<commit_message>
#12 New dynamic reinfocement learning  explanation with cat example speech added on introduction slides
</commit_message>
<xml_diff>
--- a/SAI_presentation_libre_office.pptx
+++ b/SAI_presentation_libre_office.pptx
@@ -250,7 +250,7 @@
           <a:bodyPr lIns="0" rIns="0" tIns="0" bIns="0" anchor="b"/>
           <a:p>
             <a:pPr algn="r"/>
-            <a:fld id="{0CE4242C-CBC7-4924-9509-304B4E82155F}" type="slidenum">
+            <a:fld id="{22C23751-C934-481E-81BB-979039E34D7F}" type="slidenum">
               <a:rPr b="0" lang="fr-FR" sz="1400" spc="-1" strike="noStrike">
                 <a:latin typeface="Times New Roman"/>
               </a:rPr>
@@ -298,7 +298,7 @@
         <p:spPr>
           <a:xfrm>
             <a:off x="685800" y="1143000"/>
-            <a:ext cx="5485680" cy="3085560"/>
+            <a:ext cx="5485320" cy="3085200"/>
           </a:xfrm>
           <a:prstGeom prst="rect">
             <a:avLst/>
@@ -318,7 +318,7 @@
         <p:spPr>
           <a:xfrm>
             <a:off x="685800" y="4400640"/>
-            <a:ext cx="5485680" cy="3599640"/>
+            <a:ext cx="5485320" cy="3599280"/>
           </a:xfrm>
           <a:prstGeom prst="rect">
             <a:avLst/>
@@ -327,7 +327,7 @@
         <p:txBody>
           <a:bodyPr lIns="0" rIns="0" tIns="0" bIns="0"/>
           <a:p>
-            <a:pPr marL="216000" indent="-215640">
+            <a:pPr marL="216000" indent="-215280">
               <a:lnSpc>
                 <a:spcPct val="100000"/>
               </a:lnSpc>
@@ -343,7 +343,7 @@
             </a:endParaRPr>
           </a:p>
           <a:p>
-            <a:pPr marL="216000" indent="-215640">
+            <a:pPr marL="216000" indent="-215280">
               <a:lnSpc>
                 <a:spcPct val="100000"/>
               </a:lnSpc>
@@ -360,7 +360,7 @@
             </a:endParaRPr>
           </a:p>
           <a:p>
-            <a:pPr marL="216000" indent="-215640">
+            <a:pPr marL="216000" indent="-215280">
               <a:lnSpc>
                 <a:spcPct val="100000"/>
               </a:lnSpc>
@@ -376,7 +376,7 @@
             </a:endParaRPr>
           </a:p>
           <a:p>
-            <a:pPr marL="216000" indent="-215640">
+            <a:pPr marL="216000" indent="-215280">
               <a:lnSpc>
                 <a:spcPct val="100000"/>
               </a:lnSpc>
@@ -392,7 +392,7 @@
             </a:endParaRPr>
           </a:p>
           <a:p>
-            <a:pPr marL="216000" indent="-215640">
+            <a:pPr marL="216000" indent="-215280">
               <a:lnSpc>
                 <a:spcPct val="100000"/>
               </a:lnSpc>
@@ -419,7 +419,7 @@
         <p:spPr>
           <a:xfrm>
             <a:off x="3884760" y="8685360"/>
-            <a:ext cx="2971080" cy="457920"/>
+            <a:ext cx="2970720" cy="457560"/>
           </a:xfrm>
           <a:prstGeom prst="rect">
             <a:avLst/>
@@ -443,8 +443,11 @@
                 <a:spcPct val="100000"/>
               </a:lnSpc>
             </a:pPr>
-            <a:fld id="{8F94560A-D34E-47B2-8F40-C70E6B0C284C}" type="slidenum">
+            <a:fld id="{1DF230C7-FD30-46C9-B502-C3A3B0C4A801}" type="slidenum">
               <a:rPr b="0" lang="fr-FR" sz="1200" spc="-1" strike="noStrike">
+                <a:solidFill>
+                  <a:srgbClr val="000000"/>
+                </a:solidFill>
                 <a:latin typeface="Times New Roman"/>
               </a:rPr>
               <a:t>&lt;numéro&gt;</a:t>
@@ -490,7 +493,7 @@
         <p:spPr>
           <a:xfrm>
             <a:off x="685800" y="1143000"/>
-            <a:ext cx="5485680" cy="3085560"/>
+            <a:ext cx="5485320" cy="3085200"/>
           </a:xfrm>
           <a:prstGeom prst="rect">
             <a:avLst/>
@@ -510,7 +513,7 @@
         <p:spPr>
           <a:xfrm>
             <a:off x="685800" y="4400640"/>
-            <a:ext cx="5485680" cy="3599640"/>
+            <a:ext cx="5485320" cy="3599280"/>
           </a:xfrm>
           <a:prstGeom prst="rect">
             <a:avLst/>
@@ -519,7 +522,7 @@
         <p:txBody>
           <a:bodyPr lIns="0" rIns="0" tIns="0" bIns="0"/>
           <a:p>
-            <a:pPr marL="216000" indent="-216000">
+            <a:pPr marL="216000" indent="-215640">
               <a:lnSpc>
                 <a:spcPct val="100000"/>
               </a:lnSpc>
@@ -535,7 +538,7 @@
             </a:endParaRPr>
           </a:p>
           <a:p>
-            <a:pPr marL="216000" indent="-216000">
+            <a:pPr marL="216000" indent="-215640">
               <a:lnSpc>
                 <a:spcPct val="100000"/>
               </a:lnSpc>
@@ -545,7 +548,7 @@
             </a:endParaRPr>
           </a:p>
           <a:p>
-            <a:pPr marL="216000" indent="-216000">
+            <a:pPr marL="216000" indent="-215640">
               <a:lnSpc>
                 <a:spcPct val="100000"/>
               </a:lnSpc>
@@ -561,7 +564,7 @@
             </a:endParaRPr>
           </a:p>
           <a:p>
-            <a:pPr marL="216000" indent="-216000">
+            <a:pPr marL="216000" indent="-215640">
               <a:lnSpc>
                 <a:spcPct val="100000"/>
               </a:lnSpc>
@@ -571,7 +574,7 @@
             </a:endParaRPr>
           </a:p>
           <a:p>
-            <a:pPr marL="216000" indent="-216000">
+            <a:pPr marL="216000" indent="-215640">
               <a:lnSpc>
                 <a:spcPct val="100000"/>
               </a:lnSpc>
@@ -587,7 +590,7 @@
             </a:endParaRPr>
           </a:p>
           <a:p>
-            <a:pPr marL="216000" indent="-216000">
+            <a:pPr marL="216000" indent="-215640">
               <a:lnSpc>
                 <a:spcPct val="100000"/>
               </a:lnSpc>
@@ -597,7 +600,7 @@
             </a:endParaRPr>
           </a:p>
           <a:p>
-            <a:pPr marL="216000" indent="-216000">
+            <a:pPr marL="216000" indent="-215640">
               <a:lnSpc>
                 <a:spcPct val="100000"/>
               </a:lnSpc>
@@ -613,7 +616,7 @@
             </a:endParaRPr>
           </a:p>
           <a:p>
-            <a:pPr marL="216000" indent="-216000">
+            <a:pPr marL="216000" indent="-215640">
               <a:lnSpc>
                 <a:spcPct val="100000"/>
               </a:lnSpc>
@@ -623,7 +626,7 @@
             </a:endParaRPr>
           </a:p>
           <a:p>
-            <a:pPr marL="216000" indent="-216000">
+            <a:pPr marL="216000" indent="-215640">
               <a:lnSpc>
                 <a:spcPct val="100000"/>
               </a:lnSpc>
@@ -633,7 +636,7 @@
             </a:endParaRPr>
           </a:p>
           <a:p>
-            <a:pPr marL="216000" indent="-216000">
+            <a:pPr marL="216000" indent="-215640">
               <a:lnSpc>
                 <a:spcPct val="100000"/>
               </a:lnSpc>
@@ -649,7 +652,7 @@
             </a:endParaRPr>
           </a:p>
           <a:p>
-            <a:pPr marL="216000" indent="-216000">
+            <a:pPr marL="216000" indent="-215640">
               <a:lnSpc>
                 <a:spcPct val="100000"/>
               </a:lnSpc>
@@ -665,7 +668,7 @@
             </a:endParaRPr>
           </a:p>
           <a:p>
-            <a:pPr marL="216000" indent="-216000">
+            <a:pPr marL="216000" indent="-215640">
               <a:lnSpc>
                 <a:spcPct val="100000"/>
               </a:lnSpc>
@@ -681,7 +684,7 @@
             </a:endParaRPr>
           </a:p>
           <a:p>
-            <a:pPr marL="216000" indent="-216000">
+            <a:pPr marL="216000" indent="-215640">
               <a:lnSpc>
                 <a:spcPct val="100000"/>
               </a:lnSpc>
@@ -691,7 +694,7 @@
             </a:endParaRPr>
           </a:p>
           <a:p>
-            <a:pPr marL="216000" indent="-216000">
+            <a:pPr marL="216000" indent="-215640">
               <a:lnSpc>
                 <a:spcPct val="100000"/>
               </a:lnSpc>
@@ -707,7 +710,7 @@
             </a:endParaRPr>
           </a:p>
           <a:p>
-            <a:pPr marL="216000" indent="-216000">
+            <a:pPr marL="216000" indent="-215640">
               <a:lnSpc>
                 <a:spcPct val="100000"/>
               </a:lnSpc>
@@ -717,7 +720,7 @@
             </a:endParaRPr>
           </a:p>
           <a:p>
-            <a:pPr marL="216000" indent="-216000">
+            <a:pPr marL="216000" indent="-215640">
               <a:lnSpc>
                 <a:spcPct val="100000"/>
               </a:lnSpc>
@@ -733,7 +736,7 @@
             </a:endParaRPr>
           </a:p>
           <a:p>
-            <a:pPr marL="216000" indent="-216000">
+            <a:pPr marL="216000" indent="-215640">
               <a:lnSpc>
                 <a:spcPct val="100000"/>
               </a:lnSpc>
@@ -749,7 +752,7 @@
             </a:endParaRPr>
           </a:p>
           <a:p>
-            <a:pPr marL="216000" indent="-216000">
+            <a:pPr marL="216000" indent="-215640">
               <a:lnSpc>
                 <a:spcPct val="100000"/>
               </a:lnSpc>
@@ -765,7 +768,7 @@
             </a:endParaRPr>
           </a:p>
           <a:p>
-            <a:pPr marL="216000" indent="-216000">
+            <a:pPr marL="216000" indent="-215640">
               <a:lnSpc>
                 <a:spcPct val="100000"/>
               </a:lnSpc>
@@ -781,7 +784,7 @@
             </a:endParaRPr>
           </a:p>
           <a:p>
-            <a:pPr marL="216000" indent="-216000">
+            <a:pPr marL="216000" indent="-215640">
               <a:lnSpc>
                 <a:spcPct val="100000"/>
               </a:lnSpc>
@@ -791,7 +794,7 @@
             </a:endParaRPr>
           </a:p>
           <a:p>
-            <a:pPr marL="216000" indent="-216000">
+            <a:pPr marL="216000" indent="-215640">
               <a:lnSpc>
                 <a:spcPct val="100000"/>
               </a:lnSpc>
@@ -807,7 +810,7 @@
             </a:endParaRPr>
           </a:p>
           <a:p>
-            <a:pPr marL="216000" indent="-216000">
+            <a:pPr marL="216000" indent="-215640">
               <a:lnSpc>
                 <a:spcPct val="100000"/>
               </a:lnSpc>
@@ -823,7 +826,7 @@
             </a:endParaRPr>
           </a:p>
           <a:p>
-            <a:pPr marL="216000" indent="-216000">
+            <a:pPr marL="216000" indent="-215640">
               <a:lnSpc>
                 <a:spcPct val="100000"/>
               </a:lnSpc>
@@ -839,7 +842,7 @@
             </a:endParaRPr>
           </a:p>
           <a:p>
-            <a:pPr marL="216000" indent="-216000">
+            <a:pPr marL="216000" indent="-215640">
               <a:lnSpc>
                 <a:spcPct val="100000"/>
               </a:lnSpc>
@@ -855,7 +858,7 @@
             </a:endParaRPr>
           </a:p>
           <a:p>
-            <a:pPr marL="216000" indent="-216000">
+            <a:pPr marL="216000" indent="-215640">
               <a:lnSpc>
                 <a:spcPct val="100000"/>
               </a:lnSpc>
@@ -871,7 +874,7 @@
             </a:endParaRPr>
           </a:p>
           <a:p>
-            <a:pPr marL="216000" indent="-216000">
+            <a:pPr marL="216000" indent="-215640">
               <a:lnSpc>
                 <a:spcPct val="100000"/>
               </a:lnSpc>
@@ -881,7 +884,7 @@
             </a:endParaRPr>
           </a:p>
           <a:p>
-            <a:pPr marL="216000" indent="-216000">
+            <a:pPr marL="216000" indent="-215640">
               <a:lnSpc>
                 <a:spcPct val="100000"/>
               </a:lnSpc>
@@ -897,7 +900,7 @@
             </a:endParaRPr>
           </a:p>
           <a:p>
-            <a:pPr marL="216000" indent="-216000">
+            <a:pPr marL="216000" indent="-215640">
               <a:lnSpc>
                 <a:spcPct val="100000"/>
               </a:lnSpc>
@@ -913,7 +916,7 @@
             </a:endParaRPr>
           </a:p>
           <a:p>
-            <a:pPr marL="216000" indent="-216000">
+            <a:pPr marL="216000" indent="-215640">
               <a:lnSpc>
                 <a:spcPct val="100000"/>
               </a:lnSpc>
@@ -929,7 +932,7 @@
             </a:endParaRPr>
           </a:p>
           <a:p>
-            <a:pPr marL="216000" indent="-216000">
+            <a:pPr marL="216000" indent="-215640">
               <a:lnSpc>
                 <a:spcPct val="100000"/>
               </a:lnSpc>
@@ -939,7 +942,7 @@
             </a:endParaRPr>
           </a:p>
           <a:p>
-            <a:pPr marL="216000" indent="-216000">
+            <a:pPr marL="216000" indent="-215640">
               <a:lnSpc>
                 <a:spcPct val="100000"/>
               </a:lnSpc>
@@ -955,7 +958,7 @@
             </a:endParaRPr>
           </a:p>
           <a:p>
-            <a:pPr marL="216000" indent="-216000">
+            <a:pPr marL="216000" indent="-215640">
               <a:lnSpc>
                 <a:spcPct val="100000"/>
               </a:lnSpc>
@@ -971,7 +974,7 @@
             </a:endParaRPr>
           </a:p>
           <a:p>
-            <a:pPr marL="216000" indent="-216000">
+            <a:pPr marL="216000" indent="-215640">
               <a:lnSpc>
                 <a:spcPct val="100000"/>
               </a:lnSpc>
@@ -987,7 +990,7 @@
             </a:endParaRPr>
           </a:p>
           <a:p>
-            <a:pPr marL="216000" indent="-216000">
+            <a:pPr marL="216000" indent="-215640">
               <a:lnSpc>
                 <a:spcPct val="100000"/>
               </a:lnSpc>
@@ -997,7 +1000,7 @@
             </a:endParaRPr>
           </a:p>
           <a:p>
-            <a:pPr marL="216000" indent="-216000">
+            <a:pPr marL="216000" indent="-215640">
               <a:lnSpc>
                 <a:spcPct val="100000"/>
               </a:lnSpc>
@@ -1013,7 +1016,7 @@
             </a:endParaRPr>
           </a:p>
           <a:p>
-            <a:pPr marL="216000" indent="-216000">
+            <a:pPr marL="216000" indent="-215640">
               <a:lnSpc>
                 <a:spcPct val="100000"/>
               </a:lnSpc>
@@ -1029,7 +1032,7 @@
             </a:endParaRPr>
           </a:p>
           <a:p>
-            <a:pPr marL="216000" indent="-216000">
+            <a:pPr marL="216000" indent="-215640">
               <a:lnSpc>
                 <a:spcPct val="100000"/>
               </a:lnSpc>
@@ -1045,7 +1048,7 @@
             </a:endParaRPr>
           </a:p>
           <a:p>
-            <a:pPr marL="216000" indent="-216000">
+            <a:pPr marL="216000" indent="-215640">
               <a:lnSpc>
                 <a:spcPct val="100000"/>
               </a:lnSpc>
@@ -1061,7 +1064,7 @@
             </a:endParaRPr>
           </a:p>
           <a:p>
-            <a:pPr marL="216000" indent="-216000">
+            <a:pPr marL="216000" indent="-215640">
               <a:lnSpc>
                 <a:spcPct val="100000"/>
               </a:lnSpc>
@@ -1071,7 +1074,7 @@
             </a:endParaRPr>
           </a:p>
           <a:p>
-            <a:pPr marL="216000" indent="-216000">
+            <a:pPr marL="216000" indent="-215640">
               <a:lnSpc>
                 <a:spcPct val="100000"/>
               </a:lnSpc>
@@ -1087,7 +1090,7 @@
             </a:endParaRPr>
           </a:p>
           <a:p>
-            <a:pPr marL="216000" indent="-216000">
+            <a:pPr marL="216000" indent="-215640">
               <a:lnSpc>
                 <a:spcPct val="100000"/>
               </a:lnSpc>
@@ -1097,20 +1100,31 @@
                 <a:latin typeface="Arial"/>
                 <a:ea typeface="Noto Sans CJK SC"/>
               </a:rPr>
-              <a:t>When the observer saw that the cat </a:t>
-            </a:r>
+              <a:t>When the observer saw that the cat act with the environment (stay in the garden) it will give him a reward (let him enjoy its life)</a:t>
+            </a:r>
+            <a:endParaRPr b="0" lang="fr-FR" sz="900" spc="-1" strike="noStrike">
+              <a:latin typeface="Arial"/>
+            </a:endParaRPr>
+          </a:p>
+          <a:p>
+            <a:pPr marL="216000" indent="-215640">
+              <a:lnSpc>
+                <a:spcPct val="100000"/>
+              </a:lnSpc>
+            </a:pPr>
             <a:r>
               <a:rPr b="0" lang="fr-FR" sz="900" spc="-1" strike="noStrike">
                 <a:latin typeface="Arial"/>
-              </a:rPr>
-              <a:t>act with the environment (stay in the garden) it will give him a reward (let him enjoy its life)</a:t>
+                <a:ea typeface="Noto Sans CJK SC"/>
+              </a:rPr>
+              <a:t>When the observer saw the cat act with the environment (trying to go in the house) it will give it a penality (don’t let him enjoy its life)</a:t>
             </a:r>
             <a:endParaRPr b="0" lang="fr-FR" sz="900" spc="-1" strike="noStrike">
               <a:latin typeface="Arial"/>
             </a:endParaRPr>
           </a:p>
           <a:p>
-            <a:pPr marL="216000" indent="-216000">
+            <a:pPr marL="216000" indent="-215640">
               <a:lnSpc>
                 <a:spcPct val="100000"/>
               </a:lnSpc>
@@ -1118,15 +1132,16 @@
             <a:r>
               <a:rPr b="0" lang="fr-FR" sz="900" spc="-1" strike="noStrike">
                 <a:latin typeface="Arial"/>
-              </a:rPr>
-              <a:t>When the observer saw the cat act with the environment (trying to go in the house) it will give it a penality (don’t let him enjoy its life)</a:t>
+                <a:ea typeface="Noto Sans CJK SC"/>
+              </a:rPr>
+              <a:t>So the cat will understand how the rule works and the man will disapear forever</a:t>
             </a:r>
             <a:endParaRPr b="0" lang="fr-FR" sz="900" spc="-1" strike="noStrike">
               <a:latin typeface="Arial"/>
             </a:endParaRPr>
           </a:p>
           <a:p>
-            <a:pPr marL="216000" indent="-216000">
+            <a:pPr marL="216000" indent="-215640">
               <a:lnSpc>
                 <a:spcPct val="100000"/>
               </a:lnSpc>
@@ -1136,27 +1151,41 @@
             </a:endParaRPr>
           </a:p>
           <a:p>
-            <a:pPr marL="216000" indent="-216000">
-              <a:lnSpc>
-                <a:spcPct val="100000"/>
-              </a:lnSpc>
-            </a:pPr>
+            <a:pPr marL="216000" indent="-215640">
+              <a:lnSpc>
+                <a:spcPct val="100000"/>
+              </a:lnSpc>
+            </a:pPr>
+            <a:r>
+              <a:rPr b="0" lang="fr-FR" sz="900" spc="-1" strike="noStrike">
+                <a:latin typeface="Arial"/>
+                <a:ea typeface="Noto Sans CJK SC"/>
+              </a:rPr>
+              <a:t>Now the new reinfocement learning algorithm regarding this example will be</a:t>
+            </a:r>
             <a:endParaRPr b="0" lang="fr-FR" sz="900" spc="-1" strike="noStrike">
               <a:latin typeface="Arial"/>
             </a:endParaRPr>
           </a:p>
           <a:p>
-            <a:pPr marL="216000" indent="-216000">
-              <a:lnSpc>
-                <a:spcPct val="100000"/>
-              </a:lnSpc>
-            </a:pPr>
+            <a:pPr marL="216000" indent="-215640">
+              <a:lnSpc>
+                <a:spcPct val="100000"/>
+              </a:lnSpc>
+            </a:pPr>
+            <a:r>
+              <a:rPr b="0" lang="fr-FR" sz="900" spc="-1" strike="noStrike">
+                <a:latin typeface="Arial"/>
+                <a:ea typeface="Noto Sans CJK SC"/>
+              </a:rPr>
+              <a:t>The cat will understand how the rule works and the man will always teach the cat at any time</a:t>
+            </a:r>
             <a:endParaRPr b="0" lang="fr-FR" sz="900" spc="-1" strike="noStrike">
               <a:latin typeface="Arial"/>
             </a:endParaRPr>
           </a:p>
           <a:p>
-            <a:pPr marL="216000" indent="-216000">
+            <a:pPr marL="216000" indent="-215640">
               <a:lnSpc>
                 <a:spcPct val="100000"/>
               </a:lnSpc>
@@ -1166,7 +1195,37 @@
             </a:endParaRPr>
           </a:p>
           <a:p>
-            <a:pPr marL="216000" indent="-216000">
+            <a:pPr marL="216000" indent="-215640">
+              <a:lnSpc>
+                <a:spcPct val="100000"/>
+              </a:lnSpc>
+            </a:pPr>
+            <a:endParaRPr b="0" lang="fr-FR" sz="900" spc="-1" strike="noStrike">
+              <a:latin typeface="Arial"/>
+            </a:endParaRPr>
+          </a:p>
+          <a:p>
+            <a:pPr marL="216000" indent="-215640">
+              <a:lnSpc>
+                <a:spcPct val="100000"/>
+              </a:lnSpc>
+            </a:pPr>
+            <a:endParaRPr b="0" lang="fr-FR" sz="900" spc="-1" strike="noStrike">
+              <a:latin typeface="Arial"/>
+            </a:endParaRPr>
+          </a:p>
+          <a:p>
+            <a:pPr marL="216000" indent="-215640">
+              <a:lnSpc>
+                <a:spcPct val="100000"/>
+              </a:lnSpc>
+            </a:pPr>
+            <a:endParaRPr b="0" lang="fr-FR" sz="900" spc="-1" strike="noStrike">
+              <a:latin typeface="Arial"/>
+            </a:endParaRPr>
+          </a:p>
+          <a:p>
+            <a:pPr marL="216000" indent="-215640">
               <a:lnSpc>
                 <a:spcPct val="100000"/>
               </a:lnSpc>
@@ -1186,7 +1245,7 @@
         <p:spPr>
           <a:xfrm>
             <a:off x="3884760" y="8685360"/>
-            <a:ext cx="2971080" cy="457920"/>
+            <a:ext cx="2970720" cy="457560"/>
           </a:xfrm>
           <a:prstGeom prst="rect">
             <a:avLst/>
@@ -1210,8 +1269,11 @@
                 <a:spcPct val="100000"/>
               </a:lnSpc>
             </a:pPr>
-            <a:fld id="{08A8BDB8-72AE-4DDC-987E-014EBA31F82E}" type="slidenum">
+            <a:fld id="{99CEFD47-6484-4B88-B630-9673BC0E0835}" type="slidenum">
               <a:rPr b="0" lang="fr-FR" sz="1200" spc="-1" strike="noStrike">
+                <a:solidFill>
+                  <a:srgbClr val="000000"/>
+                </a:solidFill>
                 <a:latin typeface="Times New Roman"/>
               </a:rPr>
               <a:t>&lt;numéro&gt;</a:t>
@@ -1257,7 +1319,7 @@
         <p:spPr>
           <a:xfrm>
             <a:off x="685800" y="1143000"/>
-            <a:ext cx="5485680" cy="3085560"/>
+            <a:ext cx="5485320" cy="3085200"/>
           </a:xfrm>
           <a:prstGeom prst="rect">
             <a:avLst/>
@@ -1277,7 +1339,7 @@
         <p:spPr>
           <a:xfrm>
             <a:off x="685800" y="4400640"/>
-            <a:ext cx="5485680" cy="3599640"/>
+            <a:ext cx="5485320" cy="3599280"/>
           </a:xfrm>
           <a:prstGeom prst="rect">
             <a:avLst/>
@@ -1301,7 +1363,7 @@
         <p:spPr>
           <a:xfrm>
             <a:off x="3884760" y="8685360"/>
-            <a:ext cx="2971080" cy="457920"/>
+            <a:ext cx="2970720" cy="457560"/>
           </a:xfrm>
           <a:prstGeom prst="rect">
             <a:avLst/>
@@ -1325,8 +1387,11 @@
                 <a:spcPct val="100000"/>
               </a:lnSpc>
             </a:pPr>
-            <a:fld id="{9B146B53-34FC-4425-B51C-243F41B7DFF8}" type="slidenum">
+            <a:fld id="{95FC505A-3F5A-405F-A3D7-EF73043BB9A6}" type="slidenum">
               <a:rPr b="0" lang="fr-FR" sz="1200" spc="-1" strike="noStrike">
+                <a:solidFill>
+                  <a:srgbClr val="000000"/>
+                </a:solidFill>
                 <a:latin typeface="Times New Roman"/>
               </a:rPr>
               <a:t>&lt;numéro&gt;</a:t>
@@ -4390,8 +4455,8 @@
         </p:nvSpPr>
         <p:spPr>
           <a:xfrm>
-            <a:off x="684360" y="4487400"/>
-            <a:ext cx="8533800" cy="1506240"/>
+            <a:off x="609480" y="273600"/>
+            <a:ext cx="10972080" cy="1144440"/>
           </a:xfrm>
           <a:prstGeom prst="rect">
             <a:avLst/>
@@ -4425,7 +4490,7 @@
         <p:spPr>
           <a:xfrm>
             <a:off x="609480" y="1604520"/>
-            <a:ext cx="10972440" cy="3977280"/>
+            <a:ext cx="10972080" cy="3976920"/>
           </a:xfrm>
           <a:prstGeom prst="rect">
             <a:avLst/>
@@ -4448,12 +4513,12 @@
               <a:buChar char=""/>
             </a:pPr>
             <a:r>
-              <a:rPr b="0" lang="fr-FR" sz="3200" spc="-1" strike="noStrike">
+              <a:rPr b="0" lang="fr-FR" sz="1800" spc="-1" strike="noStrike">
                 <a:latin typeface="Arial"/>
               </a:rPr>
               <a:t>Cliquez pour éditer le format du plan de texte</a:t>
             </a:r>
-            <a:endParaRPr b="0" lang="fr-FR" sz="3200" spc="-1" strike="noStrike">
+            <a:endParaRPr b="0" lang="fr-FR" sz="1800" spc="-1" strike="noStrike">
               <a:latin typeface="Arial"/>
             </a:endParaRPr>
           </a:p>
@@ -4470,12 +4535,12 @@
               <a:buChar char=""/>
             </a:pPr>
             <a:r>
-              <a:rPr b="0" lang="fr-FR" sz="2800" spc="-1" strike="noStrike">
+              <a:rPr b="0" lang="fr-FR" sz="1800" spc="-1" strike="noStrike">
                 <a:latin typeface="Arial"/>
               </a:rPr>
               <a:t>Second niveau de plan</a:t>
             </a:r>
-            <a:endParaRPr b="0" lang="fr-FR" sz="2800" spc="-1" strike="noStrike">
+            <a:endParaRPr b="0" lang="fr-FR" sz="1800" spc="-1" strike="noStrike">
               <a:latin typeface="Arial"/>
             </a:endParaRPr>
           </a:p>
@@ -4492,12 +4557,12 @@
               <a:buChar char=""/>
             </a:pPr>
             <a:r>
-              <a:rPr b="0" lang="fr-FR" sz="2400" spc="-1" strike="noStrike">
+              <a:rPr b="0" lang="fr-FR" sz="1800" spc="-1" strike="noStrike">
                 <a:latin typeface="Arial"/>
               </a:rPr>
               <a:t>Troisième niveau de plan</a:t>
             </a:r>
-            <a:endParaRPr b="0" lang="fr-FR" sz="2400" spc="-1" strike="noStrike">
+            <a:endParaRPr b="0" lang="fr-FR" sz="1800" spc="-1" strike="noStrike">
               <a:latin typeface="Arial"/>
             </a:endParaRPr>
           </a:p>
@@ -4514,12 +4579,12 @@
               <a:buChar char=""/>
             </a:pPr>
             <a:r>
-              <a:rPr b="0" lang="fr-FR" sz="2000" spc="-1" strike="noStrike">
+              <a:rPr b="0" lang="fr-FR" sz="1800" spc="-1" strike="noStrike">
                 <a:latin typeface="Arial"/>
               </a:rPr>
               <a:t>Quatrième niveau de plan</a:t>
             </a:r>
-            <a:endParaRPr b="0" lang="fr-FR" sz="2000" spc="-1" strike="noStrike">
+            <a:endParaRPr b="0" lang="fr-FR" sz="1800" spc="-1" strike="noStrike">
               <a:latin typeface="Arial"/>
             </a:endParaRPr>
           </a:p>
@@ -4536,12 +4601,12 @@
               <a:buChar char=""/>
             </a:pPr>
             <a:r>
-              <a:rPr b="0" lang="fr-FR" sz="2000" spc="-1" strike="noStrike">
+              <a:rPr b="0" lang="fr-FR" sz="1800" spc="-1" strike="noStrike">
                 <a:latin typeface="Arial"/>
               </a:rPr>
               <a:t>Cinquième niveau de plan</a:t>
             </a:r>
-            <a:endParaRPr b="0" lang="fr-FR" sz="2000" spc="-1" strike="noStrike">
+            <a:endParaRPr b="0" lang="fr-FR" sz="1800" spc="-1" strike="noStrike">
               <a:latin typeface="Arial"/>
             </a:endParaRPr>
           </a:p>
@@ -4558,12 +4623,12 @@
               <a:buChar char=""/>
             </a:pPr>
             <a:r>
-              <a:rPr b="0" lang="fr-FR" sz="2000" spc="-1" strike="noStrike">
+              <a:rPr b="0" lang="fr-FR" sz="1800" spc="-1" strike="noStrike">
                 <a:latin typeface="Arial"/>
               </a:rPr>
               <a:t>Sixième niveau de plan</a:t>
             </a:r>
-            <a:endParaRPr b="0" lang="fr-FR" sz="2000" spc="-1" strike="noStrike">
+            <a:endParaRPr b="0" lang="fr-FR" sz="1800" spc="-1" strike="noStrike">
               <a:latin typeface="Arial"/>
             </a:endParaRPr>
           </a:p>
@@ -4580,12 +4645,12 @@
               <a:buChar char=""/>
             </a:pPr>
             <a:r>
-              <a:rPr b="0" lang="fr-FR" sz="2000" spc="-1" strike="noStrike">
+              <a:rPr b="0" lang="fr-FR" sz="1800" spc="-1" strike="noStrike">
                 <a:latin typeface="Arial"/>
               </a:rPr>
               <a:t>Septième niveau de plan</a:t>
             </a:r>
-            <a:endParaRPr b="0" lang="fr-FR" sz="2000" spc="-1" strike="noStrike">
+            <a:endParaRPr b="0" lang="fr-FR" sz="1800" spc="-1" strike="noStrike">
               <a:latin typeface="Arial"/>
             </a:endParaRPr>
           </a:p>
@@ -5073,7 +5138,7 @@
         <p:spPr>
           <a:xfrm>
             <a:off x="0" y="0"/>
-            <a:ext cx="12191400" cy="6857280"/>
+            <a:ext cx="12191040" cy="6856920"/>
           </a:xfrm>
           <a:prstGeom prst="rect">
             <a:avLst/>
@@ -5105,8 +5170,8 @@
         </p:nvSpPr>
         <p:spPr>
           <a:xfrm flipV="1">
-            <a:off x="0" y="-720"/>
-            <a:ext cx="12188160" cy="6857280"/>
+            <a:off x="0" y="-1440"/>
+            <a:ext cx="12187800" cy="6856920"/>
           </a:xfrm>
           <a:prstGeom prst="snip1Rect">
             <a:avLst>
@@ -5161,7 +5226,7 @@
         <p:spPr>
           <a:xfrm>
             <a:off x="684360" y="685800"/>
-            <a:ext cx="9678240" cy="3672720"/>
+            <a:ext cx="9677880" cy="3672360"/>
           </a:xfrm>
           <a:prstGeom prst="rect">
             <a:avLst/>
@@ -5193,6 +5258,7 @@
                   <a:srgbClr val="146194"/>
                 </a:solidFill>
                 <a:latin typeface="Century Gothic"/>
+                <a:ea typeface="DejaVu Sans"/>
               </a:rPr>
               <a:t>Strong artificial intelligence</a:t>
             </a:r>
@@ -5211,7 +5277,7 @@
         <p:spPr>
           <a:xfrm>
             <a:off x="684360" y="4648320"/>
-            <a:ext cx="7004880" cy="1142280"/>
+            <a:ext cx="7004520" cy="1141920"/>
           </a:xfrm>
           <a:prstGeom prst="rect">
             <a:avLst/>
@@ -5249,6 +5315,7 @@
                   <a:srgbClr val="000000"/>
                 </a:solidFill>
                 <a:latin typeface="Century Gothic"/>
+                <a:ea typeface="DejaVu Sans"/>
               </a:rPr>
               <a:t>Johnny NGUYEN</a:t>
             </a:r>
@@ -5348,7 +5415,7 @@
         <p:spPr>
           <a:xfrm>
             <a:off x="684360" y="4487400"/>
-            <a:ext cx="8533800" cy="1506240"/>
+            <a:ext cx="8533440" cy="1505880"/>
           </a:xfrm>
           <a:prstGeom prst="rect">
             <a:avLst/>
@@ -5378,6 +5445,7 @@
                   <a:srgbClr val="ffffff"/>
                 </a:solidFill>
                 <a:latin typeface="Century Gothic"/>
+                <a:ea typeface="DejaVu Sans"/>
               </a:rPr>
               <a:t>SAI everytime</a:t>
             </a:r>
@@ -5396,7 +5464,7 @@
         <p:spPr>
           <a:xfrm>
             <a:off x="684360" y="685800"/>
-            <a:ext cx="8533800" cy="3614400"/>
+            <a:ext cx="8533440" cy="3614040"/>
           </a:xfrm>
           <a:prstGeom prst="rect">
             <a:avLst/>
@@ -5415,7 +5483,7 @@
         <p:txBody>
           <a:bodyPr lIns="90000" rIns="90000" tIns="45000" bIns="45000" anchor="ctr"/>
           <a:p>
-            <a:pPr marL="285840" indent="-285120">
+            <a:pPr marL="285840" indent="-284760">
               <a:lnSpc>
                 <a:spcPct val="100000"/>
               </a:lnSpc>
@@ -5438,6 +5506,7 @@
                   <a:srgbClr val="ffc000"/>
                 </a:solidFill>
                 <a:latin typeface="Century Gothic"/>
+                <a:ea typeface="DejaVu Sans"/>
               </a:rPr>
               <a:t>SAI</a:t>
             </a:r>
@@ -5447,6 +5516,7 @@
                   <a:srgbClr val="0f496f"/>
                 </a:solidFill>
                 <a:latin typeface="Century Gothic"/>
+                <a:ea typeface="DejaVu Sans"/>
               </a:rPr>
               <a:t> needs to run as a daemon that use the </a:t>
             </a:r>
@@ -5456,6 +5526,7 @@
                   <a:srgbClr val="002060"/>
                 </a:solidFill>
                 <a:latin typeface="Century Gothic"/>
+                <a:ea typeface="DejaVu Sans"/>
               </a:rPr>
               <a:t>mic </a:t>
             </a:r>
@@ -5465,6 +5536,7 @@
                   <a:srgbClr val="002060"/>
                 </a:solidFill>
                 <a:latin typeface="Century Gothic"/>
+                <a:ea typeface="DejaVu Sans"/>
               </a:rPr>
               <a:t>to listen </a:t>
             </a:r>
@@ -5474,6 +5546,7 @@
                   <a:srgbClr val="e67272"/>
                 </a:solidFill>
                 <a:latin typeface="Century Gothic"/>
+                <a:ea typeface="DejaVu Sans"/>
               </a:rPr>
               <a:t>a command</a:t>
             </a:r>
@@ -5483,6 +5556,7 @@
                   <a:srgbClr val="e67272"/>
                 </a:solidFill>
                 <a:latin typeface="Century Gothic"/>
+                <a:ea typeface="DejaVu Sans"/>
               </a:rPr>
               <a:t> </a:t>
             </a:r>
@@ -5492,6 +5566,7 @@
                   <a:srgbClr val="0f496f"/>
                 </a:solidFill>
                 <a:latin typeface="Century Gothic"/>
+                <a:ea typeface="DejaVu Sans"/>
               </a:rPr>
               <a:t>and let the </a:t>
             </a:r>
@@ -5501,6 +5576,7 @@
                   <a:srgbClr val="002060"/>
                 </a:solidFill>
                 <a:latin typeface="Century Gothic"/>
+                <a:ea typeface="DejaVu Sans"/>
               </a:rPr>
               <a:t>mic</a:t>
             </a:r>
@@ -5510,6 +5586,7 @@
                   <a:srgbClr val="0f496f"/>
                 </a:solidFill>
                 <a:latin typeface="Century Gothic"/>
+                <a:ea typeface="DejaVu Sans"/>
               </a:rPr>
               <a:t> for </a:t>
             </a:r>
@@ -5519,6 +5596,7 @@
                   <a:srgbClr val="ffff00"/>
                 </a:solidFill>
                 <a:latin typeface="Century Gothic"/>
+                <a:ea typeface="DejaVu Sans"/>
               </a:rPr>
               <a:t>another application</a:t>
             </a:r>
@@ -5528,6 +5606,7 @@
                   <a:srgbClr val="0f496f"/>
                 </a:solidFill>
                 <a:latin typeface="Century Gothic"/>
+                <a:ea typeface="DejaVu Sans"/>
               </a:rPr>
               <a:t> if its need</a:t>
             </a:r>
@@ -5536,7 +5615,7 @@
             </a:endParaRPr>
           </a:p>
           <a:p>
-            <a:pPr marL="285840" indent="-285120">
+            <a:pPr marL="285840" indent="-284760">
               <a:lnSpc>
                 <a:spcPct val="100000"/>
               </a:lnSpc>
@@ -5559,6 +5638,7 @@
                   <a:srgbClr val="0f496f"/>
                 </a:solidFill>
                 <a:latin typeface="Century Gothic"/>
+                <a:ea typeface="DejaVu Sans"/>
               </a:rPr>
               <a:t>A schema to explain</a:t>
             </a:r>
@@ -5581,7 +5661,7 @@
         <p:spPr>
           <a:xfrm>
             <a:off x="4733640" y="3979440"/>
-            <a:ext cx="913680" cy="913680"/>
+            <a:ext cx="913320" cy="913320"/>
           </a:xfrm>
           <a:prstGeom prst="rect">
             <a:avLst/>
@@ -5604,7 +5684,7 @@
         <p:spPr>
           <a:xfrm>
             <a:off x="6825960" y="4030200"/>
-            <a:ext cx="913680" cy="913680"/>
+            <a:ext cx="913320" cy="913320"/>
           </a:xfrm>
           <a:prstGeom prst="rect">
             <a:avLst/>
@@ -5627,7 +5707,7 @@
         <p:spPr>
           <a:xfrm>
             <a:off x="5354640" y="2725920"/>
-            <a:ext cx="913680" cy="913680"/>
+            <a:ext cx="913320" cy="913320"/>
           </a:xfrm>
           <a:prstGeom prst="rect">
             <a:avLst/>
@@ -5650,7 +5730,7 @@
         <p:spPr>
           <a:xfrm>
             <a:off x="8550000" y="3433320"/>
-            <a:ext cx="913680" cy="913680"/>
+            <a:ext cx="913320" cy="913320"/>
           </a:xfrm>
           <a:prstGeom prst="rect">
             <a:avLst/>
@@ -5673,7 +5753,7 @@
         <p:spPr>
           <a:xfrm>
             <a:off x="5153040" y="5079960"/>
-            <a:ext cx="913680" cy="913680"/>
+            <a:ext cx="913320" cy="913320"/>
           </a:xfrm>
           <a:prstGeom prst="rect">
             <a:avLst/>
@@ -5691,8 +5771,8 @@
         </p:nvSpPr>
         <p:spPr>
           <a:xfrm rot="3732600">
-            <a:off x="7993800" y="3765240"/>
-            <a:ext cx="203400" cy="669240"/>
+            <a:off x="7993800" y="3764880"/>
+            <a:ext cx="203040" cy="668880"/>
           </a:xfrm>
           <a:prstGeom prst="downArrow">
             <a:avLst>
@@ -5731,7 +5811,7 @@
         <p:spPr>
           <a:xfrm rot="14618400">
             <a:off x="6344280" y="4762440"/>
-            <a:ext cx="203400" cy="669240"/>
+            <a:ext cx="203040" cy="668880"/>
           </a:xfrm>
           <a:prstGeom prst="downArrow">
             <a:avLst>
@@ -5769,8 +5849,8 @@
         </p:nvSpPr>
         <p:spPr>
           <a:xfrm rot="5400000">
-            <a:off x="6189480" y="4132800"/>
-            <a:ext cx="203400" cy="669240"/>
+            <a:off x="6189840" y="4132800"/>
+            <a:ext cx="203040" cy="668880"/>
           </a:xfrm>
           <a:prstGeom prst="downArrow">
             <a:avLst>
@@ -5809,7 +5889,7 @@
         <p:spPr>
           <a:xfrm rot="7014000">
             <a:off x="6423480" y="3552840"/>
-            <a:ext cx="203400" cy="669240"/>
+            <a:ext cx="203040" cy="668880"/>
           </a:xfrm>
           <a:prstGeom prst="downArrow">
             <a:avLst>
@@ -5847,8 +5927,8 @@
         </p:nvSpPr>
         <p:spPr>
           <a:xfrm rot="1747800">
-            <a:off x="5088600" y="3304800"/>
-            <a:ext cx="203400" cy="669240"/>
+            <a:off x="5088600" y="3304440"/>
+            <a:ext cx="203040" cy="668880"/>
           </a:xfrm>
           <a:prstGeom prst="downArrow">
             <a:avLst>
@@ -5936,7 +6016,7 @@
         <p:spPr>
           <a:xfrm>
             <a:off x="6868080" y="306720"/>
-            <a:ext cx="5043240" cy="2085120"/>
+            <a:ext cx="5042880" cy="2084760"/>
           </a:xfrm>
           <a:prstGeom prst="rect">
             <a:avLst/>
@@ -5979,7 +6059,7 @@
         <p:spPr>
           <a:xfrm>
             <a:off x="6271200" y="2669400"/>
-            <a:ext cx="5632200" cy="3008160"/>
+            <a:ext cx="5631840" cy="3007800"/>
           </a:xfrm>
           <a:prstGeom prst="rect">
             <a:avLst/>
@@ -6024,7 +6104,7 @@
         <p:spPr>
           <a:xfrm>
             <a:off x="129960" y="5709960"/>
-            <a:ext cx="11182680" cy="1089360"/>
+            <a:ext cx="11182320" cy="1089000"/>
           </a:xfrm>
           <a:prstGeom prst="rect">
             <a:avLst/>
@@ -6069,7 +6149,7 @@
         <p:spPr>
           <a:xfrm>
             <a:off x="207000" y="1787400"/>
-            <a:ext cx="5594040" cy="3227400"/>
+            <a:ext cx="5593680" cy="3227040"/>
           </a:xfrm>
           <a:prstGeom prst="rect">
             <a:avLst/>
@@ -6114,7 +6194,7 @@
         <p:spPr>
           <a:xfrm>
             <a:off x="684360" y="4487400"/>
-            <a:ext cx="8533800" cy="1506240"/>
+            <a:ext cx="8533440" cy="1505880"/>
           </a:xfrm>
           <a:prstGeom prst="rect">
             <a:avLst/>
@@ -6144,6 +6224,7 @@
                   <a:srgbClr val="ffffff"/>
                 </a:solidFill>
                 <a:latin typeface="Century Gothic"/>
+                <a:ea typeface="DejaVu Sans"/>
               </a:rPr>
               <a:t>Issues</a:t>
             </a:r>
@@ -6162,7 +6243,7 @@
         <p:spPr>
           <a:xfrm>
             <a:off x="684360" y="685800"/>
-            <a:ext cx="8533800" cy="3614400"/>
+            <a:ext cx="8533440" cy="3614040"/>
           </a:xfrm>
           <a:prstGeom prst="rect">
             <a:avLst/>
@@ -6181,7 +6262,7 @@
         <p:txBody>
           <a:bodyPr lIns="90000" rIns="90000" tIns="45000" bIns="45000" anchor="ctr"/>
           <a:p>
-            <a:pPr marL="285840" indent="-285120">
+            <a:pPr marL="285840" indent="-284760">
               <a:lnSpc>
                 <a:spcPct val="100000"/>
               </a:lnSpc>
@@ -6204,6 +6285,7 @@
                   <a:srgbClr val="0f496f"/>
                 </a:solidFill>
                 <a:latin typeface="Century Gothic"/>
+                <a:ea typeface="DejaVu Sans"/>
               </a:rPr>
               <a:t>Create an </a:t>
             </a:r>
@@ -6213,6 +6295,7 @@
                   <a:srgbClr val="c7ea94"/>
                 </a:solidFill>
                 <a:latin typeface="Century Gothic"/>
+                <a:ea typeface="DejaVu Sans"/>
               </a:rPr>
               <a:t>adapter</a:t>
             </a:r>
@@ -6222,6 +6305,7 @@
                   <a:srgbClr val="0f496f"/>
                 </a:solidFill>
                 <a:latin typeface="Century Gothic"/>
+                <a:ea typeface="DejaVu Sans"/>
               </a:rPr>
               <a:t> to easely deploy</a:t>
             </a:r>
@@ -6230,7 +6314,7 @@
             </a:endParaRPr>
           </a:p>
           <a:p>
-            <a:pPr marL="285840" indent="-285120">
+            <a:pPr marL="285840" indent="-284760">
               <a:lnSpc>
                 <a:spcPct val="100000"/>
               </a:lnSpc>
@@ -6253,6 +6337,7 @@
                   <a:srgbClr val="00b0f0"/>
                 </a:solidFill>
                 <a:latin typeface="Century Gothic"/>
+                <a:ea typeface="DejaVu Sans"/>
               </a:rPr>
               <a:t>Compress</a:t>
             </a:r>
@@ -6262,6 +6347,7 @@
                   <a:srgbClr val="0f496f"/>
                 </a:solidFill>
                 <a:latin typeface="Century Gothic"/>
+                <a:ea typeface="DejaVu Sans"/>
               </a:rPr>
               <a:t> data gather by SAI</a:t>
             </a:r>
@@ -6270,7 +6356,7 @@
             </a:endParaRPr>
           </a:p>
           <a:p>
-            <a:pPr marL="285840" indent="-285120">
+            <a:pPr marL="285840" indent="-284760">
               <a:lnSpc>
                 <a:spcPct val="100000"/>
               </a:lnSpc>
@@ -6293,6 +6379,7 @@
                   <a:srgbClr val="0f496f"/>
                 </a:solidFill>
                 <a:latin typeface="Century Gothic"/>
+                <a:ea typeface="DejaVu Sans"/>
               </a:rPr>
               <a:t>Create a </a:t>
             </a:r>
@@ -6302,6 +6389,7 @@
                   <a:srgbClr val="0f705d"/>
                 </a:solidFill>
                 <a:latin typeface="Century Gothic"/>
+                <a:ea typeface="DejaVu Sans"/>
               </a:rPr>
               <a:t>reward</a:t>
             </a:r>
@@ -6311,6 +6399,7 @@
                   <a:srgbClr val="0f496f"/>
                 </a:solidFill>
                 <a:latin typeface="Century Gothic"/>
+                <a:ea typeface="DejaVu Sans"/>
               </a:rPr>
               <a:t> using RL</a:t>
             </a:r>
@@ -6319,7 +6408,7 @@
             </a:endParaRPr>
           </a:p>
           <a:p>
-            <a:pPr marL="285840" indent="-285120">
+            <a:pPr marL="285840" indent="-284760">
               <a:lnSpc>
                 <a:spcPct val="100000"/>
               </a:lnSpc>
@@ -6342,6 +6431,7 @@
                   <a:srgbClr val="0f496f"/>
                 </a:solidFill>
                 <a:latin typeface="Century Gothic"/>
+                <a:ea typeface="DejaVu Sans"/>
               </a:rPr>
               <a:t>Make SAI </a:t>
             </a:r>
@@ -6351,6 +6441,7 @@
                   <a:srgbClr val="b1d3fb"/>
                 </a:solidFill>
                 <a:latin typeface="Century Gothic"/>
+                <a:ea typeface="DejaVu Sans"/>
               </a:rPr>
               <a:t>robust</a:t>
             </a:r>
@@ -6485,7 +6576,7 @@
         <p:spPr>
           <a:xfrm>
             <a:off x="4629600" y="1832040"/>
-            <a:ext cx="853920" cy="853920"/>
+            <a:ext cx="853560" cy="853560"/>
           </a:xfrm>
           <a:prstGeom prst="rect">
             <a:avLst/>
@@ -6508,7 +6599,7 @@
         <p:spPr>
           <a:xfrm>
             <a:off x="4463640" y="4185360"/>
-            <a:ext cx="1180440" cy="472680"/>
+            <a:ext cx="1180080" cy="472320"/>
           </a:xfrm>
           <a:prstGeom prst="rect">
             <a:avLst/>
@@ -6531,7 +6622,7 @@
         <p:spPr>
           <a:xfrm>
             <a:off x="4586040" y="2785680"/>
-            <a:ext cx="897480" cy="1039680"/>
+            <a:ext cx="897120" cy="1039320"/>
           </a:xfrm>
           <a:prstGeom prst="rect">
             <a:avLst/>
@@ -6554,7 +6645,7 @@
         <p:spPr>
           <a:xfrm>
             <a:off x="250560" y="1953720"/>
-            <a:ext cx="913680" cy="913680"/>
+            <a:ext cx="913320" cy="913320"/>
           </a:xfrm>
           <a:prstGeom prst="rect">
             <a:avLst/>
@@ -6577,7 +6668,7 @@
         <p:spPr>
           <a:xfrm>
             <a:off x="271440" y="3259800"/>
-            <a:ext cx="913680" cy="913680"/>
+            <a:ext cx="913320" cy="913320"/>
           </a:xfrm>
           <a:prstGeom prst="rect">
             <a:avLst/>
@@ -6600,7 +6691,7 @@
         <p:spPr>
           <a:xfrm>
             <a:off x="2440800" y="2741040"/>
-            <a:ext cx="913680" cy="913680"/>
+            <a:ext cx="913320" cy="913320"/>
           </a:xfrm>
           <a:prstGeom prst="rect">
             <a:avLst/>
@@ -6618,8 +6709,8 @@
         </p:nvSpPr>
         <p:spPr>
           <a:xfrm rot="1192200">
-            <a:off x="1579680" y="2562120"/>
-            <a:ext cx="977760" cy="483840"/>
+            <a:off x="1579320" y="2561760"/>
+            <a:ext cx="977400" cy="483480"/>
           </a:xfrm>
           <a:prstGeom prst="rightArrow">
             <a:avLst>
@@ -6660,8 +6751,8 @@
         </p:nvSpPr>
         <p:spPr>
           <a:xfrm rot="20407800">
-            <a:off x="1559520" y="3348720"/>
-            <a:ext cx="977760" cy="483840"/>
+            <a:off x="1559160" y="3348720"/>
+            <a:ext cx="977400" cy="483480"/>
           </a:xfrm>
           <a:prstGeom prst="rightArrow">
             <a:avLst>
@@ -6702,8 +6793,8 @@
         </p:nvSpPr>
         <p:spPr>
           <a:xfrm rot="1192200">
-            <a:off x="3333240" y="3670560"/>
-            <a:ext cx="977760" cy="483840"/>
+            <a:off x="3332880" y="3670200"/>
+            <a:ext cx="977400" cy="483480"/>
           </a:xfrm>
           <a:prstGeom prst="rightArrow">
             <a:avLst>
@@ -6744,8 +6835,8 @@
         </p:nvSpPr>
         <p:spPr>
           <a:xfrm rot="20407800">
-            <a:off x="3407760" y="2344320"/>
-            <a:ext cx="977760" cy="483840"/>
+            <a:off x="3407400" y="2344320"/>
+            <a:ext cx="977400" cy="483480"/>
           </a:xfrm>
           <a:prstGeom prst="rightArrow">
             <a:avLst>
@@ -6787,7 +6878,7 @@
         <p:spPr>
           <a:xfrm>
             <a:off x="3483720" y="3004200"/>
-            <a:ext cx="977760" cy="483840"/>
+            <a:ext cx="977400" cy="483480"/>
           </a:xfrm>
           <a:prstGeom prst="rightArrow">
             <a:avLst>
@@ -6833,7 +6924,7 @@
         <p:spPr>
           <a:xfrm>
             <a:off x="5819760" y="5709960"/>
-            <a:ext cx="913680" cy="913680"/>
+            <a:ext cx="913320" cy="913320"/>
           </a:xfrm>
           <a:prstGeom prst="rect">
             <a:avLst/>
@@ -6856,7 +6947,7 @@
         <p:spPr>
           <a:xfrm>
             <a:off x="2060640" y="5759640"/>
-            <a:ext cx="913680" cy="913680"/>
+            <a:ext cx="913320" cy="913320"/>
           </a:xfrm>
           <a:prstGeom prst="rect">
             <a:avLst/>
@@ -6879,7 +6970,7 @@
         <p:spPr>
           <a:xfrm>
             <a:off x="9383040" y="5709960"/>
-            <a:ext cx="913680" cy="913680"/>
+            <a:ext cx="913320" cy="913320"/>
           </a:xfrm>
           <a:prstGeom prst="rect">
             <a:avLst/>
@@ -6902,7 +6993,7 @@
         <p:spPr>
           <a:xfrm>
             <a:off x="7495920" y="5709960"/>
-            <a:ext cx="913680" cy="913680"/>
+            <a:ext cx="913320" cy="913320"/>
           </a:xfrm>
           <a:prstGeom prst="rect">
             <a:avLst/>
@@ -6925,7 +7016,7 @@
         <p:spPr>
           <a:xfrm>
             <a:off x="4004640" y="5709960"/>
-            <a:ext cx="913680" cy="913680"/>
+            <a:ext cx="913320" cy="913320"/>
           </a:xfrm>
           <a:prstGeom prst="rect">
             <a:avLst/>
@@ -6948,7 +7039,7 @@
         <p:spPr>
           <a:xfrm>
             <a:off x="276120" y="5759640"/>
-            <a:ext cx="913680" cy="913680"/>
+            <a:ext cx="913320" cy="913320"/>
           </a:xfrm>
           <a:prstGeom prst="rect">
             <a:avLst/>
@@ -6967,7 +7058,7 @@
         <p:spPr>
           <a:xfrm>
             <a:off x="1230120" y="6098760"/>
-            <a:ext cx="682200" cy="261360"/>
+            <a:ext cx="681840" cy="261000"/>
           </a:xfrm>
           <a:prstGeom prst="rightArrow">
             <a:avLst>
@@ -7006,7 +7097,7 @@
         <p:spPr>
           <a:xfrm>
             <a:off x="3103920" y="6117480"/>
-            <a:ext cx="682200" cy="261360"/>
+            <a:ext cx="681840" cy="261000"/>
           </a:xfrm>
           <a:prstGeom prst="rightArrow">
             <a:avLst>
@@ -7045,7 +7136,7 @@
         <p:spPr>
           <a:xfrm>
             <a:off x="4958640" y="6109200"/>
-            <a:ext cx="682200" cy="261360"/>
+            <a:ext cx="681840" cy="261000"/>
           </a:xfrm>
           <a:prstGeom prst="rightArrow">
             <a:avLst>
@@ -7084,7 +7175,7 @@
         <p:spPr>
           <a:xfrm>
             <a:off x="6754320" y="6098760"/>
-            <a:ext cx="682200" cy="261360"/>
+            <a:ext cx="681840" cy="261000"/>
           </a:xfrm>
           <a:prstGeom prst="rightArrow">
             <a:avLst>
@@ -7123,7 +7214,7 @@
         <p:spPr>
           <a:xfrm>
             <a:off x="8468280" y="6085800"/>
-            <a:ext cx="682200" cy="261360"/>
+            <a:ext cx="681840" cy="261000"/>
           </a:xfrm>
           <a:prstGeom prst="rightArrow">
             <a:avLst>
@@ -7166,7 +7257,7 @@
         <p:spPr>
           <a:xfrm>
             <a:off x="6582600" y="3915000"/>
-            <a:ext cx="913680" cy="913680"/>
+            <a:ext cx="913320" cy="913320"/>
           </a:xfrm>
           <a:prstGeom prst="rect">
             <a:avLst/>
@@ -7189,7 +7280,7 @@
         <p:spPr>
           <a:xfrm>
             <a:off x="8674920" y="3965760"/>
-            <a:ext cx="913680" cy="913680"/>
+            <a:ext cx="913320" cy="913320"/>
           </a:xfrm>
           <a:prstGeom prst="rect">
             <a:avLst/>
@@ -7212,7 +7303,7 @@
         <p:spPr>
           <a:xfrm>
             <a:off x="7203600" y="2661480"/>
-            <a:ext cx="913680" cy="913680"/>
+            <a:ext cx="913320" cy="913320"/>
           </a:xfrm>
           <a:prstGeom prst="rect">
             <a:avLst/>
@@ -7235,7 +7326,7 @@
         <p:spPr>
           <a:xfrm>
             <a:off x="10398960" y="3368880"/>
-            <a:ext cx="913680" cy="913680"/>
+            <a:ext cx="913320" cy="913320"/>
           </a:xfrm>
           <a:prstGeom prst="rect">
             <a:avLst/>
@@ -7258,7 +7349,7 @@
         <p:spPr>
           <a:xfrm>
             <a:off x="7002000" y="5015520"/>
-            <a:ext cx="913680" cy="913680"/>
+            <a:ext cx="913320" cy="913320"/>
           </a:xfrm>
           <a:prstGeom prst="rect">
             <a:avLst/>
@@ -7276,8 +7367,8 @@
         </p:nvSpPr>
         <p:spPr>
           <a:xfrm rot="3732600">
-            <a:off x="9843120" y="3701160"/>
-            <a:ext cx="203400" cy="669240"/>
+            <a:off x="9843120" y="3700800"/>
+            <a:ext cx="203040" cy="668880"/>
           </a:xfrm>
           <a:prstGeom prst="downArrow">
             <a:avLst>
@@ -7316,7 +7407,7 @@
         <p:spPr>
           <a:xfrm rot="14618400">
             <a:off x="8193240" y="4698360"/>
-            <a:ext cx="203400" cy="669240"/>
+            <a:ext cx="203040" cy="668880"/>
           </a:xfrm>
           <a:prstGeom prst="downArrow">
             <a:avLst>
@@ -7354,8 +7445,8 @@
         </p:nvSpPr>
         <p:spPr>
           <a:xfrm rot="5400000">
-            <a:off x="8038440" y="4068360"/>
-            <a:ext cx="203400" cy="669240"/>
+            <a:off x="8038800" y="4068360"/>
+            <a:ext cx="203040" cy="668880"/>
           </a:xfrm>
           <a:prstGeom prst="downArrow">
             <a:avLst>
@@ -7394,7 +7485,7 @@
         <p:spPr>
           <a:xfrm rot="7014000">
             <a:off x="8272800" y="3488400"/>
-            <a:ext cx="203400" cy="669240"/>
+            <a:ext cx="203040" cy="668880"/>
           </a:xfrm>
           <a:prstGeom prst="downArrow">
             <a:avLst>
@@ -7432,8 +7523,8 @@
         </p:nvSpPr>
         <p:spPr>
           <a:xfrm rot="1747800">
-            <a:off x="7095600" y="3426840"/>
-            <a:ext cx="203400" cy="669240"/>
+            <a:off x="7095600" y="3426480"/>
+            <a:ext cx="203040" cy="668880"/>
           </a:xfrm>
           <a:prstGeom prst="downArrow">
             <a:avLst>
@@ -7476,7 +7567,7 @@
         <p:spPr>
           <a:xfrm>
             <a:off x="8641080" y="309600"/>
-            <a:ext cx="913680" cy="913680"/>
+            <a:ext cx="913320" cy="913320"/>
           </a:xfrm>
           <a:prstGeom prst="rect">
             <a:avLst/>
@@ -7499,7 +7590,7 @@
         <p:spPr>
           <a:xfrm>
             <a:off x="10568880" y="1497240"/>
-            <a:ext cx="913680" cy="913680"/>
+            <a:ext cx="913320" cy="913320"/>
           </a:xfrm>
           <a:prstGeom prst="rect">
             <a:avLst/>
@@ -7522,7 +7613,7 @@
         <p:spPr>
           <a:xfrm>
             <a:off x="6932880" y="1497240"/>
-            <a:ext cx="913680" cy="913680"/>
+            <a:ext cx="913320" cy="913320"/>
           </a:xfrm>
           <a:prstGeom prst="rect">
             <a:avLst/>
@@ -7541,7 +7632,7 @@
         <p:spPr>
           <a:xfrm>
             <a:off x="8173800" y="1774080"/>
-            <a:ext cx="2067840" cy="360000"/>
+            <a:ext cx="2067480" cy="359640"/>
           </a:xfrm>
           <a:prstGeom prst="rightArrow">
             <a:avLst>
@@ -7580,7 +7671,7 @@
         <p:spPr>
           <a:xfrm>
             <a:off x="8947440" y="1361160"/>
-            <a:ext cx="300960" cy="406440"/>
+            <a:ext cx="300600" cy="406080"/>
           </a:xfrm>
           <a:prstGeom prst="downArrow">
             <a:avLst>
@@ -7668,7 +7759,7 @@
         <p:spPr>
           <a:xfrm>
             <a:off x="0" y="0"/>
-            <a:ext cx="12191400" cy="6857280"/>
+            <a:ext cx="12191040" cy="6856920"/>
           </a:xfrm>
           <a:prstGeom prst="rect">
             <a:avLst/>
@@ -7721,7 +7812,7 @@
         <p:spPr>
           <a:xfrm>
             <a:off x="640440" y="685800"/>
-            <a:ext cx="4817880" cy="4602960"/>
+            <a:ext cx="4817520" cy="4602600"/>
           </a:xfrm>
           <a:prstGeom prst="rect">
             <a:avLst/>
@@ -7753,6 +7844,7 @@
                   <a:srgbClr val="ffffff"/>
                 </a:solidFill>
                 <a:latin typeface="Century Gothic"/>
+                <a:ea typeface="DejaVu Sans"/>
               </a:rPr>
               <a:t>Solutions</a:t>
             </a:r>
@@ -7771,7 +7863,7 @@
         <p:spPr>
           <a:xfrm>
             <a:off x="6095880" y="0"/>
-            <a:ext cx="6095160" cy="6857280"/>
+            <a:ext cx="6094800" cy="6856920"/>
           </a:xfrm>
           <a:prstGeom prst="rect">
             <a:avLst/>
@@ -7809,7 +7901,7 @@
         <p:spPr>
           <a:xfrm>
             <a:off x="6625800" y="685800"/>
-            <a:ext cx="4878360" cy="4602960"/>
+            <a:ext cx="4878000" cy="4602600"/>
           </a:xfrm>
           <a:prstGeom prst="rect">
             <a:avLst/>
@@ -7830,7 +7922,7 @@
             <a:normAutofit/>
           </a:bodyPr>
           <a:p>
-            <a:pPr marL="285840" indent="-285120">
+            <a:pPr marL="285840" indent="-284760">
               <a:lnSpc>
                 <a:spcPct val="100000"/>
               </a:lnSpc>
@@ -7853,6 +7945,7 @@
                   <a:srgbClr val="ffffff"/>
                 </a:solidFill>
                 <a:latin typeface="Century Gothic"/>
+                <a:ea typeface="DejaVu Sans"/>
               </a:rPr>
               <a:t>Create SAI with pyinstaller for multiplatform</a:t>
             </a:r>
@@ -7861,7 +7954,7 @@
             </a:endParaRPr>
           </a:p>
           <a:p>
-            <a:pPr marL="285840" indent="-285120">
+            <a:pPr marL="285840" indent="-284760">
               <a:lnSpc>
                 <a:spcPct val="100000"/>
               </a:lnSpc>
@@ -7884,6 +7977,7 @@
                   <a:srgbClr val="ffffff"/>
                 </a:solidFill>
                 <a:latin typeface="Century Gothic"/>
+                <a:ea typeface="DejaVu Sans"/>
               </a:rPr>
               <a:t>Launch a scan that remove duplicate screenshot and order them by interesting strategie</a:t>
             </a:r>
@@ -7892,7 +7986,7 @@
             </a:endParaRPr>
           </a:p>
           <a:p>
-            <a:pPr marL="285840" indent="-285120">
+            <a:pPr marL="285840" indent="-284760">
               <a:lnSpc>
                 <a:spcPct val="100000"/>
               </a:lnSpc>
@@ -7915,6 +8009,7 @@
                   <a:srgbClr val="ffffff"/>
                 </a:solidFill>
                 <a:latin typeface="Century Gothic"/>
+                <a:ea typeface="DejaVu Sans"/>
               </a:rPr>
               <a:t>Increment the reward if there was difference between images</a:t>
             </a:r>
@@ -7923,7 +8018,7 @@
             </a:endParaRPr>
           </a:p>
           <a:p>
-            <a:pPr marL="285840" indent="-285120">
+            <a:pPr marL="285840" indent="-284760">
               <a:lnSpc>
                 <a:spcPct val="100000"/>
               </a:lnSpc>
@@ -7946,6 +8041,7 @@
                   <a:srgbClr val="ffffff"/>
                 </a:solidFill>
                 <a:latin typeface="Century Gothic"/>
+                <a:ea typeface="DejaVu Sans"/>
               </a:rPr>
               <a:t>Create a web page with the strategies learned</a:t>
             </a:r>
@@ -7954,7 +8050,7 @@
             </a:endParaRPr>
           </a:p>
           <a:p>
-            <a:pPr marL="285840" indent="-285120">
+            <a:pPr marL="285840" indent="-284760">
               <a:lnSpc>
                 <a:spcPct val="100000"/>
               </a:lnSpc>
@@ -7977,6 +8073,7 @@
                   <a:srgbClr val="ffffff"/>
                 </a:solidFill>
                 <a:latin typeface="Century Gothic"/>
+                <a:ea typeface="DejaVu Sans"/>
               </a:rPr>
               <a:t>Create a web interface or a vocal controller to order strategies</a:t>
             </a:r>
@@ -8017,7 +8114,7 @@
         <p:spPr>
           <a:xfrm>
             <a:off x="684360" y="4487400"/>
-            <a:ext cx="8533800" cy="1506240"/>
+            <a:ext cx="8533440" cy="1505880"/>
           </a:xfrm>
           <a:prstGeom prst="rect">
             <a:avLst/>
@@ -8047,6 +8144,7 @@
                   <a:srgbClr val="ffffff"/>
                 </a:solidFill>
                 <a:latin typeface="Century Gothic"/>
+                <a:ea typeface="DejaVu Sans"/>
               </a:rPr>
               <a:t>Pyinstaller</a:t>
             </a:r>
@@ -8065,7 +8163,7 @@
         <p:spPr>
           <a:xfrm>
             <a:off x="684360" y="685800"/>
-            <a:ext cx="8533800" cy="3614400"/>
+            <a:ext cx="8533440" cy="3614040"/>
           </a:xfrm>
           <a:prstGeom prst="rect">
             <a:avLst/>
@@ -8084,7 +8182,7 @@
         <p:txBody>
           <a:bodyPr lIns="90000" rIns="90000" tIns="45000" bIns="45000" anchor="ctr"/>
           <a:p>
-            <a:pPr marL="285840" indent="-285120">
+            <a:pPr marL="285840" indent="-284760">
               <a:lnSpc>
                 <a:spcPct val="100000"/>
               </a:lnSpc>
@@ -8107,6 +8205,7 @@
                   <a:srgbClr val="0f496f"/>
                 </a:solidFill>
                 <a:latin typeface="Century Gothic"/>
+                <a:ea typeface="DejaVu Sans"/>
               </a:rPr>
               <a:t>We choose to use pyinstaller to deploy SAI on Windows and OS X</a:t>
             </a:r>
@@ -8115,7 +8214,7 @@
             </a:endParaRPr>
           </a:p>
           <a:p>
-            <a:pPr marL="285840" indent="-285120">
+            <a:pPr marL="285840" indent="-284760">
               <a:lnSpc>
                 <a:spcPct val="100000"/>
               </a:lnSpc>
@@ -8138,6 +8237,7 @@
                   <a:srgbClr val="0f496f"/>
                 </a:solidFill>
                 <a:latin typeface="Century Gothic"/>
+                <a:ea typeface="DejaVu Sans"/>
               </a:rPr>
               <a:t>Pyinstaller allows us to create executable for all platforms</a:t>
             </a:r>
@@ -8224,7 +8324,7 @@
         <p:spPr>
           <a:xfrm>
             <a:off x="6995520" y="1949760"/>
-            <a:ext cx="853920" cy="853920"/>
+            <a:ext cx="853560" cy="853560"/>
           </a:xfrm>
           <a:prstGeom prst="rect">
             <a:avLst/>
@@ -8247,7 +8347,7 @@
         <p:spPr>
           <a:xfrm>
             <a:off x="6829560" y="4303080"/>
-            <a:ext cx="1180440" cy="472680"/>
+            <a:ext cx="1180080" cy="472320"/>
           </a:xfrm>
           <a:prstGeom prst="rect">
             <a:avLst/>
@@ -8270,7 +8370,7 @@
         <p:spPr>
           <a:xfrm>
             <a:off x="6951960" y="2903040"/>
-            <a:ext cx="897480" cy="1039680"/>
+            <a:ext cx="897120" cy="1039320"/>
           </a:xfrm>
           <a:prstGeom prst="rect">
             <a:avLst/>
@@ -8293,7 +8393,7 @@
         <p:spPr>
           <a:xfrm>
             <a:off x="2616120" y="2071080"/>
-            <a:ext cx="913680" cy="913680"/>
+            <a:ext cx="913320" cy="913320"/>
           </a:xfrm>
           <a:prstGeom prst="rect">
             <a:avLst/>
@@ -8316,7 +8416,7 @@
         <p:spPr>
           <a:xfrm>
             <a:off x="2637000" y="3377160"/>
-            <a:ext cx="913680" cy="913680"/>
+            <a:ext cx="913320" cy="913320"/>
           </a:xfrm>
           <a:prstGeom prst="rect">
             <a:avLst/>
@@ -8334,8 +8434,8 @@
         </p:nvSpPr>
         <p:spPr>
           <a:xfrm rot="1192200">
-            <a:off x="3945240" y="2679480"/>
-            <a:ext cx="977760" cy="483840"/>
+            <a:off x="3944880" y="2679120"/>
+            <a:ext cx="977400" cy="483480"/>
           </a:xfrm>
           <a:prstGeom prst="rightArrow">
             <a:avLst>
@@ -8376,8 +8476,8 @@
         </p:nvSpPr>
         <p:spPr>
           <a:xfrm rot="20407800">
-            <a:off x="3925080" y="3466080"/>
-            <a:ext cx="977760" cy="483840"/>
+            <a:off x="3924720" y="3466080"/>
+            <a:ext cx="977400" cy="483480"/>
           </a:xfrm>
           <a:prstGeom prst="rightArrow">
             <a:avLst>
@@ -8418,8 +8518,8 @@
         </p:nvSpPr>
         <p:spPr>
           <a:xfrm rot="1192200">
-            <a:off x="5699160" y="3787920"/>
-            <a:ext cx="977760" cy="483840"/>
+            <a:off x="5698800" y="3787560"/>
+            <a:ext cx="977400" cy="483480"/>
           </a:xfrm>
           <a:prstGeom prst="rightArrow">
             <a:avLst>
@@ -8460,8 +8560,8 @@
         </p:nvSpPr>
         <p:spPr>
           <a:xfrm rot="20407800">
-            <a:off x="5773320" y="2461680"/>
-            <a:ext cx="977760" cy="483840"/>
+            <a:off x="5772960" y="2461680"/>
+            <a:ext cx="977400" cy="483480"/>
           </a:xfrm>
           <a:prstGeom prst="rightArrow">
             <a:avLst>
@@ -8503,7 +8603,7 @@
         <p:spPr>
           <a:xfrm>
             <a:off x="5849640" y="3121560"/>
-            <a:ext cx="977760" cy="483840"/>
+            <a:ext cx="977400" cy="483480"/>
           </a:xfrm>
           <a:prstGeom prst="rightArrow">
             <a:avLst>
@@ -8549,7 +8649,7 @@
         <p:spPr>
           <a:xfrm>
             <a:off x="4950720" y="2998800"/>
-            <a:ext cx="756000" cy="756000"/>
+            <a:ext cx="755640" cy="755640"/>
           </a:xfrm>
           <a:prstGeom prst="rect">
             <a:avLst/>
@@ -8590,7 +8690,7 @@
         <p:spPr>
           <a:xfrm>
             <a:off x="684360" y="4487400"/>
-            <a:ext cx="8533800" cy="1506240"/>
+            <a:ext cx="8533440" cy="1505880"/>
           </a:xfrm>
           <a:prstGeom prst="rect">
             <a:avLst/>
@@ -8620,6 +8720,7 @@
                   <a:srgbClr val="ffffff"/>
                 </a:solidFill>
                 <a:latin typeface="Century Gothic"/>
+                <a:ea typeface="DejaVu Sans"/>
               </a:rPr>
               <a:t>Clean and Strategy</a:t>
             </a:r>
@@ -8638,7 +8739,7 @@
         <p:spPr>
           <a:xfrm>
             <a:off x="684360" y="685800"/>
-            <a:ext cx="8533800" cy="3614400"/>
+            <a:ext cx="8533440" cy="3614040"/>
           </a:xfrm>
           <a:prstGeom prst="rect">
             <a:avLst/>
@@ -8657,7 +8758,7 @@
         <p:txBody>
           <a:bodyPr lIns="90000" rIns="90000" tIns="45000" bIns="45000" anchor="ctr"/>
           <a:p>
-            <a:pPr marL="285840" indent="-285120">
+            <a:pPr marL="285840" indent="-284760">
               <a:lnSpc>
                 <a:spcPct val="100000"/>
               </a:lnSpc>
@@ -8680,6 +8781,7 @@
                   <a:srgbClr val="0f496f"/>
                 </a:solidFill>
                 <a:latin typeface="Century Gothic"/>
+                <a:ea typeface="DejaVu Sans"/>
               </a:rPr>
               <a:t>Method used to </a:t>
             </a:r>
@@ -8689,6 +8791,7 @@
                   <a:srgbClr val="ff0000"/>
                 </a:solidFill>
                 <a:latin typeface="Century Gothic"/>
+                <a:ea typeface="DejaVu Sans"/>
               </a:rPr>
               <a:t>remove</a:t>
             </a:r>
@@ -8698,6 +8801,7 @@
                   <a:srgbClr val="0f496f"/>
                 </a:solidFill>
                 <a:latin typeface="Century Gothic"/>
+                <a:ea typeface="DejaVu Sans"/>
               </a:rPr>
               <a:t> </a:t>
             </a:r>
@@ -8707,6 +8811,7 @@
                   <a:srgbClr val="ffff00"/>
                 </a:solidFill>
                 <a:latin typeface="Century Gothic"/>
+                <a:ea typeface="DejaVu Sans"/>
               </a:rPr>
               <a:t>duplicate scan</a:t>
             </a:r>
@@ -8779,7 +8884,7 @@
             </a:endParaRPr>
           </a:p>
           <a:p>
-            <a:pPr marL="285840" indent="-285120">
+            <a:pPr marL="285840" indent="-284760">
               <a:lnSpc>
                 <a:spcPct val="100000"/>
               </a:lnSpc>
@@ -8802,6 +8907,7 @@
                   <a:srgbClr val="0f496f"/>
                 </a:solidFill>
                 <a:latin typeface="Century Gothic"/>
+                <a:ea typeface="DejaVu Sans"/>
               </a:rPr>
               <a:t>Method used to </a:t>
             </a:r>
@@ -8811,6 +8917,7 @@
                   <a:srgbClr val="92d050"/>
                 </a:solidFill>
                 <a:latin typeface="Century Gothic"/>
+                <a:ea typeface="DejaVu Sans"/>
               </a:rPr>
               <a:t>sort</a:t>
             </a:r>
@@ -8820,6 +8927,7 @@
                   <a:srgbClr val="0f496f"/>
                 </a:solidFill>
                 <a:latin typeface="Century Gothic"/>
+                <a:ea typeface="DejaVu Sans"/>
               </a:rPr>
               <a:t> them by </a:t>
             </a:r>
@@ -8829,6 +8937,7 @@
                   <a:srgbClr val="0070c0"/>
                 </a:solidFill>
                 <a:latin typeface="Century Gothic"/>
+                <a:ea typeface="DejaVu Sans"/>
               </a:rPr>
               <a:t>strategy</a:t>
             </a:r>
@@ -8867,7 +8976,7 @@
         <p:spPr>
           <a:xfrm>
             <a:off x="3562560" y="1395720"/>
-            <a:ext cx="913680" cy="913680"/>
+            <a:ext cx="913320" cy="913320"/>
           </a:xfrm>
           <a:prstGeom prst="rect">
             <a:avLst/>
@@ -8890,7 +8999,7 @@
         <p:spPr>
           <a:xfrm>
             <a:off x="6678360" y="1395720"/>
-            <a:ext cx="913680" cy="913680"/>
+            <a:ext cx="913320" cy="913320"/>
           </a:xfrm>
           <a:prstGeom prst="rect">
             <a:avLst/>
@@ -8913,7 +9022,7 @@
         <p:spPr>
           <a:xfrm>
             <a:off x="7042320" y="3904200"/>
-            <a:ext cx="913680" cy="913680"/>
+            <a:ext cx="913320" cy="913320"/>
           </a:xfrm>
           <a:prstGeom prst="rect">
             <a:avLst/>
@@ -8936,7 +9045,7 @@
         <p:spPr>
           <a:xfrm>
             <a:off x="3562560" y="3904200"/>
-            <a:ext cx="913680" cy="913680"/>
+            <a:ext cx="913320" cy="913320"/>
           </a:xfrm>
           <a:prstGeom prst="rect">
             <a:avLst/>
@@ -8959,7 +9068,7 @@
         <p:spPr>
           <a:xfrm>
             <a:off x="6678360" y="1395720"/>
-            <a:ext cx="913680" cy="913680"/>
+            <a:ext cx="913320" cy="913320"/>
           </a:xfrm>
           <a:prstGeom prst="rect">
             <a:avLst/>
@@ -8982,7 +9091,7 @@
         <p:spPr>
           <a:xfrm>
             <a:off x="4113000" y="2039400"/>
-            <a:ext cx="913680" cy="913680"/>
+            <a:ext cx="913320" cy="913320"/>
           </a:xfrm>
           <a:prstGeom prst="rect">
             <a:avLst/>
@@ -9005,7 +9114,7 @@
         <p:spPr>
           <a:xfrm>
             <a:off x="7296480" y="2133000"/>
-            <a:ext cx="913680" cy="913680"/>
+            <a:ext cx="913320" cy="913320"/>
           </a:xfrm>
           <a:prstGeom prst="rect">
             <a:avLst/>
@@ -9024,7 +9133,7 @@
         <p:spPr>
           <a:xfrm>
             <a:off x="5285160" y="1920960"/>
-            <a:ext cx="1182240" cy="544680"/>
+            <a:ext cx="1181880" cy="544320"/>
           </a:xfrm>
           <a:prstGeom prst="rightArrow">
             <a:avLst>
@@ -9066,7 +9175,7 @@
         <p:spPr>
           <a:xfrm>
             <a:off x="5149440" y="4088880"/>
-            <a:ext cx="1182240" cy="544680"/>
+            <a:ext cx="1181880" cy="544320"/>
           </a:xfrm>
           <a:prstGeom prst="rightArrow">
             <a:avLst>
@@ -9131,7 +9240,7 @@
         <p:spPr>
           <a:xfrm>
             <a:off x="4895280" y="2388600"/>
-            <a:ext cx="2707200" cy="364320"/>
+            <a:ext cx="2706840" cy="363960"/>
           </a:xfrm>
           <a:prstGeom prst="rect">
             <a:avLst/>
@@ -9180,7 +9289,7 @@
         <p:spPr>
           <a:xfrm>
             <a:off x="5027400" y="4575240"/>
-            <a:ext cx="2327040" cy="364320"/>
+            <a:ext cx="2326680" cy="363960"/>
           </a:xfrm>
           <a:prstGeom prst="rect">
             <a:avLst/>
@@ -9251,7 +9360,7 @@
         <p:spPr>
           <a:xfrm>
             <a:off x="684360" y="4487400"/>
-            <a:ext cx="8533800" cy="1506240"/>
+            <a:ext cx="8533440" cy="1505880"/>
           </a:xfrm>
           <a:prstGeom prst="rect">
             <a:avLst/>
@@ -9281,6 +9390,7 @@
                   <a:srgbClr val="ffffff"/>
                 </a:solidFill>
                 <a:latin typeface="Century Gothic"/>
+                <a:ea typeface="DejaVu Sans"/>
               </a:rPr>
               <a:t>Difference between images</a:t>
             </a:r>
@@ -9299,7 +9409,7 @@
         <p:spPr>
           <a:xfrm>
             <a:off x="684360" y="685800"/>
-            <a:ext cx="8533800" cy="3614400"/>
+            <a:ext cx="8533440" cy="3614040"/>
           </a:xfrm>
           <a:prstGeom prst="rect">
             <a:avLst/>
@@ -9318,7 +9428,7 @@
         <p:txBody>
           <a:bodyPr lIns="90000" rIns="90000" tIns="45000" bIns="45000" anchor="ctr"/>
           <a:p>
-            <a:pPr marL="285840" indent="-285120">
+            <a:pPr marL="285840" indent="-284760">
               <a:lnSpc>
                 <a:spcPct val="100000"/>
               </a:lnSpc>
@@ -9341,6 +9451,7 @@
                   <a:srgbClr val="0f496f"/>
                 </a:solidFill>
                 <a:latin typeface="Century Gothic"/>
+                <a:ea typeface="DejaVu Sans"/>
               </a:rPr>
               <a:t>Create</a:t>
             </a:r>
@@ -9350,6 +9461,7 @@
                   <a:srgbClr val="0f496f"/>
                 </a:solidFill>
                 <a:latin typeface="Century Gothic"/>
+                <a:ea typeface="DejaVu Sans"/>
               </a:rPr>
               <a:t> a </a:t>
             </a:r>
@@ -9359,6 +9471,7 @@
                   <a:srgbClr val="0070c0"/>
                 </a:solidFill>
                 <a:latin typeface="Century Gothic"/>
+                <a:ea typeface="DejaVu Sans"/>
               </a:rPr>
               <a:t>strategy</a:t>
             </a:r>
@@ -9368,6 +9481,7 @@
                   <a:srgbClr val="0f496f"/>
                 </a:solidFill>
                 <a:latin typeface="Century Gothic"/>
+                <a:ea typeface="DejaVu Sans"/>
               </a:rPr>
               <a:t> when </a:t>
             </a:r>
@@ -9377,6 +9491,7 @@
                   <a:srgbClr val="ffff00"/>
                 </a:solidFill>
                 <a:latin typeface="Century Gothic"/>
+                <a:ea typeface="DejaVu Sans"/>
               </a:rPr>
               <a:t>some images </a:t>
             </a:r>
@@ -9386,6 +9501,7 @@
                   <a:srgbClr val="0f496f"/>
                 </a:solidFill>
                 <a:latin typeface="Century Gothic"/>
+                <a:ea typeface="DejaVu Sans"/>
               </a:rPr>
               <a:t>are really different using a </a:t>
             </a:r>
@@ -9395,6 +9511,7 @@
                   <a:srgbClr val="eea1a1"/>
                 </a:solidFill>
                 <a:latin typeface="Century Gothic"/>
+                <a:ea typeface="DejaVu Sans"/>
               </a:rPr>
               <a:t>threshold</a:t>
             </a:r>
@@ -9433,7 +9550,7 @@
         <p:spPr>
           <a:xfrm>
             <a:off x="1863000" y="3157920"/>
-            <a:ext cx="913680" cy="913680"/>
+            <a:ext cx="913320" cy="913320"/>
           </a:xfrm>
           <a:prstGeom prst="rect">
             <a:avLst/>
@@ -9456,7 +9573,7 @@
         <p:spPr>
           <a:xfrm>
             <a:off x="2413440" y="3801600"/>
-            <a:ext cx="913680" cy="913680"/>
+            <a:ext cx="913320" cy="913320"/>
           </a:xfrm>
           <a:prstGeom prst="rect">
             <a:avLst/>
@@ -9479,7 +9596,7 @@
         <p:spPr>
           <a:xfrm>
             <a:off x="7197480" y="3439800"/>
-            <a:ext cx="913680" cy="913680"/>
+            <a:ext cx="913320" cy="913320"/>
           </a:xfrm>
           <a:prstGeom prst="rect">
             <a:avLst/>
@@ -9502,7 +9619,7 @@
         <p:spPr>
           <a:xfrm>
             <a:off x="4758840" y="3366360"/>
-            <a:ext cx="913680" cy="913680"/>
+            <a:ext cx="913320" cy="913320"/>
           </a:xfrm>
           <a:prstGeom prst="rect">
             <a:avLst/>
@@ -9521,7 +9638,7 @@
         <p:spPr>
           <a:xfrm>
             <a:off x="3568680" y="3429000"/>
-            <a:ext cx="936720" cy="913680"/>
+            <a:ext cx="936360" cy="913320"/>
           </a:xfrm>
           <a:prstGeom prst="mathPlus">
             <a:avLst>
@@ -9559,7 +9676,7 @@
         <p:spPr>
           <a:xfrm>
             <a:off x="6095880" y="3654360"/>
-            <a:ext cx="737640" cy="565560"/>
+            <a:ext cx="737280" cy="565200"/>
           </a:xfrm>
           <a:prstGeom prst="mathEqual">
             <a:avLst>
@@ -9620,7 +9737,7 @@
         <p:spPr>
           <a:xfrm>
             <a:off x="4750920" y="2898360"/>
-            <a:ext cx="2689200" cy="3719160"/>
+            <a:ext cx="2688840" cy="3718800"/>
           </a:xfrm>
           <a:prstGeom prst="rect">
             <a:avLst/>
@@ -9663,7 +9780,7 @@
         <p:spPr>
           <a:xfrm>
             <a:off x="684360" y="4487400"/>
-            <a:ext cx="8533800" cy="1506240"/>
+            <a:ext cx="8533440" cy="1505880"/>
           </a:xfrm>
           <a:prstGeom prst="rect">
             <a:avLst/>
@@ -9693,6 +9810,7 @@
                   <a:srgbClr val="ffffff"/>
                 </a:solidFill>
                 <a:latin typeface="Century Gothic"/>
+                <a:ea typeface="DejaVu Sans"/>
               </a:rPr>
               <a:t>Web page</a:t>
             </a:r>
@@ -9711,7 +9829,7 @@
         <p:spPr>
           <a:xfrm>
             <a:off x="684360" y="685800"/>
-            <a:ext cx="8533800" cy="3614400"/>
+            <a:ext cx="8533440" cy="3614040"/>
           </a:xfrm>
           <a:prstGeom prst="rect">
             <a:avLst/>
@@ -9730,7 +9848,7 @@
         <p:txBody>
           <a:bodyPr lIns="90000" rIns="90000" tIns="45000" bIns="45000" anchor="ctr"/>
           <a:p>
-            <a:pPr marL="285840" indent="-285120">
+            <a:pPr marL="285840" indent="-284760">
               <a:lnSpc>
                 <a:spcPct val="100000"/>
               </a:lnSpc>
@@ -9753,6 +9871,7 @@
                   <a:srgbClr val="0f496f"/>
                 </a:solidFill>
                 <a:latin typeface="Century Gothic"/>
+                <a:ea typeface="DejaVu Sans"/>
               </a:rPr>
               <a:t>The </a:t>
             </a:r>
@@ -9762,6 +9881,7 @@
                   <a:srgbClr val="f2f2f2"/>
                 </a:solidFill>
                 <a:latin typeface="Century Gothic"/>
+                <a:ea typeface="DejaVu Sans"/>
               </a:rPr>
               <a:t>web page </a:t>
             </a:r>
@@ -9771,6 +9891,7 @@
                   <a:srgbClr val="0f496f"/>
                 </a:solidFill>
                 <a:latin typeface="Century Gothic"/>
+                <a:ea typeface="DejaVu Sans"/>
               </a:rPr>
               <a:t>will show us all the </a:t>
             </a:r>
@@ -9780,6 +9901,7 @@
                   <a:srgbClr val="0070c0"/>
                 </a:solidFill>
                 <a:latin typeface="Century Gothic"/>
+                <a:ea typeface="DejaVu Sans"/>
               </a:rPr>
               <a:t>strategies</a:t>
             </a:r>
@@ -9789,6 +9911,7 @@
                   <a:srgbClr val="0f496f"/>
                 </a:solidFill>
                 <a:latin typeface="Century Gothic"/>
+                <a:ea typeface="DejaVu Sans"/>
               </a:rPr>
               <a:t> </a:t>
             </a:r>
@@ -9798,6 +9921,7 @@
                   <a:srgbClr val="ffc000"/>
                 </a:solidFill>
                 <a:latin typeface="Century Gothic"/>
+                <a:ea typeface="DejaVu Sans"/>
               </a:rPr>
               <a:t>SAI</a:t>
             </a:r>
@@ -9807,6 +9931,7 @@
                   <a:srgbClr val="0f496f"/>
                 </a:solidFill>
                 <a:latin typeface="Century Gothic"/>
+                <a:ea typeface="DejaVu Sans"/>
               </a:rPr>
               <a:t> </a:t>
             </a:r>
@@ -9816,6 +9941,7 @@
                   <a:srgbClr val="d9d9d9"/>
                 </a:solidFill>
                 <a:latin typeface="Century Gothic"/>
+                <a:ea typeface="DejaVu Sans"/>
               </a:rPr>
               <a:t>record</a:t>
             </a:r>
@@ -9825,6 +9951,7 @@
                   <a:srgbClr val="0f496f"/>
                 </a:solidFill>
                 <a:latin typeface="Century Gothic"/>
+                <a:ea typeface="DejaVu Sans"/>
               </a:rPr>
               <a:t> </a:t>
             </a:r>
@@ -9834,6 +9961,7 @@
                   <a:srgbClr val="4be7c8"/>
                 </a:solidFill>
                 <a:latin typeface="Century Gothic"/>
+                <a:ea typeface="DejaVu Sans"/>
               </a:rPr>
               <a:t>during the day</a:t>
             </a:r>
@@ -9856,7 +9984,7 @@
         <p:spPr>
           <a:xfrm>
             <a:off x="4843440" y="2989800"/>
-            <a:ext cx="641160" cy="641160"/>
+            <a:ext cx="640800" cy="640800"/>
           </a:xfrm>
           <a:prstGeom prst="rect">
             <a:avLst/>
@@ -9879,7 +10007,7 @@
         <p:spPr>
           <a:xfrm>
             <a:off x="5028120" y="4248360"/>
-            <a:ext cx="913680" cy="913680"/>
+            <a:ext cx="913320" cy="913320"/>
           </a:xfrm>
           <a:prstGeom prst="rect">
             <a:avLst/>
@@ -9902,7 +10030,7 @@
         <p:spPr>
           <a:xfrm>
             <a:off x="5506200" y="5025240"/>
-            <a:ext cx="913680" cy="913680"/>
+            <a:ext cx="913320" cy="913320"/>
           </a:xfrm>
           <a:prstGeom prst="rect">
             <a:avLst/>
@@ -9925,7 +10053,7 @@
         <p:spPr>
           <a:xfrm>
             <a:off x="6042600" y="4248360"/>
-            <a:ext cx="913680" cy="913680"/>
+            <a:ext cx="913320" cy="913320"/>
           </a:xfrm>
           <a:prstGeom prst="rect">
             <a:avLst/>
@@ -9948,7 +10076,7 @@
         <p:spPr>
           <a:xfrm>
             <a:off x="7944480" y="2602440"/>
-            <a:ext cx="913680" cy="913680"/>
+            <a:ext cx="913320" cy="913320"/>
           </a:xfrm>
           <a:prstGeom prst="rect">
             <a:avLst/>
@@ -9971,7 +10099,7 @@
         <p:spPr>
           <a:xfrm>
             <a:off x="6671160" y="3059640"/>
-            <a:ext cx="570960" cy="570960"/>
+            <a:ext cx="570600" cy="570600"/>
           </a:xfrm>
           <a:prstGeom prst="rect">
             <a:avLst/>
@@ -9994,7 +10122,7 @@
         <p:spPr>
           <a:xfrm>
             <a:off x="2973240" y="3863520"/>
-            <a:ext cx="913680" cy="913680"/>
+            <a:ext cx="913320" cy="913320"/>
           </a:xfrm>
           <a:prstGeom prst="rect">
             <a:avLst/>
@@ -10013,7 +10141,7 @@
         <p:spPr>
           <a:xfrm>
             <a:off x="4012560" y="4487400"/>
-            <a:ext cx="1492920" cy="856440"/>
+            <a:ext cx="1492560" cy="856080"/>
           </a:xfrm>
           <a:custGeom>
             <a:avLst/>
@@ -10065,7 +10193,7 @@
         <p:spPr>
           <a:xfrm>
             <a:off x="4012560" y="4248360"/>
-            <a:ext cx="2029320" cy="238320"/>
+            <a:ext cx="2028960" cy="237960"/>
           </a:xfrm>
           <a:custGeom>
             <a:avLst/>
@@ -10117,7 +10245,7 @@
         <p:spPr>
           <a:xfrm>
             <a:off x="4012560" y="4367880"/>
-            <a:ext cx="938160" cy="239040"/>
+            <a:ext cx="937800" cy="238680"/>
           </a:xfrm>
           <a:custGeom>
             <a:avLst/>
@@ -10168,8 +10296,8 @@
         </p:nvSpPr>
         <p:spPr>
           <a:xfrm flipV="1">
-            <a:off x="7242840" y="3222000"/>
-            <a:ext cx="628920" cy="122400"/>
+            <a:off x="7242840" y="3221280"/>
+            <a:ext cx="628560" cy="122040"/>
           </a:xfrm>
           <a:custGeom>
             <a:avLst/>
@@ -10244,7 +10372,7 @@
         <p:spPr>
           <a:xfrm>
             <a:off x="684360" y="4487400"/>
-            <a:ext cx="8533800" cy="1506240"/>
+            <a:ext cx="8533440" cy="1505880"/>
           </a:xfrm>
           <a:prstGeom prst="rect">
             <a:avLst/>
@@ -10274,6 +10402,7 @@
                   <a:srgbClr val="ffffff"/>
                 </a:solidFill>
                 <a:latin typeface="Century Gothic"/>
+                <a:ea typeface="DejaVu Sans"/>
               </a:rPr>
               <a:t>Strategy learning</a:t>
             </a:r>
@@ -10292,7 +10421,7 @@
         <p:spPr>
           <a:xfrm>
             <a:off x="684360" y="685800"/>
-            <a:ext cx="8533800" cy="3614400"/>
+            <a:ext cx="8533440" cy="3614040"/>
           </a:xfrm>
           <a:prstGeom prst="rect">
             <a:avLst/>
@@ -10311,7 +10440,7 @@
         <p:txBody>
           <a:bodyPr lIns="90000" rIns="90000" tIns="45000" bIns="45000" anchor="ctr"/>
           <a:p>
-            <a:pPr marL="285840" indent="-285120">
+            <a:pPr marL="285840" indent="-284760">
               <a:lnSpc>
                 <a:spcPct val="100000"/>
               </a:lnSpc>
@@ -10334,6 +10463,7 @@
                   <a:srgbClr val="0f496f"/>
                 </a:solidFill>
                 <a:latin typeface="Century Gothic"/>
+                <a:ea typeface="DejaVu Sans"/>
               </a:rPr>
               <a:t>The </a:t>
             </a:r>
@@ -10343,6 +10473,7 @@
                   <a:srgbClr val="f2f2f2"/>
                 </a:solidFill>
                 <a:latin typeface="Century Gothic"/>
+                <a:ea typeface="DejaVu Sans"/>
               </a:rPr>
               <a:t>web page </a:t>
             </a:r>
@@ -10352,6 +10483,7 @@
                   <a:srgbClr val="0f496f"/>
                 </a:solidFill>
                 <a:latin typeface="Century Gothic"/>
+                <a:ea typeface="DejaVu Sans"/>
               </a:rPr>
               <a:t>will allow the </a:t>
             </a:r>
@@ -10361,6 +10493,7 @@
                   <a:srgbClr val="002060"/>
                 </a:solidFill>
                 <a:latin typeface="Century Gothic"/>
+                <a:ea typeface="DejaVu Sans"/>
               </a:rPr>
               <a:t>user to choose </a:t>
             </a:r>
@@ -10370,6 +10503,7 @@
                   <a:srgbClr val="0f496f"/>
                 </a:solidFill>
                 <a:latin typeface="Century Gothic"/>
+                <a:ea typeface="DejaVu Sans"/>
               </a:rPr>
               <a:t>the best way (</a:t>
             </a:r>
@@ -10379,6 +10513,7 @@
                   <a:srgbClr val="0070c0"/>
                 </a:solidFill>
                 <a:latin typeface="Century Gothic"/>
+                <a:ea typeface="DejaVu Sans"/>
               </a:rPr>
               <a:t>strategy</a:t>
             </a:r>
@@ -10388,6 +10523,7 @@
                   <a:srgbClr val="0f496f"/>
                 </a:solidFill>
                 <a:latin typeface="Century Gothic"/>
+                <a:ea typeface="DejaVu Sans"/>
               </a:rPr>
               <a:t>) </a:t>
             </a:r>
@@ -10397,6 +10533,7 @@
                   <a:srgbClr val="ffc000"/>
                 </a:solidFill>
                 <a:latin typeface="Century Gothic"/>
+                <a:ea typeface="DejaVu Sans"/>
               </a:rPr>
               <a:t>SAI</a:t>
             </a:r>
@@ -10406,6 +10543,7 @@
                   <a:srgbClr val="0f496f"/>
                 </a:solidFill>
                 <a:latin typeface="Century Gothic"/>
+                <a:ea typeface="DejaVu Sans"/>
               </a:rPr>
               <a:t> will </a:t>
             </a:r>
@@ -10415,6 +10553,7 @@
                   <a:srgbClr val="ff0000"/>
                 </a:solidFill>
                 <a:latin typeface="Century Gothic"/>
+                <a:ea typeface="DejaVu Sans"/>
               </a:rPr>
               <a:t>understand</a:t>
             </a:r>
@@ -10424,6 +10563,7 @@
                   <a:srgbClr val="0f496f"/>
                 </a:solidFill>
                 <a:latin typeface="Century Gothic"/>
+                <a:ea typeface="DejaVu Sans"/>
               </a:rPr>
               <a:t> how it </a:t>
             </a:r>
@@ -10433,6 +10573,7 @@
                   <a:srgbClr val="ff0000"/>
                 </a:solidFill>
                 <a:latin typeface="Century Gothic"/>
+                <a:ea typeface="DejaVu Sans"/>
               </a:rPr>
               <a:t>needs to do</a:t>
             </a:r>
@@ -10467,7 +10608,7 @@
         <p:spPr>
           <a:xfrm>
             <a:off x="5430600" y="2730600"/>
-            <a:ext cx="2689200" cy="3719160"/>
+            <a:ext cx="2688840" cy="3718800"/>
           </a:xfrm>
           <a:prstGeom prst="rect">
             <a:avLst/>
@@ -10514,7 +10655,7 @@
         <p:spPr>
           <a:xfrm>
             <a:off x="5523120" y="2822040"/>
-            <a:ext cx="641160" cy="641160"/>
+            <a:ext cx="640800" cy="640800"/>
           </a:xfrm>
           <a:prstGeom prst="rect">
             <a:avLst/>
@@ -10537,7 +10678,7 @@
         <p:spPr>
           <a:xfrm>
             <a:off x="5707800" y="4080600"/>
-            <a:ext cx="913680" cy="913680"/>
+            <a:ext cx="913320" cy="913320"/>
           </a:xfrm>
           <a:prstGeom prst="rect">
             <a:avLst/>
@@ -10560,7 +10701,7 @@
         <p:spPr>
           <a:xfrm>
             <a:off x="6185880" y="4857480"/>
-            <a:ext cx="913680" cy="913680"/>
+            <a:ext cx="913320" cy="913320"/>
           </a:xfrm>
           <a:prstGeom prst="rect">
             <a:avLst/>
@@ -10583,7 +10724,7 @@
         <p:spPr>
           <a:xfrm>
             <a:off x="6722280" y="4080600"/>
-            <a:ext cx="913680" cy="913680"/>
+            <a:ext cx="913320" cy="913320"/>
           </a:xfrm>
           <a:prstGeom prst="rect">
             <a:avLst/>
@@ -10606,7 +10747,7 @@
         <p:spPr>
           <a:xfrm>
             <a:off x="3652920" y="3695760"/>
-            <a:ext cx="913680" cy="913680"/>
+            <a:ext cx="913320" cy="913320"/>
           </a:xfrm>
           <a:prstGeom prst="rect">
             <a:avLst/>
@@ -10625,7 +10766,7 @@
         <p:spPr>
           <a:xfrm>
             <a:off x="4692240" y="4319640"/>
-            <a:ext cx="1492920" cy="856440"/>
+            <a:ext cx="1492560" cy="856080"/>
           </a:xfrm>
           <a:custGeom>
             <a:avLst/>
@@ -10677,7 +10818,7 @@
         <p:spPr>
           <a:xfrm>
             <a:off x="4692240" y="4080600"/>
-            <a:ext cx="2029320" cy="238320"/>
+            <a:ext cx="2028960" cy="237960"/>
           </a:xfrm>
           <a:custGeom>
             <a:avLst/>
@@ -10729,7 +10870,7 @@
         <p:spPr>
           <a:xfrm>
             <a:off x="4692240" y="4200120"/>
-            <a:ext cx="938160" cy="239040"/>
+            <a:ext cx="937800" cy="238680"/>
           </a:xfrm>
           <a:custGeom>
             <a:avLst/>
@@ -10785,7 +10926,7 @@
         <p:spPr>
           <a:xfrm>
             <a:off x="9653760" y="3605400"/>
-            <a:ext cx="913680" cy="913680"/>
+            <a:ext cx="913320" cy="913320"/>
           </a:xfrm>
           <a:prstGeom prst="rect">
             <a:avLst/>
@@ -10803,8 +10944,8 @@
         </p:nvSpPr>
         <p:spPr>
           <a:xfrm rot="10325400">
-            <a:off x="7855200" y="4105800"/>
-            <a:ext cx="1785240" cy="307080"/>
+            <a:off x="7855200" y="4106160"/>
+            <a:ext cx="1784880" cy="306720"/>
           </a:xfrm>
           <a:prstGeom prst="rightArrow">
             <a:avLst>
@@ -10868,7 +11009,7 @@
         <p:spPr>
           <a:xfrm>
             <a:off x="684360" y="4487400"/>
-            <a:ext cx="8533800" cy="1506240"/>
+            <a:ext cx="8533440" cy="1505880"/>
           </a:xfrm>
           <a:prstGeom prst="rect">
             <a:avLst/>
@@ -10898,6 +11039,7 @@
                   <a:srgbClr val="ffffff"/>
                 </a:solidFill>
                 <a:latin typeface="Century Gothic"/>
+                <a:ea typeface="DejaVu Sans"/>
               </a:rPr>
               <a:t>Result</a:t>
             </a:r>
@@ -10916,7 +11058,7 @@
         <p:spPr>
           <a:xfrm>
             <a:off x="684360" y="685800"/>
-            <a:ext cx="8533800" cy="3614400"/>
+            <a:ext cx="8533440" cy="3614040"/>
           </a:xfrm>
           <a:prstGeom prst="rect">
             <a:avLst/>
@@ -10946,7 +11088,7 @@
         <p:spPr>
           <a:xfrm>
             <a:off x="4069440" y="82800"/>
-            <a:ext cx="4045680" cy="2846160"/>
+            <a:ext cx="4045320" cy="2845800"/>
           </a:xfrm>
           <a:prstGeom prst="rect">
             <a:avLst/>
@@ -10969,7 +11111,7 @@
         <p:spPr>
           <a:xfrm>
             <a:off x="83880" y="3103560"/>
-            <a:ext cx="3866760" cy="1643760"/>
+            <a:ext cx="3866400" cy="1643400"/>
           </a:xfrm>
           <a:prstGeom prst="rect">
             <a:avLst/>
@@ -10992,7 +11134,7 @@
         <p:spPr>
           <a:xfrm>
             <a:off x="4161600" y="3103560"/>
-            <a:ext cx="3866760" cy="1643760"/>
+            <a:ext cx="3866400" cy="1643400"/>
           </a:xfrm>
           <a:prstGeom prst="rect">
             <a:avLst/>
@@ -11015,7 +11157,7 @@
         <p:spPr>
           <a:xfrm>
             <a:off x="8230320" y="3103560"/>
-            <a:ext cx="3866760" cy="1643760"/>
+            <a:ext cx="3866400" cy="1643400"/>
           </a:xfrm>
           <a:prstGeom prst="rect">
             <a:avLst/>
@@ -11034,7 +11176,7 @@
         <p:spPr>
           <a:xfrm>
             <a:off x="3993840" y="3766680"/>
-            <a:ext cx="150480" cy="318600"/>
+            <a:ext cx="150120" cy="318240"/>
           </a:xfrm>
           <a:prstGeom prst="rightArrow">
             <a:avLst>
@@ -11073,7 +11215,7 @@
         <p:spPr>
           <a:xfrm>
             <a:off x="8073360" y="3793320"/>
-            <a:ext cx="131400" cy="318600"/>
+            <a:ext cx="131040" cy="318240"/>
           </a:xfrm>
           <a:prstGeom prst="rightArrow">
             <a:avLst>
@@ -11112,7 +11254,7 @@
         <p:spPr>
           <a:xfrm>
             <a:off x="2701080" y="5176080"/>
-            <a:ext cx="1836360" cy="921960"/>
+            <a:ext cx="1836000" cy="921600"/>
           </a:xfrm>
           <a:prstGeom prst="wedgeRectCallout">
             <a:avLst>
@@ -11177,7 +11319,7 @@
         <p:spPr>
           <a:xfrm>
             <a:off x="6722640" y="5196600"/>
-            <a:ext cx="1967760" cy="825120"/>
+            <a:ext cx="1967400" cy="824760"/>
           </a:xfrm>
           <a:prstGeom prst="wedgeRectCallout">
             <a:avLst>
@@ -11242,7 +11384,7 @@
         <p:spPr>
           <a:xfrm>
             <a:off x="9731160" y="5131440"/>
-            <a:ext cx="2104920" cy="655920"/>
+            <a:ext cx="2104560" cy="655560"/>
           </a:xfrm>
           <a:prstGeom prst="wedgeRectCallout">
             <a:avLst>
@@ -11307,7 +11449,7 @@
         <p:spPr>
           <a:xfrm>
             <a:off x="5033520" y="2516760"/>
-            <a:ext cx="2574720" cy="364320"/>
+            <a:ext cx="2574360" cy="363960"/>
           </a:xfrm>
           <a:prstGeom prst="rect">
             <a:avLst/>
@@ -11355,8 +11497,8 @@
         </p:nvSpPr>
         <p:spPr>
           <a:xfrm rot="16200000">
-            <a:off x="3177360" y="1265760"/>
-            <a:ext cx="1963800" cy="364320"/>
+            <a:off x="3177360" y="1266120"/>
+            <a:ext cx="1963440" cy="363960"/>
           </a:xfrm>
           <a:prstGeom prst="rect">
             <a:avLst/>
@@ -11427,7 +11569,7 @@
         <p:spPr>
           <a:xfrm>
             <a:off x="684360" y="4487400"/>
-            <a:ext cx="8533800" cy="1506240"/>
+            <a:ext cx="8533440" cy="1505880"/>
           </a:xfrm>
           <a:prstGeom prst="rect">
             <a:avLst/>
@@ -11459,6 +11601,7 @@
                   <a:srgbClr val="ffffff"/>
                 </a:solidFill>
                 <a:latin typeface="Century Gothic"/>
+                <a:ea typeface="DejaVu Sans"/>
               </a:rPr>
               <a:t>Conclusion</a:t>
             </a:r>
@@ -11477,9 +11620,9 @@
         <p:grpSpPr>
           <a:xfrm>
             <a:off x="948240" y="823320"/>
-            <a:ext cx="10291680" cy="3339000"/>
+            <a:ext cx="10291320" cy="3338640"/>
             <a:chOff x="948240" y="823320"/>
-            <a:chExt cx="10291680" cy="3339000"/>
+            <a:chExt cx="10291320" cy="3338640"/>
           </a:xfrm>
         </p:grpSpPr>
         <p:sp>
@@ -11491,7 +11634,7 @@
           <p:spPr>
             <a:xfrm>
               <a:off x="948240" y="823320"/>
-              <a:ext cx="1361880" cy="1361880"/>
+              <a:ext cx="1361520" cy="1361520"/>
             </a:xfrm>
             <a:prstGeom prst="ellipse">
               <a:avLst/>
@@ -11524,7 +11667,7 @@
           <p:spPr>
             <a:xfrm>
               <a:off x="1234440" y="1109520"/>
-              <a:ext cx="789480" cy="789480"/>
+              <a:ext cx="789120" cy="789120"/>
             </a:xfrm>
             <a:prstGeom prst="rect">
               <a:avLst/>
@@ -11555,7 +11698,7 @@
           <p:spPr>
             <a:xfrm>
               <a:off x="2602800" y="823320"/>
-              <a:ext cx="3211200" cy="1361880"/>
+              <a:ext cx="3210840" cy="1361520"/>
             </a:xfrm>
             <a:prstGeom prst="rect">
               <a:avLst/>
@@ -11607,7 +11750,7 @@
           <p:spPr>
             <a:xfrm>
               <a:off x="6374160" y="823320"/>
-              <a:ext cx="1361880" cy="1361880"/>
+              <a:ext cx="1361520" cy="1361520"/>
             </a:xfrm>
             <a:prstGeom prst="ellipse">
               <a:avLst/>
@@ -11640,7 +11783,7 @@
           <p:spPr>
             <a:xfrm>
               <a:off x="6660360" y="1109520"/>
-              <a:ext cx="789480" cy="789480"/>
+              <a:ext cx="789120" cy="789120"/>
             </a:xfrm>
             <a:prstGeom prst="rect">
               <a:avLst/>
@@ -11671,7 +11814,7 @@
           <p:spPr>
             <a:xfrm>
               <a:off x="8028720" y="823320"/>
-              <a:ext cx="3211200" cy="1361880"/>
+              <a:ext cx="3210840" cy="1361520"/>
             </a:xfrm>
             <a:prstGeom prst="rect">
               <a:avLst/>
@@ -11723,7 +11866,7 @@
           <p:spPr>
             <a:xfrm>
               <a:off x="948240" y="2800440"/>
-              <a:ext cx="1361880" cy="1361880"/>
+              <a:ext cx="1361520" cy="1361520"/>
             </a:xfrm>
             <a:prstGeom prst="ellipse">
               <a:avLst/>
@@ -11756,7 +11899,7 @@
           <p:spPr>
             <a:xfrm>
               <a:off x="1234440" y="3086640"/>
-              <a:ext cx="789480" cy="789480"/>
+              <a:ext cx="789120" cy="789120"/>
             </a:xfrm>
             <a:prstGeom prst="rect">
               <a:avLst/>
@@ -11787,7 +11930,7 @@
           <p:spPr>
             <a:xfrm>
               <a:off x="2602800" y="2800440"/>
-              <a:ext cx="3211200" cy="1361880"/>
+              <a:ext cx="3210840" cy="1361520"/>
             </a:xfrm>
             <a:prstGeom prst="rect">
               <a:avLst/>
@@ -11839,7 +11982,7 @@
           <p:spPr>
             <a:xfrm>
               <a:off x="6374160" y="2800440"/>
-              <a:ext cx="1361880" cy="1361880"/>
+              <a:ext cx="1361520" cy="1361520"/>
             </a:xfrm>
             <a:prstGeom prst="ellipse">
               <a:avLst/>
@@ -11872,7 +12015,7 @@
           <p:spPr>
             <a:xfrm>
               <a:off x="6660360" y="3086640"/>
-              <a:ext cx="789480" cy="789480"/>
+              <a:ext cx="789120" cy="789120"/>
             </a:xfrm>
             <a:prstGeom prst="rect">
               <a:avLst/>
@@ -11903,7 +12046,7 @@
           <p:spPr>
             <a:xfrm>
               <a:off x="8028720" y="2800440"/>
-              <a:ext cx="3211200" cy="1361880"/>
+              <a:ext cx="3210840" cy="1361520"/>
             </a:xfrm>
             <a:prstGeom prst="rect">
               <a:avLst/>
@@ -11993,7 +12136,7 @@
         <p:spPr>
           <a:xfrm>
             <a:off x="0" y="0"/>
-            <a:ext cx="12191400" cy="6857280"/>
+            <a:ext cx="12191040" cy="6856920"/>
           </a:xfrm>
           <a:prstGeom prst="rect">
             <a:avLst/>
@@ -12046,7 +12189,7 @@
         <p:spPr>
           <a:xfrm>
             <a:off x="0" y="0"/>
-            <a:ext cx="8129160" cy="6857280"/>
+            <a:ext cx="8128800" cy="6856920"/>
           </a:xfrm>
           <a:prstGeom prst="snip2DiagRect">
             <a:avLst>
@@ -12268,7 +12411,7 @@
         <p:spPr>
           <a:xfrm>
             <a:off x="8588520" y="941400"/>
-            <a:ext cx="3043080" cy="3247920"/>
+            <a:ext cx="3042720" cy="3247560"/>
           </a:xfrm>
           <a:prstGeom prst="rect">
             <a:avLst/>
@@ -12300,6 +12443,7 @@
                   <a:srgbClr val="ffffff"/>
                 </a:solidFill>
                 <a:latin typeface="Century Gothic"/>
+                <a:ea typeface="DejaVu Sans"/>
               </a:rPr>
               <a:t>Environment</a:t>
             </a:r>
@@ -12318,9 +12462,9 @@
         <p:grpSpPr>
           <a:xfrm>
             <a:off x="952560" y="2104200"/>
-            <a:ext cx="6165720" cy="2442600"/>
+            <a:ext cx="6165360" cy="2442240"/>
             <a:chOff x="952560" y="2104200"/>
-            <a:chExt cx="6165720" cy="2442600"/>
+            <a:chExt cx="6165360" cy="2442240"/>
           </a:xfrm>
         </p:grpSpPr>
         <p:sp>
@@ -12332,7 +12476,7 @@
           <p:spPr>
             <a:xfrm>
               <a:off x="952560" y="2104200"/>
-              <a:ext cx="815760" cy="815760"/>
+              <a:ext cx="815400" cy="815400"/>
             </a:xfrm>
             <a:prstGeom prst="ellipse">
               <a:avLst/>
@@ -12365,7 +12509,7 @@
           <p:spPr>
             <a:xfrm>
               <a:off x="1123920" y="2275560"/>
-              <a:ext cx="472680" cy="472680"/>
+              <a:ext cx="472320" cy="472320"/>
             </a:xfrm>
             <a:prstGeom prst="rect">
               <a:avLst/>
@@ -12396,7 +12540,7 @@
           <p:spPr>
             <a:xfrm>
               <a:off x="1944000" y="2104200"/>
-              <a:ext cx="1923480" cy="815760"/>
+              <a:ext cx="1923120" cy="815400"/>
             </a:xfrm>
             <a:prstGeom prst="rect">
               <a:avLst/>
@@ -12448,7 +12592,7 @@
           <p:spPr>
             <a:xfrm>
               <a:off x="4203360" y="2104200"/>
-              <a:ext cx="815760" cy="815760"/>
+              <a:ext cx="815400" cy="815400"/>
             </a:xfrm>
             <a:prstGeom prst="ellipse">
               <a:avLst/>
@@ -12481,7 +12625,7 @@
           <p:spPr>
             <a:xfrm>
               <a:off x="4375080" y="2275560"/>
-              <a:ext cx="472680" cy="472680"/>
+              <a:ext cx="472320" cy="472320"/>
             </a:xfrm>
             <a:prstGeom prst="rect">
               <a:avLst/>
@@ -12512,7 +12656,7 @@
           <p:spPr>
             <a:xfrm>
               <a:off x="5194800" y="2104200"/>
-              <a:ext cx="1923480" cy="815760"/>
+              <a:ext cx="1923120" cy="815400"/>
             </a:xfrm>
             <a:prstGeom prst="rect">
               <a:avLst/>
@@ -12564,7 +12708,7 @@
           <p:spPr>
             <a:xfrm>
               <a:off x="952560" y="3731040"/>
-              <a:ext cx="815760" cy="815760"/>
+              <a:ext cx="815400" cy="815400"/>
             </a:xfrm>
             <a:prstGeom prst="ellipse">
               <a:avLst/>
@@ -12597,7 +12741,7 @@
           <p:spPr>
             <a:xfrm>
               <a:off x="1123920" y="3902400"/>
-              <a:ext cx="472680" cy="472680"/>
+              <a:ext cx="472320" cy="472320"/>
             </a:xfrm>
             <a:prstGeom prst="rect">
               <a:avLst/>
@@ -12628,7 +12772,7 @@
           <p:spPr>
             <a:xfrm>
               <a:off x="1944000" y="3731040"/>
-              <a:ext cx="1923480" cy="815760"/>
+              <a:ext cx="1923120" cy="815400"/>
             </a:xfrm>
             <a:prstGeom prst="rect">
               <a:avLst/>
@@ -12680,7 +12824,7 @@
           <p:spPr>
             <a:xfrm>
               <a:off x="4203360" y="3731040"/>
-              <a:ext cx="815760" cy="815760"/>
+              <a:ext cx="815400" cy="815400"/>
             </a:xfrm>
             <a:prstGeom prst="ellipse">
               <a:avLst/>
@@ -12713,7 +12857,7 @@
           <p:spPr>
             <a:xfrm>
               <a:off x="4375080" y="3902400"/>
-              <a:ext cx="472680" cy="472680"/>
+              <a:ext cx="472320" cy="472320"/>
             </a:xfrm>
             <a:prstGeom prst="rect">
               <a:avLst/>
@@ -12744,7 +12888,7 @@
           <p:spPr>
             <a:xfrm>
               <a:off x="5194800" y="3731040"/>
-              <a:ext cx="1923480" cy="815760"/>
+              <a:ext cx="1923120" cy="815400"/>
             </a:xfrm>
             <a:prstGeom prst="rect">
               <a:avLst/>
@@ -12861,7 +13005,7 @@
         <p:spPr>
           <a:xfrm>
             <a:off x="684360" y="4487400"/>
-            <a:ext cx="8533800" cy="1506240"/>
+            <a:ext cx="8533440" cy="1505880"/>
           </a:xfrm>
           <a:prstGeom prst="rect">
             <a:avLst/>
@@ -12891,6 +13035,7 @@
                   <a:srgbClr val="ffffff"/>
                 </a:solidFill>
                 <a:latin typeface="Century Gothic"/>
+                <a:ea typeface="DejaVu Sans"/>
               </a:rPr>
               <a:t>Future work</a:t>
             </a:r>
@@ -12909,7 +13054,7 @@
         <p:spPr>
           <a:xfrm>
             <a:off x="684360" y="685800"/>
-            <a:ext cx="8533800" cy="3614400"/>
+            <a:ext cx="8533440" cy="3614040"/>
           </a:xfrm>
           <a:prstGeom prst="rect">
             <a:avLst/>
@@ -12928,7 +13073,7 @@
         <p:txBody>
           <a:bodyPr lIns="90000" rIns="90000" tIns="45000" bIns="45000" anchor="ctr"/>
           <a:p>
-            <a:pPr marL="285840" indent="-285120">
+            <a:pPr marL="285840" indent="-284760">
               <a:lnSpc>
                 <a:spcPct val="100000"/>
               </a:lnSpc>
@@ -12951,6 +13096,7 @@
                   <a:srgbClr val="0f496f"/>
                 </a:solidFill>
                 <a:latin typeface="Century Gothic"/>
+                <a:ea typeface="DejaVu Sans"/>
               </a:rPr>
               <a:t>Virtual assistant launch every time the computer is up</a:t>
             </a:r>
@@ -12959,7 +13105,7 @@
             </a:endParaRPr>
           </a:p>
           <a:p>
-            <a:pPr marL="285840" indent="-285120">
+            <a:pPr marL="285840" indent="-284760">
               <a:lnSpc>
                 <a:spcPct val="100000"/>
               </a:lnSpc>
@@ -12982,6 +13128,7 @@
                   <a:srgbClr val="0f496f"/>
                 </a:solidFill>
                 <a:latin typeface="Century Gothic"/>
+                <a:ea typeface="DejaVu Sans"/>
               </a:rPr>
               <a:t>Generate a voice for the virtual assistant to communicate with the user</a:t>
             </a:r>
@@ -12990,7 +13137,7 @@
             </a:endParaRPr>
           </a:p>
           <a:p>
-            <a:pPr marL="285840" indent="-285120">
+            <a:pPr marL="285840" indent="-284760">
               <a:lnSpc>
                 <a:spcPct val="100000"/>
               </a:lnSpc>
@@ -13013,6 +13160,7 @@
                   <a:srgbClr val="0f496f"/>
                 </a:solidFill>
                 <a:latin typeface="Century Gothic"/>
+                <a:ea typeface="DejaVu Sans"/>
               </a:rPr>
               <a:t>Profiling each user that use the virtual assistant</a:t>
             </a:r>
@@ -13021,7 +13169,7 @@
             </a:endParaRPr>
           </a:p>
           <a:p>
-            <a:pPr marL="285840" indent="-285120">
+            <a:pPr marL="285840" indent="-284760">
               <a:lnSpc>
                 <a:spcPct val="100000"/>
               </a:lnSpc>
@@ -13044,6 +13192,7 @@
                   <a:srgbClr val="0f496f"/>
                 </a:solidFill>
                 <a:latin typeface="Century Gothic"/>
+                <a:ea typeface="DejaVu Sans"/>
               </a:rPr>
               <a:t>Create SAI with kivy for multiapplication</a:t>
             </a:r>
@@ -13084,7 +13233,7 @@
         <p:spPr>
           <a:xfrm>
             <a:off x="684360" y="4487400"/>
-            <a:ext cx="8533800" cy="1506240"/>
+            <a:ext cx="8533440" cy="1505880"/>
           </a:xfrm>
           <a:prstGeom prst="rect">
             <a:avLst/>
@@ -13114,6 +13263,7 @@
                   <a:srgbClr val="ffffff"/>
                 </a:solidFill>
                 <a:latin typeface="Century Gothic"/>
+                <a:ea typeface="DejaVu Sans"/>
               </a:rPr>
               <a:t>annexe</a:t>
             </a:r>
@@ -13136,7 +13286,7 @@
         <p:spPr>
           <a:xfrm>
             <a:off x="5221440" y="75600"/>
-            <a:ext cx="913680" cy="913680"/>
+            <a:ext cx="913320" cy="913320"/>
           </a:xfrm>
           <a:prstGeom prst="rect">
             <a:avLst/>
@@ -13159,7 +13309,7 @@
         <p:spPr>
           <a:xfrm>
             <a:off x="4695120" y="4444560"/>
-            <a:ext cx="913680" cy="913680"/>
+            <a:ext cx="913320" cy="913320"/>
           </a:xfrm>
           <a:prstGeom prst="rect">
             <a:avLst/>
@@ -13182,7 +13332,7 @@
         <p:spPr>
           <a:xfrm>
             <a:off x="2603880" y="2294640"/>
-            <a:ext cx="913680" cy="913680"/>
+            <a:ext cx="913320" cy="913320"/>
           </a:xfrm>
           <a:prstGeom prst="rect">
             <a:avLst/>
@@ -13205,7 +13355,7 @@
         <p:spPr>
           <a:xfrm>
             <a:off x="9767160" y="3294360"/>
-            <a:ext cx="913680" cy="913680"/>
+            <a:ext cx="913320" cy="913320"/>
           </a:xfrm>
           <a:prstGeom prst="rect">
             <a:avLst/>
@@ -13228,7 +13378,7 @@
         <p:spPr>
           <a:xfrm>
             <a:off x="1967760" y="3811680"/>
-            <a:ext cx="913680" cy="913680"/>
+            <a:ext cx="913320" cy="913320"/>
           </a:xfrm>
           <a:prstGeom prst="rect">
             <a:avLst/>
@@ -13251,7 +13401,7 @@
         <p:spPr>
           <a:xfrm>
             <a:off x="5221440" y="2907360"/>
-            <a:ext cx="913680" cy="913680"/>
+            <a:ext cx="913320" cy="913320"/>
           </a:xfrm>
           <a:prstGeom prst="rect">
             <a:avLst/>
@@ -13274,7 +13424,7 @@
         <p:spPr>
           <a:xfrm>
             <a:off x="1093680" y="3282480"/>
-            <a:ext cx="913680" cy="913680"/>
+            <a:ext cx="913320" cy="913320"/>
           </a:xfrm>
           <a:prstGeom prst="rect">
             <a:avLst/>
@@ -13297,7 +13447,7 @@
         <p:spPr>
           <a:xfrm>
             <a:off x="8595360" y="3808800"/>
-            <a:ext cx="913680" cy="913680"/>
+            <a:ext cx="913320" cy="913320"/>
           </a:xfrm>
           <a:prstGeom prst="rect">
             <a:avLst/>
@@ -13320,7 +13470,7 @@
         <p:spPr>
           <a:xfrm>
             <a:off x="7839000" y="2294640"/>
-            <a:ext cx="913680" cy="913680"/>
+            <a:ext cx="913320" cy="913320"/>
           </a:xfrm>
           <a:prstGeom prst="rect">
             <a:avLst/>
@@ -13339,7 +13489,7 @@
         <p:spPr>
           <a:xfrm>
             <a:off x="6312960" y="944640"/>
-            <a:ext cx="1525680" cy="1339560"/>
+            <a:ext cx="1525320" cy="1339200"/>
           </a:xfrm>
           <a:custGeom>
             <a:avLst/>
@@ -13392,7 +13542,7 @@
         <p:spPr>
           <a:xfrm>
             <a:off x="5678640" y="1145160"/>
-            <a:ext cx="360" cy="1605960"/>
+            <a:ext cx="360" cy="1605600"/>
           </a:xfrm>
           <a:custGeom>
             <a:avLst/>
@@ -13444,8 +13594,8 @@
         </p:nvSpPr>
         <p:spPr>
           <a:xfrm flipH="1">
-            <a:off x="3426120" y="990000"/>
-            <a:ext cx="1617120" cy="1379880"/>
+            <a:off x="3425400" y="990000"/>
+            <a:ext cx="1616760" cy="1379520"/>
           </a:xfrm>
           <a:custGeom>
             <a:avLst/>
@@ -13498,7 +13648,7 @@
         <p:spPr>
           <a:xfrm>
             <a:off x="2082960" y="3279600"/>
-            <a:ext cx="916920" cy="364320"/>
+            <a:ext cx="916560" cy="363960"/>
           </a:xfrm>
           <a:prstGeom prst="rect">
             <a:avLst/>
@@ -13547,7 +13697,7 @@
         <p:spPr>
           <a:xfrm>
             <a:off x="5227200" y="4030200"/>
-            <a:ext cx="929160" cy="364320"/>
+            <a:ext cx="928800" cy="363960"/>
           </a:xfrm>
           <a:prstGeom prst="rect">
             <a:avLst/>
@@ -13596,7 +13746,7 @@
         <p:spPr>
           <a:xfrm>
             <a:off x="8246520" y="3279600"/>
-            <a:ext cx="1255320" cy="364320"/>
+            <a:ext cx="1254960" cy="363960"/>
           </a:xfrm>
           <a:prstGeom prst="rect">
             <a:avLst/>
@@ -13645,7 +13795,7 @@
         <p:spPr>
           <a:xfrm>
             <a:off x="481680" y="348120"/>
-            <a:ext cx="1811520" cy="364320"/>
+            <a:ext cx="1811160" cy="363960"/>
           </a:xfrm>
           <a:prstGeom prst="rect">
             <a:avLst/>
@@ -13698,7 +13848,7 @@
         <p:spPr>
           <a:xfrm>
             <a:off x="5855760" y="4444560"/>
-            <a:ext cx="913680" cy="913680"/>
+            <a:ext cx="913320" cy="913320"/>
           </a:xfrm>
           <a:prstGeom prst="rect">
             <a:avLst/>
@@ -13739,7 +13889,7 @@
         <p:spPr>
           <a:xfrm>
             <a:off x="684360" y="4487400"/>
-            <a:ext cx="8533800" cy="1506240"/>
+            <a:ext cx="8533440" cy="1505880"/>
           </a:xfrm>
           <a:prstGeom prst="rect">
             <a:avLst/>
@@ -13769,6 +13919,7 @@
                   <a:srgbClr val="ffffff"/>
                 </a:solidFill>
                 <a:latin typeface="Century Gothic"/>
+                <a:ea typeface="DejaVu Sans"/>
               </a:rPr>
               <a:t>Annexe</a:t>
             </a:r>
@@ -13791,7 +13942,7 @@
         <p:spPr>
           <a:xfrm>
             <a:off x="7839000" y="2560320"/>
-            <a:ext cx="1313640" cy="599400"/>
+            <a:ext cx="1313280" cy="599040"/>
           </a:xfrm>
           <a:prstGeom prst="rect">
             <a:avLst/>
@@ -13810,7 +13961,7 @@
         <p:spPr>
           <a:xfrm>
             <a:off x="480240" y="348120"/>
-            <a:ext cx="1791720" cy="364320"/>
+            <a:ext cx="1791360" cy="363960"/>
           </a:xfrm>
           <a:prstGeom prst="rect">
             <a:avLst/>
@@ -13859,7 +14010,7 @@
         <p:spPr>
           <a:xfrm>
             <a:off x="6384240" y="990000"/>
-            <a:ext cx="1525680" cy="1339560"/>
+            <a:ext cx="1525320" cy="1339200"/>
           </a:xfrm>
           <a:custGeom>
             <a:avLst/>
@@ -13912,7 +14063,7 @@
         <p:spPr>
           <a:xfrm>
             <a:off x="5678640" y="1145160"/>
-            <a:ext cx="360" cy="1605960"/>
+            <a:ext cx="360" cy="1605600"/>
           </a:xfrm>
           <a:custGeom>
             <a:avLst/>
@@ -13964,8 +14115,8 @@
         </p:nvSpPr>
         <p:spPr>
           <a:xfrm flipH="1">
-            <a:off x="3426120" y="990000"/>
-            <a:ext cx="1617120" cy="1379880"/>
+            <a:off x="3425400" y="990000"/>
+            <a:ext cx="1616760" cy="1379520"/>
           </a:xfrm>
           <a:custGeom>
             <a:avLst/>
@@ -14018,7 +14169,7 @@
         <p:spPr>
           <a:xfrm>
             <a:off x="2082960" y="3279600"/>
-            <a:ext cx="916920" cy="364320"/>
+            <a:ext cx="916560" cy="363960"/>
           </a:xfrm>
           <a:prstGeom prst="rect">
             <a:avLst/>
@@ -14067,7 +14218,7 @@
         <p:spPr>
           <a:xfrm>
             <a:off x="5227200" y="4030200"/>
-            <a:ext cx="929160" cy="364320"/>
+            <a:ext cx="928800" cy="363960"/>
           </a:xfrm>
           <a:prstGeom prst="rect">
             <a:avLst/>
@@ -14116,7 +14267,7 @@
         <p:spPr>
           <a:xfrm>
             <a:off x="8246520" y="3279600"/>
-            <a:ext cx="1255320" cy="364320"/>
+            <a:ext cx="1254960" cy="363960"/>
           </a:xfrm>
           <a:prstGeom prst="rect">
             <a:avLst/>
@@ -14169,7 +14320,7 @@
         <p:spPr>
           <a:xfrm>
             <a:off x="4979520" y="218880"/>
-            <a:ext cx="1332720" cy="618480"/>
+            <a:ext cx="1332360" cy="618120"/>
           </a:xfrm>
           <a:prstGeom prst="rect">
             <a:avLst/>
@@ -14192,7 +14343,7 @@
         <p:spPr>
           <a:xfrm>
             <a:off x="2102760" y="2514600"/>
-            <a:ext cx="1323360" cy="608760"/>
+            <a:ext cx="1323000" cy="608400"/>
           </a:xfrm>
           <a:prstGeom prst="rect">
             <a:avLst/>
@@ -14215,7 +14366,7 @@
         <p:spPr>
           <a:xfrm>
             <a:off x="4235760" y="3279600"/>
-            <a:ext cx="1313640" cy="599400"/>
+            <a:ext cx="1313280" cy="599040"/>
           </a:xfrm>
           <a:prstGeom prst="rect">
             <a:avLst/>
@@ -14238,7 +14389,7 @@
         <p:spPr>
           <a:xfrm>
             <a:off x="5833080" y="3279600"/>
-            <a:ext cx="1313640" cy="599400"/>
+            <a:ext cx="1313280" cy="599040"/>
           </a:xfrm>
           <a:prstGeom prst="rect">
             <a:avLst/>
@@ -14279,7 +14430,7 @@
         <p:spPr>
           <a:xfrm>
             <a:off x="684360" y="4487400"/>
-            <a:ext cx="8533800" cy="1506240"/>
+            <a:ext cx="8533440" cy="1505880"/>
           </a:xfrm>
           <a:prstGeom prst="rect">
             <a:avLst/>
@@ -14309,6 +14460,7 @@
                   <a:srgbClr val="ffffff"/>
                 </a:solidFill>
                 <a:latin typeface="Century Gothic"/>
+                <a:ea typeface="DejaVu Sans"/>
               </a:rPr>
               <a:t>Sources</a:t>
             </a:r>
@@ -14327,7 +14479,7 @@
         <p:spPr>
           <a:xfrm>
             <a:off x="684360" y="685800"/>
-            <a:ext cx="8533800" cy="3614400"/>
+            <a:ext cx="8533440" cy="3614040"/>
           </a:xfrm>
           <a:prstGeom prst="rect">
             <a:avLst/>
@@ -14346,7 +14498,7 @@
         <p:txBody>
           <a:bodyPr lIns="90000" rIns="90000" tIns="45000" bIns="45000" anchor="ctr"/>
           <a:p>
-            <a:pPr marL="285840" indent="-285120">
+            <a:pPr marL="285840" indent="-284760">
               <a:lnSpc>
                 <a:spcPct val="100000"/>
               </a:lnSpc>
@@ -14369,6 +14521,7 @@
                   <a:srgbClr val="0f496f"/>
                 </a:solidFill>
                 <a:latin typeface="Century Gothic"/>
+                <a:ea typeface="DejaVu Sans"/>
               </a:rPr>
               <a:t>Annexe prototype: </a:t>
             </a:r>
@@ -14379,6 +14532,7 @@
                 </a:solidFill>
                 <a:uFillTx/>
                 <a:latin typeface="Century Gothic"/>
+                <a:ea typeface="DejaVu Sans"/>
                 <a:hlinkClick r:id="rId1"/>
               </a:rPr>
               <a:t>https://www.draw.io/</a:t>
@@ -14420,7 +14574,7 @@
         <p:spPr>
           <a:xfrm>
             <a:off x="666000" y="2574360"/>
-            <a:ext cx="4809960" cy="2973240"/>
+            <a:ext cx="4809600" cy="2972880"/>
           </a:xfrm>
           <a:prstGeom prst="roundRect">
             <a:avLst>
@@ -14570,7 +14724,7 @@
         <p:spPr>
           <a:xfrm>
             <a:off x="684360" y="5241960"/>
-            <a:ext cx="8533800" cy="1506240"/>
+            <a:ext cx="8533440" cy="1505880"/>
           </a:xfrm>
           <a:prstGeom prst="rect">
             <a:avLst/>
@@ -14600,6 +14754,7 @@
                   <a:srgbClr val="ffffff"/>
                 </a:solidFill>
                 <a:latin typeface="Century Gothic"/>
+                <a:ea typeface="DejaVu Sans"/>
               </a:rPr>
               <a:t>Weak IA and Strong IA</a:t>
             </a:r>
@@ -14618,7 +14773,7 @@
         <p:spPr>
           <a:xfrm>
             <a:off x="684360" y="685800"/>
-            <a:ext cx="10989360" cy="2287440"/>
+            <a:ext cx="10989000" cy="2287080"/>
           </a:xfrm>
           <a:prstGeom prst="rect">
             <a:avLst/>
@@ -14639,7 +14794,7 @@
             <a:normAutofit/>
           </a:bodyPr>
           <a:p>
-            <a:pPr marL="285840" indent="-285120">
+            <a:pPr marL="285840" indent="-284760">
               <a:lnSpc>
                 <a:spcPct val="100000"/>
               </a:lnSpc>
@@ -14662,6 +14817,7 @@
                   <a:srgbClr val="0f496f"/>
                 </a:solidFill>
                 <a:latin typeface="Century Gothic"/>
+                <a:ea typeface="DejaVu Sans"/>
               </a:rPr>
               <a:t>“</a:t>
             </a:r>
@@ -14671,6 +14827,7 @@
                   <a:srgbClr val="0f496f"/>
                 </a:solidFill>
                 <a:latin typeface="Century Gothic"/>
+                <a:ea typeface="DejaVu Sans"/>
               </a:rPr>
               <a:t>Weak artificial intelligence (weak AI), is artificial intelligence that implements a </a:t>
             </a:r>
@@ -14680,6 +14837,7 @@
                   <a:srgbClr val="167bf3"/>
                 </a:solidFill>
                 <a:latin typeface="Century Gothic"/>
+                <a:ea typeface="DejaVu Sans"/>
               </a:rPr>
               <a:t>limited part of mind</a:t>
             </a:r>
@@ -14689,6 +14847,7 @@
                   <a:srgbClr val="0f496f"/>
                 </a:solidFill>
                 <a:latin typeface="Century Gothic"/>
+                <a:ea typeface="DejaVu Sans"/>
               </a:rPr>
               <a:t>, or as narrow AI, is focused on </a:t>
             </a:r>
@@ -14698,6 +14857,7 @@
                   <a:srgbClr val="c15a16"/>
                 </a:solidFill>
                 <a:latin typeface="Century Gothic"/>
+                <a:ea typeface="DejaVu Sans"/>
               </a:rPr>
               <a:t>one narrow task</a:t>
             </a:r>
@@ -14707,6 +14867,7 @@
                   <a:srgbClr val="0f496f"/>
                 </a:solidFill>
                 <a:latin typeface="Century Gothic"/>
+                <a:ea typeface="DejaVu Sans"/>
               </a:rPr>
               <a:t>. In John Searle's terms it “would be useful for testing hypothesis about minds, but would not actually be minds” “ from Wikipedia</a:t>
             </a:r>
@@ -14715,7 +14876,7 @@
             </a:endParaRPr>
           </a:p>
           <a:p>
-            <a:pPr marL="285840" indent="-285120">
+            <a:pPr marL="285840" indent="-284760">
               <a:lnSpc>
                 <a:spcPct val="100000"/>
               </a:lnSpc>
@@ -14738,6 +14899,7 @@
                   <a:srgbClr val="0f496f"/>
                 </a:solidFill>
                 <a:latin typeface="Century Gothic"/>
+                <a:ea typeface="DejaVu Sans"/>
               </a:rPr>
               <a:t> ”</a:t>
             </a:r>
@@ -14747,6 +14909,7 @@
                   <a:srgbClr val="0f496f"/>
                 </a:solidFill>
                 <a:latin typeface="Century Gothic"/>
+                <a:ea typeface="DejaVu Sans"/>
               </a:rPr>
               <a:t>Strong artificial intelligence (strong AI) is the </a:t>
             </a:r>
@@ -14756,6 +14919,7 @@
                   <a:srgbClr val="a50e82"/>
                 </a:solidFill>
                 <a:latin typeface="Century Gothic"/>
+                <a:ea typeface="DejaVu Sans"/>
               </a:rPr>
               <a:t>speculative intelligence of a machine that has the capacity</a:t>
             </a:r>
@@ -14765,6 +14929,7 @@
                   <a:srgbClr val="0f496f"/>
                 </a:solidFill>
                 <a:latin typeface="Century Gothic"/>
+                <a:ea typeface="DejaVu Sans"/>
               </a:rPr>
               <a:t> to </a:t>
             </a:r>
@@ -14774,6 +14939,7 @@
                   <a:srgbClr val="ffff00"/>
                 </a:solidFill>
                 <a:latin typeface="Century Gothic"/>
+                <a:ea typeface="DejaVu Sans"/>
               </a:rPr>
               <a:t>understand or learn any intellectual task that a human being can</a:t>
             </a:r>
@@ -14783,6 +14949,7 @@
                   <a:srgbClr val="0f496f"/>
                 </a:solidFill>
                 <a:latin typeface="Century Gothic"/>
+                <a:ea typeface="DejaVu Sans"/>
               </a:rPr>
               <a:t>” from Wikipedia</a:t>
             </a:r>
@@ -14833,7 +15000,7 @@
         <p:spPr>
           <a:xfrm>
             <a:off x="2523960" y="3718800"/>
-            <a:ext cx="727560" cy="722520"/>
+            <a:ext cx="727200" cy="722160"/>
           </a:xfrm>
           <a:prstGeom prst="ellipse">
             <a:avLst/>
@@ -14901,7 +15068,7 @@
         <p:spPr>
           <a:xfrm>
             <a:off x="3363480" y="3303360"/>
-            <a:ext cx="1216800" cy="406440"/>
+            <a:ext cx="1216440" cy="406080"/>
           </a:xfrm>
           <a:prstGeom prst="ellipse">
             <a:avLst/>
@@ -14969,7 +15136,7 @@
         <p:spPr>
           <a:xfrm>
             <a:off x="744120" y="3208680"/>
-            <a:ext cx="1590120" cy="674640"/>
+            <a:ext cx="1589760" cy="674280"/>
           </a:xfrm>
           <a:prstGeom prst="ellipse">
             <a:avLst/>
@@ -15037,7 +15204,7 @@
         <p:spPr>
           <a:xfrm>
             <a:off x="2119680" y="4628880"/>
-            <a:ext cx="1529280" cy="674640"/>
+            <a:ext cx="1528920" cy="674280"/>
           </a:xfrm>
           <a:prstGeom prst="ellipse">
             <a:avLst/>
@@ -15105,7 +15272,7 @@
         <p:spPr>
           <a:xfrm>
             <a:off x="6819480" y="2574360"/>
-            <a:ext cx="4809960" cy="2973240"/>
+            <a:ext cx="4809600" cy="2972880"/>
           </a:xfrm>
           <a:prstGeom prst="roundRect">
             <a:avLst>
@@ -15255,7 +15422,7 @@
         <p:spPr>
           <a:xfrm>
             <a:off x="7103880" y="4147560"/>
-            <a:ext cx="4378320" cy="858600"/>
+            <a:ext cx="4377960" cy="858240"/>
           </a:xfrm>
           <a:prstGeom prst="ellipse">
             <a:avLst/>
@@ -15323,7 +15490,7 @@
         <p:spPr>
           <a:xfrm>
             <a:off x="9898200" y="3332520"/>
-            <a:ext cx="1216800" cy="406440"/>
+            <a:ext cx="1216440" cy="406080"/>
           </a:xfrm>
           <a:prstGeom prst="ellipse">
             <a:avLst/>
@@ -15391,7 +15558,7 @@
         <p:spPr>
           <a:xfrm>
             <a:off x="6965640" y="3288960"/>
-            <a:ext cx="1590120" cy="674640"/>
+            <a:ext cx="1589760" cy="674280"/>
           </a:xfrm>
           <a:prstGeom prst="ellipse">
             <a:avLst/>
@@ -15459,7 +15626,7 @@
         <p:spPr>
           <a:xfrm>
             <a:off x="8287920" y="2688120"/>
-            <a:ext cx="1873080" cy="674640"/>
+            <a:ext cx="1872720" cy="674280"/>
           </a:xfrm>
           <a:prstGeom prst="ellipse">
             <a:avLst/>
@@ -15576,7 +15743,7 @@
         <p:spPr>
           <a:xfrm>
             <a:off x="684360" y="4487400"/>
-            <a:ext cx="8533800" cy="1506240"/>
+            <a:ext cx="8533440" cy="1505880"/>
           </a:xfrm>
           <a:prstGeom prst="rect">
             <a:avLst/>
@@ -15606,6 +15773,7 @@
                   <a:srgbClr val="ffffff"/>
                 </a:solidFill>
                 <a:latin typeface="Century Gothic"/>
+                <a:ea typeface="DejaVu Sans"/>
               </a:rPr>
               <a:t>Reinforcement learning</a:t>
             </a:r>
@@ -15624,7 +15792,7 @@
         <p:spPr>
           <a:xfrm>
             <a:off x="684360" y="685800"/>
-            <a:ext cx="11361960" cy="3614400"/>
+            <a:ext cx="11361600" cy="3614040"/>
           </a:xfrm>
           <a:prstGeom prst="rect">
             <a:avLst/>
@@ -15645,7 +15813,7 @@
             <a:normAutofit/>
           </a:bodyPr>
           <a:p>
-            <a:pPr marL="285840" indent="-285120">
+            <a:pPr marL="285840" indent="-284760">
               <a:lnSpc>
                 <a:spcPct val="100000"/>
               </a:lnSpc>
@@ -15668,6 +15836,7 @@
                   <a:srgbClr val="00b050"/>
                 </a:solidFill>
                 <a:latin typeface="Century Gothic"/>
+                <a:ea typeface="DejaVu Sans"/>
               </a:rPr>
               <a:t>Policy</a:t>
             </a:r>
@@ -15677,6 +15846,7 @@
                   <a:srgbClr val="0f496f"/>
                 </a:solidFill>
                 <a:latin typeface="Century Gothic"/>
+                <a:ea typeface="DejaVu Sans"/>
               </a:rPr>
               <a:t> :  the agent’s action selection</a:t>
             </a:r>
@@ -15685,7 +15855,7 @@
             </a:endParaRPr>
           </a:p>
           <a:p>
-            <a:pPr marL="285840" indent="-285120">
+            <a:pPr marL="285840" indent="-284760">
               <a:lnSpc>
                 <a:spcPct val="100000"/>
               </a:lnSpc>
@@ -15708,6 +15878,7 @@
                   <a:srgbClr val="ffff00"/>
                 </a:solidFill>
                 <a:latin typeface="Century Gothic"/>
+                <a:ea typeface="DejaVu Sans"/>
               </a:rPr>
               <a:t>State value-fonction </a:t>
             </a:r>
@@ -15717,6 +15888,7 @@
                   <a:srgbClr val="0f496f"/>
                 </a:solidFill>
                 <a:latin typeface="Century Gothic"/>
+                <a:ea typeface="DejaVu Sans"/>
               </a:rPr>
               <a:t>: how « good » it is to be in a given state</a:t>
             </a:r>
@@ -15742,6 +15914,7 @@
                   <a:srgbClr val="0f496f"/>
                 </a:solidFill>
                 <a:latin typeface="Century Gothic"/>
+                <a:ea typeface="DejaVu Sans"/>
               </a:rPr>
               <a:t>	</a:t>
             </a:r>
@@ -15751,6 +15924,7 @@
                   <a:srgbClr val="0f496f"/>
                 </a:solidFill>
                 <a:latin typeface="Century Gothic"/>
+                <a:ea typeface="DejaVu Sans"/>
               </a:rPr>
               <a:t>	</a:t>
             </a:r>
@@ -15760,6 +15934,7 @@
                   <a:srgbClr val="0f496f"/>
                 </a:solidFill>
                 <a:latin typeface="Century Gothic"/>
+                <a:ea typeface="DejaVu Sans"/>
               </a:rPr>
               <a:t>	</a:t>
             </a:r>
@@ -15769,6 +15944,7 @@
                   <a:srgbClr val="0f496f"/>
                 </a:solidFill>
                 <a:latin typeface="Century Gothic"/>
+                <a:ea typeface="DejaVu Sans"/>
               </a:rPr>
               <a:t>	</a:t>
             </a:r>
@@ -15778,6 +15954,7 @@
                   <a:srgbClr val="0f496f"/>
                 </a:solidFill>
                 <a:latin typeface="Century Gothic"/>
+                <a:ea typeface="DejaVu Sans"/>
               </a:rPr>
               <a:t>	</a:t>
             </a:r>
@@ -15787,6 +15964,7 @@
                   <a:srgbClr val="0f496f"/>
                 </a:solidFill>
                 <a:latin typeface="Century Gothic"/>
+                <a:ea typeface="DejaVu Sans"/>
               </a:rPr>
               <a:t>Q(</a:t>
             </a:r>
@@ -15796,6 +15974,7 @@
                   <a:srgbClr val="ffff00"/>
                 </a:solidFill>
                 <a:latin typeface="Century Gothic"/>
+                <a:ea typeface="DejaVu Sans"/>
               </a:rPr>
               <a:t>s</a:t>
             </a:r>
@@ -15805,6 +15984,7 @@
                   <a:srgbClr val="0f496f"/>
                 </a:solidFill>
                 <a:latin typeface="Century Gothic"/>
+                <a:ea typeface="DejaVu Sans"/>
               </a:rPr>
               <a:t>, </a:t>
             </a:r>
@@ -15814,6 +15994,7 @@
                   <a:srgbClr val="00b050"/>
                 </a:solidFill>
                 <a:latin typeface="Century Gothic"/>
+                <a:ea typeface="DejaVu Sans"/>
               </a:rPr>
               <a:t>a</a:t>
             </a:r>
@@ -15823,6 +16004,7 @@
                   <a:srgbClr val="0f496f"/>
                 </a:solidFill>
                 <a:latin typeface="Century Gothic"/>
+                <a:ea typeface="DejaVu Sans"/>
               </a:rPr>
               <a:t>) =  sum(prob of each state) </a:t>
             </a:r>
@@ -15863,7 +16045,7 @@
             </a:endParaRPr>
           </a:p>
           <a:p>
-            <a:pPr marL="285840" indent="-285120">
+            <a:pPr marL="285840" indent="-284760">
               <a:lnSpc>
                 <a:spcPct val="100000"/>
               </a:lnSpc>
@@ -15886,6 +16068,7 @@
                   <a:srgbClr val="0f496f"/>
                 </a:solidFill>
                 <a:latin typeface="Century Gothic"/>
+                <a:ea typeface="DejaVu Sans"/>
               </a:rPr>
               <a:t>Show a schema to understand (tic tac toe example)</a:t>
             </a:r>
@@ -15894,7 +16077,7 @@
             </a:endParaRPr>
           </a:p>
           <a:p>
-            <a:pPr marL="285840" indent="-285120">
+            <a:pPr marL="285840" indent="-284760">
               <a:lnSpc>
                 <a:spcPct val="100000"/>
               </a:lnSpc>
@@ -15917,6 +16100,7 @@
                   <a:srgbClr val="0f496f"/>
                 </a:solidFill>
                 <a:latin typeface="Century Gothic"/>
+                <a:ea typeface="DejaVu Sans"/>
               </a:rPr>
               <a:t>This formula give us the power to make a decision for the next action using random training</a:t>
             </a:r>
@@ -15984,7 +16168,7 @@
         <p:spPr>
           <a:xfrm>
             <a:off x="684360" y="4487400"/>
-            <a:ext cx="8533800" cy="1506240"/>
+            <a:ext cx="8533440" cy="1505880"/>
           </a:xfrm>
           <a:prstGeom prst="rect">
             <a:avLst/>
@@ -16014,6 +16198,7 @@
                   <a:srgbClr val="ffffff"/>
                 </a:solidFill>
                 <a:latin typeface="Century Gothic"/>
+                <a:ea typeface="DejaVu Sans"/>
               </a:rPr>
               <a:t>DYNAMIc LEARNING</a:t>
             </a:r>
@@ -16032,7 +16217,7 @@
         <p:spPr>
           <a:xfrm>
             <a:off x="684360" y="685800"/>
-            <a:ext cx="8533800" cy="3614400"/>
+            <a:ext cx="8533440" cy="3614040"/>
           </a:xfrm>
           <a:prstGeom prst="rect">
             <a:avLst/>
@@ -16051,7 +16236,7 @@
         <p:txBody>
           <a:bodyPr lIns="90000" rIns="90000" tIns="45000" bIns="45000" anchor="ctr"/>
           <a:p>
-            <a:pPr marL="285840" indent="-285120">
+            <a:pPr marL="285840" indent="-284760">
               <a:lnSpc>
                 <a:spcPct val="100000"/>
               </a:lnSpc>
@@ -16074,6 +16259,7 @@
                   <a:srgbClr val="0f496f"/>
                 </a:solidFill>
                 <a:latin typeface="Century Gothic"/>
+                <a:ea typeface="DejaVu Sans"/>
               </a:rPr>
               <a:t>This research show us that the </a:t>
             </a:r>
@@ -16083,6 +16269,7 @@
                   <a:srgbClr val="00b050"/>
                 </a:solidFill>
                 <a:latin typeface="Century Gothic"/>
+                <a:ea typeface="DejaVu Sans"/>
               </a:rPr>
               <a:t>AI will learn better policy </a:t>
             </a:r>
@@ -16092,6 +16279,7 @@
                   <a:srgbClr val="0f496f"/>
                 </a:solidFill>
                 <a:latin typeface="Century Gothic"/>
+                <a:ea typeface="DejaVu Sans"/>
               </a:rPr>
               <a:t>using </a:t>
             </a:r>
@@ -16101,6 +16289,7 @@
                   <a:srgbClr val="ffc000"/>
                 </a:solidFill>
                 <a:latin typeface="Century Gothic"/>
+                <a:ea typeface="DejaVu Sans"/>
               </a:rPr>
               <a:t>an expert </a:t>
             </a:r>
@@ -16110,6 +16299,7 @@
                   <a:srgbClr val="0f496f"/>
                 </a:solidFill>
                 <a:latin typeface="Century Gothic"/>
+                <a:ea typeface="DejaVu Sans"/>
               </a:rPr>
               <a:t>to make a</a:t>
             </a:r>
@@ -16119,6 +16309,7 @@
                   <a:srgbClr val="ffc000"/>
                 </a:solidFill>
                 <a:latin typeface="Century Gothic"/>
+                <a:ea typeface="DejaVu Sans"/>
               </a:rPr>
               <a:t> </a:t>
             </a:r>
@@ -16128,6 +16319,7 @@
                   <a:srgbClr val="7c0a61"/>
                 </a:solidFill>
                 <a:latin typeface="Century Gothic"/>
+                <a:ea typeface="DejaVu Sans"/>
               </a:rPr>
               <a:t>decision</a:t>
             </a:r>
@@ -16137,6 +16329,7 @@
                   <a:srgbClr val="0f496f"/>
                 </a:solidFill>
                 <a:latin typeface="Century Gothic"/>
+                <a:ea typeface="DejaVu Sans"/>
               </a:rPr>
               <a:t>.</a:t>
             </a:r>
@@ -16145,7 +16338,7 @@
             </a:endParaRPr>
           </a:p>
           <a:p>
-            <a:pPr marL="285840" indent="-285120">
+            <a:pPr marL="285840" indent="-284760">
               <a:lnSpc>
                 <a:spcPct val="100000"/>
               </a:lnSpc>
@@ -16168,6 +16361,7 @@
                   <a:srgbClr val="0f496f"/>
                 </a:solidFill>
                 <a:latin typeface="Century Gothic"/>
+                <a:ea typeface="DejaVu Sans"/>
               </a:rPr>
               <a:t>B. Lubars, Chenhao Tan, 2019, “Ask what AI can do, but what  AI should do: towards a framework of task delegability”, </a:t>
             </a:r>
@@ -16178,6 +16372,7 @@
                 </a:solidFill>
                 <a:uFillTx/>
                 <a:latin typeface="Century Gothic"/>
+                <a:ea typeface="DejaVu Sans"/>
                 <a:hlinkClick r:id="rId1"/>
               </a:rPr>
               <a:t>https://arxiv.org/pdf/1902.03245v1.pdf</a:t>
@@ -16245,7 +16440,7 @@
         <p:spPr>
           <a:xfrm>
             <a:off x="2521440" y="3979080"/>
-            <a:ext cx="1881360" cy="807120"/>
+            <a:ext cx="1881000" cy="806760"/>
           </a:xfrm>
           <a:prstGeom prst="rect">
             <a:avLst/>
@@ -16311,7 +16506,7 @@
         <p:spPr>
           <a:xfrm>
             <a:off x="5487840" y="3979080"/>
-            <a:ext cx="1881360" cy="807120"/>
+            <a:ext cx="1881000" cy="806760"/>
           </a:xfrm>
           <a:prstGeom prst="rect">
             <a:avLst/>
@@ -16377,7 +16572,7 @@
         <p:spPr>
           <a:xfrm>
             <a:off x="4004640" y="2771640"/>
-            <a:ext cx="1881360" cy="807120"/>
+            <a:ext cx="1881000" cy="806760"/>
           </a:xfrm>
           <a:prstGeom prst="rect">
             <a:avLst/>
@@ -16443,7 +16638,7 @@
         <p:spPr>
           <a:xfrm>
             <a:off x="4483080" y="4383000"/>
-            <a:ext cx="1004040" cy="360"/>
+            <a:ext cx="1003680" cy="360"/>
           </a:xfrm>
           <a:custGeom>
             <a:avLst/>
@@ -16495,7 +16690,7 @@
         <p:spPr>
           <a:xfrm>
             <a:off x="4985640" y="3657600"/>
-            <a:ext cx="360" cy="578880"/>
+            <a:ext cx="360" cy="578520"/>
           </a:xfrm>
           <a:custGeom>
             <a:avLst/>
@@ -16596,7 +16791,7 @@
         <p:spPr>
           <a:xfrm>
             <a:off x="0" y="0"/>
-            <a:ext cx="12191400" cy="6857280"/>
+            <a:ext cx="12191040" cy="6856920"/>
           </a:xfrm>
           <a:prstGeom prst="rect">
             <a:avLst/>
@@ -16649,7 +16844,7 @@
         <p:spPr>
           <a:xfrm>
             <a:off x="640440" y="685800"/>
-            <a:ext cx="4817880" cy="4602960"/>
+            <a:ext cx="4817520" cy="4602600"/>
           </a:xfrm>
           <a:prstGeom prst="rect">
             <a:avLst/>
@@ -16681,6 +16876,7 @@
                   <a:srgbClr val="ffffff"/>
                 </a:solidFill>
                 <a:latin typeface="Century Gothic"/>
+                <a:ea typeface="DejaVu Sans"/>
               </a:rPr>
               <a:t>issues</a:t>
             </a:r>
@@ -16699,7 +16895,7 @@
         <p:spPr>
           <a:xfrm>
             <a:off x="6095880" y="0"/>
-            <a:ext cx="6095160" cy="6857280"/>
+            <a:ext cx="6094800" cy="6856920"/>
           </a:xfrm>
           <a:prstGeom prst="rect">
             <a:avLst/>
@@ -16737,7 +16933,7 @@
         <p:spPr>
           <a:xfrm>
             <a:off x="6625800" y="685800"/>
-            <a:ext cx="4878360" cy="4602960"/>
+            <a:ext cx="4878000" cy="4602600"/>
           </a:xfrm>
           <a:prstGeom prst="rect">
             <a:avLst/>
@@ -16758,7 +16954,7 @@
             <a:normAutofit/>
           </a:bodyPr>
           <a:p>
-            <a:pPr marL="285840" indent="-285120">
+            <a:pPr marL="285840" indent="-284760">
               <a:lnSpc>
                 <a:spcPct val="100000"/>
               </a:lnSpc>
@@ -16781,6 +16977,7 @@
                   <a:srgbClr val="ffffff"/>
                 </a:solidFill>
                 <a:latin typeface="Century Gothic"/>
+                <a:ea typeface="DejaVu Sans"/>
               </a:rPr>
               <a:t>Hard to deploy</a:t>
             </a:r>
@@ -16789,7 +16986,7 @@
             </a:endParaRPr>
           </a:p>
           <a:p>
-            <a:pPr marL="285840" indent="-285120">
+            <a:pPr marL="285840" indent="-284760">
               <a:lnSpc>
                 <a:spcPct val="100000"/>
               </a:lnSpc>
@@ -16812,6 +17009,7 @@
                   <a:srgbClr val="ffffff"/>
                 </a:solidFill>
                 <a:latin typeface="Century Gothic"/>
+                <a:ea typeface="DejaVu Sans"/>
               </a:rPr>
               <a:t>Simulate the brain behavior during sleep (sort/compress/delete data)</a:t>
             </a:r>
@@ -16820,7 +17018,7 @@
             </a:endParaRPr>
           </a:p>
           <a:p>
-            <a:pPr marL="285840" indent="-285120">
+            <a:pPr marL="285840" indent="-284760">
               <a:lnSpc>
                 <a:spcPct val="100000"/>
               </a:lnSpc>
@@ -16843,6 +17041,7 @@
                   <a:srgbClr val="ffffff"/>
                 </a:solidFill>
                 <a:latin typeface="Century Gothic"/>
+                <a:ea typeface="DejaVu Sans"/>
               </a:rPr>
               <a:t>Add a reward (seems like RL, pheromon)</a:t>
             </a:r>
@@ -16851,7 +17050,7 @@
             </a:endParaRPr>
           </a:p>
           <a:p>
-            <a:pPr marL="285840" indent="-285120">
+            <a:pPr marL="285840" indent="-284760">
               <a:lnSpc>
                 <a:spcPct val="100000"/>
               </a:lnSpc>
@@ -16874,6 +17073,7 @@
                   <a:srgbClr val="ffffff"/>
                 </a:solidFill>
                 <a:latin typeface="Century Gothic"/>
+                <a:ea typeface="DejaVu Sans"/>
               </a:rPr>
               <a:t>Launch the SAI each day, it will give a report of what it learned</a:t>
             </a:r>
@@ -16941,7 +17141,7 @@
         <p:spPr>
           <a:xfrm>
             <a:off x="684360" y="4487400"/>
-            <a:ext cx="8533800" cy="1506240"/>
+            <a:ext cx="8533440" cy="1505880"/>
           </a:xfrm>
           <a:prstGeom prst="rect">
             <a:avLst/>
@@ -16971,6 +17171,7 @@
                   <a:srgbClr val="ffffff"/>
                 </a:solidFill>
                 <a:latin typeface="Century Gothic"/>
+                <a:ea typeface="DejaVu Sans"/>
               </a:rPr>
               <a:t>Hard to deploy</a:t>
             </a:r>
@@ -16989,7 +17190,7 @@
         <p:spPr>
           <a:xfrm>
             <a:off x="1044720" y="500040"/>
-            <a:ext cx="8263440" cy="3232080"/>
+            <a:ext cx="8263080" cy="3231720"/>
           </a:xfrm>
           <a:prstGeom prst="rect">
             <a:avLst/>
@@ -17008,7 +17209,7 @@
         <p:txBody>
           <a:bodyPr lIns="90000" rIns="90000" tIns="45000" bIns="45000" anchor="ctr"/>
           <a:p>
-            <a:pPr marL="285840" indent="-285120">
+            <a:pPr marL="285840" indent="-284760">
               <a:lnSpc>
                 <a:spcPct val="100000"/>
               </a:lnSpc>
@@ -17031,6 +17232,7 @@
                   <a:srgbClr val="0f496f"/>
                 </a:solidFill>
                 <a:latin typeface="Century Gothic"/>
+                <a:ea typeface="DejaVu Sans"/>
               </a:rPr>
               <a:t>Need to test mic and screenshot in every </a:t>
             </a:r>
@@ -17040,6 +17242,7 @@
                   <a:srgbClr val="ffff00"/>
                 </a:solidFill>
                 <a:latin typeface="Century Gothic"/>
+                <a:ea typeface="DejaVu Sans"/>
               </a:rPr>
               <a:t>operating system</a:t>
             </a:r>
@@ -17048,7 +17251,7 @@
             </a:endParaRPr>
           </a:p>
           <a:p>
-            <a:pPr marL="285840" indent="-285120">
+            <a:pPr marL="285840" indent="-284760">
               <a:lnSpc>
                 <a:spcPct val="100000"/>
               </a:lnSpc>
@@ -17071,6 +17274,7 @@
                   <a:srgbClr val="0f496f"/>
                 </a:solidFill>
                 <a:latin typeface="Century Gothic"/>
+                <a:ea typeface="DejaVu Sans"/>
               </a:rPr>
               <a:t>We need to add an </a:t>
             </a:r>
@@ -17080,6 +17284,7 @@
                   <a:srgbClr val="ffc000"/>
                 </a:solidFill>
                 <a:latin typeface="Century Gothic"/>
+                <a:ea typeface="DejaVu Sans"/>
               </a:rPr>
               <a:t>adapter</a:t>
             </a:r>
@@ -17089,6 +17294,7 @@
                   <a:srgbClr val="0f496f"/>
                 </a:solidFill>
                 <a:latin typeface="Century Gothic"/>
+                <a:ea typeface="DejaVu Sans"/>
               </a:rPr>
               <a:t> that translate the data from the mic and the screen</a:t>
             </a:r>
@@ -17097,7 +17303,7 @@
             </a:endParaRPr>
           </a:p>
           <a:p>
-            <a:pPr marL="285840" indent="-285120">
+            <a:pPr marL="285840" indent="-284760">
               <a:lnSpc>
                 <a:spcPct val="100000"/>
               </a:lnSpc>
@@ -17120,6 +17326,7 @@
                   <a:srgbClr val="0f496f"/>
                 </a:solidFill>
                 <a:latin typeface="Century Gothic"/>
+                <a:ea typeface="DejaVu Sans"/>
               </a:rPr>
               <a:t>This adapter will detect the os before interpreting </a:t>
             </a:r>
@@ -17129,6 +17336,7 @@
                   <a:srgbClr val="00b050"/>
                 </a:solidFill>
                 <a:latin typeface="Century Gothic"/>
+                <a:ea typeface="DejaVu Sans"/>
               </a:rPr>
               <a:t>inputs</a:t>
             </a:r>
@@ -17247,7 +17455,7 @@
         <p:spPr>
           <a:xfrm>
             <a:off x="7097760" y="1943280"/>
-            <a:ext cx="853920" cy="853920"/>
+            <a:ext cx="853560" cy="853560"/>
           </a:xfrm>
           <a:prstGeom prst="rect">
             <a:avLst/>
@@ -17270,7 +17478,7 @@
         <p:spPr>
           <a:xfrm>
             <a:off x="6931800" y="4296600"/>
-            <a:ext cx="1180440" cy="472680"/>
+            <a:ext cx="1180080" cy="472320"/>
           </a:xfrm>
           <a:prstGeom prst="rect">
             <a:avLst/>
@@ -17293,7 +17501,7 @@
         <p:spPr>
           <a:xfrm>
             <a:off x="7054200" y="2896920"/>
-            <a:ext cx="897480" cy="1039680"/>
+            <a:ext cx="897120" cy="1039320"/>
           </a:xfrm>
           <a:prstGeom prst="rect">
             <a:avLst/>
@@ -17316,7 +17524,7 @@
         <p:spPr>
           <a:xfrm>
             <a:off x="2718360" y="2064960"/>
-            <a:ext cx="913680" cy="913680"/>
+            <a:ext cx="913320" cy="913320"/>
           </a:xfrm>
           <a:prstGeom prst="rect">
             <a:avLst/>
@@ -17339,7 +17547,7 @@
         <p:spPr>
           <a:xfrm>
             <a:off x="2739240" y="3371040"/>
-            <a:ext cx="913680" cy="913680"/>
+            <a:ext cx="913320" cy="913320"/>
           </a:xfrm>
           <a:prstGeom prst="rect">
             <a:avLst/>
@@ -17362,7 +17570,7 @@
         <p:spPr>
           <a:xfrm>
             <a:off x="4908600" y="2852280"/>
-            <a:ext cx="913680" cy="913680"/>
+            <a:ext cx="913320" cy="913320"/>
           </a:xfrm>
           <a:prstGeom prst="rect">
             <a:avLst/>
@@ -17380,8 +17588,8 @@
         </p:nvSpPr>
         <p:spPr>
           <a:xfrm rot="1192200">
-            <a:off x="4047840" y="2673360"/>
-            <a:ext cx="977760" cy="483840"/>
+            <a:off x="4047480" y="2673000"/>
+            <a:ext cx="977400" cy="483480"/>
           </a:xfrm>
           <a:prstGeom prst="rightArrow">
             <a:avLst>
@@ -17422,8 +17630,8 @@
         </p:nvSpPr>
         <p:spPr>
           <a:xfrm rot="20407800">
-            <a:off x="4027320" y="3459960"/>
-            <a:ext cx="977760" cy="483840"/>
+            <a:off x="4026960" y="3459960"/>
+            <a:ext cx="977400" cy="483480"/>
           </a:xfrm>
           <a:prstGeom prst="rightArrow">
             <a:avLst>
@@ -17464,8 +17672,8 @@
         </p:nvSpPr>
         <p:spPr>
           <a:xfrm rot="1192200">
-            <a:off x="5801400" y="3781800"/>
-            <a:ext cx="977760" cy="483840"/>
+            <a:off x="5801040" y="3781440"/>
+            <a:ext cx="977400" cy="483480"/>
           </a:xfrm>
           <a:prstGeom prst="rightArrow">
             <a:avLst>
@@ -17506,8 +17714,8 @@
         </p:nvSpPr>
         <p:spPr>
           <a:xfrm rot="20407800">
-            <a:off x="5875560" y="2455560"/>
-            <a:ext cx="977760" cy="483840"/>
+            <a:off x="5875200" y="2455560"/>
+            <a:ext cx="977400" cy="483480"/>
           </a:xfrm>
           <a:prstGeom prst="rightArrow">
             <a:avLst>
@@ -17549,7 +17757,7 @@
         <p:spPr>
           <a:xfrm>
             <a:off x="5951880" y="3115440"/>
-            <a:ext cx="977760" cy="483840"/>
+            <a:ext cx="977400" cy="483480"/>
           </a:xfrm>
           <a:prstGeom prst="rightArrow">
             <a:avLst>
@@ -17640,7 +17848,7 @@
         <p:spPr>
           <a:xfrm>
             <a:off x="684360" y="4487400"/>
-            <a:ext cx="8533800" cy="1506240"/>
+            <a:ext cx="8533440" cy="1505880"/>
           </a:xfrm>
           <a:prstGeom prst="rect">
             <a:avLst/>
@@ -17670,6 +17878,7 @@
                   <a:srgbClr val="ffffff"/>
                 </a:solidFill>
                 <a:latin typeface="Century Gothic"/>
+                <a:ea typeface="DejaVu Sans"/>
               </a:rPr>
               <a:t>Simulate the brain</a:t>
             </a:r>
@@ -17688,7 +17897,7 @@
         <p:spPr>
           <a:xfrm>
             <a:off x="684360" y="685800"/>
-            <a:ext cx="8533800" cy="3614400"/>
+            <a:ext cx="8533440" cy="3614040"/>
           </a:xfrm>
           <a:prstGeom prst="rect">
             <a:avLst/>
@@ -17707,7 +17916,7 @@
         <p:txBody>
           <a:bodyPr lIns="90000" rIns="90000" tIns="45000" bIns="45000" anchor="ctr"/>
           <a:p>
-            <a:pPr marL="285840" indent="-285120">
+            <a:pPr marL="285840" indent="-284760">
               <a:lnSpc>
                 <a:spcPct val="100000"/>
               </a:lnSpc>
@@ -17730,6 +17939,7 @@
                   <a:srgbClr val="0f496f"/>
                 </a:solidFill>
                 <a:latin typeface="Century Gothic"/>
+                <a:ea typeface="DejaVu Sans"/>
               </a:rPr>
               <a:t>A </a:t>
             </a:r>
@@ -17739,6 +17949,7 @@
                   <a:srgbClr val="0070c0"/>
                 </a:solidFill>
                 <a:latin typeface="Century Gothic"/>
+                <a:ea typeface="DejaVu Sans"/>
               </a:rPr>
               <a:t>human </a:t>
             </a:r>
@@ -17748,6 +17959,7 @@
                   <a:srgbClr val="92d050"/>
                 </a:solidFill>
                 <a:latin typeface="Century Gothic"/>
+                <a:ea typeface="DejaVu Sans"/>
               </a:rPr>
               <a:t>sleep</a:t>
             </a:r>
@@ -17757,6 +17969,7 @@
                   <a:srgbClr val="0070c0"/>
                 </a:solidFill>
                 <a:latin typeface="Century Gothic"/>
+                <a:ea typeface="DejaVu Sans"/>
               </a:rPr>
               <a:t> </a:t>
             </a:r>
@@ -17766,6 +17979,7 @@
                   <a:srgbClr val="0f496f"/>
                 </a:solidFill>
                 <a:latin typeface="Century Gothic"/>
+                <a:ea typeface="DejaVu Sans"/>
               </a:rPr>
               <a:t>to </a:t>
             </a:r>
@@ -17775,6 +17989,7 @@
                   <a:srgbClr val="002060"/>
                 </a:solidFill>
                 <a:latin typeface="Century Gothic"/>
+                <a:ea typeface="DejaVu Sans"/>
               </a:rPr>
               <a:t>organize</a:t>
             </a:r>
@@ -17784,6 +17999,7 @@
                   <a:srgbClr val="0f496f"/>
                 </a:solidFill>
                 <a:latin typeface="Century Gothic"/>
+                <a:ea typeface="DejaVu Sans"/>
               </a:rPr>
               <a:t> it memory</a:t>
             </a:r>
@@ -17792,7 +18008,7 @@
             </a:endParaRPr>
           </a:p>
           <a:p>
-            <a:pPr marL="285840" indent="-285120">
+            <a:pPr marL="285840" indent="-284760">
               <a:lnSpc>
                 <a:spcPct val="100000"/>
               </a:lnSpc>
@@ -17815,6 +18031,7 @@
                   <a:srgbClr val="0f496f"/>
                 </a:solidFill>
                 <a:latin typeface="Century Gothic"/>
+                <a:ea typeface="DejaVu Sans"/>
               </a:rPr>
               <a:t>So does </a:t>
             </a:r>
@@ -17824,6 +18041,7 @@
                   <a:srgbClr val="ffc000"/>
                 </a:solidFill>
                 <a:latin typeface="Century Gothic"/>
+                <a:ea typeface="DejaVu Sans"/>
               </a:rPr>
               <a:t>SAI</a:t>
             </a:r>
@@ -17833,6 +18051,7 @@
                   <a:srgbClr val="0f496f"/>
                 </a:solidFill>
                 <a:latin typeface="Century Gothic"/>
+                <a:ea typeface="DejaVu Sans"/>
               </a:rPr>
               <a:t> need to</a:t>
             </a:r>
@@ -17841,7 +18060,7 @@
             </a:endParaRPr>
           </a:p>
           <a:p>
-            <a:pPr marL="285840" indent="-285120">
+            <a:pPr marL="285840" indent="-284760">
               <a:lnSpc>
                 <a:spcPct val="100000"/>
               </a:lnSpc>
@@ -17864,6 +18083,7 @@
                   <a:srgbClr val="0f496f"/>
                 </a:solidFill>
                 <a:latin typeface="Century Gothic"/>
+                <a:ea typeface="DejaVu Sans"/>
               </a:rPr>
               <a:t>It will </a:t>
             </a:r>
@@ -17873,6 +18093,7 @@
                   <a:srgbClr val="941a1b"/>
                 </a:solidFill>
                 <a:latin typeface="Century Gothic"/>
+                <a:ea typeface="DejaVu Sans"/>
               </a:rPr>
               <a:t>compress</a:t>
             </a:r>
@@ -17882,6 +18103,7 @@
                   <a:srgbClr val="0f496f"/>
                 </a:solidFill>
                 <a:latin typeface="Century Gothic"/>
+                <a:ea typeface="DejaVu Sans"/>
               </a:rPr>
               <a:t> </a:t>
             </a:r>
@@ -17891,6 +18113,7 @@
                   <a:srgbClr val="4be7c8"/>
                 </a:solidFill>
                 <a:latin typeface="Century Gothic"/>
+                <a:ea typeface="DejaVu Sans"/>
               </a:rPr>
               <a:t>data</a:t>
             </a:r>
@@ -17900,6 +18123,7 @@
                   <a:srgbClr val="0f496f"/>
                 </a:solidFill>
                 <a:latin typeface="Century Gothic"/>
+                <a:ea typeface="DejaVu Sans"/>
               </a:rPr>
               <a:t> as much as he can</a:t>
             </a:r>
@@ -17922,7 +18146,7 @@
         <p:spPr>
           <a:xfrm>
             <a:off x="6227640" y="3794400"/>
-            <a:ext cx="913680" cy="913680"/>
+            <a:ext cx="913320" cy="913320"/>
           </a:xfrm>
           <a:prstGeom prst="rect">
             <a:avLst/>
@@ -17945,7 +18169,7 @@
         <p:spPr>
           <a:xfrm>
             <a:off x="2468520" y="3843720"/>
-            <a:ext cx="913680" cy="913680"/>
+            <a:ext cx="913320" cy="913320"/>
           </a:xfrm>
           <a:prstGeom prst="rect">
             <a:avLst/>
@@ -17968,7 +18192,7 @@
         <p:spPr>
           <a:xfrm>
             <a:off x="9790920" y="3794400"/>
-            <a:ext cx="913680" cy="913680"/>
+            <a:ext cx="913320" cy="913320"/>
           </a:xfrm>
           <a:prstGeom prst="rect">
             <a:avLst/>
@@ -17991,7 +18215,7 @@
         <p:spPr>
           <a:xfrm>
             <a:off x="7903800" y="3794400"/>
-            <a:ext cx="913680" cy="913680"/>
+            <a:ext cx="913320" cy="913320"/>
           </a:xfrm>
           <a:prstGeom prst="rect">
             <a:avLst/>
@@ -18014,7 +18238,7 @@
         <p:spPr>
           <a:xfrm>
             <a:off x="4412520" y="3794400"/>
-            <a:ext cx="913680" cy="913680"/>
+            <a:ext cx="913320" cy="913320"/>
           </a:xfrm>
           <a:prstGeom prst="rect">
             <a:avLst/>
@@ -18037,7 +18261,7 @@
         <p:spPr>
           <a:xfrm>
             <a:off x="684360" y="3843720"/>
-            <a:ext cx="913680" cy="913680"/>
+            <a:ext cx="913320" cy="913320"/>
           </a:xfrm>
           <a:prstGeom prst="rect">
             <a:avLst/>
@@ -18056,7 +18280,7 @@
         <p:spPr>
           <a:xfrm>
             <a:off x="1638000" y="4183200"/>
-            <a:ext cx="682200" cy="261360"/>
+            <a:ext cx="681840" cy="261000"/>
           </a:xfrm>
           <a:prstGeom prst="rightArrow">
             <a:avLst>
@@ -18095,7 +18319,7 @@
         <p:spPr>
           <a:xfrm>
             <a:off x="3511800" y="4201920"/>
-            <a:ext cx="682200" cy="261360"/>
+            <a:ext cx="681840" cy="261000"/>
           </a:xfrm>
           <a:prstGeom prst="rightArrow">
             <a:avLst>
@@ -18134,7 +18358,7 @@
         <p:spPr>
           <a:xfrm>
             <a:off x="5366520" y="4193640"/>
-            <a:ext cx="682200" cy="261360"/>
+            <a:ext cx="681840" cy="261000"/>
           </a:xfrm>
           <a:prstGeom prst="rightArrow">
             <a:avLst>
@@ -18173,7 +18397,7 @@
         <p:spPr>
           <a:xfrm>
             <a:off x="7162200" y="4183200"/>
-            <a:ext cx="682200" cy="261360"/>
+            <a:ext cx="681840" cy="261000"/>
           </a:xfrm>
           <a:prstGeom prst="rightArrow">
             <a:avLst>
@@ -18212,7 +18436,7 @@
         <p:spPr>
           <a:xfrm>
             <a:off x="8876160" y="4169880"/>
-            <a:ext cx="682200" cy="261360"/>
+            <a:ext cx="681840" cy="261000"/>
           </a:xfrm>
           <a:prstGeom prst="rightArrow">
             <a:avLst>
@@ -18300,7 +18524,7 @@
         <p:spPr>
           <a:xfrm>
             <a:off x="684360" y="4487400"/>
-            <a:ext cx="8533800" cy="1506240"/>
+            <a:ext cx="8533440" cy="1505880"/>
           </a:xfrm>
           <a:prstGeom prst="rect">
             <a:avLst/>
@@ -18330,6 +18554,7 @@
                   <a:srgbClr val="ffffff"/>
                 </a:solidFill>
                 <a:latin typeface="Century Gothic"/>
+                <a:ea typeface="DejaVu Sans"/>
               </a:rPr>
               <a:t>Add a reward</a:t>
             </a:r>
@@ -18348,7 +18573,7 @@
         <p:spPr>
           <a:xfrm>
             <a:off x="684360" y="685800"/>
-            <a:ext cx="8533800" cy="3614400"/>
+            <a:ext cx="8533440" cy="3614040"/>
           </a:xfrm>
           <a:prstGeom prst="rect">
             <a:avLst/>
@@ -18367,7 +18592,7 @@
         <p:txBody>
           <a:bodyPr lIns="90000" rIns="90000" tIns="45000" bIns="45000" anchor="ctr"/>
           <a:p>
-            <a:pPr marL="285840" indent="-285120">
+            <a:pPr marL="285840" indent="-284760">
               <a:lnSpc>
                 <a:spcPct val="100000"/>
               </a:lnSpc>
@@ -18390,6 +18615,7 @@
                   <a:srgbClr val="0f496f"/>
                 </a:solidFill>
                 <a:latin typeface="Century Gothic"/>
+                <a:ea typeface="DejaVu Sans"/>
               </a:rPr>
               <a:t>The </a:t>
             </a:r>
@@ -18399,6 +18625,7 @@
                   <a:srgbClr val="aadf5e"/>
                 </a:solidFill>
                 <a:latin typeface="Century Gothic"/>
+                <a:ea typeface="DejaVu Sans"/>
               </a:rPr>
               <a:t>reward</a:t>
             </a:r>
@@ -18408,6 +18635,7 @@
                   <a:srgbClr val="0f496f"/>
                 </a:solidFill>
                 <a:latin typeface="Century Gothic"/>
+                <a:ea typeface="DejaVu Sans"/>
               </a:rPr>
               <a:t> will impact the </a:t>
             </a:r>
@@ -18417,6 +18645,7 @@
                   <a:srgbClr val="c8f1fb"/>
                 </a:solidFill>
                 <a:latin typeface="Century Gothic"/>
+                <a:ea typeface="DejaVu Sans"/>
               </a:rPr>
               <a:t>next decision</a:t>
             </a:r>
@@ -18426,6 +18655,7 @@
                   <a:srgbClr val="0f496f"/>
                 </a:solidFill>
                 <a:latin typeface="Century Gothic"/>
+                <a:ea typeface="DejaVu Sans"/>
               </a:rPr>
               <a:t> for </a:t>
             </a:r>
@@ -18435,6 +18665,7 @@
                   <a:srgbClr val="ffc000"/>
                 </a:solidFill>
                 <a:latin typeface="Century Gothic"/>
+                <a:ea typeface="DejaVu Sans"/>
               </a:rPr>
               <a:t>SAI</a:t>
             </a:r>
@@ -18443,7 +18674,7 @@
             </a:endParaRPr>
           </a:p>
           <a:p>
-            <a:pPr marL="285840" indent="-285120">
+            <a:pPr marL="285840" indent="-284760">
               <a:lnSpc>
                 <a:spcPct val="100000"/>
               </a:lnSpc>
@@ -18466,6 +18697,7 @@
                   <a:srgbClr val="0f496f"/>
                 </a:solidFill>
                 <a:latin typeface="Century Gothic"/>
+                <a:ea typeface="DejaVu Sans"/>
               </a:rPr>
               <a:t>Explain with a schema</a:t>
             </a:r>
@@ -18488,7 +18720,7 @@
         <p:spPr>
           <a:xfrm>
             <a:off x="4681800" y="2481480"/>
-            <a:ext cx="913680" cy="913680"/>
+            <a:ext cx="913320" cy="913320"/>
           </a:xfrm>
           <a:prstGeom prst="rect">
             <a:avLst/>
@@ -18511,7 +18743,7 @@
         <p:spPr>
           <a:xfrm>
             <a:off x="6609240" y="3669480"/>
-            <a:ext cx="913680" cy="913680"/>
+            <a:ext cx="913320" cy="913320"/>
           </a:xfrm>
           <a:prstGeom prst="rect">
             <a:avLst/>
@@ -18534,7 +18766,7 @@
         <p:spPr>
           <a:xfrm>
             <a:off x="2973240" y="3669480"/>
-            <a:ext cx="913680" cy="913680"/>
+            <a:ext cx="913320" cy="913320"/>
           </a:xfrm>
           <a:prstGeom prst="rect">
             <a:avLst/>
@@ -18553,7 +18785,7 @@
         <p:spPr>
           <a:xfrm>
             <a:off x="4214160" y="3946320"/>
-            <a:ext cx="2067840" cy="360000"/>
+            <a:ext cx="2067480" cy="359640"/>
           </a:xfrm>
           <a:prstGeom prst="rightArrow">
             <a:avLst>
@@ -18592,7 +18824,7 @@
         <p:spPr>
           <a:xfrm>
             <a:off x="4988160" y="3533400"/>
-            <a:ext cx="300960" cy="406440"/>
+            <a:ext cx="300600" cy="406080"/>
           </a:xfrm>
           <a:prstGeom prst="downArrow">
             <a:avLst>

</xml_diff>

<commit_message>
#12 Reinfocement learning  explanation with cat example speech part 1 added on introduction slides
</commit_message>
<xml_diff>
--- a/SAI_presentation_libre_office.pptx
+++ b/SAI_presentation_libre_office.pptx
@@ -250,7 +250,7 @@
           <a:bodyPr lIns="0" rIns="0" tIns="0" bIns="0" anchor="b"/>
           <a:p>
             <a:pPr algn="r"/>
-            <a:fld id="{22C23751-C934-481E-81BB-979039E34D7F}" type="slidenum">
+            <a:fld id="{FB6E05D9-635A-46E5-A86C-15EFB78B77F6}" type="slidenum">
               <a:rPr b="0" lang="fr-FR" sz="1400" spc="-1" strike="noStrike">
                 <a:latin typeface="Times New Roman"/>
               </a:rPr>
@@ -298,7 +298,7 @@
         <p:spPr>
           <a:xfrm>
             <a:off x="685800" y="1143000"/>
-            <a:ext cx="5485320" cy="3085200"/>
+            <a:ext cx="5484960" cy="3084840"/>
           </a:xfrm>
           <a:prstGeom prst="rect">
             <a:avLst/>
@@ -318,7 +318,7 @@
         <p:spPr>
           <a:xfrm>
             <a:off x="685800" y="4400640"/>
-            <a:ext cx="5485320" cy="3599280"/>
+            <a:ext cx="5484960" cy="3598920"/>
           </a:xfrm>
           <a:prstGeom prst="rect">
             <a:avLst/>
@@ -327,7 +327,7 @@
         <p:txBody>
           <a:bodyPr lIns="0" rIns="0" tIns="0" bIns="0"/>
           <a:p>
-            <a:pPr marL="216000" indent="-215280">
+            <a:pPr marL="216000" indent="-214920">
               <a:lnSpc>
                 <a:spcPct val="100000"/>
               </a:lnSpc>
@@ -343,7 +343,7 @@
             </a:endParaRPr>
           </a:p>
           <a:p>
-            <a:pPr marL="216000" indent="-215280">
+            <a:pPr marL="216000" indent="-214920">
               <a:lnSpc>
                 <a:spcPct val="100000"/>
               </a:lnSpc>
@@ -360,7 +360,7 @@
             </a:endParaRPr>
           </a:p>
           <a:p>
-            <a:pPr marL="216000" indent="-215280">
+            <a:pPr marL="216000" indent="-214920">
               <a:lnSpc>
                 <a:spcPct val="100000"/>
               </a:lnSpc>
@@ -376,7 +376,7 @@
             </a:endParaRPr>
           </a:p>
           <a:p>
-            <a:pPr marL="216000" indent="-215280">
+            <a:pPr marL="216000" indent="-214920">
               <a:lnSpc>
                 <a:spcPct val="100000"/>
               </a:lnSpc>
@@ -392,7 +392,7 @@
             </a:endParaRPr>
           </a:p>
           <a:p>
-            <a:pPr marL="216000" indent="-215280">
+            <a:pPr marL="216000" indent="-214920">
               <a:lnSpc>
                 <a:spcPct val="100000"/>
               </a:lnSpc>
@@ -419,7 +419,7 @@
         <p:spPr>
           <a:xfrm>
             <a:off x="3884760" y="8685360"/>
-            <a:ext cx="2970720" cy="457560"/>
+            <a:ext cx="2970360" cy="457200"/>
           </a:xfrm>
           <a:prstGeom prst="rect">
             <a:avLst/>
@@ -443,14 +443,14 @@
                 <a:spcPct val="100000"/>
               </a:lnSpc>
             </a:pPr>
-            <a:fld id="{1DF230C7-FD30-46C9-B502-C3A3B0C4A801}" type="slidenum">
+            <a:fld id="{295C6F7E-DF9A-4F8E-B082-D07629C9DA57}" type="slidenum">
               <a:rPr b="0" lang="fr-FR" sz="1200" spc="-1" strike="noStrike">
                 <a:solidFill>
                   <a:srgbClr val="000000"/>
                 </a:solidFill>
                 <a:latin typeface="Times New Roman"/>
               </a:rPr>
-              <a:t>&lt;numéro&gt;</a:t>
+              <a:t>1</a:t>
             </a:fld>
             <a:endParaRPr b="0" lang="fr-FR" sz="1200" spc="-1" strike="noStrike">
               <a:latin typeface="Arial"/>
@@ -493,7 +493,7 @@
         <p:spPr>
           <a:xfrm>
             <a:off x="685800" y="1143000"/>
-            <a:ext cx="5485320" cy="3085200"/>
+            <a:ext cx="5484960" cy="3084840"/>
           </a:xfrm>
           <a:prstGeom prst="rect">
             <a:avLst/>
@@ -513,7 +513,7 @@
         <p:spPr>
           <a:xfrm>
             <a:off x="685800" y="4400640"/>
-            <a:ext cx="5485320" cy="3599280"/>
+            <a:ext cx="5484960" cy="3598920"/>
           </a:xfrm>
           <a:prstGeom prst="rect">
             <a:avLst/>
@@ -522,7 +522,7 @@
         <p:txBody>
           <a:bodyPr lIns="0" rIns="0" tIns="0" bIns="0"/>
           <a:p>
-            <a:pPr marL="216000" indent="-215640">
+            <a:pPr marL="216000" indent="-215280">
               <a:lnSpc>
                 <a:spcPct val="100000"/>
               </a:lnSpc>
@@ -538,7 +538,7 @@
             </a:endParaRPr>
           </a:p>
           <a:p>
-            <a:pPr marL="216000" indent="-215640">
+            <a:pPr marL="216000" indent="-215280">
               <a:lnSpc>
                 <a:spcPct val="100000"/>
               </a:lnSpc>
@@ -548,7 +548,7 @@
             </a:endParaRPr>
           </a:p>
           <a:p>
-            <a:pPr marL="216000" indent="-215640">
+            <a:pPr marL="216000" indent="-215280">
               <a:lnSpc>
                 <a:spcPct val="100000"/>
               </a:lnSpc>
@@ -564,7 +564,7 @@
             </a:endParaRPr>
           </a:p>
           <a:p>
-            <a:pPr marL="216000" indent="-215640">
+            <a:pPr marL="216000" indent="-215280">
               <a:lnSpc>
                 <a:spcPct val="100000"/>
               </a:lnSpc>
@@ -574,7 +574,7 @@
             </a:endParaRPr>
           </a:p>
           <a:p>
-            <a:pPr marL="216000" indent="-215640">
+            <a:pPr marL="216000" indent="-215280">
               <a:lnSpc>
                 <a:spcPct val="100000"/>
               </a:lnSpc>
@@ -590,7 +590,7 @@
             </a:endParaRPr>
           </a:p>
           <a:p>
-            <a:pPr marL="216000" indent="-215640">
+            <a:pPr marL="216000" indent="-215280">
               <a:lnSpc>
                 <a:spcPct val="100000"/>
               </a:lnSpc>
@@ -600,7 +600,7 @@
             </a:endParaRPr>
           </a:p>
           <a:p>
-            <a:pPr marL="216000" indent="-215640">
+            <a:pPr marL="216000" indent="-215280">
               <a:lnSpc>
                 <a:spcPct val="100000"/>
               </a:lnSpc>
@@ -616,7 +616,7 @@
             </a:endParaRPr>
           </a:p>
           <a:p>
-            <a:pPr marL="216000" indent="-215640">
+            <a:pPr marL="216000" indent="-215280">
               <a:lnSpc>
                 <a:spcPct val="100000"/>
               </a:lnSpc>
@@ -626,7 +626,7 @@
             </a:endParaRPr>
           </a:p>
           <a:p>
-            <a:pPr marL="216000" indent="-215640">
+            <a:pPr marL="216000" indent="-215280">
               <a:lnSpc>
                 <a:spcPct val="100000"/>
               </a:lnSpc>
@@ -636,7 +636,7 @@
             </a:endParaRPr>
           </a:p>
           <a:p>
-            <a:pPr marL="216000" indent="-215640">
+            <a:pPr marL="216000" indent="-215280">
               <a:lnSpc>
                 <a:spcPct val="100000"/>
               </a:lnSpc>
@@ -652,7 +652,7 @@
             </a:endParaRPr>
           </a:p>
           <a:p>
-            <a:pPr marL="216000" indent="-215640">
+            <a:pPr marL="216000" indent="-215280">
               <a:lnSpc>
                 <a:spcPct val="100000"/>
               </a:lnSpc>
@@ -668,7 +668,7 @@
             </a:endParaRPr>
           </a:p>
           <a:p>
-            <a:pPr marL="216000" indent="-215640">
+            <a:pPr marL="216000" indent="-215280">
               <a:lnSpc>
                 <a:spcPct val="100000"/>
               </a:lnSpc>
@@ -684,7 +684,7 @@
             </a:endParaRPr>
           </a:p>
           <a:p>
-            <a:pPr marL="216000" indent="-215640">
+            <a:pPr marL="216000" indent="-215280">
               <a:lnSpc>
                 <a:spcPct val="100000"/>
               </a:lnSpc>
@@ -694,7 +694,7 @@
             </a:endParaRPr>
           </a:p>
           <a:p>
-            <a:pPr marL="216000" indent="-215640">
+            <a:pPr marL="216000" indent="-215280">
               <a:lnSpc>
                 <a:spcPct val="100000"/>
               </a:lnSpc>
@@ -710,7 +710,7 @@
             </a:endParaRPr>
           </a:p>
           <a:p>
-            <a:pPr marL="216000" indent="-215640">
+            <a:pPr marL="216000" indent="-215280">
               <a:lnSpc>
                 <a:spcPct val="100000"/>
               </a:lnSpc>
@@ -720,7 +720,7 @@
             </a:endParaRPr>
           </a:p>
           <a:p>
-            <a:pPr marL="216000" indent="-215640">
+            <a:pPr marL="216000" indent="-215280">
               <a:lnSpc>
                 <a:spcPct val="100000"/>
               </a:lnSpc>
@@ -736,7 +736,7 @@
             </a:endParaRPr>
           </a:p>
           <a:p>
-            <a:pPr marL="216000" indent="-215640">
+            <a:pPr marL="216000" indent="-215280">
               <a:lnSpc>
                 <a:spcPct val="100000"/>
               </a:lnSpc>
@@ -752,7 +752,7 @@
             </a:endParaRPr>
           </a:p>
           <a:p>
-            <a:pPr marL="216000" indent="-215640">
+            <a:pPr marL="216000" indent="-215280">
               <a:lnSpc>
                 <a:spcPct val="100000"/>
               </a:lnSpc>
@@ -768,7 +768,7 @@
             </a:endParaRPr>
           </a:p>
           <a:p>
-            <a:pPr marL="216000" indent="-215640">
+            <a:pPr marL="216000" indent="-215280">
               <a:lnSpc>
                 <a:spcPct val="100000"/>
               </a:lnSpc>
@@ -784,7 +784,7 @@
             </a:endParaRPr>
           </a:p>
           <a:p>
-            <a:pPr marL="216000" indent="-215640">
+            <a:pPr marL="216000" indent="-215280">
               <a:lnSpc>
                 <a:spcPct val="100000"/>
               </a:lnSpc>
@@ -794,7 +794,7 @@
             </a:endParaRPr>
           </a:p>
           <a:p>
-            <a:pPr marL="216000" indent="-215640">
+            <a:pPr marL="216000" indent="-215280">
               <a:lnSpc>
                 <a:spcPct val="100000"/>
               </a:lnSpc>
@@ -810,7 +810,7 @@
             </a:endParaRPr>
           </a:p>
           <a:p>
-            <a:pPr marL="216000" indent="-215640">
+            <a:pPr marL="216000" indent="-215280">
               <a:lnSpc>
                 <a:spcPct val="100000"/>
               </a:lnSpc>
@@ -826,7 +826,7 @@
             </a:endParaRPr>
           </a:p>
           <a:p>
-            <a:pPr marL="216000" indent="-215640">
+            <a:pPr marL="216000" indent="-215280">
               <a:lnSpc>
                 <a:spcPct val="100000"/>
               </a:lnSpc>
@@ -842,7 +842,7 @@
             </a:endParaRPr>
           </a:p>
           <a:p>
-            <a:pPr marL="216000" indent="-215640">
+            <a:pPr marL="216000" indent="-215280">
               <a:lnSpc>
                 <a:spcPct val="100000"/>
               </a:lnSpc>
@@ -858,7 +858,7 @@
             </a:endParaRPr>
           </a:p>
           <a:p>
-            <a:pPr marL="216000" indent="-215640">
+            <a:pPr marL="216000" indent="-215280">
               <a:lnSpc>
                 <a:spcPct val="100000"/>
               </a:lnSpc>
@@ -874,7 +874,7 @@
             </a:endParaRPr>
           </a:p>
           <a:p>
-            <a:pPr marL="216000" indent="-215640">
+            <a:pPr marL="216000" indent="-215280">
               <a:lnSpc>
                 <a:spcPct val="100000"/>
               </a:lnSpc>
@@ -884,7 +884,7 @@
             </a:endParaRPr>
           </a:p>
           <a:p>
-            <a:pPr marL="216000" indent="-215640">
+            <a:pPr marL="216000" indent="-215280">
               <a:lnSpc>
                 <a:spcPct val="100000"/>
               </a:lnSpc>
@@ -900,7 +900,7 @@
             </a:endParaRPr>
           </a:p>
           <a:p>
-            <a:pPr marL="216000" indent="-215640">
+            <a:pPr marL="216000" indent="-215280">
               <a:lnSpc>
                 <a:spcPct val="100000"/>
               </a:lnSpc>
@@ -916,7 +916,7 @@
             </a:endParaRPr>
           </a:p>
           <a:p>
-            <a:pPr marL="216000" indent="-215640">
+            <a:pPr marL="216000" indent="-215280">
               <a:lnSpc>
                 <a:spcPct val="100000"/>
               </a:lnSpc>
@@ -932,7 +932,7 @@
             </a:endParaRPr>
           </a:p>
           <a:p>
-            <a:pPr marL="216000" indent="-215640">
+            <a:pPr marL="216000" indent="-215280">
               <a:lnSpc>
                 <a:spcPct val="100000"/>
               </a:lnSpc>
@@ -942,7 +942,7 @@
             </a:endParaRPr>
           </a:p>
           <a:p>
-            <a:pPr marL="216000" indent="-215640">
+            <a:pPr marL="216000" indent="-215280">
               <a:lnSpc>
                 <a:spcPct val="100000"/>
               </a:lnSpc>
@@ -958,7 +958,7 @@
             </a:endParaRPr>
           </a:p>
           <a:p>
-            <a:pPr marL="216000" indent="-215640">
+            <a:pPr marL="216000" indent="-215280">
               <a:lnSpc>
                 <a:spcPct val="100000"/>
               </a:lnSpc>
@@ -974,7 +974,7 @@
             </a:endParaRPr>
           </a:p>
           <a:p>
-            <a:pPr marL="216000" indent="-215640">
+            <a:pPr marL="216000" indent="-215280">
               <a:lnSpc>
                 <a:spcPct val="100000"/>
               </a:lnSpc>
@@ -990,7 +990,7 @@
             </a:endParaRPr>
           </a:p>
           <a:p>
-            <a:pPr marL="216000" indent="-215640">
+            <a:pPr marL="216000" indent="-215280">
               <a:lnSpc>
                 <a:spcPct val="100000"/>
               </a:lnSpc>
@@ -1000,7 +1000,7 @@
             </a:endParaRPr>
           </a:p>
           <a:p>
-            <a:pPr marL="216000" indent="-215640">
+            <a:pPr marL="216000" indent="-215280">
               <a:lnSpc>
                 <a:spcPct val="100000"/>
               </a:lnSpc>
@@ -1016,7 +1016,7 @@
             </a:endParaRPr>
           </a:p>
           <a:p>
-            <a:pPr marL="216000" indent="-215640">
+            <a:pPr marL="216000" indent="-215280">
               <a:lnSpc>
                 <a:spcPct val="100000"/>
               </a:lnSpc>
@@ -1032,7 +1032,7 @@
             </a:endParaRPr>
           </a:p>
           <a:p>
-            <a:pPr marL="216000" indent="-215640">
+            <a:pPr marL="216000" indent="-215280">
               <a:lnSpc>
                 <a:spcPct val="100000"/>
               </a:lnSpc>
@@ -1048,7 +1048,7 @@
             </a:endParaRPr>
           </a:p>
           <a:p>
-            <a:pPr marL="216000" indent="-215640">
+            <a:pPr marL="216000" indent="-215280">
               <a:lnSpc>
                 <a:spcPct val="100000"/>
               </a:lnSpc>
@@ -1064,7 +1064,7 @@
             </a:endParaRPr>
           </a:p>
           <a:p>
-            <a:pPr marL="216000" indent="-215640">
+            <a:pPr marL="216000" indent="-215280">
               <a:lnSpc>
                 <a:spcPct val="100000"/>
               </a:lnSpc>
@@ -1074,7 +1074,7 @@
             </a:endParaRPr>
           </a:p>
           <a:p>
-            <a:pPr marL="216000" indent="-215640">
+            <a:pPr marL="216000" indent="-215280">
               <a:lnSpc>
                 <a:spcPct val="100000"/>
               </a:lnSpc>
@@ -1090,7 +1090,7 @@
             </a:endParaRPr>
           </a:p>
           <a:p>
-            <a:pPr marL="216000" indent="-215640">
+            <a:pPr marL="216000" indent="-215280">
               <a:lnSpc>
                 <a:spcPct val="100000"/>
               </a:lnSpc>
@@ -1107,7 +1107,7 @@
             </a:endParaRPr>
           </a:p>
           <a:p>
-            <a:pPr marL="216000" indent="-215640">
+            <a:pPr marL="216000" indent="-215280">
               <a:lnSpc>
                 <a:spcPct val="100000"/>
               </a:lnSpc>
@@ -1124,7 +1124,7 @@
             </a:endParaRPr>
           </a:p>
           <a:p>
-            <a:pPr marL="216000" indent="-215640">
+            <a:pPr marL="216000" indent="-215280">
               <a:lnSpc>
                 <a:spcPct val="100000"/>
               </a:lnSpc>
@@ -1141,7 +1141,7 @@
             </a:endParaRPr>
           </a:p>
           <a:p>
-            <a:pPr marL="216000" indent="-215640">
+            <a:pPr marL="216000" indent="-215280">
               <a:lnSpc>
                 <a:spcPct val="100000"/>
               </a:lnSpc>
@@ -1151,7 +1151,7 @@
             </a:endParaRPr>
           </a:p>
           <a:p>
-            <a:pPr marL="216000" indent="-215640">
+            <a:pPr marL="216000" indent="-215280">
               <a:lnSpc>
                 <a:spcPct val="100000"/>
               </a:lnSpc>
@@ -1168,7 +1168,7 @@
             </a:endParaRPr>
           </a:p>
           <a:p>
-            <a:pPr marL="216000" indent="-215640">
+            <a:pPr marL="216000" indent="-215280">
               <a:lnSpc>
                 <a:spcPct val="100000"/>
               </a:lnSpc>
@@ -1185,7 +1185,7 @@
             </a:endParaRPr>
           </a:p>
           <a:p>
-            <a:pPr marL="216000" indent="-215640">
+            <a:pPr marL="216000" indent="-215280">
               <a:lnSpc>
                 <a:spcPct val="100000"/>
               </a:lnSpc>
@@ -1195,7 +1195,7 @@
             </a:endParaRPr>
           </a:p>
           <a:p>
-            <a:pPr marL="216000" indent="-215640">
+            <a:pPr marL="216000" indent="-215280">
               <a:lnSpc>
                 <a:spcPct val="100000"/>
               </a:lnSpc>
@@ -1205,7 +1205,7 @@
             </a:endParaRPr>
           </a:p>
           <a:p>
-            <a:pPr marL="216000" indent="-215640">
+            <a:pPr marL="216000" indent="-215280">
               <a:lnSpc>
                 <a:spcPct val="100000"/>
               </a:lnSpc>
@@ -1215,7 +1215,7 @@
             </a:endParaRPr>
           </a:p>
           <a:p>
-            <a:pPr marL="216000" indent="-215640">
+            <a:pPr marL="216000" indent="-215280">
               <a:lnSpc>
                 <a:spcPct val="100000"/>
               </a:lnSpc>
@@ -1225,7 +1225,7 @@
             </a:endParaRPr>
           </a:p>
           <a:p>
-            <a:pPr marL="216000" indent="-215640">
+            <a:pPr marL="216000" indent="-215280">
               <a:lnSpc>
                 <a:spcPct val="100000"/>
               </a:lnSpc>
@@ -1245,7 +1245,7 @@
         <p:spPr>
           <a:xfrm>
             <a:off x="3884760" y="8685360"/>
-            <a:ext cx="2970720" cy="457560"/>
+            <a:ext cx="2970360" cy="457200"/>
           </a:xfrm>
           <a:prstGeom prst="rect">
             <a:avLst/>
@@ -1269,7 +1269,7 @@
                 <a:spcPct val="100000"/>
               </a:lnSpc>
             </a:pPr>
-            <a:fld id="{99CEFD47-6484-4B88-B630-9673BC0E0835}" type="slidenum">
+            <a:fld id="{C5298413-480B-4DD9-856B-2E165C1590A5}" type="slidenum">
               <a:rPr b="0" lang="fr-FR" sz="1200" spc="-1" strike="noStrike">
                 <a:solidFill>
                   <a:srgbClr val="000000"/>
@@ -1319,7 +1319,7 @@
         <p:spPr>
           <a:xfrm>
             <a:off x="685800" y="1143000"/>
-            <a:ext cx="5485320" cy="3085200"/>
+            <a:ext cx="5484960" cy="3084840"/>
           </a:xfrm>
           <a:prstGeom prst="rect">
             <a:avLst/>
@@ -1339,7 +1339,7 @@
         <p:spPr>
           <a:xfrm>
             <a:off x="685800" y="4400640"/>
-            <a:ext cx="5485320" cy="3599280"/>
+            <a:ext cx="5484960" cy="3598920"/>
           </a:xfrm>
           <a:prstGeom prst="rect">
             <a:avLst/>
@@ -1363,7 +1363,7 @@
         <p:spPr>
           <a:xfrm>
             <a:off x="3884760" y="8685360"/>
-            <a:ext cx="2970720" cy="457560"/>
+            <a:ext cx="2970360" cy="457200"/>
           </a:xfrm>
           <a:prstGeom prst="rect">
             <a:avLst/>
@@ -1387,7 +1387,7 @@
                 <a:spcPct val="100000"/>
               </a:lnSpc>
             </a:pPr>
-            <a:fld id="{95FC505A-3F5A-405F-A3D7-EF73043BB9A6}" type="slidenum">
+            <a:fld id="{B1905C72-210F-424C-ACBD-6833A06495DF}" type="slidenum">
               <a:rPr b="0" lang="fr-FR" sz="1200" spc="-1" strike="noStrike">
                 <a:solidFill>
                   <a:srgbClr val="000000"/>
@@ -1397,6 +1397,82 @@
               <a:t>&lt;numéro&gt;</a:t>
             </a:fld>
             <a:endParaRPr b="0" lang="fr-FR" sz="1200" spc="-1" strike="noStrike">
+              <a:latin typeface="Arial"/>
+            </a:endParaRPr>
+          </a:p>
+        </p:txBody>
+      </p:sp>
+    </p:spTree>
+  </p:cSld>
+</p:notes>
+</file>
+
+<file path=ppt/notesSlides/notesSlide4.xml><?xml version="1.0" encoding="utf-8"?>
+<p:notes xmlns:a="http://schemas.openxmlformats.org/drawingml/2006/main" xmlns:p="http://schemas.openxmlformats.org/presentationml/2006/main" xmlns:r="http://schemas.openxmlformats.org/officeDocument/2006/relationships" xmlns:p14="http://schemas.microsoft.com/office/powerpoint/2010/main" xmlns:p15="http://schemas.microsoft.com/office/powerpoint/2012/main" xmlns:mc="http://schemas.openxmlformats.org/markup-compatibility/2006">
+  <p:cSld>
+    <p:spTree>
+      <p:nvGrpSpPr>
+        <p:cNvPr id="1" name=""/>
+        <p:cNvGrpSpPr/>
+        <p:nvPr/>
+      </p:nvGrpSpPr>
+      <p:grpSpPr>
+        <a:xfrm>
+          <a:off x="0" y="0"/>
+          <a:ext cx="0" cy="0"/>
+          <a:chOff x="0" y="0"/>
+          <a:chExt cx="0" cy="0"/>
+        </a:xfrm>
+      </p:grpSpPr>
+      <p:sp>
+        <p:nvSpPr>
+          <p:cNvPr id="376" name="PlaceHolder 1"/>
+          <p:cNvSpPr>
+            <a:spLocks noGrp="1"/>
+          </p:cNvSpPr>
+          <p:nvPr>
+            <p:ph type="sldImg"/>
+          </p:nvPr>
+        </p:nvSpPr>
+        <p:spPr>
+          <a:xfrm>
+            <a:off x="380880" y="694800"/>
+            <a:ext cx="6095520" cy="3428640"/>
+          </a:xfrm>
+          <a:prstGeom prst="rect">
+            <a:avLst/>
+          </a:prstGeom>
+        </p:spPr>
+      </p:sp>
+      <p:sp>
+        <p:nvSpPr>
+          <p:cNvPr id="377" name="PlaceHolder 2"/>
+          <p:cNvSpPr>
+            <a:spLocks noGrp="1"/>
+          </p:cNvSpPr>
+          <p:nvPr>
+            <p:ph type="body"/>
+          </p:nvPr>
+        </p:nvSpPr>
+        <p:spPr>
+          <a:xfrm>
+            <a:off x="685800" y="4343400"/>
+            <a:ext cx="5486040" cy="4114440"/>
+          </a:xfrm>
+          <a:prstGeom prst="rect">
+            <a:avLst/>
+          </a:prstGeom>
+        </p:spPr>
+        <p:txBody>
+          <a:bodyPr lIns="0" rIns="0" tIns="0" bIns="0"/>
+          <a:p>
+            <a:r>
+              <a:rPr b="0" lang="fr-FR" sz="2000" spc="-1" strike="noStrike">
+                <a:latin typeface="Arial"/>
+              </a:rPr>
+              <a:t>Now I’m going to explain you how RL works really. Giving the past example with the cat, imagine you have the cat here as the agent</a:t>
+            </a:r>
+            <a:endParaRPr b="0" lang="fr-FR" sz="2000" spc="-1" strike="noStrike">
               <a:latin typeface="Arial"/>
             </a:endParaRPr>
           </a:p>
@@ -4456,7 +4532,7 @@
         <p:spPr>
           <a:xfrm>
             <a:off x="609480" y="273600"/>
-            <a:ext cx="10972080" cy="1144440"/>
+            <a:ext cx="10972440" cy="1144800"/>
           </a:xfrm>
           <a:prstGeom prst="rect">
             <a:avLst/>
@@ -4465,13 +4541,14 @@
         <p:txBody>
           <a:bodyPr lIns="0" rIns="0" tIns="0" bIns="0" anchor="ctr"/>
           <a:p>
-            <a:r>
-              <a:rPr b="0" lang="fr-FR" sz="1800" spc="-1" strike="noStrike">
+            <a:pPr algn="ctr"/>
+            <a:r>
+              <a:rPr b="0" lang="fr-FR" sz="4400" spc="-1" strike="noStrike">
                 <a:latin typeface="Arial"/>
               </a:rPr>
               <a:t>Cliquez pour éditer le format du texte-titre</a:t>
             </a:r>
-            <a:endParaRPr b="0" lang="fr-FR" sz="1800" spc="-1" strike="noStrike">
+            <a:endParaRPr b="0" lang="fr-FR" sz="4400" spc="-1" strike="noStrike">
               <a:latin typeface="Arial"/>
             </a:endParaRPr>
           </a:p>
@@ -4490,7 +4567,7 @@
         <p:spPr>
           <a:xfrm>
             <a:off x="609480" y="1604520"/>
-            <a:ext cx="10972080" cy="3976920"/>
+            <a:ext cx="10972440" cy="3977280"/>
           </a:xfrm>
           <a:prstGeom prst="rect">
             <a:avLst/>
@@ -4513,12 +4590,12 @@
               <a:buChar char=""/>
             </a:pPr>
             <a:r>
-              <a:rPr b="0" lang="fr-FR" sz="1800" spc="-1" strike="noStrike">
+              <a:rPr b="0" lang="fr-FR" sz="3200" spc="-1" strike="noStrike">
                 <a:latin typeface="Arial"/>
               </a:rPr>
               <a:t>Cliquez pour éditer le format du plan de texte</a:t>
             </a:r>
-            <a:endParaRPr b="0" lang="fr-FR" sz="1800" spc="-1" strike="noStrike">
+            <a:endParaRPr b="0" lang="fr-FR" sz="3200" spc="-1" strike="noStrike">
               <a:latin typeface="Arial"/>
             </a:endParaRPr>
           </a:p>
@@ -4535,12 +4612,12 @@
               <a:buChar char=""/>
             </a:pPr>
             <a:r>
-              <a:rPr b="0" lang="fr-FR" sz="1800" spc="-1" strike="noStrike">
+              <a:rPr b="0" lang="fr-FR" sz="2800" spc="-1" strike="noStrike">
                 <a:latin typeface="Arial"/>
               </a:rPr>
               <a:t>Second niveau de plan</a:t>
             </a:r>
-            <a:endParaRPr b="0" lang="fr-FR" sz="1800" spc="-1" strike="noStrike">
+            <a:endParaRPr b="0" lang="fr-FR" sz="2800" spc="-1" strike="noStrike">
               <a:latin typeface="Arial"/>
             </a:endParaRPr>
           </a:p>
@@ -4557,12 +4634,12 @@
               <a:buChar char=""/>
             </a:pPr>
             <a:r>
-              <a:rPr b="0" lang="fr-FR" sz="1800" spc="-1" strike="noStrike">
+              <a:rPr b="0" lang="fr-FR" sz="2400" spc="-1" strike="noStrike">
                 <a:latin typeface="Arial"/>
               </a:rPr>
               <a:t>Troisième niveau de plan</a:t>
             </a:r>
-            <a:endParaRPr b="0" lang="fr-FR" sz="1800" spc="-1" strike="noStrike">
+            <a:endParaRPr b="0" lang="fr-FR" sz="2400" spc="-1" strike="noStrike">
               <a:latin typeface="Arial"/>
             </a:endParaRPr>
           </a:p>
@@ -4579,12 +4656,12 @@
               <a:buChar char=""/>
             </a:pPr>
             <a:r>
-              <a:rPr b="0" lang="fr-FR" sz="1800" spc="-1" strike="noStrike">
+              <a:rPr b="0" lang="fr-FR" sz="2000" spc="-1" strike="noStrike">
                 <a:latin typeface="Arial"/>
               </a:rPr>
               <a:t>Quatrième niveau de plan</a:t>
             </a:r>
-            <a:endParaRPr b="0" lang="fr-FR" sz="1800" spc="-1" strike="noStrike">
+            <a:endParaRPr b="0" lang="fr-FR" sz="2000" spc="-1" strike="noStrike">
               <a:latin typeface="Arial"/>
             </a:endParaRPr>
           </a:p>
@@ -4601,12 +4678,12 @@
               <a:buChar char=""/>
             </a:pPr>
             <a:r>
-              <a:rPr b="0" lang="fr-FR" sz="1800" spc="-1" strike="noStrike">
+              <a:rPr b="0" lang="fr-FR" sz="2000" spc="-1" strike="noStrike">
                 <a:latin typeface="Arial"/>
               </a:rPr>
               <a:t>Cinquième niveau de plan</a:t>
             </a:r>
-            <a:endParaRPr b="0" lang="fr-FR" sz="1800" spc="-1" strike="noStrike">
+            <a:endParaRPr b="0" lang="fr-FR" sz="2000" spc="-1" strike="noStrike">
               <a:latin typeface="Arial"/>
             </a:endParaRPr>
           </a:p>
@@ -4623,12 +4700,12 @@
               <a:buChar char=""/>
             </a:pPr>
             <a:r>
-              <a:rPr b="0" lang="fr-FR" sz="1800" spc="-1" strike="noStrike">
+              <a:rPr b="0" lang="fr-FR" sz="2000" spc="-1" strike="noStrike">
                 <a:latin typeface="Arial"/>
               </a:rPr>
               <a:t>Sixième niveau de plan</a:t>
             </a:r>
-            <a:endParaRPr b="0" lang="fr-FR" sz="1800" spc="-1" strike="noStrike">
+            <a:endParaRPr b="0" lang="fr-FR" sz="2000" spc="-1" strike="noStrike">
               <a:latin typeface="Arial"/>
             </a:endParaRPr>
           </a:p>
@@ -4645,12 +4722,12 @@
               <a:buChar char=""/>
             </a:pPr>
             <a:r>
-              <a:rPr b="0" lang="fr-FR" sz="1800" spc="-1" strike="noStrike">
+              <a:rPr b="0" lang="fr-FR" sz="2000" spc="-1" strike="noStrike">
                 <a:latin typeface="Arial"/>
               </a:rPr>
               <a:t>Septième niveau de plan</a:t>
             </a:r>
-            <a:endParaRPr b="0" lang="fr-FR" sz="1800" spc="-1" strike="noStrike">
+            <a:endParaRPr b="0" lang="fr-FR" sz="2000" spc="-1" strike="noStrike">
               <a:latin typeface="Arial"/>
             </a:endParaRPr>
           </a:p>
@@ -5138,7 +5215,7 @@
         <p:spPr>
           <a:xfrm>
             <a:off x="0" y="0"/>
-            <a:ext cx="12191040" cy="6856920"/>
+            <a:ext cx="12190680" cy="6856560"/>
           </a:xfrm>
           <a:prstGeom prst="rect">
             <a:avLst/>
@@ -5171,7 +5248,7 @@
         <p:spPr>
           <a:xfrm flipV="1">
             <a:off x="0" y="-1440"/>
-            <a:ext cx="12187800" cy="6856920"/>
+            <a:ext cx="12187440" cy="6856560"/>
           </a:xfrm>
           <a:prstGeom prst="snip1Rect">
             <a:avLst>
@@ -5226,7 +5303,7 @@
         <p:spPr>
           <a:xfrm>
             <a:off x="684360" y="685800"/>
-            <a:ext cx="9677880" cy="3672360"/>
+            <a:ext cx="9677520" cy="3672000"/>
           </a:xfrm>
           <a:prstGeom prst="rect">
             <a:avLst/>
@@ -5277,7 +5354,7 @@
         <p:spPr>
           <a:xfrm>
             <a:off x="684360" y="4648320"/>
-            <a:ext cx="7004520" cy="1141920"/>
+            <a:ext cx="7004160" cy="1141560"/>
           </a:xfrm>
           <a:prstGeom prst="rect">
             <a:avLst/>
@@ -5415,7 +5492,7 @@
         <p:spPr>
           <a:xfrm>
             <a:off x="684360" y="4487400"/>
-            <a:ext cx="8533440" cy="1505880"/>
+            <a:ext cx="8533080" cy="1505520"/>
           </a:xfrm>
           <a:prstGeom prst="rect">
             <a:avLst/>
@@ -5464,7 +5541,7 @@
         <p:spPr>
           <a:xfrm>
             <a:off x="684360" y="685800"/>
-            <a:ext cx="8533440" cy="3614040"/>
+            <a:ext cx="8533080" cy="3613680"/>
           </a:xfrm>
           <a:prstGeom prst="rect">
             <a:avLst/>
@@ -5483,7 +5560,7 @@
         <p:txBody>
           <a:bodyPr lIns="90000" rIns="90000" tIns="45000" bIns="45000" anchor="ctr"/>
           <a:p>
-            <a:pPr marL="285840" indent="-284760">
+            <a:pPr marL="285840" indent="-284400">
               <a:lnSpc>
                 <a:spcPct val="100000"/>
               </a:lnSpc>
@@ -5615,7 +5692,7 @@
             </a:endParaRPr>
           </a:p>
           <a:p>
-            <a:pPr marL="285840" indent="-284760">
+            <a:pPr marL="285840" indent="-284400">
               <a:lnSpc>
                 <a:spcPct val="100000"/>
               </a:lnSpc>
@@ -5661,7 +5738,7 @@
         <p:spPr>
           <a:xfrm>
             <a:off x="4733640" y="3979440"/>
-            <a:ext cx="913320" cy="913320"/>
+            <a:ext cx="912960" cy="912960"/>
           </a:xfrm>
           <a:prstGeom prst="rect">
             <a:avLst/>
@@ -5684,7 +5761,7 @@
         <p:spPr>
           <a:xfrm>
             <a:off x="6825960" y="4030200"/>
-            <a:ext cx="913320" cy="913320"/>
+            <a:ext cx="912960" cy="912960"/>
           </a:xfrm>
           <a:prstGeom prst="rect">
             <a:avLst/>
@@ -5707,7 +5784,7 @@
         <p:spPr>
           <a:xfrm>
             <a:off x="5354640" y="2725920"/>
-            <a:ext cx="913320" cy="913320"/>
+            <a:ext cx="912960" cy="912960"/>
           </a:xfrm>
           <a:prstGeom prst="rect">
             <a:avLst/>
@@ -5730,7 +5807,7 @@
         <p:spPr>
           <a:xfrm>
             <a:off x="8550000" y="3433320"/>
-            <a:ext cx="913320" cy="913320"/>
+            <a:ext cx="912960" cy="912960"/>
           </a:xfrm>
           <a:prstGeom prst="rect">
             <a:avLst/>
@@ -5753,7 +5830,7 @@
         <p:spPr>
           <a:xfrm>
             <a:off x="5153040" y="5079960"/>
-            <a:ext cx="913320" cy="913320"/>
+            <a:ext cx="912960" cy="912960"/>
           </a:xfrm>
           <a:prstGeom prst="rect">
             <a:avLst/>
@@ -5771,8 +5848,8 @@
         </p:nvSpPr>
         <p:spPr>
           <a:xfrm rot="3732600">
-            <a:off x="7993800" y="3764880"/>
-            <a:ext cx="203040" cy="668880"/>
+            <a:off x="7993800" y="3764520"/>
+            <a:ext cx="202680" cy="668520"/>
           </a:xfrm>
           <a:prstGeom prst="downArrow">
             <a:avLst>
@@ -5810,8 +5887,8 @@
         </p:nvSpPr>
         <p:spPr>
           <a:xfrm rot="14618400">
-            <a:off x="6344280" y="4762440"/>
-            <a:ext cx="203040" cy="668880"/>
+            <a:off x="6344280" y="4762800"/>
+            <a:ext cx="202680" cy="668520"/>
           </a:xfrm>
           <a:prstGeom prst="downArrow">
             <a:avLst>
@@ -5849,8 +5926,8 @@
         </p:nvSpPr>
         <p:spPr>
           <a:xfrm rot="5400000">
-            <a:off x="6189840" y="4132800"/>
-            <a:ext cx="203040" cy="668880"/>
+            <a:off x="6190200" y="4132800"/>
+            <a:ext cx="202680" cy="668520"/>
           </a:xfrm>
           <a:prstGeom prst="downArrow">
             <a:avLst>
@@ -5888,8 +5965,8 @@
         </p:nvSpPr>
         <p:spPr>
           <a:xfrm rot="7014000">
-            <a:off x="6423480" y="3552840"/>
-            <a:ext cx="203040" cy="668880"/>
+            <a:off x="6423840" y="3552840"/>
+            <a:ext cx="202680" cy="668520"/>
           </a:xfrm>
           <a:prstGeom prst="downArrow">
             <a:avLst>
@@ -5927,8 +6004,8 @@
         </p:nvSpPr>
         <p:spPr>
           <a:xfrm rot="1747800">
-            <a:off x="5088600" y="3304440"/>
-            <a:ext cx="203040" cy="668880"/>
+            <a:off x="5088600" y="3304080"/>
+            <a:ext cx="202680" cy="668520"/>
           </a:xfrm>
           <a:prstGeom prst="downArrow">
             <a:avLst>
@@ -6016,7 +6093,7 @@
         <p:spPr>
           <a:xfrm>
             <a:off x="6868080" y="306720"/>
-            <a:ext cx="5042880" cy="2084760"/>
+            <a:ext cx="5042520" cy="2084400"/>
           </a:xfrm>
           <a:prstGeom prst="rect">
             <a:avLst/>
@@ -6059,7 +6136,7 @@
         <p:spPr>
           <a:xfrm>
             <a:off x="6271200" y="2669400"/>
-            <a:ext cx="5631840" cy="3007800"/>
+            <a:ext cx="5631480" cy="3007440"/>
           </a:xfrm>
           <a:prstGeom prst="rect">
             <a:avLst/>
@@ -6104,7 +6181,7 @@
         <p:spPr>
           <a:xfrm>
             <a:off x="129960" y="5709960"/>
-            <a:ext cx="11182320" cy="1089000"/>
+            <a:ext cx="11181960" cy="1088640"/>
           </a:xfrm>
           <a:prstGeom prst="rect">
             <a:avLst/>
@@ -6149,7 +6226,7 @@
         <p:spPr>
           <a:xfrm>
             <a:off x="207000" y="1787400"/>
-            <a:ext cx="5593680" cy="3227040"/>
+            <a:ext cx="5593320" cy="3226680"/>
           </a:xfrm>
           <a:prstGeom prst="rect">
             <a:avLst/>
@@ -6194,7 +6271,7 @@
         <p:spPr>
           <a:xfrm>
             <a:off x="684360" y="4487400"/>
-            <a:ext cx="8533440" cy="1505880"/>
+            <a:ext cx="8533080" cy="1505520"/>
           </a:xfrm>
           <a:prstGeom prst="rect">
             <a:avLst/>
@@ -6243,7 +6320,7 @@
         <p:spPr>
           <a:xfrm>
             <a:off x="684360" y="685800"/>
-            <a:ext cx="8533440" cy="3614040"/>
+            <a:ext cx="8533080" cy="3613680"/>
           </a:xfrm>
           <a:prstGeom prst="rect">
             <a:avLst/>
@@ -6262,7 +6339,7 @@
         <p:txBody>
           <a:bodyPr lIns="90000" rIns="90000" tIns="45000" bIns="45000" anchor="ctr"/>
           <a:p>
-            <a:pPr marL="285840" indent="-284760">
+            <a:pPr marL="285840" indent="-284400">
               <a:lnSpc>
                 <a:spcPct val="100000"/>
               </a:lnSpc>
@@ -6314,7 +6391,7 @@
             </a:endParaRPr>
           </a:p>
           <a:p>
-            <a:pPr marL="285840" indent="-284760">
+            <a:pPr marL="285840" indent="-284400">
               <a:lnSpc>
                 <a:spcPct val="100000"/>
               </a:lnSpc>
@@ -6356,7 +6433,7 @@
             </a:endParaRPr>
           </a:p>
           <a:p>
-            <a:pPr marL="285840" indent="-284760">
+            <a:pPr marL="285840" indent="-284400">
               <a:lnSpc>
                 <a:spcPct val="100000"/>
               </a:lnSpc>
@@ -6408,7 +6485,7 @@
             </a:endParaRPr>
           </a:p>
           <a:p>
-            <a:pPr marL="285840" indent="-284760">
+            <a:pPr marL="285840" indent="-284400">
               <a:lnSpc>
                 <a:spcPct val="100000"/>
               </a:lnSpc>
@@ -6576,7 +6653,7 @@
         <p:spPr>
           <a:xfrm>
             <a:off x="4629600" y="1832040"/>
-            <a:ext cx="853560" cy="853560"/>
+            <a:ext cx="853200" cy="853200"/>
           </a:xfrm>
           <a:prstGeom prst="rect">
             <a:avLst/>
@@ -6599,7 +6676,7 @@
         <p:spPr>
           <a:xfrm>
             <a:off x="4463640" y="4185360"/>
-            <a:ext cx="1180080" cy="472320"/>
+            <a:ext cx="1179720" cy="471960"/>
           </a:xfrm>
           <a:prstGeom prst="rect">
             <a:avLst/>
@@ -6622,7 +6699,7 @@
         <p:spPr>
           <a:xfrm>
             <a:off x="4586040" y="2785680"/>
-            <a:ext cx="897120" cy="1039320"/>
+            <a:ext cx="896760" cy="1038960"/>
           </a:xfrm>
           <a:prstGeom prst="rect">
             <a:avLst/>
@@ -6645,7 +6722,7 @@
         <p:spPr>
           <a:xfrm>
             <a:off x="250560" y="1953720"/>
-            <a:ext cx="913320" cy="913320"/>
+            <a:ext cx="912960" cy="912960"/>
           </a:xfrm>
           <a:prstGeom prst="rect">
             <a:avLst/>
@@ -6668,7 +6745,7 @@
         <p:spPr>
           <a:xfrm>
             <a:off x="271440" y="3259800"/>
-            <a:ext cx="913320" cy="913320"/>
+            <a:ext cx="912960" cy="912960"/>
           </a:xfrm>
           <a:prstGeom prst="rect">
             <a:avLst/>
@@ -6691,7 +6768,7 @@
         <p:spPr>
           <a:xfrm>
             <a:off x="2440800" y="2741040"/>
-            <a:ext cx="913320" cy="913320"/>
+            <a:ext cx="912960" cy="912960"/>
           </a:xfrm>
           <a:prstGeom prst="rect">
             <a:avLst/>
@@ -6710,7 +6787,7 @@
         <p:spPr>
           <a:xfrm rot="1192200">
             <a:off x="1579320" y="2561760"/>
-            <a:ext cx="977400" cy="483480"/>
+            <a:ext cx="977040" cy="483120"/>
           </a:xfrm>
           <a:prstGeom prst="rightArrow">
             <a:avLst>
@@ -6751,8 +6828,8 @@
         </p:nvSpPr>
         <p:spPr>
           <a:xfrm rot="20407800">
-            <a:off x="1559160" y="3348720"/>
-            <a:ext cx="977400" cy="483480"/>
+            <a:off x="1559160" y="3348360"/>
+            <a:ext cx="977040" cy="483120"/>
           </a:xfrm>
           <a:prstGeom prst="rightArrow">
             <a:avLst>
@@ -6794,7 +6871,7 @@
         <p:spPr>
           <a:xfrm rot="1192200">
             <a:off x="3332880" y="3670200"/>
-            <a:ext cx="977400" cy="483480"/>
+            <a:ext cx="977040" cy="483120"/>
           </a:xfrm>
           <a:prstGeom prst="rightArrow">
             <a:avLst>
@@ -6835,8 +6912,8 @@
         </p:nvSpPr>
         <p:spPr>
           <a:xfrm rot="20407800">
-            <a:off x="3407400" y="2344320"/>
-            <a:ext cx="977400" cy="483480"/>
+            <a:off x="3407400" y="2343960"/>
+            <a:ext cx="977040" cy="483120"/>
           </a:xfrm>
           <a:prstGeom prst="rightArrow">
             <a:avLst>
@@ -6878,7 +6955,7 @@
         <p:spPr>
           <a:xfrm>
             <a:off x="3483720" y="3004200"/>
-            <a:ext cx="977400" cy="483480"/>
+            <a:ext cx="977040" cy="483120"/>
           </a:xfrm>
           <a:prstGeom prst="rightArrow">
             <a:avLst>
@@ -6924,7 +7001,7 @@
         <p:spPr>
           <a:xfrm>
             <a:off x="5819760" y="5709960"/>
-            <a:ext cx="913320" cy="913320"/>
+            <a:ext cx="912960" cy="912960"/>
           </a:xfrm>
           <a:prstGeom prst="rect">
             <a:avLst/>
@@ -6947,7 +7024,7 @@
         <p:spPr>
           <a:xfrm>
             <a:off x="2060640" y="5759640"/>
-            <a:ext cx="913320" cy="913320"/>
+            <a:ext cx="912960" cy="912960"/>
           </a:xfrm>
           <a:prstGeom prst="rect">
             <a:avLst/>
@@ -6970,7 +7047,7 @@
         <p:spPr>
           <a:xfrm>
             <a:off x="9383040" y="5709960"/>
-            <a:ext cx="913320" cy="913320"/>
+            <a:ext cx="912960" cy="912960"/>
           </a:xfrm>
           <a:prstGeom prst="rect">
             <a:avLst/>
@@ -6993,7 +7070,7 @@
         <p:spPr>
           <a:xfrm>
             <a:off x="7495920" y="5709960"/>
-            <a:ext cx="913320" cy="913320"/>
+            <a:ext cx="912960" cy="912960"/>
           </a:xfrm>
           <a:prstGeom prst="rect">
             <a:avLst/>
@@ -7016,7 +7093,7 @@
         <p:spPr>
           <a:xfrm>
             <a:off x="4004640" y="5709960"/>
-            <a:ext cx="913320" cy="913320"/>
+            <a:ext cx="912960" cy="912960"/>
           </a:xfrm>
           <a:prstGeom prst="rect">
             <a:avLst/>
@@ -7039,7 +7116,7 @@
         <p:spPr>
           <a:xfrm>
             <a:off x="276120" y="5759640"/>
-            <a:ext cx="913320" cy="913320"/>
+            <a:ext cx="912960" cy="912960"/>
           </a:xfrm>
           <a:prstGeom prst="rect">
             <a:avLst/>
@@ -7058,7 +7135,7 @@
         <p:spPr>
           <a:xfrm>
             <a:off x="1230120" y="6098760"/>
-            <a:ext cx="681840" cy="261000"/>
+            <a:ext cx="681480" cy="260640"/>
           </a:xfrm>
           <a:prstGeom prst="rightArrow">
             <a:avLst>
@@ -7097,7 +7174,7 @@
         <p:spPr>
           <a:xfrm>
             <a:off x="3103920" y="6117480"/>
-            <a:ext cx="681840" cy="261000"/>
+            <a:ext cx="681480" cy="260640"/>
           </a:xfrm>
           <a:prstGeom prst="rightArrow">
             <a:avLst>
@@ -7136,7 +7213,7 @@
         <p:spPr>
           <a:xfrm>
             <a:off x="4958640" y="6109200"/>
-            <a:ext cx="681840" cy="261000"/>
+            <a:ext cx="681480" cy="260640"/>
           </a:xfrm>
           <a:prstGeom prst="rightArrow">
             <a:avLst>
@@ -7175,7 +7252,7 @@
         <p:spPr>
           <a:xfrm>
             <a:off x="6754320" y="6098760"/>
-            <a:ext cx="681840" cy="261000"/>
+            <a:ext cx="681480" cy="260640"/>
           </a:xfrm>
           <a:prstGeom prst="rightArrow">
             <a:avLst>
@@ -7214,7 +7291,7 @@
         <p:spPr>
           <a:xfrm>
             <a:off x="8468280" y="6085800"/>
-            <a:ext cx="681840" cy="261000"/>
+            <a:ext cx="681480" cy="260640"/>
           </a:xfrm>
           <a:prstGeom prst="rightArrow">
             <a:avLst>
@@ -7257,7 +7334,7 @@
         <p:spPr>
           <a:xfrm>
             <a:off x="6582600" y="3915000"/>
-            <a:ext cx="913320" cy="913320"/>
+            <a:ext cx="912960" cy="912960"/>
           </a:xfrm>
           <a:prstGeom prst="rect">
             <a:avLst/>
@@ -7280,7 +7357,7 @@
         <p:spPr>
           <a:xfrm>
             <a:off x="8674920" y="3965760"/>
-            <a:ext cx="913320" cy="913320"/>
+            <a:ext cx="912960" cy="912960"/>
           </a:xfrm>
           <a:prstGeom prst="rect">
             <a:avLst/>
@@ -7303,7 +7380,7 @@
         <p:spPr>
           <a:xfrm>
             <a:off x="7203600" y="2661480"/>
-            <a:ext cx="913320" cy="913320"/>
+            <a:ext cx="912960" cy="912960"/>
           </a:xfrm>
           <a:prstGeom prst="rect">
             <a:avLst/>
@@ -7326,7 +7403,7 @@
         <p:spPr>
           <a:xfrm>
             <a:off x="10398960" y="3368880"/>
-            <a:ext cx="913320" cy="913320"/>
+            <a:ext cx="912960" cy="912960"/>
           </a:xfrm>
           <a:prstGeom prst="rect">
             <a:avLst/>
@@ -7349,7 +7426,7 @@
         <p:spPr>
           <a:xfrm>
             <a:off x="7002000" y="5015520"/>
-            <a:ext cx="913320" cy="913320"/>
+            <a:ext cx="912960" cy="912960"/>
           </a:xfrm>
           <a:prstGeom prst="rect">
             <a:avLst/>
@@ -7367,8 +7444,8 @@
         </p:nvSpPr>
         <p:spPr>
           <a:xfrm rot="3732600">
-            <a:off x="9843120" y="3700800"/>
-            <a:ext cx="203040" cy="668880"/>
+            <a:off x="9843120" y="3700440"/>
+            <a:ext cx="202680" cy="668520"/>
           </a:xfrm>
           <a:prstGeom prst="downArrow">
             <a:avLst>
@@ -7406,8 +7483,8 @@
         </p:nvSpPr>
         <p:spPr>
           <a:xfrm rot="14618400">
-            <a:off x="8193240" y="4698360"/>
-            <a:ext cx="203040" cy="668880"/>
+            <a:off x="8193240" y="4698720"/>
+            <a:ext cx="202680" cy="668520"/>
           </a:xfrm>
           <a:prstGeom prst="downArrow">
             <a:avLst>
@@ -7445,8 +7522,8 @@
         </p:nvSpPr>
         <p:spPr>
           <a:xfrm rot="5400000">
-            <a:off x="8038800" y="4068360"/>
-            <a:ext cx="203040" cy="668880"/>
+            <a:off x="8039160" y="4068360"/>
+            <a:ext cx="202680" cy="668520"/>
           </a:xfrm>
           <a:prstGeom prst="downArrow">
             <a:avLst>
@@ -7484,8 +7561,8 @@
         </p:nvSpPr>
         <p:spPr>
           <a:xfrm rot="7014000">
-            <a:off x="8272800" y="3488400"/>
-            <a:ext cx="203040" cy="668880"/>
+            <a:off x="8273160" y="3488400"/>
+            <a:ext cx="202680" cy="668520"/>
           </a:xfrm>
           <a:prstGeom prst="downArrow">
             <a:avLst>
@@ -7523,8 +7600,8 @@
         </p:nvSpPr>
         <p:spPr>
           <a:xfrm rot="1747800">
-            <a:off x="7095600" y="3426480"/>
-            <a:ext cx="203040" cy="668880"/>
+            <a:off x="7095600" y="3426120"/>
+            <a:ext cx="202680" cy="668520"/>
           </a:xfrm>
           <a:prstGeom prst="downArrow">
             <a:avLst>
@@ -7567,7 +7644,7 @@
         <p:spPr>
           <a:xfrm>
             <a:off x="8641080" y="309600"/>
-            <a:ext cx="913320" cy="913320"/>
+            <a:ext cx="912960" cy="912960"/>
           </a:xfrm>
           <a:prstGeom prst="rect">
             <a:avLst/>
@@ -7590,7 +7667,7 @@
         <p:spPr>
           <a:xfrm>
             <a:off x="10568880" y="1497240"/>
-            <a:ext cx="913320" cy="913320"/>
+            <a:ext cx="912960" cy="912960"/>
           </a:xfrm>
           <a:prstGeom prst="rect">
             <a:avLst/>
@@ -7613,7 +7690,7 @@
         <p:spPr>
           <a:xfrm>
             <a:off x="6932880" y="1497240"/>
-            <a:ext cx="913320" cy="913320"/>
+            <a:ext cx="912960" cy="912960"/>
           </a:xfrm>
           <a:prstGeom prst="rect">
             <a:avLst/>
@@ -7632,7 +7709,7 @@
         <p:spPr>
           <a:xfrm>
             <a:off x="8173800" y="1774080"/>
-            <a:ext cx="2067480" cy="359640"/>
+            <a:ext cx="2067120" cy="359280"/>
           </a:xfrm>
           <a:prstGeom prst="rightArrow">
             <a:avLst>
@@ -7671,7 +7748,7 @@
         <p:spPr>
           <a:xfrm>
             <a:off x="8947440" y="1361160"/>
-            <a:ext cx="300600" cy="406080"/>
+            <a:ext cx="300240" cy="405720"/>
           </a:xfrm>
           <a:prstGeom prst="downArrow">
             <a:avLst>
@@ -7759,7 +7836,7 @@
         <p:spPr>
           <a:xfrm>
             <a:off x="0" y="0"/>
-            <a:ext cx="12191040" cy="6856920"/>
+            <a:ext cx="12190680" cy="6856560"/>
           </a:xfrm>
           <a:prstGeom prst="rect">
             <a:avLst/>
@@ -7812,7 +7889,7 @@
         <p:spPr>
           <a:xfrm>
             <a:off x="640440" y="685800"/>
-            <a:ext cx="4817520" cy="4602600"/>
+            <a:ext cx="4817160" cy="4602240"/>
           </a:xfrm>
           <a:prstGeom prst="rect">
             <a:avLst/>
@@ -7863,7 +7940,7 @@
         <p:spPr>
           <a:xfrm>
             <a:off x="6095880" y="0"/>
-            <a:ext cx="6094800" cy="6856920"/>
+            <a:ext cx="6094440" cy="6856560"/>
           </a:xfrm>
           <a:prstGeom prst="rect">
             <a:avLst/>
@@ -7901,7 +7978,7 @@
         <p:spPr>
           <a:xfrm>
             <a:off x="6625800" y="685800"/>
-            <a:ext cx="4878000" cy="4602600"/>
+            <a:ext cx="4877640" cy="4602240"/>
           </a:xfrm>
           <a:prstGeom prst="rect">
             <a:avLst/>
@@ -7922,7 +7999,7 @@
             <a:normAutofit/>
           </a:bodyPr>
           <a:p>
-            <a:pPr marL="285840" indent="-284760">
+            <a:pPr marL="285840" indent="-284400">
               <a:lnSpc>
                 <a:spcPct val="100000"/>
               </a:lnSpc>
@@ -7954,7 +8031,7 @@
             </a:endParaRPr>
           </a:p>
           <a:p>
-            <a:pPr marL="285840" indent="-284760">
+            <a:pPr marL="285840" indent="-284400">
               <a:lnSpc>
                 <a:spcPct val="100000"/>
               </a:lnSpc>
@@ -7986,7 +8063,7 @@
             </a:endParaRPr>
           </a:p>
           <a:p>
-            <a:pPr marL="285840" indent="-284760">
+            <a:pPr marL="285840" indent="-284400">
               <a:lnSpc>
                 <a:spcPct val="100000"/>
               </a:lnSpc>
@@ -8018,7 +8095,7 @@
             </a:endParaRPr>
           </a:p>
           <a:p>
-            <a:pPr marL="285840" indent="-284760">
+            <a:pPr marL="285840" indent="-284400">
               <a:lnSpc>
                 <a:spcPct val="100000"/>
               </a:lnSpc>
@@ -8050,7 +8127,7 @@
             </a:endParaRPr>
           </a:p>
           <a:p>
-            <a:pPr marL="285840" indent="-284760">
+            <a:pPr marL="285840" indent="-284400">
               <a:lnSpc>
                 <a:spcPct val="100000"/>
               </a:lnSpc>
@@ -8114,7 +8191,7 @@
         <p:spPr>
           <a:xfrm>
             <a:off x="684360" y="4487400"/>
-            <a:ext cx="8533440" cy="1505880"/>
+            <a:ext cx="8533080" cy="1505520"/>
           </a:xfrm>
           <a:prstGeom prst="rect">
             <a:avLst/>
@@ -8163,7 +8240,7 @@
         <p:spPr>
           <a:xfrm>
             <a:off x="684360" y="685800"/>
-            <a:ext cx="8533440" cy="3614040"/>
+            <a:ext cx="8533080" cy="3613680"/>
           </a:xfrm>
           <a:prstGeom prst="rect">
             <a:avLst/>
@@ -8182,7 +8259,7 @@
         <p:txBody>
           <a:bodyPr lIns="90000" rIns="90000" tIns="45000" bIns="45000" anchor="ctr"/>
           <a:p>
-            <a:pPr marL="285840" indent="-284760">
+            <a:pPr marL="285840" indent="-284400">
               <a:lnSpc>
                 <a:spcPct val="100000"/>
               </a:lnSpc>
@@ -8214,7 +8291,7 @@
             </a:endParaRPr>
           </a:p>
           <a:p>
-            <a:pPr marL="285840" indent="-284760">
+            <a:pPr marL="285840" indent="-284400">
               <a:lnSpc>
                 <a:spcPct val="100000"/>
               </a:lnSpc>
@@ -8324,7 +8401,7 @@
         <p:spPr>
           <a:xfrm>
             <a:off x="6995520" y="1949760"/>
-            <a:ext cx="853560" cy="853560"/>
+            <a:ext cx="853200" cy="853200"/>
           </a:xfrm>
           <a:prstGeom prst="rect">
             <a:avLst/>
@@ -8347,7 +8424,7 @@
         <p:spPr>
           <a:xfrm>
             <a:off x="6829560" y="4303080"/>
-            <a:ext cx="1180080" cy="472320"/>
+            <a:ext cx="1179720" cy="471960"/>
           </a:xfrm>
           <a:prstGeom prst="rect">
             <a:avLst/>
@@ -8370,7 +8447,7 @@
         <p:spPr>
           <a:xfrm>
             <a:off x="6951960" y="2903040"/>
-            <a:ext cx="897120" cy="1039320"/>
+            <a:ext cx="896760" cy="1038960"/>
           </a:xfrm>
           <a:prstGeom prst="rect">
             <a:avLst/>
@@ -8393,7 +8470,7 @@
         <p:spPr>
           <a:xfrm>
             <a:off x="2616120" y="2071080"/>
-            <a:ext cx="913320" cy="913320"/>
+            <a:ext cx="912960" cy="912960"/>
           </a:xfrm>
           <a:prstGeom prst="rect">
             <a:avLst/>
@@ -8416,7 +8493,7 @@
         <p:spPr>
           <a:xfrm>
             <a:off x="2637000" y="3377160"/>
-            <a:ext cx="913320" cy="913320"/>
+            <a:ext cx="912960" cy="912960"/>
           </a:xfrm>
           <a:prstGeom prst="rect">
             <a:avLst/>
@@ -8435,7 +8512,7 @@
         <p:spPr>
           <a:xfrm rot="1192200">
             <a:off x="3944880" y="2679120"/>
-            <a:ext cx="977400" cy="483480"/>
+            <a:ext cx="977040" cy="483120"/>
           </a:xfrm>
           <a:prstGeom prst="rightArrow">
             <a:avLst>
@@ -8476,8 +8553,8 @@
         </p:nvSpPr>
         <p:spPr>
           <a:xfrm rot="20407800">
-            <a:off x="3924720" y="3466080"/>
-            <a:ext cx="977400" cy="483480"/>
+            <a:off x="3924720" y="3465720"/>
+            <a:ext cx="977040" cy="483120"/>
           </a:xfrm>
           <a:prstGeom prst="rightArrow">
             <a:avLst>
@@ -8519,7 +8596,7 @@
         <p:spPr>
           <a:xfrm rot="1192200">
             <a:off x="5698800" y="3787560"/>
-            <a:ext cx="977400" cy="483480"/>
+            <a:ext cx="977040" cy="483120"/>
           </a:xfrm>
           <a:prstGeom prst="rightArrow">
             <a:avLst>
@@ -8560,8 +8637,8 @@
         </p:nvSpPr>
         <p:spPr>
           <a:xfrm rot="20407800">
-            <a:off x="5772960" y="2461680"/>
-            <a:ext cx="977400" cy="483480"/>
+            <a:off x="5772960" y="2461320"/>
+            <a:ext cx="977040" cy="483120"/>
           </a:xfrm>
           <a:prstGeom prst="rightArrow">
             <a:avLst>
@@ -8603,7 +8680,7 @@
         <p:spPr>
           <a:xfrm>
             <a:off x="5849640" y="3121560"/>
-            <a:ext cx="977400" cy="483480"/>
+            <a:ext cx="977040" cy="483120"/>
           </a:xfrm>
           <a:prstGeom prst="rightArrow">
             <a:avLst>
@@ -8649,7 +8726,7 @@
         <p:spPr>
           <a:xfrm>
             <a:off x="4950720" y="2998800"/>
-            <a:ext cx="755640" cy="755640"/>
+            <a:ext cx="755280" cy="755280"/>
           </a:xfrm>
           <a:prstGeom prst="rect">
             <a:avLst/>
@@ -8690,7 +8767,7 @@
         <p:spPr>
           <a:xfrm>
             <a:off x="684360" y="4487400"/>
-            <a:ext cx="8533440" cy="1505880"/>
+            <a:ext cx="8533080" cy="1505520"/>
           </a:xfrm>
           <a:prstGeom prst="rect">
             <a:avLst/>
@@ -8739,7 +8816,7 @@
         <p:spPr>
           <a:xfrm>
             <a:off x="684360" y="685800"/>
-            <a:ext cx="8533440" cy="3614040"/>
+            <a:ext cx="8533080" cy="3613680"/>
           </a:xfrm>
           <a:prstGeom prst="rect">
             <a:avLst/>
@@ -8758,7 +8835,7 @@
         <p:txBody>
           <a:bodyPr lIns="90000" rIns="90000" tIns="45000" bIns="45000" anchor="ctr"/>
           <a:p>
-            <a:pPr marL="285840" indent="-284760">
+            <a:pPr marL="285840" indent="-284400">
               <a:lnSpc>
                 <a:spcPct val="100000"/>
               </a:lnSpc>
@@ -8884,7 +8961,7 @@
             </a:endParaRPr>
           </a:p>
           <a:p>
-            <a:pPr marL="285840" indent="-284760">
+            <a:pPr marL="285840" indent="-284400">
               <a:lnSpc>
                 <a:spcPct val="100000"/>
               </a:lnSpc>
@@ -8976,7 +9053,7 @@
         <p:spPr>
           <a:xfrm>
             <a:off x="3562560" y="1395720"/>
-            <a:ext cx="913320" cy="913320"/>
+            <a:ext cx="912960" cy="912960"/>
           </a:xfrm>
           <a:prstGeom prst="rect">
             <a:avLst/>
@@ -8999,7 +9076,7 @@
         <p:spPr>
           <a:xfrm>
             <a:off x="6678360" y="1395720"/>
-            <a:ext cx="913320" cy="913320"/>
+            <a:ext cx="912960" cy="912960"/>
           </a:xfrm>
           <a:prstGeom prst="rect">
             <a:avLst/>
@@ -9022,7 +9099,7 @@
         <p:spPr>
           <a:xfrm>
             <a:off x="7042320" y="3904200"/>
-            <a:ext cx="913320" cy="913320"/>
+            <a:ext cx="912960" cy="912960"/>
           </a:xfrm>
           <a:prstGeom prst="rect">
             <a:avLst/>
@@ -9045,7 +9122,7 @@
         <p:spPr>
           <a:xfrm>
             <a:off x="3562560" y="3904200"/>
-            <a:ext cx="913320" cy="913320"/>
+            <a:ext cx="912960" cy="912960"/>
           </a:xfrm>
           <a:prstGeom prst="rect">
             <a:avLst/>
@@ -9068,7 +9145,7 @@
         <p:spPr>
           <a:xfrm>
             <a:off x="6678360" y="1395720"/>
-            <a:ext cx="913320" cy="913320"/>
+            <a:ext cx="912960" cy="912960"/>
           </a:xfrm>
           <a:prstGeom prst="rect">
             <a:avLst/>
@@ -9091,7 +9168,7 @@
         <p:spPr>
           <a:xfrm>
             <a:off x="4113000" y="2039400"/>
-            <a:ext cx="913320" cy="913320"/>
+            <a:ext cx="912960" cy="912960"/>
           </a:xfrm>
           <a:prstGeom prst="rect">
             <a:avLst/>
@@ -9114,7 +9191,7 @@
         <p:spPr>
           <a:xfrm>
             <a:off x="7296480" y="2133000"/>
-            <a:ext cx="913320" cy="913320"/>
+            <a:ext cx="912960" cy="912960"/>
           </a:xfrm>
           <a:prstGeom prst="rect">
             <a:avLst/>
@@ -9133,7 +9210,7 @@
         <p:spPr>
           <a:xfrm>
             <a:off x="5285160" y="1920960"/>
-            <a:ext cx="1181880" cy="544320"/>
+            <a:ext cx="1181520" cy="543960"/>
           </a:xfrm>
           <a:prstGeom prst="rightArrow">
             <a:avLst>
@@ -9175,7 +9252,7 @@
         <p:spPr>
           <a:xfrm>
             <a:off x="5149440" y="4088880"/>
-            <a:ext cx="1181880" cy="544320"/>
+            <a:ext cx="1181520" cy="543960"/>
           </a:xfrm>
           <a:prstGeom prst="rightArrow">
             <a:avLst>
@@ -9240,7 +9317,7 @@
         <p:spPr>
           <a:xfrm>
             <a:off x="4895280" y="2388600"/>
-            <a:ext cx="2706840" cy="363960"/>
+            <a:ext cx="2706480" cy="363600"/>
           </a:xfrm>
           <a:prstGeom prst="rect">
             <a:avLst/>
@@ -9289,7 +9366,7 @@
         <p:spPr>
           <a:xfrm>
             <a:off x="5027400" y="4575240"/>
-            <a:ext cx="2326680" cy="363960"/>
+            <a:ext cx="2326320" cy="363600"/>
           </a:xfrm>
           <a:prstGeom prst="rect">
             <a:avLst/>
@@ -9360,7 +9437,7 @@
         <p:spPr>
           <a:xfrm>
             <a:off x="684360" y="4487400"/>
-            <a:ext cx="8533440" cy="1505880"/>
+            <a:ext cx="8533080" cy="1505520"/>
           </a:xfrm>
           <a:prstGeom prst="rect">
             <a:avLst/>
@@ -9409,7 +9486,7 @@
         <p:spPr>
           <a:xfrm>
             <a:off x="684360" y="685800"/>
-            <a:ext cx="8533440" cy="3614040"/>
+            <a:ext cx="8533080" cy="3613680"/>
           </a:xfrm>
           <a:prstGeom prst="rect">
             <a:avLst/>
@@ -9428,7 +9505,7 @@
         <p:txBody>
           <a:bodyPr lIns="90000" rIns="90000" tIns="45000" bIns="45000" anchor="ctr"/>
           <a:p>
-            <a:pPr marL="285840" indent="-284760">
+            <a:pPr marL="285840" indent="-284400">
               <a:lnSpc>
                 <a:spcPct val="100000"/>
               </a:lnSpc>
@@ -9550,7 +9627,7 @@
         <p:spPr>
           <a:xfrm>
             <a:off x="1863000" y="3157920"/>
-            <a:ext cx="913320" cy="913320"/>
+            <a:ext cx="912960" cy="912960"/>
           </a:xfrm>
           <a:prstGeom prst="rect">
             <a:avLst/>
@@ -9573,7 +9650,7 @@
         <p:spPr>
           <a:xfrm>
             <a:off x="2413440" y="3801600"/>
-            <a:ext cx="913320" cy="913320"/>
+            <a:ext cx="912960" cy="912960"/>
           </a:xfrm>
           <a:prstGeom prst="rect">
             <a:avLst/>
@@ -9596,7 +9673,7 @@
         <p:spPr>
           <a:xfrm>
             <a:off x="7197480" y="3439800"/>
-            <a:ext cx="913320" cy="913320"/>
+            <a:ext cx="912960" cy="912960"/>
           </a:xfrm>
           <a:prstGeom prst="rect">
             <a:avLst/>
@@ -9619,7 +9696,7 @@
         <p:spPr>
           <a:xfrm>
             <a:off x="4758840" y="3366360"/>
-            <a:ext cx="913320" cy="913320"/>
+            <a:ext cx="912960" cy="912960"/>
           </a:xfrm>
           <a:prstGeom prst="rect">
             <a:avLst/>
@@ -9638,7 +9715,7 @@
         <p:spPr>
           <a:xfrm>
             <a:off x="3568680" y="3429000"/>
-            <a:ext cx="936360" cy="913320"/>
+            <a:ext cx="936000" cy="912960"/>
           </a:xfrm>
           <a:prstGeom prst="mathPlus">
             <a:avLst>
@@ -9676,7 +9753,7 @@
         <p:spPr>
           <a:xfrm>
             <a:off x="6095880" y="3654360"/>
-            <a:ext cx="737280" cy="565200"/>
+            <a:ext cx="736920" cy="564840"/>
           </a:xfrm>
           <a:prstGeom prst="mathEqual">
             <a:avLst>
@@ -9737,7 +9814,7 @@
         <p:spPr>
           <a:xfrm>
             <a:off x="4750920" y="2898360"/>
-            <a:ext cx="2688840" cy="3718800"/>
+            <a:ext cx="2688480" cy="3718440"/>
           </a:xfrm>
           <a:prstGeom prst="rect">
             <a:avLst/>
@@ -9780,7 +9857,7 @@
         <p:spPr>
           <a:xfrm>
             <a:off x="684360" y="4487400"/>
-            <a:ext cx="8533440" cy="1505880"/>
+            <a:ext cx="8533080" cy="1505520"/>
           </a:xfrm>
           <a:prstGeom prst="rect">
             <a:avLst/>
@@ -9829,7 +9906,7 @@
         <p:spPr>
           <a:xfrm>
             <a:off x="684360" y="685800"/>
-            <a:ext cx="8533440" cy="3614040"/>
+            <a:ext cx="8533080" cy="3613680"/>
           </a:xfrm>
           <a:prstGeom prst="rect">
             <a:avLst/>
@@ -9848,7 +9925,7 @@
         <p:txBody>
           <a:bodyPr lIns="90000" rIns="90000" tIns="45000" bIns="45000" anchor="ctr"/>
           <a:p>
-            <a:pPr marL="285840" indent="-284760">
+            <a:pPr marL="285840" indent="-284400">
               <a:lnSpc>
                 <a:spcPct val="100000"/>
               </a:lnSpc>
@@ -9984,7 +10061,7 @@
         <p:spPr>
           <a:xfrm>
             <a:off x="4843440" y="2989800"/>
-            <a:ext cx="640800" cy="640800"/>
+            <a:ext cx="640440" cy="640440"/>
           </a:xfrm>
           <a:prstGeom prst="rect">
             <a:avLst/>
@@ -10007,7 +10084,7 @@
         <p:spPr>
           <a:xfrm>
             <a:off x="5028120" y="4248360"/>
-            <a:ext cx="913320" cy="913320"/>
+            <a:ext cx="912960" cy="912960"/>
           </a:xfrm>
           <a:prstGeom prst="rect">
             <a:avLst/>
@@ -10030,7 +10107,7 @@
         <p:spPr>
           <a:xfrm>
             <a:off x="5506200" y="5025240"/>
-            <a:ext cx="913320" cy="913320"/>
+            <a:ext cx="912960" cy="912960"/>
           </a:xfrm>
           <a:prstGeom prst="rect">
             <a:avLst/>
@@ -10053,7 +10130,7 @@
         <p:spPr>
           <a:xfrm>
             <a:off x="6042600" y="4248360"/>
-            <a:ext cx="913320" cy="913320"/>
+            <a:ext cx="912960" cy="912960"/>
           </a:xfrm>
           <a:prstGeom prst="rect">
             <a:avLst/>
@@ -10076,7 +10153,7 @@
         <p:spPr>
           <a:xfrm>
             <a:off x="7944480" y="2602440"/>
-            <a:ext cx="913320" cy="913320"/>
+            <a:ext cx="912960" cy="912960"/>
           </a:xfrm>
           <a:prstGeom prst="rect">
             <a:avLst/>
@@ -10099,7 +10176,7 @@
         <p:spPr>
           <a:xfrm>
             <a:off x="6671160" y="3059640"/>
-            <a:ext cx="570600" cy="570600"/>
+            <a:ext cx="570240" cy="570240"/>
           </a:xfrm>
           <a:prstGeom prst="rect">
             <a:avLst/>
@@ -10122,7 +10199,7 @@
         <p:spPr>
           <a:xfrm>
             <a:off x="2973240" y="3863520"/>
-            <a:ext cx="913320" cy="913320"/>
+            <a:ext cx="912960" cy="912960"/>
           </a:xfrm>
           <a:prstGeom prst="rect">
             <a:avLst/>
@@ -10141,7 +10218,7 @@
         <p:spPr>
           <a:xfrm>
             <a:off x="4012560" y="4487400"/>
-            <a:ext cx="1492560" cy="856080"/>
+            <a:ext cx="1492200" cy="855720"/>
           </a:xfrm>
           <a:custGeom>
             <a:avLst/>
@@ -10193,7 +10270,7 @@
         <p:spPr>
           <a:xfrm>
             <a:off x="4012560" y="4248360"/>
-            <a:ext cx="2028960" cy="237960"/>
+            <a:ext cx="2028600" cy="237600"/>
           </a:xfrm>
           <a:custGeom>
             <a:avLst/>
@@ -10245,7 +10322,7 @@
         <p:spPr>
           <a:xfrm>
             <a:off x="4012560" y="4367880"/>
-            <a:ext cx="937800" cy="238680"/>
+            <a:ext cx="937440" cy="238320"/>
           </a:xfrm>
           <a:custGeom>
             <a:avLst/>
@@ -10297,7 +10374,7 @@
         <p:spPr>
           <a:xfrm flipV="1">
             <a:off x="7242840" y="3221280"/>
-            <a:ext cx="628560" cy="122040"/>
+            <a:ext cx="628200" cy="121680"/>
           </a:xfrm>
           <a:custGeom>
             <a:avLst/>
@@ -10372,7 +10449,7 @@
         <p:spPr>
           <a:xfrm>
             <a:off x="684360" y="4487400"/>
-            <a:ext cx="8533440" cy="1505880"/>
+            <a:ext cx="8533080" cy="1505520"/>
           </a:xfrm>
           <a:prstGeom prst="rect">
             <a:avLst/>
@@ -10421,7 +10498,7 @@
         <p:spPr>
           <a:xfrm>
             <a:off x="684360" y="685800"/>
-            <a:ext cx="8533440" cy="3614040"/>
+            <a:ext cx="8533080" cy="3613680"/>
           </a:xfrm>
           <a:prstGeom prst="rect">
             <a:avLst/>
@@ -10440,7 +10517,7 @@
         <p:txBody>
           <a:bodyPr lIns="90000" rIns="90000" tIns="45000" bIns="45000" anchor="ctr"/>
           <a:p>
-            <a:pPr marL="285840" indent="-284760">
+            <a:pPr marL="285840" indent="-284400">
               <a:lnSpc>
                 <a:spcPct val="100000"/>
               </a:lnSpc>
@@ -10608,7 +10685,7 @@
         <p:spPr>
           <a:xfrm>
             <a:off x="5430600" y="2730600"/>
-            <a:ext cx="2688840" cy="3718800"/>
+            <a:ext cx="2688480" cy="3718440"/>
           </a:xfrm>
           <a:prstGeom prst="rect">
             <a:avLst/>
@@ -10655,7 +10732,7 @@
         <p:spPr>
           <a:xfrm>
             <a:off x="5523120" y="2822040"/>
-            <a:ext cx="640800" cy="640800"/>
+            <a:ext cx="640440" cy="640440"/>
           </a:xfrm>
           <a:prstGeom prst="rect">
             <a:avLst/>
@@ -10678,7 +10755,7 @@
         <p:spPr>
           <a:xfrm>
             <a:off x="5707800" y="4080600"/>
-            <a:ext cx="913320" cy="913320"/>
+            <a:ext cx="912960" cy="912960"/>
           </a:xfrm>
           <a:prstGeom prst="rect">
             <a:avLst/>
@@ -10701,7 +10778,7 @@
         <p:spPr>
           <a:xfrm>
             <a:off x="6185880" y="4857480"/>
-            <a:ext cx="913320" cy="913320"/>
+            <a:ext cx="912960" cy="912960"/>
           </a:xfrm>
           <a:prstGeom prst="rect">
             <a:avLst/>
@@ -10724,7 +10801,7 @@
         <p:spPr>
           <a:xfrm>
             <a:off x="6722280" y="4080600"/>
-            <a:ext cx="913320" cy="913320"/>
+            <a:ext cx="912960" cy="912960"/>
           </a:xfrm>
           <a:prstGeom prst="rect">
             <a:avLst/>
@@ -10747,7 +10824,7 @@
         <p:spPr>
           <a:xfrm>
             <a:off x="3652920" y="3695760"/>
-            <a:ext cx="913320" cy="913320"/>
+            <a:ext cx="912960" cy="912960"/>
           </a:xfrm>
           <a:prstGeom prst="rect">
             <a:avLst/>
@@ -10766,7 +10843,7 @@
         <p:spPr>
           <a:xfrm>
             <a:off x="4692240" y="4319640"/>
-            <a:ext cx="1492560" cy="856080"/>
+            <a:ext cx="1492200" cy="855720"/>
           </a:xfrm>
           <a:custGeom>
             <a:avLst/>
@@ -10818,7 +10895,7 @@
         <p:spPr>
           <a:xfrm>
             <a:off x="4692240" y="4080600"/>
-            <a:ext cx="2028960" cy="237960"/>
+            <a:ext cx="2028600" cy="237600"/>
           </a:xfrm>
           <a:custGeom>
             <a:avLst/>
@@ -10870,7 +10947,7 @@
         <p:spPr>
           <a:xfrm>
             <a:off x="4692240" y="4200120"/>
-            <a:ext cx="937800" cy="238680"/>
+            <a:ext cx="937440" cy="238320"/>
           </a:xfrm>
           <a:custGeom>
             <a:avLst/>
@@ -10926,7 +11003,7 @@
         <p:spPr>
           <a:xfrm>
             <a:off x="9653760" y="3605400"/>
-            <a:ext cx="913320" cy="913320"/>
+            <a:ext cx="912960" cy="912960"/>
           </a:xfrm>
           <a:prstGeom prst="rect">
             <a:avLst/>
@@ -10944,8 +11021,8 @@
         </p:nvSpPr>
         <p:spPr>
           <a:xfrm rot="10325400">
-            <a:off x="7855200" y="4106160"/>
-            <a:ext cx="1784880" cy="306720"/>
+            <a:off x="7855560" y="4106520"/>
+            <a:ext cx="1784520" cy="306360"/>
           </a:xfrm>
           <a:prstGeom prst="rightArrow">
             <a:avLst>
@@ -11009,7 +11086,7 @@
         <p:spPr>
           <a:xfrm>
             <a:off x="684360" y="4487400"/>
-            <a:ext cx="8533440" cy="1505880"/>
+            <a:ext cx="8533080" cy="1505520"/>
           </a:xfrm>
           <a:prstGeom prst="rect">
             <a:avLst/>
@@ -11058,7 +11135,7 @@
         <p:spPr>
           <a:xfrm>
             <a:off x="684360" y="685800"/>
-            <a:ext cx="8533440" cy="3614040"/>
+            <a:ext cx="8533080" cy="3613680"/>
           </a:xfrm>
           <a:prstGeom prst="rect">
             <a:avLst/>
@@ -11088,7 +11165,7 @@
         <p:spPr>
           <a:xfrm>
             <a:off x="4069440" y="82800"/>
-            <a:ext cx="4045320" cy="2845800"/>
+            <a:ext cx="4044960" cy="2845440"/>
           </a:xfrm>
           <a:prstGeom prst="rect">
             <a:avLst/>
@@ -11111,7 +11188,7 @@
         <p:spPr>
           <a:xfrm>
             <a:off x="83880" y="3103560"/>
-            <a:ext cx="3866400" cy="1643400"/>
+            <a:ext cx="3866040" cy="1643040"/>
           </a:xfrm>
           <a:prstGeom prst="rect">
             <a:avLst/>
@@ -11134,7 +11211,7 @@
         <p:spPr>
           <a:xfrm>
             <a:off x="4161600" y="3103560"/>
-            <a:ext cx="3866400" cy="1643400"/>
+            <a:ext cx="3866040" cy="1643040"/>
           </a:xfrm>
           <a:prstGeom prst="rect">
             <a:avLst/>
@@ -11157,7 +11234,7 @@
         <p:spPr>
           <a:xfrm>
             <a:off x="8230320" y="3103560"/>
-            <a:ext cx="3866400" cy="1643400"/>
+            <a:ext cx="3866040" cy="1643040"/>
           </a:xfrm>
           <a:prstGeom prst="rect">
             <a:avLst/>
@@ -11176,7 +11253,7 @@
         <p:spPr>
           <a:xfrm>
             <a:off x="3993840" y="3766680"/>
-            <a:ext cx="150120" cy="318240"/>
+            <a:ext cx="149760" cy="317880"/>
           </a:xfrm>
           <a:prstGeom prst="rightArrow">
             <a:avLst>
@@ -11215,7 +11292,7 @@
         <p:spPr>
           <a:xfrm>
             <a:off x="8073360" y="3793320"/>
-            <a:ext cx="131040" cy="318240"/>
+            <a:ext cx="130680" cy="317880"/>
           </a:xfrm>
           <a:prstGeom prst="rightArrow">
             <a:avLst>
@@ -11254,7 +11331,7 @@
         <p:spPr>
           <a:xfrm>
             <a:off x="2701080" y="5176080"/>
-            <a:ext cx="1836000" cy="921600"/>
+            <a:ext cx="1835640" cy="921240"/>
           </a:xfrm>
           <a:prstGeom prst="wedgeRectCallout">
             <a:avLst>
@@ -11319,7 +11396,7 @@
         <p:spPr>
           <a:xfrm>
             <a:off x="6722640" y="5196600"/>
-            <a:ext cx="1967400" cy="824760"/>
+            <a:ext cx="1967040" cy="824400"/>
           </a:xfrm>
           <a:prstGeom prst="wedgeRectCallout">
             <a:avLst>
@@ -11384,7 +11461,7 @@
         <p:spPr>
           <a:xfrm>
             <a:off x="9731160" y="5131440"/>
-            <a:ext cx="2104560" cy="655560"/>
+            <a:ext cx="2104200" cy="655200"/>
           </a:xfrm>
           <a:prstGeom prst="wedgeRectCallout">
             <a:avLst>
@@ -11449,7 +11526,7 @@
         <p:spPr>
           <a:xfrm>
             <a:off x="5033520" y="2516760"/>
-            <a:ext cx="2574360" cy="363960"/>
+            <a:ext cx="2574000" cy="363600"/>
           </a:xfrm>
           <a:prstGeom prst="rect">
             <a:avLst/>
@@ -11497,8 +11574,8 @@
         </p:nvSpPr>
         <p:spPr>
           <a:xfrm rot="16200000">
-            <a:off x="3177360" y="1266120"/>
-            <a:ext cx="1963440" cy="363960"/>
+            <a:off x="3177360" y="1266480"/>
+            <a:ext cx="1963080" cy="363600"/>
           </a:xfrm>
           <a:prstGeom prst="rect">
             <a:avLst/>
@@ -11569,7 +11646,7 @@
         <p:spPr>
           <a:xfrm>
             <a:off x="684360" y="4487400"/>
-            <a:ext cx="8533440" cy="1505880"/>
+            <a:ext cx="8533080" cy="1505520"/>
           </a:xfrm>
           <a:prstGeom prst="rect">
             <a:avLst/>
@@ -11620,9 +11697,9 @@
         <p:grpSpPr>
           <a:xfrm>
             <a:off x="948240" y="823320"/>
-            <a:ext cx="10291320" cy="3338640"/>
+            <a:ext cx="10290960" cy="3338280"/>
             <a:chOff x="948240" y="823320"/>
-            <a:chExt cx="10291320" cy="3338640"/>
+            <a:chExt cx="10290960" cy="3338280"/>
           </a:xfrm>
         </p:grpSpPr>
         <p:sp>
@@ -11634,7 +11711,7 @@
           <p:spPr>
             <a:xfrm>
               <a:off x="948240" y="823320"/>
-              <a:ext cx="1361520" cy="1361520"/>
+              <a:ext cx="1361160" cy="1361160"/>
             </a:xfrm>
             <a:prstGeom prst="ellipse">
               <a:avLst/>
@@ -11667,7 +11744,7 @@
           <p:spPr>
             <a:xfrm>
               <a:off x="1234440" y="1109520"/>
-              <a:ext cx="789120" cy="789120"/>
+              <a:ext cx="788760" cy="788760"/>
             </a:xfrm>
             <a:prstGeom prst="rect">
               <a:avLst/>
@@ -11698,7 +11775,7 @@
           <p:spPr>
             <a:xfrm>
               <a:off x="2602800" y="823320"/>
-              <a:ext cx="3210840" cy="1361520"/>
+              <a:ext cx="3210480" cy="1361160"/>
             </a:xfrm>
             <a:prstGeom prst="rect">
               <a:avLst/>
@@ -11750,7 +11827,7 @@
           <p:spPr>
             <a:xfrm>
               <a:off x="6374160" y="823320"/>
-              <a:ext cx="1361520" cy="1361520"/>
+              <a:ext cx="1361160" cy="1361160"/>
             </a:xfrm>
             <a:prstGeom prst="ellipse">
               <a:avLst/>
@@ -11783,7 +11860,7 @@
           <p:spPr>
             <a:xfrm>
               <a:off x="6660360" y="1109520"/>
-              <a:ext cx="789120" cy="789120"/>
+              <a:ext cx="788760" cy="788760"/>
             </a:xfrm>
             <a:prstGeom prst="rect">
               <a:avLst/>
@@ -11814,7 +11891,7 @@
           <p:spPr>
             <a:xfrm>
               <a:off x="8028720" y="823320"/>
-              <a:ext cx="3210840" cy="1361520"/>
+              <a:ext cx="3210480" cy="1361160"/>
             </a:xfrm>
             <a:prstGeom prst="rect">
               <a:avLst/>
@@ -11866,7 +11943,7 @@
           <p:spPr>
             <a:xfrm>
               <a:off x="948240" y="2800440"/>
-              <a:ext cx="1361520" cy="1361520"/>
+              <a:ext cx="1361160" cy="1361160"/>
             </a:xfrm>
             <a:prstGeom prst="ellipse">
               <a:avLst/>
@@ -11899,7 +11976,7 @@
           <p:spPr>
             <a:xfrm>
               <a:off x="1234440" y="3086640"/>
-              <a:ext cx="789120" cy="789120"/>
+              <a:ext cx="788760" cy="788760"/>
             </a:xfrm>
             <a:prstGeom prst="rect">
               <a:avLst/>
@@ -11930,7 +12007,7 @@
           <p:spPr>
             <a:xfrm>
               <a:off x="2602800" y="2800440"/>
-              <a:ext cx="3210840" cy="1361520"/>
+              <a:ext cx="3210480" cy="1361160"/>
             </a:xfrm>
             <a:prstGeom prst="rect">
               <a:avLst/>
@@ -11982,7 +12059,7 @@
           <p:spPr>
             <a:xfrm>
               <a:off x="6374160" y="2800440"/>
-              <a:ext cx="1361520" cy="1361520"/>
+              <a:ext cx="1361160" cy="1361160"/>
             </a:xfrm>
             <a:prstGeom prst="ellipse">
               <a:avLst/>
@@ -12015,7 +12092,7 @@
           <p:spPr>
             <a:xfrm>
               <a:off x="6660360" y="3086640"/>
-              <a:ext cx="789120" cy="789120"/>
+              <a:ext cx="788760" cy="788760"/>
             </a:xfrm>
             <a:prstGeom prst="rect">
               <a:avLst/>
@@ -12046,7 +12123,7 @@
           <p:spPr>
             <a:xfrm>
               <a:off x="8028720" y="2800440"/>
-              <a:ext cx="3210840" cy="1361520"/>
+              <a:ext cx="3210480" cy="1361160"/>
             </a:xfrm>
             <a:prstGeom prst="rect">
               <a:avLst/>
@@ -12136,7 +12213,7 @@
         <p:spPr>
           <a:xfrm>
             <a:off x="0" y="0"/>
-            <a:ext cx="12191040" cy="6856920"/>
+            <a:ext cx="12190680" cy="6856560"/>
           </a:xfrm>
           <a:prstGeom prst="rect">
             <a:avLst/>
@@ -12189,7 +12266,7 @@
         <p:spPr>
           <a:xfrm>
             <a:off x="0" y="0"/>
-            <a:ext cx="8128800" cy="6856920"/>
+            <a:ext cx="8128440" cy="6856560"/>
           </a:xfrm>
           <a:prstGeom prst="snip2DiagRect">
             <a:avLst>
@@ -12411,7 +12488,7 @@
         <p:spPr>
           <a:xfrm>
             <a:off x="8588520" y="941400"/>
-            <a:ext cx="3042720" cy="3247560"/>
+            <a:ext cx="3042360" cy="3247200"/>
           </a:xfrm>
           <a:prstGeom prst="rect">
             <a:avLst/>
@@ -12462,9 +12539,9 @@
         <p:grpSpPr>
           <a:xfrm>
             <a:off x="952560" y="2104200"/>
-            <a:ext cx="6165360" cy="2442240"/>
+            <a:ext cx="6165000" cy="2441880"/>
             <a:chOff x="952560" y="2104200"/>
-            <a:chExt cx="6165360" cy="2442240"/>
+            <a:chExt cx="6165000" cy="2441880"/>
           </a:xfrm>
         </p:grpSpPr>
         <p:sp>
@@ -12476,7 +12553,7 @@
           <p:spPr>
             <a:xfrm>
               <a:off x="952560" y="2104200"/>
-              <a:ext cx="815400" cy="815400"/>
+              <a:ext cx="815040" cy="815040"/>
             </a:xfrm>
             <a:prstGeom prst="ellipse">
               <a:avLst/>
@@ -12509,7 +12586,7 @@
           <p:spPr>
             <a:xfrm>
               <a:off x="1123920" y="2275560"/>
-              <a:ext cx="472320" cy="472320"/>
+              <a:ext cx="471960" cy="471960"/>
             </a:xfrm>
             <a:prstGeom prst="rect">
               <a:avLst/>
@@ -12540,7 +12617,7 @@
           <p:spPr>
             <a:xfrm>
               <a:off x="1944000" y="2104200"/>
-              <a:ext cx="1923120" cy="815400"/>
+              <a:ext cx="1922760" cy="815040"/>
             </a:xfrm>
             <a:prstGeom prst="rect">
               <a:avLst/>
@@ -12592,7 +12669,7 @@
           <p:spPr>
             <a:xfrm>
               <a:off x="4203360" y="2104200"/>
-              <a:ext cx="815400" cy="815400"/>
+              <a:ext cx="815040" cy="815040"/>
             </a:xfrm>
             <a:prstGeom prst="ellipse">
               <a:avLst/>
@@ -12625,7 +12702,7 @@
           <p:spPr>
             <a:xfrm>
               <a:off x="4375080" y="2275560"/>
-              <a:ext cx="472320" cy="472320"/>
+              <a:ext cx="471960" cy="471960"/>
             </a:xfrm>
             <a:prstGeom prst="rect">
               <a:avLst/>
@@ -12656,7 +12733,7 @@
           <p:spPr>
             <a:xfrm>
               <a:off x="5194800" y="2104200"/>
-              <a:ext cx="1923120" cy="815400"/>
+              <a:ext cx="1922760" cy="815040"/>
             </a:xfrm>
             <a:prstGeom prst="rect">
               <a:avLst/>
@@ -12708,7 +12785,7 @@
           <p:spPr>
             <a:xfrm>
               <a:off x="952560" y="3731040"/>
-              <a:ext cx="815400" cy="815400"/>
+              <a:ext cx="815040" cy="815040"/>
             </a:xfrm>
             <a:prstGeom prst="ellipse">
               <a:avLst/>
@@ -12741,7 +12818,7 @@
           <p:spPr>
             <a:xfrm>
               <a:off x="1123920" y="3902400"/>
-              <a:ext cx="472320" cy="472320"/>
+              <a:ext cx="471960" cy="471960"/>
             </a:xfrm>
             <a:prstGeom prst="rect">
               <a:avLst/>
@@ -12772,7 +12849,7 @@
           <p:spPr>
             <a:xfrm>
               <a:off x="1944000" y="3731040"/>
-              <a:ext cx="1923120" cy="815400"/>
+              <a:ext cx="1922760" cy="815040"/>
             </a:xfrm>
             <a:prstGeom prst="rect">
               <a:avLst/>
@@ -12824,7 +12901,7 @@
           <p:spPr>
             <a:xfrm>
               <a:off x="4203360" y="3731040"/>
-              <a:ext cx="815400" cy="815400"/>
+              <a:ext cx="815040" cy="815040"/>
             </a:xfrm>
             <a:prstGeom prst="ellipse">
               <a:avLst/>
@@ -12857,7 +12934,7 @@
           <p:spPr>
             <a:xfrm>
               <a:off x="4375080" y="3902400"/>
-              <a:ext cx="472320" cy="472320"/>
+              <a:ext cx="471960" cy="471960"/>
             </a:xfrm>
             <a:prstGeom prst="rect">
               <a:avLst/>
@@ -12888,7 +12965,7 @@
           <p:spPr>
             <a:xfrm>
               <a:off x="5194800" y="3731040"/>
-              <a:ext cx="1923120" cy="815400"/>
+              <a:ext cx="1922760" cy="815040"/>
             </a:xfrm>
             <a:prstGeom prst="rect">
               <a:avLst/>
@@ -13005,7 +13082,7 @@
         <p:spPr>
           <a:xfrm>
             <a:off x="684360" y="4487400"/>
-            <a:ext cx="8533440" cy="1505880"/>
+            <a:ext cx="8533080" cy="1505520"/>
           </a:xfrm>
           <a:prstGeom prst="rect">
             <a:avLst/>
@@ -13054,7 +13131,7 @@
         <p:spPr>
           <a:xfrm>
             <a:off x="684360" y="685800"/>
-            <a:ext cx="8533440" cy="3614040"/>
+            <a:ext cx="8533080" cy="3613680"/>
           </a:xfrm>
           <a:prstGeom prst="rect">
             <a:avLst/>
@@ -13073,7 +13150,7 @@
         <p:txBody>
           <a:bodyPr lIns="90000" rIns="90000" tIns="45000" bIns="45000" anchor="ctr"/>
           <a:p>
-            <a:pPr marL="285840" indent="-284760">
+            <a:pPr marL="285840" indent="-284400">
               <a:lnSpc>
                 <a:spcPct val="100000"/>
               </a:lnSpc>
@@ -13105,7 +13182,7 @@
             </a:endParaRPr>
           </a:p>
           <a:p>
-            <a:pPr marL="285840" indent="-284760">
+            <a:pPr marL="285840" indent="-284400">
               <a:lnSpc>
                 <a:spcPct val="100000"/>
               </a:lnSpc>
@@ -13137,7 +13214,7 @@
             </a:endParaRPr>
           </a:p>
           <a:p>
-            <a:pPr marL="285840" indent="-284760">
+            <a:pPr marL="285840" indent="-284400">
               <a:lnSpc>
                 <a:spcPct val="100000"/>
               </a:lnSpc>
@@ -13169,7 +13246,7 @@
             </a:endParaRPr>
           </a:p>
           <a:p>
-            <a:pPr marL="285840" indent="-284760">
+            <a:pPr marL="285840" indent="-284400">
               <a:lnSpc>
                 <a:spcPct val="100000"/>
               </a:lnSpc>
@@ -13233,7 +13310,7 @@
         <p:spPr>
           <a:xfrm>
             <a:off x="684360" y="4487400"/>
-            <a:ext cx="8533440" cy="1505880"/>
+            <a:ext cx="8533080" cy="1505520"/>
           </a:xfrm>
           <a:prstGeom prst="rect">
             <a:avLst/>
@@ -13286,7 +13363,7 @@
         <p:spPr>
           <a:xfrm>
             <a:off x="5221440" y="75600"/>
-            <a:ext cx="913320" cy="913320"/>
+            <a:ext cx="912960" cy="912960"/>
           </a:xfrm>
           <a:prstGeom prst="rect">
             <a:avLst/>
@@ -13309,7 +13386,7 @@
         <p:spPr>
           <a:xfrm>
             <a:off x="4695120" y="4444560"/>
-            <a:ext cx="913320" cy="913320"/>
+            <a:ext cx="912960" cy="912960"/>
           </a:xfrm>
           <a:prstGeom prst="rect">
             <a:avLst/>
@@ -13332,7 +13409,7 @@
         <p:spPr>
           <a:xfrm>
             <a:off x="2603880" y="2294640"/>
-            <a:ext cx="913320" cy="913320"/>
+            <a:ext cx="912960" cy="912960"/>
           </a:xfrm>
           <a:prstGeom prst="rect">
             <a:avLst/>
@@ -13355,7 +13432,7 @@
         <p:spPr>
           <a:xfrm>
             <a:off x="9767160" y="3294360"/>
-            <a:ext cx="913320" cy="913320"/>
+            <a:ext cx="912960" cy="912960"/>
           </a:xfrm>
           <a:prstGeom prst="rect">
             <a:avLst/>
@@ -13378,7 +13455,7 @@
         <p:spPr>
           <a:xfrm>
             <a:off x="1967760" y="3811680"/>
-            <a:ext cx="913320" cy="913320"/>
+            <a:ext cx="912960" cy="912960"/>
           </a:xfrm>
           <a:prstGeom prst="rect">
             <a:avLst/>
@@ -13401,7 +13478,7 @@
         <p:spPr>
           <a:xfrm>
             <a:off x="5221440" y="2907360"/>
-            <a:ext cx="913320" cy="913320"/>
+            <a:ext cx="912960" cy="912960"/>
           </a:xfrm>
           <a:prstGeom prst="rect">
             <a:avLst/>
@@ -13424,7 +13501,7 @@
         <p:spPr>
           <a:xfrm>
             <a:off x="1093680" y="3282480"/>
-            <a:ext cx="913320" cy="913320"/>
+            <a:ext cx="912960" cy="912960"/>
           </a:xfrm>
           <a:prstGeom prst="rect">
             <a:avLst/>
@@ -13447,7 +13524,7 @@
         <p:spPr>
           <a:xfrm>
             <a:off x="8595360" y="3808800"/>
-            <a:ext cx="913320" cy="913320"/>
+            <a:ext cx="912960" cy="912960"/>
           </a:xfrm>
           <a:prstGeom prst="rect">
             <a:avLst/>
@@ -13470,7 +13547,7 @@
         <p:spPr>
           <a:xfrm>
             <a:off x="7839000" y="2294640"/>
-            <a:ext cx="913320" cy="913320"/>
+            <a:ext cx="912960" cy="912960"/>
           </a:xfrm>
           <a:prstGeom prst="rect">
             <a:avLst/>
@@ -13489,7 +13566,7 @@
         <p:spPr>
           <a:xfrm>
             <a:off x="6312960" y="944640"/>
-            <a:ext cx="1525320" cy="1339200"/>
+            <a:ext cx="1524960" cy="1338840"/>
           </a:xfrm>
           <a:custGeom>
             <a:avLst/>
@@ -13542,7 +13619,7 @@
         <p:spPr>
           <a:xfrm>
             <a:off x="5678640" y="1145160"/>
-            <a:ext cx="360" cy="1605600"/>
+            <a:ext cx="360" cy="1605240"/>
           </a:xfrm>
           <a:custGeom>
             <a:avLst/>
@@ -13595,7 +13672,7 @@
         <p:spPr>
           <a:xfrm flipH="1">
             <a:off x="3425400" y="990000"/>
-            <a:ext cx="1616760" cy="1379520"/>
+            <a:ext cx="1616400" cy="1379160"/>
           </a:xfrm>
           <a:custGeom>
             <a:avLst/>
@@ -13648,7 +13725,7 @@
         <p:spPr>
           <a:xfrm>
             <a:off x="2082960" y="3279600"/>
-            <a:ext cx="916560" cy="363960"/>
+            <a:ext cx="916200" cy="363600"/>
           </a:xfrm>
           <a:prstGeom prst="rect">
             <a:avLst/>
@@ -13697,7 +13774,7 @@
         <p:spPr>
           <a:xfrm>
             <a:off x="5227200" y="4030200"/>
-            <a:ext cx="928800" cy="363960"/>
+            <a:ext cx="928440" cy="363600"/>
           </a:xfrm>
           <a:prstGeom prst="rect">
             <a:avLst/>
@@ -13746,7 +13823,7 @@
         <p:spPr>
           <a:xfrm>
             <a:off x="8246520" y="3279600"/>
-            <a:ext cx="1254960" cy="363960"/>
+            <a:ext cx="1254600" cy="363600"/>
           </a:xfrm>
           <a:prstGeom prst="rect">
             <a:avLst/>
@@ -13795,7 +13872,7 @@
         <p:spPr>
           <a:xfrm>
             <a:off x="481680" y="348120"/>
-            <a:ext cx="1811160" cy="363960"/>
+            <a:ext cx="1810800" cy="363600"/>
           </a:xfrm>
           <a:prstGeom prst="rect">
             <a:avLst/>
@@ -13848,7 +13925,7 @@
         <p:spPr>
           <a:xfrm>
             <a:off x="5855760" y="4444560"/>
-            <a:ext cx="913320" cy="913320"/>
+            <a:ext cx="912960" cy="912960"/>
           </a:xfrm>
           <a:prstGeom prst="rect">
             <a:avLst/>
@@ -13889,7 +13966,7 @@
         <p:spPr>
           <a:xfrm>
             <a:off x="684360" y="4487400"/>
-            <a:ext cx="8533440" cy="1505880"/>
+            <a:ext cx="8533080" cy="1505520"/>
           </a:xfrm>
           <a:prstGeom prst="rect">
             <a:avLst/>
@@ -13942,7 +14019,7 @@
         <p:spPr>
           <a:xfrm>
             <a:off x="7839000" y="2560320"/>
-            <a:ext cx="1313280" cy="599040"/>
+            <a:ext cx="1312920" cy="598680"/>
           </a:xfrm>
           <a:prstGeom prst="rect">
             <a:avLst/>
@@ -13961,7 +14038,7 @@
         <p:spPr>
           <a:xfrm>
             <a:off x="480240" y="348120"/>
-            <a:ext cx="1791360" cy="363960"/>
+            <a:ext cx="1791000" cy="363600"/>
           </a:xfrm>
           <a:prstGeom prst="rect">
             <a:avLst/>
@@ -14010,7 +14087,7 @@
         <p:spPr>
           <a:xfrm>
             <a:off x="6384240" y="990000"/>
-            <a:ext cx="1525320" cy="1339200"/>
+            <a:ext cx="1524960" cy="1338840"/>
           </a:xfrm>
           <a:custGeom>
             <a:avLst/>
@@ -14063,7 +14140,7 @@
         <p:spPr>
           <a:xfrm>
             <a:off x="5678640" y="1145160"/>
-            <a:ext cx="360" cy="1605600"/>
+            <a:ext cx="360" cy="1605240"/>
           </a:xfrm>
           <a:custGeom>
             <a:avLst/>
@@ -14116,7 +14193,7 @@
         <p:spPr>
           <a:xfrm flipH="1">
             <a:off x="3425400" y="990000"/>
-            <a:ext cx="1616760" cy="1379520"/>
+            <a:ext cx="1616400" cy="1379160"/>
           </a:xfrm>
           <a:custGeom>
             <a:avLst/>
@@ -14169,7 +14246,7 @@
         <p:spPr>
           <a:xfrm>
             <a:off x="2082960" y="3279600"/>
-            <a:ext cx="916560" cy="363960"/>
+            <a:ext cx="916200" cy="363600"/>
           </a:xfrm>
           <a:prstGeom prst="rect">
             <a:avLst/>
@@ -14218,7 +14295,7 @@
         <p:spPr>
           <a:xfrm>
             <a:off x="5227200" y="4030200"/>
-            <a:ext cx="928800" cy="363960"/>
+            <a:ext cx="928440" cy="363600"/>
           </a:xfrm>
           <a:prstGeom prst="rect">
             <a:avLst/>
@@ -14267,7 +14344,7 @@
         <p:spPr>
           <a:xfrm>
             <a:off x="8246520" y="3279600"/>
-            <a:ext cx="1254960" cy="363960"/>
+            <a:ext cx="1254600" cy="363600"/>
           </a:xfrm>
           <a:prstGeom prst="rect">
             <a:avLst/>
@@ -14320,7 +14397,7 @@
         <p:spPr>
           <a:xfrm>
             <a:off x="4979520" y="218880"/>
-            <a:ext cx="1332360" cy="618120"/>
+            <a:ext cx="1332000" cy="617760"/>
           </a:xfrm>
           <a:prstGeom prst="rect">
             <a:avLst/>
@@ -14343,7 +14420,7 @@
         <p:spPr>
           <a:xfrm>
             <a:off x="2102760" y="2514600"/>
-            <a:ext cx="1323000" cy="608400"/>
+            <a:ext cx="1322640" cy="608040"/>
           </a:xfrm>
           <a:prstGeom prst="rect">
             <a:avLst/>
@@ -14366,7 +14443,7 @@
         <p:spPr>
           <a:xfrm>
             <a:off x="4235760" y="3279600"/>
-            <a:ext cx="1313280" cy="599040"/>
+            <a:ext cx="1312920" cy="598680"/>
           </a:xfrm>
           <a:prstGeom prst="rect">
             <a:avLst/>
@@ -14389,7 +14466,7 @@
         <p:spPr>
           <a:xfrm>
             <a:off x="5833080" y="3279600"/>
-            <a:ext cx="1313280" cy="599040"/>
+            <a:ext cx="1312920" cy="598680"/>
           </a:xfrm>
           <a:prstGeom prst="rect">
             <a:avLst/>
@@ -14430,7 +14507,7 @@
         <p:spPr>
           <a:xfrm>
             <a:off x="684360" y="4487400"/>
-            <a:ext cx="8533440" cy="1505880"/>
+            <a:ext cx="8533080" cy="1505520"/>
           </a:xfrm>
           <a:prstGeom prst="rect">
             <a:avLst/>
@@ -14479,7 +14556,7 @@
         <p:spPr>
           <a:xfrm>
             <a:off x="684360" y="685800"/>
-            <a:ext cx="8533440" cy="3614040"/>
+            <a:ext cx="8533080" cy="3613680"/>
           </a:xfrm>
           <a:prstGeom prst="rect">
             <a:avLst/>
@@ -14498,7 +14575,7 @@
         <p:txBody>
           <a:bodyPr lIns="90000" rIns="90000" tIns="45000" bIns="45000" anchor="ctr"/>
           <a:p>
-            <a:pPr marL="285840" indent="-284760">
+            <a:pPr marL="285840" indent="-284400">
               <a:lnSpc>
                 <a:spcPct val="100000"/>
               </a:lnSpc>
@@ -14574,7 +14651,7 @@
         <p:spPr>
           <a:xfrm>
             <a:off x="666000" y="2574360"/>
-            <a:ext cx="4809600" cy="2972880"/>
+            <a:ext cx="4809240" cy="2972520"/>
           </a:xfrm>
           <a:prstGeom prst="roundRect">
             <a:avLst>
@@ -14724,7 +14801,7 @@
         <p:spPr>
           <a:xfrm>
             <a:off x="684360" y="5241960"/>
-            <a:ext cx="8533440" cy="1505880"/>
+            <a:ext cx="8533080" cy="1505520"/>
           </a:xfrm>
           <a:prstGeom prst="rect">
             <a:avLst/>
@@ -14773,7 +14850,7 @@
         <p:spPr>
           <a:xfrm>
             <a:off x="684360" y="685800"/>
-            <a:ext cx="10989000" cy="2287080"/>
+            <a:ext cx="10988640" cy="2286720"/>
           </a:xfrm>
           <a:prstGeom prst="rect">
             <a:avLst/>
@@ -14794,7 +14871,7 @@
             <a:normAutofit/>
           </a:bodyPr>
           <a:p>
-            <a:pPr marL="285840" indent="-284760">
+            <a:pPr marL="285840" indent="-284400">
               <a:lnSpc>
                 <a:spcPct val="100000"/>
               </a:lnSpc>
@@ -14876,7 +14953,7 @@
             </a:endParaRPr>
           </a:p>
           <a:p>
-            <a:pPr marL="285840" indent="-284760">
+            <a:pPr marL="285840" indent="-284400">
               <a:lnSpc>
                 <a:spcPct val="100000"/>
               </a:lnSpc>
@@ -15000,7 +15077,7 @@
         <p:spPr>
           <a:xfrm>
             <a:off x="2523960" y="3718800"/>
-            <a:ext cx="727200" cy="722160"/>
+            <a:ext cx="726840" cy="721800"/>
           </a:xfrm>
           <a:prstGeom prst="ellipse">
             <a:avLst/>
@@ -15068,7 +15145,7 @@
         <p:spPr>
           <a:xfrm>
             <a:off x="3363480" y="3303360"/>
-            <a:ext cx="1216440" cy="406080"/>
+            <a:ext cx="1216080" cy="405720"/>
           </a:xfrm>
           <a:prstGeom prst="ellipse">
             <a:avLst/>
@@ -15136,7 +15213,7 @@
         <p:spPr>
           <a:xfrm>
             <a:off x="744120" y="3208680"/>
-            <a:ext cx="1589760" cy="674280"/>
+            <a:ext cx="1589400" cy="673920"/>
           </a:xfrm>
           <a:prstGeom prst="ellipse">
             <a:avLst/>
@@ -15204,7 +15281,7 @@
         <p:spPr>
           <a:xfrm>
             <a:off x="2119680" y="4628880"/>
-            <a:ext cx="1528920" cy="674280"/>
+            <a:ext cx="1528560" cy="673920"/>
           </a:xfrm>
           <a:prstGeom prst="ellipse">
             <a:avLst/>
@@ -15272,7 +15349,7 @@
         <p:spPr>
           <a:xfrm>
             <a:off x="6819480" y="2574360"/>
-            <a:ext cx="4809600" cy="2972880"/>
+            <a:ext cx="4809240" cy="2972520"/>
           </a:xfrm>
           <a:prstGeom prst="roundRect">
             <a:avLst>
@@ -15422,7 +15499,7 @@
         <p:spPr>
           <a:xfrm>
             <a:off x="7103880" y="4147560"/>
-            <a:ext cx="4377960" cy="858240"/>
+            <a:ext cx="4377600" cy="857880"/>
           </a:xfrm>
           <a:prstGeom prst="ellipse">
             <a:avLst/>
@@ -15490,7 +15567,7 @@
         <p:spPr>
           <a:xfrm>
             <a:off x="9898200" y="3332520"/>
-            <a:ext cx="1216440" cy="406080"/>
+            <a:ext cx="1216080" cy="405720"/>
           </a:xfrm>
           <a:prstGeom prst="ellipse">
             <a:avLst/>
@@ -15558,7 +15635,7 @@
         <p:spPr>
           <a:xfrm>
             <a:off x="6965640" y="3288960"/>
-            <a:ext cx="1589760" cy="674280"/>
+            <a:ext cx="1589400" cy="673920"/>
           </a:xfrm>
           <a:prstGeom prst="ellipse">
             <a:avLst/>
@@ -15626,7 +15703,7 @@
         <p:spPr>
           <a:xfrm>
             <a:off x="8287920" y="2688120"/>
-            <a:ext cx="1872720" cy="674280"/>
+            <a:ext cx="1872360" cy="673920"/>
           </a:xfrm>
           <a:prstGeom prst="ellipse">
             <a:avLst/>
@@ -15743,7 +15820,7 @@
         <p:spPr>
           <a:xfrm>
             <a:off x="684360" y="4487400"/>
-            <a:ext cx="8533440" cy="1505880"/>
+            <a:ext cx="8533080" cy="1505520"/>
           </a:xfrm>
           <a:prstGeom prst="rect">
             <a:avLst/>
@@ -15792,7 +15869,7 @@
         <p:spPr>
           <a:xfrm>
             <a:off x="684360" y="685800"/>
-            <a:ext cx="11361600" cy="3614040"/>
+            <a:ext cx="11361240" cy="3613680"/>
           </a:xfrm>
           <a:prstGeom prst="rect">
             <a:avLst/>
@@ -15813,7 +15890,7 @@
             <a:normAutofit/>
           </a:bodyPr>
           <a:p>
-            <a:pPr marL="285840" indent="-284760">
+            <a:pPr marL="285840" indent="-284400">
               <a:lnSpc>
                 <a:spcPct val="100000"/>
               </a:lnSpc>
@@ -15855,7 +15932,7 @@
             </a:endParaRPr>
           </a:p>
           <a:p>
-            <a:pPr marL="285840" indent="-284760">
+            <a:pPr marL="285840" indent="-284400">
               <a:lnSpc>
                 <a:spcPct val="100000"/>
               </a:lnSpc>
@@ -16045,7 +16122,7 @@
             </a:endParaRPr>
           </a:p>
           <a:p>
-            <a:pPr marL="285840" indent="-284760">
+            <a:pPr marL="285840" indent="-284400">
               <a:lnSpc>
                 <a:spcPct val="100000"/>
               </a:lnSpc>
@@ -16077,7 +16154,7 @@
             </a:endParaRPr>
           </a:p>
           <a:p>
-            <a:pPr marL="285840" indent="-284760">
+            <a:pPr marL="285840" indent="-284400">
               <a:lnSpc>
                 <a:spcPct val="100000"/>
               </a:lnSpc>
@@ -16168,7 +16245,7 @@
         <p:spPr>
           <a:xfrm>
             <a:off x="684360" y="4487400"/>
-            <a:ext cx="8533440" cy="1505880"/>
+            <a:ext cx="8533080" cy="1505520"/>
           </a:xfrm>
           <a:prstGeom prst="rect">
             <a:avLst/>
@@ -16217,7 +16294,7 @@
         <p:spPr>
           <a:xfrm>
             <a:off x="684360" y="685800"/>
-            <a:ext cx="8533440" cy="3614040"/>
+            <a:ext cx="8533080" cy="3613680"/>
           </a:xfrm>
           <a:prstGeom prst="rect">
             <a:avLst/>
@@ -16236,7 +16313,7 @@
         <p:txBody>
           <a:bodyPr lIns="90000" rIns="90000" tIns="45000" bIns="45000" anchor="ctr"/>
           <a:p>
-            <a:pPr marL="285840" indent="-284760">
+            <a:pPr marL="285840" indent="-284400">
               <a:lnSpc>
                 <a:spcPct val="100000"/>
               </a:lnSpc>
@@ -16338,7 +16415,7 @@
             </a:endParaRPr>
           </a:p>
           <a:p>
-            <a:pPr marL="285840" indent="-284760">
+            <a:pPr marL="285840" indent="-284400">
               <a:lnSpc>
                 <a:spcPct val="100000"/>
               </a:lnSpc>
@@ -16440,7 +16517,7 @@
         <p:spPr>
           <a:xfrm>
             <a:off x="2521440" y="3979080"/>
-            <a:ext cx="1881000" cy="806760"/>
+            <a:ext cx="1880640" cy="806400"/>
           </a:xfrm>
           <a:prstGeom prst="rect">
             <a:avLst/>
@@ -16506,7 +16583,7 @@
         <p:spPr>
           <a:xfrm>
             <a:off x="5487840" y="3979080"/>
-            <a:ext cx="1881000" cy="806760"/>
+            <a:ext cx="1880640" cy="806400"/>
           </a:xfrm>
           <a:prstGeom prst="rect">
             <a:avLst/>
@@ -16572,7 +16649,7 @@
         <p:spPr>
           <a:xfrm>
             <a:off x="4004640" y="2771640"/>
-            <a:ext cx="1881000" cy="806760"/>
+            <a:ext cx="1880640" cy="806400"/>
           </a:xfrm>
           <a:prstGeom prst="rect">
             <a:avLst/>
@@ -16638,7 +16715,7 @@
         <p:spPr>
           <a:xfrm>
             <a:off x="4483080" y="4383000"/>
-            <a:ext cx="1003680" cy="360"/>
+            <a:ext cx="1003320" cy="360"/>
           </a:xfrm>
           <a:custGeom>
             <a:avLst/>
@@ -16690,7 +16767,7 @@
         <p:spPr>
           <a:xfrm>
             <a:off x="4985640" y="3657600"/>
-            <a:ext cx="360" cy="578520"/>
+            <a:ext cx="360" cy="578160"/>
           </a:xfrm>
           <a:custGeom>
             <a:avLst/>
@@ -16791,7 +16868,7 @@
         <p:spPr>
           <a:xfrm>
             <a:off x="0" y="0"/>
-            <a:ext cx="12191040" cy="6856920"/>
+            <a:ext cx="12190680" cy="6856560"/>
           </a:xfrm>
           <a:prstGeom prst="rect">
             <a:avLst/>
@@ -16844,7 +16921,7 @@
         <p:spPr>
           <a:xfrm>
             <a:off x="640440" y="685800"/>
-            <a:ext cx="4817520" cy="4602600"/>
+            <a:ext cx="4817160" cy="4602240"/>
           </a:xfrm>
           <a:prstGeom prst="rect">
             <a:avLst/>
@@ -16895,7 +16972,7 @@
         <p:spPr>
           <a:xfrm>
             <a:off x="6095880" y="0"/>
-            <a:ext cx="6094800" cy="6856920"/>
+            <a:ext cx="6094440" cy="6856560"/>
           </a:xfrm>
           <a:prstGeom prst="rect">
             <a:avLst/>
@@ -16933,7 +17010,7 @@
         <p:spPr>
           <a:xfrm>
             <a:off x="6625800" y="685800"/>
-            <a:ext cx="4878000" cy="4602600"/>
+            <a:ext cx="4877640" cy="4602240"/>
           </a:xfrm>
           <a:prstGeom prst="rect">
             <a:avLst/>
@@ -16954,7 +17031,7 @@
             <a:normAutofit/>
           </a:bodyPr>
           <a:p>
-            <a:pPr marL="285840" indent="-284760">
+            <a:pPr marL="285840" indent="-284400">
               <a:lnSpc>
                 <a:spcPct val="100000"/>
               </a:lnSpc>
@@ -16986,7 +17063,7 @@
             </a:endParaRPr>
           </a:p>
           <a:p>
-            <a:pPr marL="285840" indent="-284760">
+            <a:pPr marL="285840" indent="-284400">
               <a:lnSpc>
                 <a:spcPct val="100000"/>
               </a:lnSpc>
@@ -17018,7 +17095,7 @@
             </a:endParaRPr>
           </a:p>
           <a:p>
-            <a:pPr marL="285840" indent="-284760">
+            <a:pPr marL="285840" indent="-284400">
               <a:lnSpc>
                 <a:spcPct val="100000"/>
               </a:lnSpc>
@@ -17050,7 +17127,7 @@
             </a:endParaRPr>
           </a:p>
           <a:p>
-            <a:pPr marL="285840" indent="-284760">
+            <a:pPr marL="285840" indent="-284400">
               <a:lnSpc>
                 <a:spcPct val="100000"/>
               </a:lnSpc>
@@ -17141,7 +17218,7 @@
         <p:spPr>
           <a:xfrm>
             <a:off x="684360" y="4487400"/>
-            <a:ext cx="8533440" cy="1505880"/>
+            <a:ext cx="8533080" cy="1505520"/>
           </a:xfrm>
           <a:prstGeom prst="rect">
             <a:avLst/>
@@ -17190,7 +17267,7 @@
         <p:spPr>
           <a:xfrm>
             <a:off x="1044720" y="500040"/>
-            <a:ext cx="8263080" cy="3231720"/>
+            <a:ext cx="8262720" cy="3231360"/>
           </a:xfrm>
           <a:prstGeom prst="rect">
             <a:avLst/>
@@ -17209,7 +17286,7 @@
         <p:txBody>
           <a:bodyPr lIns="90000" rIns="90000" tIns="45000" bIns="45000" anchor="ctr"/>
           <a:p>
-            <a:pPr marL="285840" indent="-284760">
+            <a:pPr marL="285840" indent="-284400">
               <a:lnSpc>
                 <a:spcPct val="100000"/>
               </a:lnSpc>
@@ -17251,7 +17328,7 @@
             </a:endParaRPr>
           </a:p>
           <a:p>
-            <a:pPr marL="285840" indent="-284760">
+            <a:pPr marL="285840" indent="-284400">
               <a:lnSpc>
                 <a:spcPct val="100000"/>
               </a:lnSpc>
@@ -17303,7 +17380,7 @@
             </a:endParaRPr>
           </a:p>
           <a:p>
-            <a:pPr marL="285840" indent="-284760">
+            <a:pPr marL="285840" indent="-284400">
               <a:lnSpc>
                 <a:spcPct val="100000"/>
               </a:lnSpc>
@@ -17455,7 +17532,7 @@
         <p:spPr>
           <a:xfrm>
             <a:off x="7097760" y="1943280"/>
-            <a:ext cx="853560" cy="853560"/>
+            <a:ext cx="853200" cy="853200"/>
           </a:xfrm>
           <a:prstGeom prst="rect">
             <a:avLst/>
@@ -17478,7 +17555,7 @@
         <p:spPr>
           <a:xfrm>
             <a:off x="6931800" y="4296600"/>
-            <a:ext cx="1180080" cy="472320"/>
+            <a:ext cx="1179720" cy="471960"/>
           </a:xfrm>
           <a:prstGeom prst="rect">
             <a:avLst/>
@@ -17501,7 +17578,7 @@
         <p:spPr>
           <a:xfrm>
             <a:off x="7054200" y="2896920"/>
-            <a:ext cx="897120" cy="1039320"/>
+            <a:ext cx="896760" cy="1038960"/>
           </a:xfrm>
           <a:prstGeom prst="rect">
             <a:avLst/>
@@ -17524,7 +17601,7 @@
         <p:spPr>
           <a:xfrm>
             <a:off x="2718360" y="2064960"/>
-            <a:ext cx="913320" cy="913320"/>
+            <a:ext cx="912960" cy="912960"/>
           </a:xfrm>
           <a:prstGeom prst="rect">
             <a:avLst/>
@@ -17547,7 +17624,7 @@
         <p:spPr>
           <a:xfrm>
             <a:off x="2739240" y="3371040"/>
-            <a:ext cx="913320" cy="913320"/>
+            <a:ext cx="912960" cy="912960"/>
           </a:xfrm>
           <a:prstGeom prst="rect">
             <a:avLst/>
@@ -17570,7 +17647,7 @@
         <p:spPr>
           <a:xfrm>
             <a:off x="4908600" y="2852280"/>
-            <a:ext cx="913320" cy="913320"/>
+            <a:ext cx="912960" cy="912960"/>
           </a:xfrm>
           <a:prstGeom prst="rect">
             <a:avLst/>
@@ -17589,7 +17666,7 @@
         <p:spPr>
           <a:xfrm rot="1192200">
             <a:off x="4047480" y="2673000"/>
-            <a:ext cx="977400" cy="483480"/>
+            <a:ext cx="977040" cy="483120"/>
           </a:xfrm>
           <a:prstGeom prst="rightArrow">
             <a:avLst>
@@ -17630,8 +17707,8 @@
         </p:nvSpPr>
         <p:spPr>
           <a:xfrm rot="20407800">
-            <a:off x="4026960" y="3459960"/>
-            <a:ext cx="977400" cy="483480"/>
+            <a:off x="4026960" y="3459600"/>
+            <a:ext cx="977040" cy="483120"/>
           </a:xfrm>
           <a:prstGeom prst="rightArrow">
             <a:avLst>
@@ -17673,7 +17750,7 @@
         <p:spPr>
           <a:xfrm rot="1192200">
             <a:off x="5801040" y="3781440"/>
-            <a:ext cx="977400" cy="483480"/>
+            <a:ext cx="977040" cy="483120"/>
           </a:xfrm>
           <a:prstGeom prst="rightArrow">
             <a:avLst>
@@ -17714,8 +17791,8 @@
         </p:nvSpPr>
         <p:spPr>
           <a:xfrm rot="20407800">
-            <a:off x="5875200" y="2455560"/>
-            <a:ext cx="977400" cy="483480"/>
+            <a:off x="5875200" y="2455200"/>
+            <a:ext cx="977040" cy="483120"/>
           </a:xfrm>
           <a:prstGeom prst="rightArrow">
             <a:avLst>
@@ -17757,7 +17834,7 @@
         <p:spPr>
           <a:xfrm>
             <a:off x="5951880" y="3115440"/>
-            <a:ext cx="977400" cy="483480"/>
+            <a:ext cx="977040" cy="483120"/>
           </a:xfrm>
           <a:prstGeom prst="rightArrow">
             <a:avLst>
@@ -17848,7 +17925,7 @@
         <p:spPr>
           <a:xfrm>
             <a:off x="684360" y="4487400"/>
-            <a:ext cx="8533440" cy="1505880"/>
+            <a:ext cx="8533080" cy="1505520"/>
           </a:xfrm>
           <a:prstGeom prst="rect">
             <a:avLst/>
@@ -17897,7 +17974,7 @@
         <p:spPr>
           <a:xfrm>
             <a:off x="684360" y="685800"/>
-            <a:ext cx="8533440" cy="3614040"/>
+            <a:ext cx="8533080" cy="3613680"/>
           </a:xfrm>
           <a:prstGeom prst="rect">
             <a:avLst/>
@@ -17916,7 +17993,7 @@
         <p:txBody>
           <a:bodyPr lIns="90000" rIns="90000" tIns="45000" bIns="45000" anchor="ctr"/>
           <a:p>
-            <a:pPr marL="285840" indent="-284760">
+            <a:pPr marL="285840" indent="-284400">
               <a:lnSpc>
                 <a:spcPct val="100000"/>
               </a:lnSpc>
@@ -18008,7 +18085,7 @@
             </a:endParaRPr>
           </a:p>
           <a:p>
-            <a:pPr marL="285840" indent="-284760">
+            <a:pPr marL="285840" indent="-284400">
               <a:lnSpc>
                 <a:spcPct val="100000"/>
               </a:lnSpc>
@@ -18060,7 +18137,7 @@
             </a:endParaRPr>
           </a:p>
           <a:p>
-            <a:pPr marL="285840" indent="-284760">
+            <a:pPr marL="285840" indent="-284400">
               <a:lnSpc>
                 <a:spcPct val="100000"/>
               </a:lnSpc>
@@ -18146,7 +18223,7 @@
         <p:spPr>
           <a:xfrm>
             <a:off x="6227640" y="3794400"/>
-            <a:ext cx="913320" cy="913320"/>
+            <a:ext cx="912960" cy="912960"/>
           </a:xfrm>
           <a:prstGeom prst="rect">
             <a:avLst/>
@@ -18169,7 +18246,7 @@
         <p:spPr>
           <a:xfrm>
             <a:off x="2468520" y="3843720"/>
-            <a:ext cx="913320" cy="913320"/>
+            <a:ext cx="912960" cy="912960"/>
           </a:xfrm>
           <a:prstGeom prst="rect">
             <a:avLst/>
@@ -18192,7 +18269,7 @@
         <p:spPr>
           <a:xfrm>
             <a:off x="9790920" y="3794400"/>
-            <a:ext cx="913320" cy="913320"/>
+            <a:ext cx="912960" cy="912960"/>
           </a:xfrm>
           <a:prstGeom prst="rect">
             <a:avLst/>
@@ -18215,7 +18292,7 @@
         <p:spPr>
           <a:xfrm>
             <a:off x="7903800" y="3794400"/>
-            <a:ext cx="913320" cy="913320"/>
+            <a:ext cx="912960" cy="912960"/>
           </a:xfrm>
           <a:prstGeom prst="rect">
             <a:avLst/>
@@ -18238,7 +18315,7 @@
         <p:spPr>
           <a:xfrm>
             <a:off x="4412520" y="3794400"/>
-            <a:ext cx="913320" cy="913320"/>
+            <a:ext cx="912960" cy="912960"/>
           </a:xfrm>
           <a:prstGeom prst="rect">
             <a:avLst/>
@@ -18261,7 +18338,7 @@
         <p:spPr>
           <a:xfrm>
             <a:off x="684360" y="3843720"/>
-            <a:ext cx="913320" cy="913320"/>
+            <a:ext cx="912960" cy="912960"/>
           </a:xfrm>
           <a:prstGeom prst="rect">
             <a:avLst/>
@@ -18280,7 +18357,7 @@
         <p:spPr>
           <a:xfrm>
             <a:off x="1638000" y="4183200"/>
-            <a:ext cx="681840" cy="261000"/>
+            <a:ext cx="681480" cy="260640"/>
           </a:xfrm>
           <a:prstGeom prst="rightArrow">
             <a:avLst>
@@ -18319,7 +18396,7 @@
         <p:spPr>
           <a:xfrm>
             <a:off x="3511800" y="4201920"/>
-            <a:ext cx="681840" cy="261000"/>
+            <a:ext cx="681480" cy="260640"/>
           </a:xfrm>
           <a:prstGeom prst="rightArrow">
             <a:avLst>
@@ -18358,7 +18435,7 @@
         <p:spPr>
           <a:xfrm>
             <a:off x="5366520" y="4193640"/>
-            <a:ext cx="681840" cy="261000"/>
+            <a:ext cx="681480" cy="260640"/>
           </a:xfrm>
           <a:prstGeom prst="rightArrow">
             <a:avLst>
@@ -18397,7 +18474,7 @@
         <p:spPr>
           <a:xfrm>
             <a:off x="7162200" y="4183200"/>
-            <a:ext cx="681840" cy="261000"/>
+            <a:ext cx="681480" cy="260640"/>
           </a:xfrm>
           <a:prstGeom prst="rightArrow">
             <a:avLst>
@@ -18436,7 +18513,7 @@
         <p:spPr>
           <a:xfrm>
             <a:off x="8876160" y="4169880"/>
-            <a:ext cx="681840" cy="261000"/>
+            <a:ext cx="681480" cy="260640"/>
           </a:xfrm>
           <a:prstGeom prst="rightArrow">
             <a:avLst>
@@ -18524,7 +18601,7 @@
         <p:spPr>
           <a:xfrm>
             <a:off x="684360" y="4487400"/>
-            <a:ext cx="8533440" cy="1505880"/>
+            <a:ext cx="8533080" cy="1505520"/>
           </a:xfrm>
           <a:prstGeom prst="rect">
             <a:avLst/>
@@ -18573,7 +18650,7 @@
         <p:spPr>
           <a:xfrm>
             <a:off x="684360" y="685800"/>
-            <a:ext cx="8533440" cy="3614040"/>
+            <a:ext cx="8533080" cy="3613680"/>
           </a:xfrm>
           <a:prstGeom prst="rect">
             <a:avLst/>
@@ -18592,7 +18669,7 @@
         <p:txBody>
           <a:bodyPr lIns="90000" rIns="90000" tIns="45000" bIns="45000" anchor="ctr"/>
           <a:p>
-            <a:pPr marL="285840" indent="-284760">
+            <a:pPr marL="285840" indent="-284400">
               <a:lnSpc>
                 <a:spcPct val="100000"/>
               </a:lnSpc>
@@ -18674,7 +18751,7 @@
             </a:endParaRPr>
           </a:p>
           <a:p>
-            <a:pPr marL="285840" indent="-284760">
+            <a:pPr marL="285840" indent="-284400">
               <a:lnSpc>
                 <a:spcPct val="100000"/>
               </a:lnSpc>
@@ -18720,7 +18797,7 @@
         <p:spPr>
           <a:xfrm>
             <a:off x="4681800" y="2481480"/>
-            <a:ext cx="913320" cy="913320"/>
+            <a:ext cx="912960" cy="912960"/>
           </a:xfrm>
           <a:prstGeom prst="rect">
             <a:avLst/>
@@ -18743,7 +18820,7 @@
         <p:spPr>
           <a:xfrm>
             <a:off x="6609240" y="3669480"/>
-            <a:ext cx="913320" cy="913320"/>
+            <a:ext cx="912960" cy="912960"/>
           </a:xfrm>
           <a:prstGeom prst="rect">
             <a:avLst/>
@@ -18766,7 +18843,7 @@
         <p:spPr>
           <a:xfrm>
             <a:off x="2973240" y="3669480"/>
-            <a:ext cx="913320" cy="913320"/>
+            <a:ext cx="912960" cy="912960"/>
           </a:xfrm>
           <a:prstGeom prst="rect">
             <a:avLst/>
@@ -18785,7 +18862,7 @@
         <p:spPr>
           <a:xfrm>
             <a:off x="4214160" y="3946320"/>
-            <a:ext cx="2067480" cy="359640"/>
+            <a:ext cx="2067120" cy="359280"/>
           </a:xfrm>
           <a:prstGeom prst="rightArrow">
             <a:avLst>
@@ -18824,7 +18901,7 @@
         <p:spPr>
           <a:xfrm>
             <a:off x="4988160" y="3533400"/>
-            <a:ext cx="300600" cy="406080"/>
+            <a:ext cx="300240" cy="405720"/>
           </a:xfrm>
           <a:prstGeom prst="downArrow">
             <a:avLst>

</xml_diff>

<commit_message>
#12 Reinfocement learning  explanation with cat example speech part 2 added on introduction slides
</commit_message>
<xml_diff>
--- a/SAI_presentation_libre_office.pptx
+++ b/SAI_presentation_libre_office.pptx
@@ -250,7 +250,7 @@
           <a:bodyPr lIns="0" rIns="0" tIns="0" bIns="0" anchor="b"/>
           <a:p>
             <a:pPr algn="r"/>
-            <a:fld id="{FB6E05D9-635A-46E5-A86C-15EFB78B77F6}" type="slidenum">
+            <a:fld id="{D5D5A20A-1EBA-4FBB-A515-820F37612E6C}" type="slidenum">
               <a:rPr b="0" lang="fr-FR" sz="1400" spc="-1" strike="noStrike">
                 <a:latin typeface="Times New Roman"/>
               </a:rPr>
@@ -298,7 +298,7 @@
         <p:spPr>
           <a:xfrm>
             <a:off x="685800" y="1143000"/>
-            <a:ext cx="5484960" cy="3084840"/>
+            <a:ext cx="5484600" cy="3084480"/>
           </a:xfrm>
           <a:prstGeom prst="rect">
             <a:avLst/>
@@ -318,7 +318,7 @@
         <p:spPr>
           <a:xfrm>
             <a:off x="685800" y="4400640"/>
-            <a:ext cx="5484960" cy="3598920"/>
+            <a:ext cx="5484600" cy="3598560"/>
           </a:xfrm>
           <a:prstGeom prst="rect">
             <a:avLst/>
@@ -327,7 +327,7 @@
         <p:txBody>
           <a:bodyPr lIns="0" rIns="0" tIns="0" bIns="0"/>
           <a:p>
-            <a:pPr marL="216000" indent="-214920">
+            <a:pPr marL="216000" indent="-214560">
               <a:lnSpc>
                 <a:spcPct val="100000"/>
               </a:lnSpc>
@@ -343,7 +343,7 @@
             </a:endParaRPr>
           </a:p>
           <a:p>
-            <a:pPr marL="216000" indent="-214920">
+            <a:pPr marL="216000" indent="-214560">
               <a:lnSpc>
                 <a:spcPct val="100000"/>
               </a:lnSpc>
@@ -360,7 +360,7 @@
             </a:endParaRPr>
           </a:p>
           <a:p>
-            <a:pPr marL="216000" indent="-214920">
+            <a:pPr marL="216000" indent="-214560">
               <a:lnSpc>
                 <a:spcPct val="100000"/>
               </a:lnSpc>
@@ -376,7 +376,7 @@
             </a:endParaRPr>
           </a:p>
           <a:p>
-            <a:pPr marL="216000" indent="-214920">
+            <a:pPr marL="216000" indent="-214560">
               <a:lnSpc>
                 <a:spcPct val="100000"/>
               </a:lnSpc>
@@ -392,7 +392,7 @@
             </a:endParaRPr>
           </a:p>
           <a:p>
-            <a:pPr marL="216000" indent="-214920">
+            <a:pPr marL="216000" indent="-214560">
               <a:lnSpc>
                 <a:spcPct val="100000"/>
               </a:lnSpc>
@@ -419,7 +419,7 @@
         <p:spPr>
           <a:xfrm>
             <a:off x="3884760" y="8685360"/>
-            <a:ext cx="2970360" cy="457200"/>
+            <a:ext cx="2970000" cy="456840"/>
           </a:xfrm>
           <a:prstGeom prst="rect">
             <a:avLst/>
@@ -443,7 +443,7 @@
                 <a:spcPct val="100000"/>
               </a:lnSpc>
             </a:pPr>
-            <a:fld id="{295C6F7E-DF9A-4F8E-B082-D07629C9DA57}" type="slidenum">
+            <a:fld id="{7AE86BEA-D7C7-4EEF-AFED-7E2927971E7E}" type="slidenum">
               <a:rPr b="0" lang="fr-FR" sz="1200" spc="-1" strike="noStrike">
                 <a:solidFill>
                   <a:srgbClr val="000000"/>
@@ -493,7 +493,7 @@
         <p:spPr>
           <a:xfrm>
             <a:off x="685800" y="1143000"/>
-            <a:ext cx="5484960" cy="3084840"/>
+            <a:ext cx="5484600" cy="3084480"/>
           </a:xfrm>
           <a:prstGeom prst="rect">
             <a:avLst/>
@@ -513,7 +513,7 @@
         <p:spPr>
           <a:xfrm>
             <a:off x="685800" y="4400640"/>
-            <a:ext cx="5484960" cy="3598920"/>
+            <a:ext cx="5484600" cy="3598560"/>
           </a:xfrm>
           <a:prstGeom prst="rect">
             <a:avLst/>
@@ -522,7 +522,7 @@
         <p:txBody>
           <a:bodyPr lIns="0" rIns="0" tIns="0" bIns="0"/>
           <a:p>
-            <a:pPr marL="216000" indent="-215280">
+            <a:pPr marL="216000" indent="-214920">
               <a:lnSpc>
                 <a:spcPct val="100000"/>
               </a:lnSpc>
@@ -538,7 +538,7 @@
             </a:endParaRPr>
           </a:p>
           <a:p>
-            <a:pPr marL="216000" indent="-215280">
+            <a:pPr marL="216000" indent="-214920">
               <a:lnSpc>
                 <a:spcPct val="100000"/>
               </a:lnSpc>
@@ -548,7 +548,7 @@
             </a:endParaRPr>
           </a:p>
           <a:p>
-            <a:pPr marL="216000" indent="-215280">
+            <a:pPr marL="216000" indent="-214920">
               <a:lnSpc>
                 <a:spcPct val="100000"/>
               </a:lnSpc>
@@ -564,7 +564,7 @@
             </a:endParaRPr>
           </a:p>
           <a:p>
-            <a:pPr marL="216000" indent="-215280">
+            <a:pPr marL="216000" indent="-214920">
               <a:lnSpc>
                 <a:spcPct val="100000"/>
               </a:lnSpc>
@@ -574,7 +574,7 @@
             </a:endParaRPr>
           </a:p>
           <a:p>
-            <a:pPr marL="216000" indent="-215280">
+            <a:pPr marL="216000" indent="-214920">
               <a:lnSpc>
                 <a:spcPct val="100000"/>
               </a:lnSpc>
@@ -590,7 +590,7 @@
             </a:endParaRPr>
           </a:p>
           <a:p>
-            <a:pPr marL="216000" indent="-215280">
+            <a:pPr marL="216000" indent="-214920">
               <a:lnSpc>
                 <a:spcPct val="100000"/>
               </a:lnSpc>
@@ -600,7 +600,7 @@
             </a:endParaRPr>
           </a:p>
           <a:p>
-            <a:pPr marL="216000" indent="-215280">
+            <a:pPr marL="216000" indent="-214920">
               <a:lnSpc>
                 <a:spcPct val="100000"/>
               </a:lnSpc>
@@ -616,7 +616,7 @@
             </a:endParaRPr>
           </a:p>
           <a:p>
-            <a:pPr marL="216000" indent="-215280">
+            <a:pPr marL="216000" indent="-214920">
               <a:lnSpc>
                 <a:spcPct val="100000"/>
               </a:lnSpc>
@@ -626,7 +626,7 @@
             </a:endParaRPr>
           </a:p>
           <a:p>
-            <a:pPr marL="216000" indent="-215280">
+            <a:pPr marL="216000" indent="-214920">
               <a:lnSpc>
                 <a:spcPct val="100000"/>
               </a:lnSpc>
@@ -636,7 +636,7 @@
             </a:endParaRPr>
           </a:p>
           <a:p>
-            <a:pPr marL="216000" indent="-215280">
+            <a:pPr marL="216000" indent="-214920">
               <a:lnSpc>
                 <a:spcPct val="100000"/>
               </a:lnSpc>
@@ -652,7 +652,7 @@
             </a:endParaRPr>
           </a:p>
           <a:p>
-            <a:pPr marL="216000" indent="-215280">
+            <a:pPr marL="216000" indent="-214920">
               <a:lnSpc>
                 <a:spcPct val="100000"/>
               </a:lnSpc>
@@ -668,7 +668,7 @@
             </a:endParaRPr>
           </a:p>
           <a:p>
-            <a:pPr marL="216000" indent="-215280">
+            <a:pPr marL="216000" indent="-214920">
               <a:lnSpc>
                 <a:spcPct val="100000"/>
               </a:lnSpc>
@@ -684,7 +684,7 @@
             </a:endParaRPr>
           </a:p>
           <a:p>
-            <a:pPr marL="216000" indent="-215280">
+            <a:pPr marL="216000" indent="-214920">
               <a:lnSpc>
                 <a:spcPct val="100000"/>
               </a:lnSpc>
@@ -694,7 +694,7 @@
             </a:endParaRPr>
           </a:p>
           <a:p>
-            <a:pPr marL="216000" indent="-215280">
+            <a:pPr marL="216000" indent="-214920">
               <a:lnSpc>
                 <a:spcPct val="100000"/>
               </a:lnSpc>
@@ -710,7 +710,7 @@
             </a:endParaRPr>
           </a:p>
           <a:p>
-            <a:pPr marL="216000" indent="-215280">
+            <a:pPr marL="216000" indent="-214920">
               <a:lnSpc>
                 <a:spcPct val="100000"/>
               </a:lnSpc>
@@ -720,7 +720,7 @@
             </a:endParaRPr>
           </a:p>
           <a:p>
-            <a:pPr marL="216000" indent="-215280">
+            <a:pPr marL="216000" indent="-214920">
               <a:lnSpc>
                 <a:spcPct val="100000"/>
               </a:lnSpc>
@@ -736,7 +736,7 @@
             </a:endParaRPr>
           </a:p>
           <a:p>
-            <a:pPr marL="216000" indent="-215280">
+            <a:pPr marL="216000" indent="-214920">
               <a:lnSpc>
                 <a:spcPct val="100000"/>
               </a:lnSpc>
@@ -752,7 +752,7 @@
             </a:endParaRPr>
           </a:p>
           <a:p>
-            <a:pPr marL="216000" indent="-215280">
+            <a:pPr marL="216000" indent="-214920">
               <a:lnSpc>
                 <a:spcPct val="100000"/>
               </a:lnSpc>
@@ -768,7 +768,7 @@
             </a:endParaRPr>
           </a:p>
           <a:p>
-            <a:pPr marL="216000" indent="-215280">
+            <a:pPr marL="216000" indent="-214920">
               <a:lnSpc>
                 <a:spcPct val="100000"/>
               </a:lnSpc>
@@ -784,7 +784,7 @@
             </a:endParaRPr>
           </a:p>
           <a:p>
-            <a:pPr marL="216000" indent="-215280">
+            <a:pPr marL="216000" indent="-214920">
               <a:lnSpc>
                 <a:spcPct val="100000"/>
               </a:lnSpc>
@@ -794,7 +794,7 @@
             </a:endParaRPr>
           </a:p>
           <a:p>
-            <a:pPr marL="216000" indent="-215280">
+            <a:pPr marL="216000" indent="-214920">
               <a:lnSpc>
                 <a:spcPct val="100000"/>
               </a:lnSpc>
@@ -810,7 +810,7 @@
             </a:endParaRPr>
           </a:p>
           <a:p>
-            <a:pPr marL="216000" indent="-215280">
+            <a:pPr marL="216000" indent="-214920">
               <a:lnSpc>
                 <a:spcPct val="100000"/>
               </a:lnSpc>
@@ -826,7 +826,7 @@
             </a:endParaRPr>
           </a:p>
           <a:p>
-            <a:pPr marL="216000" indent="-215280">
+            <a:pPr marL="216000" indent="-214920">
               <a:lnSpc>
                 <a:spcPct val="100000"/>
               </a:lnSpc>
@@ -842,7 +842,7 @@
             </a:endParaRPr>
           </a:p>
           <a:p>
-            <a:pPr marL="216000" indent="-215280">
+            <a:pPr marL="216000" indent="-214920">
               <a:lnSpc>
                 <a:spcPct val="100000"/>
               </a:lnSpc>
@@ -858,7 +858,7 @@
             </a:endParaRPr>
           </a:p>
           <a:p>
-            <a:pPr marL="216000" indent="-215280">
+            <a:pPr marL="216000" indent="-214920">
               <a:lnSpc>
                 <a:spcPct val="100000"/>
               </a:lnSpc>
@@ -874,7 +874,7 @@
             </a:endParaRPr>
           </a:p>
           <a:p>
-            <a:pPr marL="216000" indent="-215280">
+            <a:pPr marL="216000" indent="-214920">
               <a:lnSpc>
                 <a:spcPct val="100000"/>
               </a:lnSpc>
@@ -884,7 +884,7 @@
             </a:endParaRPr>
           </a:p>
           <a:p>
-            <a:pPr marL="216000" indent="-215280">
+            <a:pPr marL="216000" indent="-214920">
               <a:lnSpc>
                 <a:spcPct val="100000"/>
               </a:lnSpc>
@@ -900,7 +900,7 @@
             </a:endParaRPr>
           </a:p>
           <a:p>
-            <a:pPr marL="216000" indent="-215280">
+            <a:pPr marL="216000" indent="-214920">
               <a:lnSpc>
                 <a:spcPct val="100000"/>
               </a:lnSpc>
@@ -916,7 +916,7 @@
             </a:endParaRPr>
           </a:p>
           <a:p>
-            <a:pPr marL="216000" indent="-215280">
+            <a:pPr marL="216000" indent="-214920">
               <a:lnSpc>
                 <a:spcPct val="100000"/>
               </a:lnSpc>
@@ -932,7 +932,7 @@
             </a:endParaRPr>
           </a:p>
           <a:p>
-            <a:pPr marL="216000" indent="-215280">
+            <a:pPr marL="216000" indent="-214920">
               <a:lnSpc>
                 <a:spcPct val="100000"/>
               </a:lnSpc>
@@ -942,7 +942,7 @@
             </a:endParaRPr>
           </a:p>
           <a:p>
-            <a:pPr marL="216000" indent="-215280">
+            <a:pPr marL="216000" indent="-214920">
               <a:lnSpc>
                 <a:spcPct val="100000"/>
               </a:lnSpc>
@@ -958,7 +958,7 @@
             </a:endParaRPr>
           </a:p>
           <a:p>
-            <a:pPr marL="216000" indent="-215280">
+            <a:pPr marL="216000" indent="-214920">
               <a:lnSpc>
                 <a:spcPct val="100000"/>
               </a:lnSpc>
@@ -974,7 +974,7 @@
             </a:endParaRPr>
           </a:p>
           <a:p>
-            <a:pPr marL="216000" indent="-215280">
+            <a:pPr marL="216000" indent="-214920">
               <a:lnSpc>
                 <a:spcPct val="100000"/>
               </a:lnSpc>
@@ -990,7 +990,7 @@
             </a:endParaRPr>
           </a:p>
           <a:p>
-            <a:pPr marL="216000" indent="-215280">
+            <a:pPr marL="216000" indent="-214920">
               <a:lnSpc>
                 <a:spcPct val="100000"/>
               </a:lnSpc>
@@ -1000,7 +1000,7 @@
             </a:endParaRPr>
           </a:p>
           <a:p>
-            <a:pPr marL="216000" indent="-215280">
+            <a:pPr marL="216000" indent="-214920">
               <a:lnSpc>
                 <a:spcPct val="100000"/>
               </a:lnSpc>
@@ -1016,7 +1016,7 @@
             </a:endParaRPr>
           </a:p>
           <a:p>
-            <a:pPr marL="216000" indent="-215280">
+            <a:pPr marL="216000" indent="-214920">
               <a:lnSpc>
                 <a:spcPct val="100000"/>
               </a:lnSpc>
@@ -1032,7 +1032,7 @@
             </a:endParaRPr>
           </a:p>
           <a:p>
-            <a:pPr marL="216000" indent="-215280">
+            <a:pPr marL="216000" indent="-214920">
               <a:lnSpc>
                 <a:spcPct val="100000"/>
               </a:lnSpc>
@@ -1048,7 +1048,7 @@
             </a:endParaRPr>
           </a:p>
           <a:p>
-            <a:pPr marL="216000" indent="-215280">
+            <a:pPr marL="216000" indent="-214920">
               <a:lnSpc>
                 <a:spcPct val="100000"/>
               </a:lnSpc>
@@ -1064,7 +1064,7 @@
             </a:endParaRPr>
           </a:p>
           <a:p>
-            <a:pPr marL="216000" indent="-215280">
+            <a:pPr marL="216000" indent="-214920">
               <a:lnSpc>
                 <a:spcPct val="100000"/>
               </a:lnSpc>
@@ -1074,7 +1074,7 @@
             </a:endParaRPr>
           </a:p>
           <a:p>
-            <a:pPr marL="216000" indent="-215280">
+            <a:pPr marL="216000" indent="-214920">
               <a:lnSpc>
                 <a:spcPct val="100000"/>
               </a:lnSpc>
@@ -1090,7 +1090,7 @@
             </a:endParaRPr>
           </a:p>
           <a:p>
-            <a:pPr marL="216000" indent="-215280">
+            <a:pPr marL="216000" indent="-214920">
               <a:lnSpc>
                 <a:spcPct val="100000"/>
               </a:lnSpc>
@@ -1107,7 +1107,7 @@
             </a:endParaRPr>
           </a:p>
           <a:p>
-            <a:pPr marL="216000" indent="-215280">
+            <a:pPr marL="216000" indent="-214920">
               <a:lnSpc>
                 <a:spcPct val="100000"/>
               </a:lnSpc>
@@ -1124,7 +1124,7 @@
             </a:endParaRPr>
           </a:p>
           <a:p>
-            <a:pPr marL="216000" indent="-215280">
+            <a:pPr marL="216000" indent="-214920">
               <a:lnSpc>
                 <a:spcPct val="100000"/>
               </a:lnSpc>
@@ -1141,7 +1141,7 @@
             </a:endParaRPr>
           </a:p>
           <a:p>
-            <a:pPr marL="216000" indent="-215280">
+            <a:pPr marL="216000" indent="-214920">
               <a:lnSpc>
                 <a:spcPct val="100000"/>
               </a:lnSpc>
@@ -1151,7 +1151,7 @@
             </a:endParaRPr>
           </a:p>
           <a:p>
-            <a:pPr marL="216000" indent="-215280">
+            <a:pPr marL="216000" indent="-214920">
               <a:lnSpc>
                 <a:spcPct val="100000"/>
               </a:lnSpc>
@@ -1168,7 +1168,7 @@
             </a:endParaRPr>
           </a:p>
           <a:p>
-            <a:pPr marL="216000" indent="-215280">
+            <a:pPr marL="216000" indent="-214920">
               <a:lnSpc>
                 <a:spcPct val="100000"/>
               </a:lnSpc>
@@ -1185,7 +1185,7 @@
             </a:endParaRPr>
           </a:p>
           <a:p>
-            <a:pPr marL="216000" indent="-215280">
+            <a:pPr marL="216000" indent="-214920">
               <a:lnSpc>
                 <a:spcPct val="100000"/>
               </a:lnSpc>
@@ -1195,7 +1195,7 @@
             </a:endParaRPr>
           </a:p>
           <a:p>
-            <a:pPr marL="216000" indent="-215280">
+            <a:pPr marL="216000" indent="-214920">
               <a:lnSpc>
                 <a:spcPct val="100000"/>
               </a:lnSpc>
@@ -1205,7 +1205,7 @@
             </a:endParaRPr>
           </a:p>
           <a:p>
-            <a:pPr marL="216000" indent="-215280">
+            <a:pPr marL="216000" indent="-214920">
               <a:lnSpc>
                 <a:spcPct val="100000"/>
               </a:lnSpc>
@@ -1215,7 +1215,7 @@
             </a:endParaRPr>
           </a:p>
           <a:p>
-            <a:pPr marL="216000" indent="-215280">
+            <a:pPr marL="216000" indent="-214920">
               <a:lnSpc>
                 <a:spcPct val="100000"/>
               </a:lnSpc>
@@ -1225,7 +1225,7 @@
             </a:endParaRPr>
           </a:p>
           <a:p>
-            <a:pPr marL="216000" indent="-215280">
+            <a:pPr marL="216000" indent="-214920">
               <a:lnSpc>
                 <a:spcPct val="100000"/>
               </a:lnSpc>
@@ -1245,7 +1245,7 @@
         <p:spPr>
           <a:xfrm>
             <a:off x="3884760" y="8685360"/>
-            <a:ext cx="2970360" cy="457200"/>
+            <a:ext cx="2970000" cy="456840"/>
           </a:xfrm>
           <a:prstGeom prst="rect">
             <a:avLst/>
@@ -1269,7 +1269,7 @@
                 <a:spcPct val="100000"/>
               </a:lnSpc>
             </a:pPr>
-            <a:fld id="{C5298413-480B-4DD9-856B-2E165C1590A5}" type="slidenum">
+            <a:fld id="{29E7C6BF-F49D-4E0F-8E1D-DA77FC0F0BFC}" type="slidenum">
               <a:rPr b="0" lang="fr-FR" sz="1200" spc="-1" strike="noStrike">
                 <a:solidFill>
                   <a:srgbClr val="000000"/>
@@ -1319,7 +1319,7 @@
         <p:spPr>
           <a:xfrm>
             <a:off x="685800" y="1143000"/>
-            <a:ext cx="5484960" cy="3084840"/>
+            <a:ext cx="5484600" cy="3084480"/>
           </a:xfrm>
           <a:prstGeom prst="rect">
             <a:avLst/>
@@ -1339,7 +1339,7 @@
         <p:spPr>
           <a:xfrm>
             <a:off x="685800" y="4400640"/>
-            <a:ext cx="5484960" cy="3598920"/>
+            <a:ext cx="5484600" cy="3598560"/>
           </a:xfrm>
           <a:prstGeom prst="rect">
             <a:avLst/>
@@ -1363,7 +1363,7 @@
         <p:spPr>
           <a:xfrm>
             <a:off x="3884760" y="8685360"/>
-            <a:ext cx="2970360" cy="457200"/>
+            <a:ext cx="2970000" cy="456840"/>
           </a:xfrm>
           <a:prstGeom prst="rect">
             <a:avLst/>
@@ -1387,7 +1387,7 @@
                 <a:spcPct val="100000"/>
               </a:lnSpc>
             </a:pPr>
-            <a:fld id="{B1905C72-210F-424C-ACBD-6833A06495DF}" type="slidenum">
+            <a:fld id="{4EC2C2BA-637B-4BE9-B38D-177C6298A084}" type="slidenum">
               <a:rPr b="0" lang="fr-FR" sz="1200" spc="-1" strike="noStrike">
                 <a:solidFill>
                   <a:srgbClr val="000000"/>
@@ -1437,7 +1437,7 @@
         <p:spPr>
           <a:xfrm>
             <a:off x="380880" y="694800"/>
-            <a:ext cx="6095520" cy="3428640"/>
+            <a:ext cx="6095160" cy="3428280"/>
           </a:xfrm>
           <a:prstGeom prst="rect">
             <a:avLst/>
@@ -1457,7 +1457,7 @@
         <p:spPr>
           <a:xfrm>
             <a:off x="685800" y="4343400"/>
-            <a:ext cx="5486040" cy="4114440"/>
+            <a:ext cx="5485680" cy="4114080"/>
           </a:xfrm>
           <a:prstGeom prst="rect">
             <a:avLst/>
@@ -1466,12 +1466,43 @@
         <p:txBody>
           <a:bodyPr lIns="0" rIns="0" tIns="0" bIns="0"/>
           <a:p>
+            <a:pPr marL="216000" indent="-216000">
+              <a:lnSpc>
+                <a:spcPct val="100000"/>
+              </a:lnSpc>
+            </a:pPr>
             <a:r>
               <a:rPr b="0" lang="fr-FR" sz="2000" spc="-1" strike="noStrike">
                 <a:latin typeface="Arial"/>
               </a:rPr>
               <a:t>Now I’m going to explain you how RL works really. Giving the past example with the cat, imagine you have the cat here as the agent</a:t>
             </a:r>
+            <a:endParaRPr b="0" lang="fr-FR" sz="2000" spc="-1" strike="noStrike">
+              <a:latin typeface="Arial"/>
+            </a:endParaRPr>
+          </a:p>
+          <a:p>
+            <a:pPr marL="216000" indent="-216000">
+              <a:lnSpc>
+                <a:spcPct val="100000"/>
+              </a:lnSpc>
+            </a:pPr>
+            <a:r>
+              <a:rPr b="0" lang="fr-FR" sz="2000" spc="-1" strike="noStrike">
+                <a:latin typeface="Arial"/>
+              </a:rPr>
+              <a:t>Then we have the observer as the state, it calculates the probability for the cat (agent) to have a reward (leave) or not</a:t>
+            </a:r>
+            <a:endParaRPr b="0" lang="fr-FR" sz="2000" spc="-1" strike="noStrike">
+              <a:latin typeface="Arial"/>
+            </a:endParaRPr>
+          </a:p>
+          <a:p>
+            <a:pPr marL="216000" indent="-216000">
+              <a:lnSpc>
+                <a:spcPct val="100000"/>
+              </a:lnSpc>
+            </a:pPr>
             <a:endParaRPr b="0" lang="fr-FR" sz="2000" spc="-1" strike="noStrike">
               <a:latin typeface="Arial"/>
             </a:endParaRPr>
@@ -5215,7 +5246,7 @@
         <p:spPr>
           <a:xfrm>
             <a:off x="0" y="0"/>
-            <a:ext cx="12190680" cy="6856560"/>
+            <a:ext cx="12190320" cy="6856200"/>
           </a:xfrm>
           <a:prstGeom prst="rect">
             <a:avLst/>
@@ -5247,8 +5278,8 @@
         </p:nvSpPr>
         <p:spPr>
           <a:xfrm flipV="1">
-            <a:off x="0" y="-1440"/>
-            <a:ext cx="12187440" cy="6856560"/>
+            <a:off x="0" y="-2160"/>
+            <a:ext cx="12187080" cy="6856200"/>
           </a:xfrm>
           <a:prstGeom prst="snip1Rect">
             <a:avLst>
@@ -5303,7 +5334,7 @@
         <p:spPr>
           <a:xfrm>
             <a:off x="684360" y="685800"/>
-            <a:ext cx="9677520" cy="3672000"/>
+            <a:ext cx="9677160" cy="3671640"/>
           </a:xfrm>
           <a:prstGeom prst="rect">
             <a:avLst/>
@@ -5354,7 +5385,7 @@
         <p:spPr>
           <a:xfrm>
             <a:off x="684360" y="4648320"/>
-            <a:ext cx="7004160" cy="1141560"/>
+            <a:ext cx="7003800" cy="1141200"/>
           </a:xfrm>
           <a:prstGeom prst="rect">
             <a:avLst/>
@@ -5492,7 +5523,7 @@
         <p:spPr>
           <a:xfrm>
             <a:off x="684360" y="4487400"/>
-            <a:ext cx="8533080" cy="1505520"/>
+            <a:ext cx="8532720" cy="1505160"/>
           </a:xfrm>
           <a:prstGeom prst="rect">
             <a:avLst/>
@@ -5541,7 +5572,7 @@
         <p:spPr>
           <a:xfrm>
             <a:off x="684360" y="685800"/>
-            <a:ext cx="8533080" cy="3613680"/>
+            <a:ext cx="8532720" cy="3613320"/>
           </a:xfrm>
           <a:prstGeom prst="rect">
             <a:avLst/>
@@ -5560,7 +5591,7 @@
         <p:txBody>
           <a:bodyPr lIns="90000" rIns="90000" tIns="45000" bIns="45000" anchor="ctr"/>
           <a:p>
-            <a:pPr marL="285840" indent="-284400">
+            <a:pPr marL="285840" indent="-284040">
               <a:lnSpc>
                 <a:spcPct val="100000"/>
               </a:lnSpc>
@@ -5692,7 +5723,7 @@
             </a:endParaRPr>
           </a:p>
           <a:p>
-            <a:pPr marL="285840" indent="-284400">
+            <a:pPr marL="285840" indent="-284040">
               <a:lnSpc>
                 <a:spcPct val="100000"/>
               </a:lnSpc>
@@ -5738,7 +5769,7 @@
         <p:spPr>
           <a:xfrm>
             <a:off x="4733640" y="3979440"/>
-            <a:ext cx="912960" cy="912960"/>
+            <a:ext cx="912600" cy="912600"/>
           </a:xfrm>
           <a:prstGeom prst="rect">
             <a:avLst/>
@@ -5761,7 +5792,7 @@
         <p:spPr>
           <a:xfrm>
             <a:off x="6825960" y="4030200"/>
-            <a:ext cx="912960" cy="912960"/>
+            <a:ext cx="912600" cy="912600"/>
           </a:xfrm>
           <a:prstGeom prst="rect">
             <a:avLst/>
@@ -5784,7 +5815,7 @@
         <p:spPr>
           <a:xfrm>
             <a:off x="5354640" y="2725920"/>
-            <a:ext cx="912960" cy="912960"/>
+            <a:ext cx="912600" cy="912600"/>
           </a:xfrm>
           <a:prstGeom prst="rect">
             <a:avLst/>
@@ -5807,7 +5838,7 @@
         <p:spPr>
           <a:xfrm>
             <a:off x="8550000" y="3433320"/>
-            <a:ext cx="912960" cy="912960"/>
+            <a:ext cx="912600" cy="912600"/>
           </a:xfrm>
           <a:prstGeom prst="rect">
             <a:avLst/>
@@ -5830,7 +5861,7 @@
         <p:spPr>
           <a:xfrm>
             <a:off x="5153040" y="5079960"/>
-            <a:ext cx="912960" cy="912960"/>
+            <a:ext cx="912600" cy="912600"/>
           </a:xfrm>
           <a:prstGeom prst="rect">
             <a:avLst/>
@@ -5848,8 +5879,8 @@
         </p:nvSpPr>
         <p:spPr>
           <a:xfrm rot="3732600">
-            <a:off x="7993800" y="3764520"/>
-            <a:ext cx="202680" cy="668520"/>
+            <a:off x="7994160" y="3764520"/>
+            <a:ext cx="202320" cy="668160"/>
           </a:xfrm>
           <a:prstGeom prst="downArrow">
             <a:avLst>
@@ -5887,8 +5918,8 @@
         </p:nvSpPr>
         <p:spPr>
           <a:xfrm rot="14618400">
-            <a:off x="6344280" y="4762800"/>
-            <a:ext cx="202680" cy="668520"/>
+            <a:off x="6344280" y="4763160"/>
+            <a:ext cx="202320" cy="668160"/>
           </a:xfrm>
           <a:prstGeom prst="downArrow">
             <a:avLst>
@@ -5926,8 +5957,8 @@
         </p:nvSpPr>
         <p:spPr>
           <a:xfrm rot="5400000">
-            <a:off x="6190200" y="4132800"/>
-            <a:ext cx="202680" cy="668520"/>
+            <a:off x="6190560" y="4132800"/>
+            <a:ext cx="202320" cy="668160"/>
           </a:xfrm>
           <a:prstGeom prst="downArrow">
             <a:avLst>
@@ -5965,8 +5996,8 @@
         </p:nvSpPr>
         <p:spPr>
           <a:xfrm rot="7014000">
-            <a:off x="6423840" y="3552840"/>
-            <a:ext cx="202680" cy="668520"/>
+            <a:off x="6424200" y="3552840"/>
+            <a:ext cx="202320" cy="668160"/>
           </a:xfrm>
           <a:prstGeom prst="downArrow">
             <a:avLst>
@@ -6004,8 +6035,8 @@
         </p:nvSpPr>
         <p:spPr>
           <a:xfrm rot="1747800">
-            <a:off x="5088600" y="3304080"/>
-            <a:ext cx="202680" cy="668520"/>
+            <a:off x="5088600" y="3303720"/>
+            <a:ext cx="202320" cy="668160"/>
           </a:xfrm>
           <a:prstGeom prst="downArrow">
             <a:avLst>
@@ -6093,7 +6124,7 @@
         <p:spPr>
           <a:xfrm>
             <a:off x="6868080" y="306720"/>
-            <a:ext cx="5042520" cy="2084400"/>
+            <a:ext cx="5042160" cy="2084040"/>
           </a:xfrm>
           <a:prstGeom prst="rect">
             <a:avLst/>
@@ -6136,7 +6167,7 @@
         <p:spPr>
           <a:xfrm>
             <a:off x="6271200" y="2669400"/>
-            <a:ext cx="5631480" cy="3007440"/>
+            <a:ext cx="5631120" cy="3007080"/>
           </a:xfrm>
           <a:prstGeom prst="rect">
             <a:avLst/>
@@ -6181,7 +6212,7 @@
         <p:spPr>
           <a:xfrm>
             <a:off x="129960" y="5709960"/>
-            <a:ext cx="11181960" cy="1088640"/>
+            <a:ext cx="11181600" cy="1088280"/>
           </a:xfrm>
           <a:prstGeom prst="rect">
             <a:avLst/>
@@ -6226,7 +6257,7 @@
         <p:spPr>
           <a:xfrm>
             <a:off x="207000" y="1787400"/>
-            <a:ext cx="5593320" cy="3226680"/>
+            <a:ext cx="5592960" cy="3226320"/>
           </a:xfrm>
           <a:prstGeom prst="rect">
             <a:avLst/>
@@ -6271,7 +6302,7 @@
         <p:spPr>
           <a:xfrm>
             <a:off x="684360" y="4487400"/>
-            <a:ext cx="8533080" cy="1505520"/>
+            <a:ext cx="8532720" cy="1505160"/>
           </a:xfrm>
           <a:prstGeom prst="rect">
             <a:avLst/>
@@ -6320,7 +6351,7 @@
         <p:spPr>
           <a:xfrm>
             <a:off x="684360" y="685800"/>
-            <a:ext cx="8533080" cy="3613680"/>
+            <a:ext cx="8532720" cy="3613320"/>
           </a:xfrm>
           <a:prstGeom prst="rect">
             <a:avLst/>
@@ -6339,7 +6370,7 @@
         <p:txBody>
           <a:bodyPr lIns="90000" rIns="90000" tIns="45000" bIns="45000" anchor="ctr"/>
           <a:p>
-            <a:pPr marL="285840" indent="-284400">
+            <a:pPr marL="285840" indent="-284040">
               <a:lnSpc>
                 <a:spcPct val="100000"/>
               </a:lnSpc>
@@ -6391,7 +6422,7 @@
             </a:endParaRPr>
           </a:p>
           <a:p>
-            <a:pPr marL="285840" indent="-284400">
+            <a:pPr marL="285840" indent="-284040">
               <a:lnSpc>
                 <a:spcPct val="100000"/>
               </a:lnSpc>
@@ -6433,7 +6464,7 @@
             </a:endParaRPr>
           </a:p>
           <a:p>
-            <a:pPr marL="285840" indent="-284400">
+            <a:pPr marL="285840" indent="-284040">
               <a:lnSpc>
                 <a:spcPct val="100000"/>
               </a:lnSpc>
@@ -6485,7 +6516,7 @@
             </a:endParaRPr>
           </a:p>
           <a:p>
-            <a:pPr marL="285840" indent="-284400">
+            <a:pPr marL="285840" indent="-284040">
               <a:lnSpc>
                 <a:spcPct val="100000"/>
               </a:lnSpc>
@@ -6653,7 +6684,7 @@
         <p:spPr>
           <a:xfrm>
             <a:off x="4629600" y="1832040"/>
-            <a:ext cx="853200" cy="853200"/>
+            <a:ext cx="852840" cy="852840"/>
           </a:xfrm>
           <a:prstGeom prst="rect">
             <a:avLst/>
@@ -6676,7 +6707,7 @@
         <p:spPr>
           <a:xfrm>
             <a:off x="4463640" y="4185360"/>
-            <a:ext cx="1179720" cy="471960"/>
+            <a:ext cx="1179360" cy="471600"/>
           </a:xfrm>
           <a:prstGeom prst="rect">
             <a:avLst/>
@@ -6699,7 +6730,7 @@
         <p:spPr>
           <a:xfrm>
             <a:off x="4586040" y="2785680"/>
-            <a:ext cx="896760" cy="1038960"/>
+            <a:ext cx="896400" cy="1038600"/>
           </a:xfrm>
           <a:prstGeom prst="rect">
             <a:avLst/>
@@ -6722,7 +6753,7 @@
         <p:spPr>
           <a:xfrm>
             <a:off x="250560" y="1953720"/>
-            <a:ext cx="912960" cy="912960"/>
+            <a:ext cx="912600" cy="912600"/>
           </a:xfrm>
           <a:prstGeom prst="rect">
             <a:avLst/>
@@ -6745,7 +6776,7 @@
         <p:spPr>
           <a:xfrm>
             <a:off x="271440" y="3259800"/>
-            <a:ext cx="912960" cy="912960"/>
+            <a:ext cx="912600" cy="912600"/>
           </a:xfrm>
           <a:prstGeom prst="rect">
             <a:avLst/>
@@ -6768,7 +6799,7 @@
         <p:spPr>
           <a:xfrm>
             <a:off x="2440800" y="2741040"/>
-            <a:ext cx="912960" cy="912960"/>
+            <a:ext cx="912600" cy="912600"/>
           </a:xfrm>
           <a:prstGeom prst="rect">
             <a:avLst/>
@@ -6787,7 +6818,7 @@
         <p:spPr>
           <a:xfrm rot="1192200">
             <a:off x="1579320" y="2561760"/>
-            <a:ext cx="977040" cy="483120"/>
+            <a:ext cx="976680" cy="482760"/>
           </a:xfrm>
           <a:prstGeom prst="rightArrow">
             <a:avLst>
@@ -6829,7 +6860,7 @@
         <p:spPr>
           <a:xfrm rot="20407800">
             <a:off x="1559160" y="3348360"/>
-            <a:ext cx="977040" cy="483120"/>
+            <a:ext cx="976680" cy="482760"/>
           </a:xfrm>
           <a:prstGeom prst="rightArrow">
             <a:avLst>
@@ -6871,7 +6902,7 @@
         <p:spPr>
           <a:xfrm rot="1192200">
             <a:off x="3332880" y="3670200"/>
-            <a:ext cx="977040" cy="483120"/>
+            <a:ext cx="976680" cy="482760"/>
           </a:xfrm>
           <a:prstGeom prst="rightArrow">
             <a:avLst>
@@ -6913,7 +6944,7 @@
         <p:spPr>
           <a:xfrm rot="20407800">
             <a:off x="3407400" y="2343960"/>
-            <a:ext cx="977040" cy="483120"/>
+            <a:ext cx="976680" cy="482760"/>
           </a:xfrm>
           <a:prstGeom prst="rightArrow">
             <a:avLst>
@@ -6955,7 +6986,7 @@
         <p:spPr>
           <a:xfrm>
             <a:off x="3483720" y="3004200"/>
-            <a:ext cx="977040" cy="483120"/>
+            <a:ext cx="976680" cy="482760"/>
           </a:xfrm>
           <a:prstGeom prst="rightArrow">
             <a:avLst>
@@ -7001,7 +7032,7 @@
         <p:spPr>
           <a:xfrm>
             <a:off x="5819760" y="5709960"/>
-            <a:ext cx="912960" cy="912960"/>
+            <a:ext cx="912600" cy="912600"/>
           </a:xfrm>
           <a:prstGeom prst="rect">
             <a:avLst/>
@@ -7024,7 +7055,7 @@
         <p:spPr>
           <a:xfrm>
             <a:off x="2060640" y="5759640"/>
-            <a:ext cx="912960" cy="912960"/>
+            <a:ext cx="912600" cy="912600"/>
           </a:xfrm>
           <a:prstGeom prst="rect">
             <a:avLst/>
@@ -7047,7 +7078,7 @@
         <p:spPr>
           <a:xfrm>
             <a:off x="9383040" y="5709960"/>
-            <a:ext cx="912960" cy="912960"/>
+            <a:ext cx="912600" cy="912600"/>
           </a:xfrm>
           <a:prstGeom prst="rect">
             <a:avLst/>
@@ -7070,7 +7101,7 @@
         <p:spPr>
           <a:xfrm>
             <a:off x="7495920" y="5709960"/>
-            <a:ext cx="912960" cy="912960"/>
+            <a:ext cx="912600" cy="912600"/>
           </a:xfrm>
           <a:prstGeom prst="rect">
             <a:avLst/>
@@ -7093,7 +7124,7 @@
         <p:spPr>
           <a:xfrm>
             <a:off x="4004640" y="5709960"/>
-            <a:ext cx="912960" cy="912960"/>
+            <a:ext cx="912600" cy="912600"/>
           </a:xfrm>
           <a:prstGeom prst="rect">
             <a:avLst/>
@@ -7116,7 +7147,7 @@
         <p:spPr>
           <a:xfrm>
             <a:off x="276120" y="5759640"/>
-            <a:ext cx="912960" cy="912960"/>
+            <a:ext cx="912600" cy="912600"/>
           </a:xfrm>
           <a:prstGeom prst="rect">
             <a:avLst/>
@@ -7135,7 +7166,7 @@
         <p:spPr>
           <a:xfrm>
             <a:off x="1230120" y="6098760"/>
-            <a:ext cx="681480" cy="260640"/>
+            <a:ext cx="681120" cy="260280"/>
           </a:xfrm>
           <a:prstGeom prst="rightArrow">
             <a:avLst>
@@ -7174,7 +7205,7 @@
         <p:spPr>
           <a:xfrm>
             <a:off x="3103920" y="6117480"/>
-            <a:ext cx="681480" cy="260640"/>
+            <a:ext cx="681120" cy="260280"/>
           </a:xfrm>
           <a:prstGeom prst="rightArrow">
             <a:avLst>
@@ -7213,7 +7244,7 @@
         <p:spPr>
           <a:xfrm>
             <a:off x="4958640" y="6109200"/>
-            <a:ext cx="681480" cy="260640"/>
+            <a:ext cx="681120" cy="260280"/>
           </a:xfrm>
           <a:prstGeom prst="rightArrow">
             <a:avLst>
@@ -7252,7 +7283,7 @@
         <p:spPr>
           <a:xfrm>
             <a:off x="6754320" y="6098760"/>
-            <a:ext cx="681480" cy="260640"/>
+            <a:ext cx="681120" cy="260280"/>
           </a:xfrm>
           <a:prstGeom prst="rightArrow">
             <a:avLst>
@@ -7291,7 +7322,7 @@
         <p:spPr>
           <a:xfrm>
             <a:off x="8468280" y="6085800"/>
-            <a:ext cx="681480" cy="260640"/>
+            <a:ext cx="681120" cy="260280"/>
           </a:xfrm>
           <a:prstGeom prst="rightArrow">
             <a:avLst>
@@ -7334,7 +7365,7 @@
         <p:spPr>
           <a:xfrm>
             <a:off x="6582600" y="3915000"/>
-            <a:ext cx="912960" cy="912960"/>
+            <a:ext cx="912600" cy="912600"/>
           </a:xfrm>
           <a:prstGeom prst="rect">
             <a:avLst/>
@@ -7357,7 +7388,7 @@
         <p:spPr>
           <a:xfrm>
             <a:off x="8674920" y="3965760"/>
-            <a:ext cx="912960" cy="912960"/>
+            <a:ext cx="912600" cy="912600"/>
           </a:xfrm>
           <a:prstGeom prst="rect">
             <a:avLst/>
@@ -7380,7 +7411,7 @@
         <p:spPr>
           <a:xfrm>
             <a:off x="7203600" y="2661480"/>
-            <a:ext cx="912960" cy="912960"/>
+            <a:ext cx="912600" cy="912600"/>
           </a:xfrm>
           <a:prstGeom prst="rect">
             <a:avLst/>
@@ -7403,7 +7434,7 @@
         <p:spPr>
           <a:xfrm>
             <a:off x="10398960" y="3368880"/>
-            <a:ext cx="912960" cy="912960"/>
+            <a:ext cx="912600" cy="912600"/>
           </a:xfrm>
           <a:prstGeom prst="rect">
             <a:avLst/>
@@ -7426,7 +7457,7 @@
         <p:spPr>
           <a:xfrm>
             <a:off x="7002000" y="5015520"/>
-            <a:ext cx="912960" cy="912960"/>
+            <a:ext cx="912600" cy="912600"/>
           </a:xfrm>
           <a:prstGeom prst="rect">
             <a:avLst/>
@@ -7444,8 +7475,8 @@
         </p:nvSpPr>
         <p:spPr>
           <a:xfrm rot="3732600">
-            <a:off x="9843120" y="3700440"/>
-            <a:ext cx="202680" cy="668520"/>
+            <a:off x="9843480" y="3700440"/>
+            <a:ext cx="202320" cy="668160"/>
           </a:xfrm>
           <a:prstGeom prst="downArrow">
             <a:avLst>
@@ -7483,8 +7514,8 @@
         </p:nvSpPr>
         <p:spPr>
           <a:xfrm rot="14618400">
-            <a:off x="8193240" y="4698720"/>
-            <a:ext cx="202680" cy="668520"/>
+            <a:off x="8193240" y="4699080"/>
+            <a:ext cx="202320" cy="668160"/>
           </a:xfrm>
           <a:prstGeom prst="downArrow">
             <a:avLst>
@@ -7522,8 +7553,8 @@
         </p:nvSpPr>
         <p:spPr>
           <a:xfrm rot="5400000">
-            <a:off x="8039160" y="4068360"/>
-            <a:ext cx="202680" cy="668520"/>
+            <a:off x="8039520" y="4068360"/>
+            <a:ext cx="202320" cy="668160"/>
           </a:xfrm>
           <a:prstGeom prst="downArrow">
             <a:avLst>
@@ -7561,8 +7592,8 @@
         </p:nvSpPr>
         <p:spPr>
           <a:xfrm rot="7014000">
-            <a:off x="8273160" y="3488400"/>
-            <a:ext cx="202680" cy="668520"/>
+            <a:off x="8273520" y="3488400"/>
+            <a:ext cx="202320" cy="668160"/>
           </a:xfrm>
           <a:prstGeom prst="downArrow">
             <a:avLst>
@@ -7600,8 +7631,8 @@
         </p:nvSpPr>
         <p:spPr>
           <a:xfrm rot="1747800">
-            <a:off x="7095600" y="3426120"/>
-            <a:ext cx="202680" cy="668520"/>
+            <a:off x="7095600" y="3425760"/>
+            <a:ext cx="202320" cy="668160"/>
           </a:xfrm>
           <a:prstGeom prst="downArrow">
             <a:avLst>
@@ -7644,7 +7675,7 @@
         <p:spPr>
           <a:xfrm>
             <a:off x="8641080" y="309600"/>
-            <a:ext cx="912960" cy="912960"/>
+            <a:ext cx="912600" cy="912600"/>
           </a:xfrm>
           <a:prstGeom prst="rect">
             <a:avLst/>
@@ -7667,7 +7698,7 @@
         <p:spPr>
           <a:xfrm>
             <a:off x="10568880" y="1497240"/>
-            <a:ext cx="912960" cy="912960"/>
+            <a:ext cx="912600" cy="912600"/>
           </a:xfrm>
           <a:prstGeom prst="rect">
             <a:avLst/>
@@ -7690,7 +7721,7 @@
         <p:spPr>
           <a:xfrm>
             <a:off x="6932880" y="1497240"/>
-            <a:ext cx="912960" cy="912960"/>
+            <a:ext cx="912600" cy="912600"/>
           </a:xfrm>
           <a:prstGeom prst="rect">
             <a:avLst/>
@@ -7709,7 +7740,7 @@
         <p:spPr>
           <a:xfrm>
             <a:off x="8173800" y="1774080"/>
-            <a:ext cx="2067120" cy="359280"/>
+            <a:ext cx="2066760" cy="358920"/>
           </a:xfrm>
           <a:prstGeom prst="rightArrow">
             <a:avLst>
@@ -7748,7 +7779,7 @@
         <p:spPr>
           <a:xfrm>
             <a:off x="8947440" y="1361160"/>
-            <a:ext cx="300240" cy="405720"/>
+            <a:ext cx="299880" cy="405360"/>
           </a:xfrm>
           <a:prstGeom prst="downArrow">
             <a:avLst>
@@ -7836,7 +7867,7 @@
         <p:spPr>
           <a:xfrm>
             <a:off x="0" y="0"/>
-            <a:ext cx="12190680" cy="6856560"/>
+            <a:ext cx="12190320" cy="6856200"/>
           </a:xfrm>
           <a:prstGeom prst="rect">
             <a:avLst/>
@@ -7889,7 +7920,7 @@
         <p:spPr>
           <a:xfrm>
             <a:off x="640440" y="685800"/>
-            <a:ext cx="4817160" cy="4602240"/>
+            <a:ext cx="4816800" cy="4601880"/>
           </a:xfrm>
           <a:prstGeom prst="rect">
             <a:avLst/>
@@ -7940,7 +7971,7 @@
         <p:spPr>
           <a:xfrm>
             <a:off x="6095880" y="0"/>
-            <a:ext cx="6094440" cy="6856560"/>
+            <a:ext cx="6094080" cy="6856200"/>
           </a:xfrm>
           <a:prstGeom prst="rect">
             <a:avLst/>
@@ -7978,7 +8009,7 @@
         <p:spPr>
           <a:xfrm>
             <a:off x="6625800" y="685800"/>
-            <a:ext cx="4877640" cy="4602240"/>
+            <a:ext cx="4877280" cy="4601880"/>
           </a:xfrm>
           <a:prstGeom prst="rect">
             <a:avLst/>
@@ -7999,7 +8030,7 @@
             <a:normAutofit/>
           </a:bodyPr>
           <a:p>
-            <a:pPr marL="285840" indent="-284400">
+            <a:pPr marL="285840" indent="-284040">
               <a:lnSpc>
                 <a:spcPct val="100000"/>
               </a:lnSpc>
@@ -8031,7 +8062,7 @@
             </a:endParaRPr>
           </a:p>
           <a:p>
-            <a:pPr marL="285840" indent="-284400">
+            <a:pPr marL="285840" indent="-284040">
               <a:lnSpc>
                 <a:spcPct val="100000"/>
               </a:lnSpc>
@@ -8063,7 +8094,7 @@
             </a:endParaRPr>
           </a:p>
           <a:p>
-            <a:pPr marL="285840" indent="-284400">
+            <a:pPr marL="285840" indent="-284040">
               <a:lnSpc>
                 <a:spcPct val="100000"/>
               </a:lnSpc>
@@ -8095,7 +8126,7 @@
             </a:endParaRPr>
           </a:p>
           <a:p>
-            <a:pPr marL="285840" indent="-284400">
+            <a:pPr marL="285840" indent="-284040">
               <a:lnSpc>
                 <a:spcPct val="100000"/>
               </a:lnSpc>
@@ -8127,7 +8158,7 @@
             </a:endParaRPr>
           </a:p>
           <a:p>
-            <a:pPr marL="285840" indent="-284400">
+            <a:pPr marL="285840" indent="-284040">
               <a:lnSpc>
                 <a:spcPct val="100000"/>
               </a:lnSpc>
@@ -8191,7 +8222,7 @@
         <p:spPr>
           <a:xfrm>
             <a:off x="684360" y="4487400"/>
-            <a:ext cx="8533080" cy="1505520"/>
+            <a:ext cx="8532720" cy="1505160"/>
           </a:xfrm>
           <a:prstGeom prst="rect">
             <a:avLst/>
@@ -8240,7 +8271,7 @@
         <p:spPr>
           <a:xfrm>
             <a:off x="684360" y="685800"/>
-            <a:ext cx="8533080" cy="3613680"/>
+            <a:ext cx="8532720" cy="3613320"/>
           </a:xfrm>
           <a:prstGeom prst="rect">
             <a:avLst/>
@@ -8259,7 +8290,7 @@
         <p:txBody>
           <a:bodyPr lIns="90000" rIns="90000" tIns="45000" bIns="45000" anchor="ctr"/>
           <a:p>
-            <a:pPr marL="285840" indent="-284400">
+            <a:pPr marL="285840" indent="-284040">
               <a:lnSpc>
                 <a:spcPct val="100000"/>
               </a:lnSpc>
@@ -8291,7 +8322,7 @@
             </a:endParaRPr>
           </a:p>
           <a:p>
-            <a:pPr marL="285840" indent="-284400">
+            <a:pPr marL="285840" indent="-284040">
               <a:lnSpc>
                 <a:spcPct val="100000"/>
               </a:lnSpc>
@@ -8401,7 +8432,7 @@
         <p:spPr>
           <a:xfrm>
             <a:off x="6995520" y="1949760"/>
-            <a:ext cx="853200" cy="853200"/>
+            <a:ext cx="852840" cy="852840"/>
           </a:xfrm>
           <a:prstGeom prst="rect">
             <a:avLst/>
@@ -8424,7 +8455,7 @@
         <p:spPr>
           <a:xfrm>
             <a:off x="6829560" y="4303080"/>
-            <a:ext cx="1179720" cy="471960"/>
+            <a:ext cx="1179360" cy="471600"/>
           </a:xfrm>
           <a:prstGeom prst="rect">
             <a:avLst/>
@@ -8447,7 +8478,7 @@
         <p:spPr>
           <a:xfrm>
             <a:off x="6951960" y="2903040"/>
-            <a:ext cx="896760" cy="1038960"/>
+            <a:ext cx="896400" cy="1038600"/>
           </a:xfrm>
           <a:prstGeom prst="rect">
             <a:avLst/>
@@ -8470,7 +8501,7 @@
         <p:spPr>
           <a:xfrm>
             <a:off x="2616120" y="2071080"/>
-            <a:ext cx="912960" cy="912960"/>
+            <a:ext cx="912600" cy="912600"/>
           </a:xfrm>
           <a:prstGeom prst="rect">
             <a:avLst/>
@@ -8493,7 +8524,7 @@
         <p:spPr>
           <a:xfrm>
             <a:off x="2637000" y="3377160"/>
-            <a:ext cx="912960" cy="912960"/>
+            <a:ext cx="912600" cy="912600"/>
           </a:xfrm>
           <a:prstGeom prst="rect">
             <a:avLst/>
@@ -8512,7 +8543,7 @@
         <p:spPr>
           <a:xfrm rot="1192200">
             <a:off x="3944880" y="2679120"/>
-            <a:ext cx="977040" cy="483120"/>
+            <a:ext cx="976680" cy="482760"/>
           </a:xfrm>
           <a:prstGeom prst="rightArrow">
             <a:avLst>
@@ -8554,7 +8585,7 @@
         <p:spPr>
           <a:xfrm rot="20407800">
             <a:off x="3924720" y="3465720"/>
-            <a:ext cx="977040" cy="483120"/>
+            <a:ext cx="976680" cy="482760"/>
           </a:xfrm>
           <a:prstGeom prst="rightArrow">
             <a:avLst>
@@ -8596,7 +8627,7 @@
         <p:spPr>
           <a:xfrm rot="1192200">
             <a:off x="5698800" y="3787560"/>
-            <a:ext cx="977040" cy="483120"/>
+            <a:ext cx="976680" cy="482760"/>
           </a:xfrm>
           <a:prstGeom prst="rightArrow">
             <a:avLst>
@@ -8638,7 +8669,7 @@
         <p:spPr>
           <a:xfrm rot="20407800">
             <a:off x="5772960" y="2461320"/>
-            <a:ext cx="977040" cy="483120"/>
+            <a:ext cx="976680" cy="482760"/>
           </a:xfrm>
           <a:prstGeom prst="rightArrow">
             <a:avLst>
@@ -8680,7 +8711,7 @@
         <p:spPr>
           <a:xfrm>
             <a:off x="5849640" y="3121560"/>
-            <a:ext cx="977040" cy="483120"/>
+            <a:ext cx="976680" cy="482760"/>
           </a:xfrm>
           <a:prstGeom prst="rightArrow">
             <a:avLst>
@@ -8726,7 +8757,7 @@
         <p:spPr>
           <a:xfrm>
             <a:off x="4950720" y="2998800"/>
-            <a:ext cx="755280" cy="755280"/>
+            <a:ext cx="754920" cy="754920"/>
           </a:xfrm>
           <a:prstGeom prst="rect">
             <a:avLst/>
@@ -8767,7 +8798,7 @@
         <p:spPr>
           <a:xfrm>
             <a:off x="684360" y="4487400"/>
-            <a:ext cx="8533080" cy="1505520"/>
+            <a:ext cx="8532720" cy="1505160"/>
           </a:xfrm>
           <a:prstGeom prst="rect">
             <a:avLst/>
@@ -8816,7 +8847,7 @@
         <p:spPr>
           <a:xfrm>
             <a:off x="684360" y="685800"/>
-            <a:ext cx="8533080" cy="3613680"/>
+            <a:ext cx="8532720" cy="3613320"/>
           </a:xfrm>
           <a:prstGeom prst="rect">
             <a:avLst/>
@@ -8835,7 +8866,7 @@
         <p:txBody>
           <a:bodyPr lIns="90000" rIns="90000" tIns="45000" bIns="45000" anchor="ctr"/>
           <a:p>
-            <a:pPr marL="285840" indent="-284400">
+            <a:pPr marL="285840" indent="-284040">
               <a:lnSpc>
                 <a:spcPct val="100000"/>
               </a:lnSpc>
@@ -8961,7 +8992,7 @@
             </a:endParaRPr>
           </a:p>
           <a:p>
-            <a:pPr marL="285840" indent="-284400">
+            <a:pPr marL="285840" indent="-284040">
               <a:lnSpc>
                 <a:spcPct val="100000"/>
               </a:lnSpc>
@@ -9053,7 +9084,7 @@
         <p:spPr>
           <a:xfrm>
             <a:off x="3562560" y="1395720"/>
-            <a:ext cx="912960" cy="912960"/>
+            <a:ext cx="912600" cy="912600"/>
           </a:xfrm>
           <a:prstGeom prst="rect">
             <a:avLst/>
@@ -9076,7 +9107,7 @@
         <p:spPr>
           <a:xfrm>
             <a:off x="6678360" y="1395720"/>
-            <a:ext cx="912960" cy="912960"/>
+            <a:ext cx="912600" cy="912600"/>
           </a:xfrm>
           <a:prstGeom prst="rect">
             <a:avLst/>
@@ -9099,7 +9130,7 @@
         <p:spPr>
           <a:xfrm>
             <a:off x="7042320" y="3904200"/>
-            <a:ext cx="912960" cy="912960"/>
+            <a:ext cx="912600" cy="912600"/>
           </a:xfrm>
           <a:prstGeom prst="rect">
             <a:avLst/>
@@ -9122,7 +9153,7 @@
         <p:spPr>
           <a:xfrm>
             <a:off x="3562560" y="3904200"/>
-            <a:ext cx="912960" cy="912960"/>
+            <a:ext cx="912600" cy="912600"/>
           </a:xfrm>
           <a:prstGeom prst="rect">
             <a:avLst/>
@@ -9145,7 +9176,7 @@
         <p:spPr>
           <a:xfrm>
             <a:off x="6678360" y="1395720"/>
-            <a:ext cx="912960" cy="912960"/>
+            <a:ext cx="912600" cy="912600"/>
           </a:xfrm>
           <a:prstGeom prst="rect">
             <a:avLst/>
@@ -9168,7 +9199,7 @@
         <p:spPr>
           <a:xfrm>
             <a:off x="4113000" y="2039400"/>
-            <a:ext cx="912960" cy="912960"/>
+            <a:ext cx="912600" cy="912600"/>
           </a:xfrm>
           <a:prstGeom prst="rect">
             <a:avLst/>
@@ -9191,7 +9222,7 @@
         <p:spPr>
           <a:xfrm>
             <a:off x="7296480" y="2133000"/>
-            <a:ext cx="912960" cy="912960"/>
+            <a:ext cx="912600" cy="912600"/>
           </a:xfrm>
           <a:prstGeom prst="rect">
             <a:avLst/>
@@ -9210,7 +9241,7 @@
         <p:spPr>
           <a:xfrm>
             <a:off x="5285160" y="1920960"/>
-            <a:ext cx="1181520" cy="543960"/>
+            <a:ext cx="1181160" cy="543600"/>
           </a:xfrm>
           <a:prstGeom prst="rightArrow">
             <a:avLst>
@@ -9252,7 +9283,7 @@
         <p:spPr>
           <a:xfrm>
             <a:off x="5149440" y="4088880"/>
-            <a:ext cx="1181520" cy="543960"/>
+            <a:ext cx="1181160" cy="543600"/>
           </a:xfrm>
           <a:prstGeom prst="rightArrow">
             <a:avLst>
@@ -9317,7 +9348,7 @@
         <p:spPr>
           <a:xfrm>
             <a:off x="4895280" y="2388600"/>
-            <a:ext cx="2706480" cy="363600"/>
+            <a:ext cx="2706120" cy="363240"/>
           </a:xfrm>
           <a:prstGeom prst="rect">
             <a:avLst/>
@@ -9366,7 +9397,7 @@
         <p:spPr>
           <a:xfrm>
             <a:off x="5027400" y="4575240"/>
-            <a:ext cx="2326320" cy="363600"/>
+            <a:ext cx="2325960" cy="363240"/>
           </a:xfrm>
           <a:prstGeom prst="rect">
             <a:avLst/>
@@ -9437,7 +9468,7 @@
         <p:spPr>
           <a:xfrm>
             <a:off x="684360" y="4487400"/>
-            <a:ext cx="8533080" cy="1505520"/>
+            <a:ext cx="8532720" cy="1505160"/>
           </a:xfrm>
           <a:prstGeom prst="rect">
             <a:avLst/>
@@ -9486,7 +9517,7 @@
         <p:spPr>
           <a:xfrm>
             <a:off x="684360" y="685800"/>
-            <a:ext cx="8533080" cy="3613680"/>
+            <a:ext cx="8532720" cy="3613320"/>
           </a:xfrm>
           <a:prstGeom prst="rect">
             <a:avLst/>
@@ -9505,7 +9536,7 @@
         <p:txBody>
           <a:bodyPr lIns="90000" rIns="90000" tIns="45000" bIns="45000" anchor="ctr"/>
           <a:p>
-            <a:pPr marL="285840" indent="-284400">
+            <a:pPr marL="285840" indent="-284040">
               <a:lnSpc>
                 <a:spcPct val="100000"/>
               </a:lnSpc>
@@ -9627,7 +9658,7 @@
         <p:spPr>
           <a:xfrm>
             <a:off x="1863000" y="3157920"/>
-            <a:ext cx="912960" cy="912960"/>
+            <a:ext cx="912600" cy="912600"/>
           </a:xfrm>
           <a:prstGeom prst="rect">
             <a:avLst/>
@@ -9650,7 +9681,7 @@
         <p:spPr>
           <a:xfrm>
             <a:off x="2413440" y="3801600"/>
-            <a:ext cx="912960" cy="912960"/>
+            <a:ext cx="912600" cy="912600"/>
           </a:xfrm>
           <a:prstGeom prst="rect">
             <a:avLst/>
@@ -9673,7 +9704,7 @@
         <p:spPr>
           <a:xfrm>
             <a:off x="7197480" y="3439800"/>
-            <a:ext cx="912960" cy="912960"/>
+            <a:ext cx="912600" cy="912600"/>
           </a:xfrm>
           <a:prstGeom prst="rect">
             <a:avLst/>
@@ -9696,7 +9727,7 @@
         <p:spPr>
           <a:xfrm>
             <a:off x="4758840" y="3366360"/>
-            <a:ext cx="912960" cy="912960"/>
+            <a:ext cx="912600" cy="912600"/>
           </a:xfrm>
           <a:prstGeom prst="rect">
             <a:avLst/>
@@ -9715,7 +9746,7 @@
         <p:spPr>
           <a:xfrm>
             <a:off x="3568680" y="3429000"/>
-            <a:ext cx="936000" cy="912960"/>
+            <a:ext cx="935640" cy="912600"/>
           </a:xfrm>
           <a:prstGeom prst="mathPlus">
             <a:avLst>
@@ -9753,7 +9784,7 @@
         <p:spPr>
           <a:xfrm>
             <a:off x="6095880" y="3654360"/>
-            <a:ext cx="736920" cy="564840"/>
+            <a:ext cx="736560" cy="564480"/>
           </a:xfrm>
           <a:prstGeom prst="mathEqual">
             <a:avLst>
@@ -9814,7 +9845,7 @@
         <p:spPr>
           <a:xfrm>
             <a:off x="4750920" y="2898360"/>
-            <a:ext cx="2688480" cy="3718440"/>
+            <a:ext cx="2688120" cy="3718080"/>
           </a:xfrm>
           <a:prstGeom prst="rect">
             <a:avLst/>
@@ -9857,7 +9888,7 @@
         <p:spPr>
           <a:xfrm>
             <a:off x="684360" y="4487400"/>
-            <a:ext cx="8533080" cy="1505520"/>
+            <a:ext cx="8532720" cy="1505160"/>
           </a:xfrm>
           <a:prstGeom prst="rect">
             <a:avLst/>
@@ -9906,7 +9937,7 @@
         <p:spPr>
           <a:xfrm>
             <a:off x="684360" y="685800"/>
-            <a:ext cx="8533080" cy="3613680"/>
+            <a:ext cx="8532720" cy="3613320"/>
           </a:xfrm>
           <a:prstGeom prst="rect">
             <a:avLst/>
@@ -9925,7 +9956,7 @@
         <p:txBody>
           <a:bodyPr lIns="90000" rIns="90000" tIns="45000" bIns="45000" anchor="ctr"/>
           <a:p>
-            <a:pPr marL="285840" indent="-284400">
+            <a:pPr marL="285840" indent="-284040">
               <a:lnSpc>
                 <a:spcPct val="100000"/>
               </a:lnSpc>
@@ -10061,7 +10092,7 @@
         <p:spPr>
           <a:xfrm>
             <a:off x="4843440" y="2989800"/>
-            <a:ext cx="640440" cy="640440"/>
+            <a:ext cx="640080" cy="640080"/>
           </a:xfrm>
           <a:prstGeom prst="rect">
             <a:avLst/>
@@ -10084,7 +10115,7 @@
         <p:spPr>
           <a:xfrm>
             <a:off x="5028120" y="4248360"/>
-            <a:ext cx="912960" cy="912960"/>
+            <a:ext cx="912600" cy="912600"/>
           </a:xfrm>
           <a:prstGeom prst="rect">
             <a:avLst/>
@@ -10107,7 +10138,7 @@
         <p:spPr>
           <a:xfrm>
             <a:off x="5506200" y="5025240"/>
-            <a:ext cx="912960" cy="912960"/>
+            <a:ext cx="912600" cy="912600"/>
           </a:xfrm>
           <a:prstGeom prst="rect">
             <a:avLst/>
@@ -10130,7 +10161,7 @@
         <p:spPr>
           <a:xfrm>
             <a:off x="6042600" y="4248360"/>
-            <a:ext cx="912960" cy="912960"/>
+            <a:ext cx="912600" cy="912600"/>
           </a:xfrm>
           <a:prstGeom prst="rect">
             <a:avLst/>
@@ -10153,7 +10184,7 @@
         <p:spPr>
           <a:xfrm>
             <a:off x="7944480" y="2602440"/>
-            <a:ext cx="912960" cy="912960"/>
+            <a:ext cx="912600" cy="912600"/>
           </a:xfrm>
           <a:prstGeom prst="rect">
             <a:avLst/>
@@ -10176,7 +10207,7 @@
         <p:spPr>
           <a:xfrm>
             <a:off x="6671160" y="3059640"/>
-            <a:ext cx="570240" cy="570240"/>
+            <a:ext cx="569880" cy="569880"/>
           </a:xfrm>
           <a:prstGeom prst="rect">
             <a:avLst/>
@@ -10199,7 +10230,7 @@
         <p:spPr>
           <a:xfrm>
             <a:off x="2973240" y="3863520"/>
-            <a:ext cx="912960" cy="912960"/>
+            <a:ext cx="912600" cy="912600"/>
           </a:xfrm>
           <a:prstGeom prst="rect">
             <a:avLst/>
@@ -10218,7 +10249,7 @@
         <p:spPr>
           <a:xfrm>
             <a:off x="4012560" y="4487400"/>
-            <a:ext cx="1492200" cy="855720"/>
+            <a:ext cx="1491840" cy="855360"/>
           </a:xfrm>
           <a:custGeom>
             <a:avLst/>
@@ -10270,7 +10301,7 @@
         <p:spPr>
           <a:xfrm>
             <a:off x="4012560" y="4248360"/>
-            <a:ext cx="2028600" cy="237600"/>
+            <a:ext cx="2028240" cy="237240"/>
           </a:xfrm>
           <a:custGeom>
             <a:avLst/>
@@ -10322,7 +10353,7 @@
         <p:spPr>
           <a:xfrm>
             <a:off x="4012560" y="4367880"/>
-            <a:ext cx="937440" cy="238320"/>
+            <a:ext cx="937080" cy="237960"/>
           </a:xfrm>
           <a:custGeom>
             <a:avLst/>
@@ -10373,8 +10404,8 @@
         </p:nvSpPr>
         <p:spPr>
           <a:xfrm flipV="1">
-            <a:off x="7242840" y="3221280"/>
-            <a:ext cx="628200" cy="121680"/>
+            <a:off x="7242840" y="3220560"/>
+            <a:ext cx="627840" cy="121320"/>
           </a:xfrm>
           <a:custGeom>
             <a:avLst/>
@@ -10449,7 +10480,7 @@
         <p:spPr>
           <a:xfrm>
             <a:off x="684360" y="4487400"/>
-            <a:ext cx="8533080" cy="1505520"/>
+            <a:ext cx="8532720" cy="1505160"/>
           </a:xfrm>
           <a:prstGeom prst="rect">
             <a:avLst/>
@@ -10498,7 +10529,7 @@
         <p:spPr>
           <a:xfrm>
             <a:off x="684360" y="685800"/>
-            <a:ext cx="8533080" cy="3613680"/>
+            <a:ext cx="8532720" cy="3613320"/>
           </a:xfrm>
           <a:prstGeom prst="rect">
             <a:avLst/>
@@ -10517,7 +10548,7 @@
         <p:txBody>
           <a:bodyPr lIns="90000" rIns="90000" tIns="45000" bIns="45000" anchor="ctr"/>
           <a:p>
-            <a:pPr marL="285840" indent="-284400">
+            <a:pPr marL="285840" indent="-284040">
               <a:lnSpc>
                 <a:spcPct val="100000"/>
               </a:lnSpc>
@@ -10685,7 +10716,7 @@
         <p:spPr>
           <a:xfrm>
             <a:off x="5430600" y="2730600"/>
-            <a:ext cx="2688480" cy="3718440"/>
+            <a:ext cx="2688120" cy="3718080"/>
           </a:xfrm>
           <a:prstGeom prst="rect">
             <a:avLst/>
@@ -10732,7 +10763,7 @@
         <p:spPr>
           <a:xfrm>
             <a:off x="5523120" y="2822040"/>
-            <a:ext cx="640440" cy="640440"/>
+            <a:ext cx="640080" cy="640080"/>
           </a:xfrm>
           <a:prstGeom prst="rect">
             <a:avLst/>
@@ -10755,7 +10786,7 @@
         <p:spPr>
           <a:xfrm>
             <a:off x="5707800" y="4080600"/>
-            <a:ext cx="912960" cy="912960"/>
+            <a:ext cx="912600" cy="912600"/>
           </a:xfrm>
           <a:prstGeom prst="rect">
             <a:avLst/>
@@ -10778,7 +10809,7 @@
         <p:spPr>
           <a:xfrm>
             <a:off x="6185880" y="4857480"/>
-            <a:ext cx="912960" cy="912960"/>
+            <a:ext cx="912600" cy="912600"/>
           </a:xfrm>
           <a:prstGeom prst="rect">
             <a:avLst/>
@@ -10801,7 +10832,7 @@
         <p:spPr>
           <a:xfrm>
             <a:off x="6722280" y="4080600"/>
-            <a:ext cx="912960" cy="912960"/>
+            <a:ext cx="912600" cy="912600"/>
           </a:xfrm>
           <a:prstGeom prst="rect">
             <a:avLst/>
@@ -10824,7 +10855,7 @@
         <p:spPr>
           <a:xfrm>
             <a:off x="3652920" y="3695760"/>
-            <a:ext cx="912960" cy="912960"/>
+            <a:ext cx="912600" cy="912600"/>
           </a:xfrm>
           <a:prstGeom prst="rect">
             <a:avLst/>
@@ -10843,7 +10874,7 @@
         <p:spPr>
           <a:xfrm>
             <a:off x="4692240" y="4319640"/>
-            <a:ext cx="1492200" cy="855720"/>
+            <a:ext cx="1491840" cy="855360"/>
           </a:xfrm>
           <a:custGeom>
             <a:avLst/>
@@ -10895,7 +10926,7 @@
         <p:spPr>
           <a:xfrm>
             <a:off x="4692240" y="4080600"/>
-            <a:ext cx="2028600" cy="237600"/>
+            <a:ext cx="2028240" cy="237240"/>
           </a:xfrm>
           <a:custGeom>
             <a:avLst/>
@@ -10947,7 +10978,7 @@
         <p:spPr>
           <a:xfrm>
             <a:off x="4692240" y="4200120"/>
-            <a:ext cx="937440" cy="238320"/>
+            <a:ext cx="937080" cy="237960"/>
           </a:xfrm>
           <a:custGeom>
             <a:avLst/>
@@ -11003,7 +11034,7 @@
         <p:spPr>
           <a:xfrm>
             <a:off x="9653760" y="3605400"/>
-            <a:ext cx="912960" cy="912960"/>
+            <a:ext cx="912600" cy="912600"/>
           </a:xfrm>
           <a:prstGeom prst="rect">
             <a:avLst/>
@@ -11021,8 +11052,8 @@
         </p:nvSpPr>
         <p:spPr>
           <a:xfrm rot="10325400">
-            <a:off x="7855560" y="4106520"/>
-            <a:ext cx="1784520" cy="306360"/>
+            <a:off x="7855920" y="4106880"/>
+            <a:ext cx="1784160" cy="306000"/>
           </a:xfrm>
           <a:prstGeom prst="rightArrow">
             <a:avLst>
@@ -11086,7 +11117,7 @@
         <p:spPr>
           <a:xfrm>
             <a:off x="684360" y="4487400"/>
-            <a:ext cx="8533080" cy="1505520"/>
+            <a:ext cx="8532720" cy="1505160"/>
           </a:xfrm>
           <a:prstGeom prst="rect">
             <a:avLst/>
@@ -11135,7 +11166,7 @@
         <p:spPr>
           <a:xfrm>
             <a:off x="684360" y="685800"/>
-            <a:ext cx="8533080" cy="3613680"/>
+            <a:ext cx="8532720" cy="3613320"/>
           </a:xfrm>
           <a:prstGeom prst="rect">
             <a:avLst/>
@@ -11165,7 +11196,7 @@
         <p:spPr>
           <a:xfrm>
             <a:off x="4069440" y="82800"/>
-            <a:ext cx="4044960" cy="2845440"/>
+            <a:ext cx="4044600" cy="2845080"/>
           </a:xfrm>
           <a:prstGeom prst="rect">
             <a:avLst/>
@@ -11188,7 +11219,7 @@
         <p:spPr>
           <a:xfrm>
             <a:off x="83880" y="3103560"/>
-            <a:ext cx="3866040" cy="1643040"/>
+            <a:ext cx="3865680" cy="1642680"/>
           </a:xfrm>
           <a:prstGeom prst="rect">
             <a:avLst/>
@@ -11211,7 +11242,7 @@
         <p:spPr>
           <a:xfrm>
             <a:off x="4161600" y="3103560"/>
-            <a:ext cx="3866040" cy="1643040"/>
+            <a:ext cx="3865680" cy="1642680"/>
           </a:xfrm>
           <a:prstGeom prst="rect">
             <a:avLst/>
@@ -11234,7 +11265,7 @@
         <p:spPr>
           <a:xfrm>
             <a:off x="8230320" y="3103560"/>
-            <a:ext cx="3866040" cy="1643040"/>
+            <a:ext cx="3865680" cy="1642680"/>
           </a:xfrm>
           <a:prstGeom prst="rect">
             <a:avLst/>
@@ -11253,7 +11284,7 @@
         <p:spPr>
           <a:xfrm>
             <a:off x="3993840" y="3766680"/>
-            <a:ext cx="149760" cy="317880"/>
+            <a:ext cx="149400" cy="317520"/>
           </a:xfrm>
           <a:prstGeom prst="rightArrow">
             <a:avLst>
@@ -11292,7 +11323,7 @@
         <p:spPr>
           <a:xfrm>
             <a:off x="8073360" y="3793320"/>
-            <a:ext cx="130680" cy="317880"/>
+            <a:ext cx="130320" cy="317520"/>
           </a:xfrm>
           <a:prstGeom prst="rightArrow">
             <a:avLst>
@@ -11331,7 +11362,7 @@
         <p:spPr>
           <a:xfrm>
             <a:off x="2701080" y="5176080"/>
-            <a:ext cx="1835640" cy="921240"/>
+            <a:ext cx="1835280" cy="920880"/>
           </a:xfrm>
           <a:prstGeom prst="wedgeRectCallout">
             <a:avLst>
@@ -11396,7 +11427,7 @@
         <p:spPr>
           <a:xfrm>
             <a:off x="6722640" y="5196600"/>
-            <a:ext cx="1967040" cy="824400"/>
+            <a:ext cx="1966680" cy="824040"/>
           </a:xfrm>
           <a:prstGeom prst="wedgeRectCallout">
             <a:avLst>
@@ -11461,7 +11492,7 @@
         <p:spPr>
           <a:xfrm>
             <a:off x="9731160" y="5131440"/>
-            <a:ext cx="2104200" cy="655200"/>
+            <a:ext cx="2103840" cy="654840"/>
           </a:xfrm>
           <a:prstGeom prst="wedgeRectCallout">
             <a:avLst>
@@ -11526,7 +11557,7 @@
         <p:spPr>
           <a:xfrm>
             <a:off x="5033520" y="2516760"/>
-            <a:ext cx="2574000" cy="363600"/>
+            <a:ext cx="2573640" cy="363240"/>
           </a:xfrm>
           <a:prstGeom prst="rect">
             <a:avLst/>
@@ -11574,8 +11605,8 @@
         </p:nvSpPr>
         <p:spPr>
           <a:xfrm rot="16200000">
-            <a:off x="3177360" y="1266480"/>
-            <a:ext cx="1963080" cy="363600"/>
+            <a:off x="3177360" y="1266840"/>
+            <a:ext cx="1962720" cy="363240"/>
           </a:xfrm>
           <a:prstGeom prst="rect">
             <a:avLst/>
@@ -11646,7 +11677,7 @@
         <p:spPr>
           <a:xfrm>
             <a:off x="684360" y="4487400"/>
-            <a:ext cx="8533080" cy="1505520"/>
+            <a:ext cx="8532720" cy="1505160"/>
           </a:xfrm>
           <a:prstGeom prst="rect">
             <a:avLst/>
@@ -11697,9 +11728,9 @@
         <p:grpSpPr>
           <a:xfrm>
             <a:off x="948240" y="823320"/>
-            <a:ext cx="10290960" cy="3338280"/>
+            <a:ext cx="10290600" cy="3337920"/>
             <a:chOff x="948240" y="823320"/>
-            <a:chExt cx="10290960" cy="3338280"/>
+            <a:chExt cx="10290600" cy="3337920"/>
           </a:xfrm>
         </p:grpSpPr>
         <p:sp>
@@ -11711,7 +11742,7 @@
           <p:spPr>
             <a:xfrm>
               <a:off x="948240" y="823320"/>
-              <a:ext cx="1361160" cy="1361160"/>
+              <a:ext cx="1360800" cy="1360800"/>
             </a:xfrm>
             <a:prstGeom prst="ellipse">
               <a:avLst/>
@@ -11744,7 +11775,7 @@
           <p:spPr>
             <a:xfrm>
               <a:off x="1234440" y="1109520"/>
-              <a:ext cx="788760" cy="788760"/>
+              <a:ext cx="788400" cy="788400"/>
             </a:xfrm>
             <a:prstGeom prst="rect">
               <a:avLst/>
@@ -11775,7 +11806,7 @@
           <p:spPr>
             <a:xfrm>
               <a:off x="2602800" y="823320"/>
-              <a:ext cx="3210480" cy="1361160"/>
+              <a:ext cx="3210120" cy="1360800"/>
             </a:xfrm>
             <a:prstGeom prst="rect">
               <a:avLst/>
@@ -11827,7 +11858,7 @@
           <p:spPr>
             <a:xfrm>
               <a:off x="6374160" y="823320"/>
-              <a:ext cx="1361160" cy="1361160"/>
+              <a:ext cx="1360800" cy="1360800"/>
             </a:xfrm>
             <a:prstGeom prst="ellipse">
               <a:avLst/>
@@ -11860,7 +11891,7 @@
           <p:spPr>
             <a:xfrm>
               <a:off x="6660360" y="1109520"/>
-              <a:ext cx="788760" cy="788760"/>
+              <a:ext cx="788400" cy="788400"/>
             </a:xfrm>
             <a:prstGeom prst="rect">
               <a:avLst/>
@@ -11891,7 +11922,7 @@
           <p:spPr>
             <a:xfrm>
               <a:off x="8028720" y="823320"/>
-              <a:ext cx="3210480" cy="1361160"/>
+              <a:ext cx="3210120" cy="1360800"/>
             </a:xfrm>
             <a:prstGeom prst="rect">
               <a:avLst/>
@@ -11943,7 +11974,7 @@
           <p:spPr>
             <a:xfrm>
               <a:off x="948240" y="2800440"/>
-              <a:ext cx="1361160" cy="1361160"/>
+              <a:ext cx="1360800" cy="1360800"/>
             </a:xfrm>
             <a:prstGeom prst="ellipse">
               <a:avLst/>
@@ -11976,7 +12007,7 @@
           <p:spPr>
             <a:xfrm>
               <a:off x="1234440" y="3086640"/>
-              <a:ext cx="788760" cy="788760"/>
+              <a:ext cx="788400" cy="788400"/>
             </a:xfrm>
             <a:prstGeom prst="rect">
               <a:avLst/>
@@ -12007,7 +12038,7 @@
           <p:spPr>
             <a:xfrm>
               <a:off x="2602800" y="2800440"/>
-              <a:ext cx="3210480" cy="1361160"/>
+              <a:ext cx="3210120" cy="1360800"/>
             </a:xfrm>
             <a:prstGeom prst="rect">
               <a:avLst/>
@@ -12059,7 +12090,7 @@
           <p:spPr>
             <a:xfrm>
               <a:off x="6374160" y="2800440"/>
-              <a:ext cx="1361160" cy="1361160"/>
+              <a:ext cx="1360800" cy="1360800"/>
             </a:xfrm>
             <a:prstGeom prst="ellipse">
               <a:avLst/>
@@ -12092,7 +12123,7 @@
           <p:spPr>
             <a:xfrm>
               <a:off x="6660360" y="3086640"/>
-              <a:ext cx="788760" cy="788760"/>
+              <a:ext cx="788400" cy="788400"/>
             </a:xfrm>
             <a:prstGeom prst="rect">
               <a:avLst/>
@@ -12123,7 +12154,7 @@
           <p:spPr>
             <a:xfrm>
               <a:off x="8028720" y="2800440"/>
-              <a:ext cx="3210480" cy="1361160"/>
+              <a:ext cx="3210120" cy="1360800"/>
             </a:xfrm>
             <a:prstGeom prst="rect">
               <a:avLst/>
@@ -12213,7 +12244,7 @@
         <p:spPr>
           <a:xfrm>
             <a:off x="0" y="0"/>
-            <a:ext cx="12190680" cy="6856560"/>
+            <a:ext cx="12190320" cy="6856200"/>
           </a:xfrm>
           <a:prstGeom prst="rect">
             <a:avLst/>
@@ -12266,7 +12297,7 @@
         <p:spPr>
           <a:xfrm>
             <a:off x="0" y="0"/>
-            <a:ext cx="8128440" cy="6856560"/>
+            <a:ext cx="8128080" cy="6856200"/>
           </a:xfrm>
           <a:prstGeom prst="snip2DiagRect">
             <a:avLst>
@@ -12488,7 +12519,7 @@
         <p:spPr>
           <a:xfrm>
             <a:off x="8588520" y="941400"/>
-            <a:ext cx="3042360" cy="3247200"/>
+            <a:ext cx="3042000" cy="3246840"/>
           </a:xfrm>
           <a:prstGeom prst="rect">
             <a:avLst/>
@@ -12539,9 +12570,9 @@
         <p:grpSpPr>
           <a:xfrm>
             <a:off x="952560" y="2104200"/>
-            <a:ext cx="6165000" cy="2441880"/>
+            <a:ext cx="6164640" cy="2441520"/>
             <a:chOff x="952560" y="2104200"/>
-            <a:chExt cx="6165000" cy="2441880"/>
+            <a:chExt cx="6164640" cy="2441520"/>
           </a:xfrm>
         </p:grpSpPr>
         <p:sp>
@@ -12553,7 +12584,7 @@
           <p:spPr>
             <a:xfrm>
               <a:off x="952560" y="2104200"/>
-              <a:ext cx="815040" cy="815040"/>
+              <a:ext cx="814680" cy="814680"/>
             </a:xfrm>
             <a:prstGeom prst="ellipse">
               <a:avLst/>
@@ -12586,7 +12617,7 @@
           <p:spPr>
             <a:xfrm>
               <a:off x="1123920" y="2275560"/>
-              <a:ext cx="471960" cy="471960"/>
+              <a:ext cx="471600" cy="471600"/>
             </a:xfrm>
             <a:prstGeom prst="rect">
               <a:avLst/>
@@ -12617,7 +12648,7 @@
           <p:spPr>
             <a:xfrm>
               <a:off x="1944000" y="2104200"/>
-              <a:ext cx="1922760" cy="815040"/>
+              <a:ext cx="1922400" cy="814680"/>
             </a:xfrm>
             <a:prstGeom prst="rect">
               <a:avLst/>
@@ -12669,7 +12700,7 @@
           <p:spPr>
             <a:xfrm>
               <a:off x="4203360" y="2104200"/>
-              <a:ext cx="815040" cy="815040"/>
+              <a:ext cx="814680" cy="814680"/>
             </a:xfrm>
             <a:prstGeom prst="ellipse">
               <a:avLst/>
@@ -12702,7 +12733,7 @@
           <p:spPr>
             <a:xfrm>
               <a:off x="4375080" y="2275560"/>
-              <a:ext cx="471960" cy="471960"/>
+              <a:ext cx="471600" cy="471600"/>
             </a:xfrm>
             <a:prstGeom prst="rect">
               <a:avLst/>
@@ -12733,7 +12764,7 @@
           <p:spPr>
             <a:xfrm>
               <a:off x="5194800" y="2104200"/>
-              <a:ext cx="1922760" cy="815040"/>
+              <a:ext cx="1922400" cy="814680"/>
             </a:xfrm>
             <a:prstGeom prst="rect">
               <a:avLst/>
@@ -12785,7 +12816,7 @@
           <p:spPr>
             <a:xfrm>
               <a:off x="952560" y="3731040"/>
-              <a:ext cx="815040" cy="815040"/>
+              <a:ext cx="814680" cy="814680"/>
             </a:xfrm>
             <a:prstGeom prst="ellipse">
               <a:avLst/>
@@ -12818,7 +12849,7 @@
           <p:spPr>
             <a:xfrm>
               <a:off x="1123920" y="3902400"/>
-              <a:ext cx="471960" cy="471960"/>
+              <a:ext cx="471600" cy="471600"/>
             </a:xfrm>
             <a:prstGeom prst="rect">
               <a:avLst/>
@@ -12849,7 +12880,7 @@
           <p:spPr>
             <a:xfrm>
               <a:off x="1944000" y="3731040"/>
-              <a:ext cx="1922760" cy="815040"/>
+              <a:ext cx="1922400" cy="814680"/>
             </a:xfrm>
             <a:prstGeom prst="rect">
               <a:avLst/>
@@ -12901,7 +12932,7 @@
           <p:spPr>
             <a:xfrm>
               <a:off x="4203360" y="3731040"/>
-              <a:ext cx="815040" cy="815040"/>
+              <a:ext cx="814680" cy="814680"/>
             </a:xfrm>
             <a:prstGeom prst="ellipse">
               <a:avLst/>
@@ -12934,7 +12965,7 @@
           <p:spPr>
             <a:xfrm>
               <a:off x="4375080" y="3902400"/>
-              <a:ext cx="471960" cy="471960"/>
+              <a:ext cx="471600" cy="471600"/>
             </a:xfrm>
             <a:prstGeom prst="rect">
               <a:avLst/>
@@ -12965,7 +12996,7 @@
           <p:spPr>
             <a:xfrm>
               <a:off x="5194800" y="3731040"/>
-              <a:ext cx="1922760" cy="815040"/>
+              <a:ext cx="1922400" cy="814680"/>
             </a:xfrm>
             <a:prstGeom prst="rect">
               <a:avLst/>
@@ -13082,7 +13113,7 @@
         <p:spPr>
           <a:xfrm>
             <a:off x="684360" y="4487400"/>
-            <a:ext cx="8533080" cy="1505520"/>
+            <a:ext cx="8532720" cy="1505160"/>
           </a:xfrm>
           <a:prstGeom prst="rect">
             <a:avLst/>
@@ -13131,7 +13162,7 @@
         <p:spPr>
           <a:xfrm>
             <a:off x="684360" y="685800"/>
-            <a:ext cx="8533080" cy="3613680"/>
+            <a:ext cx="8532720" cy="3613320"/>
           </a:xfrm>
           <a:prstGeom prst="rect">
             <a:avLst/>
@@ -13150,7 +13181,7 @@
         <p:txBody>
           <a:bodyPr lIns="90000" rIns="90000" tIns="45000" bIns="45000" anchor="ctr"/>
           <a:p>
-            <a:pPr marL="285840" indent="-284400">
+            <a:pPr marL="285840" indent="-284040">
               <a:lnSpc>
                 <a:spcPct val="100000"/>
               </a:lnSpc>
@@ -13182,7 +13213,7 @@
             </a:endParaRPr>
           </a:p>
           <a:p>
-            <a:pPr marL="285840" indent="-284400">
+            <a:pPr marL="285840" indent="-284040">
               <a:lnSpc>
                 <a:spcPct val="100000"/>
               </a:lnSpc>
@@ -13214,7 +13245,7 @@
             </a:endParaRPr>
           </a:p>
           <a:p>
-            <a:pPr marL="285840" indent="-284400">
+            <a:pPr marL="285840" indent="-284040">
               <a:lnSpc>
                 <a:spcPct val="100000"/>
               </a:lnSpc>
@@ -13246,7 +13277,7 @@
             </a:endParaRPr>
           </a:p>
           <a:p>
-            <a:pPr marL="285840" indent="-284400">
+            <a:pPr marL="285840" indent="-284040">
               <a:lnSpc>
                 <a:spcPct val="100000"/>
               </a:lnSpc>
@@ -13310,7 +13341,7 @@
         <p:spPr>
           <a:xfrm>
             <a:off x="684360" y="4487400"/>
-            <a:ext cx="8533080" cy="1505520"/>
+            <a:ext cx="8532720" cy="1505160"/>
           </a:xfrm>
           <a:prstGeom prst="rect">
             <a:avLst/>
@@ -13363,7 +13394,7 @@
         <p:spPr>
           <a:xfrm>
             <a:off x="5221440" y="75600"/>
-            <a:ext cx="912960" cy="912960"/>
+            <a:ext cx="912600" cy="912600"/>
           </a:xfrm>
           <a:prstGeom prst="rect">
             <a:avLst/>
@@ -13386,7 +13417,7 @@
         <p:spPr>
           <a:xfrm>
             <a:off x="4695120" y="4444560"/>
-            <a:ext cx="912960" cy="912960"/>
+            <a:ext cx="912600" cy="912600"/>
           </a:xfrm>
           <a:prstGeom prst="rect">
             <a:avLst/>
@@ -13409,7 +13440,7 @@
         <p:spPr>
           <a:xfrm>
             <a:off x="2603880" y="2294640"/>
-            <a:ext cx="912960" cy="912960"/>
+            <a:ext cx="912600" cy="912600"/>
           </a:xfrm>
           <a:prstGeom prst="rect">
             <a:avLst/>
@@ -13432,7 +13463,7 @@
         <p:spPr>
           <a:xfrm>
             <a:off x="9767160" y="3294360"/>
-            <a:ext cx="912960" cy="912960"/>
+            <a:ext cx="912600" cy="912600"/>
           </a:xfrm>
           <a:prstGeom prst="rect">
             <a:avLst/>
@@ -13455,7 +13486,7 @@
         <p:spPr>
           <a:xfrm>
             <a:off x="1967760" y="3811680"/>
-            <a:ext cx="912960" cy="912960"/>
+            <a:ext cx="912600" cy="912600"/>
           </a:xfrm>
           <a:prstGeom prst="rect">
             <a:avLst/>
@@ -13478,7 +13509,7 @@
         <p:spPr>
           <a:xfrm>
             <a:off x="5221440" y="2907360"/>
-            <a:ext cx="912960" cy="912960"/>
+            <a:ext cx="912600" cy="912600"/>
           </a:xfrm>
           <a:prstGeom prst="rect">
             <a:avLst/>
@@ -13501,7 +13532,7 @@
         <p:spPr>
           <a:xfrm>
             <a:off x="1093680" y="3282480"/>
-            <a:ext cx="912960" cy="912960"/>
+            <a:ext cx="912600" cy="912600"/>
           </a:xfrm>
           <a:prstGeom prst="rect">
             <a:avLst/>
@@ -13524,7 +13555,7 @@
         <p:spPr>
           <a:xfrm>
             <a:off x="8595360" y="3808800"/>
-            <a:ext cx="912960" cy="912960"/>
+            <a:ext cx="912600" cy="912600"/>
           </a:xfrm>
           <a:prstGeom prst="rect">
             <a:avLst/>
@@ -13547,7 +13578,7 @@
         <p:spPr>
           <a:xfrm>
             <a:off x="7839000" y="2294640"/>
-            <a:ext cx="912960" cy="912960"/>
+            <a:ext cx="912600" cy="912600"/>
           </a:xfrm>
           <a:prstGeom prst="rect">
             <a:avLst/>
@@ -13566,7 +13597,7 @@
         <p:spPr>
           <a:xfrm>
             <a:off x="6312960" y="944640"/>
-            <a:ext cx="1524960" cy="1338840"/>
+            <a:ext cx="1524600" cy="1338480"/>
           </a:xfrm>
           <a:custGeom>
             <a:avLst/>
@@ -13619,7 +13650,7 @@
         <p:spPr>
           <a:xfrm>
             <a:off x="5678640" y="1145160"/>
-            <a:ext cx="360" cy="1605240"/>
+            <a:ext cx="360" cy="1604880"/>
           </a:xfrm>
           <a:custGeom>
             <a:avLst/>
@@ -13671,8 +13702,8 @@
         </p:nvSpPr>
         <p:spPr>
           <a:xfrm flipH="1">
-            <a:off x="3425400" y="990000"/>
-            <a:ext cx="1616400" cy="1379160"/>
+            <a:off x="3424680" y="990000"/>
+            <a:ext cx="1616040" cy="1378800"/>
           </a:xfrm>
           <a:custGeom>
             <a:avLst/>
@@ -13725,7 +13756,7 @@
         <p:spPr>
           <a:xfrm>
             <a:off x="2082960" y="3279600"/>
-            <a:ext cx="916200" cy="363600"/>
+            <a:ext cx="915840" cy="363240"/>
           </a:xfrm>
           <a:prstGeom prst="rect">
             <a:avLst/>
@@ -13774,7 +13805,7 @@
         <p:spPr>
           <a:xfrm>
             <a:off x="5227200" y="4030200"/>
-            <a:ext cx="928440" cy="363600"/>
+            <a:ext cx="928080" cy="363240"/>
           </a:xfrm>
           <a:prstGeom prst="rect">
             <a:avLst/>
@@ -13823,7 +13854,7 @@
         <p:spPr>
           <a:xfrm>
             <a:off x="8246520" y="3279600"/>
-            <a:ext cx="1254600" cy="363600"/>
+            <a:ext cx="1254240" cy="363240"/>
           </a:xfrm>
           <a:prstGeom prst="rect">
             <a:avLst/>
@@ -13872,7 +13903,7 @@
         <p:spPr>
           <a:xfrm>
             <a:off x="481680" y="348120"/>
-            <a:ext cx="1810800" cy="363600"/>
+            <a:ext cx="1810440" cy="363240"/>
           </a:xfrm>
           <a:prstGeom prst="rect">
             <a:avLst/>
@@ -13925,7 +13956,7 @@
         <p:spPr>
           <a:xfrm>
             <a:off x="5855760" y="4444560"/>
-            <a:ext cx="912960" cy="912960"/>
+            <a:ext cx="912600" cy="912600"/>
           </a:xfrm>
           <a:prstGeom prst="rect">
             <a:avLst/>
@@ -13966,7 +13997,7 @@
         <p:spPr>
           <a:xfrm>
             <a:off x="684360" y="4487400"/>
-            <a:ext cx="8533080" cy="1505520"/>
+            <a:ext cx="8532720" cy="1505160"/>
           </a:xfrm>
           <a:prstGeom prst="rect">
             <a:avLst/>
@@ -14019,7 +14050,7 @@
         <p:spPr>
           <a:xfrm>
             <a:off x="7839000" y="2560320"/>
-            <a:ext cx="1312920" cy="598680"/>
+            <a:ext cx="1312560" cy="598320"/>
           </a:xfrm>
           <a:prstGeom prst="rect">
             <a:avLst/>
@@ -14038,7 +14069,7 @@
         <p:spPr>
           <a:xfrm>
             <a:off x="480240" y="348120"/>
-            <a:ext cx="1791000" cy="363600"/>
+            <a:ext cx="1790640" cy="363240"/>
           </a:xfrm>
           <a:prstGeom prst="rect">
             <a:avLst/>
@@ -14087,7 +14118,7 @@
         <p:spPr>
           <a:xfrm>
             <a:off x="6384240" y="990000"/>
-            <a:ext cx="1524960" cy="1338840"/>
+            <a:ext cx="1524600" cy="1338480"/>
           </a:xfrm>
           <a:custGeom>
             <a:avLst/>
@@ -14140,7 +14171,7 @@
         <p:spPr>
           <a:xfrm>
             <a:off x="5678640" y="1145160"/>
-            <a:ext cx="360" cy="1605240"/>
+            <a:ext cx="360" cy="1604880"/>
           </a:xfrm>
           <a:custGeom>
             <a:avLst/>
@@ -14192,8 +14223,8 @@
         </p:nvSpPr>
         <p:spPr>
           <a:xfrm flipH="1">
-            <a:off x="3425400" y="990000"/>
-            <a:ext cx="1616400" cy="1379160"/>
+            <a:off x="3424680" y="990000"/>
+            <a:ext cx="1616040" cy="1378800"/>
           </a:xfrm>
           <a:custGeom>
             <a:avLst/>
@@ -14246,7 +14277,7 @@
         <p:spPr>
           <a:xfrm>
             <a:off x="2082960" y="3279600"/>
-            <a:ext cx="916200" cy="363600"/>
+            <a:ext cx="915840" cy="363240"/>
           </a:xfrm>
           <a:prstGeom prst="rect">
             <a:avLst/>
@@ -14295,7 +14326,7 @@
         <p:spPr>
           <a:xfrm>
             <a:off x="5227200" y="4030200"/>
-            <a:ext cx="928440" cy="363600"/>
+            <a:ext cx="928080" cy="363240"/>
           </a:xfrm>
           <a:prstGeom prst="rect">
             <a:avLst/>
@@ -14344,7 +14375,7 @@
         <p:spPr>
           <a:xfrm>
             <a:off x="8246520" y="3279600"/>
-            <a:ext cx="1254600" cy="363600"/>
+            <a:ext cx="1254240" cy="363240"/>
           </a:xfrm>
           <a:prstGeom prst="rect">
             <a:avLst/>
@@ -14397,7 +14428,7 @@
         <p:spPr>
           <a:xfrm>
             <a:off x="4979520" y="218880"/>
-            <a:ext cx="1332000" cy="617760"/>
+            <a:ext cx="1331640" cy="617400"/>
           </a:xfrm>
           <a:prstGeom prst="rect">
             <a:avLst/>
@@ -14420,7 +14451,7 @@
         <p:spPr>
           <a:xfrm>
             <a:off x="2102760" y="2514600"/>
-            <a:ext cx="1322640" cy="608040"/>
+            <a:ext cx="1322280" cy="607680"/>
           </a:xfrm>
           <a:prstGeom prst="rect">
             <a:avLst/>
@@ -14443,7 +14474,7 @@
         <p:spPr>
           <a:xfrm>
             <a:off x="4235760" y="3279600"/>
-            <a:ext cx="1312920" cy="598680"/>
+            <a:ext cx="1312560" cy="598320"/>
           </a:xfrm>
           <a:prstGeom prst="rect">
             <a:avLst/>
@@ -14466,7 +14497,7 @@
         <p:spPr>
           <a:xfrm>
             <a:off x="5833080" y="3279600"/>
-            <a:ext cx="1312920" cy="598680"/>
+            <a:ext cx="1312560" cy="598320"/>
           </a:xfrm>
           <a:prstGeom prst="rect">
             <a:avLst/>
@@ -14507,7 +14538,7 @@
         <p:spPr>
           <a:xfrm>
             <a:off x="684360" y="4487400"/>
-            <a:ext cx="8533080" cy="1505520"/>
+            <a:ext cx="8532720" cy="1505160"/>
           </a:xfrm>
           <a:prstGeom prst="rect">
             <a:avLst/>
@@ -14556,7 +14587,7 @@
         <p:spPr>
           <a:xfrm>
             <a:off x="684360" y="685800"/>
-            <a:ext cx="8533080" cy="3613680"/>
+            <a:ext cx="8532720" cy="3613320"/>
           </a:xfrm>
           <a:prstGeom prst="rect">
             <a:avLst/>
@@ -14575,7 +14606,7 @@
         <p:txBody>
           <a:bodyPr lIns="90000" rIns="90000" tIns="45000" bIns="45000" anchor="ctr"/>
           <a:p>
-            <a:pPr marL="285840" indent="-284400">
+            <a:pPr marL="285840" indent="-284040">
               <a:lnSpc>
                 <a:spcPct val="100000"/>
               </a:lnSpc>
@@ -14651,7 +14682,7 @@
         <p:spPr>
           <a:xfrm>
             <a:off x="666000" y="2574360"/>
-            <a:ext cx="4809240" cy="2972520"/>
+            <a:ext cx="4808880" cy="2972160"/>
           </a:xfrm>
           <a:prstGeom prst="roundRect">
             <a:avLst>
@@ -14801,7 +14832,7 @@
         <p:spPr>
           <a:xfrm>
             <a:off x="684360" y="5241960"/>
-            <a:ext cx="8533080" cy="1505520"/>
+            <a:ext cx="8532720" cy="1505160"/>
           </a:xfrm>
           <a:prstGeom prst="rect">
             <a:avLst/>
@@ -14850,7 +14881,7 @@
         <p:spPr>
           <a:xfrm>
             <a:off x="684360" y="685800"/>
-            <a:ext cx="10988640" cy="2286720"/>
+            <a:ext cx="10988280" cy="2286360"/>
           </a:xfrm>
           <a:prstGeom prst="rect">
             <a:avLst/>
@@ -14871,7 +14902,7 @@
             <a:normAutofit/>
           </a:bodyPr>
           <a:p>
-            <a:pPr marL="285840" indent="-284400">
+            <a:pPr marL="285840" indent="-284040">
               <a:lnSpc>
                 <a:spcPct val="100000"/>
               </a:lnSpc>
@@ -14953,7 +14984,7 @@
             </a:endParaRPr>
           </a:p>
           <a:p>
-            <a:pPr marL="285840" indent="-284400">
+            <a:pPr marL="285840" indent="-284040">
               <a:lnSpc>
                 <a:spcPct val="100000"/>
               </a:lnSpc>
@@ -15077,7 +15108,7 @@
         <p:spPr>
           <a:xfrm>
             <a:off x="2523960" y="3718800"/>
-            <a:ext cx="726840" cy="721800"/>
+            <a:ext cx="726480" cy="721440"/>
           </a:xfrm>
           <a:prstGeom prst="ellipse">
             <a:avLst/>
@@ -15145,7 +15176,7 @@
         <p:spPr>
           <a:xfrm>
             <a:off x="3363480" y="3303360"/>
-            <a:ext cx="1216080" cy="405720"/>
+            <a:ext cx="1215720" cy="405360"/>
           </a:xfrm>
           <a:prstGeom prst="ellipse">
             <a:avLst/>
@@ -15213,7 +15244,7 @@
         <p:spPr>
           <a:xfrm>
             <a:off x="744120" y="3208680"/>
-            <a:ext cx="1589400" cy="673920"/>
+            <a:ext cx="1589040" cy="673560"/>
           </a:xfrm>
           <a:prstGeom prst="ellipse">
             <a:avLst/>
@@ -15281,7 +15312,7 @@
         <p:spPr>
           <a:xfrm>
             <a:off x="2119680" y="4628880"/>
-            <a:ext cx="1528560" cy="673920"/>
+            <a:ext cx="1528200" cy="673560"/>
           </a:xfrm>
           <a:prstGeom prst="ellipse">
             <a:avLst/>
@@ -15349,7 +15380,7 @@
         <p:spPr>
           <a:xfrm>
             <a:off x="6819480" y="2574360"/>
-            <a:ext cx="4809240" cy="2972520"/>
+            <a:ext cx="4808880" cy="2972160"/>
           </a:xfrm>
           <a:prstGeom prst="roundRect">
             <a:avLst>
@@ -15499,7 +15530,7 @@
         <p:spPr>
           <a:xfrm>
             <a:off x="7103880" y="4147560"/>
-            <a:ext cx="4377600" cy="857880"/>
+            <a:ext cx="4377240" cy="857520"/>
           </a:xfrm>
           <a:prstGeom prst="ellipse">
             <a:avLst/>
@@ -15567,7 +15598,7 @@
         <p:spPr>
           <a:xfrm>
             <a:off x="9898200" y="3332520"/>
-            <a:ext cx="1216080" cy="405720"/>
+            <a:ext cx="1215720" cy="405360"/>
           </a:xfrm>
           <a:prstGeom prst="ellipse">
             <a:avLst/>
@@ -15635,7 +15666,7 @@
         <p:spPr>
           <a:xfrm>
             <a:off x="6965640" y="3288960"/>
-            <a:ext cx="1589400" cy="673920"/>
+            <a:ext cx="1589040" cy="673560"/>
           </a:xfrm>
           <a:prstGeom prst="ellipse">
             <a:avLst/>
@@ -15703,7 +15734,7 @@
         <p:spPr>
           <a:xfrm>
             <a:off x="8287920" y="2688120"/>
-            <a:ext cx="1872360" cy="673920"/>
+            <a:ext cx="1872000" cy="673560"/>
           </a:xfrm>
           <a:prstGeom prst="ellipse">
             <a:avLst/>
@@ -15820,7 +15851,7 @@
         <p:spPr>
           <a:xfrm>
             <a:off x="684360" y="4487400"/>
-            <a:ext cx="8533080" cy="1505520"/>
+            <a:ext cx="8532720" cy="1505160"/>
           </a:xfrm>
           <a:prstGeom prst="rect">
             <a:avLst/>
@@ -15869,7 +15900,7 @@
         <p:spPr>
           <a:xfrm>
             <a:off x="684360" y="685800"/>
-            <a:ext cx="11361240" cy="3613680"/>
+            <a:ext cx="11360880" cy="3613320"/>
           </a:xfrm>
           <a:prstGeom prst="rect">
             <a:avLst/>
@@ -15890,7 +15921,7 @@
             <a:normAutofit/>
           </a:bodyPr>
           <a:p>
-            <a:pPr marL="285840" indent="-284400">
+            <a:pPr marL="285840" indent="-284040">
               <a:lnSpc>
                 <a:spcPct val="100000"/>
               </a:lnSpc>
@@ -15932,7 +15963,7 @@
             </a:endParaRPr>
           </a:p>
           <a:p>
-            <a:pPr marL="285840" indent="-284400">
+            <a:pPr marL="285840" indent="-284040">
               <a:lnSpc>
                 <a:spcPct val="100000"/>
               </a:lnSpc>
@@ -16122,7 +16153,7 @@
             </a:endParaRPr>
           </a:p>
           <a:p>
-            <a:pPr marL="285840" indent="-284400">
+            <a:pPr marL="285840" indent="-284040">
               <a:lnSpc>
                 <a:spcPct val="100000"/>
               </a:lnSpc>
@@ -16154,7 +16185,7 @@
             </a:endParaRPr>
           </a:p>
           <a:p>
-            <a:pPr marL="285840" indent="-284400">
+            <a:pPr marL="285840" indent="-284040">
               <a:lnSpc>
                 <a:spcPct val="100000"/>
               </a:lnSpc>
@@ -16245,7 +16276,7 @@
         <p:spPr>
           <a:xfrm>
             <a:off x="684360" y="4487400"/>
-            <a:ext cx="8533080" cy="1505520"/>
+            <a:ext cx="8532720" cy="1505160"/>
           </a:xfrm>
           <a:prstGeom prst="rect">
             <a:avLst/>
@@ -16294,7 +16325,7 @@
         <p:spPr>
           <a:xfrm>
             <a:off x="684360" y="685800"/>
-            <a:ext cx="8533080" cy="3613680"/>
+            <a:ext cx="8532720" cy="3613320"/>
           </a:xfrm>
           <a:prstGeom prst="rect">
             <a:avLst/>
@@ -16313,7 +16344,7 @@
         <p:txBody>
           <a:bodyPr lIns="90000" rIns="90000" tIns="45000" bIns="45000" anchor="ctr"/>
           <a:p>
-            <a:pPr marL="285840" indent="-284400">
+            <a:pPr marL="285840" indent="-284040">
               <a:lnSpc>
                 <a:spcPct val="100000"/>
               </a:lnSpc>
@@ -16415,7 +16446,7 @@
             </a:endParaRPr>
           </a:p>
           <a:p>
-            <a:pPr marL="285840" indent="-284400">
+            <a:pPr marL="285840" indent="-284040">
               <a:lnSpc>
                 <a:spcPct val="100000"/>
               </a:lnSpc>
@@ -16517,7 +16548,7 @@
         <p:spPr>
           <a:xfrm>
             <a:off x="2521440" y="3979080"/>
-            <a:ext cx="1880640" cy="806400"/>
+            <a:ext cx="1880280" cy="806040"/>
           </a:xfrm>
           <a:prstGeom prst="rect">
             <a:avLst/>
@@ -16583,7 +16614,7 @@
         <p:spPr>
           <a:xfrm>
             <a:off x="5487840" y="3979080"/>
-            <a:ext cx="1880640" cy="806400"/>
+            <a:ext cx="1880280" cy="806040"/>
           </a:xfrm>
           <a:prstGeom prst="rect">
             <a:avLst/>
@@ -16649,7 +16680,7 @@
         <p:spPr>
           <a:xfrm>
             <a:off x="4004640" y="2771640"/>
-            <a:ext cx="1880640" cy="806400"/>
+            <a:ext cx="1880280" cy="806040"/>
           </a:xfrm>
           <a:prstGeom prst="rect">
             <a:avLst/>
@@ -16715,7 +16746,7 @@
         <p:spPr>
           <a:xfrm>
             <a:off x="4483080" y="4383000"/>
-            <a:ext cx="1003320" cy="360"/>
+            <a:ext cx="1002960" cy="360"/>
           </a:xfrm>
           <a:custGeom>
             <a:avLst/>
@@ -16767,7 +16798,7 @@
         <p:spPr>
           <a:xfrm>
             <a:off x="4985640" y="3657600"/>
-            <a:ext cx="360" cy="578160"/>
+            <a:ext cx="360" cy="577800"/>
           </a:xfrm>
           <a:custGeom>
             <a:avLst/>
@@ -16868,7 +16899,7 @@
         <p:spPr>
           <a:xfrm>
             <a:off x="0" y="0"/>
-            <a:ext cx="12190680" cy="6856560"/>
+            <a:ext cx="12190320" cy="6856200"/>
           </a:xfrm>
           <a:prstGeom prst="rect">
             <a:avLst/>
@@ -16921,7 +16952,7 @@
         <p:spPr>
           <a:xfrm>
             <a:off x="640440" y="685800"/>
-            <a:ext cx="4817160" cy="4602240"/>
+            <a:ext cx="4816800" cy="4601880"/>
           </a:xfrm>
           <a:prstGeom prst="rect">
             <a:avLst/>
@@ -16972,7 +17003,7 @@
         <p:spPr>
           <a:xfrm>
             <a:off x="6095880" y="0"/>
-            <a:ext cx="6094440" cy="6856560"/>
+            <a:ext cx="6094080" cy="6856200"/>
           </a:xfrm>
           <a:prstGeom prst="rect">
             <a:avLst/>
@@ -17010,7 +17041,7 @@
         <p:spPr>
           <a:xfrm>
             <a:off x="6625800" y="685800"/>
-            <a:ext cx="4877640" cy="4602240"/>
+            <a:ext cx="4877280" cy="4601880"/>
           </a:xfrm>
           <a:prstGeom prst="rect">
             <a:avLst/>
@@ -17031,7 +17062,7 @@
             <a:normAutofit/>
           </a:bodyPr>
           <a:p>
-            <a:pPr marL="285840" indent="-284400">
+            <a:pPr marL="285840" indent="-284040">
               <a:lnSpc>
                 <a:spcPct val="100000"/>
               </a:lnSpc>
@@ -17063,7 +17094,7 @@
             </a:endParaRPr>
           </a:p>
           <a:p>
-            <a:pPr marL="285840" indent="-284400">
+            <a:pPr marL="285840" indent="-284040">
               <a:lnSpc>
                 <a:spcPct val="100000"/>
               </a:lnSpc>
@@ -17095,7 +17126,7 @@
             </a:endParaRPr>
           </a:p>
           <a:p>
-            <a:pPr marL="285840" indent="-284400">
+            <a:pPr marL="285840" indent="-284040">
               <a:lnSpc>
                 <a:spcPct val="100000"/>
               </a:lnSpc>
@@ -17127,7 +17158,7 @@
             </a:endParaRPr>
           </a:p>
           <a:p>
-            <a:pPr marL="285840" indent="-284400">
+            <a:pPr marL="285840" indent="-284040">
               <a:lnSpc>
                 <a:spcPct val="100000"/>
               </a:lnSpc>
@@ -17218,7 +17249,7 @@
         <p:spPr>
           <a:xfrm>
             <a:off x="684360" y="4487400"/>
-            <a:ext cx="8533080" cy="1505520"/>
+            <a:ext cx="8532720" cy="1505160"/>
           </a:xfrm>
           <a:prstGeom prst="rect">
             <a:avLst/>
@@ -17267,7 +17298,7 @@
         <p:spPr>
           <a:xfrm>
             <a:off x="1044720" y="500040"/>
-            <a:ext cx="8262720" cy="3231360"/>
+            <a:ext cx="8262360" cy="3231000"/>
           </a:xfrm>
           <a:prstGeom prst="rect">
             <a:avLst/>
@@ -17286,7 +17317,7 @@
         <p:txBody>
           <a:bodyPr lIns="90000" rIns="90000" tIns="45000" bIns="45000" anchor="ctr"/>
           <a:p>
-            <a:pPr marL="285840" indent="-284400">
+            <a:pPr marL="285840" indent="-284040">
               <a:lnSpc>
                 <a:spcPct val="100000"/>
               </a:lnSpc>
@@ -17328,7 +17359,7 @@
             </a:endParaRPr>
           </a:p>
           <a:p>
-            <a:pPr marL="285840" indent="-284400">
+            <a:pPr marL="285840" indent="-284040">
               <a:lnSpc>
                 <a:spcPct val="100000"/>
               </a:lnSpc>
@@ -17380,7 +17411,7 @@
             </a:endParaRPr>
           </a:p>
           <a:p>
-            <a:pPr marL="285840" indent="-284400">
+            <a:pPr marL="285840" indent="-284040">
               <a:lnSpc>
                 <a:spcPct val="100000"/>
               </a:lnSpc>
@@ -17532,7 +17563,7 @@
         <p:spPr>
           <a:xfrm>
             <a:off x="7097760" y="1943280"/>
-            <a:ext cx="853200" cy="853200"/>
+            <a:ext cx="852840" cy="852840"/>
           </a:xfrm>
           <a:prstGeom prst="rect">
             <a:avLst/>
@@ -17555,7 +17586,7 @@
         <p:spPr>
           <a:xfrm>
             <a:off x="6931800" y="4296600"/>
-            <a:ext cx="1179720" cy="471960"/>
+            <a:ext cx="1179360" cy="471600"/>
           </a:xfrm>
           <a:prstGeom prst="rect">
             <a:avLst/>
@@ -17578,7 +17609,7 @@
         <p:spPr>
           <a:xfrm>
             <a:off x="7054200" y="2896920"/>
-            <a:ext cx="896760" cy="1038960"/>
+            <a:ext cx="896400" cy="1038600"/>
           </a:xfrm>
           <a:prstGeom prst="rect">
             <a:avLst/>
@@ -17601,7 +17632,7 @@
         <p:spPr>
           <a:xfrm>
             <a:off x="2718360" y="2064960"/>
-            <a:ext cx="912960" cy="912960"/>
+            <a:ext cx="912600" cy="912600"/>
           </a:xfrm>
           <a:prstGeom prst="rect">
             <a:avLst/>
@@ -17624,7 +17655,7 @@
         <p:spPr>
           <a:xfrm>
             <a:off x="2739240" y="3371040"/>
-            <a:ext cx="912960" cy="912960"/>
+            <a:ext cx="912600" cy="912600"/>
           </a:xfrm>
           <a:prstGeom prst="rect">
             <a:avLst/>
@@ -17647,7 +17678,7 @@
         <p:spPr>
           <a:xfrm>
             <a:off x="4908600" y="2852280"/>
-            <a:ext cx="912960" cy="912960"/>
+            <a:ext cx="912600" cy="912600"/>
           </a:xfrm>
           <a:prstGeom prst="rect">
             <a:avLst/>
@@ -17666,7 +17697,7 @@
         <p:spPr>
           <a:xfrm rot="1192200">
             <a:off x="4047480" y="2673000"/>
-            <a:ext cx="977040" cy="483120"/>
+            <a:ext cx="976680" cy="482760"/>
           </a:xfrm>
           <a:prstGeom prst="rightArrow">
             <a:avLst>
@@ -17708,7 +17739,7 @@
         <p:spPr>
           <a:xfrm rot="20407800">
             <a:off x="4026960" y="3459600"/>
-            <a:ext cx="977040" cy="483120"/>
+            <a:ext cx="976680" cy="482760"/>
           </a:xfrm>
           <a:prstGeom prst="rightArrow">
             <a:avLst>
@@ -17750,7 +17781,7 @@
         <p:spPr>
           <a:xfrm rot="1192200">
             <a:off x="5801040" y="3781440"/>
-            <a:ext cx="977040" cy="483120"/>
+            <a:ext cx="976680" cy="482760"/>
           </a:xfrm>
           <a:prstGeom prst="rightArrow">
             <a:avLst>
@@ -17792,7 +17823,7 @@
         <p:spPr>
           <a:xfrm rot="20407800">
             <a:off x="5875200" y="2455200"/>
-            <a:ext cx="977040" cy="483120"/>
+            <a:ext cx="976680" cy="482760"/>
           </a:xfrm>
           <a:prstGeom prst="rightArrow">
             <a:avLst>
@@ -17834,7 +17865,7 @@
         <p:spPr>
           <a:xfrm>
             <a:off x="5951880" y="3115440"/>
-            <a:ext cx="977040" cy="483120"/>
+            <a:ext cx="976680" cy="482760"/>
           </a:xfrm>
           <a:prstGeom prst="rightArrow">
             <a:avLst>
@@ -17925,7 +17956,7 @@
         <p:spPr>
           <a:xfrm>
             <a:off x="684360" y="4487400"/>
-            <a:ext cx="8533080" cy="1505520"/>
+            <a:ext cx="8532720" cy="1505160"/>
           </a:xfrm>
           <a:prstGeom prst="rect">
             <a:avLst/>
@@ -17974,7 +18005,7 @@
         <p:spPr>
           <a:xfrm>
             <a:off x="684360" y="685800"/>
-            <a:ext cx="8533080" cy="3613680"/>
+            <a:ext cx="8532720" cy="3613320"/>
           </a:xfrm>
           <a:prstGeom prst="rect">
             <a:avLst/>
@@ -17993,7 +18024,7 @@
         <p:txBody>
           <a:bodyPr lIns="90000" rIns="90000" tIns="45000" bIns="45000" anchor="ctr"/>
           <a:p>
-            <a:pPr marL="285840" indent="-284400">
+            <a:pPr marL="285840" indent="-284040">
               <a:lnSpc>
                 <a:spcPct val="100000"/>
               </a:lnSpc>
@@ -18085,7 +18116,7 @@
             </a:endParaRPr>
           </a:p>
           <a:p>
-            <a:pPr marL="285840" indent="-284400">
+            <a:pPr marL="285840" indent="-284040">
               <a:lnSpc>
                 <a:spcPct val="100000"/>
               </a:lnSpc>
@@ -18137,7 +18168,7 @@
             </a:endParaRPr>
           </a:p>
           <a:p>
-            <a:pPr marL="285840" indent="-284400">
+            <a:pPr marL="285840" indent="-284040">
               <a:lnSpc>
                 <a:spcPct val="100000"/>
               </a:lnSpc>
@@ -18223,7 +18254,7 @@
         <p:spPr>
           <a:xfrm>
             <a:off x="6227640" y="3794400"/>
-            <a:ext cx="912960" cy="912960"/>
+            <a:ext cx="912600" cy="912600"/>
           </a:xfrm>
           <a:prstGeom prst="rect">
             <a:avLst/>
@@ -18246,7 +18277,7 @@
         <p:spPr>
           <a:xfrm>
             <a:off x="2468520" y="3843720"/>
-            <a:ext cx="912960" cy="912960"/>
+            <a:ext cx="912600" cy="912600"/>
           </a:xfrm>
           <a:prstGeom prst="rect">
             <a:avLst/>
@@ -18269,7 +18300,7 @@
         <p:spPr>
           <a:xfrm>
             <a:off x="9790920" y="3794400"/>
-            <a:ext cx="912960" cy="912960"/>
+            <a:ext cx="912600" cy="912600"/>
           </a:xfrm>
           <a:prstGeom prst="rect">
             <a:avLst/>
@@ -18292,7 +18323,7 @@
         <p:spPr>
           <a:xfrm>
             <a:off x="7903800" y="3794400"/>
-            <a:ext cx="912960" cy="912960"/>
+            <a:ext cx="912600" cy="912600"/>
           </a:xfrm>
           <a:prstGeom prst="rect">
             <a:avLst/>
@@ -18315,7 +18346,7 @@
         <p:spPr>
           <a:xfrm>
             <a:off x="4412520" y="3794400"/>
-            <a:ext cx="912960" cy="912960"/>
+            <a:ext cx="912600" cy="912600"/>
           </a:xfrm>
           <a:prstGeom prst="rect">
             <a:avLst/>
@@ -18338,7 +18369,7 @@
         <p:spPr>
           <a:xfrm>
             <a:off x="684360" y="3843720"/>
-            <a:ext cx="912960" cy="912960"/>
+            <a:ext cx="912600" cy="912600"/>
           </a:xfrm>
           <a:prstGeom prst="rect">
             <a:avLst/>
@@ -18357,7 +18388,7 @@
         <p:spPr>
           <a:xfrm>
             <a:off x="1638000" y="4183200"/>
-            <a:ext cx="681480" cy="260640"/>
+            <a:ext cx="681120" cy="260280"/>
           </a:xfrm>
           <a:prstGeom prst="rightArrow">
             <a:avLst>
@@ -18396,7 +18427,7 @@
         <p:spPr>
           <a:xfrm>
             <a:off x="3511800" y="4201920"/>
-            <a:ext cx="681480" cy="260640"/>
+            <a:ext cx="681120" cy="260280"/>
           </a:xfrm>
           <a:prstGeom prst="rightArrow">
             <a:avLst>
@@ -18435,7 +18466,7 @@
         <p:spPr>
           <a:xfrm>
             <a:off x="5366520" y="4193640"/>
-            <a:ext cx="681480" cy="260640"/>
+            <a:ext cx="681120" cy="260280"/>
           </a:xfrm>
           <a:prstGeom prst="rightArrow">
             <a:avLst>
@@ -18474,7 +18505,7 @@
         <p:spPr>
           <a:xfrm>
             <a:off x="7162200" y="4183200"/>
-            <a:ext cx="681480" cy="260640"/>
+            <a:ext cx="681120" cy="260280"/>
           </a:xfrm>
           <a:prstGeom prst="rightArrow">
             <a:avLst>
@@ -18513,7 +18544,7 @@
         <p:spPr>
           <a:xfrm>
             <a:off x="8876160" y="4169880"/>
-            <a:ext cx="681480" cy="260640"/>
+            <a:ext cx="681120" cy="260280"/>
           </a:xfrm>
           <a:prstGeom prst="rightArrow">
             <a:avLst>
@@ -18601,7 +18632,7 @@
         <p:spPr>
           <a:xfrm>
             <a:off x="684360" y="4487400"/>
-            <a:ext cx="8533080" cy="1505520"/>
+            <a:ext cx="8532720" cy="1505160"/>
           </a:xfrm>
           <a:prstGeom prst="rect">
             <a:avLst/>
@@ -18650,7 +18681,7 @@
         <p:spPr>
           <a:xfrm>
             <a:off x="684360" y="685800"/>
-            <a:ext cx="8533080" cy="3613680"/>
+            <a:ext cx="8532720" cy="3613320"/>
           </a:xfrm>
           <a:prstGeom prst="rect">
             <a:avLst/>
@@ -18669,7 +18700,7 @@
         <p:txBody>
           <a:bodyPr lIns="90000" rIns="90000" tIns="45000" bIns="45000" anchor="ctr"/>
           <a:p>
-            <a:pPr marL="285840" indent="-284400">
+            <a:pPr marL="285840" indent="-284040">
               <a:lnSpc>
                 <a:spcPct val="100000"/>
               </a:lnSpc>
@@ -18751,7 +18782,7 @@
             </a:endParaRPr>
           </a:p>
           <a:p>
-            <a:pPr marL="285840" indent="-284400">
+            <a:pPr marL="285840" indent="-284040">
               <a:lnSpc>
                 <a:spcPct val="100000"/>
               </a:lnSpc>
@@ -18797,7 +18828,7 @@
         <p:spPr>
           <a:xfrm>
             <a:off x="4681800" y="2481480"/>
-            <a:ext cx="912960" cy="912960"/>
+            <a:ext cx="912600" cy="912600"/>
           </a:xfrm>
           <a:prstGeom prst="rect">
             <a:avLst/>
@@ -18820,7 +18851,7 @@
         <p:spPr>
           <a:xfrm>
             <a:off x="6609240" y="3669480"/>
-            <a:ext cx="912960" cy="912960"/>
+            <a:ext cx="912600" cy="912600"/>
           </a:xfrm>
           <a:prstGeom prst="rect">
             <a:avLst/>
@@ -18843,7 +18874,7 @@
         <p:spPr>
           <a:xfrm>
             <a:off x="2973240" y="3669480"/>
-            <a:ext cx="912960" cy="912960"/>
+            <a:ext cx="912600" cy="912600"/>
           </a:xfrm>
           <a:prstGeom prst="rect">
             <a:avLst/>
@@ -18862,7 +18893,7 @@
         <p:spPr>
           <a:xfrm>
             <a:off x="4214160" y="3946320"/>
-            <a:ext cx="2067120" cy="359280"/>
+            <a:ext cx="2066760" cy="358920"/>
           </a:xfrm>
           <a:prstGeom prst="rightArrow">
             <a:avLst>
@@ -18901,7 +18932,7 @@
         <p:spPr>
           <a:xfrm>
             <a:off x="4988160" y="3533400"/>
-            <a:ext cx="300240" cy="405720"/>
+            <a:ext cx="299880" cy="405360"/>
           </a:xfrm>
           <a:prstGeom prst="downArrow">
             <a:avLst>

</xml_diff>

<commit_message>
#12 Reinfocement learning  explanation with cat example speech part 3 added on introduction slides
</commit_message>
<xml_diff>
--- a/SAI_presentation_libre_office.pptx
+++ b/SAI_presentation_libre_office.pptx
@@ -250,7 +250,7 @@
           <a:bodyPr lIns="0" rIns="0" tIns="0" bIns="0" anchor="b"/>
           <a:p>
             <a:pPr algn="r"/>
-            <a:fld id="{D5D5A20A-1EBA-4FBB-A515-820F37612E6C}" type="slidenum">
+            <a:fld id="{B66CE860-0531-4975-8EBB-338191391009}" type="slidenum">
               <a:rPr b="0" lang="fr-FR" sz="1400" spc="-1" strike="noStrike">
                 <a:latin typeface="Times New Roman"/>
               </a:rPr>
@@ -298,7 +298,7 @@
         <p:spPr>
           <a:xfrm>
             <a:off x="685800" y="1143000"/>
-            <a:ext cx="5484600" cy="3084480"/>
+            <a:ext cx="5484240" cy="3084120"/>
           </a:xfrm>
           <a:prstGeom prst="rect">
             <a:avLst/>
@@ -318,7 +318,7 @@
         <p:spPr>
           <a:xfrm>
             <a:off x="685800" y="4400640"/>
-            <a:ext cx="5484600" cy="3598560"/>
+            <a:ext cx="5484240" cy="3598200"/>
           </a:xfrm>
           <a:prstGeom prst="rect">
             <a:avLst/>
@@ -327,7 +327,7 @@
         <p:txBody>
           <a:bodyPr lIns="0" rIns="0" tIns="0" bIns="0"/>
           <a:p>
-            <a:pPr marL="216000" indent="-214560">
+            <a:pPr marL="216000" indent="-214200">
               <a:lnSpc>
                 <a:spcPct val="100000"/>
               </a:lnSpc>
@@ -343,7 +343,7 @@
             </a:endParaRPr>
           </a:p>
           <a:p>
-            <a:pPr marL="216000" indent="-214560">
+            <a:pPr marL="216000" indent="-214200">
               <a:lnSpc>
                 <a:spcPct val="100000"/>
               </a:lnSpc>
@@ -360,7 +360,7 @@
             </a:endParaRPr>
           </a:p>
           <a:p>
-            <a:pPr marL="216000" indent="-214560">
+            <a:pPr marL="216000" indent="-214200">
               <a:lnSpc>
                 <a:spcPct val="100000"/>
               </a:lnSpc>
@@ -376,7 +376,7 @@
             </a:endParaRPr>
           </a:p>
           <a:p>
-            <a:pPr marL="216000" indent="-214560">
+            <a:pPr marL="216000" indent="-214200">
               <a:lnSpc>
                 <a:spcPct val="100000"/>
               </a:lnSpc>
@@ -392,7 +392,7 @@
             </a:endParaRPr>
           </a:p>
           <a:p>
-            <a:pPr marL="216000" indent="-214560">
+            <a:pPr marL="216000" indent="-214200">
               <a:lnSpc>
                 <a:spcPct val="100000"/>
               </a:lnSpc>
@@ -419,7 +419,7 @@
         <p:spPr>
           <a:xfrm>
             <a:off x="3884760" y="8685360"/>
-            <a:ext cx="2970000" cy="456840"/>
+            <a:ext cx="2969640" cy="456480"/>
           </a:xfrm>
           <a:prstGeom prst="rect">
             <a:avLst/>
@@ -443,7 +443,7 @@
                 <a:spcPct val="100000"/>
               </a:lnSpc>
             </a:pPr>
-            <a:fld id="{7AE86BEA-D7C7-4EEF-AFED-7E2927971E7E}" type="slidenum">
+            <a:fld id="{A14EA1BF-F29A-4BF3-9E62-3B9E956627D7}" type="slidenum">
               <a:rPr b="0" lang="fr-FR" sz="1200" spc="-1" strike="noStrike">
                 <a:solidFill>
                   <a:srgbClr val="000000"/>
@@ -493,7 +493,7 @@
         <p:spPr>
           <a:xfrm>
             <a:off x="685800" y="1143000"/>
-            <a:ext cx="5484600" cy="3084480"/>
+            <a:ext cx="5484240" cy="3084120"/>
           </a:xfrm>
           <a:prstGeom prst="rect">
             <a:avLst/>
@@ -513,7 +513,7 @@
         <p:spPr>
           <a:xfrm>
             <a:off x="685800" y="4400640"/>
-            <a:ext cx="5484600" cy="3598560"/>
+            <a:ext cx="5484240" cy="3598200"/>
           </a:xfrm>
           <a:prstGeom prst="rect">
             <a:avLst/>
@@ -522,7 +522,7 @@
         <p:txBody>
           <a:bodyPr lIns="0" rIns="0" tIns="0" bIns="0"/>
           <a:p>
-            <a:pPr marL="216000" indent="-214920">
+            <a:pPr marL="216000" indent="-214560">
               <a:lnSpc>
                 <a:spcPct val="100000"/>
               </a:lnSpc>
@@ -538,7 +538,7 @@
             </a:endParaRPr>
           </a:p>
           <a:p>
-            <a:pPr marL="216000" indent="-214920">
+            <a:pPr marL="216000" indent="-214560">
               <a:lnSpc>
                 <a:spcPct val="100000"/>
               </a:lnSpc>
@@ -548,7 +548,7 @@
             </a:endParaRPr>
           </a:p>
           <a:p>
-            <a:pPr marL="216000" indent="-214920">
+            <a:pPr marL="216000" indent="-214560">
               <a:lnSpc>
                 <a:spcPct val="100000"/>
               </a:lnSpc>
@@ -564,7 +564,7 @@
             </a:endParaRPr>
           </a:p>
           <a:p>
-            <a:pPr marL="216000" indent="-214920">
+            <a:pPr marL="216000" indent="-214560">
               <a:lnSpc>
                 <a:spcPct val="100000"/>
               </a:lnSpc>
@@ -574,7 +574,7 @@
             </a:endParaRPr>
           </a:p>
           <a:p>
-            <a:pPr marL="216000" indent="-214920">
+            <a:pPr marL="216000" indent="-214560">
               <a:lnSpc>
                 <a:spcPct val="100000"/>
               </a:lnSpc>
@@ -590,7 +590,7 @@
             </a:endParaRPr>
           </a:p>
           <a:p>
-            <a:pPr marL="216000" indent="-214920">
+            <a:pPr marL="216000" indent="-214560">
               <a:lnSpc>
                 <a:spcPct val="100000"/>
               </a:lnSpc>
@@ -600,7 +600,7 @@
             </a:endParaRPr>
           </a:p>
           <a:p>
-            <a:pPr marL="216000" indent="-214920">
+            <a:pPr marL="216000" indent="-214560">
               <a:lnSpc>
                 <a:spcPct val="100000"/>
               </a:lnSpc>
@@ -616,7 +616,7 @@
             </a:endParaRPr>
           </a:p>
           <a:p>
-            <a:pPr marL="216000" indent="-214920">
+            <a:pPr marL="216000" indent="-214560">
               <a:lnSpc>
                 <a:spcPct val="100000"/>
               </a:lnSpc>
@@ -626,7 +626,7 @@
             </a:endParaRPr>
           </a:p>
           <a:p>
-            <a:pPr marL="216000" indent="-214920">
+            <a:pPr marL="216000" indent="-214560">
               <a:lnSpc>
                 <a:spcPct val="100000"/>
               </a:lnSpc>
@@ -636,7 +636,7 @@
             </a:endParaRPr>
           </a:p>
           <a:p>
-            <a:pPr marL="216000" indent="-214920">
+            <a:pPr marL="216000" indent="-214560">
               <a:lnSpc>
                 <a:spcPct val="100000"/>
               </a:lnSpc>
@@ -652,7 +652,7 @@
             </a:endParaRPr>
           </a:p>
           <a:p>
-            <a:pPr marL="216000" indent="-214920">
+            <a:pPr marL="216000" indent="-214560">
               <a:lnSpc>
                 <a:spcPct val="100000"/>
               </a:lnSpc>
@@ -668,7 +668,7 @@
             </a:endParaRPr>
           </a:p>
           <a:p>
-            <a:pPr marL="216000" indent="-214920">
+            <a:pPr marL="216000" indent="-214560">
               <a:lnSpc>
                 <a:spcPct val="100000"/>
               </a:lnSpc>
@@ -684,7 +684,7 @@
             </a:endParaRPr>
           </a:p>
           <a:p>
-            <a:pPr marL="216000" indent="-214920">
+            <a:pPr marL="216000" indent="-214560">
               <a:lnSpc>
                 <a:spcPct val="100000"/>
               </a:lnSpc>
@@ -694,7 +694,7 @@
             </a:endParaRPr>
           </a:p>
           <a:p>
-            <a:pPr marL="216000" indent="-214920">
+            <a:pPr marL="216000" indent="-214560">
               <a:lnSpc>
                 <a:spcPct val="100000"/>
               </a:lnSpc>
@@ -710,7 +710,7 @@
             </a:endParaRPr>
           </a:p>
           <a:p>
-            <a:pPr marL="216000" indent="-214920">
+            <a:pPr marL="216000" indent="-214560">
               <a:lnSpc>
                 <a:spcPct val="100000"/>
               </a:lnSpc>
@@ -720,7 +720,7 @@
             </a:endParaRPr>
           </a:p>
           <a:p>
-            <a:pPr marL="216000" indent="-214920">
+            <a:pPr marL="216000" indent="-214560">
               <a:lnSpc>
                 <a:spcPct val="100000"/>
               </a:lnSpc>
@@ -736,7 +736,7 @@
             </a:endParaRPr>
           </a:p>
           <a:p>
-            <a:pPr marL="216000" indent="-214920">
+            <a:pPr marL="216000" indent="-214560">
               <a:lnSpc>
                 <a:spcPct val="100000"/>
               </a:lnSpc>
@@ -752,7 +752,7 @@
             </a:endParaRPr>
           </a:p>
           <a:p>
-            <a:pPr marL="216000" indent="-214920">
+            <a:pPr marL="216000" indent="-214560">
               <a:lnSpc>
                 <a:spcPct val="100000"/>
               </a:lnSpc>
@@ -768,7 +768,7 @@
             </a:endParaRPr>
           </a:p>
           <a:p>
-            <a:pPr marL="216000" indent="-214920">
+            <a:pPr marL="216000" indent="-214560">
               <a:lnSpc>
                 <a:spcPct val="100000"/>
               </a:lnSpc>
@@ -784,7 +784,7 @@
             </a:endParaRPr>
           </a:p>
           <a:p>
-            <a:pPr marL="216000" indent="-214920">
+            <a:pPr marL="216000" indent="-214560">
               <a:lnSpc>
                 <a:spcPct val="100000"/>
               </a:lnSpc>
@@ -794,7 +794,7 @@
             </a:endParaRPr>
           </a:p>
           <a:p>
-            <a:pPr marL="216000" indent="-214920">
+            <a:pPr marL="216000" indent="-214560">
               <a:lnSpc>
                 <a:spcPct val="100000"/>
               </a:lnSpc>
@@ -810,7 +810,7 @@
             </a:endParaRPr>
           </a:p>
           <a:p>
-            <a:pPr marL="216000" indent="-214920">
+            <a:pPr marL="216000" indent="-214560">
               <a:lnSpc>
                 <a:spcPct val="100000"/>
               </a:lnSpc>
@@ -826,7 +826,7 @@
             </a:endParaRPr>
           </a:p>
           <a:p>
-            <a:pPr marL="216000" indent="-214920">
+            <a:pPr marL="216000" indent="-214560">
               <a:lnSpc>
                 <a:spcPct val="100000"/>
               </a:lnSpc>
@@ -842,7 +842,7 @@
             </a:endParaRPr>
           </a:p>
           <a:p>
-            <a:pPr marL="216000" indent="-214920">
+            <a:pPr marL="216000" indent="-214560">
               <a:lnSpc>
                 <a:spcPct val="100000"/>
               </a:lnSpc>
@@ -858,7 +858,7 @@
             </a:endParaRPr>
           </a:p>
           <a:p>
-            <a:pPr marL="216000" indent="-214920">
+            <a:pPr marL="216000" indent="-214560">
               <a:lnSpc>
                 <a:spcPct val="100000"/>
               </a:lnSpc>
@@ -874,7 +874,7 @@
             </a:endParaRPr>
           </a:p>
           <a:p>
-            <a:pPr marL="216000" indent="-214920">
+            <a:pPr marL="216000" indent="-214560">
               <a:lnSpc>
                 <a:spcPct val="100000"/>
               </a:lnSpc>
@@ -884,7 +884,7 @@
             </a:endParaRPr>
           </a:p>
           <a:p>
-            <a:pPr marL="216000" indent="-214920">
+            <a:pPr marL="216000" indent="-214560">
               <a:lnSpc>
                 <a:spcPct val="100000"/>
               </a:lnSpc>
@@ -900,7 +900,7 @@
             </a:endParaRPr>
           </a:p>
           <a:p>
-            <a:pPr marL="216000" indent="-214920">
+            <a:pPr marL="216000" indent="-214560">
               <a:lnSpc>
                 <a:spcPct val="100000"/>
               </a:lnSpc>
@@ -916,7 +916,7 @@
             </a:endParaRPr>
           </a:p>
           <a:p>
-            <a:pPr marL="216000" indent="-214920">
+            <a:pPr marL="216000" indent="-214560">
               <a:lnSpc>
                 <a:spcPct val="100000"/>
               </a:lnSpc>
@@ -932,7 +932,7 @@
             </a:endParaRPr>
           </a:p>
           <a:p>
-            <a:pPr marL="216000" indent="-214920">
+            <a:pPr marL="216000" indent="-214560">
               <a:lnSpc>
                 <a:spcPct val="100000"/>
               </a:lnSpc>
@@ -942,7 +942,7 @@
             </a:endParaRPr>
           </a:p>
           <a:p>
-            <a:pPr marL="216000" indent="-214920">
+            <a:pPr marL="216000" indent="-214560">
               <a:lnSpc>
                 <a:spcPct val="100000"/>
               </a:lnSpc>
@@ -958,7 +958,7 @@
             </a:endParaRPr>
           </a:p>
           <a:p>
-            <a:pPr marL="216000" indent="-214920">
+            <a:pPr marL="216000" indent="-214560">
               <a:lnSpc>
                 <a:spcPct val="100000"/>
               </a:lnSpc>
@@ -974,7 +974,7 @@
             </a:endParaRPr>
           </a:p>
           <a:p>
-            <a:pPr marL="216000" indent="-214920">
+            <a:pPr marL="216000" indent="-214560">
               <a:lnSpc>
                 <a:spcPct val="100000"/>
               </a:lnSpc>
@@ -990,7 +990,7 @@
             </a:endParaRPr>
           </a:p>
           <a:p>
-            <a:pPr marL="216000" indent="-214920">
+            <a:pPr marL="216000" indent="-214560">
               <a:lnSpc>
                 <a:spcPct val="100000"/>
               </a:lnSpc>
@@ -1000,7 +1000,7 @@
             </a:endParaRPr>
           </a:p>
           <a:p>
-            <a:pPr marL="216000" indent="-214920">
+            <a:pPr marL="216000" indent="-214560">
               <a:lnSpc>
                 <a:spcPct val="100000"/>
               </a:lnSpc>
@@ -1016,7 +1016,7 @@
             </a:endParaRPr>
           </a:p>
           <a:p>
-            <a:pPr marL="216000" indent="-214920">
+            <a:pPr marL="216000" indent="-214560">
               <a:lnSpc>
                 <a:spcPct val="100000"/>
               </a:lnSpc>
@@ -1032,7 +1032,7 @@
             </a:endParaRPr>
           </a:p>
           <a:p>
-            <a:pPr marL="216000" indent="-214920">
+            <a:pPr marL="216000" indent="-214560">
               <a:lnSpc>
                 <a:spcPct val="100000"/>
               </a:lnSpc>
@@ -1048,7 +1048,7 @@
             </a:endParaRPr>
           </a:p>
           <a:p>
-            <a:pPr marL="216000" indent="-214920">
+            <a:pPr marL="216000" indent="-214560">
               <a:lnSpc>
                 <a:spcPct val="100000"/>
               </a:lnSpc>
@@ -1064,7 +1064,7 @@
             </a:endParaRPr>
           </a:p>
           <a:p>
-            <a:pPr marL="216000" indent="-214920">
+            <a:pPr marL="216000" indent="-214560">
               <a:lnSpc>
                 <a:spcPct val="100000"/>
               </a:lnSpc>
@@ -1074,7 +1074,7 @@
             </a:endParaRPr>
           </a:p>
           <a:p>
-            <a:pPr marL="216000" indent="-214920">
+            <a:pPr marL="216000" indent="-214560">
               <a:lnSpc>
                 <a:spcPct val="100000"/>
               </a:lnSpc>
@@ -1090,7 +1090,7 @@
             </a:endParaRPr>
           </a:p>
           <a:p>
-            <a:pPr marL="216000" indent="-214920">
+            <a:pPr marL="216000" indent="-214560">
               <a:lnSpc>
                 <a:spcPct val="100000"/>
               </a:lnSpc>
@@ -1107,7 +1107,7 @@
             </a:endParaRPr>
           </a:p>
           <a:p>
-            <a:pPr marL="216000" indent="-214920">
+            <a:pPr marL="216000" indent="-214560">
               <a:lnSpc>
                 <a:spcPct val="100000"/>
               </a:lnSpc>
@@ -1124,7 +1124,7 @@
             </a:endParaRPr>
           </a:p>
           <a:p>
-            <a:pPr marL="216000" indent="-214920">
+            <a:pPr marL="216000" indent="-214560">
               <a:lnSpc>
                 <a:spcPct val="100000"/>
               </a:lnSpc>
@@ -1141,7 +1141,7 @@
             </a:endParaRPr>
           </a:p>
           <a:p>
-            <a:pPr marL="216000" indent="-214920">
+            <a:pPr marL="216000" indent="-214560">
               <a:lnSpc>
                 <a:spcPct val="100000"/>
               </a:lnSpc>
@@ -1151,7 +1151,7 @@
             </a:endParaRPr>
           </a:p>
           <a:p>
-            <a:pPr marL="216000" indent="-214920">
+            <a:pPr marL="216000" indent="-214560">
               <a:lnSpc>
                 <a:spcPct val="100000"/>
               </a:lnSpc>
@@ -1168,7 +1168,7 @@
             </a:endParaRPr>
           </a:p>
           <a:p>
-            <a:pPr marL="216000" indent="-214920">
+            <a:pPr marL="216000" indent="-214560">
               <a:lnSpc>
                 <a:spcPct val="100000"/>
               </a:lnSpc>
@@ -1185,7 +1185,7 @@
             </a:endParaRPr>
           </a:p>
           <a:p>
-            <a:pPr marL="216000" indent="-214920">
+            <a:pPr marL="216000" indent="-214560">
               <a:lnSpc>
                 <a:spcPct val="100000"/>
               </a:lnSpc>
@@ -1195,7 +1195,7 @@
             </a:endParaRPr>
           </a:p>
           <a:p>
-            <a:pPr marL="216000" indent="-214920">
+            <a:pPr marL="216000" indent="-214560">
               <a:lnSpc>
                 <a:spcPct val="100000"/>
               </a:lnSpc>
@@ -1205,7 +1205,7 @@
             </a:endParaRPr>
           </a:p>
           <a:p>
-            <a:pPr marL="216000" indent="-214920">
+            <a:pPr marL="216000" indent="-214560">
               <a:lnSpc>
                 <a:spcPct val="100000"/>
               </a:lnSpc>
@@ -1215,7 +1215,7 @@
             </a:endParaRPr>
           </a:p>
           <a:p>
-            <a:pPr marL="216000" indent="-214920">
+            <a:pPr marL="216000" indent="-214560">
               <a:lnSpc>
                 <a:spcPct val="100000"/>
               </a:lnSpc>
@@ -1225,7 +1225,7 @@
             </a:endParaRPr>
           </a:p>
           <a:p>
-            <a:pPr marL="216000" indent="-214920">
+            <a:pPr marL="216000" indent="-214560">
               <a:lnSpc>
                 <a:spcPct val="100000"/>
               </a:lnSpc>
@@ -1245,7 +1245,7 @@
         <p:spPr>
           <a:xfrm>
             <a:off x="3884760" y="8685360"/>
-            <a:ext cx="2970000" cy="456840"/>
+            <a:ext cx="2969640" cy="456480"/>
           </a:xfrm>
           <a:prstGeom prst="rect">
             <a:avLst/>
@@ -1269,7 +1269,7 @@
                 <a:spcPct val="100000"/>
               </a:lnSpc>
             </a:pPr>
-            <a:fld id="{29E7C6BF-F49D-4E0F-8E1D-DA77FC0F0BFC}" type="slidenum">
+            <a:fld id="{F2F404CD-2CDD-4CD5-B6CF-5AF324E00F5E}" type="slidenum">
               <a:rPr b="0" lang="fr-FR" sz="1200" spc="-1" strike="noStrike">
                 <a:solidFill>
                   <a:srgbClr val="000000"/>
@@ -1319,7 +1319,7 @@
         <p:spPr>
           <a:xfrm>
             <a:off x="685800" y="1143000"/>
-            <a:ext cx="5484600" cy="3084480"/>
+            <a:ext cx="5484240" cy="3084120"/>
           </a:xfrm>
           <a:prstGeom prst="rect">
             <a:avLst/>
@@ -1339,7 +1339,7 @@
         <p:spPr>
           <a:xfrm>
             <a:off x="685800" y="4400640"/>
-            <a:ext cx="5484600" cy="3598560"/>
+            <a:ext cx="5484240" cy="3598200"/>
           </a:xfrm>
           <a:prstGeom prst="rect">
             <a:avLst/>
@@ -1363,7 +1363,7 @@
         <p:spPr>
           <a:xfrm>
             <a:off x="3884760" y="8685360"/>
-            <a:ext cx="2970000" cy="456840"/>
+            <a:ext cx="2969640" cy="456480"/>
           </a:xfrm>
           <a:prstGeom prst="rect">
             <a:avLst/>
@@ -1387,7 +1387,7 @@
                 <a:spcPct val="100000"/>
               </a:lnSpc>
             </a:pPr>
-            <a:fld id="{4EC2C2BA-637B-4BE9-B38D-177C6298A084}" type="slidenum">
+            <a:fld id="{049ED122-F611-4628-8590-E2D4AFB4115A}" type="slidenum">
               <a:rPr b="0" lang="fr-FR" sz="1200" spc="-1" strike="noStrike">
                 <a:solidFill>
                   <a:srgbClr val="000000"/>
@@ -1437,7 +1437,7 @@
         <p:spPr>
           <a:xfrm>
             <a:off x="380880" y="694800"/>
-            <a:ext cx="6095160" cy="3428280"/>
+            <a:ext cx="6094800" cy="3427920"/>
           </a:xfrm>
           <a:prstGeom prst="rect">
             <a:avLst/>
@@ -1457,7 +1457,7 @@
         <p:spPr>
           <a:xfrm>
             <a:off x="685800" y="4343400"/>
-            <a:ext cx="5485680" cy="4114080"/>
+            <a:ext cx="5485320" cy="4113720"/>
           </a:xfrm>
           <a:prstGeom prst="rect">
             <a:avLst/>
@@ -1466,7 +1466,7 @@
         <p:txBody>
           <a:bodyPr lIns="0" rIns="0" tIns="0" bIns="0"/>
           <a:p>
-            <a:pPr marL="216000" indent="-216000">
+            <a:pPr marL="216000" indent="-215640">
               <a:lnSpc>
                 <a:spcPct val="100000"/>
               </a:lnSpc>
@@ -1482,7 +1482,7 @@
             </a:endParaRPr>
           </a:p>
           <a:p>
-            <a:pPr marL="216000" indent="-216000">
+            <a:pPr marL="216000" indent="-215640">
               <a:lnSpc>
                 <a:spcPct val="100000"/>
               </a:lnSpc>
@@ -1498,7 +1498,23 @@
             </a:endParaRPr>
           </a:p>
           <a:p>
-            <a:pPr marL="216000" indent="-216000">
+            <a:pPr marL="216000" indent="-215640">
+              <a:lnSpc>
+                <a:spcPct val="100000"/>
+              </a:lnSpc>
+            </a:pPr>
+            <a:r>
+              <a:rPr b="0" lang="fr-FR" sz="2000" spc="-1" strike="noStrike">
+                <a:latin typeface="Arial"/>
+              </a:rPr>
+              <a:t>The result of the equation give us a probability of our agent to do an action (go house/garden) regarding the state and the observer (the man)</a:t>
+            </a:r>
+            <a:endParaRPr b="0" lang="fr-FR" sz="2000" spc="-1" strike="noStrike">
+              <a:latin typeface="Arial"/>
+            </a:endParaRPr>
+          </a:p>
+          <a:p>
+            <a:pPr marL="216000" indent="-215640">
               <a:lnSpc>
                 <a:spcPct val="100000"/>
               </a:lnSpc>
@@ -5246,7 +5262,7 @@
         <p:spPr>
           <a:xfrm>
             <a:off x="0" y="0"/>
-            <a:ext cx="12190320" cy="6856200"/>
+            <a:ext cx="12189960" cy="6855840"/>
           </a:xfrm>
           <a:prstGeom prst="rect">
             <a:avLst/>
@@ -5279,7 +5295,7 @@
         <p:spPr>
           <a:xfrm flipV="1">
             <a:off x="0" y="-2160"/>
-            <a:ext cx="12187080" cy="6856200"/>
+            <a:ext cx="12186720" cy="6855840"/>
           </a:xfrm>
           <a:prstGeom prst="snip1Rect">
             <a:avLst>
@@ -5334,7 +5350,7 @@
         <p:spPr>
           <a:xfrm>
             <a:off x="684360" y="685800"/>
-            <a:ext cx="9677160" cy="3671640"/>
+            <a:ext cx="9676800" cy="3671280"/>
           </a:xfrm>
           <a:prstGeom prst="rect">
             <a:avLst/>
@@ -5385,7 +5401,7 @@
         <p:spPr>
           <a:xfrm>
             <a:off x="684360" y="4648320"/>
-            <a:ext cx="7003800" cy="1141200"/>
+            <a:ext cx="7003440" cy="1140840"/>
           </a:xfrm>
           <a:prstGeom prst="rect">
             <a:avLst/>
@@ -5523,7 +5539,7 @@
         <p:spPr>
           <a:xfrm>
             <a:off x="684360" y="4487400"/>
-            <a:ext cx="8532720" cy="1505160"/>
+            <a:ext cx="8532360" cy="1504800"/>
           </a:xfrm>
           <a:prstGeom prst="rect">
             <a:avLst/>
@@ -5572,7 +5588,7 @@
         <p:spPr>
           <a:xfrm>
             <a:off x="684360" y="685800"/>
-            <a:ext cx="8532720" cy="3613320"/>
+            <a:ext cx="8532360" cy="3612960"/>
           </a:xfrm>
           <a:prstGeom prst="rect">
             <a:avLst/>
@@ -5591,7 +5607,7 @@
         <p:txBody>
           <a:bodyPr lIns="90000" rIns="90000" tIns="45000" bIns="45000" anchor="ctr"/>
           <a:p>
-            <a:pPr marL="285840" indent="-284040">
+            <a:pPr marL="285840" indent="-283680">
               <a:lnSpc>
                 <a:spcPct val="100000"/>
               </a:lnSpc>
@@ -5723,7 +5739,7 @@
             </a:endParaRPr>
           </a:p>
           <a:p>
-            <a:pPr marL="285840" indent="-284040">
+            <a:pPr marL="285840" indent="-283680">
               <a:lnSpc>
                 <a:spcPct val="100000"/>
               </a:lnSpc>
@@ -5769,7 +5785,7 @@
         <p:spPr>
           <a:xfrm>
             <a:off x="4733640" y="3979440"/>
-            <a:ext cx="912600" cy="912600"/>
+            <a:ext cx="912240" cy="912240"/>
           </a:xfrm>
           <a:prstGeom prst="rect">
             <a:avLst/>
@@ -5792,7 +5808,7 @@
         <p:spPr>
           <a:xfrm>
             <a:off x="6825960" y="4030200"/>
-            <a:ext cx="912600" cy="912600"/>
+            <a:ext cx="912240" cy="912240"/>
           </a:xfrm>
           <a:prstGeom prst="rect">
             <a:avLst/>
@@ -5815,7 +5831,7 @@
         <p:spPr>
           <a:xfrm>
             <a:off x="5354640" y="2725920"/>
-            <a:ext cx="912600" cy="912600"/>
+            <a:ext cx="912240" cy="912240"/>
           </a:xfrm>
           <a:prstGeom prst="rect">
             <a:avLst/>
@@ -5838,7 +5854,7 @@
         <p:spPr>
           <a:xfrm>
             <a:off x="8550000" y="3433320"/>
-            <a:ext cx="912600" cy="912600"/>
+            <a:ext cx="912240" cy="912240"/>
           </a:xfrm>
           <a:prstGeom prst="rect">
             <a:avLst/>
@@ -5861,7 +5877,7 @@
         <p:spPr>
           <a:xfrm>
             <a:off x="5153040" y="5079960"/>
-            <a:ext cx="912600" cy="912600"/>
+            <a:ext cx="912240" cy="912240"/>
           </a:xfrm>
           <a:prstGeom prst="rect">
             <a:avLst/>
@@ -5880,7 +5896,7 @@
         <p:spPr>
           <a:xfrm rot="3732600">
             <a:off x="7994160" y="3764520"/>
-            <a:ext cx="202320" cy="668160"/>
+            <a:ext cx="201960" cy="667800"/>
           </a:xfrm>
           <a:prstGeom prst="downArrow">
             <a:avLst>
@@ -5918,8 +5934,8 @@
         </p:nvSpPr>
         <p:spPr>
           <a:xfrm rot="14618400">
-            <a:off x="6344280" y="4763160"/>
-            <a:ext cx="202320" cy="668160"/>
+            <a:off x="6344280" y="4763520"/>
+            <a:ext cx="201960" cy="667800"/>
           </a:xfrm>
           <a:prstGeom prst="downArrow">
             <a:avLst>
@@ -5957,8 +5973,8 @@
         </p:nvSpPr>
         <p:spPr>
           <a:xfrm rot="5400000">
-            <a:off x="6190560" y="4132800"/>
-            <a:ext cx="202320" cy="668160"/>
+            <a:off x="6190920" y="4132800"/>
+            <a:ext cx="201960" cy="667800"/>
           </a:xfrm>
           <a:prstGeom prst="downArrow">
             <a:avLst>
@@ -5996,8 +6012,8 @@
         </p:nvSpPr>
         <p:spPr>
           <a:xfrm rot="7014000">
-            <a:off x="6424200" y="3552840"/>
-            <a:ext cx="202320" cy="668160"/>
+            <a:off x="6424560" y="3552840"/>
+            <a:ext cx="201960" cy="667800"/>
           </a:xfrm>
           <a:prstGeom prst="downArrow">
             <a:avLst>
@@ -6036,7 +6052,7 @@
         <p:spPr>
           <a:xfrm rot="1747800">
             <a:off x="5088600" y="3303720"/>
-            <a:ext cx="202320" cy="668160"/>
+            <a:ext cx="201960" cy="667800"/>
           </a:xfrm>
           <a:prstGeom prst="downArrow">
             <a:avLst>
@@ -6124,7 +6140,7 @@
         <p:spPr>
           <a:xfrm>
             <a:off x="6868080" y="306720"/>
-            <a:ext cx="5042160" cy="2084040"/>
+            <a:ext cx="5041800" cy="2083680"/>
           </a:xfrm>
           <a:prstGeom prst="rect">
             <a:avLst/>
@@ -6167,7 +6183,7 @@
         <p:spPr>
           <a:xfrm>
             <a:off x="6271200" y="2669400"/>
-            <a:ext cx="5631120" cy="3007080"/>
+            <a:ext cx="5630760" cy="3006720"/>
           </a:xfrm>
           <a:prstGeom prst="rect">
             <a:avLst/>
@@ -6212,7 +6228,7 @@
         <p:spPr>
           <a:xfrm>
             <a:off x="129960" y="5709960"/>
-            <a:ext cx="11181600" cy="1088280"/>
+            <a:ext cx="11181240" cy="1087920"/>
           </a:xfrm>
           <a:prstGeom prst="rect">
             <a:avLst/>
@@ -6257,7 +6273,7 @@
         <p:spPr>
           <a:xfrm>
             <a:off x="207000" y="1787400"/>
-            <a:ext cx="5592960" cy="3226320"/>
+            <a:ext cx="5592600" cy="3225960"/>
           </a:xfrm>
           <a:prstGeom prst="rect">
             <a:avLst/>
@@ -6302,7 +6318,7 @@
         <p:spPr>
           <a:xfrm>
             <a:off x="684360" y="4487400"/>
-            <a:ext cx="8532720" cy="1505160"/>
+            <a:ext cx="8532360" cy="1504800"/>
           </a:xfrm>
           <a:prstGeom prst="rect">
             <a:avLst/>
@@ -6351,7 +6367,7 @@
         <p:spPr>
           <a:xfrm>
             <a:off x="684360" y="685800"/>
-            <a:ext cx="8532720" cy="3613320"/>
+            <a:ext cx="8532360" cy="3612960"/>
           </a:xfrm>
           <a:prstGeom prst="rect">
             <a:avLst/>
@@ -6370,7 +6386,7 @@
         <p:txBody>
           <a:bodyPr lIns="90000" rIns="90000" tIns="45000" bIns="45000" anchor="ctr"/>
           <a:p>
-            <a:pPr marL="285840" indent="-284040">
+            <a:pPr marL="285840" indent="-283680">
               <a:lnSpc>
                 <a:spcPct val="100000"/>
               </a:lnSpc>
@@ -6422,7 +6438,7 @@
             </a:endParaRPr>
           </a:p>
           <a:p>
-            <a:pPr marL="285840" indent="-284040">
+            <a:pPr marL="285840" indent="-283680">
               <a:lnSpc>
                 <a:spcPct val="100000"/>
               </a:lnSpc>
@@ -6464,7 +6480,7 @@
             </a:endParaRPr>
           </a:p>
           <a:p>
-            <a:pPr marL="285840" indent="-284040">
+            <a:pPr marL="285840" indent="-283680">
               <a:lnSpc>
                 <a:spcPct val="100000"/>
               </a:lnSpc>
@@ -6516,7 +6532,7 @@
             </a:endParaRPr>
           </a:p>
           <a:p>
-            <a:pPr marL="285840" indent="-284040">
+            <a:pPr marL="285840" indent="-283680">
               <a:lnSpc>
                 <a:spcPct val="100000"/>
               </a:lnSpc>
@@ -6684,7 +6700,7 @@
         <p:spPr>
           <a:xfrm>
             <a:off x="4629600" y="1832040"/>
-            <a:ext cx="852840" cy="852840"/>
+            <a:ext cx="852480" cy="852480"/>
           </a:xfrm>
           <a:prstGeom prst="rect">
             <a:avLst/>
@@ -6707,7 +6723,7 @@
         <p:spPr>
           <a:xfrm>
             <a:off x="4463640" y="4185360"/>
-            <a:ext cx="1179360" cy="471600"/>
+            <a:ext cx="1179000" cy="471240"/>
           </a:xfrm>
           <a:prstGeom prst="rect">
             <a:avLst/>
@@ -6730,7 +6746,7 @@
         <p:spPr>
           <a:xfrm>
             <a:off x="4586040" y="2785680"/>
-            <a:ext cx="896400" cy="1038600"/>
+            <a:ext cx="896040" cy="1038240"/>
           </a:xfrm>
           <a:prstGeom prst="rect">
             <a:avLst/>
@@ -6753,7 +6769,7 @@
         <p:spPr>
           <a:xfrm>
             <a:off x="250560" y="1953720"/>
-            <a:ext cx="912600" cy="912600"/>
+            <a:ext cx="912240" cy="912240"/>
           </a:xfrm>
           <a:prstGeom prst="rect">
             <a:avLst/>
@@ -6776,7 +6792,7 @@
         <p:spPr>
           <a:xfrm>
             <a:off x="271440" y="3259800"/>
-            <a:ext cx="912600" cy="912600"/>
+            <a:ext cx="912240" cy="912240"/>
           </a:xfrm>
           <a:prstGeom prst="rect">
             <a:avLst/>
@@ -6799,7 +6815,7 @@
         <p:spPr>
           <a:xfrm>
             <a:off x="2440800" y="2741040"/>
-            <a:ext cx="912600" cy="912600"/>
+            <a:ext cx="912240" cy="912240"/>
           </a:xfrm>
           <a:prstGeom prst="rect">
             <a:avLst/>
@@ -6817,8 +6833,8 @@
         </p:nvSpPr>
         <p:spPr>
           <a:xfrm rot="1192200">
-            <a:off x="1579320" y="2561760"/>
-            <a:ext cx="976680" cy="482760"/>
+            <a:off x="1579320" y="2561400"/>
+            <a:ext cx="976320" cy="482400"/>
           </a:xfrm>
           <a:prstGeom prst="rightArrow">
             <a:avLst>
@@ -6859,8 +6875,8 @@
         </p:nvSpPr>
         <p:spPr>
           <a:xfrm rot="20407800">
-            <a:off x="1559160" y="3348360"/>
-            <a:ext cx="976680" cy="482760"/>
+            <a:off x="1558800" y="3348360"/>
+            <a:ext cx="976320" cy="482400"/>
           </a:xfrm>
           <a:prstGeom prst="rightArrow">
             <a:avLst>
@@ -6901,8 +6917,8 @@
         </p:nvSpPr>
         <p:spPr>
           <a:xfrm rot="1192200">
-            <a:off x="3332880" y="3670200"/>
-            <a:ext cx="976680" cy="482760"/>
+            <a:off x="3332880" y="3669840"/>
+            <a:ext cx="976320" cy="482400"/>
           </a:xfrm>
           <a:prstGeom prst="rightArrow">
             <a:avLst>
@@ -6943,8 +6959,8 @@
         </p:nvSpPr>
         <p:spPr>
           <a:xfrm rot="20407800">
-            <a:off x="3407400" y="2343960"/>
-            <a:ext cx="976680" cy="482760"/>
+            <a:off x="3407040" y="2343960"/>
+            <a:ext cx="976320" cy="482400"/>
           </a:xfrm>
           <a:prstGeom prst="rightArrow">
             <a:avLst>
@@ -6986,7 +7002,7 @@
         <p:spPr>
           <a:xfrm>
             <a:off x="3483720" y="3004200"/>
-            <a:ext cx="976680" cy="482760"/>
+            <a:ext cx="976320" cy="482400"/>
           </a:xfrm>
           <a:prstGeom prst="rightArrow">
             <a:avLst>
@@ -7032,7 +7048,7 @@
         <p:spPr>
           <a:xfrm>
             <a:off x="5819760" y="5709960"/>
-            <a:ext cx="912600" cy="912600"/>
+            <a:ext cx="912240" cy="912240"/>
           </a:xfrm>
           <a:prstGeom prst="rect">
             <a:avLst/>
@@ -7055,7 +7071,7 @@
         <p:spPr>
           <a:xfrm>
             <a:off x="2060640" y="5759640"/>
-            <a:ext cx="912600" cy="912600"/>
+            <a:ext cx="912240" cy="912240"/>
           </a:xfrm>
           <a:prstGeom prst="rect">
             <a:avLst/>
@@ -7078,7 +7094,7 @@
         <p:spPr>
           <a:xfrm>
             <a:off x="9383040" y="5709960"/>
-            <a:ext cx="912600" cy="912600"/>
+            <a:ext cx="912240" cy="912240"/>
           </a:xfrm>
           <a:prstGeom prst="rect">
             <a:avLst/>
@@ -7101,7 +7117,7 @@
         <p:spPr>
           <a:xfrm>
             <a:off x="7495920" y="5709960"/>
-            <a:ext cx="912600" cy="912600"/>
+            <a:ext cx="912240" cy="912240"/>
           </a:xfrm>
           <a:prstGeom prst="rect">
             <a:avLst/>
@@ -7124,7 +7140,7 @@
         <p:spPr>
           <a:xfrm>
             <a:off x="4004640" y="5709960"/>
-            <a:ext cx="912600" cy="912600"/>
+            <a:ext cx="912240" cy="912240"/>
           </a:xfrm>
           <a:prstGeom prst="rect">
             <a:avLst/>
@@ -7147,7 +7163,7 @@
         <p:spPr>
           <a:xfrm>
             <a:off x="276120" y="5759640"/>
-            <a:ext cx="912600" cy="912600"/>
+            <a:ext cx="912240" cy="912240"/>
           </a:xfrm>
           <a:prstGeom prst="rect">
             <a:avLst/>
@@ -7166,7 +7182,7 @@
         <p:spPr>
           <a:xfrm>
             <a:off x="1230120" y="6098760"/>
-            <a:ext cx="681120" cy="260280"/>
+            <a:ext cx="680760" cy="259920"/>
           </a:xfrm>
           <a:prstGeom prst="rightArrow">
             <a:avLst>
@@ -7205,7 +7221,7 @@
         <p:spPr>
           <a:xfrm>
             <a:off x="3103920" y="6117480"/>
-            <a:ext cx="681120" cy="260280"/>
+            <a:ext cx="680760" cy="259920"/>
           </a:xfrm>
           <a:prstGeom prst="rightArrow">
             <a:avLst>
@@ -7244,7 +7260,7 @@
         <p:spPr>
           <a:xfrm>
             <a:off x="4958640" y="6109200"/>
-            <a:ext cx="681120" cy="260280"/>
+            <a:ext cx="680760" cy="259920"/>
           </a:xfrm>
           <a:prstGeom prst="rightArrow">
             <a:avLst>
@@ -7283,7 +7299,7 @@
         <p:spPr>
           <a:xfrm>
             <a:off x="6754320" y="6098760"/>
-            <a:ext cx="681120" cy="260280"/>
+            <a:ext cx="680760" cy="259920"/>
           </a:xfrm>
           <a:prstGeom prst="rightArrow">
             <a:avLst>
@@ -7322,7 +7338,7 @@
         <p:spPr>
           <a:xfrm>
             <a:off x="8468280" y="6085800"/>
-            <a:ext cx="681120" cy="260280"/>
+            <a:ext cx="680760" cy="259920"/>
           </a:xfrm>
           <a:prstGeom prst="rightArrow">
             <a:avLst>
@@ -7365,7 +7381,7 @@
         <p:spPr>
           <a:xfrm>
             <a:off x="6582600" y="3915000"/>
-            <a:ext cx="912600" cy="912600"/>
+            <a:ext cx="912240" cy="912240"/>
           </a:xfrm>
           <a:prstGeom prst="rect">
             <a:avLst/>
@@ -7388,7 +7404,7 @@
         <p:spPr>
           <a:xfrm>
             <a:off x="8674920" y="3965760"/>
-            <a:ext cx="912600" cy="912600"/>
+            <a:ext cx="912240" cy="912240"/>
           </a:xfrm>
           <a:prstGeom prst="rect">
             <a:avLst/>
@@ -7411,7 +7427,7 @@
         <p:spPr>
           <a:xfrm>
             <a:off x="7203600" y="2661480"/>
-            <a:ext cx="912600" cy="912600"/>
+            <a:ext cx="912240" cy="912240"/>
           </a:xfrm>
           <a:prstGeom prst="rect">
             <a:avLst/>
@@ -7434,7 +7450,7 @@
         <p:spPr>
           <a:xfrm>
             <a:off x="10398960" y="3368880"/>
-            <a:ext cx="912600" cy="912600"/>
+            <a:ext cx="912240" cy="912240"/>
           </a:xfrm>
           <a:prstGeom prst="rect">
             <a:avLst/>
@@ -7457,7 +7473,7 @@
         <p:spPr>
           <a:xfrm>
             <a:off x="7002000" y="5015520"/>
-            <a:ext cx="912600" cy="912600"/>
+            <a:ext cx="912240" cy="912240"/>
           </a:xfrm>
           <a:prstGeom prst="rect">
             <a:avLst/>
@@ -7476,7 +7492,7 @@
         <p:spPr>
           <a:xfrm rot="3732600">
             <a:off x="9843480" y="3700440"/>
-            <a:ext cx="202320" cy="668160"/>
+            <a:ext cx="201960" cy="667800"/>
           </a:xfrm>
           <a:prstGeom prst="downArrow">
             <a:avLst>
@@ -7514,8 +7530,8 @@
         </p:nvSpPr>
         <p:spPr>
           <a:xfrm rot="14618400">
-            <a:off x="8193240" y="4699080"/>
-            <a:ext cx="202320" cy="668160"/>
+            <a:off x="8193240" y="4699440"/>
+            <a:ext cx="201960" cy="667800"/>
           </a:xfrm>
           <a:prstGeom prst="downArrow">
             <a:avLst>
@@ -7553,8 +7569,8 @@
         </p:nvSpPr>
         <p:spPr>
           <a:xfrm rot="5400000">
-            <a:off x="8039520" y="4068360"/>
-            <a:ext cx="202320" cy="668160"/>
+            <a:off x="8039880" y="4068360"/>
+            <a:ext cx="201960" cy="667800"/>
           </a:xfrm>
           <a:prstGeom prst="downArrow">
             <a:avLst>
@@ -7592,8 +7608,8 @@
         </p:nvSpPr>
         <p:spPr>
           <a:xfrm rot="7014000">
-            <a:off x="8273520" y="3488400"/>
-            <a:ext cx="202320" cy="668160"/>
+            <a:off x="8273880" y="3488400"/>
+            <a:ext cx="201960" cy="667800"/>
           </a:xfrm>
           <a:prstGeom prst="downArrow">
             <a:avLst>
@@ -7632,7 +7648,7 @@
         <p:spPr>
           <a:xfrm rot="1747800">
             <a:off x="7095600" y="3425760"/>
-            <a:ext cx="202320" cy="668160"/>
+            <a:ext cx="201960" cy="667800"/>
           </a:xfrm>
           <a:prstGeom prst="downArrow">
             <a:avLst>
@@ -7675,7 +7691,7 @@
         <p:spPr>
           <a:xfrm>
             <a:off x="8641080" y="309600"/>
-            <a:ext cx="912600" cy="912600"/>
+            <a:ext cx="912240" cy="912240"/>
           </a:xfrm>
           <a:prstGeom prst="rect">
             <a:avLst/>
@@ -7698,7 +7714,7 @@
         <p:spPr>
           <a:xfrm>
             <a:off x="10568880" y="1497240"/>
-            <a:ext cx="912600" cy="912600"/>
+            <a:ext cx="912240" cy="912240"/>
           </a:xfrm>
           <a:prstGeom prst="rect">
             <a:avLst/>
@@ -7721,7 +7737,7 @@
         <p:spPr>
           <a:xfrm>
             <a:off x="6932880" y="1497240"/>
-            <a:ext cx="912600" cy="912600"/>
+            <a:ext cx="912240" cy="912240"/>
           </a:xfrm>
           <a:prstGeom prst="rect">
             <a:avLst/>
@@ -7740,7 +7756,7 @@
         <p:spPr>
           <a:xfrm>
             <a:off x="8173800" y="1774080"/>
-            <a:ext cx="2066760" cy="358920"/>
+            <a:ext cx="2066400" cy="358560"/>
           </a:xfrm>
           <a:prstGeom prst="rightArrow">
             <a:avLst>
@@ -7779,7 +7795,7 @@
         <p:spPr>
           <a:xfrm>
             <a:off x="8947440" y="1361160"/>
-            <a:ext cx="299880" cy="405360"/>
+            <a:ext cx="299520" cy="405000"/>
           </a:xfrm>
           <a:prstGeom prst="downArrow">
             <a:avLst>
@@ -7867,7 +7883,7 @@
         <p:spPr>
           <a:xfrm>
             <a:off x="0" y="0"/>
-            <a:ext cx="12190320" cy="6856200"/>
+            <a:ext cx="12189960" cy="6855840"/>
           </a:xfrm>
           <a:prstGeom prst="rect">
             <a:avLst/>
@@ -7920,7 +7936,7 @@
         <p:spPr>
           <a:xfrm>
             <a:off x="640440" y="685800"/>
-            <a:ext cx="4816800" cy="4601880"/>
+            <a:ext cx="4816440" cy="4601520"/>
           </a:xfrm>
           <a:prstGeom prst="rect">
             <a:avLst/>
@@ -7971,7 +7987,7 @@
         <p:spPr>
           <a:xfrm>
             <a:off x="6095880" y="0"/>
-            <a:ext cx="6094080" cy="6856200"/>
+            <a:ext cx="6093720" cy="6855840"/>
           </a:xfrm>
           <a:prstGeom prst="rect">
             <a:avLst/>
@@ -8009,7 +8025,7 @@
         <p:spPr>
           <a:xfrm>
             <a:off x="6625800" y="685800"/>
-            <a:ext cx="4877280" cy="4601880"/>
+            <a:ext cx="4876920" cy="4601520"/>
           </a:xfrm>
           <a:prstGeom prst="rect">
             <a:avLst/>
@@ -8030,7 +8046,7 @@
             <a:normAutofit/>
           </a:bodyPr>
           <a:p>
-            <a:pPr marL="285840" indent="-284040">
+            <a:pPr marL="285840" indent="-283680">
               <a:lnSpc>
                 <a:spcPct val="100000"/>
               </a:lnSpc>
@@ -8062,7 +8078,7 @@
             </a:endParaRPr>
           </a:p>
           <a:p>
-            <a:pPr marL="285840" indent="-284040">
+            <a:pPr marL="285840" indent="-283680">
               <a:lnSpc>
                 <a:spcPct val="100000"/>
               </a:lnSpc>
@@ -8094,7 +8110,7 @@
             </a:endParaRPr>
           </a:p>
           <a:p>
-            <a:pPr marL="285840" indent="-284040">
+            <a:pPr marL="285840" indent="-283680">
               <a:lnSpc>
                 <a:spcPct val="100000"/>
               </a:lnSpc>
@@ -8126,7 +8142,7 @@
             </a:endParaRPr>
           </a:p>
           <a:p>
-            <a:pPr marL="285840" indent="-284040">
+            <a:pPr marL="285840" indent="-283680">
               <a:lnSpc>
                 <a:spcPct val="100000"/>
               </a:lnSpc>
@@ -8158,7 +8174,7 @@
             </a:endParaRPr>
           </a:p>
           <a:p>
-            <a:pPr marL="285840" indent="-284040">
+            <a:pPr marL="285840" indent="-283680">
               <a:lnSpc>
                 <a:spcPct val="100000"/>
               </a:lnSpc>
@@ -8222,7 +8238,7 @@
         <p:spPr>
           <a:xfrm>
             <a:off x="684360" y="4487400"/>
-            <a:ext cx="8532720" cy="1505160"/>
+            <a:ext cx="8532360" cy="1504800"/>
           </a:xfrm>
           <a:prstGeom prst="rect">
             <a:avLst/>
@@ -8271,7 +8287,7 @@
         <p:spPr>
           <a:xfrm>
             <a:off x="684360" y="685800"/>
-            <a:ext cx="8532720" cy="3613320"/>
+            <a:ext cx="8532360" cy="3612960"/>
           </a:xfrm>
           <a:prstGeom prst="rect">
             <a:avLst/>
@@ -8290,7 +8306,7 @@
         <p:txBody>
           <a:bodyPr lIns="90000" rIns="90000" tIns="45000" bIns="45000" anchor="ctr"/>
           <a:p>
-            <a:pPr marL="285840" indent="-284040">
+            <a:pPr marL="285840" indent="-283680">
               <a:lnSpc>
                 <a:spcPct val="100000"/>
               </a:lnSpc>
@@ -8322,7 +8338,7 @@
             </a:endParaRPr>
           </a:p>
           <a:p>
-            <a:pPr marL="285840" indent="-284040">
+            <a:pPr marL="285840" indent="-283680">
               <a:lnSpc>
                 <a:spcPct val="100000"/>
               </a:lnSpc>
@@ -8432,7 +8448,7 @@
         <p:spPr>
           <a:xfrm>
             <a:off x="6995520" y="1949760"/>
-            <a:ext cx="852840" cy="852840"/>
+            <a:ext cx="852480" cy="852480"/>
           </a:xfrm>
           <a:prstGeom prst="rect">
             <a:avLst/>
@@ -8455,7 +8471,7 @@
         <p:spPr>
           <a:xfrm>
             <a:off x="6829560" y="4303080"/>
-            <a:ext cx="1179360" cy="471600"/>
+            <a:ext cx="1179000" cy="471240"/>
           </a:xfrm>
           <a:prstGeom prst="rect">
             <a:avLst/>
@@ -8478,7 +8494,7 @@
         <p:spPr>
           <a:xfrm>
             <a:off x="6951960" y="2903040"/>
-            <a:ext cx="896400" cy="1038600"/>
+            <a:ext cx="896040" cy="1038240"/>
           </a:xfrm>
           <a:prstGeom prst="rect">
             <a:avLst/>
@@ -8501,7 +8517,7 @@
         <p:spPr>
           <a:xfrm>
             <a:off x="2616120" y="2071080"/>
-            <a:ext cx="912600" cy="912600"/>
+            <a:ext cx="912240" cy="912240"/>
           </a:xfrm>
           <a:prstGeom prst="rect">
             <a:avLst/>
@@ -8524,7 +8540,7 @@
         <p:spPr>
           <a:xfrm>
             <a:off x="2637000" y="3377160"/>
-            <a:ext cx="912600" cy="912600"/>
+            <a:ext cx="912240" cy="912240"/>
           </a:xfrm>
           <a:prstGeom prst="rect">
             <a:avLst/>
@@ -8542,8 +8558,8 @@
         </p:nvSpPr>
         <p:spPr>
           <a:xfrm rot="1192200">
-            <a:off x="3944880" y="2679120"/>
-            <a:ext cx="976680" cy="482760"/>
+            <a:off x="3944880" y="2678760"/>
+            <a:ext cx="976320" cy="482400"/>
           </a:xfrm>
           <a:prstGeom prst="rightArrow">
             <a:avLst>
@@ -8584,8 +8600,8 @@
         </p:nvSpPr>
         <p:spPr>
           <a:xfrm rot="20407800">
-            <a:off x="3924720" y="3465720"/>
-            <a:ext cx="976680" cy="482760"/>
+            <a:off x="3924360" y="3465720"/>
+            <a:ext cx="976320" cy="482400"/>
           </a:xfrm>
           <a:prstGeom prst="rightArrow">
             <a:avLst>
@@ -8626,8 +8642,8 @@
         </p:nvSpPr>
         <p:spPr>
           <a:xfrm rot="1192200">
-            <a:off x="5698800" y="3787560"/>
-            <a:ext cx="976680" cy="482760"/>
+            <a:off x="5698800" y="3787200"/>
+            <a:ext cx="976320" cy="482400"/>
           </a:xfrm>
           <a:prstGeom prst="rightArrow">
             <a:avLst>
@@ -8668,8 +8684,8 @@
         </p:nvSpPr>
         <p:spPr>
           <a:xfrm rot="20407800">
-            <a:off x="5772960" y="2461320"/>
-            <a:ext cx="976680" cy="482760"/>
+            <a:off x="5772600" y="2461320"/>
+            <a:ext cx="976320" cy="482400"/>
           </a:xfrm>
           <a:prstGeom prst="rightArrow">
             <a:avLst>
@@ -8711,7 +8727,7 @@
         <p:spPr>
           <a:xfrm>
             <a:off x="5849640" y="3121560"/>
-            <a:ext cx="976680" cy="482760"/>
+            <a:ext cx="976320" cy="482400"/>
           </a:xfrm>
           <a:prstGeom prst="rightArrow">
             <a:avLst>
@@ -8757,7 +8773,7 @@
         <p:spPr>
           <a:xfrm>
             <a:off x="4950720" y="2998800"/>
-            <a:ext cx="754920" cy="754920"/>
+            <a:ext cx="754560" cy="754560"/>
           </a:xfrm>
           <a:prstGeom prst="rect">
             <a:avLst/>
@@ -8798,7 +8814,7 @@
         <p:spPr>
           <a:xfrm>
             <a:off x="684360" y="4487400"/>
-            <a:ext cx="8532720" cy="1505160"/>
+            <a:ext cx="8532360" cy="1504800"/>
           </a:xfrm>
           <a:prstGeom prst="rect">
             <a:avLst/>
@@ -8847,7 +8863,7 @@
         <p:spPr>
           <a:xfrm>
             <a:off x="684360" y="685800"/>
-            <a:ext cx="8532720" cy="3613320"/>
+            <a:ext cx="8532360" cy="3612960"/>
           </a:xfrm>
           <a:prstGeom prst="rect">
             <a:avLst/>
@@ -8866,7 +8882,7 @@
         <p:txBody>
           <a:bodyPr lIns="90000" rIns="90000" tIns="45000" bIns="45000" anchor="ctr"/>
           <a:p>
-            <a:pPr marL="285840" indent="-284040">
+            <a:pPr marL="285840" indent="-283680">
               <a:lnSpc>
                 <a:spcPct val="100000"/>
               </a:lnSpc>
@@ -8992,7 +9008,7 @@
             </a:endParaRPr>
           </a:p>
           <a:p>
-            <a:pPr marL="285840" indent="-284040">
+            <a:pPr marL="285840" indent="-283680">
               <a:lnSpc>
                 <a:spcPct val="100000"/>
               </a:lnSpc>
@@ -9084,7 +9100,7 @@
         <p:spPr>
           <a:xfrm>
             <a:off x="3562560" y="1395720"/>
-            <a:ext cx="912600" cy="912600"/>
+            <a:ext cx="912240" cy="912240"/>
           </a:xfrm>
           <a:prstGeom prst="rect">
             <a:avLst/>
@@ -9107,7 +9123,7 @@
         <p:spPr>
           <a:xfrm>
             <a:off x="6678360" y="1395720"/>
-            <a:ext cx="912600" cy="912600"/>
+            <a:ext cx="912240" cy="912240"/>
           </a:xfrm>
           <a:prstGeom prst="rect">
             <a:avLst/>
@@ -9130,7 +9146,7 @@
         <p:spPr>
           <a:xfrm>
             <a:off x="7042320" y="3904200"/>
-            <a:ext cx="912600" cy="912600"/>
+            <a:ext cx="912240" cy="912240"/>
           </a:xfrm>
           <a:prstGeom prst="rect">
             <a:avLst/>
@@ -9153,7 +9169,7 @@
         <p:spPr>
           <a:xfrm>
             <a:off x="3562560" y="3904200"/>
-            <a:ext cx="912600" cy="912600"/>
+            <a:ext cx="912240" cy="912240"/>
           </a:xfrm>
           <a:prstGeom prst="rect">
             <a:avLst/>
@@ -9176,7 +9192,7 @@
         <p:spPr>
           <a:xfrm>
             <a:off x="6678360" y="1395720"/>
-            <a:ext cx="912600" cy="912600"/>
+            <a:ext cx="912240" cy="912240"/>
           </a:xfrm>
           <a:prstGeom prst="rect">
             <a:avLst/>
@@ -9199,7 +9215,7 @@
         <p:spPr>
           <a:xfrm>
             <a:off x="4113000" y="2039400"/>
-            <a:ext cx="912600" cy="912600"/>
+            <a:ext cx="912240" cy="912240"/>
           </a:xfrm>
           <a:prstGeom prst="rect">
             <a:avLst/>
@@ -9222,7 +9238,7 @@
         <p:spPr>
           <a:xfrm>
             <a:off x="7296480" y="2133000"/>
-            <a:ext cx="912600" cy="912600"/>
+            <a:ext cx="912240" cy="912240"/>
           </a:xfrm>
           <a:prstGeom prst="rect">
             <a:avLst/>
@@ -9241,7 +9257,7 @@
         <p:spPr>
           <a:xfrm>
             <a:off x="5285160" y="1920960"/>
-            <a:ext cx="1181160" cy="543600"/>
+            <a:ext cx="1180800" cy="543240"/>
           </a:xfrm>
           <a:prstGeom prst="rightArrow">
             <a:avLst>
@@ -9283,7 +9299,7 @@
         <p:spPr>
           <a:xfrm>
             <a:off x="5149440" y="4088880"/>
-            <a:ext cx="1181160" cy="543600"/>
+            <a:ext cx="1180800" cy="543240"/>
           </a:xfrm>
           <a:prstGeom prst="rightArrow">
             <a:avLst>
@@ -9348,7 +9364,7 @@
         <p:spPr>
           <a:xfrm>
             <a:off x="4895280" y="2388600"/>
-            <a:ext cx="2706120" cy="363240"/>
+            <a:ext cx="2705760" cy="362880"/>
           </a:xfrm>
           <a:prstGeom prst="rect">
             <a:avLst/>
@@ -9397,7 +9413,7 @@
         <p:spPr>
           <a:xfrm>
             <a:off x="5027400" y="4575240"/>
-            <a:ext cx="2325960" cy="363240"/>
+            <a:ext cx="2325600" cy="362880"/>
           </a:xfrm>
           <a:prstGeom prst="rect">
             <a:avLst/>
@@ -9468,7 +9484,7 @@
         <p:spPr>
           <a:xfrm>
             <a:off x="684360" y="4487400"/>
-            <a:ext cx="8532720" cy="1505160"/>
+            <a:ext cx="8532360" cy="1504800"/>
           </a:xfrm>
           <a:prstGeom prst="rect">
             <a:avLst/>
@@ -9517,7 +9533,7 @@
         <p:spPr>
           <a:xfrm>
             <a:off x="684360" y="685800"/>
-            <a:ext cx="8532720" cy="3613320"/>
+            <a:ext cx="8532360" cy="3612960"/>
           </a:xfrm>
           <a:prstGeom prst="rect">
             <a:avLst/>
@@ -9536,7 +9552,7 @@
         <p:txBody>
           <a:bodyPr lIns="90000" rIns="90000" tIns="45000" bIns="45000" anchor="ctr"/>
           <a:p>
-            <a:pPr marL="285840" indent="-284040">
+            <a:pPr marL="285840" indent="-283680">
               <a:lnSpc>
                 <a:spcPct val="100000"/>
               </a:lnSpc>
@@ -9658,7 +9674,7 @@
         <p:spPr>
           <a:xfrm>
             <a:off x="1863000" y="3157920"/>
-            <a:ext cx="912600" cy="912600"/>
+            <a:ext cx="912240" cy="912240"/>
           </a:xfrm>
           <a:prstGeom prst="rect">
             <a:avLst/>
@@ -9681,7 +9697,7 @@
         <p:spPr>
           <a:xfrm>
             <a:off x="2413440" y="3801600"/>
-            <a:ext cx="912600" cy="912600"/>
+            <a:ext cx="912240" cy="912240"/>
           </a:xfrm>
           <a:prstGeom prst="rect">
             <a:avLst/>
@@ -9704,7 +9720,7 @@
         <p:spPr>
           <a:xfrm>
             <a:off x="7197480" y="3439800"/>
-            <a:ext cx="912600" cy="912600"/>
+            <a:ext cx="912240" cy="912240"/>
           </a:xfrm>
           <a:prstGeom prst="rect">
             <a:avLst/>
@@ -9727,7 +9743,7 @@
         <p:spPr>
           <a:xfrm>
             <a:off x="4758840" y="3366360"/>
-            <a:ext cx="912600" cy="912600"/>
+            <a:ext cx="912240" cy="912240"/>
           </a:xfrm>
           <a:prstGeom prst="rect">
             <a:avLst/>
@@ -9746,7 +9762,7 @@
         <p:spPr>
           <a:xfrm>
             <a:off x="3568680" y="3429000"/>
-            <a:ext cx="935640" cy="912600"/>
+            <a:ext cx="935280" cy="912240"/>
           </a:xfrm>
           <a:prstGeom prst="mathPlus">
             <a:avLst>
@@ -9784,7 +9800,7 @@
         <p:spPr>
           <a:xfrm>
             <a:off x="6095880" y="3654360"/>
-            <a:ext cx="736560" cy="564480"/>
+            <a:ext cx="736200" cy="564120"/>
           </a:xfrm>
           <a:prstGeom prst="mathEqual">
             <a:avLst>
@@ -9845,7 +9861,7 @@
         <p:spPr>
           <a:xfrm>
             <a:off x="4750920" y="2898360"/>
-            <a:ext cx="2688120" cy="3718080"/>
+            <a:ext cx="2687760" cy="3717720"/>
           </a:xfrm>
           <a:prstGeom prst="rect">
             <a:avLst/>
@@ -9888,7 +9904,7 @@
         <p:spPr>
           <a:xfrm>
             <a:off x="684360" y="4487400"/>
-            <a:ext cx="8532720" cy="1505160"/>
+            <a:ext cx="8532360" cy="1504800"/>
           </a:xfrm>
           <a:prstGeom prst="rect">
             <a:avLst/>
@@ -9937,7 +9953,7 @@
         <p:spPr>
           <a:xfrm>
             <a:off x="684360" y="685800"/>
-            <a:ext cx="8532720" cy="3613320"/>
+            <a:ext cx="8532360" cy="3612960"/>
           </a:xfrm>
           <a:prstGeom prst="rect">
             <a:avLst/>
@@ -9956,7 +9972,7 @@
         <p:txBody>
           <a:bodyPr lIns="90000" rIns="90000" tIns="45000" bIns="45000" anchor="ctr"/>
           <a:p>
-            <a:pPr marL="285840" indent="-284040">
+            <a:pPr marL="285840" indent="-283680">
               <a:lnSpc>
                 <a:spcPct val="100000"/>
               </a:lnSpc>
@@ -10092,7 +10108,7 @@
         <p:spPr>
           <a:xfrm>
             <a:off x="4843440" y="2989800"/>
-            <a:ext cx="640080" cy="640080"/>
+            <a:ext cx="639720" cy="639720"/>
           </a:xfrm>
           <a:prstGeom prst="rect">
             <a:avLst/>
@@ -10115,7 +10131,7 @@
         <p:spPr>
           <a:xfrm>
             <a:off x="5028120" y="4248360"/>
-            <a:ext cx="912600" cy="912600"/>
+            <a:ext cx="912240" cy="912240"/>
           </a:xfrm>
           <a:prstGeom prst="rect">
             <a:avLst/>
@@ -10138,7 +10154,7 @@
         <p:spPr>
           <a:xfrm>
             <a:off x="5506200" y="5025240"/>
-            <a:ext cx="912600" cy="912600"/>
+            <a:ext cx="912240" cy="912240"/>
           </a:xfrm>
           <a:prstGeom prst="rect">
             <a:avLst/>
@@ -10161,7 +10177,7 @@
         <p:spPr>
           <a:xfrm>
             <a:off x="6042600" y="4248360"/>
-            <a:ext cx="912600" cy="912600"/>
+            <a:ext cx="912240" cy="912240"/>
           </a:xfrm>
           <a:prstGeom prst="rect">
             <a:avLst/>
@@ -10184,7 +10200,7 @@
         <p:spPr>
           <a:xfrm>
             <a:off x="7944480" y="2602440"/>
-            <a:ext cx="912600" cy="912600"/>
+            <a:ext cx="912240" cy="912240"/>
           </a:xfrm>
           <a:prstGeom prst="rect">
             <a:avLst/>
@@ -10207,7 +10223,7 @@
         <p:spPr>
           <a:xfrm>
             <a:off x="6671160" y="3059640"/>
-            <a:ext cx="569880" cy="569880"/>
+            <a:ext cx="569520" cy="569520"/>
           </a:xfrm>
           <a:prstGeom prst="rect">
             <a:avLst/>
@@ -10230,7 +10246,7 @@
         <p:spPr>
           <a:xfrm>
             <a:off x="2973240" y="3863520"/>
-            <a:ext cx="912600" cy="912600"/>
+            <a:ext cx="912240" cy="912240"/>
           </a:xfrm>
           <a:prstGeom prst="rect">
             <a:avLst/>
@@ -10249,7 +10265,7 @@
         <p:spPr>
           <a:xfrm>
             <a:off x="4012560" y="4487400"/>
-            <a:ext cx="1491840" cy="855360"/>
+            <a:ext cx="1491480" cy="855000"/>
           </a:xfrm>
           <a:custGeom>
             <a:avLst/>
@@ -10301,7 +10317,7 @@
         <p:spPr>
           <a:xfrm>
             <a:off x="4012560" y="4248360"/>
-            <a:ext cx="2028240" cy="237240"/>
+            <a:ext cx="2027880" cy="236880"/>
           </a:xfrm>
           <a:custGeom>
             <a:avLst/>
@@ -10353,7 +10369,7 @@
         <p:spPr>
           <a:xfrm>
             <a:off x="4012560" y="4367880"/>
-            <a:ext cx="937080" cy="237960"/>
+            <a:ext cx="936720" cy="237600"/>
           </a:xfrm>
           <a:custGeom>
             <a:avLst/>
@@ -10405,7 +10421,7 @@
         <p:spPr>
           <a:xfrm flipV="1">
             <a:off x="7242840" y="3220560"/>
-            <a:ext cx="627840" cy="121320"/>
+            <a:ext cx="627480" cy="120960"/>
           </a:xfrm>
           <a:custGeom>
             <a:avLst/>
@@ -10480,7 +10496,7 @@
         <p:spPr>
           <a:xfrm>
             <a:off x="684360" y="4487400"/>
-            <a:ext cx="8532720" cy="1505160"/>
+            <a:ext cx="8532360" cy="1504800"/>
           </a:xfrm>
           <a:prstGeom prst="rect">
             <a:avLst/>
@@ -10529,7 +10545,7 @@
         <p:spPr>
           <a:xfrm>
             <a:off x="684360" y="685800"/>
-            <a:ext cx="8532720" cy="3613320"/>
+            <a:ext cx="8532360" cy="3612960"/>
           </a:xfrm>
           <a:prstGeom prst="rect">
             <a:avLst/>
@@ -10548,7 +10564,7 @@
         <p:txBody>
           <a:bodyPr lIns="90000" rIns="90000" tIns="45000" bIns="45000" anchor="ctr"/>
           <a:p>
-            <a:pPr marL="285840" indent="-284040">
+            <a:pPr marL="285840" indent="-283680">
               <a:lnSpc>
                 <a:spcPct val="100000"/>
               </a:lnSpc>
@@ -10716,7 +10732,7 @@
         <p:spPr>
           <a:xfrm>
             <a:off x="5430600" y="2730600"/>
-            <a:ext cx="2688120" cy="3718080"/>
+            <a:ext cx="2687760" cy="3717720"/>
           </a:xfrm>
           <a:prstGeom prst="rect">
             <a:avLst/>
@@ -10763,7 +10779,7 @@
         <p:spPr>
           <a:xfrm>
             <a:off x="5523120" y="2822040"/>
-            <a:ext cx="640080" cy="640080"/>
+            <a:ext cx="639720" cy="639720"/>
           </a:xfrm>
           <a:prstGeom prst="rect">
             <a:avLst/>
@@ -10786,7 +10802,7 @@
         <p:spPr>
           <a:xfrm>
             <a:off x="5707800" y="4080600"/>
-            <a:ext cx="912600" cy="912600"/>
+            <a:ext cx="912240" cy="912240"/>
           </a:xfrm>
           <a:prstGeom prst="rect">
             <a:avLst/>
@@ -10809,7 +10825,7 @@
         <p:spPr>
           <a:xfrm>
             <a:off x="6185880" y="4857480"/>
-            <a:ext cx="912600" cy="912600"/>
+            <a:ext cx="912240" cy="912240"/>
           </a:xfrm>
           <a:prstGeom prst="rect">
             <a:avLst/>
@@ -10832,7 +10848,7 @@
         <p:spPr>
           <a:xfrm>
             <a:off x="6722280" y="4080600"/>
-            <a:ext cx="912600" cy="912600"/>
+            <a:ext cx="912240" cy="912240"/>
           </a:xfrm>
           <a:prstGeom prst="rect">
             <a:avLst/>
@@ -10855,7 +10871,7 @@
         <p:spPr>
           <a:xfrm>
             <a:off x="3652920" y="3695760"/>
-            <a:ext cx="912600" cy="912600"/>
+            <a:ext cx="912240" cy="912240"/>
           </a:xfrm>
           <a:prstGeom prst="rect">
             <a:avLst/>
@@ -10874,7 +10890,7 @@
         <p:spPr>
           <a:xfrm>
             <a:off x="4692240" y="4319640"/>
-            <a:ext cx="1491840" cy="855360"/>
+            <a:ext cx="1491480" cy="855000"/>
           </a:xfrm>
           <a:custGeom>
             <a:avLst/>
@@ -10926,7 +10942,7 @@
         <p:spPr>
           <a:xfrm>
             <a:off x="4692240" y="4080600"/>
-            <a:ext cx="2028240" cy="237240"/>
+            <a:ext cx="2027880" cy="236880"/>
           </a:xfrm>
           <a:custGeom>
             <a:avLst/>
@@ -10978,7 +10994,7 @@
         <p:spPr>
           <a:xfrm>
             <a:off x="4692240" y="4200120"/>
-            <a:ext cx="937080" cy="237960"/>
+            <a:ext cx="936720" cy="237600"/>
           </a:xfrm>
           <a:custGeom>
             <a:avLst/>
@@ -11034,7 +11050,7 @@
         <p:spPr>
           <a:xfrm>
             <a:off x="9653760" y="3605400"/>
-            <a:ext cx="912600" cy="912600"/>
+            <a:ext cx="912240" cy="912240"/>
           </a:xfrm>
           <a:prstGeom prst="rect">
             <a:avLst/>
@@ -11052,8 +11068,8 @@
         </p:nvSpPr>
         <p:spPr>
           <a:xfrm rot="10325400">
-            <a:off x="7855920" y="4106880"/>
-            <a:ext cx="1784160" cy="306000"/>
+            <a:off x="7856280" y="4106880"/>
+            <a:ext cx="1783800" cy="305640"/>
           </a:xfrm>
           <a:prstGeom prst="rightArrow">
             <a:avLst>
@@ -11117,7 +11133,7 @@
         <p:spPr>
           <a:xfrm>
             <a:off x="684360" y="4487400"/>
-            <a:ext cx="8532720" cy="1505160"/>
+            <a:ext cx="8532360" cy="1504800"/>
           </a:xfrm>
           <a:prstGeom prst="rect">
             <a:avLst/>
@@ -11166,7 +11182,7 @@
         <p:spPr>
           <a:xfrm>
             <a:off x="684360" y="685800"/>
-            <a:ext cx="8532720" cy="3613320"/>
+            <a:ext cx="8532360" cy="3612960"/>
           </a:xfrm>
           <a:prstGeom prst="rect">
             <a:avLst/>
@@ -11196,7 +11212,7 @@
         <p:spPr>
           <a:xfrm>
             <a:off x="4069440" y="82800"/>
-            <a:ext cx="4044600" cy="2845080"/>
+            <a:ext cx="4044240" cy="2844720"/>
           </a:xfrm>
           <a:prstGeom prst="rect">
             <a:avLst/>
@@ -11219,7 +11235,7 @@
         <p:spPr>
           <a:xfrm>
             <a:off x="83880" y="3103560"/>
-            <a:ext cx="3865680" cy="1642680"/>
+            <a:ext cx="3865320" cy="1642320"/>
           </a:xfrm>
           <a:prstGeom prst="rect">
             <a:avLst/>
@@ -11242,7 +11258,7 @@
         <p:spPr>
           <a:xfrm>
             <a:off x="4161600" y="3103560"/>
-            <a:ext cx="3865680" cy="1642680"/>
+            <a:ext cx="3865320" cy="1642320"/>
           </a:xfrm>
           <a:prstGeom prst="rect">
             <a:avLst/>
@@ -11265,7 +11281,7 @@
         <p:spPr>
           <a:xfrm>
             <a:off x="8230320" y="3103560"/>
-            <a:ext cx="3865680" cy="1642680"/>
+            <a:ext cx="3865320" cy="1642320"/>
           </a:xfrm>
           <a:prstGeom prst="rect">
             <a:avLst/>
@@ -11284,7 +11300,7 @@
         <p:spPr>
           <a:xfrm>
             <a:off x="3993840" y="3766680"/>
-            <a:ext cx="149400" cy="317520"/>
+            <a:ext cx="149040" cy="317160"/>
           </a:xfrm>
           <a:prstGeom prst="rightArrow">
             <a:avLst>
@@ -11323,7 +11339,7 @@
         <p:spPr>
           <a:xfrm>
             <a:off x="8073360" y="3793320"/>
-            <a:ext cx="130320" cy="317520"/>
+            <a:ext cx="129960" cy="317160"/>
           </a:xfrm>
           <a:prstGeom prst="rightArrow">
             <a:avLst>
@@ -11362,7 +11378,7 @@
         <p:spPr>
           <a:xfrm>
             <a:off x="2701080" y="5176080"/>
-            <a:ext cx="1835280" cy="920880"/>
+            <a:ext cx="1834920" cy="920520"/>
           </a:xfrm>
           <a:prstGeom prst="wedgeRectCallout">
             <a:avLst>
@@ -11427,7 +11443,7 @@
         <p:spPr>
           <a:xfrm>
             <a:off x="6722640" y="5196600"/>
-            <a:ext cx="1966680" cy="824040"/>
+            <a:ext cx="1966320" cy="823680"/>
           </a:xfrm>
           <a:prstGeom prst="wedgeRectCallout">
             <a:avLst>
@@ -11492,7 +11508,7 @@
         <p:spPr>
           <a:xfrm>
             <a:off x="9731160" y="5131440"/>
-            <a:ext cx="2103840" cy="654840"/>
+            <a:ext cx="2103480" cy="654480"/>
           </a:xfrm>
           <a:prstGeom prst="wedgeRectCallout">
             <a:avLst>
@@ -11557,7 +11573,7 @@
         <p:spPr>
           <a:xfrm>
             <a:off x="5033520" y="2516760"/>
-            <a:ext cx="2573640" cy="363240"/>
+            <a:ext cx="2573280" cy="362880"/>
           </a:xfrm>
           <a:prstGeom prst="rect">
             <a:avLst/>
@@ -11605,8 +11621,8 @@
         </p:nvSpPr>
         <p:spPr>
           <a:xfrm rot="16200000">
-            <a:off x="3177360" y="1266840"/>
-            <a:ext cx="1962720" cy="363240"/>
+            <a:off x="3177360" y="1267200"/>
+            <a:ext cx="1962360" cy="362880"/>
           </a:xfrm>
           <a:prstGeom prst="rect">
             <a:avLst/>
@@ -11677,7 +11693,7 @@
         <p:spPr>
           <a:xfrm>
             <a:off x="684360" y="4487400"/>
-            <a:ext cx="8532720" cy="1505160"/>
+            <a:ext cx="8532360" cy="1504800"/>
           </a:xfrm>
           <a:prstGeom prst="rect">
             <a:avLst/>
@@ -11728,9 +11744,9 @@
         <p:grpSpPr>
           <a:xfrm>
             <a:off x="948240" y="823320"/>
-            <a:ext cx="10290600" cy="3337920"/>
+            <a:ext cx="10290240" cy="3337560"/>
             <a:chOff x="948240" y="823320"/>
-            <a:chExt cx="10290600" cy="3337920"/>
+            <a:chExt cx="10290240" cy="3337560"/>
           </a:xfrm>
         </p:grpSpPr>
         <p:sp>
@@ -11742,7 +11758,7 @@
           <p:spPr>
             <a:xfrm>
               <a:off x="948240" y="823320"/>
-              <a:ext cx="1360800" cy="1360800"/>
+              <a:ext cx="1360440" cy="1360440"/>
             </a:xfrm>
             <a:prstGeom prst="ellipse">
               <a:avLst/>
@@ -11775,7 +11791,7 @@
           <p:spPr>
             <a:xfrm>
               <a:off x="1234440" y="1109520"/>
-              <a:ext cx="788400" cy="788400"/>
+              <a:ext cx="788040" cy="788040"/>
             </a:xfrm>
             <a:prstGeom prst="rect">
               <a:avLst/>
@@ -11806,7 +11822,7 @@
           <p:spPr>
             <a:xfrm>
               <a:off x="2602800" y="823320"/>
-              <a:ext cx="3210120" cy="1360800"/>
+              <a:ext cx="3209760" cy="1360440"/>
             </a:xfrm>
             <a:prstGeom prst="rect">
               <a:avLst/>
@@ -11858,7 +11874,7 @@
           <p:spPr>
             <a:xfrm>
               <a:off x="6374160" y="823320"/>
-              <a:ext cx="1360800" cy="1360800"/>
+              <a:ext cx="1360440" cy="1360440"/>
             </a:xfrm>
             <a:prstGeom prst="ellipse">
               <a:avLst/>
@@ -11891,7 +11907,7 @@
           <p:spPr>
             <a:xfrm>
               <a:off x="6660360" y="1109520"/>
-              <a:ext cx="788400" cy="788400"/>
+              <a:ext cx="788040" cy="788040"/>
             </a:xfrm>
             <a:prstGeom prst="rect">
               <a:avLst/>
@@ -11922,7 +11938,7 @@
           <p:spPr>
             <a:xfrm>
               <a:off x="8028720" y="823320"/>
-              <a:ext cx="3210120" cy="1360800"/>
+              <a:ext cx="3209760" cy="1360440"/>
             </a:xfrm>
             <a:prstGeom prst="rect">
               <a:avLst/>
@@ -11974,7 +11990,7 @@
           <p:spPr>
             <a:xfrm>
               <a:off x="948240" y="2800440"/>
-              <a:ext cx="1360800" cy="1360800"/>
+              <a:ext cx="1360440" cy="1360440"/>
             </a:xfrm>
             <a:prstGeom prst="ellipse">
               <a:avLst/>
@@ -12007,7 +12023,7 @@
           <p:spPr>
             <a:xfrm>
               <a:off x="1234440" y="3086640"/>
-              <a:ext cx="788400" cy="788400"/>
+              <a:ext cx="788040" cy="788040"/>
             </a:xfrm>
             <a:prstGeom prst="rect">
               <a:avLst/>
@@ -12038,7 +12054,7 @@
           <p:spPr>
             <a:xfrm>
               <a:off x="2602800" y="2800440"/>
-              <a:ext cx="3210120" cy="1360800"/>
+              <a:ext cx="3209760" cy="1360440"/>
             </a:xfrm>
             <a:prstGeom prst="rect">
               <a:avLst/>
@@ -12090,7 +12106,7 @@
           <p:spPr>
             <a:xfrm>
               <a:off x="6374160" y="2800440"/>
-              <a:ext cx="1360800" cy="1360800"/>
+              <a:ext cx="1360440" cy="1360440"/>
             </a:xfrm>
             <a:prstGeom prst="ellipse">
               <a:avLst/>
@@ -12123,7 +12139,7 @@
           <p:spPr>
             <a:xfrm>
               <a:off x="6660360" y="3086640"/>
-              <a:ext cx="788400" cy="788400"/>
+              <a:ext cx="788040" cy="788040"/>
             </a:xfrm>
             <a:prstGeom prst="rect">
               <a:avLst/>
@@ -12154,7 +12170,7 @@
           <p:spPr>
             <a:xfrm>
               <a:off x="8028720" y="2800440"/>
-              <a:ext cx="3210120" cy="1360800"/>
+              <a:ext cx="3209760" cy="1360440"/>
             </a:xfrm>
             <a:prstGeom prst="rect">
               <a:avLst/>
@@ -12244,7 +12260,7 @@
         <p:spPr>
           <a:xfrm>
             <a:off x="0" y="0"/>
-            <a:ext cx="12190320" cy="6856200"/>
+            <a:ext cx="12189960" cy="6855840"/>
           </a:xfrm>
           <a:prstGeom prst="rect">
             <a:avLst/>
@@ -12297,7 +12313,7 @@
         <p:spPr>
           <a:xfrm>
             <a:off x="0" y="0"/>
-            <a:ext cx="8128080" cy="6856200"/>
+            <a:ext cx="8127720" cy="6855840"/>
           </a:xfrm>
           <a:prstGeom prst="snip2DiagRect">
             <a:avLst>
@@ -12519,7 +12535,7 @@
         <p:spPr>
           <a:xfrm>
             <a:off x="8588520" y="941400"/>
-            <a:ext cx="3042000" cy="3246840"/>
+            <a:ext cx="3041640" cy="3246480"/>
           </a:xfrm>
           <a:prstGeom prst="rect">
             <a:avLst/>
@@ -12570,9 +12586,9 @@
         <p:grpSpPr>
           <a:xfrm>
             <a:off x="952560" y="2104200"/>
-            <a:ext cx="6164640" cy="2441520"/>
+            <a:ext cx="6164280" cy="2441160"/>
             <a:chOff x="952560" y="2104200"/>
-            <a:chExt cx="6164640" cy="2441520"/>
+            <a:chExt cx="6164280" cy="2441160"/>
           </a:xfrm>
         </p:grpSpPr>
         <p:sp>
@@ -12584,7 +12600,7 @@
           <p:spPr>
             <a:xfrm>
               <a:off x="952560" y="2104200"/>
-              <a:ext cx="814680" cy="814680"/>
+              <a:ext cx="814320" cy="814320"/>
             </a:xfrm>
             <a:prstGeom prst="ellipse">
               <a:avLst/>
@@ -12617,7 +12633,7 @@
           <p:spPr>
             <a:xfrm>
               <a:off x="1123920" y="2275560"/>
-              <a:ext cx="471600" cy="471600"/>
+              <a:ext cx="471240" cy="471240"/>
             </a:xfrm>
             <a:prstGeom prst="rect">
               <a:avLst/>
@@ -12648,7 +12664,7 @@
           <p:spPr>
             <a:xfrm>
               <a:off x="1944000" y="2104200"/>
-              <a:ext cx="1922400" cy="814680"/>
+              <a:ext cx="1922040" cy="814320"/>
             </a:xfrm>
             <a:prstGeom prst="rect">
               <a:avLst/>
@@ -12700,7 +12716,7 @@
           <p:spPr>
             <a:xfrm>
               <a:off x="4203360" y="2104200"/>
-              <a:ext cx="814680" cy="814680"/>
+              <a:ext cx="814320" cy="814320"/>
             </a:xfrm>
             <a:prstGeom prst="ellipse">
               <a:avLst/>
@@ -12733,7 +12749,7 @@
           <p:spPr>
             <a:xfrm>
               <a:off x="4375080" y="2275560"/>
-              <a:ext cx="471600" cy="471600"/>
+              <a:ext cx="471240" cy="471240"/>
             </a:xfrm>
             <a:prstGeom prst="rect">
               <a:avLst/>
@@ -12764,7 +12780,7 @@
           <p:spPr>
             <a:xfrm>
               <a:off x="5194800" y="2104200"/>
-              <a:ext cx="1922400" cy="814680"/>
+              <a:ext cx="1922040" cy="814320"/>
             </a:xfrm>
             <a:prstGeom prst="rect">
               <a:avLst/>
@@ -12816,7 +12832,7 @@
           <p:spPr>
             <a:xfrm>
               <a:off x="952560" y="3731040"/>
-              <a:ext cx="814680" cy="814680"/>
+              <a:ext cx="814320" cy="814320"/>
             </a:xfrm>
             <a:prstGeom prst="ellipse">
               <a:avLst/>
@@ -12849,7 +12865,7 @@
           <p:spPr>
             <a:xfrm>
               <a:off x="1123920" y="3902400"/>
-              <a:ext cx="471600" cy="471600"/>
+              <a:ext cx="471240" cy="471240"/>
             </a:xfrm>
             <a:prstGeom prst="rect">
               <a:avLst/>
@@ -12880,7 +12896,7 @@
           <p:spPr>
             <a:xfrm>
               <a:off x="1944000" y="3731040"/>
-              <a:ext cx="1922400" cy="814680"/>
+              <a:ext cx="1922040" cy="814320"/>
             </a:xfrm>
             <a:prstGeom prst="rect">
               <a:avLst/>
@@ -12932,7 +12948,7 @@
           <p:spPr>
             <a:xfrm>
               <a:off x="4203360" y="3731040"/>
-              <a:ext cx="814680" cy="814680"/>
+              <a:ext cx="814320" cy="814320"/>
             </a:xfrm>
             <a:prstGeom prst="ellipse">
               <a:avLst/>
@@ -12965,7 +12981,7 @@
           <p:spPr>
             <a:xfrm>
               <a:off x="4375080" y="3902400"/>
-              <a:ext cx="471600" cy="471600"/>
+              <a:ext cx="471240" cy="471240"/>
             </a:xfrm>
             <a:prstGeom prst="rect">
               <a:avLst/>
@@ -12996,7 +13012,7 @@
           <p:spPr>
             <a:xfrm>
               <a:off x="5194800" y="3731040"/>
-              <a:ext cx="1922400" cy="814680"/>
+              <a:ext cx="1922040" cy="814320"/>
             </a:xfrm>
             <a:prstGeom prst="rect">
               <a:avLst/>
@@ -13113,7 +13129,7 @@
         <p:spPr>
           <a:xfrm>
             <a:off x="684360" y="4487400"/>
-            <a:ext cx="8532720" cy="1505160"/>
+            <a:ext cx="8532360" cy="1504800"/>
           </a:xfrm>
           <a:prstGeom prst="rect">
             <a:avLst/>
@@ -13162,7 +13178,7 @@
         <p:spPr>
           <a:xfrm>
             <a:off x="684360" y="685800"/>
-            <a:ext cx="8532720" cy="3613320"/>
+            <a:ext cx="8532360" cy="3612960"/>
           </a:xfrm>
           <a:prstGeom prst="rect">
             <a:avLst/>
@@ -13181,7 +13197,7 @@
         <p:txBody>
           <a:bodyPr lIns="90000" rIns="90000" tIns="45000" bIns="45000" anchor="ctr"/>
           <a:p>
-            <a:pPr marL="285840" indent="-284040">
+            <a:pPr marL="285840" indent="-283680">
               <a:lnSpc>
                 <a:spcPct val="100000"/>
               </a:lnSpc>
@@ -13213,7 +13229,7 @@
             </a:endParaRPr>
           </a:p>
           <a:p>
-            <a:pPr marL="285840" indent="-284040">
+            <a:pPr marL="285840" indent="-283680">
               <a:lnSpc>
                 <a:spcPct val="100000"/>
               </a:lnSpc>
@@ -13245,7 +13261,7 @@
             </a:endParaRPr>
           </a:p>
           <a:p>
-            <a:pPr marL="285840" indent="-284040">
+            <a:pPr marL="285840" indent="-283680">
               <a:lnSpc>
                 <a:spcPct val="100000"/>
               </a:lnSpc>
@@ -13277,7 +13293,7 @@
             </a:endParaRPr>
           </a:p>
           <a:p>
-            <a:pPr marL="285840" indent="-284040">
+            <a:pPr marL="285840" indent="-283680">
               <a:lnSpc>
                 <a:spcPct val="100000"/>
               </a:lnSpc>
@@ -13341,7 +13357,7 @@
         <p:spPr>
           <a:xfrm>
             <a:off x="684360" y="4487400"/>
-            <a:ext cx="8532720" cy="1505160"/>
+            <a:ext cx="8532360" cy="1504800"/>
           </a:xfrm>
           <a:prstGeom prst="rect">
             <a:avLst/>
@@ -13394,7 +13410,7 @@
         <p:spPr>
           <a:xfrm>
             <a:off x="5221440" y="75600"/>
-            <a:ext cx="912600" cy="912600"/>
+            <a:ext cx="912240" cy="912240"/>
           </a:xfrm>
           <a:prstGeom prst="rect">
             <a:avLst/>
@@ -13417,7 +13433,7 @@
         <p:spPr>
           <a:xfrm>
             <a:off x="4695120" y="4444560"/>
-            <a:ext cx="912600" cy="912600"/>
+            <a:ext cx="912240" cy="912240"/>
           </a:xfrm>
           <a:prstGeom prst="rect">
             <a:avLst/>
@@ -13440,7 +13456,7 @@
         <p:spPr>
           <a:xfrm>
             <a:off x="2603880" y="2294640"/>
-            <a:ext cx="912600" cy="912600"/>
+            <a:ext cx="912240" cy="912240"/>
           </a:xfrm>
           <a:prstGeom prst="rect">
             <a:avLst/>
@@ -13463,7 +13479,7 @@
         <p:spPr>
           <a:xfrm>
             <a:off x="9767160" y="3294360"/>
-            <a:ext cx="912600" cy="912600"/>
+            <a:ext cx="912240" cy="912240"/>
           </a:xfrm>
           <a:prstGeom prst="rect">
             <a:avLst/>
@@ -13486,7 +13502,7 @@
         <p:spPr>
           <a:xfrm>
             <a:off x="1967760" y="3811680"/>
-            <a:ext cx="912600" cy="912600"/>
+            <a:ext cx="912240" cy="912240"/>
           </a:xfrm>
           <a:prstGeom prst="rect">
             <a:avLst/>
@@ -13509,7 +13525,7 @@
         <p:spPr>
           <a:xfrm>
             <a:off x="5221440" y="2907360"/>
-            <a:ext cx="912600" cy="912600"/>
+            <a:ext cx="912240" cy="912240"/>
           </a:xfrm>
           <a:prstGeom prst="rect">
             <a:avLst/>
@@ -13532,7 +13548,7 @@
         <p:spPr>
           <a:xfrm>
             <a:off x="1093680" y="3282480"/>
-            <a:ext cx="912600" cy="912600"/>
+            <a:ext cx="912240" cy="912240"/>
           </a:xfrm>
           <a:prstGeom prst="rect">
             <a:avLst/>
@@ -13555,7 +13571,7 @@
         <p:spPr>
           <a:xfrm>
             <a:off x="8595360" y="3808800"/>
-            <a:ext cx="912600" cy="912600"/>
+            <a:ext cx="912240" cy="912240"/>
           </a:xfrm>
           <a:prstGeom prst="rect">
             <a:avLst/>
@@ -13578,7 +13594,7 @@
         <p:spPr>
           <a:xfrm>
             <a:off x="7839000" y="2294640"/>
-            <a:ext cx="912600" cy="912600"/>
+            <a:ext cx="912240" cy="912240"/>
           </a:xfrm>
           <a:prstGeom prst="rect">
             <a:avLst/>
@@ -13597,7 +13613,7 @@
         <p:spPr>
           <a:xfrm>
             <a:off x="6312960" y="944640"/>
-            <a:ext cx="1524600" cy="1338480"/>
+            <a:ext cx="1524240" cy="1338120"/>
           </a:xfrm>
           <a:custGeom>
             <a:avLst/>
@@ -13650,7 +13666,7 @@
         <p:spPr>
           <a:xfrm>
             <a:off x="5678640" y="1145160"/>
-            <a:ext cx="360" cy="1604880"/>
+            <a:ext cx="360" cy="1604520"/>
           </a:xfrm>
           <a:custGeom>
             <a:avLst/>
@@ -13703,7 +13719,7 @@
         <p:spPr>
           <a:xfrm flipH="1">
             <a:off x="3424680" y="990000"/>
-            <a:ext cx="1616040" cy="1378800"/>
+            <a:ext cx="1615680" cy="1378440"/>
           </a:xfrm>
           <a:custGeom>
             <a:avLst/>
@@ -13756,7 +13772,7 @@
         <p:spPr>
           <a:xfrm>
             <a:off x="2082960" y="3279600"/>
-            <a:ext cx="915840" cy="363240"/>
+            <a:ext cx="915480" cy="362880"/>
           </a:xfrm>
           <a:prstGeom prst="rect">
             <a:avLst/>
@@ -13805,7 +13821,7 @@
         <p:spPr>
           <a:xfrm>
             <a:off x="5227200" y="4030200"/>
-            <a:ext cx="928080" cy="363240"/>
+            <a:ext cx="927720" cy="362880"/>
           </a:xfrm>
           <a:prstGeom prst="rect">
             <a:avLst/>
@@ -13854,7 +13870,7 @@
         <p:spPr>
           <a:xfrm>
             <a:off x="8246520" y="3279600"/>
-            <a:ext cx="1254240" cy="363240"/>
+            <a:ext cx="1253880" cy="362880"/>
           </a:xfrm>
           <a:prstGeom prst="rect">
             <a:avLst/>
@@ -13903,7 +13919,7 @@
         <p:spPr>
           <a:xfrm>
             <a:off x="481680" y="348120"/>
-            <a:ext cx="1810440" cy="363240"/>
+            <a:ext cx="1810080" cy="362880"/>
           </a:xfrm>
           <a:prstGeom prst="rect">
             <a:avLst/>
@@ -13956,7 +13972,7 @@
         <p:spPr>
           <a:xfrm>
             <a:off x="5855760" y="4444560"/>
-            <a:ext cx="912600" cy="912600"/>
+            <a:ext cx="912240" cy="912240"/>
           </a:xfrm>
           <a:prstGeom prst="rect">
             <a:avLst/>
@@ -13997,7 +14013,7 @@
         <p:spPr>
           <a:xfrm>
             <a:off x="684360" y="4487400"/>
-            <a:ext cx="8532720" cy="1505160"/>
+            <a:ext cx="8532360" cy="1504800"/>
           </a:xfrm>
           <a:prstGeom prst="rect">
             <a:avLst/>
@@ -14050,7 +14066,7 @@
         <p:spPr>
           <a:xfrm>
             <a:off x="7839000" y="2560320"/>
-            <a:ext cx="1312560" cy="598320"/>
+            <a:ext cx="1312200" cy="597960"/>
           </a:xfrm>
           <a:prstGeom prst="rect">
             <a:avLst/>
@@ -14069,7 +14085,7 @@
         <p:spPr>
           <a:xfrm>
             <a:off x="480240" y="348120"/>
-            <a:ext cx="1790640" cy="363240"/>
+            <a:ext cx="1790280" cy="362880"/>
           </a:xfrm>
           <a:prstGeom prst="rect">
             <a:avLst/>
@@ -14118,7 +14134,7 @@
         <p:spPr>
           <a:xfrm>
             <a:off x="6384240" y="990000"/>
-            <a:ext cx="1524600" cy="1338480"/>
+            <a:ext cx="1524240" cy="1338120"/>
           </a:xfrm>
           <a:custGeom>
             <a:avLst/>
@@ -14171,7 +14187,7 @@
         <p:spPr>
           <a:xfrm>
             <a:off x="5678640" y="1145160"/>
-            <a:ext cx="360" cy="1604880"/>
+            <a:ext cx="360" cy="1604520"/>
           </a:xfrm>
           <a:custGeom>
             <a:avLst/>
@@ -14224,7 +14240,7 @@
         <p:spPr>
           <a:xfrm flipH="1">
             <a:off x="3424680" y="990000"/>
-            <a:ext cx="1616040" cy="1378800"/>
+            <a:ext cx="1615680" cy="1378440"/>
           </a:xfrm>
           <a:custGeom>
             <a:avLst/>
@@ -14277,7 +14293,7 @@
         <p:spPr>
           <a:xfrm>
             <a:off x="2082960" y="3279600"/>
-            <a:ext cx="915840" cy="363240"/>
+            <a:ext cx="915480" cy="362880"/>
           </a:xfrm>
           <a:prstGeom prst="rect">
             <a:avLst/>
@@ -14326,7 +14342,7 @@
         <p:spPr>
           <a:xfrm>
             <a:off x="5227200" y="4030200"/>
-            <a:ext cx="928080" cy="363240"/>
+            <a:ext cx="927720" cy="362880"/>
           </a:xfrm>
           <a:prstGeom prst="rect">
             <a:avLst/>
@@ -14375,7 +14391,7 @@
         <p:spPr>
           <a:xfrm>
             <a:off x="8246520" y="3279600"/>
-            <a:ext cx="1254240" cy="363240"/>
+            <a:ext cx="1253880" cy="362880"/>
           </a:xfrm>
           <a:prstGeom prst="rect">
             <a:avLst/>
@@ -14428,7 +14444,7 @@
         <p:spPr>
           <a:xfrm>
             <a:off x="4979520" y="218880"/>
-            <a:ext cx="1331640" cy="617400"/>
+            <a:ext cx="1331280" cy="617040"/>
           </a:xfrm>
           <a:prstGeom prst="rect">
             <a:avLst/>
@@ -14451,7 +14467,7 @@
         <p:spPr>
           <a:xfrm>
             <a:off x="2102760" y="2514600"/>
-            <a:ext cx="1322280" cy="607680"/>
+            <a:ext cx="1321920" cy="607320"/>
           </a:xfrm>
           <a:prstGeom prst="rect">
             <a:avLst/>
@@ -14474,7 +14490,7 @@
         <p:spPr>
           <a:xfrm>
             <a:off x="4235760" y="3279600"/>
-            <a:ext cx="1312560" cy="598320"/>
+            <a:ext cx="1312200" cy="597960"/>
           </a:xfrm>
           <a:prstGeom prst="rect">
             <a:avLst/>
@@ -14497,7 +14513,7 @@
         <p:spPr>
           <a:xfrm>
             <a:off x="5833080" y="3279600"/>
-            <a:ext cx="1312560" cy="598320"/>
+            <a:ext cx="1312200" cy="597960"/>
           </a:xfrm>
           <a:prstGeom prst="rect">
             <a:avLst/>
@@ -14538,7 +14554,7 @@
         <p:spPr>
           <a:xfrm>
             <a:off x="684360" y="4487400"/>
-            <a:ext cx="8532720" cy="1505160"/>
+            <a:ext cx="8532360" cy="1504800"/>
           </a:xfrm>
           <a:prstGeom prst="rect">
             <a:avLst/>
@@ -14587,7 +14603,7 @@
         <p:spPr>
           <a:xfrm>
             <a:off x="684360" y="685800"/>
-            <a:ext cx="8532720" cy="3613320"/>
+            <a:ext cx="8532360" cy="3612960"/>
           </a:xfrm>
           <a:prstGeom prst="rect">
             <a:avLst/>
@@ -14606,7 +14622,7 @@
         <p:txBody>
           <a:bodyPr lIns="90000" rIns="90000" tIns="45000" bIns="45000" anchor="ctr"/>
           <a:p>
-            <a:pPr marL="285840" indent="-284040">
+            <a:pPr marL="285840" indent="-283680">
               <a:lnSpc>
                 <a:spcPct val="100000"/>
               </a:lnSpc>
@@ -14682,7 +14698,7 @@
         <p:spPr>
           <a:xfrm>
             <a:off x="666000" y="2574360"/>
-            <a:ext cx="4808880" cy="2972160"/>
+            <a:ext cx="4808520" cy="2971800"/>
           </a:xfrm>
           <a:prstGeom prst="roundRect">
             <a:avLst>
@@ -14832,7 +14848,7 @@
         <p:spPr>
           <a:xfrm>
             <a:off x="684360" y="5241960"/>
-            <a:ext cx="8532720" cy="1505160"/>
+            <a:ext cx="8532360" cy="1504800"/>
           </a:xfrm>
           <a:prstGeom prst="rect">
             <a:avLst/>
@@ -14881,7 +14897,7 @@
         <p:spPr>
           <a:xfrm>
             <a:off x="684360" y="685800"/>
-            <a:ext cx="10988280" cy="2286360"/>
+            <a:ext cx="10987920" cy="2286000"/>
           </a:xfrm>
           <a:prstGeom prst="rect">
             <a:avLst/>
@@ -14902,7 +14918,7 @@
             <a:normAutofit/>
           </a:bodyPr>
           <a:p>
-            <a:pPr marL="285840" indent="-284040">
+            <a:pPr marL="285840" indent="-283680">
               <a:lnSpc>
                 <a:spcPct val="100000"/>
               </a:lnSpc>
@@ -14984,7 +15000,7 @@
             </a:endParaRPr>
           </a:p>
           <a:p>
-            <a:pPr marL="285840" indent="-284040">
+            <a:pPr marL="285840" indent="-283680">
               <a:lnSpc>
                 <a:spcPct val="100000"/>
               </a:lnSpc>
@@ -15108,7 +15124,7 @@
         <p:spPr>
           <a:xfrm>
             <a:off x="2523960" y="3718800"/>
-            <a:ext cx="726480" cy="721440"/>
+            <a:ext cx="726120" cy="721080"/>
           </a:xfrm>
           <a:prstGeom prst="ellipse">
             <a:avLst/>
@@ -15176,7 +15192,7 @@
         <p:spPr>
           <a:xfrm>
             <a:off x="3363480" y="3303360"/>
-            <a:ext cx="1215720" cy="405360"/>
+            <a:ext cx="1215360" cy="405000"/>
           </a:xfrm>
           <a:prstGeom prst="ellipse">
             <a:avLst/>
@@ -15244,7 +15260,7 @@
         <p:spPr>
           <a:xfrm>
             <a:off x="744120" y="3208680"/>
-            <a:ext cx="1589040" cy="673560"/>
+            <a:ext cx="1588680" cy="673200"/>
           </a:xfrm>
           <a:prstGeom prst="ellipse">
             <a:avLst/>
@@ -15312,7 +15328,7 @@
         <p:spPr>
           <a:xfrm>
             <a:off x="2119680" y="4628880"/>
-            <a:ext cx="1528200" cy="673560"/>
+            <a:ext cx="1527840" cy="673200"/>
           </a:xfrm>
           <a:prstGeom prst="ellipse">
             <a:avLst/>
@@ -15380,7 +15396,7 @@
         <p:spPr>
           <a:xfrm>
             <a:off x="6819480" y="2574360"/>
-            <a:ext cx="4808880" cy="2972160"/>
+            <a:ext cx="4808520" cy="2971800"/>
           </a:xfrm>
           <a:prstGeom prst="roundRect">
             <a:avLst>
@@ -15530,7 +15546,7 @@
         <p:spPr>
           <a:xfrm>
             <a:off x="7103880" y="4147560"/>
-            <a:ext cx="4377240" cy="857520"/>
+            <a:ext cx="4376880" cy="857160"/>
           </a:xfrm>
           <a:prstGeom prst="ellipse">
             <a:avLst/>
@@ -15598,7 +15614,7 @@
         <p:spPr>
           <a:xfrm>
             <a:off x="9898200" y="3332520"/>
-            <a:ext cx="1215720" cy="405360"/>
+            <a:ext cx="1215360" cy="405000"/>
           </a:xfrm>
           <a:prstGeom prst="ellipse">
             <a:avLst/>
@@ -15666,7 +15682,7 @@
         <p:spPr>
           <a:xfrm>
             <a:off x="6965640" y="3288960"/>
-            <a:ext cx="1589040" cy="673560"/>
+            <a:ext cx="1588680" cy="673200"/>
           </a:xfrm>
           <a:prstGeom prst="ellipse">
             <a:avLst/>
@@ -15734,7 +15750,7 @@
         <p:spPr>
           <a:xfrm>
             <a:off x="8287920" y="2688120"/>
-            <a:ext cx="1872000" cy="673560"/>
+            <a:ext cx="1871640" cy="673200"/>
           </a:xfrm>
           <a:prstGeom prst="ellipse">
             <a:avLst/>
@@ -15851,7 +15867,7 @@
         <p:spPr>
           <a:xfrm>
             <a:off x="684360" y="4487400"/>
-            <a:ext cx="8532720" cy="1505160"/>
+            <a:ext cx="8532360" cy="1504800"/>
           </a:xfrm>
           <a:prstGeom prst="rect">
             <a:avLst/>
@@ -15900,7 +15916,7 @@
         <p:spPr>
           <a:xfrm>
             <a:off x="684360" y="685800"/>
-            <a:ext cx="11360880" cy="3613320"/>
+            <a:ext cx="11360520" cy="3612960"/>
           </a:xfrm>
           <a:prstGeom prst="rect">
             <a:avLst/>
@@ -15921,7 +15937,7 @@
             <a:normAutofit/>
           </a:bodyPr>
           <a:p>
-            <a:pPr marL="285840" indent="-284040">
+            <a:pPr marL="285840" indent="-283680">
               <a:lnSpc>
                 <a:spcPct val="100000"/>
               </a:lnSpc>
@@ -15963,7 +15979,7 @@
             </a:endParaRPr>
           </a:p>
           <a:p>
-            <a:pPr marL="285840" indent="-284040">
+            <a:pPr marL="285840" indent="-283680">
               <a:lnSpc>
                 <a:spcPct val="100000"/>
               </a:lnSpc>
@@ -16153,7 +16169,7 @@
             </a:endParaRPr>
           </a:p>
           <a:p>
-            <a:pPr marL="285840" indent="-284040">
+            <a:pPr marL="285840" indent="-283680">
               <a:lnSpc>
                 <a:spcPct val="100000"/>
               </a:lnSpc>
@@ -16185,7 +16201,7 @@
             </a:endParaRPr>
           </a:p>
           <a:p>
-            <a:pPr marL="285840" indent="-284040">
+            <a:pPr marL="285840" indent="-283680">
               <a:lnSpc>
                 <a:spcPct val="100000"/>
               </a:lnSpc>
@@ -16276,7 +16292,7 @@
         <p:spPr>
           <a:xfrm>
             <a:off x="684360" y="4487400"/>
-            <a:ext cx="8532720" cy="1505160"/>
+            <a:ext cx="8532360" cy="1504800"/>
           </a:xfrm>
           <a:prstGeom prst="rect">
             <a:avLst/>
@@ -16325,7 +16341,7 @@
         <p:spPr>
           <a:xfrm>
             <a:off x="684360" y="685800"/>
-            <a:ext cx="8532720" cy="3613320"/>
+            <a:ext cx="8532360" cy="3612960"/>
           </a:xfrm>
           <a:prstGeom prst="rect">
             <a:avLst/>
@@ -16344,7 +16360,7 @@
         <p:txBody>
           <a:bodyPr lIns="90000" rIns="90000" tIns="45000" bIns="45000" anchor="ctr"/>
           <a:p>
-            <a:pPr marL="285840" indent="-284040">
+            <a:pPr marL="285840" indent="-283680">
               <a:lnSpc>
                 <a:spcPct val="100000"/>
               </a:lnSpc>
@@ -16446,7 +16462,7 @@
             </a:endParaRPr>
           </a:p>
           <a:p>
-            <a:pPr marL="285840" indent="-284040">
+            <a:pPr marL="285840" indent="-283680">
               <a:lnSpc>
                 <a:spcPct val="100000"/>
               </a:lnSpc>
@@ -16548,7 +16564,7 @@
         <p:spPr>
           <a:xfrm>
             <a:off x="2521440" y="3979080"/>
-            <a:ext cx="1880280" cy="806040"/>
+            <a:ext cx="1879920" cy="805680"/>
           </a:xfrm>
           <a:prstGeom prst="rect">
             <a:avLst/>
@@ -16614,7 +16630,7 @@
         <p:spPr>
           <a:xfrm>
             <a:off x="5487840" y="3979080"/>
-            <a:ext cx="1880280" cy="806040"/>
+            <a:ext cx="1879920" cy="805680"/>
           </a:xfrm>
           <a:prstGeom prst="rect">
             <a:avLst/>
@@ -16680,7 +16696,7 @@
         <p:spPr>
           <a:xfrm>
             <a:off x="4004640" y="2771640"/>
-            <a:ext cx="1880280" cy="806040"/>
+            <a:ext cx="1879920" cy="805680"/>
           </a:xfrm>
           <a:prstGeom prst="rect">
             <a:avLst/>
@@ -16746,7 +16762,7 @@
         <p:spPr>
           <a:xfrm>
             <a:off x="4483080" y="4383000"/>
-            <a:ext cx="1002960" cy="360"/>
+            <a:ext cx="1002600" cy="360"/>
           </a:xfrm>
           <a:custGeom>
             <a:avLst/>
@@ -16798,7 +16814,7 @@
         <p:spPr>
           <a:xfrm>
             <a:off x="4985640" y="3657600"/>
-            <a:ext cx="360" cy="577800"/>
+            <a:ext cx="360" cy="577440"/>
           </a:xfrm>
           <a:custGeom>
             <a:avLst/>
@@ -16899,7 +16915,7 @@
         <p:spPr>
           <a:xfrm>
             <a:off x="0" y="0"/>
-            <a:ext cx="12190320" cy="6856200"/>
+            <a:ext cx="12189960" cy="6855840"/>
           </a:xfrm>
           <a:prstGeom prst="rect">
             <a:avLst/>
@@ -16952,7 +16968,7 @@
         <p:spPr>
           <a:xfrm>
             <a:off x="640440" y="685800"/>
-            <a:ext cx="4816800" cy="4601880"/>
+            <a:ext cx="4816440" cy="4601520"/>
           </a:xfrm>
           <a:prstGeom prst="rect">
             <a:avLst/>
@@ -17003,7 +17019,7 @@
         <p:spPr>
           <a:xfrm>
             <a:off x="6095880" y="0"/>
-            <a:ext cx="6094080" cy="6856200"/>
+            <a:ext cx="6093720" cy="6855840"/>
           </a:xfrm>
           <a:prstGeom prst="rect">
             <a:avLst/>
@@ -17041,7 +17057,7 @@
         <p:spPr>
           <a:xfrm>
             <a:off x="6625800" y="685800"/>
-            <a:ext cx="4877280" cy="4601880"/>
+            <a:ext cx="4876920" cy="4601520"/>
           </a:xfrm>
           <a:prstGeom prst="rect">
             <a:avLst/>
@@ -17062,7 +17078,7 @@
             <a:normAutofit/>
           </a:bodyPr>
           <a:p>
-            <a:pPr marL="285840" indent="-284040">
+            <a:pPr marL="285840" indent="-283680">
               <a:lnSpc>
                 <a:spcPct val="100000"/>
               </a:lnSpc>
@@ -17094,7 +17110,7 @@
             </a:endParaRPr>
           </a:p>
           <a:p>
-            <a:pPr marL="285840" indent="-284040">
+            <a:pPr marL="285840" indent="-283680">
               <a:lnSpc>
                 <a:spcPct val="100000"/>
               </a:lnSpc>
@@ -17126,7 +17142,7 @@
             </a:endParaRPr>
           </a:p>
           <a:p>
-            <a:pPr marL="285840" indent="-284040">
+            <a:pPr marL="285840" indent="-283680">
               <a:lnSpc>
                 <a:spcPct val="100000"/>
               </a:lnSpc>
@@ -17158,7 +17174,7 @@
             </a:endParaRPr>
           </a:p>
           <a:p>
-            <a:pPr marL="285840" indent="-284040">
+            <a:pPr marL="285840" indent="-283680">
               <a:lnSpc>
                 <a:spcPct val="100000"/>
               </a:lnSpc>
@@ -17249,7 +17265,7 @@
         <p:spPr>
           <a:xfrm>
             <a:off x="684360" y="4487400"/>
-            <a:ext cx="8532720" cy="1505160"/>
+            <a:ext cx="8532360" cy="1504800"/>
           </a:xfrm>
           <a:prstGeom prst="rect">
             <a:avLst/>
@@ -17298,7 +17314,7 @@
         <p:spPr>
           <a:xfrm>
             <a:off x="1044720" y="500040"/>
-            <a:ext cx="8262360" cy="3231000"/>
+            <a:ext cx="8262000" cy="3230640"/>
           </a:xfrm>
           <a:prstGeom prst="rect">
             <a:avLst/>
@@ -17317,7 +17333,7 @@
         <p:txBody>
           <a:bodyPr lIns="90000" rIns="90000" tIns="45000" bIns="45000" anchor="ctr"/>
           <a:p>
-            <a:pPr marL="285840" indent="-284040">
+            <a:pPr marL="285840" indent="-283680">
               <a:lnSpc>
                 <a:spcPct val="100000"/>
               </a:lnSpc>
@@ -17359,7 +17375,7 @@
             </a:endParaRPr>
           </a:p>
           <a:p>
-            <a:pPr marL="285840" indent="-284040">
+            <a:pPr marL="285840" indent="-283680">
               <a:lnSpc>
                 <a:spcPct val="100000"/>
               </a:lnSpc>
@@ -17411,7 +17427,7 @@
             </a:endParaRPr>
           </a:p>
           <a:p>
-            <a:pPr marL="285840" indent="-284040">
+            <a:pPr marL="285840" indent="-283680">
               <a:lnSpc>
                 <a:spcPct val="100000"/>
               </a:lnSpc>
@@ -17563,7 +17579,7 @@
         <p:spPr>
           <a:xfrm>
             <a:off x="7097760" y="1943280"/>
-            <a:ext cx="852840" cy="852840"/>
+            <a:ext cx="852480" cy="852480"/>
           </a:xfrm>
           <a:prstGeom prst="rect">
             <a:avLst/>
@@ -17586,7 +17602,7 @@
         <p:spPr>
           <a:xfrm>
             <a:off x="6931800" y="4296600"/>
-            <a:ext cx="1179360" cy="471600"/>
+            <a:ext cx="1179000" cy="471240"/>
           </a:xfrm>
           <a:prstGeom prst="rect">
             <a:avLst/>
@@ -17609,7 +17625,7 @@
         <p:spPr>
           <a:xfrm>
             <a:off x="7054200" y="2896920"/>
-            <a:ext cx="896400" cy="1038600"/>
+            <a:ext cx="896040" cy="1038240"/>
           </a:xfrm>
           <a:prstGeom prst="rect">
             <a:avLst/>
@@ -17632,7 +17648,7 @@
         <p:spPr>
           <a:xfrm>
             <a:off x="2718360" y="2064960"/>
-            <a:ext cx="912600" cy="912600"/>
+            <a:ext cx="912240" cy="912240"/>
           </a:xfrm>
           <a:prstGeom prst="rect">
             <a:avLst/>
@@ -17655,7 +17671,7 @@
         <p:spPr>
           <a:xfrm>
             <a:off x="2739240" y="3371040"/>
-            <a:ext cx="912600" cy="912600"/>
+            <a:ext cx="912240" cy="912240"/>
           </a:xfrm>
           <a:prstGeom prst="rect">
             <a:avLst/>
@@ -17678,7 +17694,7 @@
         <p:spPr>
           <a:xfrm>
             <a:off x="4908600" y="2852280"/>
-            <a:ext cx="912600" cy="912600"/>
+            <a:ext cx="912240" cy="912240"/>
           </a:xfrm>
           <a:prstGeom prst="rect">
             <a:avLst/>
@@ -17696,8 +17712,8 @@
         </p:nvSpPr>
         <p:spPr>
           <a:xfrm rot="1192200">
-            <a:off x="4047480" y="2673000"/>
-            <a:ext cx="976680" cy="482760"/>
+            <a:off x="4047480" y="2672640"/>
+            <a:ext cx="976320" cy="482400"/>
           </a:xfrm>
           <a:prstGeom prst="rightArrow">
             <a:avLst>
@@ -17738,8 +17754,8 @@
         </p:nvSpPr>
         <p:spPr>
           <a:xfrm rot="20407800">
-            <a:off x="4026960" y="3459600"/>
-            <a:ext cx="976680" cy="482760"/>
+            <a:off x="4026600" y="3459600"/>
+            <a:ext cx="976320" cy="482400"/>
           </a:xfrm>
           <a:prstGeom prst="rightArrow">
             <a:avLst>
@@ -17780,8 +17796,8 @@
         </p:nvSpPr>
         <p:spPr>
           <a:xfrm rot="1192200">
-            <a:off x="5801040" y="3781440"/>
-            <a:ext cx="976680" cy="482760"/>
+            <a:off x="5801040" y="3781080"/>
+            <a:ext cx="976320" cy="482400"/>
           </a:xfrm>
           <a:prstGeom prst="rightArrow">
             <a:avLst>
@@ -17822,8 +17838,8 @@
         </p:nvSpPr>
         <p:spPr>
           <a:xfrm rot="20407800">
-            <a:off x="5875200" y="2455200"/>
-            <a:ext cx="976680" cy="482760"/>
+            <a:off x="5874840" y="2455200"/>
+            <a:ext cx="976320" cy="482400"/>
           </a:xfrm>
           <a:prstGeom prst="rightArrow">
             <a:avLst>
@@ -17865,7 +17881,7 @@
         <p:spPr>
           <a:xfrm>
             <a:off x="5951880" y="3115440"/>
-            <a:ext cx="976680" cy="482760"/>
+            <a:ext cx="976320" cy="482400"/>
           </a:xfrm>
           <a:prstGeom prst="rightArrow">
             <a:avLst>
@@ -17956,7 +17972,7 @@
         <p:spPr>
           <a:xfrm>
             <a:off x="684360" y="4487400"/>
-            <a:ext cx="8532720" cy="1505160"/>
+            <a:ext cx="8532360" cy="1504800"/>
           </a:xfrm>
           <a:prstGeom prst="rect">
             <a:avLst/>
@@ -18005,7 +18021,7 @@
         <p:spPr>
           <a:xfrm>
             <a:off x="684360" y="685800"/>
-            <a:ext cx="8532720" cy="3613320"/>
+            <a:ext cx="8532360" cy="3612960"/>
           </a:xfrm>
           <a:prstGeom prst="rect">
             <a:avLst/>
@@ -18024,7 +18040,7 @@
         <p:txBody>
           <a:bodyPr lIns="90000" rIns="90000" tIns="45000" bIns="45000" anchor="ctr"/>
           <a:p>
-            <a:pPr marL="285840" indent="-284040">
+            <a:pPr marL="285840" indent="-283680">
               <a:lnSpc>
                 <a:spcPct val="100000"/>
               </a:lnSpc>
@@ -18116,7 +18132,7 @@
             </a:endParaRPr>
           </a:p>
           <a:p>
-            <a:pPr marL="285840" indent="-284040">
+            <a:pPr marL="285840" indent="-283680">
               <a:lnSpc>
                 <a:spcPct val="100000"/>
               </a:lnSpc>
@@ -18168,7 +18184,7 @@
             </a:endParaRPr>
           </a:p>
           <a:p>
-            <a:pPr marL="285840" indent="-284040">
+            <a:pPr marL="285840" indent="-283680">
               <a:lnSpc>
                 <a:spcPct val="100000"/>
               </a:lnSpc>
@@ -18254,7 +18270,7 @@
         <p:spPr>
           <a:xfrm>
             <a:off x="6227640" y="3794400"/>
-            <a:ext cx="912600" cy="912600"/>
+            <a:ext cx="912240" cy="912240"/>
           </a:xfrm>
           <a:prstGeom prst="rect">
             <a:avLst/>
@@ -18277,7 +18293,7 @@
         <p:spPr>
           <a:xfrm>
             <a:off x="2468520" y="3843720"/>
-            <a:ext cx="912600" cy="912600"/>
+            <a:ext cx="912240" cy="912240"/>
           </a:xfrm>
           <a:prstGeom prst="rect">
             <a:avLst/>
@@ -18300,7 +18316,7 @@
         <p:spPr>
           <a:xfrm>
             <a:off x="9790920" y="3794400"/>
-            <a:ext cx="912600" cy="912600"/>
+            <a:ext cx="912240" cy="912240"/>
           </a:xfrm>
           <a:prstGeom prst="rect">
             <a:avLst/>
@@ -18323,7 +18339,7 @@
         <p:spPr>
           <a:xfrm>
             <a:off x="7903800" y="3794400"/>
-            <a:ext cx="912600" cy="912600"/>
+            <a:ext cx="912240" cy="912240"/>
           </a:xfrm>
           <a:prstGeom prst="rect">
             <a:avLst/>
@@ -18346,7 +18362,7 @@
         <p:spPr>
           <a:xfrm>
             <a:off x="4412520" y="3794400"/>
-            <a:ext cx="912600" cy="912600"/>
+            <a:ext cx="912240" cy="912240"/>
           </a:xfrm>
           <a:prstGeom prst="rect">
             <a:avLst/>
@@ -18369,7 +18385,7 @@
         <p:spPr>
           <a:xfrm>
             <a:off x="684360" y="3843720"/>
-            <a:ext cx="912600" cy="912600"/>
+            <a:ext cx="912240" cy="912240"/>
           </a:xfrm>
           <a:prstGeom prst="rect">
             <a:avLst/>
@@ -18388,7 +18404,7 @@
         <p:spPr>
           <a:xfrm>
             <a:off x="1638000" y="4183200"/>
-            <a:ext cx="681120" cy="260280"/>
+            <a:ext cx="680760" cy="259920"/>
           </a:xfrm>
           <a:prstGeom prst="rightArrow">
             <a:avLst>
@@ -18427,7 +18443,7 @@
         <p:spPr>
           <a:xfrm>
             <a:off x="3511800" y="4201920"/>
-            <a:ext cx="681120" cy="260280"/>
+            <a:ext cx="680760" cy="259920"/>
           </a:xfrm>
           <a:prstGeom prst="rightArrow">
             <a:avLst>
@@ -18466,7 +18482,7 @@
         <p:spPr>
           <a:xfrm>
             <a:off x="5366520" y="4193640"/>
-            <a:ext cx="681120" cy="260280"/>
+            <a:ext cx="680760" cy="259920"/>
           </a:xfrm>
           <a:prstGeom prst="rightArrow">
             <a:avLst>
@@ -18505,7 +18521,7 @@
         <p:spPr>
           <a:xfrm>
             <a:off x="7162200" y="4183200"/>
-            <a:ext cx="681120" cy="260280"/>
+            <a:ext cx="680760" cy="259920"/>
           </a:xfrm>
           <a:prstGeom prst="rightArrow">
             <a:avLst>
@@ -18544,7 +18560,7 @@
         <p:spPr>
           <a:xfrm>
             <a:off x="8876160" y="4169880"/>
-            <a:ext cx="681120" cy="260280"/>
+            <a:ext cx="680760" cy="259920"/>
           </a:xfrm>
           <a:prstGeom prst="rightArrow">
             <a:avLst>
@@ -18632,7 +18648,7 @@
         <p:spPr>
           <a:xfrm>
             <a:off x="684360" y="4487400"/>
-            <a:ext cx="8532720" cy="1505160"/>
+            <a:ext cx="8532360" cy="1504800"/>
           </a:xfrm>
           <a:prstGeom prst="rect">
             <a:avLst/>
@@ -18681,7 +18697,7 @@
         <p:spPr>
           <a:xfrm>
             <a:off x="684360" y="685800"/>
-            <a:ext cx="8532720" cy="3613320"/>
+            <a:ext cx="8532360" cy="3612960"/>
           </a:xfrm>
           <a:prstGeom prst="rect">
             <a:avLst/>
@@ -18700,7 +18716,7 @@
         <p:txBody>
           <a:bodyPr lIns="90000" rIns="90000" tIns="45000" bIns="45000" anchor="ctr"/>
           <a:p>
-            <a:pPr marL="285840" indent="-284040">
+            <a:pPr marL="285840" indent="-283680">
               <a:lnSpc>
                 <a:spcPct val="100000"/>
               </a:lnSpc>
@@ -18782,7 +18798,7 @@
             </a:endParaRPr>
           </a:p>
           <a:p>
-            <a:pPr marL="285840" indent="-284040">
+            <a:pPr marL="285840" indent="-283680">
               <a:lnSpc>
                 <a:spcPct val="100000"/>
               </a:lnSpc>
@@ -18828,7 +18844,7 @@
         <p:spPr>
           <a:xfrm>
             <a:off x="4681800" y="2481480"/>
-            <a:ext cx="912600" cy="912600"/>
+            <a:ext cx="912240" cy="912240"/>
           </a:xfrm>
           <a:prstGeom prst="rect">
             <a:avLst/>
@@ -18851,7 +18867,7 @@
         <p:spPr>
           <a:xfrm>
             <a:off x="6609240" y="3669480"/>
-            <a:ext cx="912600" cy="912600"/>
+            <a:ext cx="912240" cy="912240"/>
           </a:xfrm>
           <a:prstGeom prst="rect">
             <a:avLst/>
@@ -18874,7 +18890,7 @@
         <p:spPr>
           <a:xfrm>
             <a:off x="2973240" y="3669480"/>
-            <a:ext cx="912600" cy="912600"/>
+            <a:ext cx="912240" cy="912240"/>
           </a:xfrm>
           <a:prstGeom prst="rect">
             <a:avLst/>
@@ -18893,7 +18909,7 @@
         <p:spPr>
           <a:xfrm>
             <a:off x="4214160" y="3946320"/>
-            <a:ext cx="2066760" cy="358920"/>
+            <a:ext cx="2066400" cy="358560"/>
           </a:xfrm>
           <a:prstGeom prst="rightArrow">
             <a:avLst>
@@ -18932,7 +18948,7 @@
         <p:spPr>
           <a:xfrm>
             <a:off x="4988160" y="3533400"/>
-            <a:ext cx="299880" cy="405360"/>
+            <a:ext cx="299520" cy="405000"/>
           </a:xfrm>
           <a:prstGeom prst="downArrow">
             <a:avLst>

</xml_diff>

<commit_message>
#12 Weak AI vs Strong AI explanation speech part 1 added on introduction slides
</commit_message>
<xml_diff>
--- a/SAI_presentation_libre_office.pptx
+++ b/SAI_presentation_libre_office.pptx
@@ -250,7 +250,7 @@
           <a:bodyPr lIns="0" rIns="0" tIns="0" bIns="0" anchor="b"/>
           <a:p>
             <a:pPr algn="r"/>
-            <a:fld id="{B66CE860-0531-4975-8EBB-338191391009}" type="slidenum">
+            <a:fld id="{D8A910D1-813C-42CC-BA61-A53608384F6B}" type="slidenum">
               <a:rPr b="0" lang="fr-FR" sz="1400" spc="-1" strike="noStrike">
                 <a:latin typeface="Times New Roman"/>
               </a:rPr>
@@ -298,7 +298,7 @@
         <p:spPr>
           <a:xfrm>
             <a:off x="685800" y="1143000"/>
-            <a:ext cx="5484240" cy="3084120"/>
+            <a:ext cx="5483880" cy="3083760"/>
           </a:xfrm>
           <a:prstGeom prst="rect">
             <a:avLst/>
@@ -318,7 +318,7 @@
         <p:spPr>
           <a:xfrm>
             <a:off x="685800" y="4400640"/>
-            <a:ext cx="5484240" cy="3598200"/>
+            <a:ext cx="5483880" cy="3597840"/>
           </a:xfrm>
           <a:prstGeom prst="rect">
             <a:avLst/>
@@ -327,7 +327,7 @@
         <p:txBody>
           <a:bodyPr lIns="0" rIns="0" tIns="0" bIns="0"/>
           <a:p>
-            <a:pPr marL="216000" indent="-214200">
+            <a:pPr marL="216000" indent="-213840">
               <a:lnSpc>
                 <a:spcPct val="100000"/>
               </a:lnSpc>
@@ -343,7 +343,7 @@
             </a:endParaRPr>
           </a:p>
           <a:p>
-            <a:pPr marL="216000" indent="-214200">
+            <a:pPr marL="216000" indent="-213840">
               <a:lnSpc>
                 <a:spcPct val="100000"/>
               </a:lnSpc>
@@ -360,7 +360,7 @@
             </a:endParaRPr>
           </a:p>
           <a:p>
-            <a:pPr marL="216000" indent="-214200">
+            <a:pPr marL="216000" indent="-213840">
               <a:lnSpc>
                 <a:spcPct val="100000"/>
               </a:lnSpc>
@@ -376,7 +376,7 @@
             </a:endParaRPr>
           </a:p>
           <a:p>
-            <a:pPr marL="216000" indent="-214200">
+            <a:pPr marL="216000" indent="-213840">
               <a:lnSpc>
                 <a:spcPct val="100000"/>
               </a:lnSpc>
@@ -392,7 +392,7 @@
             </a:endParaRPr>
           </a:p>
           <a:p>
-            <a:pPr marL="216000" indent="-214200">
+            <a:pPr marL="216000" indent="-213840">
               <a:lnSpc>
                 <a:spcPct val="100000"/>
               </a:lnSpc>
@@ -419,7 +419,7 @@
         <p:spPr>
           <a:xfrm>
             <a:off x="3884760" y="8685360"/>
-            <a:ext cx="2969640" cy="456480"/>
+            <a:ext cx="2969280" cy="456120"/>
           </a:xfrm>
           <a:prstGeom prst="rect">
             <a:avLst/>
@@ -443,7 +443,7 @@
                 <a:spcPct val="100000"/>
               </a:lnSpc>
             </a:pPr>
-            <a:fld id="{A14EA1BF-F29A-4BF3-9E62-3B9E956627D7}" type="slidenum">
+            <a:fld id="{EB8238CC-1DA6-4906-9A69-F8390BC9677A}" type="slidenum">
               <a:rPr b="0" lang="fr-FR" sz="1200" spc="-1" strike="noStrike">
                 <a:solidFill>
                   <a:srgbClr val="000000"/>
@@ -493,7 +493,7 @@
         <p:spPr>
           <a:xfrm>
             <a:off x="685800" y="1143000"/>
-            <a:ext cx="5484240" cy="3084120"/>
+            <a:ext cx="5483880" cy="3083760"/>
           </a:xfrm>
           <a:prstGeom prst="rect">
             <a:avLst/>
@@ -513,7 +513,7 @@
         <p:spPr>
           <a:xfrm>
             <a:off x="685800" y="4400640"/>
-            <a:ext cx="5484240" cy="3598200"/>
+            <a:ext cx="5483880" cy="3597840"/>
           </a:xfrm>
           <a:prstGeom prst="rect">
             <a:avLst/>
@@ -522,7 +522,7 @@
         <p:txBody>
           <a:bodyPr lIns="0" rIns="0" tIns="0" bIns="0"/>
           <a:p>
-            <a:pPr marL="216000" indent="-214560">
+            <a:pPr marL="216000" indent="-214200">
               <a:lnSpc>
                 <a:spcPct val="100000"/>
               </a:lnSpc>
@@ -538,7 +538,7 @@
             </a:endParaRPr>
           </a:p>
           <a:p>
-            <a:pPr marL="216000" indent="-214560">
+            <a:pPr marL="216000" indent="-214200">
               <a:lnSpc>
                 <a:spcPct val="100000"/>
               </a:lnSpc>
@@ -548,7 +548,7 @@
             </a:endParaRPr>
           </a:p>
           <a:p>
-            <a:pPr marL="216000" indent="-214560">
+            <a:pPr marL="216000" indent="-214200">
               <a:lnSpc>
                 <a:spcPct val="100000"/>
               </a:lnSpc>
@@ -564,7 +564,7 @@
             </a:endParaRPr>
           </a:p>
           <a:p>
-            <a:pPr marL="216000" indent="-214560">
+            <a:pPr marL="216000" indent="-214200">
               <a:lnSpc>
                 <a:spcPct val="100000"/>
               </a:lnSpc>
@@ -574,7 +574,7 @@
             </a:endParaRPr>
           </a:p>
           <a:p>
-            <a:pPr marL="216000" indent="-214560">
+            <a:pPr marL="216000" indent="-214200">
               <a:lnSpc>
                 <a:spcPct val="100000"/>
               </a:lnSpc>
@@ -590,7 +590,7 @@
             </a:endParaRPr>
           </a:p>
           <a:p>
-            <a:pPr marL="216000" indent="-214560">
+            <a:pPr marL="216000" indent="-214200">
               <a:lnSpc>
                 <a:spcPct val="100000"/>
               </a:lnSpc>
@@ -600,7 +600,7 @@
             </a:endParaRPr>
           </a:p>
           <a:p>
-            <a:pPr marL="216000" indent="-214560">
+            <a:pPr marL="216000" indent="-214200">
               <a:lnSpc>
                 <a:spcPct val="100000"/>
               </a:lnSpc>
@@ -616,7 +616,7 @@
             </a:endParaRPr>
           </a:p>
           <a:p>
-            <a:pPr marL="216000" indent="-214560">
+            <a:pPr marL="216000" indent="-214200">
               <a:lnSpc>
                 <a:spcPct val="100000"/>
               </a:lnSpc>
@@ -626,7 +626,7 @@
             </a:endParaRPr>
           </a:p>
           <a:p>
-            <a:pPr marL="216000" indent="-214560">
+            <a:pPr marL="216000" indent="-214200">
               <a:lnSpc>
                 <a:spcPct val="100000"/>
               </a:lnSpc>
@@ -636,7 +636,7 @@
             </a:endParaRPr>
           </a:p>
           <a:p>
-            <a:pPr marL="216000" indent="-214560">
+            <a:pPr marL="216000" indent="-214200">
               <a:lnSpc>
                 <a:spcPct val="100000"/>
               </a:lnSpc>
@@ -652,7 +652,7 @@
             </a:endParaRPr>
           </a:p>
           <a:p>
-            <a:pPr marL="216000" indent="-214560">
+            <a:pPr marL="216000" indent="-214200">
               <a:lnSpc>
                 <a:spcPct val="100000"/>
               </a:lnSpc>
@@ -668,7 +668,7 @@
             </a:endParaRPr>
           </a:p>
           <a:p>
-            <a:pPr marL="216000" indent="-214560">
+            <a:pPr marL="216000" indent="-214200">
               <a:lnSpc>
                 <a:spcPct val="100000"/>
               </a:lnSpc>
@@ -684,7 +684,7 @@
             </a:endParaRPr>
           </a:p>
           <a:p>
-            <a:pPr marL="216000" indent="-214560">
+            <a:pPr marL="216000" indent="-214200">
               <a:lnSpc>
                 <a:spcPct val="100000"/>
               </a:lnSpc>
@@ -694,7 +694,7 @@
             </a:endParaRPr>
           </a:p>
           <a:p>
-            <a:pPr marL="216000" indent="-214560">
+            <a:pPr marL="216000" indent="-214200">
               <a:lnSpc>
                 <a:spcPct val="100000"/>
               </a:lnSpc>
@@ -710,7 +710,7 @@
             </a:endParaRPr>
           </a:p>
           <a:p>
-            <a:pPr marL="216000" indent="-214560">
+            <a:pPr marL="216000" indent="-214200">
               <a:lnSpc>
                 <a:spcPct val="100000"/>
               </a:lnSpc>
@@ -720,7 +720,7 @@
             </a:endParaRPr>
           </a:p>
           <a:p>
-            <a:pPr marL="216000" indent="-214560">
+            <a:pPr marL="216000" indent="-214200">
               <a:lnSpc>
                 <a:spcPct val="100000"/>
               </a:lnSpc>
@@ -736,7 +736,7 @@
             </a:endParaRPr>
           </a:p>
           <a:p>
-            <a:pPr marL="216000" indent="-214560">
+            <a:pPr marL="216000" indent="-214200">
               <a:lnSpc>
                 <a:spcPct val="100000"/>
               </a:lnSpc>
@@ -752,7 +752,7 @@
             </a:endParaRPr>
           </a:p>
           <a:p>
-            <a:pPr marL="216000" indent="-214560">
+            <a:pPr marL="216000" indent="-214200">
               <a:lnSpc>
                 <a:spcPct val="100000"/>
               </a:lnSpc>
@@ -768,7 +768,7 @@
             </a:endParaRPr>
           </a:p>
           <a:p>
-            <a:pPr marL="216000" indent="-214560">
+            <a:pPr marL="216000" indent="-214200">
               <a:lnSpc>
                 <a:spcPct val="100000"/>
               </a:lnSpc>
@@ -784,7 +784,7 @@
             </a:endParaRPr>
           </a:p>
           <a:p>
-            <a:pPr marL="216000" indent="-214560">
+            <a:pPr marL="216000" indent="-214200">
               <a:lnSpc>
                 <a:spcPct val="100000"/>
               </a:lnSpc>
@@ -794,7 +794,7 @@
             </a:endParaRPr>
           </a:p>
           <a:p>
-            <a:pPr marL="216000" indent="-214560">
+            <a:pPr marL="216000" indent="-214200">
               <a:lnSpc>
                 <a:spcPct val="100000"/>
               </a:lnSpc>
@@ -810,7 +810,7 @@
             </a:endParaRPr>
           </a:p>
           <a:p>
-            <a:pPr marL="216000" indent="-214560">
+            <a:pPr marL="216000" indent="-214200">
               <a:lnSpc>
                 <a:spcPct val="100000"/>
               </a:lnSpc>
@@ -826,7 +826,7 @@
             </a:endParaRPr>
           </a:p>
           <a:p>
-            <a:pPr marL="216000" indent="-214560">
+            <a:pPr marL="216000" indent="-214200">
               <a:lnSpc>
                 <a:spcPct val="100000"/>
               </a:lnSpc>
@@ -842,7 +842,7 @@
             </a:endParaRPr>
           </a:p>
           <a:p>
-            <a:pPr marL="216000" indent="-214560">
+            <a:pPr marL="216000" indent="-214200">
               <a:lnSpc>
                 <a:spcPct val="100000"/>
               </a:lnSpc>
@@ -858,7 +858,7 @@
             </a:endParaRPr>
           </a:p>
           <a:p>
-            <a:pPr marL="216000" indent="-214560">
+            <a:pPr marL="216000" indent="-214200">
               <a:lnSpc>
                 <a:spcPct val="100000"/>
               </a:lnSpc>
@@ -874,7 +874,7 @@
             </a:endParaRPr>
           </a:p>
           <a:p>
-            <a:pPr marL="216000" indent="-214560">
+            <a:pPr marL="216000" indent="-214200">
               <a:lnSpc>
                 <a:spcPct val="100000"/>
               </a:lnSpc>
@@ -884,7 +884,7 @@
             </a:endParaRPr>
           </a:p>
           <a:p>
-            <a:pPr marL="216000" indent="-214560">
+            <a:pPr marL="216000" indent="-214200">
               <a:lnSpc>
                 <a:spcPct val="100000"/>
               </a:lnSpc>
@@ -900,7 +900,7 @@
             </a:endParaRPr>
           </a:p>
           <a:p>
-            <a:pPr marL="216000" indent="-214560">
+            <a:pPr marL="216000" indent="-214200">
               <a:lnSpc>
                 <a:spcPct val="100000"/>
               </a:lnSpc>
@@ -916,7 +916,7 @@
             </a:endParaRPr>
           </a:p>
           <a:p>
-            <a:pPr marL="216000" indent="-214560">
+            <a:pPr marL="216000" indent="-214200">
               <a:lnSpc>
                 <a:spcPct val="100000"/>
               </a:lnSpc>
@@ -932,7 +932,7 @@
             </a:endParaRPr>
           </a:p>
           <a:p>
-            <a:pPr marL="216000" indent="-214560">
+            <a:pPr marL="216000" indent="-214200">
               <a:lnSpc>
                 <a:spcPct val="100000"/>
               </a:lnSpc>
@@ -942,7 +942,7 @@
             </a:endParaRPr>
           </a:p>
           <a:p>
-            <a:pPr marL="216000" indent="-214560">
+            <a:pPr marL="216000" indent="-214200">
               <a:lnSpc>
                 <a:spcPct val="100000"/>
               </a:lnSpc>
@@ -958,7 +958,7 @@
             </a:endParaRPr>
           </a:p>
           <a:p>
-            <a:pPr marL="216000" indent="-214560">
+            <a:pPr marL="216000" indent="-214200">
               <a:lnSpc>
                 <a:spcPct val="100000"/>
               </a:lnSpc>
@@ -974,7 +974,7 @@
             </a:endParaRPr>
           </a:p>
           <a:p>
-            <a:pPr marL="216000" indent="-214560">
+            <a:pPr marL="216000" indent="-214200">
               <a:lnSpc>
                 <a:spcPct val="100000"/>
               </a:lnSpc>
@@ -990,7 +990,7 @@
             </a:endParaRPr>
           </a:p>
           <a:p>
-            <a:pPr marL="216000" indent="-214560">
+            <a:pPr marL="216000" indent="-214200">
               <a:lnSpc>
                 <a:spcPct val="100000"/>
               </a:lnSpc>
@@ -1000,7 +1000,7 @@
             </a:endParaRPr>
           </a:p>
           <a:p>
-            <a:pPr marL="216000" indent="-214560">
+            <a:pPr marL="216000" indent="-214200">
               <a:lnSpc>
                 <a:spcPct val="100000"/>
               </a:lnSpc>
@@ -1016,7 +1016,7 @@
             </a:endParaRPr>
           </a:p>
           <a:p>
-            <a:pPr marL="216000" indent="-214560">
+            <a:pPr marL="216000" indent="-214200">
               <a:lnSpc>
                 <a:spcPct val="100000"/>
               </a:lnSpc>
@@ -1032,7 +1032,7 @@
             </a:endParaRPr>
           </a:p>
           <a:p>
-            <a:pPr marL="216000" indent="-214560">
+            <a:pPr marL="216000" indent="-214200">
               <a:lnSpc>
                 <a:spcPct val="100000"/>
               </a:lnSpc>
@@ -1048,7 +1048,7 @@
             </a:endParaRPr>
           </a:p>
           <a:p>
-            <a:pPr marL="216000" indent="-214560">
+            <a:pPr marL="216000" indent="-214200">
               <a:lnSpc>
                 <a:spcPct val="100000"/>
               </a:lnSpc>
@@ -1064,7 +1064,7 @@
             </a:endParaRPr>
           </a:p>
           <a:p>
-            <a:pPr marL="216000" indent="-214560">
+            <a:pPr marL="216000" indent="-214200">
               <a:lnSpc>
                 <a:spcPct val="100000"/>
               </a:lnSpc>
@@ -1074,7 +1074,7 @@
             </a:endParaRPr>
           </a:p>
           <a:p>
-            <a:pPr marL="216000" indent="-214560">
+            <a:pPr marL="216000" indent="-214200">
               <a:lnSpc>
                 <a:spcPct val="100000"/>
               </a:lnSpc>
@@ -1090,7 +1090,7 @@
             </a:endParaRPr>
           </a:p>
           <a:p>
-            <a:pPr marL="216000" indent="-214560">
+            <a:pPr marL="216000" indent="-214200">
               <a:lnSpc>
                 <a:spcPct val="100000"/>
               </a:lnSpc>
@@ -1107,7 +1107,7 @@
             </a:endParaRPr>
           </a:p>
           <a:p>
-            <a:pPr marL="216000" indent="-214560">
+            <a:pPr marL="216000" indent="-214200">
               <a:lnSpc>
                 <a:spcPct val="100000"/>
               </a:lnSpc>
@@ -1124,7 +1124,7 @@
             </a:endParaRPr>
           </a:p>
           <a:p>
-            <a:pPr marL="216000" indent="-214560">
+            <a:pPr marL="216000" indent="-214200">
               <a:lnSpc>
                 <a:spcPct val="100000"/>
               </a:lnSpc>
@@ -1141,7 +1141,7 @@
             </a:endParaRPr>
           </a:p>
           <a:p>
-            <a:pPr marL="216000" indent="-214560">
+            <a:pPr marL="216000" indent="-214200">
               <a:lnSpc>
                 <a:spcPct val="100000"/>
               </a:lnSpc>
@@ -1151,7 +1151,7 @@
             </a:endParaRPr>
           </a:p>
           <a:p>
-            <a:pPr marL="216000" indent="-214560">
+            <a:pPr marL="216000" indent="-214200">
               <a:lnSpc>
                 <a:spcPct val="100000"/>
               </a:lnSpc>
@@ -1168,7 +1168,7 @@
             </a:endParaRPr>
           </a:p>
           <a:p>
-            <a:pPr marL="216000" indent="-214560">
+            <a:pPr marL="216000" indent="-214200">
               <a:lnSpc>
                 <a:spcPct val="100000"/>
               </a:lnSpc>
@@ -1185,7 +1185,7 @@
             </a:endParaRPr>
           </a:p>
           <a:p>
-            <a:pPr marL="216000" indent="-214560">
+            <a:pPr marL="216000" indent="-214200">
               <a:lnSpc>
                 <a:spcPct val="100000"/>
               </a:lnSpc>
@@ -1195,7 +1195,7 @@
             </a:endParaRPr>
           </a:p>
           <a:p>
-            <a:pPr marL="216000" indent="-214560">
+            <a:pPr marL="216000" indent="-214200">
               <a:lnSpc>
                 <a:spcPct val="100000"/>
               </a:lnSpc>
@@ -1205,7 +1205,7 @@
             </a:endParaRPr>
           </a:p>
           <a:p>
-            <a:pPr marL="216000" indent="-214560">
+            <a:pPr marL="216000" indent="-214200">
               <a:lnSpc>
                 <a:spcPct val="100000"/>
               </a:lnSpc>
@@ -1215,7 +1215,7 @@
             </a:endParaRPr>
           </a:p>
           <a:p>
-            <a:pPr marL="216000" indent="-214560">
+            <a:pPr marL="216000" indent="-214200">
               <a:lnSpc>
                 <a:spcPct val="100000"/>
               </a:lnSpc>
@@ -1225,7 +1225,7 @@
             </a:endParaRPr>
           </a:p>
           <a:p>
-            <a:pPr marL="216000" indent="-214560">
+            <a:pPr marL="216000" indent="-214200">
               <a:lnSpc>
                 <a:spcPct val="100000"/>
               </a:lnSpc>
@@ -1245,7 +1245,7 @@
         <p:spPr>
           <a:xfrm>
             <a:off x="3884760" y="8685360"/>
-            <a:ext cx="2969640" cy="456480"/>
+            <a:ext cx="2969280" cy="456120"/>
           </a:xfrm>
           <a:prstGeom prst="rect">
             <a:avLst/>
@@ -1269,7 +1269,7 @@
                 <a:spcPct val="100000"/>
               </a:lnSpc>
             </a:pPr>
-            <a:fld id="{F2F404CD-2CDD-4CD5-B6CF-5AF324E00F5E}" type="slidenum">
+            <a:fld id="{A98FF6B5-729D-48AB-9F61-B604B3F0025E}" type="slidenum">
               <a:rPr b="0" lang="fr-FR" sz="1200" spc="-1" strike="noStrike">
                 <a:solidFill>
                   <a:srgbClr val="000000"/>
@@ -1319,7 +1319,7 @@
         <p:spPr>
           <a:xfrm>
             <a:off x="685800" y="1143000"/>
-            <a:ext cx="5484240" cy="3084120"/>
+            <a:ext cx="5483880" cy="3083760"/>
           </a:xfrm>
           <a:prstGeom prst="rect">
             <a:avLst/>
@@ -1339,7 +1339,7 @@
         <p:spPr>
           <a:xfrm>
             <a:off x="685800" y="4400640"/>
-            <a:ext cx="5484240" cy="3598200"/>
+            <a:ext cx="5483880" cy="3597840"/>
           </a:xfrm>
           <a:prstGeom prst="rect">
             <a:avLst/>
@@ -1348,7 +1348,50 @@
         <p:txBody>
           <a:bodyPr lIns="0" rIns="0" tIns="0" bIns="0"/>
           <a:p>
-            <a:endParaRPr b="0" lang="fr-FR" sz="2000" spc="-1" strike="noStrike">
+            <a:pPr marL="216000" indent="-216000">
+              <a:lnSpc>
+                <a:spcPct val="100000"/>
+              </a:lnSpc>
+            </a:pPr>
+            <a:r>
+              <a:rPr b="0" lang="fr-FR" sz="1800" spc="-1" strike="noStrike">
+                <a:latin typeface="Arial"/>
+              </a:rPr>
+              <a:t>I will present you what is a weak AI</a:t>
+            </a:r>
+            <a:endParaRPr b="0" lang="fr-FR" sz="1800" spc="-1" strike="noStrike">
+              <a:latin typeface="Arial"/>
+            </a:endParaRPr>
+          </a:p>
+          <a:p>
+            <a:pPr marL="216000" indent="-216000">
+              <a:lnSpc>
+                <a:spcPct val="100000"/>
+              </a:lnSpc>
+            </a:pPr>
+            <a:r>
+              <a:rPr b="0" lang="fr-FR" sz="1800" spc="-1" strike="noStrike">
+                <a:latin typeface="Arial"/>
+              </a:rPr>
+              <a:t>Then you will understand the particularity of the AI I want to create.</a:t>
+            </a:r>
+            <a:endParaRPr b="0" lang="fr-FR" sz="1800" spc="-1" strike="noStrike">
+              <a:latin typeface="Arial"/>
+            </a:endParaRPr>
+          </a:p>
+          <a:p>
+            <a:pPr marL="216000" indent="-216000">
+              <a:lnSpc>
+                <a:spcPct val="100000"/>
+              </a:lnSpc>
+            </a:pPr>
+            <a:r>
+              <a:rPr b="0" lang="fr-FR" sz="1800" spc="-1" strike="noStrike">
+                <a:latin typeface="Arial"/>
+              </a:rPr>
+              <a:t>Weak AI is an AI which is a specialist on something he was train for.</a:t>
+            </a:r>
+            <a:endParaRPr b="0" lang="fr-FR" sz="1800" spc="-1" strike="noStrike">
               <a:latin typeface="Arial"/>
             </a:endParaRPr>
           </a:p>
@@ -1363,7 +1406,7 @@
         <p:spPr>
           <a:xfrm>
             <a:off x="3884760" y="8685360"/>
-            <a:ext cx="2969640" cy="456480"/>
+            <a:ext cx="2969280" cy="456120"/>
           </a:xfrm>
           <a:prstGeom prst="rect">
             <a:avLst/>
@@ -1387,7 +1430,7 @@
                 <a:spcPct val="100000"/>
               </a:lnSpc>
             </a:pPr>
-            <a:fld id="{049ED122-F611-4628-8590-E2D4AFB4115A}" type="slidenum">
+            <a:fld id="{64A57D56-0BA0-4587-9697-7C1FB089DEA3}" type="slidenum">
               <a:rPr b="0" lang="fr-FR" sz="1200" spc="-1" strike="noStrike">
                 <a:solidFill>
                   <a:srgbClr val="000000"/>
@@ -1437,7 +1480,7 @@
         <p:spPr>
           <a:xfrm>
             <a:off x="380880" y="694800"/>
-            <a:ext cx="6094800" cy="3427920"/>
+            <a:ext cx="6094440" cy="3427560"/>
           </a:xfrm>
           <a:prstGeom prst="rect">
             <a:avLst/>
@@ -1457,7 +1500,7 @@
         <p:spPr>
           <a:xfrm>
             <a:off x="685800" y="4343400"/>
-            <a:ext cx="5485320" cy="4113720"/>
+            <a:ext cx="5484960" cy="4113360"/>
           </a:xfrm>
           <a:prstGeom prst="rect">
             <a:avLst/>
@@ -1466,7 +1509,7 @@
         <p:txBody>
           <a:bodyPr lIns="0" rIns="0" tIns="0" bIns="0"/>
           <a:p>
-            <a:pPr marL="216000" indent="-215640">
+            <a:pPr marL="216000" indent="-215280">
               <a:lnSpc>
                 <a:spcPct val="100000"/>
               </a:lnSpc>
@@ -1482,7 +1525,7 @@
             </a:endParaRPr>
           </a:p>
           <a:p>
-            <a:pPr marL="216000" indent="-215640">
+            <a:pPr marL="216000" indent="-215280">
               <a:lnSpc>
                 <a:spcPct val="100000"/>
               </a:lnSpc>
@@ -1498,7 +1541,7 @@
             </a:endParaRPr>
           </a:p>
           <a:p>
-            <a:pPr marL="216000" indent="-215640">
+            <a:pPr marL="216000" indent="-215280">
               <a:lnSpc>
                 <a:spcPct val="100000"/>
               </a:lnSpc>
@@ -1514,7 +1557,7 @@
             </a:endParaRPr>
           </a:p>
           <a:p>
-            <a:pPr marL="216000" indent="-215640">
+            <a:pPr marL="216000" indent="-215280">
               <a:lnSpc>
                 <a:spcPct val="100000"/>
               </a:lnSpc>
@@ -5262,7 +5305,7 @@
         <p:spPr>
           <a:xfrm>
             <a:off x="0" y="0"/>
-            <a:ext cx="12189960" cy="6855840"/>
+            <a:ext cx="12189600" cy="6855480"/>
           </a:xfrm>
           <a:prstGeom prst="rect">
             <a:avLst/>
@@ -5294,8 +5337,8 @@
         </p:nvSpPr>
         <p:spPr>
           <a:xfrm flipV="1">
-            <a:off x="0" y="-2160"/>
-            <a:ext cx="12186720" cy="6855840"/>
+            <a:off x="0" y="-2880"/>
+            <a:ext cx="12186360" cy="6855480"/>
           </a:xfrm>
           <a:prstGeom prst="snip1Rect">
             <a:avLst>
@@ -5350,7 +5393,7 @@
         <p:spPr>
           <a:xfrm>
             <a:off x="684360" y="685800"/>
-            <a:ext cx="9676800" cy="3671280"/>
+            <a:ext cx="9676440" cy="3670920"/>
           </a:xfrm>
           <a:prstGeom prst="rect">
             <a:avLst/>
@@ -5401,7 +5444,7 @@
         <p:spPr>
           <a:xfrm>
             <a:off x="684360" y="4648320"/>
-            <a:ext cx="7003440" cy="1140840"/>
+            <a:ext cx="7003080" cy="1140480"/>
           </a:xfrm>
           <a:prstGeom prst="rect">
             <a:avLst/>
@@ -5539,7 +5582,7 @@
         <p:spPr>
           <a:xfrm>
             <a:off x="684360" y="4487400"/>
-            <a:ext cx="8532360" cy="1504800"/>
+            <a:ext cx="8532000" cy="1504440"/>
           </a:xfrm>
           <a:prstGeom prst="rect">
             <a:avLst/>
@@ -5588,7 +5631,7 @@
         <p:spPr>
           <a:xfrm>
             <a:off x="684360" y="685800"/>
-            <a:ext cx="8532360" cy="3612960"/>
+            <a:ext cx="8532000" cy="3612600"/>
           </a:xfrm>
           <a:prstGeom prst="rect">
             <a:avLst/>
@@ -5607,7 +5650,7 @@
         <p:txBody>
           <a:bodyPr lIns="90000" rIns="90000" tIns="45000" bIns="45000" anchor="ctr"/>
           <a:p>
-            <a:pPr marL="285840" indent="-283680">
+            <a:pPr marL="285840" indent="-283320">
               <a:lnSpc>
                 <a:spcPct val="100000"/>
               </a:lnSpc>
@@ -5739,7 +5782,7 @@
             </a:endParaRPr>
           </a:p>
           <a:p>
-            <a:pPr marL="285840" indent="-283680">
+            <a:pPr marL="285840" indent="-283320">
               <a:lnSpc>
                 <a:spcPct val="100000"/>
               </a:lnSpc>
@@ -5785,7 +5828,7 @@
         <p:spPr>
           <a:xfrm>
             <a:off x="4733640" y="3979440"/>
-            <a:ext cx="912240" cy="912240"/>
+            <a:ext cx="911880" cy="911880"/>
           </a:xfrm>
           <a:prstGeom prst="rect">
             <a:avLst/>
@@ -5808,7 +5851,7 @@
         <p:spPr>
           <a:xfrm>
             <a:off x="6825960" y="4030200"/>
-            <a:ext cx="912240" cy="912240"/>
+            <a:ext cx="911880" cy="911880"/>
           </a:xfrm>
           <a:prstGeom prst="rect">
             <a:avLst/>
@@ -5831,7 +5874,7 @@
         <p:spPr>
           <a:xfrm>
             <a:off x="5354640" y="2725920"/>
-            <a:ext cx="912240" cy="912240"/>
+            <a:ext cx="911880" cy="911880"/>
           </a:xfrm>
           <a:prstGeom prst="rect">
             <a:avLst/>
@@ -5854,7 +5897,7 @@
         <p:spPr>
           <a:xfrm>
             <a:off x="8550000" y="3433320"/>
-            <a:ext cx="912240" cy="912240"/>
+            <a:ext cx="911880" cy="911880"/>
           </a:xfrm>
           <a:prstGeom prst="rect">
             <a:avLst/>
@@ -5877,7 +5920,7 @@
         <p:spPr>
           <a:xfrm>
             <a:off x="5153040" y="5079960"/>
-            <a:ext cx="912240" cy="912240"/>
+            <a:ext cx="911880" cy="911880"/>
           </a:xfrm>
           <a:prstGeom prst="rect">
             <a:avLst/>
@@ -5895,8 +5938,8 @@
         </p:nvSpPr>
         <p:spPr>
           <a:xfrm rot="3732600">
-            <a:off x="7994160" y="3764520"/>
-            <a:ext cx="201960" cy="667800"/>
+            <a:off x="7994160" y="3764160"/>
+            <a:ext cx="201600" cy="667440"/>
           </a:xfrm>
           <a:prstGeom prst="downArrow">
             <a:avLst>
@@ -5934,8 +5977,8 @@
         </p:nvSpPr>
         <p:spPr>
           <a:xfrm rot="14618400">
-            <a:off x="6344280" y="4763520"/>
-            <a:ext cx="201960" cy="667800"/>
+            <a:off x="6344280" y="4763880"/>
+            <a:ext cx="201600" cy="667440"/>
           </a:xfrm>
           <a:prstGeom prst="downArrow">
             <a:avLst>
@@ -5973,8 +6016,8 @@
         </p:nvSpPr>
         <p:spPr>
           <a:xfrm rot="5400000">
-            <a:off x="6190920" y="4132800"/>
-            <a:ext cx="201960" cy="667800"/>
+            <a:off x="6191280" y="4132800"/>
+            <a:ext cx="201600" cy="667440"/>
           </a:xfrm>
           <a:prstGeom prst="downArrow">
             <a:avLst>
@@ -6012,8 +6055,8 @@
         </p:nvSpPr>
         <p:spPr>
           <a:xfrm rot="7014000">
-            <a:off x="6424560" y="3552840"/>
-            <a:ext cx="201960" cy="667800"/>
+            <a:off x="6424920" y="3552840"/>
+            <a:ext cx="201600" cy="667440"/>
           </a:xfrm>
           <a:prstGeom prst="downArrow">
             <a:avLst>
@@ -6052,7 +6095,7 @@
         <p:spPr>
           <a:xfrm rot="1747800">
             <a:off x="5088600" y="3303720"/>
-            <a:ext cx="201960" cy="667800"/>
+            <a:ext cx="201600" cy="667440"/>
           </a:xfrm>
           <a:prstGeom prst="downArrow">
             <a:avLst>
@@ -6140,7 +6183,7 @@
         <p:spPr>
           <a:xfrm>
             <a:off x="6868080" y="306720"/>
-            <a:ext cx="5041800" cy="2083680"/>
+            <a:ext cx="5041440" cy="2083320"/>
           </a:xfrm>
           <a:prstGeom prst="rect">
             <a:avLst/>
@@ -6183,7 +6226,7 @@
         <p:spPr>
           <a:xfrm>
             <a:off x="6271200" y="2669400"/>
-            <a:ext cx="5630760" cy="3006720"/>
+            <a:ext cx="5630400" cy="3006360"/>
           </a:xfrm>
           <a:prstGeom prst="rect">
             <a:avLst/>
@@ -6228,7 +6271,7 @@
         <p:spPr>
           <a:xfrm>
             <a:off x="129960" y="5709960"/>
-            <a:ext cx="11181240" cy="1087920"/>
+            <a:ext cx="11180880" cy="1087560"/>
           </a:xfrm>
           <a:prstGeom prst="rect">
             <a:avLst/>
@@ -6273,7 +6316,7 @@
         <p:spPr>
           <a:xfrm>
             <a:off x="207000" y="1787400"/>
-            <a:ext cx="5592600" cy="3225960"/>
+            <a:ext cx="5592240" cy="3225600"/>
           </a:xfrm>
           <a:prstGeom prst="rect">
             <a:avLst/>
@@ -6318,7 +6361,7 @@
         <p:spPr>
           <a:xfrm>
             <a:off x="684360" y="4487400"/>
-            <a:ext cx="8532360" cy="1504800"/>
+            <a:ext cx="8532000" cy="1504440"/>
           </a:xfrm>
           <a:prstGeom prst="rect">
             <a:avLst/>
@@ -6367,7 +6410,7 @@
         <p:spPr>
           <a:xfrm>
             <a:off x="684360" y="685800"/>
-            <a:ext cx="8532360" cy="3612960"/>
+            <a:ext cx="8532000" cy="3612600"/>
           </a:xfrm>
           <a:prstGeom prst="rect">
             <a:avLst/>
@@ -6386,7 +6429,7 @@
         <p:txBody>
           <a:bodyPr lIns="90000" rIns="90000" tIns="45000" bIns="45000" anchor="ctr"/>
           <a:p>
-            <a:pPr marL="285840" indent="-283680">
+            <a:pPr marL="285840" indent="-283320">
               <a:lnSpc>
                 <a:spcPct val="100000"/>
               </a:lnSpc>
@@ -6438,7 +6481,7 @@
             </a:endParaRPr>
           </a:p>
           <a:p>
-            <a:pPr marL="285840" indent="-283680">
+            <a:pPr marL="285840" indent="-283320">
               <a:lnSpc>
                 <a:spcPct val="100000"/>
               </a:lnSpc>
@@ -6480,7 +6523,7 @@
             </a:endParaRPr>
           </a:p>
           <a:p>
-            <a:pPr marL="285840" indent="-283680">
+            <a:pPr marL="285840" indent="-283320">
               <a:lnSpc>
                 <a:spcPct val="100000"/>
               </a:lnSpc>
@@ -6532,7 +6575,7 @@
             </a:endParaRPr>
           </a:p>
           <a:p>
-            <a:pPr marL="285840" indent="-283680">
+            <a:pPr marL="285840" indent="-283320">
               <a:lnSpc>
                 <a:spcPct val="100000"/>
               </a:lnSpc>
@@ -6700,7 +6743,7 @@
         <p:spPr>
           <a:xfrm>
             <a:off x="4629600" y="1832040"/>
-            <a:ext cx="852480" cy="852480"/>
+            <a:ext cx="852120" cy="852120"/>
           </a:xfrm>
           <a:prstGeom prst="rect">
             <a:avLst/>
@@ -6723,7 +6766,7 @@
         <p:spPr>
           <a:xfrm>
             <a:off x="4463640" y="4185360"/>
-            <a:ext cx="1179000" cy="471240"/>
+            <a:ext cx="1178640" cy="470880"/>
           </a:xfrm>
           <a:prstGeom prst="rect">
             <a:avLst/>
@@ -6746,7 +6789,7 @@
         <p:spPr>
           <a:xfrm>
             <a:off x="4586040" y="2785680"/>
-            <a:ext cx="896040" cy="1038240"/>
+            <a:ext cx="895680" cy="1037880"/>
           </a:xfrm>
           <a:prstGeom prst="rect">
             <a:avLst/>
@@ -6769,7 +6812,7 @@
         <p:spPr>
           <a:xfrm>
             <a:off x="250560" y="1953720"/>
-            <a:ext cx="912240" cy="912240"/>
+            <a:ext cx="911880" cy="911880"/>
           </a:xfrm>
           <a:prstGeom prst="rect">
             <a:avLst/>
@@ -6792,7 +6835,7 @@
         <p:spPr>
           <a:xfrm>
             <a:off x="271440" y="3259800"/>
-            <a:ext cx="912240" cy="912240"/>
+            <a:ext cx="911880" cy="911880"/>
           </a:xfrm>
           <a:prstGeom prst="rect">
             <a:avLst/>
@@ -6815,7 +6858,7 @@
         <p:spPr>
           <a:xfrm>
             <a:off x="2440800" y="2741040"/>
-            <a:ext cx="912240" cy="912240"/>
+            <a:ext cx="911880" cy="911880"/>
           </a:xfrm>
           <a:prstGeom prst="rect">
             <a:avLst/>
@@ -6833,8 +6876,8 @@
         </p:nvSpPr>
         <p:spPr>
           <a:xfrm rot="1192200">
-            <a:off x="1579320" y="2561400"/>
-            <a:ext cx="976320" cy="482400"/>
+            <a:off x="1578960" y="2561040"/>
+            <a:ext cx="975960" cy="482040"/>
           </a:xfrm>
           <a:prstGeom prst="rightArrow">
             <a:avLst>
@@ -6875,8 +6918,8 @@
         </p:nvSpPr>
         <p:spPr>
           <a:xfrm rot="20407800">
-            <a:off x="1558800" y="3348360"/>
-            <a:ext cx="976320" cy="482400"/>
+            <a:off x="1558440" y="3348360"/>
+            <a:ext cx="975960" cy="482040"/>
           </a:xfrm>
           <a:prstGeom prst="rightArrow">
             <a:avLst>
@@ -6917,8 +6960,8 @@
         </p:nvSpPr>
         <p:spPr>
           <a:xfrm rot="1192200">
-            <a:off x="3332880" y="3669840"/>
-            <a:ext cx="976320" cy="482400"/>
+            <a:off x="3332520" y="3669480"/>
+            <a:ext cx="975960" cy="482040"/>
           </a:xfrm>
           <a:prstGeom prst="rightArrow">
             <a:avLst>
@@ -6959,8 +7002,8 @@
         </p:nvSpPr>
         <p:spPr>
           <a:xfrm rot="20407800">
-            <a:off x="3407040" y="2343960"/>
-            <a:ext cx="976320" cy="482400"/>
+            <a:off x="3406680" y="2343960"/>
+            <a:ext cx="975960" cy="482040"/>
           </a:xfrm>
           <a:prstGeom prst="rightArrow">
             <a:avLst>
@@ -7002,7 +7045,7 @@
         <p:spPr>
           <a:xfrm>
             <a:off x="3483720" y="3004200"/>
-            <a:ext cx="976320" cy="482400"/>
+            <a:ext cx="975960" cy="482040"/>
           </a:xfrm>
           <a:prstGeom prst="rightArrow">
             <a:avLst>
@@ -7048,7 +7091,7 @@
         <p:spPr>
           <a:xfrm>
             <a:off x="5819760" y="5709960"/>
-            <a:ext cx="912240" cy="912240"/>
+            <a:ext cx="911880" cy="911880"/>
           </a:xfrm>
           <a:prstGeom prst="rect">
             <a:avLst/>
@@ -7071,7 +7114,7 @@
         <p:spPr>
           <a:xfrm>
             <a:off x="2060640" y="5759640"/>
-            <a:ext cx="912240" cy="912240"/>
+            <a:ext cx="911880" cy="911880"/>
           </a:xfrm>
           <a:prstGeom prst="rect">
             <a:avLst/>
@@ -7094,7 +7137,7 @@
         <p:spPr>
           <a:xfrm>
             <a:off x="9383040" y="5709960"/>
-            <a:ext cx="912240" cy="912240"/>
+            <a:ext cx="911880" cy="911880"/>
           </a:xfrm>
           <a:prstGeom prst="rect">
             <a:avLst/>
@@ -7117,7 +7160,7 @@
         <p:spPr>
           <a:xfrm>
             <a:off x="7495920" y="5709960"/>
-            <a:ext cx="912240" cy="912240"/>
+            <a:ext cx="911880" cy="911880"/>
           </a:xfrm>
           <a:prstGeom prst="rect">
             <a:avLst/>
@@ -7140,7 +7183,7 @@
         <p:spPr>
           <a:xfrm>
             <a:off x="4004640" y="5709960"/>
-            <a:ext cx="912240" cy="912240"/>
+            <a:ext cx="911880" cy="911880"/>
           </a:xfrm>
           <a:prstGeom prst="rect">
             <a:avLst/>
@@ -7163,7 +7206,7 @@
         <p:spPr>
           <a:xfrm>
             <a:off x="276120" y="5759640"/>
-            <a:ext cx="912240" cy="912240"/>
+            <a:ext cx="911880" cy="911880"/>
           </a:xfrm>
           <a:prstGeom prst="rect">
             <a:avLst/>
@@ -7182,7 +7225,7 @@
         <p:spPr>
           <a:xfrm>
             <a:off x="1230120" y="6098760"/>
-            <a:ext cx="680760" cy="259920"/>
+            <a:ext cx="680400" cy="259560"/>
           </a:xfrm>
           <a:prstGeom prst="rightArrow">
             <a:avLst>
@@ -7221,7 +7264,7 @@
         <p:spPr>
           <a:xfrm>
             <a:off x="3103920" y="6117480"/>
-            <a:ext cx="680760" cy="259920"/>
+            <a:ext cx="680400" cy="259560"/>
           </a:xfrm>
           <a:prstGeom prst="rightArrow">
             <a:avLst>
@@ -7260,7 +7303,7 @@
         <p:spPr>
           <a:xfrm>
             <a:off x="4958640" y="6109200"/>
-            <a:ext cx="680760" cy="259920"/>
+            <a:ext cx="680400" cy="259560"/>
           </a:xfrm>
           <a:prstGeom prst="rightArrow">
             <a:avLst>
@@ -7299,7 +7342,7 @@
         <p:spPr>
           <a:xfrm>
             <a:off x="6754320" y="6098760"/>
-            <a:ext cx="680760" cy="259920"/>
+            <a:ext cx="680400" cy="259560"/>
           </a:xfrm>
           <a:prstGeom prst="rightArrow">
             <a:avLst>
@@ -7338,7 +7381,7 @@
         <p:spPr>
           <a:xfrm>
             <a:off x="8468280" y="6085800"/>
-            <a:ext cx="680760" cy="259920"/>
+            <a:ext cx="680400" cy="259560"/>
           </a:xfrm>
           <a:prstGeom prst="rightArrow">
             <a:avLst>
@@ -7381,7 +7424,7 @@
         <p:spPr>
           <a:xfrm>
             <a:off x="6582600" y="3915000"/>
-            <a:ext cx="912240" cy="912240"/>
+            <a:ext cx="911880" cy="911880"/>
           </a:xfrm>
           <a:prstGeom prst="rect">
             <a:avLst/>
@@ -7404,7 +7447,7 @@
         <p:spPr>
           <a:xfrm>
             <a:off x="8674920" y="3965760"/>
-            <a:ext cx="912240" cy="912240"/>
+            <a:ext cx="911880" cy="911880"/>
           </a:xfrm>
           <a:prstGeom prst="rect">
             <a:avLst/>
@@ -7427,7 +7470,7 @@
         <p:spPr>
           <a:xfrm>
             <a:off x="7203600" y="2661480"/>
-            <a:ext cx="912240" cy="912240"/>
+            <a:ext cx="911880" cy="911880"/>
           </a:xfrm>
           <a:prstGeom prst="rect">
             <a:avLst/>
@@ -7450,7 +7493,7 @@
         <p:spPr>
           <a:xfrm>
             <a:off x="10398960" y="3368880"/>
-            <a:ext cx="912240" cy="912240"/>
+            <a:ext cx="911880" cy="911880"/>
           </a:xfrm>
           <a:prstGeom prst="rect">
             <a:avLst/>
@@ -7473,7 +7516,7 @@
         <p:spPr>
           <a:xfrm>
             <a:off x="7002000" y="5015520"/>
-            <a:ext cx="912240" cy="912240"/>
+            <a:ext cx="911880" cy="911880"/>
           </a:xfrm>
           <a:prstGeom prst="rect">
             <a:avLst/>
@@ -7491,8 +7534,8 @@
         </p:nvSpPr>
         <p:spPr>
           <a:xfrm rot="3732600">
-            <a:off x="9843480" y="3700440"/>
-            <a:ext cx="201960" cy="667800"/>
+            <a:off x="9843480" y="3700080"/>
+            <a:ext cx="201600" cy="667440"/>
           </a:xfrm>
           <a:prstGeom prst="downArrow">
             <a:avLst>
@@ -7530,8 +7573,8 @@
         </p:nvSpPr>
         <p:spPr>
           <a:xfrm rot="14618400">
-            <a:off x="8193240" y="4699440"/>
-            <a:ext cx="201960" cy="667800"/>
+            <a:off x="8193240" y="4699800"/>
+            <a:ext cx="201600" cy="667440"/>
           </a:xfrm>
           <a:prstGeom prst="downArrow">
             <a:avLst>
@@ -7569,8 +7612,8 @@
         </p:nvSpPr>
         <p:spPr>
           <a:xfrm rot="5400000">
-            <a:off x="8039880" y="4068360"/>
-            <a:ext cx="201960" cy="667800"/>
+            <a:off x="8040240" y="4068360"/>
+            <a:ext cx="201600" cy="667440"/>
           </a:xfrm>
           <a:prstGeom prst="downArrow">
             <a:avLst>
@@ -7608,8 +7651,8 @@
         </p:nvSpPr>
         <p:spPr>
           <a:xfrm rot="7014000">
-            <a:off x="8273880" y="3488400"/>
-            <a:ext cx="201960" cy="667800"/>
+            <a:off x="8274240" y="3488400"/>
+            <a:ext cx="201600" cy="667440"/>
           </a:xfrm>
           <a:prstGeom prst="downArrow">
             <a:avLst>
@@ -7648,7 +7691,7 @@
         <p:spPr>
           <a:xfrm rot="1747800">
             <a:off x="7095600" y="3425760"/>
-            <a:ext cx="201960" cy="667800"/>
+            <a:ext cx="201600" cy="667440"/>
           </a:xfrm>
           <a:prstGeom prst="downArrow">
             <a:avLst>
@@ -7691,7 +7734,7 @@
         <p:spPr>
           <a:xfrm>
             <a:off x="8641080" y="309600"/>
-            <a:ext cx="912240" cy="912240"/>
+            <a:ext cx="911880" cy="911880"/>
           </a:xfrm>
           <a:prstGeom prst="rect">
             <a:avLst/>
@@ -7714,7 +7757,7 @@
         <p:spPr>
           <a:xfrm>
             <a:off x="10568880" y="1497240"/>
-            <a:ext cx="912240" cy="912240"/>
+            <a:ext cx="911880" cy="911880"/>
           </a:xfrm>
           <a:prstGeom prst="rect">
             <a:avLst/>
@@ -7737,7 +7780,7 @@
         <p:spPr>
           <a:xfrm>
             <a:off x="6932880" y="1497240"/>
-            <a:ext cx="912240" cy="912240"/>
+            <a:ext cx="911880" cy="911880"/>
           </a:xfrm>
           <a:prstGeom prst="rect">
             <a:avLst/>
@@ -7756,7 +7799,7 @@
         <p:spPr>
           <a:xfrm>
             <a:off x="8173800" y="1774080"/>
-            <a:ext cx="2066400" cy="358560"/>
+            <a:ext cx="2066040" cy="358200"/>
           </a:xfrm>
           <a:prstGeom prst="rightArrow">
             <a:avLst>
@@ -7795,7 +7838,7 @@
         <p:spPr>
           <a:xfrm>
             <a:off x="8947440" y="1361160"/>
-            <a:ext cx="299520" cy="405000"/>
+            <a:ext cx="299160" cy="404640"/>
           </a:xfrm>
           <a:prstGeom prst="downArrow">
             <a:avLst>
@@ -7883,7 +7926,7 @@
         <p:spPr>
           <a:xfrm>
             <a:off x="0" y="0"/>
-            <a:ext cx="12189960" cy="6855840"/>
+            <a:ext cx="12189600" cy="6855480"/>
           </a:xfrm>
           <a:prstGeom prst="rect">
             <a:avLst/>
@@ -7936,7 +7979,7 @@
         <p:spPr>
           <a:xfrm>
             <a:off x="640440" y="685800"/>
-            <a:ext cx="4816440" cy="4601520"/>
+            <a:ext cx="4816080" cy="4601160"/>
           </a:xfrm>
           <a:prstGeom prst="rect">
             <a:avLst/>
@@ -7987,7 +8030,7 @@
         <p:spPr>
           <a:xfrm>
             <a:off x="6095880" y="0"/>
-            <a:ext cx="6093720" cy="6855840"/>
+            <a:ext cx="6093360" cy="6855480"/>
           </a:xfrm>
           <a:prstGeom prst="rect">
             <a:avLst/>
@@ -8025,7 +8068,7 @@
         <p:spPr>
           <a:xfrm>
             <a:off x="6625800" y="685800"/>
-            <a:ext cx="4876920" cy="4601520"/>
+            <a:ext cx="4876560" cy="4601160"/>
           </a:xfrm>
           <a:prstGeom prst="rect">
             <a:avLst/>
@@ -8046,7 +8089,7 @@
             <a:normAutofit/>
           </a:bodyPr>
           <a:p>
-            <a:pPr marL="285840" indent="-283680">
+            <a:pPr marL="285840" indent="-283320">
               <a:lnSpc>
                 <a:spcPct val="100000"/>
               </a:lnSpc>
@@ -8078,7 +8121,7 @@
             </a:endParaRPr>
           </a:p>
           <a:p>
-            <a:pPr marL="285840" indent="-283680">
+            <a:pPr marL="285840" indent="-283320">
               <a:lnSpc>
                 <a:spcPct val="100000"/>
               </a:lnSpc>
@@ -8110,7 +8153,7 @@
             </a:endParaRPr>
           </a:p>
           <a:p>
-            <a:pPr marL="285840" indent="-283680">
+            <a:pPr marL="285840" indent="-283320">
               <a:lnSpc>
                 <a:spcPct val="100000"/>
               </a:lnSpc>
@@ -8142,7 +8185,7 @@
             </a:endParaRPr>
           </a:p>
           <a:p>
-            <a:pPr marL="285840" indent="-283680">
+            <a:pPr marL="285840" indent="-283320">
               <a:lnSpc>
                 <a:spcPct val="100000"/>
               </a:lnSpc>
@@ -8174,7 +8217,7 @@
             </a:endParaRPr>
           </a:p>
           <a:p>
-            <a:pPr marL="285840" indent="-283680">
+            <a:pPr marL="285840" indent="-283320">
               <a:lnSpc>
                 <a:spcPct val="100000"/>
               </a:lnSpc>
@@ -8238,7 +8281,7 @@
         <p:spPr>
           <a:xfrm>
             <a:off x="684360" y="4487400"/>
-            <a:ext cx="8532360" cy="1504800"/>
+            <a:ext cx="8532000" cy="1504440"/>
           </a:xfrm>
           <a:prstGeom prst="rect">
             <a:avLst/>
@@ -8287,7 +8330,7 @@
         <p:spPr>
           <a:xfrm>
             <a:off x="684360" y="685800"/>
-            <a:ext cx="8532360" cy="3612960"/>
+            <a:ext cx="8532000" cy="3612600"/>
           </a:xfrm>
           <a:prstGeom prst="rect">
             <a:avLst/>
@@ -8306,7 +8349,7 @@
         <p:txBody>
           <a:bodyPr lIns="90000" rIns="90000" tIns="45000" bIns="45000" anchor="ctr"/>
           <a:p>
-            <a:pPr marL="285840" indent="-283680">
+            <a:pPr marL="285840" indent="-283320">
               <a:lnSpc>
                 <a:spcPct val="100000"/>
               </a:lnSpc>
@@ -8338,7 +8381,7 @@
             </a:endParaRPr>
           </a:p>
           <a:p>
-            <a:pPr marL="285840" indent="-283680">
+            <a:pPr marL="285840" indent="-283320">
               <a:lnSpc>
                 <a:spcPct val="100000"/>
               </a:lnSpc>
@@ -8448,7 +8491,7 @@
         <p:spPr>
           <a:xfrm>
             <a:off x="6995520" y="1949760"/>
-            <a:ext cx="852480" cy="852480"/>
+            <a:ext cx="852120" cy="852120"/>
           </a:xfrm>
           <a:prstGeom prst="rect">
             <a:avLst/>
@@ -8471,7 +8514,7 @@
         <p:spPr>
           <a:xfrm>
             <a:off x="6829560" y="4303080"/>
-            <a:ext cx="1179000" cy="471240"/>
+            <a:ext cx="1178640" cy="470880"/>
           </a:xfrm>
           <a:prstGeom prst="rect">
             <a:avLst/>
@@ -8494,7 +8537,7 @@
         <p:spPr>
           <a:xfrm>
             <a:off x="6951960" y="2903040"/>
-            <a:ext cx="896040" cy="1038240"/>
+            <a:ext cx="895680" cy="1037880"/>
           </a:xfrm>
           <a:prstGeom prst="rect">
             <a:avLst/>
@@ -8517,7 +8560,7 @@
         <p:spPr>
           <a:xfrm>
             <a:off x="2616120" y="2071080"/>
-            <a:ext cx="912240" cy="912240"/>
+            <a:ext cx="911880" cy="911880"/>
           </a:xfrm>
           <a:prstGeom prst="rect">
             <a:avLst/>
@@ -8540,7 +8583,7 @@
         <p:spPr>
           <a:xfrm>
             <a:off x="2637000" y="3377160"/>
-            <a:ext cx="912240" cy="912240"/>
+            <a:ext cx="911880" cy="911880"/>
           </a:xfrm>
           <a:prstGeom prst="rect">
             <a:avLst/>
@@ -8558,8 +8601,8 @@
         </p:nvSpPr>
         <p:spPr>
           <a:xfrm rot="1192200">
-            <a:off x="3944880" y="2678760"/>
-            <a:ext cx="976320" cy="482400"/>
+            <a:off x="3944520" y="2678400"/>
+            <a:ext cx="975960" cy="482040"/>
           </a:xfrm>
           <a:prstGeom prst="rightArrow">
             <a:avLst>
@@ -8600,8 +8643,8 @@
         </p:nvSpPr>
         <p:spPr>
           <a:xfrm rot="20407800">
-            <a:off x="3924360" y="3465720"/>
-            <a:ext cx="976320" cy="482400"/>
+            <a:off x="3924000" y="3465720"/>
+            <a:ext cx="975960" cy="482040"/>
           </a:xfrm>
           <a:prstGeom prst="rightArrow">
             <a:avLst>
@@ -8642,8 +8685,8 @@
         </p:nvSpPr>
         <p:spPr>
           <a:xfrm rot="1192200">
-            <a:off x="5698800" y="3787200"/>
-            <a:ext cx="976320" cy="482400"/>
+            <a:off x="5698440" y="3786840"/>
+            <a:ext cx="975960" cy="482040"/>
           </a:xfrm>
           <a:prstGeom prst="rightArrow">
             <a:avLst>
@@ -8684,8 +8727,8 @@
         </p:nvSpPr>
         <p:spPr>
           <a:xfrm rot="20407800">
-            <a:off x="5772600" y="2461320"/>
-            <a:ext cx="976320" cy="482400"/>
+            <a:off x="5772240" y="2461320"/>
+            <a:ext cx="975960" cy="482040"/>
           </a:xfrm>
           <a:prstGeom prst="rightArrow">
             <a:avLst>
@@ -8727,7 +8770,7 @@
         <p:spPr>
           <a:xfrm>
             <a:off x="5849640" y="3121560"/>
-            <a:ext cx="976320" cy="482400"/>
+            <a:ext cx="975960" cy="482040"/>
           </a:xfrm>
           <a:prstGeom prst="rightArrow">
             <a:avLst>
@@ -8773,7 +8816,7 @@
         <p:spPr>
           <a:xfrm>
             <a:off x="4950720" y="2998800"/>
-            <a:ext cx="754560" cy="754560"/>
+            <a:ext cx="754200" cy="754200"/>
           </a:xfrm>
           <a:prstGeom prst="rect">
             <a:avLst/>
@@ -8814,7 +8857,7 @@
         <p:spPr>
           <a:xfrm>
             <a:off x="684360" y="4487400"/>
-            <a:ext cx="8532360" cy="1504800"/>
+            <a:ext cx="8532000" cy="1504440"/>
           </a:xfrm>
           <a:prstGeom prst="rect">
             <a:avLst/>
@@ -8863,7 +8906,7 @@
         <p:spPr>
           <a:xfrm>
             <a:off x="684360" y="685800"/>
-            <a:ext cx="8532360" cy="3612960"/>
+            <a:ext cx="8532000" cy="3612600"/>
           </a:xfrm>
           <a:prstGeom prst="rect">
             <a:avLst/>
@@ -8882,7 +8925,7 @@
         <p:txBody>
           <a:bodyPr lIns="90000" rIns="90000" tIns="45000" bIns="45000" anchor="ctr"/>
           <a:p>
-            <a:pPr marL="285840" indent="-283680">
+            <a:pPr marL="285840" indent="-283320">
               <a:lnSpc>
                 <a:spcPct val="100000"/>
               </a:lnSpc>
@@ -9008,7 +9051,7 @@
             </a:endParaRPr>
           </a:p>
           <a:p>
-            <a:pPr marL="285840" indent="-283680">
+            <a:pPr marL="285840" indent="-283320">
               <a:lnSpc>
                 <a:spcPct val="100000"/>
               </a:lnSpc>
@@ -9100,7 +9143,7 @@
         <p:spPr>
           <a:xfrm>
             <a:off x="3562560" y="1395720"/>
-            <a:ext cx="912240" cy="912240"/>
+            <a:ext cx="911880" cy="911880"/>
           </a:xfrm>
           <a:prstGeom prst="rect">
             <a:avLst/>
@@ -9123,7 +9166,7 @@
         <p:spPr>
           <a:xfrm>
             <a:off x="6678360" y="1395720"/>
-            <a:ext cx="912240" cy="912240"/>
+            <a:ext cx="911880" cy="911880"/>
           </a:xfrm>
           <a:prstGeom prst="rect">
             <a:avLst/>
@@ -9146,7 +9189,7 @@
         <p:spPr>
           <a:xfrm>
             <a:off x="7042320" y="3904200"/>
-            <a:ext cx="912240" cy="912240"/>
+            <a:ext cx="911880" cy="911880"/>
           </a:xfrm>
           <a:prstGeom prst="rect">
             <a:avLst/>
@@ -9169,7 +9212,7 @@
         <p:spPr>
           <a:xfrm>
             <a:off x="3562560" y="3904200"/>
-            <a:ext cx="912240" cy="912240"/>
+            <a:ext cx="911880" cy="911880"/>
           </a:xfrm>
           <a:prstGeom prst="rect">
             <a:avLst/>
@@ -9192,7 +9235,7 @@
         <p:spPr>
           <a:xfrm>
             <a:off x="6678360" y="1395720"/>
-            <a:ext cx="912240" cy="912240"/>
+            <a:ext cx="911880" cy="911880"/>
           </a:xfrm>
           <a:prstGeom prst="rect">
             <a:avLst/>
@@ -9215,7 +9258,7 @@
         <p:spPr>
           <a:xfrm>
             <a:off x="4113000" y="2039400"/>
-            <a:ext cx="912240" cy="912240"/>
+            <a:ext cx="911880" cy="911880"/>
           </a:xfrm>
           <a:prstGeom prst="rect">
             <a:avLst/>
@@ -9238,7 +9281,7 @@
         <p:spPr>
           <a:xfrm>
             <a:off x="7296480" y="2133000"/>
-            <a:ext cx="912240" cy="912240"/>
+            <a:ext cx="911880" cy="911880"/>
           </a:xfrm>
           <a:prstGeom prst="rect">
             <a:avLst/>
@@ -9257,7 +9300,7 @@
         <p:spPr>
           <a:xfrm>
             <a:off x="5285160" y="1920960"/>
-            <a:ext cx="1180800" cy="543240"/>
+            <a:ext cx="1180440" cy="542880"/>
           </a:xfrm>
           <a:prstGeom prst="rightArrow">
             <a:avLst>
@@ -9299,7 +9342,7 @@
         <p:spPr>
           <a:xfrm>
             <a:off x="5149440" y="4088880"/>
-            <a:ext cx="1180800" cy="543240"/>
+            <a:ext cx="1180440" cy="542880"/>
           </a:xfrm>
           <a:prstGeom prst="rightArrow">
             <a:avLst>
@@ -9364,7 +9407,7 @@
         <p:spPr>
           <a:xfrm>
             <a:off x="4895280" y="2388600"/>
-            <a:ext cx="2705760" cy="362880"/>
+            <a:ext cx="2705400" cy="362520"/>
           </a:xfrm>
           <a:prstGeom prst="rect">
             <a:avLst/>
@@ -9413,7 +9456,7 @@
         <p:spPr>
           <a:xfrm>
             <a:off x="5027400" y="4575240"/>
-            <a:ext cx="2325600" cy="362880"/>
+            <a:ext cx="2325240" cy="362520"/>
           </a:xfrm>
           <a:prstGeom prst="rect">
             <a:avLst/>
@@ -9484,7 +9527,7 @@
         <p:spPr>
           <a:xfrm>
             <a:off x="684360" y="4487400"/>
-            <a:ext cx="8532360" cy="1504800"/>
+            <a:ext cx="8532000" cy="1504440"/>
           </a:xfrm>
           <a:prstGeom prst="rect">
             <a:avLst/>
@@ -9533,7 +9576,7 @@
         <p:spPr>
           <a:xfrm>
             <a:off x="684360" y="685800"/>
-            <a:ext cx="8532360" cy="3612960"/>
+            <a:ext cx="8532000" cy="3612600"/>
           </a:xfrm>
           <a:prstGeom prst="rect">
             <a:avLst/>
@@ -9552,7 +9595,7 @@
         <p:txBody>
           <a:bodyPr lIns="90000" rIns="90000" tIns="45000" bIns="45000" anchor="ctr"/>
           <a:p>
-            <a:pPr marL="285840" indent="-283680">
+            <a:pPr marL="285840" indent="-283320">
               <a:lnSpc>
                 <a:spcPct val="100000"/>
               </a:lnSpc>
@@ -9674,7 +9717,7 @@
         <p:spPr>
           <a:xfrm>
             <a:off x="1863000" y="3157920"/>
-            <a:ext cx="912240" cy="912240"/>
+            <a:ext cx="911880" cy="911880"/>
           </a:xfrm>
           <a:prstGeom prst="rect">
             <a:avLst/>
@@ -9697,7 +9740,7 @@
         <p:spPr>
           <a:xfrm>
             <a:off x="2413440" y="3801600"/>
-            <a:ext cx="912240" cy="912240"/>
+            <a:ext cx="911880" cy="911880"/>
           </a:xfrm>
           <a:prstGeom prst="rect">
             <a:avLst/>
@@ -9720,7 +9763,7 @@
         <p:spPr>
           <a:xfrm>
             <a:off x="7197480" y="3439800"/>
-            <a:ext cx="912240" cy="912240"/>
+            <a:ext cx="911880" cy="911880"/>
           </a:xfrm>
           <a:prstGeom prst="rect">
             <a:avLst/>
@@ -9743,7 +9786,7 @@
         <p:spPr>
           <a:xfrm>
             <a:off x="4758840" y="3366360"/>
-            <a:ext cx="912240" cy="912240"/>
+            <a:ext cx="911880" cy="911880"/>
           </a:xfrm>
           <a:prstGeom prst="rect">
             <a:avLst/>
@@ -9762,7 +9805,7 @@
         <p:spPr>
           <a:xfrm>
             <a:off x="3568680" y="3429000"/>
-            <a:ext cx="935280" cy="912240"/>
+            <a:ext cx="934920" cy="911880"/>
           </a:xfrm>
           <a:prstGeom prst="mathPlus">
             <a:avLst>
@@ -9800,7 +9843,7 @@
         <p:spPr>
           <a:xfrm>
             <a:off x="6095880" y="3654360"/>
-            <a:ext cx="736200" cy="564120"/>
+            <a:ext cx="735840" cy="563760"/>
           </a:xfrm>
           <a:prstGeom prst="mathEqual">
             <a:avLst>
@@ -9861,7 +9904,7 @@
         <p:spPr>
           <a:xfrm>
             <a:off x="4750920" y="2898360"/>
-            <a:ext cx="2687760" cy="3717720"/>
+            <a:ext cx="2687400" cy="3717360"/>
           </a:xfrm>
           <a:prstGeom prst="rect">
             <a:avLst/>
@@ -9904,7 +9947,7 @@
         <p:spPr>
           <a:xfrm>
             <a:off x="684360" y="4487400"/>
-            <a:ext cx="8532360" cy="1504800"/>
+            <a:ext cx="8532000" cy="1504440"/>
           </a:xfrm>
           <a:prstGeom prst="rect">
             <a:avLst/>
@@ -9953,7 +9996,7 @@
         <p:spPr>
           <a:xfrm>
             <a:off x="684360" y="685800"/>
-            <a:ext cx="8532360" cy="3612960"/>
+            <a:ext cx="8532000" cy="3612600"/>
           </a:xfrm>
           <a:prstGeom prst="rect">
             <a:avLst/>
@@ -9972,7 +10015,7 @@
         <p:txBody>
           <a:bodyPr lIns="90000" rIns="90000" tIns="45000" bIns="45000" anchor="ctr"/>
           <a:p>
-            <a:pPr marL="285840" indent="-283680">
+            <a:pPr marL="285840" indent="-283320">
               <a:lnSpc>
                 <a:spcPct val="100000"/>
               </a:lnSpc>
@@ -10108,7 +10151,7 @@
         <p:spPr>
           <a:xfrm>
             <a:off x="4843440" y="2989800"/>
-            <a:ext cx="639720" cy="639720"/>
+            <a:ext cx="639360" cy="639360"/>
           </a:xfrm>
           <a:prstGeom prst="rect">
             <a:avLst/>
@@ -10131,7 +10174,7 @@
         <p:spPr>
           <a:xfrm>
             <a:off x="5028120" y="4248360"/>
-            <a:ext cx="912240" cy="912240"/>
+            <a:ext cx="911880" cy="911880"/>
           </a:xfrm>
           <a:prstGeom prst="rect">
             <a:avLst/>
@@ -10154,7 +10197,7 @@
         <p:spPr>
           <a:xfrm>
             <a:off x="5506200" y="5025240"/>
-            <a:ext cx="912240" cy="912240"/>
+            <a:ext cx="911880" cy="911880"/>
           </a:xfrm>
           <a:prstGeom prst="rect">
             <a:avLst/>
@@ -10177,7 +10220,7 @@
         <p:spPr>
           <a:xfrm>
             <a:off x="6042600" y="4248360"/>
-            <a:ext cx="912240" cy="912240"/>
+            <a:ext cx="911880" cy="911880"/>
           </a:xfrm>
           <a:prstGeom prst="rect">
             <a:avLst/>
@@ -10200,7 +10243,7 @@
         <p:spPr>
           <a:xfrm>
             <a:off x="7944480" y="2602440"/>
-            <a:ext cx="912240" cy="912240"/>
+            <a:ext cx="911880" cy="911880"/>
           </a:xfrm>
           <a:prstGeom prst="rect">
             <a:avLst/>
@@ -10223,7 +10266,7 @@
         <p:spPr>
           <a:xfrm>
             <a:off x="6671160" y="3059640"/>
-            <a:ext cx="569520" cy="569520"/>
+            <a:ext cx="569160" cy="569160"/>
           </a:xfrm>
           <a:prstGeom prst="rect">
             <a:avLst/>
@@ -10246,7 +10289,7 @@
         <p:spPr>
           <a:xfrm>
             <a:off x="2973240" y="3863520"/>
-            <a:ext cx="912240" cy="912240"/>
+            <a:ext cx="911880" cy="911880"/>
           </a:xfrm>
           <a:prstGeom prst="rect">
             <a:avLst/>
@@ -10265,7 +10308,7 @@
         <p:spPr>
           <a:xfrm>
             <a:off x="4012560" y="4487400"/>
-            <a:ext cx="1491480" cy="855000"/>
+            <a:ext cx="1491120" cy="854640"/>
           </a:xfrm>
           <a:custGeom>
             <a:avLst/>
@@ -10317,7 +10360,7 @@
         <p:spPr>
           <a:xfrm>
             <a:off x="4012560" y="4248360"/>
-            <a:ext cx="2027880" cy="236880"/>
+            <a:ext cx="2027520" cy="236520"/>
           </a:xfrm>
           <a:custGeom>
             <a:avLst/>
@@ -10369,7 +10412,7 @@
         <p:spPr>
           <a:xfrm>
             <a:off x="4012560" y="4367880"/>
-            <a:ext cx="936720" cy="237600"/>
+            <a:ext cx="936360" cy="237240"/>
           </a:xfrm>
           <a:custGeom>
             <a:avLst/>
@@ -10420,8 +10463,8 @@
         </p:nvSpPr>
         <p:spPr>
           <a:xfrm flipV="1">
-            <a:off x="7242840" y="3220560"/>
-            <a:ext cx="627480" cy="120960"/>
+            <a:off x="7242840" y="3219840"/>
+            <a:ext cx="627120" cy="120600"/>
           </a:xfrm>
           <a:custGeom>
             <a:avLst/>
@@ -10496,7 +10539,7 @@
         <p:spPr>
           <a:xfrm>
             <a:off x="684360" y="4487400"/>
-            <a:ext cx="8532360" cy="1504800"/>
+            <a:ext cx="8532000" cy="1504440"/>
           </a:xfrm>
           <a:prstGeom prst="rect">
             <a:avLst/>
@@ -10545,7 +10588,7 @@
         <p:spPr>
           <a:xfrm>
             <a:off x="684360" y="685800"/>
-            <a:ext cx="8532360" cy="3612960"/>
+            <a:ext cx="8532000" cy="3612600"/>
           </a:xfrm>
           <a:prstGeom prst="rect">
             <a:avLst/>
@@ -10564,7 +10607,7 @@
         <p:txBody>
           <a:bodyPr lIns="90000" rIns="90000" tIns="45000" bIns="45000" anchor="ctr"/>
           <a:p>
-            <a:pPr marL="285840" indent="-283680">
+            <a:pPr marL="285840" indent="-283320">
               <a:lnSpc>
                 <a:spcPct val="100000"/>
               </a:lnSpc>
@@ -10732,7 +10775,7 @@
         <p:spPr>
           <a:xfrm>
             <a:off x="5430600" y="2730600"/>
-            <a:ext cx="2687760" cy="3717720"/>
+            <a:ext cx="2687400" cy="3717360"/>
           </a:xfrm>
           <a:prstGeom prst="rect">
             <a:avLst/>
@@ -10779,7 +10822,7 @@
         <p:spPr>
           <a:xfrm>
             <a:off x="5523120" y="2822040"/>
-            <a:ext cx="639720" cy="639720"/>
+            <a:ext cx="639360" cy="639360"/>
           </a:xfrm>
           <a:prstGeom prst="rect">
             <a:avLst/>
@@ -10802,7 +10845,7 @@
         <p:spPr>
           <a:xfrm>
             <a:off x="5707800" y="4080600"/>
-            <a:ext cx="912240" cy="912240"/>
+            <a:ext cx="911880" cy="911880"/>
           </a:xfrm>
           <a:prstGeom prst="rect">
             <a:avLst/>
@@ -10825,7 +10868,7 @@
         <p:spPr>
           <a:xfrm>
             <a:off x="6185880" y="4857480"/>
-            <a:ext cx="912240" cy="912240"/>
+            <a:ext cx="911880" cy="911880"/>
           </a:xfrm>
           <a:prstGeom prst="rect">
             <a:avLst/>
@@ -10848,7 +10891,7 @@
         <p:spPr>
           <a:xfrm>
             <a:off x="6722280" y="4080600"/>
-            <a:ext cx="912240" cy="912240"/>
+            <a:ext cx="911880" cy="911880"/>
           </a:xfrm>
           <a:prstGeom prst="rect">
             <a:avLst/>
@@ -10871,7 +10914,7 @@
         <p:spPr>
           <a:xfrm>
             <a:off x="3652920" y="3695760"/>
-            <a:ext cx="912240" cy="912240"/>
+            <a:ext cx="911880" cy="911880"/>
           </a:xfrm>
           <a:prstGeom prst="rect">
             <a:avLst/>
@@ -10890,7 +10933,7 @@
         <p:spPr>
           <a:xfrm>
             <a:off x="4692240" y="4319640"/>
-            <a:ext cx="1491480" cy="855000"/>
+            <a:ext cx="1491120" cy="854640"/>
           </a:xfrm>
           <a:custGeom>
             <a:avLst/>
@@ -10942,7 +10985,7 @@
         <p:spPr>
           <a:xfrm>
             <a:off x="4692240" y="4080600"/>
-            <a:ext cx="2027880" cy="236880"/>
+            <a:ext cx="2027520" cy="236520"/>
           </a:xfrm>
           <a:custGeom>
             <a:avLst/>
@@ -10994,7 +11037,7 @@
         <p:spPr>
           <a:xfrm>
             <a:off x="4692240" y="4200120"/>
-            <a:ext cx="936720" cy="237600"/>
+            <a:ext cx="936360" cy="237240"/>
           </a:xfrm>
           <a:custGeom>
             <a:avLst/>
@@ -11050,7 +11093,7 @@
         <p:spPr>
           <a:xfrm>
             <a:off x="9653760" y="3605400"/>
-            <a:ext cx="912240" cy="912240"/>
+            <a:ext cx="911880" cy="911880"/>
           </a:xfrm>
           <a:prstGeom prst="rect">
             <a:avLst/>
@@ -11068,8 +11111,8 @@
         </p:nvSpPr>
         <p:spPr>
           <a:xfrm rot="10325400">
-            <a:off x="7856280" y="4106880"/>
-            <a:ext cx="1783800" cy="305640"/>
+            <a:off x="7856640" y="4106880"/>
+            <a:ext cx="1783440" cy="305280"/>
           </a:xfrm>
           <a:prstGeom prst="rightArrow">
             <a:avLst>
@@ -11133,7 +11176,7 @@
         <p:spPr>
           <a:xfrm>
             <a:off x="684360" y="4487400"/>
-            <a:ext cx="8532360" cy="1504800"/>
+            <a:ext cx="8532000" cy="1504440"/>
           </a:xfrm>
           <a:prstGeom prst="rect">
             <a:avLst/>
@@ -11182,7 +11225,7 @@
         <p:spPr>
           <a:xfrm>
             <a:off x="684360" y="685800"/>
-            <a:ext cx="8532360" cy="3612960"/>
+            <a:ext cx="8532000" cy="3612600"/>
           </a:xfrm>
           <a:prstGeom prst="rect">
             <a:avLst/>
@@ -11212,7 +11255,7 @@
         <p:spPr>
           <a:xfrm>
             <a:off x="4069440" y="82800"/>
-            <a:ext cx="4044240" cy="2844720"/>
+            <a:ext cx="4043880" cy="2844360"/>
           </a:xfrm>
           <a:prstGeom prst="rect">
             <a:avLst/>
@@ -11235,7 +11278,7 @@
         <p:spPr>
           <a:xfrm>
             <a:off x="83880" y="3103560"/>
-            <a:ext cx="3865320" cy="1642320"/>
+            <a:ext cx="3864960" cy="1641960"/>
           </a:xfrm>
           <a:prstGeom prst="rect">
             <a:avLst/>
@@ -11258,7 +11301,7 @@
         <p:spPr>
           <a:xfrm>
             <a:off x="4161600" y="3103560"/>
-            <a:ext cx="3865320" cy="1642320"/>
+            <a:ext cx="3864960" cy="1641960"/>
           </a:xfrm>
           <a:prstGeom prst="rect">
             <a:avLst/>
@@ -11281,7 +11324,7 @@
         <p:spPr>
           <a:xfrm>
             <a:off x="8230320" y="3103560"/>
-            <a:ext cx="3865320" cy="1642320"/>
+            <a:ext cx="3864960" cy="1641960"/>
           </a:xfrm>
           <a:prstGeom prst="rect">
             <a:avLst/>
@@ -11300,7 +11343,7 @@
         <p:spPr>
           <a:xfrm>
             <a:off x="3993840" y="3766680"/>
-            <a:ext cx="149040" cy="317160"/>
+            <a:ext cx="148680" cy="316800"/>
           </a:xfrm>
           <a:prstGeom prst="rightArrow">
             <a:avLst>
@@ -11339,7 +11382,7 @@
         <p:spPr>
           <a:xfrm>
             <a:off x="8073360" y="3793320"/>
-            <a:ext cx="129960" cy="317160"/>
+            <a:ext cx="129600" cy="316800"/>
           </a:xfrm>
           <a:prstGeom prst="rightArrow">
             <a:avLst>
@@ -11378,7 +11421,7 @@
         <p:spPr>
           <a:xfrm>
             <a:off x="2701080" y="5176080"/>
-            <a:ext cx="1834920" cy="920520"/>
+            <a:ext cx="1834560" cy="920160"/>
           </a:xfrm>
           <a:prstGeom prst="wedgeRectCallout">
             <a:avLst>
@@ -11443,7 +11486,7 @@
         <p:spPr>
           <a:xfrm>
             <a:off x="6722640" y="5196600"/>
-            <a:ext cx="1966320" cy="823680"/>
+            <a:ext cx="1965960" cy="823320"/>
           </a:xfrm>
           <a:prstGeom prst="wedgeRectCallout">
             <a:avLst>
@@ -11508,7 +11551,7 @@
         <p:spPr>
           <a:xfrm>
             <a:off x="9731160" y="5131440"/>
-            <a:ext cx="2103480" cy="654480"/>
+            <a:ext cx="2103120" cy="654120"/>
           </a:xfrm>
           <a:prstGeom prst="wedgeRectCallout">
             <a:avLst>
@@ -11573,7 +11616,7 @@
         <p:spPr>
           <a:xfrm>
             <a:off x="5033520" y="2516760"/>
-            <a:ext cx="2573280" cy="362880"/>
+            <a:ext cx="2572920" cy="362520"/>
           </a:xfrm>
           <a:prstGeom prst="rect">
             <a:avLst/>
@@ -11621,8 +11664,8 @@
         </p:nvSpPr>
         <p:spPr>
           <a:xfrm rot="16200000">
-            <a:off x="3177360" y="1267200"/>
-            <a:ext cx="1962360" cy="362880"/>
+            <a:off x="3177360" y="1267560"/>
+            <a:ext cx="1962000" cy="362520"/>
           </a:xfrm>
           <a:prstGeom prst="rect">
             <a:avLst/>
@@ -11693,7 +11736,7 @@
         <p:spPr>
           <a:xfrm>
             <a:off x="684360" y="4487400"/>
-            <a:ext cx="8532360" cy="1504800"/>
+            <a:ext cx="8532000" cy="1504440"/>
           </a:xfrm>
           <a:prstGeom prst="rect">
             <a:avLst/>
@@ -11744,9 +11787,9 @@
         <p:grpSpPr>
           <a:xfrm>
             <a:off x="948240" y="823320"/>
-            <a:ext cx="10290240" cy="3337560"/>
+            <a:ext cx="10289880" cy="3337200"/>
             <a:chOff x="948240" y="823320"/>
-            <a:chExt cx="10290240" cy="3337560"/>
+            <a:chExt cx="10289880" cy="3337200"/>
           </a:xfrm>
         </p:grpSpPr>
         <p:sp>
@@ -11758,7 +11801,7 @@
           <p:spPr>
             <a:xfrm>
               <a:off x="948240" y="823320"/>
-              <a:ext cx="1360440" cy="1360440"/>
+              <a:ext cx="1360080" cy="1360080"/>
             </a:xfrm>
             <a:prstGeom prst="ellipse">
               <a:avLst/>
@@ -11791,7 +11834,7 @@
           <p:spPr>
             <a:xfrm>
               <a:off x="1234440" y="1109520"/>
-              <a:ext cx="788040" cy="788040"/>
+              <a:ext cx="787680" cy="787680"/>
             </a:xfrm>
             <a:prstGeom prst="rect">
               <a:avLst/>
@@ -11822,7 +11865,7 @@
           <p:spPr>
             <a:xfrm>
               <a:off x="2602800" y="823320"/>
-              <a:ext cx="3209760" cy="1360440"/>
+              <a:ext cx="3209400" cy="1360080"/>
             </a:xfrm>
             <a:prstGeom prst="rect">
               <a:avLst/>
@@ -11874,7 +11917,7 @@
           <p:spPr>
             <a:xfrm>
               <a:off x="6374160" y="823320"/>
-              <a:ext cx="1360440" cy="1360440"/>
+              <a:ext cx="1360080" cy="1360080"/>
             </a:xfrm>
             <a:prstGeom prst="ellipse">
               <a:avLst/>
@@ -11907,7 +11950,7 @@
           <p:spPr>
             <a:xfrm>
               <a:off x="6660360" y="1109520"/>
-              <a:ext cx="788040" cy="788040"/>
+              <a:ext cx="787680" cy="787680"/>
             </a:xfrm>
             <a:prstGeom prst="rect">
               <a:avLst/>
@@ -11938,7 +11981,7 @@
           <p:spPr>
             <a:xfrm>
               <a:off x="8028720" y="823320"/>
-              <a:ext cx="3209760" cy="1360440"/>
+              <a:ext cx="3209400" cy="1360080"/>
             </a:xfrm>
             <a:prstGeom prst="rect">
               <a:avLst/>
@@ -11990,7 +12033,7 @@
           <p:spPr>
             <a:xfrm>
               <a:off x="948240" y="2800440"/>
-              <a:ext cx="1360440" cy="1360440"/>
+              <a:ext cx="1360080" cy="1360080"/>
             </a:xfrm>
             <a:prstGeom prst="ellipse">
               <a:avLst/>
@@ -12023,7 +12066,7 @@
           <p:spPr>
             <a:xfrm>
               <a:off x="1234440" y="3086640"/>
-              <a:ext cx="788040" cy="788040"/>
+              <a:ext cx="787680" cy="787680"/>
             </a:xfrm>
             <a:prstGeom prst="rect">
               <a:avLst/>
@@ -12054,7 +12097,7 @@
           <p:spPr>
             <a:xfrm>
               <a:off x="2602800" y="2800440"/>
-              <a:ext cx="3209760" cy="1360440"/>
+              <a:ext cx="3209400" cy="1360080"/>
             </a:xfrm>
             <a:prstGeom prst="rect">
               <a:avLst/>
@@ -12106,7 +12149,7 @@
           <p:spPr>
             <a:xfrm>
               <a:off x="6374160" y="2800440"/>
-              <a:ext cx="1360440" cy="1360440"/>
+              <a:ext cx="1360080" cy="1360080"/>
             </a:xfrm>
             <a:prstGeom prst="ellipse">
               <a:avLst/>
@@ -12139,7 +12182,7 @@
           <p:spPr>
             <a:xfrm>
               <a:off x="6660360" y="3086640"/>
-              <a:ext cx="788040" cy="788040"/>
+              <a:ext cx="787680" cy="787680"/>
             </a:xfrm>
             <a:prstGeom prst="rect">
               <a:avLst/>
@@ -12170,7 +12213,7 @@
           <p:spPr>
             <a:xfrm>
               <a:off x="8028720" y="2800440"/>
-              <a:ext cx="3209760" cy="1360440"/>
+              <a:ext cx="3209400" cy="1360080"/>
             </a:xfrm>
             <a:prstGeom prst="rect">
               <a:avLst/>
@@ -12260,7 +12303,7 @@
         <p:spPr>
           <a:xfrm>
             <a:off x="0" y="0"/>
-            <a:ext cx="12189960" cy="6855840"/>
+            <a:ext cx="12189600" cy="6855480"/>
           </a:xfrm>
           <a:prstGeom prst="rect">
             <a:avLst/>
@@ -12313,7 +12356,7 @@
         <p:spPr>
           <a:xfrm>
             <a:off x="0" y="0"/>
-            <a:ext cx="8127720" cy="6855840"/>
+            <a:ext cx="8127360" cy="6855480"/>
           </a:xfrm>
           <a:prstGeom prst="snip2DiagRect">
             <a:avLst>
@@ -12535,7 +12578,7 @@
         <p:spPr>
           <a:xfrm>
             <a:off x="8588520" y="941400"/>
-            <a:ext cx="3041640" cy="3246480"/>
+            <a:ext cx="3041280" cy="3246120"/>
           </a:xfrm>
           <a:prstGeom prst="rect">
             <a:avLst/>
@@ -12586,9 +12629,9 @@
         <p:grpSpPr>
           <a:xfrm>
             <a:off x="952560" y="2104200"/>
-            <a:ext cx="6164280" cy="2441160"/>
+            <a:ext cx="6163920" cy="2440800"/>
             <a:chOff x="952560" y="2104200"/>
-            <a:chExt cx="6164280" cy="2441160"/>
+            <a:chExt cx="6163920" cy="2440800"/>
           </a:xfrm>
         </p:grpSpPr>
         <p:sp>
@@ -12600,7 +12643,7 @@
           <p:spPr>
             <a:xfrm>
               <a:off x="952560" y="2104200"/>
-              <a:ext cx="814320" cy="814320"/>
+              <a:ext cx="813960" cy="813960"/>
             </a:xfrm>
             <a:prstGeom prst="ellipse">
               <a:avLst/>
@@ -12633,7 +12676,7 @@
           <p:spPr>
             <a:xfrm>
               <a:off x="1123920" y="2275560"/>
-              <a:ext cx="471240" cy="471240"/>
+              <a:ext cx="470880" cy="470880"/>
             </a:xfrm>
             <a:prstGeom prst="rect">
               <a:avLst/>
@@ -12664,7 +12707,7 @@
           <p:spPr>
             <a:xfrm>
               <a:off x="1944000" y="2104200"/>
-              <a:ext cx="1922040" cy="814320"/>
+              <a:ext cx="1921680" cy="813960"/>
             </a:xfrm>
             <a:prstGeom prst="rect">
               <a:avLst/>
@@ -12716,7 +12759,7 @@
           <p:spPr>
             <a:xfrm>
               <a:off x="4203360" y="2104200"/>
-              <a:ext cx="814320" cy="814320"/>
+              <a:ext cx="813960" cy="813960"/>
             </a:xfrm>
             <a:prstGeom prst="ellipse">
               <a:avLst/>
@@ -12749,7 +12792,7 @@
           <p:spPr>
             <a:xfrm>
               <a:off x="4375080" y="2275560"/>
-              <a:ext cx="471240" cy="471240"/>
+              <a:ext cx="470880" cy="470880"/>
             </a:xfrm>
             <a:prstGeom prst="rect">
               <a:avLst/>
@@ -12780,7 +12823,7 @@
           <p:spPr>
             <a:xfrm>
               <a:off x="5194800" y="2104200"/>
-              <a:ext cx="1922040" cy="814320"/>
+              <a:ext cx="1921680" cy="813960"/>
             </a:xfrm>
             <a:prstGeom prst="rect">
               <a:avLst/>
@@ -12832,7 +12875,7 @@
           <p:spPr>
             <a:xfrm>
               <a:off x="952560" y="3731040"/>
-              <a:ext cx="814320" cy="814320"/>
+              <a:ext cx="813960" cy="813960"/>
             </a:xfrm>
             <a:prstGeom prst="ellipse">
               <a:avLst/>
@@ -12865,7 +12908,7 @@
           <p:spPr>
             <a:xfrm>
               <a:off x="1123920" y="3902400"/>
-              <a:ext cx="471240" cy="471240"/>
+              <a:ext cx="470880" cy="470880"/>
             </a:xfrm>
             <a:prstGeom prst="rect">
               <a:avLst/>
@@ -12896,7 +12939,7 @@
           <p:spPr>
             <a:xfrm>
               <a:off x="1944000" y="3731040"/>
-              <a:ext cx="1922040" cy="814320"/>
+              <a:ext cx="1921680" cy="813960"/>
             </a:xfrm>
             <a:prstGeom prst="rect">
               <a:avLst/>
@@ -12948,7 +12991,7 @@
           <p:spPr>
             <a:xfrm>
               <a:off x="4203360" y="3731040"/>
-              <a:ext cx="814320" cy="814320"/>
+              <a:ext cx="813960" cy="813960"/>
             </a:xfrm>
             <a:prstGeom prst="ellipse">
               <a:avLst/>
@@ -12981,7 +13024,7 @@
           <p:spPr>
             <a:xfrm>
               <a:off x="4375080" y="3902400"/>
-              <a:ext cx="471240" cy="471240"/>
+              <a:ext cx="470880" cy="470880"/>
             </a:xfrm>
             <a:prstGeom prst="rect">
               <a:avLst/>
@@ -13012,7 +13055,7 @@
           <p:spPr>
             <a:xfrm>
               <a:off x="5194800" y="3731040"/>
-              <a:ext cx="1922040" cy="814320"/>
+              <a:ext cx="1921680" cy="813960"/>
             </a:xfrm>
             <a:prstGeom prst="rect">
               <a:avLst/>
@@ -13129,7 +13172,7 @@
         <p:spPr>
           <a:xfrm>
             <a:off x="684360" y="4487400"/>
-            <a:ext cx="8532360" cy="1504800"/>
+            <a:ext cx="8532000" cy="1504440"/>
           </a:xfrm>
           <a:prstGeom prst="rect">
             <a:avLst/>
@@ -13178,7 +13221,7 @@
         <p:spPr>
           <a:xfrm>
             <a:off x="684360" y="685800"/>
-            <a:ext cx="8532360" cy="3612960"/>
+            <a:ext cx="8532000" cy="3612600"/>
           </a:xfrm>
           <a:prstGeom prst="rect">
             <a:avLst/>
@@ -13197,7 +13240,7 @@
         <p:txBody>
           <a:bodyPr lIns="90000" rIns="90000" tIns="45000" bIns="45000" anchor="ctr"/>
           <a:p>
-            <a:pPr marL="285840" indent="-283680">
+            <a:pPr marL="285840" indent="-283320">
               <a:lnSpc>
                 <a:spcPct val="100000"/>
               </a:lnSpc>
@@ -13229,7 +13272,7 @@
             </a:endParaRPr>
           </a:p>
           <a:p>
-            <a:pPr marL="285840" indent="-283680">
+            <a:pPr marL="285840" indent="-283320">
               <a:lnSpc>
                 <a:spcPct val="100000"/>
               </a:lnSpc>
@@ -13261,7 +13304,7 @@
             </a:endParaRPr>
           </a:p>
           <a:p>
-            <a:pPr marL="285840" indent="-283680">
+            <a:pPr marL="285840" indent="-283320">
               <a:lnSpc>
                 <a:spcPct val="100000"/>
               </a:lnSpc>
@@ -13293,7 +13336,7 @@
             </a:endParaRPr>
           </a:p>
           <a:p>
-            <a:pPr marL="285840" indent="-283680">
+            <a:pPr marL="285840" indent="-283320">
               <a:lnSpc>
                 <a:spcPct val="100000"/>
               </a:lnSpc>
@@ -13357,7 +13400,7 @@
         <p:spPr>
           <a:xfrm>
             <a:off x="684360" y="4487400"/>
-            <a:ext cx="8532360" cy="1504800"/>
+            <a:ext cx="8532000" cy="1504440"/>
           </a:xfrm>
           <a:prstGeom prst="rect">
             <a:avLst/>
@@ -13410,7 +13453,7 @@
         <p:spPr>
           <a:xfrm>
             <a:off x="5221440" y="75600"/>
-            <a:ext cx="912240" cy="912240"/>
+            <a:ext cx="911880" cy="911880"/>
           </a:xfrm>
           <a:prstGeom prst="rect">
             <a:avLst/>
@@ -13433,7 +13476,7 @@
         <p:spPr>
           <a:xfrm>
             <a:off x="4695120" y="4444560"/>
-            <a:ext cx="912240" cy="912240"/>
+            <a:ext cx="911880" cy="911880"/>
           </a:xfrm>
           <a:prstGeom prst="rect">
             <a:avLst/>
@@ -13456,7 +13499,7 @@
         <p:spPr>
           <a:xfrm>
             <a:off x="2603880" y="2294640"/>
-            <a:ext cx="912240" cy="912240"/>
+            <a:ext cx="911880" cy="911880"/>
           </a:xfrm>
           <a:prstGeom prst="rect">
             <a:avLst/>
@@ -13479,7 +13522,7 @@
         <p:spPr>
           <a:xfrm>
             <a:off x="9767160" y="3294360"/>
-            <a:ext cx="912240" cy="912240"/>
+            <a:ext cx="911880" cy="911880"/>
           </a:xfrm>
           <a:prstGeom prst="rect">
             <a:avLst/>
@@ -13502,7 +13545,7 @@
         <p:spPr>
           <a:xfrm>
             <a:off x="1967760" y="3811680"/>
-            <a:ext cx="912240" cy="912240"/>
+            <a:ext cx="911880" cy="911880"/>
           </a:xfrm>
           <a:prstGeom prst="rect">
             <a:avLst/>
@@ -13525,7 +13568,7 @@
         <p:spPr>
           <a:xfrm>
             <a:off x="5221440" y="2907360"/>
-            <a:ext cx="912240" cy="912240"/>
+            <a:ext cx="911880" cy="911880"/>
           </a:xfrm>
           <a:prstGeom prst="rect">
             <a:avLst/>
@@ -13548,7 +13591,7 @@
         <p:spPr>
           <a:xfrm>
             <a:off x="1093680" y="3282480"/>
-            <a:ext cx="912240" cy="912240"/>
+            <a:ext cx="911880" cy="911880"/>
           </a:xfrm>
           <a:prstGeom prst="rect">
             <a:avLst/>
@@ -13571,7 +13614,7 @@
         <p:spPr>
           <a:xfrm>
             <a:off x="8595360" y="3808800"/>
-            <a:ext cx="912240" cy="912240"/>
+            <a:ext cx="911880" cy="911880"/>
           </a:xfrm>
           <a:prstGeom prst="rect">
             <a:avLst/>
@@ -13594,7 +13637,7 @@
         <p:spPr>
           <a:xfrm>
             <a:off x="7839000" y="2294640"/>
-            <a:ext cx="912240" cy="912240"/>
+            <a:ext cx="911880" cy="911880"/>
           </a:xfrm>
           <a:prstGeom prst="rect">
             <a:avLst/>
@@ -13613,7 +13656,7 @@
         <p:spPr>
           <a:xfrm>
             <a:off x="6312960" y="944640"/>
-            <a:ext cx="1524240" cy="1338120"/>
+            <a:ext cx="1523880" cy="1337760"/>
           </a:xfrm>
           <a:custGeom>
             <a:avLst/>
@@ -13666,7 +13709,7 @@
         <p:spPr>
           <a:xfrm>
             <a:off x="5678640" y="1145160"/>
-            <a:ext cx="360" cy="1604520"/>
+            <a:ext cx="360" cy="1604160"/>
           </a:xfrm>
           <a:custGeom>
             <a:avLst/>
@@ -13718,8 +13761,8 @@
         </p:nvSpPr>
         <p:spPr>
           <a:xfrm flipH="1">
-            <a:off x="3424680" y="990000"/>
-            <a:ext cx="1615680" cy="1378440"/>
+            <a:off x="3423960" y="990000"/>
+            <a:ext cx="1615320" cy="1378080"/>
           </a:xfrm>
           <a:custGeom>
             <a:avLst/>
@@ -13772,7 +13815,7 @@
         <p:spPr>
           <a:xfrm>
             <a:off x="2082960" y="3279600"/>
-            <a:ext cx="915480" cy="362880"/>
+            <a:ext cx="915120" cy="362520"/>
           </a:xfrm>
           <a:prstGeom prst="rect">
             <a:avLst/>
@@ -13821,7 +13864,7 @@
         <p:spPr>
           <a:xfrm>
             <a:off x="5227200" y="4030200"/>
-            <a:ext cx="927720" cy="362880"/>
+            <a:ext cx="927360" cy="362520"/>
           </a:xfrm>
           <a:prstGeom prst="rect">
             <a:avLst/>
@@ -13870,7 +13913,7 @@
         <p:spPr>
           <a:xfrm>
             <a:off x="8246520" y="3279600"/>
-            <a:ext cx="1253880" cy="362880"/>
+            <a:ext cx="1253520" cy="362520"/>
           </a:xfrm>
           <a:prstGeom prst="rect">
             <a:avLst/>
@@ -13919,7 +13962,7 @@
         <p:spPr>
           <a:xfrm>
             <a:off x="481680" y="348120"/>
-            <a:ext cx="1810080" cy="362880"/>
+            <a:ext cx="1809720" cy="362520"/>
           </a:xfrm>
           <a:prstGeom prst="rect">
             <a:avLst/>
@@ -13972,7 +14015,7 @@
         <p:spPr>
           <a:xfrm>
             <a:off x="5855760" y="4444560"/>
-            <a:ext cx="912240" cy="912240"/>
+            <a:ext cx="911880" cy="911880"/>
           </a:xfrm>
           <a:prstGeom prst="rect">
             <a:avLst/>
@@ -14013,7 +14056,7 @@
         <p:spPr>
           <a:xfrm>
             <a:off x="684360" y="4487400"/>
-            <a:ext cx="8532360" cy="1504800"/>
+            <a:ext cx="8532000" cy="1504440"/>
           </a:xfrm>
           <a:prstGeom prst="rect">
             <a:avLst/>
@@ -14066,7 +14109,7 @@
         <p:spPr>
           <a:xfrm>
             <a:off x="7839000" y="2560320"/>
-            <a:ext cx="1312200" cy="597960"/>
+            <a:ext cx="1311840" cy="597600"/>
           </a:xfrm>
           <a:prstGeom prst="rect">
             <a:avLst/>
@@ -14085,7 +14128,7 @@
         <p:spPr>
           <a:xfrm>
             <a:off x="480240" y="348120"/>
-            <a:ext cx="1790280" cy="362880"/>
+            <a:ext cx="1789920" cy="362520"/>
           </a:xfrm>
           <a:prstGeom prst="rect">
             <a:avLst/>
@@ -14134,7 +14177,7 @@
         <p:spPr>
           <a:xfrm>
             <a:off x="6384240" y="990000"/>
-            <a:ext cx="1524240" cy="1338120"/>
+            <a:ext cx="1523880" cy="1337760"/>
           </a:xfrm>
           <a:custGeom>
             <a:avLst/>
@@ -14187,7 +14230,7 @@
         <p:spPr>
           <a:xfrm>
             <a:off x="5678640" y="1145160"/>
-            <a:ext cx="360" cy="1604520"/>
+            <a:ext cx="360" cy="1604160"/>
           </a:xfrm>
           <a:custGeom>
             <a:avLst/>
@@ -14239,8 +14282,8 @@
         </p:nvSpPr>
         <p:spPr>
           <a:xfrm flipH="1">
-            <a:off x="3424680" y="990000"/>
-            <a:ext cx="1615680" cy="1378440"/>
+            <a:off x="3423960" y="990000"/>
+            <a:ext cx="1615320" cy="1378080"/>
           </a:xfrm>
           <a:custGeom>
             <a:avLst/>
@@ -14293,7 +14336,7 @@
         <p:spPr>
           <a:xfrm>
             <a:off x="2082960" y="3279600"/>
-            <a:ext cx="915480" cy="362880"/>
+            <a:ext cx="915120" cy="362520"/>
           </a:xfrm>
           <a:prstGeom prst="rect">
             <a:avLst/>
@@ -14342,7 +14385,7 @@
         <p:spPr>
           <a:xfrm>
             <a:off x="5227200" y="4030200"/>
-            <a:ext cx="927720" cy="362880"/>
+            <a:ext cx="927360" cy="362520"/>
           </a:xfrm>
           <a:prstGeom prst="rect">
             <a:avLst/>
@@ -14391,7 +14434,7 @@
         <p:spPr>
           <a:xfrm>
             <a:off x="8246520" y="3279600"/>
-            <a:ext cx="1253880" cy="362880"/>
+            <a:ext cx="1253520" cy="362520"/>
           </a:xfrm>
           <a:prstGeom prst="rect">
             <a:avLst/>
@@ -14444,7 +14487,7 @@
         <p:spPr>
           <a:xfrm>
             <a:off x="4979520" y="218880"/>
-            <a:ext cx="1331280" cy="617040"/>
+            <a:ext cx="1330920" cy="616680"/>
           </a:xfrm>
           <a:prstGeom prst="rect">
             <a:avLst/>
@@ -14467,7 +14510,7 @@
         <p:spPr>
           <a:xfrm>
             <a:off x="2102760" y="2514600"/>
-            <a:ext cx="1321920" cy="607320"/>
+            <a:ext cx="1321560" cy="606960"/>
           </a:xfrm>
           <a:prstGeom prst="rect">
             <a:avLst/>
@@ -14490,7 +14533,7 @@
         <p:spPr>
           <a:xfrm>
             <a:off x="4235760" y="3279600"/>
-            <a:ext cx="1312200" cy="597960"/>
+            <a:ext cx="1311840" cy="597600"/>
           </a:xfrm>
           <a:prstGeom prst="rect">
             <a:avLst/>
@@ -14513,7 +14556,7 @@
         <p:spPr>
           <a:xfrm>
             <a:off x="5833080" y="3279600"/>
-            <a:ext cx="1312200" cy="597960"/>
+            <a:ext cx="1311840" cy="597600"/>
           </a:xfrm>
           <a:prstGeom prst="rect">
             <a:avLst/>
@@ -14554,7 +14597,7 @@
         <p:spPr>
           <a:xfrm>
             <a:off x="684360" y="4487400"/>
-            <a:ext cx="8532360" cy="1504800"/>
+            <a:ext cx="8532000" cy="1504440"/>
           </a:xfrm>
           <a:prstGeom prst="rect">
             <a:avLst/>
@@ -14603,7 +14646,7 @@
         <p:spPr>
           <a:xfrm>
             <a:off x="684360" y="685800"/>
-            <a:ext cx="8532360" cy="3612960"/>
+            <a:ext cx="8532000" cy="3612600"/>
           </a:xfrm>
           <a:prstGeom prst="rect">
             <a:avLst/>
@@ -14622,7 +14665,7 @@
         <p:txBody>
           <a:bodyPr lIns="90000" rIns="90000" tIns="45000" bIns="45000" anchor="ctr"/>
           <a:p>
-            <a:pPr marL="285840" indent="-283680">
+            <a:pPr marL="285840" indent="-283320">
               <a:lnSpc>
                 <a:spcPct val="100000"/>
               </a:lnSpc>
@@ -14698,7 +14741,7 @@
         <p:spPr>
           <a:xfrm>
             <a:off x="666000" y="2574360"/>
-            <a:ext cx="4808520" cy="2971800"/>
+            <a:ext cx="4808160" cy="2971440"/>
           </a:xfrm>
           <a:prstGeom prst="roundRect">
             <a:avLst>
@@ -14848,7 +14891,7 @@
         <p:spPr>
           <a:xfrm>
             <a:off x="684360" y="5241960"/>
-            <a:ext cx="8532360" cy="1504800"/>
+            <a:ext cx="8532000" cy="1504440"/>
           </a:xfrm>
           <a:prstGeom prst="rect">
             <a:avLst/>
@@ -14897,7 +14940,7 @@
         <p:spPr>
           <a:xfrm>
             <a:off x="684360" y="685800"/>
-            <a:ext cx="10987920" cy="2286000"/>
+            <a:ext cx="10987560" cy="2285640"/>
           </a:xfrm>
           <a:prstGeom prst="rect">
             <a:avLst/>
@@ -14918,7 +14961,7 @@
             <a:normAutofit/>
           </a:bodyPr>
           <a:p>
-            <a:pPr marL="285840" indent="-283680">
+            <a:pPr marL="285840" indent="-283320">
               <a:lnSpc>
                 <a:spcPct val="100000"/>
               </a:lnSpc>
@@ -15000,7 +15043,7 @@
             </a:endParaRPr>
           </a:p>
           <a:p>
-            <a:pPr marL="285840" indent="-283680">
+            <a:pPr marL="285840" indent="-283320">
               <a:lnSpc>
                 <a:spcPct val="100000"/>
               </a:lnSpc>
@@ -15124,7 +15167,7 @@
         <p:spPr>
           <a:xfrm>
             <a:off x="2523960" y="3718800"/>
-            <a:ext cx="726120" cy="721080"/>
+            <a:ext cx="725760" cy="720720"/>
           </a:xfrm>
           <a:prstGeom prst="ellipse">
             <a:avLst/>
@@ -15192,7 +15235,7 @@
         <p:spPr>
           <a:xfrm>
             <a:off x="3363480" y="3303360"/>
-            <a:ext cx="1215360" cy="405000"/>
+            <a:ext cx="1215000" cy="404640"/>
           </a:xfrm>
           <a:prstGeom prst="ellipse">
             <a:avLst/>
@@ -15260,7 +15303,7 @@
         <p:spPr>
           <a:xfrm>
             <a:off x="744120" y="3208680"/>
-            <a:ext cx="1588680" cy="673200"/>
+            <a:ext cx="1588320" cy="672840"/>
           </a:xfrm>
           <a:prstGeom prst="ellipse">
             <a:avLst/>
@@ -15328,7 +15371,7 @@
         <p:spPr>
           <a:xfrm>
             <a:off x="2119680" y="4628880"/>
-            <a:ext cx="1527840" cy="673200"/>
+            <a:ext cx="1527480" cy="672840"/>
           </a:xfrm>
           <a:prstGeom prst="ellipse">
             <a:avLst/>
@@ -15396,7 +15439,7 @@
         <p:spPr>
           <a:xfrm>
             <a:off x="6819480" y="2574360"/>
-            <a:ext cx="4808520" cy="2971800"/>
+            <a:ext cx="4808160" cy="2971440"/>
           </a:xfrm>
           <a:prstGeom prst="roundRect">
             <a:avLst>
@@ -15546,7 +15589,7 @@
         <p:spPr>
           <a:xfrm>
             <a:off x="7103880" y="4147560"/>
-            <a:ext cx="4376880" cy="857160"/>
+            <a:ext cx="4376520" cy="856800"/>
           </a:xfrm>
           <a:prstGeom prst="ellipse">
             <a:avLst/>
@@ -15614,7 +15657,7 @@
         <p:spPr>
           <a:xfrm>
             <a:off x="9898200" y="3332520"/>
-            <a:ext cx="1215360" cy="405000"/>
+            <a:ext cx="1215000" cy="404640"/>
           </a:xfrm>
           <a:prstGeom prst="ellipse">
             <a:avLst/>
@@ -15682,7 +15725,7 @@
         <p:spPr>
           <a:xfrm>
             <a:off x="6965640" y="3288960"/>
-            <a:ext cx="1588680" cy="673200"/>
+            <a:ext cx="1588320" cy="672840"/>
           </a:xfrm>
           <a:prstGeom prst="ellipse">
             <a:avLst/>
@@ -15750,7 +15793,7 @@
         <p:spPr>
           <a:xfrm>
             <a:off x="8287920" y="2688120"/>
-            <a:ext cx="1871640" cy="673200"/>
+            <a:ext cx="1871280" cy="672840"/>
           </a:xfrm>
           <a:prstGeom prst="ellipse">
             <a:avLst/>
@@ -15867,7 +15910,7 @@
         <p:spPr>
           <a:xfrm>
             <a:off x="684360" y="4487400"/>
-            <a:ext cx="8532360" cy="1504800"/>
+            <a:ext cx="8532000" cy="1504440"/>
           </a:xfrm>
           <a:prstGeom prst="rect">
             <a:avLst/>
@@ -15916,7 +15959,7 @@
         <p:spPr>
           <a:xfrm>
             <a:off x="684360" y="685800"/>
-            <a:ext cx="11360520" cy="3612960"/>
+            <a:ext cx="11360160" cy="3612600"/>
           </a:xfrm>
           <a:prstGeom prst="rect">
             <a:avLst/>
@@ -15937,7 +15980,7 @@
             <a:normAutofit/>
           </a:bodyPr>
           <a:p>
-            <a:pPr marL="285840" indent="-283680">
+            <a:pPr marL="285840" indent="-283320">
               <a:lnSpc>
                 <a:spcPct val="100000"/>
               </a:lnSpc>
@@ -15979,7 +16022,7 @@
             </a:endParaRPr>
           </a:p>
           <a:p>
-            <a:pPr marL="285840" indent="-283680">
+            <a:pPr marL="285840" indent="-283320">
               <a:lnSpc>
                 <a:spcPct val="100000"/>
               </a:lnSpc>
@@ -16169,7 +16212,7 @@
             </a:endParaRPr>
           </a:p>
           <a:p>
-            <a:pPr marL="285840" indent="-283680">
+            <a:pPr marL="285840" indent="-283320">
               <a:lnSpc>
                 <a:spcPct val="100000"/>
               </a:lnSpc>
@@ -16201,7 +16244,7 @@
             </a:endParaRPr>
           </a:p>
           <a:p>
-            <a:pPr marL="285840" indent="-283680">
+            <a:pPr marL="285840" indent="-283320">
               <a:lnSpc>
                 <a:spcPct val="100000"/>
               </a:lnSpc>
@@ -16292,7 +16335,7 @@
         <p:spPr>
           <a:xfrm>
             <a:off x="684360" y="4487400"/>
-            <a:ext cx="8532360" cy="1504800"/>
+            <a:ext cx="8532000" cy="1504440"/>
           </a:xfrm>
           <a:prstGeom prst="rect">
             <a:avLst/>
@@ -16341,7 +16384,7 @@
         <p:spPr>
           <a:xfrm>
             <a:off x="684360" y="685800"/>
-            <a:ext cx="8532360" cy="3612960"/>
+            <a:ext cx="8532000" cy="3612600"/>
           </a:xfrm>
           <a:prstGeom prst="rect">
             <a:avLst/>
@@ -16360,7 +16403,7 @@
         <p:txBody>
           <a:bodyPr lIns="90000" rIns="90000" tIns="45000" bIns="45000" anchor="ctr"/>
           <a:p>
-            <a:pPr marL="285840" indent="-283680">
+            <a:pPr marL="285840" indent="-283320">
               <a:lnSpc>
                 <a:spcPct val="100000"/>
               </a:lnSpc>
@@ -16462,7 +16505,7 @@
             </a:endParaRPr>
           </a:p>
           <a:p>
-            <a:pPr marL="285840" indent="-283680">
+            <a:pPr marL="285840" indent="-283320">
               <a:lnSpc>
                 <a:spcPct val="100000"/>
               </a:lnSpc>
@@ -16564,7 +16607,7 @@
         <p:spPr>
           <a:xfrm>
             <a:off x="2521440" y="3979080"/>
-            <a:ext cx="1879920" cy="805680"/>
+            <a:ext cx="1879560" cy="805320"/>
           </a:xfrm>
           <a:prstGeom prst="rect">
             <a:avLst/>
@@ -16630,7 +16673,7 @@
         <p:spPr>
           <a:xfrm>
             <a:off x="5487840" y="3979080"/>
-            <a:ext cx="1879920" cy="805680"/>
+            <a:ext cx="1879560" cy="805320"/>
           </a:xfrm>
           <a:prstGeom prst="rect">
             <a:avLst/>
@@ -16696,7 +16739,7 @@
         <p:spPr>
           <a:xfrm>
             <a:off x="4004640" y="2771640"/>
-            <a:ext cx="1879920" cy="805680"/>
+            <a:ext cx="1879560" cy="805320"/>
           </a:xfrm>
           <a:prstGeom prst="rect">
             <a:avLst/>
@@ -16762,7 +16805,7 @@
         <p:spPr>
           <a:xfrm>
             <a:off x="4483080" y="4383000"/>
-            <a:ext cx="1002600" cy="360"/>
+            <a:ext cx="1002240" cy="360"/>
           </a:xfrm>
           <a:custGeom>
             <a:avLst/>
@@ -16814,7 +16857,7 @@
         <p:spPr>
           <a:xfrm>
             <a:off x="4985640" y="3657600"/>
-            <a:ext cx="360" cy="577440"/>
+            <a:ext cx="360" cy="577080"/>
           </a:xfrm>
           <a:custGeom>
             <a:avLst/>
@@ -16915,7 +16958,7 @@
         <p:spPr>
           <a:xfrm>
             <a:off x="0" y="0"/>
-            <a:ext cx="12189960" cy="6855840"/>
+            <a:ext cx="12189600" cy="6855480"/>
           </a:xfrm>
           <a:prstGeom prst="rect">
             <a:avLst/>
@@ -16968,7 +17011,7 @@
         <p:spPr>
           <a:xfrm>
             <a:off x="640440" y="685800"/>
-            <a:ext cx="4816440" cy="4601520"/>
+            <a:ext cx="4816080" cy="4601160"/>
           </a:xfrm>
           <a:prstGeom prst="rect">
             <a:avLst/>
@@ -17019,7 +17062,7 @@
         <p:spPr>
           <a:xfrm>
             <a:off x="6095880" y="0"/>
-            <a:ext cx="6093720" cy="6855840"/>
+            <a:ext cx="6093360" cy="6855480"/>
           </a:xfrm>
           <a:prstGeom prst="rect">
             <a:avLst/>
@@ -17057,7 +17100,7 @@
         <p:spPr>
           <a:xfrm>
             <a:off x="6625800" y="685800"/>
-            <a:ext cx="4876920" cy="4601520"/>
+            <a:ext cx="4876560" cy="4601160"/>
           </a:xfrm>
           <a:prstGeom prst="rect">
             <a:avLst/>
@@ -17078,7 +17121,7 @@
             <a:normAutofit/>
           </a:bodyPr>
           <a:p>
-            <a:pPr marL="285840" indent="-283680">
+            <a:pPr marL="285840" indent="-283320">
               <a:lnSpc>
                 <a:spcPct val="100000"/>
               </a:lnSpc>
@@ -17110,7 +17153,7 @@
             </a:endParaRPr>
           </a:p>
           <a:p>
-            <a:pPr marL="285840" indent="-283680">
+            <a:pPr marL="285840" indent="-283320">
               <a:lnSpc>
                 <a:spcPct val="100000"/>
               </a:lnSpc>
@@ -17142,7 +17185,7 @@
             </a:endParaRPr>
           </a:p>
           <a:p>
-            <a:pPr marL="285840" indent="-283680">
+            <a:pPr marL="285840" indent="-283320">
               <a:lnSpc>
                 <a:spcPct val="100000"/>
               </a:lnSpc>
@@ -17174,7 +17217,7 @@
             </a:endParaRPr>
           </a:p>
           <a:p>
-            <a:pPr marL="285840" indent="-283680">
+            <a:pPr marL="285840" indent="-283320">
               <a:lnSpc>
                 <a:spcPct val="100000"/>
               </a:lnSpc>
@@ -17265,7 +17308,7 @@
         <p:spPr>
           <a:xfrm>
             <a:off x="684360" y="4487400"/>
-            <a:ext cx="8532360" cy="1504800"/>
+            <a:ext cx="8532000" cy="1504440"/>
           </a:xfrm>
           <a:prstGeom prst="rect">
             <a:avLst/>
@@ -17314,7 +17357,7 @@
         <p:spPr>
           <a:xfrm>
             <a:off x="1044720" y="500040"/>
-            <a:ext cx="8262000" cy="3230640"/>
+            <a:ext cx="8261640" cy="3230280"/>
           </a:xfrm>
           <a:prstGeom prst="rect">
             <a:avLst/>
@@ -17333,7 +17376,7 @@
         <p:txBody>
           <a:bodyPr lIns="90000" rIns="90000" tIns="45000" bIns="45000" anchor="ctr"/>
           <a:p>
-            <a:pPr marL="285840" indent="-283680">
+            <a:pPr marL="285840" indent="-283320">
               <a:lnSpc>
                 <a:spcPct val="100000"/>
               </a:lnSpc>
@@ -17375,7 +17418,7 @@
             </a:endParaRPr>
           </a:p>
           <a:p>
-            <a:pPr marL="285840" indent="-283680">
+            <a:pPr marL="285840" indent="-283320">
               <a:lnSpc>
                 <a:spcPct val="100000"/>
               </a:lnSpc>
@@ -17427,7 +17470,7 @@
             </a:endParaRPr>
           </a:p>
           <a:p>
-            <a:pPr marL="285840" indent="-283680">
+            <a:pPr marL="285840" indent="-283320">
               <a:lnSpc>
                 <a:spcPct val="100000"/>
               </a:lnSpc>
@@ -17579,7 +17622,7 @@
         <p:spPr>
           <a:xfrm>
             <a:off x="7097760" y="1943280"/>
-            <a:ext cx="852480" cy="852480"/>
+            <a:ext cx="852120" cy="852120"/>
           </a:xfrm>
           <a:prstGeom prst="rect">
             <a:avLst/>
@@ -17602,7 +17645,7 @@
         <p:spPr>
           <a:xfrm>
             <a:off x="6931800" y="4296600"/>
-            <a:ext cx="1179000" cy="471240"/>
+            <a:ext cx="1178640" cy="470880"/>
           </a:xfrm>
           <a:prstGeom prst="rect">
             <a:avLst/>
@@ -17625,7 +17668,7 @@
         <p:spPr>
           <a:xfrm>
             <a:off x="7054200" y="2896920"/>
-            <a:ext cx="896040" cy="1038240"/>
+            <a:ext cx="895680" cy="1037880"/>
           </a:xfrm>
           <a:prstGeom prst="rect">
             <a:avLst/>
@@ -17648,7 +17691,7 @@
         <p:spPr>
           <a:xfrm>
             <a:off x="2718360" y="2064960"/>
-            <a:ext cx="912240" cy="912240"/>
+            <a:ext cx="911880" cy="911880"/>
           </a:xfrm>
           <a:prstGeom prst="rect">
             <a:avLst/>
@@ -17671,7 +17714,7 @@
         <p:spPr>
           <a:xfrm>
             <a:off x="2739240" y="3371040"/>
-            <a:ext cx="912240" cy="912240"/>
+            <a:ext cx="911880" cy="911880"/>
           </a:xfrm>
           <a:prstGeom prst="rect">
             <a:avLst/>
@@ -17694,7 +17737,7 @@
         <p:spPr>
           <a:xfrm>
             <a:off x="4908600" y="2852280"/>
-            <a:ext cx="912240" cy="912240"/>
+            <a:ext cx="911880" cy="911880"/>
           </a:xfrm>
           <a:prstGeom prst="rect">
             <a:avLst/>
@@ -17712,8 +17755,8 @@
         </p:nvSpPr>
         <p:spPr>
           <a:xfrm rot="1192200">
-            <a:off x="4047480" y="2672640"/>
-            <a:ext cx="976320" cy="482400"/>
+            <a:off x="4047120" y="2672280"/>
+            <a:ext cx="975960" cy="482040"/>
           </a:xfrm>
           <a:prstGeom prst="rightArrow">
             <a:avLst>
@@ -17754,8 +17797,8 @@
         </p:nvSpPr>
         <p:spPr>
           <a:xfrm rot="20407800">
-            <a:off x="4026600" y="3459600"/>
-            <a:ext cx="976320" cy="482400"/>
+            <a:off x="4026240" y="3459600"/>
+            <a:ext cx="975960" cy="482040"/>
           </a:xfrm>
           <a:prstGeom prst="rightArrow">
             <a:avLst>
@@ -17796,8 +17839,8 @@
         </p:nvSpPr>
         <p:spPr>
           <a:xfrm rot="1192200">
-            <a:off x="5801040" y="3781080"/>
-            <a:ext cx="976320" cy="482400"/>
+            <a:off x="5800680" y="3780720"/>
+            <a:ext cx="975960" cy="482040"/>
           </a:xfrm>
           <a:prstGeom prst="rightArrow">
             <a:avLst>
@@ -17838,8 +17881,8 @@
         </p:nvSpPr>
         <p:spPr>
           <a:xfrm rot="20407800">
-            <a:off x="5874840" y="2455200"/>
-            <a:ext cx="976320" cy="482400"/>
+            <a:off x="5874480" y="2455200"/>
+            <a:ext cx="975960" cy="482040"/>
           </a:xfrm>
           <a:prstGeom prst="rightArrow">
             <a:avLst>
@@ -17881,7 +17924,7 @@
         <p:spPr>
           <a:xfrm>
             <a:off x="5951880" y="3115440"/>
-            <a:ext cx="976320" cy="482400"/>
+            <a:ext cx="975960" cy="482040"/>
           </a:xfrm>
           <a:prstGeom prst="rightArrow">
             <a:avLst>
@@ -17972,7 +18015,7 @@
         <p:spPr>
           <a:xfrm>
             <a:off x="684360" y="4487400"/>
-            <a:ext cx="8532360" cy="1504800"/>
+            <a:ext cx="8532000" cy="1504440"/>
           </a:xfrm>
           <a:prstGeom prst="rect">
             <a:avLst/>
@@ -18021,7 +18064,7 @@
         <p:spPr>
           <a:xfrm>
             <a:off x="684360" y="685800"/>
-            <a:ext cx="8532360" cy="3612960"/>
+            <a:ext cx="8532000" cy="3612600"/>
           </a:xfrm>
           <a:prstGeom prst="rect">
             <a:avLst/>
@@ -18040,7 +18083,7 @@
         <p:txBody>
           <a:bodyPr lIns="90000" rIns="90000" tIns="45000" bIns="45000" anchor="ctr"/>
           <a:p>
-            <a:pPr marL="285840" indent="-283680">
+            <a:pPr marL="285840" indent="-283320">
               <a:lnSpc>
                 <a:spcPct val="100000"/>
               </a:lnSpc>
@@ -18132,7 +18175,7 @@
             </a:endParaRPr>
           </a:p>
           <a:p>
-            <a:pPr marL="285840" indent="-283680">
+            <a:pPr marL="285840" indent="-283320">
               <a:lnSpc>
                 <a:spcPct val="100000"/>
               </a:lnSpc>
@@ -18184,7 +18227,7 @@
             </a:endParaRPr>
           </a:p>
           <a:p>
-            <a:pPr marL="285840" indent="-283680">
+            <a:pPr marL="285840" indent="-283320">
               <a:lnSpc>
                 <a:spcPct val="100000"/>
               </a:lnSpc>
@@ -18270,7 +18313,7 @@
         <p:spPr>
           <a:xfrm>
             <a:off x="6227640" y="3794400"/>
-            <a:ext cx="912240" cy="912240"/>
+            <a:ext cx="911880" cy="911880"/>
           </a:xfrm>
           <a:prstGeom prst="rect">
             <a:avLst/>
@@ -18293,7 +18336,7 @@
         <p:spPr>
           <a:xfrm>
             <a:off x="2468520" y="3843720"/>
-            <a:ext cx="912240" cy="912240"/>
+            <a:ext cx="911880" cy="911880"/>
           </a:xfrm>
           <a:prstGeom prst="rect">
             <a:avLst/>
@@ -18316,7 +18359,7 @@
         <p:spPr>
           <a:xfrm>
             <a:off x="9790920" y="3794400"/>
-            <a:ext cx="912240" cy="912240"/>
+            <a:ext cx="911880" cy="911880"/>
           </a:xfrm>
           <a:prstGeom prst="rect">
             <a:avLst/>
@@ -18339,7 +18382,7 @@
         <p:spPr>
           <a:xfrm>
             <a:off x="7903800" y="3794400"/>
-            <a:ext cx="912240" cy="912240"/>
+            <a:ext cx="911880" cy="911880"/>
           </a:xfrm>
           <a:prstGeom prst="rect">
             <a:avLst/>
@@ -18362,7 +18405,7 @@
         <p:spPr>
           <a:xfrm>
             <a:off x="4412520" y="3794400"/>
-            <a:ext cx="912240" cy="912240"/>
+            <a:ext cx="911880" cy="911880"/>
           </a:xfrm>
           <a:prstGeom prst="rect">
             <a:avLst/>
@@ -18385,7 +18428,7 @@
         <p:spPr>
           <a:xfrm>
             <a:off x="684360" y="3843720"/>
-            <a:ext cx="912240" cy="912240"/>
+            <a:ext cx="911880" cy="911880"/>
           </a:xfrm>
           <a:prstGeom prst="rect">
             <a:avLst/>
@@ -18404,7 +18447,7 @@
         <p:spPr>
           <a:xfrm>
             <a:off x="1638000" y="4183200"/>
-            <a:ext cx="680760" cy="259920"/>
+            <a:ext cx="680400" cy="259560"/>
           </a:xfrm>
           <a:prstGeom prst="rightArrow">
             <a:avLst>
@@ -18443,7 +18486,7 @@
         <p:spPr>
           <a:xfrm>
             <a:off x="3511800" y="4201920"/>
-            <a:ext cx="680760" cy="259920"/>
+            <a:ext cx="680400" cy="259560"/>
           </a:xfrm>
           <a:prstGeom prst="rightArrow">
             <a:avLst>
@@ -18482,7 +18525,7 @@
         <p:spPr>
           <a:xfrm>
             <a:off x="5366520" y="4193640"/>
-            <a:ext cx="680760" cy="259920"/>
+            <a:ext cx="680400" cy="259560"/>
           </a:xfrm>
           <a:prstGeom prst="rightArrow">
             <a:avLst>
@@ -18521,7 +18564,7 @@
         <p:spPr>
           <a:xfrm>
             <a:off x="7162200" y="4183200"/>
-            <a:ext cx="680760" cy="259920"/>
+            <a:ext cx="680400" cy="259560"/>
           </a:xfrm>
           <a:prstGeom prst="rightArrow">
             <a:avLst>
@@ -18560,7 +18603,7 @@
         <p:spPr>
           <a:xfrm>
             <a:off x="8876160" y="4169880"/>
-            <a:ext cx="680760" cy="259920"/>
+            <a:ext cx="680400" cy="259560"/>
           </a:xfrm>
           <a:prstGeom prst="rightArrow">
             <a:avLst>
@@ -18648,7 +18691,7 @@
         <p:spPr>
           <a:xfrm>
             <a:off x="684360" y="4487400"/>
-            <a:ext cx="8532360" cy="1504800"/>
+            <a:ext cx="8532000" cy="1504440"/>
           </a:xfrm>
           <a:prstGeom prst="rect">
             <a:avLst/>
@@ -18697,7 +18740,7 @@
         <p:spPr>
           <a:xfrm>
             <a:off x="684360" y="685800"/>
-            <a:ext cx="8532360" cy="3612960"/>
+            <a:ext cx="8532000" cy="3612600"/>
           </a:xfrm>
           <a:prstGeom prst="rect">
             <a:avLst/>
@@ -18716,7 +18759,7 @@
         <p:txBody>
           <a:bodyPr lIns="90000" rIns="90000" tIns="45000" bIns="45000" anchor="ctr"/>
           <a:p>
-            <a:pPr marL="285840" indent="-283680">
+            <a:pPr marL="285840" indent="-283320">
               <a:lnSpc>
                 <a:spcPct val="100000"/>
               </a:lnSpc>
@@ -18798,7 +18841,7 @@
             </a:endParaRPr>
           </a:p>
           <a:p>
-            <a:pPr marL="285840" indent="-283680">
+            <a:pPr marL="285840" indent="-283320">
               <a:lnSpc>
                 <a:spcPct val="100000"/>
               </a:lnSpc>
@@ -18844,7 +18887,7 @@
         <p:spPr>
           <a:xfrm>
             <a:off x="4681800" y="2481480"/>
-            <a:ext cx="912240" cy="912240"/>
+            <a:ext cx="911880" cy="911880"/>
           </a:xfrm>
           <a:prstGeom prst="rect">
             <a:avLst/>
@@ -18867,7 +18910,7 @@
         <p:spPr>
           <a:xfrm>
             <a:off x="6609240" y="3669480"/>
-            <a:ext cx="912240" cy="912240"/>
+            <a:ext cx="911880" cy="911880"/>
           </a:xfrm>
           <a:prstGeom prst="rect">
             <a:avLst/>
@@ -18890,7 +18933,7 @@
         <p:spPr>
           <a:xfrm>
             <a:off x="2973240" y="3669480"/>
-            <a:ext cx="912240" cy="912240"/>
+            <a:ext cx="911880" cy="911880"/>
           </a:xfrm>
           <a:prstGeom prst="rect">
             <a:avLst/>
@@ -18909,7 +18952,7 @@
         <p:spPr>
           <a:xfrm>
             <a:off x="4214160" y="3946320"/>
-            <a:ext cx="2066400" cy="358560"/>
+            <a:ext cx="2066040" cy="358200"/>
           </a:xfrm>
           <a:prstGeom prst="rightArrow">
             <a:avLst>
@@ -18948,7 +18991,7 @@
         <p:spPr>
           <a:xfrm>
             <a:off x="4988160" y="3533400"/>
-            <a:ext cx="299520" cy="405000"/>
+            <a:ext cx="299160" cy="404640"/>
           </a:xfrm>
           <a:prstGeom prst="downArrow">
             <a:avLst>

</xml_diff>

<commit_message>
#12 Weak AI vs Strong AI explanation speech part 2 added on introduction slides
</commit_message>
<xml_diff>
--- a/SAI_presentation_libre_office.pptx
+++ b/SAI_presentation_libre_office.pptx
@@ -250,7 +250,7 @@
           <a:bodyPr lIns="0" rIns="0" tIns="0" bIns="0" anchor="b"/>
           <a:p>
             <a:pPr algn="r"/>
-            <a:fld id="{D8A910D1-813C-42CC-BA61-A53608384F6B}" type="slidenum">
+            <a:fld id="{4F05004F-99EA-4949-8869-9F69F1A6BA1D}" type="slidenum">
               <a:rPr b="0" lang="fr-FR" sz="1400" spc="-1" strike="noStrike">
                 <a:latin typeface="Times New Roman"/>
               </a:rPr>
@@ -298,7 +298,7 @@
         <p:spPr>
           <a:xfrm>
             <a:off x="685800" y="1143000"/>
-            <a:ext cx="5483880" cy="3083760"/>
+            <a:ext cx="5483520" cy="3083400"/>
           </a:xfrm>
           <a:prstGeom prst="rect">
             <a:avLst/>
@@ -318,7 +318,7 @@
         <p:spPr>
           <a:xfrm>
             <a:off x="685800" y="4400640"/>
-            <a:ext cx="5483880" cy="3597840"/>
+            <a:ext cx="5483520" cy="3597480"/>
           </a:xfrm>
           <a:prstGeom prst="rect">
             <a:avLst/>
@@ -327,7 +327,7 @@
         <p:txBody>
           <a:bodyPr lIns="0" rIns="0" tIns="0" bIns="0"/>
           <a:p>
-            <a:pPr marL="216000" indent="-213840">
+            <a:pPr marL="216000" indent="-213480">
               <a:lnSpc>
                 <a:spcPct val="100000"/>
               </a:lnSpc>
@@ -343,7 +343,7 @@
             </a:endParaRPr>
           </a:p>
           <a:p>
-            <a:pPr marL="216000" indent="-213840">
+            <a:pPr marL="216000" indent="-213480">
               <a:lnSpc>
                 <a:spcPct val="100000"/>
               </a:lnSpc>
@@ -360,7 +360,7 @@
             </a:endParaRPr>
           </a:p>
           <a:p>
-            <a:pPr marL="216000" indent="-213840">
+            <a:pPr marL="216000" indent="-213480">
               <a:lnSpc>
                 <a:spcPct val="100000"/>
               </a:lnSpc>
@@ -376,7 +376,7 @@
             </a:endParaRPr>
           </a:p>
           <a:p>
-            <a:pPr marL="216000" indent="-213840">
+            <a:pPr marL="216000" indent="-213480">
               <a:lnSpc>
                 <a:spcPct val="100000"/>
               </a:lnSpc>
@@ -392,7 +392,7 @@
             </a:endParaRPr>
           </a:p>
           <a:p>
-            <a:pPr marL="216000" indent="-213840">
+            <a:pPr marL="216000" indent="-213480">
               <a:lnSpc>
                 <a:spcPct val="100000"/>
               </a:lnSpc>
@@ -419,7 +419,7 @@
         <p:spPr>
           <a:xfrm>
             <a:off x="3884760" y="8685360"/>
-            <a:ext cx="2969280" cy="456120"/>
+            <a:ext cx="2968920" cy="455760"/>
           </a:xfrm>
           <a:prstGeom prst="rect">
             <a:avLst/>
@@ -443,7 +443,7 @@
                 <a:spcPct val="100000"/>
               </a:lnSpc>
             </a:pPr>
-            <a:fld id="{EB8238CC-1DA6-4906-9A69-F8390BC9677A}" type="slidenum">
+            <a:fld id="{90645693-E2B3-4E85-97F6-857F7D54308E}" type="slidenum">
               <a:rPr b="0" lang="fr-FR" sz="1200" spc="-1" strike="noStrike">
                 <a:solidFill>
                   <a:srgbClr val="000000"/>
@@ -493,7 +493,7 @@
         <p:spPr>
           <a:xfrm>
             <a:off x="685800" y="1143000"/>
-            <a:ext cx="5483880" cy="3083760"/>
+            <a:ext cx="5483520" cy="3083400"/>
           </a:xfrm>
           <a:prstGeom prst="rect">
             <a:avLst/>
@@ -513,7 +513,7 @@
         <p:spPr>
           <a:xfrm>
             <a:off x="685800" y="4400640"/>
-            <a:ext cx="5483880" cy="3597840"/>
+            <a:ext cx="5483520" cy="3597480"/>
           </a:xfrm>
           <a:prstGeom prst="rect">
             <a:avLst/>
@@ -522,7 +522,7 @@
         <p:txBody>
           <a:bodyPr lIns="0" rIns="0" tIns="0" bIns="0"/>
           <a:p>
-            <a:pPr marL="216000" indent="-214200">
+            <a:pPr marL="216000" indent="-213840">
               <a:lnSpc>
                 <a:spcPct val="100000"/>
               </a:lnSpc>
@@ -538,7 +538,7 @@
             </a:endParaRPr>
           </a:p>
           <a:p>
-            <a:pPr marL="216000" indent="-214200">
+            <a:pPr marL="216000" indent="-213840">
               <a:lnSpc>
                 <a:spcPct val="100000"/>
               </a:lnSpc>
@@ -548,7 +548,7 @@
             </a:endParaRPr>
           </a:p>
           <a:p>
-            <a:pPr marL="216000" indent="-214200">
+            <a:pPr marL="216000" indent="-213840">
               <a:lnSpc>
                 <a:spcPct val="100000"/>
               </a:lnSpc>
@@ -564,7 +564,7 @@
             </a:endParaRPr>
           </a:p>
           <a:p>
-            <a:pPr marL="216000" indent="-214200">
+            <a:pPr marL="216000" indent="-213840">
               <a:lnSpc>
                 <a:spcPct val="100000"/>
               </a:lnSpc>
@@ -574,7 +574,7 @@
             </a:endParaRPr>
           </a:p>
           <a:p>
-            <a:pPr marL="216000" indent="-214200">
+            <a:pPr marL="216000" indent="-213840">
               <a:lnSpc>
                 <a:spcPct val="100000"/>
               </a:lnSpc>
@@ -590,7 +590,7 @@
             </a:endParaRPr>
           </a:p>
           <a:p>
-            <a:pPr marL="216000" indent="-214200">
+            <a:pPr marL="216000" indent="-213840">
               <a:lnSpc>
                 <a:spcPct val="100000"/>
               </a:lnSpc>
@@ -600,7 +600,7 @@
             </a:endParaRPr>
           </a:p>
           <a:p>
-            <a:pPr marL="216000" indent="-214200">
+            <a:pPr marL="216000" indent="-213840">
               <a:lnSpc>
                 <a:spcPct val="100000"/>
               </a:lnSpc>
@@ -616,7 +616,7 @@
             </a:endParaRPr>
           </a:p>
           <a:p>
-            <a:pPr marL="216000" indent="-214200">
+            <a:pPr marL="216000" indent="-213840">
               <a:lnSpc>
                 <a:spcPct val="100000"/>
               </a:lnSpc>
@@ -626,7 +626,7 @@
             </a:endParaRPr>
           </a:p>
           <a:p>
-            <a:pPr marL="216000" indent="-214200">
+            <a:pPr marL="216000" indent="-213840">
               <a:lnSpc>
                 <a:spcPct val="100000"/>
               </a:lnSpc>
@@ -636,7 +636,7 @@
             </a:endParaRPr>
           </a:p>
           <a:p>
-            <a:pPr marL="216000" indent="-214200">
+            <a:pPr marL="216000" indent="-213840">
               <a:lnSpc>
                 <a:spcPct val="100000"/>
               </a:lnSpc>
@@ -652,7 +652,7 @@
             </a:endParaRPr>
           </a:p>
           <a:p>
-            <a:pPr marL="216000" indent="-214200">
+            <a:pPr marL="216000" indent="-213840">
               <a:lnSpc>
                 <a:spcPct val="100000"/>
               </a:lnSpc>
@@ -668,7 +668,7 @@
             </a:endParaRPr>
           </a:p>
           <a:p>
-            <a:pPr marL="216000" indent="-214200">
+            <a:pPr marL="216000" indent="-213840">
               <a:lnSpc>
                 <a:spcPct val="100000"/>
               </a:lnSpc>
@@ -684,7 +684,7 @@
             </a:endParaRPr>
           </a:p>
           <a:p>
-            <a:pPr marL="216000" indent="-214200">
+            <a:pPr marL="216000" indent="-213840">
               <a:lnSpc>
                 <a:spcPct val="100000"/>
               </a:lnSpc>
@@ -694,7 +694,7 @@
             </a:endParaRPr>
           </a:p>
           <a:p>
-            <a:pPr marL="216000" indent="-214200">
+            <a:pPr marL="216000" indent="-213840">
               <a:lnSpc>
                 <a:spcPct val="100000"/>
               </a:lnSpc>
@@ -710,7 +710,7 @@
             </a:endParaRPr>
           </a:p>
           <a:p>
-            <a:pPr marL="216000" indent="-214200">
+            <a:pPr marL="216000" indent="-213840">
               <a:lnSpc>
                 <a:spcPct val="100000"/>
               </a:lnSpc>
@@ -720,7 +720,7 @@
             </a:endParaRPr>
           </a:p>
           <a:p>
-            <a:pPr marL="216000" indent="-214200">
+            <a:pPr marL="216000" indent="-213840">
               <a:lnSpc>
                 <a:spcPct val="100000"/>
               </a:lnSpc>
@@ -736,7 +736,7 @@
             </a:endParaRPr>
           </a:p>
           <a:p>
-            <a:pPr marL="216000" indent="-214200">
+            <a:pPr marL="216000" indent="-213840">
               <a:lnSpc>
                 <a:spcPct val="100000"/>
               </a:lnSpc>
@@ -752,7 +752,7 @@
             </a:endParaRPr>
           </a:p>
           <a:p>
-            <a:pPr marL="216000" indent="-214200">
+            <a:pPr marL="216000" indent="-213840">
               <a:lnSpc>
                 <a:spcPct val="100000"/>
               </a:lnSpc>
@@ -768,7 +768,7 @@
             </a:endParaRPr>
           </a:p>
           <a:p>
-            <a:pPr marL="216000" indent="-214200">
+            <a:pPr marL="216000" indent="-213840">
               <a:lnSpc>
                 <a:spcPct val="100000"/>
               </a:lnSpc>
@@ -784,7 +784,7 @@
             </a:endParaRPr>
           </a:p>
           <a:p>
-            <a:pPr marL="216000" indent="-214200">
+            <a:pPr marL="216000" indent="-213840">
               <a:lnSpc>
                 <a:spcPct val="100000"/>
               </a:lnSpc>
@@ -794,7 +794,7 @@
             </a:endParaRPr>
           </a:p>
           <a:p>
-            <a:pPr marL="216000" indent="-214200">
+            <a:pPr marL="216000" indent="-213840">
               <a:lnSpc>
                 <a:spcPct val="100000"/>
               </a:lnSpc>
@@ -810,7 +810,7 @@
             </a:endParaRPr>
           </a:p>
           <a:p>
-            <a:pPr marL="216000" indent="-214200">
+            <a:pPr marL="216000" indent="-213840">
               <a:lnSpc>
                 <a:spcPct val="100000"/>
               </a:lnSpc>
@@ -826,7 +826,7 @@
             </a:endParaRPr>
           </a:p>
           <a:p>
-            <a:pPr marL="216000" indent="-214200">
+            <a:pPr marL="216000" indent="-213840">
               <a:lnSpc>
                 <a:spcPct val="100000"/>
               </a:lnSpc>
@@ -842,7 +842,7 @@
             </a:endParaRPr>
           </a:p>
           <a:p>
-            <a:pPr marL="216000" indent="-214200">
+            <a:pPr marL="216000" indent="-213840">
               <a:lnSpc>
                 <a:spcPct val="100000"/>
               </a:lnSpc>
@@ -858,7 +858,7 @@
             </a:endParaRPr>
           </a:p>
           <a:p>
-            <a:pPr marL="216000" indent="-214200">
+            <a:pPr marL="216000" indent="-213840">
               <a:lnSpc>
                 <a:spcPct val="100000"/>
               </a:lnSpc>
@@ -874,7 +874,7 @@
             </a:endParaRPr>
           </a:p>
           <a:p>
-            <a:pPr marL="216000" indent="-214200">
+            <a:pPr marL="216000" indent="-213840">
               <a:lnSpc>
                 <a:spcPct val="100000"/>
               </a:lnSpc>
@@ -884,7 +884,7 @@
             </a:endParaRPr>
           </a:p>
           <a:p>
-            <a:pPr marL="216000" indent="-214200">
+            <a:pPr marL="216000" indent="-213840">
               <a:lnSpc>
                 <a:spcPct val="100000"/>
               </a:lnSpc>
@@ -900,7 +900,7 @@
             </a:endParaRPr>
           </a:p>
           <a:p>
-            <a:pPr marL="216000" indent="-214200">
+            <a:pPr marL="216000" indent="-213840">
               <a:lnSpc>
                 <a:spcPct val="100000"/>
               </a:lnSpc>
@@ -916,7 +916,7 @@
             </a:endParaRPr>
           </a:p>
           <a:p>
-            <a:pPr marL="216000" indent="-214200">
+            <a:pPr marL="216000" indent="-213840">
               <a:lnSpc>
                 <a:spcPct val="100000"/>
               </a:lnSpc>
@@ -932,7 +932,7 @@
             </a:endParaRPr>
           </a:p>
           <a:p>
-            <a:pPr marL="216000" indent="-214200">
+            <a:pPr marL="216000" indent="-213840">
               <a:lnSpc>
                 <a:spcPct val="100000"/>
               </a:lnSpc>
@@ -942,7 +942,7 @@
             </a:endParaRPr>
           </a:p>
           <a:p>
-            <a:pPr marL="216000" indent="-214200">
+            <a:pPr marL="216000" indent="-213840">
               <a:lnSpc>
                 <a:spcPct val="100000"/>
               </a:lnSpc>
@@ -958,7 +958,7 @@
             </a:endParaRPr>
           </a:p>
           <a:p>
-            <a:pPr marL="216000" indent="-214200">
+            <a:pPr marL="216000" indent="-213840">
               <a:lnSpc>
                 <a:spcPct val="100000"/>
               </a:lnSpc>
@@ -974,7 +974,7 @@
             </a:endParaRPr>
           </a:p>
           <a:p>
-            <a:pPr marL="216000" indent="-214200">
+            <a:pPr marL="216000" indent="-213840">
               <a:lnSpc>
                 <a:spcPct val="100000"/>
               </a:lnSpc>
@@ -990,7 +990,7 @@
             </a:endParaRPr>
           </a:p>
           <a:p>
-            <a:pPr marL="216000" indent="-214200">
+            <a:pPr marL="216000" indent="-213840">
               <a:lnSpc>
                 <a:spcPct val="100000"/>
               </a:lnSpc>
@@ -1000,7 +1000,7 @@
             </a:endParaRPr>
           </a:p>
           <a:p>
-            <a:pPr marL="216000" indent="-214200">
+            <a:pPr marL="216000" indent="-213840">
               <a:lnSpc>
                 <a:spcPct val="100000"/>
               </a:lnSpc>
@@ -1016,7 +1016,7 @@
             </a:endParaRPr>
           </a:p>
           <a:p>
-            <a:pPr marL="216000" indent="-214200">
+            <a:pPr marL="216000" indent="-213840">
               <a:lnSpc>
                 <a:spcPct val="100000"/>
               </a:lnSpc>
@@ -1032,7 +1032,7 @@
             </a:endParaRPr>
           </a:p>
           <a:p>
-            <a:pPr marL="216000" indent="-214200">
+            <a:pPr marL="216000" indent="-213840">
               <a:lnSpc>
                 <a:spcPct val="100000"/>
               </a:lnSpc>
@@ -1048,7 +1048,7 @@
             </a:endParaRPr>
           </a:p>
           <a:p>
-            <a:pPr marL="216000" indent="-214200">
+            <a:pPr marL="216000" indent="-213840">
               <a:lnSpc>
                 <a:spcPct val="100000"/>
               </a:lnSpc>
@@ -1064,7 +1064,7 @@
             </a:endParaRPr>
           </a:p>
           <a:p>
-            <a:pPr marL="216000" indent="-214200">
+            <a:pPr marL="216000" indent="-213840">
               <a:lnSpc>
                 <a:spcPct val="100000"/>
               </a:lnSpc>
@@ -1074,7 +1074,7 @@
             </a:endParaRPr>
           </a:p>
           <a:p>
-            <a:pPr marL="216000" indent="-214200">
+            <a:pPr marL="216000" indent="-213840">
               <a:lnSpc>
                 <a:spcPct val="100000"/>
               </a:lnSpc>
@@ -1090,7 +1090,7 @@
             </a:endParaRPr>
           </a:p>
           <a:p>
-            <a:pPr marL="216000" indent="-214200">
+            <a:pPr marL="216000" indent="-213840">
               <a:lnSpc>
                 <a:spcPct val="100000"/>
               </a:lnSpc>
@@ -1107,7 +1107,7 @@
             </a:endParaRPr>
           </a:p>
           <a:p>
-            <a:pPr marL="216000" indent="-214200">
+            <a:pPr marL="216000" indent="-213840">
               <a:lnSpc>
                 <a:spcPct val="100000"/>
               </a:lnSpc>
@@ -1124,7 +1124,7 @@
             </a:endParaRPr>
           </a:p>
           <a:p>
-            <a:pPr marL="216000" indent="-214200">
+            <a:pPr marL="216000" indent="-213840">
               <a:lnSpc>
                 <a:spcPct val="100000"/>
               </a:lnSpc>
@@ -1141,7 +1141,7 @@
             </a:endParaRPr>
           </a:p>
           <a:p>
-            <a:pPr marL="216000" indent="-214200">
+            <a:pPr marL="216000" indent="-213840">
               <a:lnSpc>
                 <a:spcPct val="100000"/>
               </a:lnSpc>
@@ -1151,7 +1151,7 @@
             </a:endParaRPr>
           </a:p>
           <a:p>
-            <a:pPr marL="216000" indent="-214200">
+            <a:pPr marL="216000" indent="-213840">
               <a:lnSpc>
                 <a:spcPct val="100000"/>
               </a:lnSpc>
@@ -1168,7 +1168,7 @@
             </a:endParaRPr>
           </a:p>
           <a:p>
-            <a:pPr marL="216000" indent="-214200">
+            <a:pPr marL="216000" indent="-213840">
               <a:lnSpc>
                 <a:spcPct val="100000"/>
               </a:lnSpc>
@@ -1185,7 +1185,7 @@
             </a:endParaRPr>
           </a:p>
           <a:p>
-            <a:pPr marL="216000" indent="-214200">
+            <a:pPr marL="216000" indent="-213840">
               <a:lnSpc>
                 <a:spcPct val="100000"/>
               </a:lnSpc>
@@ -1195,7 +1195,7 @@
             </a:endParaRPr>
           </a:p>
           <a:p>
-            <a:pPr marL="216000" indent="-214200">
+            <a:pPr marL="216000" indent="-213840">
               <a:lnSpc>
                 <a:spcPct val="100000"/>
               </a:lnSpc>
@@ -1205,7 +1205,7 @@
             </a:endParaRPr>
           </a:p>
           <a:p>
-            <a:pPr marL="216000" indent="-214200">
+            <a:pPr marL="216000" indent="-213840">
               <a:lnSpc>
                 <a:spcPct val="100000"/>
               </a:lnSpc>
@@ -1215,7 +1215,7 @@
             </a:endParaRPr>
           </a:p>
           <a:p>
-            <a:pPr marL="216000" indent="-214200">
+            <a:pPr marL="216000" indent="-213840">
               <a:lnSpc>
                 <a:spcPct val="100000"/>
               </a:lnSpc>
@@ -1225,7 +1225,7 @@
             </a:endParaRPr>
           </a:p>
           <a:p>
-            <a:pPr marL="216000" indent="-214200">
+            <a:pPr marL="216000" indent="-213840">
               <a:lnSpc>
                 <a:spcPct val="100000"/>
               </a:lnSpc>
@@ -1245,7 +1245,7 @@
         <p:spPr>
           <a:xfrm>
             <a:off x="3884760" y="8685360"/>
-            <a:ext cx="2969280" cy="456120"/>
+            <a:ext cx="2968920" cy="455760"/>
           </a:xfrm>
           <a:prstGeom prst="rect">
             <a:avLst/>
@@ -1269,7 +1269,7 @@
                 <a:spcPct val="100000"/>
               </a:lnSpc>
             </a:pPr>
-            <a:fld id="{A98FF6B5-729D-48AB-9F61-B604B3F0025E}" type="slidenum">
+            <a:fld id="{B50DF82A-F5E2-4428-B395-29DC1AD4F77E}" type="slidenum">
               <a:rPr b="0" lang="fr-FR" sz="1200" spc="-1" strike="noStrike">
                 <a:solidFill>
                   <a:srgbClr val="000000"/>
@@ -1319,7 +1319,7 @@
         <p:spPr>
           <a:xfrm>
             <a:off x="685800" y="1143000"/>
-            <a:ext cx="5483880" cy="3083760"/>
+            <a:ext cx="5483520" cy="3083400"/>
           </a:xfrm>
           <a:prstGeom prst="rect">
             <a:avLst/>
@@ -1339,7 +1339,7 @@
         <p:spPr>
           <a:xfrm>
             <a:off x="685800" y="4400640"/>
-            <a:ext cx="5483880" cy="3597840"/>
+            <a:ext cx="5483520" cy="3597480"/>
           </a:xfrm>
           <a:prstGeom prst="rect">
             <a:avLst/>
@@ -1348,7 +1348,7 @@
         <p:txBody>
           <a:bodyPr lIns="0" rIns="0" tIns="0" bIns="0"/>
           <a:p>
-            <a:pPr marL="216000" indent="-216000">
+            <a:pPr marL="216000" indent="-215640">
               <a:lnSpc>
                 <a:spcPct val="100000"/>
               </a:lnSpc>
@@ -1364,7 +1364,7 @@
             </a:endParaRPr>
           </a:p>
           <a:p>
-            <a:pPr marL="216000" indent="-216000">
+            <a:pPr marL="216000" indent="-215640">
               <a:lnSpc>
                 <a:spcPct val="100000"/>
               </a:lnSpc>
@@ -1380,7 +1380,7 @@
             </a:endParaRPr>
           </a:p>
           <a:p>
-            <a:pPr marL="216000" indent="-216000">
+            <a:pPr marL="216000" indent="-215640">
               <a:lnSpc>
                 <a:spcPct val="100000"/>
               </a:lnSpc>
@@ -1395,6 +1395,68 @@
               <a:latin typeface="Arial"/>
             </a:endParaRPr>
           </a:p>
+          <a:p>
+            <a:pPr marL="216000" indent="-215640">
+              <a:lnSpc>
+                <a:spcPct val="100000"/>
+              </a:lnSpc>
+            </a:pPr>
+            <a:endParaRPr b="0" lang="fr-FR" sz="1800" spc="-1" strike="noStrike">
+              <a:latin typeface="Arial"/>
+            </a:endParaRPr>
+          </a:p>
+          <a:p>
+            <a:pPr marL="216000" indent="-215640">
+              <a:lnSpc>
+                <a:spcPct val="100000"/>
+              </a:lnSpc>
+            </a:pPr>
+            <a:r>
+              <a:rPr b="0" lang="fr-FR" sz="1800" spc="-1" strike="noStrike">
+                <a:latin typeface="Arial"/>
+              </a:rPr>
+              <a:t>It can be really good at what it does (for example, beat the best player on AlphaGo)</a:t>
+            </a:r>
+            <a:endParaRPr b="0" lang="fr-FR" sz="1800" spc="-1" strike="noStrike">
+              <a:latin typeface="Arial"/>
+            </a:endParaRPr>
+          </a:p>
+          <a:p>
+            <a:pPr marL="216000" indent="-215640">
+              <a:lnSpc>
+                <a:spcPct val="100000"/>
+              </a:lnSpc>
+            </a:pPr>
+            <a:r>
+              <a:rPr b="0" lang="fr-FR" sz="1800" spc="-1" strike="noStrike">
+                <a:latin typeface="Arial"/>
+              </a:rPr>
+              <a:t>But it can’t understand the questions « where are you from ? » « What is your favorite food ? ».</a:t>
+            </a:r>
+            <a:endParaRPr b="0" lang="fr-FR" sz="1800" spc="-1" strike="noStrike">
+              <a:latin typeface="Arial"/>
+            </a:endParaRPr>
+          </a:p>
+          <a:p>
+            <a:pPr marL="216000" indent="-215640">
+              <a:lnSpc>
+                <a:spcPct val="100000"/>
+              </a:lnSpc>
+            </a:pPr>
+            <a:endParaRPr b="0" lang="fr-FR" sz="1800" spc="-1" strike="noStrike">
+              <a:latin typeface="Arial"/>
+            </a:endParaRPr>
+          </a:p>
+          <a:p>
+            <a:pPr marL="216000" indent="-215640">
+              <a:lnSpc>
+                <a:spcPct val="100000"/>
+              </a:lnSpc>
+            </a:pPr>
+            <a:endParaRPr b="0" lang="fr-FR" sz="1800" spc="-1" strike="noStrike">
+              <a:latin typeface="Arial"/>
+            </a:endParaRPr>
+          </a:p>
         </p:txBody>
       </p:sp>
       <p:sp>
@@ -1406,7 +1468,7 @@
         <p:spPr>
           <a:xfrm>
             <a:off x="3884760" y="8685360"/>
-            <a:ext cx="2969280" cy="456120"/>
+            <a:ext cx="2968920" cy="455760"/>
           </a:xfrm>
           <a:prstGeom prst="rect">
             <a:avLst/>
@@ -1430,7 +1492,7 @@
                 <a:spcPct val="100000"/>
               </a:lnSpc>
             </a:pPr>
-            <a:fld id="{64A57D56-0BA0-4587-9697-7C1FB089DEA3}" type="slidenum">
+            <a:fld id="{6D1C4CDD-D4AB-4623-A625-850DD8B872F0}" type="slidenum">
               <a:rPr b="0" lang="fr-FR" sz="1200" spc="-1" strike="noStrike">
                 <a:solidFill>
                   <a:srgbClr val="000000"/>
@@ -1480,7 +1542,7 @@
         <p:spPr>
           <a:xfrm>
             <a:off x="380880" y="694800"/>
-            <a:ext cx="6094440" cy="3427560"/>
+            <a:ext cx="6094080" cy="3427200"/>
           </a:xfrm>
           <a:prstGeom prst="rect">
             <a:avLst/>
@@ -1500,7 +1562,7 @@
         <p:spPr>
           <a:xfrm>
             <a:off x="685800" y="4343400"/>
-            <a:ext cx="5484960" cy="4113360"/>
+            <a:ext cx="5484600" cy="4113000"/>
           </a:xfrm>
           <a:prstGeom prst="rect">
             <a:avLst/>
@@ -1509,7 +1571,7 @@
         <p:txBody>
           <a:bodyPr lIns="0" rIns="0" tIns="0" bIns="0"/>
           <a:p>
-            <a:pPr marL="216000" indent="-215280">
+            <a:pPr marL="216000" indent="-214920">
               <a:lnSpc>
                 <a:spcPct val="100000"/>
               </a:lnSpc>
@@ -1525,7 +1587,7 @@
             </a:endParaRPr>
           </a:p>
           <a:p>
-            <a:pPr marL="216000" indent="-215280">
+            <a:pPr marL="216000" indent="-214920">
               <a:lnSpc>
                 <a:spcPct val="100000"/>
               </a:lnSpc>
@@ -1541,7 +1603,7 @@
             </a:endParaRPr>
           </a:p>
           <a:p>
-            <a:pPr marL="216000" indent="-215280">
+            <a:pPr marL="216000" indent="-214920">
               <a:lnSpc>
                 <a:spcPct val="100000"/>
               </a:lnSpc>
@@ -1557,7 +1619,7 @@
             </a:endParaRPr>
           </a:p>
           <a:p>
-            <a:pPr marL="216000" indent="-215280">
+            <a:pPr marL="216000" indent="-214920">
               <a:lnSpc>
                 <a:spcPct val="100000"/>
               </a:lnSpc>
@@ -5305,7 +5367,7 @@
         <p:spPr>
           <a:xfrm>
             <a:off x="0" y="0"/>
-            <a:ext cx="12189600" cy="6855480"/>
+            <a:ext cx="12189240" cy="6855120"/>
           </a:xfrm>
           <a:prstGeom prst="rect">
             <a:avLst/>
@@ -5338,7 +5400,7 @@
         <p:spPr>
           <a:xfrm flipV="1">
             <a:off x="0" y="-2880"/>
-            <a:ext cx="12186360" cy="6855480"/>
+            <a:ext cx="12186000" cy="6855120"/>
           </a:xfrm>
           <a:prstGeom prst="snip1Rect">
             <a:avLst>
@@ -5393,7 +5455,7 @@
         <p:spPr>
           <a:xfrm>
             <a:off x="684360" y="685800"/>
-            <a:ext cx="9676440" cy="3670920"/>
+            <a:ext cx="9676080" cy="3670560"/>
           </a:xfrm>
           <a:prstGeom prst="rect">
             <a:avLst/>
@@ -5444,7 +5506,7 @@
         <p:spPr>
           <a:xfrm>
             <a:off x="684360" y="4648320"/>
-            <a:ext cx="7003080" cy="1140480"/>
+            <a:ext cx="7002720" cy="1140120"/>
           </a:xfrm>
           <a:prstGeom prst="rect">
             <a:avLst/>
@@ -5582,7 +5644,7 @@
         <p:spPr>
           <a:xfrm>
             <a:off x="684360" y="4487400"/>
-            <a:ext cx="8532000" cy="1504440"/>
+            <a:ext cx="8531640" cy="1504080"/>
           </a:xfrm>
           <a:prstGeom prst="rect">
             <a:avLst/>
@@ -5631,7 +5693,7 @@
         <p:spPr>
           <a:xfrm>
             <a:off x="684360" y="685800"/>
-            <a:ext cx="8532000" cy="3612600"/>
+            <a:ext cx="8531640" cy="3612240"/>
           </a:xfrm>
           <a:prstGeom prst="rect">
             <a:avLst/>
@@ -5650,7 +5712,7 @@
         <p:txBody>
           <a:bodyPr lIns="90000" rIns="90000" tIns="45000" bIns="45000" anchor="ctr"/>
           <a:p>
-            <a:pPr marL="285840" indent="-283320">
+            <a:pPr marL="285840" indent="-282960">
               <a:lnSpc>
                 <a:spcPct val="100000"/>
               </a:lnSpc>
@@ -5782,7 +5844,7 @@
             </a:endParaRPr>
           </a:p>
           <a:p>
-            <a:pPr marL="285840" indent="-283320">
+            <a:pPr marL="285840" indent="-282960">
               <a:lnSpc>
                 <a:spcPct val="100000"/>
               </a:lnSpc>
@@ -5828,7 +5890,7 @@
         <p:spPr>
           <a:xfrm>
             <a:off x="4733640" y="3979440"/>
-            <a:ext cx="911880" cy="911880"/>
+            <a:ext cx="911520" cy="911520"/>
           </a:xfrm>
           <a:prstGeom prst="rect">
             <a:avLst/>
@@ -5851,7 +5913,7 @@
         <p:spPr>
           <a:xfrm>
             <a:off x="6825960" y="4030200"/>
-            <a:ext cx="911880" cy="911880"/>
+            <a:ext cx="911520" cy="911520"/>
           </a:xfrm>
           <a:prstGeom prst="rect">
             <a:avLst/>
@@ -5874,7 +5936,7 @@
         <p:spPr>
           <a:xfrm>
             <a:off x="5354640" y="2725920"/>
-            <a:ext cx="911880" cy="911880"/>
+            <a:ext cx="911520" cy="911520"/>
           </a:xfrm>
           <a:prstGeom prst="rect">
             <a:avLst/>
@@ -5897,7 +5959,7 @@
         <p:spPr>
           <a:xfrm>
             <a:off x="8550000" y="3433320"/>
-            <a:ext cx="911880" cy="911880"/>
+            <a:ext cx="911520" cy="911520"/>
           </a:xfrm>
           <a:prstGeom prst="rect">
             <a:avLst/>
@@ -5920,7 +5982,7 @@
         <p:spPr>
           <a:xfrm>
             <a:off x="5153040" y="5079960"/>
-            <a:ext cx="911880" cy="911880"/>
+            <a:ext cx="911520" cy="911520"/>
           </a:xfrm>
           <a:prstGeom prst="rect">
             <a:avLst/>
@@ -5938,8 +6000,8 @@
         </p:nvSpPr>
         <p:spPr>
           <a:xfrm rot="3732600">
-            <a:off x="7994160" y="3764160"/>
-            <a:ext cx="201600" cy="667440"/>
+            <a:off x="7994520" y="3763800"/>
+            <a:ext cx="201240" cy="667080"/>
           </a:xfrm>
           <a:prstGeom prst="downArrow">
             <a:avLst>
@@ -5978,7 +6040,7 @@
         <p:spPr>
           <a:xfrm rot="14618400">
             <a:off x="6344280" y="4763880"/>
-            <a:ext cx="201600" cy="667440"/>
+            <a:ext cx="201240" cy="667080"/>
           </a:xfrm>
           <a:prstGeom prst="downArrow">
             <a:avLst>
@@ -6016,8 +6078,8 @@
         </p:nvSpPr>
         <p:spPr>
           <a:xfrm rot="5400000">
-            <a:off x="6191280" y="4132800"/>
-            <a:ext cx="201600" cy="667440"/>
+            <a:off x="6191640" y="4132800"/>
+            <a:ext cx="201240" cy="667080"/>
           </a:xfrm>
           <a:prstGeom prst="downArrow">
             <a:avLst>
@@ -6056,7 +6118,7 @@
         <p:spPr>
           <a:xfrm rot="7014000">
             <a:off x="6424920" y="3552840"/>
-            <a:ext cx="201600" cy="667440"/>
+            <a:ext cx="201240" cy="667080"/>
           </a:xfrm>
           <a:prstGeom prst="downArrow">
             <a:avLst>
@@ -6094,8 +6156,8 @@
         </p:nvSpPr>
         <p:spPr>
           <a:xfrm rot="1747800">
-            <a:off x="5088600" y="3303720"/>
-            <a:ext cx="201600" cy="667440"/>
+            <a:off x="5088600" y="3303360"/>
+            <a:ext cx="201240" cy="667080"/>
           </a:xfrm>
           <a:prstGeom prst="downArrow">
             <a:avLst>
@@ -6183,7 +6245,7 @@
         <p:spPr>
           <a:xfrm>
             <a:off x="6868080" y="306720"/>
-            <a:ext cx="5041440" cy="2083320"/>
+            <a:ext cx="5041080" cy="2082960"/>
           </a:xfrm>
           <a:prstGeom prst="rect">
             <a:avLst/>
@@ -6226,7 +6288,7 @@
         <p:spPr>
           <a:xfrm>
             <a:off x="6271200" y="2669400"/>
-            <a:ext cx="5630400" cy="3006360"/>
+            <a:ext cx="5630040" cy="3006000"/>
           </a:xfrm>
           <a:prstGeom prst="rect">
             <a:avLst/>
@@ -6271,7 +6333,7 @@
         <p:spPr>
           <a:xfrm>
             <a:off x="129960" y="5709960"/>
-            <a:ext cx="11180880" cy="1087560"/>
+            <a:ext cx="11180520" cy="1087200"/>
           </a:xfrm>
           <a:prstGeom prst="rect">
             <a:avLst/>
@@ -6316,7 +6378,7 @@
         <p:spPr>
           <a:xfrm>
             <a:off x="207000" y="1787400"/>
-            <a:ext cx="5592240" cy="3225600"/>
+            <a:ext cx="5591880" cy="3225240"/>
           </a:xfrm>
           <a:prstGeom prst="rect">
             <a:avLst/>
@@ -6361,7 +6423,7 @@
         <p:spPr>
           <a:xfrm>
             <a:off x="684360" y="4487400"/>
-            <a:ext cx="8532000" cy="1504440"/>
+            <a:ext cx="8531640" cy="1504080"/>
           </a:xfrm>
           <a:prstGeom prst="rect">
             <a:avLst/>
@@ -6410,7 +6472,7 @@
         <p:spPr>
           <a:xfrm>
             <a:off x="684360" y="685800"/>
-            <a:ext cx="8532000" cy="3612600"/>
+            <a:ext cx="8531640" cy="3612240"/>
           </a:xfrm>
           <a:prstGeom prst="rect">
             <a:avLst/>
@@ -6429,7 +6491,7 @@
         <p:txBody>
           <a:bodyPr lIns="90000" rIns="90000" tIns="45000" bIns="45000" anchor="ctr"/>
           <a:p>
-            <a:pPr marL="285840" indent="-283320">
+            <a:pPr marL="285840" indent="-282960">
               <a:lnSpc>
                 <a:spcPct val="100000"/>
               </a:lnSpc>
@@ -6481,7 +6543,7 @@
             </a:endParaRPr>
           </a:p>
           <a:p>
-            <a:pPr marL="285840" indent="-283320">
+            <a:pPr marL="285840" indent="-282960">
               <a:lnSpc>
                 <a:spcPct val="100000"/>
               </a:lnSpc>
@@ -6523,7 +6585,7 @@
             </a:endParaRPr>
           </a:p>
           <a:p>
-            <a:pPr marL="285840" indent="-283320">
+            <a:pPr marL="285840" indent="-282960">
               <a:lnSpc>
                 <a:spcPct val="100000"/>
               </a:lnSpc>
@@ -6575,7 +6637,7 @@
             </a:endParaRPr>
           </a:p>
           <a:p>
-            <a:pPr marL="285840" indent="-283320">
+            <a:pPr marL="285840" indent="-282960">
               <a:lnSpc>
                 <a:spcPct val="100000"/>
               </a:lnSpc>
@@ -6743,7 +6805,7 @@
         <p:spPr>
           <a:xfrm>
             <a:off x="4629600" y="1832040"/>
-            <a:ext cx="852120" cy="852120"/>
+            <a:ext cx="851760" cy="851760"/>
           </a:xfrm>
           <a:prstGeom prst="rect">
             <a:avLst/>
@@ -6766,7 +6828,7 @@
         <p:spPr>
           <a:xfrm>
             <a:off x="4463640" y="4185360"/>
-            <a:ext cx="1178640" cy="470880"/>
+            <a:ext cx="1178280" cy="470520"/>
           </a:xfrm>
           <a:prstGeom prst="rect">
             <a:avLst/>
@@ -6789,7 +6851,7 @@
         <p:spPr>
           <a:xfrm>
             <a:off x="4586040" y="2785680"/>
-            <a:ext cx="895680" cy="1037880"/>
+            <a:ext cx="895320" cy="1037520"/>
           </a:xfrm>
           <a:prstGeom prst="rect">
             <a:avLst/>
@@ -6812,7 +6874,7 @@
         <p:spPr>
           <a:xfrm>
             <a:off x="250560" y="1953720"/>
-            <a:ext cx="911880" cy="911880"/>
+            <a:ext cx="911520" cy="911520"/>
           </a:xfrm>
           <a:prstGeom prst="rect">
             <a:avLst/>
@@ -6835,7 +6897,7 @@
         <p:spPr>
           <a:xfrm>
             <a:off x="271440" y="3259800"/>
-            <a:ext cx="911880" cy="911880"/>
+            <a:ext cx="911520" cy="911520"/>
           </a:xfrm>
           <a:prstGeom prst="rect">
             <a:avLst/>
@@ -6858,7 +6920,7 @@
         <p:spPr>
           <a:xfrm>
             <a:off x="2440800" y="2741040"/>
-            <a:ext cx="911880" cy="911880"/>
+            <a:ext cx="911520" cy="911520"/>
           </a:xfrm>
           <a:prstGeom prst="rect">
             <a:avLst/>
@@ -6876,8 +6938,8 @@
         </p:nvSpPr>
         <p:spPr>
           <a:xfrm rot="1192200">
-            <a:off x="1578960" y="2561040"/>
-            <a:ext cx="975960" cy="482040"/>
+            <a:off x="1578600" y="2560680"/>
+            <a:ext cx="975600" cy="481680"/>
           </a:xfrm>
           <a:prstGeom prst="rightArrow">
             <a:avLst>
@@ -6918,8 +6980,8 @@
         </p:nvSpPr>
         <p:spPr>
           <a:xfrm rot="20407800">
-            <a:off x="1558440" y="3348360"/>
-            <a:ext cx="975960" cy="482040"/>
+            <a:off x="1558080" y="3348360"/>
+            <a:ext cx="975600" cy="481680"/>
           </a:xfrm>
           <a:prstGeom prst="rightArrow">
             <a:avLst>
@@ -6960,8 +7022,8 @@
         </p:nvSpPr>
         <p:spPr>
           <a:xfrm rot="1192200">
-            <a:off x="3332520" y="3669480"/>
-            <a:ext cx="975960" cy="482040"/>
+            <a:off x="3332160" y="3669120"/>
+            <a:ext cx="975600" cy="481680"/>
           </a:xfrm>
           <a:prstGeom prst="rightArrow">
             <a:avLst>
@@ -7002,8 +7064,8 @@
         </p:nvSpPr>
         <p:spPr>
           <a:xfrm rot="20407800">
-            <a:off x="3406680" y="2343960"/>
-            <a:ext cx="975960" cy="482040"/>
+            <a:off x="3406320" y="2343960"/>
+            <a:ext cx="975600" cy="481680"/>
           </a:xfrm>
           <a:prstGeom prst="rightArrow">
             <a:avLst>
@@ -7045,7 +7107,7 @@
         <p:spPr>
           <a:xfrm>
             <a:off x="3483720" y="3004200"/>
-            <a:ext cx="975960" cy="482040"/>
+            <a:ext cx="975600" cy="481680"/>
           </a:xfrm>
           <a:prstGeom prst="rightArrow">
             <a:avLst>
@@ -7091,7 +7153,7 @@
         <p:spPr>
           <a:xfrm>
             <a:off x="5819760" y="5709960"/>
-            <a:ext cx="911880" cy="911880"/>
+            <a:ext cx="911520" cy="911520"/>
           </a:xfrm>
           <a:prstGeom prst="rect">
             <a:avLst/>
@@ -7114,7 +7176,7 @@
         <p:spPr>
           <a:xfrm>
             <a:off x="2060640" y="5759640"/>
-            <a:ext cx="911880" cy="911880"/>
+            <a:ext cx="911520" cy="911520"/>
           </a:xfrm>
           <a:prstGeom prst="rect">
             <a:avLst/>
@@ -7137,7 +7199,7 @@
         <p:spPr>
           <a:xfrm>
             <a:off x="9383040" y="5709960"/>
-            <a:ext cx="911880" cy="911880"/>
+            <a:ext cx="911520" cy="911520"/>
           </a:xfrm>
           <a:prstGeom prst="rect">
             <a:avLst/>
@@ -7160,7 +7222,7 @@
         <p:spPr>
           <a:xfrm>
             <a:off x="7495920" y="5709960"/>
-            <a:ext cx="911880" cy="911880"/>
+            <a:ext cx="911520" cy="911520"/>
           </a:xfrm>
           <a:prstGeom prst="rect">
             <a:avLst/>
@@ -7183,7 +7245,7 @@
         <p:spPr>
           <a:xfrm>
             <a:off x="4004640" y="5709960"/>
-            <a:ext cx="911880" cy="911880"/>
+            <a:ext cx="911520" cy="911520"/>
           </a:xfrm>
           <a:prstGeom prst="rect">
             <a:avLst/>
@@ -7206,7 +7268,7 @@
         <p:spPr>
           <a:xfrm>
             <a:off x="276120" y="5759640"/>
-            <a:ext cx="911880" cy="911880"/>
+            <a:ext cx="911520" cy="911520"/>
           </a:xfrm>
           <a:prstGeom prst="rect">
             <a:avLst/>
@@ -7225,7 +7287,7 @@
         <p:spPr>
           <a:xfrm>
             <a:off x="1230120" y="6098760"/>
-            <a:ext cx="680400" cy="259560"/>
+            <a:ext cx="680040" cy="259200"/>
           </a:xfrm>
           <a:prstGeom prst="rightArrow">
             <a:avLst>
@@ -7264,7 +7326,7 @@
         <p:spPr>
           <a:xfrm>
             <a:off x="3103920" y="6117480"/>
-            <a:ext cx="680400" cy="259560"/>
+            <a:ext cx="680040" cy="259200"/>
           </a:xfrm>
           <a:prstGeom prst="rightArrow">
             <a:avLst>
@@ -7303,7 +7365,7 @@
         <p:spPr>
           <a:xfrm>
             <a:off x="4958640" y="6109200"/>
-            <a:ext cx="680400" cy="259560"/>
+            <a:ext cx="680040" cy="259200"/>
           </a:xfrm>
           <a:prstGeom prst="rightArrow">
             <a:avLst>
@@ -7342,7 +7404,7 @@
         <p:spPr>
           <a:xfrm>
             <a:off x="6754320" y="6098760"/>
-            <a:ext cx="680400" cy="259560"/>
+            <a:ext cx="680040" cy="259200"/>
           </a:xfrm>
           <a:prstGeom prst="rightArrow">
             <a:avLst>
@@ -7381,7 +7443,7 @@
         <p:spPr>
           <a:xfrm>
             <a:off x="8468280" y="6085800"/>
-            <a:ext cx="680400" cy="259560"/>
+            <a:ext cx="680040" cy="259200"/>
           </a:xfrm>
           <a:prstGeom prst="rightArrow">
             <a:avLst>
@@ -7424,7 +7486,7 @@
         <p:spPr>
           <a:xfrm>
             <a:off x="6582600" y="3915000"/>
-            <a:ext cx="911880" cy="911880"/>
+            <a:ext cx="911520" cy="911520"/>
           </a:xfrm>
           <a:prstGeom prst="rect">
             <a:avLst/>
@@ -7447,7 +7509,7 @@
         <p:spPr>
           <a:xfrm>
             <a:off x="8674920" y="3965760"/>
-            <a:ext cx="911880" cy="911880"/>
+            <a:ext cx="911520" cy="911520"/>
           </a:xfrm>
           <a:prstGeom prst="rect">
             <a:avLst/>
@@ -7470,7 +7532,7 @@
         <p:spPr>
           <a:xfrm>
             <a:off x="7203600" y="2661480"/>
-            <a:ext cx="911880" cy="911880"/>
+            <a:ext cx="911520" cy="911520"/>
           </a:xfrm>
           <a:prstGeom prst="rect">
             <a:avLst/>
@@ -7493,7 +7555,7 @@
         <p:spPr>
           <a:xfrm>
             <a:off x="10398960" y="3368880"/>
-            <a:ext cx="911880" cy="911880"/>
+            <a:ext cx="911520" cy="911520"/>
           </a:xfrm>
           <a:prstGeom prst="rect">
             <a:avLst/>
@@ -7516,7 +7578,7 @@
         <p:spPr>
           <a:xfrm>
             <a:off x="7002000" y="5015520"/>
-            <a:ext cx="911880" cy="911880"/>
+            <a:ext cx="911520" cy="911520"/>
           </a:xfrm>
           <a:prstGeom prst="rect">
             <a:avLst/>
@@ -7534,8 +7596,8 @@
         </p:nvSpPr>
         <p:spPr>
           <a:xfrm rot="3732600">
-            <a:off x="9843480" y="3700080"/>
-            <a:ext cx="201600" cy="667440"/>
+            <a:off x="9843840" y="3699720"/>
+            <a:ext cx="201240" cy="667080"/>
           </a:xfrm>
           <a:prstGeom prst="downArrow">
             <a:avLst>
@@ -7574,7 +7636,7 @@
         <p:spPr>
           <a:xfrm rot="14618400">
             <a:off x="8193240" y="4699800"/>
-            <a:ext cx="201600" cy="667440"/>
+            <a:ext cx="201240" cy="667080"/>
           </a:xfrm>
           <a:prstGeom prst="downArrow">
             <a:avLst>
@@ -7612,8 +7674,8 @@
         </p:nvSpPr>
         <p:spPr>
           <a:xfrm rot="5400000">
-            <a:off x="8040240" y="4068360"/>
-            <a:ext cx="201600" cy="667440"/>
+            <a:off x="8040600" y="4068360"/>
+            <a:ext cx="201240" cy="667080"/>
           </a:xfrm>
           <a:prstGeom prst="downArrow">
             <a:avLst>
@@ -7652,7 +7714,7 @@
         <p:spPr>
           <a:xfrm rot="7014000">
             <a:off x="8274240" y="3488400"/>
-            <a:ext cx="201600" cy="667440"/>
+            <a:ext cx="201240" cy="667080"/>
           </a:xfrm>
           <a:prstGeom prst="downArrow">
             <a:avLst>
@@ -7690,8 +7752,8 @@
         </p:nvSpPr>
         <p:spPr>
           <a:xfrm rot="1747800">
-            <a:off x="7095600" y="3425760"/>
-            <a:ext cx="201600" cy="667440"/>
+            <a:off x="7095600" y="3425400"/>
+            <a:ext cx="201240" cy="667080"/>
           </a:xfrm>
           <a:prstGeom prst="downArrow">
             <a:avLst>
@@ -7734,7 +7796,7 @@
         <p:spPr>
           <a:xfrm>
             <a:off x="8641080" y="309600"/>
-            <a:ext cx="911880" cy="911880"/>
+            <a:ext cx="911520" cy="911520"/>
           </a:xfrm>
           <a:prstGeom prst="rect">
             <a:avLst/>
@@ -7757,7 +7819,7 @@
         <p:spPr>
           <a:xfrm>
             <a:off x="10568880" y="1497240"/>
-            <a:ext cx="911880" cy="911880"/>
+            <a:ext cx="911520" cy="911520"/>
           </a:xfrm>
           <a:prstGeom prst="rect">
             <a:avLst/>
@@ -7780,7 +7842,7 @@
         <p:spPr>
           <a:xfrm>
             <a:off x="6932880" y="1497240"/>
-            <a:ext cx="911880" cy="911880"/>
+            <a:ext cx="911520" cy="911520"/>
           </a:xfrm>
           <a:prstGeom prst="rect">
             <a:avLst/>
@@ -7799,7 +7861,7 @@
         <p:spPr>
           <a:xfrm>
             <a:off x="8173800" y="1774080"/>
-            <a:ext cx="2066040" cy="358200"/>
+            <a:ext cx="2065680" cy="357840"/>
           </a:xfrm>
           <a:prstGeom prst="rightArrow">
             <a:avLst>
@@ -7838,7 +7900,7 @@
         <p:spPr>
           <a:xfrm>
             <a:off x="8947440" y="1361160"/>
-            <a:ext cx="299160" cy="404640"/>
+            <a:ext cx="298800" cy="404280"/>
           </a:xfrm>
           <a:prstGeom prst="downArrow">
             <a:avLst>
@@ -7926,7 +7988,7 @@
         <p:spPr>
           <a:xfrm>
             <a:off x="0" y="0"/>
-            <a:ext cx="12189600" cy="6855480"/>
+            <a:ext cx="12189240" cy="6855120"/>
           </a:xfrm>
           <a:prstGeom prst="rect">
             <a:avLst/>
@@ -7979,7 +8041,7 @@
         <p:spPr>
           <a:xfrm>
             <a:off x="640440" y="685800"/>
-            <a:ext cx="4816080" cy="4601160"/>
+            <a:ext cx="4815720" cy="4600800"/>
           </a:xfrm>
           <a:prstGeom prst="rect">
             <a:avLst/>
@@ -8030,7 +8092,7 @@
         <p:spPr>
           <a:xfrm>
             <a:off x="6095880" y="0"/>
-            <a:ext cx="6093360" cy="6855480"/>
+            <a:ext cx="6093000" cy="6855120"/>
           </a:xfrm>
           <a:prstGeom prst="rect">
             <a:avLst/>
@@ -8068,7 +8130,7 @@
         <p:spPr>
           <a:xfrm>
             <a:off x="6625800" y="685800"/>
-            <a:ext cx="4876560" cy="4601160"/>
+            <a:ext cx="4876200" cy="4600800"/>
           </a:xfrm>
           <a:prstGeom prst="rect">
             <a:avLst/>
@@ -8089,7 +8151,7 @@
             <a:normAutofit/>
           </a:bodyPr>
           <a:p>
-            <a:pPr marL="285840" indent="-283320">
+            <a:pPr marL="285840" indent="-282960">
               <a:lnSpc>
                 <a:spcPct val="100000"/>
               </a:lnSpc>
@@ -8121,7 +8183,7 @@
             </a:endParaRPr>
           </a:p>
           <a:p>
-            <a:pPr marL="285840" indent="-283320">
+            <a:pPr marL="285840" indent="-282960">
               <a:lnSpc>
                 <a:spcPct val="100000"/>
               </a:lnSpc>
@@ -8153,7 +8215,7 @@
             </a:endParaRPr>
           </a:p>
           <a:p>
-            <a:pPr marL="285840" indent="-283320">
+            <a:pPr marL="285840" indent="-282960">
               <a:lnSpc>
                 <a:spcPct val="100000"/>
               </a:lnSpc>
@@ -8185,7 +8247,7 @@
             </a:endParaRPr>
           </a:p>
           <a:p>
-            <a:pPr marL="285840" indent="-283320">
+            <a:pPr marL="285840" indent="-282960">
               <a:lnSpc>
                 <a:spcPct val="100000"/>
               </a:lnSpc>
@@ -8217,7 +8279,7 @@
             </a:endParaRPr>
           </a:p>
           <a:p>
-            <a:pPr marL="285840" indent="-283320">
+            <a:pPr marL="285840" indent="-282960">
               <a:lnSpc>
                 <a:spcPct val="100000"/>
               </a:lnSpc>
@@ -8281,7 +8343,7 @@
         <p:spPr>
           <a:xfrm>
             <a:off x="684360" y="4487400"/>
-            <a:ext cx="8532000" cy="1504440"/>
+            <a:ext cx="8531640" cy="1504080"/>
           </a:xfrm>
           <a:prstGeom prst="rect">
             <a:avLst/>
@@ -8330,7 +8392,7 @@
         <p:spPr>
           <a:xfrm>
             <a:off x="684360" y="685800"/>
-            <a:ext cx="8532000" cy="3612600"/>
+            <a:ext cx="8531640" cy="3612240"/>
           </a:xfrm>
           <a:prstGeom prst="rect">
             <a:avLst/>
@@ -8349,7 +8411,7 @@
         <p:txBody>
           <a:bodyPr lIns="90000" rIns="90000" tIns="45000" bIns="45000" anchor="ctr"/>
           <a:p>
-            <a:pPr marL="285840" indent="-283320">
+            <a:pPr marL="285840" indent="-282960">
               <a:lnSpc>
                 <a:spcPct val="100000"/>
               </a:lnSpc>
@@ -8381,7 +8443,7 @@
             </a:endParaRPr>
           </a:p>
           <a:p>
-            <a:pPr marL="285840" indent="-283320">
+            <a:pPr marL="285840" indent="-282960">
               <a:lnSpc>
                 <a:spcPct val="100000"/>
               </a:lnSpc>
@@ -8491,7 +8553,7 @@
         <p:spPr>
           <a:xfrm>
             <a:off x="6995520" y="1949760"/>
-            <a:ext cx="852120" cy="852120"/>
+            <a:ext cx="851760" cy="851760"/>
           </a:xfrm>
           <a:prstGeom prst="rect">
             <a:avLst/>
@@ -8514,7 +8576,7 @@
         <p:spPr>
           <a:xfrm>
             <a:off x="6829560" y="4303080"/>
-            <a:ext cx="1178640" cy="470880"/>
+            <a:ext cx="1178280" cy="470520"/>
           </a:xfrm>
           <a:prstGeom prst="rect">
             <a:avLst/>
@@ -8537,7 +8599,7 @@
         <p:spPr>
           <a:xfrm>
             <a:off x="6951960" y="2903040"/>
-            <a:ext cx="895680" cy="1037880"/>
+            <a:ext cx="895320" cy="1037520"/>
           </a:xfrm>
           <a:prstGeom prst="rect">
             <a:avLst/>
@@ -8560,7 +8622,7 @@
         <p:spPr>
           <a:xfrm>
             <a:off x="2616120" y="2071080"/>
-            <a:ext cx="911880" cy="911880"/>
+            <a:ext cx="911520" cy="911520"/>
           </a:xfrm>
           <a:prstGeom prst="rect">
             <a:avLst/>
@@ -8583,7 +8645,7 @@
         <p:spPr>
           <a:xfrm>
             <a:off x="2637000" y="3377160"/>
-            <a:ext cx="911880" cy="911880"/>
+            <a:ext cx="911520" cy="911520"/>
           </a:xfrm>
           <a:prstGeom prst="rect">
             <a:avLst/>
@@ -8601,8 +8663,8 @@
         </p:nvSpPr>
         <p:spPr>
           <a:xfrm rot="1192200">
-            <a:off x="3944520" y="2678400"/>
-            <a:ext cx="975960" cy="482040"/>
+            <a:off x="3944160" y="2678040"/>
+            <a:ext cx="975600" cy="481680"/>
           </a:xfrm>
           <a:prstGeom prst="rightArrow">
             <a:avLst>
@@ -8643,8 +8705,8 @@
         </p:nvSpPr>
         <p:spPr>
           <a:xfrm rot="20407800">
-            <a:off x="3924000" y="3465720"/>
-            <a:ext cx="975960" cy="482040"/>
+            <a:off x="3923640" y="3465720"/>
+            <a:ext cx="975600" cy="481680"/>
           </a:xfrm>
           <a:prstGeom prst="rightArrow">
             <a:avLst>
@@ -8685,8 +8747,8 @@
         </p:nvSpPr>
         <p:spPr>
           <a:xfrm rot="1192200">
-            <a:off x="5698440" y="3786840"/>
-            <a:ext cx="975960" cy="482040"/>
+            <a:off x="5698080" y="3786480"/>
+            <a:ext cx="975600" cy="481680"/>
           </a:xfrm>
           <a:prstGeom prst="rightArrow">
             <a:avLst>
@@ -8727,8 +8789,8 @@
         </p:nvSpPr>
         <p:spPr>
           <a:xfrm rot="20407800">
-            <a:off x="5772240" y="2461320"/>
-            <a:ext cx="975960" cy="482040"/>
+            <a:off x="5771880" y="2461320"/>
+            <a:ext cx="975600" cy="481680"/>
           </a:xfrm>
           <a:prstGeom prst="rightArrow">
             <a:avLst>
@@ -8770,7 +8832,7 @@
         <p:spPr>
           <a:xfrm>
             <a:off x="5849640" y="3121560"/>
-            <a:ext cx="975960" cy="482040"/>
+            <a:ext cx="975600" cy="481680"/>
           </a:xfrm>
           <a:prstGeom prst="rightArrow">
             <a:avLst>
@@ -8816,7 +8878,7 @@
         <p:spPr>
           <a:xfrm>
             <a:off x="4950720" y="2998800"/>
-            <a:ext cx="754200" cy="754200"/>
+            <a:ext cx="753840" cy="753840"/>
           </a:xfrm>
           <a:prstGeom prst="rect">
             <a:avLst/>
@@ -8857,7 +8919,7 @@
         <p:spPr>
           <a:xfrm>
             <a:off x="684360" y="4487400"/>
-            <a:ext cx="8532000" cy="1504440"/>
+            <a:ext cx="8531640" cy="1504080"/>
           </a:xfrm>
           <a:prstGeom prst="rect">
             <a:avLst/>
@@ -8906,7 +8968,7 @@
         <p:spPr>
           <a:xfrm>
             <a:off x="684360" y="685800"/>
-            <a:ext cx="8532000" cy="3612600"/>
+            <a:ext cx="8531640" cy="3612240"/>
           </a:xfrm>
           <a:prstGeom prst="rect">
             <a:avLst/>
@@ -8925,7 +8987,7 @@
         <p:txBody>
           <a:bodyPr lIns="90000" rIns="90000" tIns="45000" bIns="45000" anchor="ctr"/>
           <a:p>
-            <a:pPr marL="285840" indent="-283320">
+            <a:pPr marL="285840" indent="-282960">
               <a:lnSpc>
                 <a:spcPct val="100000"/>
               </a:lnSpc>
@@ -9051,7 +9113,7 @@
             </a:endParaRPr>
           </a:p>
           <a:p>
-            <a:pPr marL="285840" indent="-283320">
+            <a:pPr marL="285840" indent="-282960">
               <a:lnSpc>
                 <a:spcPct val="100000"/>
               </a:lnSpc>
@@ -9143,7 +9205,7 @@
         <p:spPr>
           <a:xfrm>
             <a:off x="3562560" y="1395720"/>
-            <a:ext cx="911880" cy="911880"/>
+            <a:ext cx="911520" cy="911520"/>
           </a:xfrm>
           <a:prstGeom prst="rect">
             <a:avLst/>
@@ -9166,7 +9228,7 @@
         <p:spPr>
           <a:xfrm>
             <a:off x="6678360" y="1395720"/>
-            <a:ext cx="911880" cy="911880"/>
+            <a:ext cx="911520" cy="911520"/>
           </a:xfrm>
           <a:prstGeom prst="rect">
             <a:avLst/>
@@ -9189,7 +9251,7 @@
         <p:spPr>
           <a:xfrm>
             <a:off x="7042320" y="3904200"/>
-            <a:ext cx="911880" cy="911880"/>
+            <a:ext cx="911520" cy="911520"/>
           </a:xfrm>
           <a:prstGeom prst="rect">
             <a:avLst/>
@@ -9212,7 +9274,7 @@
         <p:spPr>
           <a:xfrm>
             <a:off x="3562560" y="3904200"/>
-            <a:ext cx="911880" cy="911880"/>
+            <a:ext cx="911520" cy="911520"/>
           </a:xfrm>
           <a:prstGeom prst="rect">
             <a:avLst/>
@@ -9235,7 +9297,7 @@
         <p:spPr>
           <a:xfrm>
             <a:off x="6678360" y="1395720"/>
-            <a:ext cx="911880" cy="911880"/>
+            <a:ext cx="911520" cy="911520"/>
           </a:xfrm>
           <a:prstGeom prst="rect">
             <a:avLst/>
@@ -9258,7 +9320,7 @@
         <p:spPr>
           <a:xfrm>
             <a:off x="4113000" y="2039400"/>
-            <a:ext cx="911880" cy="911880"/>
+            <a:ext cx="911520" cy="911520"/>
           </a:xfrm>
           <a:prstGeom prst="rect">
             <a:avLst/>
@@ -9281,7 +9343,7 @@
         <p:spPr>
           <a:xfrm>
             <a:off x="7296480" y="2133000"/>
-            <a:ext cx="911880" cy="911880"/>
+            <a:ext cx="911520" cy="911520"/>
           </a:xfrm>
           <a:prstGeom prst="rect">
             <a:avLst/>
@@ -9300,7 +9362,7 @@
         <p:spPr>
           <a:xfrm>
             <a:off x="5285160" y="1920960"/>
-            <a:ext cx="1180440" cy="542880"/>
+            <a:ext cx="1180080" cy="542520"/>
           </a:xfrm>
           <a:prstGeom prst="rightArrow">
             <a:avLst>
@@ -9342,7 +9404,7 @@
         <p:spPr>
           <a:xfrm>
             <a:off x="5149440" y="4088880"/>
-            <a:ext cx="1180440" cy="542880"/>
+            <a:ext cx="1180080" cy="542520"/>
           </a:xfrm>
           <a:prstGeom prst="rightArrow">
             <a:avLst>
@@ -9407,7 +9469,7 @@
         <p:spPr>
           <a:xfrm>
             <a:off x="4895280" y="2388600"/>
-            <a:ext cx="2705400" cy="362520"/>
+            <a:ext cx="2705040" cy="362160"/>
           </a:xfrm>
           <a:prstGeom prst="rect">
             <a:avLst/>
@@ -9456,7 +9518,7 @@
         <p:spPr>
           <a:xfrm>
             <a:off x="5027400" y="4575240"/>
-            <a:ext cx="2325240" cy="362520"/>
+            <a:ext cx="2324880" cy="362160"/>
           </a:xfrm>
           <a:prstGeom prst="rect">
             <a:avLst/>
@@ -9527,7 +9589,7 @@
         <p:spPr>
           <a:xfrm>
             <a:off x="684360" y="4487400"/>
-            <a:ext cx="8532000" cy="1504440"/>
+            <a:ext cx="8531640" cy="1504080"/>
           </a:xfrm>
           <a:prstGeom prst="rect">
             <a:avLst/>
@@ -9576,7 +9638,7 @@
         <p:spPr>
           <a:xfrm>
             <a:off x="684360" y="685800"/>
-            <a:ext cx="8532000" cy="3612600"/>
+            <a:ext cx="8531640" cy="3612240"/>
           </a:xfrm>
           <a:prstGeom prst="rect">
             <a:avLst/>
@@ -9595,7 +9657,7 @@
         <p:txBody>
           <a:bodyPr lIns="90000" rIns="90000" tIns="45000" bIns="45000" anchor="ctr"/>
           <a:p>
-            <a:pPr marL="285840" indent="-283320">
+            <a:pPr marL="285840" indent="-282960">
               <a:lnSpc>
                 <a:spcPct val="100000"/>
               </a:lnSpc>
@@ -9717,7 +9779,7 @@
         <p:spPr>
           <a:xfrm>
             <a:off x="1863000" y="3157920"/>
-            <a:ext cx="911880" cy="911880"/>
+            <a:ext cx="911520" cy="911520"/>
           </a:xfrm>
           <a:prstGeom prst="rect">
             <a:avLst/>
@@ -9740,7 +9802,7 @@
         <p:spPr>
           <a:xfrm>
             <a:off x="2413440" y="3801600"/>
-            <a:ext cx="911880" cy="911880"/>
+            <a:ext cx="911520" cy="911520"/>
           </a:xfrm>
           <a:prstGeom prst="rect">
             <a:avLst/>
@@ -9763,7 +9825,7 @@
         <p:spPr>
           <a:xfrm>
             <a:off x="7197480" y="3439800"/>
-            <a:ext cx="911880" cy="911880"/>
+            <a:ext cx="911520" cy="911520"/>
           </a:xfrm>
           <a:prstGeom prst="rect">
             <a:avLst/>
@@ -9786,7 +9848,7 @@
         <p:spPr>
           <a:xfrm>
             <a:off x="4758840" y="3366360"/>
-            <a:ext cx="911880" cy="911880"/>
+            <a:ext cx="911520" cy="911520"/>
           </a:xfrm>
           <a:prstGeom prst="rect">
             <a:avLst/>
@@ -9805,7 +9867,7 @@
         <p:spPr>
           <a:xfrm>
             <a:off x="3568680" y="3429000"/>
-            <a:ext cx="934920" cy="911880"/>
+            <a:ext cx="934560" cy="911520"/>
           </a:xfrm>
           <a:prstGeom prst="mathPlus">
             <a:avLst>
@@ -9843,7 +9905,7 @@
         <p:spPr>
           <a:xfrm>
             <a:off x="6095880" y="3654360"/>
-            <a:ext cx="735840" cy="563760"/>
+            <a:ext cx="735480" cy="563400"/>
           </a:xfrm>
           <a:prstGeom prst="mathEqual">
             <a:avLst>
@@ -9904,7 +9966,7 @@
         <p:spPr>
           <a:xfrm>
             <a:off x="4750920" y="2898360"/>
-            <a:ext cx="2687400" cy="3717360"/>
+            <a:ext cx="2687040" cy="3717000"/>
           </a:xfrm>
           <a:prstGeom prst="rect">
             <a:avLst/>
@@ -9947,7 +10009,7 @@
         <p:spPr>
           <a:xfrm>
             <a:off x="684360" y="4487400"/>
-            <a:ext cx="8532000" cy="1504440"/>
+            <a:ext cx="8531640" cy="1504080"/>
           </a:xfrm>
           <a:prstGeom prst="rect">
             <a:avLst/>
@@ -9996,7 +10058,7 @@
         <p:spPr>
           <a:xfrm>
             <a:off x="684360" y="685800"/>
-            <a:ext cx="8532000" cy="3612600"/>
+            <a:ext cx="8531640" cy="3612240"/>
           </a:xfrm>
           <a:prstGeom prst="rect">
             <a:avLst/>
@@ -10015,7 +10077,7 @@
         <p:txBody>
           <a:bodyPr lIns="90000" rIns="90000" tIns="45000" bIns="45000" anchor="ctr"/>
           <a:p>
-            <a:pPr marL="285840" indent="-283320">
+            <a:pPr marL="285840" indent="-282960">
               <a:lnSpc>
                 <a:spcPct val="100000"/>
               </a:lnSpc>
@@ -10151,7 +10213,7 @@
         <p:spPr>
           <a:xfrm>
             <a:off x="4843440" y="2989800"/>
-            <a:ext cx="639360" cy="639360"/>
+            <a:ext cx="639000" cy="639000"/>
           </a:xfrm>
           <a:prstGeom prst="rect">
             <a:avLst/>
@@ -10174,7 +10236,7 @@
         <p:spPr>
           <a:xfrm>
             <a:off x="5028120" y="4248360"/>
-            <a:ext cx="911880" cy="911880"/>
+            <a:ext cx="911520" cy="911520"/>
           </a:xfrm>
           <a:prstGeom prst="rect">
             <a:avLst/>
@@ -10197,7 +10259,7 @@
         <p:spPr>
           <a:xfrm>
             <a:off x="5506200" y="5025240"/>
-            <a:ext cx="911880" cy="911880"/>
+            <a:ext cx="911520" cy="911520"/>
           </a:xfrm>
           <a:prstGeom prst="rect">
             <a:avLst/>
@@ -10220,7 +10282,7 @@
         <p:spPr>
           <a:xfrm>
             <a:off x="6042600" y="4248360"/>
-            <a:ext cx="911880" cy="911880"/>
+            <a:ext cx="911520" cy="911520"/>
           </a:xfrm>
           <a:prstGeom prst="rect">
             <a:avLst/>
@@ -10243,7 +10305,7 @@
         <p:spPr>
           <a:xfrm>
             <a:off x="7944480" y="2602440"/>
-            <a:ext cx="911880" cy="911880"/>
+            <a:ext cx="911520" cy="911520"/>
           </a:xfrm>
           <a:prstGeom prst="rect">
             <a:avLst/>
@@ -10266,7 +10328,7 @@
         <p:spPr>
           <a:xfrm>
             <a:off x="6671160" y="3059640"/>
-            <a:ext cx="569160" cy="569160"/>
+            <a:ext cx="568800" cy="568800"/>
           </a:xfrm>
           <a:prstGeom prst="rect">
             <a:avLst/>
@@ -10289,7 +10351,7 @@
         <p:spPr>
           <a:xfrm>
             <a:off x="2973240" y="3863520"/>
-            <a:ext cx="911880" cy="911880"/>
+            <a:ext cx="911520" cy="911520"/>
           </a:xfrm>
           <a:prstGeom prst="rect">
             <a:avLst/>
@@ -10308,7 +10370,7 @@
         <p:spPr>
           <a:xfrm>
             <a:off x="4012560" y="4487400"/>
-            <a:ext cx="1491120" cy="854640"/>
+            <a:ext cx="1490760" cy="854280"/>
           </a:xfrm>
           <a:custGeom>
             <a:avLst/>
@@ -10360,7 +10422,7 @@
         <p:spPr>
           <a:xfrm>
             <a:off x="4012560" y="4248360"/>
-            <a:ext cx="2027520" cy="236520"/>
+            <a:ext cx="2027160" cy="236160"/>
           </a:xfrm>
           <a:custGeom>
             <a:avLst/>
@@ -10412,7 +10474,7 @@
         <p:spPr>
           <a:xfrm>
             <a:off x="4012560" y="4367880"/>
-            <a:ext cx="936360" cy="237240"/>
+            <a:ext cx="936000" cy="236880"/>
           </a:xfrm>
           <a:custGeom>
             <a:avLst/>
@@ -10464,7 +10526,7 @@
         <p:spPr>
           <a:xfrm flipV="1">
             <a:off x="7242840" y="3219840"/>
-            <a:ext cx="627120" cy="120600"/>
+            <a:ext cx="626760" cy="120240"/>
           </a:xfrm>
           <a:custGeom>
             <a:avLst/>
@@ -10539,7 +10601,7 @@
         <p:spPr>
           <a:xfrm>
             <a:off x="684360" y="4487400"/>
-            <a:ext cx="8532000" cy="1504440"/>
+            <a:ext cx="8531640" cy="1504080"/>
           </a:xfrm>
           <a:prstGeom prst="rect">
             <a:avLst/>
@@ -10588,7 +10650,7 @@
         <p:spPr>
           <a:xfrm>
             <a:off x="684360" y="685800"/>
-            <a:ext cx="8532000" cy="3612600"/>
+            <a:ext cx="8531640" cy="3612240"/>
           </a:xfrm>
           <a:prstGeom prst="rect">
             <a:avLst/>
@@ -10607,7 +10669,7 @@
         <p:txBody>
           <a:bodyPr lIns="90000" rIns="90000" tIns="45000" bIns="45000" anchor="ctr"/>
           <a:p>
-            <a:pPr marL="285840" indent="-283320">
+            <a:pPr marL="285840" indent="-282960">
               <a:lnSpc>
                 <a:spcPct val="100000"/>
               </a:lnSpc>
@@ -10775,7 +10837,7 @@
         <p:spPr>
           <a:xfrm>
             <a:off x="5430600" y="2730600"/>
-            <a:ext cx="2687400" cy="3717360"/>
+            <a:ext cx="2687040" cy="3717000"/>
           </a:xfrm>
           <a:prstGeom prst="rect">
             <a:avLst/>
@@ -10822,7 +10884,7 @@
         <p:spPr>
           <a:xfrm>
             <a:off x="5523120" y="2822040"/>
-            <a:ext cx="639360" cy="639360"/>
+            <a:ext cx="639000" cy="639000"/>
           </a:xfrm>
           <a:prstGeom prst="rect">
             <a:avLst/>
@@ -10845,7 +10907,7 @@
         <p:spPr>
           <a:xfrm>
             <a:off x="5707800" y="4080600"/>
-            <a:ext cx="911880" cy="911880"/>
+            <a:ext cx="911520" cy="911520"/>
           </a:xfrm>
           <a:prstGeom prst="rect">
             <a:avLst/>
@@ -10868,7 +10930,7 @@
         <p:spPr>
           <a:xfrm>
             <a:off x="6185880" y="4857480"/>
-            <a:ext cx="911880" cy="911880"/>
+            <a:ext cx="911520" cy="911520"/>
           </a:xfrm>
           <a:prstGeom prst="rect">
             <a:avLst/>
@@ -10891,7 +10953,7 @@
         <p:spPr>
           <a:xfrm>
             <a:off x="6722280" y="4080600"/>
-            <a:ext cx="911880" cy="911880"/>
+            <a:ext cx="911520" cy="911520"/>
           </a:xfrm>
           <a:prstGeom prst="rect">
             <a:avLst/>
@@ -10914,7 +10976,7 @@
         <p:spPr>
           <a:xfrm>
             <a:off x="3652920" y="3695760"/>
-            <a:ext cx="911880" cy="911880"/>
+            <a:ext cx="911520" cy="911520"/>
           </a:xfrm>
           <a:prstGeom prst="rect">
             <a:avLst/>
@@ -10933,7 +10995,7 @@
         <p:spPr>
           <a:xfrm>
             <a:off x="4692240" y="4319640"/>
-            <a:ext cx="1491120" cy="854640"/>
+            <a:ext cx="1490760" cy="854280"/>
           </a:xfrm>
           <a:custGeom>
             <a:avLst/>
@@ -10985,7 +11047,7 @@
         <p:spPr>
           <a:xfrm>
             <a:off x="4692240" y="4080600"/>
-            <a:ext cx="2027520" cy="236520"/>
+            <a:ext cx="2027160" cy="236160"/>
           </a:xfrm>
           <a:custGeom>
             <a:avLst/>
@@ -11037,7 +11099,7 @@
         <p:spPr>
           <a:xfrm>
             <a:off x="4692240" y="4200120"/>
-            <a:ext cx="936360" cy="237240"/>
+            <a:ext cx="936000" cy="236880"/>
           </a:xfrm>
           <a:custGeom>
             <a:avLst/>
@@ -11093,7 +11155,7 @@
         <p:spPr>
           <a:xfrm>
             <a:off x="9653760" y="3605400"/>
-            <a:ext cx="911880" cy="911880"/>
+            <a:ext cx="911520" cy="911520"/>
           </a:xfrm>
           <a:prstGeom prst="rect">
             <a:avLst/>
@@ -11111,8 +11173,8 @@
         </p:nvSpPr>
         <p:spPr>
           <a:xfrm rot="10325400">
-            <a:off x="7856640" y="4106880"/>
-            <a:ext cx="1783440" cy="305280"/>
+            <a:off x="7857000" y="4106880"/>
+            <a:ext cx="1783080" cy="304920"/>
           </a:xfrm>
           <a:prstGeom prst="rightArrow">
             <a:avLst>
@@ -11176,7 +11238,7 @@
         <p:spPr>
           <a:xfrm>
             <a:off x="684360" y="4487400"/>
-            <a:ext cx="8532000" cy="1504440"/>
+            <a:ext cx="8531640" cy="1504080"/>
           </a:xfrm>
           <a:prstGeom prst="rect">
             <a:avLst/>
@@ -11225,7 +11287,7 @@
         <p:spPr>
           <a:xfrm>
             <a:off x="684360" y="685800"/>
-            <a:ext cx="8532000" cy="3612600"/>
+            <a:ext cx="8531640" cy="3612240"/>
           </a:xfrm>
           <a:prstGeom prst="rect">
             <a:avLst/>
@@ -11255,7 +11317,7 @@
         <p:spPr>
           <a:xfrm>
             <a:off x="4069440" y="82800"/>
-            <a:ext cx="4043880" cy="2844360"/>
+            <a:ext cx="4043520" cy="2844000"/>
           </a:xfrm>
           <a:prstGeom prst="rect">
             <a:avLst/>
@@ -11278,7 +11340,7 @@
         <p:spPr>
           <a:xfrm>
             <a:off x="83880" y="3103560"/>
-            <a:ext cx="3864960" cy="1641960"/>
+            <a:ext cx="3864600" cy="1641600"/>
           </a:xfrm>
           <a:prstGeom prst="rect">
             <a:avLst/>
@@ -11301,7 +11363,7 @@
         <p:spPr>
           <a:xfrm>
             <a:off x="4161600" y="3103560"/>
-            <a:ext cx="3864960" cy="1641960"/>
+            <a:ext cx="3864600" cy="1641600"/>
           </a:xfrm>
           <a:prstGeom prst="rect">
             <a:avLst/>
@@ -11324,7 +11386,7 @@
         <p:spPr>
           <a:xfrm>
             <a:off x="8230320" y="3103560"/>
-            <a:ext cx="3864960" cy="1641960"/>
+            <a:ext cx="3864600" cy="1641600"/>
           </a:xfrm>
           <a:prstGeom prst="rect">
             <a:avLst/>
@@ -11343,7 +11405,7 @@
         <p:spPr>
           <a:xfrm>
             <a:off x="3993840" y="3766680"/>
-            <a:ext cx="148680" cy="316800"/>
+            <a:ext cx="148320" cy="316440"/>
           </a:xfrm>
           <a:prstGeom prst="rightArrow">
             <a:avLst>
@@ -11382,7 +11444,7 @@
         <p:spPr>
           <a:xfrm>
             <a:off x="8073360" y="3793320"/>
-            <a:ext cx="129600" cy="316800"/>
+            <a:ext cx="129240" cy="316440"/>
           </a:xfrm>
           <a:prstGeom prst="rightArrow">
             <a:avLst>
@@ -11421,7 +11483,7 @@
         <p:spPr>
           <a:xfrm>
             <a:off x="2701080" y="5176080"/>
-            <a:ext cx="1834560" cy="920160"/>
+            <a:ext cx="1834200" cy="919800"/>
           </a:xfrm>
           <a:prstGeom prst="wedgeRectCallout">
             <a:avLst>
@@ -11486,7 +11548,7 @@
         <p:spPr>
           <a:xfrm>
             <a:off x="6722640" y="5196600"/>
-            <a:ext cx="1965960" cy="823320"/>
+            <a:ext cx="1965600" cy="822960"/>
           </a:xfrm>
           <a:prstGeom prst="wedgeRectCallout">
             <a:avLst>
@@ -11551,7 +11613,7 @@
         <p:spPr>
           <a:xfrm>
             <a:off x="9731160" y="5131440"/>
-            <a:ext cx="2103120" cy="654120"/>
+            <a:ext cx="2102760" cy="653760"/>
           </a:xfrm>
           <a:prstGeom prst="wedgeRectCallout">
             <a:avLst>
@@ -11616,7 +11678,7 @@
         <p:spPr>
           <a:xfrm>
             <a:off x="5033520" y="2516760"/>
-            <a:ext cx="2572920" cy="362520"/>
+            <a:ext cx="2572560" cy="362160"/>
           </a:xfrm>
           <a:prstGeom prst="rect">
             <a:avLst/>
@@ -11664,8 +11726,8 @@
         </p:nvSpPr>
         <p:spPr>
           <a:xfrm rot="16200000">
-            <a:off x="3177360" y="1267560"/>
-            <a:ext cx="1962000" cy="362520"/>
+            <a:off x="3177360" y="1267920"/>
+            <a:ext cx="1961640" cy="362160"/>
           </a:xfrm>
           <a:prstGeom prst="rect">
             <a:avLst/>
@@ -11736,7 +11798,7 @@
         <p:spPr>
           <a:xfrm>
             <a:off x="684360" y="4487400"/>
-            <a:ext cx="8532000" cy="1504440"/>
+            <a:ext cx="8531640" cy="1504080"/>
           </a:xfrm>
           <a:prstGeom prst="rect">
             <a:avLst/>
@@ -11787,9 +11849,9 @@
         <p:grpSpPr>
           <a:xfrm>
             <a:off x="948240" y="823320"/>
-            <a:ext cx="10289880" cy="3337200"/>
+            <a:ext cx="10289520" cy="3336840"/>
             <a:chOff x="948240" y="823320"/>
-            <a:chExt cx="10289880" cy="3337200"/>
+            <a:chExt cx="10289520" cy="3336840"/>
           </a:xfrm>
         </p:grpSpPr>
         <p:sp>
@@ -11801,7 +11863,7 @@
           <p:spPr>
             <a:xfrm>
               <a:off x="948240" y="823320"/>
-              <a:ext cx="1360080" cy="1360080"/>
+              <a:ext cx="1359720" cy="1359720"/>
             </a:xfrm>
             <a:prstGeom prst="ellipse">
               <a:avLst/>
@@ -11834,7 +11896,7 @@
           <p:spPr>
             <a:xfrm>
               <a:off x="1234440" y="1109520"/>
-              <a:ext cx="787680" cy="787680"/>
+              <a:ext cx="787320" cy="787320"/>
             </a:xfrm>
             <a:prstGeom prst="rect">
               <a:avLst/>
@@ -11865,7 +11927,7 @@
           <p:spPr>
             <a:xfrm>
               <a:off x="2602800" y="823320"/>
-              <a:ext cx="3209400" cy="1360080"/>
+              <a:ext cx="3209040" cy="1359720"/>
             </a:xfrm>
             <a:prstGeom prst="rect">
               <a:avLst/>
@@ -11917,7 +11979,7 @@
           <p:spPr>
             <a:xfrm>
               <a:off x="6374160" y="823320"/>
-              <a:ext cx="1360080" cy="1360080"/>
+              <a:ext cx="1359720" cy="1359720"/>
             </a:xfrm>
             <a:prstGeom prst="ellipse">
               <a:avLst/>
@@ -11950,7 +12012,7 @@
           <p:spPr>
             <a:xfrm>
               <a:off x="6660360" y="1109520"/>
-              <a:ext cx="787680" cy="787680"/>
+              <a:ext cx="787320" cy="787320"/>
             </a:xfrm>
             <a:prstGeom prst="rect">
               <a:avLst/>
@@ -11981,7 +12043,7 @@
           <p:spPr>
             <a:xfrm>
               <a:off x="8028720" y="823320"/>
-              <a:ext cx="3209400" cy="1360080"/>
+              <a:ext cx="3209040" cy="1359720"/>
             </a:xfrm>
             <a:prstGeom prst="rect">
               <a:avLst/>
@@ -12033,7 +12095,7 @@
           <p:spPr>
             <a:xfrm>
               <a:off x="948240" y="2800440"/>
-              <a:ext cx="1360080" cy="1360080"/>
+              <a:ext cx="1359720" cy="1359720"/>
             </a:xfrm>
             <a:prstGeom prst="ellipse">
               <a:avLst/>
@@ -12066,7 +12128,7 @@
           <p:spPr>
             <a:xfrm>
               <a:off x="1234440" y="3086640"/>
-              <a:ext cx="787680" cy="787680"/>
+              <a:ext cx="787320" cy="787320"/>
             </a:xfrm>
             <a:prstGeom prst="rect">
               <a:avLst/>
@@ -12097,7 +12159,7 @@
           <p:spPr>
             <a:xfrm>
               <a:off x="2602800" y="2800440"/>
-              <a:ext cx="3209400" cy="1360080"/>
+              <a:ext cx="3209040" cy="1359720"/>
             </a:xfrm>
             <a:prstGeom prst="rect">
               <a:avLst/>
@@ -12149,7 +12211,7 @@
           <p:spPr>
             <a:xfrm>
               <a:off x="6374160" y="2800440"/>
-              <a:ext cx="1360080" cy="1360080"/>
+              <a:ext cx="1359720" cy="1359720"/>
             </a:xfrm>
             <a:prstGeom prst="ellipse">
               <a:avLst/>
@@ -12182,7 +12244,7 @@
           <p:spPr>
             <a:xfrm>
               <a:off x="6660360" y="3086640"/>
-              <a:ext cx="787680" cy="787680"/>
+              <a:ext cx="787320" cy="787320"/>
             </a:xfrm>
             <a:prstGeom prst="rect">
               <a:avLst/>
@@ -12213,7 +12275,7 @@
           <p:spPr>
             <a:xfrm>
               <a:off x="8028720" y="2800440"/>
-              <a:ext cx="3209400" cy="1360080"/>
+              <a:ext cx="3209040" cy="1359720"/>
             </a:xfrm>
             <a:prstGeom prst="rect">
               <a:avLst/>
@@ -12303,7 +12365,7 @@
         <p:spPr>
           <a:xfrm>
             <a:off x="0" y="0"/>
-            <a:ext cx="12189600" cy="6855480"/>
+            <a:ext cx="12189240" cy="6855120"/>
           </a:xfrm>
           <a:prstGeom prst="rect">
             <a:avLst/>
@@ -12356,7 +12418,7 @@
         <p:spPr>
           <a:xfrm>
             <a:off x="0" y="0"/>
-            <a:ext cx="8127360" cy="6855480"/>
+            <a:ext cx="8127000" cy="6855120"/>
           </a:xfrm>
           <a:prstGeom prst="snip2DiagRect">
             <a:avLst>
@@ -12578,7 +12640,7 @@
         <p:spPr>
           <a:xfrm>
             <a:off x="8588520" y="941400"/>
-            <a:ext cx="3041280" cy="3246120"/>
+            <a:ext cx="3040920" cy="3245760"/>
           </a:xfrm>
           <a:prstGeom prst="rect">
             <a:avLst/>
@@ -12629,9 +12691,9 @@
         <p:grpSpPr>
           <a:xfrm>
             <a:off x="952560" y="2104200"/>
-            <a:ext cx="6163920" cy="2440800"/>
+            <a:ext cx="6163560" cy="2440440"/>
             <a:chOff x="952560" y="2104200"/>
-            <a:chExt cx="6163920" cy="2440800"/>
+            <a:chExt cx="6163560" cy="2440440"/>
           </a:xfrm>
         </p:grpSpPr>
         <p:sp>
@@ -12643,7 +12705,7 @@
           <p:spPr>
             <a:xfrm>
               <a:off x="952560" y="2104200"/>
-              <a:ext cx="813960" cy="813960"/>
+              <a:ext cx="813600" cy="813600"/>
             </a:xfrm>
             <a:prstGeom prst="ellipse">
               <a:avLst/>
@@ -12676,7 +12738,7 @@
           <p:spPr>
             <a:xfrm>
               <a:off x="1123920" y="2275560"/>
-              <a:ext cx="470880" cy="470880"/>
+              <a:ext cx="470520" cy="470520"/>
             </a:xfrm>
             <a:prstGeom prst="rect">
               <a:avLst/>
@@ -12707,7 +12769,7 @@
           <p:spPr>
             <a:xfrm>
               <a:off x="1944000" y="2104200"/>
-              <a:ext cx="1921680" cy="813960"/>
+              <a:ext cx="1921320" cy="813600"/>
             </a:xfrm>
             <a:prstGeom prst="rect">
               <a:avLst/>
@@ -12759,7 +12821,7 @@
           <p:spPr>
             <a:xfrm>
               <a:off x="4203360" y="2104200"/>
-              <a:ext cx="813960" cy="813960"/>
+              <a:ext cx="813600" cy="813600"/>
             </a:xfrm>
             <a:prstGeom prst="ellipse">
               <a:avLst/>
@@ -12792,7 +12854,7 @@
           <p:spPr>
             <a:xfrm>
               <a:off x="4375080" y="2275560"/>
-              <a:ext cx="470880" cy="470880"/>
+              <a:ext cx="470520" cy="470520"/>
             </a:xfrm>
             <a:prstGeom prst="rect">
               <a:avLst/>
@@ -12823,7 +12885,7 @@
           <p:spPr>
             <a:xfrm>
               <a:off x="5194800" y="2104200"/>
-              <a:ext cx="1921680" cy="813960"/>
+              <a:ext cx="1921320" cy="813600"/>
             </a:xfrm>
             <a:prstGeom prst="rect">
               <a:avLst/>
@@ -12875,7 +12937,7 @@
           <p:spPr>
             <a:xfrm>
               <a:off x="952560" y="3731040"/>
-              <a:ext cx="813960" cy="813960"/>
+              <a:ext cx="813600" cy="813600"/>
             </a:xfrm>
             <a:prstGeom prst="ellipse">
               <a:avLst/>
@@ -12908,7 +12970,7 @@
           <p:spPr>
             <a:xfrm>
               <a:off x="1123920" y="3902400"/>
-              <a:ext cx="470880" cy="470880"/>
+              <a:ext cx="470520" cy="470520"/>
             </a:xfrm>
             <a:prstGeom prst="rect">
               <a:avLst/>
@@ -12939,7 +13001,7 @@
           <p:spPr>
             <a:xfrm>
               <a:off x="1944000" y="3731040"/>
-              <a:ext cx="1921680" cy="813960"/>
+              <a:ext cx="1921320" cy="813600"/>
             </a:xfrm>
             <a:prstGeom prst="rect">
               <a:avLst/>
@@ -12991,7 +13053,7 @@
           <p:spPr>
             <a:xfrm>
               <a:off x="4203360" y="3731040"/>
-              <a:ext cx="813960" cy="813960"/>
+              <a:ext cx="813600" cy="813600"/>
             </a:xfrm>
             <a:prstGeom prst="ellipse">
               <a:avLst/>
@@ -13024,7 +13086,7 @@
           <p:spPr>
             <a:xfrm>
               <a:off x="4375080" y="3902400"/>
-              <a:ext cx="470880" cy="470880"/>
+              <a:ext cx="470520" cy="470520"/>
             </a:xfrm>
             <a:prstGeom prst="rect">
               <a:avLst/>
@@ -13055,7 +13117,7 @@
           <p:spPr>
             <a:xfrm>
               <a:off x="5194800" y="3731040"/>
-              <a:ext cx="1921680" cy="813960"/>
+              <a:ext cx="1921320" cy="813600"/>
             </a:xfrm>
             <a:prstGeom prst="rect">
               <a:avLst/>
@@ -13172,7 +13234,7 @@
         <p:spPr>
           <a:xfrm>
             <a:off x="684360" y="4487400"/>
-            <a:ext cx="8532000" cy="1504440"/>
+            <a:ext cx="8531640" cy="1504080"/>
           </a:xfrm>
           <a:prstGeom prst="rect">
             <a:avLst/>
@@ -13221,7 +13283,7 @@
         <p:spPr>
           <a:xfrm>
             <a:off x="684360" y="685800"/>
-            <a:ext cx="8532000" cy="3612600"/>
+            <a:ext cx="8531640" cy="3612240"/>
           </a:xfrm>
           <a:prstGeom prst="rect">
             <a:avLst/>
@@ -13240,7 +13302,7 @@
         <p:txBody>
           <a:bodyPr lIns="90000" rIns="90000" tIns="45000" bIns="45000" anchor="ctr"/>
           <a:p>
-            <a:pPr marL="285840" indent="-283320">
+            <a:pPr marL="285840" indent="-282960">
               <a:lnSpc>
                 <a:spcPct val="100000"/>
               </a:lnSpc>
@@ -13272,7 +13334,7 @@
             </a:endParaRPr>
           </a:p>
           <a:p>
-            <a:pPr marL="285840" indent="-283320">
+            <a:pPr marL="285840" indent="-282960">
               <a:lnSpc>
                 <a:spcPct val="100000"/>
               </a:lnSpc>
@@ -13304,7 +13366,7 @@
             </a:endParaRPr>
           </a:p>
           <a:p>
-            <a:pPr marL="285840" indent="-283320">
+            <a:pPr marL="285840" indent="-282960">
               <a:lnSpc>
                 <a:spcPct val="100000"/>
               </a:lnSpc>
@@ -13336,7 +13398,7 @@
             </a:endParaRPr>
           </a:p>
           <a:p>
-            <a:pPr marL="285840" indent="-283320">
+            <a:pPr marL="285840" indent="-282960">
               <a:lnSpc>
                 <a:spcPct val="100000"/>
               </a:lnSpc>
@@ -13400,7 +13462,7 @@
         <p:spPr>
           <a:xfrm>
             <a:off x="684360" y="4487400"/>
-            <a:ext cx="8532000" cy="1504440"/>
+            <a:ext cx="8531640" cy="1504080"/>
           </a:xfrm>
           <a:prstGeom prst="rect">
             <a:avLst/>
@@ -13453,7 +13515,7 @@
         <p:spPr>
           <a:xfrm>
             <a:off x="5221440" y="75600"/>
-            <a:ext cx="911880" cy="911880"/>
+            <a:ext cx="911520" cy="911520"/>
           </a:xfrm>
           <a:prstGeom prst="rect">
             <a:avLst/>
@@ -13476,7 +13538,7 @@
         <p:spPr>
           <a:xfrm>
             <a:off x="4695120" y="4444560"/>
-            <a:ext cx="911880" cy="911880"/>
+            <a:ext cx="911520" cy="911520"/>
           </a:xfrm>
           <a:prstGeom prst="rect">
             <a:avLst/>
@@ -13499,7 +13561,7 @@
         <p:spPr>
           <a:xfrm>
             <a:off x="2603880" y="2294640"/>
-            <a:ext cx="911880" cy="911880"/>
+            <a:ext cx="911520" cy="911520"/>
           </a:xfrm>
           <a:prstGeom prst="rect">
             <a:avLst/>
@@ -13522,7 +13584,7 @@
         <p:spPr>
           <a:xfrm>
             <a:off x="9767160" y="3294360"/>
-            <a:ext cx="911880" cy="911880"/>
+            <a:ext cx="911520" cy="911520"/>
           </a:xfrm>
           <a:prstGeom prst="rect">
             <a:avLst/>
@@ -13545,7 +13607,7 @@
         <p:spPr>
           <a:xfrm>
             <a:off x="1967760" y="3811680"/>
-            <a:ext cx="911880" cy="911880"/>
+            <a:ext cx="911520" cy="911520"/>
           </a:xfrm>
           <a:prstGeom prst="rect">
             <a:avLst/>
@@ -13568,7 +13630,7 @@
         <p:spPr>
           <a:xfrm>
             <a:off x="5221440" y="2907360"/>
-            <a:ext cx="911880" cy="911880"/>
+            <a:ext cx="911520" cy="911520"/>
           </a:xfrm>
           <a:prstGeom prst="rect">
             <a:avLst/>
@@ -13591,7 +13653,7 @@
         <p:spPr>
           <a:xfrm>
             <a:off x="1093680" y="3282480"/>
-            <a:ext cx="911880" cy="911880"/>
+            <a:ext cx="911520" cy="911520"/>
           </a:xfrm>
           <a:prstGeom prst="rect">
             <a:avLst/>
@@ -13614,7 +13676,7 @@
         <p:spPr>
           <a:xfrm>
             <a:off x="8595360" y="3808800"/>
-            <a:ext cx="911880" cy="911880"/>
+            <a:ext cx="911520" cy="911520"/>
           </a:xfrm>
           <a:prstGeom prst="rect">
             <a:avLst/>
@@ -13637,7 +13699,7 @@
         <p:spPr>
           <a:xfrm>
             <a:off x="7839000" y="2294640"/>
-            <a:ext cx="911880" cy="911880"/>
+            <a:ext cx="911520" cy="911520"/>
           </a:xfrm>
           <a:prstGeom prst="rect">
             <a:avLst/>
@@ -13656,7 +13718,7 @@
         <p:spPr>
           <a:xfrm>
             <a:off x="6312960" y="944640"/>
-            <a:ext cx="1523880" cy="1337760"/>
+            <a:ext cx="1523520" cy="1337400"/>
           </a:xfrm>
           <a:custGeom>
             <a:avLst/>
@@ -13709,7 +13771,7 @@
         <p:spPr>
           <a:xfrm>
             <a:off x="5678640" y="1145160"/>
-            <a:ext cx="360" cy="1604160"/>
+            <a:ext cx="360" cy="1603800"/>
           </a:xfrm>
           <a:custGeom>
             <a:avLst/>
@@ -13762,7 +13824,7 @@
         <p:spPr>
           <a:xfrm flipH="1">
             <a:off x="3423960" y="990000"/>
-            <a:ext cx="1615320" cy="1378080"/>
+            <a:ext cx="1614960" cy="1377720"/>
           </a:xfrm>
           <a:custGeom>
             <a:avLst/>
@@ -13815,7 +13877,7 @@
         <p:spPr>
           <a:xfrm>
             <a:off x="2082960" y="3279600"/>
-            <a:ext cx="915120" cy="362520"/>
+            <a:ext cx="914760" cy="362160"/>
           </a:xfrm>
           <a:prstGeom prst="rect">
             <a:avLst/>
@@ -13864,7 +13926,7 @@
         <p:spPr>
           <a:xfrm>
             <a:off x="5227200" y="4030200"/>
-            <a:ext cx="927360" cy="362520"/>
+            <a:ext cx="927000" cy="362160"/>
           </a:xfrm>
           <a:prstGeom prst="rect">
             <a:avLst/>
@@ -13913,7 +13975,7 @@
         <p:spPr>
           <a:xfrm>
             <a:off x="8246520" y="3279600"/>
-            <a:ext cx="1253520" cy="362520"/>
+            <a:ext cx="1253160" cy="362160"/>
           </a:xfrm>
           <a:prstGeom prst="rect">
             <a:avLst/>
@@ -13962,7 +14024,7 @@
         <p:spPr>
           <a:xfrm>
             <a:off x="481680" y="348120"/>
-            <a:ext cx="1809720" cy="362520"/>
+            <a:ext cx="1809360" cy="362160"/>
           </a:xfrm>
           <a:prstGeom prst="rect">
             <a:avLst/>
@@ -14015,7 +14077,7 @@
         <p:spPr>
           <a:xfrm>
             <a:off x="5855760" y="4444560"/>
-            <a:ext cx="911880" cy="911880"/>
+            <a:ext cx="911520" cy="911520"/>
           </a:xfrm>
           <a:prstGeom prst="rect">
             <a:avLst/>
@@ -14056,7 +14118,7 @@
         <p:spPr>
           <a:xfrm>
             <a:off x="684360" y="4487400"/>
-            <a:ext cx="8532000" cy="1504440"/>
+            <a:ext cx="8531640" cy="1504080"/>
           </a:xfrm>
           <a:prstGeom prst="rect">
             <a:avLst/>
@@ -14109,7 +14171,7 @@
         <p:spPr>
           <a:xfrm>
             <a:off x="7839000" y="2560320"/>
-            <a:ext cx="1311840" cy="597600"/>
+            <a:ext cx="1311480" cy="597240"/>
           </a:xfrm>
           <a:prstGeom prst="rect">
             <a:avLst/>
@@ -14128,7 +14190,7 @@
         <p:spPr>
           <a:xfrm>
             <a:off x="480240" y="348120"/>
-            <a:ext cx="1789920" cy="362520"/>
+            <a:ext cx="1789560" cy="362160"/>
           </a:xfrm>
           <a:prstGeom prst="rect">
             <a:avLst/>
@@ -14177,7 +14239,7 @@
         <p:spPr>
           <a:xfrm>
             <a:off x="6384240" y="990000"/>
-            <a:ext cx="1523880" cy="1337760"/>
+            <a:ext cx="1523520" cy="1337400"/>
           </a:xfrm>
           <a:custGeom>
             <a:avLst/>
@@ -14230,7 +14292,7 @@
         <p:spPr>
           <a:xfrm>
             <a:off x="5678640" y="1145160"/>
-            <a:ext cx="360" cy="1604160"/>
+            <a:ext cx="360" cy="1603800"/>
           </a:xfrm>
           <a:custGeom>
             <a:avLst/>
@@ -14283,7 +14345,7 @@
         <p:spPr>
           <a:xfrm flipH="1">
             <a:off x="3423960" y="990000"/>
-            <a:ext cx="1615320" cy="1378080"/>
+            <a:ext cx="1614960" cy="1377720"/>
           </a:xfrm>
           <a:custGeom>
             <a:avLst/>
@@ -14336,7 +14398,7 @@
         <p:spPr>
           <a:xfrm>
             <a:off x="2082960" y="3279600"/>
-            <a:ext cx="915120" cy="362520"/>
+            <a:ext cx="914760" cy="362160"/>
           </a:xfrm>
           <a:prstGeom prst="rect">
             <a:avLst/>
@@ -14385,7 +14447,7 @@
         <p:spPr>
           <a:xfrm>
             <a:off x="5227200" y="4030200"/>
-            <a:ext cx="927360" cy="362520"/>
+            <a:ext cx="927000" cy="362160"/>
           </a:xfrm>
           <a:prstGeom prst="rect">
             <a:avLst/>
@@ -14434,7 +14496,7 @@
         <p:spPr>
           <a:xfrm>
             <a:off x="8246520" y="3279600"/>
-            <a:ext cx="1253520" cy="362520"/>
+            <a:ext cx="1253160" cy="362160"/>
           </a:xfrm>
           <a:prstGeom prst="rect">
             <a:avLst/>
@@ -14487,7 +14549,7 @@
         <p:spPr>
           <a:xfrm>
             <a:off x="4979520" y="218880"/>
-            <a:ext cx="1330920" cy="616680"/>
+            <a:ext cx="1330560" cy="616320"/>
           </a:xfrm>
           <a:prstGeom prst="rect">
             <a:avLst/>
@@ -14510,7 +14572,7 @@
         <p:spPr>
           <a:xfrm>
             <a:off x="2102760" y="2514600"/>
-            <a:ext cx="1321560" cy="606960"/>
+            <a:ext cx="1321200" cy="606600"/>
           </a:xfrm>
           <a:prstGeom prst="rect">
             <a:avLst/>
@@ -14533,7 +14595,7 @@
         <p:spPr>
           <a:xfrm>
             <a:off x="4235760" y="3279600"/>
-            <a:ext cx="1311840" cy="597600"/>
+            <a:ext cx="1311480" cy="597240"/>
           </a:xfrm>
           <a:prstGeom prst="rect">
             <a:avLst/>
@@ -14556,7 +14618,7 @@
         <p:spPr>
           <a:xfrm>
             <a:off x="5833080" y="3279600"/>
-            <a:ext cx="1311840" cy="597600"/>
+            <a:ext cx="1311480" cy="597240"/>
           </a:xfrm>
           <a:prstGeom prst="rect">
             <a:avLst/>
@@ -14597,7 +14659,7 @@
         <p:spPr>
           <a:xfrm>
             <a:off x="684360" y="4487400"/>
-            <a:ext cx="8532000" cy="1504440"/>
+            <a:ext cx="8531640" cy="1504080"/>
           </a:xfrm>
           <a:prstGeom prst="rect">
             <a:avLst/>
@@ -14646,7 +14708,7 @@
         <p:spPr>
           <a:xfrm>
             <a:off x="684360" y="685800"/>
-            <a:ext cx="8532000" cy="3612600"/>
+            <a:ext cx="8531640" cy="3612240"/>
           </a:xfrm>
           <a:prstGeom prst="rect">
             <a:avLst/>
@@ -14665,7 +14727,7 @@
         <p:txBody>
           <a:bodyPr lIns="90000" rIns="90000" tIns="45000" bIns="45000" anchor="ctr"/>
           <a:p>
-            <a:pPr marL="285840" indent="-283320">
+            <a:pPr marL="285840" indent="-282960">
               <a:lnSpc>
                 <a:spcPct val="100000"/>
               </a:lnSpc>
@@ -14741,7 +14803,7 @@
         <p:spPr>
           <a:xfrm>
             <a:off x="666000" y="2574360"/>
-            <a:ext cx="4808160" cy="2971440"/>
+            <a:ext cx="4807800" cy="2971080"/>
           </a:xfrm>
           <a:prstGeom prst="roundRect">
             <a:avLst>
@@ -14891,7 +14953,7 @@
         <p:spPr>
           <a:xfrm>
             <a:off x="684360" y="5241960"/>
-            <a:ext cx="8532000" cy="1504440"/>
+            <a:ext cx="8531640" cy="1504080"/>
           </a:xfrm>
           <a:prstGeom prst="rect">
             <a:avLst/>
@@ -14940,7 +15002,7 @@
         <p:spPr>
           <a:xfrm>
             <a:off x="684360" y="685800"/>
-            <a:ext cx="10987560" cy="2285640"/>
+            <a:ext cx="10987200" cy="2285280"/>
           </a:xfrm>
           <a:prstGeom prst="rect">
             <a:avLst/>
@@ -14961,7 +15023,7 @@
             <a:normAutofit/>
           </a:bodyPr>
           <a:p>
-            <a:pPr marL="285840" indent="-283320">
+            <a:pPr marL="285840" indent="-282960">
               <a:lnSpc>
                 <a:spcPct val="100000"/>
               </a:lnSpc>
@@ -15043,7 +15105,7 @@
             </a:endParaRPr>
           </a:p>
           <a:p>
-            <a:pPr marL="285840" indent="-283320">
+            <a:pPr marL="285840" indent="-282960">
               <a:lnSpc>
                 <a:spcPct val="100000"/>
               </a:lnSpc>
@@ -15167,7 +15229,7 @@
         <p:spPr>
           <a:xfrm>
             <a:off x="2523960" y="3718800"/>
-            <a:ext cx="725760" cy="720720"/>
+            <a:ext cx="725400" cy="720360"/>
           </a:xfrm>
           <a:prstGeom prst="ellipse">
             <a:avLst/>
@@ -15235,7 +15297,7 @@
         <p:spPr>
           <a:xfrm>
             <a:off x="3363480" y="3303360"/>
-            <a:ext cx="1215000" cy="404640"/>
+            <a:ext cx="1214640" cy="404280"/>
           </a:xfrm>
           <a:prstGeom prst="ellipse">
             <a:avLst/>
@@ -15303,7 +15365,7 @@
         <p:spPr>
           <a:xfrm>
             <a:off x="744120" y="3208680"/>
-            <a:ext cx="1588320" cy="672840"/>
+            <a:ext cx="1587960" cy="672480"/>
           </a:xfrm>
           <a:prstGeom prst="ellipse">
             <a:avLst/>
@@ -15371,7 +15433,7 @@
         <p:spPr>
           <a:xfrm>
             <a:off x="2119680" y="4628880"/>
-            <a:ext cx="1527480" cy="672840"/>
+            <a:ext cx="1527120" cy="672480"/>
           </a:xfrm>
           <a:prstGeom prst="ellipse">
             <a:avLst/>
@@ -15439,7 +15501,7 @@
         <p:spPr>
           <a:xfrm>
             <a:off x="6819480" y="2574360"/>
-            <a:ext cx="4808160" cy="2971440"/>
+            <a:ext cx="4807800" cy="2971080"/>
           </a:xfrm>
           <a:prstGeom prst="roundRect">
             <a:avLst>
@@ -15589,7 +15651,7 @@
         <p:spPr>
           <a:xfrm>
             <a:off x="7103880" y="4147560"/>
-            <a:ext cx="4376520" cy="856800"/>
+            <a:ext cx="4376160" cy="856440"/>
           </a:xfrm>
           <a:prstGeom prst="ellipse">
             <a:avLst/>
@@ -15657,7 +15719,7 @@
         <p:spPr>
           <a:xfrm>
             <a:off x="9898200" y="3332520"/>
-            <a:ext cx="1215000" cy="404640"/>
+            <a:ext cx="1214640" cy="404280"/>
           </a:xfrm>
           <a:prstGeom prst="ellipse">
             <a:avLst/>
@@ -15725,7 +15787,7 @@
         <p:spPr>
           <a:xfrm>
             <a:off x="6965640" y="3288960"/>
-            <a:ext cx="1588320" cy="672840"/>
+            <a:ext cx="1587960" cy="672480"/>
           </a:xfrm>
           <a:prstGeom prst="ellipse">
             <a:avLst/>
@@ -15793,7 +15855,7 @@
         <p:spPr>
           <a:xfrm>
             <a:off x="8287920" y="2688120"/>
-            <a:ext cx="1871280" cy="672840"/>
+            <a:ext cx="1870920" cy="672480"/>
           </a:xfrm>
           <a:prstGeom prst="ellipse">
             <a:avLst/>
@@ -15910,7 +15972,7 @@
         <p:spPr>
           <a:xfrm>
             <a:off x="684360" y="4487400"/>
-            <a:ext cx="8532000" cy="1504440"/>
+            <a:ext cx="8531640" cy="1504080"/>
           </a:xfrm>
           <a:prstGeom prst="rect">
             <a:avLst/>
@@ -15959,7 +16021,7 @@
         <p:spPr>
           <a:xfrm>
             <a:off x="684360" y="685800"/>
-            <a:ext cx="11360160" cy="3612600"/>
+            <a:ext cx="11359800" cy="3612240"/>
           </a:xfrm>
           <a:prstGeom prst="rect">
             <a:avLst/>
@@ -15980,7 +16042,7 @@
             <a:normAutofit/>
           </a:bodyPr>
           <a:p>
-            <a:pPr marL="285840" indent="-283320">
+            <a:pPr marL="285840" indent="-282960">
               <a:lnSpc>
                 <a:spcPct val="100000"/>
               </a:lnSpc>
@@ -16022,7 +16084,7 @@
             </a:endParaRPr>
           </a:p>
           <a:p>
-            <a:pPr marL="285840" indent="-283320">
+            <a:pPr marL="285840" indent="-282960">
               <a:lnSpc>
                 <a:spcPct val="100000"/>
               </a:lnSpc>
@@ -16212,7 +16274,7 @@
             </a:endParaRPr>
           </a:p>
           <a:p>
-            <a:pPr marL="285840" indent="-283320">
+            <a:pPr marL="285840" indent="-282960">
               <a:lnSpc>
                 <a:spcPct val="100000"/>
               </a:lnSpc>
@@ -16244,7 +16306,7 @@
             </a:endParaRPr>
           </a:p>
           <a:p>
-            <a:pPr marL="285840" indent="-283320">
+            <a:pPr marL="285840" indent="-282960">
               <a:lnSpc>
                 <a:spcPct val="100000"/>
               </a:lnSpc>
@@ -16335,7 +16397,7 @@
         <p:spPr>
           <a:xfrm>
             <a:off x="684360" y="4487400"/>
-            <a:ext cx="8532000" cy="1504440"/>
+            <a:ext cx="8531640" cy="1504080"/>
           </a:xfrm>
           <a:prstGeom prst="rect">
             <a:avLst/>
@@ -16384,7 +16446,7 @@
         <p:spPr>
           <a:xfrm>
             <a:off x="684360" y="685800"/>
-            <a:ext cx="8532000" cy="3612600"/>
+            <a:ext cx="8531640" cy="3612240"/>
           </a:xfrm>
           <a:prstGeom prst="rect">
             <a:avLst/>
@@ -16403,7 +16465,7 @@
         <p:txBody>
           <a:bodyPr lIns="90000" rIns="90000" tIns="45000" bIns="45000" anchor="ctr"/>
           <a:p>
-            <a:pPr marL="285840" indent="-283320">
+            <a:pPr marL="285840" indent="-282960">
               <a:lnSpc>
                 <a:spcPct val="100000"/>
               </a:lnSpc>
@@ -16505,7 +16567,7 @@
             </a:endParaRPr>
           </a:p>
           <a:p>
-            <a:pPr marL="285840" indent="-283320">
+            <a:pPr marL="285840" indent="-282960">
               <a:lnSpc>
                 <a:spcPct val="100000"/>
               </a:lnSpc>
@@ -16607,7 +16669,7 @@
         <p:spPr>
           <a:xfrm>
             <a:off x="2521440" y="3979080"/>
-            <a:ext cx="1879560" cy="805320"/>
+            <a:ext cx="1879200" cy="804960"/>
           </a:xfrm>
           <a:prstGeom prst="rect">
             <a:avLst/>
@@ -16673,7 +16735,7 @@
         <p:spPr>
           <a:xfrm>
             <a:off x="5487840" y="3979080"/>
-            <a:ext cx="1879560" cy="805320"/>
+            <a:ext cx="1879200" cy="804960"/>
           </a:xfrm>
           <a:prstGeom prst="rect">
             <a:avLst/>
@@ -16739,7 +16801,7 @@
         <p:spPr>
           <a:xfrm>
             <a:off x="4004640" y="2771640"/>
-            <a:ext cx="1879560" cy="805320"/>
+            <a:ext cx="1879200" cy="804960"/>
           </a:xfrm>
           <a:prstGeom prst="rect">
             <a:avLst/>
@@ -16805,7 +16867,7 @@
         <p:spPr>
           <a:xfrm>
             <a:off x="4483080" y="4383000"/>
-            <a:ext cx="1002240" cy="360"/>
+            <a:ext cx="1001880" cy="360"/>
           </a:xfrm>
           <a:custGeom>
             <a:avLst/>
@@ -16857,7 +16919,7 @@
         <p:spPr>
           <a:xfrm>
             <a:off x="4985640" y="3657600"/>
-            <a:ext cx="360" cy="577080"/>
+            <a:ext cx="360" cy="576720"/>
           </a:xfrm>
           <a:custGeom>
             <a:avLst/>
@@ -16958,7 +17020,7 @@
         <p:spPr>
           <a:xfrm>
             <a:off x="0" y="0"/>
-            <a:ext cx="12189600" cy="6855480"/>
+            <a:ext cx="12189240" cy="6855120"/>
           </a:xfrm>
           <a:prstGeom prst="rect">
             <a:avLst/>
@@ -17011,7 +17073,7 @@
         <p:spPr>
           <a:xfrm>
             <a:off x="640440" y="685800"/>
-            <a:ext cx="4816080" cy="4601160"/>
+            <a:ext cx="4815720" cy="4600800"/>
           </a:xfrm>
           <a:prstGeom prst="rect">
             <a:avLst/>
@@ -17062,7 +17124,7 @@
         <p:spPr>
           <a:xfrm>
             <a:off x="6095880" y="0"/>
-            <a:ext cx="6093360" cy="6855480"/>
+            <a:ext cx="6093000" cy="6855120"/>
           </a:xfrm>
           <a:prstGeom prst="rect">
             <a:avLst/>
@@ -17100,7 +17162,7 @@
         <p:spPr>
           <a:xfrm>
             <a:off x="6625800" y="685800"/>
-            <a:ext cx="4876560" cy="4601160"/>
+            <a:ext cx="4876200" cy="4600800"/>
           </a:xfrm>
           <a:prstGeom prst="rect">
             <a:avLst/>
@@ -17121,7 +17183,7 @@
             <a:normAutofit/>
           </a:bodyPr>
           <a:p>
-            <a:pPr marL="285840" indent="-283320">
+            <a:pPr marL="285840" indent="-282960">
               <a:lnSpc>
                 <a:spcPct val="100000"/>
               </a:lnSpc>
@@ -17153,7 +17215,7 @@
             </a:endParaRPr>
           </a:p>
           <a:p>
-            <a:pPr marL="285840" indent="-283320">
+            <a:pPr marL="285840" indent="-282960">
               <a:lnSpc>
                 <a:spcPct val="100000"/>
               </a:lnSpc>
@@ -17185,7 +17247,7 @@
             </a:endParaRPr>
           </a:p>
           <a:p>
-            <a:pPr marL="285840" indent="-283320">
+            <a:pPr marL="285840" indent="-282960">
               <a:lnSpc>
                 <a:spcPct val="100000"/>
               </a:lnSpc>
@@ -17217,7 +17279,7 @@
             </a:endParaRPr>
           </a:p>
           <a:p>
-            <a:pPr marL="285840" indent="-283320">
+            <a:pPr marL="285840" indent="-282960">
               <a:lnSpc>
                 <a:spcPct val="100000"/>
               </a:lnSpc>
@@ -17308,7 +17370,7 @@
         <p:spPr>
           <a:xfrm>
             <a:off x="684360" y="4487400"/>
-            <a:ext cx="8532000" cy="1504440"/>
+            <a:ext cx="8531640" cy="1504080"/>
           </a:xfrm>
           <a:prstGeom prst="rect">
             <a:avLst/>
@@ -17357,7 +17419,7 @@
         <p:spPr>
           <a:xfrm>
             <a:off x="1044720" y="500040"/>
-            <a:ext cx="8261640" cy="3230280"/>
+            <a:ext cx="8261280" cy="3229920"/>
           </a:xfrm>
           <a:prstGeom prst="rect">
             <a:avLst/>
@@ -17376,7 +17438,7 @@
         <p:txBody>
           <a:bodyPr lIns="90000" rIns="90000" tIns="45000" bIns="45000" anchor="ctr"/>
           <a:p>
-            <a:pPr marL="285840" indent="-283320">
+            <a:pPr marL="285840" indent="-282960">
               <a:lnSpc>
                 <a:spcPct val="100000"/>
               </a:lnSpc>
@@ -17418,7 +17480,7 @@
             </a:endParaRPr>
           </a:p>
           <a:p>
-            <a:pPr marL="285840" indent="-283320">
+            <a:pPr marL="285840" indent="-282960">
               <a:lnSpc>
                 <a:spcPct val="100000"/>
               </a:lnSpc>
@@ -17470,7 +17532,7 @@
             </a:endParaRPr>
           </a:p>
           <a:p>
-            <a:pPr marL="285840" indent="-283320">
+            <a:pPr marL="285840" indent="-282960">
               <a:lnSpc>
                 <a:spcPct val="100000"/>
               </a:lnSpc>
@@ -17622,7 +17684,7 @@
         <p:spPr>
           <a:xfrm>
             <a:off x="7097760" y="1943280"/>
-            <a:ext cx="852120" cy="852120"/>
+            <a:ext cx="851760" cy="851760"/>
           </a:xfrm>
           <a:prstGeom prst="rect">
             <a:avLst/>
@@ -17645,7 +17707,7 @@
         <p:spPr>
           <a:xfrm>
             <a:off x="6931800" y="4296600"/>
-            <a:ext cx="1178640" cy="470880"/>
+            <a:ext cx="1178280" cy="470520"/>
           </a:xfrm>
           <a:prstGeom prst="rect">
             <a:avLst/>
@@ -17668,7 +17730,7 @@
         <p:spPr>
           <a:xfrm>
             <a:off x="7054200" y="2896920"/>
-            <a:ext cx="895680" cy="1037880"/>
+            <a:ext cx="895320" cy="1037520"/>
           </a:xfrm>
           <a:prstGeom prst="rect">
             <a:avLst/>
@@ -17691,7 +17753,7 @@
         <p:spPr>
           <a:xfrm>
             <a:off x="2718360" y="2064960"/>
-            <a:ext cx="911880" cy="911880"/>
+            <a:ext cx="911520" cy="911520"/>
           </a:xfrm>
           <a:prstGeom prst="rect">
             <a:avLst/>
@@ -17714,7 +17776,7 @@
         <p:spPr>
           <a:xfrm>
             <a:off x="2739240" y="3371040"/>
-            <a:ext cx="911880" cy="911880"/>
+            <a:ext cx="911520" cy="911520"/>
           </a:xfrm>
           <a:prstGeom prst="rect">
             <a:avLst/>
@@ -17737,7 +17799,7 @@
         <p:spPr>
           <a:xfrm>
             <a:off x="4908600" y="2852280"/>
-            <a:ext cx="911880" cy="911880"/>
+            <a:ext cx="911520" cy="911520"/>
           </a:xfrm>
           <a:prstGeom prst="rect">
             <a:avLst/>
@@ -17755,8 +17817,8 @@
         </p:nvSpPr>
         <p:spPr>
           <a:xfrm rot="1192200">
-            <a:off x="4047120" y="2672280"/>
-            <a:ext cx="975960" cy="482040"/>
+            <a:off x="4046760" y="2671920"/>
+            <a:ext cx="975600" cy="481680"/>
           </a:xfrm>
           <a:prstGeom prst="rightArrow">
             <a:avLst>
@@ -17797,8 +17859,8 @@
         </p:nvSpPr>
         <p:spPr>
           <a:xfrm rot="20407800">
-            <a:off x="4026240" y="3459600"/>
-            <a:ext cx="975960" cy="482040"/>
+            <a:off x="4025880" y="3459600"/>
+            <a:ext cx="975600" cy="481680"/>
           </a:xfrm>
           <a:prstGeom prst="rightArrow">
             <a:avLst>
@@ -17839,8 +17901,8 @@
         </p:nvSpPr>
         <p:spPr>
           <a:xfrm rot="1192200">
-            <a:off x="5800680" y="3780720"/>
-            <a:ext cx="975960" cy="482040"/>
+            <a:off x="5800320" y="3780360"/>
+            <a:ext cx="975600" cy="481680"/>
           </a:xfrm>
           <a:prstGeom prst="rightArrow">
             <a:avLst>
@@ -17881,8 +17943,8 @@
         </p:nvSpPr>
         <p:spPr>
           <a:xfrm rot="20407800">
-            <a:off x="5874480" y="2455200"/>
-            <a:ext cx="975960" cy="482040"/>
+            <a:off x="5874120" y="2455200"/>
+            <a:ext cx="975600" cy="481680"/>
           </a:xfrm>
           <a:prstGeom prst="rightArrow">
             <a:avLst>
@@ -17924,7 +17986,7 @@
         <p:spPr>
           <a:xfrm>
             <a:off x="5951880" y="3115440"/>
-            <a:ext cx="975960" cy="482040"/>
+            <a:ext cx="975600" cy="481680"/>
           </a:xfrm>
           <a:prstGeom prst="rightArrow">
             <a:avLst>
@@ -18015,7 +18077,7 @@
         <p:spPr>
           <a:xfrm>
             <a:off x="684360" y="4487400"/>
-            <a:ext cx="8532000" cy="1504440"/>
+            <a:ext cx="8531640" cy="1504080"/>
           </a:xfrm>
           <a:prstGeom prst="rect">
             <a:avLst/>
@@ -18064,7 +18126,7 @@
         <p:spPr>
           <a:xfrm>
             <a:off x="684360" y="685800"/>
-            <a:ext cx="8532000" cy="3612600"/>
+            <a:ext cx="8531640" cy="3612240"/>
           </a:xfrm>
           <a:prstGeom prst="rect">
             <a:avLst/>
@@ -18083,7 +18145,7 @@
         <p:txBody>
           <a:bodyPr lIns="90000" rIns="90000" tIns="45000" bIns="45000" anchor="ctr"/>
           <a:p>
-            <a:pPr marL="285840" indent="-283320">
+            <a:pPr marL="285840" indent="-282960">
               <a:lnSpc>
                 <a:spcPct val="100000"/>
               </a:lnSpc>
@@ -18175,7 +18237,7 @@
             </a:endParaRPr>
           </a:p>
           <a:p>
-            <a:pPr marL="285840" indent="-283320">
+            <a:pPr marL="285840" indent="-282960">
               <a:lnSpc>
                 <a:spcPct val="100000"/>
               </a:lnSpc>
@@ -18227,7 +18289,7 @@
             </a:endParaRPr>
           </a:p>
           <a:p>
-            <a:pPr marL="285840" indent="-283320">
+            <a:pPr marL="285840" indent="-282960">
               <a:lnSpc>
                 <a:spcPct val="100000"/>
               </a:lnSpc>
@@ -18313,7 +18375,7 @@
         <p:spPr>
           <a:xfrm>
             <a:off x="6227640" y="3794400"/>
-            <a:ext cx="911880" cy="911880"/>
+            <a:ext cx="911520" cy="911520"/>
           </a:xfrm>
           <a:prstGeom prst="rect">
             <a:avLst/>
@@ -18336,7 +18398,7 @@
         <p:spPr>
           <a:xfrm>
             <a:off x="2468520" y="3843720"/>
-            <a:ext cx="911880" cy="911880"/>
+            <a:ext cx="911520" cy="911520"/>
           </a:xfrm>
           <a:prstGeom prst="rect">
             <a:avLst/>
@@ -18359,7 +18421,7 @@
         <p:spPr>
           <a:xfrm>
             <a:off x="9790920" y="3794400"/>
-            <a:ext cx="911880" cy="911880"/>
+            <a:ext cx="911520" cy="911520"/>
           </a:xfrm>
           <a:prstGeom prst="rect">
             <a:avLst/>
@@ -18382,7 +18444,7 @@
         <p:spPr>
           <a:xfrm>
             <a:off x="7903800" y="3794400"/>
-            <a:ext cx="911880" cy="911880"/>
+            <a:ext cx="911520" cy="911520"/>
           </a:xfrm>
           <a:prstGeom prst="rect">
             <a:avLst/>
@@ -18405,7 +18467,7 @@
         <p:spPr>
           <a:xfrm>
             <a:off x="4412520" y="3794400"/>
-            <a:ext cx="911880" cy="911880"/>
+            <a:ext cx="911520" cy="911520"/>
           </a:xfrm>
           <a:prstGeom prst="rect">
             <a:avLst/>
@@ -18428,7 +18490,7 @@
         <p:spPr>
           <a:xfrm>
             <a:off x="684360" y="3843720"/>
-            <a:ext cx="911880" cy="911880"/>
+            <a:ext cx="911520" cy="911520"/>
           </a:xfrm>
           <a:prstGeom prst="rect">
             <a:avLst/>
@@ -18447,7 +18509,7 @@
         <p:spPr>
           <a:xfrm>
             <a:off x="1638000" y="4183200"/>
-            <a:ext cx="680400" cy="259560"/>
+            <a:ext cx="680040" cy="259200"/>
           </a:xfrm>
           <a:prstGeom prst="rightArrow">
             <a:avLst>
@@ -18486,7 +18548,7 @@
         <p:spPr>
           <a:xfrm>
             <a:off x="3511800" y="4201920"/>
-            <a:ext cx="680400" cy="259560"/>
+            <a:ext cx="680040" cy="259200"/>
           </a:xfrm>
           <a:prstGeom prst="rightArrow">
             <a:avLst>
@@ -18525,7 +18587,7 @@
         <p:spPr>
           <a:xfrm>
             <a:off x="5366520" y="4193640"/>
-            <a:ext cx="680400" cy="259560"/>
+            <a:ext cx="680040" cy="259200"/>
           </a:xfrm>
           <a:prstGeom prst="rightArrow">
             <a:avLst>
@@ -18564,7 +18626,7 @@
         <p:spPr>
           <a:xfrm>
             <a:off x="7162200" y="4183200"/>
-            <a:ext cx="680400" cy="259560"/>
+            <a:ext cx="680040" cy="259200"/>
           </a:xfrm>
           <a:prstGeom prst="rightArrow">
             <a:avLst>
@@ -18603,7 +18665,7 @@
         <p:spPr>
           <a:xfrm>
             <a:off x="8876160" y="4169880"/>
-            <a:ext cx="680400" cy="259560"/>
+            <a:ext cx="680040" cy="259200"/>
           </a:xfrm>
           <a:prstGeom prst="rightArrow">
             <a:avLst>
@@ -18691,7 +18753,7 @@
         <p:spPr>
           <a:xfrm>
             <a:off x="684360" y="4487400"/>
-            <a:ext cx="8532000" cy="1504440"/>
+            <a:ext cx="8531640" cy="1504080"/>
           </a:xfrm>
           <a:prstGeom prst="rect">
             <a:avLst/>
@@ -18740,7 +18802,7 @@
         <p:spPr>
           <a:xfrm>
             <a:off x="684360" y="685800"/>
-            <a:ext cx="8532000" cy="3612600"/>
+            <a:ext cx="8531640" cy="3612240"/>
           </a:xfrm>
           <a:prstGeom prst="rect">
             <a:avLst/>
@@ -18759,7 +18821,7 @@
         <p:txBody>
           <a:bodyPr lIns="90000" rIns="90000" tIns="45000" bIns="45000" anchor="ctr"/>
           <a:p>
-            <a:pPr marL="285840" indent="-283320">
+            <a:pPr marL="285840" indent="-282960">
               <a:lnSpc>
                 <a:spcPct val="100000"/>
               </a:lnSpc>
@@ -18841,7 +18903,7 @@
             </a:endParaRPr>
           </a:p>
           <a:p>
-            <a:pPr marL="285840" indent="-283320">
+            <a:pPr marL="285840" indent="-282960">
               <a:lnSpc>
                 <a:spcPct val="100000"/>
               </a:lnSpc>
@@ -18887,7 +18949,7 @@
         <p:spPr>
           <a:xfrm>
             <a:off x="4681800" y="2481480"/>
-            <a:ext cx="911880" cy="911880"/>
+            <a:ext cx="911520" cy="911520"/>
           </a:xfrm>
           <a:prstGeom prst="rect">
             <a:avLst/>
@@ -18910,7 +18972,7 @@
         <p:spPr>
           <a:xfrm>
             <a:off x="6609240" y="3669480"/>
-            <a:ext cx="911880" cy="911880"/>
+            <a:ext cx="911520" cy="911520"/>
           </a:xfrm>
           <a:prstGeom prst="rect">
             <a:avLst/>
@@ -18933,7 +18995,7 @@
         <p:spPr>
           <a:xfrm>
             <a:off x="2973240" y="3669480"/>
-            <a:ext cx="911880" cy="911880"/>
+            <a:ext cx="911520" cy="911520"/>
           </a:xfrm>
           <a:prstGeom prst="rect">
             <a:avLst/>
@@ -18952,7 +19014,7 @@
         <p:spPr>
           <a:xfrm>
             <a:off x="4214160" y="3946320"/>
-            <a:ext cx="2066040" cy="358200"/>
+            <a:ext cx="2065680" cy="357840"/>
           </a:xfrm>
           <a:prstGeom prst="rightArrow">
             <a:avLst>
@@ -18991,7 +19053,7 @@
         <p:spPr>
           <a:xfrm>
             <a:off x="4988160" y="3533400"/>
-            <a:ext cx="299160" cy="404640"/>
+            <a:ext cx="298800" cy="404280"/>
           </a:xfrm>
           <a:prstGeom prst="downArrow">
             <a:avLst>

</xml_diff>

<commit_message>
#12 Weak AI vs Strong AI explanation speech part 3 added on introduction slides
</commit_message>
<xml_diff>
--- a/SAI_presentation_libre_office.pptx
+++ b/SAI_presentation_libre_office.pptx
@@ -250,7 +250,7 @@
           <a:bodyPr lIns="0" rIns="0" tIns="0" bIns="0" anchor="b"/>
           <a:p>
             <a:pPr algn="r"/>
-            <a:fld id="{4F05004F-99EA-4949-8869-9F69F1A6BA1D}" type="slidenum">
+            <a:fld id="{6DA60267-36CD-4E28-9602-C0844D823BB9}" type="slidenum">
               <a:rPr b="0" lang="fr-FR" sz="1400" spc="-1" strike="noStrike">
                 <a:latin typeface="Times New Roman"/>
               </a:rPr>
@@ -298,7 +298,7 @@
         <p:spPr>
           <a:xfrm>
             <a:off x="685800" y="1143000"/>
-            <a:ext cx="5483520" cy="3083400"/>
+            <a:ext cx="5483160" cy="3083040"/>
           </a:xfrm>
           <a:prstGeom prst="rect">
             <a:avLst/>
@@ -318,7 +318,7 @@
         <p:spPr>
           <a:xfrm>
             <a:off x="685800" y="4400640"/>
-            <a:ext cx="5483520" cy="3597480"/>
+            <a:ext cx="5483160" cy="3597120"/>
           </a:xfrm>
           <a:prstGeom prst="rect">
             <a:avLst/>
@@ -327,7 +327,7 @@
         <p:txBody>
           <a:bodyPr lIns="0" rIns="0" tIns="0" bIns="0"/>
           <a:p>
-            <a:pPr marL="216000" indent="-213480">
+            <a:pPr marL="216000" indent="-213120">
               <a:lnSpc>
                 <a:spcPct val="100000"/>
               </a:lnSpc>
@@ -343,7 +343,7 @@
             </a:endParaRPr>
           </a:p>
           <a:p>
-            <a:pPr marL="216000" indent="-213480">
+            <a:pPr marL="216000" indent="-213120">
               <a:lnSpc>
                 <a:spcPct val="100000"/>
               </a:lnSpc>
@@ -360,7 +360,7 @@
             </a:endParaRPr>
           </a:p>
           <a:p>
-            <a:pPr marL="216000" indent="-213480">
+            <a:pPr marL="216000" indent="-213120">
               <a:lnSpc>
                 <a:spcPct val="100000"/>
               </a:lnSpc>
@@ -376,7 +376,7 @@
             </a:endParaRPr>
           </a:p>
           <a:p>
-            <a:pPr marL="216000" indent="-213480">
+            <a:pPr marL="216000" indent="-213120">
               <a:lnSpc>
                 <a:spcPct val="100000"/>
               </a:lnSpc>
@@ -392,7 +392,7 @@
             </a:endParaRPr>
           </a:p>
           <a:p>
-            <a:pPr marL="216000" indent="-213480">
+            <a:pPr marL="216000" indent="-213120">
               <a:lnSpc>
                 <a:spcPct val="100000"/>
               </a:lnSpc>
@@ -419,7 +419,7 @@
         <p:spPr>
           <a:xfrm>
             <a:off x="3884760" y="8685360"/>
-            <a:ext cx="2968920" cy="455760"/>
+            <a:ext cx="2968560" cy="455400"/>
           </a:xfrm>
           <a:prstGeom prst="rect">
             <a:avLst/>
@@ -443,7 +443,7 @@
                 <a:spcPct val="100000"/>
               </a:lnSpc>
             </a:pPr>
-            <a:fld id="{90645693-E2B3-4E85-97F6-857F7D54308E}" type="slidenum">
+            <a:fld id="{FF7396E4-2DEC-4C99-AFDB-E9680E8E65D8}" type="slidenum">
               <a:rPr b="0" lang="fr-FR" sz="1200" spc="-1" strike="noStrike">
                 <a:solidFill>
                   <a:srgbClr val="000000"/>
@@ -493,7 +493,7 @@
         <p:spPr>
           <a:xfrm>
             <a:off x="685800" y="1143000"/>
-            <a:ext cx="5483520" cy="3083400"/>
+            <a:ext cx="5483160" cy="3083040"/>
           </a:xfrm>
           <a:prstGeom prst="rect">
             <a:avLst/>
@@ -513,7 +513,7 @@
         <p:spPr>
           <a:xfrm>
             <a:off x="685800" y="4400640"/>
-            <a:ext cx="5483520" cy="3597480"/>
+            <a:ext cx="5483160" cy="3597120"/>
           </a:xfrm>
           <a:prstGeom prst="rect">
             <a:avLst/>
@@ -522,7 +522,7 @@
         <p:txBody>
           <a:bodyPr lIns="0" rIns="0" tIns="0" bIns="0"/>
           <a:p>
-            <a:pPr marL="216000" indent="-213840">
+            <a:pPr marL="216000" indent="-213480">
               <a:lnSpc>
                 <a:spcPct val="100000"/>
               </a:lnSpc>
@@ -538,7 +538,7 @@
             </a:endParaRPr>
           </a:p>
           <a:p>
-            <a:pPr marL="216000" indent="-213840">
+            <a:pPr marL="216000" indent="-213480">
               <a:lnSpc>
                 <a:spcPct val="100000"/>
               </a:lnSpc>
@@ -548,7 +548,7 @@
             </a:endParaRPr>
           </a:p>
           <a:p>
-            <a:pPr marL="216000" indent="-213840">
+            <a:pPr marL="216000" indent="-213480">
               <a:lnSpc>
                 <a:spcPct val="100000"/>
               </a:lnSpc>
@@ -564,7 +564,7 @@
             </a:endParaRPr>
           </a:p>
           <a:p>
-            <a:pPr marL="216000" indent="-213840">
+            <a:pPr marL="216000" indent="-213480">
               <a:lnSpc>
                 <a:spcPct val="100000"/>
               </a:lnSpc>
@@ -574,7 +574,7 @@
             </a:endParaRPr>
           </a:p>
           <a:p>
-            <a:pPr marL="216000" indent="-213840">
+            <a:pPr marL="216000" indent="-213480">
               <a:lnSpc>
                 <a:spcPct val="100000"/>
               </a:lnSpc>
@@ -590,7 +590,7 @@
             </a:endParaRPr>
           </a:p>
           <a:p>
-            <a:pPr marL="216000" indent="-213840">
+            <a:pPr marL="216000" indent="-213480">
               <a:lnSpc>
                 <a:spcPct val="100000"/>
               </a:lnSpc>
@@ -600,7 +600,7 @@
             </a:endParaRPr>
           </a:p>
           <a:p>
-            <a:pPr marL="216000" indent="-213840">
+            <a:pPr marL="216000" indent="-213480">
               <a:lnSpc>
                 <a:spcPct val="100000"/>
               </a:lnSpc>
@@ -616,7 +616,7 @@
             </a:endParaRPr>
           </a:p>
           <a:p>
-            <a:pPr marL="216000" indent="-213840">
+            <a:pPr marL="216000" indent="-213480">
               <a:lnSpc>
                 <a:spcPct val="100000"/>
               </a:lnSpc>
@@ -626,7 +626,7 @@
             </a:endParaRPr>
           </a:p>
           <a:p>
-            <a:pPr marL="216000" indent="-213840">
+            <a:pPr marL="216000" indent="-213480">
               <a:lnSpc>
                 <a:spcPct val="100000"/>
               </a:lnSpc>
@@ -636,7 +636,7 @@
             </a:endParaRPr>
           </a:p>
           <a:p>
-            <a:pPr marL="216000" indent="-213840">
+            <a:pPr marL="216000" indent="-213480">
               <a:lnSpc>
                 <a:spcPct val="100000"/>
               </a:lnSpc>
@@ -652,7 +652,7 @@
             </a:endParaRPr>
           </a:p>
           <a:p>
-            <a:pPr marL="216000" indent="-213840">
+            <a:pPr marL="216000" indent="-213480">
               <a:lnSpc>
                 <a:spcPct val="100000"/>
               </a:lnSpc>
@@ -668,7 +668,7 @@
             </a:endParaRPr>
           </a:p>
           <a:p>
-            <a:pPr marL="216000" indent="-213840">
+            <a:pPr marL="216000" indent="-213480">
               <a:lnSpc>
                 <a:spcPct val="100000"/>
               </a:lnSpc>
@@ -684,7 +684,7 @@
             </a:endParaRPr>
           </a:p>
           <a:p>
-            <a:pPr marL="216000" indent="-213840">
+            <a:pPr marL="216000" indent="-213480">
               <a:lnSpc>
                 <a:spcPct val="100000"/>
               </a:lnSpc>
@@ -694,7 +694,7 @@
             </a:endParaRPr>
           </a:p>
           <a:p>
-            <a:pPr marL="216000" indent="-213840">
+            <a:pPr marL="216000" indent="-213480">
               <a:lnSpc>
                 <a:spcPct val="100000"/>
               </a:lnSpc>
@@ -710,7 +710,7 @@
             </a:endParaRPr>
           </a:p>
           <a:p>
-            <a:pPr marL="216000" indent="-213840">
+            <a:pPr marL="216000" indent="-213480">
               <a:lnSpc>
                 <a:spcPct val="100000"/>
               </a:lnSpc>
@@ -720,7 +720,7 @@
             </a:endParaRPr>
           </a:p>
           <a:p>
-            <a:pPr marL="216000" indent="-213840">
+            <a:pPr marL="216000" indent="-213480">
               <a:lnSpc>
                 <a:spcPct val="100000"/>
               </a:lnSpc>
@@ -736,7 +736,7 @@
             </a:endParaRPr>
           </a:p>
           <a:p>
-            <a:pPr marL="216000" indent="-213840">
+            <a:pPr marL="216000" indent="-213480">
               <a:lnSpc>
                 <a:spcPct val="100000"/>
               </a:lnSpc>
@@ -752,7 +752,7 @@
             </a:endParaRPr>
           </a:p>
           <a:p>
-            <a:pPr marL="216000" indent="-213840">
+            <a:pPr marL="216000" indent="-213480">
               <a:lnSpc>
                 <a:spcPct val="100000"/>
               </a:lnSpc>
@@ -768,7 +768,7 @@
             </a:endParaRPr>
           </a:p>
           <a:p>
-            <a:pPr marL="216000" indent="-213840">
+            <a:pPr marL="216000" indent="-213480">
               <a:lnSpc>
                 <a:spcPct val="100000"/>
               </a:lnSpc>
@@ -784,7 +784,7 @@
             </a:endParaRPr>
           </a:p>
           <a:p>
-            <a:pPr marL="216000" indent="-213840">
+            <a:pPr marL="216000" indent="-213480">
               <a:lnSpc>
                 <a:spcPct val="100000"/>
               </a:lnSpc>
@@ -794,7 +794,7 @@
             </a:endParaRPr>
           </a:p>
           <a:p>
-            <a:pPr marL="216000" indent="-213840">
+            <a:pPr marL="216000" indent="-213480">
               <a:lnSpc>
                 <a:spcPct val="100000"/>
               </a:lnSpc>
@@ -810,7 +810,7 @@
             </a:endParaRPr>
           </a:p>
           <a:p>
-            <a:pPr marL="216000" indent="-213840">
+            <a:pPr marL="216000" indent="-213480">
               <a:lnSpc>
                 <a:spcPct val="100000"/>
               </a:lnSpc>
@@ -826,7 +826,7 @@
             </a:endParaRPr>
           </a:p>
           <a:p>
-            <a:pPr marL="216000" indent="-213840">
+            <a:pPr marL="216000" indent="-213480">
               <a:lnSpc>
                 <a:spcPct val="100000"/>
               </a:lnSpc>
@@ -842,7 +842,7 @@
             </a:endParaRPr>
           </a:p>
           <a:p>
-            <a:pPr marL="216000" indent="-213840">
+            <a:pPr marL="216000" indent="-213480">
               <a:lnSpc>
                 <a:spcPct val="100000"/>
               </a:lnSpc>
@@ -858,7 +858,7 @@
             </a:endParaRPr>
           </a:p>
           <a:p>
-            <a:pPr marL="216000" indent="-213840">
+            <a:pPr marL="216000" indent="-213480">
               <a:lnSpc>
                 <a:spcPct val="100000"/>
               </a:lnSpc>
@@ -874,7 +874,7 @@
             </a:endParaRPr>
           </a:p>
           <a:p>
-            <a:pPr marL="216000" indent="-213840">
+            <a:pPr marL="216000" indent="-213480">
               <a:lnSpc>
                 <a:spcPct val="100000"/>
               </a:lnSpc>
@@ -884,7 +884,7 @@
             </a:endParaRPr>
           </a:p>
           <a:p>
-            <a:pPr marL="216000" indent="-213840">
+            <a:pPr marL="216000" indent="-213480">
               <a:lnSpc>
                 <a:spcPct val="100000"/>
               </a:lnSpc>
@@ -900,7 +900,7 @@
             </a:endParaRPr>
           </a:p>
           <a:p>
-            <a:pPr marL="216000" indent="-213840">
+            <a:pPr marL="216000" indent="-213480">
               <a:lnSpc>
                 <a:spcPct val="100000"/>
               </a:lnSpc>
@@ -916,7 +916,7 @@
             </a:endParaRPr>
           </a:p>
           <a:p>
-            <a:pPr marL="216000" indent="-213840">
+            <a:pPr marL="216000" indent="-213480">
               <a:lnSpc>
                 <a:spcPct val="100000"/>
               </a:lnSpc>
@@ -932,7 +932,7 @@
             </a:endParaRPr>
           </a:p>
           <a:p>
-            <a:pPr marL="216000" indent="-213840">
+            <a:pPr marL="216000" indent="-213480">
               <a:lnSpc>
                 <a:spcPct val="100000"/>
               </a:lnSpc>
@@ -942,7 +942,7 @@
             </a:endParaRPr>
           </a:p>
           <a:p>
-            <a:pPr marL="216000" indent="-213840">
+            <a:pPr marL="216000" indent="-213480">
               <a:lnSpc>
                 <a:spcPct val="100000"/>
               </a:lnSpc>
@@ -958,7 +958,7 @@
             </a:endParaRPr>
           </a:p>
           <a:p>
-            <a:pPr marL="216000" indent="-213840">
+            <a:pPr marL="216000" indent="-213480">
               <a:lnSpc>
                 <a:spcPct val="100000"/>
               </a:lnSpc>
@@ -974,7 +974,7 @@
             </a:endParaRPr>
           </a:p>
           <a:p>
-            <a:pPr marL="216000" indent="-213840">
+            <a:pPr marL="216000" indent="-213480">
               <a:lnSpc>
                 <a:spcPct val="100000"/>
               </a:lnSpc>
@@ -990,7 +990,7 @@
             </a:endParaRPr>
           </a:p>
           <a:p>
-            <a:pPr marL="216000" indent="-213840">
+            <a:pPr marL="216000" indent="-213480">
               <a:lnSpc>
                 <a:spcPct val="100000"/>
               </a:lnSpc>
@@ -1000,7 +1000,7 @@
             </a:endParaRPr>
           </a:p>
           <a:p>
-            <a:pPr marL="216000" indent="-213840">
+            <a:pPr marL="216000" indent="-213480">
               <a:lnSpc>
                 <a:spcPct val="100000"/>
               </a:lnSpc>
@@ -1016,7 +1016,7 @@
             </a:endParaRPr>
           </a:p>
           <a:p>
-            <a:pPr marL="216000" indent="-213840">
+            <a:pPr marL="216000" indent="-213480">
               <a:lnSpc>
                 <a:spcPct val="100000"/>
               </a:lnSpc>
@@ -1032,7 +1032,7 @@
             </a:endParaRPr>
           </a:p>
           <a:p>
-            <a:pPr marL="216000" indent="-213840">
+            <a:pPr marL="216000" indent="-213480">
               <a:lnSpc>
                 <a:spcPct val="100000"/>
               </a:lnSpc>
@@ -1048,7 +1048,7 @@
             </a:endParaRPr>
           </a:p>
           <a:p>
-            <a:pPr marL="216000" indent="-213840">
+            <a:pPr marL="216000" indent="-213480">
               <a:lnSpc>
                 <a:spcPct val="100000"/>
               </a:lnSpc>
@@ -1064,7 +1064,7 @@
             </a:endParaRPr>
           </a:p>
           <a:p>
-            <a:pPr marL="216000" indent="-213840">
+            <a:pPr marL="216000" indent="-213480">
               <a:lnSpc>
                 <a:spcPct val="100000"/>
               </a:lnSpc>
@@ -1074,7 +1074,7 @@
             </a:endParaRPr>
           </a:p>
           <a:p>
-            <a:pPr marL="216000" indent="-213840">
+            <a:pPr marL="216000" indent="-213480">
               <a:lnSpc>
                 <a:spcPct val="100000"/>
               </a:lnSpc>
@@ -1090,7 +1090,7 @@
             </a:endParaRPr>
           </a:p>
           <a:p>
-            <a:pPr marL="216000" indent="-213840">
+            <a:pPr marL="216000" indent="-213480">
               <a:lnSpc>
                 <a:spcPct val="100000"/>
               </a:lnSpc>
@@ -1107,7 +1107,7 @@
             </a:endParaRPr>
           </a:p>
           <a:p>
-            <a:pPr marL="216000" indent="-213840">
+            <a:pPr marL="216000" indent="-213480">
               <a:lnSpc>
                 <a:spcPct val="100000"/>
               </a:lnSpc>
@@ -1124,7 +1124,7 @@
             </a:endParaRPr>
           </a:p>
           <a:p>
-            <a:pPr marL="216000" indent="-213840">
+            <a:pPr marL="216000" indent="-213480">
               <a:lnSpc>
                 <a:spcPct val="100000"/>
               </a:lnSpc>
@@ -1141,7 +1141,7 @@
             </a:endParaRPr>
           </a:p>
           <a:p>
-            <a:pPr marL="216000" indent="-213840">
+            <a:pPr marL="216000" indent="-213480">
               <a:lnSpc>
                 <a:spcPct val="100000"/>
               </a:lnSpc>
@@ -1151,7 +1151,7 @@
             </a:endParaRPr>
           </a:p>
           <a:p>
-            <a:pPr marL="216000" indent="-213840">
+            <a:pPr marL="216000" indent="-213480">
               <a:lnSpc>
                 <a:spcPct val="100000"/>
               </a:lnSpc>
@@ -1168,7 +1168,7 @@
             </a:endParaRPr>
           </a:p>
           <a:p>
-            <a:pPr marL="216000" indent="-213840">
+            <a:pPr marL="216000" indent="-213480">
               <a:lnSpc>
                 <a:spcPct val="100000"/>
               </a:lnSpc>
@@ -1185,7 +1185,7 @@
             </a:endParaRPr>
           </a:p>
           <a:p>
-            <a:pPr marL="216000" indent="-213840">
+            <a:pPr marL="216000" indent="-213480">
               <a:lnSpc>
                 <a:spcPct val="100000"/>
               </a:lnSpc>
@@ -1195,7 +1195,7 @@
             </a:endParaRPr>
           </a:p>
           <a:p>
-            <a:pPr marL="216000" indent="-213840">
+            <a:pPr marL="216000" indent="-213480">
               <a:lnSpc>
                 <a:spcPct val="100000"/>
               </a:lnSpc>
@@ -1205,7 +1205,7 @@
             </a:endParaRPr>
           </a:p>
           <a:p>
-            <a:pPr marL="216000" indent="-213840">
+            <a:pPr marL="216000" indent="-213480">
               <a:lnSpc>
                 <a:spcPct val="100000"/>
               </a:lnSpc>
@@ -1215,7 +1215,7 @@
             </a:endParaRPr>
           </a:p>
           <a:p>
-            <a:pPr marL="216000" indent="-213840">
+            <a:pPr marL="216000" indent="-213480">
               <a:lnSpc>
                 <a:spcPct val="100000"/>
               </a:lnSpc>
@@ -1225,7 +1225,7 @@
             </a:endParaRPr>
           </a:p>
           <a:p>
-            <a:pPr marL="216000" indent="-213840">
+            <a:pPr marL="216000" indent="-213480">
               <a:lnSpc>
                 <a:spcPct val="100000"/>
               </a:lnSpc>
@@ -1245,7 +1245,7 @@
         <p:spPr>
           <a:xfrm>
             <a:off x="3884760" y="8685360"/>
-            <a:ext cx="2968920" cy="455760"/>
+            <a:ext cx="2968560" cy="455400"/>
           </a:xfrm>
           <a:prstGeom prst="rect">
             <a:avLst/>
@@ -1269,7 +1269,7 @@
                 <a:spcPct val="100000"/>
               </a:lnSpc>
             </a:pPr>
-            <a:fld id="{B50DF82A-F5E2-4428-B395-29DC1AD4F77E}" type="slidenum">
+            <a:fld id="{8BCD16B1-DC43-440C-BDAA-71F410E0124A}" type="slidenum">
               <a:rPr b="0" lang="fr-FR" sz="1200" spc="-1" strike="noStrike">
                 <a:solidFill>
                   <a:srgbClr val="000000"/>
@@ -1319,7 +1319,7 @@
         <p:spPr>
           <a:xfrm>
             <a:off x="685800" y="1143000"/>
-            <a:ext cx="5483520" cy="3083400"/>
+            <a:ext cx="5483160" cy="3083040"/>
           </a:xfrm>
           <a:prstGeom prst="rect">
             <a:avLst/>
@@ -1339,7 +1339,7 @@
         <p:spPr>
           <a:xfrm>
             <a:off x="685800" y="4400640"/>
-            <a:ext cx="5483520" cy="3597480"/>
+            <a:ext cx="5483160" cy="3597120"/>
           </a:xfrm>
           <a:prstGeom prst="rect">
             <a:avLst/>
@@ -1348,7 +1348,7 @@
         <p:txBody>
           <a:bodyPr lIns="0" rIns="0" tIns="0" bIns="0"/>
           <a:p>
-            <a:pPr marL="216000" indent="-215640">
+            <a:pPr marL="216000" indent="-215280">
               <a:lnSpc>
                 <a:spcPct val="100000"/>
               </a:lnSpc>
@@ -1364,7 +1364,7 @@
             </a:endParaRPr>
           </a:p>
           <a:p>
-            <a:pPr marL="216000" indent="-215640">
+            <a:pPr marL="216000" indent="-215280">
               <a:lnSpc>
                 <a:spcPct val="100000"/>
               </a:lnSpc>
@@ -1380,7 +1380,7 @@
             </a:endParaRPr>
           </a:p>
           <a:p>
-            <a:pPr marL="216000" indent="-215640">
+            <a:pPr marL="216000" indent="-215280">
               <a:lnSpc>
                 <a:spcPct val="100000"/>
               </a:lnSpc>
@@ -1396,7 +1396,7 @@
             </a:endParaRPr>
           </a:p>
           <a:p>
-            <a:pPr marL="216000" indent="-215640">
+            <a:pPr marL="216000" indent="-215280">
               <a:lnSpc>
                 <a:spcPct val="100000"/>
               </a:lnSpc>
@@ -1406,7 +1406,7 @@
             </a:endParaRPr>
           </a:p>
           <a:p>
-            <a:pPr marL="216000" indent="-215640">
+            <a:pPr marL="216000" indent="-215280">
               <a:lnSpc>
                 <a:spcPct val="100000"/>
               </a:lnSpc>
@@ -1422,7 +1422,7 @@
             </a:endParaRPr>
           </a:p>
           <a:p>
-            <a:pPr marL="216000" indent="-215640">
+            <a:pPr marL="216000" indent="-215280">
               <a:lnSpc>
                 <a:spcPct val="100000"/>
               </a:lnSpc>
@@ -1438,7 +1438,7 @@
             </a:endParaRPr>
           </a:p>
           <a:p>
-            <a:pPr marL="216000" indent="-215640">
+            <a:pPr marL="216000" indent="-215280">
               <a:lnSpc>
                 <a:spcPct val="100000"/>
               </a:lnSpc>
@@ -1448,7 +1448,59 @@
             </a:endParaRPr>
           </a:p>
           <a:p>
-            <a:pPr marL="216000" indent="-215640">
+            <a:pPr marL="216000" indent="-215280">
+              <a:lnSpc>
+                <a:spcPct val="100000"/>
+              </a:lnSpc>
+            </a:pPr>
+            <a:r>
+              <a:rPr b="0" lang="fr-FR" sz="1800" spc="-1" strike="noStrike">
+                <a:latin typeface="Arial"/>
+              </a:rPr>
+              <a:t>It may understand this question if we train it before or prepare the answer before.</a:t>
+            </a:r>
+            <a:endParaRPr b="0" lang="fr-FR" sz="1800" spc="-1" strike="noStrike">
+              <a:latin typeface="Arial"/>
+            </a:endParaRPr>
+          </a:p>
+          <a:p>
+            <a:pPr marL="216000" indent="-215280">
+              <a:lnSpc>
+                <a:spcPct val="100000"/>
+              </a:lnSpc>
+            </a:pPr>
+            <a:endParaRPr b="0" lang="fr-FR" sz="1800" spc="-1" strike="noStrike">
+              <a:latin typeface="Arial"/>
+            </a:endParaRPr>
+          </a:p>
+          <a:p>
+            <a:pPr marL="216000" indent="-215280">
+              <a:lnSpc>
+                <a:spcPct val="100000"/>
+              </a:lnSpc>
+            </a:pPr>
+            <a:r>
+              <a:rPr b="0" lang="fr-FR" sz="1800" spc="-1" strike="noStrike">
+                <a:latin typeface="Arial"/>
+              </a:rPr>
+              <a:t>TODO</a:t>
+            </a:r>
+            <a:endParaRPr b="0" lang="fr-FR" sz="1800" spc="-1" strike="noStrike">
+              <a:latin typeface="Arial"/>
+            </a:endParaRPr>
+          </a:p>
+          <a:p>
+            <a:pPr marL="216000" indent="-215280">
+              <a:lnSpc>
+                <a:spcPct val="100000"/>
+              </a:lnSpc>
+            </a:pPr>
+            <a:endParaRPr b="0" lang="fr-FR" sz="1800" spc="-1" strike="noStrike">
+              <a:latin typeface="Arial"/>
+            </a:endParaRPr>
+          </a:p>
+          <a:p>
+            <a:pPr marL="216000" indent="-215280">
               <a:lnSpc>
                 <a:spcPct val="100000"/>
               </a:lnSpc>
@@ -1468,7 +1520,7 @@
         <p:spPr>
           <a:xfrm>
             <a:off x="3884760" y="8685360"/>
-            <a:ext cx="2968920" cy="455760"/>
+            <a:ext cx="2968560" cy="455400"/>
           </a:xfrm>
           <a:prstGeom prst="rect">
             <a:avLst/>
@@ -1492,7 +1544,7 @@
                 <a:spcPct val="100000"/>
               </a:lnSpc>
             </a:pPr>
-            <a:fld id="{6D1C4CDD-D4AB-4623-A625-850DD8B872F0}" type="slidenum">
+            <a:fld id="{9E95F168-EA7B-4651-A707-0F5241F40FEE}" type="slidenum">
               <a:rPr b="0" lang="fr-FR" sz="1200" spc="-1" strike="noStrike">
                 <a:solidFill>
                   <a:srgbClr val="000000"/>
@@ -1542,7 +1594,7 @@
         <p:spPr>
           <a:xfrm>
             <a:off x="380880" y="694800"/>
-            <a:ext cx="6094080" cy="3427200"/>
+            <a:ext cx="6093720" cy="3426840"/>
           </a:xfrm>
           <a:prstGeom prst="rect">
             <a:avLst/>
@@ -1562,7 +1614,7 @@
         <p:spPr>
           <a:xfrm>
             <a:off x="685800" y="4343400"/>
-            <a:ext cx="5484600" cy="4113000"/>
+            <a:ext cx="5484240" cy="4112640"/>
           </a:xfrm>
           <a:prstGeom prst="rect">
             <a:avLst/>
@@ -1571,7 +1623,7 @@
         <p:txBody>
           <a:bodyPr lIns="0" rIns="0" tIns="0" bIns="0"/>
           <a:p>
-            <a:pPr marL="216000" indent="-214920">
+            <a:pPr marL="216000" indent="-214560">
               <a:lnSpc>
                 <a:spcPct val="100000"/>
               </a:lnSpc>
@@ -1587,7 +1639,7 @@
             </a:endParaRPr>
           </a:p>
           <a:p>
-            <a:pPr marL="216000" indent="-214920">
+            <a:pPr marL="216000" indent="-214560">
               <a:lnSpc>
                 <a:spcPct val="100000"/>
               </a:lnSpc>
@@ -1603,7 +1655,7 @@
             </a:endParaRPr>
           </a:p>
           <a:p>
-            <a:pPr marL="216000" indent="-214920">
+            <a:pPr marL="216000" indent="-214560">
               <a:lnSpc>
                 <a:spcPct val="100000"/>
               </a:lnSpc>
@@ -1619,7 +1671,7 @@
             </a:endParaRPr>
           </a:p>
           <a:p>
-            <a:pPr marL="216000" indent="-214920">
+            <a:pPr marL="216000" indent="-214560">
               <a:lnSpc>
                 <a:spcPct val="100000"/>
               </a:lnSpc>
@@ -5367,7 +5419,7 @@
         <p:spPr>
           <a:xfrm>
             <a:off x="0" y="0"/>
-            <a:ext cx="12189240" cy="6855120"/>
+            <a:ext cx="12188880" cy="6854760"/>
           </a:xfrm>
           <a:prstGeom prst="rect">
             <a:avLst/>
@@ -5399,8 +5451,8 @@
         </p:nvSpPr>
         <p:spPr>
           <a:xfrm flipV="1">
-            <a:off x="0" y="-2880"/>
-            <a:ext cx="12186000" cy="6855120"/>
+            <a:off x="0" y="-3600"/>
+            <a:ext cx="12185640" cy="6854760"/>
           </a:xfrm>
           <a:prstGeom prst="snip1Rect">
             <a:avLst>
@@ -5455,7 +5507,7 @@
         <p:spPr>
           <a:xfrm>
             <a:off x="684360" y="685800"/>
-            <a:ext cx="9676080" cy="3670560"/>
+            <a:ext cx="9675720" cy="3670200"/>
           </a:xfrm>
           <a:prstGeom prst="rect">
             <a:avLst/>
@@ -5506,7 +5558,7 @@
         <p:spPr>
           <a:xfrm>
             <a:off x="684360" y="4648320"/>
-            <a:ext cx="7002720" cy="1140120"/>
+            <a:ext cx="7002360" cy="1139760"/>
           </a:xfrm>
           <a:prstGeom prst="rect">
             <a:avLst/>
@@ -5644,7 +5696,7 @@
         <p:spPr>
           <a:xfrm>
             <a:off x="684360" y="4487400"/>
-            <a:ext cx="8531640" cy="1504080"/>
+            <a:ext cx="8531280" cy="1503720"/>
           </a:xfrm>
           <a:prstGeom prst="rect">
             <a:avLst/>
@@ -5693,7 +5745,7 @@
         <p:spPr>
           <a:xfrm>
             <a:off x="684360" y="685800"/>
-            <a:ext cx="8531640" cy="3612240"/>
+            <a:ext cx="8531280" cy="3611880"/>
           </a:xfrm>
           <a:prstGeom prst="rect">
             <a:avLst/>
@@ -5712,7 +5764,7 @@
         <p:txBody>
           <a:bodyPr lIns="90000" rIns="90000" tIns="45000" bIns="45000" anchor="ctr"/>
           <a:p>
-            <a:pPr marL="285840" indent="-282960">
+            <a:pPr marL="285840" indent="-282600">
               <a:lnSpc>
                 <a:spcPct val="100000"/>
               </a:lnSpc>
@@ -5844,7 +5896,7 @@
             </a:endParaRPr>
           </a:p>
           <a:p>
-            <a:pPr marL="285840" indent="-282960">
+            <a:pPr marL="285840" indent="-282600">
               <a:lnSpc>
                 <a:spcPct val="100000"/>
               </a:lnSpc>
@@ -5890,7 +5942,7 @@
         <p:spPr>
           <a:xfrm>
             <a:off x="4733640" y="3979440"/>
-            <a:ext cx="911520" cy="911520"/>
+            <a:ext cx="911160" cy="911160"/>
           </a:xfrm>
           <a:prstGeom prst="rect">
             <a:avLst/>
@@ -5913,7 +5965,7 @@
         <p:spPr>
           <a:xfrm>
             <a:off x="6825960" y="4030200"/>
-            <a:ext cx="911520" cy="911520"/>
+            <a:ext cx="911160" cy="911160"/>
           </a:xfrm>
           <a:prstGeom prst="rect">
             <a:avLst/>
@@ -5936,7 +5988,7 @@
         <p:spPr>
           <a:xfrm>
             <a:off x="5354640" y="2725920"/>
-            <a:ext cx="911520" cy="911520"/>
+            <a:ext cx="911160" cy="911160"/>
           </a:xfrm>
           <a:prstGeom prst="rect">
             <a:avLst/>
@@ -5959,7 +6011,7 @@
         <p:spPr>
           <a:xfrm>
             <a:off x="8550000" y="3433320"/>
-            <a:ext cx="911520" cy="911520"/>
+            <a:ext cx="911160" cy="911160"/>
           </a:xfrm>
           <a:prstGeom prst="rect">
             <a:avLst/>
@@ -5982,7 +6034,7 @@
         <p:spPr>
           <a:xfrm>
             <a:off x="5153040" y="5079960"/>
-            <a:ext cx="911520" cy="911520"/>
+            <a:ext cx="911160" cy="911160"/>
           </a:xfrm>
           <a:prstGeom prst="rect">
             <a:avLst/>
@@ -6000,8 +6052,8 @@
         </p:nvSpPr>
         <p:spPr>
           <a:xfrm rot="3732600">
-            <a:off x="7994520" y="3763800"/>
-            <a:ext cx="201240" cy="667080"/>
+            <a:off x="7994520" y="3763440"/>
+            <a:ext cx="200880" cy="666720"/>
           </a:xfrm>
           <a:prstGeom prst="downArrow">
             <a:avLst>
@@ -6039,8 +6091,8 @@
         </p:nvSpPr>
         <p:spPr>
           <a:xfrm rot="14618400">
-            <a:off x="6344280" y="4763880"/>
-            <a:ext cx="201240" cy="667080"/>
+            <a:off x="6343920" y="4763880"/>
+            <a:ext cx="200880" cy="666720"/>
           </a:xfrm>
           <a:prstGeom prst="downArrow">
             <a:avLst>
@@ -6078,8 +6130,8 @@
         </p:nvSpPr>
         <p:spPr>
           <a:xfrm rot="5400000">
-            <a:off x="6191640" y="4132800"/>
-            <a:ext cx="201240" cy="667080"/>
+            <a:off x="6192000" y="4132800"/>
+            <a:ext cx="200880" cy="666720"/>
           </a:xfrm>
           <a:prstGeom prst="downArrow">
             <a:avLst>
@@ -6117,8 +6169,8 @@
         </p:nvSpPr>
         <p:spPr>
           <a:xfrm rot="7014000">
-            <a:off x="6424920" y="3552840"/>
-            <a:ext cx="201240" cy="667080"/>
+            <a:off x="6424920" y="3552480"/>
+            <a:ext cx="200880" cy="666720"/>
           </a:xfrm>
           <a:prstGeom prst="downArrow">
             <a:avLst>
@@ -6156,8 +6208,8 @@
         </p:nvSpPr>
         <p:spPr>
           <a:xfrm rot="1747800">
-            <a:off x="5088600" y="3303360"/>
-            <a:ext cx="201240" cy="667080"/>
+            <a:off x="5088240" y="3303000"/>
+            <a:ext cx="200880" cy="666720"/>
           </a:xfrm>
           <a:prstGeom prst="downArrow">
             <a:avLst>
@@ -6245,7 +6297,7 @@
         <p:spPr>
           <a:xfrm>
             <a:off x="6868080" y="306720"/>
-            <a:ext cx="5041080" cy="2082960"/>
+            <a:ext cx="5040720" cy="2082600"/>
           </a:xfrm>
           <a:prstGeom prst="rect">
             <a:avLst/>
@@ -6288,7 +6340,7 @@
         <p:spPr>
           <a:xfrm>
             <a:off x="6271200" y="2669400"/>
-            <a:ext cx="5630040" cy="3006000"/>
+            <a:ext cx="5629680" cy="3005640"/>
           </a:xfrm>
           <a:prstGeom prst="rect">
             <a:avLst/>
@@ -6333,7 +6385,7 @@
         <p:spPr>
           <a:xfrm>
             <a:off x="129960" y="5709960"/>
-            <a:ext cx="11180520" cy="1087200"/>
+            <a:ext cx="11180160" cy="1086840"/>
           </a:xfrm>
           <a:prstGeom prst="rect">
             <a:avLst/>
@@ -6378,7 +6430,7 @@
         <p:spPr>
           <a:xfrm>
             <a:off x="207000" y="1787400"/>
-            <a:ext cx="5591880" cy="3225240"/>
+            <a:ext cx="5591520" cy="3224880"/>
           </a:xfrm>
           <a:prstGeom prst="rect">
             <a:avLst/>
@@ -6423,7 +6475,7 @@
         <p:spPr>
           <a:xfrm>
             <a:off x="684360" y="4487400"/>
-            <a:ext cx="8531640" cy="1504080"/>
+            <a:ext cx="8531280" cy="1503720"/>
           </a:xfrm>
           <a:prstGeom prst="rect">
             <a:avLst/>
@@ -6472,7 +6524,7 @@
         <p:spPr>
           <a:xfrm>
             <a:off x="684360" y="685800"/>
-            <a:ext cx="8531640" cy="3612240"/>
+            <a:ext cx="8531280" cy="3611880"/>
           </a:xfrm>
           <a:prstGeom prst="rect">
             <a:avLst/>
@@ -6491,7 +6543,7 @@
         <p:txBody>
           <a:bodyPr lIns="90000" rIns="90000" tIns="45000" bIns="45000" anchor="ctr"/>
           <a:p>
-            <a:pPr marL="285840" indent="-282960">
+            <a:pPr marL="285840" indent="-282600">
               <a:lnSpc>
                 <a:spcPct val="100000"/>
               </a:lnSpc>
@@ -6543,7 +6595,7 @@
             </a:endParaRPr>
           </a:p>
           <a:p>
-            <a:pPr marL="285840" indent="-282960">
+            <a:pPr marL="285840" indent="-282600">
               <a:lnSpc>
                 <a:spcPct val="100000"/>
               </a:lnSpc>
@@ -6585,7 +6637,7 @@
             </a:endParaRPr>
           </a:p>
           <a:p>
-            <a:pPr marL="285840" indent="-282960">
+            <a:pPr marL="285840" indent="-282600">
               <a:lnSpc>
                 <a:spcPct val="100000"/>
               </a:lnSpc>
@@ -6637,7 +6689,7 @@
             </a:endParaRPr>
           </a:p>
           <a:p>
-            <a:pPr marL="285840" indent="-282960">
+            <a:pPr marL="285840" indent="-282600">
               <a:lnSpc>
                 <a:spcPct val="100000"/>
               </a:lnSpc>
@@ -6805,7 +6857,7 @@
         <p:spPr>
           <a:xfrm>
             <a:off x="4629600" y="1832040"/>
-            <a:ext cx="851760" cy="851760"/>
+            <a:ext cx="851400" cy="851400"/>
           </a:xfrm>
           <a:prstGeom prst="rect">
             <a:avLst/>
@@ -6828,7 +6880,7 @@
         <p:spPr>
           <a:xfrm>
             <a:off x="4463640" y="4185360"/>
-            <a:ext cx="1178280" cy="470520"/>
+            <a:ext cx="1177920" cy="470160"/>
           </a:xfrm>
           <a:prstGeom prst="rect">
             <a:avLst/>
@@ -6851,7 +6903,7 @@
         <p:spPr>
           <a:xfrm>
             <a:off x="4586040" y="2785680"/>
-            <a:ext cx="895320" cy="1037520"/>
+            <a:ext cx="894960" cy="1037160"/>
           </a:xfrm>
           <a:prstGeom prst="rect">
             <a:avLst/>
@@ -6874,7 +6926,7 @@
         <p:spPr>
           <a:xfrm>
             <a:off x="250560" y="1953720"/>
-            <a:ext cx="911520" cy="911520"/>
+            <a:ext cx="911160" cy="911160"/>
           </a:xfrm>
           <a:prstGeom prst="rect">
             <a:avLst/>
@@ -6897,7 +6949,7 @@
         <p:spPr>
           <a:xfrm>
             <a:off x="271440" y="3259800"/>
-            <a:ext cx="911520" cy="911520"/>
+            <a:ext cx="911160" cy="911160"/>
           </a:xfrm>
           <a:prstGeom prst="rect">
             <a:avLst/>
@@ -6920,7 +6972,7 @@
         <p:spPr>
           <a:xfrm>
             <a:off x="2440800" y="2741040"/>
-            <a:ext cx="911520" cy="911520"/>
+            <a:ext cx="911160" cy="911160"/>
           </a:xfrm>
           <a:prstGeom prst="rect">
             <a:avLst/>
@@ -6938,8 +6990,8 @@
         </p:nvSpPr>
         <p:spPr>
           <a:xfrm rot="1192200">
-            <a:off x="1578600" y="2560680"/>
-            <a:ext cx="975600" cy="481680"/>
+            <a:off x="1578600" y="2560320"/>
+            <a:ext cx="975240" cy="481320"/>
           </a:xfrm>
           <a:prstGeom prst="rightArrow">
             <a:avLst>
@@ -6980,8 +7032,8 @@
         </p:nvSpPr>
         <p:spPr>
           <a:xfrm rot="20407800">
-            <a:off x="1558080" y="3348360"/>
-            <a:ext cx="975600" cy="481680"/>
+            <a:off x="1557720" y="3348000"/>
+            <a:ext cx="975240" cy="481320"/>
           </a:xfrm>
           <a:prstGeom prst="rightArrow">
             <a:avLst>
@@ -7022,8 +7074,8 @@
         </p:nvSpPr>
         <p:spPr>
           <a:xfrm rot="1192200">
-            <a:off x="3332160" y="3669120"/>
-            <a:ext cx="975600" cy="481680"/>
+            <a:off x="3332160" y="3668760"/>
+            <a:ext cx="975240" cy="481320"/>
           </a:xfrm>
           <a:prstGeom prst="rightArrow">
             <a:avLst>
@@ -7064,8 +7116,8 @@
         </p:nvSpPr>
         <p:spPr>
           <a:xfrm rot="20407800">
-            <a:off x="3406320" y="2343960"/>
-            <a:ext cx="975600" cy="481680"/>
+            <a:off x="3405960" y="2343600"/>
+            <a:ext cx="975240" cy="481320"/>
           </a:xfrm>
           <a:prstGeom prst="rightArrow">
             <a:avLst>
@@ -7107,7 +7159,7 @@
         <p:spPr>
           <a:xfrm>
             <a:off x="3483720" y="3004200"/>
-            <a:ext cx="975600" cy="481680"/>
+            <a:ext cx="975240" cy="481320"/>
           </a:xfrm>
           <a:prstGeom prst="rightArrow">
             <a:avLst>
@@ -7153,7 +7205,7 @@
         <p:spPr>
           <a:xfrm>
             <a:off x="5819760" y="5709960"/>
-            <a:ext cx="911520" cy="911520"/>
+            <a:ext cx="911160" cy="911160"/>
           </a:xfrm>
           <a:prstGeom prst="rect">
             <a:avLst/>
@@ -7176,7 +7228,7 @@
         <p:spPr>
           <a:xfrm>
             <a:off x="2060640" y="5759640"/>
-            <a:ext cx="911520" cy="911520"/>
+            <a:ext cx="911160" cy="911160"/>
           </a:xfrm>
           <a:prstGeom prst="rect">
             <a:avLst/>
@@ -7199,7 +7251,7 @@
         <p:spPr>
           <a:xfrm>
             <a:off x="9383040" y="5709960"/>
-            <a:ext cx="911520" cy="911520"/>
+            <a:ext cx="911160" cy="911160"/>
           </a:xfrm>
           <a:prstGeom prst="rect">
             <a:avLst/>
@@ -7222,7 +7274,7 @@
         <p:spPr>
           <a:xfrm>
             <a:off x="7495920" y="5709960"/>
-            <a:ext cx="911520" cy="911520"/>
+            <a:ext cx="911160" cy="911160"/>
           </a:xfrm>
           <a:prstGeom prst="rect">
             <a:avLst/>
@@ -7245,7 +7297,7 @@
         <p:spPr>
           <a:xfrm>
             <a:off x="4004640" y="5709960"/>
-            <a:ext cx="911520" cy="911520"/>
+            <a:ext cx="911160" cy="911160"/>
           </a:xfrm>
           <a:prstGeom prst="rect">
             <a:avLst/>
@@ -7268,7 +7320,7 @@
         <p:spPr>
           <a:xfrm>
             <a:off x="276120" y="5759640"/>
-            <a:ext cx="911520" cy="911520"/>
+            <a:ext cx="911160" cy="911160"/>
           </a:xfrm>
           <a:prstGeom prst="rect">
             <a:avLst/>
@@ -7287,7 +7339,7 @@
         <p:spPr>
           <a:xfrm>
             <a:off x="1230120" y="6098760"/>
-            <a:ext cx="680040" cy="259200"/>
+            <a:ext cx="679680" cy="258840"/>
           </a:xfrm>
           <a:prstGeom prst="rightArrow">
             <a:avLst>
@@ -7326,7 +7378,7 @@
         <p:spPr>
           <a:xfrm>
             <a:off x="3103920" y="6117480"/>
-            <a:ext cx="680040" cy="259200"/>
+            <a:ext cx="679680" cy="258840"/>
           </a:xfrm>
           <a:prstGeom prst="rightArrow">
             <a:avLst>
@@ -7365,7 +7417,7 @@
         <p:spPr>
           <a:xfrm>
             <a:off x="4958640" y="6109200"/>
-            <a:ext cx="680040" cy="259200"/>
+            <a:ext cx="679680" cy="258840"/>
           </a:xfrm>
           <a:prstGeom prst="rightArrow">
             <a:avLst>
@@ -7404,7 +7456,7 @@
         <p:spPr>
           <a:xfrm>
             <a:off x="6754320" y="6098760"/>
-            <a:ext cx="680040" cy="259200"/>
+            <a:ext cx="679680" cy="258840"/>
           </a:xfrm>
           <a:prstGeom prst="rightArrow">
             <a:avLst>
@@ -7443,7 +7495,7 @@
         <p:spPr>
           <a:xfrm>
             <a:off x="8468280" y="6085800"/>
-            <a:ext cx="680040" cy="259200"/>
+            <a:ext cx="679680" cy="258840"/>
           </a:xfrm>
           <a:prstGeom prst="rightArrow">
             <a:avLst>
@@ -7486,7 +7538,7 @@
         <p:spPr>
           <a:xfrm>
             <a:off x="6582600" y="3915000"/>
-            <a:ext cx="911520" cy="911520"/>
+            <a:ext cx="911160" cy="911160"/>
           </a:xfrm>
           <a:prstGeom prst="rect">
             <a:avLst/>
@@ -7509,7 +7561,7 @@
         <p:spPr>
           <a:xfrm>
             <a:off x="8674920" y="3965760"/>
-            <a:ext cx="911520" cy="911520"/>
+            <a:ext cx="911160" cy="911160"/>
           </a:xfrm>
           <a:prstGeom prst="rect">
             <a:avLst/>
@@ -7532,7 +7584,7 @@
         <p:spPr>
           <a:xfrm>
             <a:off x="7203600" y="2661480"/>
-            <a:ext cx="911520" cy="911520"/>
+            <a:ext cx="911160" cy="911160"/>
           </a:xfrm>
           <a:prstGeom prst="rect">
             <a:avLst/>
@@ -7555,7 +7607,7 @@
         <p:spPr>
           <a:xfrm>
             <a:off x="10398960" y="3368880"/>
-            <a:ext cx="911520" cy="911520"/>
+            <a:ext cx="911160" cy="911160"/>
           </a:xfrm>
           <a:prstGeom prst="rect">
             <a:avLst/>
@@ -7578,7 +7630,7 @@
         <p:spPr>
           <a:xfrm>
             <a:off x="7002000" y="5015520"/>
-            <a:ext cx="911520" cy="911520"/>
+            <a:ext cx="911160" cy="911160"/>
           </a:xfrm>
           <a:prstGeom prst="rect">
             <a:avLst/>
@@ -7596,8 +7648,8 @@
         </p:nvSpPr>
         <p:spPr>
           <a:xfrm rot="3732600">
-            <a:off x="9843840" y="3699720"/>
-            <a:ext cx="201240" cy="667080"/>
+            <a:off x="9843840" y="3699360"/>
+            <a:ext cx="200880" cy="666720"/>
           </a:xfrm>
           <a:prstGeom prst="downArrow">
             <a:avLst>
@@ -7635,8 +7687,8 @@
         </p:nvSpPr>
         <p:spPr>
           <a:xfrm rot="14618400">
-            <a:off x="8193240" y="4699800"/>
-            <a:ext cx="201240" cy="667080"/>
+            <a:off x="8192880" y="4699800"/>
+            <a:ext cx="200880" cy="666720"/>
           </a:xfrm>
           <a:prstGeom prst="downArrow">
             <a:avLst>
@@ -7674,8 +7726,8 @@
         </p:nvSpPr>
         <p:spPr>
           <a:xfrm rot="5400000">
-            <a:off x="8040600" y="4068360"/>
-            <a:ext cx="201240" cy="667080"/>
+            <a:off x="8040960" y="4068360"/>
+            <a:ext cx="200880" cy="666720"/>
           </a:xfrm>
           <a:prstGeom prst="downArrow">
             <a:avLst>
@@ -7713,8 +7765,8 @@
         </p:nvSpPr>
         <p:spPr>
           <a:xfrm rot="7014000">
-            <a:off x="8274240" y="3488400"/>
-            <a:ext cx="201240" cy="667080"/>
+            <a:off x="8274240" y="3488040"/>
+            <a:ext cx="200880" cy="666720"/>
           </a:xfrm>
           <a:prstGeom prst="downArrow">
             <a:avLst>
@@ -7752,8 +7804,8 @@
         </p:nvSpPr>
         <p:spPr>
           <a:xfrm rot="1747800">
-            <a:off x="7095600" y="3425400"/>
-            <a:ext cx="201240" cy="667080"/>
+            <a:off x="7095240" y="3425040"/>
+            <a:ext cx="200880" cy="666720"/>
           </a:xfrm>
           <a:prstGeom prst="downArrow">
             <a:avLst>
@@ -7796,7 +7848,7 @@
         <p:spPr>
           <a:xfrm>
             <a:off x="8641080" y="309600"/>
-            <a:ext cx="911520" cy="911520"/>
+            <a:ext cx="911160" cy="911160"/>
           </a:xfrm>
           <a:prstGeom prst="rect">
             <a:avLst/>
@@ -7819,7 +7871,7 @@
         <p:spPr>
           <a:xfrm>
             <a:off x="10568880" y="1497240"/>
-            <a:ext cx="911520" cy="911520"/>
+            <a:ext cx="911160" cy="911160"/>
           </a:xfrm>
           <a:prstGeom prst="rect">
             <a:avLst/>
@@ -7842,7 +7894,7 @@
         <p:spPr>
           <a:xfrm>
             <a:off x="6932880" y="1497240"/>
-            <a:ext cx="911520" cy="911520"/>
+            <a:ext cx="911160" cy="911160"/>
           </a:xfrm>
           <a:prstGeom prst="rect">
             <a:avLst/>
@@ -7861,7 +7913,7 @@
         <p:spPr>
           <a:xfrm>
             <a:off x="8173800" y="1774080"/>
-            <a:ext cx="2065680" cy="357840"/>
+            <a:ext cx="2065320" cy="357480"/>
           </a:xfrm>
           <a:prstGeom prst="rightArrow">
             <a:avLst>
@@ -7900,7 +7952,7 @@
         <p:spPr>
           <a:xfrm>
             <a:off x="8947440" y="1361160"/>
-            <a:ext cx="298800" cy="404280"/>
+            <a:ext cx="298440" cy="403920"/>
           </a:xfrm>
           <a:prstGeom prst="downArrow">
             <a:avLst>
@@ -7988,7 +8040,7 @@
         <p:spPr>
           <a:xfrm>
             <a:off x="0" y="0"/>
-            <a:ext cx="12189240" cy="6855120"/>
+            <a:ext cx="12188880" cy="6854760"/>
           </a:xfrm>
           <a:prstGeom prst="rect">
             <a:avLst/>
@@ -8041,7 +8093,7 @@
         <p:spPr>
           <a:xfrm>
             <a:off x="640440" y="685800"/>
-            <a:ext cx="4815720" cy="4600800"/>
+            <a:ext cx="4815360" cy="4600440"/>
           </a:xfrm>
           <a:prstGeom prst="rect">
             <a:avLst/>
@@ -8092,7 +8144,7 @@
         <p:spPr>
           <a:xfrm>
             <a:off x="6095880" y="0"/>
-            <a:ext cx="6093000" cy="6855120"/>
+            <a:ext cx="6092640" cy="6854760"/>
           </a:xfrm>
           <a:prstGeom prst="rect">
             <a:avLst/>
@@ -8130,7 +8182,7 @@
         <p:spPr>
           <a:xfrm>
             <a:off x="6625800" y="685800"/>
-            <a:ext cx="4876200" cy="4600800"/>
+            <a:ext cx="4875840" cy="4600440"/>
           </a:xfrm>
           <a:prstGeom prst="rect">
             <a:avLst/>
@@ -8151,7 +8203,7 @@
             <a:normAutofit/>
           </a:bodyPr>
           <a:p>
-            <a:pPr marL="285840" indent="-282960">
+            <a:pPr marL="285840" indent="-282600">
               <a:lnSpc>
                 <a:spcPct val="100000"/>
               </a:lnSpc>
@@ -8183,7 +8235,7 @@
             </a:endParaRPr>
           </a:p>
           <a:p>
-            <a:pPr marL="285840" indent="-282960">
+            <a:pPr marL="285840" indent="-282600">
               <a:lnSpc>
                 <a:spcPct val="100000"/>
               </a:lnSpc>
@@ -8215,7 +8267,7 @@
             </a:endParaRPr>
           </a:p>
           <a:p>
-            <a:pPr marL="285840" indent="-282960">
+            <a:pPr marL="285840" indent="-282600">
               <a:lnSpc>
                 <a:spcPct val="100000"/>
               </a:lnSpc>
@@ -8247,7 +8299,7 @@
             </a:endParaRPr>
           </a:p>
           <a:p>
-            <a:pPr marL="285840" indent="-282960">
+            <a:pPr marL="285840" indent="-282600">
               <a:lnSpc>
                 <a:spcPct val="100000"/>
               </a:lnSpc>
@@ -8279,7 +8331,7 @@
             </a:endParaRPr>
           </a:p>
           <a:p>
-            <a:pPr marL="285840" indent="-282960">
+            <a:pPr marL="285840" indent="-282600">
               <a:lnSpc>
                 <a:spcPct val="100000"/>
               </a:lnSpc>
@@ -8343,7 +8395,7 @@
         <p:spPr>
           <a:xfrm>
             <a:off x="684360" y="4487400"/>
-            <a:ext cx="8531640" cy="1504080"/>
+            <a:ext cx="8531280" cy="1503720"/>
           </a:xfrm>
           <a:prstGeom prst="rect">
             <a:avLst/>
@@ -8392,7 +8444,7 @@
         <p:spPr>
           <a:xfrm>
             <a:off x="684360" y="685800"/>
-            <a:ext cx="8531640" cy="3612240"/>
+            <a:ext cx="8531280" cy="3611880"/>
           </a:xfrm>
           <a:prstGeom prst="rect">
             <a:avLst/>
@@ -8411,7 +8463,7 @@
         <p:txBody>
           <a:bodyPr lIns="90000" rIns="90000" tIns="45000" bIns="45000" anchor="ctr"/>
           <a:p>
-            <a:pPr marL="285840" indent="-282960">
+            <a:pPr marL="285840" indent="-282600">
               <a:lnSpc>
                 <a:spcPct val="100000"/>
               </a:lnSpc>
@@ -8443,7 +8495,7 @@
             </a:endParaRPr>
           </a:p>
           <a:p>
-            <a:pPr marL="285840" indent="-282960">
+            <a:pPr marL="285840" indent="-282600">
               <a:lnSpc>
                 <a:spcPct val="100000"/>
               </a:lnSpc>
@@ -8553,7 +8605,7 @@
         <p:spPr>
           <a:xfrm>
             <a:off x="6995520" y="1949760"/>
-            <a:ext cx="851760" cy="851760"/>
+            <a:ext cx="851400" cy="851400"/>
           </a:xfrm>
           <a:prstGeom prst="rect">
             <a:avLst/>
@@ -8576,7 +8628,7 @@
         <p:spPr>
           <a:xfrm>
             <a:off x="6829560" y="4303080"/>
-            <a:ext cx="1178280" cy="470520"/>
+            <a:ext cx="1177920" cy="470160"/>
           </a:xfrm>
           <a:prstGeom prst="rect">
             <a:avLst/>
@@ -8599,7 +8651,7 @@
         <p:spPr>
           <a:xfrm>
             <a:off x="6951960" y="2903040"/>
-            <a:ext cx="895320" cy="1037520"/>
+            <a:ext cx="894960" cy="1037160"/>
           </a:xfrm>
           <a:prstGeom prst="rect">
             <a:avLst/>
@@ -8622,7 +8674,7 @@
         <p:spPr>
           <a:xfrm>
             <a:off x="2616120" y="2071080"/>
-            <a:ext cx="911520" cy="911520"/>
+            <a:ext cx="911160" cy="911160"/>
           </a:xfrm>
           <a:prstGeom prst="rect">
             <a:avLst/>
@@ -8645,7 +8697,7 @@
         <p:spPr>
           <a:xfrm>
             <a:off x="2637000" y="3377160"/>
-            <a:ext cx="911520" cy="911520"/>
+            <a:ext cx="911160" cy="911160"/>
           </a:xfrm>
           <a:prstGeom prst="rect">
             <a:avLst/>
@@ -8663,8 +8715,8 @@
         </p:nvSpPr>
         <p:spPr>
           <a:xfrm rot="1192200">
-            <a:off x="3944160" y="2678040"/>
-            <a:ext cx="975600" cy="481680"/>
+            <a:off x="3944160" y="2677680"/>
+            <a:ext cx="975240" cy="481320"/>
           </a:xfrm>
           <a:prstGeom prst="rightArrow">
             <a:avLst>
@@ -8705,8 +8757,8 @@
         </p:nvSpPr>
         <p:spPr>
           <a:xfrm rot="20407800">
-            <a:off x="3923640" y="3465720"/>
-            <a:ext cx="975600" cy="481680"/>
+            <a:off x="3923280" y="3465360"/>
+            <a:ext cx="975240" cy="481320"/>
           </a:xfrm>
           <a:prstGeom prst="rightArrow">
             <a:avLst>
@@ -8747,8 +8799,8 @@
         </p:nvSpPr>
         <p:spPr>
           <a:xfrm rot="1192200">
-            <a:off x="5698080" y="3786480"/>
-            <a:ext cx="975600" cy="481680"/>
+            <a:off x="5698080" y="3786120"/>
+            <a:ext cx="975240" cy="481320"/>
           </a:xfrm>
           <a:prstGeom prst="rightArrow">
             <a:avLst>
@@ -8789,8 +8841,8 @@
         </p:nvSpPr>
         <p:spPr>
           <a:xfrm rot="20407800">
-            <a:off x="5771880" y="2461320"/>
-            <a:ext cx="975600" cy="481680"/>
+            <a:off x="5771520" y="2460960"/>
+            <a:ext cx="975240" cy="481320"/>
           </a:xfrm>
           <a:prstGeom prst="rightArrow">
             <a:avLst>
@@ -8832,7 +8884,7 @@
         <p:spPr>
           <a:xfrm>
             <a:off x="5849640" y="3121560"/>
-            <a:ext cx="975600" cy="481680"/>
+            <a:ext cx="975240" cy="481320"/>
           </a:xfrm>
           <a:prstGeom prst="rightArrow">
             <a:avLst>
@@ -8878,7 +8930,7 @@
         <p:spPr>
           <a:xfrm>
             <a:off x="4950720" y="2998800"/>
-            <a:ext cx="753840" cy="753840"/>
+            <a:ext cx="753480" cy="753480"/>
           </a:xfrm>
           <a:prstGeom prst="rect">
             <a:avLst/>
@@ -8919,7 +8971,7 @@
         <p:spPr>
           <a:xfrm>
             <a:off x="684360" y="4487400"/>
-            <a:ext cx="8531640" cy="1504080"/>
+            <a:ext cx="8531280" cy="1503720"/>
           </a:xfrm>
           <a:prstGeom prst="rect">
             <a:avLst/>
@@ -8968,7 +9020,7 @@
         <p:spPr>
           <a:xfrm>
             <a:off x="684360" y="685800"/>
-            <a:ext cx="8531640" cy="3612240"/>
+            <a:ext cx="8531280" cy="3611880"/>
           </a:xfrm>
           <a:prstGeom prst="rect">
             <a:avLst/>
@@ -8987,7 +9039,7 @@
         <p:txBody>
           <a:bodyPr lIns="90000" rIns="90000" tIns="45000" bIns="45000" anchor="ctr"/>
           <a:p>
-            <a:pPr marL="285840" indent="-282960">
+            <a:pPr marL="285840" indent="-282600">
               <a:lnSpc>
                 <a:spcPct val="100000"/>
               </a:lnSpc>
@@ -9113,7 +9165,7 @@
             </a:endParaRPr>
           </a:p>
           <a:p>
-            <a:pPr marL="285840" indent="-282960">
+            <a:pPr marL="285840" indent="-282600">
               <a:lnSpc>
                 <a:spcPct val="100000"/>
               </a:lnSpc>
@@ -9205,7 +9257,7 @@
         <p:spPr>
           <a:xfrm>
             <a:off x="3562560" y="1395720"/>
-            <a:ext cx="911520" cy="911520"/>
+            <a:ext cx="911160" cy="911160"/>
           </a:xfrm>
           <a:prstGeom prst="rect">
             <a:avLst/>
@@ -9228,7 +9280,7 @@
         <p:spPr>
           <a:xfrm>
             <a:off x="6678360" y="1395720"/>
-            <a:ext cx="911520" cy="911520"/>
+            <a:ext cx="911160" cy="911160"/>
           </a:xfrm>
           <a:prstGeom prst="rect">
             <a:avLst/>
@@ -9251,7 +9303,7 @@
         <p:spPr>
           <a:xfrm>
             <a:off x="7042320" y="3904200"/>
-            <a:ext cx="911520" cy="911520"/>
+            <a:ext cx="911160" cy="911160"/>
           </a:xfrm>
           <a:prstGeom prst="rect">
             <a:avLst/>
@@ -9274,7 +9326,7 @@
         <p:spPr>
           <a:xfrm>
             <a:off x="3562560" y="3904200"/>
-            <a:ext cx="911520" cy="911520"/>
+            <a:ext cx="911160" cy="911160"/>
           </a:xfrm>
           <a:prstGeom prst="rect">
             <a:avLst/>
@@ -9297,7 +9349,7 @@
         <p:spPr>
           <a:xfrm>
             <a:off x="6678360" y="1395720"/>
-            <a:ext cx="911520" cy="911520"/>
+            <a:ext cx="911160" cy="911160"/>
           </a:xfrm>
           <a:prstGeom prst="rect">
             <a:avLst/>
@@ -9320,7 +9372,7 @@
         <p:spPr>
           <a:xfrm>
             <a:off x="4113000" y="2039400"/>
-            <a:ext cx="911520" cy="911520"/>
+            <a:ext cx="911160" cy="911160"/>
           </a:xfrm>
           <a:prstGeom prst="rect">
             <a:avLst/>
@@ -9343,7 +9395,7 @@
         <p:spPr>
           <a:xfrm>
             <a:off x="7296480" y="2133000"/>
-            <a:ext cx="911520" cy="911520"/>
+            <a:ext cx="911160" cy="911160"/>
           </a:xfrm>
           <a:prstGeom prst="rect">
             <a:avLst/>
@@ -9362,7 +9414,7 @@
         <p:spPr>
           <a:xfrm>
             <a:off x="5285160" y="1920960"/>
-            <a:ext cx="1180080" cy="542520"/>
+            <a:ext cx="1179720" cy="542160"/>
           </a:xfrm>
           <a:prstGeom prst="rightArrow">
             <a:avLst>
@@ -9404,7 +9456,7 @@
         <p:spPr>
           <a:xfrm>
             <a:off x="5149440" y="4088880"/>
-            <a:ext cx="1180080" cy="542520"/>
+            <a:ext cx="1179720" cy="542160"/>
           </a:xfrm>
           <a:prstGeom prst="rightArrow">
             <a:avLst>
@@ -9469,7 +9521,7 @@
         <p:spPr>
           <a:xfrm>
             <a:off x="4895280" y="2388600"/>
-            <a:ext cx="2705040" cy="362160"/>
+            <a:ext cx="2704680" cy="361800"/>
           </a:xfrm>
           <a:prstGeom prst="rect">
             <a:avLst/>
@@ -9518,7 +9570,7 @@
         <p:spPr>
           <a:xfrm>
             <a:off x="5027400" y="4575240"/>
-            <a:ext cx="2324880" cy="362160"/>
+            <a:ext cx="2324520" cy="361800"/>
           </a:xfrm>
           <a:prstGeom prst="rect">
             <a:avLst/>
@@ -9589,7 +9641,7 @@
         <p:spPr>
           <a:xfrm>
             <a:off x="684360" y="4487400"/>
-            <a:ext cx="8531640" cy="1504080"/>
+            <a:ext cx="8531280" cy="1503720"/>
           </a:xfrm>
           <a:prstGeom prst="rect">
             <a:avLst/>
@@ -9638,7 +9690,7 @@
         <p:spPr>
           <a:xfrm>
             <a:off x="684360" y="685800"/>
-            <a:ext cx="8531640" cy="3612240"/>
+            <a:ext cx="8531280" cy="3611880"/>
           </a:xfrm>
           <a:prstGeom prst="rect">
             <a:avLst/>
@@ -9657,7 +9709,7 @@
         <p:txBody>
           <a:bodyPr lIns="90000" rIns="90000" tIns="45000" bIns="45000" anchor="ctr"/>
           <a:p>
-            <a:pPr marL="285840" indent="-282960">
+            <a:pPr marL="285840" indent="-282600">
               <a:lnSpc>
                 <a:spcPct val="100000"/>
               </a:lnSpc>
@@ -9779,7 +9831,7 @@
         <p:spPr>
           <a:xfrm>
             <a:off x="1863000" y="3157920"/>
-            <a:ext cx="911520" cy="911520"/>
+            <a:ext cx="911160" cy="911160"/>
           </a:xfrm>
           <a:prstGeom prst="rect">
             <a:avLst/>
@@ -9802,7 +9854,7 @@
         <p:spPr>
           <a:xfrm>
             <a:off x="2413440" y="3801600"/>
-            <a:ext cx="911520" cy="911520"/>
+            <a:ext cx="911160" cy="911160"/>
           </a:xfrm>
           <a:prstGeom prst="rect">
             <a:avLst/>
@@ -9825,7 +9877,7 @@
         <p:spPr>
           <a:xfrm>
             <a:off x="7197480" y="3439800"/>
-            <a:ext cx="911520" cy="911520"/>
+            <a:ext cx="911160" cy="911160"/>
           </a:xfrm>
           <a:prstGeom prst="rect">
             <a:avLst/>
@@ -9848,7 +9900,7 @@
         <p:spPr>
           <a:xfrm>
             <a:off x="4758840" y="3366360"/>
-            <a:ext cx="911520" cy="911520"/>
+            <a:ext cx="911160" cy="911160"/>
           </a:xfrm>
           <a:prstGeom prst="rect">
             <a:avLst/>
@@ -9867,7 +9919,7 @@
         <p:spPr>
           <a:xfrm>
             <a:off x="3568680" y="3429000"/>
-            <a:ext cx="934560" cy="911520"/>
+            <a:ext cx="934200" cy="911160"/>
           </a:xfrm>
           <a:prstGeom prst="mathPlus">
             <a:avLst>
@@ -9905,7 +9957,7 @@
         <p:spPr>
           <a:xfrm>
             <a:off x="6095880" y="3654360"/>
-            <a:ext cx="735480" cy="563400"/>
+            <a:ext cx="735120" cy="563040"/>
           </a:xfrm>
           <a:prstGeom prst="mathEqual">
             <a:avLst>
@@ -9966,7 +10018,7 @@
         <p:spPr>
           <a:xfrm>
             <a:off x="4750920" y="2898360"/>
-            <a:ext cx="2687040" cy="3717000"/>
+            <a:ext cx="2686680" cy="3716640"/>
           </a:xfrm>
           <a:prstGeom prst="rect">
             <a:avLst/>
@@ -10009,7 +10061,7 @@
         <p:spPr>
           <a:xfrm>
             <a:off x="684360" y="4487400"/>
-            <a:ext cx="8531640" cy="1504080"/>
+            <a:ext cx="8531280" cy="1503720"/>
           </a:xfrm>
           <a:prstGeom prst="rect">
             <a:avLst/>
@@ -10058,7 +10110,7 @@
         <p:spPr>
           <a:xfrm>
             <a:off x="684360" y="685800"/>
-            <a:ext cx="8531640" cy="3612240"/>
+            <a:ext cx="8531280" cy="3611880"/>
           </a:xfrm>
           <a:prstGeom prst="rect">
             <a:avLst/>
@@ -10077,7 +10129,7 @@
         <p:txBody>
           <a:bodyPr lIns="90000" rIns="90000" tIns="45000" bIns="45000" anchor="ctr"/>
           <a:p>
-            <a:pPr marL="285840" indent="-282960">
+            <a:pPr marL="285840" indent="-282600">
               <a:lnSpc>
                 <a:spcPct val="100000"/>
               </a:lnSpc>
@@ -10213,7 +10265,7 @@
         <p:spPr>
           <a:xfrm>
             <a:off x="4843440" y="2989800"/>
-            <a:ext cx="639000" cy="639000"/>
+            <a:ext cx="638640" cy="638640"/>
           </a:xfrm>
           <a:prstGeom prst="rect">
             <a:avLst/>
@@ -10236,7 +10288,7 @@
         <p:spPr>
           <a:xfrm>
             <a:off x="5028120" y="4248360"/>
-            <a:ext cx="911520" cy="911520"/>
+            <a:ext cx="911160" cy="911160"/>
           </a:xfrm>
           <a:prstGeom prst="rect">
             <a:avLst/>
@@ -10259,7 +10311,7 @@
         <p:spPr>
           <a:xfrm>
             <a:off x="5506200" y="5025240"/>
-            <a:ext cx="911520" cy="911520"/>
+            <a:ext cx="911160" cy="911160"/>
           </a:xfrm>
           <a:prstGeom prst="rect">
             <a:avLst/>
@@ -10282,7 +10334,7 @@
         <p:spPr>
           <a:xfrm>
             <a:off x="6042600" y="4248360"/>
-            <a:ext cx="911520" cy="911520"/>
+            <a:ext cx="911160" cy="911160"/>
           </a:xfrm>
           <a:prstGeom prst="rect">
             <a:avLst/>
@@ -10305,7 +10357,7 @@
         <p:spPr>
           <a:xfrm>
             <a:off x="7944480" y="2602440"/>
-            <a:ext cx="911520" cy="911520"/>
+            <a:ext cx="911160" cy="911160"/>
           </a:xfrm>
           <a:prstGeom prst="rect">
             <a:avLst/>
@@ -10328,7 +10380,7 @@
         <p:spPr>
           <a:xfrm>
             <a:off x="6671160" y="3059640"/>
-            <a:ext cx="568800" cy="568800"/>
+            <a:ext cx="568440" cy="568440"/>
           </a:xfrm>
           <a:prstGeom prst="rect">
             <a:avLst/>
@@ -10351,7 +10403,7 @@
         <p:spPr>
           <a:xfrm>
             <a:off x="2973240" y="3863520"/>
-            <a:ext cx="911520" cy="911520"/>
+            <a:ext cx="911160" cy="911160"/>
           </a:xfrm>
           <a:prstGeom prst="rect">
             <a:avLst/>
@@ -10370,7 +10422,7 @@
         <p:spPr>
           <a:xfrm>
             <a:off x="4012560" y="4487400"/>
-            <a:ext cx="1490760" cy="854280"/>
+            <a:ext cx="1490400" cy="853920"/>
           </a:xfrm>
           <a:custGeom>
             <a:avLst/>
@@ -10422,7 +10474,7 @@
         <p:spPr>
           <a:xfrm>
             <a:off x="4012560" y="4248360"/>
-            <a:ext cx="2027160" cy="236160"/>
+            <a:ext cx="2026800" cy="235800"/>
           </a:xfrm>
           <a:custGeom>
             <a:avLst/>
@@ -10474,7 +10526,7 @@
         <p:spPr>
           <a:xfrm>
             <a:off x="4012560" y="4367880"/>
-            <a:ext cx="936000" cy="236880"/>
+            <a:ext cx="935640" cy="236520"/>
           </a:xfrm>
           <a:custGeom>
             <a:avLst/>
@@ -10525,8 +10577,8 @@
         </p:nvSpPr>
         <p:spPr>
           <a:xfrm flipV="1">
-            <a:off x="7242840" y="3219840"/>
-            <a:ext cx="626760" cy="120240"/>
+            <a:off x="7242840" y="3219120"/>
+            <a:ext cx="626400" cy="119880"/>
           </a:xfrm>
           <a:custGeom>
             <a:avLst/>
@@ -10601,7 +10653,7 @@
         <p:spPr>
           <a:xfrm>
             <a:off x="684360" y="4487400"/>
-            <a:ext cx="8531640" cy="1504080"/>
+            <a:ext cx="8531280" cy="1503720"/>
           </a:xfrm>
           <a:prstGeom prst="rect">
             <a:avLst/>
@@ -10650,7 +10702,7 @@
         <p:spPr>
           <a:xfrm>
             <a:off x="684360" y="685800"/>
-            <a:ext cx="8531640" cy="3612240"/>
+            <a:ext cx="8531280" cy="3611880"/>
           </a:xfrm>
           <a:prstGeom prst="rect">
             <a:avLst/>
@@ -10669,7 +10721,7 @@
         <p:txBody>
           <a:bodyPr lIns="90000" rIns="90000" tIns="45000" bIns="45000" anchor="ctr"/>
           <a:p>
-            <a:pPr marL="285840" indent="-282960">
+            <a:pPr marL="285840" indent="-282600">
               <a:lnSpc>
                 <a:spcPct val="100000"/>
               </a:lnSpc>
@@ -10837,7 +10889,7 @@
         <p:spPr>
           <a:xfrm>
             <a:off x="5430600" y="2730600"/>
-            <a:ext cx="2687040" cy="3717000"/>
+            <a:ext cx="2686680" cy="3716640"/>
           </a:xfrm>
           <a:prstGeom prst="rect">
             <a:avLst/>
@@ -10884,7 +10936,7 @@
         <p:spPr>
           <a:xfrm>
             <a:off x="5523120" y="2822040"/>
-            <a:ext cx="639000" cy="639000"/>
+            <a:ext cx="638640" cy="638640"/>
           </a:xfrm>
           <a:prstGeom prst="rect">
             <a:avLst/>
@@ -10907,7 +10959,7 @@
         <p:spPr>
           <a:xfrm>
             <a:off x="5707800" y="4080600"/>
-            <a:ext cx="911520" cy="911520"/>
+            <a:ext cx="911160" cy="911160"/>
           </a:xfrm>
           <a:prstGeom prst="rect">
             <a:avLst/>
@@ -10930,7 +10982,7 @@
         <p:spPr>
           <a:xfrm>
             <a:off x="6185880" y="4857480"/>
-            <a:ext cx="911520" cy="911520"/>
+            <a:ext cx="911160" cy="911160"/>
           </a:xfrm>
           <a:prstGeom prst="rect">
             <a:avLst/>
@@ -10953,7 +11005,7 @@
         <p:spPr>
           <a:xfrm>
             <a:off x="6722280" y="4080600"/>
-            <a:ext cx="911520" cy="911520"/>
+            <a:ext cx="911160" cy="911160"/>
           </a:xfrm>
           <a:prstGeom prst="rect">
             <a:avLst/>
@@ -10976,7 +11028,7 @@
         <p:spPr>
           <a:xfrm>
             <a:off x="3652920" y="3695760"/>
-            <a:ext cx="911520" cy="911520"/>
+            <a:ext cx="911160" cy="911160"/>
           </a:xfrm>
           <a:prstGeom prst="rect">
             <a:avLst/>
@@ -10995,7 +11047,7 @@
         <p:spPr>
           <a:xfrm>
             <a:off x="4692240" y="4319640"/>
-            <a:ext cx="1490760" cy="854280"/>
+            <a:ext cx="1490400" cy="853920"/>
           </a:xfrm>
           <a:custGeom>
             <a:avLst/>
@@ -11047,7 +11099,7 @@
         <p:spPr>
           <a:xfrm>
             <a:off x="4692240" y="4080600"/>
-            <a:ext cx="2027160" cy="236160"/>
+            <a:ext cx="2026800" cy="235800"/>
           </a:xfrm>
           <a:custGeom>
             <a:avLst/>
@@ -11099,7 +11151,7 @@
         <p:spPr>
           <a:xfrm>
             <a:off x="4692240" y="4200120"/>
-            <a:ext cx="936000" cy="236880"/>
+            <a:ext cx="935640" cy="236520"/>
           </a:xfrm>
           <a:custGeom>
             <a:avLst/>
@@ -11155,7 +11207,7 @@
         <p:spPr>
           <a:xfrm>
             <a:off x="9653760" y="3605400"/>
-            <a:ext cx="911520" cy="911520"/>
+            <a:ext cx="911160" cy="911160"/>
           </a:xfrm>
           <a:prstGeom prst="rect">
             <a:avLst/>
@@ -11173,8 +11225,8 @@
         </p:nvSpPr>
         <p:spPr>
           <a:xfrm rot="10325400">
-            <a:off x="7857000" y="4106880"/>
-            <a:ext cx="1783080" cy="304920"/>
+            <a:off x="7857360" y="4106880"/>
+            <a:ext cx="1782720" cy="304560"/>
           </a:xfrm>
           <a:prstGeom prst="rightArrow">
             <a:avLst>
@@ -11238,7 +11290,7 @@
         <p:spPr>
           <a:xfrm>
             <a:off x="684360" y="4487400"/>
-            <a:ext cx="8531640" cy="1504080"/>
+            <a:ext cx="8531280" cy="1503720"/>
           </a:xfrm>
           <a:prstGeom prst="rect">
             <a:avLst/>
@@ -11287,7 +11339,7 @@
         <p:spPr>
           <a:xfrm>
             <a:off x="684360" y="685800"/>
-            <a:ext cx="8531640" cy="3612240"/>
+            <a:ext cx="8531280" cy="3611880"/>
           </a:xfrm>
           <a:prstGeom prst="rect">
             <a:avLst/>
@@ -11317,7 +11369,7 @@
         <p:spPr>
           <a:xfrm>
             <a:off x="4069440" y="82800"/>
-            <a:ext cx="4043520" cy="2844000"/>
+            <a:ext cx="4043160" cy="2843640"/>
           </a:xfrm>
           <a:prstGeom prst="rect">
             <a:avLst/>
@@ -11340,7 +11392,7 @@
         <p:spPr>
           <a:xfrm>
             <a:off x="83880" y="3103560"/>
-            <a:ext cx="3864600" cy="1641600"/>
+            <a:ext cx="3864240" cy="1641240"/>
           </a:xfrm>
           <a:prstGeom prst="rect">
             <a:avLst/>
@@ -11363,7 +11415,7 @@
         <p:spPr>
           <a:xfrm>
             <a:off x="4161600" y="3103560"/>
-            <a:ext cx="3864600" cy="1641600"/>
+            <a:ext cx="3864240" cy="1641240"/>
           </a:xfrm>
           <a:prstGeom prst="rect">
             <a:avLst/>
@@ -11386,7 +11438,7 @@
         <p:spPr>
           <a:xfrm>
             <a:off x="8230320" y="3103560"/>
-            <a:ext cx="3864600" cy="1641600"/>
+            <a:ext cx="3864240" cy="1641240"/>
           </a:xfrm>
           <a:prstGeom prst="rect">
             <a:avLst/>
@@ -11405,7 +11457,7 @@
         <p:spPr>
           <a:xfrm>
             <a:off x="3993840" y="3766680"/>
-            <a:ext cx="148320" cy="316440"/>
+            <a:ext cx="147960" cy="316080"/>
           </a:xfrm>
           <a:prstGeom prst="rightArrow">
             <a:avLst>
@@ -11444,7 +11496,7 @@
         <p:spPr>
           <a:xfrm>
             <a:off x="8073360" y="3793320"/>
-            <a:ext cx="129240" cy="316440"/>
+            <a:ext cx="128880" cy="316080"/>
           </a:xfrm>
           <a:prstGeom prst="rightArrow">
             <a:avLst>
@@ -11483,7 +11535,7 @@
         <p:spPr>
           <a:xfrm>
             <a:off x="2701080" y="5176080"/>
-            <a:ext cx="1834200" cy="919800"/>
+            <a:ext cx="1833840" cy="919440"/>
           </a:xfrm>
           <a:prstGeom prst="wedgeRectCallout">
             <a:avLst>
@@ -11548,7 +11600,7 @@
         <p:spPr>
           <a:xfrm>
             <a:off x="6722640" y="5196600"/>
-            <a:ext cx="1965600" cy="822960"/>
+            <a:ext cx="1965240" cy="822600"/>
           </a:xfrm>
           <a:prstGeom prst="wedgeRectCallout">
             <a:avLst>
@@ -11613,7 +11665,7 @@
         <p:spPr>
           <a:xfrm>
             <a:off x="9731160" y="5131440"/>
-            <a:ext cx="2102760" cy="653760"/>
+            <a:ext cx="2102400" cy="653400"/>
           </a:xfrm>
           <a:prstGeom prst="wedgeRectCallout">
             <a:avLst>
@@ -11678,7 +11730,7 @@
         <p:spPr>
           <a:xfrm>
             <a:off x="5033520" y="2516760"/>
-            <a:ext cx="2572560" cy="362160"/>
+            <a:ext cx="2572200" cy="361800"/>
           </a:xfrm>
           <a:prstGeom prst="rect">
             <a:avLst/>
@@ -11726,8 +11778,8 @@
         </p:nvSpPr>
         <p:spPr>
           <a:xfrm rot="16200000">
-            <a:off x="3177360" y="1267920"/>
-            <a:ext cx="1961640" cy="362160"/>
+            <a:off x="3177360" y="1268280"/>
+            <a:ext cx="1961280" cy="361800"/>
           </a:xfrm>
           <a:prstGeom prst="rect">
             <a:avLst/>
@@ -11798,7 +11850,7 @@
         <p:spPr>
           <a:xfrm>
             <a:off x="684360" y="4487400"/>
-            <a:ext cx="8531640" cy="1504080"/>
+            <a:ext cx="8531280" cy="1503720"/>
           </a:xfrm>
           <a:prstGeom prst="rect">
             <a:avLst/>
@@ -11849,9 +11901,9 @@
         <p:grpSpPr>
           <a:xfrm>
             <a:off x="948240" y="823320"/>
-            <a:ext cx="10289520" cy="3336840"/>
+            <a:ext cx="10289160" cy="3336480"/>
             <a:chOff x="948240" y="823320"/>
-            <a:chExt cx="10289520" cy="3336840"/>
+            <a:chExt cx="10289160" cy="3336480"/>
           </a:xfrm>
         </p:grpSpPr>
         <p:sp>
@@ -11863,7 +11915,7 @@
           <p:spPr>
             <a:xfrm>
               <a:off x="948240" y="823320"/>
-              <a:ext cx="1359720" cy="1359720"/>
+              <a:ext cx="1359360" cy="1359360"/>
             </a:xfrm>
             <a:prstGeom prst="ellipse">
               <a:avLst/>
@@ -11896,7 +11948,7 @@
           <p:spPr>
             <a:xfrm>
               <a:off x="1234440" y="1109520"/>
-              <a:ext cx="787320" cy="787320"/>
+              <a:ext cx="786960" cy="786960"/>
             </a:xfrm>
             <a:prstGeom prst="rect">
               <a:avLst/>
@@ -11927,7 +11979,7 @@
           <p:spPr>
             <a:xfrm>
               <a:off x="2602800" y="823320"/>
-              <a:ext cx="3209040" cy="1359720"/>
+              <a:ext cx="3208680" cy="1359360"/>
             </a:xfrm>
             <a:prstGeom prst="rect">
               <a:avLst/>
@@ -11979,7 +12031,7 @@
           <p:spPr>
             <a:xfrm>
               <a:off x="6374160" y="823320"/>
-              <a:ext cx="1359720" cy="1359720"/>
+              <a:ext cx="1359360" cy="1359360"/>
             </a:xfrm>
             <a:prstGeom prst="ellipse">
               <a:avLst/>
@@ -12012,7 +12064,7 @@
           <p:spPr>
             <a:xfrm>
               <a:off x="6660360" y="1109520"/>
-              <a:ext cx="787320" cy="787320"/>
+              <a:ext cx="786960" cy="786960"/>
             </a:xfrm>
             <a:prstGeom prst="rect">
               <a:avLst/>
@@ -12043,7 +12095,7 @@
           <p:spPr>
             <a:xfrm>
               <a:off x="8028720" y="823320"/>
-              <a:ext cx="3209040" cy="1359720"/>
+              <a:ext cx="3208680" cy="1359360"/>
             </a:xfrm>
             <a:prstGeom prst="rect">
               <a:avLst/>
@@ -12095,7 +12147,7 @@
           <p:spPr>
             <a:xfrm>
               <a:off x="948240" y="2800440"/>
-              <a:ext cx="1359720" cy="1359720"/>
+              <a:ext cx="1359360" cy="1359360"/>
             </a:xfrm>
             <a:prstGeom prst="ellipse">
               <a:avLst/>
@@ -12128,7 +12180,7 @@
           <p:spPr>
             <a:xfrm>
               <a:off x="1234440" y="3086640"/>
-              <a:ext cx="787320" cy="787320"/>
+              <a:ext cx="786960" cy="786960"/>
             </a:xfrm>
             <a:prstGeom prst="rect">
               <a:avLst/>
@@ -12159,7 +12211,7 @@
           <p:spPr>
             <a:xfrm>
               <a:off x="2602800" y="2800440"/>
-              <a:ext cx="3209040" cy="1359720"/>
+              <a:ext cx="3208680" cy="1359360"/>
             </a:xfrm>
             <a:prstGeom prst="rect">
               <a:avLst/>
@@ -12211,7 +12263,7 @@
           <p:spPr>
             <a:xfrm>
               <a:off x="6374160" y="2800440"/>
-              <a:ext cx="1359720" cy="1359720"/>
+              <a:ext cx="1359360" cy="1359360"/>
             </a:xfrm>
             <a:prstGeom prst="ellipse">
               <a:avLst/>
@@ -12244,7 +12296,7 @@
           <p:spPr>
             <a:xfrm>
               <a:off x="6660360" y="3086640"/>
-              <a:ext cx="787320" cy="787320"/>
+              <a:ext cx="786960" cy="786960"/>
             </a:xfrm>
             <a:prstGeom prst="rect">
               <a:avLst/>
@@ -12275,7 +12327,7 @@
           <p:spPr>
             <a:xfrm>
               <a:off x="8028720" y="2800440"/>
-              <a:ext cx="3209040" cy="1359720"/>
+              <a:ext cx="3208680" cy="1359360"/>
             </a:xfrm>
             <a:prstGeom prst="rect">
               <a:avLst/>
@@ -12365,7 +12417,7 @@
         <p:spPr>
           <a:xfrm>
             <a:off x="0" y="0"/>
-            <a:ext cx="12189240" cy="6855120"/>
+            <a:ext cx="12188880" cy="6854760"/>
           </a:xfrm>
           <a:prstGeom prst="rect">
             <a:avLst/>
@@ -12418,7 +12470,7 @@
         <p:spPr>
           <a:xfrm>
             <a:off x="0" y="0"/>
-            <a:ext cx="8127000" cy="6855120"/>
+            <a:ext cx="8126640" cy="6854760"/>
           </a:xfrm>
           <a:prstGeom prst="snip2DiagRect">
             <a:avLst>
@@ -12640,7 +12692,7 @@
         <p:spPr>
           <a:xfrm>
             <a:off x="8588520" y="941400"/>
-            <a:ext cx="3040920" cy="3245760"/>
+            <a:ext cx="3040560" cy="3245400"/>
           </a:xfrm>
           <a:prstGeom prst="rect">
             <a:avLst/>
@@ -12691,9 +12743,9 @@
         <p:grpSpPr>
           <a:xfrm>
             <a:off x="952560" y="2104200"/>
-            <a:ext cx="6163560" cy="2440440"/>
+            <a:ext cx="6163200" cy="2440080"/>
             <a:chOff x="952560" y="2104200"/>
-            <a:chExt cx="6163560" cy="2440440"/>
+            <a:chExt cx="6163200" cy="2440080"/>
           </a:xfrm>
         </p:grpSpPr>
         <p:sp>
@@ -12705,7 +12757,7 @@
           <p:spPr>
             <a:xfrm>
               <a:off x="952560" y="2104200"/>
-              <a:ext cx="813600" cy="813600"/>
+              <a:ext cx="813240" cy="813240"/>
             </a:xfrm>
             <a:prstGeom prst="ellipse">
               <a:avLst/>
@@ -12738,7 +12790,7 @@
           <p:spPr>
             <a:xfrm>
               <a:off x="1123920" y="2275560"/>
-              <a:ext cx="470520" cy="470520"/>
+              <a:ext cx="470160" cy="470160"/>
             </a:xfrm>
             <a:prstGeom prst="rect">
               <a:avLst/>
@@ -12769,7 +12821,7 @@
           <p:spPr>
             <a:xfrm>
               <a:off x="1944000" y="2104200"/>
-              <a:ext cx="1921320" cy="813600"/>
+              <a:ext cx="1920960" cy="813240"/>
             </a:xfrm>
             <a:prstGeom prst="rect">
               <a:avLst/>
@@ -12821,7 +12873,7 @@
           <p:spPr>
             <a:xfrm>
               <a:off x="4203360" y="2104200"/>
-              <a:ext cx="813600" cy="813600"/>
+              <a:ext cx="813240" cy="813240"/>
             </a:xfrm>
             <a:prstGeom prst="ellipse">
               <a:avLst/>
@@ -12854,7 +12906,7 @@
           <p:spPr>
             <a:xfrm>
               <a:off x="4375080" y="2275560"/>
-              <a:ext cx="470520" cy="470520"/>
+              <a:ext cx="470160" cy="470160"/>
             </a:xfrm>
             <a:prstGeom prst="rect">
               <a:avLst/>
@@ -12885,7 +12937,7 @@
           <p:spPr>
             <a:xfrm>
               <a:off x="5194800" y="2104200"/>
-              <a:ext cx="1921320" cy="813600"/>
+              <a:ext cx="1920960" cy="813240"/>
             </a:xfrm>
             <a:prstGeom prst="rect">
               <a:avLst/>
@@ -12937,7 +12989,7 @@
           <p:spPr>
             <a:xfrm>
               <a:off x="952560" y="3731040"/>
-              <a:ext cx="813600" cy="813600"/>
+              <a:ext cx="813240" cy="813240"/>
             </a:xfrm>
             <a:prstGeom prst="ellipse">
               <a:avLst/>
@@ -12970,7 +13022,7 @@
           <p:spPr>
             <a:xfrm>
               <a:off x="1123920" y="3902400"/>
-              <a:ext cx="470520" cy="470520"/>
+              <a:ext cx="470160" cy="470160"/>
             </a:xfrm>
             <a:prstGeom prst="rect">
               <a:avLst/>
@@ -13001,7 +13053,7 @@
           <p:spPr>
             <a:xfrm>
               <a:off x="1944000" y="3731040"/>
-              <a:ext cx="1921320" cy="813600"/>
+              <a:ext cx="1920960" cy="813240"/>
             </a:xfrm>
             <a:prstGeom prst="rect">
               <a:avLst/>
@@ -13053,7 +13105,7 @@
           <p:spPr>
             <a:xfrm>
               <a:off x="4203360" y="3731040"/>
-              <a:ext cx="813600" cy="813600"/>
+              <a:ext cx="813240" cy="813240"/>
             </a:xfrm>
             <a:prstGeom prst="ellipse">
               <a:avLst/>
@@ -13086,7 +13138,7 @@
           <p:spPr>
             <a:xfrm>
               <a:off x="4375080" y="3902400"/>
-              <a:ext cx="470520" cy="470520"/>
+              <a:ext cx="470160" cy="470160"/>
             </a:xfrm>
             <a:prstGeom prst="rect">
               <a:avLst/>
@@ -13117,7 +13169,7 @@
           <p:spPr>
             <a:xfrm>
               <a:off x="5194800" y="3731040"/>
-              <a:ext cx="1921320" cy="813600"/>
+              <a:ext cx="1920960" cy="813240"/>
             </a:xfrm>
             <a:prstGeom prst="rect">
               <a:avLst/>
@@ -13234,7 +13286,7 @@
         <p:spPr>
           <a:xfrm>
             <a:off x="684360" y="4487400"/>
-            <a:ext cx="8531640" cy="1504080"/>
+            <a:ext cx="8531280" cy="1503720"/>
           </a:xfrm>
           <a:prstGeom prst="rect">
             <a:avLst/>
@@ -13283,7 +13335,7 @@
         <p:spPr>
           <a:xfrm>
             <a:off x="684360" y="685800"/>
-            <a:ext cx="8531640" cy="3612240"/>
+            <a:ext cx="8531280" cy="3611880"/>
           </a:xfrm>
           <a:prstGeom prst="rect">
             <a:avLst/>
@@ -13302,7 +13354,7 @@
         <p:txBody>
           <a:bodyPr lIns="90000" rIns="90000" tIns="45000" bIns="45000" anchor="ctr"/>
           <a:p>
-            <a:pPr marL="285840" indent="-282960">
+            <a:pPr marL="285840" indent="-282600">
               <a:lnSpc>
                 <a:spcPct val="100000"/>
               </a:lnSpc>
@@ -13334,7 +13386,7 @@
             </a:endParaRPr>
           </a:p>
           <a:p>
-            <a:pPr marL="285840" indent="-282960">
+            <a:pPr marL="285840" indent="-282600">
               <a:lnSpc>
                 <a:spcPct val="100000"/>
               </a:lnSpc>
@@ -13366,7 +13418,7 @@
             </a:endParaRPr>
           </a:p>
           <a:p>
-            <a:pPr marL="285840" indent="-282960">
+            <a:pPr marL="285840" indent="-282600">
               <a:lnSpc>
                 <a:spcPct val="100000"/>
               </a:lnSpc>
@@ -13398,7 +13450,7 @@
             </a:endParaRPr>
           </a:p>
           <a:p>
-            <a:pPr marL="285840" indent="-282960">
+            <a:pPr marL="285840" indent="-282600">
               <a:lnSpc>
                 <a:spcPct val="100000"/>
               </a:lnSpc>
@@ -13462,7 +13514,7 @@
         <p:spPr>
           <a:xfrm>
             <a:off x="684360" y="4487400"/>
-            <a:ext cx="8531640" cy="1504080"/>
+            <a:ext cx="8531280" cy="1503720"/>
           </a:xfrm>
           <a:prstGeom prst="rect">
             <a:avLst/>
@@ -13515,7 +13567,7 @@
         <p:spPr>
           <a:xfrm>
             <a:off x="5221440" y="75600"/>
-            <a:ext cx="911520" cy="911520"/>
+            <a:ext cx="911160" cy="911160"/>
           </a:xfrm>
           <a:prstGeom prst="rect">
             <a:avLst/>
@@ -13538,7 +13590,7 @@
         <p:spPr>
           <a:xfrm>
             <a:off x="4695120" y="4444560"/>
-            <a:ext cx="911520" cy="911520"/>
+            <a:ext cx="911160" cy="911160"/>
           </a:xfrm>
           <a:prstGeom prst="rect">
             <a:avLst/>
@@ -13561,7 +13613,7 @@
         <p:spPr>
           <a:xfrm>
             <a:off x="2603880" y="2294640"/>
-            <a:ext cx="911520" cy="911520"/>
+            <a:ext cx="911160" cy="911160"/>
           </a:xfrm>
           <a:prstGeom prst="rect">
             <a:avLst/>
@@ -13584,7 +13636,7 @@
         <p:spPr>
           <a:xfrm>
             <a:off x="9767160" y="3294360"/>
-            <a:ext cx="911520" cy="911520"/>
+            <a:ext cx="911160" cy="911160"/>
           </a:xfrm>
           <a:prstGeom prst="rect">
             <a:avLst/>
@@ -13607,7 +13659,7 @@
         <p:spPr>
           <a:xfrm>
             <a:off x="1967760" y="3811680"/>
-            <a:ext cx="911520" cy="911520"/>
+            <a:ext cx="911160" cy="911160"/>
           </a:xfrm>
           <a:prstGeom prst="rect">
             <a:avLst/>
@@ -13630,7 +13682,7 @@
         <p:spPr>
           <a:xfrm>
             <a:off x="5221440" y="2907360"/>
-            <a:ext cx="911520" cy="911520"/>
+            <a:ext cx="911160" cy="911160"/>
           </a:xfrm>
           <a:prstGeom prst="rect">
             <a:avLst/>
@@ -13653,7 +13705,7 @@
         <p:spPr>
           <a:xfrm>
             <a:off x="1093680" y="3282480"/>
-            <a:ext cx="911520" cy="911520"/>
+            <a:ext cx="911160" cy="911160"/>
           </a:xfrm>
           <a:prstGeom prst="rect">
             <a:avLst/>
@@ -13676,7 +13728,7 @@
         <p:spPr>
           <a:xfrm>
             <a:off x="8595360" y="3808800"/>
-            <a:ext cx="911520" cy="911520"/>
+            <a:ext cx="911160" cy="911160"/>
           </a:xfrm>
           <a:prstGeom prst="rect">
             <a:avLst/>
@@ -13699,7 +13751,7 @@
         <p:spPr>
           <a:xfrm>
             <a:off x="7839000" y="2294640"/>
-            <a:ext cx="911520" cy="911520"/>
+            <a:ext cx="911160" cy="911160"/>
           </a:xfrm>
           <a:prstGeom prst="rect">
             <a:avLst/>
@@ -13718,7 +13770,7 @@
         <p:spPr>
           <a:xfrm>
             <a:off x="6312960" y="944640"/>
-            <a:ext cx="1523520" cy="1337400"/>
+            <a:ext cx="1523160" cy="1337040"/>
           </a:xfrm>
           <a:custGeom>
             <a:avLst/>
@@ -13771,7 +13823,7 @@
         <p:spPr>
           <a:xfrm>
             <a:off x="5678640" y="1145160"/>
-            <a:ext cx="360" cy="1603800"/>
+            <a:ext cx="360" cy="1603440"/>
           </a:xfrm>
           <a:custGeom>
             <a:avLst/>
@@ -13823,8 +13875,8 @@
         </p:nvSpPr>
         <p:spPr>
           <a:xfrm flipH="1">
-            <a:off x="3423960" y="990000"/>
-            <a:ext cx="1614960" cy="1377720"/>
+            <a:off x="3423240" y="990000"/>
+            <a:ext cx="1614600" cy="1377360"/>
           </a:xfrm>
           <a:custGeom>
             <a:avLst/>
@@ -13877,7 +13929,7 @@
         <p:spPr>
           <a:xfrm>
             <a:off x="2082960" y="3279600"/>
-            <a:ext cx="914760" cy="362160"/>
+            <a:ext cx="914400" cy="361800"/>
           </a:xfrm>
           <a:prstGeom prst="rect">
             <a:avLst/>
@@ -13926,7 +13978,7 @@
         <p:spPr>
           <a:xfrm>
             <a:off x="5227200" y="4030200"/>
-            <a:ext cx="927000" cy="362160"/>
+            <a:ext cx="926640" cy="361800"/>
           </a:xfrm>
           <a:prstGeom prst="rect">
             <a:avLst/>
@@ -13975,7 +14027,7 @@
         <p:spPr>
           <a:xfrm>
             <a:off x="8246520" y="3279600"/>
-            <a:ext cx="1253160" cy="362160"/>
+            <a:ext cx="1252800" cy="361800"/>
           </a:xfrm>
           <a:prstGeom prst="rect">
             <a:avLst/>
@@ -14024,7 +14076,7 @@
         <p:spPr>
           <a:xfrm>
             <a:off x="481680" y="348120"/>
-            <a:ext cx="1809360" cy="362160"/>
+            <a:ext cx="1809000" cy="361800"/>
           </a:xfrm>
           <a:prstGeom prst="rect">
             <a:avLst/>
@@ -14077,7 +14129,7 @@
         <p:spPr>
           <a:xfrm>
             <a:off x="5855760" y="4444560"/>
-            <a:ext cx="911520" cy="911520"/>
+            <a:ext cx="911160" cy="911160"/>
           </a:xfrm>
           <a:prstGeom prst="rect">
             <a:avLst/>
@@ -14118,7 +14170,7 @@
         <p:spPr>
           <a:xfrm>
             <a:off x="684360" y="4487400"/>
-            <a:ext cx="8531640" cy="1504080"/>
+            <a:ext cx="8531280" cy="1503720"/>
           </a:xfrm>
           <a:prstGeom prst="rect">
             <a:avLst/>
@@ -14171,7 +14223,7 @@
         <p:spPr>
           <a:xfrm>
             <a:off x="7839000" y="2560320"/>
-            <a:ext cx="1311480" cy="597240"/>
+            <a:ext cx="1311120" cy="596880"/>
           </a:xfrm>
           <a:prstGeom prst="rect">
             <a:avLst/>
@@ -14190,7 +14242,7 @@
         <p:spPr>
           <a:xfrm>
             <a:off x="480240" y="348120"/>
-            <a:ext cx="1789560" cy="362160"/>
+            <a:ext cx="1789200" cy="361800"/>
           </a:xfrm>
           <a:prstGeom prst="rect">
             <a:avLst/>
@@ -14239,7 +14291,7 @@
         <p:spPr>
           <a:xfrm>
             <a:off x="6384240" y="990000"/>
-            <a:ext cx="1523520" cy="1337400"/>
+            <a:ext cx="1523160" cy="1337040"/>
           </a:xfrm>
           <a:custGeom>
             <a:avLst/>
@@ -14292,7 +14344,7 @@
         <p:spPr>
           <a:xfrm>
             <a:off x="5678640" y="1145160"/>
-            <a:ext cx="360" cy="1603800"/>
+            <a:ext cx="360" cy="1603440"/>
           </a:xfrm>
           <a:custGeom>
             <a:avLst/>
@@ -14344,8 +14396,8 @@
         </p:nvSpPr>
         <p:spPr>
           <a:xfrm flipH="1">
-            <a:off x="3423960" y="990000"/>
-            <a:ext cx="1614960" cy="1377720"/>
+            <a:off x="3423240" y="990000"/>
+            <a:ext cx="1614600" cy="1377360"/>
           </a:xfrm>
           <a:custGeom>
             <a:avLst/>
@@ -14398,7 +14450,7 @@
         <p:spPr>
           <a:xfrm>
             <a:off x="2082960" y="3279600"/>
-            <a:ext cx="914760" cy="362160"/>
+            <a:ext cx="914400" cy="361800"/>
           </a:xfrm>
           <a:prstGeom prst="rect">
             <a:avLst/>
@@ -14447,7 +14499,7 @@
         <p:spPr>
           <a:xfrm>
             <a:off x="5227200" y="4030200"/>
-            <a:ext cx="927000" cy="362160"/>
+            <a:ext cx="926640" cy="361800"/>
           </a:xfrm>
           <a:prstGeom prst="rect">
             <a:avLst/>
@@ -14496,7 +14548,7 @@
         <p:spPr>
           <a:xfrm>
             <a:off x="8246520" y="3279600"/>
-            <a:ext cx="1253160" cy="362160"/>
+            <a:ext cx="1252800" cy="361800"/>
           </a:xfrm>
           <a:prstGeom prst="rect">
             <a:avLst/>
@@ -14549,7 +14601,7 @@
         <p:spPr>
           <a:xfrm>
             <a:off x="4979520" y="218880"/>
-            <a:ext cx="1330560" cy="616320"/>
+            <a:ext cx="1330200" cy="615960"/>
           </a:xfrm>
           <a:prstGeom prst="rect">
             <a:avLst/>
@@ -14572,7 +14624,7 @@
         <p:spPr>
           <a:xfrm>
             <a:off x="2102760" y="2514600"/>
-            <a:ext cx="1321200" cy="606600"/>
+            <a:ext cx="1320840" cy="606240"/>
           </a:xfrm>
           <a:prstGeom prst="rect">
             <a:avLst/>
@@ -14595,7 +14647,7 @@
         <p:spPr>
           <a:xfrm>
             <a:off x="4235760" y="3279600"/>
-            <a:ext cx="1311480" cy="597240"/>
+            <a:ext cx="1311120" cy="596880"/>
           </a:xfrm>
           <a:prstGeom prst="rect">
             <a:avLst/>
@@ -14618,7 +14670,7 @@
         <p:spPr>
           <a:xfrm>
             <a:off x="5833080" y="3279600"/>
-            <a:ext cx="1311480" cy="597240"/>
+            <a:ext cx="1311120" cy="596880"/>
           </a:xfrm>
           <a:prstGeom prst="rect">
             <a:avLst/>
@@ -14659,7 +14711,7 @@
         <p:spPr>
           <a:xfrm>
             <a:off x="684360" y="4487400"/>
-            <a:ext cx="8531640" cy="1504080"/>
+            <a:ext cx="8531280" cy="1503720"/>
           </a:xfrm>
           <a:prstGeom prst="rect">
             <a:avLst/>
@@ -14708,7 +14760,7 @@
         <p:spPr>
           <a:xfrm>
             <a:off x="684360" y="685800"/>
-            <a:ext cx="8531640" cy="3612240"/>
+            <a:ext cx="8531280" cy="3611880"/>
           </a:xfrm>
           <a:prstGeom prst="rect">
             <a:avLst/>
@@ -14727,7 +14779,7 @@
         <p:txBody>
           <a:bodyPr lIns="90000" rIns="90000" tIns="45000" bIns="45000" anchor="ctr"/>
           <a:p>
-            <a:pPr marL="285840" indent="-282960">
+            <a:pPr marL="285840" indent="-282600">
               <a:lnSpc>
                 <a:spcPct val="100000"/>
               </a:lnSpc>
@@ -14803,7 +14855,7 @@
         <p:spPr>
           <a:xfrm>
             <a:off x="666000" y="2574360"/>
-            <a:ext cx="4807800" cy="2971080"/>
+            <a:ext cx="4807440" cy="2970720"/>
           </a:xfrm>
           <a:prstGeom prst="roundRect">
             <a:avLst>
@@ -14953,7 +15005,7 @@
         <p:spPr>
           <a:xfrm>
             <a:off x="684360" y="5241960"/>
-            <a:ext cx="8531640" cy="1504080"/>
+            <a:ext cx="8531280" cy="1503720"/>
           </a:xfrm>
           <a:prstGeom prst="rect">
             <a:avLst/>
@@ -15002,7 +15054,7 @@
         <p:spPr>
           <a:xfrm>
             <a:off x="684360" y="685800"/>
-            <a:ext cx="10987200" cy="2285280"/>
+            <a:ext cx="10986840" cy="2284920"/>
           </a:xfrm>
           <a:prstGeom prst="rect">
             <a:avLst/>
@@ -15023,7 +15075,7 @@
             <a:normAutofit/>
           </a:bodyPr>
           <a:p>
-            <a:pPr marL="285840" indent="-282960">
+            <a:pPr marL="285840" indent="-282600">
               <a:lnSpc>
                 <a:spcPct val="100000"/>
               </a:lnSpc>
@@ -15105,7 +15157,7 @@
             </a:endParaRPr>
           </a:p>
           <a:p>
-            <a:pPr marL="285840" indent="-282960">
+            <a:pPr marL="285840" indent="-282600">
               <a:lnSpc>
                 <a:spcPct val="100000"/>
               </a:lnSpc>
@@ -15229,7 +15281,7 @@
         <p:spPr>
           <a:xfrm>
             <a:off x="2523960" y="3718800"/>
-            <a:ext cx="725400" cy="720360"/>
+            <a:ext cx="725040" cy="720000"/>
           </a:xfrm>
           <a:prstGeom prst="ellipse">
             <a:avLst/>
@@ -15297,7 +15349,7 @@
         <p:spPr>
           <a:xfrm>
             <a:off x="3363480" y="3303360"/>
-            <a:ext cx="1214640" cy="404280"/>
+            <a:ext cx="1214280" cy="403920"/>
           </a:xfrm>
           <a:prstGeom prst="ellipse">
             <a:avLst/>
@@ -15365,7 +15417,7 @@
         <p:spPr>
           <a:xfrm>
             <a:off x="744120" y="3208680"/>
-            <a:ext cx="1587960" cy="672480"/>
+            <a:ext cx="1587600" cy="672120"/>
           </a:xfrm>
           <a:prstGeom prst="ellipse">
             <a:avLst/>
@@ -15433,7 +15485,7 @@
         <p:spPr>
           <a:xfrm>
             <a:off x="2119680" y="4628880"/>
-            <a:ext cx="1527120" cy="672480"/>
+            <a:ext cx="1526760" cy="672120"/>
           </a:xfrm>
           <a:prstGeom prst="ellipse">
             <a:avLst/>
@@ -15501,7 +15553,7 @@
         <p:spPr>
           <a:xfrm>
             <a:off x="6819480" y="2574360"/>
-            <a:ext cx="4807800" cy="2971080"/>
+            <a:ext cx="4807440" cy="2970720"/>
           </a:xfrm>
           <a:prstGeom prst="roundRect">
             <a:avLst>
@@ -15651,7 +15703,7 @@
         <p:spPr>
           <a:xfrm>
             <a:off x="7103880" y="4147560"/>
-            <a:ext cx="4376160" cy="856440"/>
+            <a:ext cx="4375800" cy="856080"/>
           </a:xfrm>
           <a:prstGeom prst="ellipse">
             <a:avLst/>
@@ -15719,7 +15771,7 @@
         <p:spPr>
           <a:xfrm>
             <a:off x="9898200" y="3332520"/>
-            <a:ext cx="1214640" cy="404280"/>
+            <a:ext cx="1214280" cy="403920"/>
           </a:xfrm>
           <a:prstGeom prst="ellipse">
             <a:avLst/>
@@ -15787,7 +15839,7 @@
         <p:spPr>
           <a:xfrm>
             <a:off x="6965640" y="3288960"/>
-            <a:ext cx="1587960" cy="672480"/>
+            <a:ext cx="1587600" cy="672120"/>
           </a:xfrm>
           <a:prstGeom prst="ellipse">
             <a:avLst/>
@@ -15855,7 +15907,7 @@
         <p:spPr>
           <a:xfrm>
             <a:off x="8287920" y="2688120"/>
-            <a:ext cx="1870920" cy="672480"/>
+            <a:ext cx="1870560" cy="672120"/>
           </a:xfrm>
           <a:prstGeom prst="ellipse">
             <a:avLst/>
@@ -15972,7 +16024,7 @@
         <p:spPr>
           <a:xfrm>
             <a:off x="684360" y="4487400"/>
-            <a:ext cx="8531640" cy="1504080"/>
+            <a:ext cx="8531280" cy="1503720"/>
           </a:xfrm>
           <a:prstGeom prst="rect">
             <a:avLst/>
@@ -16021,7 +16073,7 @@
         <p:spPr>
           <a:xfrm>
             <a:off x="684360" y="685800"/>
-            <a:ext cx="11359800" cy="3612240"/>
+            <a:ext cx="11359440" cy="3611880"/>
           </a:xfrm>
           <a:prstGeom prst="rect">
             <a:avLst/>
@@ -16042,7 +16094,7 @@
             <a:normAutofit/>
           </a:bodyPr>
           <a:p>
-            <a:pPr marL="285840" indent="-282960">
+            <a:pPr marL="285840" indent="-282600">
               <a:lnSpc>
                 <a:spcPct val="100000"/>
               </a:lnSpc>
@@ -16084,7 +16136,7 @@
             </a:endParaRPr>
           </a:p>
           <a:p>
-            <a:pPr marL="285840" indent="-282960">
+            <a:pPr marL="285840" indent="-282600">
               <a:lnSpc>
                 <a:spcPct val="100000"/>
               </a:lnSpc>
@@ -16274,7 +16326,7 @@
             </a:endParaRPr>
           </a:p>
           <a:p>
-            <a:pPr marL="285840" indent="-282960">
+            <a:pPr marL="285840" indent="-282600">
               <a:lnSpc>
                 <a:spcPct val="100000"/>
               </a:lnSpc>
@@ -16306,7 +16358,7 @@
             </a:endParaRPr>
           </a:p>
           <a:p>
-            <a:pPr marL="285840" indent="-282960">
+            <a:pPr marL="285840" indent="-282600">
               <a:lnSpc>
                 <a:spcPct val="100000"/>
               </a:lnSpc>
@@ -16397,7 +16449,7 @@
         <p:spPr>
           <a:xfrm>
             <a:off x="684360" y="4487400"/>
-            <a:ext cx="8531640" cy="1504080"/>
+            <a:ext cx="8531280" cy="1503720"/>
           </a:xfrm>
           <a:prstGeom prst="rect">
             <a:avLst/>
@@ -16446,7 +16498,7 @@
         <p:spPr>
           <a:xfrm>
             <a:off x="684360" y="685800"/>
-            <a:ext cx="8531640" cy="3612240"/>
+            <a:ext cx="8531280" cy="3611880"/>
           </a:xfrm>
           <a:prstGeom prst="rect">
             <a:avLst/>
@@ -16465,7 +16517,7 @@
         <p:txBody>
           <a:bodyPr lIns="90000" rIns="90000" tIns="45000" bIns="45000" anchor="ctr"/>
           <a:p>
-            <a:pPr marL="285840" indent="-282960">
+            <a:pPr marL="285840" indent="-282600">
               <a:lnSpc>
                 <a:spcPct val="100000"/>
               </a:lnSpc>
@@ -16567,7 +16619,7 @@
             </a:endParaRPr>
           </a:p>
           <a:p>
-            <a:pPr marL="285840" indent="-282960">
+            <a:pPr marL="285840" indent="-282600">
               <a:lnSpc>
                 <a:spcPct val="100000"/>
               </a:lnSpc>
@@ -16669,7 +16721,7 @@
         <p:spPr>
           <a:xfrm>
             <a:off x="2521440" y="3979080"/>
-            <a:ext cx="1879200" cy="804960"/>
+            <a:ext cx="1878840" cy="804600"/>
           </a:xfrm>
           <a:prstGeom prst="rect">
             <a:avLst/>
@@ -16735,7 +16787,7 @@
         <p:spPr>
           <a:xfrm>
             <a:off x="5487840" y="3979080"/>
-            <a:ext cx="1879200" cy="804960"/>
+            <a:ext cx="1878840" cy="804600"/>
           </a:xfrm>
           <a:prstGeom prst="rect">
             <a:avLst/>
@@ -16801,7 +16853,7 @@
         <p:spPr>
           <a:xfrm>
             <a:off x="4004640" y="2771640"/>
-            <a:ext cx="1879200" cy="804960"/>
+            <a:ext cx="1878840" cy="804600"/>
           </a:xfrm>
           <a:prstGeom prst="rect">
             <a:avLst/>
@@ -16867,7 +16919,7 @@
         <p:spPr>
           <a:xfrm>
             <a:off x="4483080" y="4383000"/>
-            <a:ext cx="1001880" cy="360"/>
+            <a:ext cx="1001520" cy="360"/>
           </a:xfrm>
           <a:custGeom>
             <a:avLst/>
@@ -16919,7 +16971,7 @@
         <p:spPr>
           <a:xfrm>
             <a:off x="4985640" y="3657600"/>
-            <a:ext cx="360" cy="576720"/>
+            <a:ext cx="360" cy="576360"/>
           </a:xfrm>
           <a:custGeom>
             <a:avLst/>
@@ -17020,7 +17072,7 @@
         <p:spPr>
           <a:xfrm>
             <a:off x="0" y="0"/>
-            <a:ext cx="12189240" cy="6855120"/>
+            <a:ext cx="12188880" cy="6854760"/>
           </a:xfrm>
           <a:prstGeom prst="rect">
             <a:avLst/>
@@ -17073,7 +17125,7 @@
         <p:spPr>
           <a:xfrm>
             <a:off x="640440" y="685800"/>
-            <a:ext cx="4815720" cy="4600800"/>
+            <a:ext cx="4815360" cy="4600440"/>
           </a:xfrm>
           <a:prstGeom prst="rect">
             <a:avLst/>
@@ -17124,7 +17176,7 @@
         <p:spPr>
           <a:xfrm>
             <a:off x="6095880" y="0"/>
-            <a:ext cx="6093000" cy="6855120"/>
+            <a:ext cx="6092640" cy="6854760"/>
           </a:xfrm>
           <a:prstGeom prst="rect">
             <a:avLst/>
@@ -17162,7 +17214,7 @@
         <p:spPr>
           <a:xfrm>
             <a:off x="6625800" y="685800"/>
-            <a:ext cx="4876200" cy="4600800"/>
+            <a:ext cx="4875840" cy="4600440"/>
           </a:xfrm>
           <a:prstGeom prst="rect">
             <a:avLst/>
@@ -17183,7 +17235,7 @@
             <a:normAutofit/>
           </a:bodyPr>
           <a:p>
-            <a:pPr marL="285840" indent="-282960">
+            <a:pPr marL="285840" indent="-282600">
               <a:lnSpc>
                 <a:spcPct val="100000"/>
               </a:lnSpc>
@@ -17215,7 +17267,7 @@
             </a:endParaRPr>
           </a:p>
           <a:p>
-            <a:pPr marL="285840" indent="-282960">
+            <a:pPr marL="285840" indent="-282600">
               <a:lnSpc>
                 <a:spcPct val="100000"/>
               </a:lnSpc>
@@ -17247,7 +17299,7 @@
             </a:endParaRPr>
           </a:p>
           <a:p>
-            <a:pPr marL="285840" indent="-282960">
+            <a:pPr marL="285840" indent="-282600">
               <a:lnSpc>
                 <a:spcPct val="100000"/>
               </a:lnSpc>
@@ -17279,7 +17331,7 @@
             </a:endParaRPr>
           </a:p>
           <a:p>
-            <a:pPr marL="285840" indent="-282960">
+            <a:pPr marL="285840" indent="-282600">
               <a:lnSpc>
                 <a:spcPct val="100000"/>
               </a:lnSpc>
@@ -17370,7 +17422,7 @@
         <p:spPr>
           <a:xfrm>
             <a:off x="684360" y="4487400"/>
-            <a:ext cx="8531640" cy="1504080"/>
+            <a:ext cx="8531280" cy="1503720"/>
           </a:xfrm>
           <a:prstGeom prst="rect">
             <a:avLst/>
@@ -17419,7 +17471,7 @@
         <p:spPr>
           <a:xfrm>
             <a:off x="1044720" y="500040"/>
-            <a:ext cx="8261280" cy="3229920"/>
+            <a:ext cx="8260920" cy="3229560"/>
           </a:xfrm>
           <a:prstGeom prst="rect">
             <a:avLst/>
@@ -17438,7 +17490,7 @@
         <p:txBody>
           <a:bodyPr lIns="90000" rIns="90000" tIns="45000" bIns="45000" anchor="ctr"/>
           <a:p>
-            <a:pPr marL="285840" indent="-282960">
+            <a:pPr marL="285840" indent="-282600">
               <a:lnSpc>
                 <a:spcPct val="100000"/>
               </a:lnSpc>
@@ -17480,7 +17532,7 @@
             </a:endParaRPr>
           </a:p>
           <a:p>
-            <a:pPr marL="285840" indent="-282960">
+            <a:pPr marL="285840" indent="-282600">
               <a:lnSpc>
                 <a:spcPct val="100000"/>
               </a:lnSpc>
@@ -17532,7 +17584,7 @@
             </a:endParaRPr>
           </a:p>
           <a:p>
-            <a:pPr marL="285840" indent="-282960">
+            <a:pPr marL="285840" indent="-282600">
               <a:lnSpc>
                 <a:spcPct val="100000"/>
               </a:lnSpc>
@@ -17684,7 +17736,7 @@
         <p:spPr>
           <a:xfrm>
             <a:off x="7097760" y="1943280"/>
-            <a:ext cx="851760" cy="851760"/>
+            <a:ext cx="851400" cy="851400"/>
           </a:xfrm>
           <a:prstGeom prst="rect">
             <a:avLst/>
@@ -17707,7 +17759,7 @@
         <p:spPr>
           <a:xfrm>
             <a:off x="6931800" y="4296600"/>
-            <a:ext cx="1178280" cy="470520"/>
+            <a:ext cx="1177920" cy="470160"/>
           </a:xfrm>
           <a:prstGeom prst="rect">
             <a:avLst/>
@@ -17730,7 +17782,7 @@
         <p:spPr>
           <a:xfrm>
             <a:off x="7054200" y="2896920"/>
-            <a:ext cx="895320" cy="1037520"/>
+            <a:ext cx="894960" cy="1037160"/>
           </a:xfrm>
           <a:prstGeom prst="rect">
             <a:avLst/>
@@ -17753,7 +17805,7 @@
         <p:spPr>
           <a:xfrm>
             <a:off x="2718360" y="2064960"/>
-            <a:ext cx="911520" cy="911520"/>
+            <a:ext cx="911160" cy="911160"/>
           </a:xfrm>
           <a:prstGeom prst="rect">
             <a:avLst/>
@@ -17776,7 +17828,7 @@
         <p:spPr>
           <a:xfrm>
             <a:off x="2739240" y="3371040"/>
-            <a:ext cx="911520" cy="911520"/>
+            <a:ext cx="911160" cy="911160"/>
           </a:xfrm>
           <a:prstGeom prst="rect">
             <a:avLst/>
@@ -17799,7 +17851,7 @@
         <p:spPr>
           <a:xfrm>
             <a:off x="4908600" y="2852280"/>
-            <a:ext cx="911520" cy="911520"/>
+            <a:ext cx="911160" cy="911160"/>
           </a:xfrm>
           <a:prstGeom prst="rect">
             <a:avLst/>
@@ -17817,8 +17869,8 @@
         </p:nvSpPr>
         <p:spPr>
           <a:xfrm rot="1192200">
-            <a:off x="4046760" y="2671920"/>
-            <a:ext cx="975600" cy="481680"/>
+            <a:off x="4046760" y="2671560"/>
+            <a:ext cx="975240" cy="481320"/>
           </a:xfrm>
           <a:prstGeom prst="rightArrow">
             <a:avLst>
@@ -17859,8 +17911,8 @@
         </p:nvSpPr>
         <p:spPr>
           <a:xfrm rot="20407800">
-            <a:off x="4025880" y="3459600"/>
-            <a:ext cx="975600" cy="481680"/>
+            <a:off x="4025520" y="3459240"/>
+            <a:ext cx="975240" cy="481320"/>
           </a:xfrm>
           <a:prstGeom prst="rightArrow">
             <a:avLst>
@@ -17901,8 +17953,8 @@
         </p:nvSpPr>
         <p:spPr>
           <a:xfrm rot="1192200">
-            <a:off x="5800320" y="3780360"/>
-            <a:ext cx="975600" cy="481680"/>
+            <a:off x="5800320" y="3780000"/>
+            <a:ext cx="975240" cy="481320"/>
           </a:xfrm>
           <a:prstGeom prst="rightArrow">
             <a:avLst>
@@ -17943,8 +17995,8 @@
         </p:nvSpPr>
         <p:spPr>
           <a:xfrm rot="20407800">
-            <a:off x="5874120" y="2455200"/>
-            <a:ext cx="975600" cy="481680"/>
+            <a:off x="5873760" y="2454840"/>
+            <a:ext cx="975240" cy="481320"/>
           </a:xfrm>
           <a:prstGeom prst="rightArrow">
             <a:avLst>
@@ -17986,7 +18038,7 @@
         <p:spPr>
           <a:xfrm>
             <a:off x="5951880" y="3115440"/>
-            <a:ext cx="975600" cy="481680"/>
+            <a:ext cx="975240" cy="481320"/>
           </a:xfrm>
           <a:prstGeom prst="rightArrow">
             <a:avLst>
@@ -18077,7 +18129,7 @@
         <p:spPr>
           <a:xfrm>
             <a:off x="684360" y="4487400"/>
-            <a:ext cx="8531640" cy="1504080"/>
+            <a:ext cx="8531280" cy="1503720"/>
           </a:xfrm>
           <a:prstGeom prst="rect">
             <a:avLst/>
@@ -18126,7 +18178,7 @@
         <p:spPr>
           <a:xfrm>
             <a:off x="684360" y="685800"/>
-            <a:ext cx="8531640" cy="3612240"/>
+            <a:ext cx="8531280" cy="3611880"/>
           </a:xfrm>
           <a:prstGeom prst="rect">
             <a:avLst/>
@@ -18145,7 +18197,7 @@
         <p:txBody>
           <a:bodyPr lIns="90000" rIns="90000" tIns="45000" bIns="45000" anchor="ctr"/>
           <a:p>
-            <a:pPr marL="285840" indent="-282960">
+            <a:pPr marL="285840" indent="-282600">
               <a:lnSpc>
                 <a:spcPct val="100000"/>
               </a:lnSpc>
@@ -18237,7 +18289,7 @@
             </a:endParaRPr>
           </a:p>
           <a:p>
-            <a:pPr marL="285840" indent="-282960">
+            <a:pPr marL="285840" indent="-282600">
               <a:lnSpc>
                 <a:spcPct val="100000"/>
               </a:lnSpc>
@@ -18289,7 +18341,7 @@
             </a:endParaRPr>
           </a:p>
           <a:p>
-            <a:pPr marL="285840" indent="-282960">
+            <a:pPr marL="285840" indent="-282600">
               <a:lnSpc>
                 <a:spcPct val="100000"/>
               </a:lnSpc>
@@ -18375,7 +18427,7 @@
         <p:spPr>
           <a:xfrm>
             <a:off x="6227640" y="3794400"/>
-            <a:ext cx="911520" cy="911520"/>
+            <a:ext cx="911160" cy="911160"/>
           </a:xfrm>
           <a:prstGeom prst="rect">
             <a:avLst/>
@@ -18398,7 +18450,7 @@
         <p:spPr>
           <a:xfrm>
             <a:off x="2468520" y="3843720"/>
-            <a:ext cx="911520" cy="911520"/>
+            <a:ext cx="911160" cy="911160"/>
           </a:xfrm>
           <a:prstGeom prst="rect">
             <a:avLst/>
@@ -18421,7 +18473,7 @@
         <p:spPr>
           <a:xfrm>
             <a:off x="9790920" y="3794400"/>
-            <a:ext cx="911520" cy="911520"/>
+            <a:ext cx="911160" cy="911160"/>
           </a:xfrm>
           <a:prstGeom prst="rect">
             <a:avLst/>
@@ -18444,7 +18496,7 @@
         <p:spPr>
           <a:xfrm>
             <a:off x="7903800" y="3794400"/>
-            <a:ext cx="911520" cy="911520"/>
+            <a:ext cx="911160" cy="911160"/>
           </a:xfrm>
           <a:prstGeom prst="rect">
             <a:avLst/>
@@ -18467,7 +18519,7 @@
         <p:spPr>
           <a:xfrm>
             <a:off x="4412520" y="3794400"/>
-            <a:ext cx="911520" cy="911520"/>
+            <a:ext cx="911160" cy="911160"/>
           </a:xfrm>
           <a:prstGeom prst="rect">
             <a:avLst/>
@@ -18490,7 +18542,7 @@
         <p:spPr>
           <a:xfrm>
             <a:off x="684360" y="3843720"/>
-            <a:ext cx="911520" cy="911520"/>
+            <a:ext cx="911160" cy="911160"/>
           </a:xfrm>
           <a:prstGeom prst="rect">
             <a:avLst/>
@@ -18509,7 +18561,7 @@
         <p:spPr>
           <a:xfrm>
             <a:off x="1638000" y="4183200"/>
-            <a:ext cx="680040" cy="259200"/>
+            <a:ext cx="679680" cy="258840"/>
           </a:xfrm>
           <a:prstGeom prst="rightArrow">
             <a:avLst>
@@ -18548,7 +18600,7 @@
         <p:spPr>
           <a:xfrm>
             <a:off x="3511800" y="4201920"/>
-            <a:ext cx="680040" cy="259200"/>
+            <a:ext cx="679680" cy="258840"/>
           </a:xfrm>
           <a:prstGeom prst="rightArrow">
             <a:avLst>
@@ -18587,7 +18639,7 @@
         <p:spPr>
           <a:xfrm>
             <a:off x="5366520" y="4193640"/>
-            <a:ext cx="680040" cy="259200"/>
+            <a:ext cx="679680" cy="258840"/>
           </a:xfrm>
           <a:prstGeom prst="rightArrow">
             <a:avLst>
@@ -18626,7 +18678,7 @@
         <p:spPr>
           <a:xfrm>
             <a:off x="7162200" y="4183200"/>
-            <a:ext cx="680040" cy="259200"/>
+            <a:ext cx="679680" cy="258840"/>
           </a:xfrm>
           <a:prstGeom prst="rightArrow">
             <a:avLst>
@@ -18665,7 +18717,7 @@
         <p:spPr>
           <a:xfrm>
             <a:off x="8876160" y="4169880"/>
-            <a:ext cx="680040" cy="259200"/>
+            <a:ext cx="679680" cy="258840"/>
           </a:xfrm>
           <a:prstGeom prst="rightArrow">
             <a:avLst>
@@ -18753,7 +18805,7 @@
         <p:spPr>
           <a:xfrm>
             <a:off x="684360" y="4487400"/>
-            <a:ext cx="8531640" cy="1504080"/>
+            <a:ext cx="8531280" cy="1503720"/>
           </a:xfrm>
           <a:prstGeom prst="rect">
             <a:avLst/>
@@ -18802,7 +18854,7 @@
         <p:spPr>
           <a:xfrm>
             <a:off x="684360" y="685800"/>
-            <a:ext cx="8531640" cy="3612240"/>
+            <a:ext cx="8531280" cy="3611880"/>
           </a:xfrm>
           <a:prstGeom prst="rect">
             <a:avLst/>
@@ -18821,7 +18873,7 @@
         <p:txBody>
           <a:bodyPr lIns="90000" rIns="90000" tIns="45000" bIns="45000" anchor="ctr"/>
           <a:p>
-            <a:pPr marL="285840" indent="-282960">
+            <a:pPr marL="285840" indent="-282600">
               <a:lnSpc>
                 <a:spcPct val="100000"/>
               </a:lnSpc>
@@ -18903,7 +18955,7 @@
             </a:endParaRPr>
           </a:p>
           <a:p>
-            <a:pPr marL="285840" indent="-282960">
+            <a:pPr marL="285840" indent="-282600">
               <a:lnSpc>
                 <a:spcPct val="100000"/>
               </a:lnSpc>
@@ -18949,7 +19001,7 @@
         <p:spPr>
           <a:xfrm>
             <a:off x="4681800" y="2481480"/>
-            <a:ext cx="911520" cy="911520"/>
+            <a:ext cx="911160" cy="911160"/>
           </a:xfrm>
           <a:prstGeom prst="rect">
             <a:avLst/>
@@ -18972,7 +19024,7 @@
         <p:spPr>
           <a:xfrm>
             <a:off x="6609240" y="3669480"/>
-            <a:ext cx="911520" cy="911520"/>
+            <a:ext cx="911160" cy="911160"/>
           </a:xfrm>
           <a:prstGeom prst="rect">
             <a:avLst/>
@@ -18995,7 +19047,7 @@
         <p:spPr>
           <a:xfrm>
             <a:off x="2973240" y="3669480"/>
-            <a:ext cx="911520" cy="911520"/>
+            <a:ext cx="911160" cy="911160"/>
           </a:xfrm>
           <a:prstGeom prst="rect">
             <a:avLst/>
@@ -19014,7 +19066,7 @@
         <p:spPr>
           <a:xfrm>
             <a:off x="4214160" y="3946320"/>
-            <a:ext cx="2065680" cy="357840"/>
+            <a:ext cx="2065320" cy="357480"/>
           </a:xfrm>
           <a:prstGeom prst="rightArrow">
             <a:avLst>
@@ -19053,7 +19105,7 @@
         <p:spPr>
           <a:xfrm>
             <a:off x="4988160" y="3533400"/>
-            <a:ext cx="298800" cy="404280"/>
+            <a:ext cx="298440" cy="403920"/>
           </a:xfrm>
           <a:prstGeom prst="downArrow">
             <a:avLst>

</xml_diff>

<commit_message>
#12 Weak AI vs Strong AI explanation speech part 4 added on introduction slides
</commit_message>
<xml_diff>
--- a/SAI_presentation_libre_office.pptx
+++ b/SAI_presentation_libre_office.pptx
@@ -250,7 +250,7 @@
           <a:bodyPr lIns="0" rIns="0" tIns="0" bIns="0" anchor="b"/>
           <a:p>
             <a:pPr algn="r"/>
-            <a:fld id="{6DA60267-36CD-4E28-9602-C0844D823BB9}" type="slidenum">
+            <a:fld id="{1A4B5CE5-19E2-4E74-8950-C94F4E59DB6D}" type="slidenum">
               <a:rPr b="0" lang="fr-FR" sz="1400" spc="-1" strike="noStrike">
                 <a:latin typeface="Times New Roman"/>
               </a:rPr>
@@ -298,7 +298,7 @@
         <p:spPr>
           <a:xfrm>
             <a:off x="685800" y="1143000"/>
-            <a:ext cx="5483160" cy="3083040"/>
+            <a:ext cx="5482800" cy="3082680"/>
           </a:xfrm>
           <a:prstGeom prst="rect">
             <a:avLst/>
@@ -318,7 +318,7 @@
         <p:spPr>
           <a:xfrm>
             <a:off x="685800" y="4400640"/>
-            <a:ext cx="5483160" cy="3597120"/>
+            <a:ext cx="5482800" cy="3596760"/>
           </a:xfrm>
           <a:prstGeom prst="rect">
             <a:avLst/>
@@ -327,7 +327,7 @@
         <p:txBody>
           <a:bodyPr lIns="0" rIns="0" tIns="0" bIns="0"/>
           <a:p>
-            <a:pPr marL="216000" indent="-213120">
+            <a:pPr marL="216000" indent="-212760">
               <a:lnSpc>
                 <a:spcPct val="100000"/>
               </a:lnSpc>
@@ -343,7 +343,7 @@
             </a:endParaRPr>
           </a:p>
           <a:p>
-            <a:pPr marL="216000" indent="-213120">
+            <a:pPr marL="216000" indent="-212760">
               <a:lnSpc>
                 <a:spcPct val="100000"/>
               </a:lnSpc>
@@ -360,7 +360,7 @@
             </a:endParaRPr>
           </a:p>
           <a:p>
-            <a:pPr marL="216000" indent="-213120">
+            <a:pPr marL="216000" indent="-212760">
               <a:lnSpc>
                 <a:spcPct val="100000"/>
               </a:lnSpc>
@@ -376,7 +376,7 @@
             </a:endParaRPr>
           </a:p>
           <a:p>
-            <a:pPr marL="216000" indent="-213120">
+            <a:pPr marL="216000" indent="-212760">
               <a:lnSpc>
                 <a:spcPct val="100000"/>
               </a:lnSpc>
@@ -392,7 +392,7 @@
             </a:endParaRPr>
           </a:p>
           <a:p>
-            <a:pPr marL="216000" indent="-213120">
+            <a:pPr marL="216000" indent="-212760">
               <a:lnSpc>
                 <a:spcPct val="100000"/>
               </a:lnSpc>
@@ -419,7 +419,7 @@
         <p:spPr>
           <a:xfrm>
             <a:off x="3884760" y="8685360"/>
-            <a:ext cx="2968560" cy="455400"/>
+            <a:ext cx="2968200" cy="455040"/>
           </a:xfrm>
           <a:prstGeom prst="rect">
             <a:avLst/>
@@ -443,7 +443,7 @@
                 <a:spcPct val="100000"/>
               </a:lnSpc>
             </a:pPr>
-            <a:fld id="{FF7396E4-2DEC-4C99-AFDB-E9680E8E65D8}" type="slidenum">
+            <a:fld id="{135D7357-4ABB-477C-8DE1-E4CB148FE102}" type="slidenum">
               <a:rPr b="0" lang="fr-FR" sz="1200" spc="-1" strike="noStrike">
                 <a:solidFill>
                   <a:srgbClr val="000000"/>
@@ -493,7 +493,7 @@
         <p:spPr>
           <a:xfrm>
             <a:off x="685800" y="1143000"/>
-            <a:ext cx="5483160" cy="3083040"/>
+            <a:ext cx="5482800" cy="3082680"/>
           </a:xfrm>
           <a:prstGeom prst="rect">
             <a:avLst/>
@@ -513,7 +513,7 @@
         <p:spPr>
           <a:xfrm>
             <a:off x="685800" y="4400640"/>
-            <a:ext cx="5483160" cy="3597120"/>
+            <a:ext cx="5482800" cy="3596760"/>
           </a:xfrm>
           <a:prstGeom prst="rect">
             <a:avLst/>
@@ -522,7 +522,7 @@
         <p:txBody>
           <a:bodyPr lIns="0" rIns="0" tIns="0" bIns="0"/>
           <a:p>
-            <a:pPr marL="216000" indent="-213480">
+            <a:pPr marL="216000" indent="-213120">
               <a:lnSpc>
                 <a:spcPct val="100000"/>
               </a:lnSpc>
@@ -538,7 +538,7 @@
             </a:endParaRPr>
           </a:p>
           <a:p>
-            <a:pPr marL="216000" indent="-213480">
+            <a:pPr marL="216000" indent="-213120">
               <a:lnSpc>
                 <a:spcPct val="100000"/>
               </a:lnSpc>
@@ -548,7 +548,7 @@
             </a:endParaRPr>
           </a:p>
           <a:p>
-            <a:pPr marL="216000" indent="-213480">
+            <a:pPr marL="216000" indent="-213120">
               <a:lnSpc>
                 <a:spcPct val="100000"/>
               </a:lnSpc>
@@ -564,7 +564,7 @@
             </a:endParaRPr>
           </a:p>
           <a:p>
-            <a:pPr marL="216000" indent="-213480">
+            <a:pPr marL="216000" indent="-213120">
               <a:lnSpc>
                 <a:spcPct val="100000"/>
               </a:lnSpc>
@@ -574,7 +574,7 @@
             </a:endParaRPr>
           </a:p>
           <a:p>
-            <a:pPr marL="216000" indent="-213480">
+            <a:pPr marL="216000" indent="-213120">
               <a:lnSpc>
                 <a:spcPct val="100000"/>
               </a:lnSpc>
@@ -590,7 +590,7 @@
             </a:endParaRPr>
           </a:p>
           <a:p>
-            <a:pPr marL="216000" indent="-213480">
+            <a:pPr marL="216000" indent="-213120">
               <a:lnSpc>
                 <a:spcPct val="100000"/>
               </a:lnSpc>
@@ -600,7 +600,7 @@
             </a:endParaRPr>
           </a:p>
           <a:p>
-            <a:pPr marL="216000" indent="-213480">
+            <a:pPr marL="216000" indent="-213120">
               <a:lnSpc>
                 <a:spcPct val="100000"/>
               </a:lnSpc>
@@ -616,7 +616,7 @@
             </a:endParaRPr>
           </a:p>
           <a:p>
-            <a:pPr marL="216000" indent="-213480">
+            <a:pPr marL="216000" indent="-213120">
               <a:lnSpc>
                 <a:spcPct val="100000"/>
               </a:lnSpc>
@@ -626,7 +626,7 @@
             </a:endParaRPr>
           </a:p>
           <a:p>
-            <a:pPr marL="216000" indent="-213480">
+            <a:pPr marL="216000" indent="-213120">
               <a:lnSpc>
                 <a:spcPct val="100000"/>
               </a:lnSpc>
@@ -636,7 +636,7 @@
             </a:endParaRPr>
           </a:p>
           <a:p>
-            <a:pPr marL="216000" indent="-213480">
+            <a:pPr marL="216000" indent="-213120">
               <a:lnSpc>
                 <a:spcPct val="100000"/>
               </a:lnSpc>
@@ -652,7 +652,7 @@
             </a:endParaRPr>
           </a:p>
           <a:p>
-            <a:pPr marL="216000" indent="-213480">
+            <a:pPr marL="216000" indent="-213120">
               <a:lnSpc>
                 <a:spcPct val="100000"/>
               </a:lnSpc>
@@ -668,7 +668,7 @@
             </a:endParaRPr>
           </a:p>
           <a:p>
-            <a:pPr marL="216000" indent="-213480">
+            <a:pPr marL="216000" indent="-213120">
               <a:lnSpc>
                 <a:spcPct val="100000"/>
               </a:lnSpc>
@@ -684,7 +684,7 @@
             </a:endParaRPr>
           </a:p>
           <a:p>
-            <a:pPr marL="216000" indent="-213480">
+            <a:pPr marL="216000" indent="-213120">
               <a:lnSpc>
                 <a:spcPct val="100000"/>
               </a:lnSpc>
@@ -694,7 +694,7 @@
             </a:endParaRPr>
           </a:p>
           <a:p>
-            <a:pPr marL="216000" indent="-213480">
+            <a:pPr marL="216000" indent="-213120">
               <a:lnSpc>
                 <a:spcPct val="100000"/>
               </a:lnSpc>
@@ -710,7 +710,7 @@
             </a:endParaRPr>
           </a:p>
           <a:p>
-            <a:pPr marL="216000" indent="-213480">
+            <a:pPr marL="216000" indent="-213120">
               <a:lnSpc>
                 <a:spcPct val="100000"/>
               </a:lnSpc>
@@ -720,7 +720,7 @@
             </a:endParaRPr>
           </a:p>
           <a:p>
-            <a:pPr marL="216000" indent="-213480">
+            <a:pPr marL="216000" indent="-213120">
               <a:lnSpc>
                 <a:spcPct val="100000"/>
               </a:lnSpc>
@@ -736,7 +736,7 @@
             </a:endParaRPr>
           </a:p>
           <a:p>
-            <a:pPr marL="216000" indent="-213480">
+            <a:pPr marL="216000" indent="-213120">
               <a:lnSpc>
                 <a:spcPct val="100000"/>
               </a:lnSpc>
@@ -752,7 +752,7 @@
             </a:endParaRPr>
           </a:p>
           <a:p>
-            <a:pPr marL="216000" indent="-213480">
+            <a:pPr marL="216000" indent="-213120">
               <a:lnSpc>
                 <a:spcPct val="100000"/>
               </a:lnSpc>
@@ -768,7 +768,7 @@
             </a:endParaRPr>
           </a:p>
           <a:p>
-            <a:pPr marL="216000" indent="-213480">
+            <a:pPr marL="216000" indent="-213120">
               <a:lnSpc>
                 <a:spcPct val="100000"/>
               </a:lnSpc>
@@ -784,7 +784,7 @@
             </a:endParaRPr>
           </a:p>
           <a:p>
-            <a:pPr marL="216000" indent="-213480">
+            <a:pPr marL="216000" indent="-213120">
               <a:lnSpc>
                 <a:spcPct val="100000"/>
               </a:lnSpc>
@@ -794,7 +794,7 @@
             </a:endParaRPr>
           </a:p>
           <a:p>
-            <a:pPr marL="216000" indent="-213480">
+            <a:pPr marL="216000" indent="-213120">
               <a:lnSpc>
                 <a:spcPct val="100000"/>
               </a:lnSpc>
@@ -810,7 +810,7 @@
             </a:endParaRPr>
           </a:p>
           <a:p>
-            <a:pPr marL="216000" indent="-213480">
+            <a:pPr marL="216000" indent="-213120">
               <a:lnSpc>
                 <a:spcPct val="100000"/>
               </a:lnSpc>
@@ -826,7 +826,7 @@
             </a:endParaRPr>
           </a:p>
           <a:p>
-            <a:pPr marL="216000" indent="-213480">
+            <a:pPr marL="216000" indent="-213120">
               <a:lnSpc>
                 <a:spcPct val="100000"/>
               </a:lnSpc>
@@ -842,7 +842,7 @@
             </a:endParaRPr>
           </a:p>
           <a:p>
-            <a:pPr marL="216000" indent="-213480">
+            <a:pPr marL="216000" indent="-213120">
               <a:lnSpc>
                 <a:spcPct val="100000"/>
               </a:lnSpc>
@@ -858,7 +858,7 @@
             </a:endParaRPr>
           </a:p>
           <a:p>
-            <a:pPr marL="216000" indent="-213480">
+            <a:pPr marL="216000" indent="-213120">
               <a:lnSpc>
                 <a:spcPct val="100000"/>
               </a:lnSpc>
@@ -874,7 +874,7 @@
             </a:endParaRPr>
           </a:p>
           <a:p>
-            <a:pPr marL="216000" indent="-213480">
+            <a:pPr marL="216000" indent="-213120">
               <a:lnSpc>
                 <a:spcPct val="100000"/>
               </a:lnSpc>
@@ -884,7 +884,7 @@
             </a:endParaRPr>
           </a:p>
           <a:p>
-            <a:pPr marL="216000" indent="-213480">
+            <a:pPr marL="216000" indent="-213120">
               <a:lnSpc>
                 <a:spcPct val="100000"/>
               </a:lnSpc>
@@ -900,7 +900,7 @@
             </a:endParaRPr>
           </a:p>
           <a:p>
-            <a:pPr marL="216000" indent="-213480">
+            <a:pPr marL="216000" indent="-213120">
               <a:lnSpc>
                 <a:spcPct val="100000"/>
               </a:lnSpc>
@@ -916,7 +916,7 @@
             </a:endParaRPr>
           </a:p>
           <a:p>
-            <a:pPr marL="216000" indent="-213480">
+            <a:pPr marL="216000" indent="-213120">
               <a:lnSpc>
                 <a:spcPct val="100000"/>
               </a:lnSpc>
@@ -932,7 +932,7 @@
             </a:endParaRPr>
           </a:p>
           <a:p>
-            <a:pPr marL="216000" indent="-213480">
+            <a:pPr marL="216000" indent="-213120">
               <a:lnSpc>
                 <a:spcPct val="100000"/>
               </a:lnSpc>
@@ -942,7 +942,7 @@
             </a:endParaRPr>
           </a:p>
           <a:p>
-            <a:pPr marL="216000" indent="-213480">
+            <a:pPr marL="216000" indent="-213120">
               <a:lnSpc>
                 <a:spcPct val="100000"/>
               </a:lnSpc>
@@ -958,7 +958,7 @@
             </a:endParaRPr>
           </a:p>
           <a:p>
-            <a:pPr marL="216000" indent="-213480">
+            <a:pPr marL="216000" indent="-213120">
               <a:lnSpc>
                 <a:spcPct val="100000"/>
               </a:lnSpc>
@@ -974,7 +974,7 @@
             </a:endParaRPr>
           </a:p>
           <a:p>
-            <a:pPr marL="216000" indent="-213480">
+            <a:pPr marL="216000" indent="-213120">
               <a:lnSpc>
                 <a:spcPct val="100000"/>
               </a:lnSpc>
@@ -990,7 +990,7 @@
             </a:endParaRPr>
           </a:p>
           <a:p>
-            <a:pPr marL="216000" indent="-213480">
+            <a:pPr marL="216000" indent="-213120">
               <a:lnSpc>
                 <a:spcPct val="100000"/>
               </a:lnSpc>
@@ -1000,7 +1000,7 @@
             </a:endParaRPr>
           </a:p>
           <a:p>
-            <a:pPr marL="216000" indent="-213480">
+            <a:pPr marL="216000" indent="-213120">
               <a:lnSpc>
                 <a:spcPct val="100000"/>
               </a:lnSpc>
@@ -1016,7 +1016,7 @@
             </a:endParaRPr>
           </a:p>
           <a:p>
-            <a:pPr marL="216000" indent="-213480">
+            <a:pPr marL="216000" indent="-213120">
               <a:lnSpc>
                 <a:spcPct val="100000"/>
               </a:lnSpc>
@@ -1032,7 +1032,7 @@
             </a:endParaRPr>
           </a:p>
           <a:p>
-            <a:pPr marL="216000" indent="-213480">
+            <a:pPr marL="216000" indent="-213120">
               <a:lnSpc>
                 <a:spcPct val="100000"/>
               </a:lnSpc>
@@ -1048,7 +1048,7 @@
             </a:endParaRPr>
           </a:p>
           <a:p>
-            <a:pPr marL="216000" indent="-213480">
+            <a:pPr marL="216000" indent="-213120">
               <a:lnSpc>
                 <a:spcPct val="100000"/>
               </a:lnSpc>
@@ -1064,7 +1064,7 @@
             </a:endParaRPr>
           </a:p>
           <a:p>
-            <a:pPr marL="216000" indent="-213480">
+            <a:pPr marL="216000" indent="-213120">
               <a:lnSpc>
                 <a:spcPct val="100000"/>
               </a:lnSpc>
@@ -1074,7 +1074,7 @@
             </a:endParaRPr>
           </a:p>
           <a:p>
-            <a:pPr marL="216000" indent="-213480">
+            <a:pPr marL="216000" indent="-213120">
               <a:lnSpc>
                 <a:spcPct val="100000"/>
               </a:lnSpc>
@@ -1090,7 +1090,7 @@
             </a:endParaRPr>
           </a:p>
           <a:p>
-            <a:pPr marL="216000" indent="-213480">
+            <a:pPr marL="216000" indent="-213120">
               <a:lnSpc>
                 <a:spcPct val="100000"/>
               </a:lnSpc>
@@ -1107,7 +1107,7 @@
             </a:endParaRPr>
           </a:p>
           <a:p>
-            <a:pPr marL="216000" indent="-213480">
+            <a:pPr marL="216000" indent="-213120">
               <a:lnSpc>
                 <a:spcPct val="100000"/>
               </a:lnSpc>
@@ -1124,7 +1124,7 @@
             </a:endParaRPr>
           </a:p>
           <a:p>
-            <a:pPr marL="216000" indent="-213480">
+            <a:pPr marL="216000" indent="-213120">
               <a:lnSpc>
                 <a:spcPct val="100000"/>
               </a:lnSpc>
@@ -1141,7 +1141,7 @@
             </a:endParaRPr>
           </a:p>
           <a:p>
-            <a:pPr marL="216000" indent="-213480">
+            <a:pPr marL="216000" indent="-213120">
               <a:lnSpc>
                 <a:spcPct val="100000"/>
               </a:lnSpc>
@@ -1151,7 +1151,7 @@
             </a:endParaRPr>
           </a:p>
           <a:p>
-            <a:pPr marL="216000" indent="-213480">
+            <a:pPr marL="216000" indent="-213120">
               <a:lnSpc>
                 <a:spcPct val="100000"/>
               </a:lnSpc>
@@ -1168,7 +1168,7 @@
             </a:endParaRPr>
           </a:p>
           <a:p>
-            <a:pPr marL="216000" indent="-213480">
+            <a:pPr marL="216000" indent="-213120">
               <a:lnSpc>
                 <a:spcPct val="100000"/>
               </a:lnSpc>
@@ -1185,7 +1185,7 @@
             </a:endParaRPr>
           </a:p>
           <a:p>
-            <a:pPr marL="216000" indent="-213480">
+            <a:pPr marL="216000" indent="-213120">
               <a:lnSpc>
                 <a:spcPct val="100000"/>
               </a:lnSpc>
@@ -1195,7 +1195,7 @@
             </a:endParaRPr>
           </a:p>
           <a:p>
-            <a:pPr marL="216000" indent="-213480">
+            <a:pPr marL="216000" indent="-213120">
               <a:lnSpc>
                 <a:spcPct val="100000"/>
               </a:lnSpc>
@@ -1205,7 +1205,7 @@
             </a:endParaRPr>
           </a:p>
           <a:p>
-            <a:pPr marL="216000" indent="-213480">
+            <a:pPr marL="216000" indent="-213120">
               <a:lnSpc>
                 <a:spcPct val="100000"/>
               </a:lnSpc>
@@ -1215,7 +1215,7 @@
             </a:endParaRPr>
           </a:p>
           <a:p>
-            <a:pPr marL="216000" indent="-213480">
+            <a:pPr marL="216000" indent="-213120">
               <a:lnSpc>
                 <a:spcPct val="100000"/>
               </a:lnSpc>
@@ -1225,7 +1225,7 @@
             </a:endParaRPr>
           </a:p>
           <a:p>
-            <a:pPr marL="216000" indent="-213480">
+            <a:pPr marL="216000" indent="-213120">
               <a:lnSpc>
                 <a:spcPct val="100000"/>
               </a:lnSpc>
@@ -1245,7 +1245,7 @@
         <p:spPr>
           <a:xfrm>
             <a:off x="3884760" y="8685360"/>
-            <a:ext cx="2968560" cy="455400"/>
+            <a:ext cx="2968200" cy="455040"/>
           </a:xfrm>
           <a:prstGeom prst="rect">
             <a:avLst/>
@@ -1269,7 +1269,7 @@
                 <a:spcPct val="100000"/>
               </a:lnSpc>
             </a:pPr>
-            <a:fld id="{8BCD16B1-DC43-440C-BDAA-71F410E0124A}" type="slidenum">
+            <a:fld id="{4FE01581-72AE-484C-AEB6-DC511DFE6339}" type="slidenum">
               <a:rPr b="0" lang="fr-FR" sz="1200" spc="-1" strike="noStrike">
                 <a:solidFill>
                   <a:srgbClr val="000000"/>
@@ -1319,7 +1319,7 @@
         <p:spPr>
           <a:xfrm>
             <a:off x="685800" y="1143000"/>
-            <a:ext cx="5483160" cy="3083040"/>
+            <a:ext cx="5482800" cy="3082680"/>
           </a:xfrm>
           <a:prstGeom prst="rect">
             <a:avLst/>
@@ -1339,7 +1339,7 @@
         <p:spPr>
           <a:xfrm>
             <a:off x="685800" y="4400640"/>
-            <a:ext cx="5483160" cy="3597120"/>
+            <a:ext cx="5482800" cy="3596760"/>
           </a:xfrm>
           <a:prstGeom prst="rect">
             <a:avLst/>
@@ -1348,7 +1348,7 @@
         <p:txBody>
           <a:bodyPr lIns="0" rIns="0" tIns="0" bIns="0"/>
           <a:p>
-            <a:pPr marL="216000" indent="-215280">
+            <a:pPr marL="216000" indent="-214920">
               <a:lnSpc>
                 <a:spcPct val="100000"/>
               </a:lnSpc>
@@ -1364,7 +1364,7 @@
             </a:endParaRPr>
           </a:p>
           <a:p>
-            <a:pPr marL="216000" indent="-215280">
+            <a:pPr marL="216000" indent="-214920">
               <a:lnSpc>
                 <a:spcPct val="100000"/>
               </a:lnSpc>
@@ -1380,7 +1380,7 @@
             </a:endParaRPr>
           </a:p>
           <a:p>
-            <a:pPr marL="216000" indent="-215280">
+            <a:pPr marL="216000" indent="-214920">
               <a:lnSpc>
                 <a:spcPct val="100000"/>
               </a:lnSpc>
@@ -1396,7 +1396,7 @@
             </a:endParaRPr>
           </a:p>
           <a:p>
-            <a:pPr marL="216000" indent="-215280">
+            <a:pPr marL="216000" indent="-214920">
               <a:lnSpc>
                 <a:spcPct val="100000"/>
               </a:lnSpc>
@@ -1406,7 +1406,7 @@
             </a:endParaRPr>
           </a:p>
           <a:p>
-            <a:pPr marL="216000" indent="-215280">
+            <a:pPr marL="216000" indent="-214920">
               <a:lnSpc>
                 <a:spcPct val="100000"/>
               </a:lnSpc>
@@ -1422,7 +1422,7 @@
             </a:endParaRPr>
           </a:p>
           <a:p>
-            <a:pPr marL="216000" indent="-215280">
+            <a:pPr marL="216000" indent="-214920">
               <a:lnSpc>
                 <a:spcPct val="100000"/>
               </a:lnSpc>
@@ -1438,7 +1438,7 @@
             </a:endParaRPr>
           </a:p>
           <a:p>
-            <a:pPr marL="216000" indent="-215280">
+            <a:pPr marL="216000" indent="-214920">
               <a:lnSpc>
                 <a:spcPct val="100000"/>
               </a:lnSpc>
@@ -1448,7 +1448,7 @@
             </a:endParaRPr>
           </a:p>
           <a:p>
-            <a:pPr marL="216000" indent="-215280">
+            <a:pPr marL="216000" indent="-214920">
               <a:lnSpc>
                 <a:spcPct val="100000"/>
               </a:lnSpc>
@@ -1464,7 +1464,7 @@
             </a:endParaRPr>
           </a:p>
           <a:p>
-            <a:pPr marL="216000" indent="-215280">
+            <a:pPr marL="216000" indent="-214920">
               <a:lnSpc>
                 <a:spcPct val="100000"/>
               </a:lnSpc>
@@ -1474,7 +1474,7 @@
             </a:endParaRPr>
           </a:p>
           <a:p>
-            <a:pPr marL="216000" indent="-215280">
+            <a:pPr marL="216000" indent="-214920">
               <a:lnSpc>
                 <a:spcPct val="100000"/>
               </a:lnSpc>
@@ -1483,14 +1483,14 @@
               <a:rPr b="0" lang="fr-FR" sz="1800" spc="-1" strike="noStrike">
                 <a:latin typeface="Arial"/>
               </a:rPr>
-              <a:t>TODO</a:t>
+              <a:t>The benefit of our AI is that he will know it life belong and it would make hypothesis or heuristic of everything by itself</a:t>
             </a:r>
             <a:endParaRPr b="0" lang="fr-FR" sz="1800" spc="-1" strike="noStrike">
               <a:latin typeface="Arial"/>
             </a:endParaRPr>
           </a:p>
           <a:p>
-            <a:pPr marL="216000" indent="-215280">
+            <a:pPr marL="216000" indent="-214920">
               <a:lnSpc>
                 <a:spcPct val="100000"/>
               </a:lnSpc>
@@ -1500,7 +1500,17 @@
             </a:endParaRPr>
           </a:p>
           <a:p>
-            <a:pPr marL="216000" indent="-215280">
+            <a:pPr marL="216000" indent="-214920">
+              <a:lnSpc>
+                <a:spcPct val="100000"/>
+              </a:lnSpc>
+            </a:pPr>
+            <a:endParaRPr b="0" lang="fr-FR" sz="1800" spc="-1" strike="noStrike">
+              <a:latin typeface="Arial"/>
+            </a:endParaRPr>
+          </a:p>
+          <a:p>
+            <a:pPr marL="216000" indent="-214920">
               <a:lnSpc>
                 <a:spcPct val="100000"/>
               </a:lnSpc>
@@ -1520,7 +1530,7 @@
         <p:spPr>
           <a:xfrm>
             <a:off x="3884760" y="8685360"/>
-            <a:ext cx="2968560" cy="455400"/>
+            <a:ext cx="2968200" cy="455040"/>
           </a:xfrm>
           <a:prstGeom prst="rect">
             <a:avLst/>
@@ -1544,7 +1554,7 @@
                 <a:spcPct val="100000"/>
               </a:lnSpc>
             </a:pPr>
-            <a:fld id="{9E95F168-EA7B-4651-A707-0F5241F40FEE}" type="slidenum">
+            <a:fld id="{AEEC32A1-5E72-43A1-AC29-B21C7F2ED015}" type="slidenum">
               <a:rPr b="0" lang="fr-FR" sz="1200" spc="-1" strike="noStrike">
                 <a:solidFill>
                   <a:srgbClr val="000000"/>
@@ -1594,7 +1604,7 @@
         <p:spPr>
           <a:xfrm>
             <a:off x="380880" y="694800"/>
-            <a:ext cx="6093720" cy="3426840"/>
+            <a:ext cx="6093360" cy="3426480"/>
           </a:xfrm>
           <a:prstGeom prst="rect">
             <a:avLst/>
@@ -1614,7 +1624,7 @@
         <p:spPr>
           <a:xfrm>
             <a:off x="685800" y="4343400"/>
-            <a:ext cx="5484240" cy="4112640"/>
+            <a:ext cx="5483880" cy="4112280"/>
           </a:xfrm>
           <a:prstGeom prst="rect">
             <a:avLst/>
@@ -1623,7 +1633,7 @@
         <p:txBody>
           <a:bodyPr lIns="0" rIns="0" tIns="0" bIns="0"/>
           <a:p>
-            <a:pPr marL="216000" indent="-214560">
+            <a:pPr marL="216000" indent="-214200">
               <a:lnSpc>
                 <a:spcPct val="100000"/>
               </a:lnSpc>
@@ -1639,7 +1649,7 @@
             </a:endParaRPr>
           </a:p>
           <a:p>
-            <a:pPr marL="216000" indent="-214560">
+            <a:pPr marL="216000" indent="-214200">
               <a:lnSpc>
                 <a:spcPct val="100000"/>
               </a:lnSpc>
@@ -1655,7 +1665,7 @@
             </a:endParaRPr>
           </a:p>
           <a:p>
-            <a:pPr marL="216000" indent="-214560">
+            <a:pPr marL="216000" indent="-214200">
               <a:lnSpc>
                 <a:spcPct val="100000"/>
               </a:lnSpc>
@@ -1671,7 +1681,7 @@
             </a:endParaRPr>
           </a:p>
           <a:p>
-            <a:pPr marL="216000" indent="-214560">
+            <a:pPr marL="216000" indent="-214200">
               <a:lnSpc>
                 <a:spcPct val="100000"/>
               </a:lnSpc>
@@ -5419,7 +5429,7 @@
         <p:spPr>
           <a:xfrm>
             <a:off x="0" y="0"/>
-            <a:ext cx="12188880" cy="6854760"/>
+            <a:ext cx="12188520" cy="6854400"/>
           </a:xfrm>
           <a:prstGeom prst="rect">
             <a:avLst/>
@@ -5452,7 +5462,7 @@
         <p:spPr>
           <a:xfrm flipV="1">
             <a:off x="0" y="-3600"/>
-            <a:ext cx="12185640" cy="6854760"/>
+            <a:ext cx="12185280" cy="6854400"/>
           </a:xfrm>
           <a:prstGeom prst="snip1Rect">
             <a:avLst>
@@ -5507,7 +5517,7 @@
         <p:spPr>
           <a:xfrm>
             <a:off x="684360" y="685800"/>
-            <a:ext cx="9675720" cy="3670200"/>
+            <a:ext cx="9675360" cy="3669840"/>
           </a:xfrm>
           <a:prstGeom prst="rect">
             <a:avLst/>
@@ -5558,7 +5568,7 @@
         <p:spPr>
           <a:xfrm>
             <a:off x="684360" y="4648320"/>
-            <a:ext cx="7002360" cy="1139760"/>
+            <a:ext cx="7002000" cy="1139400"/>
           </a:xfrm>
           <a:prstGeom prst="rect">
             <a:avLst/>
@@ -5696,7 +5706,7 @@
         <p:spPr>
           <a:xfrm>
             <a:off x="684360" y="4487400"/>
-            <a:ext cx="8531280" cy="1503720"/>
+            <a:ext cx="8530920" cy="1503360"/>
           </a:xfrm>
           <a:prstGeom prst="rect">
             <a:avLst/>
@@ -5745,7 +5755,7 @@
         <p:spPr>
           <a:xfrm>
             <a:off x="684360" y="685800"/>
-            <a:ext cx="8531280" cy="3611880"/>
+            <a:ext cx="8530920" cy="3611520"/>
           </a:xfrm>
           <a:prstGeom prst="rect">
             <a:avLst/>
@@ -5764,7 +5774,7 @@
         <p:txBody>
           <a:bodyPr lIns="90000" rIns="90000" tIns="45000" bIns="45000" anchor="ctr"/>
           <a:p>
-            <a:pPr marL="285840" indent="-282600">
+            <a:pPr marL="285840" indent="-282240">
               <a:lnSpc>
                 <a:spcPct val="100000"/>
               </a:lnSpc>
@@ -5896,7 +5906,7 @@
             </a:endParaRPr>
           </a:p>
           <a:p>
-            <a:pPr marL="285840" indent="-282600">
+            <a:pPr marL="285840" indent="-282240">
               <a:lnSpc>
                 <a:spcPct val="100000"/>
               </a:lnSpc>
@@ -5942,7 +5952,7 @@
         <p:spPr>
           <a:xfrm>
             <a:off x="4733640" y="3979440"/>
-            <a:ext cx="911160" cy="911160"/>
+            <a:ext cx="910800" cy="910800"/>
           </a:xfrm>
           <a:prstGeom prst="rect">
             <a:avLst/>
@@ -5965,7 +5975,7 @@
         <p:spPr>
           <a:xfrm>
             <a:off x="6825960" y="4030200"/>
-            <a:ext cx="911160" cy="911160"/>
+            <a:ext cx="910800" cy="910800"/>
           </a:xfrm>
           <a:prstGeom prst="rect">
             <a:avLst/>
@@ -5988,7 +5998,7 @@
         <p:spPr>
           <a:xfrm>
             <a:off x="5354640" y="2725920"/>
-            <a:ext cx="911160" cy="911160"/>
+            <a:ext cx="910800" cy="910800"/>
           </a:xfrm>
           <a:prstGeom prst="rect">
             <a:avLst/>
@@ -6011,7 +6021,7 @@
         <p:spPr>
           <a:xfrm>
             <a:off x="8550000" y="3433320"/>
-            <a:ext cx="911160" cy="911160"/>
+            <a:ext cx="910800" cy="910800"/>
           </a:xfrm>
           <a:prstGeom prst="rect">
             <a:avLst/>
@@ -6034,7 +6044,7 @@
         <p:spPr>
           <a:xfrm>
             <a:off x="5153040" y="5079960"/>
-            <a:ext cx="911160" cy="911160"/>
+            <a:ext cx="910800" cy="910800"/>
           </a:xfrm>
           <a:prstGeom prst="rect">
             <a:avLst/>
@@ -6052,8 +6062,8 @@
         </p:nvSpPr>
         <p:spPr>
           <a:xfrm rot="3732600">
-            <a:off x="7994520" y="3763440"/>
-            <a:ext cx="200880" cy="666720"/>
+            <a:off x="7994520" y="3763080"/>
+            <a:ext cx="200520" cy="666360"/>
           </a:xfrm>
           <a:prstGeom prst="downArrow">
             <a:avLst>
@@ -6091,8 +6101,8 @@
         </p:nvSpPr>
         <p:spPr>
           <a:xfrm rot="14618400">
-            <a:off x="6343920" y="4763880"/>
-            <a:ext cx="200880" cy="666720"/>
+            <a:off x="6343920" y="4764240"/>
+            <a:ext cx="200520" cy="666360"/>
           </a:xfrm>
           <a:prstGeom prst="downArrow">
             <a:avLst>
@@ -6130,8 +6140,8 @@
         </p:nvSpPr>
         <p:spPr>
           <a:xfrm rot="5400000">
-            <a:off x="6192000" y="4132800"/>
-            <a:ext cx="200880" cy="666720"/>
+            <a:off x="6192360" y="4132800"/>
+            <a:ext cx="200520" cy="666360"/>
           </a:xfrm>
           <a:prstGeom prst="downArrow">
             <a:avLst>
@@ -6169,8 +6179,8 @@
         </p:nvSpPr>
         <p:spPr>
           <a:xfrm rot="7014000">
-            <a:off x="6424920" y="3552480"/>
-            <a:ext cx="200880" cy="666720"/>
+            <a:off x="6425280" y="3552480"/>
+            <a:ext cx="200520" cy="666360"/>
           </a:xfrm>
           <a:prstGeom prst="downArrow">
             <a:avLst>
@@ -6208,8 +6218,8 @@
         </p:nvSpPr>
         <p:spPr>
           <a:xfrm rot="1747800">
-            <a:off x="5088240" y="3303000"/>
-            <a:ext cx="200880" cy="666720"/>
+            <a:off x="5088240" y="3302640"/>
+            <a:ext cx="200520" cy="666360"/>
           </a:xfrm>
           <a:prstGeom prst="downArrow">
             <a:avLst>
@@ -6297,7 +6307,7 @@
         <p:spPr>
           <a:xfrm>
             <a:off x="6868080" y="306720"/>
-            <a:ext cx="5040720" cy="2082600"/>
+            <a:ext cx="5040360" cy="2082240"/>
           </a:xfrm>
           <a:prstGeom prst="rect">
             <a:avLst/>
@@ -6340,7 +6350,7 @@
         <p:spPr>
           <a:xfrm>
             <a:off x="6271200" y="2669400"/>
-            <a:ext cx="5629680" cy="3005640"/>
+            <a:ext cx="5629320" cy="3005280"/>
           </a:xfrm>
           <a:prstGeom prst="rect">
             <a:avLst/>
@@ -6385,7 +6395,7 @@
         <p:spPr>
           <a:xfrm>
             <a:off x="129960" y="5709960"/>
-            <a:ext cx="11180160" cy="1086840"/>
+            <a:ext cx="11179800" cy="1086480"/>
           </a:xfrm>
           <a:prstGeom prst="rect">
             <a:avLst/>
@@ -6430,7 +6440,7 @@
         <p:spPr>
           <a:xfrm>
             <a:off x="207000" y="1787400"/>
-            <a:ext cx="5591520" cy="3224880"/>
+            <a:ext cx="5591160" cy="3224520"/>
           </a:xfrm>
           <a:prstGeom prst="rect">
             <a:avLst/>
@@ -6475,7 +6485,7 @@
         <p:spPr>
           <a:xfrm>
             <a:off x="684360" y="4487400"/>
-            <a:ext cx="8531280" cy="1503720"/>
+            <a:ext cx="8530920" cy="1503360"/>
           </a:xfrm>
           <a:prstGeom prst="rect">
             <a:avLst/>
@@ -6524,7 +6534,7 @@
         <p:spPr>
           <a:xfrm>
             <a:off x="684360" y="685800"/>
-            <a:ext cx="8531280" cy="3611880"/>
+            <a:ext cx="8530920" cy="3611520"/>
           </a:xfrm>
           <a:prstGeom prst="rect">
             <a:avLst/>
@@ -6543,7 +6553,7 @@
         <p:txBody>
           <a:bodyPr lIns="90000" rIns="90000" tIns="45000" bIns="45000" anchor="ctr"/>
           <a:p>
-            <a:pPr marL="285840" indent="-282600">
+            <a:pPr marL="285840" indent="-282240">
               <a:lnSpc>
                 <a:spcPct val="100000"/>
               </a:lnSpc>
@@ -6595,7 +6605,7 @@
             </a:endParaRPr>
           </a:p>
           <a:p>
-            <a:pPr marL="285840" indent="-282600">
+            <a:pPr marL="285840" indent="-282240">
               <a:lnSpc>
                 <a:spcPct val="100000"/>
               </a:lnSpc>
@@ -6637,7 +6647,7 @@
             </a:endParaRPr>
           </a:p>
           <a:p>
-            <a:pPr marL="285840" indent="-282600">
+            <a:pPr marL="285840" indent="-282240">
               <a:lnSpc>
                 <a:spcPct val="100000"/>
               </a:lnSpc>
@@ -6689,7 +6699,7 @@
             </a:endParaRPr>
           </a:p>
           <a:p>
-            <a:pPr marL="285840" indent="-282600">
+            <a:pPr marL="285840" indent="-282240">
               <a:lnSpc>
                 <a:spcPct val="100000"/>
               </a:lnSpc>
@@ -6857,7 +6867,7 @@
         <p:spPr>
           <a:xfrm>
             <a:off x="4629600" y="1832040"/>
-            <a:ext cx="851400" cy="851400"/>
+            <a:ext cx="851040" cy="851040"/>
           </a:xfrm>
           <a:prstGeom prst="rect">
             <a:avLst/>
@@ -6880,7 +6890,7 @@
         <p:spPr>
           <a:xfrm>
             <a:off x="4463640" y="4185360"/>
-            <a:ext cx="1177920" cy="470160"/>
+            <a:ext cx="1177560" cy="469800"/>
           </a:xfrm>
           <a:prstGeom prst="rect">
             <a:avLst/>
@@ -6903,7 +6913,7 @@
         <p:spPr>
           <a:xfrm>
             <a:off x="4586040" y="2785680"/>
-            <a:ext cx="894960" cy="1037160"/>
+            <a:ext cx="894600" cy="1036800"/>
           </a:xfrm>
           <a:prstGeom prst="rect">
             <a:avLst/>
@@ -6926,7 +6936,7 @@
         <p:spPr>
           <a:xfrm>
             <a:off x="250560" y="1953720"/>
-            <a:ext cx="911160" cy="911160"/>
+            <a:ext cx="910800" cy="910800"/>
           </a:xfrm>
           <a:prstGeom prst="rect">
             <a:avLst/>
@@ -6949,7 +6959,7 @@
         <p:spPr>
           <a:xfrm>
             <a:off x="271440" y="3259800"/>
-            <a:ext cx="911160" cy="911160"/>
+            <a:ext cx="910800" cy="910800"/>
           </a:xfrm>
           <a:prstGeom prst="rect">
             <a:avLst/>
@@ -6972,7 +6982,7 @@
         <p:spPr>
           <a:xfrm>
             <a:off x="2440800" y="2741040"/>
-            <a:ext cx="911160" cy="911160"/>
+            <a:ext cx="910800" cy="910800"/>
           </a:xfrm>
           <a:prstGeom prst="rect">
             <a:avLst/>
@@ -6990,8 +7000,8 @@
         </p:nvSpPr>
         <p:spPr>
           <a:xfrm rot="1192200">
-            <a:off x="1578600" y="2560320"/>
-            <a:ext cx="975240" cy="481320"/>
+            <a:off x="1578600" y="2559960"/>
+            <a:ext cx="974880" cy="480960"/>
           </a:xfrm>
           <a:prstGeom prst="rightArrow">
             <a:avLst>
@@ -7032,8 +7042,8 @@
         </p:nvSpPr>
         <p:spPr>
           <a:xfrm rot="20407800">
-            <a:off x="1557720" y="3348000"/>
-            <a:ext cx="975240" cy="481320"/>
+            <a:off x="1557360" y="3348000"/>
+            <a:ext cx="974880" cy="480960"/>
           </a:xfrm>
           <a:prstGeom prst="rightArrow">
             <a:avLst>
@@ -7074,8 +7084,8 @@
         </p:nvSpPr>
         <p:spPr>
           <a:xfrm rot="1192200">
-            <a:off x="3332160" y="3668760"/>
-            <a:ext cx="975240" cy="481320"/>
+            <a:off x="3332160" y="3668400"/>
+            <a:ext cx="974880" cy="480960"/>
           </a:xfrm>
           <a:prstGeom prst="rightArrow">
             <a:avLst>
@@ -7116,8 +7126,8 @@
         </p:nvSpPr>
         <p:spPr>
           <a:xfrm rot="20407800">
-            <a:off x="3405960" y="2343600"/>
-            <a:ext cx="975240" cy="481320"/>
+            <a:off x="3405600" y="2343600"/>
+            <a:ext cx="974880" cy="480960"/>
           </a:xfrm>
           <a:prstGeom prst="rightArrow">
             <a:avLst>
@@ -7159,7 +7169,7 @@
         <p:spPr>
           <a:xfrm>
             <a:off x="3483720" y="3004200"/>
-            <a:ext cx="975240" cy="481320"/>
+            <a:ext cx="974880" cy="480960"/>
           </a:xfrm>
           <a:prstGeom prst="rightArrow">
             <a:avLst>
@@ -7205,7 +7215,7 @@
         <p:spPr>
           <a:xfrm>
             <a:off x="5819760" y="5709960"/>
-            <a:ext cx="911160" cy="911160"/>
+            <a:ext cx="910800" cy="910800"/>
           </a:xfrm>
           <a:prstGeom prst="rect">
             <a:avLst/>
@@ -7228,7 +7238,7 @@
         <p:spPr>
           <a:xfrm>
             <a:off x="2060640" y="5759640"/>
-            <a:ext cx="911160" cy="911160"/>
+            <a:ext cx="910800" cy="910800"/>
           </a:xfrm>
           <a:prstGeom prst="rect">
             <a:avLst/>
@@ -7251,7 +7261,7 @@
         <p:spPr>
           <a:xfrm>
             <a:off x="9383040" y="5709960"/>
-            <a:ext cx="911160" cy="911160"/>
+            <a:ext cx="910800" cy="910800"/>
           </a:xfrm>
           <a:prstGeom prst="rect">
             <a:avLst/>
@@ -7274,7 +7284,7 @@
         <p:spPr>
           <a:xfrm>
             <a:off x="7495920" y="5709960"/>
-            <a:ext cx="911160" cy="911160"/>
+            <a:ext cx="910800" cy="910800"/>
           </a:xfrm>
           <a:prstGeom prst="rect">
             <a:avLst/>
@@ -7297,7 +7307,7 @@
         <p:spPr>
           <a:xfrm>
             <a:off x="4004640" y="5709960"/>
-            <a:ext cx="911160" cy="911160"/>
+            <a:ext cx="910800" cy="910800"/>
           </a:xfrm>
           <a:prstGeom prst="rect">
             <a:avLst/>
@@ -7320,7 +7330,7 @@
         <p:spPr>
           <a:xfrm>
             <a:off x="276120" y="5759640"/>
-            <a:ext cx="911160" cy="911160"/>
+            <a:ext cx="910800" cy="910800"/>
           </a:xfrm>
           <a:prstGeom prst="rect">
             <a:avLst/>
@@ -7339,7 +7349,7 @@
         <p:spPr>
           <a:xfrm>
             <a:off x="1230120" y="6098760"/>
-            <a:ext cx="679680" cy="258840"/>
+            <a:ext cx="679320" cy="258480"/>
           </a:xfrm>
           <a:prstGeom prst="rightArrow">
             <a:avLst>
@@ -7378,7 +7388,7 @@
         <p:spPr>
           <a:xfrm>
             <a:off x="3103920" y="6117480"/>
-            <a:ext cx="679680" cy="258840"/>
+            <a:ext cx="679320" cy="258480"/>
           </a:xfrm>
           <a:prstGeom prst="rightArrow">
             <a:avLst>
@@ -7417,7 +7427,7 @@
         <p:spPr>
           <a:xfrm>
             <a:off x="4958640" y="6109200"/>
-            <a:ext cx="679680" cy="258840"/>
+            <a:ext cx="679320" cy="258480"/>
           </a:xfrm>
           <a:prstGeom prst="rightArrow">
             <a:avLst>
@@ -7456,7 +7466,7 @@
         <p:spPr>
           <a:xfrm>
             <a:off x="6754320" y="6098760"/>
-            <a:ext cx="679680" cy="258840"/>
+            <a:ext cx="679320" cy="258480"/>
           </a:xfrm>
           <a:prstGeom prst="rightArrow">
             <a:avLst>
@@ -7495,7 +7505,7 @@
         <p:spPr>
           <a:xfrm>
             <a:off x="8468280" y="6085800"/>
-            <a:ext cx="679680" cy="258840"/>
+            <a:ext cx="679320" cy="258480"/>
           </a:xfrm>
           <a:prstGeom prst="rightArrow">
             <a:avLst>
@@ -7538,7 +7548,7 @@
         <p:spPr>
           <a:xfrm>
             <a:off x="6582600" y="3915000"/>
-            <a:ext cx="911160" cy="911160"/>
+            <a:ext cx="910800" cy="910800"/>
           </a:xfrm>
           <a:prstGeom prst="rect">
             <a:avLst/>
@@ -7561,7 +7571,7 @@
         <p:spPr>
           <a:xfrm>
             <a:off x="8674920" y="3965760"/>
-            <a:ext cx="911160" cy="911160"/>
+            <a:ext cx="910800" cy="910800"/>
           </a:xfrm>
           <a:prstGeom prst="rect">
             <a:avLst/>
@@ -7584,7 +7594,7 @@
         <p:spPr>
           <a:xfrm>
             <a:off x="7203600" y="2661480"/>
-            <a:ext cx="911160" cy="911160"/>
+            <a:ext cx="910800" cy="910800"/>
           </a:xfrm>
           <a:prstGeom prst="rect">
             <a:avLst/>
@@ -7607,7 +7617,7 @@
         <p:spPr>
           <a:xfrm>
             <a:off x="10398960" y="3368880"/>
-            <a:ext cx="911160" cy="911160"/>
+            <a:ext cx="910800" cy="910800"/>
           </a:xfrm>
           <a:prstGeom prst="rect">
             <a:avLst/>
@@ -7630,7 +7640,7 @@
         <p:spPr>
           <a:xfrm>
             <a:off x="7002000" y="5015520"/>
-            <a:ext cx="911160" cy="911160"/>
+            <a:ext cx="910800" cy="910800"/>
           </a:xfrm>
           <a:prstGeom prst="rect">
             <a:avLst/>
@@ -7648,8 +7658,8 @@
         </p:nvSpPr>
         <p:spPr>
           <a:xfrm rot="3732600">
-            <a:off x="9843840" y="3699360"/>
-            <a:ext cx="200880" cy="666720"/>
+            <a:off x="9843840" y="3699000"/>
+            <a:ext cx="200520" cy="666360"/>
           </a:xfrm>
           <a:prstGeom prst="downArrow">
             <a:avLst>
@@ -7687,8 +7697,8 @@
         </p:nvSpPr>
         <p:spPr>
           <a:xfrm rot="14618400">
-            <a:off x="8192880" y="4699800"/>
-            <a:ext cx="200880" cy="666720"/>
+            <a:off x="8192880" y="4700160"/>
+            <a:ext cx="200520" cy="666360"/>
           </a:xfrm>
           <a:prstGeom prst="downArrow">
             <a:avLst>
@@ -7726,8 +7736,8 @@
         </p:nvSpPr>
         <p:spPr>
           <a:xfrm rot="5400000">
-            <a:off x="8040960" y="4068360"/>
-            <a:ext cx="200880" cy="666720"/>
+            <a:off x="8041320" y="4068360"/>
+            <a:ext cx="200520" cy="666360"/>
           </a:xfrm>
           <a:prstGeom prst="downArrow">
             <a:avLst>
@@ -7765,8 +7775,8 @@
         </p:nvSpPr>
         <p:spPr>
           <a:xfrm rot="7014000">
-            <a:off x="8274240" y="3488040"/>
-            <a:ext cx="200880" cy="666720"/>
+            <a:off x="8274600" y="3488040"/>
+            <a:ext cx="200520" cy="666360"/>
           </a:xfrm>
           <a:prstGeom prst="downArrow">
             <a:avLst>
@@ -7804,8 +7814,8 @@
         </p:nvSpPr>
         <p:spPr>
           <a:xfrm rot="1747800">
-            <a:off x="7095240" y="3425040"/>
-            <a:ext cx="200880" cy="666720"/>
+            <a:off x="7095240" y="3424680"/>
+            <a:ext cx="200520" cy="666360"/>
           </a:xfrm>
           <a:prstGeom prst="downArrow">
             <a:avLst>
@@ -7848,7 +7858,7 @@
         <p:spPr>
           <a:xfrm>
             <a:off x="8641080" y="309600"/>
-            <a:ext cx="911160" cy="911160"/>
+            <a:ext cx="910800" cy="910800"/>
           </a:xfrm>
           <a:prstGeom prst="rect">
             <a:avLst/>
@@ -7871,7 +7881,7 @@
         <p:spPr>
           <a:xfrm>
             <a:off x="10568880" y="1497240"/>
-            <a:ext cx="911160" cy="911160"/>
+            <a:ext cx="910800" cy="910800"/>
           </a:xfrm>
           <a:prstGeom prst="rect">
             <a:avLst/>
@@ -7894,7 +7904,7 @@
         <p:spPr>
           <a:xfrm>
             <a:off x="6932880" y="1497240"/>
-            <a:ext cx="911160" cy="911160"/>
+            <a:ext cx="910800" cy="910800"/>
           </a:xfrm>
           <a:prstGeom prst="rect">
             <a:avLst/>
@@ -7913,7 +7923,7 @@
         <p:spPr>
           <a:xfrm>
             <a:off x="8173800" y="1774080"/>
-            <a:ext cx="2065320" cy="357480"/>
+            <a:ext cx="2064960" cy="357120"/>
           </a:xfrm>
           <a:prstGeom prst="rightArrow">
             <a:avLst>
@@ -7952,7 +7962,7 @@
         <p:spPr>
           <a:xfrm>
             <a:off x="8947440" y="1361160"/>
-            <a:ext cx="298440" cy="403920"/>
+            <a:ext cx="298080" cy="403560"/>
           </a:xfrm>
           <a:prstGeom prst="downArrow">
             <a:avLst>
@@ -8040,7 +8050,7 @@
         <p:spPr>
           <a:xfrm>
             <a:off x="0" y="0"/>
-            <a:ext cx="12188880" cy="6854760"/>
+            <a:ext cx="12188520" cy="6854400"/>
           </a:xfrm>
           <a:prstGeom prst="rect">
             <a:avLst/>
@@ -8093,7 +8103,7 @@
         <p:spPr>
           <a:xfrm>
             <a:off x="640440" y="685800"/>
-            <a:ext cx="4815360" cy="4600440"/>
+            <a:ext cx="4815000" cy="4600080"/>
           </a:xfrm>
           <a:prstGeom prst="rect">
             <a:avLst/>
@@ -8144,7 +8154,7 @@
         <p:spPr>
           <a:xfrm>
             <a:off x="6095880" y="0"/>
-            <a:ext cx="6092640" cy="6854760"/>
+            <a:ext cx="6092280" cy="6854400"/>
           </a:xfrm>
           <a:prstGeom prst="rect">
             <a:avLst/>
@@ -8182,7 +8192,7 @@
         <p:spPr>
           <a:xfrm>
             <a:off x="6625800" y="685800"/>
-            <a:ext cx="4875840" cy="4600440"/>
+            <a:ext cx="4875480" cy="4600080"/>
           </a:xfrm>
           <a:prstGeom prst="rect">
             <a:avLst/>
@@ -8203,7 +8213,7 @@
             <a:normAutofit/>
           </a:bodyPr>
           <a:p>
-            <a:pPr marL="285840" indent="-282600">
+            <a:pPr marL="285840" indent="-282240">
               <a:lnSpc>
                 <a:spcPct val="100000"/>
               </a:lnSpc>
@@ -8235,7 +8245,7 @@
             </a:endParaRPr>
           </a:p>
           <a:p>
-            <a:pPr marL="285840" indent="-282600">
+            <a:pPr marL="285840" indent="-282240">
               <a:lnSpc>
                 <a:spcPct val="100000"/>
               </a:lnSpc>
@@ -8267,7 +8277,7 @@
             </a:endParaRPr>
           </a:p>
           <a:p>
-            <a:pPr marL="285840" indent="-282600">
+            <a:pPr marL="285840" indent="-282240">
               <a:lnSpc>
                 <a:spcPct val="100000"/>
               </a:lnSpc>
@@ -8299,7 +8309,7 @@
             </a:endParaRPr>
           </a:p>
           <a:p>
-            <a:pPr marL="285840" indent="-282600">
+            <a:pPr marL="285840" indent="-282240">
               <a:lnSpc>
                 <a:spcPct val="100000"/>
               </a:lnSpc>
@@ -8331,7 +8341,7 @@
             </a:endParaRPr>
           </a:p>
           <a:p>
-            <a:pPr marL="285840" indent="-282600">
+            <a:pPr marL="285840" indent="-282240">
               <a:lnSpc>
                 <a:spcPct val="100000"/>
               </a:lnSpc>
@@ -8395,7 +8405,7 @@
         <p:spPr>
           <a:xfrm>
             <a:off x="684360" y="4487400"/>
-            <a:ext cx="8531280" cy="1503720"/>
+            <a:ext cx="8530920" cy="1503360"/>
           </a:xfrm>
           <a:prstGeom prst="rect">
             <a:avLst/>
@@ -8444,7 +8454,7 @@
         <p:spPr>
           <a:xfrm>
             <a:off x="684360" y="685800"/>
-            <a:ext cx="8531280" cy="3611880"/>
+            <a:ext cx="8530920" cy="3611520"/>
           </a:xfrm>
           <a:prstGeom prst="rect">
             <a:avLst/>
@@ -8463,7 +8473,7 @@
         <p:txBody>
           <a:bodyPr lIns="90000" rIns="90000" tIns="45000" bIns="45000" anchor="ctr"/>
           <a:p>
-            <a:pPr marL="285840" indent="-282600">
+            <a:pPr marL="285840" indent="-282240">
               <a:lnSpc>
                 <a:spcPct val="100000"/>
               </a:lnSpc>
@@ -8495,7 +8505,7 @@
             </a:endParaRPr>
           </a:p>
           <a:p>
-            <a:pPr marL="285840" indent="-282600">
+            <a:pPr marL="285840" indent="-282240">
               <a:lnSpc>
                 <a:spcPct val="100000"/>
               </a:lnSpc>
@@ -8605,7 +8615,7 @@
         <p:spPr>
           <a:xfrm>
             <a:off x="6995520" y="1949760"/>
-            <a:ext cx="851400" cy="851400"/>
+            <a:ext cx="851040" cy="851040"/>
           </a:xfrm>
           <a:prstGeom prst="rect">
             <a:avLst/>
@@ -8628,7 +8638,7 @@
         <p:spPr>
           <a:xfrm>
             <a:off x="6829560" y="4303080"/>
-            <a:ext cx="1177920" cy="470160"/>
+            <a:ext cx="1177560" cy="469800"/>
           </a:xfrm>
           <a:prstGeom prst="rect">
             <a:avLst/>
@@ -8651,7 +8661,7 @@
         <p:spPr>
           <a:xfrm>
             <a:off x="6951960" y="2903040"/>
-            <a:ext cx="894960" cy="1037160"/>
+            <a:ext cx="894600" cy="1036800"/>
           </a:xfrm>
           <a:prstGeom prst="rect">
             <a:avLst/>
@@ -8674,7 +8684,7 @@
         <p:spPr>
           <a:xfrm>
             <a:off x="2616120" y="2071080"/>
-            <a:ext cx="911160" cy="911160"/>
+            <a:ext cx="910800" cy="910800"/>
           </a:xfrm>
           <a:prstGeom prst="rect">
             <a:avLst/>
@@ -8697,7 +8707,7 @@
         <p:spPr>
           <a:xfrm>
             <a:off x="2637000" y="3377160"/>
-            <a:ext cx="911160" cy="911160"/>
+            <a:ext cx="910800" cy="910800"/>
           </a:xfrm>
           <a:prstGeom prst="rect">
             <a:avLst/>
@@ -8715,8 +8725,8 @@
         </p:nvSpPr>
         <p:spPr>
           <a:xfrm rot="1192200">
-            <a:off x="3944160" y="2677680"/>
-            <a:ext cx="975240" cy="481320"/>
+            <a:off x="3944160" y="2677320"/>
+            <a:ext cx="974880" cy="480960"/>
           </a:xfrm>
           <a:prstGeom prst="rightArrow">
             <a:avLst>
@@ -8757,8 +8767,8 @@
         </p:nvSpPr>
         <p:spPr>
           <a:xfrm rot="20407800">
-            <a:off x="3923280" y="3465360"/>
-            <a:ext cx="975240" cy="481320"/>
+            <a:off x="3922920" y="3465360"/>
+            <a:ext cx="974880" cy="480960"/>
           </a:xfrm>
           <a:prstGeom prst="rightArrow">
             <a:avLst>
@@ -8799,8 +8809,8 @@
         </p:nvSpPr>
         <p:spPr>
           <a:xfrm rot="1192200">
-            <a:off x="5698080" y="3786120"/>
-            <a:ext cx="975240" cy="481320"/>
+            <a:off x="5698080" y="3785760"/>
+            <a:ext cx="974880" cy="480960"/>
           </a:xfrm>
           <a:prstGeom prst="rightArrow">
             <a:avLst>
@@ -8841,8 +8851,8 @@
         </p:nvSpPr>
         <p:spPr>
           <a:xfrm rot="20407800">
-            <a:off x="5771520" y="2460960"/>
-            <a:ext cx="975240" cy="481320"/>
+            <a:off x="5771160" y="2460960"/>
+            <a:ext cx="974880" cy="480960"/>
           </a:xfrm>
           <a:prstGeom prst="rightArrow">
             <a:avLst>
@@ -8884,7 +8894,7 @@
         <p:spPr>
           <a:xfrm>
             <a:off x="5849640" y="3121560"/>
-            <a:ext cx="975240" cy="481320"/>
+            <a:ext cx="974880" cy="480960"/>
           </a:xfrm>
           <a:prstGeom prst="rightArrow">
             <a:avLst>
@@ -8930,7 +8940,7 @@
         <p:spPr>
           <a:xfrm>
             <a:off x="4950720" y="2998800"/>
-            <a:ext cx="753480" cy="753480"/>
+            <a:ext cx="753120" cy="753120"/>
           </a:xfrm>
           <a:prstGeom prst="rect">
             <a:avLst/>
@@ -8971,7 +8981,7 @@
         <p:spPr>
           <a:xfrm>
             <a:off x="684360" y="4487400"/>
-            <a:ext cx="8531280" cy="1503720"/>
+            <a:ext cx="8530920" cy="1503360"/>
           </a:xfrm>
           <a:prstGeom prst="rect">
             <a:avLst/>
@@ -9020,7 +9030,7 @@
         <p:spPr>
           <a:xfrm>
             <a:off x="684360" y="685800"/>
-            <a:ext cx="8531280" cy="3611880"/>
+            <a:ext cx="8530920" cy="3611520"/>
           </a:xfrm>
           <a:prstGeom prst="rect">
             <a:avLst/>
@@ -9039,7 +9049,7 @@
         <p:txBody>
           <a:bodyPr lIns="90000" rIns="90000" tIns="45000" bIns="45000" anchor="ctr"/>
           <a:p>
-            <a:pPr marL="285840" indent="-282600">
+            <a:pPr marL="285840" indent="-282240">
               <a:lnSpc>
                 <a:spcPct val="100000"/>
               </a:lnSpc>
@@ -9165,7 +9175,7 @@
             </a:endParaRPr>
           </a:p>
           <a:p>
-            <a:pPr marL="285840" indent="-282600">
+            <a:pPr marL="285840" indent="-282240">
               <a:lnSpc>
                 <a:spcPct val="100000"/>
               </a:lnSpc>
@@ -9257,7 +9267,7 @@
         <p:spPr>
           <a:xfrm>
             <a:off x="3562560" y="1395720"/>
-            <a:ext cx="911160" cy="911160"/>
+            <a:ext cx="910800" cy="910800"/>
           </a:xfrm>
           <a:prstGeom prst="rect">
             <a:avLst/>
@@ -9280,7 +9290,7 @@
         <p:spPr>
           <a:xfrm>
             <a:off x="6678360" y="1395720"/>
-            <a:ext cx="911160" cy="911160"/>
+            <a:ext cx="910800" cy="910800"/>
           </a:xfrm>
           <a:prstGeom prst="rect">
             <a:avLst/>
@@ -9303,7 +9313,7 @@
         <p:spPr>
           <a:xfrm>
             <a:off x="7042320" y="3904200"/>
-            <a:ext cx="911160" cy="911160"/>
+            <a:ext cx="910800" cy="910800"/>
           </a:xfrm>
           <a:prstGeom prst="rect">
             <a:avLst/>
@@ -9326,7 +9336,7 @@
         <p:spPr>
           <a:xfrm>
             <a:off x="3562560" y="3904200"/>
-            <a:ext cx="911160" cy="911160"/>
+            <a:ext cx="910800" cy="910800"/>
           </a:xfrm>
           <a:prstGeom prst="rect">
             <a:avLst/>
@@ -9349,7 +9359,7 @@
         <p:spPr>
           <a:xfrm>
             <a:off x="6678360" y="1395720"/>
-            <a:ext cx="911160" cy="911160"/>
+            <a:ext cx="910800" cy="910800"/>
           </a:xfrm>
           <a:prstGeom prst="rect">
             <a:avLst/>
@@ -9372,7 +9382,7 @@
         <p:spPr>
           <a:xfrm>
             <a:off x="4113000" y="2039400"/>
-            <a:ext cx="911160" cy="911160"/>
+            <a:ext cx="910800" cy="910800"/>
           </a:xfrm>
           <a:prstGeom prst="rect">
             <a:avLst/>
@@ -9395,7 +9405,7 @@
         <p:spPr>
           <a:xfrm>
             <a:off x="7296480" y="2133000"/>
-            <a:ext cx="911160" cy="911160"/>
+            <a:ext cx="910800" cy="910800"/>
           </a:xfrm>
           <a:prstGeom prst="rect">
             <a:avLst/>
@@ -9414,7 +9424,7 @@
         <p:spPr>
           <a:xfrm>
             <a:off x="5285160" y="1920960"/>
-            <a:ext cx="1179720" cy="542160"/>
+            <a:ext cx="1179360" cy="541800"/>
           </a:xfrm>
           <a:prstGeom prst="rightArrow">
             <a:avLst>
@@ -9456,7 +9466,7 @@
         <p:spPr>
           <a:xfrm>
             <a:off x="5149440" y="4088880"/>
-            <a:ext cx="1179720" cy="542160"/>
+            <a:ext cx="1179360" cy="541800"/>
           </a:xfrm>
           <a:prstGeom prst="rightArrow">
             <a:avLst>
@@ -9521,7 +9531,7 @@
         <p:spPr>
           <a:xfrm>
             <a:off x="4895280" y="2388600"/>
-            <a:ext cx="2704680" cy="361800"/>
+            <a:ext cx="2704320" cy="361440"/>
           </a:xfrm>
           <a:prstGeom prst="rect">
             <a:avLst/>
@@ -9570,7 +9580,7 @@
         <p:spPr>
           <a:xfrm>
             <a:off x="5027400" y="4575240"/>
-            <a:ext cx="2324520" cy="361800"/>
+            <a:ext cx="2324160" cy="361440"/>
           </a:xfrm>
           <a:prstGeom prst="rect">
             <a:avLst/>
@@ -9641,7 +9651,7 @@
         <p:spPr>
           <a:xfrm>
             <a:off x="684360" y="4487400"/>
-            <a:ext cx="8531280" cy="1503720"/>
+            <a:ext cx="8530920" cy="1503360"/>
           </a:xfrm>
           <a:prstGeom prst="rect">
             <a:avLst/>
@@ -9690,7 +9700,7 @@
         <p:spPr>
           <a:xfrm>
             <a:off x="684360" y="685800"/>
-            <a:ext cx="8531280" cy="3611880"/>
+            <a:ext cx="8530920" cy="3611520"/>
           </a:xfrm>
           <a:prstGeom prst="rect">
             <a:avLst/>
@@ -9709,7 +9719,7 @@
         <p:txBody>
           <a:bodyPr lIns="90000" rIns="90000" tIns="45000" bIns="45000" anchor="ctr"/>
           <a:p>
-            <a:pPr marL="285840" indent="-282600">
+            <a:pPr marL="285840" indent="-282240">
               <a:lnSpc>
                 <a:spcPct val="100000"/>
               </a:lnSpc>
@@ -9831,7 +9841,7 @@
         <p:spPr>
           <a:xfrm>
             <a:off x="1863000" y="3157920"/>
-            <a:ext cx="911160" cy="911160"/>
+            <a:ext cx="910800" cy="910800"/>
           </a:xfrm>
           <a:prstGeom prst="rect">
             <a:avLst/>
@@ -9854,7 +9864,7 @@
         <p:spPr>
           <a:xfrm>
             <a:off x="2413440" y="3801600"/>
-            <a:ext cx="911160" cy="911160"/>
+            <a:ext cx="910800" cy="910800"/>
           </a:xfrm>
           <a:prstGeom prst="rect">
             <a:avLst/>
@@ -9877,7 +9887,7 @@
         <p:spPr>
           <a:xfrm>
             <a:off x="7197480" y="3439800"/>
-            <a:ext cx="911160" cy="911160"/>
+            <a:ext cx="910800" cy="910800"/>
           </a:xfrm>
           <a:prstGeom prst="rect">
             <a:avLst/>
@@ -9900,7 +9910,7 @@
         <p:spPr>
           <a:xfrm>
             <a:off x="4758840" y="3366360"/>
-            <a:ext cx="911160" cy="911160"/>
+            <a:ext cx="910800" cy="910800"/>
           </a:xfrm>
           <a:prstGeom prst="rect">
             <a:avLst/>
@@ -9919,7 +9929,7 @@
         <p:spPr>
           <a:xfrm>
             <a:off x="3568680" y="3429000"/>
-            <a:ext cx="934200" cy="911160"/>
+            <a:ext cx="933840" cy="910800"/>
           </a:xfrm>
           <a:prstGeom prst="mathPlus">
             <a:avLst>
@@ -9957,7 +9967,7 @@
         <p:spPr>
           <a:xfrm>
             <a:off x="6095880" y="3654360"/>
-            <a:ext cx="735120" cy="563040"/>
+            <a:ext cx="734760" cy="562680"/>
           </a:xfrm>
           <a:prstGeom prst="mathEqual">
             <a:avLst>
@@ -10018,7 +10028,7 @@
         <p:spPr>
           <a:xfrm>
             <a:off x="4750920" y="2898360"/>
-            <a:ext cx="2686680" cy="3716640"/>
+            <a:ext cx="2686320" cy="3716280"/>
           </a:xfrm>
           <a:prstGeom prst="rect">
             <a:avLst/>
@@ -10061,7 +10071,7 @@
         <p:spPr>
           <a:xfrm>
             <a:off x="684360" y="4487400"/>
-            <a:ext cx="8531280" cy="1503720"/>
+            <a:ext cx="8530920" cy="1503360"/>
           </a:xfrm>
           <a:prstGeom prst="rect">
             <a:avLst/>
@@ -10110,7 +10120,7 @@
         <p:spPr>
           <a:xfrm>
             <a:off x="684360" y="685800"/>
-            <a:ext cx="8531280" cy="3611880"/>
+            <a:ext cx="8530920" cy="3611520"/>
           </a:xfrm>
           <a:prstGeom prst="rect">
             <a:avLst/>
@@ -10129,7 +10139,7 @@
         <p:txBody>
           <a:bodyPr lIns="90000" rIns="90000" tIns="45000" bIns="45000" anchor="ctr"/>
           <a:p>
-            <a:pPr marL="285840" indent="-282600">
+            <a:pPr marL="285840" indent="-282240">
               <a:lnSpc>
                 <a:spcPct val="100000"/>
               </a:lnSpc>
@@ -10265,7 +10275,7 @@
         <p:spPr>
           <a:xfrm>
             <a:off x="4843440" y="2989800"/>
-            <a:ext cx="638640" cy="638640"/>
+            <a:ext cx="638280" cy="638280"/>
           </a:xfrm>
           <a:prstGeom prst="rect">
             <a:avLst/>
@@ -10288,7 +10298,7 @@
         <p:spPr>
           <a:xfrm>
             <a:off x="5028120" y="4248360"/>
-            <a:ext cx="911160" cy="911160"/>
+            <a:ext cx="910800" cy="910800"/>
           </a:xfrm>
           <a:prstGeom prst="rect">
             <a:avLst/>
@@ -10311,7 +10321,7 @@
         <p:spPr>
           <a:xfrm>
             <a:off x="5506200" y="5025240"/>
-            <a:ext cx="911160" cy="911160"/>
+            <a:ext cx="910800" cy="910800"/>
           </a:xfrm>
           <a:prstGeom prst="rect">
             <a:avLst/>
@@ -10334,7 +10344,7 @@
         <p:spPr>
           <a:xfrm>
             <a:off x="6042600" y="4248360"/>
-            <a:ext cx="911160" cy="911160"/>
+            <a:ext cx="910800" cy="910800"/>
           </a:xfrm>
           <a:prstGeom prst="rect">
             <a:avLst/>
@@ -10357,7 +10367,7 @@
         <p:spPr>
           <a:xfrm>
             <a:off x="7944480" y="2602440"/>
-            <a:ext cx="911160" cy="911160"/>
+            <a:ext cx="910800" cy="910800"/>
           </a:xfrm>
           <a:prstGeom prst="rect">
             <a:avLst/>
@@ -10380,7 +10390,7 @@
         <p:spPr>
           <a:xfrm>
             <a:off x="6671160" y="3059640"/>
-            <a:ext cx="568440" cy="568440"/>
+            <a:ext cx="568080" cy="568080"/>
           </a:xfrm>
           <a:prstGeom prst="rect">
             <a:avLst/>
@@ -10403,7 +10413,7 @@
         <p:spPr>
           <a:xfrm>
             <a:off x="2973240" y="3863520"/>
-            <a:ext cx="911160" cy="911160"/>
+            <a:ext cx="910800" cy="910800"/>
           </a:xfrm>
           <a:prstGeom prst="rect">
             <a:avLst/>
@@ -10422,7 +10432,7 @@
         <p:spPr>
           <a:xfrm>
             <a:off x="4012560" y="4487400"/>
-            <a:ext cx="1490400" cy="853920"/>
+            <a:ext cx="1490040" cy="853560"/>
           </a:xfrm>
           <a:custGeom>
             <a:avLst/>
@@ -10474,7 +10484,7 @@
         <p:spPr>
           <a:xfrm>
             <a:off x="4012560" y="4248360"/>
-            <a:ext cx="2026800" cy="235800"/>
+            <a:ext cx="2026440" cy="235440"/>
           </a:xfrm>
           <a:custGeom>
             <a:avLst/>
@@ -10526,7 +10536,7 @@
         <p:spPr>
           <a:xfrm>
             <a:off x="4012560" y="4367880"/>
-            <a:ext cx="935640" cy="236520"/>
+            <a:ext cx="935280" cy="236160"/>
           </a:xfrm>
           <a:custGeom>
             <a:avLst/>
@@ -10578,7 +10588,7 @@
         <p:spPr>
           <a:xfrm flipV="1">
             <a:off x="7242840" y="3219120"/>
-            <a:ext cx="626400" cy="119880"/>
+            <a:ext cx="626040" cy="119520"/>
           </a:xfrm>
           <a:custGeom>
             <a:avLst/>
@@ -10653,7 +10663,7 @@
         <p:spPr>
           <a:xfrm>
             <a:off x="684360" y="4487400"/>
-            <a:ext cx="8531280" cy="1503720"/>
+            <a:ext cx="8530920" cy="1503360"/>
           </a:xfrm>
           <a:prstGeom prst="rect">
             <a:avLst/>
@@ -10702,7 +10712,7 @@
         <p:spPr>
           <a:xfrm>
             <a:off x="684360" y="685800"/>
-            <a:ext cx="8531280" cy="3611880"/>
+            <a:ext cx="8530920" cy="3611520"/>
           </a:xfrm>
           <a:prstGeom prst="rect">
             <a:avLst/>
@@ -10721,7 +10731,7 @@
         <p:txBody>
           <a:bodyPr lIns="90000" rIns="90000" tIns="45000" bIns="45000" anchor="ctr"/>
           <a:p>
-            <a:pPr marL="285840" indent="-282600">
+            <a:pPr marL="285840" indent="-282240">
               <a:lnSpc>
                 <a:spcPct val="100000"/>
               </a:lnSpc>
@@ -10889,7 +10899,7 @@
         <p:spPr>
           <a:xfrm>
             <a:off x="5430600" y="2730600"/>
-            <a:ext cx="2686680" cy="3716640"/>
+            <a:ext cx="2686320" cy="3716280"/>
           </a:xfrm>
           <a:prstGeom prst="rect">
             <a:avLst/>
@@ -10936,7 +10946,7 @@
         <p:spPr>
           <a:xfrm>
             <a:off x="5523120" y="2822040"/>
-            <a:ext cx="638640" cy="638640"/>
+            <a:ext cx="638280" cy="638280"/>
           </a:xfrm>
           <a:prstGeom prst="rect">
             <a:avLst/>
@@ -10959,7 +10969,7 @@
         <p:spPr>
           <a:xfrm>
             <a:off x="5707800" y="4080600"/>
-            <a:ext cx="911160" cy="911160"/>
+            <a:ext cx="910800" cy="910800"/>
           </a:xfrm>
           <a:prstGeom prst="rect">
             <a:avLst/>
@@ -10982,7 +10992,7 @@
         <p:spPr>
           <a:xfrm>
             <a:off x="6185880" y="4857480"/>
-            <a:ext cx="911160" cy="911160"/>
+            <a:ext cx="910800" cy="910800"/>
           </a:xfrm>
           <a:prstGeom prst="rect">
             <a:avLst/>
@@ -11005,7 +11015,7 @@
         <p:spPr>
           <a:xfrm>
             <a:off x="6722280" y="4080600"/>
-            <a:ext cx="911160" cy="911160"/>
+            <a:ext cx="910800" cy="910800"/>
           </a:xfrm>
           <a:prstGeom prst="rect">
             <a:avLst/>
@@ -11028,7 +11038,7 @@
         <p:spPr>
           <a:xfrm>
             <a:off x="3652920" y="3695760"/>
-            <a:ext cx="911160" cy="911160"/>
+            <a:ext cx="910800" cy="910800"/>
           </a:xfrm>
           <a:prstGeom prst="rect">
             <a:avLst/>
@@ -11047,7 +11057,7 @@
         <p:spPr>
           <a:xfrm>
             <a:off x="4692240" y="4319640"/>
-            <a:ext cx="1490400" cy="853920"/>
+            <a:ext cx="1490040" cy="853560"/>
           </a:xfrm>
           <a:custGeom>
             <a:avLst/>
@@ -11099,7 +11109,7 @@
         <p:spPr>
           <a:xfrm>
             <a:off x="4692240" y="4080600"/>
-            <a:ext cx="2026800" cy="235800"/>
+            <a:ext cx="2026440" cy="235440"/>
           </a:xfrm>
           <a:custGeom>
             <a:avLst/>
@@ -11151,7 +11161,7 @@
         <p:spPr>
           <a:xfrm>
             <a:off x="4692240" y="4200120"/>
-            <a:ext cx="935640" cy="236520"/>
+            <a:ext cx="935280" cy="236160"/>
           </a:xfrm>
           <a:custGeom>
             <a:avLst/>
@@ -11207,7 +11217,7 @@
         <p:spPr>
           <a:xfrm>
             <a:off x="9653760" y="3605400"/>
-            <a:ext cx="911160" cy="911160"/>
+            <a:ext cx="910800" cy="910800"/>
           </a:xfrm>
           <a:prstGeom prst="rect">
             <a:avLst/>
@@ -11225,8 +11235,8 @@
         </p:nvSpPr>
         <p:spPr>
           <a:xfrm rot="10325400">
-            <a:off x="7857360" y="4106880"/>
-            <a:ext cx="1782720" cy="304560"/>
+            <a:off x="7857720" y="4106880"/>
+            <a:ext cx="1782360" cy="304200"/>
           </a:xfrm>
           <a:prstGeom prst="rightArrow">
             <a:avLst>
@@ -11290,7 +11300,7 @@
         <p:spPr>
           <a:xfrm>
             <a:off x="684360" y="4487400"/>
-            <a:ext cx="8531280" cy="1503720"/>
+            <a:ext cx="8530920" cy="1503360"/>
           </a:xfrm>
           <a:prstGeom prst="rect">
             <a:avLst/>
@@ -11339,7 +11349,7 @@
         <p:spPr>
           <a:xfrm>
             <a:off x="684360" y="685800"/>
-            <a:ext cx="8531280" cy="3611880"/>
+            <a:ext cx="8530920" cy="3611520"/>
           </a:xfrm>
           <a:prstGeom prst="rect">
             <a:avLst/>
@@ -11369,7 +11379,7 @@
         <p:spPr>
           <a:xfrm>
             <a:off x="4069440" y="82800"/>
-            <a:ext cx="4043160" cy="2843640"/>
+            <a:ext cx="4042800" cy="2843280"/>
           </a:xfrm>
           <a:prstGeom prst="rect">
             <a:avLst/>
@@ -11392,7 +11402,7 @@
         <p:spPr>
           <a:xfrm>
             <a:off x="83880" y="3103560"/>
-            <a:ext cx="3864240" cy="1641240"/>
+            <a:ext cx="3863880" cy="1640880"/>
           </a:xfrm>
           <a:prstGeom prst="rect">
             <a:avLst/>
@@ -11415,7 +11425,7 @@
         <p:spPr>
           <a:xfrm>
             <a:off x="4161600" y="3103560"/>
-            <a:ext cx="3864240" cy="1641240"/>
+            <a:ext cx="3863880" cy="1640880"/>
           </a:xfrm>
           <a:prstGeom prst="rect">
             <a:avLst/>
@@ -11438,7 +11448,7 @@
         <p:spPr>
           <a:xfrm>
             <a:off x="8230320" y="3103560"/>
-            <a:ext cx="3864240" cy="1641240"/>
+            <a:ext cx="3863880" cy="1640880"/>
           </a:xfrm>
           <a:prstGeom prst="rect">
             <a:avLst/>
@@ -11457,7 +11467,7 @@
         <p:spPr>
           <a:xfrm>
             <a:off x="3993840" y="3766680"/>
-            <a:ext cx="147960" cy="316080"/>
+            <a:ext cx="147600" cy="315720"/>
           </a:xfrm>
           <a:prstGeom prst="rightArrow">
             <a:avLst>
@@ -11496,7 +11506,7 @@
         <p:spPr>
           <a:xfrm>
             <a:off x="8073360" y="3793320"/>
-            <a:ext cx="128880" cy="316080"/>
+            <a:ext cx="128520" cy="315720"/>
           </a:xfrm>
           <a:prstGeom prst="rightArrow">
             <a:avLst>
@@ -11535,7 +11545,7 @@
         <p:spPr>
           <a:xfrm>
             <a:off x="2701080" y="5176080"/>
-            <a:ext cx="1833840" cy="919440"/>
+            <a:ext cx="1833480" cy="919080"/>
           </a:xfrm>
           <a:prstGeom prst="wedgeRectCallout">
             <a:avLst>
@@ -11600,7 +11610,7 @@
         <p:spPr>
           <a:xfrm>
             <a:off x="6722640" y="5196600"/>
-            <a:ext cx="1965240" cy="822600"/>
+            <a:ext cx="1964880" cy="822240"/>
           </a:xfrm>
           <a:prstGeom prst="wedgeRectCallout">
             <a:avLst>
@@ -11665,7 +11675,7 @@
         <p:spPr>
           <a:xfrm>
             <a:off x="9731160" y="5131440"/>
-            <a:ext cx="2102400" cy="653400"/>
+            <a:ext cx="2102040" cy="653040"/>
           </a:xfrm>
           <a:prstGeom prst="wedgeRectCallout">
             <a:avLst>
@@ -11730,7 +11740,7 @@
         <p:spPr>
           <a:xfrm>
             <a:off x="5033520" y="2516760"/>
-            <a:ext cx="2572200" cy="361800"/>
+            <a:ext cx="2571840" cy="361440"/>
           </a:xfrm>
           <a:prstGeom prst="rect">
             <a:avLst/>
@@ -11778,8 +11788,8 @@
         </p:nvSpPr>
         <p:spPr>
           <a:xfrm rot="16200000">
-            <a:off x="3177360" y="1268280"/>
-            <a:ext cx="1961280" cy="361800"/>
+            <a:off x="3177360" y="1268640"/>
+            <a:ext cx="1960920" cy="361440"/>
           </a:xfrm>
           <a:prstGeom prst="rect">
             <a:avLst/>
@@ -11850,7 +11860,7 @@
         <p:spPr>
           <a:xfrm>
             <a:off x="684360" y="4487400"/>
-            <a:ext cx="8531280" cy="1503720"/>
+            <a:ext cx="8530920" cy="1503360"/>
           </a:xfrm>
           <a:prstGeom prst="rect">
             <a:avLst/>
@@ -11901,9 +11911,9 @@
         <p:grpSpPr>
           <a:xfrm>
             <a:off x="948240" y="823320"/>
-            <a:ext cx="10289160" cy="3336480"/>
+            <a:ext cx="10288800" cy="3336120"/>
             <a:chOff x="948240" y="823320"/>
-            <a:chExt cx="10289160" cy="3336480"/>
+            <a:chExt cx="10288800" cy="3336120"/>
           </a:xfrm>
         </p:grpSpPr>
         <p:sp>
@@ -11915,7 +11925,7 @@
           <p:spPr>
             <a:xfrm>
               <a:off x="948240" y="823320"/>
-              <a:ext cx="1359360" cy="1359360"/>
+              <a:ext cx="1359000" cy="1359000"/>
             </a:xfrm>
             <a:prstGeom prst="ellipse">
               <a:avLst/>
@@ -11948,7 +11958,7 @@
           <p:spPr>
             <a:xfrm>
               <a:off x="1234440" y="1109520"/>
-              <a:ext cx="786960" cy="786960"/>
+              <a:ext cx="786600" cy="786600"/>
             </a:xfrm>
             <a:prstGeom prst="rect">
               <a:avLst/>
@@ -11979,7 +11989,7 @@
           <p:spPr>
             <a:xfrm>
               <a:off x="2602800" y="823320"/>
-              <a:ext cx="3208680" cy="1359360"/>
+              <a:ext cx="3208320" cy="1359000"/>
             </a:xfrm>
             <a:prstGeom prst="rect">
               <a:avLst/>
@@ -12031,7 +12041,7 @@
           <p:spPr>
             <a:xfrm>
               <a:off x="6374160" y="823320"/>
-              <a:ext cx="1359360" cy="1359360"/>
+              <a:ext cx="1359000" cy="1359000"/>
             </a:xfrm>
             <a:prstGeom prst="ellipse">
               <a:avLst/>
@@ -12064,7 +12074,7 @@
           <p:spPr>
             <a:xfrm>
               <a:off x="6660360" y="1109520"/>
-              <a:ext cx="786960" cy="786960"/>
+              <a:ext cx="786600" cy="786600"/>
             </a:xfrm>
             <a:prstGeom prst="rect">
               <a:avLst/>
@@ -12095,7 +12105,7 @@
           <p:spPr>
             <a:xfrm>
               <a:off x="8028720" y="823320"/>
-              <a:ext cx="3208680" cy="1359360"/>
+              <a:ext cx="3208320" cy="1359000"/>
             </a:xfrm>
             <a:prstGeom prst="rect">
               <a:avLst/>
@@ -12147,7 +12157,7 @@
           <p:spPr>
             <a:xfrm>
               <a:off x="948240" y="2800440"/>
-              <a:ext cx="1359360" cy="1359360"/>
+              <a:ext cx="1359000" cy="1359000"/>
             </a:xfrm>
             <a:prstGeom prst="ellipse">
               <a:avLst/>
@@ -12180,7 +12190,7 @@
           <p:spPr>
             <a:xfrm>
               <a:off x="1234440" y="3086640"/>
-              <a:ext cx="786960" cy="786960"/>
+              <a:ext cx="786600" cy="786600"/>
             </a:xfrm>
             <a:prstGeom prst="rect">
               <a:avLst/>
@@ -12211,7 +12221,7 @@
           <p:spPr>
             <a:xfrm>
               <a:off x="2602800" y="2800440"/>
-              <a:ext cx="3208680" cy="1359360"/>
+              <a:ext cx="3208320" cy="1359000"/>
             </a:xfrm>
             <a:prstGeom prst="rect">
               <a:avLst/>
@@ -12263,7 +12273,7 @@
           <p:spPr>
             <a:xfrm>
               <a:off x="6374160" y="2800440"/>
-              <a:ext cx="1359360" cy="1359360"/>
+              <a:ext cx="1359000" cy="1359000"/>
             </a:xfrm>
             <a:prstGeom prst="ellipse">
               <a:avLst/>
@@ -12296,7 +12306,7 @@
           <p:spPr>
             <a:xfrm>
               <a:off x="6660360" y="3086640"/>
-              <a:ext cx="786960" cy="786960"/>
+              <a:ext cx="786600" cy="786600"/>
             </a:xfrm>
             <a:prstGeom prst="rect">
               <a:avLst/>
@@ -12327,7 +12337,7 @@
           <p:spPr>
             <a:xfrm>
               <a:off x="8028720" y="2800440"/>
-              <a:ext cx="3208680" cy="1359360"/>
+              <a:ext cx="3208320" cy="1359000"/>
             </a:xfrm>
             <a:prstGeom prst="rect">
               <a:avLst/>
@@ -12417,7 +12427,7 @@
         <p:spPr>
           <a:xfrm>
             <a:off x="0" y="0"/>
-            <a:ext cx="12188880" cy="6854760"/>
+            <a:ext cx="12188520" cy="6854400"/>
           </a:xfrm>
           <a:prstGeom prst="rect">
             <a:avLst/>
@@ -12470,7 +12480,7 @@
         <p:spPr>
           <a:xfrm>
             <a:off x="0" y="0"/>
-            <a:ext cx="8126640" cy="6854760"/>
+            <a:ext cx="8126280" cy="6854400"/>
           </a:xfrm>
           <a:prstGeom prst="snip2DiagRect">
             <a:avLst>
@@ -12692,7 +12702,7 @@
         <p:spPr>
           <a:xfrm>
             <a:off x="8588520" y="941400"/>
-            <a:ext cx="3040560" cy="3245400"/>
+            <a:ext cx="3040200" cy="3245040"/>
           </a:xfrm>
           <a:prstGeom prst="rect">
             <a:avLst/>
@@ -12743,9 +12753,9 @@
         <p:grpSpPr>
           <a:xfrm>
             <a:off x="952560" y="2104200"/>
-            <a:ext cx="6163200" cy="2440080"/>
+            <a:ext cx="6162840" cy="2439720"/>
             <a:chOff x="952560" y="2104200"/>
-            <a:chExt cx="6163200" cy="2440080"/>
+            <a:chExt cx="6162840" cy="2439720"/>
           </a:xfrm>
         </p:grpSpPr>
         <p:sp>
@@ -12757,7 +12767,7 @@
           <p:spPr>
             <a:xfrm>
               <a:off x="952560" y="2104200"/>
-              <a:ext cx="813240" cy="813240"/>
+              <a:ext cx="812880" cy="812880"/>
             </a:xfrm>
             <a:prstGeom prst="ellipse">
               <a:avLst/>
@@ -12790,7 +12800,7 @@
           <p:spPr>
             <a:xfrm>
               <a:off x="1123920" y="2275560"/>
-              <a:ext cx="470160" cy="470160"/>
+              <a:ext cx="469800" cy="469800"/>
             </a:xfrm>
             <a:prstGeom prst="rect">
               <a:avLst/>
@@ -12821,7 +12831,7 @@
           <p:spPr>
             <a:xfrm>
               <a:off x="1944000" y="2104200"/>
-              <a:ext cx="1920960" cy="813240"/>
+              <a:ext cx="1920600" cy="812880"/>
             </a:xfrm>
             <a:prstGeom prst="rect">
               <a:avLst/>
@@ -12873,7 +12883,7 @@
           <p:spPr>
             <a:xfrm>
               <a:off x="4203360" y="2104200"/>
-              <a:ext cx="813240" cy="813240"/>
+              <a:ext cx="812880" cy="812880"/>
             </a:xfrm>
             <a:prstGeom prst="ellipse">
               <a:avLst/>
@@ -12906,7 +12916,7 @@
           <p:spPr>
             <a:xfrm>
               <a:off x="4375080" y="2275560"/>
-              <a:ext cx="470160" cy="470160"/>
+              <a:ext cx="469800" cy="469800"/>
             </a:xfrm>
             <a:prstGeom prst="rect">
               <a:avLst/>
@@ -12937,7 +12947,7 @@
           <p:spPr>
             <a:xfrm>
               <a:off x="5194800" y="2104200"/>
-              <a:ext cx="1920960" cy="813240"/>
+              <a:ext cx="1920600" cy="812880"/>
             </a:xfrm>
             <a:prstGeom prst="rect">
               <a:avLst/>
@@ -12989,7 +12999,7 @@
           <p:spPr>
             <a:xfrm>
               <a:off x="952560" y="3731040"/>
-              <a:ext cx="813240" cy="813240"/>
+              <a:ext cx="812880" cy="812880"/>
             </a:xfrm>
             <a:prstGeom prst="ellipse">
               <a:avLst/>
@@ -13022,7 +13032,7 @@
           <p:spPr>
             <a:xfrm>
               <a:off x="1123920" y="3902400"/>
-              <a:ext cx="470160" cy="470160"/>
+              <a:ext cx="469800" cy="469800"/>
             </a:xfrm>
             <a:prstGeom prst="rect">
               <a:avLst/>
@@ -13053,7 +13063,7 @@
           <p:spPr>
             <a:xfrm>
               <a:off x="1944000" y="3731040"/>
-              <a:ext cx="1920960" cy="813240"/>
+              <a:ext cx="1920600" cy="812880"/>
             </a:xfrm>
             <a:prstGeom prst="rect">
               <a:avLst/>
@@ -13105,7 +13115,7 @@
           <p:spPr>
             <a:xfrm>
               <a:off x="4203360" y="3731040"/>
-              <a:ext cx="813240" cy="813240"/>
+              <a:ext cx="812880" cy="812880"/>
             </a:xfrm>
             <a:prstGeom prst="ellipse">
               <a:avLst/>
@@ -13138,7 +13148,7 @@
           <p:spPr>
             <a:xfrm>
               <a:off x="4375080" y="3902400"/>
-              <a:ext cx="470160" cy="470160"/>
+              <a:ext cx="469800" cy="469800"/>
             </a:xfrm>
             <a:prstGeom prst="rect">
               <a:avLst/>
@@ -13169,7 +13179,7 @@
           <p:spPr>
             <a:xfrm>
               <a:off x="5194800" y="3731040"/>
-              <a:ext cx="1920960" cy="813240"/>
+              <a:ext cx="1920600" cy="812880"/>
             </a:xfrm>
             <a:prstGeom prst="rect">
               <a:avLst/>
@@ -13286,7 +13296,7 @@
         <p:spPr>
           <a:xfrm>
             <a:off x="684360" y="4487400"/>
-            <a:ext cx="8531280" cy="1503720"/>
+            <a:ext cx="8530920" cy="1503360"/>
           </a:xfrm>
           <a:prstGeom prst="rect">
             <a:avLst/>
@@ -13335,7 +13345,7 @@
         <p:spPr>
           <a:xfrm>
             <a:off x="684360" y="685800"/>
-            <a:ext cx="8531280" cy="3611880"/>
+            <a:ext cx="8530920" cy="3611520"/>
           </a:xfrm>
           <a:prstGeom prst="rect">
             <a:avLst/>
@@ -13354,7 +13364,7 @@
         <p:txBody>
           <a:bodyPr lIns="90000" rIns="90000" tIns="45000" bIns="45000" anchor="ctr"/>
           <a:p>
-            <a:pPr marL="285840" indent="-282600">
+            <a:pPr marL="285840" indent="-282240">
               <a:lnSpc>
                 <a:spcPct val="100000"/>
               </a:lnSpc>
@@ -13386,7 +13396,7 @@
             </a:endParaRPr>
           </a:p>
           <a:p>
-            <a:pPr marL="285840" indent="-282600">
+            <a:pPr marL="285840" indent="-282240">
               <a:lnSpc>
                 <a:spcPct val="100000"/>
               </a:lnSpc>
@@ -13418,7 +13428,7 @@
             </a:endParaRPr>
           </a:p>
           <a:p>
-            <a:pPr marL="285840" indent="-282600">
+            <a:pPr marL="285840" indent="-282240">
               <a:lnSpc>
                 <a:spcPct val="100000"/>
               </a:lnSpc>
@@ -13450,7 +13460,7 @@
             </a:endParaRPr>
           </a:p>
           <a:p>
-            <a:pPr marL="285840" indent="-282600">
+            <a:pPr marL="285840" indent="-282240">
               <a:lnSpc>
                 <a:spcPct val="100000"/>
               </a:lnSpc>
@@ -13514,7 +13524,7 @@
         <p:spPr>
           <a:xfrm>
             <a:off x="684360" y="4487400"/>
-            <a:ext cx="8531280" cy="1503720"/>
+            <a:ext cx="8530920" cy="1503360"/>
           </a:xfrm>
           <a:prstGeom prst="rect">
             <a:avLst/>
@@ -13567,7 +13577,7 @@
         <p:spPr>
           <a:xfrm>
             <a:off x="5221440" y="75600"/>
-            <a:ext cx="911160" cy="911160"/>
+            <a:ext cx="910800" cy="910800"/>
           </a:xfrm>
           <a:prstGeom prst="rect">
             <a:avLst/>
@@ -13590,7 +13600,7 @@
         <p:spPr>
           <a:xfrm>
             <a:off x="4695120" y="4444560"/>
-            <a:ext cx="911160" cy="911160"/>
+            <a:ext cx="910800" cy="910800"/>
           </a:xfrm>
           <a:prstGeom prst="rect">
             <a:avLst/>
@@ -13613,7 +13623,7 @@
         <p:spPr>
           <a:xfrm>
             <a:off x="2603880" y="2294640"/>
-            <a:ext cx="911160" cy="911160"/>
+            <a:ext cx="910800" cy="910800"/>
           </a:xfrm>
           <a:prstGeom prst="rect">
             <a:avLst/>
@@ -13636,7 +13646,7 @@
         <p:spPr>
           <a:xfrm>
             <a:off x="9767160" y="3294360"/>
-            <a:ext cx="911160" cy="911160"/>
+            <a:ext cx="910800" cy="910800"/>
           </a:xfrm>
           <a:prstGeom prst="rect">
             <a:avLst/>
@@ -13659,7 +13669,7 @@
         <p:spPr>
           <a:xfrm>
             <a:off x="1967760" y="3811680"/>
-            <a:ext cx="911160" cy="911160"/>
+            <a:ext cx="910800" cy="910800"/>
           </a:xfrm>
           <a:prstGeom prst="rect">
             <a:avLst/>
@@ -13682,7 +13692,7 @@
         <p:spPr>
           <a:xfrm>
             <a:off x="5221440" y="2907360"/>
-            <a:ext cx="911160" cy="911160"/>
+            <a:ext cx="910800" cy="910800"/>
           </a:xfrm>
           <a:prstGeom prst="rect">
             <a:avLst/>
@@ -13705,7 +13715,7 @@
         <p:spPr>
           <a:xfrm>
             <a:off x="1093680" y="3282480"/>
-            <a:ext cx="911160" cy="911160"/>
+            <a:ext cx="910800" cy="910800"/>
           </a:xfrm>
           <a:prstGeom prst="rect">
             <a:avLst/>
@@ -13728,7 +13738,7 @@
         <p:spPr>
           <a:xfrm>
             <a:off x="8595360" y="3808800"/>
-            <a:ext cx="911160" cy="911160"/>
+            <a:ext cx="910800" cy="910800"/>
           </a:xfrm>
           <a:prstGeom prst="rect">
             <a:avLst/>
@@ -13751,7 +13761,7 @@
         <p:spPr>
           <a:xfrm>
             <a:off x="7839000" y="2294640"/>
-            <a:ext cx="911160" cy="911160"/>
+            <a:ext cx="910800" cy="910800"/>
           </a:xfrm>
           <a:prstGeom prst="rect">
             <a:avLst/>
@@ -13770,7 +13780,7 @@
         <p:spPr>
           <a:xfrm>
             <a:off x="6312960" y="944640"/>
-            <a:ext cx="1523160" cy="1337040"/>
+            <a:ext cx="1522800" cy="1336680"/>
           </a:xfrm>
           <a:custGeom>
             <a:avLst/>
@@ -13823,7 +13833,7 @@
         <p:spPr>
           <a:xfrm>
             <a:off x="5678640" y="1145160"/>
-            <a:ext cx="360" cy="1603440"/>
+            <a:ext cx="360" cy="1603080"/>
           </a:xfrm>
           <a:custGeom>
             <a:avLst/>
@@ -13876,7 +13886,7 @@
         <p:spPr>
           <a:xfrm flipH="1">
             <a:off x="3423240" y="990000"/>
-            <a:ext cx="1614600" cy="1377360"/>
+            <a:ext cx="1614240" cy="1377000"/>
           </a:xfrm>
           <a:custGeom>
             <a:avLst/>
@@ -13929,7 +13939,7 @@
         <p:spPr>
           <a:xfrm>
             <a:off x="2082960" y="3279600"/>
-            <a:ext cx="914400" cy="361800"/>
+            <a:ext cx="914040" cy="361440"/>
           </a:xfrm>
           <a:prstGeom prst="rect">
             <a:avLst/>
@@ -13978,7 +13988,7 @@
         <p:spPr>
           <a:xfrm>
             <a:off x="5227200" y="4030200"/>
-            <a:ext cx="926640" cy="361800"/>
+            <a:ext cx="926280" cy="361440"/>
           </a:xfrm>
           <a:prstGeom prst="rect">
             <a:avLst/>
@@ -14027,7 +14037,7 @@
         <p:spPr>
           <a:xfrm>
             <a:off x="8246520" y="3279600"/>
-            <a:ext cx="1252800" cy="361800"/>
+            <a:ext cx="1252440" cy="361440"/>
           </a:xfrm>
           <a:prstGeom prst="rect">
             <a:avLst/>
@@ -14076,7 +14086,7 @@
         <p:spPr>
           <a:xfrm>
             <a:off x="481680" y="348120"/>
-            <a:ext cx="1809000" cy="361800"/>
+            <a:ext cx="1808640" cy="361440"/>
           </a:xfrm>
           <a:prstGeom prst="rect">
             <a:avLst/>
@@ -14129,7 +14139,7 @@
         <p:spPr>
           <a:xfrm>
             <a:off x="5855760" y="4444560"/>
-            <a:ext cx="911160" cy="911160"/>
+            <a:ext cx="910800" cy="910800"/>
           </a:xfrm>
           <a:prstGeom prst="rect">
             <a:avLst/>
@@ -14170,7 +14180,7 @@
         <p:spPr>
           <a:xfrm>
             <a:off x="684360" y="4487400"/>
-            <a:ext cx="8531280" cy="1503720"/>
+            <a:ext cx="8530920" cy="1503360"/>
           </a:xfrm>
           <a:prstGeom prst="rect">
             <a:avLst/>
@@ -14223,7 +14233,7 @@
         <p:spPr>
           <a:xfrm>
             <a:off x="7839000" y="2560320"/>
-            <a:ext cx="1311120" cy="596880"/>
+            <a:ext cx="1310760" cy="596520"/>
           </a:xfrm>
           <a:prstGeom prst="rect">
             <a:avLst/>
@@ -14242,7 +14252,7 @@
         <p:spPr>
           <a:xfrm>
             <a:off x="480240" y="348120"/>
-            <a:ext cx="1789200" cy="361800"/>
+            <a:ext cx="1788840" cy="361440"/>
           </a:xfrm>
           <a:prstGeom prst="rect">
             <a:avLst/>
@@ -14291,7 +14301,7 @@
         <p:spPr>
           <a:xfrm>
             <a:off x="6384240" y="990000"/>
-            <a:ext cx="1523160" cy="1337040"/>
+            <a:ext cx="1522800" cy="1336680"/>
           </a:xfrm>
           <a:custGeom>
             <a:avLst/>
@@ -14344,7 +14354,7 @@
         <p:spPr>
           <a:xfrm>
             <a:off x="5678640" y="1145160"/>
-            <a:ext cx="360" cy="1603440"/>
+            <a:ext cx="360" cy="1603080"/>
           </a:xfrm>
           <a:custGeom>
             <a:avLst/>
@@ -14397,7 +14407,7 @@
         <p:spPr>
           <a:xfrm flipH="1">
             <a:off x="3423240" y="990000"/>
-            <a:ext cx="1614600" cy="1377360"/>
+            <a:ext cx="1614240" cy="1377000"/>
           </a:xfrm>
           <a:custGeom>
             <a:avLst/>
@@ -14450,7 +14460,7 @@
         <p:spPr>
           <a:xfrm>
             <a:off x="2082960" y="3279600"/>
-            <a:ext cx="914400" cy="361800"/>
+            <a:ext cx="914040" cy="361440"/>
           </a:xfrm>
           <a:prstGeom prst="rect">
             <a:avLst/>
@@ -14499,7 +14509,7 @@
         <p:spPr>
           <a:xfrm>
             <a:off x="5227200" y="4030200"/>
-            <a:ext cx="926640" cy="361800"/>
+            <a:ext cx="926280" cy="361440"/>
           </a:xfrm>
           <a:prstGeom prst="rect">
             <a:avLst/>
@@ -14548,7 +14558,7 @@
         <p:spPr>
           <a:xfrm>
             <a:off x="8246520" y="3279600"/>
-            <a:ext cx="1252800" cy="361800"/>
+            <a:ext cx="1252440" cy="361440"/>
           </a:xfrm>
           <a:prstGeom prst="rect">
             <a:avLst/>
@@ -14601,7 +14611,7 @@
         <p:spPr>
           <a:xfrm>
             <a:off x="4979520" y="218880"/>
-            <a:ext cx="1330200" cy="615960"/>
+            <a:ext cx="1329840" cy="615600"/>
           </a:xfrm>
           <a:prstGeom prst="rect">
             <a:avLst/>
@@ -14624,7 +14634,7 @@
         <p:spPr>
           <a:xfrm>
             <a:off x="2102760" y="2514600"/>
-            <a:ext cx="1320840" cy="606240"/>
+            <a:ext cx="1320480" cy="605880"/>
           </a:xfrm>
           <a:prstGeom prst="rect">
             <a:avLst/>
@@ -14647,7 +14657,7 @@
         <p:spPr>
           <a:xfrm>
             <a:off x="4235760" y="3279600"/>
-            <a:ext cx="1311120" cy="596880"/>
+            <a:ext cx="1310760" cy="596520"/>
           </a:xfrm>
           <a:prstGeom prst="rect">
             <a:avLst/>
@@ -14670,7 +14680,7 @@
         <p:spPr>
           <a:xfrm>
             <a:off x="5833080" y="3279600"/>
-            <a:ext cx="1311120" cy="596880"/>
+            <a:ext cx="1310760" cy="596520"/>
           </a:xfrm>
           <a:prstGeom prst="rect">
             <a:avLst/>
@@ -14711,7 +14721,7 @@
         <p:spPr>
           <a:xfrm>
             <a:off x="684360" y="4487400"/>
-            <a:ext cx="8531280" cy="1503720"/>
+            <a:ext cx="8530920" cy="1503360"/>
           </a:xfrm>
           <a:prstGeom prst="rect">
             <a:avLst/>
@@ -14760,7 +14770,7 @@
         <p:spPr>
           <a:xfrm>
             <a:off x="684360" y="685800"/>
-            <a:ext cx="8531280" cy="3611880"/>
+            <a:ext cx="8530920" cy="3611520"/>
           </a:xfrm>
           <a:prstGeom prst="rect">
             <a:avLst/>
@@ -14779,7 +14789,7 @@
         <p:txBody>
           <a:bodyPr lIns="90000" rIns="90000" tIns="45000" bIns="45000" anchor="ctr"/>
           <a:p>
-            <a:pPr marL="285840" indent="-282600">
+            <a:pPr marL="285840" indent="-282240">
               <a:lnSpc>
                 <a:spcPct val="100000"/>
               </a:lnSpc>
@@ -14855,7 +14865,7 @@
         <p:spPr>
           <a:xfrm>
             <a:off x="666000" y="2574360"/>
-            <a:ext cx="4807440" cy="2970720"/>
+            <a:ext cx="4807080" cy="2970360"/>
           </a:xfrm>
           <a:prstGeom prst="roundRect">
             <a:avLst>
@@ -15005,7 +15015,7 @@
         <p:spPr>
           <a:xfrm>
             <a:off x="684360" y="5241960"/>
-            <a:ext cx="8531280" cy="1503720"/>
+            <a:ext cx="8530920" cy="1503360"/>
           </a:xfrm>
           <a:prstGeom prst="rect">
             <a:avLst/>
@@ -15054,7 +15064,7 @@
         <p:spPr>
           <a:xfrm>
             <a:off x="684360" y="685800"/>
-            <a:ext cx="10986840" cy="2284920"/>
+            <a:ext cx="10986480" cy="2284560"/>
           </a:xfrm>
           <a:prstGeom prst="rect">
             <a:avLst/>
@@ -15075,7 +15085,7 @@
             <a:normAutofit/>
           </a:bodyPr>
           <a:p>
-            <a:pPr marL="285840" indent="-282600">
+            <a:pPr marL="285840" indent="-282240">
               <a:lnSpc>
                 <a:spcPct val="100000"/>
               </a:lnSpc>
@@ -15157,7 +15167,7 @@
             </a:endParaRPr>
           </a:p>
           <a:p>
-            <a:pPr marL="285840" indent="-282600">
+            <a:pPr marL="285840" indent="-282240">
               <a:lnSpc>
                 <a:spcPct val="100000"/>
               </a:lnSpc>
@@ -15281,7 +15291,7 @@
         <p:spPr>
           <a:xfrm>
             <a:off x="2523960" y="3718800"/>
-            <a:ext cx="725040" cy="720000"/>
+            <a:ext cx="724680" cy="719640"/>
           </a:xfrm>
           <a:prstGeom prst="ellipse">
             <a:avLst/>
@@ -15349,7 +15359,7 @@
         <p:spPr>
           <a:xfrm>
             <a:off x="3363480" y="3303360"/>
-            <a:ext cx="1214280" cy="403920"/>
+            <a:ext cx="1213920" cy="403560"/>
           </a:xfrm>
           <a:prstGeom prst="ellipse">
             <a:avLst/>
@@ -15417,7 +15427,7 @@
         <p:spPr>
           <a:xfrm>
             <a:off x="744120" y="3208680"/>
-            <a:ext cx="1587600" cy="672120"/>
+            <a:ext cx="1587240" cy="671760"/>
           </a:xfrm>
           <a:prstGeom prst="ellipse">
             <a:avLst/>
@@ -15485,7 +15495,7 @@
         <p:spPr>
           <a:xfrm>
             <a:off x="2119680" y="4628880"/>
-            <a:ext cx="1526760" cy="672120"/>
+            <a:ext cx="1526400" cy="671760"/>
           </a:xfrm>
           <a:prstGeom prst="ellipse">
             <a:avLst/>
@@ -15553,7 +15563,7 @@
         <p:spPr>
           <a:xfrm>
             <a:off x="6819480" y="2574360"/>
-            <a:ext cx="4807440" cy="2970720"/>
+            <a:ext cx="4807080" cy="2970360"/>
           </a:xfrm>
           <a:prstGeom prst="roundRect">
             <a:avLst>
@@ -15703,7 +15713,7 @@
         <p:spPr>
           <a:xfrm>
             <a:off x="7103880" y="4147560"/>
-            <a:ext cx="4375800" cy="856080"/>
+            <a:ext cx="4375440" cy="855720"/>
           </a:xfrm>
           <a:prstGeom prst="ellipse">
             <a:avLst/>
@@ -15771,7 +15781,7 @@
         <p:spPr>
           <a:xfrm>
             <a:off x="9898200" y="3332520"/>
-            <a:ext cx="1214280" cy="403920"/>
+            <a:ext cx="1213920" cy="403560"/>
           </a:xfrm>
           <a:prstGeom prst="ellipse">
             <a:avLst/>
@@ -15839,7 +15849,7 @@
         <p:spPr>
           <a:xfrm>
             <a:off x="6965640" y="3288960"/>
-            <a:ext cx="1587600" cy="672120"/>
+            <a:ext cx="1587240" cy="671760"/>
           </a:xfrm>
           <a:prstGeom prst="ellipse">
             <a:avLst/>
@@ -15907,7 +15917,7 @@
         <p:spPr>
           <a:xfrm>
             <a:off x="8287920" y="2688120"/>
-            <a:ext cx="1870560" cy="672120"/>
+            <a:ext cx="1870200" cy="671760"/>
           </a:xfrm>
           <a:prstGeom prst="ellipse">
             <a:avLst/>
@@ -16024,7 +16034,7 @@
         <p:spPr>
           <a:xfrm>
             <a:off x="684360" y="4487400"/>
-            <a:ext cx="8531280" cy="1503720"/>
+            <a:ext cx="8530920" cy="1503360"/>
           </a:xfrm>
           <a:prstGeom prst="rect">
             <a:avLst/>
@@ -16073,7 +16083,7 @@
         <p:spPr>
           <a:xfrm>
             <a:off x="684360" y="685800"/>
-            <a:ext cx="11359440" cy="3611880"/>
+            <a:ext cx="11359080" cy="3611520"/>
           </a:xfrm>
           <a:prstGeom prst="rect">
             <a:avLst/>
@@ -16094,7 +16104,7 @@
             <a:normAutofit/>
           </a:bodyPr>
           <a:p>
-            <a:pPr marL="285840" indent="-282600">
+            <a:pPr marL="285840" indent="-282240">
               <a:lnSpc>
                 <a:spcPct val="100000"/>
               </a:lnSpc>
@@ -16136,7 +16146,7 @@
             </a:endParaRPr>
           </a:p>
           <a:p>
-            <a:pPr marL="285840" indent="-282600">
+            <a:pPr marL="285840" indent="-282240">
               <a:lnSpc>
                 <a:spcPct val="100000"/>
               </a:lnSpc>
@@ -16326,7 +16336,7 @@
             </a:endParaRPr>
           </a:p>
           <a:p>
-            <a:pPr marL="285840" indent="-282600">
+            <a:pPr marL="285840" indent="-282240">
               <a:lnSpc>
                 <a:spcPct val="100000"/>
               </a:lnSpc>
@@ -16358,7 +16368,7 @@
             </a:endParaRPr>
           </a:p>
           <a:p>
-            <a:pPr marL="285840" indent="-282600">
+            <a:pPr marL="285840" indent="-282240">
               <a:lnSpc>
                 <a:spcPct val="100000"/>
               </a:lnSpc>
@@ -16449,7 +16459,7 @@
         <p:spPr>
           <a:xfrm>
             <a:off x="684360" y="4487400"/>
-            <a:ext cx="8531280" cy="1503720"/>
+            <a:ext cx="8530920" cy="1503360"/>
           </a:xfrm>
           <a:prstGeom prst="rect">
             <a:avLst/>
@@ -16498,7 +16508,7 @@
         <p:spPr>
           <a:xfrm>
             <a:off x="684360" y="685800"/>
-            <a:ext cx="8531280" cy="3611880"/>
+            <a:ext cx="8530920" cy="3611520"/>
           </a:xfrm>
           <a:prstGeom prst="rect">
             <a:avLst/>
@@ -16517,7 +16527,7 @@
         <p:txBody>
           <a:bodyPr lIns="90000" rIns="90000" tIns="45000" bIns="45000" anchor="ctr"/>
           <a:p>
-            <a:pPr marL="285840" indent="-282600">
+            <a:pPr marL="285840" indent="-282240">
               <a:lnSpc>
                 <a:spcPct val="100000"/>
               </a:lnSpc>
@@ -16619,7 +16629,7 @@
             </a:endParaRPr>
           </a:p>
           <a:p>
-            <a:pPr marL="285840" indent="-282600">
+            <a:pPr marL="285840" indent="-282240">
               <a:lnSpc>
                 <a:spcPct val="100000"/>
               </a:lnSpc>
@@ -16721,7 +16731,7 @@
         <p:spPr>
           <a:xfrm>
             <a:off x="2521440" y="3979080"/>
-            <a:ext cx="1878840" cy="804600"/>
+            <a:ext cx="1878480" cy="804240"/>
           </a:xfrm>
           <a:prstGeom prst="rect">
             <a:avLst/>
@@ -16787,7 +16797,7 @@
         <p:spPr>
           <a:xfrm>
             <a:off x="5487840" y="3979080"/>
-            <a:ext cx="1878840" cy="804600"/>
+            <a:ext cx="1878480" cy="804240"/>
           </a:xfrm>
           <a:prstGeom prst="rect">
             <a:avLst/>
@@ -16853,7 +16863,7 @@
         <p:spPr>
           <a:xfrm>
             <a:off x="4004640" y="2771640"/>
-            <a:ext cx="1878840" cy="804600"/>
+            <a:ext cx="1878480" cy="804240"/>
           </a:xfrm>
           <a:prstGeom prst="rect">
             <a:avLst/>
@@ -16919,7 +16929,7 @@
         <p:spPr>
           <a:xfrm>
             <a:off x="4483080" y="4383000"/>
-            <a:ext cx="1001520" cy="360"/>
+            <a:ext cx="1001160" cy="360"/>
           </a:xfrm>
           <a:custGeom>
             <a:avLst/>
@@ -16971,7 +16981,7 @@
         <p:spPr>
           <a:xfrm>
             <a:off x="4985640" y="3657600"/>
-            <a:ext cx="360" cy="576360"/>
+            <a:ext cx="360" cy="576000"/>
           </a:xfrm>
           <a:custGeom>
             <a:avLst/>
@@ -17072,7 +17082,7 @@
         <p:spPr>
           <a:xfrm>
             <a:off x="0" y="0"/>
-            <a:ext cx="12188880" cy="6854760"/>
+            <a:ext cx="12188520" cy="6854400"/>
           </a:xfrm>
           <a:prstGeom prst="rect">
             <a:avLst/>
@@ -17125,7 +17135,7 @@
         <p:spPr>
           <a:xfrm>
             <a:off x="640440" y="685800"/>
-            <a:ext cx="4815360" cy="4600440"/>
+            <a:ext cx="4815000" cy="4600080"/>
           </a:xfrm>
           <a:prstGeom prst="rect">
             <a:avLst/>
@@ -17176,7 +17186,7 @@
         <p:spPr>
           <a:xfrm>
             <a:off x="6095880" y="0"/>
-            <a:ext cx="6092640" cy="6854760"/>
+            <a:ext cx="6092280" cy="6854400"/>
           </a:xfrm>
           <a:prstGeom prst="rect">
             <a:avLst/>
@@ -17214,7 +17224,7 @@
         <p:spPr>
           <a:xfrm>
             <a:off x="6625800" y="685800"/>
-            <a:ext cx="4875840" cy="4600440"/>
+            <a:ext cx="4875480" cy="4600080"/>
           </a:xfrm>
           <a:prstGeom prst="rect">
             <a:avLst/>
@@ -17235,7 +17245,7 @@
             <a:normAutofit/>
           </a:bodyPr>
           <a:p>
-            <a:pPr marL="285840" indent="-282600">
+            <a:pPr marL="285840" indent="-282240">
               <a:lnSpc>
                 <a:spcPct val="100000"/>
               </a:lnSpc>
@@ -17267,7 +17277,7 @@
             </a:endParaRPr>
           </a:p>
           <a:p>
-            <a:pPr marL="285840" indent="-282600">
+            <a:pPr marL="285840" indent="-282240">
               <a:lnSpc>
                 <a:spcPct val="100000"/>
               </a:lnSpc>
@@ -17299,7 +17309,7 @@
             </a:endParaRPr>
           </a:p>
           <a:p>
-            <a:pPr marL="285840" indent="-282600">
+            <a:pPr marL="285840" indent="-282240">
               <a:lnSpc>
                 <a:spcPct val="100000"/>
               </a:lnSpc>
@@ -17331,7 +17341,7 @@
             </a:endParaRPr>
           </a:p>
           <a:p>
-            <a:pPr marL="285840" indent="-282600">
+            <a:pPr marL="285840" indent="-282240">
               <a:lnSpc>
                 <a:spcPct val="100000"/>
               </a:lnSpc>
@@ -17422,7 +17432,7 @@
         <p:spPr>
           <a:xfrm>
             <a:off x="684360" y="4487400"/>
-            <a:ext cx="8531280" cy="1503720"/>
+            <a:ext cx="8530920" cy="1503360"/>
           </a:xfrm>
           <a:prstGeom prst="rect">
             <a:avLst/>
@@ -17471,7 +17481,7 @@
         <p:spPr>
           <a:xfrm>
             <a:off x="1044720" y="500040"/>
-            <a:ext cx="8260920" cy="3229560"/>
+            <a:ext cx="8260560" cy="3229200"/>
           </a:xfrm>
           <a:prstGeom prst="rect">
             <a:avLst/>
@@ -17490,7 +17500,7 @@
         <p:txBody>
           <a:bodyPr lIns="90000" rIns="90000" tIns="45000" bIns="45000" anchor="ctr"/>
           <a:p>
-            <a:pPr marL="285840" indent="-282600">
+            <a:pPr marL="285840" indent="-282240">
               <a:lnSpc>
                 <a:spcPct val="100000"/>
               </a:lnSpc>
@@ -17532,7 +17542,7 @@
             </a:endParaRPr>
           </a:p>
           <a:p>
-            <a:pPr marL="285840" indent="-282600">
+            <a:pPr marL="285840" indent="-282240">
               <a:lnSpc>
                 <a:spcPct val="100000"/>
               </a:lnSpc>
@@ -17584,7 +17594,7 @@
             </a:endParaRPr>
           </a:p>
           <a:p>
-            <a:pPr marL="285840" indent="-282600">
+            <a:pPr marL="285840" indent="-282240">
               <a:lnSpc>
                 <a:spcPct val="100000"/>
               </a:lnSpc>
@@ -17736,7 +17746,7 @@
         <p:spPr>
           <a:xfrm>
             <a:off x="7097760" y="1943280"/>
-            <a:ext cx="851400" cy="851400"/>
+            <a:ext cx="851040" cy="851040"/>
           </a:xfrm>
           <a:prstGeom prst="rect">
             <a:avLst/>
@@ -17759,7 +17769,7 @@
         <p:spPr>
           <a:xfrm>
             <a:off x="6931800" y="4296600"/>
-            <a:ext cx="1177920" cy="470160"/>
+            <a:ext cx="1177560" cy="469800"/>
           </a:xfrm>
           <a:prstGeom prst="rect">
             <a:avLst/>
@@ -17782,7 +17792,7 @@
         <p:spPr>
           <a:xfrm>
             <a:off x="7054200" y="2896920"/>
-            <a:ext cx="894960" cy="1037160"/>
+            <a:ext cx="894600" cy="1036800"/>
           </a:xfrm>
           <a:prstGeom prst="rect">
             <a:avLst/>
@@ -17805,7 +17815,7 @@
         <p:spPr>
           <a:xfrm>
             <a:off x="2718360" y="2064960"/>
-            <a:ext cx="911160" cy="911160"/>
+            <a:ext cx="910800" cy="910800"/>
           </a:xfrm>
           <a:prstGeom prst="rect">
             <a:avLst/>
@@ -17828,7 +17838,7 @@
         <p:spPr>
           <a:xfrm>
             <a:off x="2739240" y="3371040"/>
-            <a:ext cx="911160" cy="911160"/>
+            <a:ext cx="910800" cy="910800"/>
           </a:xfrm>
           <a:prstGeom prst="rect">
             <a:avLst/>
@@ -17851,7 +17861,7 @@
         <p:spPr>
           <a:xfrm>
             <a:off x="4908600" y="2852280"/>
-            <a:ext cx="911160" cy="911160"/>
+            <a:ext cx="910800" cy="910800"/>
           </a:xfrm>
           <a:prstGeom prst="rect">
             <a:avLst/>
@@ -17869,8 +17879,8 @@
         </p:nvSpPr>
         <p:spPr>
           <a:xfrm rot="1192200">
-            <a:off x="4046760" y="2671560"/>
-            <a:ext cx="975240" cy="481320"/>
+            <a:off x="4046760" y="2671200"/>
+            <a:ext cx="974880" cy="480960"/>
           </a:xfrm>
           <a:prstGeom prst="rightArrow">
             <a:avLst>
@@ -17911,8 +17921,8 @@
         </p:nvSpPr>
         <p:spPr>
           <a:xfrm rot="20407800">
-            <a:off x="4025520" y="3459240"/>
-            <a:ext cx="975240" cy="481320"/>
+            <a:off x="4025160" y="3459240"/>
+            <a:ext cx="974880" cy="480960"/>
           </a:xfrm>
           <a:prstGeom prst="rightArrow">
             <a:avLst>
@@ -17953,8 +17963,8 @@
         </p:nvSpPr>
         <p:spPr>
           <a:xfrm rot="1192200">
-            <a:off x="5800320" y="3780000"/>
-            <a:ext cx="975240" cy="481320"/>
+            <a:off x="5800320" y="3779640"/>
+            <a:ext cx="974880" cy="480960"/>
           </a:xfrm>
           <a:prstGeom prst="rightArrow">
             <a:avLst>
@@ -17995,8 +18005,8 @@
         </p:nvSpPr>
         <p:spPr>
           <a:xfrm rot="20407800">
-            <a:off x="5873760" y="2454840"/>
-            <a:ext cx="975240" cy="481320"/>
+            <a:off x="5873400" y="2454840"/>
+            <a:ext cx="974880" cy="480960"/>
           </a:xfrm>
           <a:prstGeom prst="rightArrow">
             <a:avLst>
@@ -18038,7 +18048,7 @@
         <p:spPr>
           <a:xfrm>
             <a:off x="5951880" y="3115440"/>
-            <a:ext cx="975240" cy="481320"/>
+            <a:ext cx="974880" cy="480960"/>
           </a:xfrm>
           <a:prstGeom prst="rightArrow">
             <a:avLst>
@@ -18129,7 +18139,7 @@
         <p:spPr>
           <a:xfrm>
             <a:off x="684360" y="4487400"/>
-            <a:ext cx="8531280" cy="1503720"/>
+            <a:ext cx="8530920" cy="1503360"/>
           </a:xfrm>
           <a:prstGeom prst="rect">
             <a:avLst/>
@@ -18178,7 +18188,7 @@
         <p:spPr>
           <a:xfrm>
             <a:off x="684360" y="685800"/>
-            <a:ext cx="8531280" cy="3611880"/>
+            <a:ext cx="8530920" cy="3611520"/>
           </a:xfrm>
           <a:prstGeom prst="rect">
             <a:avLst/>
@@ -18197,7 +18207,7 @@
         <p:txBody>
           <a:bodyPr lIns="90000" rIns="90000" tIns="45000" bIns="45000" anchor="ctr"/>
           <a:p>
-            <a:pPr marL="285840" indent="-282600">
+            <a:pPr marL="285840" indent="-282240">
               <a:lnSpc>
                 <a:spcPct val="100000"/>
               </a:lnSpc>
@@ -18289,7 +18299,7 @@
             </a:endParaRPr>
           </a:p>
           <a:p>
-            <a:pPr marL="285840" indent="-282600">
+            <a:pPr marL="285840" indent="-282240">
               <a:lnSpc>
                 <a:spcPct val="100000"/>
               </a:lnSpc>
@@ -18341,7 +18351,7 @@
             </a:endParaRPr>
           </a:p>
           <a:p>
-            <a:pPr marL="285840" indent="-282600">
+            <a:pPr marL="285840" indent="-282240">
               <a:lnSpc>
                 <a:spcPct val="100000"/>
               </a:lnSpc>
@@ -18427,7 +18437,7 @@
         <p:spPr>
           <a:xfrm>
             <a:off x="6227640" y="3794400"/>
-            <a:ext cx="911160" cy="911160"/>
+            <a:ext cx="910800" cy="910800"/>
           </a:xfrm>
           <a:prstGeom prst="rect">
             <a:avLst/>
@@ -18450,7 +18460,7 @@
         <p:spPr>
           <a:xfrm>
             <a:off x="2468520" y="3843720"/>
-            <a:ext cx="911160" cy="911160"/>
+            <a:ext cx="910800" cy="910800"/>
           </a:xfrm>
           <a:prstGeom prst="rect">
             <a:avLst/>
@@ -18473,7 +18483,7 @@
         <p:spPr>
           <a:xfrm>
             <a:off x="9790920" y="3794400"/>
-            <a:ext cx="911160" cy="911160"/>
+            <a:ext cx="910800" cy="910800"/>
           </a:xfrm>
           <a:prstGeom prst="rect">
             <a:avLst/>
@@ -18496,7 +18506,7 @@
         <p:spPr>
           <a:xfrm>
             <a:off x="7903800" y="3794400"/>
-            <a:ext cx="911160" cy="911160"/>
+            <a:ext cx="910800" cy="910800"/>
           </a:xfrm>
           <a:prstGeom prst="rect">
             <a:avLst/>
@@ -18519,7 +18529,7 @@
         <p:spPr>
           <a:xfrm>
             <a:off x="4412520" y="3794400"/>
-            <a:ext cx="911160" cy="911160"/>
+            <a:ext cx="910800" cy="910800"/>
           </a:xfrm>
           <a:prstGeom prst="rect">
             <a:avLst/>
@@ -18542,7 +18552,7 @@
         <p:spPr>
           <a:xfrm>
             <a:off x="684360" y="3843720"/>
-            <a:ext cx="911160" cy="911160"/>
+            <a:ext cx="910800" cy="910800"/>
           </a:xfrm>
           <a:prstGeom prst="rect">
             <a:avLst/>
@@ -18561,7 +18571,7 @@
         <p:spPr>
           <a:xfrm>
             <a:off x="1638000" y="4183200"/>
-            <a:ext cx="679680" cy="258840"/>
+            <a:ext cx="679320" cy="258480"/>
           </a:xfrm>
           <a:prstGeom prst="rightArrow">
             <a:avLst>
@@ -18600,7 +18610,7 @@
         <p:spPr>
           <a:xfrm>
             <a:off x="3511800" y="4201920"/>
-            <a:ext cx="679680" cy="258840"/>
+            <a:ext cx="679320" cy="258480"/>
           </a:xfrm>
           <a:prstGeom prst="rightArrow">
             <a:avLst>
@@ -18639,7 +18649,7 @@
         <p:spPr>
           <a:xfrm>
             <a:off x="5366520" y="4193640"/>
-            <a:ext cx="679680" cy="258840"/>
+            <a:ext cx="679320" cy="258480"/>
           </a:xfrm>
           <a:prstGeom prst="rightArrow">
             <a:avLst>
@@ -18678,7 +18688,7 @@
         <p:spPr>
           <a:xfrm>
             <a:off x="7162200" y="4183200"/>
-            <a:ext cx="679680" cy="258840"/>
+            <a:ext cx="679320" cy="258480"/>
           </a:xfrm>
           <a:prstGeom prst="rightArrow">
             <a:avLst>
@@ -18717,7 +18727,7 @@
         <p:spPr>
           <a:xfrm>
             <a:off x="8876160" y="4169880"/>
-            <a:ext cx="679680" cy="258840"/>
+            <a:ext cx="679320" cy="258480"/>
           </a:xfrm>
           <a:prstGeom prst="rightArrow">
             <a:avLst>
@@ -18805,7 +18815,7 @@
         <p:spPr>
           <a:xfrm>
             <a:off x="684360" y="4487400"/>
-            <a:ext cx="8531280" cy="1503720"/>
+            <a:ext cx="8530920" cy="1503360"/>
           </a:xfrm>
           <a:prstGeom prst="rect">
             <a:avLst/>
@@ -18854,7 +18864,7 @@
         <p:spPr>
           <a:xfrm>
             <a:off x="684360" y="685800"/>
-            <a:ext cx="8531280" cy="3611880"/>
+            <a:ext cx="8530920" cy="3611520"/>
           </a:xfrm>
           <a:prstGeom prst="rect">
             <a:avLst/>
@@ -18873,7 +18883,7 @@
         <p:txBody>
           <a:bodyPr lIns="90000" rIns="90000" tIns="45000" bIns="45000" anchor="ctr"/>
           <a:p>
-            <a:pPr marL="285840" indent="-282600">
+            <a:pPr marL="285840" indent="-282240">
               <a:lnSpc>
                 <a:spcPct val="100000"/>
               </a:lnSpc>
@@ -18955,7 +18965,7 @@
             </a:endParaRPr>
           </a:p>
           <a:p>
-            <a:pPr marL="285840" indent="-282600">
+            <a:pPr marL="285840" indent="-282240">
               <a:lnSpc>
                 <a:spcPct val="100000"/>
               </a:lnSpc>
@@ -19001,7 +19011,7 @@
         <p:spPr>
           <a:xfrm>
             <a:off x="4681800" y="2481480"/>
-            <a:ext cx="911160" cy="911160"/>
+            <a:ext cx="910800" cy="910800"/>
           </a:xfrm>
           <a:prstGeom prst="rect">
             <a:avLst/>
@@ -19024,7 +19034,7 @@
         <p:spPr>
           <a:xfrm>
             <a:off x="6609240" y="3669480"/>
-            <a:ext cx="911160" cy="911160"/>
+            <a:ext cx="910800" cy="910800"/>
           </a:xfrm>
           <a:prstGeom prst="rect">
             <a:avLst/>
@@ -19047,7 +19057,7 @@
         <p:spPr>
           <a:xfrm>
             <a:off x="2973240" y="3669480"/>
-            <a:ext cx="911160" cy="911160"/>
+            <a:ext cx="910800" cy="910800"/>
           </a:xfrm>
           <a:prstGeom prst="rect">
             <a:avLst/>
@@ -19066,7 +19076,7 @@
         <p:spPr>
           <a:xfrm>
             <a:off x="4214160" y="3946320"/>
-            <a:ext cx="2065320" cy="357480"/>
+            <a:ext cx="2064960" cy="357120"/>
           </a:xfrm>
           <a:prstGeom prst="rightArrow">
             <a:avLst>
@@ -19105,7 +19115,7 @@
         <p:spPr>
           <a:xfrm>
             <a:off x="4988160" y="3533400"/>
-            <a:ext cx="298440" cy="403920"/>
+            <a:ext cx="298080" cy="403560"/>
           </a:xfrm>
           <a:prstGeom prst="downArrow">
             <a:avLst>

</xml_diff>

<commit_message>
#12 Weak AI vs Strong AI explanation speech part 5 added on introduction slides
</commit_message>
<xml_diff>
--- a/SAI_presentation_libre_office.pptx
+++ b/SAI_presentation_libre_office.pptx
@@ -250,7 +250,7 @@
           <a:bodyPr lIns="0" rIns="0" tIns="0" bIns="0" anchor="b"/>
           <a:p>
             <a:pPr algn="r"/>
-            <a:fld id="{1A4B5CE5-19E2-4E74-8950-C94F4E59DB6D}" type="slidenum">
+            <a:fld id="{57B7016C-ADE5-44DB-9540-5249234350B7}" type="slidenum">
               <a:rPr b="0" lang="fr-FR" sz="1400" spc="-1" strike="noStrike">
                 <a:latin typeface="Times New Roman"/>
               </a:rPr>
@@ -298,7 +298,7 @@
         <p:spPr>
           <a:xfrm>
             <a:off x="685800" y="1143000"/>
-            <a:ext cx="5482800" cy="3082680"/>
+            <a:ext cx="5482440" cy="3082320"/>
           </a:xfrm>
           <a:prstGeom prst="rect">
             <a:avLst/>
@@ -318,7 +318,7 @@
         <p:spPr>
           <a:xfrm>
             <a:off x="685800" y="4400640"/>
-            <a:ext cx="5482800" cy="3596760"/>
+            <a:ext cx="5482440" cy="3596400"/>
           </a:xfrm>
           <a:prstGeom prst="rect">
             <a:avLst/>
@@ -327,7 +327,7 @@
         <p:txBody>
           <a:bodyPr lIns="0" rIns="0" tIns="0" bIns="0"/>
           <a:p>
-            <a:pPr marL="216000" indent="-212760">
+            <a:pPr marL="216000" indent="-212400">
               <a:lnSpc>
                 <a:spcPct val="100000"/>
               </a:lnSpc>
@@ -343,7 +343,7 @@
             </a:endParaRPr>
           </a:p>
           <a:p>
-            <a:pPr marL="216000" indent="-212760">
+            <a:pPr marL="216000" indent="-212400">
               <a:lnSpc>
                 <a:spcPct val="100000"/>
               </a:lnSpc>
@@ -360,7 +360,7 @@
             </a:endParaRPr>
           </a:p>
           <a:p>
-            <a:pPr marL="216000" indent="-212760">
+            <a:pPr marL="216000" indent="-212400">
               <a:lnSpc>
                 <a:spcPct val="100000"/>
               </a:lnSpc>
@@ -376,7 +376,7 @@
             </a:endParaRPr>
           </a:p>
           <a:p>
-            <a:pPr marL="216000" indent="-212760">
+            <a:pPr marL="216000" indent="-212400">
               <a:lnSpc>
                 <a:spcPct val="100000"/>
               </a:lnSpc>
@@ -392,7 +392,7 @@
             </a:endParaRPr>
           </a:p>
           <a:p>
-            <a:pPr marL="216000" indent="-212760">
+            <a:pPr marL="216000" indent="-212400">
               <a:lnSpc>
                 <a:spcPct val="100000"/>
               </a:lnSpc>
@@ -419,7 +419,7 @@
         <p:spPr>
           <a:xfrm>
             <a:off x="3884760" y="8685360"/>
-            <a:ext cx="2968200" cy="455040"/>
+            <a:ext cx="2967840" cy="454680"/>
           </a:xfrm>
           <a:prstGeom prst="rect">
             <a:avLst/>
@@ -443,7 +443,7 @@
                 <a:spcPct val="100000"/>
               </a:lnSpc>
             </a:pPr>
-            <a:fld id="{135D7357-4ABB-477C-8DE1-E4CB148FE102}" type="slidenum">
+            <a:fld id="{8BE29AC7-B797-4AC3-9DCE-674F2CA808C0}" type="slidenum">
               <a:rPr b="0" lang="fr-FR" sz="1200" spc="-1" strike="noStrike">
                 <a:solidFill>
                   <a:srgbClr val="000000"/>
@@ -493,7 +493,7 @@
         <p:spPr>
           <a:xfrm>
             <a:off x="685800" y="1143000"/>
-            <a:ext cx="5482800" cy="3082680"/>
+            <a:ext cx="5482440" cy="3082320"/>
           </a:xfrm>
           <a:prstGeom prst="rect">
             <a:avLst/>
@@ -513,7 +513,7 @@
         <p:spPr>
           <a:xfrm>
             <a:off x="685800" y="4400640"/>
-            <a:ext cx="5482800" cy="3596760"/>
+            <a:ext cx="5482440" cy="3596400"/>
           </a:xfrm>
           <a:prstGeom prst="rect">
             <a:avLst/>
@@ -522,7 +522,7 @@
         <p:txBody>
           <a:bodyPr lIns="0" rIns="0" tIns="0" bIns="0"/>
           <a:p>
-            <a:pPr marL="216000" indent="-213120">
+            <a:pPr marL="216000" indent="-212760">
               <a:lnSpc>
                 <a:spcPct val="100000"/>
               </a:lnSpc>
@@ -538,7 +538,7 @@
             </a:endParaRPr>
           </a:p>
           <a:p>
-            <a:pPr marL="216000" indent="-213120">
+            <a:pPr marL="216000" indent="-212760">
               <a:lnSpc>
                 <a:spcPct val="100000"/>
               </a:lnSpc>
@@ -548,7 +548,7 @@
             </a:endParaRPr>
           </a:p>
           <a:p>
-            <a:pPr marL="216000" indent="-213120">
+            <a:pPr marL="216000" indent="-212760">
               <a:lnSpc>
                 <a:spcPct val="100000"/>
               </a:lnSpc>
@@ -564,7 +564,7 @@
             </a:endParaRPr>
           </a:p>
           <a:p>
-            <a:pPr marL="216000" indent="-213120">
+            <a:pPr marL="216000" indent="-212760">
               <a:lnSpc>
                 <a:spcPct val="100000"/>
               </a:lnSpc>
@@ -574,7 +574,7 @@
             </a:endParaRPr>
           </a:p>
           <a:p>
-            <a:pPr marL="216000" indent="-213120">
+            <a:pPr marL="216000" indent="-212760">
               <a:lnSpc>
                 <a:spcPct val="100000"/>
               </a:lnSpc>
@@ -590,7 +590,7 @@
             </a:endParaRPr>
           </a:p>
           <a:p>
-            <a:pPr marL="216000" indent="-213120">
+            <a:pPr marL="216000" indent="-212760">
               <a:lnSpc>
                 <a:spcPct val="100000"/>
               </a:lnSpc>
@@ -600,7 +600,7 @@
             </a:endParaRPr>
           </a:p>
           <a:p>
-            <a:pPr marL="216000" indent="-213120">
+            <a:pPr marL="216000" indent="-212760">
               <a:lnSpc>
                 <a:spcPct val="100000"/>
               </a:lnSpc>
@@ -616,7 +616,7 @@
             </a:endParaRPr>
           </a:p>
           <a:p>
-            <a:pPr marL="216000" indent="-213120">
+            <a:pPr marL="216000" indent="-212760">
               <a:lnSpc>
                 <a:spcPct val="100000"/>
               </a:lnSpc>
@@ -626,7 +626,7 @@
             </a:endParaRPr>
           </a:p>
           <a:p>
-            <a:pPr marL="216000" indent="-213120">
+            <a:pPr marL="216000" indent="-212760">
               <a:lnSpc>
                 <a:spcPct val="100000"/>
               </a:lnSpc>
@@ -636,7 +636,7 @@
             </a:endParaRPr>
           </a:p>
           <a:p>
-            <a:pPr marL="216000" indent="-213120">
+            <a:pPr marL="216000" indent="-212760">
               <a:lnSpc>
                 <a:spcPct val="100000"/>
               </a:lnSpc>
@@ -652,7 +652,7 @@
             </a:endParaRPr>
           </a:p>
           <a:p>
-            <a:pPr marL="216000" indent="-213120">
+            <a:pPr marL="216000" indent="-212760">
               <a:lnSpc>
                 <a:spcPct val="100000"/>
               </a:lnSpc>
@@ -668,7 +668,7 @@
             </a:endParaRPr>
           </a:p>
           <a:p>
-            <a:pPr marL="216000" indent="-213120">
+            <a:pPr marL="216000" indent="-212760">
               <a:lnSpc>
                 <a:spcPct val="100000"/>
               </a:lnSpc>
@@ -684,7 +684,7 @@
             </a:endParaRPr>
           </a:p>
           <a:p>
-            <a:pPr marL="216000" indent="-213120">
+            <a:pPr marL="216000" indent="-212760">
               <a:lnSpc>
                 <a:spcPct val="100000"/>
               </a:lnSpc>
@@ -694,7 +694,7 @@
             </a:endParaRPr>
           </a:p>
           <a:p>
-            <a:pPr marL="216000" indent="-213120">
+            <a:pPr marL="216000" indent="-212760">
               <a:lnSpc>
                 <a:spcPct val="100000"/>
               </a:lnSpc>
@@ -710,7 +710,7 @@
             </a:endParaRPr>
           </a:p>
           <a:p>
-            <a:pPr marL="216000" indent="-213120">
+            <a:pPr marL="216000" indent="-212760">
               <a:lnSpc>
                 <a:spcPct val="100000"/>
               </a:lnSpc>
@@ -720,7 +720,7 @@
             </a:endParaRPr>
           </a:p>
           <a:p>
-            <a:pPr marL="216000" indent="-213120">
+            <a:pPr marL="216000" indent="-212760">
               <a:lnSpc>
                 <a:spcPct val="100000"/>
               </a:lnSpc>
@@ -736,7 +736,7 @@
             </a:endParaRPr>
           </a:p>
           <a:p>
-            <a:pPr marL="216000" indent="-213120">
+            <a:pPr marL="216000" indent="-212760">
               <a:lnSpc>
                 <a:spcPct val="100000"/>
               </a:lnSpc>
@@ -752,7 +752,7 @@
             </a:endParaRPr>
           </a:p>
           <a:p>
-            <a:pPr marL="216000" indent="-213120">
+            <a:pPr marL="216000" indent="-212760">
               <a:lnSpc>
                 <a:spcPct val="100000"/>
               </a:lnSpc>
@@ -768,7 +768,7 @@
             </a:endParaRPr>
           </a:p>
           <a:p>
-            <a:pPr marL="216000" indent="-213120">
+            <a:pPr marL="216000" indent="-212760">
               <a:lnSpc>
                 <a:spcPct val="100000"/>
               </a:lnSpc>
@@ -784,7 +784,7 @@
             </a:endParaRPr>
           </a:p>
           <a:p>
-            <a:pPr marL="216000" indent="-213120">
+            <a:pPr marL="216000" indent="-212760">
               <a:lnSpc>
                 <a:spcPct val="100000"/>
               </a:lnSpc>
@@ -794,7 +794,7 @@
             </a:endParaRPr>
           </a:p>
           <a:p>
-            <a:pPr marL="216000" indent="-213120">
+            <a:pPr marL="216000" indent="-212760">
               <a:lnSpc>
                 <a:spcPct val="100000"/>
               </a:lnSpc>
@@ -810,7 +810,7 @@
             </a:endParaRPr>
           </a:p>
           <a:p>
-            <a:pPr marL="216000" indent="-213120">
+            <a:pPr marL="216000" indent="-212760">
               <a:lnSpc>
                 <a:spcPct val="100000"/>
               </a:lnSpc>
@@ -826,7 +826,7 @@
             </a:endParaRPr>
           </a:p>
           <a:p>
-            <a:pPr marL="216000" indent="-213120">
+            <a:pPr marL="216000" indent="-212760">
               <a:lnSpc>
                 <a:spcPct val="100000"/>
               </a:lnSpc>
@@ -842,7 +842,7 @@
             </a:endParaRPr>
           </a:p>
           <a:p>
-            <a:pPr marL="216000" indent="-213120">
+            <a:pPr marL="216000" indent="-212760">
               <a:lnSpc>
                 <a:spcPct val="100000"/>
               </a:lnSpc>
@@ -858,7 +858,7 @@
             </a:endParaRPr>
           </a:p>
           <a:p>
-            <a:pPr marL="216000" indent="-213120">
+            <a:pPr marL="216000" indent="-212760">
               <a:lnSpc>
                 <a:spcPct val="100000"/>
               </a:lnSpc>
@@ -874,7 +874,7 @@
             </a:endParaRPr>
           </a:p>
           <a:p>
-            <a:pPr marL="216000" indent="-213120">
+            <a:pPr marL="216000" indent="-212760">
               <a:lnSpc>
                 <a:spcPct val="100000"/>
               </a:lnSpc>
@@ -884,7 +884,7 @@
             </a:endParaRPr>
           </a:p>
           <a:p>
-            <a:pPr marL="216000" indent="-213120">
+            <a:pPr marL="216000" indent="-212760">
               <a:lnSpc>
                 <a:spcPct val="100000"/>
               </a:lnSpc>
@@ -900,7 +900,7 @@
             </a:endParaRPr>
           </a:p>
           <a:p>
-            <a:pPr marL="216000" indent="-213120">
+            <a:pPr marL="216000" indent="-212760">
               <a:lnSpc>
                 <a:spcPct val="100000"/>
               </a:lnSpc>
@@ -916,7 +916,7 @@
             </a:endParaRPr>
           </a:p>
           <a:p>
-            <a:pPr marL="216000" indent="-213120">
+            <a:pPr marL="216000" indent="-212760">
               <a:lnSpc>
                 <a:spcPct val="100000"/>
               </a:lnSpc>
@@ -932,7 +932,7 @@
             </a:endParaRPr>
           </a:p>
           <a:p>
-            <a:pPr marL="216000" indent="-213120">
+            <a:pPr marL="216000" indent="-212760">
               <a:lnSpc>
                 <a:spcPct val="100000"/>
               </a:lnSpc>
@@ -942,7 +942,7 @@
             </a:endParaRPr>
           </a:p>
           <a:p>
-            <a:pPr marL="216000" indent="-213120">
+            <a:pPr marL="216000" indent="-212760">
               <a:lnSpc>
                 <a:spcPct val="100000"/>
               </a:lnSpc>
@@ -958,7 +958,7 @@
             </a:endParaRPr>
           </a:p>
           <a:p>
-            <a:pPr marL="216000" indent="-213120">
+            <a:pPr marL="216000" indent="-212760">
               <a:lnSpc>
                 <a:spcPct val="100000"/>
               </a:lnSpc>
@@ -974,7 +974,7 @@
             </a:endParaRPr>
           </a:p>
           <a:p>
-            <a:pPr marL="216000" indent="-213120">
+            <a:pPr marL="216000" indent="-212760">
               <a:lnSpc>
                 <a:spcPct val="100000"/>
               </a:lnSpc>
@@ -990,7 +990,7 @@
             </a:endParaRPr>
           </a:p>
           <a:p>
-            <a:pPr marL="216000" indent="-213120">
+            <a:pPr marL="216000" indent="-212760">
               <a:lnSpc>
                 <a:spcPct val="100000"/>
               </a:lnSpc>
@@ -1000,7 +1000,7 @@
             </a:endParaRPr>
           </a:p>
           <a:p>
-            <a:pPr marL="216000" indent="-213120">
+            <a:pPr marL="216000" indent="-212760">
               <a:lnSpc>
                 <a:spcPct val="100000"/>
               </a:lnSpc>
@@ -1016,7 +1016,7 @@
             </a:endParaRPr>
           </a:p>
           <a:p>
-            <a:pPr marL="216000" indent="-213120">
+            <a:pPr marL="216000" indent="-212760">
               <a:lnSpc>
                 <a:spcPct val="100000"/>
               </a:lnSpc>
@@ -1032,7 +1032,7 @@
             </a:endParaRPr>
           </a:p>
           <a:p>
-            <a:pPr marL="216000" indent="-213120">
+            <a:pPr marL="216000" indent="-212760">
               <a:lnSpc>
                 <a:spcPct val="100000"/>
               </a:lnSpc>
@@ -1048,7 +1048,7 @@
             </a:endParaRPr>
           </a:p>
           <a:p>
-            <a:pPr marL="216000" indent="-213120">
+            <a:pPr marL="216000" indent="-212760">
               <a:lnSpc>
                 <a:spcPct val="100000"/>
               </a:lnSpc>
@@ -1064,7 +1064,7 @@
             </a:endParaRPr>
           </a:p>
           <a:p>
-            <a:pPr marL="216000" indent="-213120">
+            <a:pPr marL="216000" indent="-212760">
               <a:lnSpc>
                 <a:spcPct val="100000"/>
               </a:lnSpc>
@@ -1074,7 +1074,7 @@
             </a:endParaRPr>
           </a:p>
           <a:p>
-            <a:pPr marL="216000" indent="-213120">
+            <a:pPr marL="216000" indent="-212760">
               <a:lnSpc>
                 <a:spcPct val="100000"/>
               </a:lnSpc>
@@ -1090,7 +1090,7 @@
             </a:endParaRPr>
           </a:p>
           <a:p>
-            <a:pPr marL="216000" indent="-213120">
+            <a:pPr marL="216000" indent="-212760">
               <a:lnSpc>
                 <a:spcPct val="100000"/>
               </a:lnSpc>
@@ -1107,7 +1107,7 @@
             </a:endParaRPr>
           </a:p>
           <a:p>
-            <a:pPr marL="216000" indent="-213120">
+            <a:pPr marL="216000" indent="-212760">
               <a:lnSpc>
                 <a:spcPct val="100000"/>
               </a:lnSpc>
@@ -1124,7 +1124,7 @@
             </a:endParaRPr>
           </a:p>
           <a:p>
-            <a:pPr marL="216000" indent="-213120">
+            <a:pPr marL="216000" indent="-212760">
               <a:lnSpc>
                 <a:spcPct val="100000"/>
               </a:lnSpc>
@@ -1141,7 +1141,7 @@
             </a:endParaRPr>
           </a:p>
           <a:p>
-            <a:pPr marL="216000" indent="-213120">
+            <a:pPr marL="216000" indent="-212760">
               <a:lnSpc>
                 <a:spcPct val="100000"/>
               </a:lnSpc>
@@ -1151,7 +1151,7 @@
             </a:endParaRPr>
           </a:p>
           <a:p>
-            <a:pPr marL="216000" indent="-213120">
+            <a:pPr marL="216000" indent="-212760">
               <a:lnSpc>
                 <a:spcPct val="100000"/>
               </a:lnSpc>
@@ -1168,7 +1168,7 @@
             </a:endParaRPr>
           </a:p>
           <a:p>
-            <a:pPr marL="216000" indent="-213120">
+            <a:pPr marL="216000" indent="-212760">
               <a:lnSpc>
                 <a:spcPct val="100000"/>
               </a:lnSpc>
@@ -1185,7 +1185,7 @@
             </a:endParaRPr>
           </a:p>
           <a:p>
-            <a:pPr marL="216000" indent="-213120">
+            <a:pPr marL="216000" indent="-212760">
               <a:lnSpc>
                 <a:spcPct val="100000"/>
               </a:lnSpc>
@@ -1195,7 +1195,7 @@
             </a:endParaRPr>
           </a:p>
           <a:p>
-            <a:pPr marL="216000" indent="-213120">
+            <a:pPr marL="216000" indent="-212760">
               <a:lnSpc>
                 <a:spcPct val="100000"/>
               </a:lnSpc>
@@ -1205,7 +1205,7 @@
             </a:endParaRPr>
           </a:p>
           <a:p>
-            <a:pPr marL="216000" indent="-213120">
+            <a:pPr marL="216000" indent="-212760">
               <a:lnSpc>
                 <a:spcPct val="100000"/>
               </a:lnSpc>
@@ -1215,7 +1215,7 @@
             </a:endParaRPr>
           </a:p>
           <a:p>
-            <a:pPr marL="216000" indent="-213120">
+            <a:pPr marL="216000" indent="-212760">
               <a:lnSpc>
                 <a:spcPct val="100000"/>
               </a:lnSpc>
@@ -1225,7 +1225,7 @@
             </a:endParaRPr>
           </a:p>
           <a:p>
-            <a:pPr marL="216000" indent="-213120">
+            <a:pPr marL="216000" indent="-212760">
               <a:lnSpc>
                 <a:spcPct val="100000"/>
               </a:lnSpc>
@@ -1245,7 +1245,7 @@
         <p:spPr>
           <a:xfrm>
             <a:off x="3884760" y="8685360"/>
-            <a:ext cx="2968200" cy="455040"/>
+            <a:ext cx="2967840" cy="454680"/>
           </a:xfrm>
           <a:prstGeom prst="rect">
             <a:avLst/>
@@ -1269,7 +1269,7 @@
                 <a:spcPct val="100000"/>
               </a:lnSpc>
             </a:pPr>
-            <a:fld id="{4FE01581-72AE-484C-AEB6-DC511DFE6339}" type="slidenum">
+            <a:fld id="{44C7C188-7B1F-4142-A095-CA0A20E3E6A3}" type="slidenum">
               <a:rPr b="0" lang="fr-FR" sz="1200" spc="-1" strike="noStrike">
                 <a:solidFill>
                   <a:srgbClr val="000000"/>
@@ -1319,7 +1319,7 @@
         <p:spPr>
           <a:xfrm>
             <a:off x="685800" y="1143000"/>
-            <a:ext cx="5482800" cy="3082680"/>
+            <a:ext cx="5482440" cy="3082320"/>
           </a:xfrm>
           <a:prstGeom prst="rect">
             <a:avLst/>
@@ -1339,7 +1339,7 @@
         <p:spPr>
           <a:xfrm>
             <a:off x="685800" y="4400640"/>
-            <a:ext cx="5482800" cy="3596760"/>
+            <a:ext cx="5482440" cy="3596400"/>
           </a:xfrm>
           <a:prstGeom prst="rect">
             <a:avLst/>
@@ -1348,7 +1348,7 @@
         <p:txBody>
           <a:bodyPr lIns="0" rIns="0" tIns="0" bIns="0"/>
           <a:p>
-            <a:pPr marL="216000" indent="-214920">
+            <a:pPr marL="216000" indent="-214560">
               <a:lnSpc>
                 <a:spcPct val="100000"/>
               </a:lnSpc>
@@ -1364,7 +1364,7 @@
             </a:endParaRPr>
           </a:p>
           <a:p>
-            <a:pPr marL="216000" indent="-214920">
+            <a:pPr marL="216000" indent="-214560">
               <a:lnSpc>
                 <a:spcPct val="100000"/>
               </a:lnSpc>
@@ -1380,7 +1380,7 @@
             </a:endParaRPr>
           </a:p>
           <a:p>
-            <a:pPr marL="216000" indent="-214920">
+            <a:pPr marL="216000" indent="-214560">
               <a:lnSpc>
                 <a:spcPct val="100000"/>
               </a:lnSpc>
@@ -1396,7 +1396,7 @@
             </a:endParaRPr>
           </a:p>
           <a:p>
-            <a:pPr marL="216000" indent="-214920">
+            <a:pPr marL="216000" indent="-214560">
               <a:lnSpc>
                 <a:spcPct val="100000"/>
               </a:lnSpc>
@@ -1406,7 +1406,7 @@
             </a:endParaRPr>
           </a:p>
           <a:p>
-            <a:pPr marL="216000" indent="-214920">
+            <a:pPr marL="216000" indent="-214560">
               <a:lnSpc>
                 <a:spcPct val="100000"/>
               </a:lnSpc>
@@ -1422,7 +1422,7 @@
             </a:endParaRPr>
           </a:p>
           <a:p>
-            <a:pPr marL="216000" indent="-214920">
+            <a:pPr marL="216000" indent="-214560">
               <a:lnSpc>
                 <a:spcPct val="100000"/>
               </a:lnSpc>
@@ -1438,7 +1438,7 @@
             </a:endParaRPr>
           </a:p>
           <a:p>
-            <a:pPr marL="216000" indent="-214920">
+            <a:pPr marL="216000" indent="-214560">
               <a:lnSpc>
                 <a:spcPct val="100000"/>
               </a:lnSpc>
@@ -1448,7 +1448,7 @@
             </a:endParaRPr>
           </a:p>
           <a:p>
-            <a:pPr marL="216000" indent="-214920">
+            <a:pPr marL="216000" indent="-214560">
               <a:lnSpc>
                 <a:spcPct val="100000"/>
               </a:lnSpc>
@@ -1464,7 +1464,7 @@
             </a:endParaRPr>
           </a:p>
           <a:p>
-            <a:pPr marL="216000" indent="-214920">
+            <a:pPr marL="216000" indent="-214560">
               <a:lnSpc>
                 <a:spcPct val="100000"/>
               </a:lnSpc>
@@ -1474,7 +1474,7 @@
             </a:endParaRPr>
           </a:p>
           <a:p>
-            <a:pPr marL="216000" indent="-214920">
+            <a:pPr marL="216000" indent="-214560">
               <a:lnSpc>
                 <a:spcPct val="100000"/>
               </a:lnSpc>
@@ -1490,17 +1490,23 @@
             </a:endParaRPr>
           </a:p>
           <a:p>
-            <a:pPr marL="216000" indent="-214920">
-              <a:lnSpc>
-                <a:spcPct val="100000"/>
-              </a:lnSpc>
-            </a:pPr>
+            <a:pPr marL="216000" indent="-214560">
+              <a:lnSpc>
+                <a:spcPct val="100000"/>
+              </a:lnSpc>
+            </a:pPr>
+            <a:r>
+              <a:rPr b="0" lang="fr-FR" sz="1800" spc="-1" strike="noStrike">
+                <a:latin typeface="Arial"/>
+              </a:rPr>
+              <a:t>An hypothesis or heuristic can be call as a strategy in our AI. Those strategies need to be created everytime the AI is in rest.</a:t>
+            </a:r>
             <a:endParaRPr b="0" lang="fr-FR" sz="1800" spc="-1" strike="noStrike">
               <a:latin typeface="Arial"/>
             </a:endParaRPr>
           </a:p>
           <a:p>
-            <a:pPr marL="216000" indent="-214920">
+            <a:pPr marL="216000" indent="-214560">
               <a:lnSpc>
                 <a:spcPct val="100000"/>
               </a:lnSpc>
@@ -1510,7 +1516,17 @@
             </a:endParaRPr>
           </a:p>
           <a:p>
-            <a:pPr marL="216000" indent="-214920">
+            <a:pPr marL="216000" indent="-214560">
+              <a:lnSpc>
+                <a:spcPct val="100000"/>
+              </a:lnSpc>
+            </a:pPr>
+            <a:endParaRPr b="0" lang="fr-FR" sz="1800" spc="-1" strike="noStrike">
+              <a:latin typeface="Arial"/>
+            </a:endParaRPr>
+          </a:p>
+          <a:p>
+            <a:pPr marL="216000" indent="-214560">
               <a:lnSpc>
                 <a:spcPct val="100000"/>
               </a:lnSpc>
@@ -1530,7 +1546,7 @@
         <p:spPr>
           <a:xfrm>
             <a:off x="3884760" y="8685360"/>
-            <a:ext cx="2968200" cy="455040"/>
+            <a:ext cx="2967840" cy="454680"/>
           </a:xfrm>
           <a:prstGeom prst="rect">
             <a:avLst/>
@@ -1554,7 +1570,7 @@
                 <a:spcPct val="100000"/>
               </a:lnSpc>
             </a:pPr>
-            <a:fld id="{AEEC32A1-5E72-43A1-AC29-B21C7F2ED015}" type="slidenum">
+            <a:fld id="{5CF4149B-DBE4-4C04-A57A-2982C2262A27}" type="slidenum">
               <a:rPr b="0" lang="fr-FR" sz="1200" spc="-1" strike="noStrike">
                 <a:solidFill>
                   <a:srgbClr val="000000"/>
@@ -1604,7 +1620,7 @@
         <p:spPr>
           <a:xfrm>
             <a:off x="380880" y="694800"/>
-            <a:ext cx="6093360" cy="3426480"/>
+            <a:ext cx="6093000" cy="3426120"/>
           </a:xfrm>
           <a:prstGeom prst="rect">
             <a:avLst/>
@@ -1624,7 +1640,7 @@
         <p:spPr>
           <a:xfrm>
             <a:off x="685800" y="4343400"/>
-            <a:ext cx="5483880" cy="4112280"/>
+            <a:ext cx="5483520" cy="4111920"/>
           </a:xfrm>
           <a:prstGeom prst="rect">
             <a:avLst/>
@@ -1633,7 +1649,7 @@
         <p:txBody>
           <a:bodyPr lIns="0" rIns="0" tIns="0" bIns="0"/>
           <a:p>
-            <a:pPr marL="216000" indent="-214200">
+            <a:pPr marL="216000" indent="-213840">
               <a:lnSpc>
                 <a:spcPct val="100000"/>
               </a:lnSpc>
@@ -1649,7 +1665,7 @@
             </a:endParaRPr>
           </a:p>
           <a:p>
-            <a:pPr marL="216000" indent="-214200">
+            <a:pPr marL="216000" indent="-213840">
               <a:lnSpc>
                 <a:spcPct val="100000"/>
               </a:lnSpc>
@@ -1665,7 +1681,7 @@
             </a:endParaRPr>
           </a:p>
           <a:p>
-            <a:pPr marL="216000" indent="-214200">
+            <a:pPr marL="216000" indent="-213840">
               <a:lnSpc>
                 <a:spcPct val="100000"/>
               </a:lnSpc>
@@ -1681,7 +1697,7 @@
             </a:endParaRPr>
           </a:p>
           <a:p>
-            <a:pPr marL="216000" indent="-214200">
+            <a:pPr marL="216000" indent="-213840">
               <a:lnSpc>
                 <a:spcPct val="100000"/>
               </a:lnSpc>
@@ -5429,7 +5445,7 @@
         <p:spPr>
           <a:xfrm>
             <a:off x="0" y="0"/>
-            <a:ext cx="12188520" cy="6854400"/>
+            <a:ext cx="12188160" cy="6854040"/>
           </a:xfrm>
           <a:prstGeom prst="rect">
             <a:avLst/>
@@ -5461,8 +5477,8 @@
         </p:nvSpPr>
         <p:spPr>
           <a:xfrm flipV="1">
-            <a:off x="0" y="-3600"/>
-            <a:ext cx="12185280" cy="6854400"/>
+            <a:off x="0" y="-4320"/>
+            <a:ext cx="12184920" cy="6854040"/>
           </a:xfrm>
           <a:prstGeom prst="snip1Rect">
             <a:avLst>
@@ -5517,7 +5533,7 @@
         <p:spPr>
           <a:xfrm>
             <a:off x="684360" y="685800"/>
-            <a:ext cx="9675360" cy="3669840"/>
+            <a:ext cx="9675000" cy="3669480"/>
           </a:xfrm>
           <a:prstGeom prst="rect">
             <a:avLst/>
@@ -5568,7 +5584,7 @@
         <p:spPr>
           <a:xfrm>
             <a:off x="684360" y="4648320"/>
-            <a:ext cx="7002000" cy="1139400"/>
+            <a:ext cx="7001640" cy="1139040"/>
           </a:xfrm>
           <a:prstGeom prst="rect">
             <a:avLst/>
@@ -5706,7 +5722,7 @@
         <p:spPr>
           <a:xfrm>
             <a:off x="684360" y="4487400"/>
-            <a:ext cx="8530920" cy="1503360"/>
+            <a:ext cx="8530560" cy="1503000"/>
           </a:xfrm>
           <a:prstGeom prst="rect">
             <a:avLst/>
@@ -5755,7 +5771,7 @@
         <p:spPr>
           <a:xfrm>
             <a:off x="684360" y="685800"/>
-            <a:ext cx="8530920" cy="3611520"/>
+            <a:ext cx="8530560" cy="3611160"/>
           </a:xfrm>
           <a:prstGeom prst="rect">
             <a:avLst/>
@@ -5774,7 +5790,7 @@
         <p:txBody>
           <a:bodyPr lIns="90000" rIns="90000" tIns="45000" bIns="45000" anchor="ctr"/>
           <a:p>
-            <a:pPr marL="285840" indent="-282240">
+            <a:pPr marL="285840" indent="-281880">
               <a:lnSpc>
                 <a:spcPct val="100000"/>
               </a:lnSpc>
@@ -5906,7 +5922,7 @@
             </a:endParaRPr>
           </a:p>
           <a:p>
-            <a:pPr marL="285840" indent="-282240">
+            <a:pPr marL="285840" indent="-281880">
               <a:lnSpc>
                 <a:spcPct val="100000"/>
               </a:lnSpc>
@@ -5952,7 +5968,7 @@
         <p:spPr>
           <a:xfrm>
             <a:off x="4733640" y="3979440"/>
-            <a:ext cx="910800" cy="910800"/>
+            <a:ext cx="910440" cy="910440"/>
           </a:xfrm>
           <a:prstGeom prst="rect">
             <a:avLst/>
@@ -5975,7 +5991,7 @@
         <p:spPr>
           <a:xfrm>
             <a:off x="6825960" y="4030200"/>
-            <a:ext cx="910800" cy="910800"/>
+            <a:ext cx="910440" cy="910440"/>
           </a:xfrm>
           <a:prstGeom prst="rect">
             <a:avLst/>
@@ -5998,7 +6014,7 @@
         <p:spPr>
           <a:xfrm>
             <a:off x="5354640" y="2725920"/>
-            <a:ext cx="910800" cy="910800"/>
+            <a:ext cx="910440" cy="910440"/>
           </a:xfrm>
           <a:prstGeom prst="rect">
             <a:avLst/>
@@ -6021,7 +6037,7 @@
         <p:spPr>
           <a:xfrm>
             <a:off x="8550000" y="3433320"/>
-            <a:ext cx="910800" cy="910800"/>
+            <a:ext cx="910440" cy="910440"/>
           </a:xfrm>
           <a:prstGeom prst="rect">
             <a:avLst/>
@@ -6044,7 +6060,7 @@
         <p:spPr>
           <a:xfrm>
             <a:off x="5153040" y="5079960"/>
-            <a:ext cx="910800" cy="910800"/>
+            <a:ext cx="910440" cy="910440"/>
           </a:xfrm>
           <a:prstGeom prst="rect">
             <a:avLst/>
@@ -6063,7 +6079,7 @@
         <p:spPr>
           <a:xfrm rot="3732600">
             <a:off x="7994520" y="3763080"/>
-            <a:ext cx="200520" cy="666360"/>
+            <a:ext cx="200160" cy="666000"/>
           </a:xfrm>
           <a:prstGeom prst="downArrow">
             <a:avLst>
@@ -6101,8 +6117,8 @@
         </p:nvSpPr>
         <p:spPr>
           <a:xfrm rot="14618400">
-            <a:off x="6343920" y="4764240"/>
-            <a:ext cx="200520" cy="666360"/>
+            <a:off x="6343920" y="4764600"/>
+            <a:ext cx="200160" cy="666000"/>
           </a:xfrm>
           <a:prstGeom prst="downArrow">
             <a:avLst>
@@ -6140,8 +6156,8 @@
         </p:nvSpPr>
         <p:spPr>
           <a:xfrm rot="5400000">
-            <a:off x="6192360" y="4132800"/>
-            <a:ext cx="200520" cy="666360"/>
+            <a:off x="6192720" y="4132800"/>
+            <a:ext cx="200160" cy="666000"/>
           </a:xfrm>
           <a:prstGeom prst="downArrow">
             <a:avLst>
@@ -6179,8 +6195,8 @@
         </p:nvSpPr>
         <p:spPr>
           <a:xfrm rot="7014000">
-            <a:off x="6425280" y="3552480"/>
-            <a:ext cx="200520" cy="666360"/>
+            <a:off x="6425640" y="3552480"/>
+            <a:ext cx="200160" cy="666000"/>
           </a:xfrm>
           <a:prstGeom prst="downArrow">
             <a:avLst>
@@ -6218,8 +6234,8 @@
         </p:nvSpPr>
         <p:spPr>
           <a:xfrm rot="1747800">
-            <a:off x="5088240" y="3302640"/>
-            <a:ext cx="200520" cy="666360"/>
+            <a:off x="5088240" y="3302280"/>
+            <a:ext cx="200160" cy="666000"/>
           </a:xfrm>
           <a:prstGeom prst="downArrow">
             <a:avLst>
@@ -6307,7 +6323,7 @@
         <p:spPr>
           <a:xfrm>
             <a:off x="6868080" y="306720"/>
-            <a:ext cx="5040360" cy="2082240"/>
+            <a:ext cx="5040000" cy="2081880"/>
           </a:xfrm>
           <a:prstGeom prst="rect">
             <a:avLst/>
@@ -6350,7 +6366,7 @@
         <p:spPr>
           <a:xfrm>
             <a:off x="6271200" y="2669400"/>
-            <a:ext cx="5629320" cy="3005280"/>
+            <a:ext cx="5628960" cy="3004920"/>
           </a:xfrm>
           <a:prstGeom prst="rect">
             <a:avLst/>
@@ -6395,7 +6411,7 @@
         <p:spPr>
           <a:xfrm>
             <a:off x="129960" y="5709960"/>
-            <a:ext cx="11179800" cy="1086480"/>
+            <a:ext cx="11179440" cy="1086120"/>
           </a:xfrm>
           <a:prstGeom prst="rect">
             <a:avLst/>
@@ -6440,7 +6456,7 @@
         <p:spPr>
           <a:xfrm>
             <a:off x="207000" y="1787400"/>
-            <a:ext cx="5591160" cy="3224520"/>
+            <a:ext cx="5590800" cy="3224160"/>
           </a:xfrm>
           <a:prstGeom prst="rect">
             <a:avLst/>
@@ -6485,7 +6501,7 @@
         <p:spPr>
           <a:xfrm>
             <a:off x="684360" y="4487400"/>
-            <a:ext cx="8530920" cy="1503360"/>
+            <a:ext cx="8530560" cy="1503000"/>
           </a:xfrm>
           <a:prstGeom prst="rect">
             <a:avLst/>
@@ -6534,7 +6550,7 @@
         <p:spPr>
           <a:xfrm>
             <a:off x="684360" y="685800"/>
-            <a:ext cx="8530920" cy="3611520"/>
+            <a:ext cx="8530560" cy="3611160"/>
           </a:xfrm>
           <a:prstGeom prst="rect">
             <a:avLst/>
@@ -6553,7 +6569,7 @@
         <p:txBody>
           <a:bodyPr lIns="90000" rIns="90000" tIns="45000" bIns="45000" anchor="ctr"/>
           <a:p>
-            <a:pPr marL="285840" indent="-282240">
+            <a:pPr marL="285840" indent="-281880">
               <a:lnSpc>
                 <a:spcPct val="100000"/>
               </a:lnSpc>
@@ -6605,7 +6621,7 @@
             </a:endParaRPr>
           </a:p>
           <a:p>
-            <a:pPr marL="285840" indent="-282240">
+            <a:pPr marL="285840" indent="-281880">
               <a:lnSpc>
                 <a:spcPct val="100000"/>
               </a:lnSpc>
@@ -6647,7 +6663,7 @@
             </a:endParaRPr>
           </a:p>
           <a:p>
-            <a:pPr marL="285840" indent="-282240">
+            <a:pPr marL="285840" indent="-281880">
               <a:lnSpc>
                 <a:spcPct val="100000"/>
               </a:lnSpc>
@@ -6699,7 +6715,7 @@
             </a:endParaRPr>
           </a:p>
           <a:p>
-            <a:pPr marL="285840" indent="-282240">
+            <a:pPr marL="285840" indent="-281880">
               <a:lnSpc>
                 <a:spcPct val="100000"/>
               </a:lnSpc>
@@ -6867,7 +6883,7 @@
         <p:spPr>
           <a:xfrm>
             <a:off x="4629600" y="1832040"/>
-            <a:ext cx="851040" cy="851040"/>
+            <a:ext cx="850680" cy="850680"/>
           </a:xfrm>
           <a:prstGeom prst="rect">
             <a:avLst/>
@@ -6890,7 +6906,7 @@
         <p:spPr>
           <a:xfrm>
             <a:off x="4463640" y="4185360"/>
-            <a:ext cx="1177560" cy="469800"/>
+            <a:ext cx="1177200" cy="469440"/>
           </a:xfrm>
           <a:prstGeom prst="rect">
             <a:avLst/>
@@ -6913,7 +6929,7 @@
         <p:spPr>
           <a:xfrm>
             <a:off x="4586040" y="2785680"/>
-            <a:ext cx="894600" cy="1036800"/>
+            <a:ext cx="894240" cy="1036440"/>
           </a:xfrm>
           <a:prstGeom prst="rect">
             <a:avLst/>
@@ -6936,7 +6952,7 @@
         <p:spPr>
           <a:xfrm>
             <a:off x="250560" y="1953720"/>
-            <a:ext cx="910800" cy="910800"/>
+            <a:ext cx="910440" cy="910440"/>
           </a:xfrm>
           <a:prstGeom prst="rect">
             <a:avLst/>
@@ -6959,7 +6975,7 @@
         <p:spPr>
           <a:xfrm>
             <a:off x="271440" y="3259800"/>
-            <a:ext cx="910800" cy="910800"/>
+            <a:ext cx="910440" cy="910440"/>
           </a:xfrm>
           <a:prstGeom prst="rect">
             <a:avLst/>
@@ -6982,7 +6998,7 @@
         <p:spPr>
           <a:xfrm>
             <a:off x="2440800" y="2741040"/>
-            <a:ext cx="910800" cy="910800"/>
+            <a:ext cx="910440" cy="910440"/>
           </a:xfrm>
           <a:prstGeom prst="rect">
             <a:avLst/>
@@ -7001,7 +7017,7 @@
         <p:spPr>
           <a:xfrm rot="1192200">
             <a:off x="1578600" y="2559960"/>
-            <a:ext cx="974880" cy="480960"/>
+            <a:ext cx="974520" cy="480600"/>
           </a:xfrm>
           <a:prstGeom prst="rightArrow">
             <a:avLst>
@@ -7043,7 +7059,7 @@
         <p:spPr>
           <a:xfrm rot="20407800">
             <a:off x="1557360" y="3348000"/>
-            <a:ext cx="974880" cy="480960"/>
+            <a:ext cx="974520" cy="480600"/>
           </a:xfrm>
           <a:prstGeom prst="rightArrow">
             <a:avLst>
@@ -7085,7 +7101,7 @@
         <p:spPr>
           <a:xfrm rot="1192200">
             <a:off x="3332160" y="3668400"/>
-            <a:ext cx="974880" cy="480960"/>
+            <a:ext cx="974520" cy="480600"/>
           </a:xfrm>
           <a:prstGeom prst="rightArrow">
             <a:avLst>
@@ -7127,7 +7143,7 @@
         <p:spPr>
           <a:xfrm rot="20407800">
             <a:off x="3405600" y="2343600"/>
-            <a:ext cx="974880" cy="480960"/>
+            <a:ext cx="974520" cy="480600"/>
           </a:xfrm>
           <a:prstGeom prst="rightArrow">
             <a:avLst>
@@ -7169,7 +7185,7 @@
         <p:spPr>
           <a:xfrm>
             <a:off x="3483720" y="3004200"/>
-            <a:ext cx="974880" cy="480960"/>
+            <a:ext cx="974520" cy="480600"/>
           </a:xfrm>
           <a:prstGeom prst="rightArrow">
             <a:avLst>
@@ -7215,7 +7231,7 @@
         <p:spPr>
           <a:xfrm>
             <a:off x="5819760" y="5709960"/>
-            <a:ext cx="910800" cy="910800"/>
+            <a:ext cx="910440" cy="910440"/>
           </a:xfrm>
           <a:prstGeom prst="rect">
             <a:avLst/>
@@ -7238,7 +7254,7 @@
         <p:spPr>
           <a:xfrm>
             <a:off x="2060640" y="5759640"/>
-            <a:ext cx="910800" cy="910800"/>
+            <a:ext cx="910440" cy="910440"/>
           </a:xfrm>
           <a:prstGeom prst="rect">
             <a:avLst/>
@@ -7261,7 +7277,7 @@
         <p:spPr>
           <a:xfrm>
             <a:off x="9383040" y="5709960"/>
-            <a:ext cx="910800" cy="910800"/>
+            <a:ext cx="910440" cy="910440"/>
           </a:xfrm>
           <a:prstGeom prst="rect">
             <a:avLst/>
@@ -7284,7 +7300,7 @@
         <p:spPr>
           <a:xfrm>
             <a:off x="7495920" y="5709960"/>
-            <a:ext cx="910800" cy="910800"/>
+            <a:ext cx="910440" cy="910440"/>
           </a:xfrm>
           <a:prstGeom prst="rect">
             <a:avLst/>
@@ -7307,7 +7323,7 @@
         <p:spPr>
           <a:xfrm>
             <a:off x="4004640" y="5709960"/>
-            <a:ext cx="910800" cy="910800"/>
+            <a:ext cx="910440" cy="910440"/>
           </a:xfrm>
           <a:prstGeom prst="rect">
             <a:avLst/>
@@ -7330,7 +7346,7 @@
         <p:spPr>
           <a:xfrm>
             <a:off x="276120" y="5759640"/>
-            <a:ext cx="910800" cy="910800"/>
+            <a:ext cx="910440" cy="910440"/>
           </a:xfrm>
           <a:prstGeom prst="rect">
             <a:avLst/>
@@ -7349,7 +7365,7 @@
         <p:spPr>
           <a:xfrm>
             <a:off x="1230120" y="6098760"/>
-            <a:ext cx="679320" cy="258480"/>
+            <a:ext cx="678960" cy="258120"/>
           </a:xfrm>
           <a:prstGeom prst="rightArrow">
             <a:avLst>
@@ -7388,7 +7404,7 @@
         <p:spPr>
           <a:xfrm>
             <a:off x="3103920" y="6117480"/>
-            <a:ext cx="679320" cy="258480"/>
+            <a:ext cx="678960" cy="258120"/>
           </a:xfrm>
           <a:prstGeom prst="rightArrow">
             <a:avLst>
@@ -7427,7 +7443,7 @@
         <p:spPr>
           <a:xfrm>
             <a:off x="4958640" y="6109200"/>
-            <a:ext cx="679320" cy="258480"/>
+            <a:ext cx="678960" cy="258120"/>
           </a:xfrm>
           <a:prstGeom prst="rightArrow">
             <a:avLst>
@@ -7466,7 +7482,7 @@
         <p:spPr>
           <a:xfrm>
             <a:off x="6754320" y="6098760"/>
-            <a:ext cx="679320" cy="258480"/>
+            <a:ext cx="678960" cy="258120"/>
           </a:xfrm>
           <a:prstGeom prst="rightArrow">
             <a:avLst>
@@ -7505,7 +7521,7 @@
         <p:spPr>
           <a:xfrm>
             <a:off x="8468280" y="6085800"/>
-            <a:ext cx="679320" cy="258480"/>
+            <a:ext cx="678960" cy="258120"/>
           </a:xfrm>
           <a:prstGeom prst="rightArrow">
             <a:avLst>
@@ -7548,7 +7564,7 @@
         <p:spPr>
           <a:xfrm>
             <a:off x="6582600" y="3915000"/>
-            <a:ext cx="910800" cy="910800"/>
+            <a:ext cx="910440" cy="910440"/>
           </a:xfrm>
           <a:prstGeom prst="rect">
             <a:avLst/>
@@ -7571,7 +7587,7 @@
         <p:spPr>
           <a:xfrm>
             <a:off x="8674920" y="3965760"/>
-            <a:ext cx="910800" cy="910800"/>
+            <a:ext cx="910440" cy="910440"/>
           </a:xfrm>
           <a:prstGeom prst="rect">
             <a:avLst/>
@@ -7594,7 +7610,7 @@
         <p:spPr>
           <a:xfrm>
             <a:off x="7203600" y="2661480"/>
-            <a:ext cx="910800" cy="910800"/>
+            <a:ext cx="910440" cy="910440"/>
           </a:xfrm>
           <a:prstGeom prst="rect">
             <a:avLst/>
@@ -7617,7 +7633,7 @@
         <p:spPr>
           <a:xfrm>
             <a:off x="10398960" y="3368880"/>
-            <a:ext cx="910800" cy="910800"/>
+            <a:ext cx="910440" cy="910440"/>
           </a:xfrm>
           <a:prstGeom prst="rect">
             <a:avLst/>
@@ -7640,7 +7656,7 @@
         <p:spPr>
           <a:xfrm>
             <a:off x="7002000" y="5015520"/>
-            <a:ext cx="910800" cy="910800"/>
+            <a:ext cx="910440" cy="910440"/>
           </a:xfrm>
           <a:prstGeom prst="rect">
             <a:avLst/>
@@ -7659,7 +7675,7 @@
         <p:spPr>
           <a:xfrm rot="3732600">
             <a:off x="9843840" y="3699000"/>
-            <a:ext cx="200520" cy="666360"/>
+            <a:ext cx="200160" cy="666000"/>
           </a:xfrm>
           <a:prstGeom prst="downArrow">
             <a:avLst>
@@ -7697,8 +7713,8 @@
         </p:nvSpPr>
         <p:spPr>
           <a:xfrm rot="14618400">
-            <a:off x="8192880" y="4700160"/>
-            <a:ext cx="200520" cy="666360"/>
+            <a:off x="8192880" y="4700520"/>
+            <a:ext cx="200160" cy="666000"/>
           </a:xfrm>
           <a:prstGeom prst="downArrow">
             <a:avLst>
@@ -7736,8 +7752,8 @@
         </p:nvSpPr>
         <p:spPr>
           <a:xfrm rot="5400000">
-            <a:off x="8041320" y="4068360"/>
-            <a:ext cx="200520" cy="666360"/>
+            <a:off x="8041680" y="4068360"/>
+            <a:ext cx="200160" cy="666000"/>
           </a:xfrm>
           <a:prstGeom prst="downArrow">
             <a:avLst>
@@ -7775,8 +7791,8 @@
         </p:nvSpPr>
         <p:spPr>
           <a:xfrm rot="7014000">
-            <a:off x="8274600" y="3488040"/>
-            <a:ext cx="200520" cy="666360"/>
+            <a:off x="8274960" y="3488040"/>
+            <a:ext cx="200160" cy="666000"/>
           </a:xfrm>
           <a:prstGeom prst="downArrow">
             <a:avLst>
@@ -7814,8 +7830,8 @@
         </p:nvSpPr>
         <p:spPr>
           <a:xfrm rot="1747800">
-            <a:off x="7095240" y="3424680"/>
-            <a:ext cx="200520" cy="666360"/>
+            <a:off x="7095240" y="3424320"/>
+            <a:ext cx="200160" cy="666000"/>
           </a:xfrm>
           <a:prstGeom prst="downArrow">
             <a:avLst>
@@ -7858,7 +7874,7 @@
         <p:spPr>
           <a:xfrm>
             <a:off x="8641080" y="309600"/>
-            <a:ext cx="910800" cy="910800"/>
+            <a:ext cx="910440" cy="910440"/>
           </a:xfrm>
           <a:prstGeom prst="rect">
             <a:avLst/>
@@ -7881,7 +7897,7 @@
         <p:spPr>
           <a:xfrm>
             <a:off x="10568880" y="1497240"/>
-            <a:ext cx="910800" cy="910800"/>
+            <a:ext cx="910440" cy="910440"/>
           </a:xfrm>
           <a:prstGeom prst="rect">
             <a:avLst/>
@@ -7904,7 +7920,7 @@
         <p:spPr>
           <a:xfrm>
             <a:off x="6932880" y="1497240"/>
-            <a:ext cx="910800" cy="910800"/>
+            <a:ext cx="910440" cy="910440"/>
           </a:xfrm>
           <a:prstGeom prst="rect">
             <a:avLst/>
@@ -7923,7 +7939,7 @@
         <p:spPr>
           <a:xfrm>
             <a:off x="8173800" y="1774080"/>
-            <a:ext cx="2064960" cy="357120"/>
+            <a:ext cx="2064600" cy="356760"/>
           </a:xfrm>
           <a:prstGeom prst="rightArrow">
             <a:avLst>
@@ -7962,7 +7978,7 @@
         <p:spPr>
           <a:xfrm>
             <a:off x="8947440" y="1361160"/>
-            <a:ext cx="298080" cy="403560"/>
+            <a:ext cx="297720" cy="403200"/>
           </a:xfrm>
           <a:prstGeom prst="downArrow">
             <a:avLst>
@@ -8050,7 +8066,7 @@
         <p:spPr>
           <a:xfrm>
             <a:off x="0" y="0"/>
-            <a:ext cx="12188520" cy="6854400"/>
+            <a:ext cx="12188160" cy="6854040"/>
           </a:xfrm>
           <a:prstGeom prst="rect">
             <a:avLst/>
@@ -8103,7 +8119,7 @@
         <p:spPr>
           <a:xfrm>
             <a:off x="640440" y="685800"/>
-            <a:ext cx="4815000" cy="4600080"/>
+            <a:ext cx="4814640" cy="4599720"/>
           </a:xfrm>
           <a:prstGeom prst="rect">
             <a:avLst/>
@@ -8154,7 +8170,7 @@
         <p:spPr>
           <a:xfrm>
             <a:off x="6095880" y="0"/>
-            <a:ext cx="6092280" cy="6854400"/>
+            <a:ext cx="6091920" cy="6854040"/>
           </a:xfrm>
           <a:prstGeom prst="rect">
             <a:avLst/>
@@ -8192,7 +8208,7 @@
         <p:spPr>
           <a:xfrm>
             <a:off x="6625800" y="685800"/>
-            <a:ext cx="4875480" cy="4600080"/>
+            <a:ext cx="4875120" cy="4599720"/>
           </a:xfrm>
           <a:prstGeom prst="rect">
             <a:avLst/>
@@ -8213,7 +8229,7 @@
             <a:normAutofit/>
           </a:bodyPr>
           <a:p>
-            <a:pPr marL="285840" indent="-282240">
+            <a:pPr marL="285840" indent="-281880">
               <a:lnSpc>
                 <a:spcPct val="100000"/>
               </a:lnSpc>
@@ -8245,7 +8261,7 @@
             </a:endParaRPr>
           </a:p>
           <a:p>
-            <a:pPr marL="285840" indent="-282240">
+            <a:pPr marL="285840" indent="-281880">
               <a:lnSpc>
                 <a:spcPct val="100000"/>
               </a:lnSpc>
@@ -8277,7 +8293,7 @@
             </a:endParaRPr>
           </a:p>
           <a:p>
-            <a:pPr marL="285840" indent="-282240">
+            <a:pPr marL="285840" indent="-281880">
               <a:lnSpc>
                 <a:spcPct val="100000"/>
               </a:lnSpc>
@@ -8309,7 +8325,7 @@
             </a:endParaRPr>
           </a:p>
           <a:p>
-            <a:pPr marL="285840" indent="-282240">
+            <a:pPr marL="285840" indent="-281880">
               <a:lnSpc>
                 <a:spcPct val="100000"/>
               </a:lnSpc>
@@ -8341,7 +8357,7 @@
             </a:endParaRPr>
           </a:p>
           <a:p>
-            <a:pPr marL="285840" indent="-282240">
+            <a:pPr marL="285840" indent="-281880">
               <a:lnSpc>
                 <a:spcPct val="100000"/>
               </a:lnSpc>
@@ -8405,7 +8421,7 @@
         <p:spPr>
           <a:xfrm>
             <a:off x="684360" y="4487400"/>
-            <a:ext cx="8530920" cy="1503360"/>
+            <a:ext cx="8530560" cy="1503000"/>
           </a:xfrm>
           <a:prstGeom prst="rect">
             <a:avLst/>
@@ -8454,7 +8470,7 @@
         <p:spPr>
           <a:xfrm>
             <a:off x="684360" y="685800"/>
-            <a:ext cx="8530920" cy="3611520"/>
+            <a:ext cx="8530560" cy="3611160"/>
           </a:xfrm>
           <a:prstGeom prst="rect">
             <a:avLst/>
@@ -8473,7 +8489,7 @@
         <p:txBody>
           <a:bodyPr lIns="90000" rIns="90000" tIns="45000" bIns="45000" anchor="ctr"/>
           <a:p>
-            <a:pPr marL="285840" indent="-282240">
+            <a:pPr marL="285840" indent="-281880">
               <a:lnSpc>
                 <a:spcPct val="100000"/>
               </a:lnSpc>
@@ -8505,7 +8521,7 @@
             </a:endParaRPr>
           </a:p>
           <a:p>
-            <a:pPr marL="285840" indent="-282240">
+            <a:pPr marL="285840" indent="-281880">
               <a:lnSpc>
                 <a:spcPct val="100000"/>
               </a:lnSpc>
@@ -8615,7 +8631,7 @@
         <p:spPr>
           <a:xfrm>
             <a:off x="6995520" y="1949760"/>
-            <a:ext cx="851040" cy="851040"/>
+            <a:ext cx="850680" cy="850680"/>
           </a:xfrm>
           <a:prstGeom prst="rect">
             <a:avLst/>
@@ -8638,7 +8654,7 @@
         <p:spPr>
           <a:xfrm>
             <a:off x="6829560" y="4303080"/>
-            <a:ext cx="1177560" cy="469800"/>
+            <a:ext cx="1177200" cy="469440"/>
           </a:xfrm>
           <a:prstGeom prst="rect">
             <a:avLst/>
@@ -8661,7 +8677,7 @@
         <p:spPr>
           <a:xfrm>
             <a:off x="6951960" y="2903040"/>
-            <a:ext cx="894600" cy="1036800"/>
+            <a:ext cx="894240" cy="1036440"/>
           </a:xfrm>
           <a:prstGeom prst="rect">
             <a:avLst/>
@@ -8684,7 +8700,7 @@
         <p:spPr>
           <a:xfrm>
             <a:off x="2616120" y="2071080"/>
-            <a:ext cx="910800" cy="910800"/>
+            <a:ext cx="910440" cy="910440"/>
           </a:xfrm>
           <a:prstGeom prst="rect">
             <a:avLst/>
@@ -8707,7 +8723,7 @@
         <p:spPr>
           <a:xfrm>
             <a:off x="2637000" y="3377160"/>
-            <a:ext cx="910800" cy="910800"/>
+            <a:ext cx="910440" cy="910440"/>
           </a:xfrm>
           <a:prstGeom prst="rect">
             <a:avLst/>
@@ -8726,7 +8742,7 @@
         <p:spPr>
           <a:xfrm rot="1192200">
             <a:off x="3944160" y="2677320"/>
-            <a:ext cx="974880" cy="480960"/>
+            <a:ext cx="974520" cy="480600"/>
           </a:xfrm>
           <a:prstGeom prst="rightArrow">
             <a:avLst>
@@ -8768,7 +8784,7 @@
         <p:spPr>
           <a:xfrm rot="20407800">
             <a:off x="3922920" y="3465360"/>
-            <a:ext cx="974880" cy="480960"/>
+            <a:ext cx="974520" cy="480600"/>
           </a:xfrm>
           <a:prstGeom prst="rightArrow">
             <a:avLst>
@@ -8810,7 +8826,7 @@
         <p:spPr>
           <a:xfrm rot="1192200">
             <a:off x="5698080" y="3785760"/>
-            <a:ext cx="974880" cy="480960"/>
+            <a:ext cx="974520" cy="480600"/>
           </a:xfrm>
           <a:prstGeom prst="rightArrow">
             <a:avLst>
@@ -8852,7 +8868,7 @@
         <p:spPr>
           <a:xfrm rot="20407800">
             <a:off x="5771160" y="2460960"/>
-            <a:ext cx="974880" cy="480960"/>
+            <a:ext cx="974520" cy="480600"/>
           </a:xfrm>
           <a:prstGeom prst="rightArrow">
             <a:avLst>
@@ -8894,7 +8910,7 @@
         <p:spPr>
           <a:xfrm>
             <a:off x="5849640" y="3121560"/>
-            <a:ext cx="974880" cy="480960"/>
+            <a:ext cx="974520" cy="480600"/>
           </a:xfrm>
           <a:prstGeom prst="rightArrow">
             <a:avLst>
@@ -8940,7 +8956,7 @@
         <p:spPr>
           <a:xfrm>
             <a:off x="4950720" y="2998800"/>
-            <a:ext cx="753120" cy="753120"/>
+            <a:ext cx="752760" cy="752760"/>
           </a:xfrm>
           <a:prstGeom prst="rect">
             <a:avLst/>
@@ -8981,7 +8997,7 @@
         <p:spPr>
           <a:xfrm>
             <a:off x="684360" y="4487400"/>
-            <a:ext cx="8530920" cy="1503360"/>
+            <a:ext cx="8530560" cy="1503000"/>
           </a:xfrm>
           <a:prstGeom prst="rect">
             <a:avLst/>
@@ -9030,7 +9046,7 @@
         <p:spPr>
           <a:xfrm>
             <a:off x="684360" y="685800"/>
-            <a:ext cx="8530920" cy="3611520"/>
+            <a:ext cx="8530560" cy="3611160"/>
           </a:xfrm>
           <a:prstGeom prst="rect">
             <a:avLst/>
@@ -9049,7 +9065,7 @@
         <p:txBody>
           <a:bodyPr lIns="90000" rIns="90000" tIns="45000" bIns="45000" anchor="ctr"/>
           <a:p>
-            <a:pPr marL="285840" indent="-282240">
+            <a:pPr marL="285840" indent="-281880">
               <a:lnSpc>
                 <a:spcPct val="100000"/>
               </a:lnSpc>
@@ -9175,7 +9191,7 @@
             </a:endParaRPr>
           </a:p>
           <a:p>
-            <a:pPr marL="285840" indent="-282240">
+            <a:pPr marL="285840" indent="-281880">
               <a:lnSpc>
                 <a:spcPct val="100000"/>
               </a:lnSpc>
@@ -9267,7 +9283,7 @@
         <p:spPr>
           <a:xfrm>
             <a:off x="3562560" y="1395720"/>
-            <a:ext cx="910800" cy="910800"/>
+            <a:ext cx="910440" cy="910440"/>
           </a:xfrm>
           <a:prstGeom prst="rect">
             <a:avLst/>
@@ -9290,7 +9306,7 @@
         <p:spPr>
           <a:xfrm>
             <a:off x="6678360" y="1395720"/>
-            <a:ext cx="910800" cy="910800"/>
+            <a:ext cx="910440" cy="910440"/>
           </a:xfrm>
           <a:prstGeom prst="rect">
             <a:avLst/>
@@ -9313,7 +9329,7 @@
         <p:spPr>
           <a:xfrm>
             <a:off x="7042320" y="3904200"/>
-            <a:ext cx="910800" cy="910800"/>
+            <a:ext cx="910440" cy="910440"/>
           </a:xfrm>
           <a:prstGeom prst="rect">
             <a:avLst/>
@@ -9336,7 +9352,7 @@
         <p:spPr>
           <a:xfrm>
             <a:off x="3562560" y="3904200"/>
-            <a:ext cx="910800" cy="910800"/>
+            <a:ext cx="910440" cy="910440"/>
           </a:xfrm>
           <a:prstGeom prst="rect">
             <a:avLst/>
@@ -9359,7 +9375,7 @@
         <p:spPr>
           <a:xfrm>
             <a:off x="6678360" y="1395720"/>
-            <a:ext cx="910800" cy="910800"/>
+            <a:ext cx="910440" cy="910440"/>
           </a:xfrm>
           <a:prstGeom prst="rect">
             <a:avLst/>
@@ -9382,7 +9398,7 @@
         <p:spPr>
           <a:xfrm>
             <a:off x="4113000" y="2039400"/>
-            <a:ext cx="910800" cy="910800"/>
+            <a:ext cx="910440" cy="910440"/>
           </a:xfrm>
           <a:prstGeom prst="rect">
             <a:avLst/>
@@ -9405,7 +9421,7 @@
         <p:spPr>
           <a:xfrm>
             <a:off x="7296480" y="2133000"/>
-            <a:ext cx="910800" cy="910800"/>
+            <a:ext cx="910440" cy="910440"/>
           </a:xfrm>
           <a:prstGeom prst="rect">
             <a:avLst/>
@@ -9424,7 +9440,7 @@
         <p:spPr>
           <a:xfrm>
             <a:off x="5285160" y="1920960"/>
-            <a:ext cx="1179360" cy="541800"/>
+            <a:ext cx="1179000" cy="541440"/>
           </a:xfrm>
           <a:prstGeom prst="rightArrow">
             <a:avLst>
@@ -9466,7 +9482,7 @@
         <p:spPr>
           <a:xfrm>
             <a:off x="5149440" y="4088880"/>
-            <a:ext cx="1179360" cy="541800"/>
+            <a:ext cx="1179000" cy="541440"/>
           </a:xfrm>
           <a:prstGeom prst="rightArrow">
             <a:avLst>
@@ -9531,7 +9547,7 @@
         <p:spPr>
           <a:xfrm>
             <a:off x="4895280" y="2388600"/>
-            <a:ext cx="2704320" cy="361440"/>
+            <a:ext cx="2703960" cy="361080"/>
           </a:xfrm>
           <a:prstGeom prst="rect">
             <a:avLst/>
@@ -9580,7 +9596,7 @@
         <p:spPr>
           <a:xfrm>
             <a:off x="5027400" y="4575240"/>
-            <a:ext cx="2324160" cy="361440"/>
+            <a:ext cx="2323800" cy="361080"/>
           </a:xfrm>
           <a:prstGeom prst="rect">
             <a:avLst/>
@@ -9651,7 +9667,7 @@
         <p:spPr>
           <a:xfrm>
             <a:off x="684360" y="4487400"/>
-            <a:ext cx="8530920" cy="1503360"/>
+            <a:ext cx="8530560" cy="1503000"/>
           </a:xfrm>
           <a:prstGeom prst="rect">
             <a:avLst/>
@@ -9700,7 +9716,7 @@
         <p:spPr>
           <a:xfrm>
             <a:off x="684360" y="685800"/>
-            <a:ext cx="8530920" cy="3611520"/>
+            <a:ext cx="8530560" cy="3611160"/>
           </a:xfrm>
           <a:prstGeom prst="rect">
             <a:avLst/>
@@ -9719,7 +9735,7 @@
         <p:txBody>
           <a:bodyPr lIns="90000" rIns="90000" tIns="45000" bIns="45000" anchor="ctr"/>
           <a:p>
-            <a:pPr marL="285840" indent="-282240">
+            <a:pPr marL="285840" indent="-281880">
               <a:lnSpc>
                 <a:spcPct val="100000"/>
               </a:lnSpc>
@@ -9841,7 +9857,7 @@
         <p:spPr>
           <a:xfrm>
             <a:off x="1863000" y="3157920"/>
-            <a:ext cx="910800" cy="910800"/>
+            <a:ext cx="910440" cy="910440"/>
           </a:xfrm>
           <a:prstGeom prst="rect">
             <a:avLst/>
@@ -9864,7 +9880,7 @@
         <p:spPr>
           <a:xfrm>
             <a:off x="2413440" y="3801600"/>
-            <a:ext cx="910800" cy="910800"/>
+            <a:ext cx="910440" cy="910440"/>
           </a:xfrm>
           <a:prstGeom prst="rect">
             <a:avLst/>
@@ -9887,7 +9903,7 @@
         <p:spPr>
           <a:xfrm>
             <a:off x="7197480" y="3439800"/>
-            <a:ext cx="910800" cy="910800"/>
+            <a:ext cx="910440" cy="910440"/>
           </a:xfrm>
           <a:prstGeom prst="rect">
             <a:avLst/>
@@ -9910,7 +9926,7 @@
         <p:spPr>
           <a:xfrm>
             <a:off x="4758840" y="3366360"/>
-            <a:ext cx="910800" cy="910800"/>
+            <a:ext cx="910440" cy="910440"/>
           </a:xfrm>
           <a:prstGeom prst="rect">
             <a:avLst/>
@@ -9929,7 +9945,7 @@
         <p:spPr>
           <a:xfrm>
             <a:off x="3568680" y="3429000"/>
-            <a:ext cx="933840" cy="910800"/>
+            <a:ext cx="933480" cy="910440"/>
           </a:xfrm>
           <a:prstGeom prst="mathPlus">
             <a:avLst>
@@ -9967,7 +9983,7 @@
         <p:spPr>
           <a:xfrm>
             <a:off x="6095880" y="3654360"/>
-            <a:ext cx="734760" cy="562680"/>
+            <a:ext cx="734400" cy="562320"/>
           </a:xfrm>
           <a:prstGeom prst="mathEqual">
             <a:avLst>
@@ -10028,7 +10044,7 @@
         <p:spPr>
           <a:xfrm>
             <a:off x="4750920" y="2898360"/>
-            <a:ext cx="2686320" cy="3716280"/>
+            <a:ext cx="2685960" cy="3715920"/>
           </a:xfrm>
           <a:prstGeom prst="rect">
             <a:avLst/>
@@ -10071,7 +10087,7 @@
         <p:spPr>
           <a:xfrm>
             <a:off x="684360" y="4487400"/>
-            <a:ext cx="8530920" cy="1503360"/>
+            <a:ext cx="8530560" cy="1503000"/>
           </a:xfrm>
           <a:prstGeom prst="rect">
             <a:avLst/>
@@ -10120,7 +10136,7 @@
         <p:spPr>
           <a:xfrm>
             <a:off x="684360" y="685800"/>
-            <a:ext cx="8530920" cy="3611520"/>
+            <a:ext cx="8530560" cy="3611160"/>
           </a:xfrm>
           <a:prstGeom prst="rect">
             <a:avLst/>
@@ -10139,7 +10155,7 @@
         <p:txBody>
           <a:bodyPr lIns="90000" rIns="90000" tIns="45000" bIns="45000" anchor="ctr"/>
           <a:p>
-            <a:pPr marL="285840" indent="-282240">
+            <a:pPr marL="285840" indent="-281880">
               <a:lnSpc>
                 <a:spcPct val="100000"/>
               </a:lnSpc>
@@ -10275,7 +10291,7 @@
         <p:spPr>
           <a:xfrm>
             <a:off x="4843440" y="2989800"/>
-            <a:ext cx="638280" cy="638280"/>
+            <a:ext cx="637920" cy="637920"/>
           </a:xfrm>
           <a:prstGeom prst="rect">
             <a:avLst/>
@@ -10298,7 +10314,7 @@
         <p:spPr>
           <a:xfrm>
             <a:off x="5028120" y="4248360"/>
-            <a:ext cx="910800" cy="910800"/>
+            <a:ext cx="910440" cy="910440"/>
           </a:xfrm>
           <a:prstGeom prst="rect">
             <a:avLst/>
@@ -10321,7 +10337,7 @@
         <p:spPr>
           <a:xfrm>
             <a:off x="5506200" y="5025240"/>
-            <a:ext cx="910800" cy="910800"/>
+            <a:ext cx="910440" cy="910440"/>
           </a:xfrm>
           <a:prstGeom prst="rect">
             <a:avLst/>
@@ -10344,7 +10360,7 @@
         <p:spPr>
           <a:xfrm>
             <a:off x="6042600" y="4248360"/>
-            <a:ext cx="910800" cy="910800"/>
+            <a:ext cx="910440" cy="910440"/>
           </a:xfrm>
           <a:prstGeom prst="rect">
             <a:avLst/>
@@ -10367,7 +10383,7 @@
         <p:spPr>
           <a:xfrm>
             <a:off x="7944480" y="2602440"/>
-            <a:ext cx="910800" cy="910800"/>
+            <a:ext cx="910440" cy="910440"/>
           </a:xfrm>
           <a:prstGeom prst="rect">
             <a:avLst/>
@@ -10390,7 +10406,7 @@
         <p:spPr>
           <a:xfrm>
             <a:off x="6671160" y="3059640"/>
-            <a:ext cx="568080" cy="568080"/>
+            <a:ext cx="567720" cy="567720"/>
           </a:xfrm>
           <a:prstGeom prst="rect">
             <a:avLst/>
@@ -10413,7 +10429,7 @@
         <p:spPr>
           <a:xfrm>
             <a:off x="2973240" y="3863520"/>
-            <a:ext cx="910800" cy="910800"/>
+            <a:ext cx="910440" cy="910440"/>
           </a:xfrm>
           <a:prstGeom prst="rect">
             <a:avLst/>
@@ -10432,7 +10448,7 @@
         <p:spPr>
           <a:xfrm>
             <a:off x="4012560" y="4487400"/>
-            <a:ext cx="1490040" cy="853560"/>
+            <a:ext cx="1489680" cy="853200"/>
           </a:xfrm>
           <a:custGeom>
             <a:avLst/>
@@ -10484,7 +10500,7 @@
         <p:spPr>
           <a:xfrm>
             <a:off x="4012560" y="4248360"/>
-            <a:ext cx="2026440" cy="235440"/>
+            <a:ext cx="2026080" cy="235080"/>
           </a:xfrm>
           <a:custGeom>
             <a:avLst/>
@@ -10536,7 +10552,7 @@
         <p:spPr>
           <a:xfrm>
             <a:off x="4012560" y="4367880"/>
-            <a:ext cx="935280" cy="236160"/>
+            <a:ext cx="934920" cy="235800"/>
           </a:xfrm>
           <a:custGeom>
             <a:avLst/>
@@ -10587,8 +10603,8 @@
         </p:nvSpPr>
         <p:spPr>
           <a:xfrm flipV="1">
-            <a:off x="7242840" y="3219120"/>
-            <a:ext cx="626040" cy="119520"/>
+            <a:off x="7242840" y="3218400"/>
+            <a:ext cx="625680" cy="119160"/>
           </a:xfrm>
           <a:custGeom>
             <a:avLst/>
@@ -10663,7 +10679,7 @@
         <p:spPr>
           <a:xfrm>
             <a:off x="684360" y="4487400"/>
-            <a:ext cx="8530920" cy="1503360"/>
+            <a:ext cx="8530560" cy="1503000"/>
           </a:xfrm>
           <a:prstGeom prst="rect">
             <a:avLst/>
@@ -10712,7 +10728,7 @@
         <p:spPr>
           <a:xfrm>
             <a:off x="684360" y="685800"/>
-            <a:ext cx="8530920" cy="3611520"/>
+            <a:ext cx="8530560" cy="3611160"/>
           </a:xfrm>
           <a:prstGeom prst="rect">
             <a:avLst/>
@@ -10731,7 +10747,7 @@
         <p:txBody>
           <a:bodyPr lIns="90000" rIns="90000" tIns="45000" bIns="45000" anchor="ctr"/>
           <a:p>
-            <a:pPr marL="285840" indent="-282240">
+            <a:pPr marL="285840" indent="-281880">
               <a:lnSpc>
                 <a:spcPct val="100000"/>
               </a:lnSpc>
@@ -10899,7 +10915,7 @@
         <p:spPr>
           <a:xfrm>
             <a:off x="5430600" y="2730600"/>
-            <a:ext cx="2686320" cy="3716280"/>
+            <a:ext cx="2685960" cy="3715920"/>
           </a:xfrm>
           <a:prstGeom prst="rect">
             <a:avLst/>
@@ -10946,7 +10962,7 @@
         <p:spPr>
           <a:xfrm>
             <a:off x="5523120" y="2822040"/>
-            <a:ext cx="638280" cy="638280"/>
+            <a:ext cx="637920" cy="637920"/>
           </a:xfrm>
           <a:prstGeom prst="rect">
             <a:avLst/>
@@ -10969,7 +10985,7 @@
         <p:spPr>
           <a:xfrm>
             <a:off x="5707800" y="4080600"/>
-            <a:ext cx="910800" cy="910800"/>
+            <a:ext cx="910440" cy="910440"/>
           </a:xfrm>
           <a:prstGeom prst="rect">
             <a:avLst/>
@@ -10992,7 +11008,7 @@
         <p:spPr>
           <a:xfrm>
             <a:off x="6185880" y="4857480"/>
-            <a:ext cx="910800" cy="910800"/>
+            <a:ext cx="910440" cy="910440"/>
           </a:xfrm>
           <a:prstGeom prst="rect">
             <a:avLst/>
@@ -11015,7 +11031,7 @@
         <p:spPr>
           <a:xfrm>
             <a:off x="6722280" y="4080600"/>
-            <a:ext cx="910800" cy="910800"/>
+            <a:ext cx="910440" cy="910440"/>
           </a:xfrm>
           <a:prstGeom prst="rect">
             <a:avLst/>
@@ -11038,7 +11054,7 @@
         <p:spPr>
           <a:xfrm>
             <a:off x="3652920" y="3695760"/>
-            <a:ext cx="910800" cy="910800"/>
+            <a:ext cx="910440" cy="910440"/>
           </a:xfrm>
           <a:prstGeom prst="rect">
             <a:avLst/>
@@ -11057,7 +11073,7 @@
         <p:spPr>
           <a:xfrm>
             <a:off x="4692240" y="4319640"/>
-            <a:ext cx="1490040" cy="853560"/>
+            <a:ext cx="1489680" cy="853200"/>
           </a:xfrm>
           <a:custGeom>
             <a:avLst/>
@@ -11109,7 +11125,7 @@
         <p:spPr>
           <a:xfrm>
             <a:off x="4692240" y="4080600"/>
-            <a:ext cx="2026440" cy="235440"/>
+            <a:ext cx="2026080" cy="235080"/>
           </a:xfrm>
           <a:custGeom>
             <a:avLst/>
@@ -11161,7 +11177,7 @@
         <p:spPr>
           <a:xfrm>
             <a:off x="4692240" y="4200120"/>
-            <a:ext cx="935280" cy="236160"/>
+            <a:ext cx="934920" cy="235800"/>
           </a:xfrm>
           <a:custGeom>
             <a:avLst/>
@@ -11217,7 +11233,7 @@
         <p:spPr>
           <a:xfrm>
             <a:off x="9653760" y="3605400"/>
-            <a:ext cx="910800" cy="910800"/>
+            <a:ext cx="910440" cy="910440"/>
           </a:xfrm>
           <a:prstGeom prst="rect">
             <a:avLst/>
@@ -11235,8 +11251,8 @@
         </p:nvSpPr>
         <p:spPr>
           <a:xfrm rot="10325400">
-            <a:off x="7857720" y="4106880"/>
-            <a:ext cx="1782360" cy="304200"/>
+            <a:off x="7858080" y="4106880"/>
+            <a:ext cx="1782000" cy="303840"/>
           </a:xfrm>
           <a:prstGeom prst="rightArrow">
             <a:avLst>
@@ -11300,7 +11316,7 @@
         <p:spPr>
           <a:xfrm>
             <a:off x="684360" y="4487400"/>
-            <a:ext cx="8530920" cy="1503360"/>
+            <a:ext cx="8530560" cy="1503000"/>
           </a:xfrm>
           <a:prstGeom prst="rect">
             <a:avLst/>
@@ -11349,7 +11365,7 @@
         <p:spPr>
           <a:xfrm>
             <a:off x="684360" y="685800"/>
-            <a:ext cx="8530920" cy="3611520"/>
+            <a:ext cx="8530560" cy="3611160"/>
           </a:xfrm>
           <a:prstGeom prst="rect">
             <a:avLst/>
@@ -11379,7 +11395,7 @@
         <p:spPr>
           <a:xfrm>
             <a:off x="4069440" y="82800"/>
-            <a:ext cx="4042800" cy="2843280"/>
+            <a:ext cx="4042440" cy="2842920"/>
           </a:xfrm>
           <a:prstGeom prst="rect">
             <a:avLst/>
@@ -11402,7 +11418,7 @@
         <p:spPr>
           <a:xfrm>
             <a:off x="83880" y="3103560"/>
-            <a:ext cx="3863880" cy="1640880"/>
+            <a:ext cx="3863520" cy="1640520"/>
           </a:xfrm>
           <a:prstGeom prst="rect">
             <a:avLst/>
@@ -11425,7 +11441,7 @@
         <p:spPr>
           <a:xfrm>
             <a:off x="4161600" y="3103560"/>
-            <a:ext cx="3863880" cy="1640880"/>
+            <a:ext cx="3863520" cy="1640520"/>
           </a:xfrm>
           <a:prstGeom prst="rect">
             <a:avLst/>
@@ -11448,7 +11464,7 @@
         <p:spPr>
           <a:xfrm>
             <a:off x="8230320" y="3103560"/>
-            <a:ext cx="3863880" cy="1640880"/>
+            <a:ext cx="3863520" cy="1640520"/>
           </a:xfrm>
           <a:prstGeom prst="rect">
             <a:avLst/>
@@ -11467,7 +11483,7 @@
         <p:spPr>
           <a:xfrm>
             <a:off x="3993840" y="3766680"/>
-            <a:ext cx="147600" cy="315720"/>
+            <a:ext cx="147240" cy="315360"/>
           </a:xfrm>
           <a:prstGeom prst="rightArrow">
             <a:avLst>
@@ -11506,7 +11522,7 @@
         <p:spPr>
           <a:xfrm>
             <a:off x="8073360" y="3793320"/>
-            <a:ext cx="128520" cy="315720"/>
+            <a:ext cx="128160" cy="315360"/>
           </a:xfrm>
           <a:prstGeom prst="rightArrow">
             <a:avLst>
@@ -11545,7 +11561,7 @@
         <p:spPr>
           <a:xfrm>
             <a:off x="2701080" y="5176080"/>
-            <a:ext cx="1833480" cy="919080"/>
+            <a:ext cx="1833120" cy="918720"/>
           </a:xfrm>
           <a:prstGeom prst="wedgeRectCallout">
             <a:avLst>
@@ -11610,7 +11626,7 @@
         <p:spPr>
           <a:xfrm>
             <a:off x="6722640" y="5196600"/>
-            <a:ext cx="1964880" cy="822240"/>
+            <a:ext cx="1964520" cy="821880"/>
           </a:xfrm>
           <a:prstGeom prst="wedgeRectCallout">
             <a:avLst>
@@ -11675,7 +11691,7 @@
         <p:spPr>
           <a:xfrm>
             <a:off x="9731160" y="5131440"/>
-            <a:ext cx="2102040" cy="653040"/>
+            <a:ext cx="2101680" cy="652680"/>
           </a:xfrm>
           <a:prstGeom prst="wedgeRectCallout">
             <a:avLst>
@@ -11740,7 +11756,7 @@
         <p:spPr>
           <a:xfrm>
             <a:off x="5033520" y="2516760"/>
-            <a:ext cx="2571840" cy="361440"/>
+            <a:ext cx="2571480" cy="361080"/>
           </a:xfrm>
           <a:prstGeom prst="rect">
             <a:avLst/>
@@ -11788,8 +11804,8 @@
         </p:nvSpPr>
         <p:spPr>
           <a:xfrm rot="16200000">
-            <a:off x="3177360" y="1268640"/>
-            <a:ext cx="1960920" cy="361440"/>
+            <a:off x="3177360" y="1269000"/>
+            <a:ext cx="1960560" cy="361080"/>
           </a:xfrm>
           <a:prstGeom prst="rect">
             <a:avLst/>
@@ -11860,7 +11876,7 @@
         <p:spPr>
           <a:xfrm>
             <a:off x="684360" y="4487400"/>
-            <a:ext cx="8530920" cy="1503360"/>
+            <a:ext cx="8530560" cy="1503000"/>
           </a:xfrm>
           <a:prstGeom prst="rect">
             <a:avLst/>
@@ -11911,9 +11927,9 @@
         <p:grpSpPr>
           <a:xfrm>
             <a:off x="948240" y="823320"/>
-            <a:ext cx="10288800" cy="3336120"/>
+            <a:ext cx="10288440" cy="3335760"/>
             <a:chOff x="948240" y="823320"/>
-            <a:chExt cx="10288800" cy="3336120"/>
+            <a:chExt cx="10288440" cy="3335760"/>
           </a:xfrm>
         </p:grpSpPr>
         <p:sp>
@@ -11925,7 +11941,7 @@
           <p:spPr>
             <a:xfrm>
               <a:off x="948240" y="823320"/>
-              <a:ext cx="1359000" cy="1359000"/>
+              <a:ext cx="1358640" cy="1358640"/>
             </a:xfrm>
             <a:prstGeom prst="ellipse">
               <a:avLst/>
@@ -11958,7 +11974,7 @@
           <p:spPr>
             <a:xfrm>
               <a:off x="1234440" y="1109520"/>
-              <a:ext cx="786600" cy="786600"/>
+              <a:ext cx="786240" cy="786240"/>
             </a:xfrm>
             <a:prstGeom prst="rect">
               <a:avLst/>
@@ -11989,7 +12005,7 @@
           <p:spPr>
             <a:xfrm>
               <a:off x="2602800" y="823320"/>
-              <a:ext cx="3208320" cy="1359000"/>
+              <a:ext cx="3207960" cy="1358640"/>
             </a:xfrm>
             <a:prstGeom prst="rect">
               <a:avLst/>
@@ -12041,7 +12057,7 @@
           <p:spPr>
             <a:xfrm>
               <a:off x="6374160" y="823320"/>
-              <a:ext cx="1359000" cy="1359000"/>
+              <a:ext cx="1358640" cy="1358640"/>
             </a:xfrm>
             <a:prstGeom prst="ellipse">
               <a:avLst/>
@@ -12074,7 +12090,7 @@
           <p:spPr>
             <a:xfrm>
               <a:off x="6660360" y="1109520"/>
-              <a:ext cx="786600" cy="786600"/>
+              <a:ext cx="786240" cy="786240"/>
             </a:xfrm>
             <a:prstGeom prst="rect">
               <a:avLst/>
@@ -12105,7 +12121,7 @@
           <p:spPr>
             <a:xfrm>
               <a:off x="8028720" y="823320"/>
-              <a:ext cx="3208320" cy="1359000"/>
+              <a:ext cx="3207960" cy="1358640"/>
             </a:xfrm>
             <a:prstGeom prst="rect">
               <a:avLst/>
@@ -12157,7 +12173,7 @@
           <p:spPr>
             <a:xfrm>
               <a:off x="948240" y="2800440"/>
-              <a:ext cx="1359000" cy="1359000"/>
+              <a:ext cx="1358640" cy="1358640"/>
             </a:xfrm>
             <a:prstGeom prst="ellipse">
               <a:avLst/>
@@ -12190,7 +12206,7 @@
           <p:spPr>
             <a:xfrm>
               <a:off x="1234440" y="3086640"/>
-              <a:ext cx="786600" cy="786600"/>
+              <a:ext cx="786240" cy="786240"/>
             </a:xfrm>
             <a:prstGeom prst="rect">
               <a:avLst/>
@@ -12221,7 +12237,7 @@
           <p:spPr>
             <a:xfrm>
               <a:off x="2602800" y="2800440"/>
-              <a:ext cx="3208320" cy="1359000"/>
+              <a:ext cx="3207960" cy="1358640"/>
             </a:xfrm>
             <a:prstGeom prst="rect">
               <a:avLst/>
@@ -12273,7 +12289,7 @@
           <p:spPr>
             <a:xfrm>
               <a:off x="6374160" y="2800440"/>
-              <a:ext cx="1359000" cy="1359000"/>
+              <a:ext cx="1358640" cy="1358640"/>
             </a:xfrm>
             <a:prstGeom prst="ellipse">
               <a:avLst/>
@@ -12306,7 +12322,7 @@
           <p:spPr>
             <a:xfrm>
               <a:off x="6660360" y="3086640"/>
-              <a:ext cx="786600" cy="786600"/>
+              <a:ext cx="786240" cy="786240"/>
             </a:xfrm>
             <a:prstGeom prst="rect">
               <a:avLst/>
@@ -12337,7 +12353,7 @@
           <p:spPr>
             <a:xfrm>
               <a:off x="8028720" y="2800440"/>
-              <a:ext cx="3208320" cy="1359000"/>
+              <a:ext cx="3207960" cy="1358640"/>
             </a:xfrm>
             <a:prstGeom prst="rect">
               <a:avLst/>
@@ -12427,7 +12443,7 @@
         <p:spPr>
           <a:xfrm>
             <a:off x="0" y="0"/>
-            <a:ext cx="12188520" cy="6854400"/>
+            <a:ext cx="12188160" cy="6854040"/>
           </a:xfrm>
           <a:prstGeom prst="rect">
             <a:avLst/>
@@ -12480,7 +12496,7 @@
         <p:spPr>
           <a:xfrm>
             <a:off x="0" y="0"/>
-            <a:ext cx="8126280" cy="6854400"/>
+            <a:ext cx="8125920" cy="6854040"/>
           </a:xfrm>
           <a:prstGeom prst="snip2DiagRect">
             <a:avLst>
@@ -12702,7 +12718,7 @@
         <p:spPr>
           <a:xfrm>
             <a:off x="8588520" y="941400"/>
-            <a:ext cx="3040200" cy="3245040"/>
+            <a:ext cx="3039840" cy="3244680"/>
           </a:xfrm>
           <a:prstGeom prst="rect">
             <a:avLst/>
@@ -12753,9 +12769,9 @@
         <p:grpSpPr>
           <a:xfrm>
             <a:off x="952560" y="2104200"/>
-            <a:ext cx="6162840" cy="2439720"/>
+            <a:ext cx="6162480" cy="2439360"/>
             <a:chOff x="952560" y="2104200"/>
-            <a:chExt cx="6162840" cy="2439720"/>
+            <a:chExt cx="6162480" cy="2439360"/>
           </a:xfrm>
         </p:grpSpPr>
         <p:sp>
@@ -12767,7 +12783,7 @@
           <p:spPr>
             <a:xfrm>
               <a:off x="952560" y="2104200"/>
-              <a:ext cx="812880" cy="812880"/>
+              <a:ext cx="812520" cy="812520"/>
             </a:xfrm>
             <a:prstGeom prst="ellipse">
               <a:avLst/>
@@ -12800,7 +12816,7 @@
           <p:spPr>
             <a:xfrm>
               <a:off x="1123920" y="2275560"/>
-              <a:ext cx="469800" cy="469800"/>
+              <a:ext cx="469440" cy="469440"/>
             </a:xfrm>
             <a:prstGeom prst="rect">
               <a:avLst/>
@@ -12831,7 +12847,7 @@
           <p:spPr>
             <a:xfrm>
               <a:off x="1944000" y="2104200"/>
-              <a:ext cx="1920600" cy="812880"/>
+              <a:ext cx="1920240" cy="812520"/>
             </a:xfrm>
             <a:prstGeom prst="rect">
               <a:avLst/>
@@ -12883,7 +12899,7 @@
           <p:spPr>
             <a:xfrm>
               <a:off x="4203360" y="2104200"/>
-              <a:ext cx="812880" cy="812880"/>
+              <a:ext cx="812520" cy="812520"/>
             </a:xfrm>
             <a:prstGeom prst="ellipse">
               <a:avLst/>
@@ -12916,7 +12932,7 @@
           <p:spPr>
             <a:xfrm>
               <a:off x="4375080" y="2275560"/>
-              <a:ext cx="469800" cy="469800"/>
+              <a:ext cx="469440" cy="469440"/>
             </a:xfrm>
             <a:prstGeom prst="rect">
               <a:avLst/>
@@ -12947,7 +12963,7 @@
           <p:spPr>
             <a:xfrm>
               <a:off x="5194800" y="2104200"/>
-              <a:ext cx="1920600" cy="812880"/>
+              <a:ext cx="1920240" cy="812520"/>
             </a:xfrm>
             <a:prstGeom prst="rect">
               <a:avLst/>
@@ -12999,7 +13015,7 @@
           <p:spPr>
             <a:xfrm>
               <a:off x="952560" y="3731040"/>
-              <a:ext cx="812880" cy="812880"/>
+              <a:ext cx="812520" cy="812520"/>
             </a:xfrm>
             <a:prstGeom prst="ellipse">
               <a:avLst/>
@@ -13032,7 +13048,7 @@
           <p:spPr>
             <a:xfrm>
               <a:off x="1123920" y="3902400"/>
-              <a:ext cx="469800" cy="469800"/>
+              <a:ext cx="469440" cy="469440"/>
             </a:xfrm>
             <a:prstGeom prst="rect">
               <a:avLst/>
@@ -13063,7 +13079,7 @@
           <p:spPr>
             <a:xfrm>
               <a:off x="1944000" y="3731040"/>
-              <a:ext cx="1920600" cy="812880"/>
+              <a:ext cx="1920240" cy="812520"/>
             </a:xfrm>
             <a:prstGeom prst="rect">
               <a:avLst/>
@@ -13115,7 +13131,7 @@
           <p:spPr>
             <a:xfrm>
               <a:off x="4203360" y="3731040"/>
-              <a:ext cx="812880" cy="812880"/>
+              <a:ext cx="812520" cy="812520"/>
             </a:xfrm>
             <a:prstGeom prst="ellipse">
               <a:avLst/>
@@ -13148,7 +13164,7 @@
           <p:spPr>
             <a:xfrm>
               <a:off x="4375080" y="3902400"/>
-              <a:ext cx="469800" cy="469800"/>
+              <a:ext cx="469440" cy="469440"/>
             </a:xfrm>
             <a:prstGeom prst="rect">
               <a:avLst/>
@@ -13179,7 +13195,7 @@
           <p:spPr>
             <a:xfrm>
               <a:off x="5194800" y="3731040"/>
-              <a:ext cx="1920600" cy="812880"/>
+              <a:ext cx="1920240" cy="812520"/>
             </a:xfrm>
             <a:prstGeom prst="rect">
               <a:avLst/>
@@ -13296,7 +13312,7 @@
         <p:spPr>
           <a:xfrm>
             <a:off x="684360" y="4487400"/>
-            <a:ext cx="8530920" cy="1503360"/>
+            <a:ext cx="8530560" cy="1503000"/>
           </a:xfrm>
           <a:prstGeom prst="rect">
             <a:avLst/>
@@ -13345,7 +13361,7 @@
         <p:spPr>
           <a:xfrm>
             <a:off x="684360" y="685800"/>
-            <a:ext cx="8530920" cy="3611520"/>
+            <a:ext cx="8530560" cy="3611160"/>
           </a:xfrm>
           <a:prstGeom prst="rect">
             <a:avLst/>
@@ -13364,7 +13380,7 @@
         <p:txBody>
           <a:bodyPr lIns="90000" rIns="90000" tIns="45000" bIns="45000" anchor="ctr"/>
           <a:p>
-            <a:pPr marL="285840" indent="-282240">
+            <a:pPr marL="285840" indent="-281880">
               <a:lnSpc>
                 <a:spcPct val="100000"/>
               </a:lnSpc>
@@ -13396,7 +13412,7 @@
             </a:endParaRPr>
           </a:p>
           <a:p>
-            <a:pPr marL="285840" indent="-282240">
+            <a:pPr marL="285840" indent="-281880">
               <a:lnSpc>
                 <a:spcPct val="100000"/>
               </a:lnSpc>
@@ -13428,7 +13444,7 @@
             </a:endParaRPr>
           </a:p>
           <a:p>
-            <a:pPr marL="285840" indent="-282240">
+            <a:pPr marL="285840" indent="-281880">
               <a:lnSpc>
                 <a:spcPct val="100000"/>
               </a:lnSpc>
@@ -13460,7 +13476,7 @@
             </a:endParaRPr>
           </a:p>
           <a:p>
-            <a:pPr marL="285840" indent="-282240">
+            <a:pPr marL="285840" indent="-281880">
               <a:lnSpc>
                 <a:spcPct val="100000"/>
               </a:lnSpc>
@@ -13524,7 +13540,7 @@
         <p:spPr>
           <a:xfrm>
             <a:off x="684360" y="4487400"/>
-            <a:ext cx="8530920" cy="1503360"/>
+            <a:ext cx="8530560" cy="1503000"/>
           </a:xfrm>
           <a:prstGeom prst="rect">
             <a:avLst/>
@@ -13577,7 +13593,7 @@
         <p:spPr>
           <a:xfrm>
             <a:off x="5221440" y="75600"/>
-            <a:ext cx="910800" cy="910800"/>
+            <a:ext cx="910440" cy="910440"/>
           </a:xfrm>
           <a:prstGeom prst="rect">
             <a:avLst/>
@@ -13600,7 +13616,7 @@
         <p:spPr>
           <a:xfrm>
             <a:off x="4695120" y="4444560"/>
-            <a:ext cx="910800" cy="910800"/>
+            <a:ext cx="910440" cy="910440"/>
           </a:xfrm>
           <a:prstGeom prst="rect">
             <a:avLst/>
@@ -13623,7 +13639,7 @@
         <p:spPr>
           <a:xfrm>
             <a:off x="2603880" y="2294640"/>
-            <a:ext cx="910800" cy="910800"/>
+            <a:ext cx="910440" cy="910440"/>
           </a:xfrm>
           <a:prstGeom prst="rect">
             <a:avLst/>
@@ -13646,7 +13662,7 @@
         <p:spPr>
           <a:xfrm>
             <a:off x="9767160" y="3294360"/>
-            <a:ext cx="910800" cy="910800"/>
+            <a:ext cx="910440" cy="910440"/>
           </a:xfrm>
           <a:prstGeom prst="rect">
             <a:avLst/>
@@ -13669,7 +13685,7 @@
         <p:spPr>
           <a:xfrm>
             <a:off x="1967760" y="3811680"/>
-            <a:ext cx="910800" cy="910800"/>
+            <a:ext cx="910440" cy="910440"/>
           </a:xfrm>
           <a:prstGeom prst="rect">
             <a:avLst/>
@@ -13692,7 +13708,7 @@
         <p:spPr>
           <a:xfrm>
             <a:off x="5221440" y="2907360"/>
-            <a:ext cx="910800" cy="910800"/>
+            <a:ext cx="910440" cy="910440"/>
           </a:xfrm>
           <a:prstGeom prst="rect">
             <a:avLst/>
@@ -13715,7 +13731,7 @@
         <p:spPr>
           <a:xfrm>
             <a:off x="1093680" y="3282480"/>
-            <a:ext cx="910800" cy="910800"/>
+            <a:ext cx="910440" cy="910440"/>
           </a:xfrm>
           <a:prstGeom prst="rect">
             <a:avLst/>
@@ -13738,7 +13754,7 @@
         <p:spPr>
           <a:xfrm>
             <a:off x="8595360" y="3808800"/>
-            <a:ext cx="910800" cy="910800"/>
+            <a:ext cx="910440" cy="910440"/>
           </a:xfrm>
           <a:prstGeom prst="rect">
             <a:avLst/>
@@ -13761,7 +13777,7 @@
         <p:spPr>
           <a:xfrm>
             <a:off x="7839000" y="2294640"/>
-            <a:ext cx="910800" cy="910800"/>
+            <a:ext cx="910440" cy="910440"/>
           </a:xfrm>
           <a:prstGeom prst="rect">
             <a:avLst/>
@@ -13780,7 +13796,7 @@
         <p:spPr>
           <a:xfrm>
             <a:off x="6312960" y="944640"/>
-            <a:ext cx="1522800" cy="1336680"/>
+            <a:ext cx="1522440" cy="1336320"/>
           </a:xfrm>
           <a:custGeom>
             <a:avLst/>
@@ -13833,7 +13849,7 @@
         <p:spPr>
           <a:xfrm>
             <a:off x="5678640" y="1145160"/>
-            <a:ext cx="360" cy="1603080"/>
+            <a:ext cx="360" cy="1602720"/>
           </a:xfrm>
           <a:custGeom>
             <a:avLst/>
@@ -13885,8 +13901,8 @@
         </p:nvSpPr>
         <p:spPr>
           <a:xfrm flipH="1">
-            <a:off x="3423240" y="990000"/>
-            <a:ext cx="1614240" cy="1377000"/>
+            <a:off x="3422520" y="990000"/>
+            <a:ext cx="1613880" cy="1376640"/>
           </a:xfrm>
           <a:custGeom>
             <a:avLst/>
@@ -13939,7 +13955,7 @@
         <p:spPr>
           <a:xfrm>
             <a:off x="2082960" y="3279600"/>
-            <a:ext cx="914040" cy="361440"/>
+            <a:ext cx="913680" cy="361080"/>
           </a:xfrm>
           <a:prstGeom prst="rect">
             <a:avLst/>
@@ -13988,7 +14004,7 @@
         <p:spPr>
           <a:xfrm>
             <a:off x="5227200" y="4030200"/>
-            <a:ext cx="926280" cy="361440"/>
+            <a:ext cx="925920" cy="361080"/>
           </a:xfrm>
           <a:prstGeom prst="rect">
             <a:avLst/>
@@ -14037,7 +14053,7 @@
         <p:spPr>
           <a:xfrm>
             <a:off x="8246520" y="3279600"/>
-            <a:ext cx="1252440" cy="361440"/>
+            <a:ext cx="1252080" cy="361080"/>
           </a:xfrm>
           <a:prstGeom prst="rect">
             <a:avLst/>
@@ -14086,7 +14102,7 @@
         <p:spPr>
           <a:xfrm>
             <a:off x="481680" y="348120"/>
-            <a:ext cx="1808640" cy="361440"/>
+            <a:ext cx="1808280" cy="361080"/>
           </a:xfrm>
           <a:prstGeom prst="rect">
             <a:avLst/>
@@ -14139,7 +14155,7 @@
         <p:spPr>
           <a:xfrm>
             <a:off x="5855760" y="4444560"/>
-            <a:ext cx="910800" cy="910800"/>
+            <a:ext cx="910440" cy="910440"/>
           </a:xfrm>
           <a:prstGeom prst="rect">
             <a:avLst/>
@@ -14180,7 +14196,7 @@
         <p:spPr>
           <a:xfrm>
             <a:off x="684360" y="4487400"/>
-            <a:ext cx="8530920" cy="1503360"/>
+            <a:ext cx="8530560" cy="1503000"/>
           </a:xfrm>
           <a:prstGeom prst="rect">
             <a:avLst/>
@@ -14233,7 +14249,7 @@
         <p:spPr>
           <a:xfrm>
             <a:off x="7839000" y="2560320"/>
-            <a:ext cx="1310760" cy="596520"/>
+            <a:ext cx="1310400" cy="596160"/>
           </a:xfrm>
           <a:prstGeom prst="rect">
             <a:avLst/>
@@ -14252,7 +14268,7 @@
         <p:spPr>
           <a:xfrm>
             <a:off x="480240" y="348120"/>
-            <a:ext cx="1788840" cy="361440"/>
+            <a:ext cx="1788480" cy="361080"/>
           </a:xfrm>
           <a:prstGeom prst="rect">
             <a:avLst/>
@@ -14301,7 +14317,7 @@
         <p:spPr>
           <a:xfrm>
             <a:off x="6384240" y="990000"/>
-            <a:ext cx="1522800" cy="1336680"/>
+            <a:ext cx="1522440" cy="1336320"/>
           </a:xfrm>
           <a:custGeom>
             <a:avLst/>
@@ -14354,7 +14370,7 @@
         <p:spPr>
           <a:xfrm>
             <a:off x="5678640" y="1145160"/>
-            <a:ext cx="360" cy="1603080"/>
+            <a:ext cx="360" cy="1602720"/>
           </a:xfrm>
           <a:custGeom>
             <a:avLst/>
@@ -14406,8 +14422,8 @@
         </p:nvSpPr>
         <p:spPr>
           <a:xfrm flipH="1">
-            <a:off x="3423240" y="990000"/>
-            <a:ext cx="1614240" cy="1377000"/>
+            <a:off x="3422520" y="990000"/>
+            <a:ext cx="1613880" cy="1376640"/>
           </a:xfrm>
           <a:custGeom>
             <a:avLst/>
@@ -14460,7 +14476,7 @@
         <p:spPr>
           <a:xfrm>
             <a:off x="2082960" y="3279600"/>
-            <a:ext cx="914040" cy="361440"/>
+            <a:ext cx="913680" cy="361080"/>
           </a:xfrm>
           <a:prstGeom prst="rect">
             <a:avLst/>
@@ -14509,7 +14525,7 @@
         <p:spPr>
           <a:xfrm>
             <a:off x="5227200" y="4030200"/>
-            <a:ext cx="926280" cy="361440"/>
+            <a:ext cx="925920" cy="361080"/>
           </a:xfrm>
           <a:prstGeom prst="rect">
             <a:avLst/>
@@ -14558,7 +14574,7 @@
         <p:spPr>
           <a:xfrm>
             <a:off x="8246520" y="3279600"/>
-            <a:ext cx="1252440" cy="361440"/>
+            <a:ext cx="1252080" cy="361080"/>
           </a:xfrm>
           <a:prstGeom prst="rect">
             <a:avLst/>
@@ -14611,7 +14627,7 @@
         <p:spPr>
           <a:xfrm>
             <a:off x="4979520" y="218880"/>
-            <a:ext cx="1329840" cy="615600"/>
+            <a:ext cx="1329480" cy="615240"/>
           </a:xfrm>
           <a:prstGeom prst="rect">
             <a:avLst/>
@@ -14634,7 +14650,7 @@
         <p:spPr>
           <a:xfrm>
             <a:off x="2102760" y="2514600"/>
-            <a:ext cx="1320480" cy="605880"/>
+            <a:ext cx="1320120" cy="605520"/>
           </a:xfrm>
           <a:prstGeom prst="rect">
             <a:avLst/>
@@ -14657,7 +14673,7 @@
         <p:spPr>
           <a:xfrm>
             <a:off x="4235760" y="3279600"/>
-            <a:ext cx="1310760" cy="596520"/>
+            <a:ext cx="1310400" cy="596160"/>
           </a:xfrm>
           <a:prstGeom prst="rect">
             <a:avLst/>
@@ -14680,7 +14696,7 @@
         <p:spPr>
           <a:xfrm>
             <a:off x="5833080" y="3279600"/>
-            <a:ext cx="1310760" cy="596520"/>
+            <a:ext cx="1310400" cy="596160"/>
           </a:xfrm>
           <a:prstGeom prst="rect">
             <a:avLst/>
@@ -14721,7 +14737,7 @@
         <p:spPr>
           <a:xfrm>
             <a:off x="684360" y="4487400"/>
-            <a:ext cx="8530920" cy="1503360"/>
+            <a:ext cx="8530560" cy="1503000"/>
           </a:xfrm>
           <a:prstGeom prst="rect">
             <a:avLst/>
@@ -14770,7 +14786,7 @@
         <p:spPr>
           <a:xfrm>
             <a:off x="684360" y="685800"/>
-            <a:ext cx="8530920" cy="3611520"/>
+            <a:ext cx="8530560" cy="3611160"/>
           </a:xfrm>
           <a:prstGeom prst="rect">
             <a:avLst/>
@@ -14789,7 +14805,7 @@
         <p:txBody>
           <a:bodyPr lIns="90000" rIns="90000" tIns="45000" bIns="45000" anchor="ctr"/>
           <a:p>
-            <a:pPr marL="285840" indent="-282240">
+            <a:pPr marL="285840" indent="-281880">
               <a:lnSpc>
                 <a:spcPct val="100000"/>
               </a:lnSpc>
@@ -14865,7 +14881,7 @@
         <p:spPr>
           <a:xfrm>
             <a:off x="666000" y="2574360"/>
-            <a:ext cx="4807080" cy="2970360"/>
+            <a:ext cx="4806720" cy="2970000"/>
           </a:xfrm>
           <a:prstGeom prst="roundRect">
             <a:avLst>
@@ -15015,7 +15031,7 @@
         <p:spPr>
           <a:xfrm>
             <a:off x="684360" y="5241960"/>
-            <a:ext cx="8530920" cy="1503360"/>
+            <a:ext cx="8530560" cy="1503000"/>
           </a:xfrm>
           <a:prstGeom prst="rect">
             <a:avLst/>
@@ -15064,7 +15080,7 @@
         <p:spPr>
           <a:xfrm>
             <a:off x="684360" y="685800"/>
-            <a:ext cx="10986480" cy="2284560"/>
+            <a:ext cx="10986120" cy="2284200"/>
           </a:xfrm>
           <a:prstGeom prst="rect">
             <a:avLst/>
@@ -15085,7 +15101,7 @@
             <a:normAutofit/>
           </a:bodyPr>
           <a:p>
-            <a:pPr marL="285840" indent="-282240">
+            <a:pPr marL="285840" indent="-281880">
               <a:lnSpc>
                 <a:spcPct val="100000"/>
               </a:lnSpc>
@@ -15167,7 +15183,7 @@
             </a:endParaRPr>
           </a:p>
           <a:p>
-            <a:pPr marL="285840" indent="-282240">
+            <a:pPr marL="285840" indent="-281880">
               <a:lnSpc>
                 <a:spcPct val="100000"/>
               </a:lnSpc>
@@ -15291,7 +15307,7 @@
         <p:spPr>
           <a:xfrm>
             <a:off x="2523960" y="3718800"/>
-            <a:ext cx="724680" cy="719640"/>
+            <a:ext cx="724320" cy="719280"/>
           </a:xfrm>
           <a:prstGeom prst="ellipse">
             <a:avLst/>
@@ -15359,7 +15375,7 @@
         <p:spPr>
           <a:xfrm>
             <a:off x="3363480" y="3303360"/>
-            <a:ext cx="1213920" cy="403560"/>
+            <a:ext cx="1213560" cy="403200"/>
           </a:xfrm>
           <a:prstGeom prst="ellipse">
             <a:avLst/>
@@ -15427,7 +15443,7 @@
         <p:spPr>
           <a:xfrm>
             <a:off x="744120" y="3208680"/>
-            <a:ext cx="1587240" cy="671760"/>
+            <a:ext cx="1586880" cy="671400"/>
           </a:xfrm>
           <a:prstGeom prst="ellipse">
             <a:avLst/>
@@ -15495,7 +15511,7 @@
         <p:spPr>
           <a:xfrm>
             <a:off x="2119680" y="4628880"/>
-            <a:ext cx="1526400" cy="671760"/>
+            <a:ext cx="1526040" cy="671400"/>
           </a:xfrm>
           <a:prstGeom prst="ellipse">
             <a:avLst/>
@@ -15563,7 +15579,7 @@
         <p:spPr>
           <a:xfrm>
             <a:off x="6819480" y="2574360"/>
-            <a:ext cx="4807080" cy="2970360"/>
+            <a:ext cx="4806720" cy="2970000"/>
           </a:xfrm>
           <a:prstGeom prst="roundRect">
             <a:avLst>
@@ -15713,7 +15729,7 @@
         <p:spPr>
           <a:xfrm>
             <a:off x="7103880" y="4147560"/>
-            <a:ext cx="4375440" cy="855720"/>
+            <a:ext cx="4375080" cy="855360"/>
           </a:xfrm>
           <a:prstGeom prst="ellipse">
             <a:avLst/>
@@ -15781,7 +15797,7 @@
         <p:spPr>
           <a:xfrm>
             <a:off x="9898200" y="3332520"/>
-            <a:ext cx="1213920" cy="403560"/>
+            <a:ext cx="1213560" cy="403200"/>
           </a:xfrm>
           <a:prstGeom prst="ellipse">
             <a:avLst/>
@@ -15849,7 +15865,7 @@
         <p:spPr>
           <a:xfrm>
             <a:off x="6965640" y="3288960"/>
-            <a:ext cx="1587240" cy="671760"/>
+            <a:ext cx="1586880" cy="671400"/>
           </a:xfrm>
           <a:prstGeom prst="ellipse">
             <a:avLst/>
@@ -15917,7 +15933,7 @@
         <p:spPr>
           <a:xfrm>
             <a:off x="8287920" y="2688120"/>
-            <a:ext cx="1870200" cy="671760"/>
+            <a:ext cx="1869840" cy="671400"/>
           </a:xfrm>
           <a:prstGeom prst="ellipse">
             <a:avLst/>
@@ -16034,7 +16050,7 @@
         <p:spPr>
           <a:xfrm>
             <a:off x="684360" y="4487400"/>
-            <a:ext cx="8530920" cy="1503360"/>
+            <a:ext cx="8530560" cy="1503000"/>
           </a:xfrm>
           <a:prstGeom prst="rect">
             <a:avLst/>
@@ -16083,7 +16099,7 @@
         <p:spPr>
           <a:xfrm>
             <a:off x="684360" y="685800"/>
-            <a:ext cx="11359080" cy="3611520"/>
+            <a:ext cx="11358720" cy="3611160"/>
           </a:xfrm>
           <a:prstGeom prst="rect">
             <a:avLst/>
@@ -16104,7 +16120,7 @@
             <a:normAutofit/>
           </a:bodyPr>
           <a:p>
-            <a:pPr marL="285840" indent="-282240">
+            <a:pPr marL="285840" indent="-281880">
               <a:lnSpc>
                 <a:spcPct val="100000"/>
               </a:lnSpc>
@@ -16146,7 +16162,7 @@
             </a:endParaRPr>
           </a:p>
           <a:p>
-            <a:pPr marL="285840" indent="-282240">
+            <a:pPr marL="285840" indent="-281880">
               <a:lnSpc>
                 <a:spcPct val="100000"/>
               </a:lnSpc>
@@ -16336,7 +16352,7 @@
             </a:endParaRPr>
           </a:p>
           <a:p>
-            <a:pPr marL="285840" indent="-282240">
+            <a:pPr marL="285840" indent="-281880">
               <a:lnSpc>
                 <a:spcPct val="100000"/>
               </a:lnSpc>
@@ -16368,7 +16384,7 @@
             </a:endParaRPr>
           </a:p>
           <a:p>
-            <a:pPr marL="285840" indent="-282240">
+            <a:pPr marL="285840" indent="-281880">
               <a:lnSpc>
                 <a:spcPct val="100000"/>
               </a:lnSpc>
@@ -16459,7 +16475,7 @@
         <p:spPr>
           <a:xfrm>
             <a:off x="684360" y="4487400"/>
-            <a:ext cx="8530920" cy="1503360"/>
+            <a:ext cx="8530560" cy="1503000"/>
           </a:xfrm>
           <a:prstGeom prst="rect">
             <a:avLst/>
@@ -16508,7 +16524,7 @@
         <p:spPr>
           <a:xfrm>
             <a:off x="684360" y="685800"/>
-            <a:ext cx="8530920" cy="3611520"/>
+            <a:ext cx="8530560" cy="3611160"/>
           </a:xfrm>
           <a:prstGeom prst="rect">
             <a:avLst/>
@@ -16527,7 +16543,7 @@
         <p:txBody>
           <a:bodyPr lIns="90000" rIns="90000" tIns="45000" bIns="45000" anchor="ctr"/>
           <a:p>
-            <a:pPr marL="285840" indent="-282240">
+            <a:pPr marL="285840" indent="-281880">
               <a:lnSpc>
                 <a:spcPct val="100000"/>
               </a:lnSpc>
@@ -16629,7 +16645,7 @@
             </a:endParaRPr>
           </a:p>
           <a:p>
-            <a:pPr marL="285840" indent="-282240">
+            <a:pPr marL="285840" indent="-281880">
               <a:lnSpc>
                 <a:spcPct val="100000"/>
               </a:lnSpc>
@@ -16731,7 +16747,7 @@
         <p:spPr>
           <a:xfrm>
             <a:off x="2521440" y="3979080"/>
-            <a:ext cx="1878480" cy="804240"/>
+            <a:ext cx="1878120" cy="803880"/>
           </a:xfrm>
           <a:prstGeom prst="rect">
             <a:avLst/>
@@ -16797,7 +16813,7 @@
         <p:spPr>
           <a:xfrm>
             <a:off x="5487840" y="3979080"/>
-            <a:ext cx="1878480" cy="804240"/>
+            <a:ext cx="1878120" cy="803880"/>
           </a:xfrm>
           <a:prstGeom prst="rect">
             <a:avLst/>
@@ -16863,7 +16879,7 @@
         <p:spPr>
           <a:xfrm>
             <a:off x="4004640" y="2771640"/>
-            <a:ext cx="1878480" cy="804240"/>
+            <a:ext cx="1878120" cy="803880"/>
           </a:xfrm>
           <a:prstGeom prst="rect">
             <a:avLst/>
@@ -16929,7 +16945,7 @@
         <p:spPr>
           <a:xfrm>
             <a:off x="4483080" y="4383000"/>
-            <a:ext cx="1001160" cy="360"/>
+            <a:ext cx="1000800" cy="360"/>
           </a:xfrm>
           <a:custGeom>
             <a:avLst/>
@@ -16981,7 +16997,7 @@
         <p:spPr>
           <a:xfrm>
             <a:off x="4985640" y="3657600"/>
-            <a:ext cx="360" cy="576000"/>
+            <a:ext cx="360" cy="575640"/>
           </a:xfrm>
           <a:custGeom>
             <a:avLst/>
@@ -17082,7 +17098,7 @@
         <p:spPr>
           <a:xfrm>
             <a:off x="0" y="0"/>
-            <a:ext cx="12188520" cy="6854400"/>
+            <a:ext cx="12188160" cy="6854040"/>
           </a:xfrm>
           <a:prstGeom prst="rect">
             <a:avLst/>
@@ -17135,7 +17151,7 @@
         <p:spPr>
           <a:xfrm>
             <a:off x="640440" y="685800"/>
-            <a:ext cx="4815000" cy="4600080"/>
+            <a:ext cx="4814640" cy="4599720"/>
           </a:xfrm>
           <a:prstGeom prst="rect">
             <a:avLst/>
@@ -17186,7 +17202,7 @@
         <p:spPr>
           <a:xfrm>
             <a:off x="6095880" y="0"/>
-            <a:ext cx="6092280" cy="6854400"/>
+            <a:ext cx="6091920" cy="6854040"/>
           </a:xfrm>
           <a:prstGeom prst="rect">
             <a:avLst/>
@@ -17224,7 +17240,7 @@
         <p:spPr>
           <a:xfrm>
             <a:off x="6625800" y="685800"/>
-            <a:ext cx="4875480" cy="4600080"/>
+            <a:ext cx="4875120" cy="4599720"/>
           </a:xfrm>
           <a:prstGeom prst="rect">
             <a:avLst/>
@@ -17245,7 +17261,7 @@
             <a:normAutofit/>
           </a:bodyPr>
           <a:p>
-            <a:pPr marL="285840" indent="-282240">
+            <a:pPr marL="285840" indent="-281880">
               <a:lnSpc>
                 <a:spcPct val="100000"/>
               </a:lnSpc>
@@ -17277,7 +17293,7 @@
             </a:endParaRPr>
           </a:p>
           <a:p>
-            <a:pPr marL="285840" indent="-282240">
+            <a:pPr marL="285840" indent="-281880">
               <a:lnSpc>
                 <a:spcPct val="100000"/>
               </a:lnSpc>
@@ -17309,7 +17325,7 @@
             </a:endParaRPr>
           </a:p>
           <a:p>
-            <a:pPr marL="285840" indent="-282240">
+            <a:pPr marL="285840" indent="-281880">
               <a:lnSpc>
                 <a:spcPct val="100000"/>
               </a:lnSpc>
@@ -17341,7 +17357,7 @@
             </a:endParaRPr>
           </a:p>
           <a:p>
-            <a:pPr marL="285840" indent="-282240">
+            <a:pPr marL="285840" indent="-281880">
               <a:lnSpc>
                 <a:spcPct val="100000"/>
               </a:lnSpc>
@@ -17432,7 +17448,7 @@
         <p:spPr>
           <a:xfrm>
             <a:off x="684360" y="4487400"/>
-            <a:ext cx="8530920" cy="1503360"/>
+            <a:ext cx="8530560" cy="1503000"/>
           </a:xfrm>
           <a:prstGeom prst="rect">
             <a:avLst/>
@@ -17481,7 +17497,7 @@
         <p:spPr>
           <a:xfrm>
             <a:off x="1044720" y="500040"/>
-            <a:ext cx="8260560" cy="3229200"/>
+            <a:ext cx="8260200" cy="3228840"/>
           </a:xfrm>
           <a:prstGeom prst="rect">
             <a:avLst/>
@@ -17500,7 +17516,7 @@
         <p:txBody>
           <a:bodyPr lIns="90000" rIns="90000" tIns="45000" bIns="45000" anchor="ctr"/>
           <a:p>
-            <a:pPr marL="285840" indent="-282240">
+            <a:pPr marL="285840" indent="-281880">
               <a:lnSpc>
                 <a:spcPct val="100000"/>
               </a:lnSpc>
@@ -17542,7 +17558,7 @@
             </a:endParaRPr>
           </a:p>
           <a:p>
-            <a:pPr marL="285840" indent="-282240">
+            <a:pPr marL="285840" indent="-281880">
               <a:lnSpc>
                 <a:spcPct val="100000"/>
               </a:lnSpc>
@@ -17594,7 +17610,7 @@
             </a:endParaRPr>
           </a:p>
           <a:p>
-            <a:pPr marL="285840" indent="-282240">
+            <a:pPr marL="285840" indent="-281880">
               <a:lnSpc>
                 <a:spcPct val="100000"/>
               </a:lnSpc>
@@ -17746,7 +17762,7 @@
         <p:spPr>
           <a:xfrm>
             <a:off x="7097760" y="1943280"/>
-            <a:ext cx="851040" cy="851040"/>
+            <a:ext cx="850680" cy="850680"/>
           </a:xfrm>
           <a:prstGeom prst="rect">
             <a:avLst/>
@@ -17769,7 +17785,7 @@
         <p:spPr>
           <a:xfrm>
             <a:off x="6931800" y="4296600"/>
-            <a:ext cx="1177560" cy="469800"/>
+            <a:ext cx="1177200" cy="469440"/>
           </a:xfrm>
           <a:prstGeom prst="rect">
             <a:avLst/>
@@ -17792,7 +17808,7 @@
         <p:spPr>
           <a:xfrm>
             <a:off x="7054200" y="2896920"/>
-            <a:ext cx="894600" cy="1036800"/>
+            <a:ext cx="894240" cy="1036440"/>
           </a:xfrm>
           <a:prstGeom prst="rect">
             <a:avLst/>
@@ -17815,7 +17831,7 @@
         <p:spPr>
           <a:xfrm>
             <a:off x="2718360" y="2064960"/>
-            <a:ext cx="910800" cy="910800"/>
+            <a:ext cx="910440" cy="910440"/>
           </a:xfrm>
           <a:prstGeom prst="rect">
             <a:avLst/>
@@ -17838,7 +17854,7 @@
         <p:spPr>
           <a:xfrm>
             <a:off x="2739240" y="3371040"/>
-            <a:ext cx="910800" cy="910800"/>
+            <a:ext cx="910440" cy="910440"/>
           </a:xfrm>
           <a:prstGeom prst="rect">
             <a:avLst/>
@@ -17861,7 +17877,7 @@
         <p:spPr>
           <a:xfrm>
             <a:off x="4908600" y="2852280"/>
-            <a:ext cx="910800" cy="910800"/>
+            <a:ext cx="910440" cy="910440"/>
           </a:xfrm>
           <a:prstGeom prst="rect">
             <a:avLst/>
@@ -17880,7 +17896,7 @@
         <p:spPr>
           <a:xfrm rot="1192200">
             <a:off x="4046760" y="2671200"/>
-            <a:ext cx="974880" cy="480960"/>
+            <a:ext cx="974520" cy="480600"/>
           </a:xfrm>
           <a:prstGeom prst="rightArrow">
             <a:avLst>
@@ -17922,7 +17938,7 @@
         <p:spPr>
           <a:xfrm rot="20407800">
             <a:off x="4025160" y="3459240"/>
-            <a:ext cx="974880" cy="480960"/>
+            <a:ext cx="974520" cy="480600"/>
           </a:xfrm>
           <a:prstGeom prst="rightArrow">
             <a:avLst>
@@ -17964,7 +17980,7 @@
         <p:spPr>
           <a:xfrm rot="1192200">
             <a:off x="5800320" y="3779640"/>
-            <a:ext cx="974880" cy="480960"/>
+            <a:ext cx="974520" cy="480600"/>
           </a:xfrm>
           <a:prstGeom prst="rightArrow">
             <a:avLst>
@@ -18006,7 +18022,7 @@
         <p:spPr>
           <a:xfrm rot="20407800">
             <a:off x="5873400" y="2454840"/>
-            <a:ext cx="974880" cy="480960"/>
+            <a:ext cx="974520" cy="480600"/>
           </a:xfrm>
           <a:prstGeom prst="rightArrow">
             <a:avLst>
@@ -18048,7 +18064,7 @@
         <p:spPr>
           <a:xfrm>
             <a:off x="5951880" y="3115440"/>
-            <a:ext cx="974880" cy="480960"/>
+            <a:ext cx="974520" cy="480600"/>
           </a:xfrm>
           <a:prstGeom prst="rightArrow">
             <a:avLst>
@@ -18139,7 +18155,7 @@
         <p:spPr>
           <a:xfrm>
             <a:off x="684360" y="4487400"/>
-            <a:ext cx="8530920" cy="1503360"/>
+            <a:ext cx="8530560" cy="1503000"/>
           </a:xfrm>
           <a:prstGeom prst="rect">
             <a:avLst/>
@@ -18188,7 +18204,7 @@
         <p:spPr>
           <a:xfrm>
             <a:off x="684360" y="685800"/>
-            <a:ext cx="8530920" cy="3611520"/>
+            <a:ext cx="8530560" cy="3611160"/>
           </a:xfrm>
           <a:prstGeom prst="rect">
             <a:avLst/>
@@ -18207,7 +18223,7 @@
         <p:txBody>
           <a:bodyPr lIns="90000" rIns="90000" tIns="45000" bIns="45000" anchor="ctr"/>
           <a:p>
-            <a:pPr marL="285840" indent="-282240">
+            <a:pPr marL="285840" indent="-281880">
               <a:lnSpc>
                 <a:spcPct val="100000"/>
               </a:lnSpc>
@@ -18299,7 +18315,7 @@
             </a:endParaRPr>
           </a:p>
           <a:p>
-            <a:pPr marL="285840" indent="-282240">
+            <a:pPr marL="285840" indent="-281880">
               <a:lnSpc>
                 <a:spcPct val="100000"/>
               </a:lnSpc>
@@ -18351,7 +18367,7 @@
             </a:endParaRPr>
           </a:p>
           <a:p>
-            <a:pPr marL="285840" indent="-282240">
+            <a:pPr marL="285840" indent="-281880">
               <a:lnSpc>
                 <a:spcPct val="100000"/>
               </a:lnSpc>
@@ -18437,7 +18453,7 @@
         <p:spPr>
           <a:xfrm>
             <a:off x="6227640" y="3794400"/>
-            <a:ext cx="910800" cy="910800"/>
+            <a:ext cx="910440" cy="910440"/>
           </a:xfrm>
           <a:prstGeom prst="rect">
             <a:avLst/>
@@ -18460,7 +18476,7 @@
         <p:spPr>
           <a:xfrm>
             <a:off x="2468520" y="3843720"/>
-            <a:ext cx="910800" cy="910800"/>
+            <a:ext cx="910440" cy="910440"/>
           </a:xfrm>
           <a:prstGeom prst="rect">
             <a:avLst/>
@@ -18483,7 +18499,7 @@
         <p:spPr>
           <a:xfrm>
             <a:off x="9790920" y="3794400"/>
-            <a:ext cx="910800" cy="910800"/>
+            <a:ext cx="910440" cy="910440"/>
           </a:xfrm>
           <a:prstGeom prst="rect">
             <a:avLst/>
@@ -18506,7 +18522,7 @@
         <p:spPr>
           <a:xfrm>
             <a:off x="7903800" y="3794400"/>
-            <a:ext cx="910800" cy="910800"/>
+            <a:ext cx="910440" cy="910440"/>
           </a:xfrm>
           <a:prstGeom prst="rect">
             <a:avLst/>
@@ -18529,7 +18545,7 @@
         <p:spPr>
           <a:xfrm>
             <a:off x="4412520" y="3794400"/>
-            <a:ext cx="910800" cy="910800"/>
+            <a:ext cx="910440" cy="910440"/>
           </a:xfrm>
           <a:prstGeom prst="rect">
             <a:avLst/>
@@ -18552,7 +18568,7 @@
         <p:spPr>
           <a:xfrm>
             <a:off x="684360" y="3843720"/>
-            <a:ext cx="910800" cy="910800"/>
+            <a:ext cx="910440" cy="910440"/>
           </a:xfrm>
           <a:prstGeom prst="rect">
             <a:avLst/>
@@ -18571,7 +18587,7 @@
         <p:spPr>
           <a:xfrm>
             <a:off x="1638000" y="4183200"/>
-            <a:ext cx="679320" cy="258480"/>
+            <a:ext cx="678960" cy="258120"/>
           </a:xfrm>
           <a:prstGeom prst="rightArrow">
             <a:avLst>
@@ -18610,7 +18626,7 @@
         <p:spPr>
           <a:xfrm>
             <a:off x="3511800" y="4201920"/>
-            <a:ext cx="679320" cy="258480"/>
+            <a:ext cx="678960" cy="258120"/>
           </a:xfrm>
           <a:prstGeom prst="rightArrow">
             <a:avLst>
@@ -18649,7 +18665,7 @@
         <p:spPr>
           <a:xfrm>
             <a:off x="5366520" y="4193640"/>
-            <a:ext cx="679320" cy="258480"/>
+            <a:ext cx="678960" cy="258120"/>
           </a:xfrm>
           <a:prstGeom prst="rightArrow">
             <a:avLst>
@@ -18688,7 +18704,7 @@
         <p:spPr>
           <a:xfrm>
             <a:off x="7162200" y="4183200"/>
-            <a:ext cx="679320" cy="258480"/>
+            <a:ext cx="678960" cy="258120"/>
           </a:xfrm>
           <a:prstGeom prst="rightArrow">
             <a:avLst>
@@ -18727,7 +18743,7 @@
         <p:spPr>
           <a:xfrm>
             <a:off x="8876160" y="4169880"/>
-            <a:ext cx="679320" cy="258480"/>
+            <a:ext cx="678960" cy="258120"/>
           </a:xfrm>
           <a:prstGeom prst="rightArrow">
             <a:avLst>
@@ -18815,7 +18831,7 @@
         <p:spPr>
           <a:xfrm>
             <a:off x="684360" y="4487400"/>
-            <a:ext cx="8530920" cy="1503360"/>
+            <a:ext cx="8530560" cy="1503000"/>
           </a:xfrm>
           <a:prstGeom prst="rect">
             <a:avLst/>
@@ -18864,7 +18880,7 @@
         <p:spPr>
           <a:xfrm>
             <a:off x="684360" y="685800"/>
-            <a:ext cx="8530920" cy="3611520"/>
+            <a:ext cx="8530560" cy="3611160"/>
           </a:xfrm>
           <a:prstGeom prst="rect">
             <a:avLst/>
@@ -18883,7 +18899,7 @@
         <p:txBody>
           <a:bodyPr lIns="90000" rIns="90000" tIns="45000" bIns="45000" anchor="ctr"/>
           <a:p>
-            <a:pPr marL="285840" indent="-282240">
+            <a:pPr marL="285840" indent="-281880">
               <a:lnSpc>
                 <a:spcPct val="100000"/>
               </a:lnSpc>
@@ -18965,7 +18981,7 @@
             </a:endParaRPr>
           </a:p>
           <a:p>
-            <a:pPr marL="285840" indent="-282240">
+            <a:pPr marL="285840" indent="-281880">
               <a:lnSpc>
                 <a:spcPct val="100000"/>
               </a:lnSpc>
@@ -19011,7 +19027,7 @@
         <p:spPr>
           <a:xfrm>
             <a:off x="4681800" y="2481480"/>
-            <a:ext cx="910800" cy="910800"/>
+            <a:ext cx="910440" cy="910440"/>
           </a:xfrm>
           <a:prstGeom prst="rect">
             <a:avLst/>
@@ -19034,7 +19050,7 @@
         <p:spPr>
           <a:xfrm>
             <a:off x="6609240" y="3669480"/>
-            <a:ext cx="910800" cy="910800"/>
+            <a:ext cx="910440" cy="910440"/>
           </a:xfrm>
           <a:prstGeom prst="rect">
             <a:avLst/>
@@ -19057,7 +19073,7 @@
         <p:spPr>
           <a:xfrm>
             <a:off x="2973240" y="3669480"/>
-            <a:ext cx="910800" cy="910800"/>
+            <a:ext cx="910440" cy="910440"/>
           </a:xfrm>
           <a:prstGeom prst="rect">
             <a:avLst/>
@@ -19076,7 +19092,7 @@
         <p:spPr>
           <a:xfrm>
             <a:off x="4214160" y="3946320"/>
-            <a:ext cx="2064960" cy="357120"/>
+            <a:ext cx="2064600" cy="356760"/>
           </a:xfrm>
           <a:prstGeom prst="rightArrow">
             <a:avLst>
@@ -19115,7 +19131,7 @@
         <p:spPr>
           <a:xfrm>
             <a:off x="4988160" y="3533400"/>
-            <a:ext cx="298080" cy="403560"/>
+            <a:ext cx="297720" cy="403200"/>
           </a:xfrm>
           <a:prstGeom prst="downArrow">
             <a:avLst>

</xml_diff>

<commit_message>
#12 Weak AI vs Strong AI explanation speech part 6 added on introduction slides
</commit_message>
<xml_diff>
--- a/SAI_presentation_libre_office.pptx
+++ b/SAI_presentation_libre_office.pptx
@@ -150,7 +150,7 @@
               <a:rPr b="0" lang="fr-FR" sz="1400" spc="-1" strike="noStrike">
                 <a:latin typeface="Times New Roman"/>
               </a:rPr>
-              <a:t> </a:t>
+              <a:t>&lt;en-tête&gt;</a:t>
             </a:r>
             <a:endParaRPr b="0" lang="fr-FR" sz="1400" spc="-1" strike="noStrike">
               <a:latin typeface="Times New Roman"/>
@@ -185,7 +185,7 @@
               <a:rPr b="0" lang="fr-FR" sz="1400" spc="-1" strike="noStrike">
                 <a:latin typeface="Times New Roman"/>
               </a:rPr>
-              <a:t> </a:t>
+              <a:t>&lt;date/heure&gt;</a:t>
             </a:r>
             <a:endParaRPr b="0" lang="fr-FR" sz="1400" spc="-1" strike="noStrike">
               <a:latin typeface="Times New Roman"/>
@@ -219,7 +219,7 @@
               <a:rPr b="0" lang="fr-FR" sz="1400" spc="-1" strike="noStrike">
                 <a:latin typeface="Times New Roman"/>
               </a:rPr>
-              <a:t> </a:t>
+              <a:t>&lt;pied de page&gt;</a:t>
             </a:r>
             <a:endParaRPr b="0" lang="fr-FR" sz="1400" spc="-1" strike="noStrike">
               <a:latin typeface="Times New Roman"/>
@@ -250,11 +250,11 @@
           <a:bodyPr lIns="0" rIns="0" tIns="0" bIns="0" anchor="b"/>
           <a:p>
             <a:pPr algn="r"/>
-            <a:fld id="{57B7016C-ADE5-44DB-9540-5249234350B7}" type="slidenum">
+            <a:fld id="{21277F5C-5FFD-42EC-BD42-0FF9161C4643}" type="slidenum">
               <a:rPr b="0" lang="fr-FR" sz="1400" spc="-1" strike="noStrike">
                 <a:latin typeface="Times New Roman"/>
               </a:rPr>
-              <a:t>1</a:t>
+              <a:t>&lt;numéro&gt;</a:t>
             </a:fld>
             <a:endParaRPr b="0" lang="fr-FR" sz="1400" spc="-1" strike="noStrike">
               <a:latin typeface="Times New Roman"/>
@@ -298,7 +298,7 @@
         <p:spPr>
           <a:xfrm>
             <a:off x="685800" y="1143000"/>
-            <a:ext cx="5482440" cy="3082320"/>
+            <a:ext cx="5482080" cy="3081960"/>
           </a:xfrm>
           <a:prstGeom prst="rect">
             <a:avLst/>
@@ -318,7 +318,7 @@
         <p:spPr>
           <a:xfrm>
             <a:off x="685800" y="4400640"/>
-            <a:ext cx="5482440" cy="3596400"/>
+            <a:ext cx="5482080" cy="3596040"/>
           </a:xfrm>
           <a:prstGeom prst="rect">
             <a:avLst/>
@@ -327,7 +327,7 @@
         <p:txBody>
           <a:bodyPr lIns="0" rIns="0" tIns="0" bIns="0"/>
           <a:p>
-            <a:pPr marL="216000" indent="-212400">
+            <a:pPr marL="216000" indent="-212040">
               <a:lnSpc>
                 <a:spcPct val="100000"/>
               </a:lnSpc>
@@ -343,7 +343,7 @@
             </a:endParaRPr>
           </a:p>
           <a:p>
-            <a:pPr marL="216000" indent="-212400">
+            <a:pPr marL="216000" indent="-212040">
               <a:lnSpc>
                 <a:spcPct val="100000"/>
               </a:lnSpc>
@@ -360,7 +360,7 @@
             </a:endParaRPr>
           </a:p>
           <a:p>
-            <a:pPr marL="216000" indent="-212400">
+            <a:pPr marL="216000" indent="-212040">
               <a:lnSpc>
                 <a:spcPct val="100000"/>
               </a:lnSpc>
@@ -376,7 +376,7 @@
             </a:endParaRPr>
           </a:p>
           <a:p>
-            <a:pPr marL="216000" indent="-212400">
+            <a:pPr marL="216000" indent="-212040">
               <a:lnSpc>
                 <a:spcPct val="100000"/>
               </a:lnSpc>
@@ -392,7 +392,7 @@
             </a:endParaRPr>
           </a:p>
           <a:p>
-            <a:pPr marL="216000" indent="-212400">
+            <a:pPr marL="216000" indent="-212040">
               <a:lnSpc>
                 <a:spcPct val="100000"/>
               </a:lnSpc>
@@ -419,7 +419,7 @@
         <p:spPr>
           <a:xfrm>
             <a:off x="3884760" y="8685360"/>
-            <a:ext cx="2967840" cy="454680"/>
+            <a:ext cx="2967480" cy="454320"/>
           </a:xfrm>
           <a:prstGeom prst="rect">
             <a:avLst/>
@@ -443,14 +443,14 @@
                 <a:spcPct val="100000"/>
               </a:lnSpc>
             </a:pPr>
-            <a:fld id="{8BE29AC7-B797-4AC3-9DCE-674F2CA808C0}" type="slidenum">
+            <a:fld id="{67EF5DB6-07FB-4CA4-BF77-A442222E7AB4}" type="slidenum">
               <a:rPr b="0" lang="fr-FR" sz="1200" spc="-1" strike="noStrike">
                 <a:solidFill>
                   <a:srgbClr val="000000"/>
                 </a:solidFill>
                 <a:latin typeface="Times New Roman"/>
               </a:rPr>
-              <a:t>1</a:t>
+              <a:t>&lt;numéro&gt;</a:t>
             </a:fld>
             <a:endParaRPr b="0" lang="fr-FR" sz="1200" spc="-1" strike="noStrike">
               <a:latin typeface="Arial"/>
@@ -493,7 +493,7 @@
         <p:spPr>
           <a:xfrm>
             <a:off x="685800" y="1143000"/>
-            <a:ext cx="5482440" cy="3082320"/>
+            <a:ext cx="5482080" cy="3081960"/>
           </a:xfrm>
           <a:prstGeom prst="rect">
             <a:avLst/>
@@ -513,7 +513,7 @@
         <p:spPr>
           <a:xfrm>
             <a:off x="685800" y="4400640"/>
-            <a:ext cx="5482440" cy="3596400"/>
+            <a:ext cx="5482080" cy="3596040"/>
           </a:xfrm>
           <a:prstGeom prst="rect">
             <a:avLst/>
@@ -522,7 +522,7 @@
         <p:txBody>
           <a:bodyPr lIns="0" rIns="0" tIns="0" bIns="0"/>
           <a:p>
-            <a:pPr marL="216000" indent="-212760">
+            <a:pPr marL="216000" indent="-212400">
               <a:lnSpc>
                 <a:spcPct val="100000"/>
               </a:lnSpc>
@@ -538,7 +538,7 @@
             </a:endParaRPr>
           </a:p>
           <a:p>
-            <a:pPr marL="216000" indent="-212760">
+            <a:pPr marL="216000" indent="-212400">
               <a:lnSpc>
                 <a:spcPct val="100000"/>
               </a:lnSpc>
@@ -548,7 +548,7 @@
             </a:endParaRPr>
           </a:p>
           <a:p>
-            <a:pPr marL="216000" indent="-212760">
+            <a:pPr marL="216000" indent="-212400">
               <a:lnSpc>
                 <a:spcPct val="100000"/>
               </a:lnSpc>
@@ -564,7 +564,7 @@
             </a:endParaRPr>
           </a:p>
           <a:p>
-            <a:pPr marL="216000" indent="-212760">
+            <a:pPr marL="216000" indent="-212400">
               <a:lnSpc>
                 <a:spcPct val="100000"/>
               </a:lnSpc>
@@ -574,7 +574,7 @@
             </a:endParaRPr>
           </a:p>
           <a:p>
-            <a:pPr marL="216000" indent="-212760">
+            <a:pPr marL="216000" indent="-212400">
               <a:lnSpc>
                 <a:spcPct val="100000"/>
               </a:lnSpc>
@@ -590,7 +590,7 @@
             </a:endParaRPr>
           </a:p>
           <a:p>
-            <a:pPr marL="216000" indent="-212760">
+            <a:pPr marL="216000" indent="-212400">
               <a:lnSpc>
                 <a:spcPct val="100000"/>
               </a:lnSpc>
@@ -600,7 +600,7 @@
             </a:endParaRPr>
           </a:p>
           <a:p>
-            <a:pPr marL="216000" indent="-212760">
+            <a:pPr marL="216000" indent="-212400">
               <a:lnSpc>
                 <a:spcPct val="100000"/>
               </a:lnSpc>
@@ -616,7 +616,7 @@
             </a:endParaRPr>
           </a:p>
           <a:p>
-            <a:pPr marL="216000" indent="-212760">
+            <a:pPr marL="216000" indent="-212400">
               <a:lnSpc>
                 <a:spcPct val="100000"/>
               </a:lnSpc>
@@ -626,7 +626,7 @@
             </a:endParaRPr>
           </a:p>
           <a:p>
-            <a:pPr marL="216000" indent="-212760">
+            <a:pPr marL="216000" indent="-212400">
               <a:lnSpc>
                 <a:spcPct val="100000"/>
               </a:lnSpc>
@@ -636,7 +636,7 @@
             </a:endParaRPr>
           </a:p>
           <a:p>
-            <a:pPr marL="216000" indent="-212760">
+            <a:pPr marL="216000" indent="-212400">
               <a:lnSpc>
                 <a:spcPct val="100000"/>
               </a:lnSpc>
@@ -652,7 +652,7 @@
             </a:endParaRPr>
           </a:p>
           <a:p>
-            <a:pPr marL="216000" indent="-212760">
+            <a:pPr marL="216000" indent="-212400">
               <a:lnSpc>
                 <a:spcPct val="100000"/>
               </a:lnSpc>
@@ -668,7 +668,7 @@
             </a:endParaRPr>
           </a:p>
           <a:p>
-            <a:pPr marL="216000" indent="-212760">
+            <a:pPr marL="216000" indent="-212400">
               <a:lnSpc>
                 <a:spcPct val="100000"/>
               </a:lnSpc>
@@ -684,7 +684,7 @@
             </a:endParaRPr>
           </a:p>
           <a:p>
-            <a:pPr marL="216000" indent="-212760">
+            <a:pPr marL="216000" indent="-212400">
               <a:lnSpc>
                 <a:spcPct val="100000"/>
               </a:lnSpc>
@@ -694,7 +694,7 @@
             </a:endParaRPr>
           </a:p>
           <a:p>
-            <a:pPr marL="216000" indent="-212760">
+            <a:pPr marL="216000" indent="-212400">
               <a:lnSpc>
                 <a:spcPct val="100000"/>
               </a:lnSpc>
@@ -710,7 +710,7 @@
             </a:endParaRPr>
           </a:p>
           <a:p>
-            <a:pPr marL="216000" indent="-212760">
+            <a:pPr marL="216000" indent="-212400">
               <a:lnSpc>
                 <a:spcPct val="100000"/>
               </a:lnSpc>
@@ -720,7 +720,7 @@
             </a:endParaRPr>
           </a:p>
           <a:p>
-            <a:pPr marL="216000" indent="-212760">
+            <a:pPr marL="216000" indent="-212400">
               <a:lnSpc>
                 <a:spcPct val="100000"/>
               </a:lnSpc>
@@ -736,7 +736,7 @@
             </a:endParaRPr>
           </a:p>
           <a:p>
-            <a:pPr marL="216000" indent="-212760">
+            <a:pPr marL="216000" indent="-212400">
               <a:lnSpc>
                 <a:spcPct val="100000"/>
               </a:lnSpc>
@@ -752,7 +752,7 @@
             </a:endParaRPr>
           </a:p>
           <a:p>
-            <a:pPr marL="216000" indent="-212760">
+            <a:pPr marL="216000" indent="-212400">
               <a:lnSpc>
                 <a:spcPct val="100000"/>
               </a:lnSpc>
@@ -768,7 +768,7 @@
             </a:endParaRPr>
           </a:p>
           <a:p>
-            <a:pPr marL="216000" indent="-212760">
+            <a:pPr marL="216000" indent="-212400">
               <a:lnSpc>
                 <a:spcPct val="100000"/>
               </a:lnSpc>
@@ -784,7 +784,7 @@
             </a:endParaRPr>
           </a:p>
           <a:p>
-            <a:pPr marL="216000" indent="-212760">
+            <a:pPr marL="216000" indent="-212400">
               <a:lnSpc>
                 <a:spcPct val="100000"/>
               </a:lnSpc>
@@ -794,7 +794,7 @@
             </a:endParaRPr>
           </a:p>
           <a:p>
-            <a:pPr marL="216000" indent="-212760">
+            <a:pPr marL="216000" indent="-212400">
               <a:lnSpc>
                 <a:spcPct val="100000"/>
               </a:lnSpc>
@@ -810,7 +810,7 @@
             </a:endParaRPr>
           </a:p>
           <a:p>
-            <a:pPr marL="216000" indent="-212760">
+            <a:pPr marL="216000" indent="-212400">
               <a:lnSpc>
                 <a:spcPct val="100000"/>
               </a:lnSpc>
@@ -826,7 +826,7 @@
             </a:endParaRPr>
           </a:p>
           <a:p>
-            <a:pPr marL="216000" indent="-212760">
+            <a:pPr marL="216000" indent="-212400">
               <a:lnSpc>
                 <a:spcPct val="100000"/>
               </a:lnSpc>
@@ -842,7 +842,7 @@
             </a:endParaRPr>
           </a:p>
           <a:p>
-            <a:pPr marL="216000" indent="-212760">
+            <a:pPr marL="216000" indent="-212400">
               <a:lnSpc>
                 <a:spcPct val="100000"/>
               </a:lnSpc>
@@ -858,7 +858,7 @@
             </a:endParaRPr>
           </a:p>
           <a:p>
-            <a:pPr marL="216000" indent="-212760">
+            <a:pPr marL="216000" indent="-212400">
               <a:lnSpc>
                 <a:spcPct val="100000"/>
               </a:lnSpc>
@@ -874,7 +874,7 @@
             </a:endParaRPr>
           </a:p>
           <a:p>
-            <a:pPr marL="216000" indent="-212760">
+            <a:pPr marL="216000" indent="-212400">
               <a:lnSpc>
                 <a:spcPct val="100000"/>
               </a:lnSpc>
@@ -884,7 +884,7 @@
             </a:endParaRPr>
           </a:p>
           <a:p>
-            <a:pPr marL="216000" indent="-212760">
+            <a:pPr marL="216000" indent="-212400">
               <a:lnSpc>
                 <a:spcPct val="100000"/>
               </a:lnSpc>
@@ -900,7 +900,7 @@
             </a:endParaRPr>
           </a:p>
           <a:p>
-            <a:pPr marL="216000" indent="-212760">
+            <a:pPr marL="216000" indent="-212400">
               <a:lnSpc>
                 <a:spcPct val="100000"/>
               </a:lnSpc>
@@ -916,7 +916,7 @@
             </a:endParaRPr>
           </a:p>
           <a:p>
-            <a:pPr marL="216000" indent="-212760">
+            <a:pPr marL="216000" indent="-212400">
               <a:lnSpc>
                 <a:spcPct val="100000"/>
               </a:lnSpc>
@@ -932,7 +932,7 @@
             </a:endParaRPr>
           </a:p>
           <a:p>
-            <a:pPr marL="216000" indent="-212760">
+            <a:pPr marL="216000" indent="-212400">
               <a:lnSpc>
                 <a:spcPct val="100000"/>
               </a:lnSpc>
@@ -942,7 +942,7 @@
             </a:endParaRPr>
           </a:p>
           <a:p>
-            <a:pPr marL="216000" indent="-212760">
+            <a:pPr marL="216000" indent="-212400">
               <a:lnSpc>
                 <a:spcPct val="100000"/>
               </a:lnSpc>
@@ -958,7 +958,7 @@
             </a:endParaRPr>
           </a:p>
           <a:p>
-            <a:pPr marL="216000" indent="-212760">
+            <a:pPr marL="216000" indent="-212400">
               <a:lnSpc>
                 <a:spcPct val="100000"/>
               </a:lnSpc>
@@ -974,7 +974,7 @@
             </a:endParaRPr>
           </a:p>
           <a:p>
-            <a:pPr marL="216000" indent="-212760">
+            <a:pPr marL="216000" indent="-212400">
               <a:lnSpc>
                 <a:spcPct val="100000"/>
               </a:lnSpc>
@@ -990,7 +990,7 @@
             </a:endParaRPr>
           </a:p>
           <a:p>
-            <a:pPr marL="216000" indent="-212760">
+            <a:pPr marL="216000" indent="-212400">
               <a:lnSpc>
                 <a:spcPct val="100000"/>
               </a:lnSpc>
@@ -1000,7 +1000,7 @@
             </a:endParaRPr>
           </a:p>
           <a:p>
-            <a:pPr marL="216000" indent="-212760">
+            <a:pPr marL="216000" indent="-212400">
               <a:lnSpc>
                 <a:spcPct val="100000"/>
               </a:lnSpc>
@@ -1016,7 +1016,7 @@
             </a:endParaRPr>
           </a:p>
           <a:p>
-            <a:pPr marL="216000" indent="-212760">
+            <a:pPr marL="216000" indent="-212400">
               <a:lnSpc>
                 <a:spcPct val="100000"/>
               </a:lnSpc>
@@ -1032,7 +1032,7 @@
             </a:endParaRPr>
           </a:p>
           <a:p>
-            <a:pPr marL="216000" indent="-212760">
+            <a:pPr marL="216000" indent="-212400">
               <a:lnSpc>
                 <a:spcPct val="100000"/>
               </a:lnSpc>
@@ -1048,7 +1048,7 @@
             </a:endParaRPr>
           </a:p>
           <a:p>
-            <a:pPr marL="216000" indent="-212760">
+            <a:pPr marL="216000" indent="-212400">
               <a:lnSpc>
                 <a:spcPct val="100000"/>
               </a:lnSpc>
@@ -1064,7 +1064,7 @@
             </a:endParaRPr>
           </a:p>
           <a:p>
-            <a:pPr marL="216000" indent="-212760">
+            <a:pPr marL="216000" indent="-212400">
               <a:lnSpc>
                 <a:spcPct val="100000"/>
               </a:lnSpc>
@@ -1074,7 +1074,7 @@
             </a:endParaRPr>
           </a:p>
           <a:p>
-            <a:pPr marL="216000" indent="-212760">
+            <a:pPr marL="216000" indent="-212400">
               <a:lnSpc>
                 <a:spcPct val="100000"/>
               </a:lnSpc>
@@ -1090,7 +1090,7 @@
             </a:endParaRPr>
           </a:p>
           <a:p>
-            <a:pPr marL="216000" indent="-212760">
+            <a:pPr marL="216000" indent="-212400">
               <a:lnSpc>
                 <a:spcPct val="100000"/>
               </a:lnSpc>
@@ -1107,7 +1107,7 @@
             </a:endParaRPr>
           </a:p>
           <a:p>
-            <a:pPr marL="216000" indent="-212760">
+            <a:pPr marL="216000" indent="-212400">
               <a:lnSpc>
                 <a:spcPct val="100000"/>
               </a:lnSpc>
@@ -1124,7 +1124,7 @@
             </a:endParaRPr>
           </a:p>
           <a:p>
-            <a:pPr marL="216000" indent="-212760">
+            <a:pPr marL="216000" indent="-212400">
               <a:lnSpc>
                 <a:spcPct val="100000"/>
               </a:lnSpc>
@@ -1141,7 +1141,7 @@
             </a:endParaRPr>
           </a:p>
           <a:p>
-            <a:pPr marL="216000" indent="-212760">
+            <a:pPr marL="216000" indent="-212400">
               <a:lnSpc>
                 <a:spcPct val="100000"/>
               </a:lnSpc>
@@ -1151,7 +1151,7 @@
             </a:endParaRPr>
           </a:p>
           <a:p>
-            <a:pPr marL="216000" indent="-212760">
+            <a:pPr marL="216000" indent="-212400">
               <a:lnSpc>
                 <a:spcPct val="100000"/>
               </a:lnSpc>
@@ -1168,7 +1168,7 @@
             </a:endParaRPr>
           </a:p>
           <a:p>
-            <a:pPr marL="216000" indent="-212760">
+            <a:pPr marL="216000" indent="-212400">
               <a:lnSpc>
                 <a:spcPct val="100000"/>
               </a:lnSpc>
@@ -1185,7 +1185,7 @@
             </a:endParaRPr>
           </a:p>
           <a:p>
-            <a:pPr marL="216000" indent="-212760">
+            <a:pPr marL="216000" indent="-212400">
               <a:lnSpc>
                 <a:spcPct val="100000"/>
               </a:lnSpc>
@@ -1195,7 +1195,7 @@
             </a:endParaRPr>
           </a:p>
           <a:p>
-            <a:pPr marL="216000" indent="-212760">
+            <a:pPr marL="216000" indent="-212400">
               <a:lnSpc>
                 <a:spcPct val="100000"/>
               </a:lnSpc>
@@ -1205,7 +1205,7 @@
             </a:endParaRPr>
           </a:p>
           <a:p>
-            <a:pPr marL="216000" indent="-212760">
+            <a:pPr marL="216000" indent="-212400">
               <a:lnSpc>
                 <a:spcPct val="100000"/>
               </a:lnSpc>
@@ -1215,7 +1215,7 @@
             </a:endParaRPr>
           </a:p>
           <a:p>
-            <a:pPr marL="216000" indent="-212760">
+            <a:pPr marL="216000" indent="-212400">
               <a:lnSpc>
                 <a:spcPct val="100000"/>
               </a:lnSpc>
@@ -1225,7 +1225,7 @@
             </a:endParaRPr>
           </a:p>
           <a:p>
-            <a:pPr marL="216000" indent="-212760">
+            <a:pPr marL="216000" indent="-212400">
               <a:lnSpc>
                 <a:spcPct val="100000"/>
               </a:lnSpc>
@@ -1245,7 +1245,7 @@
         <p:spPr>
           <a:xfrm>
             <a:off x="3884760" y="8685360"/>
-            <a:ext cx="2967840" cy="454680"/>
+            <a:ext cx="2967480" cy="454320"/>
           </a:xfrm>
           <a:prstGeom prst="rect">
             <a:avLst/>
@@ -1269,7 +1269,7 @@
                 <a:spcPct val="100000"/>
               </a:lnSpc>
             </a:pPr>
-            <a:fld id="{44C7C188-7B1F-4142-A095-CA0A20E3E6A3}" type="slidenum">
+            <a:fld id="{13E38D91-C2D9-495F-A842-44549F2C6728}" type="slidenum">
               <a:rPr b="0" lang="fr-FR" sz="1200" spc="-1" strike="noStrike">
                 <a:solidFill>
                   <a:srgbClr val="000000"/>
@@ -1319,7 +1319,7 @@
         <p:spPr>
           <a:xfrm>
             <a:off x="685800" y="1143000"/>
-            <a:ext cx="5482440" cy="3082320"/>
+            <a:ext cx="5482080" cy="3081960"/>
           </a:xfrm>
           <a:prstGeom prst="rect">
             <a:avLst/>
@@ -1339,7 +1339,7 @@
         <p:spPr>
           <a:xfrm>
             <a:off x="685800" y="4400640"/>
-            <a:ext cx="5482440" cy="3596400"/>
+            <a:ext cx="5482080" cy="3596040"/>
           </a:xfrm>
           <a:prstGeom prst="rect">
             <a:avLst/>
@@ -1348,7 +1348,7 @@
         <p:txBody>
           <a:bodyPr lIns="0" rIns="0" tIns="0" bIns="0"/>
           <a:p>
-            <a:pPr marL="216000" indent="-214560">
+            <a:pPr marL="216000" indent="-214200">
               <a:lnSpc>
                 <a:spcPct val="100000"/>
               </a:lnSpc>
@@ -1364,7 +1364,7 @@
             </a:endParaRPr>
           </a:p>
           <a:p>
-            <a:pPr marL="216000" indent="-214560">
+            <a:pPr marL="216000" indent="-214200">
               <a:lnSpc>
                 <a:spcPct val="100000"/>
               </a:lnSpc>
@@ -1380,7 +1380,7 @@
             </a:endParaRPr>
           </a:p>
           <a:p>
-            <a:pPr marL="216000" indent="-214560">
+            <a:pPr marL="216000" indent="-214200">
               <a:lnSpc>
                 <a:spcPct val="100000"/>
               </a:lnSpc>
@@ -1396,7 +1396,7 @@
             </a:endParaRPr>
           </a:p>
           <a:p>
-            <a:pPr marL="216000" indent="-214560">
+            <a:pPr marL="216000" indent="-214200">
               <a:lnSpc>
                 <a:spcPct val="100000"/>
               </a:lnSpc>
@@ -1406,7 +1406,7 @@
             </a:endParaRPr>
           </a:p>
           <a:p>
-            <a:pPr marL="216000" indent="-214560">
+            <a:pPr marL="216000" indent="-214200">
               <a:lnSpc>
                 <a:spcPct val="100000"/>
               </a:lnSpc>
@@ -1422,7 +1422,7 @@
             </a:endParaRPr>
           </a:p>
           <a:p>
-            <a:pPr marL="216000" indent="-214560">
+            <a:pPr marL="216000" indent="-214200">
               <a:lnSpc>
                 <a:spcPct val="100000"/>
               </a:lnSpc>
@@ -1438,7 +1438,7 @@
             </a:endParaRPr>
           </a:p>
           <a:p>
-            <a:pPr marL="216000" indent="-214560">
+            <a:pPr marL="216000" indent="-214200">
               <a:lnSpc>
                 <a:spcPct val="100000"/>
               </a:lnSpc>
@@ -1448,7 +1448,7 @@
             </a:endParaRPr>
           </a:p>
           <a:p>
-            <a:pPr marL="216000" indent="-214560">
+            <a:pPr marL="216000" indent="-214200">
               <a:lnSpc>
                 <a:spcPct val="100000"/>
               </a:lnSpc>
@@ -1464,7 +1464,7 @@
             </a:endParaRPr>
           </a:p>
           <a:p>
-            <a:pPr marL="216000" indent="-214560">
+            <a:pPr marL="216000" indent="-214200">
               <a:lnSpc>
                 <a:spcPct val="100000"/>
               </a:lnSpc>
@@ -1474,7 +1474,7 @@
             </a:endParaRPr>
           </a:p>
           <a:p>
-            <a:pPr marL="216000" indent="-214560">
+            <a:pPr marL="216000" indent="-214200">
               <a:lnSpc>
                 <a:spcPct val="100000"/>
               </a:lnSpc>
@@ -1490,7 +1490,7 @@
             </a:endParaRPr>
           </a:p>
           <a:p>
-            <a:pPr marL="216000" indent="-214560">
+            <a:pPr marL="216000" indent="-214200">
               <a:lnSpc>
                 <a:spcPct val="100000"/>
               </a:lnSpc>
@@ -1506,17 +1506,30 @@
             </a:endParaRPr>
           </a:p>
           <a:p>
-            <a:pPr marL="216000" indent="-214560">
-              <a:lnSpc>
-                <a:spcPct val="100000"/>
-              </a:lnSpc>
-            </a:pPr>
+            <a:pPr marL="216000" indent="-214200">
+              <a:lnSpc>
+                <a:spcPct val="100000"/>
+              </a:lnSpc>
+            </a:pPr>
+            <a:r>
+              <a:rPr b="0" lang="fr-FR" sz="1800" spc="-1" strike="noStrike">
+                <a:latin typeface="Arial"/>
+                <a:ea typeface="Noto Sans CJK SC"/>
+              </a:rPr>
+              <a:t>For example after responding the human response and a few seconds (polite) it will be on rest mode (continue what it was thinking</a:t>
+            </a:r>
+            <a:r>
+              <a:rPr b="0" lang="fr-FR" sz="1800" spc="-1" strike="noStrike">
+                <a:latin typeface="Arial"/>
+              </a:rPr>
+              <a:t> about/strategy)</a:t>
+            </a:r>
             <a:endParaRPr b="0" lang="fr-FR" sz="1800" spc="-1" strike="noStrike">
               <a:latin typeface="Arial"/>
             </a:endParaRPr>
           </a:p>
           <a:p>
-            <a:pPr marL="216000" indent="-214560">
+            <a:pPr marL="216000" indent="-214200">
               <a:lnSpc>
                 <a:spcPct val="100000"/>
               </a:lnSpc>
@@ -1526,7 +1539,17 @@
             </a:endParaRPr>
           </a:p>
           <a:p>
-            <a:pPr marL="216000" indent="-214560">
+            <a:pPr marL="216000" indent="-214200">
+              <a:lnSpc>
+                <a:spcPct val="100000"/>
+              </a:lnSpc>
+            </a:pPr>
+            <a:endParaRPr b="0" lang="fr-FR" sz="1800" spc="-1" strike="noStrike">
+              <a:latin typeface="Arial"/>
+            </a:endParaRPr>
+          </a:p>
+          <a:p>
+            <a:pPr marL="216000" indent="-214200">
               <a:lnSpc>
                 <a:spcPct val="100000"/>
               </a:lnSpc>
@@ -1546,7 +1569,7 @@
         <p:spPr>
           <a:xfrm>
             <a:off x="3884760" y="8685360"/>
-            <a:ext cx="2967840" cy="454680"/>
+            <a:ext cx="2967480" cy="454320"/>
           </a:xfrm>
           <a:prstGeom prst="rect">
             <a:avLst/>
@@ -1570,7 +1593,7 @@
                 <a:spcPct val="100000"/>
               </a:lnSpc>
             </a:pPr>
-            <a:fld id="{5CF4149B-DBE4-4C04-A57A-2982C2262A27}" type="slidenum">
+            <a:fld id="{A20BCCF4-E8FA-4D90-B662-60ABEA8CF7CB}" type="slidenum">
               <a:rPr b="0" lang="fr-FR" sz="1200" spc="-1" strike="noStrike">
                 <a:solidFill>
                   <a:srgbClr val="000000"/>
@@ -1620,7 +1643,7 @@
         <p:spPr>
           <a:xfrm>
             <a:off x="380880" y="694800"/>
-            <a:ext cx="6093000" cy="3426120"/>
+            <a:ext cx="6092640" cy="3425760"/>
           </a:xfrm>
           <a:prstGeom prst="rect">
             <a:avLst/>
@@ -1640,7 +1663,7 @@
         <p:spPr>
           <a:xfrm>
             <a:off x="685800" y="4343400"/>
-            <a:ext cx="5483520" cy="4111920"/>
+            <a:ext cx="5483160" cy="4111560"/>
           </a:xfrm>
           <a:prstGeom prst="rect">
             <a:avLst/>
@@ -1649,7 +1672,7 @@
         <p:txBody>
           <a:bodyPr lIns="0" rIns="0" tIns="0" bIns="0"/>
           <a:p>
-            <a:pPr marL="216000" indent="-213840">
+            <a:pPr marL="216000" indent="-213480">
               <a:lnSpc>
                 <a:spcPct val="100000"/>
               </a:lnSpc>
@@ -1665,7 +1688,7 @@
             </a:endParaRPr>
           </a:p>
           <a:p>
-            <a:pPr marL="216000" indent="-213840">
+            <a:pPr marL="216000" indent="-213480">
               <a:lnSpc>
                 <a:spcPct val="100000"/>
               </a:lnSpc>
@@ -1681,7 +1704,7 @@
             </a:endParaRPr>
           </a:p>
           <a:p>
-            <a:pPr marL="216000" indent="-213840">
+            <a:pPr marL="216000" indent="-213480">
               <a:lnSpc>
                 <a:spcPct val="100000"/>
               </a:lnSpc>
@@ -1697,7 +1720,7 @@
             </a:endParaRPr>
           </a:p>
           <a:p>
-            <a:pPr marL="216000" indent="-213840">
+            <a:pPr marL="216000" indent="-213480">
               <a:lnSpc>
                 <a:spcPct val="100000"/>
               </a:lnSpc>
@@ -5445,7 +5468,7 @@
         <p:spPr>
           <a:xfrm>
             <a:off x="0" y="0"/>
-            <a:ext cx="12188160" cy="6854040"/>
+            <a:ext cx="12187800" cy="6853680"/>
           </a:xfrm>
           <a:prstGeom prst="rect">
             <a:avLst/>
@@ -5478,7 +5501,7 @@
         <p:spPr>
           <a:xfrm flipV="1">
             <a:off x="0" y="-4320"/>
-            <a:ext cx="12184920" cy="6854040"/>
+            <a:ext cx="12184560" cy="6853680"/>
           </a:xfrm>
           <a:prstGeom prst="snip1Rect">
             <a:avLst>
@@ -5533,7 +5556,7 @@
         <p:spPr>
           <a:xfrm>
             <a:off x="684360" y="685800"/>
-            <a:ext cx="9675000" cy="3669480"/>
+            <a:ext cx="9674640" cy="3669120"/>
           </a:xfrm>
           <a:prstGeom prst="rect">
             <a:avLst/>
@@ -5584,7 +5607,7 @@
         <p:spPr>
           <a:xfrm>
             <a:off x="684360" y="4648320"/>
-            <a:ext cx="7001640" cy="1139040"/>
+            <a:ext cx="7001280" cy="1138680"/>
           </a:xfrm>
           <a:prstGeom prst="rect">
             <a:avLst/>
@@ -5722,7 +5745,7 @@
         <p:spPr>
           <a:xfrm>
             <a:off x="684360" y="4487400"/>
-            <a:ext cx="8530560" cy="1503000"/>
+            <a:ext cx="8530200" cy="1502640"/>
           </a:xfrm>
           <a:prstGeom prst="rect">
             <a:avLst/>
@@ -5771,7 +5794,7 @@
         <p:spPr>
           <a:xfrm>
             <a:off x="684360" y="685800"/>
-            <a:ext cx="8530560" cy="3611160"/>
+            <a:ext cx="8530200" cy="3610800"/>
           </a:xfrm>
           <a:prstGeom prst="rect">
             <a:avLst/>
@@ -5790,7 +5813,7 @@
         <p:txBody>
           <a:bodyPr lIns="90000" rIns="90000" tIns="45000" bIns="45000" anchor="ctr"/>
           <a:p>
-            <a:pPr marL="285840" indent="-281880">
+            <a:pPr marL="285840" indent="-281520">
               <a:lnSpc>
                 <a:spcPct val="100000"/>
               </a:lnSpc>
@@ -5922,7 +5945,7 @@
             </a:endParaRPr>
           </a:p>
           <a:p>
-            <a:pPr marL="285840" indent="-281880">
+            <a:pPr marL="285840" indent="-281520">
               <a:lnSpc>
                 <a:spcPct val="100000"/>
               </a:lnSpc>
@@ -5968,7 +5991,7 @@
         <p:spPr>
           <a:xfrm>
             <a:off x="4733640" y="3979440"/>
-            <a:ext cx="910440" cy="910440"/>
+            <a:ext cx="910080" cy="910080"/>
           </a:xfrm>
           <a:prstGeom prst="rect">
             <a:avLst/>
@@ -5991,7 +6014,7 @@
         <p:spPr>
           <a:xfrm>
             <a:off x="6825960" y="4030200"/>
-            <a:ext cx="910440" cy="910440"/>
+            <a:ext cx="910080" cy="910080"/>
           </a:xfrm>
           <a:prstGeom prst="rect">
             <a:avLst/>
@@ -6014,7 +6037,7 @@
         <p:spPr>
           <a:xfrm>
             <a:off x="5354640" y="2725920"/>
-            <a:ext cx="910440" cy="910440"/>
+            <a:ext cx="910080" cy="910080"/>
           </a:xfrm>
           <a:prstGeom prst="rect">
             <a:avLst/>
@@ -6037,7 +6060,7 @@
         <p:spPr>
           <a:xfrm>
             <a:off x="8550000" y="3433320"/>
-            <a:ext cx="910440" cy="910440"/>
+            <a:ext cx="910080" cy="910080"/>
           </a:xfrm>
           <a:prstGeom prst="rect">
             <a:avLst/>
@@ -6060,7 +6083,7 @@
         <p:spPr>
           <a:xfrm>
             <a:off x="5153040" y="5079960"/>
-            <a:ext cx="910440" cy="910440"/>
+            <a:ext cx="910080" cy="910080"/>
           </a:xfrm>
           <a:prstGeom prst="rect">
             <a:avLst/>
@@ -6078,8 +6101,8 @@
         </p:nvSpPr>
         <p:spPr>
           <a:xfrm rot="3732600">
-            <a:off x="7994520" y="3763080"/>
-            <a:ext cx="200160" cy="666000"/>
+            <a:off x="7994880" y="3763080"/>
+            <a:ext cx="199800" cy="665640"/>
           </a:xfrm>
           <a:prstGeom prst="downArrow">
             <a:avLst>
@@ -6117,8 +6140,8 @@
         </p:nvSpPr>
         <p:spPr>
           <a:xfrm rot="14618400">
-            <a:off x="6343920" y="4764600"/>
-            <a:ext cx="200160" cy="666000"/>
+            <a:off x="6343920" y="4764960"/>
+            <a:ext cx="199800" cy="665640"/>
           </a:xfrm>
           <a:prstGeom prst="downArrow">
             <a:avLst>
@@ -6156,8 +6179,8 @@
         </p:nvSpPr>
         <p:spPr>
           <a:xfrm rot="5400000">
-            <a:off x="6192720" y="4132800"/>
-            <a:ext cx="200160" cy="666000"/>
+            <a:off x="6193080" y="4132800"/>
+            <a:ext cx="199800" cy="665640"/>
           </a:xfrm>
           <a:prstGeom prst="downArrow">
             <a:avLst>
@@ -6195,8 +6218,8 @@
         </p:nvSpPr>
         <p:spPr>
           <a:xfrm rot="7014000">
-            <a:off x="6425640" y="3552480"/>
-            <a:ext cx="200160" cy="666000"/>
+            <a:off x="6426000" y="3552480"/>
+            <a:ext cx="199800" cy="665640"/>
           </a:xfrm>
           <a:prstGeom prst="downArrow">
             <a:avLst>
@@ -6234,8 +6257,8 @@
         </p:nvSpPr>
         <p:spPr>
           <a:xfrm rot="1747800">
-            <a:off x="5088240" y="3302280"/>
-            <a:ext cx="200160" cy="666000"/>
+            <a:off x="5087880" y="3302280"/>
+            <a:ext cx="199800" cy="665640"/>
           </a:xfrm>
           <a:prstGeom prst="downArrow">
             <a:avLst>
@@ -6323,7 +6346,7 @@
         <p:spPr>
           <a:xfrm>
             <a:off x="6868080" y="306720"/>
-            <a:ext cx="5040000" cy="2081880"/>
+            <a:ext cx="5039640" cy="2081520"/>
           </a:xfrm>
           <a:prstGeom prst="rect">
             <a:avLst/>
@@ -6366,7 +6389,7 @@
         <p:spPr>
           <a:xfrm>
             <a:off x="6271200" y="2669400"/>
-            <a:ext cx="5628960" cy="3004920"/>
+            <a:ext cx="5628600" cy="3004560"/>
           </a:xfrm>
           <a:prstGeom prst="rect">
             <a:avLst/>
@@ -6411,7 +6434,7 @@
         <p:spPr>
           <a:xfrm>
             <a:off x="129960" y="5709960"/>
-            <a:ext cx="11179440" cy="1086120"/>
+            <a:ext cx="11179080" cy="1085760"/>
           </a:xfrm>
           <a:prstGeom prst="rect">
             <a:avLst/>
@@ -6456,7 +6479,7 @@
         <p:spPr>
           <a:xfrm>
             <a:off x="207000" y="1787400"/>
-            <a:ext cx="5590800" cy="3224160"/>
+            <a:ext cx="5590440" cy="3223800"/>
           </a:xfrm>
           <a:prstGeom prst="rect">
             <a:avLst/>
@@ -6501,7 +6524,7 @@
         <p:spPr>
           <a:xfrm>
             <a:off x="684360" y="4487400"/>
-            <a:ext cx="8530560" cy="1503000"/>
+            <a:ext cx="8530200" cy="1502640"/>
           </a:xfrm>
           <a:prstGeom prst="rect">
             <a:avLst/>
@@ -6550,7 +6573,7 @@
         <p:spPr>
           <a:xfrm>
             <a:off x="684360" y="685800"/>
-            <a:ext cx="8530560" cy="3611160"/>
+            <a:ext cx="8530200" cy="3610800"/>
           </a:xfrm>
           <a:prstGeom prst="rect">
             <a:avLst/>
@@ -6569,7 +6592,7 @@
         <p:txBody>
           <a:bodyPr lIns="90000" rIns="90000" tIns="45000" bIns="45000" anchor="ctr"/>
           <a:p>
-            <a:pPr marL="285840" indent="-281880">
+            <a:pPr marL="285840" indent="-281520">
               <a:lnSpc>
                 <a:spcPct val="100000"/>
               </a:lnSpc>
@@ -6621,7 +6644,7 @@
             </a:endParaRPr>
           </a:p>
           <a:p>
-            <a:pPr marL="285840" indent="-281880">
+            <a:pPr marL="285840" indent="-281520">
               <a:lnSpc>
                 <a:spcPct val="100000"/>
               </a:lnSpc>
@@ -6663,7 +6686,7 @@
             </a:endParaRPr>
           </a:p>
           <a:p>
-            <a:pPr marL="285840" indent="-281880">
+            <a:pPr marL="285840" indent="-281520">
               <a:lnSpc>
                 <a:spcPct val="100000"/>
               </a:lnSpc>
@@ -6715,7 +6738,7 @@
             </a:endParaRPr>
           </a:p>
           <a:p>
-            <a:pPr marL="285840" indent="-281880">
+            <a:pPr marL="285840" indent="-281520">
               <a:lnSpc>
                 <a:spcPct val="100000"/>
               </a:lnSpc>
@@ -6883,7 +6906,7 @@
         <p:spPr>
           <a:xfrm>
             <a:off x="4629600" y="1832040"/>
-            <a:ext cx="850680" cy="850680"/>
+            <a:ext cx="850320" cy="850320"/>
           </a:xfrm>
           <a:prstGeom prst="rect">
             <a:avLst/>
@@ -6906,7 +6929,7 @@
         <p:spPr>
           <a:xfrm>
             <a:off x="4463640" y="4185360"/>
-            <a:ext cx="1177200" cy="469440"/>
+            <a:ext cx="1176840" cy="469080"/>
           </a:xfrm>
           <a:prstGeom prst="rect">
             <a:avLst/>
@@ -6929,7 +6952,7 @@
         <p:spPr>
           <a:xfrm>
             <a:off x="4586040" y="2785680"/>
-            <a:ext cx="894240" cy="1036440"/>
+            <a:ext cx="893880" cy="1036080"/>
           </a:xfrm>
           <a:prstGeom prst="rect">
             <a:avLst/>
@@ -6952,7 +6975,7 @@
         <p:spPr>
           <a:xfrm>
             <a:off x="250560" y="1953720"/>
-            <a:ext cx="910440" cy="910440"/>
+            <a:ext cx="910080" cy="910080"/>
           </a:xfrm>
           <a:prstGeom prst="rect">
             <a:avLst/>
@@ -6975,7 +6998,7 @@
         <p:spPr>
           <a:xfrm>
             <a:off x="271440" y="3259800"/>
-            <a:ext cx="910440" cy="910440"/>
+            <a:ext cx="910080" cy="910080"/>
           </a:xfrm>
           <a:prstGeom prst="rect">
             <a:avLst/>
@@ -6998,7 +7021,7 @@
         <p:spPr>
           <a:xfrm>
             <a:off x="2440800" y="2741040"/>
-            <a:ext cx="910440" cy="910440"/>
+            <a:ext cx="910080" cy="910080"/>
           </a:xfrm>
           <a:prstGeom prst="rect">
             <a:avLst/>
@@ -7016,8 +7039,8 @@
         </p:nvSpPr>
         <p:spPr>
           <a:xfrm rot="1192200">
-            <a:off x="1578600" y="2559960"/>
-            <a:ext cx="974520" cy="480600"/>
+            <a:off x="1578240" y="2559960"/>
+            <a:ext cx="974160" cy="480240"/>
           </a:xfrm>
           <a:prstGeom prst="rightArrow">
             <a:avLst>
@@ -7059,7 +7082,7 @@
         <p:spPr>
           <a:xfrm rot="20407800">
             <a:off x="1557360" y="3348000"/>
-            <a:ext cx="974520" cy="480600"/>
+            <a:ext cx="974160" cy="480240"/>
           </a:xfrm>
           <a:prstGeom prst="rightArrow">
             <a:avLst>
@@ -7100,8 +7123,8 @@
         </p:nvSpPr>
         <p:spPr>
           <a:xfrm rot="1192200">
-            <a:off x="3332160" y="3668400"/>
-            <a:ext cx="974520" cy="480600"/>
+            <a:off x="3331800" y="3668400"/>
+            <a:ext cx="974160" cy="480240"/>
           </a:xfrm>
           <a:prstGeom prst="rightArrow">
             <a:avLst>
@@ -7143,7 +7166,7 @@
         <p:spPr>
           <a:xfrm rot="20407800">
             <a:off x="3405600" y="2343600"/>
-            <a:ext cx="974520" cy="480600"/>
+            <a:ext cx="974160" cy="480240"/>
           </a:xfrm>
           <a:prstGeom prst="rightArrow">
             <a:avLst>
@@ -7185,7 +7208,7 @@
         <p:spPr>
           <a:xfrm>
             <a:off x="3483720" y="3004200"/>
-            <a:ext cx="974520" cy="480600"/>
+            <a:ext cx="974160" cy="480240"/>
           </a:xfrm>
           <a:prstGeom prst="rightArrow">
             <a:avLst>
@@ -7231,7 +7254,7 @@
         <p:spPr>
           <a:xfrm>
             <a:off x="5819760" y="5709960"/>
-            <a:ext cx="910440" cy="910440"/>
+            <a:ext cx="910080" cy="910080"/>
           </a:xfrm>
           <a:prstGeom prst="rect">
             <a:avLst/>
@@ -7254,7 +7277,7 @@
         <p:spPr>
           <a:xfrm>
             <a:off x="2060640" y="5759640"/>
-            <a:ext cx="910440" cy="910440"/>
+            <a:ext cx="910080" cy="910080"/>
           </a:xfrm>
           <a:prstGeom prst="rect">
             <a:avLst/>
@@ -7277,7 +7300,7 @@
         <p:spPr>
           <a:xfrm>
             <a:off x="9383040" y="5709960"/>
-            <a:ext cx="910440" cy="910440"/>
+            <a:ext cx="910080" cy="910080"/>
           </a:xfrm>
           <a:prstGeom prst="rect">
             <a:avLst/>
@@ -7300,7 +7323,7 @@
         <p:spPr>
           <a:xfrm>
             <a:off x="7495920" y="5709960"/>
-            <a:ext cx="910440" cy="910440"/>
+            <a:ext cx="910080" cy="910080"/>
           </a:xfrm>
           <a:prstGeom prst="rect">
             <a:avLst/>
@@ -7323,7 +7346,7 @@
         <p:spPr>
           <a:xfrm>
             <a:off x="4004640" y="5709960"/>
-            <a:ext cx="910440" cy="910440"/>
+            <a:ext cx="910080" cy="910080"/>
           </a:xfrm>
           <a:prstGeom prst="rect">
             <a:avLst/>
@@ -7346,7 +7369,7 @@
         <p:spPr>
           <a:xfrm>
             <a:off x="276120" y="5759640"/>
-            <a:ext cx="910440" cy="910440"/>
+            <a:ext cx="910080" cy="910080"/>
           </a:xfrm>
           <a:prstGeom prst="rect">
             <a:avLst/>
@@ -7365,7 +7388,7 @@
         <p:spPr>
           <a:xfrm>
             <a:off x="1230120" y="6098760"/>
-            <a:ext cx="678960" cy="258120"/>
+            <a:ext cx="678600" cy="257760"/>
           </a:xfrm>
           <a:prstGeom prst="rightArrow">
             <a:avLst>
@@ -7404,7 +7427,7 @@
         <p:spPr>
           <a:xfrm>
             <a:off x="3103920" y="6117480"/>
-            <a:ext cx="678960" cy="258120"/>
+            <a:ext cx="678600" cy="257760"/>
           </a:xfrm>
           <a:prstGeom prst="rightArrow">
             <a:avLst>
@@ -7443,7 +7466,7 @@
         <p:spPr>
           <a:xfrm>
             <a:off x="4958640" y="6109200"/>
-            <a:ext cx="678960" cy="258120"/>
+            <a:ext cx="678600" cy="257760"/>
           </a:xfrm>
           <a:prstGeom prst="rightArrow">
             <a:avLst>
@@ -7482,7 +7505,7 @@
         <p:spPr>
           <a:xfrm>
             <a:off x="6754320" y="6098760"/>
-            <a:ext cx="678960" cy="258120"/>
+            <a:ext cx="678600" cy="257760"/>
           </a:xfrm>
           <a:prstGeom prst="rightArrow">
             <a:avLst>
@@ -7521,7 +7544,7 @@
         <p:spPr>
           <a:xfrm>
             <a:off x="8468280" y="6085800"/>
-            <a:ext cx="678960" cy="258120"/>
+            <a:ext cx="678600" cy="257760"/>
           </a:xfrm>
           <a:prstGeom prst="rightArrow">
             <a:avLst>
@@ -7564,7 +7587,7 @@
         <p:spPr>
           <a:xfrm>
             <a:off x="6582600" y="3915000"/>
-            <a:ext cx="910440" cy="910440"/>
+            <a:ext cx="910080" cy="910080"/>
           </a:xfrm>
           <a:prstGeom prst="rect">
             <a:avLst/>
@@ -7587,7 +7610,7 @@
         <p:spPr>
           <a:xfrm>
             <a:off x="8674920" y="3965760"/>
-            <a:ext cx="910440" cy="910440"/>
+            <a:ext cx="910080" cy="910080"/>
           </a:xfrm>
           <a:prstGeom prst="rect">
             <a:avLst/>
@@ -7610,7 +7633,7 @@
         <p:spPr>
           <a:xfrm>
             <a:off x="7203600" y="2661480"/>
-            <a:ext cx="910440" cy="910440"/>
+            <a:ext cx="910080" cy="910080"/>
           </a:xfrm>
           <a:prstGeom prst="rect">
             <a:avLst/>
@@ -7633,7 +7656,7 @@
         <p:spPr>
           <a:xfrm>
             <a:off x="10398960" y="3368880"/>
-            <a:ext cx="910440" cy="910440"/>
+            <a:ext cx="910080" cy="910080"/>
           </a:xfrm>
           <a:prstGeom prst="rect">
             <a:avLst/>
@@ -7656,7 +7679,7 @@
         <p:spPr>
           <a:xfrm>
             <a:off x="7002000" y="5015520"/>
-            <a:ext cx="910440" cy="910440"/>
+            <a:ext cx="910080" cy="910080"/>
           </a:xfrm>
           <a:prstGeom prst="rect">
             <a:avLst/>
@@ -7674,8 +7697,8 @@
         </p:nvSpPr>
         <p:spPr>
           <a:xfrm rot="3732600">
-            <a:off x="9843840" y="3699000"/>
-            <a:ext cx="200160" cy="666000"/>
+            <a:off x="9844200" y="3699000"/>
+            <a:ext cx="199800" cy="665640"/>
           </a:xfrm>
           <a:prstGeom prst="downArrow">
             <a:avLst>
@@ -7713,8 +7736,8 @@
         </p:nvSpPr>
         <p:spPr>
           <a:xfrm rot="14618400">
-            <a:off x="8192880" y="4700520"/>
-            <a:ext cx="200160" cy="666000"/>
+            <a:off x="8192880" y="4700880"/>
+            <a:ext cx="199800" cy="665640"/>
           </a:xfrm>
           <a:prstGeom prst="downArrow">
             <a:avLst>
@@ -7752,8 +7775,8 @@
         </p:nvSpPr>
         <p:spPr>
           <a:xfrm rot="5400000">
-            <a:off x="8041680" y="4068360"/>
-            <a:ext cx="200160" cy="666000"/>
+            <a:off x="8042040" y="4068360"/>
+            <a:ext cx="199800" cy="665640"/>
           </a:xfrm>
           <a:prstGeom prst="downArrow">
             <a:avLst>
@@ -7791,8 +7814,8 @@
         </p:nvSpPr>
         <p:spPr>
           <a:xfrm rot="7014000">
-            <a:off x="8274960" y="3488040"/>
-            <a:ext cx="200160" cy="666000"/>
+            <a:off x="8275320" y="3488040"/>
+            <a:ext cx="199800" cy="665640"/>
           </a:xfrm>
           <a:prstGeom prst="downArrow">
             <a:avLst>
@@ -7830,8 +7853,8 @@
         </p:nvSpPr>
         <p:spPr>
           <a:xfrm rot="1747800">
-            <a:off x="7095240" y="3424320"/>
-            <a:ext cx="200160" cy="666000"/>
+            <a:off x="7094880" y="3424320"/>
+            <a:ext cx="199800" cy="665640"/>
           </a:xfrm>
           <a:prstGeom prst="downArrow">
             <a:avLst>
@@ -7874,7 +7897,7 @@
         <p:spPr>
           <a:xfrm>
             <a:off x="8641080" y="309600"/>
-            <a:ext cx="910440" cy="910440"/>
+            <a:ext cx="910080" cy="910080"/>
           </a:xfrm>
           <a:prstGeom prst="rect">
             <a:avLst/>
@@ -7897,7 +7920,7 @@
         <p:spPr>
           <a:xfrm>
             <a:off x="10568880" y="1497240"/>
-            <a:ext cx="910440" cy="910440"/>
+            <a:ext cx="910080" cy="910080"/>
           </a:xfrm>
           <a:prstGeom prst="rect">
             <a:avLst/>
@@ -7920,7 +7943,7 @@
         <p:spPr>
           <a:xfrm>
             <a:off x="6932880" y="1497240"/>
-            <a:ext cx="910440" cy="910440"/>
+            <a:ext cx="910080" cy="910080"/>
           </a:xfrm>
           <a:prstGeom prst="rect">
             <a:avLst/>
@@ -7939,7 +7962,7 @@
         <p:spPr>
           <a:xfrm>
             <a:off x="8173800" y="1774080"/>
-            <a:ext cx="2064600" cy="356760"/>
+            <a:ext cx="2064240" cy="356400"/>
           </a:xfrm>
           <a:prstGeom prst="rightArrow">
             <a:avLst>
@@ -7978,7 +8001,7 @@
         <p:spPr>
           <a:xfrm>
             <a:off x="8947440" y="1361160"/>
-            <a:ext cx="297720" cy="403200"/>
+            <a:ext cx="297360" cy="402840"/>
           </a:xfrm>
           <a:prstGeom prst="downArrow">
             <a:avLst>
@@ -8066,7 +8089,7 @@
         <p:spPr>
           <a:xfrm>
             <a:off x="0" y="0"/>
-            <a:ext cx="12188160" cy="6854040"/>
+            <a:ext cx="12187800" cy="6853680"/>
           </a:xfrm>
           <a:prstGeom prst="rect">
             <a:avLst/>
@@ -8119,7 +8142,7 @@
         <p:spPr>
           <a:xfrm>
             <a:off x="640440" y="685800"/>
-            <a:ext cx="4814640" cy="4599720"/>
+            <a:ext cx="4814280" cy="4599360"/>
           </a:xfrm>
           <a:prstGeom prst="rect">
             <a:avLst/>
@@ -8170,7 +8193,7 @@
         <p:spPr>
           <a:xfrm>
             <a:off x="6095880" y="0"/>
-            <a:ext cx="6091920" cy="6854040"/>
+            <a:ext cx="6091560" cy="6853680"/>
           </a:xfrm>
           <a:prstGeom prst="rect">
             <a:avLst/>
@@ -8208,7 +8231,7 @@
         <p:spPr>
           <a:xfrm>
             <a:off x="6625800" y="685800"/>
-            <a:ext cx="4875120" cy="4599720"/>
+            <a:ext cx="4874760" cy="4599360"/>
           </a:xfrm>
           <a:prstGeom prst="rect">
             <a:avLst/>
@@ -8229,7 +8252,7 @@
             <a:normAutofit/>
           </a:bodyPr>
           <a:p>
-            <a:pPr marL="285840" indent="-281880">
+            <a:pPr marL="285840" indent="-281520">
               <a:lnSpc>
                 <a:spcPct val="100000"/>
               </a:lnSpc>
@@ -8261,7 +8284,7 @@
             </a:endParaRPr>
           </a:p>
           <a:p>
-            <a:pPr marL="285840" indent="-281880">
+            <a:pPr marL="285840" indent="-281520">
               <a:lnSpc>
                 <a:spcPct val="100000"/>
               </a:lnSpc>
@@ -8293,7 +8316,7 @@
             </a:endParaRPr>
           </a:p>
           <a:p>
-            <a:pPr marL="285840" indent="-281880">
+            <a:pPr marL="285840" indent="-281520">
               <a:lnSpc>
                 <a:spcPct val="100000"/>
               </a:lnSpc>
@@ -8325,7 +8348,7 @@
             </a:endParaRPr>
           </a:p>
           <a:p>
-            <a:pPr marL="285840" indent="-281880">
+            <a:pPr marL="285840" indent="-281520">
               <a:lnSpc>
                 <a:spcPct val="100000"/>
               </a:lnSpc>
@@ -8357,7 +8380,7 @@
             </a:endParaRPr>
           </a:p>
           <a:p>
-            <a:pPr marL="285840" indent="-281880">
+            <a:pPr marL="285840" indent="-281520">
               <a:lnSpc>
                 <a:spcPct val="100000"/>
               </a:lnSpc>
@@ -8421,7 +8444,7 @@
         <p:spPr>
           <a:xfrm>
             <a:off x="684360" y="4487400"/>
-            <a:ext cx="8530560" cy="1503000"/>
+            <a:ext cx="8530200" cy="1502640"/>
           </a:xfrm>
           <a:prstGeom prst="rect">
             <a:avLst/>
@@ -8470,7 +8493,7 @@
         <p:spPr>
           <a:xfrm>
             <a:off x="684360" y="685800"/>
-            <a:ext cx="8530560" cy="3611160"/>
+            <a:ext cx="8530200" cy="3610800"/>
           </a:xfrm>
           <a:prstGeom prst="rect">
             <a:avLst/>
@@ -8489,7 +8512,7 @@
         <p:txBody>
           <a:bodyPr lIns="90000" rIns="90000" tIns="45000" bIns="45000" anchor="ctr"/>
           <a:p>
-            <a:pPr marL="285840" indent="-281880">
+            <a:pPr marL="285840" indent="-281520">
               <a:lnSpc>
                 <a:spcPct val="100000"/>
               </a:lnSpc>
@@ -8521,7 +8544,7 @@
             </a:endParaRPr>
           </a:p>
           <a:p>
-            <a:pPr marL="285840" indent="-281880">
+            <a:pPr marL="285840" indent="-281520">
               <a:lnSpc>
                 <a:spcPct val="100000"/>
               </a:lnSpc>
@@ -8631,7 +8654,7 @@
         <p:spPr>
           <a:xfrm>
             <a:off x="6995520" y="1949760"/>
-            <a:ext cx="850680" cy="850680"/>
+            <a:ext cx="850320" cy="850320"/>
           </a:xfrm>
           <a:prstGeom prst="rect">
             <a:avLst/>
@@ -8654,7 +8677,7 @@
         <p:spPr>
           <a:xfrm>
             <a:off x="6829560" y="4303080"/>
-            <a:ext cx="1177200" cy="469440"/>
+            <a:ext cx="1176840" cy="469080"/>
           </a:xfrm>
           <a:prstGeom prst="rect">
             <a:avLst/>
@@ -8677,7 +8700,7 @@
         <p:spPr>
           <a:xfrm>
             <a:off x="6951960" y="2903040"/>
-            <a:ext cx="894240" cy="1036440"/>
+            <a:ext cx="893880" cy="1036080"/>
           </a:xfrm>
           <a:prstGeom prst="rect">
             <a:avLst/>
@@ -8700,7 +8723,7 @@
         <p:spPr>
           <a:xfrm>
             <a:off x="2616120" y="2071080"/>
-            <a:ext cx="910440" cy="910440"/>
+            <a:ext cx="910080" cy="910080"/>
           </a:xfrm>
           <a:prstGeom prst="rect">
             <a:avLst/>
@@ -8723,7 +8746,7 @@
         <p:spPr>
           <a:xfrm>
             <a:off x="2637000" y="3377160"/>
-            <a:ext cx="910440" cy="910440"/>
+            <a:ext cx="910080" cy="910080"/>
           </a:xfrm>
           <a:prstGeom prst="rect">
             <a:avLst/>
@@ -8741,8 +8764,8 @@
         </p:nvSpPr>
         <p:spPr>
           <a:xfrm rot="1192200">
-            <a:off x="3944160" y="2677320"/>
-            <a:ext cx="974520" cy="480600"/>
+            <a:off x="3943800" y="2677320"/>
+            <a:ext cx="974160" cy="480240"/>
           </a:xfrm>
           <a:prstGeom prst="rightArrow">
             <a:avLst>
@@ -8784,7 +8807,7 @@
         <p:spPr>
           <a:xfrm rot="20407800">
             <a:off x="3922920" y="3465360"/>
-            <a:ext cx="974520" cy="480600"/>
+            <a:ext cx="974160" cy="480240"/>
           </a:xfrm>
           <a:prstGeom prst="rightArrow">
             <a:avLst>
@@ -8825,8 +8848,8 @@
         </p:nvSpPr>
         <p:spPr>
           <a:xfrm rot="1192200">
-            <a:off x="5698080" y="3785760"/>
-            <a:ext cx="974520" cy="480600"/>
+            <a:off x="5697720" y="3785760"/>
+            <a:ext cx="974160" cy="480240"/>
           </a:xfrm>
           <a:prstGeom prst="rightArrow">
             <a:avLst>
@@ -8868,7 +8891,7 @@
         <p:spPr>
           <a:xfrm rot="20407800">
             <a:off x="5771160" y="2460960"/>
-            <a:ext cx="974520" cy="480600"/>
+            <a:ext cx="974160" cy="480240"/>
           </a:xfrm>
           <a:prstGeom prst="rightArrow">
             <a:avLst>
@@ -8910,7 +8933,7 @@
         <p:spPr>
           <a:xfrm>
             <a:off x="5849640" y="3121560"/>
-            <a:ext cx="974520" cy="480600"/>
+            <a:ext cx="974160" cy="480240"/>
           </a:xfrm>
           <a:prstGeom prst="rightArrow">
             <a:avLst>
@@ -8956,7 +8979,7 @@
         <p:spPr>
           <a:xfrm>
             <a:off x="4950720" y="2998800"/>
-            <a:ext cx="752760" cy="752760"/>
+            <a:ext cx="752400" cy="752400"/>
           </a:xfrm>
           <a:prstGeom prst="rect">
             <a:avLst/>
@@ -8997,7 +9020,7 @@
         <p:spPr>
           <a:xfrm>
             <a:off x="684360" y="4487400"/>
-            <a:ext cx="8530560" cy="1503000"/>
+            <a:ext cx="8530200" cy="1502640"/>
           </a:xfrm>
           <a:prstGeom prst="rect">
             <a:avLst/>
@@ -9046,7 +9069,7 @@
         <p:spPr>
           <a:xfrm>
             <a:off x="684360" y="685800"/>
-            <a:ext cx="8530560" cy="3611160"/>
+            <a:ext cx="8530200" cy="3610800"/>
           </a:xfrm>
           <a:prstGeom prst="rect">
             <a:avLst/>
@@ -9065,7 +9088,7 @@
         <p:txBody>
           <a:bodyPr lIns="90000" rIns="90000" tIns="45000" bIns="45000" anchor="ctr"/>
           <a:p>
-            <a:pPr marL="285840" indent="-281880">
+            <a:pPr marL="285840" indent="-281520">
               <a:lnSpc>
                 <a:spcPct val="100000"/>
               </a:lnSpc>
@@ -9191,7 +9214,7 @@
             </a:endParaRPr>
           </a:p>
           <a:p>
-            <a:pPr marL="285840" indent="-281880">
+            <a:pPr marL="285840" indent="-281520">
               <a:lnSpc>
                 <a:spcPct val="100000"/>
               </a:lnSpc>
@@ -9283,7 +9306,7 @@
         <p:spPr>
           <a:xfrm>
             <a:off x="3562560" y="1395720"/>
-            <a:ext cx="910440" cy="910440"/>
+            <a:ext cx="910080" cy="910080"/>
           </a:xfrm>
           <a:prstGeom prst="rect">
             <a:avLst/>
@@ -9306,7 +9329,7 @@
         <p:spPr>
           <a:xfrm>
             <a:off x="6678360" y="1395720"/>
-            <a:ext cx="910440" cy="910440"/>
+            <a:ext cx="910080" cy="910080"/>
           </a:xfrm>
           <a:prstGeom prst="rect">
             <a:avLst/>
@@ -9329,7 +9352,7 @@
         <p:spPr>
           <a:xfrm>
             <a:off x="7042320" y="3904200"/>
-            <a:ext cx="910440" cy="910440"/>
+            <a:ext cx="910080" cy="910080"/>
           </a:xfrm>
           <a:prstGeom prst="rect">
             <a:avLst/>
@@ -9352,7 +9375,7 @@
         <p:spPr>
           <a:xfrm>
             <a:off x="3562560" y="3904200"/>
-            <a:ext cx="910440" cy="910440"/>
+            <a:ext cx="910080" cy="910080"/>
           </a:xfrm>
           <a:prstGeom prst="rect">
             <a:avLst/>
@@ -9375,7 +9398,7 @@
         <p:spPr>
           <a:xfrm>
             <a:off x="6678360" y="1395720"/>
-            <a:ext cx="910440" cy="910440"/>
+            <a:ext cx="910080" cy="910080"/>
           </a:xfrm>
           <a:prstGeom prst="rect">
             <a:avLst/>
@@ -9398,7 +9421,7 @@
         <p:spPr>
           <a:xfrm>
             <a:off x="4113000" y="2039400"/>
-            <a:ext cx="910440" cy="910440"/>
+            <a:ext cx="910080" cy="910080"/>
           </a:xfrm>
           <a:prstGeom prst="rect">
             <a:avLst/>
@@ -9421,7 +9444,7 @@
         <p:spPr>
           <a:xfrm>
             <a:off x="7296480" y="2133000"/>
-            <a:ext cx="910440" cy="910440"/>
+            <a:ext cx="910080" cy="910080"/>
           </a:xfrm>
           <a:prstGeom prst="rect">
             <a:avLst/>
@@ -9440,7 +9463,7 @@
         <p:spPr>
           <a:xfrm>
             <a:off x="5285160" y="1920960"/>
-            <a:ext cx="1179000" cy="541440"/>
+            <a:ext cx="1178640" cy="541080"/>
           </a:xfrm>
           <a:prstGeom prst="rightArrow">
             <a:avLst>
@@ -9482,7 +9505,7 @@
         <p:spPr>
           <a:xfrm>
             <a:off x="5149440" y="4088880"/>
-            <a:ext cx="1179000" cy="541440"/>
+            <a:ext cx="1178640" cy="541080"/>
           </a:xfrm>
           <a:prstGeom prst="rightArrow">
             <a:avLst>
@@ -9547,7 +9570,7 @@
         <p:spPr>
           <a:xfrm>
             <a:off x="4895280" y="2388600"/>
-            <a:ext cx="2703960" cy="361080"/>
+            <a:ext cx="2703600" cy="360720"/>
           </a:xfrm>
           <a:prstGeom prst="rect">
             <a:avLst/>
@@ -9596,7 +9619,7 @@
         <p:spPr>
           <a:xfrm>
             <a:off x="5027400" y="4575240"/>
-            <a:ext cx="2323800" cy="361080"/>
+            <a:ext cx="2323440" cy="360720"/>
           </a:xfrm>
           <a:prstGeom prst="rect">
             <a:avLst/>
@@ -9667,7 +9690,7 @@
         <p:spPr>
           <a:xfrm>
             <a:off x="684360" y="4487400"/>
-            <a:ext cx="8530560" cy="1503000"/>
+            <a:ext cx="8530200" cy="1502640"/>
           </a:xfrm>
           <a:prstGeom prst="rect">
             <a:avLst/>
@@ -9716,7 +9739,7 @@
         <p:spPr>
           <a:xfrm>
             <a:off x="684360" y="685800"/>
-            <a:ext cx="8530560" cy="3611160"/>
+            <a:ext cx="8530200" cy="3610800"/>
           </a:xfrm>
           <a:prstGeom prst="rect">
             <a:avLst/>
@@ -9735,7 +9758,7 @@
         <p:txBody>
           <a:bodyPr lIns="90000" rIns="90000" tIns="45000" bIns="45000" anchor="ctr"/>
           <a:p>
-            <a:pPr marL="285840" indent="-281880">
+            <a:pPr marL="285840" indent="-281520">
               <a:lnSpc>
                 <a:spcPct val="100000"/>
               </a:lnSpc>
@@ -9857,7 +9880,7 @@
         <p:spPr>
           <a:xfrm>
             <a:off x="1863000" y="3157920"/>
-            <a:ext cx="910440" cy="910440"/>
+            <a:ext cx="910080" cy="910080"/>
           </a:xfrm>
           <a:prstGeom prst="rect">
             <a:avLst/>
@@ -9880,7 +9903,7 @@
         <p:spPr>
           <a:xfrm>
             <a:off x="2413440" y="3801600"/>
-            <a:ext cx="910440" cy="910440"/>
+            <a:ext cx="910080" cy="910080"/>
           </a:xfrm>
           <a:prstGeom prst="rect">
             <a:avLst/>
@@ -9903,7 +9926,7 @@
         <p:spPr>
           <a:xfrm>
             <a:off x="7197480" y="3439800"/>
-            <a:ext cx="910440" cy="910440"/>
+            <a:ext cx="910080" cy="910080"/>
           </a:xfrm>
           <a:prstGeom prst="rect">
             <a:avLst/>
@@ -9926,7 +9949,7 @@
         <p:spPr>
           <a:xfrm>
             <a:off x="4758840" y="3366360"/>
-            <a:ext cx="910440" cy="910440"/>
+            <a:ext cx="910080" cy="910080"/>
           </a:xfrm>
           <a:prstGeom prst="rect">
             <a:avLst/>
@@ -9945,7 +9968,7 @@
         <p:spPr>
           <a:xfrm>
             <a:off x="3568680" y="3429000"/>
-            <a:ext cx="933480" cy="910440"/>
+            <a:ext cx="933120" cy="910080"/>
           </a:xfrm>
           <a:prstGeom prst="mathPlus">
             <a:avLst>
@@ -9983,7 +10006,7 @@
         <p:spPr>
           <a:xfrm>
             <a:off x="6095880" y="3654360"/>
-            <a:ext cx="734400" cy="562320"/>
+            <a:ext cx="734040" cy="561960"/>
           </a:xfrm>
           <a:prstGeom prst="mathEqual">
             <a:avLst>
@@ -10044,7 +10067,7 @@
         <p:spPr>
           <a:xfrm>
             <a:off x="4750920" y="2898360"/>
-            <a:ext cx="2685960" cy="3715920"/>
+            <a:ext cx="2685600" cy="3715560"/>
           </a:xfrm>
           <a:prstGeom prst="rect">
             <a:avLst/>
@@ -10087,7 +10110,7 @@
         <p:spPr>
           <a:xfrm>
             <a:off x="684360" y="4487400"/>
-            <a:ext cx="8530560" cy="1503000"/>
+            <a:ext cx="8530200" cy="1502640"/>
           </a:xfrm>
           <a:prstGeom prst="rect">
             <a:avLst/>
@@ -10136,7 +10159,7 @@
         <p:spPr>
           <a:xfrm>
             <a:off x="684360" y="685800"/>
-            <a:ext cx="8530560" cy="3611160"/>
+            <a:ext cx="8530200" cy="3610800"/>
           </a:xfrm>
           <a:prstGeom prst="rect">
             <a:avLst/>
@@ -10155,7 +10178,7 @@
         <p:txBody>
           <a:bodyPr lIns="90000" rIns="90000" tIns="45000" bIns="45000" anchor="ctr"/>
           <a:p>
-            <a:pPr marL="285840" indent="-281880">
+            <a:pPr marL="285840" indent="-281520">
               <a:lnSpc>
                 <a:spcPct val="100000"/>
               </a:lnSpc>
@@ -10291,7 +10314,7 @@
         <p:spPr>
           <a:xfrm>
             <a:off x="4843440" y="2989800"/>
-            <a:ext cx="637920" cy="637920"/>
+            <a:ext cx="637560" cy="637560"/>
           </a:xfrm>
           <a:prstGeom prst="rect">
             <a:avLst/>
@@ -10314,7 +10337,7 @@
         <p:spPr>
           <a:xfrm>
             <a:off x="5028120" y="4248360"/>
-            <a:ext cx="910440" cy="910440"/>
+            <a:ext cx="910080" cy="910080"/>
           </a:xfrm>
           <a:prstGeom prst="rect">
             <a:avLst/>
@@ -10337,7 +10360,7 @@
         <p:spPr>
           <a:xfrm>
             <a:off x="5506200" y="5025240"/>
-            <a:ext cx="910440" cy="910440"/>
+            <a:ext cx="910080" cy="910080"/>
           </a:xfrm>
           <a:prstGeom prst="rect">
             <a:avLst/>
@@ -10360,7 +10383,7 @@
         <p:spPr>
           <a:xfrm>
             <a:off x="6042600" y="4248360"/>
-            <a:ext cx="910440" cy="910440"/>
+            <a:ext cx="910080" cy="910080"/>
           </a:xfrm>
           <a:prstGeom prst="rect">
             <a:avLst/>
@@ -10383,7 +10406,7 @@
         <p:spPr>
           <a:xfrm>
             <a:off x="7944480" y="2602440"/>
-            <a:ext cx="910440" cy="910440"/>
+            <a:ext cx="910080" cy="910080"/>
           </a:xfrm>
           <a:prstGeom prst="rect">
             <a:avLst/>
@@ -10406,7 +10429,7 @@
         <p:spPr>
           <a:xfrm>
             <a:off x="6671160" y="3059640"/>
-            <a:ext cx="567720" cy="567720"/>
+            <a:ext cx="567360" cy="567360"/>
           </a:xfrm>
           <a:prstGeom prst="rect">
             <a:avLst/>
@@ -10429,7 +10452,7 @@
         <p:spPr>
           <a:xfrm>
             <a:off x="2973240" y="3863520"/>
-            <a:ext cx="910440" cy="910440"/>
+            <a:ext cx="910080" cy="910080"/>
           </a:xfrm>
           <a:prstGeom prst="rect">
             <a:avLst/>
@@ -10448,7 +10471,7 @@
         <p:spPr>
           <a:xfrm>
             <a:off x="4012560" y="4487400"/>
-            <a:ext cx="1489680" cy="853200"/>
+            <a:ext cx="1489320" cy="852840"/>
           </a:xfrm>
           <a:custGeom>
             <a:avLst/>
@@ -10500,7 +10523,7 @@
         <p:spPr>
           <a:xfrm>
             <a:off x="4012560" y="4248360"/>
-            <a:ext cx="2026080" cy="235080"/>
+            <a:ext cx="2025720" cy="234720"/>
           </a:xfrm>
           <a:custGeom>
             <a:avLst/>
@@ -10552,7 +10575,7 @@
         <p:spPr>
           <a:xfrm>
             <a:off x="4012560" y="4367880"/>
-            <a:ext cx="934920" cy="235800"/>
+            <a:ext cx="934560" cy="235440"/>
           </a:xfrm>
           <a:custGeom>
             <a:avLst/>
@@ -10604,7 +10627,7 @@
         <p:spPr>
           <a:xfrm flipV="1">
             <a:off x="7242840" y="3218400"/>
-            <a:ext cx="625680" cy="119160"/>
+            <a:ext cx="625320" cy="118800"/>
           </a:xfrm>
           <a:custGeom>
             <a:avLst/>
@@ -10679,7 +10702,7 @@
         <p:spPr>
           <a:xfrm>
             <a:off x="684360" y="4487400"/>
-            <a:ext cx="8530560" cy="1503000"/>
+            <a:ext cx="8530200" cy="1502640"/>
           </a:xfrm>
           <a:prstGeom prst="rect">
             <a:avLst/>
@@ -10728,7 +10751,7 @@
         <p:spPr>
           <a:xfrm>
             <a:off x="684360" y="685800"/>
-            <a:ext cx="8530560" cy="3611160"/>
+            <a:ext cx="8530200" cy="3610800"/>
           </a:xfrm>
           <a:prstGeom prst="rect">
             <a:avLst/>
@@ -10747,7 +10770,7 @@
         <p:txBody>
           <a:bodyPr lIns="90000" rIns="90000" tIns="45000" bIns="45000" anchor="ctr"/>
           <a:p>
-            <a:pPr marL="285840" indent="-281880">
+            <a:pPr marL="285840" indent="-281520">
               <a:lnSpc>
                 <a:spcPct val="100000"/>
               </a:lnSpc>
@@ -10915,7 +10938,7 @@
         <p:spPr>
           <a:xfrm>
             <a:off x="5430600" y="2730600"/>
-            <a:ext cx="2685960" cy="3715920"/>
+            <a:ext cx="2685600" cy="3715560"/>
           </a:xfrm>
           <a:prstGeom prst="rect">
             <a:avLst/>
@@ -10962,7 +10985,7 @@
         <p:spPr>
           <a:xfrm>
             <a:off x="5523120" y="2822040"/>
-            <a:ext cx="637920" cy="637920"/>
+            <a:ext cx="637560" cy="637560"/>
           </a:xfrm>
           <a:prstGeom prst="rect">
             <a:avLst/>
@@ -10985,7 +11008,7 @@
         <p:spPr>
           <a:xfrm>
             <a:off x="5707800" y="4080600"/>
-            <a:ext cx="910440" cy="910440"/>
+            <a:ext cx="910080" cy="910080"/>
           </a:xfrm>
           <a:prstGeom prst="rect">
             <a:avLst/>
@@ -11008,7 +11031,7 @@
         <p:spPr>
           <a:xfrm>
             <a:off x="6185880" y="4857480"/>
-            <a:ext cx="910440" cy="910440"/>
+            <a:ext cx="910080" cy="910080"/>
           </a:xfrm>
           <a:prstGeom prst="rect">
             <a:avLst/>
@@ -11031,7 +11054,7 @@
         <p:spPr>
           <a:xfrm>
             <a:off x="6722280" y="4080600"/>
-            <a:ext cx="910440" cy="910440"/>
+            <a:ext cx="910080" cy="910080"/>
           </a:xfrm>
           <a:prstGeom prst="rect">
             <a:avLst/>
@@ -11054,7 +11077,7 @@
         <p:spPr>
           <a:xfrm>
             <a:off x="3652920" y="3695760"/>
-            <a:ext cx="910440" cy="910440"/>
+            <a:ext cx="910080" cy="910080"/>
           </a:xfrm>
           <a:prstGeom prst="rect">
             <a:avLst/>
@@ -11073,7 +11096,7 @@
         <p:spPr>
           <a:xfrm>
             <a:off x="4692240" y="4319640"/>
-            <a:ext cx="1489680" cy="853200"/>
+            <a:ext cx="1489320" cy="852840"/>
           </a:xfrm>
           <a:custGeom>
             <a:avLst/>
@@ -11125,7 +11148,7 @@
         <p:spPr>
           <a:xfrm>
             <a:off x="4692240" y="4080600"/>
-            <a:ext cx="2026080" cy="235080"/>
+            <a:ext cx="2025720" cy="234720"/>
           </a:xfrm>
           <a:custGeom>
             <a:avLst/>
@@ -11177,7 +11200,7 @@
         <p:spPr>
           <a:xfrm>
             <a:off x="4692240" y="4200120"/>
-            <a:ext cx="934920" cy="235800"/>
+            <a:ext cx="934560" cy="235440"/>
           </a:xfrm>
           <a:custGeom>
             <a:avLst/>
@@ -11233,7 +11256,7 @@
         <p:spPr>
           <a:xfrm>
             <a:off x="9653760" y="3605400"/>
-            <a:ext cx="910440" cy="910440"/>
+            <a:ext cx="910080" cy="910080"/>
           </a:xfrm>
           <a:prstGeom prst="rect">
             <a:avLst/>
@@ -11251,8 +11274,8 @@
         </p:nvSpPr>
         <p:spPr>
           <a:xfrm rot="10325400">
-            <a:off x="7858080" y="4106880"/>
-            <a:ext cx="1782000" cy="303840"/>
+            <a:off x="7858440" y="4106880"/>
+            <a:ext cx="1781640" cy="303480"/>
           </a:xfrm>
           <a:prstGeom prst="rightArrow">
             <a:avLst>
@@ -11316,7 +11339,7 @@
         <p:spPr>
           <a:xfrm>
             <a:off x="684360" y="4487400"/>
-            <a:ext cx="8530560" cy="1503000"/>
+            <a:ext cx="8530200" cy="1502640"/>
           </a:xfrm>
           <a:prstGeom prst="rect">
             <a:avLst/>
@@ -11365,7 +11388,7 @@
         <p:spPr>
           <a:xfrm>
             <a:off x="684360" y="685800"/>
-            <a:ext cx="8530560" cy="3611160"/>
+            <a:ext cx="8530200" cy="3610800"/>
           </a:xfrm>
           <a:prstGeom prst="rect">
             <a:avLst/>
@@ -11395,7 +11418,7 @@
         <p:spPr>
           <a:xfrm>
             <a:off x="4069440" y="82800"/>
-            <a:ext cx="4042440" cy="2842920"/>
+            <a:ext cx="4042080" cy="2842560"/>
           </a:xfrm>
           <a:prstGeom prst="rect">
             <a:avLst/>
@@ -11418,7 +11441,7 @@
         <p:spPr>
           <a:xfrm>
             <a:off x="83880" y="3103560"/>
-            <a:ext cx="3863520" cy="1640520"/>
+            <a:ext cx="3863160" cy="1640160"/>
           </a:xfrm>
           <a:prstGeom prst="rect">
             <a:avLst/>
@@ -11441,7 +11464,7 @@
         <p:spPr>
           <a:xfrm>
             <a:off x="4161600" y="3103560"/>
-            <a:ext cx="3863520" cy="1640520"/>
+            <a:ext cx="3863160" cy="1640160"/>
           </a:xfrm>
           <a:prstGeom prst="rect">
             <a:avLst/>
@@ -11464,7 +11487,7 @@
         <p:spPr>
           <a:xfrm>
             <a:off x="8230320" y="3103560"/>
-            <a:ext cx="3863520" cy="1640520"/>
+            <a:ext cx="3863160" cy="1640160"/>
           </a:xfrm>
           <a:prstGeom prst="rect">
             <a:avLst/>
@@ -11483,7 +11506,7 @@
         <p:spPr>
           <a:xfrm>
             <a:off x="3993840" y="3766680"/>
-            <a:ext cx="147240" cy="315360"/>
+            <a:ext cx="146880" cy="315000"/>
           </a:xfrm>
           <a:prstGeom prst="rightArrow">
             <a:avLst>
@@ -11522,7 +11545,7 @@
         <p:spPr>
           <a:xfrm>
             <a:off x="8073360" y="3793320"/>
-            <a:ext cx="128160" cy="315360"/>
+            <a:ext cx="127800" cy="315000"/>
           </a:xfrm>
           <a:prstGeom prst="rightArrow">
             <a:avLst>
@@ -11561,7 +11584,7 @@
         <p:spPr>
           <a:xfrm>
             <a:off x="2701080" y="5176080"/>
-            <a:ext cx="1833120" cy="918720"/>
+            <a:ext cx="1832760" cy="918360"/>
           </a:xfrm>
           <a:prstGeom prst="wedgeRectCallout">
             <a:avLst>
@@ -11626,7 +11649,7 @@
         <p:spPr>
           <a:xfrm>
             <a:off x="6722640" y="5196600"/>
-            <a:ext cx="1964520" cy="821880"/>
+            <a:ext cx="1964160" cy="821520"/>
           </a:xfrm>
           <a:prstGeom prst="wedgeRectCallout">
             <a:avLst>
@@ -11691,7 +11714,7 @@
         <p:spPr>
           <a:xfrm>
             <a:off x="9731160" y="5131440"/>
-            <a:ext cx="2101680" cy="652680"/>
+            <a:ext cx="2101320" cy="652320"/>
           </a:xfrm>
           <a:prstGeom prst="wedgeRectCallout">
             <a:avLst>
@@ -11756,7 +11779,7 @@
         <p:spPr>
           <a:xfrm>
             <a:off x="5033520" y="2516760"/>
-            <a:ext cx="2571480" cy="361080"/>
+            <a:ext cx="2571120" cy="360720"/>
           </a:xfrm>
           <a:prstGeom prst="rect">
             <a:avLst/>
@@ -11804,8 +11827,8 @@
         </p:nvSpPr>
         <p:spPr>
           <a:xfrm rot="16200000">
-            <a:off x="3177360" y="1269000"/>
-            <a:ext cx="1960560" cy="361080"/>
+            <a:off x="3177360" y="1269360"/>
+            <a:ext cx="1960200" cy="360720"/>
           </a:xfrm>
           <a:prstGeom prst="rect">
             <a:avLst/>
@@ -11876,7 +11899,7 @@
         <p:spPr>
           <a:xfrm>
             <a:off x="684360" y="4487400"/>
-            <a:ext cx="8530560" cy="1503000"/>
+            <a:ext cx="8530200" cy="1502640"/>
           </a:xfrm>
           <a:prstGeom prst="rect">
             <a:avLst/>
@@ -11927,9 +11950,9 @@
         <p:grpSpPr>
           <a:xfrm>
             <a:off x="948240" y="823320"/>
-            <a:ext cx="10288440" cy="3335760"/>
+            <a:ext cx="10288080" cy="3335400"/>
             <a:chOff x="948240" y="823320"/>
-            <a:chExt cx="10288440" cy="3335760"/>
+            <a:chExt cx="10288080" cy="3335400"/>
           </a:xfrm>
         </p:grpSpPr>
         <p:sp>
@@ -11941,7 +11964,7 @@
           <p:spPr>
             <a:xfrm>
               <a:off x="948240" y="823320"/>
-              <a:ext cx="1358640" cy="1358640"/>
+              <a:ext cx="1358280" cy="1358280"/>
             </a:xfrm>
             <a:prstGeom prst="ellipse">
               <a:avLst/>
@@ -11974,7 +11997,7 @@
           <p:spPr>
             <a:xfrm>
               <a:off x="1234440" y="1109520"/>
-              <a:ext cx="786240" cy="786240"/>
+              <a:ext cx="785880" cy="785880"/>
             </a:xfrm>
             <a:prstGeom prst="rect">
               <a:avLst/>
@@ -12005,7 +12028,7 @@
           <p:spPr>
             <a:xfrm>
               <a:off x="2602800" y="823320"/>
-              <a:ext cx="3207960" cy="1358640"/>
+              <a:ext cx="3207600" cy="1358280"/>
             </a:xfrm>
             <a:prstGeom prst="rect">
               <a:avLst/>
@@ -12057,7 +12080,7 @@
           <p:spPr>
             <a:xfrm>
               <a:off x="6374160" y="823320"/>
-              <a:ext cx="1358640" cy="1358640"/>
+              <a:ext cx="1358280" cy="1358280"/>
             </a:xfrm>
             <a:prstGeom prst="ellipse">
               <a:avLst/>
@@ -12090,7 +12113,7 @@
           <p:spPr>
             <a:xfrm>
               <a:off x="6660360" y="1109520"/>
-              <a:ext cx="786240" cy="786240"/>
+              <a:ext cx="785880" cy="785880"/>
             </a:xfrm>
             <a:prstGeom prst="rect">
               <a:avLst/>
@@ -12121,7 +12144,7 @@
           <p:spPr>
             <a:xfrm>
               <a:off x="8028720" y="823320"/>
-              <a:ext cx="3207960" cy="1358640"/>
+              <a:ext cx="3207600" cy="1358280"/>
             </a:xfrm>
             <a:prstGeom prst="rect">
               <a:avLst/>
@@ -12173,7 +12196,7 @@
           <p:spPr>
             <a:xfrm>
               <a:off x="948240" y="2800440"/>
-              <a:ext cx="1358640" cy="1358640"/>
+              <a:ext cx="1358280" cy="1358280"/>
             </a:xfrm>
             <a:prstGeom prst="ellipse">
               <a:avLst/>
@@ -12206,7 +12229,7 @@
           <p:spPr>
             <a:xfrm>
               <a:off x="1234440" y="3086640"/>
-              <a:ext cx="786240" cy="786240"/>
+              <a:ext cx="785880" cy="785880"/>
             </a:xfrm>
             <a:prstGeom prst="rect">
               <a:avLst/>
@@ -12237,7 +12260,7 @@
           <p:spPr>
             <a:xfrm>
               <a:off x="2602800" y="2800440"/>
-              <a:ext cx="3207960" cy="1358640"/>
+              <a:ext cx="3207600" cy="1358280"/>
             </a:xfrm>
             <a:prstGeom prst="rect">
               <a:avLst/>
@@ -12289,7 +12312,7 @@
           <p:spPr>
             <a:xfrm>
               <a:off x="6374160" y="2800440"/>
-              <a:ext cx="1358640" cy="1358640"/>
+              <a:ext cx="1358280" cy="1358280"/>
             </a:xfrm>
             <a:prstGeom prst="ellipse">
               <a:avLst/>
@@ -12322,7 +12345,7 @@
           <p:spPr>
             <a:xfrm>
               <a:off x="6660360" y="3086640"/>
-              <a:ext cx="786240" cy="786240"/>
+              <a:ext cx="785880" cy="785880"/>
             </a:xfrm>
             <a:prstGeom prst="rect">
               <a:avLst/>
@@ -12353,7 +12376,7 @@
           <p:spPr>
             <a:xfrm>
               <a:off x="8028720" y="2800440"/>
-              <a:ext cx="3207960" cy="1358640"/>
+              <a:ext cx="3207600" cy="1358280"/>
             </a:xfrm>
             <a:prstGeom prst="rect">
               <a:avLst/>
@@ -12443,7 +12466,7 @@
         <p:spPr>
           <a:xfrm>
             <a:off x="0" y="0"/>
-            <a:ext cx="12188160" cy="6854040"/>
+            <a:ext cx="12187800" cy="6853680"/>
           </a:xfrm>
           <a:prstGeom prst="rect">
             <a:avLst/>
@@ -12496,7 +12519,7 @@
         <p:spPr>
           <a:xfrm>
             <a:off x="0" y="0"/>
-            <a:ext cx="8125920" cy="6854040"/>
+            <a:ext cx="8125560" cy="6853680"/>
           </a:xfrm>
           <a:prstGeom prst="snip2DiagRect">
             <a:avLst>
@@ -12718,7 +12741,7 @@
         <p:spPr>
           <a:xfrm>
             <a:off x="8588520" y="941400"/>
-            <a:ext cx="3039840" cy="3244680"/>
+            <a:ext cx="3039480" cy="3244320"/>
           </a:xfrm>
           <a:prstGeom prst="rect">
             <a:avLst/>
@@ -12769,9 +12792,9 @@
         <p:grpSpPr>
           <a:xfrm>
             <a:off x="952560" y="2104200"/>
-            <a:ext cx="6162480" cy="2439360"/>
+            <a:ext cx="6162120" cy="2439000"/>
             <a:chOff x="952560" y="2104200"/>
-            <a:chExt cx="6162480" cy="2439360"/>
+            <a:chExt cx="6162120" cy="2439000"/>
           </a:xfrm>
         </p:grpSpPr>
         <p:sp>
@@ -12783,7 +12806,7 @@
           <p:spPr>
             <a:xfrm>
               <a:off x="952560" y="2104200"/>
-              <a:ext cx="812520" cy="812520"/>
+              <a:ext cx="812160" cy="812160"/>
             </a:xfrm>
             <a:prstGeom prst="ellipse">
               <a:avLst/>
@@ -12816,7 +12839,7 @@
           <p:spPr>
             <a:xfrm>
               <a:off x="1123920" y="2275560"/>
-              <a:ext cx="469440" cy="469440"/>
+              <a:ext cx="469080" cy="469080"/>
             </a:xfrm>
             <a:prstGeom prst="rect">
               <a:avLst/>
@@ -12847,7 +12870,7 @@
           <p:spPr>
             <a:xfrm>
               <a:off x="1944000" y="2104200"/>
-              <a:ext cx="1920240" cy="812520"/>
+              <a:ext cx="1919880" cy="812160"/>
             </a:xfrm>
             <a:prstGeom prst="rect">
               <a:avLst/>
@@ -12899,7 +12922,7 @@
           <p:spPr>
             <a:xfrm>
               <a:off x="4203360" y="2104200"/>
-              <a:ext cx="812520" cy="812520"/>
+              <a:ext cx="812160" cy="812160"/>
             </a:xfrm>
             <a:prstGeom prst="ellipse">
               <a:avLst/>
@@ -12932,7 +12955,7 @@
           <p:spPr>
             <a:xfrm>
               <a:off x="4375080" y="2275560"/>
-              <a:ext cx="469440" cy="469440"/>
+              <a:ext cx="469080" cy="469080"/>
             </a:xfrm>
             <a:prstGeom prst="rect">
               <a:avLst/>
@@ -12963,7 +12986,7 @@
           <p:spPr>
             <a:xfrm>
               <a:off x="5194800" y="2104200"/>
-              <a:ext cx="1920240" cy="812520"/>
+              <a:ext cx="1919880" cy="812160"/>
             </a:xfrm>
             <a:prstGeom prst="rect">
               <a:avLst/>
@@ -13015,7 +13038,7 @@
           <p:spPr>
             <a:xfrm>
               <a:off x="952560" y="3731040"/>
-              <a:ext cx="812520" cy="812520"/>
+              <a:ext cx="812160" cy="812160"/>
             </a:xfrm>
             <a:prstGeom prst="ellipse">
               <a:avLst/>
@@ -13048,7 +13071,7 @@
           <p:spPr>
             <a:xfrm>
               <a:off x="1123920" y="3902400"/>
-              <a:ext cx="469440" cy="469440"/>
+              <a:ext cx="469080" cy="469080"/>
             </a:xfrm>
             <a:prstGeom prst="rect">
               <a:avLst/>
@@ -13079,7 +13102,7 @@
           <p:spPr>
             <a:xfrm>
               <a:off x="1944000" y="3731040"/>
-              <a:ext cx="1920240" cy="812520"/>
+              <a:ext cx="1919880" cy="812160"/>
             </a:xfrm>
             <a:prstGeom prst="rect">
               <a:avLst/>
@@ -13131,7 +13154,7 @@
           <p:spPr>
             <a:xfrm>
               <a:off x="4203360" y="3731040"/>
-              <a:ext cx="812520" cy="812520"/>
+              <a:ext cx="812160" cy="812160"/>
             </a:xfrm>
             <a:prstGeom prst="ellipse">
               <a:avLst/>
@@ -13164,7 +13187,7 @@
           <p:spPr>
             <a:xfrm>
               <a:off x="4375080" y="3902400"/>
-              <a:ext cx="469440" cy="469440"/>
+              <a:ext cx="469080" cy="469080"/>
             </a:xfrm>
             <a:prstGeom prst="rect">
               <a:avLst/>
@@ -13195,7 +13218,7 @@
           <p:spPr>
             <a:xfrm>
               <a:off x="5194800" y="3731040"/>
-              <a:ext cx="1920240" cy="812520"/>
+              <a:ext cx="1919880" cy="812160"/>
             </a:xfrm>
             <a:prstGeom prst="rect">
               <a:avLst/>
@@ -13312,7 +13335,7 @@
         <p:spPr>
           <a:xfrm>
             <a:off x="684360" y="4487400"/>
-            <a:ext cx="8530560" cy="1503000"/>
+            <a:ext cx="8530200" cy="1502640"/>
           </a:xfrm>
           <a:prstGeom prst="rect">
             <a:avLst/>
@@ -13361,7 +13384,7 @@
         <p:spPr>
           <a:xfrm>
             <a:off x="684360" y="685800"/>
-            <a:ext cx="8530560" cy="3611160"/>
+            <a:ext cx="8530200" cy="3610800"/>
           </a:xfrm>
           <a:prstGeom prst="rect">
             <a:avLst/>
@@ -13380,7 +13403,7 @@
         <p:txBody>
           <a:bodyPr lIns="90000" rIns="90000" tIns="45000" bIns="45000" anchor="ctr"/>
           <a:p>
-            <a:pPr marL="285840" indent="-281880">
+            <a:pPr marL="285840" indent="-281520">
               <a:lnSpc>
                 <a:spcPct val="100000"/>
               </a:lnSpc>
@@ -13412,7 +13435,7 @@
             </a:endParaRPr>
           </a:p>
           <a:p>
-            <a:pPr marL="285840" indent="-281880">
+            <a:pPr marL="285840" indent="-281520">
               <a:lnSpc>
                 <a:spcPct val="100000"/>
               </a:lnSpc>
@@ -13444,7 +13467,7 @@
             </a:endParaRPr>
           </a:p>
           <a:p>
-            <a:pPr marL="285840" indent="-281880">
+            <a:pPr marL="285840" indent="-281520">
               <a:lnSpc>
                 <a:spcPct val="100000"/>
               </a:lnSpc>
@@ -13476,7 +13499,7 @@
             </a:endParaRPr>
           </a:p>
           <a:p>
-            <a:pPr marL="285840" indent="-281880">
+            <a:pPr marL="285840" indent="-281520">
               <a:lnSpc>
                 <a:spcPct val="100000"/>
               </a:lnSpc>
@@ -13540,7 +13563,7 @@
         <p:spPr>
           <a:xfrm>
             <a:off x="684360" y="4487400"/>
-            <a:ext cx="8530560" cy="1503000"/>
+            <a:ext cx="8530200" cy="1502640"/>
           </a:xfrm>
           <a:prstGeom prst="rect">
             <a:avLst/>
@@ -13593,7 +13616,7 @@
         <p:spPr>
           <a:xfrm>
             <a:off x="5221440" y="75600"/>
-            <a:ext cx="910440" cy="910440"/>
+            <a:ext cx="910080" cy="910080"/>
           </a:xfrm>
           <a:prstGeom prst="rect">
             <a:avLst/>
@@ -13616,7 +13639,7 @@
         <p:spPr>
           <a:xfrm>
             <a:off x="4695120" y="4444560"/>
-            <a:ext cx="910440" cy="910440"/>
+            <a:ext cx="910080" cy="910080"/>
           </a:xfrm>
           <a:prstGeom prst="rect">
             <a:avLst/>
@@ -13639,7 +13662,7 @@
         <p:spPr>
           <a:xfrm>
             <a:off x="2603880" y="2294640"/>
-            <a:ext cx="910440" cy="910440"/>
+            <a:ext cx="910080" cy="910080"/>
           </a:xfrm>
           <a:prstGeom prst="rect">
             <a:avLst/>
@@ -13662,7 +13685,7 @@
         <p:spPr>
           <a:xfrm>
             <a:off x="9767160" y="3294360"/>
-            <a:ext cx="910440" cy="910440"/>
+            <a:ext cx="910080" cy="910080"/>
           </a:xfrm>
           <a:prstGeom prst="rect">
             <a:avLst/>
@@ -13685,7 +13708,7 @@
         <p:spPr>
           <a:xfrm>
             <a:off x="1967760" y="3811680"/>
-            <a:ext cx="910440" cy="910440"/>
+            <a:ext cx="910080" cy="910080"/>
           </a:xfrm>
           <a:prstGeom prst="rect">
             <a:avLst/>
@@ -13708,7 +13731,7 @@
         <p:spPr>
           <a:xfrm>
             <a:off x="5221440" y="2907360"/>
-            <a:ext cx="910440" cy="910440"/>
+            <a:ext cx="910080" cy="910080"/>
           </a:xfrm>
           <a:prstGeom prst="rect">
             <a:avLst/>
@@ -13731,7 +13754,7 @@
         <p:spPr>
           <a:xfrm>
             <a:off x="1093680" y="3282480"/>
-            <a:ext cx="910440" cy="910440"/>
+            <a:ext cx="910080" cy="910080"/>
           </a:xfrm>
           <a:prstGeom prst="rect">
             <a:avLst/>
@@ -13754,7 +13777,7 @@
         <p:spPr>
           <a:xfrm>
             <a:off x="8595360" y="3808800"/>
-            <a:ext cx="910440" cy="910440"/>
+            <a:ext cx="910080" cy="910080"/>
           </a:xfrm>
           <a:prstGeom prst="rect">
             <a:avLst/>
@@ -13777,7 +13800,7 @@
         <p:spPr>
           <a:xfrm>
             <a:off x="7839000" y="2294640"/>
-            <a:ext cx="910440" cy="910440"/>
+            <a:ext cx="910080" cy="910080"/>
           </a:xfrm>
           <a:prstGeom prst="rect">
             <a:avLst/>
@@ -13796,7 +13819,7 @@
         <p:spPr>
           <a:xfrm>
             <a:off x="6312960" y="944640"/>
-            <a:ext cx="1522440" cy="1336320"/>
+            <a:ext cx="1522080" cy="1335960"/>
           </a:xfrm>
           <a:custGeom>
             <a:avLst/>
@@ -13849,7 +13872,7 @@
         <p:spPr>
           <a:xfrm>
             <a:off x="5678640" y="1145160"/>
-            <a:ext cx="360" cy="1602720"/>
+            <a:ext cx="360" cy="1602360"/>
           </a:xfrm>
           <a:custGeom>
             <a:avLst/>
@@ -13902,7 +13925,7 @@
         <p:spPr>
           <a:xfrm flipH="1">
             <a:off x="3422520" y="990000"/>
-            <a:ext cx="1613880" cy="1376640"/>
+            <a:ext cx="1613520" cy="1376280"/>
           </a:xfrm>
           <a:custGeom>
             <a:avLst/>
@@ -13955,7 +13978,7 @@
         <p:spPr>
           <a:xfrm>
             <a:off x="2082960" y="3279600"/>
-            <a:ext cx="913680" cy="361080"/>
+            <a:ext cx="913320" cy="360720"/>
           </a:xfrm>
           <a:prstGeom prst="rect">
             <a:avLst/>
@@ -14004,7 +14027,7 @@
         <p:spPr>
           <a:xfrm>
             <a:off x="5227200" y="4030200"/>
-            <a:ext cx="925920" cy="361080"/>
+            <a:ext cx="925560" cy="360720"/>
           </a:xfrm>
           <a:prstGeom prst="rect">
             <a:avLst/>
@@ -14053,7 +14076,7 @@
         <p:spPr>
           <a:xfrm>
             <a:off x="8246520" y="3279600"/>
-            <a:ext cx="1252080" cy="361080"/>
+            <a:ext cx="1251720" cy="360720"/>
           </a:xfrm>
           <a:prstGeom prst="rect">
             <a:avLst/>
@@ -14102,7 +14125,7 @@
         <p:spPr>
           <a:xfrm>
             <a:off x="481680" y="348120"/>
-            <a:ext cx="1808280" cy="361080"/>
+            <a:ext cx="1807920" cy="360720"/>
           </a:xfrm>
           <a:prstGeom prst="rect">
             <a:avLst/>
@@ -14155,7 +14178,7 @@
         <p:spPr>
           <a:xfrm>
             <a:off x="5855760" y="4444560"/>
-            <a:ext cx="910440" cy="910440"/>
+            <a:ext cx="910080" cy="910080"/>
           </a:xfrm>
           <a:prstGeom prst="rect">
             <a:avLst/>
@@ -14196,7 +14219,7 @@
         <p:spPr>
           <a:xfrm>
             <a:off x="684360" y="4487400"/>
-            <a:ext cx="8530560" cy="1503000"/>
+            <a:ext cx="8530200" cy="1502640"/>
           </a:xfrm>
           <a:prstGeom prst="rect">
             <a:avLst/>
@@ -14249,7 +14272,7 @@
         <p:spPr>
           <a:xfrm>
             <a:off x="7839000" y="2560320"/>
-            <a:ext cx="1310400" cy="596160"/>
+            <a:ext cx="1310040" cy="595800"/>
           </a:xfrm>
           <a:prstGeom prst="rect">
             <a:avLst/>
@@ -14268,7 +14291,7 @@
         <p:spPr>
           <a:xfrm>
             <a:off x="480240" y="348120"/>
-            <a:ext cx="1788480" cy="361080"/>
+            <a:ext cx="1788120" cy="360720"/>
           </a:xfrm>
           <a:prstGeom prst="rect">
             <a:avLst/>
@@ -14317,7 +14340,7 @@
         <p:spPr>
           <a:xfrm>
             <a:off x="6384240" y="990000"/>
-            <a:ext cx="1522440" cy="1336320"/>
+            <a:ext cx="1522080" cy="1335960"/>
           </a:xfrm>
           <a:custGeom>
             <a:avLst/>
@@ -14370,7 +14393,7 @@
         <p:spPr>
           <a:xfrm>
             <a:off x="5678640" y="1145160"/>
-            <a:ext cx="360" cy="1602720"/>
+            <a:ext cx="360" cy="1602360"/>
           </a:xfrm>
           <a:custGeom>
             <a:avLst/>
@@ -14423,7 +14446,7 @@
         <p:spPr>
           <a:xfrm flipH="1">
             <a:off x="3422520" y="990000"/>
-            <a:ext cx="1613880" cy="1376640"/>
+            <a:ext cx="1613520" cy="1376280"/>
           </a:xfrm>
           <a:custGeom>
             <a:avLst/>
@@ -14476,7 +14499,7 @@
         <p:spPr>
           <a:xfrm>
             <a:off x="2082960" y="3279600"/>
-            <a:ext cx="913680" cy="361080"/>
+            <a:ext cx="913320" cy="360720"/>
           </a:xfrm>
           <a:prstGeom prst="rect">
             <a:avLst/>
@@ -14525,7 +14548,7 @@
         <p:spPr>
           <a:xfrm>
             <a:off x="5227200" y="4030200"/>
-            <a:ext cx="925920" cy="361080"/>
+            <a:ext cx="925560" cy="360720"/>
           </a:xfrm>
           <a:prstGeom prst="rect">
             <a:avLst/>
@@ -14574,7 +14597,7 @@
         <p:spPr>
           <a:xfrm>
             <a:off x="8246520" y="3279600"/>
-            <a:ext cx="1252080" cy="361080"/>
+            <a:ext cx="1251720" cy="360720"/>
           </a:xfrm>
           <a:prstGeom prst="rect">
             <a:avLst/>
@@ -14627,7 +14650,7 @@
         <p:spPr>
           <a:xfrm>
             <a:off x="4979520" y="218880"/>
-            <a:ext cx="1329480" cy="615240"/>
+            <a:ext cx="1329120" cy="614880"/>
           </a:xfrm>
           <a:prstGeom prst="rect">
             <a:avLst/>
@@ -14650,7 +14673,7 @@
         <p:spPr>
           <a:xfrm>
             <a:off x="2102760" y="2514600"/>
-            <a:ext cx="1320120" cy="605520"/>
+            <a:ext cx="1319760" cy="605160"/>
           </a:xfrm>
           <a:prstGeom prst="rect">
             <a:avLst/>
@@ -14673,7 +14696,7 @@
         <p:spPr>
           <a:xfrm>
             <a:off x="4235760" y="3279600"/>
-            <a:ext cx="1310400" cy="596160"/>
+            <a:ext cx="1310040" cy="595800"/>
           </a:xfrm>
           <a:prstGeom prst="rect">
             <a:avLst/>
@@ -14696,7 +14719,7 @@
         <p:spPr>
           <a:xfrm>
             <a:off x="5833080" y="3279600"/>
-            <a:ext cx="1310400" cy="596160"/>
+            <a:ext cx="1310040" cy="595800"/>
           </a:xfrm>
           <a:prstGeom prst="rect">
             <a:avLst/>
@@ -14737,7 +14760,7 @@
         <p:spPr>
           <a:xfrm>
             <a:off x="684360" y="4487400"/>
-            <a:ext cx="8530560" cy="1503000"/>
+            <a:ext cx="8530200" cy="1502640"/>
           </a:xfrm>
           <a:prstGeom prst="rect">
             <a:avLst/>
@@ -14786,7 +14809,7 @@
         <p:spPr>
           <a:xfrm>
             <a:off x="684360" y="685800"/>
-            <a:ext cx="8530560" cy="3611160"/>
+            <a:ext cx="8530200" cy="3610800"/>
           </a:xfrm>
           <a:prstGeom prst="rect">
             <a:avLst/>
@@ -14805,7 +14828,7 @@
         <p:txBody>
           <a:bodyPr lIns="90000" rIns="90000" tIns="45000" bIns="45000" anchor="ctr"/>
           <a:p>
-            <a:pPr marL="285840" indent="-281880">
+            <a:pPr marL="285840" indent="-281520">
               <a:lnSpc>
                 <a:spcPct val="100000"/>
               </a:lnSpc>
@@ -14881,7 +14904,7 @@
         <p:spPr>
           <a:xfrm>
             <a:off x="666000" y="2574360"/>
-            <a:ext cx="4806720" cy="2970000"/>
+            <a:ext cx="4806360" cy="2969640"/>
           </a:xfrm>
           <a:prstGeom prst="roundRect">
             <a:avLst>
@@ -15031,7 +15054,7 @@
         <p:spPr>
           <a:xfrm>
             <a:off x="684360" y="5241960"/>
-            <a:ext cx="8530560" cy="1503000"/>
+            <a:ext cx="8530200" cy="1502640"/>
           </a:xfrm>
           <a:prstGeom prst="rect">
             <a:avLst/>
@@ -15080,7 +15103,7 @@
         <p:spPr>
           <a:xfrm>
             <a:off x="684360" y="685800"/>
-            <a:ext cx="10986120" cy="2284200"/>
+            <a:ext cx="10985760" cy="2283840"/>
           </a:xfrm>
           <a:prstGeom prst="rect">
             <a:avLst/>
@@ -15101,7 +15124,7 @@
             <a:normAutofit/>
           </a:bodyPr>
           <a:p>
-            <a:pPr marL="285840" indent="-281880">
+            <a:pPr marL="285840" indent="-281520">
               <a:lnSpc>
                 <a:spcPct val="100000"/>
               </a:lnSpc>
@@ -15183,7 +15206,7 @@
             </a:endParaRPr>
           </a:p>
           <a:p>
-            <a:pPr marL="285840" indent="-281880">
+            <a:pPr marL="285840" indent="-281520">
               <a:lnSpc>
                 <a:spcPct val="100000"/>
               </a:lnSpc>
@@ -15307,7 +15330,7 @@
         <p:spPr>
           <a:xfrm>
             <a:off x="2523960" y="3718800"/>
-            <a:ext cx="724320" cy="719280"/>
+            <a:ext cx="723960" cy="718920"/>
           </a:xfrm>
           <a:prstGeom prst="ellipse">
             <a:avLst/>
@@ -15375,7 +15398,7 @@
         <p:spPr>
           <a:xfrm>
             <a:off x="3363480" y="3303360"/>
-            <a:ext cx="1213560" cy="403200"/>
+            <a:ext cx="1213200" cy="402840"/>
           </a:xfrm>
           <a:prstGeom prst="ellipse">
             <a:avLst/>
@@ -15443,7 +15466,7 @@
         <p:spPr>
           <a:xfrm>
             <a:off x="744120" y="3208680"/>
-            <a:ext cx="1586880" cy="671400"/>
+            <a:ext cx="1586520" cy="671040"/>
           </a:xfrm>
           <a:prstGeom prst="ellipse">
             <a:avLst/>
@@ -15511,7 +15534,7 @@
         <p:spPr>
           <a:xfrm>
             <a:off x="2119680" y="4628880"/>
-            <a:ext cx="1526040" cy="671400"/>
+            <a:ext cx="1525680" cy="671040"/>
           </a:xfrm>
           <a:prstGeom prst="ellipse">
             <a:avLst/>
@@ -15579,7 +15602,7 @@
         <p:spPr>
           <a:xfrm>
             <a:off x="6819480" y="2574360"/>
-            <a:ext cx="4806720" cy="2970000"/>
+            <a:ext cx="4806360" cy="2969640"/>
           </a:xfrm>
           <a:prstGeom prst="roundRect">
             <a:avLst>
@@ -15729,7 +15752,7 @@
         <p:spPr>
           <a:xfrm>
             <a:off x="7103880" y="4147560"/>
-            <a:ext cx="4375080" cy="855360"/>
+            <a:ext cx="4374720" cy="855000"/>
           </a:xfrm>
           <a:prstGeom prst="ellipse">
             <a:avLst/>
@@ -15797,7 +15820,7 @@
         <p:spPr>
           <a:xfrm>
             <a:off x="9898200" y="3332520"/>
-            <a:ext cx="1213560" cy="403200"/>
+            <a:ext cx="1213200" cy="402840"/>
           </a:xfrm>
           <a:prstGeom prst="ellipse">
             <a:avLst/>
@@ -15865,7 +15888,7 @@
         <p:spPr>
           <a:xfrm>
             <a:off x="6965640" y="3288960"/>
-            <a:ext cx="1586880" cy="671400"/>
+            <a:ext cx="1586520" cy="671040"/>
           </a:xfrm>
           <a:prstGeom prst="ellipse">
             <a:avLst/>
@@ -15933,7 +15956,7 @@
         <p:spPr>
           <a:xfrm>
             <a:off x="8287920" y="2688120"/>
-            <a:ext cx="1869840" cy="671400"/>
+            <a:ext cx="1869480" cy="671040"/>
           </a:xfrm>
           <a:prstGeom prst="ellipse">
             <a:avLst/>
@@ -16050,7 +16073,7 @@
         <p:spPr>
           <a:xfrm>
             <a:off x="684360" y="4487400"/>
-            <a:ext cx="8530560" cy="1503000"/>
+            <a:ext cx="8530200" cy="1502640"/>
           </a:xfrm>
           <a:prstGeom prst="rect">
             <a:avLst/>
@@ -16099,7 +16122,7 @@
         <p:spPr>
           <a:xfrm>
             <a:off x="684360" y="685800"/>
-            <a:ext cx="11358720" cy="3611160"/>
+            <a:ext cx="11358360" cy="3610800"/>
           </a:xfrm>
           <a:prstGeom prst="rect">
             <a:avLst/>
@@ -16120,7 +16143,7 @@
             <a:normAutofit/>
           </a:bodyPr>
           <a:p>
-            <a:pPr marL="285840" indent="-281880">
+            <a:pPr marL="285840" indent="-281520">
               <a:lnSpc>
                 <a:spcPct val="100000"/>
               </a:lnSpc>
@@ -16162,7 +16185,7 @@
             </a:endParaRPr>
           </a:p>
           <a:p>
-            <a:pPr marL="285840" indent="-281880">
+            <a:pPr marL="285840" indent="-281520">
               <a:lnSpc>
                 <a:spcPct val="100000"/>
               </a:lnSpc>
@@ -16352,7 +16375,7 @@
             </a:endParaRPr>
           </a:p>
           <a:p>
-            <a:pPr marL="285840" indent="-281880">
+            <a:pPr marL="285840" indent="-281520">
               <a:lnSpc>
                 <a:spcPct val="100000"/>
               </a:lnSpc>
@@ -16384,7 +16407,7 @@
             </a:endParaRPr>
           </a:p>
           <a:p>
-            <a:pPr marL="285840" indent="-281880">
+            <a:pPr marL="285840" indent="-281520">
               <a:lnSpc>
                 <a:spcPct val="100000"/>
               </a:lnSpc>
@@ -16475,7 +16498,7 @@
         <p:spPr>
           <a:xfrm>
             <a:off x="684360" y="4487400"/>
-            <a:ext cx="8530560" cy="1503000"/>
+            <a:ext cx="8530200" cy="1502640"/>
           </a:xfrm>
           <a:prstGeom prst="rect">
             <a:avLst/>
@@ -16524,7 +16547,7 @@
         <p:spPr>
           <a:xfrm>
             <a:off x="684360" y="685800"/>
-            <a:ext cx="8530560" cy="3611160"/>
+            <a:ext cx="8530200" cy="3610800"/>
           </a:xfrm>
           <a:prstGeom prst="rect">
             <a:avLst/>
@@ -16543,7 +16566,7 @@
         <p:txBody>
           <a:bodyPr lIns="90000" rIns="90000" tIns="45000" bIns="45000" anchor="ctr"/>
           <a:p>
-            <a:pPr marL="285840" indent="-281880">
+            <a:pPr marL="285840" indent="-281520">
               <a:lnSpc>
                 <a:spcPct val="100000"/>
               </a:lnSpc>
@@ -16645,7 +16668,7 @@
             </a:endParaRPr>
           </a:p>
           <a:p>
-            <a:pPr marL="285840" indent="-281880">
+            <a:pPr marL="285840" indent="-281520">
               <a:lnSpc>
                 <a:spcPct val="100000"/>
               </a:lnSpc>
@@ -16747,7 +16770,7 @@
         <p:spPr>
           <a:xfrm>
             <a:off x="2521440" y="3979080"/>
-            <a:ext cx="1878120" cy="803880"/>
+            <a:ext cx="1877760" cy="803520"/>
           </a:xfrm>
           <a:prstGeom prst="rect">
             <a:avLst/>
@@ -16813,7 +16836,7 @@
         <p:spPr>
           <a:xfrm>
             <a:off x="5487840" y="3979080"/>
-            <a:ext cx="1878120" cy="803880"/>
+            <a:ext cx="1877760" cy="803520"/>
           </a:xfrm>
           <a:prstGeom prst="rect">
             <a:avLst/>
@@ -16879,7 +16902,7 @@
         <p:spPr>
           <a:xfrm>
             <a:off x="4004640" y="2771640"/>
-            <a:ext cx="1878120" cy="803880"/>
+            <a:ext cx="1877760" cy="803520"/>
           </a:xfrm>
           <a:prstGeom prst="rect">
             <a:avLst/>
@@ -16945,7 +16968,7 @@
         <p:spPr>
           <a:xfrm>
             <a:off x="4483080" y="4383000"/>
-            <a:ext cx="1000800" cy="360"/>
+            <a:ext cx="1000440" cy="360"/>
           </a:xfrm>
           <a:custGeom>
             <a:avLst/>
@@ -16997,7 +17020,7 @@
         <p:spPr>
           <a:xfrm>
             <a:off x="4985640" y="3657600"/>
-            <a:ext cx="360" cy="575640"/>
+            <a:ext cx="360" cy="575280"/>
           </a:xfrm>
           <a:custGeom>
             <a:avLst/>
@@ -17098,7 +17121,7 @@
         <p:spPr>
           <a:xfrm>
             <a:off x="0" y="0"/>
-            <a:ext cx="12188160" cy="6854040"/>
+            <a:ext cx="12187800" cy="6853680"/>
           </a:xfrm>
           <a:prstGeom prst="rect">
             <a:avLst/>
@@ -17151,7 +17174,7 @@
         <p:spPr>
           <a:xfrm>
             <a:off x="640440" y="685800"/>
-            <a:ext cx="4814640" cy="4599720"/>
+            <a:ext cx="4814280" cy="4599360"/>
           </a:xfrm>
           <a:prstGeom prst="rect">
             <a:avLst/>
@@ -17202,7 +17225,7 @@
         <p:spPr>
           <a:xfrm>
             <a:off x="6095880" y="0"/>
-            <a:ext cx="6091920" cy="6854040"/>
+            <a:ext cx="6091560" cy="6853680"/>
           </a:xfrm>
           <a:prstGeom prst="rect">
             <a:avLst/>
@@ -17240,7 +17263,7 @@
         <p:spPr>
           <a:xfrm>
             <a:off x="6625800" y="685800"/>
-            <a:ext cx="4875120" cy="4599720"/>
+            <a:ext cx="4874760" cy="4599360"/>
           </a:xfrm>
           <a:prstGeom prst="rect">
             <a:avLst/>
@@ -17261,7 +17284,7 @@
             <a:normAutofit/>
           </a:bodyPr>
           <a:p>
-            <a:pPr marL="285840" indent="-281880">
+            <a:pPr marL="285840" indent="-281520">
               <a:lnSpc>
                 <a:spcPct val="100000"/>
               </a:lnSpc>
@@ -17293,7 +17316,7 @@
             </a:endParaRPr>
           </a:p>
           <a:p>
-            <a:pPr marL="285840" indent="-281880">
+            <a:pPr marL="285840" indent="-281520">
               <a:lnSpc>
                 <a:spcPct val="100000"/>
               </a:lnSpc>
@@ -17325,7 +17348,7 @@
             </a:endParaRPr>
           </a:p>
           <a:p>
-            <a:pPr marL="285840" indent="-281880">
+            <a:pPr marL="285840" indent="-281520">
               <a:lnSpc>
                 <a:spcPct val="100000"/>
               </a:lnSpc>
@@ -17357,7 +17380,7 @@
             </a:endParaRPr>
           </a:p>
           <a:p>
-            <a:pPr marL="285840" indent="-281880">
+            <a:pPr marL="285840" indent="-281520">
               <a:lnSpc>
                 <a:spcPct val="100000"/>
               </a:lnSpc>
@@ -17448,7 +17471,7 @@
         <p:spPr>
           <a:xfrm>
             <a:off x="684360" y="4487400"/>
-            <a:ext cx="8530560" cy="1503000"/>
+            <a:ext cx="8530200" cy="1502640"/>
           </a:xfrm>
           <a:prstGeom prst="rect">
             <a:avLst/>
@@ -17497,7 +17520,7 @@
         <p:spPr>
           <a:xfrm>
             <a:off x="1044720" y="500040"/>
-            <a:ext cx="8260200" cy="3228840"/>
+            <a:ext cx="8259840" cy="3228480"/>
           </a:xfrm>
           <a:prstGeom prst="rect">
             <a:avLst/>
@@ -17516,7 +17539,7 @@
         <p:txBody>
           <a:bodyPr lIns="90000" rIns="90000" tIns="45000" bIns="45000" anchor="ctr"/>
           <a:p>
-            <a:pPr marL="285840" indent="-281880">
+            <a:pPr marL="285840" indent="-281520">
               <a:lnSpc>
                 <a:spcPct val="100000"/>
               </a:lnSpc>
@@ -17558,7 +17581,7 @@
             </a:endParaRPr>
           </a:p>
           <a:p>
-            <a:pPr marL="285840" indent="-281880">
+            <a:pPr marL="285840" indent="-281520">
               <a:lnSpc>
                 <a:spcPct val="100000"/>
               </a:lnSpc>
@@ -17610,7 +17633,7 @@
             </a:endParaRPr>
           </a:p>
           <a:p>
-            <a:pPr marL="285840" indent="-281880">
+            <a:pPr marL="285840" indent="-281520">
               <a:lnSpc>
                 <a:spcPct val="100000"/>
               </a:lnSpc>
@@ -17762,7 +17785,7 @@
         <p:spPr>
           <a:xfrm>
             <a:off x="7097760" y="1943280"/>
-            <a:ext cx="850680" cy="850680"/>
+            <a:ext cx="850320" cy="850320"/>
           </a:xfrm>
           <a:prstGeom prst="rect">
             <a:avLst/>
@@ -17785,7 +17808,7 @@
         <p:spPr>
           <a:xfrm>
             <a:off x="6931800" y="4296600"/>
-            <a:ext cx="1177200" cy="469440"/>
+            <a:ext cx="1176840" cy="469080"/>
           </a:xfrm>
           <a:prstGeom prst="rect">
             <a:avLst/>
@@ -17808,7 +17831,7 @@
         <p:spPr>
           <a:xfrm>
             <a:off x="7054200" y="2896920"/>
-            <a:ext cx="894240" cy="1036440"/>
+            <a:ext cx="893880" cy="1036080"/>
           </a:xfrm>
           <a:prstGeom prst="rect">
             <a:avLst/>
@@ -17831,7 +17854,7 @@
         <p:spPr>
           <a:xfrm>
             <a:off x="2718360" y="2064960"/>
-            <a:ext cx="910440" cy="910440"/>
+            <a:ext cx="910080" cy="910080"/>
           </a:xfrm>
           <a:prstGeom prst="rect">
             <a:avLst/>
@@ -17854,7 +17877,7 @@
         <p:spPr>
           <a:xfrm>
             <a:off x="2739240" y="3371040"/>
-            <a:ext cx="910440" cy="910440"/>
+            <a:ext cx="910080" cy="910080"/>
           </a:xfrm>
           <a:prstGeom prst="rect">
             <a:avLst/>
@@ -17877,7 +17900,7 @@
         <p:spPr>
           <a:xfrm>
             <a:off x="4908600" y="2852280"/>
-            <a:ext cx="910440" cy="910440"/>
+            <a:ext cx="910080" cy="910080"/>
           </a:xfrm>
           <a:prstGeom prst="rect">
             <a:avLst/>
@@ -17895,8 +17918,8 @@
         </p:nvSpPr>
         <p:spPr>
           <a:xfrm rot="1192200">
-            <a:off x="4046760" y="2671200"/>
-            <a:ext cx="974520" cy="480600"/>
+            <a:off x="4046400" y="2671200"/>
+            <a:ext cx="974160" cy="480240"/>
           </a:xfrm>
           <a:prstGeom prst="rightArrow">
             <a:avLst>
@@ -17938,7 +17961,7 @@
         <p:spPr>
           <a:xfrm rot="20407800">
             <a:off x="4025160" y="3459240"/>
-            <a:ext cx="974520" cy="480600"/>
+            <a:ext cx="974160" cy="480240"/>
           </a:xfrm>
           <a:prstGeom prst="rightArrow">
             <a:avLst>
@@ -17979,8 +18002,8 @@
         </p:nvSpPr>
         <p:spPr>
           <a:xfrm rot="1192200">
-            <a:off x="5800320" y="3779640"/>
-            <a:ext cx="974520" cy="480600"/>
+            <a:off x="5799960" y="3779640"/>
+            <a:ext cx="974160" cy="480240"/>
           </a:xfrm>
           <a:prstGeom prst="rightArrow">
             <a:avLst>
@@ -18022,7 +18045,7 @@
         <p:spPr>
           <a:xfrm rot="20407800">
             <a:off x="5873400" y="2454840"/>
-            <a:ext cx="974520" cy="480600"/>
+            <a:ext cx="974160" cy="480240"/>
           </a:xfrm>
           <a:prstGeom prst="rightArrow">
             <a:avLst>
@@ -18064,7 +18087,7 @@
         <p:spPr>
           <a:xfrm>
             <a:off x="5951880" y="3115440"/>
-            <a:ext cx="974520" cy="480600"/>
+            <a:ext cx="974160" cy="480240"/>
           </a:xfrm>
           <a:prstGeom prst="rightArrow">
             <a:avLst>
@@ -18155,7 +18178,7 @@
         <p:spPr>
           <a:xfrm>
             <a:off x="684360" y="4487400"/>
-            <a:ext cx="8530560" cy="1503000"/>
+            <a:ext cx="8530200" cy="1502640"/>
           </a:xfrm>
           <a:prstGeom prst="rect">
             <a:avLst/>
@@ -18204,7 +18227,7 @@
         <p:spPr>
           <a:xfrm>
             <a:off x="684360" y="685800"/>
-            <a:ext cx="8530560" cy="3611160"/>
+            <a:ext cx="8530200" cy="3610800"/>
           </a:xfrm>
           <a:prstGeom prst="rect">
             <a:avLst/>
@@ -18223,7 +18246,7 @@
         <p:txBody>
           <a:bodyPr lIns="90000" rIns="90000" tIns="45000" bIns="45000" anchor="ctr"/>
           <a:p>
-            <a:pPr marL="285840" indent="-281880">
+            <a:pPr marL="285840" indent="-281520">
               <a:lnSpc>
                 <a:spcPct val="100000"/>
               </a:lnSpc>
@@ -18315,7 +18338,7 @@
             </a:endParaRPr>
           </a:p>
           <a:p>
-            <a:pPr marL="285840" indent="-281880">
+            <a:pPr marL="285840" indent="-281520">
               <a:lnSpc>
                 <a:spcPct val="100000"/>
               </a:lnSpc>
@@ -18367,7 +18390,7 @@
             </a:endParaRPr>
           </a:p>
           <a:p>
-            <a:pPr marL="285840" indent="-281880">
+            <a:pPr marL="285840" indent="-281520">
               <a:lnSpc>
                 <a:spcPct val="100000"/>
               </a:lnSpc>
@@ -18453,7 +18476,7 @@
         <p:spPr>
           <a:xfrm>
             <a:off x="6227640" y="3794400"/>
-            <a:ext cx="910440" cy="910440"/>
+            <a:ext cx="910080" cy="910080"/>
           </a:xfrm>
           <a:prstGeom prst="rect">
             <a:avLst/>
@@ -18476,7 +18499,7 @@
         <p:spPr>
           <a:xfrm>
             <a:off x="2468520" y="3843720"/>
-            <a:ext cx="910440" cy="910440"/>
+            <a:ext cx="910080" cy="910080"/>
           </a:xfrm>
           <a:prstGeom prst="rect">
             <a:avLst/>
@@ -18499,7 +18522,7 @@
         <p:spPr>
           <a:xfrm>
             <a:off x="9790920" y="3794400"/>
-            <a:ext cx="910440" cy="910440"/>
+            <a:ext cx="910080" cy="910080"/>
           </a:xfrm>
           <a:prstGeom prst="rect">
             <a:avLst/>
@@ -18522,7 +18545,7 @@
         <p:spPr>
           <a:xfrm>
             <a:off x="7903800" y="3794400"/>
-            <a:ext cx="910440" cy="910440"/>
+            <a:ext cx="910080" cy="910080"/>
           </a:xfrm>
           <a:prstGeom prst="rect">
             <a:avLst/>
@@ -18545,7 +18568,7 @@
         <p:spPr>
           <a:xfrm>
             <a:off x="4412520" y="3794400"/>
-            <a:ext cx="910440" cy="910440"/>
+            <a:ext cx="910080" cy="910080"/>
           </a:xfrm>
           <a:prstGeom prst="rect">
             <a:avLst/>
@@ -18568,7 +18591,7 @@
         <p:spPr>
           <a:xfrm>
             <a:off x="684360" y="3843720"/>
-            <a:ext cx="910440" cy="910440"/>
+            <a:ext cx="910080" cy="910080"/>
           </a:xfrm>
           <a:prstGeom prst="rect">
             <a:avLst/>
@@ -18587,7 +18610,7 @@
         <p:spPr>
           <a:xfrm>
             <a:off x="1638000" y="4183200"/>
-            <a:ext cx="678960" cy="258120"/>
+            <a:ext cx="678600" cy="257760"/>
           </a:xfrm>
           <a:prstGeom prst="rightArrow">
             <a:avLst>
@@ -18626,7 +18649,7 @@
         <p:spPr>
           <a:xfrm>
             <a:off x="3511800" y="4201920"/>
-            <a:ext cx="678960" cy="258120"/>
+            <a:ext cx="678600" cy="257760"/>
           </a:xfrm>
           <a:prstGeom prst="rightArrow">
             <a:avLst>
@@ -18665,7 +18688,7 @@
         <p:spPr>
           <a:xfrm>
             <a:off x="5366520" y="4193640"/>
-            <a:ext cx="678960" cy="258120"/>
+            <a:ext cx="678600" cy="257760"/>
           </a:xfrm>
           <a:prstGeom prst="rightArrow">
             <a:avLst>
@@ -18704,7 +18727,7 @@
         <p:spPr>
           <a:xfrm>
             <a:off x="7162200" y="4183200"/>
-            <a:ext cx="678960" cy="258120"/>
+            <a:ext cx="678600" cy="257760"/>
           </a:xfrm>
           <a:prstGeom prst="rightArrow">
             <a:avLst>
@@ -18743,7 +18766,7 @@
         <p:spPr>
           <a:xfrm>
             <a:off x="8876160" y="4169880"/>
-            <a:ext cx="678960" cy="258120"/>
+            <a:ext cx="678600" cy="257760"/>
           </a:xfrm>
           <a:prstGeom prst="rightArrow">
             <a:avLst>
@@ -18831,7 +18854,7 @@
         <p:spPr>
           <a:xfrm>
             <a:off x="684360" y="4487400"/>
-            <a:ext cx="8530560" cy="1503000"/>
+            <a:ext cx="8530200" cy="1502640"/>
           </a:xfrm>
           <a:prstGeom prst="rect">
             <a:avLst/>
@@ -18880,7 +18903,7 @@
         <p:spPr>
           <a:xfrm>
             <a:off x="684360" y="685800"/>
-            <a:ext cx="8530560" cy="3611160"/>
+            <a:ext cx="8530200" cy="3610800"/>
           </a:xfrm>
           <a:prstGeom prst="rect">
             <a:avLst/>
@@ -18899,7 +18922,7 @@
         <p:txBody>
           <a:bodyPr lIns="90000" rIns="90000" tIns="45000" bIns="45000" anchor="ctr"/>
           <a:p>
-            <a:pPr marL="285840" indent="-281880">
+            <a:pPr marL="285840" indent="-281520">
               <a:lnSpc>
                 <a:spcPct val="100000"/>
               </a:lnSpc>
@@ -18981,7 +19004,7 @@
             </a:endParaRPr>
           </a:p>
           <a:p>
-            <a:pPr marL="285840" indent="-281880">
+            <a:pPr marL="285840" indent="-281520">
               <a:lnSpc>
                 <a:spcPct val="100000"/>
               </a:lnSpc>
@@ -19027,7 +19050,7 @@
         <p:spPr>
           <a:xfrm>
             <a:off x="4681800" y="2481480"/>
-            <a:ext cx="910440" cy="910440"/>
+            <a:ext cx="910080" cy="910080"/>
           </a:xfrm>
           <a:prstGeom prst="rect">
             <a:avLst/>
@@ -19050,7 +19073,7 @@
         <p:spPr>
           <a:xfrm>
             <a:off x="6609240" y="3669480"/>
-            <a:ext cx="910440" cy="910440"/>
+            <a:ext cx="910080" cy="910080"/>
           </a:xfrm>
           <a:prstGeom prst="rect">
             <a:avLst/>
@@ -19073,7 +19096,7 @@
         <p:spPr>
           <a:xfrm>
             <a:off x="2973240" y="3669480"/>
-            <a:ext cx="910440" cy="910440"/>
+            <a:ext cx="910080" cy="910080"/>
           </a:xfrm>
           <a:prstGeom prst="rect">
             <a:avLst/>
@@ -19092,7 +19115,7 @@
         <p:spPr>
           <a:xfrm>
             <a:off x="4214160" y="3946320"/>
-            <a:ext cx="2064600" cy="356760"/>
+            <a:ext cx="2064240" cy="356400"/>
           </a:xfrm>
           <a:prstGeom prst="rightArrow">
             <a:avLst>
@@ -19131,7 +19154,7 @@
         <p:spPr>
           <a:xfrm>
             <a:off x="4988160" y="3533400"/>
-            <a:ext cx="297720" cy="403200"/>
+            <a:ext cx="297360" cy="402840"/>
           </a:xfrm>
           <a:prstGeom prst="downArrow">
             <a:avLst>

</xml_diff>

<commit_message>
#12 Weak AI vs Strong AI explanation speech part 7 added on introduction slides
</commit_message>
<xml_diff>
--- a/SAI_presentation_libre_office.pptx
+++ b/SAI_presentation_libre_office.pptx
@@ -250,7 +250,7 @@
           <a:bodyPr lIns="0" rIns="0" tIns="0" bIns="0" anchor="b"/>
           <a:p>
             <a:pPr algn="r"/>
-            <a:fld id="{21277F5C-5FFD-42EC-BD42-0FF9161C4643}" type="slidenum">
+            <a:fld id="{4A7EE15F-DE40-4B05-9B2B-31F9E102C42B}" type="slidenum">
               <a:rPr b="0" lang="fr-FR" sz="1400" spc="-1" strike="noStrike">
                 <a:latin typeface="Times New Roman"/>
               </a:rPr>
@@ -298,7 +298,7 @@
         <p:spPr>
           <a:xfrm>
             <a:off x="685800" y="1143000"/>
-            <a:ext cx="5482080" cy="3081960"/>
+            <a:ext cx="5481720" cy="3081600"/>
           </a:xfrm>
           <a:prstGeom prst="rect">
             <a:avLst/>
@@ -318,7 +318,7 @@
         <p:spPr>
           <a:xfrm>
             <a:off x="685800" y="4400640"/>
-            <a:ext cx="5482080" cy="3596040"/>
+            <a:ext cx="5481720" cy="3595680"/>
           </a:xfrm>
           <a:prstGeom prst="rect">
             <a:avLst/>
@@ -327,7 +327,7 @@
         <p:txBody>
           <a:bodyPr lIns="0" rIns="0" tIns="0" bIns="0"/>
           <a:p>
-            <a:pPr marL="216000" indent="-212040">
+            <a:pPr marL="216000" indent="-211680">
               <a:lnSpc>
                 <a:spcPct val="100000"/>
               </a:lnSpc>
@@ -343,7 +343,7 @@
             </a:endParaRPr>
           </a:p>
           <a:p>
-            <a:pPr marL="216000" indent="-212040">
+            <a:pPr marL="216000" indent="-211680">
               <a:lnSpc>
                 <a:spcPct val="100000"/>
               </a:lnSpc>
@@ -360,7 +360,7 @@
             </a:endParaRPr>
           </a:p>
           <a:p>
-            <a:pPr marL="216000" indent="-212040">
+            <a:pPr marL="216000" indent="-211680">
               <a:lnSpc>
                 <a:spcPct val="100000"/>
               </a:lnSpc>
@@ -376,7 +376,7 @@
             </a:endParaRPr>
           </a:p>
           <a:p>
-            <a:pPr marL="216000" indent="-212040">
+            <a:pPr marL="216000" indent="-211680">
               <a:lnSpc>
                 <a:spcPct val="100000"/>
               </a:lnSpc>
@@ -392,7 +392,7 @@
             </a:endParaRPr>
           </a:p>
           <a:p>
-            <a:pPr marL="216000" indent="-212040">
+            <a:pPr marL="216000" indent="-211680">
               <a:lnSpc>
                 <a:spcPct val="100000"/>
               </a:lnSpc>
@@ -419,7 +419,7 @@
         <p:spPr>
           <a:xfrm>
             <a:off x="3884760" y="8685360"/>
-            <a:ext cx="2967480" cy="454320"/>
+            <a:ext cx="2967120" cy="453960"/>
           </a:xfrm>
           <a:prstGeom prst="rect">
             <a:avLst/>
@@ -443,7 +443,7 @@
                 <a:spcPct val="100000"/>
               </a:lnSpc>
             </a:pPr>
-            <a:fld id="{67EF5DB6-07FB-4CA4-BF77-A442222E7AB4}" type="slidenum">
+            <a:fld id="{8678F44A-ED27-4E50-B897-07A486259560}" type="slidenum">
               <a:rPr b="0" lang="fr-FR" sz="1200" spc="-1" strike="noStrike">
                 <a:solidFill>
                   <a:srgbClr val="000000"/>
@@ -493,7 +493,7 @@
         <p:spPr>
           <a:xfrm>
             <a:off x="685800" y="1143000"/>
-            <a:ext cx="5482080" cy="3081960"/>
+            <a:ext cx="5481720" cy="3081600"/>
           </a:xfrm>
           <a:prstGeom prst="rect">
             <a:avLst/>
@@ -513,7 +513,7 @@
         <p:spPr>
           <a:xfrm>
             <a:off x="685800" y="4400640"/>
-            <a:ext cx="5482080" cy="3596040"/>
+            <a:ext cx="5481720" cy="3595680"/>
           </a:xfrm>
           <a:prstGeom prst="rect">
             <a:avLst/>
@@ -522,7 +522,7 @@
         <p:txBody>
           <a:bodyPr lIns="0" rIns="0" tIns="0" bIns="0"/>
           <a:p>
-            <a:pPr marL="216000" indent="-212400">
+            <a:pPr marL="216000" indent="-212040">
               <a:lnSpc>
                 <a:spcPct val="100000"/>
               </a:lnSpc>
@@ -538,7 +538,7 @@
             </a:endParaRPr>
           </a:p>
           <a:p>
-            <a:pPr marL="216000" indent="-212400">
+            <a:pPr marL="216000" indent="-212040">
               <a:lnSpc>
                 <a:spcPct val="100000"/>
               </a:lnSpc>
@@ -548,7 +548,7 @@
             </a:endParaRPr>
           </a:p>
           <a:p>
-            <a:pPr marL="216000" indent="-212400">
+            <a:pPr marL="216000" indent="-212040">
               <a:lnSpc>
                 <a:spcPct val="100000"/>
               </a:lnSpc>
@@ -564,7 +564,7 @@
             </a:endParaRPr>
           </a:p>
           <a:p>
-            <a:pPr marL="216000" indent="-212400">
+            <a:pPr marL="216000" indent="-212040">
               <a:lnSpc>
                 <a:spcPct val="100000"/>
               </a:lnSpc>
@@ -574,7 +574,7 @@
             </a:endParaRPr>
           </a:p>
           <a:p>
-            <a:pPr marL="216000" indent="-212400">
+            <a:pPr marL="216000" indent="-212040">
               <a:lnSpc>
                 <a:spcPct val="100000"/>
               </a:lnSpc>
@@ -590,7 +590,7 @@
             </a:endParaRPr>
           </a:p>
           <a:p>
-            <a:pPr marL="216000" indent="-212400">
+            <a:pPr marL="216000" indent="-212040">
               <a:lnSpc>
                 <a:spcPct val="100000"/>
               </a:lnSpc>
@@ -600,7 +600,7 @@
             </a:endParaRPr>
           </a:p>
           <a:p>
-            <a:pPr marL="216000" indent="-212400">
+            <a:pPr marL="216000" indent="-212040">
               <a:lnSpc>
                 <a:spcPct val="100000"/>
               </a:lnSpc>
@@ -616,7 +616,7 @@
             </a:endParaRPr>
           </a:p>
           <a:p>
-            <a:pPr marL="216000" indent="-212400">
+            <a:pPr marL="216000" indent="-212040">
               <a:lnSpc>
                 <a:spcPct val="100000"/>
               </a:lnSpc>
@@ -626,7 +626,7 @@
             </a:endParaRPr>
           </a:p>
           <a:p>
-            <a:pPr marL="216000" indent="-212400">
+            <a:pPr marL="216000" indent="-212040">
               <a:lnSpc>
                 <a:spcPct val="100000"/>
               </a:lnSpc>
@@ -636,7 +636,7 @@
             </a:endParaRPr>
           </a:p>
           <a:p>
-            <a:pPr marL="216000" indent="-212400">
+            <a:pPr marL="216000" indent="-212040">
               <a:lnSpc>
                 <a:spcPct val="100000"/>
               </a:lnSpc>
@@ -652,7 +652,7 @@
             </a:endParaRPr>
           </a:p>
           <a:p>
-            <a:pPr marL="216000" indent="-212400">
+            <a:pPr marL="216000" indent="-212040">
               <a:lnSpc>
                 <a:spcPct val="100000"/>
               </a:lnSpc>
@@ -668,7 +668,7 @@
             </a:endParaRPr>
           </a:p>
           <a:p>
-            <a:pPr marL="216000" indent="-212400">
+            <a:pPr marL="216000" indent="-212040">
               <a:lnSpc>
                 <a:spcPct val="100000"/>
               </a:lnSpc>
@@ -684,7 +684,7 @@
             </a:endParaRPr>
           </a:p>
           <a:p>
-            <a:pPr marL="216000" indent="-212400">
+            <a:pPr marL="216000" indent="-212040">
               <a:lnSpc>
                 <a:spcPct val="100000"/>
               </a:lnSpc>
@@ -694,7 +694,7 @@
             </a:endParaRPr>
           </a:p>
           <a:p>
-            <a:pPr marL="216000" indent="-212400">
+            <a:pPr marL="216000" indent="-212040">
               <a:lnSpc>
                 <a:spcPct val="100000"/>
               </a:lnSpc>
@@ -710,7 +710,7 @@
             </a:endParaRPr>
           </a:p>
           <a:p>
-            <a:pPr marL="216000" indent="-212400">
+            <a:pPr marL="216000" indent="-212040">
               <a:lnSpc>
                 <a:spcPct val="100000"/>
               </a:lnSpc>
@@ -720,7 +720,7 @@
             </a:endParaRPr>
           </a:p>
           <a:p>
-            <a:pPr marL="216000" indent="-212400">
+            <a:pPr marL="216000" indent="-212040">
               <a:lnSpc>
                 <a:spcPct val="100000"/>
               </a:lnSpc>
@@ -736,7 +736,7 @@
             </a:endParaRPr>
           </a:p>
           <a:p>
-            <a:pPr marL="216000" indent="-212400">
+            <a:pPr marL="216000" indent="-212040">
               <a:lnSpc>
                 <a:spcPct val="100000"/>
               </a:lnSpc>
@@ -752,7 +752,7 @@
             </a:endParaRPr>
           </a:p>
           <a:p>
-            <a:pPr marL="216000" indent="-212400">
+            <a:pPr marL="216000" indent="-212040">
               <a:lnSpc>
                 <a:spcPct val="100000"/>
               </a:lnSpc>
@@ -768,7 +768,7 @@
             </a:endParaRPr>
           </a:p>
           <a:p>
-            <a:pPr marL="216000" indent="-212400">
+            <a:pPr marL="216000" indent="-212040">
               <a:lnSpc>
                 <a:spcPct val="100000"/>
               </a:lnSpc>
@@ -784,7 +784,7 @@
             </a:endParaRPr>
           </a:p>
           <a:p>
-            <a:pPr marL="216000" indent="-212400">
+            <a:pPr marL="216000" indent="-212040">
               <a:lnSpc>
                 <a:spcPct val="100000"/>
               </a:lnSpc>
@@ -794,7 +794,7 @@
             </a:endParaRPr>
           </a:p>
           <a:p>
-            <a:pPr marL="216000" indent="-212400">
+            <a:pPr marL="216000" indent="-212040">
               <a:lnSpc>
                 <a:spcPct val="100000"/>
               </a:lnSpc>
@@ -810,7 +810,7 @@
             </a:endParaRPr>
           </a:p>
           <a:p>
-            <a:pPr marL="216000" indent="-212400">
+            <a:pPr marL="216000" indent="-212040">
               <a:lnSpc>
                 <a:spcPct val="100000"/>
               </a:lnSpc>
@@ -826,7 +826,7 @@
             </a:endParaRPr>
           </a:p>
           <a:p>
-            <a:pPr marL="216000" indent="-212400">
+            <a:pPr marL="216000" indent="-212040">
               <a:lnSpc>
                 <a:spcPct val="100000"/>
               </a:lnSpc>
@@ -842,7 +842,7 @@
             </a:endParaRPr>
           </a:p>
           <a:p>
-            <a:pPr marL="216000" indent="-212400">
+            <a:pPr marL="216000" indent="-212040">
               <a:lnSpc>
                 <a:spcPct val="100000"/>
               </a:lnSpc>
@@ -858,7 +858,7 @@
             </a:endParaRPr>
           </a:p>
           <a:p>
-            <a:pPr marL="216000" indent="-212400">
+            <a:pPr marL="216000" indent="-212040">
               <a:lnSpc>
                 <a:spcPct val="100000"/>
               </a:lnSpc>
@@ -874,7 +874,7 @@
             </a:endParaRPr>
           </a:p>
           <a:p>
-            <a:pPr marL="216000" indent="-212400">
+            <a:pPr marL="216000" indent="-212040">
               <a:lnSpc>
                 <a:spcPct val="100000"/>
               </a:lnSpc>
@@ -884,7 +884,7 @@
             </a:endParaRPr>
           </a:p>
           <a:p>
-            <a:pPr marL="216000" indent="-212400">
+            <a:pPr marL="216000" indent="-212040">
               <a:lnSpc>
                 <a:spcPct val="100000"/>
               </a:lnSpc>
@@ -900,7 +900,7 @@
             </a:endParaRPr>
           </a:p>
           <a:p>
-            <a:pPr marL="216000" indent="-212400">
+            <a:pPr marL="216000" indent="-212040">
               <a:lnSpc>
                 <a:spcPct val="100000"/>
               </a:lnSpc>
@@ -916,7 +916,7 @@
             </a:endParaRPr>
           </a:p>
           <a:p>
-            <a:pPr marL="216000" indent="-212400">
+            <a:pPr marL="216000" indent="-212040">
               <a:lnSpc>
                 <a:spcPct val="100000"/>
               </a:lnSpc>
@@ -932,7 +932,7 @@
             </a:endParaRPr>
           </a:p>
           <a:p>
-            <a:pPr marL="216000" indent="-212400">
+            <a:pPr marL="216000" indent="-212040">
               <a:lnSpc>
                 <a:spcPct val="100000"/>
               </a:lnSpc>
@@ -942,7 +942,7 @@
             </a:endParaRPr>
           </a:p>
           <a:p>
-            <a:pPr marL="216000" indent="-212400">
+            <a:pPr marL="216000" indent="-212040">
               <a:lnSpc>
                 <a:spcPct val="100000"/>
               </a:lnSpc>
@@ -958,7 +958,7 @@
             </a:endParaRPr>
           </a:p>
           <a:p>
-            <a:pPr marL="216000" indent="-212400">
+            <a:pPr marL="216000" indent="-212040">
               <a:lnSpc>
                 <a:spcPct val="100000"/>
               </a:lnSpc>
@@ -974,7 +974,7 @@
             </a:endParaRPr>
           </a:p>
           <a:p>
-            <a:pPr marL="216000" indent="-212400">
+            <a:pPr marL="216000" indent="-212040">
               <a:lnSpc>
                 <a:spcPct val="100000"/>
               </a:lnSpc>
@@ -990,7 +990,7 @@
             </a:endParaRPr>
           </a:p>
           <a:p>
-            <a:pPr marL="216000" indent="-212400">
+            <a:pPr marL="216000" indent="-212040">
               <a:lnSpc>
                 <a:spcPct val="100000"/>
               </a:lnSpc>
@@ -1000,7 +1000,7 @@
             </a:endParaRPr>
           </a:p>
           <a:p>
-            <a:pPr marL="216000" indent="-212400">
+            <a:pPr marL="216000" indent="-212040">
               <a:lnSpc>
                 <a:spcPct val="100000"/>
               </a:lnSpc>
@@ -1016,7 +1016,7 @@
             </a:endParaRPr>
           </a:p>
           <a:p>
-            <a:pPr marL="216000" indent="-212400">
+            <a:pPr marL="216000" indent="-212040">
               <a:lnSpc>
                 <a:spcPct val="100000"/>
               </a:lnSpc>
@@ -1032,7 +1032,7 @@
             </a:endParaRPr>
           </a:p>
           <a:p>
-            <a:pPr marL="216000" indent="-212400">
+            <a:pPr marL="216000" indent="-212040">
               <a:lnSpc>
                 <a:spcPct val="100000"/>
               </a:lnSpc>
@@ -1048,7 +1048,7 @@
             </a:endParaRPr>
           </a:p>
           <a:p>
-            <a:pPr marL="216000" indent="-212400">
+            <a:pPr marL="216000" indent="-212040">
               <a:lnSpc>
                 <a:spcPct val="100000"/>
               </a:lnSpc>
@@ -1064,7 +1064,7 @@
             </a:endParaRPr>
           </a:p>
           <a:p>
-            <a:pPr marL="216000" indent="-212400">
+            <a:pPr marL="216000" indent="-212040">
               <a:lnSpc>
                 <a:spcPct val="100000"/>
               </a:lnSpc>
@@ -1074,7 +1074,7 @@
             </a:endParaRPr>
           </a:p>
           <a:p>
-            <a:pPr marL="216000" indent="-212400">
+            <a:pPr marL="216000" indent="-212040">
               <a:lnSpc>
                 <a:spcPct val="100000"/>
               </a:lnSpc>
@@ -1090,7 +1090,7 @@
             </a:endParaRPr>
           </a:p>
           <a:p>
-            <a:pPr marL="216000" indent="-212400">
+            <a:pPr marL="216000" indent="-212040">
               <a:lnSpc>
                 <a:spcPct val="100000"/>
               </a:lnSpc>
@@ -1107,7 +1107,7 @@
             </a:endParaRPr>
           </a:p>
           <a:p>
-            <a:pPr marL="216000" indent="-212400">
+            <a:pPr marL="216000" indent="-212040">
               <a:lnSpc>
                 <a:spcPct val="100000"/>
               </a:lnSpc>
@@ -1124,7 +1124,7 @@
             </a:endParaRPr>
           </a:p>
           <a:p>
-            <a:pPr marL="216000" indent="-212400">
+            <a:pPr marL="216000" indent="-212040">
               <a:lnSpc>
                 <a:spcPct val="100000"/>
               </a:lnSpc>
@@ -1141,7 +1141,7 @@
             </a:endParaRPr>
           </a:p>
           <a:p>
-            <a:pPr marL="216000" indent="-212400">
+            <a:pPr marL="216000" indent="-212040">
               <a:lnSpc>
                 <a:spcPct val="100000"/>
               </a:lnSpc>
@@ -1151,7 +1151,7 @@
             </a:endParaRPr>
           </a:p>
           <a:p>
-            <a:pPr marL="216000" indent="-212400">
+            <a:pPr marL="216000" indent="-212040">
               <a:lnSpc>
                 <a:spcPct val="100000"/>
               </a:lnSpc>
@@ -1168,7 +1168,7 @@
             </a:endParaRPr>
           </a:p>
           <a:p>
-            <a:pPr marL="216000" indent="-212400">
+            <a:pPr marL="216000" indent="-212040">
               <a:lnSpc>
                 <a:spcPct val="100000"/>
               </a:lnSpc>
@@ -1185,7 +1185,7 @@
             </a:endParaRPr>
           </a:p>
           <a:p>
-            <a:pPr marL="216000" indent="-212400">
+            <a:pPr marL="216000" indent="-212040">
               <a:lnSpc>
                 <a:spcPct val="100000"/>
               </a:lnSpc>
@@ -1195,7 +1195,7 @@
             </a:endParaRPr>
           </a:p>
           <a:p>
-            <a:pPr marL="216000" indent="-212400">
+            <a:pPr marL="216000" indent="-212040">
               <a:lnSpc>
                 <a:spcPct val="100000"/>
               </a:lnSpc>
@@ -1205,7 +1205,7 @@
             </a:endParaRPr>
           </a:p>
           <a:p>
-            <a:pPr marL="216000" indent="-212400">
+            <a:pPr marL="216000" indent="-212040">
               <a:lnSpc>
                 <a:spcPct val="100000"/>
               </a:lnSpc>
@@ -1215,7 +1215,7 @@
             </a:endParaRPr>
           </a:p>
           <a:p>
-            <a:pPr marL="216000" indent="-212400">
+            <a:pPr marL="216000" indent="-212040">
               <a:lnSpc>
                 <a:spcPct val="100000"/>
               </a:lnSpc>
@@ -1225,7 +1225,7 @@
             </a:endParaRPr>
           </a:p>
           <a:p>
-            <a:pPr marL="216000" indent="-212400">
+            <a:pPr marL="216000" indent="-212040">
               <a:lnSpc>
                 <a:spcPct val="100000"/>
               </a:lnSpc>
@@ -1245,7 +1245,7 @@
         <p:spPr>
           <a:xfrm>
             <a:off x="3884760" y="8685360"/>
-            <a:ext cx="2967480" cy="454320"/>
+            <a:ext cx="2967120" cy="453960"/>
           </a:xfrm>
           <a:prstGeom prst="rect">
             <a:avLst/>
@@ -1269,7 +1269,7 @@
                 <a:spcPct val="100000"/>
               </a:lnSpc>
             </a:pPr>
-            <a:fld id="{13E38D91-C2D9-495F-A842-44549F2C6728}" type="slidenum">
+            <a:fld id="{022B4C5A-A124-4051-81BA-B425833854F0}" type="slidenum">
               <a:rPr b="0" lang="fr-FR" sz="1200" spc="-1" strike="noStrike">
                 <a:solidFill>
                   <a:srgbClr val="000000"/>
@@ -1319,7 +1319,7 @@
         <p:spPr>
           <a:xfrm>
             <a:off x="685800" y="1143000"/>
-            <a:ext cx="5482080" cy="3081960"/>
+            <a:ext cx="5481720" cy="3081600"/>
           </a:xfrm>
           <a:prstGeom prst="rect">
             <a:avLst/>
@@ -1339,7 +1339,7 @@
         <p:spPr>
           <a:xfrm>
             <a:off x="685800" y="4400640"/>
-            <a:ext cx="5482080" cy="3596040"/>
+            <a:ext cx="5481720" cy="3595680"/>
           </a:xfrm>
           <a:prstGeom prst="rect">
             <a:avLst/>
@@ -1348,7 +1348,7 @@
         <p:txBody>
           <a:bodyPr lIns="0" rIns="0" tIns="0" bIns="0"/>
           <a:p>
-            <a:pPr marL="216000" indent="-214200">
+            <a:pPr marL="216000" indent="-213840">
               <a:lnSpc>
                 <a:spcPct val="100000"/>
               </a:lnSpc>
@@ -1364,7 +1364,7 @@
             </a:endParaRPr>
           </a:p>
           <a:p>
-            <a:pPr marL="216000" indent="-214200">
+            <a:pPr marL="216000" indent="-213840">
               <a:lnSpc>
                 <a:spcPct val="100000"/>
               </a:lnSpc>
@@ -1380,7 +1380,7 @@
             </a:endParaRPr>
           </a:p>
           <a:p>
-            <a:pPr marL="216000" indent="-214200">
+            <a:pPr marL="216000" indent="-213840">
               <a:lnSpc>
                 <a:spcPct val="100000"/>
               </a:lnSpc>
@@ -1396,7 +1396,7 @@
             </a:endParaRPr>
           </a:p>
           <a:p>
-            <a:pPr marL="216000" indent="-214200">
+            <a:pPr marL="216000" indent="-213840">
               <a:lnSpc>
                 <a:spcPct val="100000"/>
               </a:lnSpc>
@@ -1406,7 +1406,7 @@
             </a:endParaRPr>
           </a:p>
           <a:p>
-            <a:pPr marL="216000" indent="-214200">
+            <a:pPr marL="216000" indent="-213840">
               <a:lnSpc>
                 <a:spcPct val="100000"/>
               </a:lnSpc>
@@ -1422,7 +1422,7 @@
             </a:endParaRPr>
           </a:p>
           <a:p>
-            <a:pPr marL="216000" indent="-214200">
+            <a:pPr marL="216000" indent="-213840">
               <a:lnSpc>
                 <a:spcPct val="100000"/>
               </a:lnSpc>
@@ -1438,7 +1438,7 @@
             </a:endParaRPr>
           </a:p>
           <a:p>
-            <a:pPr marL="216000" indent="-214200">
+            <a:pPr marL="216000" indent="-213840">
               <a:lnSpc>
                 <a:spcPct val="100000"/>
               </a:lnSpc>
@@ -1448,7 +1448,7 @@
             </a:endParaRPr>
           </a:p>
           <a:p>
-            <a:pPr marL="216000" indent="-214200">
+            <a:pPr marL="216000" indent="-213840">
               <a:lnSpc>
                 <a:spcPct val="100000"/>
               </a:lnSpc>
@@ -1464,7 +1464,7 @@
             </a:endParaRPr>
           </a:p>
           <a:p>
-            <a:pPr marL="216000" indent="-214200">
+            <a:pPr marL="216000" indent="-213840">
               <a:lnSpc>
                 <a:spcPct val="100000"/>
               </a:lnSpc>
@@ -1474,7 +1474,7 @@
             </a:endParaRPr>
           </a:p>
           <a:p>
-            <a:pPr marL="216000" indent="-214200">
+            <a:pPr marL="216000" indent="-213840">
               <a:lnSpc>
                 <a:spcPct val="100000"/>
               </a:lnSpc>
@@ -1490,7 +1490,7 @@
             </a:endParaRPr>
           </a:p>
           <a:p>
-            <a:pPr marL="216000" indent="-214200">
+            <a:pPr marL="216000" indent="-213840">
               <a:lnSpc>
                 <a:spcPct val="100000"/>
               </a:lnSpc>
@@ -1506,7 +1506,7 @@
             </a:endParaRPr>
           </a:p>
           <a:p>
-            <a:pPr marL="216000" indent="-214200">
+            <a:pPr marL="216000" indent="-213840">
               <a:lnSpc>
                 <a:spcPct val="100000"/>
               </a:lnSpc>
@@ -1516,20 +1516,41 @@
                 <a:latin typeface="Arial"/>
                 <a:ea typeface="Noto Sans CJK SC"/>
               </a:rPr>
-              <a:t>For example after responding the human response and a few seconds (polite) it will be on rest mode (continue what it was thinking</a:t>
-            </a:r>
+              <a:t>For example after responding the human response and a few seconds (polite) it will be on rest mode (continue what it was thinking about/strategy)</a:t>
+            </a:r>
+            <a:endParaRPr b="0" lang="fr-FR" sz="1800" spc="-1" strike="noStrike">
+              <a:latin typeface="Arial"/>
+            </a:endParaRPr>
+          </a:p>
+          <a:p>
+            <a:pPr marL="216000" indent="-213840">
+              <a:lnSpc>
+                <a:spcPct val="100000"/>
+              </a:lnSpc>
+            </a:pPr>
+            <a:endParaRPr b="0" lang="fr-FR" sz="1800" spc="-1" strike="noStrike">
+              <a:latin typeface="Arial"/>
+            </a:endParaRPr>
+          </a:p>
+          <a:p>
+            <a:pPr marL="216000" indent="-213840">
+              <a:lnSpc>
+                <a:spcPct val="100000"/>
+              </a:lnSpc>
+            </a:pPr>
             <a:r>
               <a:rPr b="0" lang="fr-FR" sz="1800" spc="-1" strike="noStrike">
                 <a:latin typeface="Arial"/>
-              </a:rPr>
-              <a:t> about/strategy)</a:t>
+                <a:ea typeface="Noto Sans CJK SC"/>
+              </a:rPr>
+              <a:t>Moreover, the fact it records everything it happen didn’t make him heavy in term of memory</a:t>
             </a:r>
             <a:endParaRPr b="0" lang="fr-FR" sz="1800" spc="-1" strike="noStrike">
               <a:latin typeface="Arial"/>
             </a:endParaRPr>
           </a:p>
           <a:p>
-            <a:pPr marL="216000" indent="-214200">
+            <a:pPr marL="216000" indent="-213840">
               <a:lnSpc>
                 <a:spcPct val="100000"/>
               </a:lnSpc>
@@ -1539,7 +1560,7 @@
             </a:endParaRPr>
           </a:p>
           <a:p>
-            <a:pPr marL="216000" indent="-214200">
+            <a:pPr marL="216000" indent="-213840">
               <a:lnSpc>
                 <a:spcPct val="100000"/>
               </a:lnSpc>
@@ -1549,7 +1570,7 @@
             </a:endParaRPr>
           </a:p>
           <a:p>
-            <a:pPr marL="216000" indent="-214200">
+            <a:pPr marL="216000" indent="-213840">
               <a:lnSpc>
                 <a:spcPct val="100000"/>
               </a:lnSpc>
@@ -1569,7 +1590,7 @@
         <p:spPr>
           <a:xfrm>
             <a:off x="3884760" y="8685360"/>
-            <a:ext cx="2967480" cy="454320"/>
+            <a:ext cx="2967120" cy="453960"/>
           </a:xfrm>
           <a:prstGeom prst="rect">
             <a:avLst/>
@@ -1593,7 +1614,7 @@
                 <a:spcPct val="100000"/>
               </a:lnSpc>
             </a:pPr>
-            <a:fld id="{A20BCCF4-E8FA-4D90-B662-60ABEA8CF7CB}" type="slidenum">
+            <a:fld id="{17C90230-D0A0-44D6-B1C9-582E3E1B7847}" type="slidenum">
               <a:rPr b="0" lang="fr-FR" sz="1200" spc="-1" strike="noStrike">
                 <a:solidFill>
                   <a:srgbClr val="000000"/>
@@ -1643,7 +1664,7 @@
         <p:spPr>
           <a:xfrm>
             <a:off x="380880" y="694800"/>
-            <a:ext cx="6092640" cy="3425760"/>
+            <a:ext cx="6092280" cy="3425400"/>
           </a:xfrm>
           <a:prstGeom prst="rect">
             <a:avLst/>
@@ -1663,7 +1684,7 @@
         <p:spPr>
           <a:xfrm>
             <a:off x="685800" y="4343400"/>
-            <a:ext cx="5483160" cy="4111560"/>
+            <a:ext cx="5482800" cy="4111200"/>
           </a:xfrm>
           <a:prstGeom prst="rect">
             <a:avLst/>
@@ -1672,7 +1693,7 @@
         <p:txBody>
           <a:bodyPr lIns="0" rIns="0" tIns="0" bIns="0"/>
           <a:p>
-            <a:pPr marL="216000" indent="-213480">
+            <a:pPr marL="216000" indent="-213120">
               <a:lnSpc>
                 <a:spcPct val="100000"/>
               </a:lnSpc>
@@ -1688,7 +1709,7 @@
             </a:endParaRPr>
           </a:p>
           <a:p>
-            <a:pPr marL="216000" indent="-213480">
+            <a:pPr marL="216000" indent="-213120">
               <a:lnSpc>
                 <a:spcPct val="100000"/>
               </a:lnSpc>
@@ -1704,7 +1725,7 @@
             </a:endParaRPr>
           </a:p>
           <a:p>
-            <a:pPr marL="216000" indent="-213480">
+            <a:pPr marL="216000" indent="-213120">
               <a:lnSpc>
                 <a:spcPct val="100000"/>
               </a:lnSpc>
@@ -1720,7 +1741,7 @@
             </a:endParaRPr>
           </a:p>
           <a:p>
-            <a:pPr marL="216000" indent="-213480">
+            <a:pPr marL="216000" indent="-213120">
               <a:lnSpc>
                 <a:spcPct val="100000"/>
               </a:lnSpc>
@@ -5468,7 +5489,7 @@
         <p:spPr>
           <a:xfrm>
             <a:off x="0" y="0"/>
-            <a:ext cx="12187800" cy="6853680"/>
+            <a:ext cx="12187440" cy="6853320"/>
           </a:xfrm>
           <a:prstGeom prst="rect">
             <a:avLst/>
@@ -5500,8 +5521,8 @@
         </p:nvSpPr>
         <p:spPr>
           <a:xfrm flipV="1">
-            <a:off x="0" y="-4320"/>
-            <a:ext cx="12184560" cy="6853680"/>
+            <a:off x="0" y="-5040"/>
+            <a:ext cx="12184200" cy="6853320"/>
           </a:xfrm>
           <a:prstGeom prst="snip1Rect">
             <a:avLst>
@@ -5556,7 +5577,7 @@
         <p:spPr>
           <a:xfrm>
             <a:off x="684360" y="685800"/>
-            <a:ext cx="9674640" cy="3669120"/>
+            <a:ext cx="9674280" cy="3668760"/>
           </a:xfrm>
           <a:prstGeom prst="rect">
             <a:avLst/>
@@ -5607,7 +5628,7 @@
         <p:spPr>
           <a:xfrm>
             <a:off x="684360" y="4648320"/>
-            <a:ext cx="7001280" cy="1138680"/>
+            <a:ext cx="7000920" cy="1138320"/>
           </a:xfrm>
           <a:prstGeom prst="rect">
             <a:avLst/>
@@ -5745,7 +5766,7 @@
         <p:spPr>
           <a:xfrm>
             <a:off x="684360" y="4487400"/>
-            <a:ext cx="8530200" cy="1502640"/>
+            <a:ext cx="8529840" cy="1502280"/>
           </a:xfrm>
           <a:prstGeom prst="rect">
             <a:avLst/>
@@ -5794,7 +5815,7 @@
         <p:spPr>
           <a:xfrm>
             <a:off x="684360" y="685800"/>
-            <a:ext cx="8530200" cy="3610800"/>
+            <a:ext cx="8529840" cy="3610440"/>
           </a:xfrm>
           <a:prstGeom prst="rect">
             <a:avLst/>
@@ -5813,7 +5834,7 @@
         <p:txBody>
           <a:bodyPr lIns="90000" rIns="90000" tIns="45000" bIns="45000" anchor="ctr"/>
           <a:p>
-            <a:pPr marL="285840" indent="-281520">
+            <a:pPr marL="285840" indent="-281160">
               <a:lnSpc>
                 <a:spcPct val="100000"/>
               </a:lnSpc>
@@ -5945,7 +5966,7 @@
             </a:endParaRPr>
           </a:p>
           <a:p>
-            <a:pPr marL="285840" indent="-281520">
+            <a:pPr marL="285840" indent="-281160">
               <a:lnSpc>
                 <a:spcPct val="100000"/>
               </a:lnSpc>
@@ -5991,7 +6012,7 @@
         <p:spPr>
           <a:xfrm>
             <a:off x="4733640" y="3979440"/>
-            <a:ext cx="910080" cy="910080"/>
+            <a:ext cx="909720" cy="909720"/>
           </a:xfrm>
           <a:prstGeom prst="rect">
             <a:avLst/>
@@ -6014,7 +6035,7 @@
         <p:spPr>
           <a:xfrm>
             <a:off x="6825960" y="4030200"/>
-            <a:ext cx="910080" cy="910080"/>
+            <a:ext cx="909720" cy="909720"/>
           </a:xfrm>
           <a:prstGeom prst="rect">
             <a:avLst/>
@@ -6037,7 +6058,7 @@
         <p:spPr>
           <a:xfrm>
             <a:off x="5354640" y="2725920"/>
-            <a:ext cx="910080" cy="910080"/>
+            <a:ext cx="909720" cy="909720"/>
           </a:xfrm>
           <a:prstGeom prst="rect">
             <a:avLst/>
@@ -6060,7 +6081,7 @@
         <p:spPr>
           <a:xfrm>
             <a:off x="8550000" y="3433320"/>
-            <a:ext cx="910080" cy="910080"/>
+            <a:ext cx="909720" cy="909720"/>
           </a:xfrm>
           <a:prstGeom prst="rect">
             <a:avLst/>
@@ -6083,7 +6104,7 @@
         <p:spPr>
           <a:xfrm>
             <a:off x="5153040" y="5079960"/>
-            <a:ext cx="910080" cy="910080"/>
+            <a:ext cx="909720" cy="909720"/>
           </a:xfrm>
           <a:prstGeom prst="rect">
             <a:avLst/>
@@ -6101,8 +6122,8 @@
         </p:nvSpPr>
         <p:spPr>
           <a:xfrm rot="3732600">
-            <a:off x="7994880" y="3763080"/>
-            <a:ext cx="199800" cy="665640"/>
+            <a:off x="7994880" y="3762720"/>
+            <a:ext cx="199440" cy="665280"/>
           </a:xfrm>
           <a:prstGeom prst="downArrow">
             <a:avLst>
@@ -6140,8 +6161,8 @@
         </p:nvSpPr>
         <p:spPr>
           <a:xfrm rot="14618400">
-            <a:off x="6343920" y="4764960"/>
-            <a:ext cx="199800" cy="665640"/>
+            <a:off x="6343560" y="4765320"/>
+            <a:ext cx="199440" cy="665280"/>
           </a:xfrm>
           <a:prstGeom prst="downArrow">
             <a:avLst>
@@ -6179,8 +6200,8 @@
         </p:nvSpPr>
         <p:spPr>
           <a:xfrm rot="5400000">
-            <a:off x="6193080" y="4132800"/>
-            <a:ext cx="199800" cy="665640"/>
+            <a:off x="6193440" y="4132800"/>
+            <a:ext cx="199440" cy="665280"/>
           </a:xfrm>
           <a:prstGeom prst="downArrow">
             <a:avLst>
@@ -6218,8 +6239,8 @@
         </p:nvSpPr>
         <p:spPr>
           <a:xfrm rot="7014000">
-            <a:off x="6426000" y="3552480"/>
-            <a:ext cx="199800" cy="665640"/>
+            <a:off x="6426360" y="3552120"/>
+            <a:ext cx="199440" cy="665280"/>
           </a:xfrm>
           <a:prstGeom prst="downArrow">
             <a:avLst>
@@ -6257,8 +6278,8 @@
         </p:nvSpPr>
         <p:spPr>
           <a:xfrm rot="1747800">
-            <a:off x="5087880" y="3302280"/>
-            <a:ext cx="199800" cy="665640"/>
+            <a:off x="5087880" y="3301920"/>
+            <a:ext cx="199440" cy="665280"/>
           </a:xfrm>
           <a:prstGeom prst="downArrow">
             <a:avLst>
@@ -6346,7 +6367,7 @@
         <p:spPr>
           <a:xfrm>
             <a:off x="6868080" y="306720"/>
-            <a:ext cx="5039640" cy="2081520"/>
+            <a:ext cx="5039280" cy="2081160"/>
           </a:xfrm>
           <a:prstGeom prst="rect">
             <a:avLst/>
@@ -6389,7 +6410,7 @@
         <p:spPr>
           <a:xfrm>
             <a:off x="6271200" y="2669400"/>
-            <a:ext cx="5628600" cy="3004560"/>
+            <a:ext cx="5628240" cy="3004200"/>
           </a:xfrm>
           <a:prstGeom prst="rect">
             <a:avLst/>
@@ -6434,7 +6455,7 @@
         <p:spPr>
           <a:xfrm>
             <a:off x="129960" y="5709960"/>
-            <a:ext cx="11179080" cy="1085760"/>
+            <a:ext cx="11178720" cy="1085400"/>
           </a:xfrm>
           <a:prstGeom prst="rect">
             <a:avLst/>
@@ -6479,7 +6500,7 @@
         <p:spPr>
           <a:xfrm>
             <a:off x="207000" y="1787400"/>
-            <a:ext cx="5590440" cy="3223800"/>
+            <a:ext cx="5590080" cy="3223440"/>
           </a:xfrm>
           <a:prstGeom prst="rect">
             <a:avLst/>
@@ -6524,7 +6545,7 @@
         <p:spPr>
           <a:xfrm>
             <a:off x="684360" y="4487400"/>
-            <a:ext cx="8530200" cy="1502640"/>
+            <a:ext cx="8529840" cy="1502280"/>
           </a:xfrm>
           <a:prstGeom prst="rect">
             <a:avLst/>
@@ -6573,7 +6594,7 @@
         <p:spPr>
           <a:xfrm>
             <a:off x="684360" y="685800"/>
-            <a:ext cx="8530200" cy="3610800"/>
+            <a:ext cx="8529840" cy="3610440"/>
           </a:xfrm>
           <a:prstGeom prst="rect">
             <a:avLst/>
@@ -6592,7 +6613,7 @@
         <p:txBody>
           <a:bodyPr lIns="90000" rIns="90000" tIns="45000" bIns="45000" anchor="ctr"/>
           <a:p>
-            <a:pPr marL="285840" indent="-281520">
+            <a:pPr marL="285840" indent="-281160">
               <a:lnSpc>
                 <a:spcPct val="100000"/>
               </a:lnSpc>
@@ -6644,7 +6665,7 @@
             </a:endParaRPr>
           </a:p>
           <a:p>
-            <a:pPr marL="285840" indent="-281520">
+            <a:pPr marL="285840" indent="-281160">
               <a:lnSpc>
                 <a:spcPct val="100000"/>
               </a:lnSpc>
@@ -6686,7 +6707,7 @@
             </a:endParaRPr>
           </a:p>
           <a:p>
-            <a:pPr marL="285840" indent="-281520">
+            <a:pPr marL="285840" indent="-281160">
               <a:lnSpc>
                 <a:spcPct val="100000"/>
               </a:lnSpc>
@@ -6738,7 +6759,7 @@
             </a:endParaRPr>
           </a:p>
           <a:p>
-            <a:pPr marL="285840" indent="-281520">
+            <a:pPr marL="285840" indent="-281160">
               <a:lnSpc>
                 <a:spcPct val="100000"/>
               </a:lnSpc>
@@ -6906,7 +6927,7 @@
         <p:spPr>
           <a:xfrm>
             <a:off x="4629600" y="1832040"/>
-            <a:ext cx="850320" cy="850320"/>
+            <a:ext cx="849960" cy="849960"/>
           </a:xfrm>
           <a:prstGeom prst="rect">
             <a:avLst/>
@@ -6929,7 +6950,7 @@
         <p:spPr>
           <a:xfrm>
             <a:off x="4463640" y="4185360"/>
-            <a:ext cx="1176840" cy="469080"/>
+            <a:ext cx="1176480" cy="468720"/>
           </a:xfrm>
           <a:prstGeom prst="rect">
             <a:avLst/>
@@ -6952,7 +6973,7 @@
         <p:spPr>
           <a:xfrm>
             <a:off x="4586040" y="2785680"/>
-            <a:ext cx="893880" cy="1036080"/>
+            <a:ext cx="893520" cy="1035720"/>
           </a:xfrm>
           <a:prstGeom prst="rect">
             <a:avLst/>
@@ -6975,7 +6996,7 @@
         <p:spPr>
           <a:xfrm>
             <a:off x="250560" y="1953720"/>
-            <a:ext cx="910080" cy="910080"/>
+            <a:ext cx="909720" cy="909720"/>
           </a:xfrm>
           <a:prstGeom prst="rect">
             <a:avLst/>
@@ -6998,7 +7019,7 @@
         <p:spPr>
           <a:xfrm>
             <a:off x="271440" y="3259800"/>
-            <a:ext cx="910080" cy="910080"/>
+            <a:ext cx="909720" cy="909720"/>
           </a:xfrm>
           <a:prstGeom prst="rect">
             <a:avLst/>
@@ -7021,7 +7042,7 @@
         <p:spPr>
           <a:xfrm>
             <a:off x="2440800" y="2741040"/>
-            <a:ext cx="910080" cy="910080"/>
+            <a:ext cx="909720" cy="909720"/>
           </a:xfrm>
           <a:prstGeom prst="rect">
             <a:avLst/>
@@ -7039,8 +7060,8 @@
         </p:nvSpPr>
         <p:spPr>
           <a:xfrm rot="1192200">
-            <a:off x="1578240" y="2559960"/>
-            <a:ext cx="974160" cy="480240"/>
+            <a:off x="1577880" y="2559960"/>
+            <a:ext cx="973800" cy="479880"/>
           </a:xfrm>
           <a:prstGeom prst="rightArrow">
             <a:avLst>
@@ -7082,7 +7103,7 @@
         <p:spPr>
           <a:xfrm rot="20407800">
             <a:off x="1557360" y="3348000"/>
-            <a:ext cx="974160" cy="480240"/>
+            <a:ext cx="973800" cy="479880"/>
           </a:xfrm>
           <a:prstGeom prst="rightArrow">
             <a:avLst>
@@ -7123,8 +7144,8 @@
         </p:nvSpPr>
         <p:spPr>
           <a:xfrm rot="1192200">
-            <a:off x="3331800" y="3668400"/>
-            <a:ext cx="974160" cy="480240"/>
+            <a:off x="3331440" y="3668400"/>
+            <a:ext cx="973800" cy="479880"/>
           </a:xfrm>
           <a:prstGeom prst="rightArrow">
             <a:avLst>
@@ -7166,7 +7187,7 @@
         <p:spPr>
           <a:xfrm rot="20407800">
             <a:off x="3405600" y="2343600"/>
-            <a:ext cx="974160" cy="480240"/>
+            <a:ext cx="973800" cy="479880"/>
           </a:xfrm>
           <a:prstGeom prst="rightArrow">
             <a:avLst>
@@ -7208,7 +7229,7 @@
         <p:spPr>
           <a:xfrm>
             <a:off x="3483720" y="3004200"/>
-            <a:ext cx="974160" cy="480240"/>
+            <a:ext cx="973800" cy="479880"/>
           </a:xfrm>
           <a:prstGeom prst="rightArrow">
             <a:avLst>
@@ -7254,7 +7275,7 @@
         <p:spPr>
           <a:xfrm>
             <a:off x="5819760" y="5709960"/>
-            <a:ext cx="910080" cy="910080"/>
+            <a:ext cx="909720" cy="909720"/>
           </a:xfrm>
           <a:prstGeom prst="rect">
             <a:avLst/>
@@ -7277,7 +7298,7 @@
         <p:spPr>
           <a:xfrm>
             <a:off x="2060640" y="5759640"/>
-            <a:ext cx="910080" cy="910080"/>
+            <a:ext cx="909720" cy="909720"/>
           </a:xfrm>
           <a:prstGeom prst="rect">
             <a:avLst/>
@@ -7300,7 +7321,7 @@
         <p:spPr>
           <a:xfrm>
             <a:off x="9383040" y="5709960"/>
-            <a:ext cx="910080" cy="910080"/>
+            <a:ext cx="909720" cy="909720"/>
           </a:xfrm>
           <a:prstGeom prst="rect">
             <a:avLst/>
@@ -7323,7 +7344,7 @@
         <p:spPr>
           <a:xfrm>
             <a:off x="7495920" y="5709960"/>
-            <a:ext cx="910080" cy="910080"/>
+            <a:ext cx="909720" cy="909720"/>
           </a:xfrm>
           <a:prstGeom prst="rect">
             <a:avLst/>
@@ -7346,7 +7367,7 @@
         <p:spPr>
           <a:xfrm>
             <a:off x="4004640" y="5709960"/>
-            <a:ext cx="910080" cy="910080"/>
+            <a:ext cx="909720" cy="909720"/>
           </a:xfrm>
           <a:prstGeom prst="rect">
             <a:avLst/>
@@ -7369,7 +7390,7 @@
         <p:spPr>
           <a:xfrm>
             <a:off x="276120" y="5759640"/>
-            <a:ext cx="910080" cy="910080"/>
+            <a:ext cx="909720" cy="909720"/>
           </a:xfrm>
           <a:prstGeom prst="rect">
             <a:avLst/>
@@ -7388,7 +7409,7 @@
         <p:spPr>
           <a:xfrm>
             <a:off x="1230120" y="6098760"/>
-            <a:ext cx="678600" cy="257760"/>
+            <a:ext cx="678240" cy="257400"/>
           </a:xfrm>
           <a:prstGeom prst="rightArrow">
             <a:avLst>
@@ -7427,7 +7448,7 @@
         <p:spPr>
           <a:xfrm>
             <a:off x="3103920" y="6117480"/>
-            <a:ext cx="678600" cy="257760"/>
+            <a:ext cx="678240" cy="257400"/>
           </a:xfrm>
           <a:prstGeom prst="rightArrow">
             <a:avLst>
@@ -7466,7 +7487,7 @@
         <p:spPr>
           <a:xfrm>
             <a:off x="4958640" y="6109200"/>
-            <a:ext cx="678600" cy="257760"/>
+            <a:ext cx="678240" cy="257400"/>
           </a:xfrm>
           <a:prstGeom prst="rightArrow">
             <a:avLst>
@@ -7505,7 +7526,7 @@
         <p:spPr>
           <a:xfrm>
             <a:off x="6754320" y="6098760"/>
-            <a:ext cx="678600" cy="257760"/>
+            <a:ext cx="678240" cy="257400"/>
           </a:xfrm>
           <a:prstGeom prst="rightArrow">
             <a:avLst>
@@ -7544,7 +7565,7 @@
         <p:spPr>
           <a:xfrm>
             <a:off x="8468280" y="6085800"/>
-            <a:ext cx="678600" cy="257760"/>
+            <a:ext cx="678240" cy="257400"/>
           </a:xfrm>
           <a:prstGeom prst="rightArrow">
             <a:avLst>
@@ -7587,7 +7608,7 @@
         <p:spPr>
           <a:xfrm>
             <a:off x="6582600" y="3915000"/>
-            <a:ext cx="910080" cy="910080"/>
+            <a:ext cx="909720" cy="909720"/>
           </a:xfrm>
           <a:prstGeom prst="rect">
             <a:avLst/>
@@ -7610,7 +7631,7 @@
         <p:spPr>
           <a:xfrm>
             <a:off x="8674920" y="3965760"/>
-            <a:ext cx="910080" cy="910080"/>
+            <a:ext cx="909720" cy="909720"/>
           </a:xfrm>
           <a:prstGeom prst="rect">
             <a:avLst/>
@@ -7633,7 +7654,7 @@
         <p:spPr>
           <a:xfrm>
             <a:off x="7203600" y="2661480"/>
-            <a:ext cx="910080" cy="910080"/>
+            <a:ext cx="909720" cy="909720"/>
           </a:xfrm>
           <a:prstGeom prst="rect">
             <a:avLst/>
@@ -7656,7 +7677,7 @@
         <p:spPr>
           <a:xfrm>
             <a:off x="10398960" y="3368880"/>
-            <a:ext cx="910080" cy="910080"/>
+            <a:ext cx="909720" cy="909720"/>
           </a:xfrm>
           <a:prstGeom prst="rect">
             <a:avLst/>
@@ -7679,7 +7700,7 @@
         <p:spPr>
           <a:xfrm>
             <a:off x="7002000" y="5015520"/>
-            <a:ext cx="910080" cy="910080"/>
+            <a:ext cx="909720" cy="909720"/>
           </a:xfrm>
           <a:prstGeom prst="rect">
             <a:avLst/>
@@ -7697,8 +7718,8 @@
         </p:nvSpPr>
         <p:spPr>
           <a:xfrm rot="3732600">
-            <a:off x="9844200" y="3699000"/>
-            <a:ext cx="199800" cy="665640"/>
+            <a:off x="9844200" y="3698640"/>
+            <a:ext cx="199440" cy="665280"/>
           </a:xfrm>
           <a:prstGeom prst="downArrow">
             <a:avLst>
@@ -7736,8 +7757,8 @@
         </p:nvSpPr>
         <p:spPr>
           <a:xfrm rot="14618400">
-            <a:off x="8192880" y="4700880"/>
-            <a:ext cx="199800" cy="665640"/>
+            <a:off x="8192520" y="4701240"/>
+            <a:ext cx="199440" cy="665280"/>
           </a:xfrm>
           <a:prstGeom prst="downArrow">
             <a:avLst>
@@ -7775,8 +7796,8 @@
         </p:nvSpPr>
         <p:spPr>
           <a:xfrm rot="5400000">
-            <a:off x="8042040" y="4068360"/>
-            <a:ext cx="199800" cy="665640"/>
+            <a:off x="8042400" y="4068360"/>
+            <a:ext cx="199440" cy="665280"/>
           </a:xfrm>
           <a:prstGeom prst="downArrow">
             <a:avLst>
@@ -7814,8 +7835,8 @@
         </p:nvSpPr>
         <p:spPr>
           <a:xfrm rot="7014000">
-            <a:off x="8275320" y="3488040"/>
-            <a:ext cx="199800" cy="665640"/>
+            <a:off x="8275680" y="3487680"/>
+            <a:ext cx="199440" cy="665280"/>
           </a:xfrm>
           <a:prstGeom prst="downArrow">
             <a:avLst>
@@ -7853,8 +7874,8 @@
         </p:nvSpPr>
         <p:spPr>
           <a:xfrm rot="1747800">
-            <a:off x="7094880" y="3424320"/>
-            <a:ext cx="199800" cy="665640"/>
+            <a:off x="7094880" y="3423960"/>
+            <a:ext cx="199440" cy="665280"/>
           </a:xfrm>
           <a:prstGeom prst="downArrow">
             <a:avLst>
@@ -7897,7 +7918,7 @@
         <p:spPr>
           <a:xfrm>
             <a:off x="8641080" y="309600"/>
-            <a:ext cx="910080" cy="910080"/>
+            <a:ext cx="909720" cy="909720"/>
           </a:xfrm>
           <a:prstGeom prst="rect">
             <a:avLst/>
@@ -7920,7 +7941,7 @@
         <p:spPr>
           <a:xfrm>
             <a:off x="10568880" y="1497240"/>
-            <a:ext cx="910080" cy="910080"/>
+            <a:ext cx="909720" cy="909720"/>
           </a:xfrm>
           <a:prstGeom prst="rect">
             <a:avLst/>
@@ -7943,7 +7964,7 @@
         <p:spPr>
           <a:xfrm>
             <a:off x="6932880" y="1497240"/>
-            <a:ext cx="910080" cy="910080"/>
+            <a:ext cx="909720" cy="909720"/>
           </a:xfrm>
           <a:prstGeom prst="rect">
             <a:avLst/>
@@ -7962,7 +7983,7 @@
         <p:spPr>
           <a:xfrm>
             <a:off x="8173800" y="1774080"/>
-            <a:ext cx="2064240" cy="356400"/>
+            <a:ext cx="2063880" cy="356040"/>
           </a:xfrm>
           <a:prstGeom prst="rightArrow">
             <a:avLst>
@@ -8001,7 +8022,7 @@
         <p:spPr>
           <a:xfrm>
             <a:off x="8947440" y="1361160"/>
-            <a:ext cx="297360" cy="402840"/>
+            <a:ext cx="297000" cy="402480"/>
           </a:xfrm>
           <a:prstGeom prst="downArrow">
             <a:avLst>
@@ -8089,7 +8110,7 @@
         <p:spPr>
           <a:xfrm>
             <a:off x="0" y="0"/>
-            <a:ext cx="12187800" cy="6853680"/>
+            <a:ext cx="12187440" cy="6853320"/>
           </a:xfrm>
           <a:prstGeom prst="rect">
             <a:avLst/>
@@ -8142,7 +8163,7 @@
         <p:spPr>
           <a:xfrm>
             <a:off x="640440" y="685800"/>
-            <a:ext cx="4814280" cy="4599360"/>
+            <a:ext cx="4813920" cy="4599000"/>
           </a:xfrm>
           <a:prstGeom prst="rect">
             <a:avLst/>
@@ -8193,7 +8214,7 @@
         <p:spPr>
           <a:xfrm>
             <a:off x="6095880" y="0"/>
-            <a:ext cx="6091560" cy="6853680"/>
+            <a:ext cx="6091200" cy="6853320"/>
           </a:xfrm>
           <a:prstGeom prst="rect">
             <a:avLst/>
@@ -8231,7 +8252,7 @@
         <p:spPr>
           <a:xfrm>
             <a:off x="6625800" y="685800"/>
-            <a:ext cx="4874760" cy="4599360"/>
+            <a:ext cx="4874400" cy="4599000"/>
           </a:xfrm>
           <a:prstGeom prst="rect">
             <a:avLst/>
@@ -8252,7 +8273,7 @@
             <a:normAutofit/>
           </a:bodyPr>
           <a:p>
-            <a:pPr marL="285840" indent="-281520">
+            <a:pPr marL="285840" indent="-281160">
               <a:lnSpc>
                 <a:spcPct val="100000"/>
               </a:lnSpc>
@@ -8284,7 +8305,7 @@
             </a:endParaRPr>
           </a:p>
           <a:p>
-            <a:pPr marL="285840" indent="-281520">
+            <a:pPr marL="285840" indent="-281160">
               <a:lnSpc>
                 <a:spcPct val="100000"/>
               </a:lnSpc>
@@ -8316,7 +8337,7 @@
             </a:endParaRPr>
           </a:p>
           <a:p>
-            <a:pPr marL="285840" indent="-281520">
+            <a:pPr marL="285840" indent="-281160">
               <a:lnSpc>
                 <a:spcPct val="100000"/>
               </a:lnSpc>
@@ -8348,7 +8369,7 @@
             </a:endParaRPr>
           </a:p>
           <a:p>
-            <a:pPr marL="285840" indent="-281520">
+            <a:pPr marL="285840" indent="-281160">
               <a:lnSpc>
                 <a:spcPct val="100000"/>
               </a:lnSpc>
@@ -8380,7 +8401,7 @@
             </a:endParaRPr>
           </a:p>
           <a:p>
-            <a:pPr marL="285840" indent="-281520">
+            <a:pPr marL="285840" indent="-281160">
               <a:lnSpc>
                 <a:spcPct val="100000"/>
               </a:lnSpc>
@@ -8444,7 +8465,7 @@
         <p:spPr>
           <a:xfrm>
             <a:off x="684360" y="4487400"/>
-            <a:ext cx="8530200" cy="1502640"/>
+            <a:ext cx="8529840" cy="1502280"/>
           </a:xfrm>
           <a:prstGeom prst="rect">
             <a:avLst/>
@@ -8493,7 +8514,7 @@
         <p:spPr>
           <a:xfrm>
             <a:off x="684360" y="685800"/>
-            <a:ext cx="8530200" cy="3610800"/>
+            <a:ext cx="8529840" cy="3610440"/>
           </a:xfrm>
           <a:prstGeom prst="rect">
             <a:avLst/>
@@ -8512,7 +8533,7 @@
         <p:txBody>
           <a:bodyPr lIns="90000" rIns="90000" tIns="45000" bIns="45000" anchor="ctr"/>
           <a:p>
-            <a:pPr marL="285840" indent="-281520">
+            <a:pPr marL="285840" indent="-281160">
               <a:lnSpc>
                 <a:spcPct val="100000"/>
               </a:lnSpc>
@@ -8544,7 +8565,7 @@
             </a:endParaRPr>
           </a:p>
           <a:p>
-            <a:pPr marL="285840" indent="-281520">
+            <a:pPr marL="285840" indent="-281160">
               <a:lnSpc>
                 <a:spcPct val="100000"/>
               </a:lnSpc>
@@ -8654,7 +8675,7 @@
         <p:spPr>
           <a:xfrm>
             <a:off x="6995520" y="1949760"/>
-            <a:ext cx="850320" cy="850320"/>
+            <a:ext cx="849960" cy="849960"/>
           </a:xfrm>
           <a:prstGeom prst="rect">
             <a:avLst/>
@@ -8677,7 +8698,7 @@
         <p:spPr>
           <a:xfrm>
             <a:off x="6829560" y="4303080"/>
-            <a:ext cx="1176840" cy="469080"/>
+            <a:ext cx="1176480" cy="468720"/>
           </a:xfrm>
           <a:prstGeom prst="rect">
             <a:avLst/>
@@ -8700,7 +8721,7 @@
         <p:spPr>
           <a:xfrm>
             <a:off x="6951960" y="2903040"/>
-            <a:ext cx="893880" cy="1036080"/>
+            <a:ext cx="893520" cy="1035720"/>
           </a:xfrm>
           <a:prstGeom prst="rect">
             <a:avLst/>
@@ -8723,7 +8744,7 @@
         <p:spPr>
           <a:xfrm>
             <a:off x="2616120" y="2071080"/>
-            <a:ext cx="910080" cy="910080"/>
+            <a:ext cx="909720" cy="909720"/>
           </a:xfrm>
           <a:prstGeom prst="rect">
             <a:avLst/>
@@ -8746,7 +8767,7 @@
         <p:spPr>
           <a:xfrm>
             <a:off x="2637000" y="3377160"/>
-            <a:ext cx="910080" cy="910080"/>
+            <a:ext cx="909720" cy="909720"/>
           </a:xfrm>
           <a:prstGeom prst="rect">
             <a:avLst/>
@@ -8764,8 +8785,8 @@
         </p:nvSpPr>
         <p:spPr>
           <a:xfrm rot="1192200">
-            <a:off x="3943800" y="2677320"/>
-            <a:ext cx="974160" cy="480240"/>
+            <a:off x="3943440" y="2677320"/>
+            <a:ext cx="973800" cy="479880"/>
           </a:xfrm>
           <a:prstGeom prst="rightArrow">
             <a:avLst>
@@ -8807,7 +8828,7 @@
         <p:spPr>
           <a:xfrm rot="20407800">
             <a:off x="3922920" y="3465360"/>
-            <a:ext cx="974160" cy="480240"/>
+            <a:ext cx="973800" cy="479880"/>
           </a:xfrm>
           <a:prstGeom prst="rightArrow">
             <a:avLst>
@@ -8848,8 +8869,8 @@
         </p:nvSpPr>
         <p:spPr>
           <a:xfrm rot="1192200">
-            <a:off x="5697720" y="3785760"/>
-            <a:ext cx="974160" cy="480240"/>
+            <a:off x="5697360" y="3785760"/>
+            <a:ext cx="973800" cy="479880"/>
           </a:xfrm>
           <a:prstGeom prst="rightArrow">
             <a:avLst>
@@ -8891,7 +8912,7 @@
         <p:spPr>
           <a:xfrm rot="20407800">
             <a:off x="5771160" y="2460960"/>
-            <a:ext cx="974160" cy="480240"/>
+            <a:ext cx="973800" cy="479880"/>
           </a:xfrm>
           <a:prstGeom prst="rightArrow">
             <a:avLst>
@@ -8933,7 +8954,7 @@
         <p:spPr>
           <a:xfrm>
             <a:off x="5849640" y="3121560"/>
-            <a:ext cx="974160" cy="480240"/>
+            <a:ext cx="973800" cy="479880"/>
           </a:xfrm>
           <a:prstGeom prst="rightArrow">
             <a:avLst>
@@ -8979,7 +9000,7 @@
         <p:spPr>
           <a:xfrm>
             <a:off x="4950720" y="2998800"/>
-            <a:ext cx="752400" cy="752400"/>
+            <a:ext cx="752040" cy="752040"/>
           </a:xfrm>
           <a:prstGeom prst="rect">
             <a:avLst/>
@@ -9020,7 +9041,7 @@
         <p:spPr>
           <a:xfrm>
             <a:off x="684360" y="4487400"/>
-            <a:ext cx="8530200" cy="1502640"/>
+            <a:ext cx="8529840" cy="1502280"/>
           </a:xfrm>
           <a:prstGeom prst="rect">
             <a:avLst/>
@@ -9069,7 +9090,7 @@
         <p:spPr>
           <a:xfrm>
             <a:off x="684360" y="685800"/>
-            <a:ext cx="8530200" cy="3610800"/>
+            <a:ext cx="8529840" cy="3610440"/>
           </a:xfrm>
           <a:prstGeom prst="rect">
             <a:avLst/>
@@ -9088,7 +9109,7 @@
         <p:txBody>
           <a:bodyPr lIns="90000" rIns="90000" tIns="45000" bIns="45000" anchor="ctr"/>
           <a:p>
-            <a:pPr marL="285840" indent="-281520">
+            <a:pPr marL="285840" indent="-281160">
               <a:lnSpc>
                 <a:spcPct val="100000"/>
               </a:lnSpc>
@@ -9214,7 +9235,7 @@
             </a:endParaRPr>
           </a:p>
           <a:p>
-            <a:pPr marL="285840" indent="-281520">
+            <a:pPr marL="285840" indent="-281160">
               <a:lnSpc>
                 <a:spcPct val="100000"/>
               </a:lnSpc>
@@ -9306,7 +9327,7 @@
         <p:spPr>
           <a:xfrm>
             <a:off x="3562560" y="1395720"/>
-            <a:ext cx="910080" cy="910080"/>
+            <a:ext cx="909720" cy="909720"/>
           </a:xfrm>
           <a:prstGeom prst="rect">
             <a:avLst/>
@@ -9329,7 +9350,7 @@
         <p:spPr>
           <a:xfrm>
             <a:off x="6678360" y="1395720"/>
-            <a:ext cx="910080" cy="910080"/>
+            <a:ext cx="909720" cy="909720"/>
           </a:xfrm>
           <a:prstGeom prst="rect">
             <a:avLst/>
@@ -9352,7 +9373,7 @@
         <p:spPr>
           <a:xfrm>
             <a:off x="7042320" y="3904200"/>
-            <a:ext cx="910080" cy="910080"/>
+            <a:ext cx="909720" cy="909720"/>
           </a:xfrm>
           <a:prstGeom prst="rect">
             <a:avLst/>
@@ -9375,7 +9396,7 @@
         <p:spPr>
           <a:xfrm>
             <a:off x="3562560" y="3904200"/>
-            <a:ext cx="910080" cy="910080"/>
+            <a:ext cx="909720" cy="909720"/>
           </a:xfrm>
           <a:prstGeom prst="rect">
             <a:avLst/>
@@ -9398,7 +9419,7 @@
         <p:spPr>
           <a:xfrm>
             <a:off x="6678360" y="1395720"/>
-            <a:ext cx="910080" cy="910080"/>
+            <a:ext cx="909720" cy="909720"/>
           </a:xfrm>
           <a:prstGeom prst="rect">
             <a:avLst/>
@@ -9421,7 +9442,7 @@
         <p:spPr>
           <a:xfrm>
             <a:off x="4113000" y="2039400"/>
-            <a:ext cx="910080" cy="910080"/>
+            <a:ext cx="909720" cy="909720"/>
           </a:xfrm>
           <a:prstGeom prst="rect">
             <a:avLst/>
@@ -9444,7 +9465,7 @@
         <p:spPr>
           <a:xfrm>
             <a:off x="7296480" y="2133000"/>
-            <a:ext cx="910080" cy="910080"/>
+            <a:ext cx="909720" cy="909720"/>
           </a:xfrm>
           <a:prstGeom prst="rect">
             <a:avLst/>
@@ -9463,7 +9484,7 @@
         <p:spPr>
           <a:xfrm>
             <a:off x="5285160" y="1920960"/>
-            <a:ext cx="1178640" cy="541080"/>
+            <a:ext cx="1178280" cy="540720"/>
           </a:xfrm>
           <a:prstGeom prst="rightArrow">
             <a:avLst>
@@ -9505,7 +9526,7 @@
         <p:spPr>
           <a:xfrm>
             <a:off x="5149440" y="4088880"/>
-            <a:ext cx="1178640" cy="541080"/>
+            <a:ext cx="1178280" cy="540720"/>
           </a:xfrm>
           <a:prstGeom prst="rightArrow">
             <a:avLst>
@@ -9570,7 +9591,7 @@
         <p:spPr>
           <a:xfrm>
             <a:off x="4895280" y="2388600"/>
-            <a:ext cx="2703600" cy="360720"/>
+            <a:ext cx="2703240" cy="360360"/>
           </a:xfrm>
           <a:prstGeom prst="rect">
             <a:avLst/>
@@ -9619,7 +9640,7 @@
         <p:spPr>
           <a:xfrm>
             <a:off x="5027400" y="4575240"/>
-            <a:ext cx="2323440" cy="360720"/>
+            <a:ext cx="2323080" cy="360360"/>
           </a:xfrm>
           <a:prstGeom prst="rect">
             <a:avLst/>
@@ -9690,7 +9711,7 @@
         <p:spPr>
           <a:xfrm>
             <a:off x="684360" y="4487400"/>
-            <a:ext cx="8530200" cy="1502640"/>
+            <a:ext cx="8529840" cy="1502280"/>
           </a:xfrm>
           <a:prstGeom prst="rect">
             <a:avLst/>
@@ -9739,7 +9760,7 @@
         <p:spPr>
           <a:xfrm>
             <a:off x="684360" y="685800"/>
-            <a:ext cx="8530200" cy="3610800"/>
+            <a:ext cx="8529840" cy="3610440"/>
           </a:xfrm>
           <a:prstGeom prst="rect">
             <a:avLst/>
@@ -9758,7 +9779,7 @@
         <p:txBody>
           <a:bodyPr lIns="90000" rIns="90000" tIns="45000" bIns="45000" anchor="ctr"/>
           <a:p>
-            <a:pPr marL="285840" indent="-281520">
+            <a:pPr marL="285840" indent="-281160">
               <a:lnSpc>
                 <a:spcPct val="100000"/>
               </a:lnSpc>
@@ -9880,7 +9901,7 @@
         <p:spPr>
           <a:xfrm>
             <a:off x="1863000" y="3157920"/>
-            <a:ext cx="910080" cy="910080"/>
+            <a:ext cx="909720" cy="909720"/>
           </a:xfrm>
           <a:prstGeom prst="rect">
             <a:avLst/>
@@ -9903,7 +9924,7 @@
         <p:spPr>
           <a:xfrm>
             <a:off x="2413440" y="3801600"/>
-            <a:ext cx="910080" cy="910080"/>
+            <a:ext cx="909720" cy="909720"/>
           </a:xfrm>
           <a:prstGeom prst="rect">
             <a:avLst/>
@@ -9926,7 +9947,7 @@
         <p:spPr>
           <a:xfrm>
             <a:off x="7197480" y="3439800"/>
-            <a:ext cx="910080" cy="910080"/>
+            <a:ext cx="909720" cy="909720"/>
           </a:xfrm>
           <a:prstGeom prst="rect">
             <a:avLst/>
@@ -9949,7 +9970,7 @@
         <p:spPr>
           <a:xfrm>
             <a:off x="4758840" y="3366360"/>
-            <a:ext cx="910080" cy="910080"/>
+            <a:ext cx="909720" cy="909720"/>
           </a:xfrm>
           <a:prstGeom prst="rect">
             <a:avLst/>
@@ -9968,7 +9989,7 @@
         <p:spPr>
           <a:xfrm>
             <a:off x="3568680" y="3429000"/>
-            <a:ext cx="933120" cy="910080"/>
+            <a:ext cx="932760" cy="909720"/>
           </a:xfrm>
           <a:prstGeom prst="mathPlus">
             <a:avLst>
@@ -10006,7 +10027,7 @@
         <p:spPr>
           <a:xfrm>
             <a:off x="6095880" y="3654360"/>
-            <a:ext cx="734040" cy="561960"/>
+            <a:ext cx="733680" cy="561600"/>
           </a:xfrm>
           <a:prstGeom prst="mathEqual">
             <a:avLst>
@@ -10067,7 +10088,7 @@
         <p:spPr>
           <a:xfrm>
             <a:off x="4750920" y="2898360"/>
-            <a:ext cx="2685600" cy="3715560"/>
+            <a:ext cx="2685240" cy="3715200"/>
           </a:xfrm>
           <a:prstGeom prst="rect">
             <a:avLst/>
@@ -10110,7 +10131,7 @@
         <p:spPr>
           <a:xfrm>
             <a:off x="684360" y="4487400"/>
-            <a:ext cx="8530200" cy="1502640"/>
+            <a:ext cx="8529840" cy="1502280"/>
           </a:xfrm>
           <a:prstGeom prst="rect">
             <a:avLst/>
@@ -10159,7 +10180,7 @@
         <p:spPr>
           <a:xfrm>
             <a:off x="684360" y="685800"/>
-            <a:ext cx="8530200" cy="3610800"/>
+            <a:ext cx="8529840" cy="3610440"/>
           </a:xfrm>
           <a:prstGeom prst="rect">
             <a:avLst/>
@@ -10178,7 +10199,7 @@
         <p:txBody>
           <a:bodyPr lIns="90000" rIns="90000" tIns="45000" bIns="45000" anchor="ctr"/>
           <a:p>
-            <a:pPr marL="285840" indent="-281520">
+            <a:pPr marL="285840" indent="-281160">
               <a:lnSpc>
                 <a:spcPct val="100000"/>
               </a:lnSpc>
@@ -10314,7 +10335,7 @@
         <p:spPr>
           <a:xfrm>
             <a:off x="4843440" y="2989800"/>
-            <a:ext cx="637560" cy="637560"/>
+            <a:ext cx="637200" cy="637200"/>
           </a:xfrm>
           <a:prstGeom prst="rect">
             <a:avLst/>
@@ -10337,7 +10358,7 @@
         <p:spPr>
           <a:xfrm>
             <a:off x="5028120" y="4248360"/>
-            <a:ext cx="910080" cy="910080"/>
+            <a:ext cx="909720" cy="909720"/>
           </a:xfrm>
           <a:prstGeom prst="rect">
             <a:avLst/>
@@ -10360,7 +10381,7 @@
         <p:spPr>
           <a:xfrm>
             <a:off x="5506200" y="5025240"/>
-            <a:ext cx="910080" cy="910080"/>
+            <a:ext cx="909720" cy="909720"/>
           </a:xfrm>
           <a:prstGeom prst="rect">
             <a:avLst/>
@@ -10383,7 +10404,7 @@
         <p:spPr>
           <a:xfrm>
             <a:off x="6042600" y="4248360"/>
-            <a:ext cx="910080" cy="910080"/>
+            <a:ext cx="909720" cy="909720"/>
           </a:xfrm>
           <a:prstGeom prst="rect">
             <a:avLst/>
@@ -10406,7 +10427,7 @@
         <p:spPr>
           <a:xfrm>
             <a:off x="7944480" y="2602440"/>
-            <a:ext cx="910080" cy="910080"/>
+            <a:ext cx="909720" cy="909720"/>
           </a:xfrm>
           <a:prstGeom prst="rect">
             <a:avLst/>
@@ -10429,7 +10450,7 @@
         <p:spPr>
           <a:xfrm>
             <a:off x="6671160" y="3059640"/>
-            <a:ext cx="567360" cy="567360"/>
+            <a:ext cx="567000" cy="567000"/>
           </a:xfrm>
           <a:prstGeom prst="rect">
             <a:avLst/>
@@ -10452,7 +10473,7 @@
         <p:spPr>
           <a:xfrm>
             <a:off x="2973240" y="3863520"/>
-            <a:ext cx="910080" cy="910080"/>
+            <a:ext cx="909720" cy="909720"/>
           </a:xfrm>
           <a:prstGeom prst="rect">
             <a:avLst/>
@@ -10471,7 +10492,7 @@
         <p:spPr>
           <a:xfrm>
             <a:off x="4012560" y="4487400"/>
-            <a:ext cx="1489320" cy="852840"/>
+            <a:ext cx="1488960" cy="852480"/>
           </a:xfrm>
           <a:custGeom>
             <a:avLst/>
@@ -10523,7 +10544,7 @@
         <p:spPr>
           <a:xfrm>
             <a:off x="4012560" y="4248360"/>
-            <a:ext cx="2025720" cy="234720"/>
+            <a:ext cx="2025360" cy="234360"/>
           </a:xfrm>
           <a:custGeom>
             <a:avLst/>
@@ -10575,7 +10596,7 @@
         <p:spPr>
           <a:xfrm>
             <a:off x="4012560" y="4367880"/>
-            <a:ext cx="934560" cy="235440"/>
+            <a:ext cx="934200" cy="235080"/>
           </a:xfrm>
           <a:custGeom>
             <a:avLst/>
@@ -10626,8 +10647,8 @@
         </p:nvSpPr>
         <p:spPr>
           <a:xfrm flipV="1">
-            <a:off x="7242840" y="3218400"/>
-            <a:ext cx="625320" cy="118800"/>
+            <a:off x="7242840" y="3217680"/>
+            <a:ext cx="624960" cy="118440"/>
           </a:xfrm>
           <a:custGeom>
             <a:avLst/>
@@ -10702,7 +10723,7 @@
         <p:spPr>
           <a:xfrm>
             <a:off x="684360" y="4487400"/>
-            <a:ext cx="8530200" cy="1502640"/>
+            <a:ext cx="8529840" cy="1502280"/>
           </a:xfrm>
           <a:prstGeom prst="rect">
             <a:avLst/>
@@ -10751,7 +10772,7 @@
         <p:spPr>
           <a:xfrm>
             <a:off x="684360" y="685800"/>
-            <a:ext cx="8530200" cy="3610800"/>
+            <a:ext cx="8529840" cy="3610440"/>
           </a:xfrm>
           <a:prstGeom prst="rect">
             <a:avLst/>
@@ -10770,7 +10791,7 @@
         <p:txBody>
           <a:bodyPr lIns="90000" rIns="90000" tIns="45000" bIns="45000" anchor="ctr"/>
           <a:p>
-            <a:pPr marL="285840" indent="-281520">
+            <a:pPr marL="285840" indent="-281160">
               <a:lnSpc>
                 <a:spcPct val="100000"/>
               </a:lnSpc>
@@ -10938,7 +10959,7 @@
         <p:spPr>
           <a:xfrm>
             <a:off x="5430600" y="2730600"/>
-            <a:ext cx="2685600" cy="3715560"/>
+            <a:ext cx="2685240" cy="3715200"/>
           </a:xfrm>
           <a:prstGeom prst="rect">
             <a:avLst/>
@@ -10985,7 +11006,7 @@
         <p:spPr>
           <a:xfrm>
             <a:off x="5523120" y="2822040"/>
-            <a:ext cx="637560" cy="637560"/>
+            <a:ext cx="637200" cy="637200"/>
           </a:xfrm>
           <a:prstGeom prst="rect">
             <a:avLst/>
@@ -11008,7 +11029,7 @@
         <p:spPr>
           <a:xfrm>
             <a:off x="5707800" y="4080600"/>
-            <a:ext cx="910080" cy="910080"/>
+            <a:ext cx="909720" cy="909720"/>
           </a:xfrm>
           <a:prstGeom prst="rect">
             <a:avLst/>
@@ -11031,7 +11052,7 @@
         <p:spPr>
           <a:xfrm>
             <a:off x="6185880" y="4857480"/>
-            <a:ext cx="910080" cy="910080"/>
+            <a:ext cx="909720" cy="909720"/>
           </a:xfrm>
           <a:prstGeom prst="rect">
             <a:avLst/>
@@ -11054,7 +11075,7 @@
         <p:spPr>
           <a:xfrm>
             <a:off x="6722280" y="4080600"/>
-            <a:ext cx="910080" cy="910080"/>
+            <a:ext cx="909720" cy="909720"/>
           </a:xfrm>
           <a:prstGeom prst="rect">
             <a:avLst/>
@@ -11077,7 +11098,7 @@
         <p:spPr>
           <a:xfrm>
             <a:off x="3652920" y="3695760"/>
-            <a:ext cx="910080" cy="910080"/>
+            <a:ext cx="909720" cy="909720"/>
           </a:xfrm>
           <a:prstGeom prst="rect">
             <a:avLst/>
@@ -11096,7 +11117,7 @@
         <p:spPr>
           <a:xfrm>
             <a:off x="4692240" y="4319640"/>
-            <a:ext cx="1489320" cy="852840"/>
+            <a:ext cx="1488960" cy="852480"/>
           </a:xfrm>
           <a:custGeom>
             <a:avLst/>
@@ -11148,7 +11169,7 @@
         <p:spPr>
           <a:xfrm>
             <a:off x="4692240" y="4080600"/>
-            <a:ext cx="2025720" cy="234720"/>
+            <a:ext cx="2025360" cy="234360"/>
           </a:xfrm>
           <a:custGeom>
             <a:avLst/>
@@ -11200,7 +11221,7 @@
         <p:spPr>
           <a:xfrm>
             <a:off x="4692240" y="4200120"/>
-            <a:ext cx="934560" cy="235440"/>
+            <a:ext cx="934200" cy="235080"/>
           </a:xfrm>
           <a:custGeom>
             <a:avLst/>
@@ -11256,7 +11277,7 @@
         <p:spPr>
           <a:xfrm>
             <a:off x="9653760" y="3605400"/>
-            <a:ext cx="910080" cy="910080"/>
+            <a:ext cx="909720" cy="909720"/>
           </a:xfrm>
           <a:prstGeom prst="rect">
             <a:avLst/>
@@ -11275,7 +11296,7 @@
         <p:spPr>
           <a:xfrm rot="10325400">
             <a:off x="7858440" y="4106880"/>
-            <a:ext cx="1781640" cy="303480"/>
+            <a:ext cx="1781280" cy="303120"/>
           </a:xfrm>
           <a:prstGeom prst="rightArrow">
             <a:avLst>
@@ -11339,7 +11360,7 @@
         <p:spPr>
           <a:xfrm>
             <a:off x="684360" y="4487400"/>
-            <a:ext cx="8530200" cy="1502640"/>
+            <a:ext cx="8529840" cy="1502280"/>
           </a:xfrm>
           <a:prstGeom prst="rect">
             <a:avLst/>
@@ -11388,7 +11409,7 @@
         <p:spPr>
           <a:xfrm>
             <a:off x="684360" y="685800"/>
-            <a:ext cx="8530200" cy="3610800"/>
+            <a:ext cx="8529840" cy="3610440"/>
           </a:xfrm>
           <a:prstGeom prst="rect">
             <a:avLst/>
@@ -11418,7 +11439,7 @@
         <p:spPr>
           <a:xfrm>
             <a:off x="4069440" y="82800"/>
-            <a:ext cx="4042080" cy="2842560"/>
+            <a:ext cx="4041720" cy="2842200"/>
           </a:xfrm>
           <a:prstGeom prst="rect">
             <a:avLst/>
@@ -11441,7 +11462,7 @@
         <p:spPr>
           <a:xfrm>
             <a:off x="83880" y="3103560"/>
-            <a:ext cx="3863160" cy="1640160"/>
+            <a:ext cx="3862800" cy="1639800"/>
           </a:xfrm>
           <a:prstGeom prst="rect">
             <a:avLst/>
@@ -11464,7 +11485,7 @@
         <p:spPr>
           <a:xfrm>
             <a:off x="4161600" y="3103560"/>
-            <a:ext cx="3863160" cy="1640160"/>
+            <a:ext cx="3862800" cy="1639800"/>
           </a:xfrm>
           <a:prstGeom prst="rect">
             <a:avLst/>
@@ -11487,7 +11508,7 @@
         <p:spPr>
           <a:xfrm>
             <a:off x="8230320" y="3103560"/>
-            <a:ext cx="3863160" cy="1640160"/>
+            <a:ext cx="3862800" cy="1639800"/>
           </a:xfrm>
           <a:prstGeom prst="rect">
             <a:avLst/>
@@ -11506,7 +11527,7 @@
         <p:spPr>
           <a:xfrm>
             <a:off x="3993840" y="3766680"/>
-            <a:ext cx="146880" cy="315000"/>
+            <a:ext cx="146520" cy="314640"/>
           </a:xfrm>
           <a:prstGeom prst="rightArrow">
             <a:avLst>
@@ -11545,7 +11566,7 @@
         <p:spPr>
           <a:xfrm>
             <a:off x="8073360" y="3793320"/>
-            <a:ext cx="127800" cy="315000"/>
+            <a:ext cx="127440" cy="314640"/>
           </a:xfrm>
           <a:prstGeom prst="rightArrow">
             <a:avLst>
@@ -11584,7 +11605,7 @@
         <p:spPr>
           <a:xfrm>
             <a:off x="2701080" y="5176080"/>
-            <a:ext cx="1832760" cy="918360"/>
+            <a:ext cx="1832400" cy="918000"/>
           </a:xfrm>
           <a:prstGeom prst="wedgeRectCallout">
             <a:avLst>
@@ -11649,7 +11670,7 @@
         <p:spPr>
           <a:xfrm>
             <a:off x="6722640" y="5196600"/>
-            <a:ext cx="1964160" cy="821520"/>
+            <a:ext cx="1963800" cy="821160"/>
           </a:xfrm>
           <a:prstGeom prst="wedgeRectCallout">
             <a:avLst>
@@ -11714,7 +11735,7 @@
         <p:spPr>
           <a:xfrm>
             <a:off x="9731160" y="5131440"/>
-            <a:ext cx="2101320" cy="652320"/>
+            <a:ext cx="2100960" cy="651960"/>
           </a:xfrm>
           <a:prstGeom prst="wedgeRectCallout">
             <a:avLst>
@@ -11779,7 +11800,7 @@
         <p:spPr>
           <a:xfrm>
             <a:off x="5033520" y="2516760"/>
-            <a:ext cx="2571120" cy="360720"/>
+            <a:ext cx="2570760" cy="360360"/>
           </a:xfrm>
           <a:prstGeom prst="rect">
             <a:avLst/>
@@ -11827,8 +11848,8 @@
         </p:nvSpPr>
         <p:spPr>
           <a:xfrm rot="16200000">
-            <a:off x="3177360" y="1269360"/>
-            <a:ext cx="1960200" cy="360720"/>
+            <a:off x="3177360" y="1269720"/>
+            <a:ext cx="1959840" cy="360360"/>
           </a:xfrm>
           <a:prstGeom prst="rect">
             <a:avLst/>
@@ -11899,7 +11920,7 @@
         <p:spPr>
           <a:xfrm>
             <a:off x="684360" y="4487400"/>
-            <a:ext cx="8530200" cy="1502640"/>
+            <a:ext cx="8529840" cy="1502280"/>
           </a:xfrm>
           <a:prstGeom prst="rect">
             <a:avLst/>
@@ -11950,9 +11971,9 @@
         <p:grpSpPr>
           <a:xfrm>
             <a:off x="948240" y="823320"/>
-            <a:ext cx="10288080" cy="3335400"/>
+            <a:ext cx="10287720" cy="3335040"/>
             <a:chOff x="948240" y="823320"/>
-            <a:chExt cx="10288080" cy="3335400"/>
+            <a:chExt cx="10287720" cy="3335040"/>
           </a:xfrm>
         </p:grpSpPr>
         <p:sp>
@@ -11964,7 +11985,7 @@
           <p:spPr>
             <a:xfrm>
               <a:off x="948240" y="823320"/>
-              <a:ext cx="1358280" cy="1358280"/>
+              <a:ext cx="1357920" cy="1357920"/>
             </a:xfrm>
             <a:prstGeom prst="ellipse">
               <a:avLst/>
@@ -11997,7 +12018,7 @@
           <p:spPr>
             <a:xfrm>
               <a:off x="1234440" y="1109520"/>
-              <a:ext cx="785880" cy="785880"/>
+              <a:ext cx="785520" cy="785520"/>
             </a:xfrm>
             <a:prstGeom prst="rect">
               <a:avLst/>
@@ -12028,7 +12049,7 @@
           <p:spPr>
             <a:xfrm>
               <a:off x="2602800" y="823320"/>
-              <a:ext cx="3207600" cy="1358280"/>
+              <a:ext cx="3207240" cy="1357920"/>
             </a:xfrm>
             <a:prstGeom prst="rect">
               <a:avLst/>
@@ -12080,7 +12101,7 @@
           <p:spPr>
             <a:xfrm>
               <a:off x="6374160" y="823320"/>
-              <a:ext cx="1358280" cy="1358280"/>
+              <a:ext cx="1357920" cy="1357920"/>
             </a:xfrm>
             <a:prstGeom prst="ellipse">
               <a:avLst/>
@@ -12113,7 +12134,7 @@
           <p:spPr>
             <a:xfrm>
               <a:off x="6660360" y="1109520"/>
-              <a:ext cx="785880" cy="785880"/>
+              <a:ext cx="785520" cy="785520"/>
             </a:xfrm>
             <a:prstGeom prst="rect">
               <a:avLst/>
@@ -12144,7 +12165,7 @@
           <p:spPr>
             <a:xfrm>
               <a:off x="8028720" y="823320"/>
-              <a:ext cx="3207600" cy="1358280"/>
+              <a:ext cx="3207240" cy="1357920"/>
             </a:xfrm>
             <a:prstGeom prst="rect">
               <a:avLst/>
@@ -12196,7 +12217,7 @@
           <p:spPr>
             <a:xfrm>
               <a:off x="948240" y="2800440"/>
-              <a:ext cx="1358280" cy="1358280"/>
+              <a:ext cx="1357920" cy="1357920"/>
             </a:xfrm>
             <a:prstGeom prst="ellipse">
               <a:avLst/>
@@ -12229,7 +12250,7 @@
           <p:spPr>
             <a:xfrm>
               <a:off x="1234440" y="3086640"/>
-              <a:ext cx="785880" cy="785880"/>
+              <a:ext cx="785520" cy="785520"/>
             </a:xfrm>
             <a:prstGeom prst="rect">
               <a:avLst/>
@@ -12260,7 +12281,7 @@
           <p:spPr>
             <a:xfrm>
               <a:off x="2602800" y="2800440"/>
-              <a:ext cx="3207600" cy="1358280"/>
+              <a:ext cx="3207240" cy="1357920"/>
             </a:xfrm>
             <a:prstGeom prst="rect">
               <a:avLst/>
@@ -12312,7 +12333,7 @@
           <p:spPr>
             <a:xfrm>
               <a:off x="6374160" y="2800440"/>
-              <a:ext cx="1358280" cy="1358280"/>
+              <a:ext cx="1357920" cy="1357920"/>
             </a:xfrm>
             <a:prstGeom prst="ellipse">
               <a:avLst/>
@@ -12345,7 +12366,7 @@
           <p:spPr>
             <a:xfrm>
               <a:off x="6660360" y="3086640"/>
-              <a:ext cx="785880" cy="785880"/>
+              <a:ext cx="785520" cy="785520"/>
             </a:xfrm>
             <a:prstGeom prst="rect">
               <a:avLst/>
@@ -12376,7 +12397,7 @@
           <p:spPr>
             <a:xfrm>
               <a:off x="8028720" y="2800440"/>
-              <a:ext cx="3207600" cy="1358280"/>
+              <a:ext cx="3207240" cy="1357920"/>
             </a:xfrm>
             <a:prstGeom prst="rect">
               <a:avLst/>
@@ -12466,7 +12487,7 @@
         <p:spPr>
           <a:xfrm>
             <a:off x="0" y="0"/>
-            <a:ext cx="12187800" cy="6853680"/>
+            <a:ext cx="12187440" cy="6853320"/>
           </a:xfrm>
           <a:prstGeom prst="rect">
             <a:avLst/>
@@ -12519,7 +12540,7 @@
         <p:spPr>
           <a:xfrm>
             <a:off x="0" y="0"/>
-            <a:ext cx="8125560" cy="6853680"/>
+            <a:ext cx="8125200" cy="6853320"/>
           </a:xfrm>
           <a:prstGeom prst="snip2DiagRect">
             <a:avLst>
@@ -12741,7 +12762,7 @@
         <p:spPr>
           <a:xfrm>
             <a:off x="8588520" y="941400"/>
-            <a:ext cx="3039480" cy="3244320"/>
+            <a:ext cx="3039120" cy="3243960"/>
           </a:xfrm>
           <a:prstGeom prst="rect">
             <a:avLst/>
@@ -12792,9 +12813,9 @@
         <p:grpSpPr>
           <a:xfrm>
             <a:off x="952560" y="2104200"/>
-            <a:ext cx="6162120" cy="2439000"/>
+            <a:ext cx="6161760" cy="2438640"/>
             <a:chOff x="952560" y="2104200"/>
-            <a:chExt cx="6162120" cy="2439000"/>
+            <a:chExt cx="6161760" cy="2438640"/>
           </a:xfrm>
         </p:grpSpPr>
         <p:sp>
@@ -12806,7 +12827,7 @@
           <p:spPr>
             <a:xfrm>
               <a:off x="952560" y="2104200"/>
-              <a:ext cx="812160" cy="812160"/>
+              <a:ext cx="811800" cy="811800"/>
             </a:xfrm>
             <a:prstGeom prst="ellipse">
               <a:avLst/>
@@ -12839,7 +12860,7 @@
           <p:spPr>
             <a:xfrm>
               <a:off x="1123920" y="2275560"/>
-              <a:ext cx="469080" cy="469080"/>
+              <a:ext cx="468720" cy="468720"/>
             </a:xfrm>
             <a:prstGeom prst="rect">
               <a:avLst/>
@@ -12870,7 +12891,7 @@
           <p:spPr>
             <a:xfrm>
               <a:off x="1944000" y="2104200"/>
-              <a:ext cx="1919880" cy="812160"/>
+              <a:ext cx="1919520" cy="811800"/>
             </a:xfrm>
             <a:prstGeom prst="rect">
               <a:avLst/>
@@ -12922,7 +12943,7 @@
           <p:spPr>
             <a:xfrm>
               <a:off x="4203360" y="2104200"/>
-              <a:ext cx="812160" cy="812160"/>
+              <a:ext cx="811800" cy="811800"/>
             </a:xfrm>
             <a:prstGeom prst="ellipse">
               <a:avLst/>
@@ -12955,7 +12976,7 @@
           <p:spPr>
             <a:xfrm>
               <a:off x="4375080" y="2275560"/>
-              <a:ext cx="469080" cy="469080"/>
+              <a:ext cx="468720" cy="468720"/>
             </a:xfrm>
             <a:prstGeom prst="rect">
               <a:avLst/>
@@ -12986,7 +13007,7 @@
           <p:spPr>
             <a:xfrm>
               <a:off x="5194800" y="2104200"/>
-              <a:ext cx="1919880" cy="812160"/>
+              <a:ext cx="1919520" cy="811800"/>
             </a:xfrm>
             <a:prstGeom prst="rect">
               <a:avLst/>
@@ -13038,7 +13059,7 @@
           <p:spPr>
             <a:xfrm>
               <a:off x="952560" y="3731040"/>
-              <a:ext cx="812160" cy="812160"/>
+              <a:ext cx="811800" cy="811800"/>
             </a:xfrm>
             <a:prstGeom prst="ellipse">
               <a:avLst/>
@@ -13071,7 +13092,7 @@
           <p:spPr>
             <a:xfrm>
               <a:off x="1123920" y="3902400"/>
-              <a:ext cx="469080" cy="469080"/>
+              <a:ext cx="468720" cy="468720"/>
             </a:xfrm>
             <a:prstGeom prst="rect">
               <a:avLst/>
@@ -13102,7 +13123,7 @@
           <p:spPr>
             <a:xfrm>
               <a:off x="1944000" y="3731040"/>
-              <a:ext cx="1919880" cy="812160"/>
+              <a:ext cx="1919520" cy="811800"/>
             </a:xfrm>
             <a:prstGeom prst="rect">
               <a:avLst/>
@@ -13154,7 +13175,7 @@
           <p:spPr>
             <a:xfrm>
               <a:off x="4203360" y="3731040"/>
-              <a:ext cx="812160" cy="812160"/>
+              <a:ext cx="811800" cy="811800"/>
             </a:xfrm>
             <a:prstGeom prst="ellipse">
               <a:avLst/>
@@ -13187,7 +13208,7 @@
           <p:spPr>
             <a:xfrm>
               <a:off x="4375080" y="3902400"/>
-              <a:ext cx="469080" cy="469080"/>
+              <a:ext cx="468720" cy="468720"/>
             </a:xfrm>
             <a:prstGeom prst="rect">
               <a:avLst/>
@@ -13218,7 +13239,7 @@
           <p:spPr>
             <a:xfrm>
               <a:off x="5194800" y="3731040"/>
-              <a:ext cx="1919880" cy="812160"/>
+              <a:ext cx="1919520" cy="811800"/>
             </a:xfrm>
             <a:prstGeom prst="rect">
               <a:avLst/>
@@ -13335,7 +13356,7 @@
         <p:spPr>
           <a:xfrm>
             <a:off x="684360" y="4487400"/>
-            <a:ext cx="8530200" cy="1502640"/>
+            <a:ext cx="8529840" cy="1502280"/>
           </a:xfrm>
           <a:prstGeom prst="rect">
             <a:avLst/>
@@ -13384,7 +13405,7 @@
         <p:spPr>
           <a:xfrm>
             <a:off x="684360" y="685800"/>
-            <a:ext cx="8530200" cy="3610800"/>
+            <a:ext cx="8529840" cy="3610440"/>
           </a:xfrm>
           <a:prstGeom prst="rect">
             <a:avLst/>
@@ -13403,7 +13424,7 @@
         <p:txBody>
           <a:bodyPr lIns="90000" rIns="90000" tIns="45000" bIns="45000" anchor="ctr"/>
           <a:p>
-            <a:pPr marL="285840" indent="-281520">
+            <a:pPr marL="285840" indent="-281160">
               <a:lnSpc>
                 <a:spcPct val="100000"/>
               </a:lnSpc>
@@ -13435,7 +13456,7 @@
             </a:endParaRPr>
           </a:p>
           <a:p>
-            <a:pPr marL="285840" indent="-281520">
+            <a:pPr marL="285840" indent="-281160">
               <a:lnSpc>
                 <a:spcPct val="100000"/>
               </a:lnSpc>
@@ -13467,7 +13488,7 @@
             </a:endParaRPr>
           </a:p>
           <a:p>
-            <a:pPr marL="285840" indent="-281520">
+            <a:pPr marL="285840" indent="-281160">
               <a:lnSpc>
                 <a:spcPct val="100000"/>
               </a:lnSpc>
@@ -13499,7 +13520,7 @@
             </a:endParaRPr>
           </a:p>
           <a:p>
-            <a:pPr marL="285840" indent="-281520">
+            <a:pPr marL="285840" indent="-281160">
               <a:lnSpc>
                 <a:spcPct val="100000"/>
               </a:lnSpc>
@@ -13563,7 +13584,7 @@
         <p:spPr>
           <a:xfrm>
             <a:off x="684360" y="4487400"/>
-            <a:ext cx="8530200" cy="1502640"/>
+            <a:ext cx="8529840" cy="1502280"/>
           </a:xfrm>
           <a:prstGeom prst="rect">
             <a:avLst/>
@@ -13616,7 +13637,7 @@
         <p:spPr>
           <a:xfrm>
             <a:off x="5221440" y="75600"/>
-            <a:ext cx="910080" cy="910080"/>
+            <a:ext cx="909720" cy="909720"/>
           </a:xfrm>
           <a:prstGeom prst="rect">
             <a:avLst/>
@@ -13639,7 +13660,7 @@
         <p:spPr>
           <a:xfrm>
             <a:off x="4695120" y="4444560"/>
-            <a:ext cx="910080" cy="910080"/>
+            <a:ext cx="909720" cy="909720"/>
           </a:xfrm>
           <a:prstGeom prst="rect">
             <a:avLst/>
@@ -13662,7 +13683,7 @@
         <p:spPr>
           <a:xfrm>
             <a:off x="2603880" y="2294640"/>
-            <a:ext cx="910080" cy="910080"/>
+            <a:ext cx="909720" cy="909720"/>
           </a:xfrm>
           <a:prstGeom prst="rect">
             <a:avLst/>
@@ -13685,7 +13706,7 @@
         <p:spPr>
           <a:xfrm>
             <a:off x="9767160" y="3294360"/>
-            <a:ext cx="910080" cy="910080"/>
+            <a:ext cx="909720" cy="909720"/>
           </a:xfrm>
           <a:prstGeom prst="rect">
             <a:avLst/>
@@ -13708,7 +13729,7 @@
         <p:spPr>
           <a:xfrm>
             <a:off x="1967760" y="3811680"/>
-            <a:ext cx="910080" cy="910080"/>
+            <a:ext cx="909720" cy="909720"/>
           </a:xfrm>
           <a:prstGeom prst="rect">
             <a:avLst/>
@@ -13731,7 +13752,7 @@
         <p:spPr>
           <a:xfrm>
             <a:off x="5221440" y="2907360"/>
-            <a:ext cx="910080" cy="910080"/>
+            <a:ext cx="909720" cy="909720"/>
           </a:xfrm>
           <a:prstGeom prst="rect">
             <a:avLst/>
@@ -13754,7 +13775,7 @@
         <p:spPr>
           <a:xfrm>
             <a:off x="1093680" y="3282480"/>
-            <a:ext cx="910080" cy="910080"/>
+            <a:ext cx="909720" cy="909720"/>
           </a:xfrm>
           <a:prstGeom prst="rect">
             <a:avLst/>
@@ -13777,7 +13798,7 @@
         <p:spPr>
           <a:xfrm>
             <a:off x="8595360" y="3808800"/>
-            <a:ext cx="910080" cy="910080"/>
+            <a:ext cx="909720" cy="909720"/>
           </a:xfrm>
           <a:prstGeom prst="rect">
             <a:avLst/>
@@ -13800,7 +13821,7 @@
         <p:spPr>
           <a:xfrm>
             <a:off x="7839000" y="2294640"/>
-            <a:ext cx="910080" cy="910080"/>
+            <a:ext cx="909720" cy="909720"/>
           </a:xfrm>
           <a:prstGeom prst="rect">
             <a:avLst/>
@@ -13819,7 +13840,7 @@
         <p:spPr>
           <a:xfrm>
             <a:off x="6312960" y="944640"/>
-            <a:ext cx="1522080" cy="1335960"/>
+            <a:ext cx="1521720" cy="1335600"/>
           </a:xfrm>
           <a:custGeom>
             <a:avLst/>
@@ -13872,7 +13893,7 @@
         <p:spPr>
           <a:xfrm>
             <a:off x="5678640" y="1145160"/>
-            <a:ext cx="360" cy="1602360"/>
+            <a:ext cx="360" cy="1602000"/>
           </a:xfrm>
           <a:custGeom>
             <a:avLst/>
@@ -13924,8 +13945,8 @@
         </p:nvSpPr>
         <p:spPr>
           <a:xfrm flipH="1">
-            <a:off x="3422520" y="990000"/>
-            <a:ext cx="1613520" cy="1376280"/>
+            <a:off x="3421800" y="990000"/>
+            <a:ext cx="1613160" cy="1375920"/>
           </a:xfrm>
           <a:custGeom>
             <a:avLst/>
@@ -13978,7 +13999,7 @@
         <p:spPr>
           <a:xfrm>
             <a:off x="2082960" y="3279600"/>
-            <a:ext cx="913320" cy="360720"/>
+            <a:ext cx="912960" cy="360360"/>
           </a:xfrm>
           <a:prstGeom prst="rect">
             <a:avLst/>
@@ -14027,7 +14048,7 @@
         <p:spPr>
           <a:xfrm>
             <a:off x="5227200" y="4030200"/>
-            <a:ext cx="925560" cy="360720"/>
+            <a:ext cx="925200" cy="360360"/>
           </a:xfrm>
           <a:prstGeom prst="rect">
             <a:avLst/>
@@ -14076,7 +14097,7 @@
         <p:spPr>
           <a:xfrm>
             <a:off x="8246520" y="3279600"/>
-            <a:ext cx="1251720" cy="360720"/>
+            <a:ext cx="1251360" cy="360360"/>
           </a:xfrm>
           <a:prstGeom prst="rect">
             <a:avLst/>
@@ -14125,7 +14146,7 @@
         <p:spPr>
           <a:xfrm>
             <a:off x="481680" y="348120"/>
-            <a:ext cx="1807920" cy="360720"/>
+            <a:ext cx="1807560" cy="360360"/>
           </a:xfrm>
           <a:prstGeom prst="rect">
             <a:avLst/>
@@ -14178,7 +14199,7 @@
         <p:spPr>
           <a:xfrm>
             <a:off x="5855760" y="4444560"/>
-            <a:ext cx="910080" cy="910080"/>
+            <a:ext cx="909720" cy="909720"/>
           </a:xfrm>
           <a:prstGeom prst="rect">
             <a:avLst/>
@@ -14219,7 +14240,7 @@
         <p:spPr>
           <a:xfrm>
             <a:off x="684360" y="4487400"/>
-            <a:ext cx="8530200" cy="1502640"/>
+            <a:ext cx="8529840" cy="1502280"/>
           </a:xfrm>
           <a:prstGeom prst="rect">
             <a:avLst/>
@@ -14272,7 +14293,7 @@
         <p:spPr>
           <a:xfrm>
             <a:off x="7839000" y="2560320"/>
-            <a:ext cx="1310040" cy="595800"/>
+            <a:ext cx="1309680" cy="595440"/>
           </a:xfrm>
           <a:prstGeom prst="rect">
             <a:avLst/>
@@ -14291,7 +14312,7 @@
         <p:spPr>
           <a:xfrm>
             <a:off x="480240" y="348120"/>
-            <a:ext cx="1788120" cy="360720"/>
+            <a:ext cx="1787760" cy="360360"/>
           </a:xfrm>
           <a:prstGeom prst="rect">
             <a:avLst/>
@@ -14340,7 +14361,7 @@
         <p:spPr>
           <a:xfrm>
             <a:off x="6384240" y="990000"/>
-            <a:ext cx="1522080" cy="1335960"/>
+            <a:ext cx="1521720" cy="1335600"/>
           </a:xfrm>
           <a:custGeom>
             <a:avLst/>
@@ -14393,7 +14414,7 @@
         <p:spPr>
           <a:xfrm>
             <a:off x="5678640" y="1145160"/>
-            <a:ext cx="360" cy="1602360"/>
+            <a:ext cx="360" cy="1602000"/>
           </a:xfrm>
           <a:custGeom>
             <a:avLst/>
@@ -14445,8 +14466,8 @@
         </p:nvSpPr>
         <p:spPr>
           <a:xfrm flipH="1">
-            <a:off x="3422520" y="990000"/>
-            <a:ext cx="1613520" cy="1376280"/>
+            <a:off x="3421800" y="990000"/>
+            <a:ext cx="1613160" cy="1375920"/>
           </a:xfrm>
           <a:custGeom>
             <a:avLst/>
@@ -14499,7 +14520,7 @@
         <p:spPr>
           <a:xfrm>
             <a:off x="2082960" y="3279600"/>
-            <a:ext cx="913320" cy="360720"/>
+            <a:ext cx="912960" cy="360360"/>
           </a:xfrm>
           <a:prstGeom prst="rect">
             <a:avLst/>
@@ -14548,7 +14569,7 @@
         <p:spPr>
           <a:xfrm>
             <a:off x="5227200" y="4030200"/>
-            <a:ext cx="925560" cy="360720"/>
+            <a:ext cx="925200" cy="360360"/>
           </a:xfrm>
           <a:prstGeom prst="rect">
             <a:avLst/>
@@ -14597,7 +14618,7 @@
         <p:spPr>
           <a:xfrm>
             <a:off x="8246520" y="3279600"/>
-            <a:ext cx="1251720" cy="360720"/>
+            <a:ext cx="1251360" cy="360360"/>
           </a:xfrm>
           <a:prstGeom prst="rect">
             <a:avLst/>
@@ -14650,7 +14671,7 @@
         <p:spPr>
           <a:xfrm>
             <a:off x="4979520" y="218880"/>
-            <a:ext cx="1329120" cy="614880"/>
+            <a:ext cx="1328760" cy="614520"/>
           </a:xfrm>
           <a:prstGeom prst="rect">
             <a:avLst/>
@@ -14673,7 +14694,7 @@
         <p:spPr>
           <a:xfrm>
             <a:off x="2102760" y="2514600"/>
-            <a:ext cx="1319760" cy="605160"/>
+            <a:ext cx="1319400" cy="604800"/>
           </a:xfrm>
           <a:prstGeom prst="rect">
             <a:avLst/>
@@ -14696,7 +14717,7 @@
         <p:spPr>
           <a:xfrm>
             <a:off x="4235760" y="3279600"/>
-            <a:ext cx="1310040" cy="595800"/>
+            <a:ext cx="1309680" cy="595440"/>
           </a:xfrm>
           <a:prstGeom prst="rect">
             <a:avLst/>
@@ -14719,7 +14740,7 @@
         <p:spPr>
           <a:xfrm>
             <a:off x="5833080" y="3279600"/>
-            <a:ext cx="1310040" cy="595800"/>
+            <a:ext cx="1309680" cy="595440"/>
           </a:xfrm>
           <a:prstGeom prst="rect">
             <a:avLst/>
@@ -14760,7 +14781,7 @@
         <p:spPr>
           <a:xfrm>
             <a:off x="684360" y="4487400"/>
-            <a:ext cx="8530200" cy="1502640"/>
+            <a:ext cx="8529840" cy="1502280"/>
           </a:xfrm>
           <a:prstGeom prst="rect">
             <a:avLst/>
@@ -14809,7 +14830,7 @@
         <p:spPr>
           <a:xfrm>
             <a:off x="684360" y="685800"/>
-            <a:ext cx="8530200" cy="3610800"/>
+            <a:ext cx="8529840" cy="3610440"/>
           </a:xfrm>
           <a:prstGeom prst="rect">
             <a:avLst/>
@@ -14828,7 +14849,7 @@
         <p:txBody>
           <a:bodyPr lIns="90000" rIns="90000" tIns="45000" bIns="45000" anchor="ctr"/>
           <a:p>
-            <a:pPr marL="285840" indent="-281520">
+            <a:pPr marL="285840" indent="-281160">
               <a:lnSpc>
                 <a:spcPct val="100000"/>
               </a:lnSpc>
@@ -14904,7 +14925,7 @@
         <p:spPr>
           <a:xfrm>
             <a:off x="666000" y="2574360"/>
-            <a:ext cx="4806360" cy="2969640"/>
+            <a:ext cx="4806000" cy="2969280"/>
           </a:xfrm>
           <a:prstGeom prst="roundRect">
             <a:avLst>
@@ -15054,7 +15075,7 @@
         <p:spPr>
           <a:xfrm>
             <a:off x="684360" y="5241960"/>
-            <a:ext cx="8530200" cy="1502640"/>
+            <a:ext cx="8529840" cy="1502280"/>
           </a:xfrm>
           <a:prstGeom prst="rect">
             <a:avLst/>
@@ -15103,7 +15124,7 @@
         <p:spPr>
           <a:xfrm>
             <a:off x="684360" y="685800"/>
-            <a:ext cx="10985760" cy="2283840"/>
+            <a:ext cx="10985400" cy="2283480"/>
           </a:xfrm>
           <a:prstGeom prst="rect">
             <a:avLst/>
@@ -15124,7 +15145,7 @@
             <a:normAutofit/>
           </a:bodyPr>
           <a:p>
-            <a:pPr marL="285840" indent="-281520">
+            <a:pPr marL="285840" indent="-281160">
               <a:lnSpc>
                 <a:spcPct val="100000"/>
               </a:lnSpc>
@@ -15206,7 +15227,7 @@
             </a:endParaRPr>
           </a:p>
           <a:p>
-            <a:pPr marL="285840" indent="-281520">
+            <a:pPr marL="285840" indent="-281160">
               <a:lnSpc>
                 <a:spcPct val="100000"/>
               </a:lnSpc>
@@ -15330,7 +15351,7 @@
         <p:spPr>
           <a:xfrm>
             <a:off x="2523960" y="3718800"/>
-            <a:ext cx="723960" cy="718920"/>
+            <a:ext cx="723600" cy="718560"/>
           </a:xfrm>
           <a:prstGeom prst="ellipse">
             <a:avLst/>
@@ -15398,7 +15419,7 @@
         <p:spPr>
           <a:xfrm>
             <a:off x="3363480" y="3303360"/>
-            <a:ext cx="1213200" cy="402840"/>
+            <a:ext cx="1212840" cy="402480"/>
           </a:xfrm>
           <a:prstGeom prst="ellipse">
             <a:avLst/>
@@ -15466,7 +15487,7 @@
         <p:spPr>
           <a:xfrm>
             <a:off x="744120" y="3208680"/>
-            <a:ext cx="1586520" cy="671040"/>
+            <a:ext cx="1586160" cy="670680"/>
           </a:xfrm>
           <a:prstGeom prst="ellipse">
             <a:avLst/>
@@ -15534,7 +15555,7 @@
         <p:spPr>
           <a:xfrm>
             <a:off x="2119680" y="4628880"/>
-            <a:ext cx="1525680" cy="671040"/>
+            <a:ext cx="1525320" cy="670680"/>
           </a:xfrm>
           <a:prstGeom prst="ellipse">
             <a:avLst/>
@@ -15602,7 +15623,7 @@
         <p:spPr>
           <a:xfrm>
             <a:off x="6819480" y="2574360"/>
-            <a:ext cx="4806360" cy="2969640"/>
+            <a:ext cx="4806000" cy="2969280"/>
           </a:xfrm>
           <a:prstGeom prst="roundRect">
             <a:avLst>
@@ -15752,7 +15773,7 @@
         <p:spPr>
           <a:xfrm>
             <a:off x="7103880" y="4147560"/>
-            <a:ext cx="4374720" cy="855000"/>
+            <a:ext cx="4374360" cy="854640"/>
           </a:xfrm>
           <a:prstGeom prst="ellipse">
             <a:avLst/>
@@ -15820,7 +15841,7 @@
         <p:spPr>
           <a:xfrm>
             <a:off x="9898200" y="3332520"/>
-            <a:ext cx="1213200" cy="402840"/>
+            <a:ext cx="1212840" cy="402480"/>
           </a:xfrm>
           <a:prstGeom prst="ellipse">
             <a:avLst/>
@@ -15888,7 +15909,7 @@
         <p:spPr>
           <a:xfrm>
             <a:off x="6965640" y="3288960"/>
-            <a:ext cx="1586520" cy="671040"/>
+            <a:ext cx="1586160" cy="670680"/>
           </a:xfrm>
           <a:prstGeom prst="ellipse">
             <a:avLst/>
@@ -15956,7 +15977,7 @@
         <p:spPr>
           <a:xfrm>
             <a:off x="8287920" y="2688120"/>
-            <a:ext cx="1869480" cy="671040"/>
+            <a:ext cx="1869120" cy="670680"/>
           </a:xfrm>
           <a:prstGeom prst="ellipse">
             <a:avLst/>
@@ -16073,7 +16094,7 @@
         <p:spPr>
           <a:xfrm>
             <a:off x="684360" y="4487400"/>
-            <a:ext cx="8530200" cy="1502640"/>
+            <a:ext cx="8529840" cy="1502280"/>
           </a:xfrm>
           <a:prstGeom prst="rect">
             <a:avLst/>
@@ -16122,7 +16143,7 @@
         <p:spPr>
           <a:xfrm>
             <a:off x="684360" y="685800"/>
-            <a:ext cx="11358360" cy="3610800"/>
+            <a:ext cx="11358000" cy="3610440"/>
           </a:xfrm>
           <a:prstGeom prst="rect">
             <a:avLst/>
@@ -16143,7 +16164,7 @@
             <a:normAutofit/>
           </a:bodyPr>
           <a:p>
-            <a:pPr marL="285840" indent="-281520">
+            <a:pPr marL="285840" indent="-281160">
               <a:lnSpc>
                 <a:spcPct val="100000"/>
               </a:lnSpc>
@@ -16185,7 +16206,7 @@
             </a:endParaRPr>
           </a:p>
           <a:p>
-            <a:pPr marL="285840" indent="-281520">
+            <a:pPr marL="285840" indent="-281160">
               <a:lnSpc>
                 <a:spcPct val="100000"/>
               </a:lnSpc>
@@ -16375,7 +16396,7 @@
             </a:endParaRPr>
           </a:p>
           <a:p>
-            <a:pPr marL="285840" indent="-281520">
+            <a:pPr marL="285840" indent="-281160">
               <a:lnSpc>
                 <a:spcPct val="100000"/>
               </a:lnSpc>
@@ -16407,7 +16428,7 @@
             </a:endParaRPr>
           </a:p>
           <a:p>
-            <a:pPr marL="285840" indent="-281520">
+            <a:pPr marL="285840" indent="-281160">
               <a:lnSpc>
                 <a:spcPct val="100000"/>
               </a:lnSpc>
@@ -16498,7 +16519,7 @@
         <p:spPr>
           <a:xfrm>
             <a:off x="684360" y="4487400"/>
-            <a:ext cx="8530200" cy="1502640"/>
+            <a:ext cx="8529840" cy="1502280"/>
           </a:xfrm>
           <a:prstGeom prst="rect">
             <a:avLst/>
@@ -16547,7 +16568,7 @@
         <p:spPr>
           <a:xfrm>
             <a:off x="684360" y="685800"/>
-            <a:ext cx="8530200" cy="3610800"/>
+            <a:ext cx="8529840" cy="3610440"/>
           </a:xfrm>
           <a:prstGeom prst="rect">
             <a:avLst/>
@@ -16566,7 +16587,7 @@
         <p:txBody>
           <a:bodyPr lIns="90000" rIns="90000" tIns="45000" bIns="45000" anchor="ctr"/>
           <a:p>
-            <a:pPr marL="285840" indent="-281520">
+            <a:pPr marL="285840" indent="-281160">
               <a:lnSpc>
                 <a:spcPct val="100000"/>
               </a:lnSpc>
@@ -16668,7 +16689,7 @@
             </a:endParaRPr>
           </a:p>
           <a:p>
-            <a:pPr marL="285840" indent="-281520">
+            <a:pPr marL="285840" indent="-281160">
               <a:lnSpc>
                 <a:spcPct val="100000"/>
               </a:lnSpc>
@@ -16770,7 +16791,7 @@
         <p:spPr>
           <a:xfrm>
             <a:off x="2521440" y="3979080"/>
-            <a:ext cx="1877760" cy="803520"/>
+            <a:ext cx="1877400" cy="803160"/>
           </a:xfrm>
           <a:prstGeom prst="rect">
             <a:avLst/>
@@ -16836,7 +16857,7 @@
         <p:spPr>
           <a:xfrm>
             <a:off x="5487840" y="3979080"/>
-            <a:ext cx="1877760" cy="803520"/>
+            <a:ext cx="1877400" cy="803160"/>
           </a:xfrm>
           <a:prstGeom prst="rect">
             <a:avLst/>
@@ -16902,7 +16923,7 @@
         <p:spPr>
           <a:xfrm>
             <a:off x="4004640" y="2771640"/>
-            <a:ext cx="1877760" cy="803520"/>
+            <a:ext cx="1877400" cy="803160"/>
           </a:xfrm>
           <a:prstGeom prst="rect">
             <a:avLst/>
@@ -16968,7 +16989,7 @@
         <p:spPr>
           <a:xfrm>
             <a:off x="4483080" y="4383000"/>
-            <a:ext cx="1000440" cy="360"/>
+            <a:ext cx="1000080" cy="360"/>
           </a:xfrm>
           <a:custGeom>
             <a:avLst/>
@@ -17020,7 +17041,7 @@
         <p:spPr>
           <a:xfrm>
             <a:off x="4985640" y="3657600"/>
-            <a:ext cx="360" cy="575280"/>
+            <a:ext cx="360" cy="574920"/>
           </a:xfrm>
           <a:custGeom>
             <a:avLst/>
@@ -17121,7 +17142,7 @@
         <p:spPr>
           <a:xfrm>
             <a:off x="0" y="0"/>
-            <a:ext cx="12187800" cy="6853680"/>
+            <a:ext cx="12187440" cy="6853320"/>
           </a:xfrm>
           <a:prstGeom prst="rect">
             <a:avLst/>
@@ -17174,7 +17195,7 @@
         <p:spPr>
           <a:xfrm>
             <a:off x="640440" y="685800"/>
-            <a:ext cx="4814280" cy="4599360"/>
+            <a:ext cx="4813920" cy="4599000"/>
           </a:xfrm>
           <a:prstGeom prst="rect">
             <a:avLst/>
@@ -17225,7 +17246,7 @@
         <p:spPr>
           <a:xfrm>
             <a:off x="6095880" y="0"/>
-            <a:ext cx="6091560" cy="6853680"/>
+            <a:ext cx="6091200" cy="6853320"/>
           </a:xfrm>
           <a:prstGeom prst="rect">
             <a:avLst/>
@@ -17263,7 +17284,7 @@
         <p:spPr>
           <a:xfrm>
             <a:off x="6625800" y="685800"/>
-            <a:ext cx="4874760" cy="4599360"/>
+            <a:ext cx="4874400" cy="4599000"/>
           </a:xfrm>
           <a:prstGeom prst="rect">
             <a:avLst/>
@@ -17284,7 +17305,7 @@
             <a:normAutofit/>
           </a:bodyPr>
           <a:p>
-            <a:pPr marL="285840" indent="-281520">
+            <a:pPr marL="285840" indent="-281160">
               <a:lnSpc>
                 <a:spcPct val="100000"/>
               </a:lnSpc>
@@ -17316,7 +17337,7 @@
             </a:endParaRPr>
           </a:p>
           <a:p>
-            <a:pPr marL="285840" indent="-281520">
+            <a:pPr marL="285840" indent="-281160">
               <a:lnSpc>
                 <a:spcPct val="100000"/>
               </a:lnSpc>
@@ -17348,7 +17369,7 @@
             </a:endParaRPr>
           </a:p>
           <a:p>
-            <a:pPr marL="285840" indent="-281520">
+            <a:pPr marL="285840" indent="-281160">
               <a:lnSpc>
                 <a:spcPct val="100000"/>
               </a:lnSpc>
@@ -17380,7 +17401,7 @@
             </a:endParaRPr>
           </a:p>
           <a:p>
-            <a:pPr marL="285840" indent="-281520">
+            <a:pPr marL="285840" indent="-281160">
               <a:lnSpc>
                 <a:spcPct val="100000"/>
               </a:lnSpc>
@@ -17471,7 +17492,7 @@
         <p:spPr>
           <a:xfrm>
             <a:off x="684360" y="4487400"/>
-            <a:ext cx="8530200" cy="1502640"/>
+            <a:ext cx="8529840" cy="1502280"/>
           </a:xfrm>
           <a:prstGeom prst="rect">
             <a:avLst/>
@@ -17520,7 +17541,7 @@
         <p:spPr>
           <a:xfrm>
             <a:off x="1044720" y="500040"/>
-            <a:ext cx="8259840" cy="3228480"/>
+            <a:ext cx="8259480" cy="3228120"/>
           </a:xfrm>
           <a:prstGeom prst="rect">
             <a:avLst/>
@@ -17539,7 +17560,7 @@
         <p:txBody>
           <a:bodyPr lIns="90000" rIns="90000" tIns="45000" bIns="45000" anchor="ctr"/>
           <a:p>
-            <a:pPr marL="285840" indent="-281520">
+            <a:pPr marL="285840" indent="-281160">
               <a:lnSpc>
                 <a:spcPct val="100000"/>
               </a:lnSpc>
@@ -17581,7 +17602,7 @@
             </a:endParaRPr>
           </a:p>
           <a:p>
-            <a:pPr marL="285840" indent="-281520">
+            <a:pPr marL="285840" indent="-281160">
               <a:lnSpc>
                 <a:spcPct val="100000"/>
               </a:lnSpc>
@@ -17633,7 +17654,7 @@
             </a:endParaRPr>
           </a:p>
           <a:p>
-            <a:pPr marL="285840" indent="-281520">
+            <a:pPr marL="285840" indent="-281160">
               <a:lnSpc>
                 <a:spcPct val="100000"/>
               </a:lnSpc>
@@ -17785,7 +17806,7 @@
         <p:spPr>
           <a:xfrm>
             <a:off x="7097760" y="1943280"/>
-            <a:ext cx="850320" cy="850320"/>
+            <a:ext cx="849960" cy="849960"/>
           </a:xfrm>
           <a:prstGeom prst="rect">
             <a:avLst/>
@@ -17808,7 +17829,7 @@
         <p:spPr>
           <a:xfrm>
             <a:off x="6931800" y="4296600"/>
-            <a:ext cx="1176840" cy="469080"/>
+            <a:ext cx="1176480" cy="468720"/>
           </a:xfrm>
           <a:prstGeom prst="rect">
             <a:avLst/>
@@ -17831,7 +17852,7 @@
         <p:spPr>
           <a:xfrm>
             <a:off x="7054200" y="2896920"/>
-            <a:ext cx="893880" cy="1036080"/>
+            <a:ext cx="893520" cy="1035720"/>
           </a:xfrm>
           <a:prstGeom prst="rect">
             <a:avLst/>
@@ -17854,7 +17875,7 @@
         <p:spPr>
           <a:xfrm>
             <a:off x="2718360" y="2064960"/>
-            <a:ext cx="910080" cy="910080"/>
+            <a:ext cx="909720" cy="909720"/>
           </a:xfrm>
           <a:prstGeom prst="rect">
             <a:avLst/>
@@ -17877,7 +17898,7 @@
         <p:spPr>
           <a:xfrm>
             <a:off x="2739240" y="3371040"/>
-            <a:ext cx="910080" cy="910080"/>
+            <a:ext cx="909720" cy="909720"/>
           </a:xfrm>
           <a:prstGeom prst="rect">
             <a:avLst/>
@@ -17900,7 +17921,7 @@
         <p:spPr>
           <a:xfrm>
             <a:off x="4908600" y="2852280"/>
-            <a:ext cx="910080" cy="910080"/>
+            <a:ext cx="909720" cy="909720"/>
           </a:xfrm>
           <a:prstGeom prst="rect">
             <a:avLst/>
@@ -17918,8 +17939,8 @@
         </p:nvSpPr>
         <p:spPr>
           <a:xfrm rot="1192200">
-            <a:off x="4046400" y="2671200"/>
-            <a:ext cx="974160" cy="480240"/>
+            <a:off x="4046040" y="2671200"/>
+            <a:ext cx="973800" cy="479880"/>
           </a:xfrm>
           <a:prstGeom prst="rightArrow">
             <a:avLst>
@@ -17961,7 +17982,7 @@
         <p:spPr>
           <a:xfrm rot="20407800">
             <a:off x="4025160" y="3459240"/>
-            <a:ext cx="974160" cy="480240"/>
+            <a:ext cx="973800" cy="479880"/>
           </a:xfrm>
           <a:prstGeom prst="rightArrow">
             <a:avLst>
@@ -18002,8 +18023,8 @@
         </p:nvSpPr>
         <p:spPr>
           <a:xfrm rot="1192200">
-            <a:off x="5799960" y="3779640"/>
-            <a:ext cx="974160" cy="480240"/>
+            <a:off x="5799600" y="3779640"/>
+            <a:ext cx="973800" cy="479880"/>
           </a:xfrm>
           <a:prstGeom prst="rightArrow">
             <a:avLst>
@@ -18045,7 +18066,7 @@
         <p:spPr>
           <a:xfrm rot="20407800">
             <a:off x="5873400" y="2454840"/>
-            <a:ext cx="974160" cy="480240"/>
+            <a:ext cx="973800" cy="479880"/>
           </a:xfrm>
           <a:prstGeom prst="rightArrow">
             <a:avLst>
@@ -18087,7 +18108,7 @@
         <p:spPr>
           <a:xfrm>
             <a:off x="5951880" y="3115440"/>
-            <a:ext cx="974160" cy="480240"/>
+            <a:ext cx="973800" cy="479880"/>
           </a:xfrm>
           <a:prstGeom prst="rightArrow">
             <a:avLst>
@@ -18178,7 +18199,7 @@
         <p:spPr>
           <a:xfrm>
             <a:off x="684360" y="4487400"/>
-            <a:ext cx="8530200" cy="1502640"/>
+            <a:ext cx="8529840" cy="1502280"/>
           </a:xfrm>
           <a:prstGeom prst="rect">
             <a:avLst/>
@@ -18227,7 +18248,7 @@
         <p:spPr>
           <a:xfrm>
             <a:off x="684360" y="685800"/>
-            <a:ext cx="8530200" cy="3610800"/>
+            <a:ext cx="8529840" cy="3610440"/>
           </a:xfrm>
           <a:prstGeom prst="rect">
             <a:avLst/>
@@ -18246,7 +18267,7 @@
         <p:txBody>
           <a:bodyPr lIns="90000" rIns="90000" tIns="45000" bIns="45000" anchor="ctr"/>
           <a:p>
-            <a:pPr marL="285840" indent="-281520">
+            <a:pPr marL="285840" indent="-281160">
               <a:lnSpc>
                 <a:spcPct val="100000"/>
               </a:lnSpc>
@@ -18338,7 +18359,7 @@
             </a:endParaRPr>
           </a:p>
           <a:p>
-            <a:pPr marL="285840" indent="-281520">
+            <a:pPr marL="285840" indent="-281160">
               <a:lnSpc>
                 <a:spcPct val="100000"/>
               </a:lnSpc>
@@ -18390,7 +18411,7 @@
             </a:endParaRPr>
           </a:p>
           <a:p>
-            <a:pPr marL="285840" indent="-281520">
+            <a:pPr marL="285840" indent="-281160">
               <a:lnSpc>
                 <a:spcPct val="100000"/>
               </a:lnSpc>
@@ -18476,7 +18497,7 @@
         <p:spPr>
           <a:xfrm>
             <a:off x="6227640" y="3794400"/>
-            <a:ext cx="910080" cy="910080"/>
+            <a:ext cx="909720" cy="909720"/>
           </a:xfrm>
           <a:prstGeom prst="rect">
             <a:avLst/>
@@ -18499,7 +18520,7 @@
         <p:spPr>
           <a:xfrm>
             <a:off x="2468520" y="3843720"/>
-            <a:ext cx="910080" cy="910080"/>
+            <a:ext cx="909720" cy="909720"/>
           </a:xfrm>
           <a:prstGeom prst="rect">
             <a:avLst/>
@@ -18522,7 +18543,7 @@
         <p:spPr>
           <a:xfrm>
             <a:off x="9790920" y="3794400"/>
-            <a:ext cx="910080" cy="910080"/>
+            <a:ext cx="909720" cy="909720"/>
           </a:xfrm>
           <a:prstGeom prst="rect">
             <a:avLst/>
@@ -18545,7 +18566,7 @@
         <p:spPr>
           <a:xfrm>
             <a:off x="7903800" y="3794400"/>
-            <a:ext cx="910080" cy="910080"/>
+            <a:ext cx="909720" cy="909720"/>
           </a:xfrm>
           <a:prstGeom prst="rect">
             <a:avLst/>
@@ -18568,7 +18589,7 @@
         <p:spPr>
           <a:xfrm>
             <a:off x="4412520" y="3794400"/>
-            <a:ext cx="910080" cy="910080"/>
+            <a:ext cx="909720" cy="909720"/>
           </a:xfrm>
           <a:prstGeom prst="rect">
             <a:avLst/>
@@ -18591,7 +18612,7 @@
         <p:spPr>
           <a:xfrm>
             <a:off x="684360" y="3843720"/>
-            <a:ext cx="910080" cy="910080"/>
+            <a:ext cx="909720" cy="909720"/>
           </a:xfrm>
           <a:prstGeom prst="rect">
             <a:avLst/>
@@ -18610,7 +18631,7 @@
         <p:spPr>
           <a:xfrm>
             <a:off x="1638000" y="4183200"/>
-            <a:ext cx="678600" cy="257760"/>
+            <a:ext cx="678240" cy="257400"/>
           </a:xfrm>
           <a:prstGeom prst="rightArrow">
             <a:avLst>
@@ -18649,7 +18670,7 @@
         <p:spPr>
           <a:xfrm>
             <a:off x="3511800" y="4201920"/>
-            <a:ext cx="678600" cy="257760"/>
+            <a:ext cx="678240" cy="257400"/>
           </a:xfrm>
           <a:prstGeom prst="rightArrow">
             <a:avLst>
@@ -18688,7 +18709,7 @@
         <p:spPr>
           <a:xfrm>
             <a:off x="5366520" y="4193640"/>
-            <a:ext cx="678600" cy="257760"/>
+            <a:ext cx="678240" cy="257400"/>
           </a:xfrm>
           <a:prstGeom prst="rightArrow">
             <a:avLst>
@@ -18727,7 +18748,7 @@
         <p:spPr>
           <a:xfrm>
             <a:off x="7162200" y="4183200"/>
-            <a:ext cx="678600" cy="257760"/>
+            <a:ext cx="678240" cy="257400"/>
           </a:xfrm>
           <a:prstGeom prst="rightArrow">
             <a:avLst>
@@ -18766,7 +18787,7 @@
         <p:spPr>
           <a:xfrm>
             <a:off x="8876160" y="4169880"/>
-            <a:ext cx="678600" cy="257760"/>
+            <a:ext cx="678240" cy="257400"/>
           </a:xfrm>
           <a:prstGeom prst="rightArrow">
             <a:avLst>
@@ -18854,7 +18875,7 @@
         <p:spPr>
           <a:xfrm>
             <a:off x="684360" y="4487400"/>
-            <a:ext cx="8530200" cy="1502640"/>
+            <a:ext cx="8529840" cy="1502280"/>
           </a:xfrm>
           <a:prstGeom prst="rect">
             <a:avLst/>
@@ -18903,7 +18924,7 @@
         <p:spPr>
           <a:xfrm>
             <a:off x="684360" y="685800"/>
-            <a:ext cx="8530200" cy="3610800"/>
+            <a:ext cx="8529840" cy="3610440"/>
           </a:xfrm>
           <a:prstGeom prst="rect">
             <a:avLst/>
@@ -18922,7 +18943,7 @@
         <p:txBody>
           <a:bodyPr lIns="90000" rIns="90000" tIns="45000" bIns="45000" anchor="ctr"/>
           <a:p>
-            <a:pPr marL="285840" indent="-281520">
+            <a:pPr marL="285840" indent="-281160">
               <a:lnSpc>
                 <a:spcPct val="100000"/>
               </a:lnSpc>
@@ -19004,7 +19025,7 @@
             </a:endParaRPr>
           </a:p>
           <a:p>
-            <a:pPr marL="285840" indent="-281520">
+            <a:pPr marL="285840" indent="-281160">
               <a:lnSpc>
                 <a:spcPct val="100000"/>
               </a:lnSpc>
@@ -19050,7 +19071,7 @@
         <p:spPr>
           <a:xfrm>
             <a:off x="4681800" y="2481480"/>
-            <a:ext cx="910080" cy="910080"/>
+            <a:ext cx="909720" cy="909720"/>
           </a:xfrm>
           <a:prstGeom prst="rect">
             <a:avLst/>
@@ -19073,7 +19094,7 @@
         <p:spPr>
           <a:xfrm>
             <a:off x="6609240" y="3669480"/>
-            <a:ext cx="910080" cy="910080"/>
+            <a:ext cx="909720" cy="909720"/>
           </a:xfrm>
           <a:prstGeom prst="rect">
             <a:avLst/>
@@ -19096,7 +19117,7 @@
         <p:spPr>
           <a:xfrm>
             <a:off x="2973240" y="3669480"/>
-            <a:ext cx="910080" cy="910080"/>
+            <a:ext cx="909720" cy="909720"/>
           </a:xfrm>
           <a:prstGeom prst="rect">
             <a:avLst/>
@@ -19115,7 +19136,7 @@
         <p:spPr>
           <a:xfrm>
             <a:off x="4214160" y="3946320"/>
-            <a:ext cx="2064240" cy="356400"/>
+            <a:ext cx="2063880" cy="356040"/>
           </a:xfrm>
           <a:prstGeom prst="rightArrow">
             <a:avLst>
@@ -19154,7 +19175,7 @@
         <p:spPr>
           <a:xfrm>
             <a:off x="4988160" y="3533400"/>
-            <a:ext cx="297360" cy="402840"/>
+            <a:ext cx="297000" cy="402480"/>
           </a:xfrm>
           <a:prstGeom prst="downArrow">
             <a:avLst>

</xml_diff>

<commit_message>
#12 Weak AI vs Strong AI explanation speech part 8 added on introduction slides
</commit_message>
<xml_diff>
--- a/SAI_presentation_libre_office.pptx
+++ b/SAI_presentation_libre_office.pptx
@@ -150,7 +150,7 @@
               <a:rPr b="0" lang="fr-FR" sz="1400" spc="-1" strike="noStrike">
                 <a:latin typeface="Times New Roman"/>
               </a:rPr>
-              <a:t>&lt;en-tête&gt;</a:t>
+              <a:t> </a:t>
             </a:r>
             <a:endParaRPr b="0" lang="fr-FR" sz="1400" spc="-1" strike="noStrike">
               <a:latin typeface="Times New Roman"/>
@@ -185,7 +185,7 @@
               <a:rPr b="0" lang="fr-FR" sz="1400" spc="-1" strike="noStrike">
                 <a:latin typeface="Times New Roman"/>
               </a:rPr>
-              <a:t>&lt;date/heure&gt;</a:t>
+              <a:t> </a:t>
             </a:r>
             <a:endParaRPr b="0" lang="fr-FR" sz="1400" spc="-1" strike="noStrike">
               <a:latin typeface="Times New Roman"/>
@@ -219,7 +219,7 @@
               <a:rPr b="0" lang="fr-FR" sz="1400" spc="-1" strike="noStrike">
                 <a:latin typeface="Times New Roman"/>
               </a:rPr>
-              <a:t>&lt;pied de page&gt;</a:t>
+              <a:t> </a:t>
             </a:r>
             <a:endParaRPr b="0" lang="fr-FR" sz="1400" spc="-1" strike="noStrike">
               <a:latin typeface="Times New Roman"/>
@@ -250,11 +250,11 @@
           <a:bodyPr lIns="0" rIns="0" tIns="0" bIns="0" anchor="b"/>
           <a:p>
             <a:pPr algn="r"/>
-            <a:fld id="{4A7EE15F-DE40-4B05-9B2B-31F9E102C42B}" type="slidenum">
+            <a:fld id="{FB28A020-7575-46CD-B827-FEACEC1EDAF0}" type="slidenum">
               <a:rPr b="0" lang="fr-FR" sz="1400" spc="-1" strike="noStrike">
                 <a:latin typeface="Times New Roman"/>
               </a:rPr>
-              <a:t>&lt;numéro&gt;</a:t>
+              <a:t>1</a:t>
             </a:fld>
             <a:endParaRPr b="0" lang="fr-FR" sz="1400" spc="-1" strike="noStrike">
               <a:latin typeface="Times New Roman"/>
@@ -298,7 +298,7 @@
         <p:spPr>
           <a:xfrm>
             <a:off x="685800" y="1143000"/>
-            <a:ext cx="5481720" cy="3081600"/>
+            <a:ext cx="5481360" cy="3081240"/>
           </a:xfrm>
           <a:prstGeom prst="rect">
             <a:avLst/>
@@ -318,7 +318,7 @@
         <p:spPr>
           <a:xfrm>
             <a:off x="685800" y="4400640"/>
-            <a:ext cx="5481720" cy="3595680"/>
+            <a:ext cx="5481360" cy="3595320"/>
           </a:xfrm>
           <a:prstGeom prst="rect">
             <a:avLst/>
@@ -327,7 +327,7 @@
         <p:txBody>
           <a:bodyPr lIns="0" rIns="0" tIns="0" bIns="0"/>
           <a:p>
-            <a:pPr marL="216000" indent="-211680">
+            <a:pPr marL="216000" indent="-211320">
               <a:lnSpc>
                 <a:spcPct val="100000"/>
               </a:lnSpc>
@@ -343,7 +343,7 @@
             </a:endParaRPr>
           </a:p>
           <a:p>
-            <a:pPr marL="216000" indent="-211680">
+            <a:pPr marL="216000" indent="-211320">
               <a:lnSpc>
                 <a:spcPct val="100000"/>
               </a:lnSpc>
@@ -360,7 +360,7 @@
             </a:endParaRPr>
           </a:p>
           <a:p>
-            <a:pPr marL="216000" indent="-211680">
+            <a:pPr marL="216000" indent="-211320">
               <a:lnSpc>
                 <a:spcPct val="100000"/>
               </a:lnSpc>
@@ -376,7 +376,7 @@
             </a:endParaRPr>
           </a:p>
           <a:p>
-            <a:pPr marL="216000" indent="-211680">
+            <a:pPr marL="216000" indent="-211320">
               <a:lnSpc>
                 <a:spcPct val="100000"/>
               </a:lnSpc>
@@ -392,7 +392,7 @@
             </a:endParaRPr>
           </a:p>
           <a:p>
-            <a:pPr marL="216000" indent="-211680">
+            <a:pPr marL="216000" indent="-211320">
               <a:lnSpc>
                 <a:spcPct val="100000"/>
               </a:lnSpc>
@@ -419,7 +419,7 @@
         <p:spPr>
           <a:xfrm>
             <a:off x="3884760" y="8685360"/>
-            <a:ext cx="2967120" cy="453960"/>
+            <a:ext cx="2966760" cy="453600"/>
           </a:xfrm>
           <a:prstGeom prst="rect">
             <a:avLst/>
@@ -443,14 +443,14 @@
                 <a:spcPct val="100000"/>
               </a:lnSpc>
             </a:pPr>
-            <a:fld id="{8678F44A-ED27-4E50-B897-07A486259560}" type="slidenum">
+            <a:fld id="{D2EB33B4-3C90-4C3E-BC0E-AFF02F4E2B5D}" type="slidenum">
               <a:rPr b="0" lang="fr-FR" sz="1200" spc="-1" strike="noStrike">
                 <a:solidFill>
                   <a:srgbClr val="000000"/>
                 </a:solidFill>
                 <a:latin typeface="Times New Roman"/>
               </a:rPr>
-              <a:t>&lt;numéro&gt;</a:t>
+              <a:t>1</a:t>
             </a:fld>
             <a:endParaRPr b="0" lang="fr-FR" sz="1200" spc="-1" strike="noStrike">
               <a:latin typeface="Arial"/>
@@ -493,7 +493,7 @@
         <p:spPr>
           <a:xfrm>
             <a:off x="685800" y="1143000"/>
-            <a:ext cx="5481720" cy="3081600"/>
+            <a:ext cx="5481360" cy="3081240"/>
           </a:xfrm>
           <a:prstGeom prst="rect">
             <a:avLst/>
@@ -513,7 +513,7 @@
         <p:spPr>
           <a:xfrm>
             <a:off x="685800" y="4400640"/>
-            <a:ext cx="5481720" cy="3595680"/>
+            <a:ext cx="5481360" cy="3595320"/>
           </a:xfrm>
           <a:prstGeom prst="rect">
             <a:avLst/>
@@ -522,7 +522,7 @@
         <p:txBody>
           <a:bodyPr lIns="0" rIns="0" tIns="0" bIns="0"/>
           <a:p>
-            <a:pPr marL="216000" indent="-212040">
+            <a:pPr marL="216000" indent="-211680">
               <a:lnSpc>
                 <a:spcPct val="100000"/>
               </a:lnSpc>
@@ -538,7 +538,7 @@
             </a:endParaRPr>
           </a:p>
           <a:p>
-            <a:pPr marL="216000" indent="-212040">
+            <a:pPr marL="216000" indent="-211680">
               <a:lnSpc>
                 <a:spcPct val="100000"/>
               </a:lnSpc>
@@ -548,7 +548,7 @@
             </a:endParaRPr>
           </a:p>
           <a:p>
-            <a:pPr marL="216000" indent="-212040">
+            <a:pPr marL="216000" indent="-211680">
               <a:lnSpc>
                 <a:spcPct val="100000"/>
               </a:lnSpc>
@@ -564,7 +564,7 @@
             </a:endParaRPr>
           </a:p>
           <a:p>
-            <a:pPr marL="216000" indent="-212040">
+            <a:pPr marL="216000" indent="-211680">
               <a:lnSpc>
                 <a:spcPct val="100000"/>
               </a:lnSpc>
@@ -574,7 +574,7 @@
             </a:endParaRPr>
           </a:p>
           <a:p>
-            <a:pPr marL="216000" indent="-212040">
+            <a:pPr marL="216000" indent="-211680">
               <a:lnSpc>
                 <a:spcPct val="100000"/>
               </a:lnSpc>
@@ -590,7 +590,7 @@
             </a:endParaRPr>
           </a:p>
           <a:p>
-            <a:pPr marL="216000" indent="-212040">
+            <a:pPr marL="216000" indent="-211680">
               <a:lnSpc>
                 <a:spcPct val="100000"/>
               </a:lnSpc>
@@ -600,7 +600,7 @@
             </a:endParaRPr>
           </a:p>
           <a:p>
-            <a:pPr marL="216000" indent="-212040">
+            <a:pPr marL="216000" indent="-211680">
               <a:lnSpc>
                 <a:spcPct val="100000"/>
               </a:lnSpc>
@@ -616,7 +616,7 @@
             </a:endParaRPr>
           </a:p>
           <a:p>
-            <a:pPr marL="216000" indent="-212040">
+            <a:pPr marL="216000" indent="-211680">
               <a:lnSpc>
                 <a:spcPct val="100000"/>
               </a:lnSpc>
@@ -626,7 +626,7 @@
             </a:endParaRPr>
           </a:p>
           <a:p>
-            <a:pPr marL="216000" indent="-212040">
+            <a:pPr marL="216000" indent="-211680">
               <a:lnSpc>
                 <a:spcPct val="100000"/>
               </a:lnSpc>
@@ -636,7 +636,7 @@
             </a:endParaRPr>
           </a:p>
           <a:p>
-            <a:pPr marL="216000" indent="-212040">
+            <a:pPr marL="216000" indent="-211680">
               <a:lnSpc>
                 <a:spcPct val="100000"/>
               </a:lnSpc>
@@ -652,7 +652,7 @@
             </a:endParaRPr>
           </a:p>
           <a:p>
-            <a:pPr marL="216000" indent="-212040">
+            <a:pPr marL="216000" indent="-211680">
               <a:lnSpc>
                 <a:spcPct val="100000"/>
               </a:lnSpc>
@@ -668,7 +668,7 @@
             </a:endParaRPr>
           </a:p>
           <a:p>
-            <a:pPr marL="216000" indent="-212040">
+            <a:pPr marL="216000" indent="-211680">
               <a:lnSpc>
                 <a:spcPct val="100000"/>
               </a:lnSpc>
@@ -684,7 +684,7 @@
             </a:endParaRPr>
           </a:p>
           <a:p>
-            <a:pPr marL="216000" indent="-212040">
+            <a:pPr marL="216000" indent="-211680">
               <a:lnSpc>
                 <a:spcPct val="100000"/>
               </a:lnSpc>
@@ -694,7 +694,7 @@
             </a:endParaRPr>
           </a:p>
           <a:p>
-            <a:pPr marL="216000" indent="-212040">
+            <a:pPr marL="216000" indent="-211680">
               <a:lnSpc>
                 <a:spcPct val="100000"/>
               </a:lnSpc>
@@ -710,7 +710,7 @@
             </a:endParaRPr>
           </a:p>
           <a:p>
-            <a:pPr marL="216000" indent="-212040">
+            <a:pPr marL="216000" indent="-211680">
               <a:lnSpc>
                 <a:spcPct val="100000"/>
               </a:lnSpc>
@@ -720,7 +720,7 @@
             </a:endParaRPr>
           </a:p>
           <a:p>
-            <a:pPr marL="216000" indent="-212040">
+            <a:pPr marL="216000" indent="-211680">
               <a:lnSpc>
                 <a:spcPct val="100000"/>
               </a:lnSpc>
@@ -736,7 +736,7 @@
             </a:endParaRPr>
           </a:p>
           <a:p>
-            <a:pPr marL="216000" indent="-212040">
+            <a:pPr marL="216000" indent="-211680">
               <a:lnSpc>
                 <a:spcPct val="100000"/>
               </a:lnSpc>
@@ -752,7 +752,7 @@
             </a:endParaRPr>
           </a:p>
           <a:p>
-            <a:pPr marL="216000" indent="-212040">
+            <a:pPr marL="216000" indent="-211680">
               <a:lnSpc>
                 <a:spcPct val="100000"/>
               </a:lnSpc>
@@ -768,7 +768,7 @@
             </a:endParaRPr>
           </a:p>
           <a:p>
-            <a:pPr marL="216000" indent="-212040">
+            <a:pPr marL="216000" indent="-211680">
               <a:lnSpc>
                 <a:spcPct val="100000"/>
               </a:lnSpc>
@@ -784,7 +784,7 @@
             </a:endParaRPr>
           </a:p>
           <a:p>
-            <a:pPr marL="216000" indent="-212040">
+            <a:pPr marL="216000" indent="-211680">
               <a:lnSpc>
                 <a:spcPct val="100000"/>
               </a:lnSpc>
@@ -794,7 +794,7 @@
             </a:endParaRPr>
           </a:p>
           <a:p>
-            <a:pPr marL="216000" indent="-212040">
+            <a:pPr marL="216000" indent="-211680">
               <a:lnSpc>
                 <a:spcPct val="100000"/>
               </a:lnSpc>
@@ -810,7 +810,7 @@
             </a:endParaRPr>
           </a:p>
           <a:p>
-            <a:pPr marL="216000" indent="-212040">
+            <a:pPr marL="216000" indent="-211680">
               <a:lnSpc>
                 <a:spcPct val="100000"/>
               </a:lnSpc>
@@ -826,7 +826,7 @@
             </a:endParaRPr>
           </a:p>
           <a:p>
-            <a:pPr marL="216000" indent="-212040">
+            <a:pPr marL="216000" indent="-211680">
               <a:lnSpc>
                 <a:spcPct val="100000"/>
               </a:lnSpc>
@@ -842,7 +842,7 @@
             </a:endParaRPr>
           </a:p>
           <a:p>
-            <a:pPr marL="216000" indent="-212040">
+            <a:pPr marL="216000" indent="-211680">
               <a:lnSpc>
                 <a:spcPct val="100000"/>
               </a:lnSpc>
@@ -858,7 +858,7 @@
             </a:endParaRPr>
           </a:p>
           <a:p>
-            <a:pPr marL="216000" indent="-212040">
+            <a:pPr marL="216000" indent="-211680">
               <a:lnSpc>
                 <a:spcPct val="100000"/>
               </a:lnSpc>
@@ -874,7 +874,7 @@
             </a:endParaRPr>
           </a:p>
           <a:p>
-            <a:pPr marL="216000" indent="-212040">
+            <a:pPr marL="216000" indent="-211680">
               <a:lnSpc>
                 <a:spcPct val="100000"/>
               </a:lnSpc>
@@ -884,7 +884,7 @@
             </a:endParaRPr>
           </a:p>
           <a:p>
-            <a:pPr marL="216000" indent="-212040">
+            <a:pPr marL="216000" indent="-211680">
               <a:lnSpc>
                 <a:spcPct val="100000"/>
               </a:lnSpc>
@@ -900,7 +900,7 @@
             </a:endParaRPr>
           </a:p>
           <a:p>
-            <a:pPr marL="216000" indent="-212040">
+            <a:pPr marL="216000" indent="-211680">
               <a:lnSpc>
                 <a:spcPct val="100000"/>
               </a:lnSpc>
@@ -916,7 +916,7 @@
             </a:endParaRPr>
           </a:p>
           <a:p>
-            <a:pPr marL="216000" indent="-212040">
+            <a:pPr marL="216000" indent="-211680">
               <a:lnSpc>
                 <a:spcPct val="100000"/>
               </a:lnSpc>
@@ -932,7 +932,7 @@
             </a:endParaRPr>
           </a:p>
           <a:p>
-            <a:pPr marL="216000" indent="-212040">
+            <a:pPr marL="216000" indent="-211680">
               <a:lnSpc>
                 <a:spcPct val="100000"/>
               </a:lnSpc>
@@ -942,7 +942,7 @@
             </a:endParaRPr>
           </a:p>
           <a:p>
-            <a:pPr marL="216000" indent="-212040">
+            <a:pPr marL="216000" indent="-211680">
               <a:lnSpc>
                 <a:spcPct val="100000"/>
               </a:lnSpc>
@@ -958,7 +958,7 @@
             </a:endParaRPr>
           </a:p>
           <a:p>
-            <a:pPr marL="216000" indent="-212040">
+            <a:pPr marL="216000" indent="-211680">
               <a:lnSpc>
                 <a:spcPct val="100000"/>
               </a:lnSpc>
@@ -974,7 +974,7 @@
             </a:endParaRPr>
           </a:p>
           <a:p>
-            <a:pPr marL="216000" indent="-212040">
+            <a:pPr marL="216000" indent="-211680">
               <a:lnSpc>
                 <a:spcPct val="100000"/>
               </a:lnSpc>
@@ -990,7 +990,7 @@
             </a:endParaRPr>
           </a:p>
           <a:p>
-            <a:pPr marL="216000" indent="-212040">
+            <a:pPr marL="216000" indent="-211680">
               <a:lnSpc>
                 <a:spcPct val="100000"/>
               </a:lnSpc>
@@ -1000,7 +1000,7 @@
             </a:endParaRPr>
           </a:p>
           <a:p>
-            <a:pPr marL="216000" indent="-212040">
+            <a:pPr marL="216000" indent="-211680">
               <a:lnSpc>
                 <a:spcPct val="100000"/>
               </a:lnSpc>
@@ -1016,7 +1016,7 @@
             </a:endParaRPr>
           </a:p>
           <a:p>
-            <a:pPr marL="216000" indent="-212040">
+            <a:pPr marL="216000" indent="-211680">
               <a:lnSpc>
                 <a:spcPct val="100000"/>
               </a:lnSpc>
@@ -1032,7 +1032,7 @@
             </a:endParaRPr>
           </a:p>
           <a:p>
-            <a:pPr marL="216000" indent="-212040">
+            <a:pPr marL="216000" indent="-211680">
               <a:lnSpc>
                 <a:spcPct val="100000"/>
               </a:lnSpc>
@@ -1048,7 +1048,7 @@
             </a:endParaRPr>
           </a:p>
           <a:p>
-            <a:pPr marL="216000" indent="-212040">
+            <a:pPr marL="216000" indent="-211680">
               <a:lnSpc>
                 <a:spcPct val="100000"/>
               </a:lnSpc>
@@ -1064,7 +1064,7 @@
             </a:endParaRPr>
           </a:p>
           <a:p>
-            <a:pPr marL="216000" indent="-212040">
+            <a:pPr marL="216000" indent="-211680">
               <a:lnSpc>
                 <a:spcPct val="100000"/>
               </a:lnSpc>
@@ -1074,7 +1074,7 @@
             </a:endParaRPr>
           </a:p>
           <a:p>
-            <a:pPr marL="216000" indent="-212040">
+            <a:pPr marL="216000" indent="-211680">
               <a:lnSpc>
                 <a:spcPct val="100000"/>
               </a:lnSpc>
@@ -1090,7 +1090,7 @@
             </a:endParaRPr>
           </a:p>
           <a:p>
-            <a:pPr marL="216000" indent="-212040">
+            <a:pPr marL="216000" indent="-211680">
               <a:lnSpc>
                 <a:spcPct val="100000"/>
               </a:lnSpc>
@@ -1107,7 +1107,7 @@
             </a:endParaRPr>
           </a:p>
           <a:p>
-            <a:pPr marL="216000" indent="-212040">
+            <a:pPr marL="216000" indent="-211680">
               <a:lnSpc>
                 <a:spcPct val="100000"/>
               </a:lnSpc>
@@ -1124,7 +1124,7 @@
             </a:endParaRPr>
           </a:p>
           <a:p>
-            <a:pPr marL="216000" indent="-212040">
+            <a:pPr marL="216000" indent="-211680">
               <a:lnSpc>
                 <a:spcPct val="100000"/>
               </a:lnSpc>
@@ -1141,7 +1141,7 @@
             </a:endParaRPr>
           </a:p>
           <a:p>
-            <a:pPr marL="216000" indent="-212040">
+            <a:pPr marL="216000" indent="-211680">
               <a:lnSpc>
                 <a:spcPct val="100000"/>
               </a:lnSpc>
@@ -1151,7 +1151,7 @@
             </a:endParaRPr>
           </a:p>
           <a:p>
-            <a:pPr marL="216000" indent="-212040">
+            <a:pPr marL="216000" indent="-211680">
               <a:lnSpc>
                 <a:spcPct val="100000"/>
               </a:lnSpc>
@@ -1168,7 +1168,7 @@
             </a:endParaRPr>
           </a:p>
           <a:p>
-            <a:pPr marL="216000" indent="-212040">
+            <a:pPr marL="216000" indent="-211680">
               <a:lnSpc>
                 <a:spcPct val="100000"/>
               </a:lnSpc>
@@ -1185,7 +1185,7 @@
             </a:endParaRPr>
           </a:p>
           <a:p>
-            <a:pPr marL="216000" indent="-212040">
+            <a:pPr marL="216000" indent="-211680">
               <a:lnSpc>
                 <a:spcPct val="100000"/>
               </a:lnSpc>
@@ -1195,7 +1195,7 @@
             </a:endParaRPr>
           </a:p>
           <a:p>
-            <a:pPr marL="216000" indent="-212040">
+            <a:pPr marL="216000" indent="-211680">
               <a:lnSpc>
                 <a:spcPct val="100000"/>
               </a:lnSpc>
@@ -1205,7 +1205,7 @@
             </a:endParaRPr>
           </a:p>
           <a:p>
-            <a:pPr marL="216000" indent="-212040">
+            <a:pPr marL="216000" indent="-211680">
               <a:lnSpc>
                 <a:spcPct val="100000"/>
               </a:lnSpc>
@@ -1215,7 +1215,7 @@
             </a:endParaRPr>
           </a:p>
           <a:p>
-            <a:pPr marL="216000" indent="-212040">
+            <a:pPr marL="216000" indent="-211680">
               <a:lnSpc>
                 <a:spcPct val="100000"/>
               </a:lnSpc>
@@ -1225,7 +1225,7 @@
             </a:endParaRPr>
           </a:p>
           <a:p>
-            <a:pPr marL="216000" indent="-212040">
+            <a:pPr marL="216000" indent="-211680">
               <a:lnSpc>
                 <a:spcPct val="100000"/>
               </a:lnSpc>
@@ -1245,7 +1245,7 @@
         <p:spPr>
           <a:xfrm>
             <a:off x="3884760" y="8685360"/>
-            <a:ext cx="2967120" cy="453960"/>
+            <a:ext cx="2966760" cy="453600"/>
           </a:xfrm>
           <a:prstGeom prst="rect">
             <a:avLst/>
@@ -1269,7 +1269,7 @@
                 <a:spcPct val="100000"/>
               </a:lnSpc>
             </a:pPr>
-            <a:fld id="{022B4C5A-A124-4051-81BA-B425833854F0}" type="slidenum">
+            <a:fld id="{FBEEBA58-6552-48AC-8435-B50C34F15BD4}" type="slidenum">
               <a:rPr b="0" lang="fr-FR" sz="1200" spc="-1" strike="noStrike">
                 <a:solidFill>
                   <a:srgbClr val="000000"/>
@@ -1319,7 +1319,7 @@
         <p:spPr>
           <a:xfrm>
             <a:off x="685800" y="1143000"/>
-            <a:ext cx="5481720" cy="3081600"/>
+            <a:ext cx="5481360" cy="3081240"/>
           </a:xfrm>
           <a:prstGeom prst="rect">
             <a:avLst/>
@@ -1339,7 +1339,7 @@
         <p:spPr>
           <a:xfrm>
             <a:off x="685800" y="4400640"/>
-            <a:ext cx="5481720" cy="3595680"/>
+            <a:ext cx="5481360" cy="3595320"/>
           </a:xfrm>
           <a:prstGeom prst="rect">
             <a:avLst/>
@@ -1348,7 +1348,7 @@
         <p:txBody>
           <a:bodyPr lIns="0" rIns="0" tIns="0" bIns="0"/>
           <a:p>
-            <a:pPr marL="216000" indent="-213840">
+            <a:pPr marL="216000" indent="-213480">
               <a:lnSpc>
                 <a:spcPct val="100000"/>
               </a:lnSpc>
@@ -1364,7 +1364,7 @@
             </a:endParaRPr>
           </a:p>
           <a:p>
-            <a:pPr marL="216000" indent="-213840">
+            <a:pPr marL="216000" indent="-213480">
               <a:lnSpc>
                 <a:spcPct val="100000"/>
               </a:lnSpc>
@@ -1380,7 +1380,7 @@
             </a:endParaRPr>
           </a:p>
           <a:p>
-            <a:pPr marL="216000" indent="-213840">
+            <a:pPr marL="216000" indent="-213480">
               <a:lnSpc>
                 <a:spcPct val="100000"/>
               </a:lnSpc>
@@ -1396,7 +1396,7 @@
             </a:endParaRPr>
           </a:p>
           <a:p>
-            <a:pPr marL="216000" indent="-213840">
+            <a:pPr marL="216000" indent="-213480">
               <a:lnSpc>
                 <a:spcPct val="100000"/>
               </a:lnSpc>
@@ -1406,7 +1406,7 @@
             </a:endParaRPr>
           </a:p>
           <a:p>
-            <a:pPr marL="216000" indent="-213840">
+            <a:pPr marL="216000" indent="-213480">
               <a:lnSpc>
                 <a:spcPct val="100000"/>
               </a:lnSpc>
@@ -1422,7 +1422,7 @@
             </a:endParaRPr>
           </a:p>
           <a:p>
-            <a:pPr marL="216000" indent="-213840">
+            <a:pPr marL="216000" indent="-213480">
               <a:lnSpc>
                 <a:spcPct val="100000"/>
               </a:lnSpc>
@@ -1438,7 +1438,7 @@
             </a:endParaRPr>
           </a:p>
           <a:p>
-            <a:pPr marL="216000" indent="-213840">
+            <a:pPr marL="216000" indent="-213480">
               <a:lnSpc>
                 <a:spcPct val="100000"/>
               </a:lnSpc>
@@ -1448,7 +1448,7 @@
             </a:endParaRPr>
           </a:p>
           <a:p>
-            <a:pPr marL="216000" indent="-213840">
+            <a:pPr marL="216000" indent="-213480">
               <a:lnSpc>
                 <a:spcPct val="100000"/>
               </a:lnSpc>
@@ -1464,7 +1464,7 @@
             </a:endParaRPr>
           </a:p>
           <a:p>
-            <a:pPr marL="216000" indent="-213840">
+            <a:pPr marL="216000" indent="-213480">
               <a:lnSpc>
                 <a:spcPct val="100000"/>
               </a:lnSpc>
@@ -1474,7 +1474,7 @@
             </a:endParaRPr>
           </a:p>
           <a:p>
-            <a:pPr marL="216000" indent="-213840">
+            <a:pPr marL="216000" indent="-213480">
               <a:lnSpc>
                 <a:spcPct val="100000"/>
               </a:lnSpc>
@@ -1490,7 +1490,7 @@
             </a:endParaRPr>
           </a:p>
           <a:p>
-            <a:pPr marL="216000" indent="-213840">
+            <a:pPr marL="216000" indent="-213480">
               <a:lnSpc>
                 <a:spcPct val="100000"/>
               </a:lnSpc>
@@ -1506,7 +1506,7 @@
             </a:endParaRPr>
           </a:p>
           <a:p>
-            <a:pPr marL="216000" indent="-213840">
+            <a:pPr marL="216000" indent="-213480">
               <a:lnSpc>
                 <a:spcPct val="100000"/>
               </a:lnSpc>
@@ -1523,7 +1523,7 @@
             </a:endParaRPr>
           </a:p>
           <a:p>
-            <a:pPr marL="216000" indent="-213840">
+            <a:pPr marL="216000" indent="-213480">
               <a:lnSpc>
                 <a:spcPct val="100000"/>
               </a:lnSpc>
@@ -1533,7 +1533,7 @@
             </a:endParaRPr>
           </a:p>
           <a:p>
-            <a:pPr marL="216000" indent="-213840">
+            <a:pPr marL="216000" indent="-213480">
               <a:lnSpc>
                 <a:spcPct val="100000"/>
               </a:lnSpc>
@@ -1550,17 +1550,24 @@
             </a:endParaRPr>
           </a:p>
           <a:p>
-            <a:pPr marL="216000" indent="-213840">
-              <a:lnSpc>
-                <a:spcPct val="100000"/>
-              </a:lnSpc>
-            </a:pPr>
+            <a:pPr marL="216000" indent="-213480">
+              <a:lnSpc>
+                <a:spcPct val="100000"/>
+              </a:lnSpc>
+            </a:pPr>
+            <a:r>
+              <a:rPr b="0" lang="fr-FR" sz="1800" spc="-1" strike="noStrike">
+                <a:latin typeface="Arial"/>
+                <a:ea typeface="Noto Sans CJK SC"/>
+              </a:rPr>
+              <a:t>It means that you have in one hand, the AI that process generally only once, and the other hand an SAI that process everytime</a:t>
+            </a:r>
             <a:endParaRPr b="0" lang="fr-FR" sz="1800" spc="-1" strike="noStrike">
               <a:latin typeface="Arial"/>
             </a:endParaRPr>
           </a:p>
           <a:p>
-            <a:pPr marL="216000" indent="-213840">
+            <a:pPr marL="216000" indent="-213480">
               <a:lnSpc>
                 <a:spcPct val="100000"/>
               </a:lnSpc>
@@ -1570,7 +1577,27 @@
             </a:endParaRPr>
           </a:p>
           <a:p>
-            <a:pPr marL="216000" indent="-213840">
+            <a:pPr marL="216000" indent="-213480">
+              <a:lnSpc>
+                <a:spcPct val="100000"/>
+              </a:lnSpc>
+            </a:pPr>
+            <a:endParaRPr b="0" lang="fr-FR" sz="1800" spc="-1" strike="noStrike">
+              <a:latin typeface="Arial"/>
+            </a:endParaRPr>
+          </a:p>
+          <a:p>
+            <a:pPr marL="216000" indent="-213480">
+              <a:lnSpc>
+                <a:spcPct val="100000"/>
+              </a:lnSpc>
+            </a:pPr>
+            <a:endParaRPr b="0" lang="fr-FR" sz="1800" spc="-1" strike="noStrike">
+              <a:latin typeface="Arial"/>
+            </a:endParaRPr>
+          </a:p>
+          <a:p>
+            <a:pPr marL="216000" indent="-213480">
               <a:lnSpc>
                 <a:spcPct val="100000"/>
               </a:lnSpc>
@@ -1590,7 +1617,7 @@
         <p:spPr>
           <a:xfrm>
             <a:off x="3884760" y="8685360"/>
-            <a:ext cx="2967120" cy="453960"/>
+            <a:ext cx="2966760" cy="453600"/>
           </a:xfrm>
           <a:prstGeom prst="rect">
             <a:avLst/>
@@ -1614,7 +1641,7 @@
                 <a:spcPct val="100000"/>
               </a:lnSpc>
             </a:pPr>
-            <a:fld id="{17C90230-D0A0-44D6-B1C9-582E3E1B7847}" type="slidenum">
+            <a:fld id="{FB206717-4220-4109-8AAB-CD37C91C3088}" type="slidenum">
               <a:rPr b="0" lang="fr-FR" sz="1200" spc="-1" strike="noStrike">
                 <a:solidFill>
                   <a:srgbClr val="000000"/>
@@ -1664,7 +1691,7 @@
         <p:spPr>
           <a:xfrm>
             <a:off x="380880" y="694800"/>
-            <a:ext cx="6092280" cy="3425400"/>
+            <a:ext cx="6091920" cy="3425040"/>
           </a:xfrm>
           <a:prstGeom prst="rect">
             <a:avLst/>
@@ -1684,7 +1711,7 @@
         <p:spPr>
           <a:xfrm>
             <a:off x="685800" y="4343400"/>
-            <a:ext cx="5482800" cy="4111200"/>
+            <a:ext cx="5482440" cy="4110840"/>
           </a:xfrm>
           <a:prstGeom prst="rect">
             <a:avLst/>
@@ -1693,7 +1720,7 @@
         <p:txBody>
           <a:bodyPr lIns="0" rIns="0" tIns="0" bIns="0"/>
           <a:p>
-            <a:pPr marL="216000" indent="-213120">
+            <a:pPr marL="216000" indent="-212760">
               <a:lnSpc>
                 <a:spcPct val="100000"/>
               </a:lnSpc>
@@ -1709,7 +1736,7 @@
             </a:endParaRPr>
           </a:p>
           <a:p>
-            <a:pPr marL="216000" indent="-213120">
+            <a:pPr marL="216000" indent="-212760">
               <a:lnSpc>
                 <a:spcPct val="100000"/>
               </a:lnSpc>
@@ -1725,7 +1752,7 @@
             </a:endParaRPr>
           </a:p>
           <a:p>
-            <a:pPr marL="216000" indent="-213120">
+            <a:pPr marL="216000" indent="-212760">
               <a:lnSpc>
                 <a:spcPct val="100000"/>
               </a:lnSpc>
@@ -1741,7 +1768,7 @@
             </a:endParaRPr>
           </a:p>
           <a:p>
-            <a:pPr marL="216000" indent="-213120">
+            <a:pPr marL="216000" indent="-212760">
               <a:lnSpc>
                 <a:spcPct val="100000"/>
               </a:lnSpc>
@@ -5489,7 +5516,7 @@
         <p:spPr>
           <a:xfrm>
             <a:off x="0" y="0"/>
-            <a:ext cx="12187440" cy="6853320"/>
+            <a:ext cx="12187080" cy="6852960"/>
           </a:xfrm>
           <a:prstGeom prst="rect">
             <a:avLst/>
@@ -5522,7 +5549,7 @@
         <p:spPr>
           <a:xfrm flipV="1">
             <a:off x="0" y="-5040"/>
-            <a:ext cx="12184200" cy="6853320"/>
+            <a:ext cx="12183840" cy="6852960"/>
           </a:xfrm>
           <a:prstGeom prst="snip1Rect">
             <a:avLst>
@@ -5577,7 +5604,7 @@
         <p:spPr>
           <a:xfrm>
             <a:off x="684360" y="685800"/>
-            <a:ext cx="9674280" cy="3668760"/>
+            <a:ext cx="9673920" cy="3668400"/>
           </a:xfrm>
           <a:prstGeom prst="rect">
             <a:avLst/>
@@ -5628,7 +5655,7 @@
         <p:spPr>
           <a:xfrm>
             <a:off x="684360" y="4648320"/>
-            <a:ext cx="7000920" cy="1138320"/>
+            <a:ext cx="7000560" cy="1137960"/>
           </a:xfrm>
           <a:prstGeom prst="rect">
             <a:avLst/>
@@ -5766,7 +5793,7 @@
         <p:spPr>
           <a:xfrm>
             <a:off x="684360" y="4487400"/>
-            <a:ext cx="8529840" cy="1502280"/>
+            <a:ext cx="8529480" cy="1501920"/>
           </a:xfrm>
           <a:prstGeom prst="rect">
             <a:avLst/>
@@ -5815,7 +5842,7 @@
         <p:spPr>
           <a:xfrm>
             <a:off x="684360" y="685800"/>
-            <a:ext cx="8529840" cy="3610440"/>
+            <a:ext cx="8529480" cy="3610080"/>
           </a:xfrm>
           <a:prstGeom prst="rect">
             <a:avLst/>
@@ -5834,7 +5861,7 @@
         <p:txBody>
           <a:bodyPr lIns="90000" rIns="90000" tIns="45000" bIns="45000" anchor="ctr"/>
           <a:p>
-            <a:pPr marL="285840" indent="-281160">
+            <a:pPr marL="285840" indent="-280800">
               <a:lnSpc>
                 <a:spcPct val="100000"/>
               </a:lnSpc>
@@ -5966,7 +5993,7 @@
             </a:endParaRPr>
           </a:p>
           <a:p>
-            <a:pPr marL="285840" indent="-281160">
+            <a:pPr marL="285840" indent="-280800">
               <a:lnSpc>
                 <a:spcPct val="100000"/>
               </a:lnSpc>
@@ -6012,7 +6039,7 @@
         <p:spPr>
           <a:xfrm>
             <a:off x="4733640" y="3979440"/>
-            <a:ext cx="909720" cy="909720"/>
+            <a:ext cx="909360" cy="909360"/>
           </a:xfrm>
           <a:prstGeom prst="rect">
             <a:avLst/>
@@ -6035,7 +6062,7 @@
         <p:spPr>
           <a:xfrm>
             <a:off x="6825960" y="4030200"/>
-            <a:ext cx="909720" cy="909720"/>
+            <a:ext cx="909360" cy="909360"/>
           </a:xfrm>
           <a:prstGeom prst="rect">
             <a:avLst/>
@@ -6058,7 +6085,7 @@
         <p:spPr>
           <a:xfrm>
             <a:off x="5354640" y="2725920"/>
-            <a:ext cx="909720" cy="909720"/>
+            <a:ext cx="909360" cy="909360"/>
           </a:xfrm>
           <a:prstGeom prst="rect">
             <a:avLst/>
@@ -6081,7 +6108,7 @@
         <p:spPr>
           <a:xfrm>
             <a:off x="8550000" y="3433320"/>
-            <a:ext cx="909720" cy="909720"/>
+            <a:ext cx="909360" cy="909360"/>
           </a:xfrm>
           <a:prstGeom prst="rect">
             <a:avLst/>
@@ -6104,7 +6131,7 @@
         <p:spPr>
           <a:xfrm>
             <a:off x="5153040" y="5079960"/>
-            <a:ext cx="909720" cy="909720"/>
+            <a:ext cx="909360" cy="909360"/>
           </a:xfrm>
           <a:prstGeom prst="rect">
             <a:avLst/>
@@ -6122,8 +6149,8 @@
         </p:nvSpPr>
         <p:spPr>
           <a:xfrm rot="3732600">
-            <a:off x="7994880" y="3762720"/>
-            <a:ext cx="199440" cy="665280"/>
+            <a:off x="7994880" y="3762360"/>
+            <a:ext cx="199080" cy="664920"/>
           </a:xfrm>
           <a:prstGeom prst="downArrow">
             <a:avLst>
@@ -6162,7 +6189,7 @@
         <p:spPr>
           <a:xfrm rot="14618400">
             <a:off x="6343560" y="4765320"/>
-            <a:ext cx="199440" cy="665280"/>
+            <a:ext cx="199080" cy="664920"/>
           </a:xfrm>
           <a:prstGeom prst="downArrow">
             <a:avLst>
@@ -6200,8 +6227,8 @@
         </p:nvSpPr>
         <p:spPr>
           <a:xfrm rot="5400000">
-            <a:off x="6193440" y="4132800"/>
-            <a:ext cx="199440" cy="665280"/>
+            <a:off x="6193800" y="4132800"/>
+            <a:ext cx="199080" cy="664920"/>
           </a:xfrm>
           <a:prstGeom prst="downArrow">
             <a:avLst>
@@ -6240,7 +6267,7 @@
         <p:spPr>
           <a:xfrm rot="7014000">
             <a:off x="6426360" y="3552120"/>
-            <a:ext cx="199440" cy="665280"/>
+            <a:ext cx="199080" cy="664920"/>
           </a:xfrm>
           <a:prstGeom prst="downArrow">
             <a:avLst>
@@ -6278,8 +6305,8 @@
         </p:nvSpPr>
         <p:spPr>
           <a:xfrm rot="1747800">
-            <a:off x="5087880" y="3301920"/>
-            <a:ext cx="199440" cy="665280"/>
+            <a:off x="5087880" y="3301560"/>
+            <a:ext cx="199080" cy="664920"/>
           </a:xfrm>
           <a:prstGeom prst="downArrow">
             <a:avLst>
@@ -6367,7 +6394,7 @@
         <p:spPr>
           <a:xfrm>
             <a:off x="6868080" y="306720"/>
-            <a:ext cx="5039280" cy="2081160"/>
+            <a:ext cx="5038920" cy="2080800"/>
           </a:xfrm>
           <a:prstGeom prst="rect">
             <a:avLst/>
@@ -6410,7 +6437,7 @@
         <p:spPr>
           <a:xfrm>
             <a:off x="6271200" y="2669400"/>
-            <a:ext cx="5628240" cy="3004200"/>
+            <a:ext cx="5627880" cy="3003840"/>
           </a:xfrm>
           <a:prstGeom prst="rect">
             <a:avLst/>
@@ -6455,7 +6482,7 @@
         <p:spPr>
           <a:xfrm>
             <a:off x="129960" y="5709960"/>
-            <a:ext cx="11178720" cy="1085400"/>
+            <a:ext cx="11178360" cy="1085040"/>
           </a:xfrm>
           <a:prstGeom prst="rect">
             <a:avLst/>
@@ -6500,7 +6527,7 @@
         <p:spPr>
           <a:xfrm>
             <a:off x="207000" y="1787400"/>
-            <a:ext cx="5590080" cy="3223440"/>
+            <a:ext cx="5589720" cy="3223080"/>
           </a:xfrm>
           <a:prstGeom prst="rect">
             <a:avLst/>
@@ -6545,7 +6572,7 @@
         <p:spPr>
           <a:xfrm>
             <a:off x="684360" y="4487400"/>
-            <a:ext cx="8529840" cy="1502280"/>
+            <a:ext cx="8529480" cy="1501920"/>
           </a:xfrm>
           <a:prstGeom prst="rect">
             <a:avLst/>
@@ -6594,7 +6621,7 @@
         <p:spPr>
           <a:xfrm>
             <a:off x="684360" y="685800"/>
-            <a:ext cx="8529840" cy="3610440"/>
+            <a:ext cx="8529480" cy="3610080"/>
           </a:xfrm>
           <a:prstGeom prst="rect">
             <a:avLst/>
@@ -6613,7 +6640,7 @@
         <p:txBody>
           <a:bodyPr lIns="90000" rIns="90000" tIns="45000" bIns="45000" anchor="ctr"/>
           <a:p>
-            <a:pPr marL="285840" indent="-281160">
+            <a:pPr marL="285840" indent="-280800">
               <a:lnSpc>
                 <a:spcPct val="100000"/>
               </a:lnSpc>
@@ -6665,7 +6692,7 @@
             </a:endParaRPr>
           </a:p>
           <a:p>
-            <a:pPr marL="285840" indent="-281160">
+            <a:pPr marL="285840" indent="-280800">
               <a:lnSpc>
                 <a:spcPct val="100000"/>
               </a:lnSpc>
@@ -6707,7 +6734,7 @@
             </a:endParaRPr>
           </a:p>
           <a:p>
-            <a:pPr marL="285840" indent="-281160">
+            <a:pPr marL="285840" indent="-280800">
               <a:lnSpc>
                 <a:spcPct val="100000"/>
               </a:lnSpc>
@@ -6759,7 +6786,7 @@
             </a:endParaRPr>
           </a:p>
           <a:p>
-            <a:pPr marL="285840" indent="-281160">
+            <a:pPr marL="285840" indent="-280800">
               <a:lnSpc>
                 <a:spcPct val="100000"/>
               </a:lnSpc>
@@ -6927,7 +6954,7 @@
         <p:spPr>
           <a:xfrm>
             <a:off x="4629600" y="1832040"/>
-            <a:ext cx="849960" cy="849960"/>
+            <a:ext cx="849600" cy="849600"/>
           </a:xfrm>
           <a:prstGeom prst="rect">
             <a:avLst/>
@@ -6950,7 +6977,7 @@
         <p:spPr>
           <a:xfrm>
             <a:off x="4463640" y="4185360"/>
-            <a:ext cx="1176480" cy="468720"/>
+            <a:ext cx="1176120" cy="468360"/>
           </a:xfrm>
           <a:prstGeom prst="rect">
             <a:avLst/>
@@ -6973,7 +7000,7 @@
         <p:spPr>
           <a:xfrm>
             <a:off x="4586040" y="2785680"/>
-            <a:ext cx="893520" cy="1035720"/>
+            <a:ext cx="893160" cy="1035360"/>
           </a:xfrm>
           <a:prstGeom prst="rect">
             <a:avLst/>
@@ -6996,7 +7023,7 @@
         <p:spPr>
           <a:xfrm>
             <a:off x="250560" y="1953720"/>
-            <a:ext cx="909720" cy="909720"/>
+            <a:ext cx="909360" cy="909360"/>
           </a:xfrm>
           <a:prstGeom prst="rect">
             <a:avLst/>
@@ -7019,7 +7046,7 @@
         <p:spPr>
           <a:xfrm>
             <a:off x="271440" y="3259800"/>
-            <a:ext cx="909720" cy="909720"/>
+            <a:ext cx="909360" cy="909360"/>
           </a:xfrm>
           <a:prstGeom prst="rect">
             <a:avLst/>
@@ -7042,7 +7069,7 @@
         <p:spPr>
           <a:xfrm>
             <a:off x="2440800" y="2741040"/>
-            <a:ext cx="909720" cy="909720"/>
+            <a:ext cx="909360" cy="909360"/>
           </a:xfrm>
           <a:prstGeom prst="rect">
             <a:avLst/>
@@ -7060,8 +7087,8 @@
         </p:nvSpPr>
         <p:spPr>
           <a:xfrm rot="1192200">
-            <a:off x="1577880" y="2559960"/>
-            <a:ext cx="973800" cy="479880"/>
+            <a:off x="1577880" y="2559600"/>
+            <a:ext cx="973440" cy="479520"/>
           </a:xfrm>
           <a:prstGeom prst="rightArrow">
             <a:avLst>
@@ -7102,8 +7129,8 @@
         </p:nvSpPr>
         <p:spPr>
           <a:xfrm rot="20407800">
-            <a:off x="1557360" y="3348000"/>
-            <a:ext cx="973800" cy="479880"/>
+            <a:off x="1557000" y="3347640"/>
+            <a:ext cx="973440" cy="479520"/>
           </a:xfrm>
           <a:prstGeom prst="rightArrow">
             <a:avLst>
@@ -7144,8 +7171,8 @@
         </p:nvSpPr>
         <p:spPr>
           <a:xfrm rot="1192200">
-            <a:off x="3331440" y="3668400"/>
-            <a:ext cx="973800" cy="479880"/>
+            <a:off x="3331440" y="3668040"/>
+            <a:ext cx="973440" cy="479520"/>
           </a:xfrm>
           <a:prstGeom prst="rightArrow">
             <a:avLst>
@@ -7186,8 +7213,8 @@
         </p:nvSpPr>
         <p:spPr>
           <a:xfrm rot="20407800">
-            <a:off x="3405600" y="2343600"/>
-            <a:ext cx="973800" cy="479880"/>
+            <a:off x="3405240" y="2343240"/>
+            <a:ext cx="973440" cy="479520"/>
           </a:xfrm>
           <a:prstGeom prst="rightArrow">
             <a:avLst>
@@ -7229,7 +7256,7 @@
         <p:spPr>
           <a:xfrm>
             <a:off x="3483720" y="3004200"/>
-            <a:ext cx="973800" cy="479880"/>
+            <a:ext cx="973440" cy="479520"/>
           </a:xfrm>
           <a:prstGeom prst="rightArrow">
             <a:avLst>
@@ -7275,7 +7302,7 @@
         <p:spPr>
           <a:xfrm>
             <a:off x="5819760" y="5709960"/>
-            <a:ext cx="909720" cy="909720"/>
+            <a:ext cx="909360" cy="909360"/>
           </a:xfrm>
           <a:prstGeom prst="rect">
             <a:avLst/>
@@ -7298,7 +7325,7 @@
         <p:spPr>
           <a:xfrm>
             <a:off x="2060640" y="5759640"/>
-            <a:ext cx="909720" cy="909720"/>
+            <a:ext cx="909360" cy="909360"/>
           </a:xfrm>
           <a:prstGeom prst="rect">
             <a:avLst/>
@@ -7321,7 +7348,7 @@
         <p:spPr>
           <a:xfrm>
             <a:off x="9383040" y="5709960"/>
-            <a:ext cx="909720" cy="909720"/>
+            <a:ext cx="909360" cy="909360"/>
           </a:xfrm>
           <a:prstGeom prst="rect">
             <a:avLst/>
@@ -7344,7 +7371,7 @@
         <p:spPr>
           <a:xfrm>
             <a:off x="7495920" y="5709960"/>
-            <a:ext cx="909720" cy="909720"/>
+            <a:ext cx="909360" cy="909360"/>
           </a:xfrm>
           <a:prstGeom prst="rect">
             <a:avLst/>
@@ -7367,7 +7394,7 @@
         <p:spPr>
           <a:xfrm>
             <a:off x="4004640" y="5709960"/>
-            <a:ext cx="909720" cy="909720"/>
+            <a:ext cx="909360" cy="909360"/>
           </a:xfrm>
           <a:prstGeom prst="rect">
             <a:avLst/>
@@ -7390,7 +7417,7 @@
         <p:spPr>
           <a:xfrm>
             <a:off x="276120" y="5759640"/>
-            <a:ext cx="909720" cy="909720"/>
+            <a:ext cx="909360" cy="909360"/>
           </a:xfrm>
           <a:prstGeom prst="rect">
             <a:avLst/>
@@ -7409,7 +7436,7 @@
         <p:spPr>
           <a:xfrm>
             <a:off x="1230120" y="6098760"/>
-            <a:ext cx="678240" cy="257400"/>
+            <a:ext cx="677880" cy="257040"/>
           </a:xfrm>
           <a:prstGeom prst="rightArrow">
             <a:avLst>
@@ -7448,7 +7475,7 @@
         <p:spPr>
           <a:xfrm>
             <a:off x="3103920" y="6117480"/>
-            <a:ext cx="678240" cy="257400"/>
+            <a:ext cx="677880" cy="257040"/>
           </a:xfrm>
           <a:prstGeom prst="rightArrow">
             <a:avLst>
@@ -7487,7 +7514,7 @@
         <p:spPr>
           <a:xfrm>
             <a:off x="4958640" y="6109200"/>
-            <a:ext cx="678240" cy="257400"/>
+            <a:ext cx="677880" cy="257040"/>
           </a:xfrm>
           <a:prstGeom prst="rightArrow">
             <a:avLst>
@@ -7526,7 +7553,7 @@
         <p:spPr>
           <a:xfrm>
             <a:off x="6754320" y="6098760"/>
-            <a:ext cx="678240" cy="257400"/>
+            <a:ext cx="677880" cy="257040"/>
           </a:xfrm>
           <a:prstGeom prst="rightArrow">
             <a:avLst>
@@ -7565,7 +7592,7 @@
         <p:spPr>
           <a:xfrm>
             <a:off x="8468280" y="6085800"/>
-            <a:ext cx="678240" cy="257400"/>
+            <a:ext cx="677880" cy="257040"/>
           </a:xfrm>
           <a:prstGeom prst="rightArrow">
             <a:avLst>
@@ -7608,7 +7635,7 @@
         <p:spPr>
           <a:xfrm>
             <a:off x="6582600" y="3915000"/>
-            <a:ext cx="909720" cy="909720"/>
+            <a:ext cx="909360" cy="909360"/>
           </a:xfrm>
           <a:prstGeom prst="rect">
             <a:avLst/>
@@ -7631,7 +7658,7 @@
         <p:spPr>
           <a:xfrm>
             <a:off x="8674920" y="3965760"/>
-            <a:ext cx="909720" cy="909720"/>
+            <a:ext cx="909360" cy="909360"/>
           </a:xfrm>
           <a:prstGeom prst="rect">
             <a:avLst/>
@@ -7654,7 +7681,7 @@
         <p:spPr>
           <a:xfrm>
             <a:off x="7203600" y="2661480"/>
-            <a:ext cx="909720" cy="909720"/>
+            <a:ext cx="909360" cy="909360"/>
           </a:xfrm>
           <a:prstGeom prst="rect">
             <a:avLst/>
@@ -7677,7 +7704,7 @@
         <p:spPr>
           <a:xfrm>
             <a:off x="10398960" y="3368880"/>
-            <a:ext cx="909720" cy="909720"/>
+            <a:ext cx="909360" cy="909360"/>
           </a:xfrm>
           <a:prstGeom prst="rect">
             <a:avLst/>
@@ -7700,7 +7727,7 @@
         <p:spPr>
           <a:xfrm>
             <a:off x="7002000" y="5015520"/>
-            <a:ext cx="909720" cy="909720"/>
+            <a:ext cx="909360" cy="909360"/>
           </a:xfrm>
           <a:prstGeom prst="rect">
             <a:avLst/>
@@ -7718,8 +7745,8 @@
         </p:nvSpPr>
         <p:spPr>
           <a:xfrm rot="3732600">
-            <a:off x="9844200" y="3698640"/>
-            <a:ext cx="199440" cy="665280"/>
+            <a:off x="9844200" y="3698280"/>
+            <a:ext cx="199080" cy="664920"/>
           </a:xfrm>
           <a:prstGeom prst="downArrow">
             <a:avLst>
@@ -7758,7 +7785,7 @@
         <p:spPr>
           <a:xfrm rot="14618400">
             <a:off x="8192520" y="4701240"/>
-            <a:ext cx="199440" cy="665280"/>
+            <a:ext cx="199080" cy="664920"/>
           </a:xfrm>
           <a:prstGeom prst="downArrow">
             <a:avLst>
@@ -7796,8 +7823,8 @@
         </p:nvSpPr>
         <p:spPr>
           <a:xfrm rot="5400000">
-            <a:off x="8042400" y="4068360"/>
-            <a:ext cx="199440" cy="665280"/>
+            <a:off x="8042760" y="4068360"/>
+            <a:ext cx="199080" cy="664920"/>
           </a:xfrm>
           <a:prstGeom prst="downArrow">
             <a:avLst>
@@ -7836,7 +7863,7 @@
         <p:spPr>
           <a:xfrm rot="7014000">
             <a:off x="8275680" y="3487680"/>
-            <a:ext cx="199440" cy="665280"/>
+            <a:ext cx="199080" cy="664920"/>
           </a:xfrm>
           <a:prstGeom prst="downArrow">
             <a:avLst>
@@ -7874,8 +7901,8 @@
         </p:nvSpPr>
         <p:spPr>
           <a:xfrm rot="1747800">
-            <a:off x="7094880" y="3423960"/>
-            <a:ext cx="199440" cy="665280"/>
+            <a:off x="7094880" y="3423600"/>
+            <a:ext cx="199080" cy="664920"/>
           </a:xfrm>
           <a:prstGeom prst="downArrow">
             <a:avLst>
@@ -7918,7 +7945,7 @@
         <p:spPr>
           <a:xfrm>
             <a:off x="8641080" y="309600"/>
-            <a:ext cx="909720" cy="909720"/>
+            <a:ext cx="909360" cy="909360"/>
           </a:xfrm>
           <a:prstGeom prst="rect">
             <a:avLst/>
@@ -7941,7 +7968,7 @@
         <p:spPr>
           <a:xfrm>
             <a:off x="10568880" y="1497240"/>
-            <a:ext cx="909720" cy="909720"/>
+            <a:ext cx="909360" cy="909360"/>
           </a:xfrm>
           <a:prstGeom prst="rect">
             <a:avLst/>
@@ -7964,7 +7991,7 @@
         <p:spPr>
           <a:xfrm>
             <a:off x="6932880" y="1497240"/>
-            <a:ext cx="909720" cy="909720"/>
+            <a:ext cx="909360" cy="909360"/>
           </a:xfrm>
           <a:prstGeom prst="rect">
             <a:avLst/>
@@ -7983,7 +8010,7 @@
         <p:spPr>
           <a:xfrm>
             <a:off x="8173800" y="1774080"/>
-            <a:ext cx="2063880" cy="356040"/>
+            <a:ext cx="2063520" cy="355680"/>
           </a:xfrm>
           <a:prstGeom prst="rightArrow">
             <a:avLst>
@@ -8022,7 +8049,7 @@
         <p:spPr>
           <a:xfrm>
             <a:off x="8947440" y="1361160"/>
-            <a:ext cx="297000" cy="402480"/>
+            <a:ext cx="296640" cy="402120"/>
           </a:xfrm>
           <a:prstGeom prst="downArrow">
             <a:avLst>
@@ -8110,7 +8137,7 @@
         <p:spPr>
           <a:xfrm>
             <a:off x="0" y="0"/>
-            <a:ext cx="12187440" cy="6853320"/>
+            <a:ext cx="12187080" cy="6852960"/>
           </a:xfrm>
           <a:prstGeom prst="rect">
             <a:avLst/>
@@ -8163,7 +8190,7 @@
         <p:spPr>
           <a:xfrm>
             <a:off x="640440" y="685800"/>
-            <a:ext cx="4813920" cy="4599000"/>
+            <a:ext cx="4813560" cy="4598640"/>
           </a:xfrm>
           <a:prstGeom prst="rect">
             <a:avLst/>
@@ -8214,7 +8241,7 @@
         <p:spPr>
           <a:xfrm>
             <a:off x="6095880" y="0"/>
-            <a:ext cx="6091200" cy="6853320"/>
+            <a:ext cx="6090840" cy="6852960"/>
           </a:xfrm>
           <a:prstGeom prst="rect">
             <a:avLst/>
@@ -8252,7 +8279,7 @@
         <p:spPr>
           <a:xfrm>
             <a:off x="6625800" y="685800"/>
-            <a:ext cx="4874400" cy="4599000"/>
+            <a:ext cx="4874040" cy="4598640"/>
           </a:xfrm>
           <a:prstGeom prst="rect">
             <a:avLst/>
@@ -8273,7 +8300,7 @@
             <a:normAutofit/>
           </a:bodyPr>
           <a:p>
-            <a:pPr marL="285840" indent="-281160">
+            <a:pPr marL="285840" indent="-280800">
               <a:lnSpc>
                 <a:spcPct val="100000"/>
               </a:lnSpc>
@@ -8305,7 +8332,7 @@
             </a:endParaRPr>
           </a:p>
           <a:p>
-            <a:pPr marL="285840" indent="-281160">
+            <a:pPr marL="285840" indent="-280800">
               <a:lnSpc>
                 <a:spcPct val="100000"/>
               </a:lnSpc>
@@ -8337,7 +8364,7 @@
             </a:endParaRPr>
           </a:p>
           <a:p>
-            <a:pPr marL="285840" indent="-281160">
+            <a:pPr marL="285840" indent="-280800">
               <a:lnSpc>
                 <a:spcPct val="100000"/>
               </a:lnSpc>
@@ -8369,7 +8396,7 @@
             </a:endParaRPr>
           </a:p>
           <a:p>
-            <a:pPr marL="285840" indent="-281160">
+            <a:pPr marL="285840" indent="-280800">
               <a:lnSpc>
                 <a:spcPct val="100000"/>
               </a:lnSpc>
@@ -8401,7 +8428,7 @@
             </a:endParaRPr>
           </a:p>
           <a:p>
-            <a:pPr marL="285840" indent="-281160">
+            <a:pPr marL="285840" indent="-280800">
               <a:lnSpc>
                 <a:spcPct val="100000"/>
               </a:lnSpc>
@@ -8436,6 +8463,33 @@
       </p:sp>
     </p:spTree>
   </p:cSld>
+  <p:timing>
+    <p:tnLst>
+      <p:par>
+        <p:cTn id="23" dur="indefinite" restart="never" nodeType="tmRoot">
+          <p:childTnLst>
+            <p:seq>
+              <p:cTn id="24" dur="indefinite" nodeType="mainSeq"/>
+              <p:prevCondLst>
+                <p:cond delay="0" evt="onPrev">
+                  <p:tgtEl>
+                    <p:sldTgt/>
+                  </p:tgtEl>
+                </p:cond>
+              </p:prevCondLst>
+              <p:nextCondLst>
+                <p:cond delay="0" evt="onNext">
+                  <p:tgtEl>
+                    <p:sldTgt/>
+                  </p:tgtEl>
+                </p:cond>
+              </p:nextCondLst>
+            </p:seq>
+          </p:childTnLst>
+        </p:cTn>
+      </p:par>
+    </p:tnLst>
+  </p:timing>
 </p:sld>
 </file>
 
@@ -8465,7 +8519,7 @@
         <p:spPr>
           <a:xfrm>
             <a:off x="684360" y="4487400"/>
-            <a:ext cx="8529840" cy="1502280"/>
+            <a:ext cx="8529480" cy="1501920"/>
           </a:xfrm>
           <a:prstGeom prst="rect">
             <a:avLst/>
@@ -8514,7 +8568,7 @@
         <p:spPr>
           <a:xfrm>
             <a:off x="684360" y="685800"/>
-            <a:ext cx="8529840" cy="3610440"/>
+            <a:ext cx="8529480" cy="3610080"/>
           </a:xfrm>
           <a:prstGeom prst="rect">
             <a:avLst/>
@@ -8533,7 +8587,7 @@
         <p:txBody>
           <a:bodyPr lIns="90000" rIns="90000" tIns="45000" bIns="45000" anchor="ctr"/>
           <a:p>
-            <a:pPr marL="285840" indent="-281160">
+            <a:pPr marL="285840" indent="-280800">
               <a:lnSpc>
                 <a:spcPct val="100000"/>
               </a:lnSpc>
@@ -8565,7 +8619,7 @@
             </a:endParaRPr>
           </a:p>
           <a:p>
-            <a:pPr marL="285840" indent="-281160">
+            <a:pPr marL="285840" indent="-280800">
               <a:lnSpc>
                 <a:spcPct val="100000"/>
               </a:lnSpc>
@@ -8675,7 +8729,7 @@
         <p:spPr>
           <a:xfrm>
             <a:off x="6995520" y="1949760"/>
-            <a:ext cx="849960" cy="849960"/>
+            <a:ext cx="849600" cy="849600"/>
           </a:xfrm>
           <a:prstGeom prst="rect">
             <a:avLst/>
@@ -8698,7 +8752,7 @@
         <p:spPr>
           <a:xfrm>
             <a:off x="6829560" y="4303080"/>
-            <a:ext cx="1176480" cy="468720"/>
+            <a:ext cx="1176120" cy="468360"/>
           </a:xfrm>
           <a:prstGeom prst="rect">
             <a:avLst/>
@@ -8721,7 +8775,7 @@
         <p:spPr>
           <a:xfrm>
             <a:off x="6951960" y="2903040"/>
-            <a:ext cx="893520" cy="1035720"/>
+            <a:ext cx="893160" cy="1035360"/>
           </a:xfrm>
           <a:prstGeom prst="rect">
             <a:avLst/>
@@ -8744,7 +8798,7 @@
         <p:spPr>
           <a:xfrm>
             <a:off x="2616120" y="2071080"/>
-            <a:ext cx="909720" cy="909720"/>
+            <a:ext cx="909360" cy="909360"/>
           </a:xfrm>
           <a:prstGeom prst="rect">
             <a:avLst/>
@@ -8767,7 +8821,7 @@
         <p:spPr>
           <a:xfrm>
             <a:off x="2637000" y="3377160"/>
-            <a:ext cx="909720" cy="909720"/>
+            <a:ext cx="909360" cy="909360"/>
           </a:xfrm>
           <a:prstGeom prst="rect">
             <a:avLst/>
@@ -8785,8 +8839,8 @@
         </p:nvSpPr>
         <p:spPr>
           <a:xfrm rot="1192200">
-            <a:off x="3943440" y="2677320"/>
-            <a:ext cx="973800" cy="479880"/>
+            <a:off x="3943440" y="2676960"/>
+            <a:ext cx="973440" cy="479520"/>
           </a:xfrm>
           <a:prstGeom prst="rightArrow">
             <a:avLst>
@@ -8827,8 +8881,8 @@
         </p:nvSpPr>
         <p:spPr>
           <a:xfrm rot="20407800">
-            <a:off x="3922920" y="3465360"/>
-            <a:ext cx="973800" cy="479880"/>
+            <a:off x="3922560" y="3465000"/>
+            <a:ext cx="973440" cy="479520"/>
           </a:xfrm>
           <a:prstGeom prst="rightArrow">
             <a:avLst>
@@ -8869,8 +8923,8 @@
         </p:nvSpPr>
         <p:spPr>
           <a:xfrm rot="1192200">
-            <a:off x="5697360" y="3785760"/>
-            <a:ext cx="973800" cy="479880"/>
+            <a:off x="5697360" y="3785400"/>
+            <a:ext cx="973440" cy="479520"/>
           </a:xfrm>
           <a:prstGeom prst="rightArrow">
             <a:avLst>
@@ -8911,8 +8965,8 @@
         </p:nvSpPr>
         <p:spPr>
           <a:xfrm rot="20407800">
-            <a:off x="5771160" y="2460960"/>
-            <a:ext cx="973800" cy="479880"/>
+            <a:off x="5770800" y="2460600"/>
+            <a:ext cx="973440" cy="479520"/>
           </a:xfrm>
           <a:prstGeom prst="rightArrow">
             <a:avLst>
@@ -8954,7 +9008,7 @@
         <p:spPr>
           <a:xfrm>
             <a:off x="5849640" y="3121560"/>
-            <a:ext cx="973800" cy="479880"/>
+            <a:ext cx="973440" cy="479520"/>
           </a:xfrm>
           <a:prstGeom prst="rightArrow">
             <a:avLst>
@@ -9000,7 +9054,7 @@
         <p:spPr>
           <a:xfrm>
             <a:off x="4950720" y="2998800"/>
-            <a:ext cx="752040" cy="752040"/>
+            <a:ext cx="751680" cy="751680"/>
           </a:xfrm>
           <a:prstGeom prst="rect">
             <a:avLst/>
@@ -9012,6 +9066,33 @@
       </p:pic>
     </p:spTree>
   </p:cSld>
+  <p:timing>
+    <p:tnLst>
+      <p:par>
+        <p:cTn id="25" dur="indefinite" restart="never" nodeType="tmRoot">
+          <p:childTnLst>
+            <p:seq>
+              <p:cTn id="26" dur="indefinite" nodeType="mainSeq"/>
+              <p:prevCondLst>
+                <p:cond delay="0" evt="onPrev">
+                  <p:tgtEl>
+                    <p:sldTgt/>
+                  </p:tgtEl>
+                </p:cond>
+              </p:prevCondLst>
+              <p:nextCondLst>
+                <p:cond delay="0" evt="onNext">
+                  <p:tgtEl>
+                    <p:sldTgt/>
+                  </p:tgtEl>
+                </p:cond>
+              </p:nextCondLst>
+            </p:seq>
+          </p:childTnLst>
+        </p:cTn>
+      </p:par>
+    </p:tnLst>
+  </p:timing>
 </p:sld>
 </file>
 
@@ -9041,7 +9122,7 @@
         <p:spPr>
           <a:xfrm>
             <a:off x="684360" y="4487400"/>
-            <a:ext cx="8529840" cy="1502280"/>
+            <a:ext cx="8529480" cy="1501920"/>
           </a:xfrm>
           <a:prstGeom prst="rect">
             <a:avLst/>
@@ -9090,7 +9171,7 @@
         <p:spPr>
           <a:xfrm>
             <a:off x="684360" y="685800"/>
-            <a:ext cx="8529840" cy="3610440"/>
+            <a:ext cx="8529480" cy="3610080"/>
           </a:xfrm>
           <a:prstGeom prst="rect">
             <a:avLst/>
@@ -9109,7 +9190,7 @@
         <p:txBody>
           <a:bodyPr lIns="90000" rIns="90000" tIns="45000" bIns="45000" anchor="ctr"/>
           <a:p>
-            <a:pPr marL="285840" indent="-281160">
+            <a:pPr marL="285840" indent="-280800">
               <a:lnSpc>
                 <a:spcPct val="100000"/>
               </a:lnSpc>
@@ -9235,7 +9316,7 @@
             </a:endParaRPr>
           </a:p>
           <a:p>
-            <a:pPr marL="285840" indent="-281160">
+            <a:pPr marL="285840" indent="-280800">
               <a:lnSpc>
                 <a:spcPct val="100000"/>
               </a:lnSpc>
@@ -9327,7 +9408,7 @@
         <p:spPr>
           <a:xfrm>
             <a:off x="3562560" y="1395720"/>
-            <a:ext cx="909720" cy="909720"/>
+            <a:ext cx="909360" cy="909360"/>
           </a:xfrm>
           <a:prstGeom prst="rect">
             <a:avLst/>
@@ -9350,7 +9431,7 @@
         <p:spPr>
           <a:xfrm>
             <a:off x="6678360" y="1395720"/>
-            <a:ext cx="909720" cy="909720"/>
+            <a:ext cx="909360" cy="909360"/>
           </a:xfrm>
           <a:prstGeom prst="rect">
             <a:avLst/>
@@ -9373,7 +9454,7 @@
         <p:spPr>
           <a:xfrm>
             <a:off x="7042320" y="3904200"/>
-            <a:ext cx="909720" cy="909720"/>
+            <a:ext cx="909360" cy="909360"/>
           </a:xfrm>
           <a:prstGeom prst="rect">
             <a:avLst/>
@@ -9396,7 +9477,7 @@
         <p:spPr>
           <a:xfrm>
             <a:off x="3562560" y="3904200"/>
-            <a:ext cx="909720" cy="909720"/>
+            <a:ext cx="909360" cy="909360"/>
           </a:xfrm>
           <a:prstGeom prst="rect">
             <a:avLst/>
@@ -9419,7 +9500,7 @@
         <p:spPr>
           <a:xfrm>
             <a:off x="6678360" y="1395720"/>
-            <a:ext cx="909720" cy="909720"/>
+            <a:ext cx="909360" cy="909360"/>
           </a:xfrm>
           <a:prstGeom prst="rect">
             <a:avLst/>
@@ -9442,7 +9523,7 @@
         <p:spPr>
           <a:xfrm>
             <a:off x="4113000" y="2039400"/>
-            <a:ext cx="909720" cy="909720"/>
+            <a:ext cx="909360" cy="909360"/>
           </a:xfrm>
           <a:prstGeom prst="rect">
             <a:avLst/>
@@ -9465,7 +9546,7 @@
         <p:spPr>
           <a:xfrm>
             <a:off x="7296480" y="2133000"/>
-            <a:ext cx="909720" cy="909720"/>
+            <a:ext cx="909360" cy="909360"/>
           </a:xfrm>
           <a:prstGeom prst="rect">
             <a:avLst/>
@@ -9484,7 +9565,7 @@
         <p:spPr>
           <a:xfrm>
             <a:off x="5285160" y="1920960"/>
-            <a:ext cx="1178280" cy="540720"/>
+            <a:ext cx="1177920" cy="540360"/>
           </a:xfrm>
           <a:prstGeom prst="rightArrow">
             <a:avLst>
@@ -9526,7 +9607,7 @@
         <p:spPr>
           <a:xfrm>
             <a:off x="5149440" y="4088880"/>
-            <a:ext cx="1178280" cy="540720"/>
+            <a:ext cx="1177920" cy="540360"/>
           </a:xfrm>
           <a:prstGeom prst="rightArrow">
             <a:avLst>
@@ -9591,7 +9672,7 @@
         <p:spPr>
           <a:xfrm>
             <a:off x="4895280" y="2388600"/>
-            <a:ext cx="2703240" cy="360360"/>
+            <a:ext cx="2702880" cy="360000"/>
           </a:xfrm>
           <a:prstGeom prst="rect">
             <a:avLst/>
@@ -9640,7 +9721,7 @@
         <p:spPr>
           <a:xfrm>
             <a:off x="5027400" y="4575240"/>
-            <a:ext cx="2323080" cy="360360"/>
+            <a:ext cx="2322720" cy="360000"/>
           </a:xfrm>
           <a:prstGeom prst="rect">
             <a:avLst/>
@@ -9711,7 +9792,7 @@
         <p:spPr>
           <a:xfrm>
             <a:off x="684360" y="4487400"/>
-            <a:ext cx="8529840" cy="1502280"/>
+            <a:ext cx="8529480" cy="1501920"/>
           </a:xfrm>
           <a:prstGeom prst="rect">
             <a:avLst/>
@@ -9760,7 +9841,7 @@
         <p:spPr>
           <a:xfrm>
             <a:off x="684360" y="685800"/>
-            <a:ext cx="8529840" cy="3610440"/>
+            <a:ext cx="8529480" cy="3610080"/>
           </a:xfrm>
           <a:prstGeom prst="rect">
             <a:avLst/>
@@ -9779,7 +9860,7 @@
         <p:txBody>
           <a:bodyPr lIns="90000" rIns="90000" tIns="45000" bIns="45000" anchor="ctr"/>
           <a:p>
-            <a:pPr marL="285840" indent="-281160">
+            <a:pPr marL="285840" indent="-280800">
               <a:lnSpc>
                 <a:spcPct val="100000"/>
               </a:lnSpc>
@@ -9901,7 +9982,7 @@
         <p:spPr>
           <a:xfrm>
             <a:off x="1863000" y="3157920"/>
-            <a:ext cx="909720" cy="909720"/>
+            <a:ext cx="909360" cy="909360"/>
           </a:xfrm>
           <a:prstGeom prst="rect">
             <a:avLst/>
@@ -9924,7 +10005,7 @@
         <p:spPr>
           <a:xfrm>
             <a:off x="2413440" y="3801600"/>
-            <a:ext cx="909720" cy="909720"/>
+            <a:ext cx="909360" cy="909360"/>
           </a:xfrm>
           <a:prstGeom prst="rect">
             <a:avLst/>
@@ -9947,7 +10028,7 @@
         <p:spPr>
           <a:xfrm>
             <a:off x="7197480" y="3439800"/>
-            <a:ext cx="909720" cy="909720"/>
+            <a:ext cx="909360" cy="909360"/>
           </a:xfrm>
           <a:prstGeom prst="rect">
             <a:avLst/>
@@ -9970,7 +10051,7 @@
         <p:spPr>
           <a:xfrm>
             <a:off x="4758840" y="3366360"/>
-            <a:ext cx="909720" cy="909720"/>
+            <a:ext cx="909360" cy="909360"/>
           </a:xfrm>
           <a:prstGeom prst="rect">
             <a:avLst/>
@@ -9989,7 +10070,7 @@
         <p:spPr>
           <a:xfrm>
             <a:off x="3568680" y="3429000"/>
-            <a:ext cx="932760" cy="909720"/>
+            <a:ext cx="932400" cy="909360"/>
           </a:xfrm>
           <a:prstGeom prst="mathPlus">
             <a:avLst>
@@ -10027,7 +10108,7 @@
         <p:spPr>
           <a:xfrm>
             <a:off x="6095880" y="3654360"/>
-            <a:ext cx="733680" cy="561600"/>
+            <a:ext cx="733320" cy="561240"/>
           </a:xfrm>
           <a:prstGeom prst="mathEqual">
             <a:avLst>
@@ -10088,7 +10169,7 @@
         <p:spPr>
           <a:xfrm>
             <a:off x="4750920" y="2898360"/>
-            <a:ext cx="2685240" cy="3715200"/>
+            <a:ext cx="2684880" cy="3714840"/>
           </a:xfrm>
           <a:prstGeom prst="rect">
             <a:avLst/>
@@ -10131,7 +10212,7 @@
         <p:spPr>
           <a:xfrm>
             <a:off x="684360" y="4487400"/>
-            <a:ext cx="8529840" cy="1502280"/>
+            <a:ext cx="8529480" cy="1501920"/>
           </a:xfrm>
           <a:prstGeom prst="rect">
             <a:avLst/>
@@ -10180,7 +10261,7 @@
         <p:spPr>
           <a:xfrm>
             <a:off x="684360" y="685800"/>
-            <a:ext cx="8529840" cy="3610440"/>
+            <a:ext cx="8529480" cy="3610080"/>
           </a:xfrm>
           <a:prstGeom prst="rect">
             <a:avLst/>
@@ -10199,7 +10280,7 @@
         <p:txBody>
           <a:bodyPr lIns="90000" rIns="90000" tIns="45000" bIns="45000" anchor="ctr"/>
           <a:p>
-            <a:pPr marL="285840" indent="-281160">
+            <a:pPr marL="285840" indent="-280800">
               <a:lnSpc>
                 <a:spcPct val="100000"/>
               </a:lnSpc>
@@ -10335,7 +10416,7 @@
         <p:spPr>
           <a:xfrm>
             <a:off x="4843440" y="2989800"/>
-            <a:ext cx="637200" cy="637200"/>
+            <a:ext cx="636840" cy="636840"/>
           </a:xfrm>
           <a:prstGeom prst="rect">
             <a:avLst/>
@@ -10358,7 +10439,7 @@
         <p:spPr>
           <a:xfrm>
             <a:off x="5028120" y="4248360"/>
-            <a:ext cx="909720" cy="909720"/>
+            <a:ext cx="909360" cy="909360"/>
           </a:xfrm>
           <a:prstGeom prst="rect">
             <a:avLst/>
@@ -10381,7 +10462,7 @@
         <p:spPr>
           <a:xfrm>
             <a:off x="5506200" y="5025240"/>
-            <a:ext cx="909720" cy="909720"/>
+            <a:ext cx="909360" cy="909360"/>
           </a:xfrm>
           <a:prstGeom prst="rect">
             <a:avLst/>
@@ -10404,7 +10485,7 @@
         <p:spPr>
           <a:xfrm>
             <a:off x="6042600" y="4248360"/>
-            <a:ext cx="909720" cy="909720"/>
+            <a:ext cx="909360" cy="909360"/>
           </a:xfrm>
           <a:prstGeom prst="rect">
             <a:avLst/>
@@ -10427,7 +10508,7 @@
         <p:spPr>
           <a:xfrm>
             <a:off x="7944480" y="2602440"/>
-            <a:ext cx="909720" cy="909720"/>
+            <a:ext cx="909360" cy="909360"/>
           </a:xfrm>
           <a:prstGeom prst="rect">
             <a:avLst/>
@@ -10450,7 +10531,7 @@
         <p:spPr>
           <a:xfrm>
             <a:off x="6671160" y="3059640"/>
-            <a:ext cx="567000" cy="567000"/>
+            <a:ext cx="566640" cy="566640"/>
           </a:xfrm>
           <a:prstGeom prst="rect">
             <a:avLst/>
@@ -10473,7 +10554,7 @@
         <p:spPr>
           <a:xfrm>
             <a:off x="2973240" y="3863520"/>
-            <a:ext cx="909720" cy="909720"/>
+            <a:ext cx="909360" cy="909360"/>
           </a:xfrm>
           <a:prstGeom prst="rect">
             <a:avLst/>
@@ -10492,7 +10573,7 @@
         <p:spPr>
           <a:xfrm>
             <a:off x="4012560" y="4487400"/>
-            <a:ext cx="1488960" cy="852480"/>
+            <a:ext cx="1488600" cy="852120"/>
           </a:xfrm>
           <a:custGeom>
             <a:avLst/>
@@ -10544,7 +10625,7 @@
         <p:spPr>
           <a:xfrm>
             <a:off x="4012560" y="4248360"/>
-            <a:ext cx="2025360" cy="234360"/>
+            <a:ext cx="2025000" cy="234000"/>
           </a:xfrm>
           <a:custGeom>
             <a:avLst/>
@@ -10596,7 +10677,7 @@
         <p:spPr>
           <a:xfrm>
             <a:off x="4012560" y="4367880"/>
-            <a:ext cx="934200" cy="235080"/>
+            <a:ext cx="933840" cy="234720"/>
           </a:xfrm>
           <a:custGeom>
             <a:avLst/>
@@ -10648,7 +10729,7 @@
         <p:spPr>
           <a:xfrm flipV="1">
             <a:off x="7242840" y="3217680"/>
-            <a:ext cx="624960" cy="118440"/>
+            <a:ext cx="624600" cy="118080"/>
           </a:xfrm>
           <a:custGeom>
             <a:avLst/>
@@ -10723,7 +10804,7 @@
         <p:spPr>
           <a:xfrm>
             <a:off x="684360" y="4487400"/>
-            <a:ext cx="8529840" cy="1502280"/>
+            <a:ext cx="8529480" cy="1501920"/>
           </a:xfrm>
           <a:prstGeom prst="rect">
             <a:avLst/>
@@ -10772,7 +10853,7 @@
         <p:spPr>
           <a:xfrm>
             <a:off x="684360" y="685800"/>
-            <a:ext cx="8529840" cy="3610440"/>
+            <a:ext cx="8529480" cy="3610080"/>
           </a:xfrm>
           <a:prstGeom prst="rect">
             <a:avLst/>
@@ -10791,7 +10872,7 @@
         <p:txBody>
           <a:bodyPr lIns="90000" rIns="90000" tIns="45000" bIns="45000" anchor="ctr"/>
           <a:p>
-            <a:pPr marL="285840" indent="-281160">
+            <a:pPr marL="285840" indent="-280800">
               <a:lnSpc>
                 <a:spcPct val="100000"/>
               </a:lnSpc>
@@ -10959,7 +11040,7 @@
         <p:spPr>
           <a:xfrm>
             <a:off x="5430600" y="2730600"/>
-            <a:ext cx="2685240" cy="3715200"/>
+            <a:ext cx="2684880" cy="3714840"/>
           </a:xfrm>
           <a:prstGeom prst="rect">
             <a:avLst/>
@@ -11006,7 +11087,7 @@
         <p:spPr>
           <a:xfrm>
             <a:off x="5523120" y="2822040"/>
-            <a:ext cx="637200" cy="637200"/>
+            <a:ext cx="636840" cy="636840"/>
           </a:xfrm>
           <a:prstGeom prst="rect">
             <a:avLst/>
@@ -11029,7 +11110,7 @@
         <p:spPr>
           <a:xfrm>
             <a:off x="5707800" y="4080600"/>
-            <a:ext cx="909720" cy="909720"/>
+            <a:ext cx="909360" cy="909360"/>
           </a:xfrm>
           <a:prstGeom prst="rect">
             <a:avLst/>
@@ -11052,7 +11133,7 @@
         <p:spPr>
           <a:xfrm>
             <a:off x="6185880" y="4857480"/>
-            <a:ext cx="909720" cy="909720"/>
+            <a:ext cx="909360" cy="909360"/>
           </a:xfrm>
           <a:prstGeom prst="rect">
             <a:avLst/>
@@ -11075,7 +11156,7 @@
         <p:spPr>
           <a:xfrm>
             <a:off x="6722280" y="4080600"/>
-            <a:ext cx="909720" cy="909720"/>
+            <a:ext cx="909360" cy="909360"/>
           </a:xfrm>
           <a:prstGeom prst="rect">
             <a:avLst/>
@@ -11098,7 +11179,7 @@
         <p:spPr>
           <a:xfrm>
             <a:off x="3652920" y="3695760"/>
-            <a:ext cx="909720" cy="909720"/>
+            <a:ext cx="909360" cy="909360"/>
           </a:xfrm>
           <a:prstGeom prst="rect">
             <a:avLst/>
@@ -11117,7 +11198,7 @@
         <p:spPr>
           <a:xfrm>
             <a:off x="4692240" y="4319640"/>
-            <a:ext cx="1488960" cy="852480"/>
+            <a:ext cx="1488600" cy="852120"/>
           </a:xfrm>
           <a:custGeom>
             <a:avLst/>
@@ -11169,7 +11250,7 @@
         <p:spPr>
           <a:xfrm>
             <a:off x="4692240" y="4080600"/>
-            <a:ext cx="2025360" cy="234360"/>
+            <a:ext cx="2025000" cy="234000"/>
           </a:xfrm>
           <a:custGeom>
             <a:avLst/>
@@ -11221,7 +11302,7 @@
         <p:spPr>
           <a:xfrm>
             <a:off x="4692240" y="4200120"/>
-            <a:ext cx="934200" cy="235080"/>
+            <a:ext cx="933840" cy="234720"/>
           </a:xfrm>
           <a:custGeom>
             <a:avLst/>
@@ -11277,7 +11358,7 @@
         <p:spPr>
           <a:xfrm>
             <a:off x="9653760" y="3605400"/>
-            <a:ext cx="909720" cy="909720"/>
+            <a:ext cx="909360" cy="909360"/>
           </a:xfrm>
           <a:prstGeom prst="rect">
             <a:avLst/>
@@ -11295,8 +11376,8 @@
         </p:nvSpPr>
         <p:spPr>
           <a:xfrm rot="10325400">
-            <a:off x="7858440" y="4106880"/>
-            <a:ext cx="1781280" cy="303120"/>
+            <a:off x="7858440" y="4107240"/>
+            <a:ext cx="1780920" cy="302760"/>
           </a:xfrm>
           <a:prstGeom prst="rightArrow">
             <a:avLst>
@@ -11360,7 +11441,7 @@
         <p:spPr>
           <a:xfrm>
             <a:off x="684360" y="4487400"/>
-            <a:ext cx="8529840" cy="1502280"/>
+            <a:ext cx="8529480" cy="1501920"/>
           </a:xfrm>
           <a:prstGeom prst="rect">
             <a:avLst/>
@@ -11409,7 +11490,7 @@
         <p:spPr>
           <a:xfrm>
             <a:off x="684360" y="685800"/>
-            <a:ext cx="8529840" cy="3610440"/>
+            <a:ext cx="8529480" cy="3610080"/>
           </a:xfrm>
           <a:prstGeom prst="rect">
             <a:avLst/>
@@ -11439,7 +11520,7 @@
         <p:spPr>
           <a:xfrm>
             <a:off x="4069440" y="82800"/>
-            <a:ext cx="4041720" cy="2842200"/>
+            <a:ext cx="4041360" cy="2841840"/>
           </a:xfrm>
           <a:prstGeom prst="rect">
             <a:avLst/>
@@ -11462,7 +11543,7 @@
         <p:spPr>
           <a:xfrm>
             <a:off x="83880" y="3103560"/>
-            <a:ext cx="3862800" cy="1639800"/>
+            <a:ext cx="3862440" cy="1639440"/>
           </a:xfrm>
           <a:prstGeom prst="rect">
             <a:avLst/>
@@ -11485,7 +11566,7 @@
         <p:spPr>
           <a:xfrm>
             <a:off x="4161600" y="3103560"/>
-            <a:ext cx="3862800" cy="1639800"/>
+            <a:ext cx="3862440" cy="1639440"/>
           </a:xfrm>
           <a:prstGeom prst="rect">
             <a:avLst/>
@@ -11508,7 +11589,7 @@
         <p:spPr>
           <a:xfrm>
             <a:off x="8230320" y="3103560"/>
-            <a:ext cx="3862800" cy="1639800"/>
+            <a:ext cx="3862440" cy="1639440"/>
           </a:xfrm>
           <a:prstGeom prst="rect">
             <a:avLst/>
@@ -11527,7 +11608,7 @@
         <p:spPr>
           <a:xfrm>
             <a:off x="3993840" y="3766680"/>
-            <a:ext cx="146520" cy="314640"/>
+            <a:ext cx="146160" cy="314280"/>
           </a:xfrm>
           <a:prstGeom prst="rightArrow">
             <a:avLst>
@@ -11566,7 +11647,7 @@
         <p:spPr>
           <a:xfrm>
             <a:off x="8073360" y="3793320"/>
-            <a:ext cx="127440" cy="314640"/>
+            <a:ext cx="127080" cy="314280"/>
           </a:xfrm>
           <a:prstGeom prst="rightArrow">
             <a:avLst>
@@ -11605,7 +11686,7 @@
         <p:spPr>
           <a:xfrm>
             <a:off x="2701080" y="5176080"/>
-            <a:ext cx="1832400" cy="918000"/>
+            <a:ext cx="1832040" cy="917640"/>
           </a:xfrm>
           <a:prstGeom prst="wedgeRectCallout">
             <a:avLst>
@@ -11670,7 +11751,7 @@
         <p:spPr>
           <a:xfrm>
             <a:off x="6722640" y="5196600"/>
-            <a:ext cx="1963800" cy="821160"/>
+            <a:ext cx="1963440" cy="820800"/>
           </a:xfrm>
           <a:prstGeom prst="wedgeRectCallout">
             <a:avLst>
@@ -11735,7 +11816,7 @@
         <p:spPr>
           <a:xfrm>
             <a:off x="9731160" y="5131440"/>
-            <a:ext cx="2100960" cy="651960"/>
+            <a:ext cx="2100600" cy="651600"/>
           </a:xfrm>
           <a:prstGeom prst="wedgeRectCallout">
             <a:avLst>
@@ -11800,7 +11881,7 @@
         <p:spPr>
           <a:xfrm>
             <a:off x="5033520" y="2516760"/>
-            <a:ext cx="2570760" cy="360360"/>
+            <a:ext cx="2570400" cy="360000"/>
           </a:xfrm>
           <a:prstGeom prst="rect">
             <a:avLst/>
@@ -11848,8 +11929,8 @@
         </p:nvSpPr>
         <p:spPr>
           <a:xfrm rot="16200000">
-            <a:off x="3177360" y="1269720"/>
-            <a:ext cx="1959840" cy="360360"/>
+            <a:off x="3177360" y="1270080"/>
+            <a:ext cx="1959480" cy="360000"/>
           </a:xfrm>
           <a:prstGeom prst="rect">
             <a:avLst/>
@@ -11920,7 +12001,7 @@
         <p:spPr>
           <a:xfrm>
             <a:off x="684360" y="4487400"/>
-            <a:ext cx="8529840" cy="1502280"/>
+            <a:ext cx="8529480" cy="1501920"/>
           </a:xfrm>
           <a:prstGeom prst="rect">
             <a:avLst/>
@@ -11971,9 +12052,9 @@
         <p:grpSpPr>
           <a:xfrm>
             <a:off x="948240" y="823320"/>
-            <a:ext cx="10287720" cy="3335040"/>
+            <a:ext cx="10287360" cy="3334680"/>
             <a:chOff x="948240" y="823320"/>
-            <a:chExt cx="10287720" cy="3335040"/>
+            <a:chExt cx="10287360" cy="3334680"/>
           </a:xfrm>
         </p:grpSpPr>
         <p:sp>
@@ -11985,7 +12066,7 @@
           <p:spPr>
             <a:xfrm>
               <a:off x="948240" y="823320"/>
-              <a:ext cx="1357920" cy="1357920"/>
+              <a:ext cx="1357560" cy="1357560"/>
             </a:xfrm>
             <a:prstGeom prst="ellipse">
               <a:avLst/>
@@ -12018,7 +12099,7 @@
           <p:spPr>
             <a:xfrm>
               <a:off x="1234440" y="1109520"/>
-              <a:ext cx="785520" cy="785520"/>
+              <a:ext cx="785160" cy="785160"/>
             </a:xfrm>
             <a:prstGeom prst="rect">
               <a:avLst/>
@@ -12049,7 +12130,7 @@
           <p:spPr>
             <a:xfrm>
               <a:off x="2602800" y="823320"/>
-              <a:ext cx="3207240" cy="1357920"/>
+              <a:ext cx="3206880" cy="1357560"/>
             </a:xfrm>
             <a:prstGeom prst="rect">
               <a:avLst/>
@@ -12101,7 +12182,7 @@
           <p:spPr>
             <a:xfrm>
               <a:off x="6374160" y="823320"/>
-              <a:ext cx="1357920" cy="1357920"/>
+              <a:ext cx="1357560" cy="1357560"/>
             </a:xfrm>
             <a:prstGeom prst="ellipse">
               <a:avLst/>
@@ -12134,7 +12215,7 @@
           <p:spPr>
             <a:xfrm>
               <a:off x="6660360" y="1109520"/>
-              <a:ext cx="785520" cy="785520"/>
+              <a:ext cx="785160" cy="785160"/>
             </a:xfrm>
             <a:prstGeom prst="rect">
               <a:avLst/>
@@ -12165,7 +12246,7 @@
           <p:spPr>
             <a:xfrm>
               <a:off x="8028720" y="823320"/>
-              <a:ext cx="3207240" cy="1357920"/>
+              <a:ext cx="3206880" cy="1357560"/>
             </a:xfrm>
             <a:prstGeom prst="rect">
               <a:avLst/>
@@ -12217,7 +12298,7 @@
           <p:spPr>
             <a:xfrm>
               <a:off x="948240" y="2800440"/>
-              <a:ext cx="1357920" cy="1357920"/>
+              <a:ext cx="1357560" cy="1357560"/>
             </a:xfrm>
             <a:prstGeom prst="ellipse">
               <a:avLst/>
@@ -12250,7 +12331,7 @@
           <p:spPr>
             <a:xfrm>
               <a:off x="1234440" y="3086640"/>
-              <a:ext cx="785520" cy="785520"/>
+              <a:ext cx="785160" cy="785160"/>
             </a:xfrm>
             <a:prstGeom prst="rect">
               <a:avLst/>
@@ -12281,7 +12362,7 @@
           <p:spPr>
             <a:xfrm>
               <a:off x="2602800" y="2800440"/>
-              <a:ext cx="3207240" cy="1357920"/>
+              <a:ext cx="3206880" cy="1357560"/>
             </a:xfrm>
             <a:prstGeom prst="rect">
               <a:avLst/>
@@ -12333,7 +12414,7 @@
           <p:spPr>
             <a:xfrm>
               <a:off x="6374160" y="2800440"/>
-              <a:ext cx="1357920" cy="1357920"/>
+              <a:ext cx="1357560" cy="1357560"/>
             </a:xfrm>
             <a:prstGeom prst="ellipse">
               <a:avLst/>
@@ -12366,7 +12447,7 @@
           <p:spPr>
             <a:xfrm>
               <a:off x="6660360" y="3086640"/>
-              <a:ext cx="785520" cy="785520"/>
+              <a:ext cx="785160" cy="785160"/>
             </a:xfrm>
             <a:prstGeom prst="rect">
               <a:avLst/>
@@ -12397,7 +12478,7 @@
           <p:spPr>
             <a:xfrm>
               <a:off x="8028720" y="2800440"/>
-              <a:ext cx="3207240" cy="1357920"/>
+              <a:ext cx="3206880" cy="1357560"/>
             </a:xfrm>
             <a:prstGeom prst="rect">
               <a:avLst/>
@@ -12487,7 +12568,7 @@
         <p:spPr>
           <a:xfrm>
             <a:off x="0" y="0"/>
-            <a:ext cx="12187440" cy="6853320"/>
+            <a:ext cx="12187080" cy="6852960"/>
           </a:xfrm>
           <a:prstGeom prst="rect">
             <a:avLst/>
@@ -12540,7 +12621,7 @@
         <p:spPr>
           <a:xfrm>
             <a:off x="0" y="0"/>
-            <a:ext cx="8125200" cy="6853320"/>
+            <a:ext cx="8124840" cy="6852960"/>
           </a:xfrm>
           <a:prstGeom prst="snip2DiagRect">
             <a:avLst>
@@ -12762,7 +12843,7 @@
         <p:spPr>
           <a:xfrm>
             <a:off x="8588520" y="941400"/>
-            <a:ext cx="3039120" cy="3243960"/>
+            <a:ext cx="3038760" cy="3243600"/>
           </a:xfrm>
           <a:prstGeom prst="rect">
             <a:avLst/>
@@ -12813,9 +12894,9 @@
         <p:grpSpPr>
           <a:xfrm>
             <a:off x="952560" y="2104200"/>
-            <a:ext cx="6161760" cy="2438640"/>
+            <a:ext cx="6161400" cy="2438280"/>
             <a:chOff x="952560" y="2104200"/>
-            <a:chExt cx="6161760" cy="2438640"/>
+            <a:chExt cx="6161400" cy="2438280"/>
           </a:xfrm>
         </p:grpSpPr>
         <p:sp>
@@ -12827,7 +12908,7 @@
           <p:spPr>
             <a:xfrm>
               <a:off x="952560" y="2104200"/>
-              <a:ext cx="811800" cy="811800"/>
+              <a:ext cx="811440" cy="811440"/>
             </a:xfrm>
             <a:prstGeom prst="ellipse">
               <a:avLst/>
@@ -12860,7 +12941,7 @@
           <p:spPr>
             <a:xfrm>
               <a:off x="1123920" y="2275560"/>
-              <a:ext cx="468720" cy="468720"/>
+              <a:ext cx="468360" cy="468360"/>
             </a:xfrm>
             <a:prstGeom prst="rect">
               <a:avLst/>
@@ -12891,7 +12972,7 @@
           <p:spPr>
             <a:xfrm>
               <a:off x="1944000" y="2104200"/>
-              <a:ext cx="1919520" cy="811800"/>
+              <a:ext cx="1919160" cy="811440"/>
             </a:xfrm>
             <a:prstGeom prst="rect">
               <a:avLst/>
@@ -12943,7 +13024,7 @@
           <p:spPr>
             <a:xfrm>
               <a:off x="4203360" y="2104200"/>
-              <a:ext cx="811800" cy="811800"/>
+              <a:ext cx="811440" cy="811440"/>
             </a:xfrm>
             <a:prstGeom prst="ellipse">
               <a:avLst/>
@@ -12976,7 +13057,7 @@
           <p:spPr>
             <a:xfrm>
               <a:off x="4375080" y="2275560"/>
-              <a:ext cx="468720" cy="468720"/>
+              <a:ext cx="468360" cy="468360"/>
             </a:xfrm>
             <a:prstGeom prst="rect">
               <a:avLst/>
@@ -13007,7 +13088,7 @@
           <p:spPr>
             <a:xfrm>
               <a:off x="5194800" y="2104200"/>
-              <a:ext cx="1919520" cy="811800"/>
+              <a:ext cx="1919160" cy="811440"/>
             </a:xfrm>
             <a:prstGeom prst="rect">
               <a:avLst/>
@@ -13059,7 +13140,7 @@
           <p:spPr>
             <a:xfrm>
               <a:off x="952560" y="3731040"/>
-              <a:ext cx="811800" cy="811800"/>
+              <a:ext cx="811440" cy="811440"/>
             </a:xfrm>
             <a:prstGeom prst="ellipse">
               <a:avLst/>
@@ -13092,7 +13173,7 @@
           <p:spPr>
             <a:xfrm>
               <a:off x="1123920" y="3902400"/>
-              <a:ext cx="468720" cy="468720"/>
+              <a:ext cx="468360" cy="468360"/>
             </a:xfrm>
             <a:prstGeom prst="rect">
               <a:avLst/>
@@ -13123,7 +13204,7 @@
           <p:spPr>
             <a:xfrm>
               <a:off x="1944000" y="3731040"/>
-              <a:ext cx="1919520" cy="811800"/>
+              <a:ext cx="1919160" cy="811440"/>
             </a:xfrm>
             <a:prstGeom prst="rect">
               <a:avLst/>
@@ -13175,7 +13256,7 @@
           <p:spPr>
             <a:xfrm>
               <a:off x="4203360" y="3731040"/>
-              <a:ext cx="811800" cy="811800"/>
+              <a:ext cx="811440" cy="811440"/>
             </a:xfrm>
             <a:prstGeom prst="ellipse">
               <a:avLst/>
@@ -13208,7 +13289,7 @@
           <p:spPr>
             <a:xfrm>
               <a:off x="4375080" y="3902400"/>
-              <a:ext cx="468720" cy="468720"/>
+              <a:ext cx="468360" cy="468360"/>
             </a:xfrm>
             <a:prstGeom prst="rect">
               <a:avLst/>
@@ -13239,7 +13320,7 @@
           <p:spPr>
             <a:xfrm>
               <a:off x="5194800" y="3731040"/>
-              <a:ext cx="1919520" cy="811800"/>
+              <a:ext cx="1919160" cy="811440"/>
             </a:xfrm>
             <a:prstGeom prst="rect">
               <a:avLst/>
@@ -13356,7 +13437,7 @@
         <p:spPr>
           <a:xfrm>
             <a:off x="684360" y="4487400"/>
-            <a:ext cx="8529840" cy="1502280"/>
+            <a:ext cx="8529480" cy="1501920"/>
           </a:xfrm>
           <a:prstGeom prst="rect">
             <a:avLst/>
@@ -13405,7 +13486,7 @@
         <p:spPr>
           <a:xfrm>
             <a:off x="684360" y="685800"/>
-            <a:ext cx="8529840" cy="3610440"/>
+            <a:ext cx="8529480" cy="3610080"/>
           </a:xfrm>
           <a:prstGeom prst="rect">
             <a:avLst/>
@@ -13424,7 +13505,7 @@
         <p:txBody>
           <a:bodyPr lIns="90000" rIns="90000" tIns="45000" bIns="45000" anchor="ctr"/>
           <a:p>
-            <a:pPr marL="285840" indent="-281160">
+            <a:pPr marL="285840" indent="-280800">
               <a:lnSpc>
                 <a:spcPct val="100000"/>
               </a:lnSpc>
@@ -13456,7 +13537,7 @@
             </a:endParaRPr>
           </a:p>
           <a:p>
-            <a:pPr marL="285840" indent="-281160">
+            <a:pPr marL="285840" indent="-280800">
               <a:lnSpc>
                 <a:spcPct val="100000"/>
               </a:lnSpc>
@@ -13488,7 +13569,7 @@
             </a:endParaRPr>
           </a:p>
           <a:p>
-            <a:pPr marL="285840" indent="-281160">
+            <a:pPr marL="285840" indent="-280800">
               <a:lnSpc>
                 <a:spcPct val="100000"/>
               </a:lnSpc>
@@ -13520,7 +13601,7 @@
             </a:endParaRPr>
           </a:p>
           <a:p>
-            <a:pPr marL="285840" indent="-281160">
+            <a:pPr marL="285840" indent="-280800">
               <a:lnSpc>
                 <a:spcPct val="100000"/>
               </a:lnSpc>
@@ -13584,7 +13665,7 @@
         <p:spPr>
           <a:xfrm>
             <a:off x="684360" y="4487400"/>
-            <a:ext cx="8529840" cy="1502280"/>
+            <a:ext cx="8529480" cy="1501920"/>
           </a:xfrm>
           <a:prstGeom prst="rect">
             <a:avLst/>
@@ -13637,7 +13718,7 @@
         <p:spPr>
           <a:xfrm>
             <a:off x="5221440" y="75600"/>
-            <a:ext cx="909720" cy="909720"/>
+            <a:ext cx="909360" cy="909360"/>
           </a:xfrm>
           <a:prstGeom prst="rect">
             <a:avLst/>
@@ -13660,7 +13741,7 @@
         <p:spPr>
           <a:xfrm>
             <a:off x="4695120" y="4444560"/>
-            <a:ext cx="909720" cy="909720"/>
+            <a:ext cx="909360" cy="909360"/>
           </a:xfrm>
           <a:prstGeom prst="rect">
             <a:avLst/>
@@ -13683,7 +13764,7 @@
         <p:spPr>
           <a:xfrm>
             <a:off x="2603880" y="2294640"/>
-            <a:ext cx="909720" cy="909720"/>
+            <a:ext cx="909360" cy="909360"/>
           </a:xfrm>
           <a:prstGeom prst="rect">
             <a:avLst/>
@@ -13706,7 +13787,7 @@
         <p:spPr>
           <a:xfrm>
             <a:off x="9767160" y="3294360"/>
-            <a:ext cx="909720" cy="909720"/>
+            <a:ext cx="909360" cy="909360"/>
           </a:xfrm>
           <a:prstGeom prst="rect">
             <a:avLst/>
@@ -13729,7 +13810,7 @@
         <p:spPr>
           <a:xfrm>
             <a:off x="1967760" y="3811680"/>
-            <a:ext cx="909720" cy="909720"/>
+            <a:ext cx="909360" cy="909360"/>
           </a:xfrm>
           <a:prstGeom prst="rect">
             <a:avLst/>
@@ -13752,7 +13833,7 @@
         <p:spPr>
           <a:xfrm>
             <a:off x="5221440" y="2907360"/>
-            <a:ext cx="909720" cy="909720"/>
+            <a:ext cx="909360" cy="909360"/>
           </a:xfrm>
           <a:prstGeom prst="rect">
             <a:avLst/>
@@ -13775,7 +13856,7 @@
         <p:spPr>
           <a:xfrm>
             <a:off x="1093680" y="3282480"/>
-            <a:ext cx="909720" cy="909720"/>
+            <a:ext cx="909360" cy="909360"/>
           </a:xfrm>
           <a:prstGeom prst="rect">
             <a:avLst/>
@@ -13798,7 +13879,7 @@
         <p:spPr>
           <a:xfrm>
             <a:off x="8595360" y="3808800"/>
-            <a:ext cx="909720" cy="909720"/>
+            <a:ext cx="909360" cy="909360"/>
           </a:xfrm>
           <a:prstGeom prst="rect">
             <a:avLst/>
@@ -13821,7 +13902,7 @@
         <p:spPr>
           <a:xfrm>
             <a:off x="7839000" y="2294640"/>
-            <a:ext cx="909720" cy="909720"/>
+            <a:ext cx="909360" cy="909360"/>
           </a:xfrm>
           <a:prstGeom prst="rect">
             <a:avLst/>
@@ -13840,7 +13921,7 @@
         <p:spPr>
           <a:xfrm>
             <a:off x="6312960" y="944640"/>
-            <a:ext cx="1521720" cy="1335600"/>
+            <a:ext cx="1521360" cy="1335240"/>
           </a:xfrm>
           <a:custGeom>
             <a:avLst/>
@@ -13893,7 +13974,7 @@
         <p:spPr>
           <a:xfrm>
             <a:off x="5678640" y="1145160"/>
-            <a:ext cx="360" cy="1602000"/>
+            <a:ext cx="360" cy="1601640"/>
           </a:xfrm>
           <a:custGeom>
             <a:avLst/>
@@ -13946,7 +14027,7 @@
         <p:spPr>
           <a:xfrm flipH="1">
             <a:off x="3421800" y="990000"/>
-            <a:ext cx="1613160" cy="1375920"/>
+            <a:ext cx="1612800" cy="1375560"/>
           </a:xfrm>
           <a:custGeom>
             <a:avLst/>
@@ -13999,7 +14080,7 @@
         <p:spPr>
           <a:xfrm>
             <a:off x="2082960" y="3279600"/>
-            <a:ext cx="912960" cy="360360"/>
+            <a:ext cx="912600" cy="360000"/>
           </a:xfrm>
           <a:prstGeom prst="rect">
             <a:avLst/>
@@ -14048,7 +14129,7 @@
         <p:spPr>
           <a:xfrm>
             <a:off x="5227200" y="4030200"/>
-            <a:ext cx="925200" cy="360360"/>
+            <a:ext cx="924840" cy="360000"/>
           </a:xfrm>
           <a:prstGeom prst="rect">
             <a:avLst/>
@@ -14097,7 +14178,7 @@
         <p:spPr>
           <a:xfrm>
             <a:off x="8246520" y="3279600"/>
-            <a:ext cx="1251360" cy="360360"/>
+            <a:ext cx="1251000" cy="360000"/>
           </a:xfrm>
           <a:prstGeom prst="rect">
             <a:avLst/>
@@ -14146,7 +14227,7 @@
         <p:spPr>
           <a:xfrm>
             <a:off x="481680" y="348120"/>
-            <a:ext cx="1807560" cy="360360"/>
+            <a:ext cx="1807200" cy="360000"/>
           </a:xfrm>
           <a:prstGeom prst="rect">
             <a:avLst/>
@@ -14199,7 +14280,7 @@
         <p:spPr>
           <a:xfrm>
             <a:off x="5855760" y="4444560"/>
-            <a:ext cx="909720" cy="909720"/>
+            <a:ext cx="909360" cy="909360"/>
           </a:xfrm>
           <a:prstGeom prst="rect">
             <a:avLst/>
@@ -14240,7 +14321,7 @@
         <p:spPr>
           <a:xfrm>
             <a:off x="684360" y="4487400"/>
-            <a:ext cx="8529840" cy="1502280"/>
+            <a:ext cx="8529480" cy="1501920"/>
           </a:xfrm>
           <a:prstGeom prst="rect">
             <a:avLst/>
@@ -14293,7 +14374,7 @@
         <p:spPr>
           <a:xfrm>
             <a:off x="7839000" y="2560320"/>
-            <a:ext cx="1309680" cy="595440"/>
+            <a:ext cx="1309320" cy="595080"/>
           </a:xfrm>
           <a:prstGeom prst="rect">
             <a:avLst/>
@@ -14312,7 +14393,7 @@
         <p:spPr>
           <a:xfrm>
             <a:off x="480240" y="348120"/>
-            <a:ext cx="1787760" cy="360360"/>
+            <a:ext cx="1787400" cy="360000"/>
           </a:xfrm>
           <a:prstGeom prst="rect">
             <a:avLst/>
@@ -14361,7 +14442,7 @@
         <p:spPr>
           <a:xfrm>
             <a:off x="6384240" y="990000"/>
-            <a:ext cx="1521720" cy="1335600"/>
+            <a:ext cx="1521360" cy="1335240"/>
           </a:xfrm>
           <a:custGeom>
             <a:avLst/>
@@ -14414,7 +14495,7 @@
         <p:spPr>
           <a:xfrm>
             <a:off x="5678640" y="1145160"/>
-            <a:ext cx="360" cy="1602000"/>
+            <a:ext cx="360" cy="1601640"/>
           </a:xfrm>
           <a:custGeom>
             <a:avLst/>
@@ -14467,7 +14548,7 @@
         <p:spPr>
           <a:xfrm flipH="1">
             <a:off x="3421800" y="990000"/>
-            <a:ext cx="1613160" cy="1375920"/>
+            <a:ext cx="1612800" cy="1375560"/>
           </a:xfrm>
           <a:custGeom>
             <a:avLst/>
@@ -14520,7 +14601,7 @@
         <p:spPr>
           <a:xfrm>
             <a:off x="2082960" y="3279600"/>
-            <a:ext cx="912960" cy="360360"/>
+            <a:ext cx="912600" cy="360000"/>
           </a:xfrm>
           <a:prstGeom prst="rect">
             <a:avLst/>
@@ -14569,7 +14650,7 @@
         <p:spPr>
           <a:xfrm>
             <a:off x="5227200" y="4030200"/>
-            <a:ext cx="925200" cy="360360"/>
+            <a:ext cx="924840" cy="360000"/>
           </a:xfrm>
           <a:prstGeom prst="rect">
             <a:avLst/>
@@ -14618,7 +14699,7 @@
         <p:spPr>
           <a:xfrm>
             <a:off x="8246520" y="3279600"/>
-            <a:ext cx="1251360" cy="360360"/>
+            <a:ext cx="1251000" cy="360000"/>
           </a:xfrm>
           <a:prstGeom prst="rect">
             <a:avLst/>
@@ -14671,7 +14752,7 @@
         <p:spPr>
           <a:xfrm>
             <a:off x="4979520" y="218880"/>
-            <a:ext cx="1328760" cy="614520"/>
+            <a:ext cx="1328400" cy="614160"/>
           </a:xfrm>
           <a:prstGeom prst="rect">
             <a:avLst/>
@@ -14694,7 +14775,7 @@
         <p:spPr>
           <a:xfrm>
             <a:off x="2102760" y="2514600"/>
-            <a:ext cx="1319400" cy="604800"/>
+            <a:ext cx="1319040" cy="604440"/>
           </a:xfrm>
           <a:prstGeom prst="rect">
             <a:avLst/>
@@ -14717,7 +14798,7 @@
         <p:spPr>
           <a:xfrm>
             <a:off x="4235760" y="3279600"/>
-            <a:ext cx="1309680" cy="595440"/>
+            <a:ext cx="1309320" cy="595080"/>
           </a:xfrm>
           <a:prstGeom prst="rect">
             <a:avLst/>
@@ -14740,7 +14821,7 @@
         <p:spPr>
           <a:xfrm>
             <a:off x="5833080" y="3279600"/>
-            <a:ext cx="1309680" cy="595440"/>
+            <a:ext cx="1309320" cy="595080"/>
           </a:xfrm>
           <a:prstGeom prst="rect">
             <a:avLst/>
@@ -14781,7 +14862,7 @@
         <p:spPr>
           <a:xfrm>
             <a:off x="684360" y="4487400"/>
-            <a:ext cx="8529840" cy="1502280"/>
+            <a:ext cx="8529480" cy="1501920"/>
           </a:xfrm>
           <a:prstGeom prst="rect">
             <a:avLst/>
@@ -14830,7 +14911,7 @@
         <p:spPr>
           <a:xfrm>
             <a:off x="684360" y="685800"/>
-            <a:ext cx="8529840" cy="3610440"/>
+            <a:ext cx="8529480" cy="3610080"/>
           </a:xfrm>
           <a:prstGeom prst="rect">
             <a:avLst/>
@@ -14849,7 +14930,7 @@
         <p:txBody>
           <a:bodyPr lIns="90000" rIns="90000" tIns="45000" bIns="45000" anchor="ctr"/>
           <a:p>
-            <a:pPr marL="285840" indent="-281160">
+            <a:pPr marL="285840" indent="-280800">
               <a:lnSpc>
                 <a:spcPct val="100000"/>
               </a:lnSpc>
@@ -14925,7 +15006,7 @@
         <p:spPr>
           <a:xfrm>
             <a:off x="666000" y="2574360"/>
-            <a:ext cx="4806000" cy="2969280"/>
+            <a:ext cx="4805640" cy="2968920"/>
           </a:xfrm>
           <a:prstGeom prst="roundRect">
             <a:avLst>
@@ -15075,7 +15156,7 @@
         <p:spPr>
           <a:xfrm>
             <a:off x="684360" y="5241960"/>
-            <a:ext cx="8529840" cy="1502280"/>
+            <a:ext cx="8529480" cy="1501920"/>
           </a:xfrm>
           <a:prstGeom prst="rect">
             <a:avLst/>
@@ -15124,7 +15205,7 @@
         <p:spPr>
           <a:xfrm>
             <a:off x="684360" y="685800"/>
-            <a:ext cx="10985400" cy="2283480"/>
+            <a:ext cx="10985040" cy="2283120"/>
           </a:xfrm>
           <a:prstGeom prst="rect">
             <a:avLst/>
@@ -15145,7 +15226,7 @@
             <a:normAutofit/>
           </a:bodyPr>
           <a:p>
-            <a:pPr marL="285840" indent="-281160">
+            <a:pPr marL="285840" indent="-280800">
               <a:lnSpc>
                 <a:spcPct val="100000"/>
               </a:lnSpc>
@@ -15227,7 +15308,7 @@
             </a:endParaRPr>
           </a:p>
           <a:p>
-            <a:pPr marL="285840" indent="-281160">
+            <a:pPr marL="285840" indent="-280800">
               <a:lnSpc>
                 <a:spcPct val="100000"/>
               </a:lnSpc>
@@ -15351,7 +15432,7 @@
         <p:spPr>
           <a:xfrm>
             <a:off x="2523960" y="3718800"/>
-            <a:ext cx="723600" cy="718560"/>
+            <a:ext cx="723240" cy="718200"/>
           </a:xfrm>
           <a:prstGeom prst="ellipse">
             <a:avLst/>
@@ -15419,7 +15500,7 @@
         <p:spPr>
           <a:xfrm>
             <a:off x="3363480" y="3303360"/>
-            <a:ext cx="1212840" cy="402480"/>
+            <a:ext cx="1212480" cy="402120"/>
           </a:xfrm>
           <a:prstGeom prst="ellipse">
             <a:avLst/>
@@ -15487,7 +15568,7 @@
         <p:spPr>
           <a:xfrm>
             <a:off x="744120" y="3208680"/>
-            <a:ext cx="1586160" cy="670680"/>
+            <a:ext cx="1585800" cy="670320"/>
           </a:xfrm>
           <a:prstGeom prst="ellipse">
             <a:avLst/>
@@ -15555,7 +15636,7 @@
         <p:spPr>
           <a:xfrm>
             <a:off x="2119680" y="4628880"/>
-            <a:ext cx="1525320" cy="670680"/>
+            <a:ext cx="1524960" cy="670320"/>
           </a:xfrm>
           <a:prstGeom prst="ellipse">
             <a:avLst/>
@@ -15623,7 +15704,7 @@
         <p:spPr>
           <a:xfrm>
             <a:off x="6819480" y="2574360"/>
-            <a:ext cx="4806000" cy="2969280"/>
+            <a:ext cx="4805640" cy="2968920"/>
           </a:xfrm>
           <a:prstGeom prst="roundRect">
             <a:avLst>
@@ -15773,7 +15854,7 @@
         <p:spPr>
           <a:xfrm>
             <a:off x="7103880" y="4147560"/>
-            <a:ext cx="4374360" cy="854640"/>
+            <a:ext cx="4374000" cy="854280"/>
           </a:xfrm>
           <a:prstGeom prst="ellipse">
             <a:avLst/>
@@ -15841,7 +15922,7 @@
         <p:spPr>
           <a:xfrm>
             <a:off x="9898200" y="3332520"/>
-            <a:ext cx="1212840" cy="402480"/>
+            <a:ext cx="1212480" cy="402120"/>
           </a:xfrm>
           <a:prstGeom prst="ellipse">
             <a:avLst/>
@@ -15909,7 +15990,7 @@
         <p:spPr>
           <a:xfrm>
             <a:off x="6965640" y="3288960"/>
-            <a:ext cx="1586160" cy="670680"/>
+            <a:ext cx="1585800" cy="670320"/>
           </a:xfrm>
           <a:prstGeom prst="ellipse">
             <a:avLst/>
@@ -15977,7 +16058,7 @@
         <p:spPr>
           <a:xfrm>
             <a:off x="8287920" y="2688120"/>
-            <a:ext cx="1869120" cy="670680"/>
+            <a:ext cx="1868760" cy="670320"/>
           </a:xfrm>
           <a:prstGeom prst="ellipse">
             <a:avLst/>
@@ -16094,7 +16175,7 @@
         <p:spPr>
           <a:xfrm>
             <a:off x="684360" y="4487400"/>
-            <a:ext cx="8529840" cy="1502280"/>
+            <a:ext cx="8529480" cy="1501920"/>
           </a:xfrm>
           <a:prstGeom prst="rect">
             <a:avLst/>
@@ -16143,7 +16224,7 @@
         <p:spPr>
           <a:xfrm>
             <a:off x="684360" y="685800"/>
-            <a:ext cx="11358000" cy="3610440"/>
+            <a:ext cx="11357640" cy="3610080"/>
           </a:xfrm>
           <a:prstGeom prst="rect">
             <a:avLst/>
@@ -16164,7 +16245,7 @@
             <a:normAutofit/>
           </a:bodyPr>
           <a:p>
-            <a:pPr marL="285840" indent="-281160">
+            <a:pPr marL="285840" indent="-280800">
               <a:lnSpc>
                 <a:spcPct val="100000"/>
               </a:lnSpc>
@@ -16206,7 +16287,7 @@
             </a:endParaRPr>
           </a:p>
           <a:p>
-            <a:pPr marL="285840" indent="-281160">
+            <a:pPr marL="285840" indent="-280800">
               <a:lnSpc>
                 <a:spcPct val="100000"/>
               </a:lnSpc>
@@ -16396,7 +16477,7 @@
             </a:endParaRPr>
           </a:p>
           <a:p>
-            <a:pPr marL="285840" indent="-281160">
+            <a:pPr marL="285840" indent="-280800">
               <a:lnSpc>
                 <a:spcPct val="100000"/>
               </a:lnSpc>
@@ -16428,7 +16509,7 @@
             </a:endParaRPr>
           </a:p>
           <a:p>
-            <a:pPr marL="285840" indent="-281160">
+            <a:pPr marL="285840" indent="-280800">
               <a:lnSpc>
                 <a:spcPct val="100000"/>
               </a:lnSpc>
@@ -16519,7 +16600,7 @@
         <p:spPr>
           <a:xfrm>
             <a:off x="684360" y="4487400"/>
-            <a:ext cx="8529840" cy="1502280"/>
+            <a:ext cx="8529480" cy="1501920"/>
           </a:xfrm>
           <a:prstGeom prst="rect">
             <a:avLst/>
@@ -16568,7 +16649,7 @@
         <p:spPr>
           <a:xfrm>
             <a:off x="684360" y="685800"/>
-            <a:ext cx="8529840" cy="3610440"/>
+            <a:ext cx="8529480" cy="3610080"/>
           </a:xfrm>
           <a:prstGeom prst="rect">
             <a:avLst/>
@@ -16587,7 +16668,7 @@
         <p:txBody>
           <a:bodyPr lIns="90000" rIns="90000" tIns="45000" bIns="45000" anchor="ctr"/>
           <a:p>
-            <a:pPr marL="285840" indent="-281160">
+            <a:pPr marL="285840" indent="-280800">
               <a:lnSpc>
                 <a:spcPct val="100000"/>
               </a:lnSpc>
@@ -16689,7 +16770,7 @@
             </a:endParaRPr>
           </a:p>
           <a:p>
-            <a:pPr marL="285840" indent="-281160">
+            <a:pPr marL="285840" indent="-280800">
               <a:lnSpc>
                 <a:spcPct val="100000"/>
               </a:lnSpc>
@@ -16791,7 +16872,7 @@
         <p:spPr>
           <a:xfrm>
             <a:off x="2521440" y="3979080"/>
-            <a:ext cx="1877400" cy="803160"/>
+            <a:ext cx="1877040" cy="802800"/>
           </a:xfrm>
           <a:prstGeom prst="rect">
             <a:avLst/>
@@ -16857,7 +16938,7 @@
         <p:spPr>
           <a:xfrm>
             <a:off x="5487840" y="3979080"/>
-            <a:ext cx="1877400" cy="803160"/>
+            <a:ext cx="1877040" cy="802800"/>
           </a:xfrm>
           <a:prstGeom prst="rect">
             <a:avLst/>
@@ -16923,7 +17004,7 @@
         <p:spPr>
           <a:xfrm>
             <a:off x="4004640" y="2771640"/>
-            <a:ext cx="1877400" cy="803160"/>
+            <a:ext cx="1877040" cy="802800"/>
           </a:xfrm>
           <a:prstGeom prst="rect">
             <a:avLst/>
@@ -16989,7 +17070,7 @@
         <p:spPr>
           <a:xfrm>
             <a:off x="4483080" y="4383000"/>
-            <a:ext cx="1000080" cy="360"/>
+            <a:ext cx="999720" cy="360"/>
           </a:xfrm>
           <a:custGeom>
             <a:avLst/>
@@ -17041,7 +17122,7 @@
         <p:spPr>
           <a:xfrm>
             <a:off x="4985640" y="3657600"/>
-            <a:ext cx="360" cy="574920"/>
+            <a:ext cx="360" cy="574560"/>
           </a:xfrm>
           <a:custGeom>
             <a:avLst/>
@@ -17142,7 +17223,7 @@
         <p:spPr>
           <a:xfrm>
             <a:off x="0" y="0"/>
-            <a:ext cx="12187440" cy="6853320"/>
+            <a:ext cx="12187080" cy="6852960"/>
           </a:xfrm>
           <a:prstGeom prst="rect">
             <a:avLst/>
@@ -17195,7 +17276,7 @@
         <p:spPr>
           <a:xfrm>
             <a:off x="640440" y="685800"/>
-            <a:ext cx="4813920" cy="4599000"/>
+            <a:ext cx="4813560" cy="4598640"/>
           </a:xfrm>
           <a:prstGeom prst="rect">
             <a:avLst/>
@@ -17246,7 +17327,7 @@
         <p:spPr>
           <a:xfrm>
             <a:off x="6095880" y="0"/>
-            <a:ext cx="6091200" cy="6853320"/>
+            <a:ext cx="6090840" cy="6852960"/>
           </a:xfrm>
           <a:prstGeom prst="rect">
             <a:avLst/>
@@ -17284,7 +17365,7 @@
         <p:spPr>
           <a:xfrm>
             <a:off x="6625800" y="685800"/>
-            <a:ext cx="4874400" cy="4599000"/>
+            <a:ext cx="4874040" cy="4598640"/>
           </a:xfrm>
           <a:prstGeom prst="rect">
             <a:avLst/>
@@ -17305,7 +17386,7 @@
             <a:normAutofit/>
           </a:bodyPr>
           <a:p>
-            <a:pPr marL="285840" indent="-281160">
+            <a:pPr marL="285840" indent="-280800">
               <a:lnSpc>
                 <a:spcPct val="100000"/>
               </a:lnSpc>
@@ -17337,7 +17418,7 @@
             </a:endParaRPr>
           </a:p>
           <a:p>
-            <a:pPr marL="285840" indent="-281160">
+            <a:pPr marL="285840" indent="-280800">
               <a:lnSpc>
                 <a:spcPct val="100000"/>
               </a:lnSpc>
@@ -17369,7 +17450,7 @@
             </a:endParaRPr>
           </a:p>
           <a:p>
-            <a:pPr marL="285840" indent="-281160">
+            <a:pPr marL="285840" indent="-280800">
               <a:lnSpc>
                 <a:spcPct val="100000"/>
               </a:lnSpc>
@@ -17401,7 +17482,7 @@
             </a:endParaRPr>
           </a:p>
           <a:p>
-            <a:pPr marL="285840" indent="-281160">
+            <a:pPr marL="285840" indent="-280800">
               <a:lnSpc>
                 <a:spcPct val="100000"/>
               </a:lnSpc>
@@ -17492,7 +17573,7 @@
         <p:spPr>
           <a:xfrm>
             <a:off x="684360" y="4487400"/>
-            <a:ext cx="8529840" cy="1502280"/>
+            <a:ext cx="8529480" cy="1501920"/>
           </a:xfrm>
           <a:prstGeom prst="rect">
             <a:avLst/>
@@ -17541,7 +17622,7 @@
         <p:spPr>
           <a:xfrm>
             <a:off x="1044720" y="500040"/>
-            <a:ext cx="8259480" cy="3228120"/>
+            <a:ext cx="8259120" cy="3227760"/>
           </a:xfrm>
           <a:prstGeom prst="rect">
             <a:avLst/>
@@ -17560,7 +17641,7 @@
         <p:txBody>
           <a:bodyPr lIns="90000" rIns="90000" tIns="45000" bIns="45000" anchor="ctr"/>
           <a:p>
-            <a:pPr marL="285840" indent="-281160">
+            <a:pPr marL="285840" indent="-280800">
               <a:lnSpc>
                 <a:spcPct val="100000"/>
               </a:lnSpc>
@@ -17602,7 +17683,7 @@
             </a:endParaRPr>
           </a:p>
           <a:p>
-            <a:pPr marL="285840" indent="-281160">
+            <a:pPr marL="285840" indent="-280800">
               <a:lnSpc>
                 <a:spcPct val="100000"/>
               </a:lnSpc>
@@ -17654,7 +17735,7 @@
             </a:endParaRPr>
           </a:p>
           <a:p>
-            <a:pPr marL="285840" indent="-281160">
+            <a:pPr marL="285840" indent="-280800">
               <a:lnSpc>
                 <a:spcPct val="100000"/>
               </a:lnSpc>
@@ -17806,7 +17887,7 @@
         <p:spPr>
           <a:xfrm>
             <a:off x="7097760" y="1943280"/>
-            <a:ext cx="849960" cy="849960"/>
+            <a:ext cx="849600" cy="849600"/>
           </a:xfrm>
           <a:prstGeom prst="rect">
             <a:avLst/>
@@ -17829,7 +17910,7 @@
         <p:spPr>
           <a:xfrm>
             <a:off x="6931800" y="4296600"/>
-            <a:ext cx="1176480" cy="468720"/>
+            <a:ext cx="1176120" cy="468360"/>
           </a:xfrm>
           <a:prstGeom prst="rect">
             <a:avLst/>
@@ -17852,7 +17933,7 @@
         <p:spPr>
           <a:xfrm>
             <a:off x="7054200" y="2896920"/>
-            <a:ext cx="893520" cy="1035720"/>
+            <a:ext cx="893160" cy="1035360"/>
           </a:xfrm>
           <a:prstGeom prst="rect">
             <a:avLst/>
@@ -17875,7 +17956,7 @@
         <p:spPr>
           <a:xfrm>
             <a:off x="2718360" y="2064960"/>
-            <a:ext cx="909720" cy="909720"/>
+            <a:ext cx="909360" cy="909360"/>
           </a:xfrm>
           <a:prstGeom prst="rect">
             <a:avLst/>
@@ -17898,7 +17979,7 @@
         <p:spPr>
           <a:xfrm>
             <a:off x="2739240" y="3371040"/>
-            <a:ext cx="909720" cy="909720"/>
+            <a:ext cx="909360" cy="909360"/>
           </a:xfrm>
           <a:prstGeom prst="rect">
             <a:avLst/>
@@ -17921,7 +18002,7 @@
         <p:spPr>
           <a:xfrm>
             <a:off x="4908600" y="2852280"/>
-            <a:ext cx="909720" cy="909720"/>
+            <a:ext cx="909360" cy="909360"/>
           </a:xfrm>
           <a:prstGeom prst="rect">
             <a:avLst/>
@@ -17939,8 +18020,8 @@
         </p:nvSpPr>
         <p:spPr>
           <a:xfrm rot="1192200">
-            <a:off x="4046040" y="2671200"/>
-            <a:ext cx="973800" cy="479880"/>
+            <a:off x="4046040" y="2670840"/>
+            <a:ext cx="973440" cy="479520"/>
           </a:xfrm>
           <a:prstGeom prst="rightArrow">
             <a:avLst>
@@ -17981,8 +18062,8 @@
         </p:nvSpPr>
         <p:spPr>
           <a:xfrm rot="20407800">
-            <a:off x="4025160" y="3459240"/>
-            <a:ext cx="973800" cy="479880"/>
+            <a:off x="4024800" y="3458880"/>
+            <a:ext cx="973440" cy="479520"/>
           </a:xfrm>
           <a:prstGeom prst="rightArrow">
             <a:avLst>
@@ -18023,8 +18104,8 @@
         </p:nvSpPr>
         <p:spPr>
           <a:xfrm rot="1192200">
-            <a:off x="5799600" y="3779640"/>
-            <a:ext cx="973800" cy="479880"/>
+            <a:off x="5799600" y="3779280"/>
+            <a:ext cx="973440" cy="479520"/>
           </a:xfrm>
           <a:prstGeom prst="rightArrow">
             <a:avLst>
@@ -18065,8 +18146,8 @@
         </p:nvSpPr>
         <p:spPr>
           <a:xfrm rot="20407800">
-            <a:off x="5873400" y="2454840"/>
-            <a:ext cx="973800" cy="479880"/>
+            <a:off x="5873040" y="2454480"/>
+            <a:ext cx="973440" cy="479520"/>
           </a:xfrm>
           <a:prstGeom prst="rightArrow">
             <a:avLst>
@@ -18108,7 +18189,7 @@
         <p:spPr>
           <a:xfrm>
             <a:off x="5951880" y="3115440"/>
-            <a:ext cx="973800" cy="479880"/>
+            <a:ext cx="973440" cy="479520"/>
           </a:xfrm>
           <a:prstGeom prst="rightArrow">
             <a:avLst>
@@ -18199,7 +18280,7 @@
         <p:spPr>
           <a:xfrm>
             <a:off x="684360" y="4487400"/>
-            <a:ext cx="8529840" cy="1502280"/>
+            <a:ext cx="8529480" cy="1501920"/>
           </a:xfrm>
           <a:prstGeom prst="rect">
             <a:avLst/>
@@ -18248,7 +18329,7 @@
         <p:spPr>
           <a:xfrm>
             <a:off x="684360" y="685800"/>
-            <a:ext cx="8529840" cy="3610440"/>
+            <a:ext cx="8529480" cy="3610080"/>
           </a:xfrm>
           <a:prstGeom prst="rect">
             <a:avLst/>
@@ -18267,7 +18348,7 @@
         <p:txBody>
           <a:bodyPr lIns="90000" rIns="90000" tIns="45000" bIns="45000" anchor="ctr"/>
           <a:p>
-            <a:pPr marL="285840" indent="-281160">
+            <a:pPr marL="285840" indent="-280800">
               <a:lnSpc>
                 <a:spcPct val="100000"/>
               </a:lnSpc>
@@ -18359,7 +18440,7 @@
             </a:endParaRPr>
           </a:p>
           <a:p>
-            <a:pPr marL="285840" indent="-281160">
+            <a:pPr marL="285840" indent="-280800">
               <a:lnSpc>
                 <a:spcPct val="100000"/>
               </a:lnSpc>
@@ -18411,7 +18492,7 @@
             </a:endParaRPr>
           </a:p>
           <a:p>
-            <a:pPr marL="285840" indent="-281160">
+            <a:pPr marL="285840" indent="-280800">
               <a:lnSpc>
                 <a:spcPct val="100000"/>
               </a:lnSpc>
@@ -18497,7 +18578,7 @@
         <p:spPr>
           <a:xfrm>
             <a:off x="6227640" y="3794400"/>
-            <a:ext cx="909720" cy="909720"/>
+            <a:ext cx="909360" cy="909360"/>
           </a:xfrm>
           <a:prstGeom prst="rect">
             <a:avLst/>
@@ -18520,7 +18601,7 @@
         <p:spPr>
           <a:xfrm>
             <a:off x="2468520" y="3843720"/>
-            <a:ext cx="909720" cy="909720"/>
+            <a:ext cx="909360" cy="909360"/>
           </a:xfrm>
           <a:prstGeom prst="rect">
             <a:avLst/>
@@ -18543,7 +18624,7 @@
         <p:spPr>
           <a:xfrm>
             <a:off x="9790920" y="3794400"/>
-            <a:ext cx="909720" cy="909720"/>
+            <a:ext cx="909360" cy="909360"/>
           </a:xfrm>
           <a:prstGeom prst="rect">
             <a:avLst/>
@@ -18566,7 +18647,7 @@
         <p:spPr>
           <a:xfrm>
             <a:off x="7903800" y="3794400"/>
-            <a:ext cx="909720" cy="909720"/>
+            <a:ext cx="909360" cy="909360"/>
           </a:xfrm>
           <a:prstGeom prst="rect">
             <a:avLst/>
@@ -18589,7 +18670,7 @@
         <p:spPr>
           <a:xfrm>
             <a:off x="4412520" y="3794400"/>
-            <a:ext cx="909720" cy="909720"/>
+            <a:ext cx="909360" cy="909360"/>
           </a:xfrm>
           <a:prstGeom prst="rect">
             <a:avLst/>
@@ -18612,7 +18693,7 @@
         <p:spPr>
           <a:xfrm>
             <a:off x="684360" y="3843720"/>
-            <a:ext cx="909720" cy="909720"/>
+            <a:ext cx="909360" cy="909360"/>
           </a:xfrm>
           <a:prstGeom prst="rect">
             <a:avLst/>
@@ -18631,7 +18712,7 @@
         <p:spPr>
           <a:xfrm>
             <a:off x="1638000" y="4183200"/>
-            <a:ext cx="678240" cy="257400"/>
+            <a:ext cx="677880" cy="257040"/>
           </a:xfrm>
           <a:prstGeom prst="rightArrow">
             <a:avLst>
@@ -18670,7 +18751,7 @@
         <p:spPr>
           <a:xfrm>
             <a:off x="3511800" y="4201920"/>
-            <a:ext cx="678240" cy="257400"/>
+            <a:ext cx="677880" cy="257040"/>
           </a:xfrm>
           <a:prstGeom prst="rightArrow">
             <a:avLst>
@@ -18709,7 +18790,7 @@
         <p:spPr>
           <a:xfrm>
             <a:off x="5366520" y="4193640"/>
-            <a:ext cx="678240" cy="257400"/>
+            <a:ext cx="677880" cy="257040"/>
           </a:xfrm>
           <a:prstGeom prst="rightArrow">
             <a:avLst>
@@ -18748,7 +18829,7 @@
         <p:spPr>
           <a:xfrm>
             <a:off x="7162200" y="4183200"/>
-            <a:ext cx="678240" cy="257400"/>
+            <a:ext cx="677880" cy="257040"/>
           </a:xfrm>
           <a:prstGeom prst="rightArrow">
             <a:avLst>
@@ -18787,7 +18868,7 @@
         <p:spPr>
           <a:xfrm>
             <a:off x="8876160" y="4169880"/>
-            <a:ext cx="678240" cy="257400"/>
+            <a:ext cx="677880" cy="257040"/>
           </a:xfrm>
           <a:prstGeom prst="rightArrow">
             <a:avLst>
@@ -18875,7 +18956,7 @@
         <p:spPr>
           <a:xfrm>
             <a:off x="684360" y="4487400"/>
-            <a:ext cx="8529840" cy="1502280"/>
+            <a:ext cx="8529480" cy="1501920"/>
           </a:xfrm>
           <a:prstGeom prst="rect">
             <a:avLst/>
@@ -18924,7 +19005,7 @@
         <p:spPr>
           <a:xfrm>
             <a:off x="684360" y="685800"/>
-            <a:ext cx="8529840" cy="3610440"/>
+            <a:ext cx="8529480" cy="3610080"/>
           </a:xfrm>
           <a:prstGeom prst="rect">
             <a:avLst/>
@@ -18943,7 +19024,7 @@
         <p:txBody>
           <a:bodyPr lIns="90000" rIns="90000" tIns="45000" bIns="45000" anchor="ctr"/>
           <a:p>
-            <a:pPr marL="285840" indent="-281160">
+            <a:pPr marL="285840" indent="-280800">
               <a:lnSpc>
                 <a:spcPct val="100000"/>
               </a:lnSpc>
@@ -19025,7 +19106,7 @@
             </a:endParaRPr>
           </a:p>
           <a:p>
-            <a:pPr marL="285840" indent="-281160">
+            <a:pPr marL="285840" indent="-280800">
               <a:lnSpc>
                 <a:spcPct val="100000"/>
               </a:lnSpc>
@@ -19071,7 +19152,7 @@
         <p:spPr>
           <a:xfrm>
             <a:off x="4681800" y="2481480"/>
-            <a:ext cx="909720" cy="909720"/>
+            <a:ext cx="909360" cy="909360"/>
           </a:xfrm>
           <a:prstGeom prst="rect">
             <a:avLst/>
@@ -19094,7 +19175,7 @@
         <p:spPr>
           <a:xfrm>
             <a:off x="6609240" y="3669480"/>
-            <a:ext cx="909720" cy="909720"/>
+            <a:ext cx="909360" cy="909360"/>
           </a:xfrm>
           <a:prstGeom prst="rect">
             <a:avLst/>
@@ -19117,7 +19198,7 @@
         <p:spPr>
           <a:xfrm>
             <a:off x="2973240" y="3669480"/>
-            <a:ext cx="909720" cy="909720"/>
+            <a:ext cx="909360" cy="909360"/>
           </a:xfrm>
           <a:prstGeom prst="rect">
             <a:avLst/>
@@ -19136,7 +19217,7 @@
         <p:spPr>
           <a:xfrm>
             <a:off x="4214160" y="3946320"/>
-            <a:ext cx="2063880" cy="356040"/>
+            <a:ext cx="2063520" cy="355680"/>
           </a:xfrm>
           <a:prstGeom prst="rightArrow">
             <a:avLst>
@@ -19175,7 +19256,7 @@
         <p:spPr>
           <a:xfrm>
             <a:off x="4988160" y="3533400"/>
-            <a:ext cx="297000" cy="402480"/>
+            <a:ext cx="296640" cy="402120"/>
           </a:xfrm>
           <a:prstGeom prst="downArrow">
             <a:avLst>

</xml_diff>

<commit_message>
#12 Weak AI vs Strong AI explanation speech part 9 added on introduction slides
</commit_message>
<xml_diff>
--- a/SAI_presentation_libre_office.pptx
+++ b/SAI_presentation_libre_office.pptx
@@ -250,7 +250,7 @@
           <a:bodyPr lIns="0" rIns="0" tIns="0" bIns="0" anchor="b"/>
           <a:p>
             <a:pPr algn="r"/>
-            <a:fld id="{FB28A020-7575-46CD-B827-FEACEC1EDAF0}" type="slidenum">
+            <a:fld id="{4A9370F0-5C00-41A5-B2ED-826CA994742E}" type="slidenum">
               <a:rPr b="0" lang="fr-FR" sz="1400" spc="-1" strike="noStrike">
                 <a:latin typeface="Times New Roman"/>
               </a:rPr>
@@ -298,7 +298,7 @@
         <p:spPr>
           <a:xfrm>
             <a:off x="685800" y="1143000"/>
-            <a:ext cx="5481360" cy="3081240"/>
+            <a:ext cx="5481000" cy="3080880"/>
           </a:xfrm>
           <a:prstGeom prst="rect">
             <a:avLst/>
@@ -318,7 +318,7 @@
         <p:spPr>
           <a:xfrm>
             <a:off x="685800" y="4400640"/>
-            <a:ext cx="5481360" cy="3595320"/>
+            <a:ext cx="5481000" cy="3594960"/>
           </a:xfrm>
           <a:prstGeom prst="rect">
             <a:avLst/>
@@ -327,7 +327,7 @@
         <p:txBody>
           <a:bodyPr lIns="0" rIns="0" tIns="0" bIns="0"/>
           <a:p>
-            <a:pPr marL="216000" indent="-211320">
+            <a:pPr marL="216000" indent="-210960">
               <a:lnSpc>
                 <a:spcPct val="100000"/>
               </a:lnSpc>
@@ -343,7 +343,7 @@
             </a:endParaRPr>
           </a:p>
           <a:p>
-            <a:pPr marL="216000" indent="-211320">
+            <a:pPr marL="216000" indent="-210960">
               <a:lnSpc>
                 <a:spcPct val="100000"/>
               </a:lnSpc>
@@ -360,7 +360,7 @@
             </a:endParaRPr>
           </a:p>
           <a:p>
-            <a:pPr marL="216000" indent="-211320">
+            <a:pPr marL="216000" indent="-210960">
               <a:lnSpc>
                 <a:spcPct val="100000"/>
               </a:lnSpc>
@@ -376,7 +376,7 @@
             </a:endParaRPr>
           </a:p>
           <a:p>
-            <a:pPr marL="216000" indent="-211320">
+            <a:pPr marL="216000" indent="-210960">
               <a:lnSpc>
                 <a:spcPct val="100000"/>
               </a:lnSpc>
@@ -392,7 +392,7 @@
             </a:endParaRPr>
           </a:p>
           <a:p>
-            <a:pPr marL="216000" indent="-211320">
+            <a:pPr marL="216000" indent="-210960">
               <a:lnSpc>
                 <a:spcPct val="100000"/>
               </a:lnSpc>
@@ -419,7 +419,7 @@
         <p:spPr>
           <a:xfrm>
             <a:off x="3884760" y="8685360"/>
-            <a:ext cx="2966760" cy="453600"/>
+            <a:ext cx="2966400" cy="453240"/>
           </a:xfrm>
           <a:prstGeom prst="rect">
             <a:avLst/>
@@ -443,7 +443,7 @@
                 <a:spcPct val="100000"/>
               </a:lnSpc>
             </a:pPr>
-            <a:fld id="{D2EB33B4-3C90-4C3E-BC0E-AFF02F4E2B5D}" type="slidenum">
+            <a:fld id="{86086E7F-7C18-4864-8788-21FA4BFE37F9}" type="slidenum">
               <a:rPr b="0" lang="fr-FR" sz="1200" spc="-1" strike="noStrike">
                 <a:solidFill>
                   <a:srgbClr val="000000"/>
@@ -493,7 +493,7 @@
         <p:spPr>
           <a:xfrm>
             <a:off x="685800" y="1143000"/>
-            <a:ext cx="5481360" cy="3081240"/>
+            <a:ext cx="5481000" cy="3080880"/>
           </a:xfrm>
           <a:prstGeom prst="rect">
             <a:avLst/>
@@ -513,7 +513,7 @@
         <p:spPr>
           <a:xfrm>
             <a:off x="685800" y="4400640"/>
-            <a:ext cx="5481360" cy="3595320"/>
+            <a:ext cx="5481000" cy="3594960"/>
           </a:xfrm>
           <a:prstGeom prst="rect">
             <a:avLst/>
@@ -522,7 +522,7 @@
         <p:txBody>
           <a:bodyPr lIns="0" rIns="0" tIns="0" bIns="0"/>
           <a:p>
-            <a:pPr marL="216000" indent="-211680">
+            <a:pPr marL="216000" indent="-211320">
               <a:lnSpc>
                 <a:spcPct val="100000"/>
               </a:lnSpc>
@@ -538,7 +538,7 @@
             </a:endParaRPr>
           </a:p>
           <a:p>
-            <a:pPr marL="216000" indent="-211680">
+            <a:pPr marL="216000" indent="-211320">
               <a:lnSpc>
                 <a:spcPct val="100000"/>
               </a:lnSpc>
@@ -548,7 +548,7 @@
             </a:endParaRPr>
           </a:p>
           <a:p>
-            <a:pPr marL="216000" indent="-211680">
+            <a:pPr marL="216000" indent="-211320">
               <a:lnSpc>
                 <a:spcPct val="100000"/>
               </a:lnSpc>
@@ -564,7 +564,7 @@
             </a:endParaRPr>
           </a:p>
           <a:p>
-            <a:pPr marL="216000" indent="-211680">
+            <a:pPr marL="216000" indent="-211320">
               <a:lnSpc>
                 <a:spcPct val="100000"/>
               </a:lnSpc>
@@ -574,7 +574,7 @@
             </a:endParaRPr>
           </a:p>
           <a:p>
-            <a:pPr marL="216000" indent="-211680">
+            <a:pPr marL="216000" indent="-211320">
               <a:lnSpc>
                 <a:spcPct val="100000"/>
               </a:lnSpc>
@@ -590,7 +590,7 @@
             </a:endParaRPr>
           </a:p>
           <a:p>
-            <a:pPr marL="216000" indent="-211680">
+            <a:pPr marL="216000" indent="-211320">
               <a:lnSpc>
                 <a:spcPct val="100000"/>
               </a:lnSpc>
@@ -600,7 +600,7 @@
             </a:endParaRPr>
           </a:p>
           <a:p>
-            <a:pPr marL="216000" indent="-211680">
+            <a:pPr marL="216000" indent="-211320">
               <a:lnSpc>
                 <a:spcPct val="100000"/>
               </a:lnSpc>
@@ -616,7 +616,7 @@
             </a:endParaRPr>
           </a:p>
           <a:p>
-            <a:pPr marL="216000" indent="-211680">
+            <a:pPr marL="216000" indent="-211320">
               <a:lnSpc>
                 <a:spcPct val="100000"/>
               </a:lnSpc>
@@ -626,7 +626,7 @@
             </a:endParaRPr>
           </a:p>
           <a:p>
-            <a:pPr marL="216000" indent="-211680">
+            <a:pPr marL="216000" indent="-211320">
               <a:lnSpc>
                 <a:spcPct val="100000"/>
               </a:lnSpc>
@@ -636,7 +636,7 @@
             </a:endParaRPr>
           </a:p>
           <a:p>
-            <a:pPr marL="216000" indent="-211680">
+            <a:pPr marL="216000" indent="-211320">
               <a:lnSpc>
                 <a:spcPct val="100000"/>
               </a:lnSpc>
@@ -652,7 +652,7 @@
             </a:endParaRPr>
           </a:p>
           <a:p>
-            <a:pPr marL="216000" indent="-211680">
+            <a:pPr marL="216000" indent="-211320">
               <a:lnSpc>
                 <a:spcPct val="100000"/>
               </a:lnSpc>
@@ -668,7 +668,7 @@
             </a:endParaRPr>
           </a:p>
           <a:p>
-            <a:pPr marL="216000" indent="-211680">
+            <a:pPr marL="216000" indent="-211320">
               <a:lnSpc>
                 <a:spcPct val="100000"/>
               </a:lnSpc>
@@ -684,7 +684,7 @@
             </a:endParaRPr>
           </a:p>
           <a:p>
-            <a:pPr marL="216000" indent="-211680">
+            <a:pPr marL="216000" indent="-211320">
               <a:lnSpc>
                 <a:spcPct val="100000"/>
               </a:lnSpc>
@@ -694,7 +694,7 @@
             </a:endParaRPr>
           </a:p>
           <a:p>
-            <a:pPr marL="216000" indent="-211680">
+            <a:pPr marL="216000" indent="-211320">
               <a:lnSpc>
                 <a:spcPct val="100000"/>
               </a:lnSpc>
@@ -710,7 +710,7 @@
             </a:endParaRPr>
           </a:p>
           <a:p>
-            <a:pPr marL="216000" indent="-211680">
+            <a:pPr marL="216000" indent="-211320">
               <a:lnSpc>
                 <a:spcPct val="100000"/>
               </a:lnSpc>
@@ -720,7 +720,7 @@
             </a:endParaRPr>
           </a:p>
           <a:p>
-            <a:pPr marL="216000" indent="-211680">
+            <a:pPr marL="216000" indent="-211320">
               <a:lnSpc>
                 <a:spcPct val="100000"/>
               </a:lnSpc>
@@ -736,7 +736,7 @@
             </a:endParaRPr>
           </a:p>
           <a:p>
-            <a:pPr marL="216000" indent="-211680">
+            <a:pPr marL="216000" indent="-211320">
               <a:lnSpc>
                 <a:spcPct val="100000"/>
               </a:lnSpc>
@@ -752,7 +752,7 @@
             </a:endParaRPr>
           </a:p>
           <a:p>
-            <a:pPr marL="216000" indent="-211680">
+            <a:pPr marL="216000" indent="-211320">
               <a:lnSpc>
                 <a:spcPct val="100000"/>
               </a:lnSpc>
@@ -768,7 +768,7 @@
             </a:endParaRPr>
           </a:p>
           <a:p>
-            <a:pPr marL="216000" indent="-211680">
+            <a:pPr marL="216000" indent="-211320">
               <a:lnSpc>
                 <a:spcPct val="100000"/>
               </a:lnSpc>
@@ -784,7 +784,7 @@
             </a:endParaRPr>
           </a:p>
           <a:p>
-            <a:pPr marL="216000" indent="-211680">
+            <a:pPr marL="216000" indent="-211320">
               <a:lnSpc>
                 <a:spcPct val="100000"/>
               </a:lnSpc>
@@ -794,7 +794,7 @@
             </a:endParaRPr>
           </a:p>
           <a:p>
-            <a:pPr marL="216000" indent="-211680">
+            <a:pPr marL="216000" indent="-211320">
               <a:lnSpc>
                 <a:spcPct val="100000"/>
               </a:lnSpc>
@@ -810,7 +810,7 @@
             </a:endParaRPr>
           </a:p>
           <a:p>
-            <a:pPr marL="216000" indent="-211680">
+            <a:pPr marL="216000" indent="-211320">
               <a:lnSpc>
                 <a:spcPct val="100000"/>
               </a:lnSpc>
@@ -826,7 +826,7 @@
             </a:endParaRPr>
           </a:p>
           <a:p>
-            <a:pPr marL="216000" indent="-211680">
+            <a:pPr marL="216000" indent="-211320">
               <a:lnSpc>
                 <a:spcPct val="100000"/>
               </a:lnSpc>
@@ -842,7 +842,7 @@
             </a:endParaRPr>
           </a:p>
           <a:p>
-            <a:pPr marL="216000" indent="-211680">
+            <a:pPr marL="216000" indent="-211320">
               <a:lnSpc>
                 <a:spcPct val="100000"/>
               </a:lnSpc>
@@ -858,7 +858,7 @@
             </a:endParaRPr>
           </a:p>
           <a:p>
-            <a:pPr marL="216000" indent="-211680">
+            <a:pPr marL="216000" indent="-211320">
               <a:lnSpc>
                 <a:spcPct val="100000"/>
               </a:lnSpc>
@@ -874,7 +874,7 @@
             </a:endParaRPr>
           </a:p>
           <a:p>
-            <a:pPr marL="216000" indent="-211680">
+            <a:pPr marL="216000" indent="-211320">
               <a:lnSpc>
                 <a:spcPct val="100000"/>
               </a:lnSpc>
@@ -884,7 +884,7 @@
             </a:endParaRPr>
           </a:p>
           <a:p>
-            <a:pPr marL="216000" indent="-211680">
+            <a:pPr marL="216000" indent="-211320">
               <a:lnSpc>
                 <a:spcPct val="100000"/>
               </a:lnSpc>
@@ -900,7 +900,7 @@
             </a:endParaRPr>
           </a:p>
           <a:p>
-            <a:pPr marL="216000" indent="-211680">
+            <a:pPr marL="216000" indent="-211320">
               <a:lnSpc>
                 <a:spcPct val="100000"/>
               </a:lnSpc>
@@ -916,7 +916,7 @@
             </a:endParaRPr>
           </a:p>
           <a:p>
-            <a:pPr marL="216000" indent="-211680">
+            <a:pPr marL="216000" indent="-211320">
               <a:lnSpc>
                 <a:spcPct val="100000"/>
               </a:lnSpc>
@@ -932,7 +932,7 @@
             </a:endParaRPr>
           </a:p>
           <a:p>
-            <a:pPr marL="216000" indent="-211680">
+            <a:pPr marL="216000" indent="-211320">
               <a:lnSpc>
                 <a:spcPct val="100000"/>
               </a:lnSpc>
@@ -942,7 +942,7 @@
             </a:endParaRPr>
           </a:p>
           <a:p>
-            <a:pPr marL="216000" indent="-211680">
+            <a:pPr marL="216000" indent="-211320">
               <a:lnSpc>
                 <a:spcPct val="100000"/>
               </a:lnSpc>
@@ -958,7 +958,7 @@
             </a:endParaRPr>
           </a:p>
           <a:p>
-            <a:pPr marL="216000" indent="-211680">
+            <a:pPr marL="216000" indent="-211320">
               <a:lnSpc>
                 <a:spcPct val="100000"/>
               </a:lnSpc>
@@ -974,7 +974,7 @@
             </a:endParaRPr>
           </a:p>
           <a:p>
-            <a:pPr marL="216000" indent="-211680">
+            <a:pPr marL="216000" indent="-211320">
               <a:lnSpc>
                 <a:spcPct val="100000"/>
               </a:lnSpc>
@@ -990,7 +990,7 @@
             </a:endParaRPr>
           </a:p>
           <a:p>
-            <a:pPr marL="216000" indent="-211680">
+            <a:pPr marL="216000" indent="-211320">
               <a:lnSpc>
                 <a:spcPct val="100000"/>
               </a:lnSpc>
@@ -1000,7 +1000,7 @@
             </a:endParaRPr>
           </a:p>
           <a:p>
-            <a:pPr marL="216000" indent="-211680">
+            <a:pPr marL="216000" indent="-211320">
               <a:lnSpc>
                 <a:spcPct val="100000"/>
               </a:lnSpc>
@@ -1016,7 +1016,7 @@
             </a:endParaRPr>
           </a:p>
           <a:p>
-            <a:pPr marL="216000" indent="-211680">
+            <a:pPr marL="216000" indent="-211320">
               <a:lnSpc>
                 <a:spcPct val="100000"/>
               </a:lnSpc>
@@ -1032,7 +1032,7 @@
             </a:endParaRPr>
           </a:p>
           <a:p>
-            <a:pPr marL="216000" indent="-211680">
+            <a:pPr marL="216000" indent="-211320">
               <a:lnSpc>
                 <a:spcPct val="100000"/>
               </a:lnSpc>
@@ -1048,7 +1048,7 @@
             </a:endParaRPr>
           </a:p>
           <a:p>
-            <a:pPr marL="216000" indent="-211680">
+            <a:pPr marL="216000" indent="-211320">
               <a:lnSpc>
                 <a:spcPct val="100000"/>
               </a:lnSpc>
@@ -1064,7 +1064,7 @@
             </a:endParaRPr>
           </a:p>
           <a:p>
-            <a:pPr marL="216000" indent="-211680">
+            <a:pPr marL="216000" indent="-211320">
               <a:lnSpc>
                 <a:spcPct val="100000"/>
               </a:lnSpc>
@@ -1074,7 +1074,7 @@
             </a:endParaRPr>
           </a:p>
           <a:p>
-            <a:pPr marL="216000" indent="-211680">
+            <a:pPr marL="216000" indent="-211320">
               <a:lnSpc>
                 <a:spcPct val="100000"/>
               </a:lnSpc>
@@ -1090,7 +1090,7 @@
             </a:endParaRPr>
           </a:p>
           <a:p>
-            <a:pPr marL="216000" indent="-211680">
+            <a:pPr marL="216000" indent="-211320">
               <a:lnSpc>
                 <a:spcPct val="100000"/>
               </a:lnSpc>
@@ -1107,7 +1107,7 @@
             </a:endParaRPr>
           </a:p>
           <a:p>
-            <a:pPr marL="216000" indent="-211680">
+            <a:pPr marL="216000" indent="-211320">
               <a:lnSpc>
                 <a:spcPct val="100000"/>
               </a:lnSpc>
@@ -1124,7 +1124,7 @@
             </a:endParaRPr>
           </a:p>
           <a:p>
-            <a:pPr marL="216000" indent="-211680">
+            <a:pPr marL="216000" indent="-211320">
               <a:lnSpc>
                 <a:spcPct val="100000"/>
               </a:lnSpc>
@@ -1141,7 +1141,7 @@
             </a:endParaRPr>
           </a:p>
           <a:p>
-            <a:pPr marL="216000" indent="-211680">
+            <a:pPr marL="216000" indent="-211320">
               <a:lnSpc>
                 <a:spcPct val="100000"/>
               </a:lnSpc>
@@ -1151,7 +1151,7 @@
             </a:endParaRPr>
           </a:p>
           <a:p>
-            <a:pPr marL="216000" indent="-211680">
+            <a:pPr marL="216000" indent="-211320">
               <a:lnSpc>
                 <a:spcPct val="100000"/>
               </a:lnSpc>
@@ -1168,7 +1168,7 @@
             </a:endParaRPr>
           </a:p>
           <a:p>
-            <a:pPr marL="216000" indent="-211680">
+            <a:pPr marL="216000" indent="-211320">
               <a:lnSpc>
                 <a:spcPct val="100000"/>
               </a:lnSpc>
@@ -1185,7 +1185,7 @@
             </a:endParaRPr>
           </a:p>
           <a:p>
-            <a:pPr marL="216000" indent="-211680">
+            <a:pPr marL="216000" indent="-211320">
               <a:lnSpc>
                 <a:spcPct val="100000"/>
               </a:lnSpc>
@@ -1195,7 +1195,7 @@
             </a:endParaRPr>
           </a:p>
           <a:p>
-            <a:pPr marL="216000" indent="-211680">
+            <a:pPr marL="216000" indent="-211320">
               <a:lnSpc>
                 <a:spcPct val="100000"/>
               </a:lnSpc>
@@ -1205,7 +1205,7 @@
             </a:endParaRPr>
           </a:p>
           <a:p>
-            <a:pPr marL="216000" indent="-211680">
+            <a:pPr marL="216000" indent="-211320">
               <a:lnSpc>
                 <a:spcPct val="100000"/>
               </a:lnSpc>
@@ -1215,7 +1215,7 @@
             </a:endParaRPr>
           </a:p>
           <a:p>
-            <a:pPr marL="216000" indent="-211680">
+            <a:pPr marL="216000" indent="-211320">
               <a:lnSpc>
                 <a:spcPct val="100000"/>
               </a:lnSpc>
@@ -1225,7 +1225,7 @@
             </a:endParaRPr>
           </a:p>
           <a:p>
-            <a:pPr marL="216000" indent="-211680">
+            <a:pPr marL="216000" indent="-211320">
               <a:lnSpc>
                 <a:spcPct val="100000"/>
               </a:lnSpc>
@@ -1245,7 +1245,7 @@
         <p:spPr>
           <a:xfrm>
             <a:off x="3884760" y="8685360"/>
-            <a:ext cx="2966760" cy="453600"/>
+            <a:ext cx="2966400" cy="453240"/>
           </a:xfrm>
           <a:prstGeom prst="rect">
             <a:avLst/>
@@ -1269,7 +1269,7 @@
                 <a:spcPct val="100000"/>
               </a:lnSpc>
             </a:pPr>
-            <a:fld id="{FBEEBA58-6552-48AC-8435-B50C34F15BD4}" type="slidenum">
+            <a:fld id="{34C0937F-3B96-4445-B005-6EBD7FC26D4B}" type="slidenum">
               <a:rPr b="0" lang="fr-FR" sz="1200" spc="-1" strike="noStrike">
                 <a:solidFill>
                   <a:srgbClr val="000000"/>
@@ -1319,7 +1319,7 @@
         <p:spPr>
           <a:xfrm>
             <a:off x="685800" y="1143000"/>
-            <a:ext cx="5481360" cy="3081240"/>
+            <a:ext cx="5481000" cy="3080880"/>
           </a:xfrm>
           <a:prstGeom prst="rect">
             <a:avLst/>
@@ -1339,7 +1339,7 @@
         <p:spPr>
           <a:xfrm>
             <a:off x="685800" y="4400640"/>
-            <a:ext cx="5481360" cy="3595320"/>
+            <a:ext cx="5481000" cy="3594960"/>
           </a:xfrm>
           <a:prstGeom prst="rect">
             <a:avLst/>
@@ -1348,7 +1348,7 @@
         <p:txBody>
           <a:bodyPr lIns="0" rIns="0" tIns="0" bIns="0"/>
           <a:p>
-            <a:pPr marL="216000" indent="-213480">
+            <a:pPr marL="216000" indent="-213120">
               <a:lnSpc>
                 <a:spcPct val="100000"/>
               </a:lnSpc>
@@ -1364,7 +1364,7 @@
             </a:endParaRPr>
           </a:p>
           <a:p>
-            <a:pPr marL="216000" indent="-213480">
+            <a:pPr marL="216000" indent="-213120">
               <a:lnSpc>
                 <a:spcPct val="100000"/>
               </a:lnSpc>
@@ -1380,7 +1380,7 @@
             </a:endParaRPr>
           </a:p>
           <a:p>
-            <a:pPr marL="216000" indent="-213480">
+            <a:pPr marL="216000" indent="-213120">
               <a:lnSpc>
                 <a:spcPct val="100000"/>
               </a:lnSpc>
@@ -1396,7 +1396,7 @@
             </a:endParaRPr>
           </a:p>
           <a:p>
-            <a:pPr marL="216000" indent="-213480">
+            <a:pPr marL="216000" indent="-213120">
               <a:lnSpc>
                 <a:spcPct val="100000"/>
               </a:lnSpc>
@@ -1406,7 +1406,7 @@
             </a:endParaRPr>
           </a:p>
           <a:p>
-            <a:pPr marL="216000" indent="-213480">
+            <a:pPr marL="216000" indent="-213120">
               <a:lnSpc>
                 <a:spcPct val="100000"/>
               </a:lnSpc>
@@ -1422,7 +1422,7 @@
             </a:endParaRPr>
           </a:p>
           <a:p>
-            <a:pPr marL="216000" indent="-213480">
+            <a:pPr marL="216000" indent="-213120">
               <a:lnSpc>
                 <a:spcPct val="100000"/>
               </a:lnSpc>
@@ -1438,7 +1438,7 @@
             </a:endParaRPr>
           </a:p>
           <a:p>
-            <a:pPr marL="216000" indent="-213480">
+            <a:pPr marL="216000" indent="-213120">
               <a:lnSpc>
                 <a:spcPct val="100000"/>
               </a:lnSpc>
@@ -1448,7 +1448,7 @@
             </a:endParaRPr>
           </a:p>
           <a:p>
-            <a:pPr marL="216000" indent="-213480">
+            <a:pPr marL="216000" indent="-213120">
               <a:lnSpc>
                 <a:spcPct val="100000"/>
               </a:lnSpc>
@@ -1464,7 +1464,7 @@
             </a:endParaRPr>
           </a:p>
           <a:p>
-            <a:pPr marL="216000" indent="-213480">
+            <a:pPr marL="216000" indent="-213120">
               <a:lnSpc>
                 <a:spcPct val="100000"/>
               </a:lnSpc>
@@ -1474,7 +1474,7 @@
             </a:endParaRPr>
           </a:p>
           <a:p>
-            <a:pPr marL="216000" indent="-213480">
+            <a:pPr marL="216000" indent="-213120">
               <a:lnSpc>
                 <a:spcPct val="100000"/>
               </a:lnSpc>
@@ -1490,7 +1490,7 @@
             </a:endParaRPr>
           </a:p>
           <a:p>
-            <a:pPr marL="216000" indent="-213480">
+            <a:pPr marL="216000" indent="-213120">
               <a:lnSpc>
                 <a:spcPct val="100000"/>
               </a:lnSpc>
@@ -1506,7 +1506,7 @@
             </a:endParaRPr>
           </a:p>
           <a:p>
-            <a:pPr marL="216000" indent="-213480">
+            <a:pPr marL="216000" indent="-213120">
               <a:lnSpc>
                 <a:spcPct val="100000"/>
               </a:lnSpc>
@@ -1523,7 +1523,7 @@
             </a:endParaRPr>
           </a:p>
           <a:p>
-            <a:pPr marL="216000" indent="-213480">
+            <a:pPr marL="216000" indent="-213120">
               <a:lnSpc>
                 <a:spcPct val="100000"/>
               </a:lnSpc>
@@ -1533,7 +1533,7 @@
             </a:endParaRPr>
           </a:p>
           <a:p>
-            <a:pPr marL="216000" indent="-213480">
+            <a:pPr marL="216000" indent="-213120">
               <a:lnSpc>
                 <a:spcPct val="100000"/>
               </a:lnSpc>
@@ -1550,7 +1550,7 @@
             </a:endParaRPr>
           </a:p>
           <a:p>
-            <a:pPr marL="216000" indent="-213480">
+            <a:pPr marL="216000" indent="-213120">
               <a:lnSpc>
                 <a:spcPct val="100000"/>
               </a:lnSpc>
@@ -1567,17 +1567,24 @@
             </a:endParaRPr>
           </a:p>
           <a:p>
-            <a:pPr marL="216000" indent="-213480">
-              <a:lnSpc>
-                <a:spcPct val="100000"/>
-              </a:lnSpc>
-            </a:pPr>
+            <a:pPr marL="216000" indent="-213120">
+              <a:lnSpc>
+                <a:spcPct val="100000"/>
+              </a:lnSpc>
+            </a:pPr>
+            <a:r>
+              <a:rPr b="0" lang="fr-FR" sz="1800" spc="-1" strike="noStrike">
+                <a:latin typeface="Arial"/>
+                <a:ea typeface="Noto Sans CJK SC"/>
+              </a:rPr>
+              <a:t>Its power exist in the capacity to index duplicate data during its rest</a:t>
+            </a:r>
             <a:endParaRPr b="0" lang="fr-FR" sz="1800" spc="-1" strike="noStrike">
               <a:latin typeface="Arial"/>
             </a:endParaRPr>
           </a:p>
           <a:p>
-            <a:pPr marL="216000" indent="-213480">
+            <a:pPr marL="216000" indent="-213120">
               <a:lnSpc>
                 <a:spcPct val="100000"/>
               </a:lnSpc>
@@ -1587,7 +1594,7 @@
             </a:endParaRPr>
           </a:p>
           <a:p>
-            <a:pPr marL="216000" indent="-213480">
+            <a:pPr marL="216000" indent="-213120">
               <a:lnSpc>
                 <a:spcPct val="100000"/>
               </a:lnSpc>
@@ -1597,7 +1604,17 @@
             </a:endParaRPr>
           </a:p>
           <a:p>
-            <a:pPr marL="216000" indent="-213480">
+            <a:pPr marL="216000" indent="-213120">
+              <a:lnSpc>
+                <a:spcPct val="100000"/>
+              </a:lnSpc>
+            </a:pPr>
+            <a:endParaRPr b="0" lang="fr-FR" sz="1800" spc="-1" strike="noStrike">
+              <a:latin typeface="Arial"/>
+            </a:endParaRPr>
+          </a:p>
+          <a:p>
+            <a:pPr marL="216000" indent="-213120">
               <a:lnSpc>
                 <a:spcPct val="100000"/>
               </a:lnSpc>
@@ -1617,7 +1634,7 @@
         <p:spPr>
           <a:xfrm>
             <a:off x="3884760" y="8685360"/>
-            <a:ext cx="2966760" cy="453600"/>
+            <a:ext cx="2966400" cy="453240"/>
           </a:xfrm>
           <a:prstGeom prst="rect">
             <a:avLst/>
@@ -1641,7 +1658,7 @@
                 <a:spcPct val="100000"/>
               </a:lnSpc>
             </a:pPr>
-            <a:fld id="{FB206717-4220-4109-8AAB-CD37C91C3088}" type="slidenum">
+            <a:fld id="{34260756-3C5E-480F-A4B2-1A6278188A71}" type="slidenum">
               <a:rPr b="0" lang="fr-FR" sz="1200" spc="-1" strike="noStrike">
                 <a:solidFill>
                   <a:srgbClr val="000000"/>
@@ -1691,7 +1708,7 @@
         <p:spPr>
           <a:xfrm>
             <a:off x="380880" y="694800"/>
-            <a:ext cx="6091920" cy="3425040"/>
+            <a:ext cx="6091560" cy="3424680"/>
           </a:xfrm>
           <a:prstGeom prst="rect">
             <a:avLst/>
@@ -1711,7 +1728,7 @@
         <p:spPr>
           <a:xfrm>
             <a:off x="685800" y="4343400"/>
-            <a:ext cx="5482440" cy="4110840"/>
+            <a:ext cx="5482080" cy="4110480"/>
           </a:xfrm>
           <a:prstGeom prst="rect">
             <a:avLst/>
@@ -1720,7 +1737,7 @@
         <p:txBody>
           <a:bodyPr lIns="0" rIns="0" tIns="0" bIns="0"/>
           <a:p>
-            <a:pPr marL="216000" indent="-212760">
+            <a:pPr marL="216000" indent="-212400">
               <a:lnSpc>
                 <a:spcPct val="100000"/>
               </a:lnSpc>
@@ -1736,7 +1753,7 @@
             </a:endParaRPr>
           </a:p>
           <a:p>
-            <a:pPr marL="216000" indent="-212760">
+            <a:pPr marL="216000" indent="-212400">
               <a:lnSpc>
                 <a:spcPct val="100000"/>
               </a:lnSpc>
@@ -1752,7 +1769,7 @@
             </a:endParaRPr>
           </a:p>
           <a:p>
-            <a:pPr marL="216000" indent="-212760">
+            <a:pPr marL="216000" indent="-212400">
               <a:lnSpc>
                 <a:spcPct val="100000"/>
               </a:lnSpc>
@@ -1768,7 +1785,7 @@
             </a:endParaRPr>
           </a:p>
           <a:p>
-            <a:pPr marL="216000" indent="-212760">
+            <a:pPr marL="216000" indent="-212400">
               <a:lnSpc>
                 <a:spcPct val="100000"/>
               </a:lnSpc>
@@ -5516,7 +5533,7 @@
         <p:spPr>
           <a:xfrm>
             <a:off x="0" y="0"/>
-            <a:ext cx="12187080" cy="6852960"/>
+            <a:ext cx="12186720" cy="6852600"/>
           </a:xfrm>
           <a:prstGeom prst="rect">
             <a:avLst/>
@@ -5548,8 +5565,8 @@
         </p:nvSpPr>
         <p:spPr>
           <a:xfrm flipV="1">
-            <a:off x="0" y="-5040"/>
-            <a:ext cx="12183840" cy="6852960"/>
+            <a:off x="0" y="-5760"/>
+            <a:ext cx="12183480" cy="6852600"/>
           </a:xfrm>
           <a:prstGeom prst="snip1Rect">
             <a:avLst>
@@ -5604,7 +5621,7 @@
         <p:spPr>
           <a:xfrm>
             <a:off x="684360" y="685800"/>
-            <a:ext cx="9673920" cy="3668400"/>
+            <a:ext cx="9673560" cy="3668040"/>
           </a:xfrm>
           <a:prstGeom prst="rect">
             <a:avLst/>
@@ -5655,7 +5672,7 @@
         <p:spPr>
           <a:xfrm>
             <a:off x="684360" y="4648320"/>
-            <a:ext cx="7000560" cy="1137960"/>
+            <a:ext cx="7000200" cy="1137600"/>
           </a:xfrm>
           <a:prstGeom prst="rect">
             <a:avLst/>
@@ -5793,7 +5810,7 @@
         <p:spPr>
           <a:xfrm>
             <a:off x="684360" y="4487400"/>
-            <a:ext cx="8529480" cy="1501920"/>
+            <a:ext cx="8529120" cy="1501560"/>
           </a:xfrm>
           <a:prstGeom prst="rect">
             <a:avLst/>
@@ -5842,7 +5859,7 @@
         <p:spPr>
           <a:xfrm>
             <a:off x="684360" y="685800"/>
-            <a:ext cx="8529480" cy="3610080"/>
+            <a:ext cx="8529120" cy="3609720"/>
           </a:xfrm>
           <a:prstGeom prst="rect">
             <a:avLst/>
@@ -5861,7 +5878,7 @@
         <p:txBody>
           <a:bodyPr lIns="90000" rIns="90000" tIns="45000" bIns="45000" anchor="ctr"/>
           <a:p>
-            <a:pPr marL="285840" indent="-280800">
+            <a:pPr marL="285840" indent="-280440">
               <a:lnSpc>
                 <a:spcPct val="100000"/>
               </a:lnSpc>
@@ -5993,7 +6010,7 @@
             </a:endParaRPr>
           </a:p>
           <a:p>
-            <a:pPr marL="285840" indent="-280800">
+            <a:pPr marL="285840" indent="-280440">
               <a:lnSpc>
                 <a:spcPct val="100000"/>
               </a:lnSpc>
@@ -6039,7 +6056,7 @@
         <p:spPr>
           <a:xfrm>
             <a:off x="4733640" y="3979440"/>
-            <a:ext cx="909360" cy="909360"/>
+            <a:ext cx="909000" cy="909000"/>
           </a:xfrm>
           <a:prstGeom prst="rect">
             <a:avLst/>
@@ -6062,7 +6079,7 @@
         <p:spPr>
           <a:xfrm>
             <a:off x="6825960" y="4030200"/>
-            <a:ext cx="909360" cy="909360"/>
+            <a:ext cx="909000" cy="909000"/>
           </a:xfrm>
           <a:prstGeom prst="rect">
             <a:avLst/>
@@ -6085,7 +6102,7 @@
         <p:spPr>
           <a:xfrm>
             <a:off x="5354640" y="2725920"/>
-            <a:ext cx="909360" cy="909360"/>
+            <a:ext cx="909000" cy="909000"/>
           </a:xfrm>
           <a:prstGeom prst="rect">
             <a:avLst/>
@@ -6108,7 +6125,7 @@
         <p:spPr>
           <a:xfrm>
             <a:off x="8550000" y="3433320"/>
-            <a:ext cx="909360" cy="909360"/>
+            <a:ext cx="909000" cy="909000"/>
           </a:xfrm>
           <a:prstGeom prst="rect">
             <a:avLst/>
@@ -6131,7 +6148,7 @@
         <p:spPr>
           <a:xfrm>
             <a:off x="5153040" y="5079960"/>
-            <a:ext cx="909360" cy="909360"/>
+            <a:ext cx="909000" cy="909000"/>
           </a:xfrm>
           <a:prstGeom prst="rect">
             <a:avLst/>
@@ -6149,8 +6166,8 @@
         </p:nvSpPr>
         <p:spPr>
           <a:xfrm rot="3732600">
-            <a:off x="7994880" y="3762360"/>
-            <a:ext cx="199080" cy="664920"/>
+            <a:off x="7995240" y="3762000"/>
+            <a:ext cx="198720" cy="664560"/>
           </a:xfrm>
           <a:prstGeom prst="downArrow">
             <a:avLst>
@@ -6189,7 +6206,7 @@
         <p:spPr>
           <a:xfrm rot="14618400">
             <a:off x="6343560" y="4765320"/>
-            <a:ext cx="199080" cy="664920"/>
+            <a:ext cx="198720" cy="664560"/>
           </a:xfrm>
           <a:prstGeom prst="downArrow">
             <a:avLst>
@@ -6227,8 +6244,8 @@
         </p:nvSpPr>
         <p:spPr>
           <a:xfrm rot="5400000">
-            <a:off x="6193800" y="4132800"/>
-            <a:ext cx="199080" cy="664920"/>
+            <a:off x="6194160" y="4132800"/>
+            <a:ext cx="198720" cy="664560"/>
           </a:xfrm>
           <a:prstGeom prst="downArrow">
             <a:avLst>
@@ -6267,7 +6284,7 @@
         <p:spPr>
           <a:xfrm rot="7014000">
             <a:off x="6426360" y="3552120"/>
-            <a:ext cx="199080" cy="664920"/>
+            <a:ext cx="198720" cy="664560"/>
           </a:xfrm>
           <a:prstGeom prst="downArrow">
             <a:avLst>
@@ -6305,8 +6322,8 @@
         </p:nvSpPr>
         <p:spPr>
           <a:xfrm rot="1747800">
-            <a:off x="5087880" y="3301560"/>
-            <a:ext cx="199080" cy="664920"/>
+            <a:off x="5087880" y="3301200"/>
+            <a:ext cx="198720" cy="664560"/>
           </a:xfrm>
           <a:prstGeom prst="downArrow">
             <a:avLst>
@@ -6394,7 +6411,7 @@
         <p:spPr>
           <a:xfrm>
             <a:off x="6868080" y="306720"/>
-            <a:ext cx="5038920" cy="2080800"/>
+            <a:ext cx="5038560" cy="2080440"/>
           </a:xfrm>
           <a:prstGeom prst="rect">
             <a:avLst/>
@@ -6437,7 +6454,7 @@
         <p:spPr>
           <a:xfrm>
             <a:off x="6271200" y="2669400"/>
-            <a:ext cx="5627880" cy="3003840"/>
+            <a:ext cx="5627520" cy="3003480"/>
           </a:xfrm>
           <a:prstGeom prst="rect">
             <a:avLst/>
@@ -6482,7 +6499,7 @@
         <p:spPr>
           <a:xfrm>
             <a:off x="129960" y="5709960"/>
-            <a:ext cx="11178360" cy="1085040"/>
+            <a:ext cx="11178000" cy="1084680"/>
           </a:xfrm>
           <a:prstGeom prst="rect">
             <a:avLst/>
@@ -6527,7 +6544,7 @@
         <p:spPr>
           <a:xfrm>
             <a:off x="207000" y="1787400"/>
-            <a:ext cx="5589720" cy="3223080"/>
+            <a:ext cx="5589360" cy="3222720"/>
           </a:xfrm>
           <a:prstGeom prst="rect">
             <a:avLst/>
@@ -6572,7 +6589,7 @@
         <p:spPr>
           <a:xfrm>
             <a:off x="684360" y="4487400"/>
-            <a:ext cx="8529480" cy="1501920"/>
+            <a:ext cx="8529120" cy="1501560"/>
           </a:xfrm>
           <a:prstGeom prst="rect">
             <a:avLst/>
@@ -6621,7 +6638,7 @@
         <p:spPr>
           <a:xfrm>
             <a:off x="684360" y="685800"/>
-            <a:ext cx="8529480" cy="3610080"/>
+            <a:ext cx="8529120" cy="3609720"/>
           </a:xfrm>
           <a:prstGeom prst="rect">
             <a:avLst/>
@@ -6640,7 +6657,7 @@
         <p:txBody>
           <a:bodyPr lIns="90000" rIns="90000" tIns="45000" bIns="45000" anchor="ctr"/>
           <a:p>
-            <a:pPr marL="285840" indent="-280800">
+            <a:pPr marL="285840" indent="-280440">
               <a:lnSpc>
                 <a:spcPct val="100000"/>
               </a:lnSpc>
@@ -6692,7 +6709,7 @@
             </a:endParaRPr>
           </a:p>
           <a:p>
-            <a:pPr marL="285840" indent="-280800">
+            <a:pPr marL="285840" indent="-280440">
               <a:lnSpc>
                 <a:spcPct val="100000"/>
               </a:lnSpc>
@@ -6734,7 +6751,7 @@
             </a:endParaRPr>
           </a:p>
           <a:p>
-            <a:pPr marL="285840" indent="-280800">
+            <a:pPr marL="285840" indent="-280440">
               <a:lnSpc>
                 <a:spcPct val="100000"/>
               </a:lnSpc>
@@ -6786,7 +6803,7 @@
             </a:endParaRPr>
           </a:p>
           <a:p>
-            <a:pPr marL="285840" indent="-280800">
+            <a:pPr marL="285840" indent="-280440">
               <a:lnSpc>
                 <a:spcPct val="100000"/>
               </a:lnSpc>
@@ -6954,7 +6971,7 @@
         <p:spPr>
           <a:xfrm>
             <a:off x="4629600" y="1832040"/>
-            <a:ext cx="849600" cy="849600"/>
+            <a:ext cx="849240" cy="849240"/>
           </a:xfrm>
           <a:prstGeom prst="rect">
             <a:avLst/>
@@ -6977,7 +6994,7 @@
         <p:spPr>
           <a:xfrm>
             <a:off x="4463640" y="4185360"/>
-            <a:ext cx="1176120" cy="468360"/>
+            <a:ext cx="1175760" cy="468000"/>
           </a:xfrm>
           <a:prstGeom prst="rect">
             <a:avLst/>
@@ -7000,7 +7017,7 @@
         <p:spPr>
           <a:xfrm>
             <a:off x="4586040" y="2785680"/>
-            <a:ext cx="893160" cy="1035360"/>
+            <a:ext cx="892800" cy="1035000"/>
           </a:xfrm>
           <a:prstGeom prst="rect">
             <a:avLst/>
@@ -7023,7 +7040,7 @@
         <p:spPr>
           <a:xfrm>
             <a:off x="250560" y="1953720"/>
-            <a:ext cx="909360" cy="909360"/>
+            <a:ext cx="909000" cy="909000"/>
           </a:xfrm>
           <a:prstGeom prst="rect">
             <a:avLst/>
@@ -7046,7 +7063,7 @@
         <p:spPr>
           <a:xfrm>
             <a:off x="271440" y="3259800"/>
-            <a:ext cx="909360" cy="909360"/>
+            <a:ext cx="909000" cy="909000"/>
           </a:xfrm>
           <a:prstGeom prst="rect">
             <a:avLst/>
@@ -7069,7 +7086,7 @@
         <p:spPr>
           <a:xfrm>
             <a:off x="2440800" y="2741040"/>
-            <a:ext cx="909360" cy="909360"/>
+            <a:ext cx="909000" cy="909000"/>
           </a:xfrm>
           <a:prstGeom prst="rect">
             <a:avLst/>
@@ -7087,8 +7104,8 @@
         </p:nvSpPr>
         <p:spPr>
           <a:xfrm rot="1192200">
-            <a:off x="1577880" y="2559600"/>
-            <a:ext cx="973440" cy="479520"/>
+            <a:off x="1577880" y="2559240"/>
+            <a:ext cx="973080" cy="479160"/>
           </a:xfrm>
           <a:prstGeom prst="rightArrow">
             <a:avLst>
@@ -7129,8 +7146,8 @@
         </p:nvSpPr>
         <p:spPr>
           <a:xfrm rot="20407800">
-            <a:off x="1557000" y="3347640"/>
-            <a:ext cx="973440" cy="479520"/>
+            <a:off x="1556640" y="3347640"/>
+            <a:ext cx="973080" cy="479160"/>
           </a:xfrm>
           <a:prstGeom prst="rightArrow">
             <a:avLst>
@@ -7171,8 +7188,8 @@
         </p:nvSpPr>
         <p:spPr>
           <a:xfrm rot="1192200">
-            <a:off x="3331440" y="3668040"/>
-            <a:ext cx="973440" cy="479520"/>
+            <a:off x="3331440" y="3667680"/>
+            <a:ext cx="973080" cy="479160"/>
           </a:xfrm>
           <a:prstGeom prst="rightArrow">
             <a:avLst>
@@ -7213,8 +7230,8 @@
         </p:nvSpPr>
         <p:spPr>
           <a:xfrm rot="20407800">
-            <a:off x="3405240" y="2343240"/>
-            <a:ext cx="973440" cy="479520"/>
+            <a:off x="3404880" y="2343240"/>
+            <a:ext cx="973080" cy="479160"/>
           </a:xfrm>
           <a:prstGeom prst="rightArrow">
             <a:avLst>
@@ -7256,7 +7273,7 @@
         <p:spPr>
           <a:xfrm>
             <a:off x="3483720" y="3004200"/>
-            <a:ext cx="973440" cy="479520"/>
+            <a:ext cx="973080" cy="479160"/>
           </a:xfrm>
           <a:prstGeom prst="rightArrow">
             <a:avLst>
@@ -7302,7 +7319,7 @@
         <p:spPr>
           <a:xfrm>
             <a:off x="5819760" y="5709960"/>
-            <a:ext cx="909360" cy="909360"/>
+            <a:ext cx="909000" cy="909000"/>
           </a:xfrm>
           <a:prstGeom prst="rect">
             <a:avLst/>
@@ -7325,7 +7342,7 @@
         <p:spPr>
           <a:xfrm>
             <a:off x="2060640" y="5759640"/>
-            <a:ext cx="909360" cy="909360"/>
+            <a:ext cx="909000" cy="909000"/>
           </a:xfrm>
           <a:prstGeom prst="rect">
             <a:avLst/>
@@ -7348,7 +7365,7 @@
         <p:spPr>
           <a:xfrm>
             <a:off x="9383040" y="5709960"/>
-            <a:ext cx="909360" cy="909360"/>
+            <a:ext cx="909000" cy="909000"/>
           </a:xfrm>
           <a:prstGeom prst="rect">
             <a:avLst/>
@@ -7371,7 +7388,7 @@
         <p:spPr>
           <a:xfrm>
             <a:off x="7495920" y="5709960"/>
-            <a:ext cx="909360" cy="909360"/>
+            <a:ext cx="909000" cy="909000"/>
           </a:xfrm>
           <a:prstGeom prst="rect">
             <a:avLst/>
@@ -7394,7 +7411,7 @@
         <p:spPr>
           <a:xfrm>
             <a:off x="4004640" y="5709960"/>
-            <a:ext cx="909360" cy="909360"/>
+            <a:ext cx="909000" cy="909000"/>
           </a:xfrm>
           <a:prstGeom prst="rect">
             <a:avLst/>
@@ -7417,7 +7434,7 @@
         <p:spPr>
           <a:xfrm>
             <a:off x="276120" y="5759640"/>
-            <a:ext cx="909360" cy="909360"/>
+            <a:ext cx="909000" cy="909000"/>
           </a:xfrm>
           <a:prstGeom prst="rect">
             <a:avLst/>
@@ -7436,7 +7453,7 @@
         <p:spPr>
           <a:xfrm>
             <a:off x="1230120" y="6098760"/>
-            <a:ext cx="677880" cy="257040"/>
+            <a:ext cx="677520" cy="256680"/>
           </a:xfrm>
           <a:prstGeom prst="rightArrow">
             <a:avLst>
@@ -7475,7 +7492,7 @@
         <p:spPr>
           <a:xfrm>
             <a:off x="3103920" y="6117480"/>
-            <a:ext cx="677880" cy="257040"/>
+            <a:ext cx="677520" cy="256680"/>
           </a:xfrm>
           <a:prstGeom prst="rightArrow">
             <a:avLst>
@@ -7514,7 +7531,7 @@
         <p:spPr>
           <a:xfrm>
             <a:off x="4958640" y="6109200"/>
-            <a:ext cx="677880" cy="257040"/>
+            <a:ext cx="677520" cy="256680"/>
           </a:xfrm>
           <a:prstGeom prst="rightArrow">
             <a:avLst>
@@ -7553,7 +7570,7 @@
         <p:spPr>
           <a:xfrm>
             <a:off x="6754320" y="6098760"/>
-            <a:ext cx="677880" cy="257040"/>
+            <a:ext cx="677520" cy="256680"/>
           </a:xfrm>
           <a:prstGeom prst="rightArrow">
             <a:avLst>
@@ -7592,7 +7609,7 @@
         <p:spPr>
           <a:xfrm>
             <a:off x="8468280" y="6085800"/>
-            <a:ext cx="677880" cy="257040"/>
+            <a:ext cx="677520" cy="256680"/>
           </a:xfrm>
           <a:prstGeom prst="rightArrow">
             <a:avLst>
@@ -7635,7 +7652,7 @@
         <p:spPr>
           <a:xfrm>
             <a:off x="6582600" y="3915000"/>
-            <a:ext cx="909360" cy="909360"/>
+            <a:ext cx="909000" cy="909000"/>
           </a:xfrm>
           <a:prstGeom prst="rect">
             <a:avLst/>
@@ -7658,7 +7675,7 @@
         <p:spPr>
           <a:xfrm>
             <a:off x="8674920" y="3965760"/>
-            <a:ext cx="909360" cy="909360"/>
+            <a:ext cx="909000" cy="909000"/>
           </a:xfrm>
           <a:prstGeom prst="rect">
             <a:avLst/>
@@ -7681,7 +7698,7 @@
         <p:spPr>
           <a:xfrm>
             <a:off x="7203600" y="2661480"/>
-            <a:ext cx="909360" cy="909360"/>
+            <a:ext cx="909000" cy="909000"/>
           </a:xfrm>
           <a:prstGeom prst="rect">
             <a:avLst/>
@@ -7704,7 +7721,7 @@
         <p:spPr>
           <a:xfrm>
             <a:off x="10398960" y="3368880"/>
-            <a:ext cx="909360" cy="909360"/>
+            <a:ext cx="909000" cy="909000"/>
           </a:xfrm>
           <a:prstGeom prst="rect">
             <a:avLst/>
@@ -7727,7 +7744,7 @@
         <p:spPr>
           <a:xfrm>
             <a:off x="7002000" y="5015520"/>
-            <a:ext cx="909360" cy="909360"/>
+            <a:ext cx="909000" cy="909000"/>
           </a:xfrm>
           <a:prstGeom prst="rect">
             <a:avLst/>
@@ -7745,8 +7762,8 @@
         </p:nvSpPr>
         <p:spPr>
           <a:xfrm rot="3732600">
-            <a:off x="9844200" y="3698280"/>
-            <a:ext cx="199080" cy="664920"/>
+            <a:off x="9844560" y="3697920"/>
+            <a:ext cx="198720" cy="664560"/>
           </a:xfrm>
           <a:prstGeom prst="downArrow">
             <a:avLst>
@@ -7785,7 +7802,7 @@
         <p:spPr>
           <a:xfrm rot="14618400">
             <a:off x="8192520" y="4701240"/>
-            <a:ext cx="199080" cy="664920"/>
+            <a:ext cx="198720" cy="664560"/>
           </a:xfrm>
           <a:prstGeom prst="downArrow">
             <a:avLst>
@@ -7823,8 +7840,8 @@
         </p:nvSpPr>
         <p:spPr>
           <a:xfrm rot="5400000">
-            <a:off x="8042760" y="4068360"/>
-            <a:ext cx="199080" cy="664920"/>
+            <a:off x="8043120" y="4068360"/>
+            <a:ext cx="198720" cy="664560"/>
           </a:xfrm>
           <a:prstGeom prst="downArrow">
             <a:avLst>
@@ -7863,7 +7880,7 @@
         <p:spPr>
           <a:xfrm rot="7014000">
             <a:off x="8275680" y="3487680"/>
-            <a:ext cx="199080" cy="664920"/>
+            <a:ext cx="198720" cy="664560"/>
           </a:xfrm>
           <a:prstGeom prst="downArrow">
             <a:avLst>
@@ -7901,8 +7918,8 @@
         </p:nvSpPr>
         <p:spPr>
           <a:xfrm rot="1747800">
-            <a:off x="7094880" y="3423600"/>
-            <a:ext cx="199080" cy="664920"/>
+            <a:off x="7094880" y="3423240"/>
+            <a:ext cx="198720" cy="664560"/>
           </a:xfrm>
           <a:prstGeom prst="downArrow">
             <a:avLst>
@@ -7945,7 +7962,7 @@
         <p:spPr>
           <a:xfrm>
             <a:off x="8641080" y="309600"/>
-            <a:ext cx="909360" cy="909360"/>
+            <a:ext cx="909000" cy="909000"/>
           </a:xfrm>
           <a:prstGeom prst="rect">
             <a:avLst/>
@@ -7968,7 +7985,7 @@
         <p:spPr>
           <a:xfrm>
             <a:off x="10568880" y="1497240"/>
-            <a:ext cx="909360" cy="909360"/>
+            <a:ext cx="909000" cy="909000"/>
           </a:xfrm>
           <a:prstGeom prst="rect">
             <a:avLst/>
@@ -7991,7 +8008,7 @@
         <p:spPr>
           <a:xfrm>
             <a:off x="6932880" y="1497240"/>
-            <a:ext cx="909360" cy="909360"/>
+            <a:ext cx="909000" cy="909000"/>
           </a:xfrm>
           <a:prstGeom prst="rect">
             <a:avLst/>
@@ -8010,7 +8027,7 @@
         <p:spPr>
           <a:xfrm>
             <a:off x="8173800" y="1774080"/>
-            <a:ext cx="2063520" cy="355680"/>
+            <a:ext cx="2063160" cy="355320"/>
           </a:xfrm>
           <a:prstGeom prst="rightArrow">
             <a:avLst>
@@ -8049,7 +8066,7 @@
         <p:spPr>
           <a:xfrm>
             <a:off x="8947440" y="1361160"/>
-            <a:ext cx="296640" cy="402120"/>
+            <a:ext cx="296280" cy="401760"/>
           </a:xfrm>
           <a:prstGeom prst="downArrow">
             <a:avLst>
@@ -8137,7 +8154,7 @@
         <p:spPr>
           <a:xfrm>
             <a:off x="0" y="0"/>
-            <a:ext cx="12187080" cy="6852960"/>
+            <a:ext cx="12186720" cy="6852600"/>
           </a:xfrm>
           <a:prstGeom prst="rect">
             <a:avLst/>
@@ -8190,7 +8207,7 @@
         <p:spPr>
           <a:xfrm>
             <a:off x="640440" y="685800"/>
-            <a:ext cx="4813560" cy="4598640"/>
+            <a:ext cx="4813200" cy="4598280"/>
           </a:xfrm>
           <a:prstGeom prst="rect">
             <a:avLst/>
@@ -8241,7 +8258,7 @@
         <p:spPr>
           <a:xfrm>
             <a:off x="6095880" y="0"/>
-            <a:ext cx="6090840" cy="6852960"/>
+            <a:ext cx="6090480" cy="6852600"/>
           </a:xfrm>
           <a:prstGeom prst="rect">
             <a:avLst/>
@@ -8279,7 +8296,7 @@
         <p:spPr>
           <a:xfrm>
             <a:off x="6625800" y="685800"/>
-            <a:ext cx="4874040" cy="4598640"/>
+            <a:ext cx="4873680" cy="4598280"/>
           </a:xfrm>
           <a:prstGeom prst="rect">
             <a:avLst/>
@@ -8300,7 +8317,7 @@
             <a:normAutofit/>
           </a:bodyPr>
           <a:p>
-            <a:pPr marL="285840" indent="-280800">
+            <a:pPr marL="285840" indent="-280440">
               <a:lnSpc>
                 <a:spcPct val="100000"/>
               </a:lnSpc>
@@ -8332,7 +8349,7 @@
             </a:endParaRPr>
           </a:p>
           <a:p>
-            <a:pPr marL="285840" indent="-280800">
+            <a:pPr marL="285840" indent="-280440">
               <a:lnSpc>
                 <a:spcPct val="100000"/>
               </a:lnSpc>
@@ -8364,7 +8381,7 @@
             </a:endParaRPr>
           </a:p>
           <a:p>
-            <a:pPr marL="285840" indent="-280800">
+            <a:pPr marL="285840" indent="-280440">
               <a:lnSpc>
                 <a:spcPct val="100000"/>
               </a:lnSpc>
@@ -8396,7 +8413,7 @@
             </a:endParaRPr>
           </a:p>
           <a:p>
-            <a:pPr marL="285840" indent="-280800">
+            <a:pPr marL="285840" indent="-280440">
               <a:lnSpc>
                 <a:spcPct val="100000"/>
               </a:lnSpc>
@@ -8428,7 +8445,7 @@
             </a:endParaRPr>
           </a:p>
           <a:p>
-            <a:pPr marL="285840" indent="-280800">
+            <a:pPr marL="285840" indent="-280440">
               <a:lnSpc>
                 <a:spcPct val="100000"/>
               </a:lnSpc>
@@ -8519,7 +8536,7 @@
         <p:spPr>
           <a:xfrm>
             <a:off x="684360" y="4487400"/>
-            <a:ext cx="8529480" cy="1501920"/>
+            <a:ext cx="8529120" cy="1501560"/>
           </a:xfrm>
           <a:prstGeom prst="rect">
             <a:avLst/>
@@ -8568,7 +8585,7 @@
         <p:spPr>
           <a:xfrm>
             <a:off x="684360" y="685800"/>
-            <a:ext cx="8529480" cy="3610080"/>
+            <a:ext cx="8529120" cy="3609720"/>
           </a:xfrm>
           <a:prstGeom prst="rect">
             <a:avLst/>
@@ -8587,7 +8604,7 @@
         <p:txBody>
           <a:bodyPr lIns="90000" rIns="90000" tIns="45000" bIns="45000" anchor="ctr"/>
           <a:p>
-            <a:pPr marL="285840" indent="-280800">
+            <a:pPr marL="285840" indent="-280440">
               <a:lnSpc>
                 <a:spcPct val="100000"/>
               </a:lnSpc>
@@ -8619,7 +8636,7 @@
             </a:endParaRPr>
           </a:p>
           <a:p>
-            <a:pPr marL="285840" indent="-280800">
+            <a:pPr marL="285840" indent="-280440">
               <a:lnSpc>
                 <a:spcPct val="100000"/>
               </a:lnSpc>
@@ -8729,7 +8746,7 @@
         <p:spPr>
           <a:xfrm>
             <a:off x="6995520" y="1949760"/>
-            <a:ext cx="849600" cy="849600"/>
+            <a:ext cx="849240" cy="849240"/>
           </a:xfrm>
           <a:prstGeom prst="rect">
             <a:avLst/>
@@ -8752,7 +8769,7 @@
         <p:spPr>
           <a:xfrm>
             <a:off x="6829560" y="4303080"/>
-            <a:ext cx="1176120" cy="468360"/>
+            <a:ext cx="1175760" cy="468000"/>
           </a:xfrm>
           <a:prstGeom prst="rect">
             <a:avLst/>
@@ -8775,7 +8792,7 @@
         <p:spPr>
           <a:xfrm>
             <a:off x="6951960" y="2903040"/>
-            <a:ext cx="893160" cy="1035360"/>
+            <a:ext cx="892800" cy="1035000"/>
           </a:xfrm>
           <a:prstGeom prst="rect">
             <a:avLst/>
@@ -8798,7 +8815,7 @@
         <p:spPr>
           <a:xfrm>
             <a:off x="2616120" y="2071080"/>
-            <a:ext cx="909360" cy="909360"/>
+            <a:ext cx="909000" cy="909000"/>
           </a:xfrm>
           <a:prstGeom prst="rect">
             <a:avLst/>
@@ -8821,7 +8838,7 @@
         <p:spPr>
           <a:xfrm>
             <a:off x="2637000" y="3377160"/>
-            <a:ext cx="909360" cy="909360"/>
+            <a:ext cx="909000" cy="909000"/>
           </a:xfrm>
           <a:prstGeom prst="rect">
             <a:avLst/>
@@ -8839,8 +8856,8 @@
         </p:nvSpPr>
         <p:spPr>
           <a:xfrm rot="1192200">
-            <a:off x="3943440" y="2676960"/>
-            <a:ext cx="973440" cy="479520"/>
+            <a:off x="3943440" y="2676600"/>
+            <a:ext cx="973080" cy="479160"/>
           </a:xfrm>
           <a:prstGeom prst="rightArrow">
             <a:avLst>
@@ -8881,8 +8898,8 @@
         </p:nvSpPr>
         <p:spPr>
           <a:xfrm rot="20407800">
-            <a:off x="3922560" y="3465000"/>
-            <a:ext cx="973440" cy="479520"/>
+            <a:off x="3922200" y="3465000"/>
+            <a:ext cx="973080" cy="479160"/>
           </a:xfrm>
           <a:prstGeom prst="rightArrow">
             <a:avLst>
@@ -8923,8 +8940,8 @@
         </p:nvSpPr>
         <p:spPr>
           <a:xfrm rot="1192200">
-            <a:off x="5697360" y="3785400"/>
-            <a:ext cx="973440" cy="479520"/>
+            <a:off x="5697360" y="3785040"/>
+            <a:ext cx="973080" cy="479160"/>
           </a:xfrm>
           <a:prstGeom prst="rightArrow">
             <a:avLst>
@@ -8965,8 +8982,8 @@
         </p:nvSpPr>
         <p:spPr>
           <a:xfrm rot="20407800">
-            <a:off x="5770800" y="2460600"/>
-            <a:ext cx="973440" cy="479520"/>
+            <a:off x="5770440" y="2460600"/>
+            <a:ext cx="973080" cy="479160"/>
           </a:xfrm>
           <a:prstGeom prst="rightArrow">
             <a:avLst>
@@ -9008,7 +9025,7 @@
         <p:spPr>
           <a:xfrm>
             <a:off x="5849640" y="3121560"/>
-            <a:ext cx="973440" cy="479520"/>
+            <a:ext cx="973080" cy="479160"/>
           </a:xfrm>
           <a:prstGeom prst="rightArrow">
             <a:avLst>
@@ -9054,7 +9071,7 @@
         <p:spPr>
           <a:xfrm>
             <a:off x="4950720" y="2998800"/>
-            <a:ext cx="751680" cy="751680"/>
+            <a:ext cx="751320" cy="751320"/>
           </a:xfrm>
           <a:prstGeom prst="rect">
             <a:avLst/>
@@ -9122,7 +9139,7 @@
         <p:spPr>
           <a:xfrm>
             <a:off x="684360" y="4487400"/>
-            <a:ext cx="8529480" cy="1501920"/>
+            <a:ext cx="8529120" cy="1501560"/>
           </a:xfrm>
           <a:prstGeom prst="rect">
             <a:avLst/>
@@ -9171,7 +9188,7 @@
         <p:spPr>
           <a:xfrm>
             <a:off x="684360" y="685800"/>
-            <a:ext cx="8529480" cy="3610080"/>
+            <a:ext cx="8529120" cy="3609720"/>
           </a:xfrm>
           <a:prstGeom prst="rect">
             <a:avLst/>
@@ -9190,7 +9207,7 @@
         <p:txBody>
           <a:bodyPr lIns="90000" rIns="90000" tIns="45000" bIns="45000" anchor="ctr"/>
           <a:p>
-            <a:pPr marL="285840" indent="-280800">
+            <a:pPr marL="285840" indent="-280440">
               <a:lnSpc>
                 <a:spcPct val="100000"/>
               </a:lnSpc>
@@ -9316,7 +9333,7 @@
             </a:endParaRPr>
           </a:p>
           <a:p>
-            <a:pPr marL="285840" indent="-280800">
+            <a:pPr marL="285840" indent="-280440">
               <a:lnSpc>
                 <a:spcPct val="100000"/>
               </a:lnSpc>
@@ -9408,7 +9425,7 @@
         <p:spPr>
           <a:xfrm>
             <a:off x="3562560" y="1395720"/>
-            <a:ext cx="909360" cy="909360"/>
+            <a:ext cx="909000" cy="909000"/>
           </a:xfrm>
           <a:prstGeom prst="rect">
             <a:avLst/>
@@ -9431,7 +9448,7 @@
         <p:spPr>
           <a:xfrm>
             <a:off x="6678360" y="1395720"/>
-            <a:ext cx="909360" cy="909360"/>
+            <a:ext cx="909000" cy="909000"/>
           </a:xfrm>
           <a:prstGeom prst="rect">
             <a:avLst/>
@@ -9454,7 +9471,7 @@
         <p:spPr>
           <a:xfrm>
             <a:off x="7042320" y="3904200"/>
-            <a:ext cx="909360" cy="909360"/>
+            <a:ext cx="909000" cy="909000"/>
           </a:xfrm>
           <a:prstGeom prst="rect">
             <a:avLst/>
@@ -9477,7 +9494,7 @@
         <p:spPr>
           <a:xfrm>
             <a:off x="3562560" y="3904200"/>
-            <a:ext cx="909360" cy="909360"/>
+            <a:ext cx="909000" cy="909000"/>
           </a:xfrm>
           <a:prstGeom prst="rect">
             <a:avLst/>
@@ -9500,7 +9517,7 @@
         <p:spPr>
           <a:xfrm>
             <a:off x="6678360" y="1395720"/>
-            <a:ext cx="909360" cy="909360"/>
+            <a:ext cx="909000" cy="909000"/>
           </a:xfrm>
           <a:prstGeom prst="rect">
             <a:avLst/>
@@ -9523,7 +9540,7 @@
         <p:spPr>
           <a:xfrm>
             <a:off x="4113000" y="2039400"/>
-            <a:ext cx="909360" cy="909360"/>
+            <a:ext cx="909000" cy="909000"/>
           </a:xfrm>
           <a:prstGeom prst="rect">
             <a:avLst/>
@@ -9546,7 +9563,7 @@
         <p:spPr>
           <a:xfrm>
             <a:off x="7296480" y="2133000"/>
-            <a:ext cx="909360" cy="909360"/>
+            <a:ext cx="909000" cy="909000"/>
           </a:xfrm>
           <a:prstGeom prst="rect">
             <a:avLst/>
@@ -9565,7 +9582,7 @@
         <p:spPr>
           <a:xfrm>
             <a:off x="5285160" y="1920960"/>
-            <a:ext cx="1177920" cy="540360"/>
+            <a:ext cx="1177560" cy="540000"/>
           </a:xfrm>
           <a:prstGeom prst="rightArrow">
             <a:avLst>
@@ -9607,7 +9624,7 @@
         <p:spPr>
           <a:xfrm>
             <a:off x="5149440" y="4088880"/>
-            <a:ext cx="1177920" cy="540360"/>
+            <a:ext cx="1177560" cy="540000"/>
           </a:xfrm>
           <a:prstGeom prst="rightArrow">
             <a:avLst>
@@ -9672,7 +9689,7 @@
         <p:spPr>
           <a:xfrm>
             <a:off x="4895280" y="2388600"/>
-            <a:ext cx="2702880" cy="360000"/>
+            <a:ext cx="2702520" cy="359640"/>
           </a:xfrm>
           <a:prstGeom prst="rect">
             <a:avLst/>
@@ -9721,7 +9738,7 @@
         <p:spPr>
           <a:xfrm>
             <a:off x="5027400" y="4575240"/>
-            <a:ext cx="2322720" cy="360000"/>
+            <a:ext cx="2322360" cy="359640"/>
           </a:xfrm>
           <a:prstGeom prst="rect">
             <a:avLst/>
@@ -9792,7 +9809,7 @@
         <p:spPr>
           <a:xfrm>
             <a:off x="684360" y="4487400"/>
-            <a:ext cx="8529480" cy="1501920"/>
+            <a:ext cx="8529120" cy="1501560"/>
           </a:xfrm>
           <a:prstGeom prst="rect">
             <a:avLst/>
@@ -9841,7 +9858,7 @@
         <p:spPr>
           <a:xfrm>
             <a:off x="684360" y="685800"/>
-            <a:ext cx="8529480" cy="3610080"/>
+            <a:ext cx="8529120" cy="3609720"/>
           </a:xfrm>
           <a:prstGeom prst="rect">
             <a:avLst/>
@@ -9860,7 +9877,7 @@
         <p:txBody>
           <a:bodyPr lIns="90000" rIns="90000" tIns="45000" bIns="45000" anchor="ctr"/>
           <a:p>
-            <a:pPr marL="285840" indent="-280800">
+            <a:pPr marL="285840" indent="-280440">
               <a:lnSpc>
                 <a:spcPct val="100000"/>
               </a:lnSpc>
@@ -9982,7 +9999,7 @@
         <p:spPr>
           <a:xfrm>
             <a:off x="1863000" y="3157920"/>
-            <a:ext cx="909360" cy="909360"/>
+            <a:ext cx="909000" cy="909000"/>
           </a:xfrm>
           <a:prstGeom prst="rect">
             <a:avLst/>
@@ -10005,7 +10022,7 @@
         <p:spPr>
           <a:xfrm>
             <a:off x="2413440" y="3801600"/>
-            <a:ext cx="909360" cy="909360"/>
+            <a:ext cx="909000" cy="909000"/>
           </a:xfrm>
           <a:prstGeom prst="rect">
             <a:avLst/>
@@ -10028,7 +10045,7 @@
         <p:spPr>
           <a:xfrm>
             <a:off x="7197480" y="3439800"/>
-            <a:ext cx="909360" cy="909360"/>
+            <a:ext cx="909000" cy="909000"/>
           </a:xfrm>
           <a:prstGeom prst="rect">
             <a:avLst/>
@@ -10051,7 +10068,7 @@
         <p:spPr>
           <a:xfrm>
             <a:off x="4758840" y="3366360"/>
-            <a:ext cx="909360" cy="909360"/>
+            <a:ext cx="909000" cy="909000"/>
           </a:xfrm>
           <a:prstGeom prst="rect">
             <a:avLst/>
@@ -10070,7 +10087,7 @@
         <p:spPr>
           <a:xfrm>
             <a:off x="3568680" y="3429000"/>
-            <a:ext cx="932400" cy="909360"/>
+            <a:ext cx="932040" cy="909000"/>
           </a:xfrm>
           <a:prstGeom prst="mathPlus">
             <a:avLst>
@@ -10108,7 +10125,7 @@
         <p:spPr>
           <a:xfrm>
             <a:off x="6095880" y="3654360"/>
-            <a:ext cx="733320" cy="561240"/>
+            <a:ext cx="732960" cy="560880"/>
           </a:xfrm>
           <a:prstGeom prst="mathEqual">
             <a:avLst>
@@ -10169,7 +10186,7 @@
         <p:spPr>
           <a:xfrm>
             <a:off x="4750920" y="2898360"/>
-            <a:ext cx="2684880" cy="3714840"/>
+            <a:ext cx="2684520" cy="3714480"/>
           </a:xfrm>
           <a:prstGeom prst="rect">
             <a:avLst/>
@@ -10212,7 +10229,7 @@
         <p:spPr>
           <a:xfrm>
             <a:off x="684360" y="4487400"/>
-            <a:ext cx="8529480" cy="1501920"/>
+            <a:ext cx="8529120" cy="1501560"/>
           </a:xfrm>
           <a:prstGeom prst="rect">
             <a:avLst/>
@@ -10261,7 +10278,7 @@
         <p:spPr>
           <a:xfrm>
             <a:off x="684360" y="685800"/>
-            <a:ext cx="8529480" cy="3610080"/>
+            <a:ext cx="8529120" cy="3609720"/>
           </a:xfrm>
           <a:prstGeom prst="rect">
             <a:avLst/>
@@ -10280,7 +10297,7 @@
         <p:txBody>
           <a:bodyPr lIns="90000" rIns="90000" tIns="45000" bIns="45000" anchor="ctr"/>
           <a:p>
-            <a:pPr marL="285840" indent="-280800">
+            <a:pPr marL="285840" indent="-280440">
               <a:lnSpc>
                 <a:spcPct val="100000"/>
               </a:lnSpc>
@@ -10416,7 +10433,7 @@
         <p:spPr>
           <a:xfrm>
             <a:off x="4843440" y="2989800"/>
-            <a:ext cx="636840" cy="636840"/>
+            <a:ext cx="636480" cy="636480"/>
           </a:xfrm>
           <a:prstGeom prst="rect">
             <a:avLst/>
@@ -10439,7 +10456,7 @@
         <p:spPr>
           <a:xfrm>
             <a:off x="5028120" y="4248360"/>
-            <a:ext cx="909360" cy="909360"/>
+            <a:ext cx="909000" cy="909000"/>
           </a:xfrm>
           <a:prstGeom prst="rect">
             <a:avLst/>
@@ -10462,7 +10479,7 @@
         <p:spPr>
           <a:xfrm>
             <a:off x="5506200" y="5025240"/>
-            <a:ext cx="909360" cy="909360"/>
+            <a:ext cx="909000" cy="909000"/>
           </a:xfrm>
           <a:prstGeom prst="rect">
             <a:avLst/>
@@ -10485,7 +10502,7 @@
         <p:spPr>
           <a:xfrm>
             <a:off x="6042600" y="4248360"/>
-            <a:ext cx="909360" cy="909360"/>
+            <a:ext cx="909000" cy="909000"/>
           </a:xfrm>
           <a:prstGeom prst="rect">
             <a:avLst/>
@@ -10508,7 +10525,7 @@
         <p:spPr>
           <a:xfrm>
             <a:off x="7944480" y="2602440"/>
-            <a:ext cx="909360" cy="909360"/>
+            <a:ext cx="909000" cy="909000"/>
           </a:xfrm>
           <a:prstGeom prst="rect">
             <a:avLst/>
@@ -10531,7 +10548,7 @@
         <p:spPr>
           <a:xfrm>
             <a:off x="6671160" y="3059640"/>
-            <a:ext cx="566640" cy="566640"/>
+            <a:ext cx="566280" cy="566280"/>
           </a:xfrm>
           <a:prstGeom prst="rect">
             <a:avLst/>
@@ -10554,7 +10571,7 @@
         <p:spPr>
           <a:xfrm>
             <a:off x="2973240" y="3863520"/>
-            <a:ext cx="909360" cy="909360"/>
+            <a:ext cx="909000" cy="909000"/>
           </a:xfrm>
           <a:prstGeom prst="rect">
             <a:avLst/>
@@ -10573,7 +10590,7 @@
         <p:spPr>
           <a:xfrm>
             <a:off x="4012560" y="4487400"/>
-            <a:ext cx="1488600" cy="852120"/>
+            <a:ext cx="1488240" cy="851760"/>
           </a:xfrm>
           <a:custGeom>
             <a:avLst/>
@@ -10625,7 +10642,7 @@
         <p:spPr>
           <a:xfrm>
             <a:off x="4012560" y="4248360"/>
-            <a:ext cx="2025000" cy="234000"/>
+            <a:ext cx="2024640" cy="233640"/>
           </a:xfrm>
           <a:custGeom>
             <a:avLst/>
@@ -10677,7 +10694,7 @@
         <p:spPr>
           <a:xfrm>
             <a:off x="4012560" y="4367880"/>
-            <a:ext cx="933840" cy="234720"/>
+            <a:ext cx="933480" cy="234360"/>
           </a:xfrm>
           <a:custGeom>
             <a:avLst/>
@@ -10728,8 +10745,8 @@
         </p:nvSpPr>
         <p:spPr>
           <a:xfrm flipV="1">
-            <a:off x="7242840" y="3217680"/>
-            <a:ext cx="624600" cy="118080"/>
+            <a:off x="7242840" y="3216960"/>
+            <a:ext cx="624240" cy="117720"/>
           </a:xfrm>
           <a:custGeom>
             <a:avLst/>
@@ -10804,7 +10821,7 @@
         <p:spPr>
           <a:xfrm>
             <a:off x="684360" y="4487400"/>
-            <a:ext cx="8529480" cy="1501920"/>
+            <a:ext cx="8529120" cy="1501560"/>
           </a:xfrm>
           <a:prstGeom prst="rect">
             <a:avLst/>
@@ -10853,7 +10870,7 @@
         <p:spPr>
           <a:xfrm>
             <a:off x="684360" y="685800"/>
-            <a:ext cx="8529480" cy="3610080"/>
+            <a:ext cx="8529120" cy="3609720"/>
           </a:xfrm>
           <a:prstGeom prst="rect">
             <a:avLst/>
@@ -10872,7 +10889,7 @@
         <p:txBody>
           <a:bodyPr lIns="90000" rIns="90000" tIns="45000" bIns="45000" anchor="ctr"/>
           <a:p>
-            <a:pPr marL="285840" indent="-280800">
+            <a:pPr marL="285840" indent="-280440">
               <a:lnSpc>
                 <a:spcPct val="100000"/>
               </a:lnSpc>
@@ -11040,7 +11057,7 @@
         <p:spPr>
           <a:xfrm>
             <a:off x="5430600" y="2730600"/>
-            <a:ext cx="2684880" cy="3714840"/>
+            <a:ext cx="2684520" cy="3714480"/>
           </a:xfrm>
           <a:prstGeom prst="rect">
             <a:avLst/>
@@ -11087,7 +11104,7 @@
         <p:spPr>
           <a:xfrm>
             <a:off x="5523120" y="2822040"/>
-            <a:ext cx="636840" cy="636840"/>
+            <a:ext cx="636480" cy="636480"/>
           </a:xfrm>
           <a:prstGeom prst="rect">
             <a:avLst/>
@@ -11110,7 +11127,7 @@
         <p:spPr>
           <a:xfrm>
             <a:off x="5707800" y="4080600"/>
-            <a:ext cx="909360" cy="909360"/>
+            <a:ext cx="909000" cy="909000"/>
           </a:xfrm>
           <a:prstGeom prst="rect">
             <a:avLst/>
@@ -11133,7 +11150,7 @@
         <p:spPr>
           <a:xfrm>
             <a:off x="6185880" y="4857480"/>
-            <a:ext cx="909360" cy="909360"/>
+            <a:ext cx="909000" cy="909000"/>
           </a:xfrm>
           <a:prstGeom prst="rect">
             <a:avLst/>
@@ -11156,7 +11173,7 @@
         <p:spPr>
           <a:xfrm>
             <a:off x="6722280" y="4080600"/>
-            <a:ext cx="909360" cy="909360"/>
+            <a:ext cx="909000" cy="909000"/>
           </a:xfrm>
           <a:prstGeom prst="rect">
             <a:avLst/>
@@ -11179,7 +11196,7 @@
         <p:spPr>
           <a:xfrm>
             <a:off x="3652920" y="3695760"/>
-            <a:ext cx="909360" cy="909360"/>
+            <a:ext cx="909000" cy="909000"/>
           </a:xfrm>
           <a:prstGeom prst="rect">
             <a:avLst/>
@@ -11198,7 +11215,7 @@
         <p:spPr>
           <a:xfrm>
             <a:off x="4692240" y="4319640"/>
-            <a:ext cx="1488600" cy="852120"/>
+            <a:ext cx="1488240" cy="851760"/>
           </a:xfrm>
           <a:custGeom>
             <a:avLst/>
@@ -11250,7 +11267,7 @@
         <p:spPr>
           <a:xfrm>
             <a:off x="4692240" y="4080600"/>
-            <a:ext cx="2025000" cy="234000"/>
+            <a:ext cx="2024640" cy="233640"/>
           </a:xfrm>
           <a:custGeom>
             <a:avLst/>
@@ -11302,7 +11319,7 @@
         <p:spPr>
           <a:xfrm>
             <a:off x="4692240" y="4200120"/>
-            <a:ext cx="933840" cy="234720"/>
+            <a:ext cx="933480" cy="234360"/>
           </a:xfrm>
           <a:custGeom>
             <a:avLst/>
@@ -11358,7 +11375,7 @@
         <p:spPr>
           <a:xfrm>
             <a:off x="9653760" y="3605400"/>
-            <a:ext cx="909360" cy="909360"/>
+            <a:ext cx="909000" cy="909000"/>
           </a:xfrm>
           <a:prstGeom prst="rect">
             <a:avLst/>
@@ -11376,8 +11393,8 @@
         </p:nvSpPr>
         <p:spPr>
           <a:xfrm rot="10325400">
-            <a:off x="7858440" y="4107240"/>
-            <a:ext cx="1780920" cy="302760"/>
+            <a:off x="7858440" y="4107600"/>
+            <a:ext cx="1780560" cy="302400"/>
           </a:xfrm>
           <a:prstGeom prst="rightArrow">
             <a:avLst>
@@ -11441,7 +11458,7 @@
         <p:spPr>
           <a:xfrm>
             <a:off x="684360" y="4487400"/>
-            <a:ext cx="8529480" cy="1501920"/>
+            <a:ext cx="8529120" cy="1501560"/>
           </a:xfrm>
           <a:prstGeom prst="rect">
             <a:avLst/>
@@ -11490,7 +11507,7 @@
         <p:spPr>
           <a:xfrm>
             <a:off x="684360" y="685800"/>
-            <a:ext cx="8529480" cy="3610080"/>
+            <a:ext cx="8529120" cy="3609720"/>
           </a:xfrm>
           <a:prstGeom prst="rect">
             <a:avLst/>
@@ -11520,7 +11537,7 @@
         <p:spPr>
           <a:xfrm>
             <a:off x="4069440" y="82800"/>
-            <a:ext cx="4041360" cy="2841840"/>
+            <a:ext cx="4041000" cy="2841480"/>
           </a:xfrm>
           <a:prstGeom prst="rect">
             <a:avLst/>
@@ -11543,7 +11560,7 @@
         <p:spPr>
           <a:xfrm>
             <a:off x="83880" y="3103560"/>
-            <a:ext cx="3862440" cy="1639440"/>
+            <a:ext cx="3862080" cy="1639080"/>
           </a:xfrm>
           <a:prstGeom prst="rect">
             <a:avLst/>
@@ -11566,7 +11583,7 @@
         <p:spPr>
           <a:xfrm>
             <a:off x="4161600" y="3103560"/>
-            <a:ext cx="3862440" cy="1639440"/>
+            <a:ext cx="3862080" cy="1639080"/>
           </a:xfrm>
           <a:prstGeom prst="rect">
             <a:avLst/>
@@ -11589,7 +11606,7 @@
         <p:spPr>
           <a:xfrm>
             <a:off x="8230320" y="3103560"/>
-            <a:ext cx="3862440" cy="1639440"/>
+            <a:ext cx="3862080" cy="1639080"/>
           </a:xfrm>
           <a:prstGeom prst="rect">
             <a:avLst/>
@@ -11608,7 +11625,7 @@
         <p:spPr>
           <a:xfrm>
             <a:off x="3993840" y="3766680"/>
-            <a:ext cx="146160" cy="314280"/>
+            <a:ext cx="145800" cy="313920"/>
           </a:xfrm>
           <a:prstGeom prst="rightArrow">
             <a:avLst>
@@ -11647,7 +11664,7 @@
         <p:spPr>
           <a:xfrm>
             <a:off x="8073360" y="3793320"/>
-            <a:ext cx="127080" cy="314280"/>
+            <a:ext cx="126720" cy="313920"/>
           </a:xfrm>
           <a:prstGeom prst="rightArrow">
             <a:avLst>
@@ -11686,7 +11703,7 @@
         <p:spPr>
           <a:xfrm>
             <a:off x="2701080" y="5176080"/>
-            <a:ext cx="1832040" cy="917640"/>
+            <a:ext cx="1831680" cy="917280"/>
           </a:xfrm>
           <a:prstGeom prst="wedgeRectCallout">
             <a:avLst>
@@ -11751,7 +11768,7 @@
         <p:spPr>
           <a:xfrm>
             <a:off x="6722640" y="5196600"/>
-            <a:ext cx="1963440" cy="820800"/>
+            <a:ext cx="1963080" cy="820440"/>
           </a:xfrm>
           <a:prstGeom prst="wedgeRectCallout">
             <a:avLst>
@@ -11816,7 +11833,7 @@
         <p:spPr>
           <a:xfrm>
             <a:off x="9731160" y="5131440"/>
-            <a:ext cx="2100600" cy="651600"/>
+            <a:ext cx="2100240" cy="651240"/>
           </a:xfrm>
           <a:prstGeom prst="wedgeRectCallout">
             <a:avLst>
@@ -11881,7 +11898,7 @@
         <p:spPr>
           <a:xfrm>
             <a:off x="5033520" y="2516760"/>
-            <a:ext cx="2570400" cy="360000"/>
+            <a:ext cx="2570040" cy="359640"/>
           </a:xfrm>
           <a:prstGeom prst="rect">
             <a:avLst/>
@@ -11929,8 +11946,8 @@
         </p:nvSpPr>
         <p:spPr>
           <a:xfrm rot="16200000">
-            <a:off x="3177360" y="1270080"/>
-            <a:ext cx="1959480" cy="360000"/>
+            <a:off x="3177360" y="1270440"/>
+            <a:ext cx="1959120" cy="359640"/>
           </a:xfrm>
           <a:prstGeom prst="rect">
             <a:avLst/>
@@ -12001,7 +12018,7 @@
         <p:spPr>
           <a:xfrm>
             <a:off x="684360" y="4487400"/>
-            <a:ext cx="8529480" cy="1501920"/>
+            <a:ext cx="8529120" cy="1501560"/>
           </a:xfrm>
           <a:prstGeom prst="rect">
             <a:avLst/>
@@ -12052,9 +12069,9 @@
         <p:grpSpPr>
           <a:xfrm>
             <a:off x="948240" y="823320"/>
-            <a:ext cx="10287360" cy="3334680"/>
+            <a:ext cx="10287000" cy="3334320"/>
             <a:chOff x="948240" y="823320"/>
-            <a:chExt cx="10287360" cy="3334680"/>
+            <a:chExt cx="10287000" cy="3334320"/>
           </a:xfrm>
         </p:grpSpPr>
         <p:sp>
@@ -12066,7 +12083,7 @@
           <p:spPr>
             <a:xfrm>
               <a:off x="948240" y="823320"/>
-              <a:ext cx="1357560" cy="1357560"/>
+              <a:ext cx="1357200" cy="1357200"/>
             </a:xfrm>
             <a:prstGeom prst="ellipse">
               <a:avLst/>
@@ -12099,7 +12116,7 @@
           <p:spPr>
             <a:xfrm>
               <a:off x="1234440" y="1109520"/>
-              <a:ext cx="785160" cy="785160"/>
+              <a:ext cx="784800" cy="784800"/>
             </a:xfrm>
             <a:prstGeom prst="rect">
               <a:avLst/>
@@ -12130,7 +12147,7 @@
           <p:spPr>
             <a:xfrm>
               <a:off x="2602800" y="823320"/>
-              <a:ext cx="3206880" cy="1357560"/>
+              <a:ext cx="3206520" cy="1357200"/>
             </a:xfrm>
             <a:prstGeom prst="rect">
               <a:avLst/>
@@ -12182,7 +12199,7 @@
           <p:spPr>
             <a:xfrm>
               <a:off x="6374160" y="823320"/>
-              <a:ext cx="1357560" cy="1357560"/>
+              <a:ext cx="1357200" cy="1357200"/>
             </a:xfrm>
             <a:prstGeom prst="ellipse">
               <a:avLst/>
@@ -12215,7 +12232,7 @@
           <p:spPr>
             <a:xfrm>
               <a:off x="6660360" y="1109520"/>
-              <a:ext cx="785160" cy="785160"/>
+              <a:ext cx="784800" cy="784800"/>
             </a:xfrm>
             <a:prstGeom prst="rect">
               <a:avLst/>
@@ -12246,7 +12263,7 @@
           <p:spPr>
             <a:xfrm>
               <a:off x="8028720" y="823320"/>
-              <a:ext cx="3206880" cy="1357560"/>
+              <a:ext cx="3206520" cy="1357200"/>
             </a:xfrm>
             <a:prstGeom prst="rect">
               <a:avLst/>
@@ -12298,7 +12315,7 @@
           <p:spPr>
             <a:xfrm>
               <a:off x="948240" y="2800440"/>
-              <a:ext cx="1357560" cy="1357560"/>
+              <a:ext cx="1357200" cy="1357200"/>
             </a:xfrm>
             <a:prstGeom prst="ellipse">
               <a:avLst/>
@@ -12331,7 +12348,7 @@
           <p:spPr>
             <a:xfrm>
               <a:off x="1234440" y="3086640"/>
-              <a:ext cx="785160" cy="785160"/>
+              <a:ext cx="784800" cy="784800"/>
             </a:xfrm>
             <a:prstGeom prst="rect">
               <a:avLst/>
@@ -12362,7 +12379,7 @@
           <p:spPr>
             <a:xfrm>
               <a:off x="2602800" y="2800440"/>
-              <a:ext cx="3206880" cy="1357560"/>
+              <a:ext cx="3206520" cy="1357200"/>
             </a:xfrm>
             <a:prstGeom prst="rect">
               <a:avLst/>
@@ -12414,7 +12431,7 @@
           <p:spPr>
             <a:xfrm>
               <a:off x="6374160" y="2800440"/>
-              <a:ext cx="1357560" cy="1357560"/>
+              <a:ext cx="1357200" cy="1357200"/>
             </a:xfrm>
             <a:prstGeom prst="ellipse">
               <a:avLst/>
@@ -12447,7 +12464,7 @@
           <p:spPr>
             <a:xfrm>
               <a:off x="6660360" y="3086640"/>
-              <a:ext cx="785160" cy="785160"/>
+              <a:ext cx="784800" cy="784800"/>
             </a:xfrm>
             <a:prstGeom prst="rect">
               <a:avLst/>
@@ -12478,7 +12495,7 @@
           <p:spPr>
             <a:xfrm>
               <a:off x="8028720" y="2800440"/>
-              <a:ext cx="3206880" cy="1357560"/>
+              <a:ext cx="3206520" cy="1357200"/>
             </a:xfrm>
             <a:prstGeom prst="rect">
               <a:avLst/>
@@ -12568,7 +12585,7 @@
         <p:spPr>
           <a:xfrm>
             <a:off x="0" y="0"/>
-            <a:ext cx="12187080" cy="6852960"/>
+            <a:ext cx="12186720" cy="6852600"/>
           </a:xfrm>
           <a:prstGeom prst="rect">
             <a:avLst/>
@@ -12621,7 +12638,7 @@
         <p:spPr>
           <a:xfrm>
             <a:off x="0" y="0"/>
-            <a:ext cx="8124840" cy="6852960"/>
+            <a:ext cx="8124480" cy="6852600"/>
           </a:xfrm>
           <a:prstGeom prst="snip2DiagRect">
             <a:avLst>
@@ -12843,7 +12860,7 @@
         <p:spPr>
           <a:xfrm>
             <a:off x="8588520" y="941400"/>
-            <a:ext cx="3038760" cy="3243600"/>
+            <a:ext cx="3038400" cy="3243240"/>
           </a:xfrm>
           <a:prstGeom prst="rect">
             <a:avLst/>
@@ -12894,9 +12911,9 @@
         <p:grpSpPr>
           <a:xfrm>
             <a:off x="952560" y="2104200"/>
-            <a:ext cx="6161400" cy="2438280"/>
+            <a:ext cx="6161040" cy="2437920"/>
             <a:chOff x="952560" y="2104200"/>
-            <a:chExt cx="6161400" cy="2438280"/>
+            <a:chExt cx="6161040" cy="2437920"/>
           </a:xfrm>
         </p:grpSpPr>
         <p:sp>
@@ -12908,7 +12925,7 @@
           <p:spPr>
             <a:xfrm>
               <a:off x="952560" y="2104200"/>
-              <a:ext cx="811440" cy="811440"/>
+              <a:ext cx="811080" cy="811080"/>
             </a:xfrm>
             <a:prstGeom prst="ellipse">
               <a:avLst/>
@@ -12941,7 +12958,7 @@
           <p:spPr>
             <a:xfrm>
               <a:off x="1123920" y="2275560"/>
-              <a:ext cx="468360" cy="468360"/>
+              <a:ext cx="468000" cy="468000"/>
             </a:xfrm>
             <a:prstGeom prst="rect">
               <a:avLst/>
@@ -12972,7 +12989,7 @@
           <p:spPr>
             <a:xfrm>
               <a:off x="1944000" y="2104200"/>
-              <a:ext cx="1919160" cy="811440"/>
+              <a:ext cx="1918800" cy="811080"/>
             </a:xfrm>
             <a:prstGeom prst="rect">
               <a:avLst/>
@@ -13024,7 +13041,7 @@
           <p:spPr>
             <a:xfrm>
               <a:off x="4203360" y="2104200"/>
-              <a:ext cx="811440" cy="811440"/>
+              <a:ext cx="811080" cy="811080"/>
             </a:xfrm>
             <a:prstGeom prst="ellipse">
               <a:avLst/>
@@ -13057,7 +13074,7 @@
           <p:spPr>
             <a:xfrm>
               <a:off x="4375080" y="2275560"/>
-              <a:ext cx="468360" cy="468360"/>
+              <a:ext cx="468000" cy="468000"/>
             </a:xfrm>
             <a:prstGeom prst="rect">
               <a:avLst/>
@@ -13088,7 +13105,7 @@
           <p:spPr>
             <a:xfrm>
               <a:off x="5194800" y="2104200"/>
-              <a:ext cx="1919160" cy="811440"/>
+              <a:ext cx="1918800" cy="811080"/>
             </a:xfrm>
             <a:prstGeom prst="rect">
               <a:avLst/>
@@ -13140,7 +13157,7 @@
           <p:spPr>
             <a:xfrm>
               <a:off x="952560" y="3731040"/>
-              <a:ext cx="811440" cy="811440"/>
+              <a:ext cx="811080" cy="811080"/>
             </a:xfrm>
             <a:prstGeom prst="ellipse">
               <a:avLst/>
@@ -13173,7 +13190,7 @@
           <p:spPr>
             <a:xfrm>
               <a:off x="1123920" y="3902400"/>
-              <a:ext cx="468360" cy="468360"/>
+              <a:ext cx="468000" cy="468000"/>
             </a:xfrm>
             <a:prstGeom prst="rect">
               <a:avLst/>
@@ -13204,7 +13221,7 @@
           <p:spPr>
             <a:xfrm>
               <a:off x="1944000" y="3731040"/>
-              <a:ext cx="1919160" cy="811440"/>
+              <a:ext cx="1918800" cy="811080"/>
             </a:xfrm>
             <a:prstGeom prst="rect">
               <a:avLst/>
@@ -13256,7 +13273,7 @@
           <p:spPr>
             <a:xfrm>
               <a:off x="4203360" y="3731040"/>
-              <a:ext cx="811440" cy="811440"/>
+              <a:ext cx="811080" cy="811080"/>
             </a:xfrm>
             <a:prstGeom prst="ellipse">
               <a:avLst/>
@@ -13289,7 +13306,7 @@
           <p:spPr>
             <a:xfrm>
               <a:off x="4375080" y="3902400"/>
-              <a:ext cx="468360" cy="468360"/>
+              <a:ext cx="468000" cy="468000"/>
             </a:xfrm>
             <a:prstGeom prst="rect">
               <a:avLst/>
@@ -13320,7 +13337,7 @@
           <p:spPr>
             <a:xfrm>
               <a:off x="5194800" y="3731040"/>
-              <a:ext cx="1919160" cy="811440"/>
+              <a:ext cx="1918800" cy="811080"/>
             </a:xfrm>
             <a:prstGeom prst="rect">
               <a:avLst/>
@@ -13437,7 +13454,7 @@
         <p:spPr>
           <a:xfrm>
             <a:off x="684360" y="4487400"/>
-            <a:ext cx="8529480" cy="1501920"/>
+            <a:ext cx="8529120" cy="1501560"/>
           </a:xfrm>
           <a:prstGeom prst="rect">
             <a:avLst/>
@@ -13486,7 +13503,7 @@
         <p:spPr>
           <a:xfrm>
             <a:off x="684360" y="685800"/>
-            <a:ext cx="8529480" cy="3610080"/>
+            <a:ext cx="8529120" cy="3609720"/>
           </a:xfrm>
           <a:prstGeom prst="rect">
             <a:avLst/>
@@ -13505,7 +13522,7 @@
         <p:txBody>
           <a:bodyPr lIns="90000" rIns="90000" tIns="45000" bIns="45000" anchor="ctr"/>
           <a:p>
-            <a:pPr marL="285840" indent="-280800">
+            <a:pPr marL="285840" indent="-280440">
               <a:lnSpc>
                 <a:spcPct val="100000"/>
               </a:lnSpc>
@@ -13537,7 +13554,7 @@
             </a:endParaRPr>
           </a:p>
           <a:p>
-            <a:pPr marL="285840" indent="-280800">
+            <a:pPr marL="285840" indent="-280440">
               <a:lnSpc>
                 <a:spcPct val="100000"/>
               </a:lnSpc>
@@ -13569,7 +13586,7 @@
             </a:endParaRPr>
           </a:p>
           <a:p>
-            <a:pPr marL="285840" indent="-280800">
+            <a:pPr marL="285840" indent="-280440">
               <a:lnSpc>
                 <a:spcPct val="100000"/>
               </a:lnSpc>
@@ -13601,7 +13618,7 @@
             </a:endParaRPr>
           </a:p>
           <a:p>
-            <a:pPr marL="285840" indent="-280800">
+            <a:pPr marL="285840" indent="-280440">
               <a:lnSpc>
                 <a:spcPct val="100000"/>
               </a:lnSpc>
@@ -13665,7 +13682,7 @@
         <p:spPr>
           <a:xfrm>
             <a:off x="684360" y="4487400"/>
-            <a:ext cx="8529480" cy="1501920"/>
+            <a:ext cx="8529120" cy="1501560"/>
           </a:xfrm>
           <a:prstGeom prst="rect">
             <a:avLst/>
@@ -13718,7 +13735,7 @@
         <p:spPr>
           <a:xfrm>
             <a:off x="5221440" y="75600"/>
-            <a:ext cx="909360" cy="909360"/>
+            <a:ext cx="909000" cy="909000"/>
           </a:xfrm>
           <a:prstGeom prst="rect">
             <a:avLst/>
@@ -13741,7 +13758,7 @@
         <p:spPr>
           <a:xfrm>
             <a:off x="4695120" y="4444560"/>
-            <a:ext cx="909360" cy="909360"/>
+            <a:ext cx="909000" cy="909000"/>
           </a:xfrm>
           <a:prstGeom prst="rect">
             <a:avLst/>
@@ -13764,7 +13781,7 @@
         <p:spPr>
           <a:xfrm>
             <a:off x="2603880" y="2294640"/>
-            <a:ext cx="909360" cy="909360"/>
+            <a:ext cx="909000" cy="909000"/>
           </a:xfrm>
           <a:prstGeom prst="rect">
             <a:avLst/>
@@ -13787,7 +13804,7 @@
         <p:spPr>
           <a:xfrm>
             <a:off x="9767160" y="3294360"/>
-            <a:ext cx="909360" cy="909360"/>
+            <a:ext cx="909000" cy="909000"/>
           </a:xfrm>
           <a:prstGeom prst="rect">
             <a:avLst/>
@@ -13810,7 +13827,7 @@
         <p:spPr>
           <a:xfrm>
             <a:off x="1967760" y="3811680"/>
-            <a:ext cx="909360" cy="909360"/>
+            <a:ext cx="909000" cy="909000"/>
           </a:xfrm>
           <a:prstGeom prst="rect">
             <a:avLst/>
@@ -13833,7 +13850,7 @@
         <p:spPr>
           <a:xfrm>
             <a:off x="5221440" y="2907360"/>
-            <a:ext cx="909360" cy="909360"/>
+            <a:ext cx="909000" cy="909000"/>
           </a:xfrm>
           <a:prstGeom prst="rect">
             <a:avLst/>
@@ -13856,7 +13873,7 @@
         <p:spPr>
           <a:xfrm>
             <a:off x="1093680" y="3282480"/>
-            <a:ext cx="909360" cy="909360"/>
+            <a:ext cx="909000" cy="909000"/>
           </a:xfrm>
           <a:prstGeom prst="rect">
             <a:avLst/>
@@ -13879,7 +13896,7 @@
         <p:spPr>
           <a:xfrm>
             <a:off x="8595360" y="3808800"/>
-            <a:ext cx="909360" cy="909360"/>
+            <a:ext cx="909000" cy="909000"/>
           </a:xfrm>
           <a:prstGeom prst="rect">
             <a:avLst/>
@@ -13902,7 +13919,7 @@
         <p:spPr>
           <a:xfrm>
             <a:off x="7839000" y="2294640"/>
-            <a:ext cx="909360" cy="909360"/>
+            <a:ext cx="909000" cy="909000"/>
           </a:xfrm>
           <a:prstGeom prst="rect">
             <a:avLst/>
@@ -13921,7 +13938,7 @@
         <p:spPr>
           <a:xfrm>
             <a:off x="6312960" y="944640"/>
-            <a:ext cx="1521360" cy="1335240"/>
+            <a:ext cx="1521000" cy="1334880"/>
           </a:xfrm>
           <a:custGeom>
             <a:avLst/>
@@ -13974,7 +13991,7 @@
         <p:spPr>
           <a:xfrm>
             <a:off x="5678640" y="1145160"/>
-            <a:ext cx="360" cy="1601640"/>
+            <a:ext cx="360" cy="1601280"/>
           </a:xfrm>
           <a:custGeom>
             <a:avLst/>
@@ -14026,8 +14043,8 @@
         </p:nvSpPr>
         <p:spPr>
           <a:xfrm flipH="1">
-            <a:off x="3421800" y="990000"/>
-            <a:ext cx="1612800" cy="1375560"/>
+            <a:off x="3421080" y="990000"/>
+            <a:ext cx="1612440" cy="1375200"/>
           </a:xfrm>
           <a:custGeom>
             <a:avLst/>
@@ -14080,7 +14097,7 @@
         <p:spPr>
           <a:xfrm>
             <a:off x="2082960" y="3279600"/>
-            <a:ext cx="912600" cy="360000"/>
+            <a:ext cx="912240" cy="359640"/>
           </a:xfrm>
           <a:prstGeom prst="rect">
             <a:avLst/>
@@ -14129,7 +14146,7 @@
         <p:spPr>
           <a:xfrm>
             <a:off x="5227200" y="4030200"/>
-            <a:ext cx="924840" cy="360000"/>
+            <a:ext cx="924480" cy="359640"/>
           </a:xfrm>
           <a:prstGeom prst="rect">
             <a:avLst/>
@@ -14178,7 +14195,7 @@
         <p:spPr>
           <a:xfrm>
             <a:off x="8246520" y="3279600"/>
-            <a:ext cx="1251000" cy="360000"/>
+            <a:ext cx="1250640" cy="359640"/>
           </a:xfrm>
           <a:prstGeom prst="rect">
             <a:avLst/>
@@ -14227,7 +14244,7 @@
         <p:spPr>
           <a:xfrm>
             <a:off x="481680" y="348120"/>
-            <a:ext cx="1807200" cy="360000"/>
+            <a:ext cx="1806840" cy="359640"/>
           </a:xfrm>
           <a:prstGeom prst="rect">
             <a:avLst/>
@@ -14280,7 +14297,7 @@
         <p:spPr>
           <a:xfrm>
             <a:off x="5855760" y="4444560"/>
-            <a:ext cx="909360" cy="909360"/>
+            <a:ext cx="909000" cy="909000"/>
           </a:xfrm>
           <a:prstGeom prst="rect">
             <a:avLst/>
@@ -14321,7 +14338,7 @@
         <p:spPr>
           <a:xfrm>
             <a:off x="684360" y="4487400"/>
-            <a:ext cx="8529480" cy="1501920"/>
+            <a:ext cx="8529120" cy="1501560"/>
           </a:xfrm>
           <a:prstGeom prst="rect">
             <a:avLst/>
@@ -14374,7 +14391,7 @@
         <p:spPr>
           <a:xfrm>
             <a:off x="7839000" y="2560320"/>
-            <a:ext cx="1309320" cy="595080"/>
+            <a:ext cx="1308960" cy="594720"/>
           </a:xfrm>
           <a:prstGeom prst="rect">
             <a:avLst/>
@@ -14393,7 +14410,7 @@
         <p:spPr>
           <a:xfrm>
             <a:off x="480240" y="348120"/>
-            <a:ext cx="1787400" cy="360000"/>
+            <a:ext cx="1787040" cy="359640"/>
           </a:xfrm>
           <a:prstGeom prst="rect">
             <a:avLst/>
@@ -14442,7 +14459,7 @@
         <p:spPr>
           <a:xfrm>
             <a:off x="6384240" y="990000"/>
-            <a:ext cx="1521360" cy="1335240"/>
+            <a:ext cx="1521000" cy="1334880"/>
           </a:xfrm>
           <a:custGeom>
             <a:avLst/>
@@ -14495,7 +14512,7 @@
         <p:spPr>
           <a:xfrm>
             <a:off x="5678640" y="1145160"/>
-            <a:ext cx="360" cy="1601640"/>
+            <a:ext cx="360" cy="1601280"/>
           </a:xfrm>
           <a:custGeom>
             <a:avLst/>
@@ -14547,8 +14564,8 @@
         </p:nvSpPr>
         <p:spPr>
           <a:xfrm flipH="1">
-            <a:off x="3421800" y="990000"/>
-            <a:ext cx="1612800" cy="1375560"/>
+            <a:off x="3421080" y="990000"/>
+            <a:ext cx="1612440" cy="1375200"/>
           </a:xfrm>
           <a:custGeom>
             <a:avLst/>
@@ -14601,7 +14618,7 @@
         <p:spPr>
           <a:xfrm>
             <a:off x="2082960" y="3279600"/>
-            <a:ext cx="912600" cy="360000"/>
+            <a:ext cx="912240" cy="359640"/>
           </a:xfrm>
           <a:prstGeom prst="rect">
             <a:avLst/>
@@ -14650,7 +14667,7 @@
         <p:spPr>
           <a:xfrm>
             <a:off x="5227200" y="4030200"/>
-            <a:ext cx="924840" cy="360000"/>
+            <a:ext cx="924480" cy="359640"/>
           </a:xfrm>
           <a:prstGeom prst="rect">
             <a:avLst/>
@@ -14699,7 +14716,7 @@
         <p:spPr>
           <a:xfrm>
             <a:off x="8246520" y="3279600"/>
-            <a:ext cx="1251000" cy="360000"/>
+            <a:ext cx="1250640" cy="359640"/>
           </a:xfrm>
           <a:prstGeom prst="rect">
             <a:avLst/>
@@ -14752,7 +14769,7 @@
         <p:spPr>
           <a:xfrm>
             <a:off x="4979520" y="218880"/>
-            <a:ext cx="1328400" cy="614160"/>
+            <a:ext cx="1328040" cy="613800"/>
           </a:xfrm>
           <a:prstGeom prst="rect">
             <a:avLst/>
@@ -14775,7 +14792,7 @@
         <p:spPr>
           <a:xfrm>
             <a:off x="2102760" y="2514600"/>
-            <a:ext cx="1319040" cy="604440"/>
+            <a:ext cx="1318680" cy="604080"/>
           </a:xfrm>
           <a:prstGeom prst="rect">
             <a:avLst/>
@@ -14798,7 +14815,7 @@
         <p:spPr>
           <a:xfrm>
             <a:off x="4235760" y="3279600"/>
-            <a:ext cx="1309320" cy="595080"/>
+            <a:ext cx="1308960" cy="594720"/>
           </a:xfrm>
           <a:prstGeom prst="rect">
             <a:avLst/>
@@ -14821,7 +14838,7 @@
         <p:spPr>
           <a:xfrm>
             <a:off x="5833080" y="3279600"/>
-            <a:ext cx="1309320" cy="595080"/>
+            <a:ext cx="1308960" cy="594720"/>
           </a:xfrm>
           <a:prstGeom prst="rect">
             <a:avLst/>
@@ -14862,7 +14879,7 @@
         <p:spPr>
           <a:xfrm>
             <a:off x="684360" y="4487400"/>
-            <a:ext cx="8529480" cy="1501920"/>
+            <a:ext cx="8529120" cy="1501560"/>
           </a:xfrm>
           <a:prstGeom prst="rect">
             <a:avLst/>
@@ -14911,7 +14928,7 @@
         <p:spPr>
           <a:xfrm>
             <a:off x="684360" y="685800"/>
-            <a:ext cx="8529480" cy="3610080"/>
+            <a:ext cx="8529120" cy="3609720"/>
           </a:xfrm>
           <a:prstGeom prst="rect">
             <a:avLst/>
@@ -14930,7 +14947,7 @@
         <p:txBody>
           <a:bodyPr lIns="90000" rIns="90000" tIns="45000" bIns="45000" anchor="ctr"/>
           <a:p>
-            <a:pPr marL="285840" indent="-280800">
+            <a:pPr marL="285840" indent="-280440">
               <a:lnSpc>
                 <a:spcPct val="100000"/>
               </a:lnSpc>
@@ -15006,7 +15023,7 @@
         <p:spPr>
           <a:xfrm>
             <a:off x="666000" y="2574360"/>
-            <a:ext cx="4805640" cy="2968920"/>
+            <a:ext cx="4805280" cy="2968560"/>
           </a:xfrm>
           <a:prstGeom prst="roundRect">
             <a:avLst>
@@ -15156,7 +15173,7 @@
         <p:spPr>
           <a:xfrm>
             <a:off x="684360" y="5241960"/>
-            <a:ext cx="8529480" cy="1501920"/>
+            <a:ext cx="8529120" cy="1501560"/>
           </a:xfrm>
           <a:prstGeom prst="rect">
             <a:avLst/>
@@ -15205,7 +15222,7 @@
         <p:spPr>
           <a:xfrm>
             <a:off x="684360" y="685800"/>
-            <a:ext cx="10985040" cy="2283120"/>
+            <a:ext cx="10984680" cy="2282760"/>
           </a:xfrm>
           <a:prstGeom prst="rect">
             <a:avLst/>
@@ -15226,7 +15243,7 @@
             <a:normAutofit/>
           </a:bodyPr>
           <a:p>
-            <a:pPr marL="285840" indent="-280800">
+            <a:pPr marL="285840" indent="-280440">
               <a:lnSpc>
                 <a:spcPct val="100000"/>
               </a:lnSpc>
@@ -15308,7 +15325,7 @@
             </a:endParaRPr>
           </a:p>
           <a:p>
-            <a:pPr marL="285840" indent="-280800">
+            <a:pPr marL="285840" indent="-280440">
               <a:lnSpc>
                 <a:spcPct val="100000"/>
               </a:lnSpc>
@@ -15432,7 +15449,7 @@
         <p:spPr>
           <a:xfrm>
             <a:off x="2523960" y="3718800"/>
-            <a:ext cx="723240" cy="718200"/>
+            <a:ext cx="722880" cy="717840"/>
           </a:xfrm>
           <a:prstGeom prst="ellipse">
             <a:avLst/>
@@ -15500,7 +15517,7 @@
         <p:spPr>
           <a:xfrm>
             <a:off x="3363480" y="3303360"/>
-            <a:ext cx="1212480" cy="402120"/>
+            <a:ext cx="1212120" cy="401760"/>
           </a:xfrm>
           <a:prstGeom prst="ellipse">
             <a:avLst/>
@@ -15568,7 +15585,7 @@
         <p:spPr>
           <a:xfrm>
             <a:off x="744120" y="3208680"/>
-            <a:ext cx="1585800" cy="670320"/>
+            <a:ext cx="1585440" cy="669960"/>
           </a:xfrm>
           <a:prstGeom prst="ellipse">
             <a:avLst/>
@@ -15636,7 +15653,7 @@
         <p:spPr>
           <a:xfrm>
             <a:off x="2119680" y="4628880"/>
-            <a:ext cx="1524960" cy="670320"/>
+            <a:ext cx="1524600" cy="669960"/>
           </a:xfrm>
           <a:prstGeom prst="ellipse">
             <a:avLst/>
@@ -15704,7 +15721,7 @@
         <p:spPr>
           <a:xfrm>
             <a:off x="6819480" y="2574360"/>
-            <a:ext cx="4805640" cy="2968920"/>
+            <a:ext cx="4805280" cy="2968560"/>
           </a:xfrm>
           <a:prstGeom prst="roundRect">
             <a:avLst>
@@ -15854,7 +15871,7 @@
         <p:spPr>
           <a:xfrm>
             <a:off x="7103880" y="4147560"/>
-            <a:ext cx="4374000" cy="854280"/>
+            <a:ext cx="4373640" cy="853920"/>
           </a:xfrm>
           <a:prstGeom prst="ellipse">
             <a:avLst/>
@@ -15922,7 +15939,7 @@
         <p:spPr>
           <a:xfrm>
             <a:off x="9898200" y="3332520"/>
-            <a:ext cx="1212480" cy="402120"/>
+            <a:ext cx="1212120" cy="401760"/>
           </a:xfrm>
           <a:prstGeom prst="ellipse">
             <a:avLst/>
@@ -15990,7 +16007,7 @@
         <p:spPr>
           <a:xfrm>
             <a:off x="6965640" y="3288960"/>
-            <a:ext cx="1585800" cy="670320"/>
+            <a:ext cx="1585440" cy="669960"/>
           </a:xfrm>
           <a:prstGeom prst="ellipse">
             <a:avLst/>
@@ -16058,7 +16075,7 @@
         <p:spPr>
           <a:xfrm>
             <a:off x="8287920" y="2688120"/>
-            <a:ext cx="1868760" cy="670320"/>
+            <a:ext cx="1868400" cy="669960"/>
           </a:xfrm>
           <a:prstGeom prst="ellipse">
             <a:avLst/>
@@ -16175,7 +16192,7 @@
         <p:spPr>
           <a:xfrm>
             <a:off x="684360" y="4487400"/>
-            <a:ext cx="8529480" cy="1501920"/>
+            <a:ext cx="8529120" cy="1501560"/>
           </a:xfrm>
           <a:prstGeom prst="rect">
             <a:avLst/>
@@ -16224,7 +16241,7 @@
         <p:spPr>
           <a:xfrm>
             <a:off x="684360" y="685800"/>
-            <a:ext cx="11357640" cy="3610080"/>
+            <a:ext cx="11357280" cy="3609720"/>
           </a:xfrm>
           <a:prstGeom prst="rect">
             <a:avLst/>
@@ -16245,7 +16262,7 @@
             <a:normAutofit/>
           </a:bodyPr>
           <a:p>
-            <a:pPr marL="285840" indent="-280800">
+            <a:pPr marL="285840" indent="-280440">
               <a:lnSpc>
                 <a:spcPct val="100000"/>
               </a:lnSpc>
@@ -16287,7 +16304,7 @@
             </a:endParaRPr>
           </a:p>
           <a:p>
-            <a:pPr marL="285840" indent="-280800">
+            <a:pPr marL="285840" indent="-280440">
               <a:lnSpc>
                 <a:spcPct val="100000"/>
               </a:lnSpc>
@@ -16477,7 +16494,7 @@
             </a:endParaRPr>
           </a:p>
           <a:p>
-            <a:pPr marL="285840" indent="-280800">
+            <a:pPr marL="285840" indent="-280440">
               <a:lnSpc>
                 <a:spcPct val="100000"/>
               </a:lnSpc>
@@ -16509,7 +16526,7 @@
             </a:endParaRPr>
           </a:p>
           <a:p>
-            <a:pPr marL="285840" indent="-280800">
+            <a:pPr marL="285840" indent="-280440">
               <a:lnSpc>
                 <a:spcPct val="100000"/>
               </a:lnSpc>
@@ -16600,7 +16617,7 @@
         <p:spPr>
           <a:xfrm>
             <a:off x="684360" y="4487400"/>
-            <a:ext cx="8529480" cy="1501920"/>
+            <a:ext cx="8529120" cy="1501560"/>
           </a:xfrm>
           <a:prstGeom prst="rect">
             <a:avLst/>
@@ -16649,7 +16666,7 @@
         <p:spPr>
           <a:xfrm>
             <a:off x="684360" y="685800"/>
-            <a:ext cx="8529480" cy="3610080"/>
+            <a:ext cx="8529120" cy="3609720"/>
           </a:xfrm>
           <a:prstGeom prst="rect">
             <a:avLst/>
@@ -16668,7 +16685,7 @@
         <p:txBody>
           <a:bodyPr lIns="90000" rIns="90000" tIns="45000" bIns="45000" anchor="ctr"/>
           <a:p>
-            <a:pPr marL="285840" indent="-280800">
+            <a:pPr marL="285840" indent="-280440">
               <a:lnSpc>
                 <a:spcPct val="100000"/>
               </a:lnSpc>
@@ -16770,7 +16787,7 @@
             </a:endParaRPr>
           </a:p>
           <a:p>
-            <a:pPr marL="285840" indent="-280800">
+            <a:pPr marL="285840" indent="-280440">
               <a:lnSpc>
                 <a:spcPct val="100000"/>
               </a:lnSpc>
@@ -16872,7 +16889,7 @@
         <p:spPr>
           <a:xfrm>
             <a:off x="2521440" y="3979080"/>
-            <a:ext cx="1877040" cy="802800"/>
+            <a:ext cx="1876680" cy="802440"/>
           </a:xfrm>
           <a:prstGeom prst="rect">
             <a:avLst/>
@@ -16938,7 +16955,7 @@
         <p:spPr>
           <a:xfrm>
             <a:off x="5487840" y="3979080"/>
-            <a:ext cx="1877040" cy="802800"/>
+            <a:ext cx="1876680" cy="802440"/>
           </a:xfrm>
           <a:prstGeom prst="rect">
             <a:avLst/>
@@ -17004,7 +17021,7 @@
         <p:spPr>
           <a:xfrm>
             <a:off x="4004640" y="2771640"/>
-            <a:ext cx="1877040" cy="802800"/>
+            <a:ext cx="1876680" cy="802440"/>
           </a:xfrm>
           <a:prstGeom prst="rect">
             <a:avLst/>
@@ -17070,7 +17087,7 @@
         <p:spPr>
           <a:xfrm>
             <a:off x="4483080" y="4383000"/>
-            <a:ext cx="999720" cy="360"/>
+            <a:ext cx="999360" cy="360"/>
           </a:xfrm>
           <a:custGeom>
             <a:avLst/>
@@ -17122,7 +17139,7 @@
         <p:spPr>
           <a:xfrm>
             <a:off x="4985640" y="3657600"/>
-            <a:ext cx="360" cy="574560"/>
+            <a:ext cx="360" cy="574200"/>
           </a:xfrm>
           <a:custGeom>
             <a:avLst/>
@@ -17223,7 +17240,7 @@
         <p:spPr>
           <a:xfrm>
             <a:off x="0" y="0"/>
-            <a:ext cx="12187080" cy="6852960"/>
+            <a:ext cx="12186720" cy="6852600"/>
           </a:xfrm>
           <a:prstGeom prst="rect">
             <a:avLst/>
@@ -17276,7 +17293,7 @@
         <p:spPr>
           <a:xfrm>
             <a:off x="640440" y="685800"/>
-            <a:ext cx="4813560" cy="4598640"/>
+            <a:ext cx="4813200" cy="4598280"/>
           </a:xfrm>
           <a:prstGeom prst="rect">
             <a:avLst/>
@@ -17327,7 +17344,7 @@
         <p:spPr>
           <a:xfrm>
             <a:off x="6095880" y="0"/>
-            <a:ext cx="6090840" cy="6852960"/>
+            <a:ext cx="6090480" cy="6852600"/>
           </a:xfrm>
           <a:prstGeom prst="rect">
             <a:avLst/>
@@ -17365,7 +17382,7 @@
         <p:spPr>
           <a:xfrm>
             <a:off x="6625800" y="685800"/>
-            <a:ext cx="4874040" cy="4598640"/>
+            <a:ext cx="4873680" cy="4598280"/>
           </a:xfrm>
           <a:prstGeom prst="rect">
             <a:avLst/>
@@ -17386,7 +17403,7 @@
             <a:normAutofit/>
           </a:bodyPr>
           <a:p>
-            <a:pPr marL="285840" indent="-280800">
+            <a:pPr marL="285840" indent="-280440">
               <a:lnSpc>
                 <a:spcPct val="100000"/>
               </a:lnSpc>
@@ -17418,7 +17435,7 @@
             </a:endParaRPr>
           </a:p>
           <a:p>
-            <a:pPr marL="285840" indent="-280800">
+            <a:pPr marL="285840" indent="-280440">
               <a:lnSpc>
                 <a:spcPct val="100000"/>
               </a:lnSpc>
@@ -17450,7 +17467,7 @@
             </a:endParaRPr>
           </a:p>
           <a:p>
-            <a:pPr marL="285840" indent="-280800">
+            <a:pPr marL="285840" indent="-280440">
               <a:lnSpc>
                 <a:spcPct val="100000"/>
               </a:lnSpc>
@@ -17482,7 +17499,7 @@
             </a:endParaRPr>
           </a:p>
           <a:p>
-            <a:pPr marL="285840" indent="-280800">
+            <a:pPr marL="285840" indent="-280440">
               <a:lnSpc>
                 <a:spcPct val="100000"/>
               </a:lnSpc>
@@ -17573,7 +17590,7 @@
         <p:spPr>
           <a:xfrm>
             <a:off x="684360" y="4487400"/>
-            <a:ext cx="8529480" cy="1501920"/>
+            <a:ext cx="8529120" cy="1501560"/>
           </a:xfrm>
           <a:prstGeom prst="rect">
             <a:avLst/>
@@ -17622,7 +17639,7 @@
         <p:spPr>
           <a:xfrm>
             <a:off x="1044720" y="500040"/>
-            <a:ext cx="8259120" cy="3227760"/>
+            <a:ext cx="8258760" cy="3227400"/>
           </a:xfrm>
           <a:prstGeom prst="rect">
             <a:avLst/>
@@ -17641,7 +17658,7 @@
         <p:txBody>
           <a:bodyPr lIns="90000" rIns="90000" tIns="45000" bIns="45000" anchor="ctr"/>
           <a:p>
-            <a:pPr marL="285840" indent="-280800">
+            <a:pPr marL="285840" indent="-280440">
               <a:lnSpc>
                 <a:spcPct val="100000"/>
               </a:lnSpc>
@@ -17683,7 +17700,7 @@
             </a:endParaRPr>
           </a:p>
           <a:p>
-            <a:pPr marL="285840" indent="-280800">
+            <a:pPr marL="285840" indent="-280440">
               <a:lnSpc>
                 <a:spcPct val="100000"/>
               </a:lnSpc>
@@ -17735,7 +17752,7 @@
             </a:endParaRPr>
           </a:p>
           <a:p>
-            <a:pPr marL="285840" indent="-280800">
+            <a:pPr marL="285840" indent="-280440">
               <a:lnSpc>
                 <a:spcPct val="100000"/>
               </a:lnSpc>
@@ -17887,7 +17904,7 @@
         <p:spPr>
           <a:xfrm>
             <a:off x="7097760" y="1943280"/>
-            <a:ext cx="849600" cy="849600"/>
+            <a:ext cx="849240" cy="849240"/>
           </a:xfrm>
           <a:prstGeom prst="rect">
             <a:avLst/>
@@ -17910,7 +17927,7 @@
         <p:spPr>
           <a:xfrm>
             <a:off x="6931800" y="4296600"/>
-            <a:ext cx="1176120" cy="468360"/>
+            <a:ext cx="1175760" cy="468000"/>
           </a:xfrm>
           <a:prstGeom prst="rect">
             <a:avLst/>
@@ -17933,7 +17950,7 @@
         <p:spPr>
           <a:xfrm>
             <a:off x="7054200" y="2896920"/>
-            <a:ext cx="893160" cy="1035360"/>
+            <a:ext cx="892800" cy="1035000"/>
           </a:xfrm>
           <a:prstGeom prst="rect">
             <a:avLst/>
@@ -17956,7 +17973,7 @@
         <p:spPr>
           <a:xfrm>
             <a:off x="2718360" y="2064960"/>
-            <a:ext cx="909360" cy="909360"/>
+            <a:ext cx="909000" cy="909000"/>
           </a:xfrm>
           <a:prstGeom prst="rect">
             <a:avLst/>
@@ -17979,7 +17996,7 @@
         <p:spPr>
           <a:xfrm>
             <a:off x="2739240" y="3371040"/>
-            <a:ext cx="909360" cy="909360"/>
+            <a:ext cx="909000" cy="909000"/>
           </a:xfrm>
           <a:prstGeom prst="rect">
             <a:avLst/>
@@ -18002,7 +18019,7 @@
         <p:spPr>
           <a:xfrm>
             <a:off x="4908600" y="2852280"/>
-            <a:ext cx="909360" cy="909360"/>
+            <a:ext cx="909000" cy="909000"/>
           </a:xfrm>
           <a:prstGeom prst="rect">
             <a:avLst/>
@@ -18020,8 +18037,8 @@
         </p:nvSpPr>
         <p:spPr>
           <a:xfrm rot="1192200">
-            <a:off x="4046040" y="2670840"/>
-            <a:ext cx="973440" cy="479520"/>
+            <a:off x="4046040" y="2670480"/>
+            <a:ext cx="973080" cy="479160"/>
           </a:xfrm>
           <a:prstGeom prst="rightArrow">
             <a:avLst>
@@ -18062,8 +18079,8 @@
         </p:nvSpPr>
         <p:spPr>
           <a:xfrm rot="20407800">
-            <a:off x="4024800" y="3458880"/>
-            <a:ext cx="973440" cy="479520"/>
+            <a:off x="4024440" y="3458880"/>
+            <a:ext cx="973080" cy="479160"/>
           </a:xfrm>
           <a:prstGeom prst="rightArrow">
             <a:avLst>
@@ -18104,8 +18121,8 @@
         </p:nvSpPr>
         <p:spPr>
           <a:xfrm rot="1192200">
-            <a:off x="5799600" y="3779280"/>
-            <a:ext cx="973440" cy="479520"/>
+            <a:off x="5799600" y="3778920"/>
+            <a:ext cx="973080" cy="479160"/>
           </a:xfrm>
           <a:prstGeom prst="rightArrow">
             <a:avLst>
@@ -18146,8 +18163,8 @@
         </p:nvSpPr>
         <p:spPr>
           <a:xfrm rot="20407800">
-            <a:off x="5873040" y="2454480"/>
-            <a:ext cx="973440" cy="479520"/>
+            <a:off x="5872680" y="2454480"/>
+            <a:ext cx="973080" cy="479160"/>
           </a:xfrm>
           <a:prstGeom prst="rightArrow">
             <a:avLst>
@@ -18189,7 +18206,7 @@
         <p:spPr>
           <a:xfrm>
             <a:off x="5951880" y="3115440"/>
-            <a:ext cx="973440" cy="479520"/>
+            <a:ext cx="973080" cy="479160"/>
           </a:xfrm>
           <a:prstGeom prst="rightArrow">
             <a:avLst>
@@ -18280,7 +18297,7 @@
         <p:spPr>
           <a:xfrm>
             <a:off x="684360" y="4487400"/>
-            <a:ext cx="8529480" cy="1501920"/>
+            <a:ext cx="8529120" cy="1501560"/>
           </a:xfrm>
           <a:prstGeom prst="rect">
             <a:avLst/>
@@ -18329,7 +18346,7 @@
         <p:spPr>
           <a:xfrm>
             <a:off x="684360" y="685800"/>
-            <a:ext cx="8529480" cy="3610080"/>
+            <a:ext cx="8529120" cy="3609720"/>
           </a:xfrm>
           <a:prstGeom prst="rect">
             <a:avLst/>
@@ -18348,7 +18365,7 @@
         <p:txBody>
           <a:bodyPr lIns="90000" rIns="90000" tIns="45000" bIns="45000" anchor="ctr"/>
           <a:p>
-            <a:pPr marL="285840" indent="-280800">
+            <a:pPr marL="285840" indent="-280440">
               <a:lnSpc>
                 <a:spcPct val="100000"/>
               </a:lnSpc>
@@ -18440,7 +18457,7 @@
             </a:endParaRPr>
           </a:p>
           <a:p>
-            <a:pPr marL="285840" indent="-280800">
+            <a:pPr marL="285840" indent="-280440">
               <a:lnSpc>
                 <a:spcPct val="100000"/>
               </a:lnSpc>
@@ -18492,7 +18509,7 @@
             </a:endParaRPr>
           </a:p>
           <a:p>
-            <a:pPr marL="285840" indent="-280800">
+            <a:pPr marL="285840" indent="-280440">
               <a:lnSpc>
                 <a:spcPct val="100000"/>
               </a:lnSpc>
@@ -18578,7 +18595,7 @@
         <p:spPr>
           <a:xfrm>
             <a:off x="6227640" y="3794400"/>
-            <a:ext cx="909360" cy="909360"/>
+            <a:ext cx="909000" cy="909000"/>
           </a:xfrm>
           <a:prstGeom prst="rect">
             <a:avLst/>
@@ -18601,7 +18618,7 @@
         <p:spPr>
           <a:xfrm>
             <a:off x="2468520" y="3843720"/>
-            <a:ext cx="909360" cy="909360"/>
+            <a:ext cx="909000" cy="909000"/>
           </a:xfrm>
           <a:prstGeom prst="rect">
             <a:avLst/>
@@ -18624,7 +18641,7 @@
         <p:spPr>
           <a:xfrm>
             <a:off x="9790920" y="3794400"/>
-            <a:ext cx="909360" cy="909360"/>
+            <a:ext cx="909000" cy="909000"/>
           </a:xfrm>
           <a:prstGeom prst="rect">
             <a:avLst/>
@@ -18647,7 +18664,7 @@
         <p:spPr>
           <a:xfrm>
             <a:off x="7903800" y="3794400"/>
-            <a:ext cx="909360" cy="909360"/>
+            <a:ext cx="909000" cy="909000"/>
           </a:xfrm>
           <a:prstGeom prst="rect">
             <a:avLst/>
@@ -18670,7 +18687,7 @@
         <p:spPr>
           <a:xfrm>
             <a:off x="4412520" y="3794400"/>
-            <a:ext cx="909360" cy="909360"/>
+            <a:ext cx="909000" cy="909000"/>
           </a:xfrm>
           <a:prstGeom prst="rect">
             <a:avLst/>
@@ -18693,7 +18710,7 @@
         <p:spPr>
           <a:xfrm>
             <a:off x="684360" y="3843720"/>
-            <a:ext cx="909360" cy="909360"/>
+            <a:ext cx="909000" cy="909000"/>
           </a:xfrm>
           <a:prstGeom prst="rect">
             <a:avLst/>
@@ -18712,7 +18729,7 @@
         <p:spPr>
           <a:xfrm>
             <a:off x="1638000" y="4183200"/>
-            <a:ext cx="677880" cy="257040"/>
+            <a:ext cx="677520" cy="256680"/>
           </a:xfrm>
           <a:prstGeom prst="rightArrow">
             <a:avLst>
@@ -18751,7 +18768,7 @@
         <p:spPr>
           <a:xfrm>
             <a:off x="3511800" y="4201920"/>
-            <a:ext cx="677880" cy="257040"/>
+            <a:ext cx="677520" cy="256680"/>
           </a:xfrm>
           <a:prstGeom prst="rightArrow">
             <a:avLst>
@@ -18790,7 +18807,7 @@
         <p:spPr>
           <a:xfrm>
             <a:off x="5366520" y="4193640"/>
-            <a:ext cx="677880" cy="257040"/>
+            <a:ext cx="677520" cy="256680"/>
           </a:xfrm>
           <a:prstGeom prst="rightArrow">
             <a:avLst>
@@ -18829,7 +18846,7 @@
         <p:spPr>
           <a:xfrm>
             <a:off x="7162200" y="4183200"/>
-            <a:ext cx="677880" cy="257040"/>
+            <a:ext cx="677520" cy="256680"/>
           </a:xfrm>
           <a:prstGeom prst="rightArrow">
             <a:avLst>
@@ -18868,7 +18885,7 @@
         <p:spPr>
           <a:xfrm>
             <a:off x="8876160" y="4169880"/>
-            <a:ext cx="677880" cy="257040"/>
+            <a:ext cx="677520" cy="256680"/>
           </a:xfrm>
           <a:prstGeom prst="rightArrow">
             <a:avLst>
@@ -18956,7 +18973,7 @@
         <p:spPr>
           <a:xfrm>
             <a:off x="684360" y="4487400"/>
-            <a:ext cx="8529480" cy="1501920"/>
+            <a:ext cx="8529120" cy="1501560"/>
           </a:xfrm>
           <a:prstGeom prst="rect">
             <a:avLst/>
@@ -19005,7 +19022,7 @@
         <p:spPr>
           <a:xfrm>
             <a:off x="684360" y="685800"/>
-            <a:ext cx="8529480" cy="3610080"/>
+            <a:ext cx="8529120" cy="3609720"/>
           </a:xfrm>
           <a:prstGeom prst="rect">
             <a:avLst/>
@@ -19024,7 +19041,7 @@
         <p:txBody>
           <a:bodyPr lIns="90000" rIns="90000" tIns="45000" bIns="45000" anchor="ctr"/>
           <a:p>
-            <a:pPr marL="285840" indent="-280800">
+            <a:pPr marL="285840" indent="-280440">
               <a:lnSpc>
                 <a:spcPct val="100000"/>
               </a:lnSpc>
@@ -19106,7 +19123,7 @@
             </a:endParaRPr>
           </a:p>
           <a:p>
-            <a:pPr marL="285840" indent="-280800">
+            <a:pPr marL="285840" indent="-280440">
               <a:lnSpc>
                 <a:spcPct val="100000"/>
               </a:lnSpc>
@@ -19152,7 +19169,7 @@
         <p:spPr>
           <a:xfrm>
             <a:off x="4681800" y="2481480"/>
-            <a:ext cx="909360" cy="909360"/>
+            <a:ext cx="909000" cy="909000"/>
           </a:xfrm>
           <a:prstGeom prst="rect">
             <a:avLst/>
@@ -19175,7 +19192,7 @@
         <p:spPr>
           <a:xfrm>
             <a:off x="6609240" y="3669480"/>
-            <a:ext cx="909360" cy="909360"/>
+            <a:ext cx="909000" cy="909000"/>
           </a:xfrm>
           <a:prstGeom prst="rect">
             <a:avLst/>
@@ -19198,7 +19215,7 @@
         <p:spPr>
           <a:xfrm>
             <a:off x="2973240" y="3669480"/>
-            <a:ext cx="909360" cy="909360"/>
+            <a:ext cx="909000" cy="909000"/>
           </a:xfrm>
           <a:prstGeom prst="rect">
             <a:avLst/>
@@ -19217,7 +19234,7 @@
         <p:spPr>
           <a:xfrm>
             <a:off x="4214160" y="3946320"/>
-            <a:ext cx="2063520" cy="355680"/>
+            <a:ext cx="2063160" cy="355320"/>
           </a:xfrm>
           <a:prstGeom prst="rightArrow">
             <a:avLst>
@@ -19256,7 +19273,7 @@
         <p:spPr>
           <a:xfrm>
             <a:off x="4988160" y="3533400"/>
-            <a:ext cx="296640" cy="402120"/>
+            <a:ext cx="296280" cy="401760"/>
           </a:xfrm>
           <a:prstGeom prst="downArrow">
             <a:avLst>

</xml_diff>

<commit_message>
#12 Weak AI vs Strong AI explanation speech data transformation part 1 added on introduction slides
</commit_message>
<xml_diff>
--- a/SAI_presentation_libre_office.pptx
+++ b/SAI_presentation_libre_office.pptx
@@ -250,7 +250,7 @@
           <a:bodyPr lIns="0" rIns="0" tIns="0" bIns="0" anchor="b"/>
           <a:p>
             <a:pPr algn="r"/>
-            <a:fld id="{4A9370F0-5C00-41A5-B2ED-826CA994742E}" type="slidenum">
+            <a:fld id="{DA7DB626-504F-4B41-B30C-74ECD9C89993}" type="slidenum">
               <a:rPr b="0" lang="fr-FR" sz="1400" spc="-1" strike="noStrike">
                 <a:latin typeface="Times New Roman"/>
               </a:rPr>
@@ -298,7 +298,7 @@
         <p:spPr>
           <a:xfrm>
             <a:off x="685800" y="1143000"/>
-            <a:ext cx="5481000" cy="3080880"/>
+            <a:ext cx="5480640" cy="3080520"/>
           </a:xfrm>
           <a:prstGeom prst="rect">
             <a:avLst/>
@@ -318,7 +318,7 @@
         <p:spPr>
           <a:xfrm>
             <a:off x="685800" y="4400640"/>
-            <a:ext cx="5481000" cy="3594960"/>
+            <a:ext cx="5480640" cy="3594600"/>
           </a:xfrm>
           <a:prstGeom prst="rect">
             <a:avLst/>
@@ -327,7 +327,7 @@
         <p:txBody>
           <a:bodyPr lIns="0" rIns="0" tIns="0" bIns="0"/>
           <a:p>
-            <a:pPr marL="216000" indent="-210960">
+            <a:pPr marL="216000" indent="-210600">
               <a:lnSpc>
                 <a:spcPct val="100000"/>
               </a:lnSpc>
@@ -343,7 +343,7 @@
             </a:endParaRPr>
           </a:p>
           <a:p>
-            <a:pPr marL="216000" indent="-210960">
+            <a:pPr marL="216000" indent="-210600">
               <a:lnSpc>
                 <a:spcPct val="100000"/>
               </a:lnSpc>
@@ -360,7 +360,7 @@
             </a:endParaRPr>
           </a:p>
           <a:p>
-            <a:pPr marL="216000" indent="-210960">
+            <a:pPr marL="216000" indent="-210600">
               <a:lnSpc>
                 <a:spcPct val="100000"/>
               </a:lnSpc>
@@ -376,7 +376,7 @@
             </a:endParaRPr>
           </a:p>
           <a:p>
-            <a:pPr marL="216000" indent="-210960">
+            <a:pPr marL="216000" indent="-210600">
               <a:lnSpc>
                 <a:spcPct val="100000"/>
               </a:lnSpc>
@@ -392,7 +392,7 @@
             </a:endParaRPr>
           </a:p>
           <a:p>
-            <a:pPr marL="216000" indent="-210960">
+            <a:pPr marL="216000" indent="-210600">
               <a:lnSpc>
                 <a:spcPct val="100000"/>
               </a:lnSpc>
@@ -419,7 +419,7 @@
         <p:spPr>
           <a:xfrm>
             <a:off x="3884760" y="8685360"/>
-            <a:ext cx="2966400" cy="453240"/>
+            <a:ext cx="2966040" cy="452880"/>
           </a:xfrm>
           <a:prstGeom prst="rect">
             <a:avLst/>
@@ -443,7 +443,7 @@
                 <a:spcPct val="100000"/>
               </a:lnSpc>
             </a:pPr>
-            <a:fld id="{86086E7F-7C18-4864-8788-21FA4BFE37F9}" type="slidenum">
+            <a:fld id="{931FE728-8A25-4099-959F-557573CA671A}" type="slidenum">
               <a:rPr b="0" lang="fr-FR" sz="1200" spc="-1" strike="noStrike">
                 <a:solidFill>
                   <a:srgbClr val="000000"/>
@@ -493,7 +493,7 @@
         <p:spPr>
           <a:xfrm>
             <a:off x="685800" y="1143000"/>
-            <a:ext cx="5481000" cy="3080880"/>
+            <a:ext cx="5480640" cy="3080520"/>
           </a:xfrm>
           <a:prstGeom prst="rect">
             <a:avLst/>
@@ -513,7 +513,7 @@
         <p:spPr>
           <a:xfrm>
             <a:off x="685800" y="4400640"/>
-            <a:ext cx="5481000" cy="3594960"/>
+            <a:ext cx="5480640" cy="3594600"/>
           </a:xfrm>
           <a:prstGeom prst="rect">
             <a:avLst/>
@@ -522,7 +522,7 @@
         <p:txBody>
           <a:bodyPr lIns="0" rIns="0" tIns="0" bIns="0"/>
           <a:p>
-            <a:pPr marL="216000" indent="-211320">
+            <a:pPr marL="216000" indent="-210960">
               <a:lnSpc>
                 <a:spcPct val="100000"/>
               </a:lnSpc>
@@ -538,7 +538,7 @@
             </a:endParaRPr>
           </a:p>
           <a:p>
-            <a:pPr marL="216000" indent="-211320">
+            <a:pPr marL="216000" indent="-210960">
               <a:lnSpc>
                 <a:spcPct val="100000"/>
               </a:lnSpc>
@@ -548,7 +548,7 @@
             </a:endParaRPr>
           </a:p>
           <a:p>
-            <a:pPr marL="216000" indent="-211320">
+            <a:pPr marL="216000" indent="-210960">
               <a:lnSpc>
                 <a:spcPct val="100000"/>
               </a:lnSpc>
@@ -564,7 +564,7 @@
             </a:endParaRPr>
           </a:p>
           <a:p>
-            <a:pPr marL="216000" indent="-211320">
+            <a:pPr marL="216000" indent="-210960">
               <a:lnSpc>
                 <a:spcPct val="100000"/>
               </a:lnSpc>
@@ -574,7 +574,7 @@
             </a:endParaRPr>
           </a:p>
           <a:p>
-            <a:pPr marL="216000" indent="-211320">
+            <a:pPr marL="216000" indent="-210960">
               <a:lnSpc>
                 <a:spcPct val="100000"/>
               </a:lnSpc>
@@ -590,7 +590,7 @@
             </a:endParaRPr>
           </a:p>
           <a:p>
-            <a:pPr marL="216000" indent="-211320">
+            <a:pPr marL="216000" indent="-210960">
               <a:lnSpc>
                 <a:spcPct val="100000"/>
               </a:lnSpc>
@@ -600,7 +600,7 @@
             </a:endParaRPr>
           </a:p>
           <a:p>
-            <a:pPr marL="216000" indent="-211320">
+            <a:pPr marL="216000" indent="-210960">
               <a:lnSpc>
                 <a:spcPct val="100000"/>
               </a:lnSpc>
@@ -616,7 +616,7 @@
             </a:endParaRPr>
           </a:p>
           <a:p>
-            <a:pPr marL="216000" indent="-211320">
+            <a:pPr marL="216000" indent="-210960">
               <a:lnSpc>
                 <a:spcPct val="100000"/>
               </a:lnSpc>
@@ -626,7 +626,7 @@
             </a:endParaRPr>
           </a:p>
           <a:p>
-            <a:pPr marL="216000" indent="-211320">
+            <a:pPr marL="216000" indent="-210960">
               <a:lnSpc>
                 <a:spcPct val="100000"/>
               </a:lnSpc>
@@ -636,7 +636,7 @@
             </a:endParaRPr>
           </a:p>
           <a:p>
-            <a:pPr marL="216000" indent="-211320">
+            <a:pPr marL="216000" indent="-210960">
               <a:lnSpc>
                 <a:spcPct val="100000"/>
               </a:lnSpc>
@@ -652,7 +652,7 @@
             </a:endParaRPr>
           </a:p>
           <a:p>
-            <a:pPr marL="216000" indent="-211320">
+            <a:pPr marL="216000" indent="-210960">
               <a:lnSpc>
                 <a:spcPct val="100000"/>
               </a:lnSpc>
@@ -668,7 +668,7 @@
             </a:endParaRPr>
           </a:p>
           <a:p>
-            <a:pPr marL="216000" indent="-211320">
+            <a:pPr marL="216000" indent="-210960">
               <a:lnSpc>
                 <a:spcPct val="100000"/>
               </a:lnSpc>
@@ -684,7 +684,7 @@
             </a:endParaRPr>
           </a:p>
           <a:p>
-            <a:pPr marL="216000" indent="-211320">
+            <a:pPr marL="216000" indent="-210960">
               <a:lnSpc>
                 <a:spcPct val="100000"/>
               </a:lnSpc>
@@ -694,7 +694,7 @@
             </a:endParaRPr>
           </a:p>
           <a:p>
-            <a:pPr marL="216000" indent="-211320">
+            <a:pPr marL="216000" indent="-210960">
               <a:lnSpc>
                 <a:spcPct val="100000"/>
               </a:lnSpc>
@@ -710,7 +710,7 @@
             </a:endParaRPr>
           </a:p>
           <a:p>
-            <a:pPr marL="216000" indent="-211320">
+            <a:pPr marL="216000" indent="-210960">
               <a:lnSpc>
                 <a:spcPct val="100000"/>
               </a:lnSpc>
@@ -720,7 +720,7 @@
             </a:endParaRPr>
           </a:p>
           <a:p>
-            <a:pPr marL="216000" indent="-211320">
+            <a:pPr marL="216000" indent="-210960">
               <a:lnSpc>
                 <a:spcPct val="100000"/>
               </a:lnSpc>
@@ -736,7 +736,7 @@
             </a:endParaRPr>
           </a:p>
           <a:p>
-            <a:pPr marL="216000" indent="-211320">
+            <a:pPr marL="216000" indent="-210960">
               <a:lnSpc>
                 <a:spcPct val="100000"/>
               </a:lnSpc>
@@ -752,7 +752,7 @@
             </a:endParaRPr>
           </a:p>
           <a:p>
-            <a:pPr marL="216000" indent="-211320">
+            <a:pPr marL="216000" indent="-210960">
               <a:lnSpc>
                 <a:spcPct val="100000"/>
               </a:lnSpc>
@@ -768,7 +768,7 @@
             </a:endParaRPr>
           </a:p>
           <a:p>
-            <a:pPr marL="216000" indent="-211320">
+            <a:pPr marL="216000" indent="-210960">
               <a:lnSpc>
                 <a:spcPct val="100000"/>
               </a:lnSpc>
@@ -784,7 +784,7 @@
             </a:endParaRPr>
           </a:p>
           <a:p>
-            <a:pPr marL="216000" indent="-211320">
+            <a:pPr marL="216000" indent="-210960">
               <a:lnSpc>
                 <a:spcPct val="100000"/>
               </a:lnSpc>
@@ -794,7 +794,7 @@
             </a:endParaRPr>
           </a:p>
           <a:p>
-            <a:pPr marL="216000" indent="-211320">
+            <a:pPr marL="216000" indent="-210960">
               <a:lnSpc>
                 <a:spcPct val="100000"/>
               </a:lnSpc>
@@ -810,7 +810,7 @@
             </a:endParaRPr>
           </a:p>
           <a:p>
-            <a:pPr marL="216000" indent="-211320">
+            <a:pPr marL="216000" indent="-210960">
               <a:lnSpc>
                 <a:spcPct val="100000"/>
               </a:lnSpc>
@@ -826,7 +826,7 @@
             </a:endParaRPr>
           </a:p>
           <a:p>
-            <a:pPr marL="216000" indent="-211320">
+            <a:pPr marL="216000" indent="-210960">
               <a:lnSpc>
                 <a:spcPct val="100000"/>
               </a:lnSpc>
@@ -842,7 +842,7 @@
             </a:endParaRPr>
           </a:p>
           <a:p>
-            <a:pPr marL="216000" indent="-211320">
+            <a:pPr marL="216000" indent="-210960">
               <a:lnSpc>
                 <a:spcPct val="100000"/>
               </a:lnSpc>
@@ -858,7 +858,7 @@
             </a:endParaRPr>
           </a:p>
           <a:p>
-            <a:pPr marL="216000" indent="-211320">
+            <a:pPr marL="216000" indent="-210960">
               <a:lnSpc>
                 <a:spcPct val="100000"/>
               </a:lnSpc>
@@ -874,7 +874,7 @@
             </a:endParaRPr>
           </a:p>
           <a:p>
-            <a:pPr marL="216000" indent="-211320">
+            <a:pPr marL="216000" indent="-210960">
               <a:lnSpc>
                 <a:spcPct val="100000"/>
               </a:lnSpc>
@@ -884,7 +884,7 @@
             </a:endParaRPr>
           </a:p>
           <a:p>
-            <a:pPr marL="216000" indent="-211320">
+            <a:pPr marL="216000" indent="-210960">
               <a:lnSpc>
                 <a:spcPct val="100000"/>
               </a:lnSpc>
@@ -900,7 +900,7 @@
             </a:endParaRPr>
           </a:p>
           <a:p>
-            <a:pPr marL="216000" indent="-211320">
+            <a:pPr marL="216000" indent="-210960">
               <a:lnSpc>
                 <a:spcPct val="100000"/>
               </a:lnSpc>
@@ -916,7 +916,7 @@
             </a:endParaRPr>
           </a:p>
           <a:p>
-            <a:pPr marL="216000" indent="-211320">
+            <a:pPr marL="216000" indent="-210960">
               <a:lnSpc>
                 <a:spcPct val="100000"/>
               </a:lnSpc>
@@ -932,7 +932,7 @@
             </a:endParaRPr>
           </a:p>
           <a:p>
-            <a:pPr marL="216000" indent="-211320">
+            <a:pPr marL="216000" indent="-210960">
               <a:lnSpc>
                 <a:spcPct val="100000"/>
               </a:lnSpc>
@@ -942,7 +942,7 @@
             </a:endParaRPr>
           </a:p>
           <a:p>
-            <a:pPr marL="216000" indent="-211320">
+            <a:pPr marL="216000" indent="-210960">
               <a:lnSpc>
                 <a:spcPct val="100000"/>
               </a:lnSpc>
@@ -958,7 +958,7 @@
             </a:endParaRPr>
           </a:p>
           <a:p>
-            <a:pPr marL="216000" indent="-211320">
+            <a:pPr marL="216000" indent="-210960">
               <a:lnSpc>
                 <a:spcPct val="100000"/>
               </a:lnSpc>
@@ -974,7 +974,7 @@
             </a:endParaRPr>
           </a:p>
           <a:p>
-            <a:pPr marL="216000" indent="-211320">
+            <a:pPr marL="216000" indent="-210960">
               <a:lnSpc>
                 <a:spcPct val="100000"/>
               </a:lnSpc>
@@ -990,7 +990,7 @@
             </a:endParaRPr>
           </a:p>
           <a:p>
-            <a:pPr marL="216000" indent="-211320">
+            <a:pPr marL="216000" indent="-210960">
               <a:lnSpc>
                 <a:spcPct val="100000"/>
               </a:lnSpc>
@@ -1000,7 +1000,7 @@
             </a:endParaRPr>
           </a:p>
           <a:p>
-            <a:pPr marL="216000" indent="-211320">
+            <a:pPr marL="216000" indent="-210960">
               <a:lnSpc>
                 <a:spcPct val="100000"/>
               </a:lnSpc>
@@ -1016,7 +1016,7 @@
             </a:endParaRPr>
           </a:p>
           <a:p>
-            <a:pPr marL="216000" indent="-211320">
+            <a:pPr marL="216000" indent="-210960">
               <a:lnSpc>
                 <a:spcPct val="100000"/>
               </a:lnSpc>
@@ -1032,7 +1032,7 @@
             </a:endParaRPr>
           </a:p>
           <a:p>
-            <a:pPr marL="216000" indent="-211320">
+            <a:pPr marL="216000" indent="-210960">
               <a:lnSpc>
                 <a:spcPct val="100000"/>
               </a:lnSpc>
@@ -1048,7 +1048,7 @@
             </a:endParaRPr>
           </a:p>
           <a:p>
-            <a:pPr marL="216000" indent="-211320">
+            <a:pPr marL="216000" indent="-210960">
               <a:lnSpc>
                 <a:spcPct val="100000"/>
               </a:lnSpc>
@@ -1064,7 +1064,7 @@
             </a:endParaRPr>
           </a:p>
           <a:p>
-            <a:pPr marL="216000" indent="-211320">
+            <a:pPr marL="216000" indent="-210960">
               <a:lnSpc>
                 <a:spcPct val="100000"/>
               </a:lnSpc>
@@ -1074,7 +1074,7 @@
             </a:endParaRPr>
           </a:p>
           <a:p>
-            <a:pPr marL="216000" indent="-211320">
+            <a:pPr marL="216000" indent="-210960">
               <a:lnSpc>
                 <a:spcPct val="100000"/>
               </a:lnSpc>
@@ -1090,7 +1090,7 @@
             </a:endParaRPr>
           </a:p>
           <a:p>
-            <a:pPr marL="216000" indent="-211320">
+            <a:pPr marL="216000" indent="-210960">
               <a:lnSpc>
                 <a:spcPct val="100000"/>
               </a:lnSpc>
@@ -1107,7 +1107,7 @@
             </a:endParaRPr>
           </a:p>
           <a:p>
-            <a:pPr marL="216000" indent="-211320">
+            <a:pPr marL="216000" indent="-210960">
               <a:lnSpc>
                 <a:spcPct val="100000"/>
               </a:lnSpc>
@@ -1124,7 +1124,7 @@
             </a:endParaRPr>
           </a:p>
           <a:p>
-            <a:pPr marL="216000" indent="-211320">
+            <a:pPr marL="216000" indent="-210960">
               <a:lnSpc>
                 <a:spcPct val="100000"/>
               </a:lnSpc>
@@ -1141,7 +1141,7 @@
             </a:endParaRPr>
           </a:p>
           <a:p>
-            <a:pPr marL="216000" indent="-211320">
+            <a:pPr marL="216000" indent="-210960">
               <a:lnSpc>
                 <a:spcPct val="100000"/>
               </a:lnSpc>
@@ -1151,7 +1151,7 @@
             </a:endParaRPr>
           </a:p>
           <a:p>
-            <a:pPr marL="216000" indent="-211320">
+            <a:pPr marL="216000" indent="-210960">
               <a:lnSpc>
                 <a:spcPct val="100000"/>
               </a:lnSpc>
@@ -1168,7 +1168,7 @@
             </a:endParaRPr>
           </a:p>
           <a:p>
-            <a:pPr marL="216000" indent="-211320">
+            <a:pPr marL="216000" indent="-210960">
               <a:lnSpc>
                 <a:spcPct val="100000"/>
               </a:lnSpc>
@@ -1185,7 +1185,7 @@
             </a:endParaRPr>
           </a:p>
           <a:p>
-            <a:pPr marL="216000" indent="-211320">
+            <a:pPr marL="216000" indent="-210960">
               <a:lnSpc>
                 <a:spcPct val="100000"/>
               </a:lnSpc>
@@ -1195,7 +1195,7 @@
             </a:endParaRPr>
           </a:p>
           <a:p>
-            <a:pPr marL="216000" indent="-211320">
+            <a:pPr marL="216000" indent="-210960">
               <a:lnSpc>
                 <a:spcPct val="100000"/>
               </a:lnSpc>
@@ -1205,7 +1205,7 @@
             </a:endParaRPr>
           </a:p>
           <a:p>
-            <a:pPr marL="216000" indent="-211320">
+            <a:pPr marL="216000" indent="-210960">
               <a:lnSpc>
                 <a:spcPct val="100000"/>
               </a:lnSpc>
@@ -1215,7 +1215,7 @@
             </a:endParaRPr>
           </a:p>
           <a:p>
-            <a:pPr marL="216000" indent="-211320">
+            <a:pPr marL="216000" indent="-210960">
               <a:lnSpc>
                 <a:spcPct val="100000"/>
               </a:lnSpc>
@@ -1225,7 +1225,7 @@
             </a:endParaRPr>
           </a:p>
           <a:p>
-            <a:pPr marL="216000" indent="-211320">
+            <a:pPr marL="216000" indent="-210960">
               <a:lnSpc>
                 <a:spcPct val="100000"/>
               </a:lnSpc>
@@ -1245,7 +1245,7 @@
         <p:spPr>
           <a:xfrm>
             <a:off x="3884760" y="8685360"/>
-            <a:ext cx="2966400" cy="453240"/>
+            <a:ext cx="2966040" cy="452880"/>
           </a:xfrm>
           <a:prstGeom prst="rect">
             <a:avLst/>
@@ -1269,7 +1269,7 @@
                 <a:spcPct val="100000"/>
               </a:lnSpc>
             </a:pPr>
-            <a:fld id="{34C0937F-3B96-4445-B005-6EBD7FC26D4B}" type="slidenum">
+            <a:fld id="{8FC3DA6A-BFC0-4E37-B5BC-2D12252A9B2C}" type="slidenum">
               <a:rPr b="0" lang="fr-FR" sz="1200" spc="-1" strike="noStrike">
                 <a:solidFill>
                   <a:srgbClr val="000000"/>
@@ -1319,7 +1319,7 @@
         <p:spPr>
           <a:xfrm>
             <a:off x="685800" y="1143000"/>
-            <a:ext cx="5481000" cy="3080880"/>
+            <a:ext cx="5480640" cy="3080520"/>
           </a:xfrm>
           <a:prstGeom prst="rect">
             <a:avLst/>
@@ -1339,7 +1339,7 @@
         <p:spPr>
           <a:xfrm>
             <a:off x="685800" y="4400640"/>
-            <a:ext cx="5481000" cy="3594960"/>
+            <a:ext cx="5480640" cy="3594600"/>
           </a:xfrm>
           <a:prstGeom prst="rect">
             <a:avLst/>
@@ -1348,278 +1348,315 @@
         <p:txBody>
           <a:bodyPr lIns="0" rIns="0" tIns="0" bIns="0"/>
           <a:p>
-            <a:pPr marL="216000" indent="-213120">
-              <a:lnSpc>
-                <a:spcPct val="100000"/>
-              </a:lnSpc>
-            </a:pPr>
-            <a:r>
-              <a:rPr b="0" lang="fr-FR" sz="1800" spc="-1" strike="noStrike">
+            <a:pPr marL="216000" indent="-212760">
+              <a:lnSpc>
+                <a:spcPct val="100000"/>
+              </a:lnSpc>
+            </a:pPr>
+            <a:r>
+              <a:rPr b="0" lang="fr-FR" sz="1000" spc="-1" strike="noStrike">
                 <a:latin typeface="Arial"/>
               </a:rPr>
               <a:t>I will present you what is a weak AI</a:t>
             </a:r>
-            <a:endParaRPr b="0" lang="fr-FR" sz="1800" spc="-1" strike="noStrike">
-              <a:latin typeface="Arial"/>
-            </a:endParaRPr>
-          </a:p>
-          <a:p>
-            <a:pPr marL="216000" indent="-213120">
-              <a:lnSpc>
-                <a:spcPct val="100000"/>
-              </a:lnSpc>
-            </a:pPr>
-            <a:r>
-              <a:rPr b="0" lang="fr-FR" sz="1800" spc="-1" strike="noStrike">
+            <a:endParaRPr b="0" lang="fr-FR" sz="1000" spc="-1" strike="noStrike">
+              <a:latin typeface="Arial"/>
+            </a:endParaRPr>
+          </a:p>
+          <a:p>
+            <a:pPr marL="216000" indent="-212760">
+              <a:lnSpc>
+                <a:spcPct val="100000"/>
+              </a:lnSpc>
+            </a:pPr>
+            <a:r>
+              <a:rPr b="0" lang="fr-FR" sz="1000" spc="-1" strike="noStrike">
                 <a:latin typeface="Arial"/>
               </a:rPr>
               <a:t>Then you will understand the particularity of the AI I want to create.</a:t>
             </a:r>
-            <a:endParaRPr b="0" lang="fr-FR" sz="1800" spc="-1" strike="noStrike">
-              <a:latin typeface="Arial"/>
-            </a:endParaRPr>
-          </a:p>
-          <a:p>
-            <a:pPr marL="216000" indent="-213120">
-              <a:lnSpc>
-                <a:spcPct val="100000"/>
-              </a:lnSpc>
-            </a:pPr>
-            <a:r>
-              <a:rPr b="0" lang="fr-FR" sz="1800" spc="-1" strike="noStrike">
+            <a:endParaRPr b="0" lang="fr-FR" sz="1000" spc="-1" strike="noStrike">
+              <a:latin typeface="Arial"/>
+            </a:endParaRPr>
+          </a:p>
+          <a:p>
+            <a:pPr marL="216000" indent="-212760">
+              <a:lnSpc>
+                <a:spcPct val="100000"/>
+              </a:lnSpc>
+            </a:pPr>
+            <a:r>
+              <a:rPr b="0" lang="fr-FR" sz="1000" spc="-1" strike="noStrike">
                 <a:latin typeface="Arial"/>
               </a:rPr>
               <a:t>Weak AI is an AI which is a specialist on something he was train for.</a:t>
             </a:r>
-            <a:endParaRPr b="0" lang="fr-FR" sz="1800" spc="-1" strike="noStrike">
-              <a:latin typeface="Arial"/>
-            </a:endParaRPr>
-          </a:p>
-          <a:p>
-            <a:pPr marL="216000" indent="-213120">
-              <a:lnSpc>
-                <a:spcPct val="100000"/>
-              </a:lnSpc>
-            </a:pPr>
-            <a:endParaRPr b="0" lang="fr-FR" sz="1800" spc="-1" strike="noStrike">
-              <a:latin typeface="Arial"/>
-            </a:endParaRPr>
-          </a:p>
-          <a:p>
-            <a:pPr marL="216000" indent="-213120">
-              <a:lnSpc>
-                <a:spcPct val="100000"/>
-              </a:lnSpc>
-            </a:pPr>
-            <a:r>
-              <a:rPr b="0" lang="fr-FR" sz="1800" spc="-1" strike="noStrike">
+            <a:endParaRPr b="0" lang="fr-FR" sz="1000" spc="-1" strike="noStrike">
+              <a:latin typeface="Arial"/>
+            </a:endParaRPr>
+          </a:p>
+          <a:p>
+            <a:pPr marL="216000" indent="-212760">
+              <a:lnSpc>
+                <a:spcPct val="100000"/>
+              </a:lnSpc>
+            </a:pPr>
+            <a:endParaRPr b="0" lang="fr-FR" sz="1000" spc="-1" strike="noStrike">
+              <a:latin typeface="Arial"/>
+            </a:endParaRPr>
+          </a:p>
+          <a:p>
+            <a:pPr marL="216000" indent="-212760">
+              <a:lnSpc>
+                <a:spcPct val="100000"/>
+              </a:lnSpc>
+            </a:pPr>
+            <a:r>
+              <a:rPr b="0" lang="fr-FR" sz="1000" spc="-1" strike="noStrike">
                 <a:latin typeface="Arial"/>
               </a:rPr>
               <a:t>It can be really good at what it does (for example, beat the best player on AlphaGo)</a:t>
             </a:r>
-            <a:endParaRPr b="0" lang="fr-FR" sz="1800" spc="-1" strike="noStrike">
-              <a:latin typeface="Arial"/>
-            </a:endParaRPr>
-          </a:p>
-          <a:p>
-            <a:pPr marL="216000" indent="-213120">
-              <a:lnSpc>
-                <a:spcPct val="100000"/>
-              </a:lnSpc>
-            </a:pPr>
-            <a:r>
-              <a:rPr b="0" lang="fr-FR" sz="1800" spc="-1" strike="noStrike">
+            <a:endParaRPr b="0" lang="fr-FR" sz="1000" spc="-1" strike="noStrike">
+              <a:latin typeface="Arial"/>
+            </a:endParaRPr>
+          </a:p>
+          <a:p>
+            <a:pPr marL="216000" indent="-212760">
+              <a:lnSpc>
+                <a:spcPct val="100000"/>
+              </a:lnSpc>
+            </a:pPr>
+            <a:r>
+              <a:rPr b="0" lang="fr-FR" sz="1000" spc="-1" strike="noStrike">
                 <a:latin typeface="Arial"/>
               </a:rPr>
               <a:t>But it can’t understand the questions « where are you from ? » « What is your favorite food ? ».</a:t>
             </a:r>
-            <a:endParaRPr b="0" lang="fr-FR" sz="1800" spc="-1" strike="noStrike">
-              <a:latin typeface="Arial"/>
-            </a:endParaRPr>
-          </a:p>
-          <a:p>
-            <a:pPr marL="216000" indent="-213120">
-              <a:lnSpc>
-                <a:spcPct val="100000"/>
-              </a:lnSpc>
-            </a:pPr>
-            <a:endParaRPr b="0" lang="fr-FR" sz="1800" spc="-1" strike="noStrike">
-              <a:latin typeface="Arial"/>
-            </a:endParaRPr>
-          </a:p>
-          <a:p>
-            <a:pPr marL="216000" indent="-213120">
-              <a:lnSpc>
-                <a:spcPct val="100000"/>
-              </a:lnSpc>
-            </a:pPr>
-            <a:r>
-              <a:rPr b="0" lang="fr-FR" sz="1800" spc="-1" strike="noStrike">
+            <a:endParaRPr b="0" lang="fr-FR" sz="1000" spc="-1" strike="noStrike">
+              <a:latin typeface="Arial"/>
+            </a:endParaRPr>
+          </a:p>
+          <a:p>
+            <a:pPr marL="216000" indent="-212760">
+              <a:lnSpc>
+                <a:spcPct val="100000"/>
+              </a:lnSpc>
+            </a:pPr>
+            <a:endParaRPr b="0" lang="fr-FR" sz="1000" spc="-1" strike="noStrike">
+              <a:latin typeface="Arial"/>
+            </a:endParaRPr>
+          </a:p>
+          <a:p>
+            <a:pPr marL="216000" indent="-212760">
+              <a:lnSpc>
+                <a:spcPct val="100000"/>
+              </a:lnSpc>
+            </a:pPr>
+            <a:r>
+              <a:rPr b="0" lang="fr-FR" sz="1000" spc="-1" strike="noStrike">
                 <a:latin typeface="Arial"/>
               </a:rPr>
               <a:t>It may understand this question if we train it before or prepare the answer before.</a:t>
             </a:r>
-            <a:endParaRPr b="0" lang="fr-FR" sz="1800" spc="-1" strike="noStrike">
-              <a:latin typeface="Arial"/>
-            </a:endParaRPr>
-          </a:p>
-          <a:p>
-            <a:pPr marL="216000" indent="-213120">
-              <a:lnSpc>
-                <a:spcPct val="100000"/>
-              </a:lnSpc>
-            </a:pPr>
-            <a:endParaRPr b="0" lang="fr-FR" sz="1800" spc="-1" strike="noStrike">
-              <a:latin typeface="Arial"/>
-            </a:endParaRPr>
-          </a:p>
-          <a:p>
-            <a:pPr marL="216000" indent="-213120">
-              <a:lnSpc>
-                <a:spcPct val="100000"/>
-              </a:lnSpc>
-            </a:pPr>
-            <a:r>
-              <a:rPr b="0" lang="fr-FR" sz="1800" spc="-1" strike="noStrike">
+            <a:endParaRPr b="0" lang="fr-FR" sz="1000" spc="-1" strike="noStrike">
+              <a:latin typeface="Arial"/>
+            </a:endParaRPr>
+          </a:p>
+          <a:p>
+            <a:pPr marL="216000" indent="-212760">
+              <a:lnSpc>
+                <a:spcPct val="100000"/>
+              </a:lnSpc>
+            </a:pPr>
+            <a:endParaRPr b="0" lang="fr-FR" sz="1000" spc="-1" strike="noStrike">
+              <a:latin typeface="Arial"/>
+            </a:endParaRPr>
+          </a:p>
+          <a:p>
+            <a:pPr marL="216000" indent="-212760">
+              <a:lnSpc>
+                <a:spcPct val="100000"/>
+              </a:lnSpc>
+            </a:pPr>
+            <a:r>
+              <a:rPr b="0" lang="fr-FR" sz="1000" spc="-1" strike="noStrike">
                 <a:latin typeface="Arial"/>
               </a:rPr>
               <a:t>The benefit of our AI is that he will know it life belong and it would make hypothesis or heuristic of everything by itself</a:t>
             </a:r>
-            <a:endParaRPr b="0" lang="fr-FR" sz="1800" spc="-1" strike="noStrike">
-              <a:latin typeface="Arial"/>
-            </a:endParaRPr>
-          </a:p>
-          <a:p>
-            <a:pPr marL="216000" indent="-213120">
-              <a:lnSpc>
-                <a:spcPct val="100000"/>
-              </a:lnSpc>
-            </a:pPr>
-            <a:r>
-              <a:rPr b="0" lang="fr-FR" sz="1800" spc="-1" strike="noStrike">
+            <a:endParaRPr b="0" lang="fr-FR" sz="1000" spc="-1" strike="noStrike">
+              <a:latin typeface="Arial"/>
+            </a:endParaRPr>
+          </a:p>
+          <a:p>
+            <a:pPr marL="216000" indent="-212760">
+              <a:lnSpc>
+                <a:spcPct val="100000"/>
+              </a:lnSpc>
+            </a:pPr>
+            <a:r>
+              <a:rPr b="0" lang="fr-FR" sz="1000" spc="-1" strike="noStrike">
                 <a:latin typeface="Arial"/>
               </a:rPr>
               <a:t>An hypothesis or heuristic can be call as a strategy in our AI. Those strategies need to be created everytime the AI is in rest.</a:t>
             </a:r>
-            <a:endParaRPr b="0" lang="fr-FR" sz="1800" spc="-1" strike="noStrike">
-              <a:latin typeface="Arial"/>
-            </a:endParaRPr>
-          </a:p>
-          <a:p>
-            <a:pPr marL="216000" indent="-213120">
-              <a:lnSpc>
-                <a:spcPct val="100000"/>
-              </a:lnSpc>
-            </a:pPr>
-            <a:r>
-              <a:rPr b="0" lang="fr-FR" sz="1800" spc="-1" strike="noStrike">
+            <a:endParaRPr b="0" lang="fr-FR" sz="1000" spc="-1" strike="noStrike">
+              <a:latin typeface="Arial"/>
+            </a:endParaRPr>
+          </a:p>
+          <a:p>
+            <a:pPr marL="216000" indent="-212760">
+              <a:lnSpc>
+                <a:spcPct val="100000"/>
+              </a:lnSpc>
+            </a:pPr>
+            <a:r>
+              <a:rPr b="0" lang="fr-FR" sz="1000" spc="-1" strike="noStrike">
                 <a:latin typeface="Arial"/>
                 <a:ea typeface="Noto Sans CJK SC"/>
               </a:rPr>
               <a:t>For example after responding the human response and a few seconds (polite) it will be on rest mode (continue what it was thinking about/strategy)</a:t>
             </a:r>
-            <a:endParaRPr b="0" lang="fr-FR" sz="1800" spc="-1" strike="noStrike">
-              <a:latin typeface="Arial"/>
-            </a:endParaRPr>
-          </a:p>
-          <a:p>
-            <a:pPr marL="216000" indent="-213120">
-              <a:lnSpc>
-                <a:spcPct val="100000"/>
-              </a:lnSpc>
-            </a:pPr>
-            <a:endParaRPr b="0" lang="fr-FR" sz="1800" spc="-1" strike="noStrike">
-              <a:latin typeface="Arial"/>
-            </a:endParaRPr>
-          </a:p>
-          <a:p>
-            <a:pPr marL="216000" indent="-213120">
-              <a:lnSpc>
-                <a:spcPct val="100000"/>
-              </a:lnSpc>
-            </a:pPr>
-            <a:r>
-              <a:rPr b="0" lang="fr-FR" sz="1800" spc="-1" strike="noStrike">
+            <a:endParaRPr b="0" lang="fr-FR" sz="1000" spc="-1" strike="noStrike">
+              <a:latin typeface="Arial"/>
+            </a:endParaRPr>
+          </a:p>
+          <a:p>
+            <a:pPr marL="216000" indent="-212760">
+              <a:lnSpc>
+                <a:spcPct val="100000"/>
+              </a:lnSpc>
+            </a:pPr>
+            <a:endParaRPr b="0" lang="fr-FR" sz="1000" spc="-1" strike="noStrike">
+              <a:latin typeface="Arial"/>
+            </a:endParaRPr>
+          </a:p>
+          <a:p>
+            <a:pPr marL="216000" indent="-212760">
+              <a:lnSpc>
+                <a:spcPct val="100000"/>
+              </a:lnSpc>
+            </a:pPr>
+            <a:r>
+              <a:rPr b="0" lang="fr-FR" sz="1000" spc="-1" strike="noStrike">
                 <a:latin typeface="Arial"/>
                 <a:ea typeface="Noto Sans CJK SC"/>
               </a:rPr>
               <a:t>Moreover, the fact it records everything it happen didn’t make him heavy in term of memory</a:t>
             </a:r>
-            <a:endParaRPr b="0" lang="fr-FR" sz="1800" spc="-1" strike="noStrike">
-              <a:latin typeface="Arial"/>
-            </a:endParaRPr>
-          </a:p>
-          <a:p>
-            <a:pPr marL="216000" indent="-213120">
-              <a:lnSpc>
-                <a:spcPct val="100000"/>
-              </a:lnSpc>
-            </a:pPr>
-            <a:r>
-              <a:rPr b="0" lang="fr-FR" sz="1800" spc="-1" strike="noStrike">
+            <a:endParaRPr b="0" lang="fr-FR" sz="1000" spc="-1" strike="noStrike">
+              <a:latin typeface="Arial"/>
+            </a:endParaRPr>
+          </a:p>
+          <a:p>
+            <a:pPr marL="216000" indent="-212760">
+              <a:lnSpc>
+                <a:spcPct val="100000"/>
+              </a:lnSpc>
+            </a:pPr>
+            <a:r>
+              <a:rPr b="0" lang="fr-FR" sz="1000" spc="-1" strike="noStrike">
                 <a:latin typeface="Arial"/>
                 <a:ea typeface="Noto Sans CJK SC"/>
               </a:rPr>
               <a:t>It means that you have in one hand, the AI that process generally only once, and the other hand an SAI that process everytime</a:t>
             </a:r>
-            <a:endParaRPr b="0" lang="fr-FR" sz="1800" spc="-1" strike="noStrike">
-              <a:latin typeface="Arial"/>
-            </a:endParaRPr>
-          </a:p>
-          <a:p>
-            <a:pPr marL="216000" indent="-213120">
-              <a:lnSpc>
-                <a:spcPct val="100000"/>
-              </a:lnSpc>
-            </a:pPr>
-            <a:r>
-              <a:rPr b="0" lang="fr-FR" sz="1800" spc="-1" strike="noStrike">
+            <a:endParaRPr b="0" lang="fr-FR" sz="1000" spc="-1" strike="noStrike">
+              <a:latin typeface="Arial"/>
+            </a:endParaRPr>
+          </a:p>
+          <a:p>
+            <a:pPr marL="216000" indent="-212760">
+              <a:lnSpc>
+                <a:spcPct val="100000"/>
+              </a:lnSpc>
+            </a:pPr>
+            <a:r>
+              <a:rPr b="0" lang="fr-FR" sz="1000" spc="-1" strike="noStrike">
                 <a:latin typeface="Arial"/>
                 <a:ea typeface="Noto Sans CJK SC"/>
               </a:rPr>
               <a:t>Its power exist in the capacity to index duplicate data during its rest</a:t>
             </a:r>
-            <a:endParaRPr b="0" lang="fr-FR" sz="1800" spc="-1" strike="noStrike">
-              <a:latin typeface="Arial"/>
-            </a:endParaRPr>
-          </a:p>
-          <a:p>
-            <a:pPr marL="216000" indent="-213120">
-              <a:lnSpc>
-                <a:spcPct val="100000"/>
-              </a:lnSpc>
-            </a:pPr>
-            <a:endParaRPr b="0" lang="fr-FR" sz="1800" spc="-1" strike="noStrike">
-              <a:latin typeface="Arial"/>
-            </a:endParaRPr>
-          </a:p>
-          <a:p>
-            <a:pPr marL="216000" indent="-213120">
-              <a:lnSpc>
-                <a:spcPct val="100000"/>
-              </a:lnSpc>
-            </a:pPr>
-            <a:endParaRPr b="0" lang="fr-FR" sz="1800" spc="-1" strike="noStrike">
-              <a:latin typeface="Arial"/>
-            </a:endParaRPr>
-          </a:p>
-          <a:p>
-            <a:pPr marL="216000" indent="-213120">
-              <a:lnSpc>
-                <a:spcPct val="100000"/>
-              </a:lnSpc>
-            </a:pPr>
-            <a:endParaRPr b="0" lang="fr-FR" sz="1800" spc="-1" strike="noStrike">
-              <a:latin typeface="Arial"/>
-            </a:endParaRPr>
-          </a:p>
-          <a:p>
-            <a:pPr marL="216000" indent="-213120">
-              <a:lnSpc>
-                <a:spcPct val="100000"/>
-              </a:lnSpc>
-            </a:pPr>
-            <a:endParaRPr b="0" lang="fr-FR" sz="1800" spc="-1" strike="noStrike">
+            <a:endParaRPr b="0" lang="fr-FR" sz="1000" spc="-1" strike="noStrike">
+              <a:latin typeface="Arial"/>
+            </a:endParaRPr>
+          </a:p>
+          <a:p>
+            <a:pPr marL="216000" indent="-212760">
+              <a:lnSpc>
+                <a:spcPct val="100000"/>
+              </a:lnSpc>
+            </a:pPr>
+            <a:endParaRPr b="0" lang="fr-FR" sz="1000" spc="-1" strike="noStrike">
+              <a:latin typeface="Arial"/>
+            </a:endParaRPr>
+          </a:p>
+          <a:p>
+            <a:pPr marL="216000" indent="-212760">
+              <a:lnSpc>
+                <a:spcPct val="100000"/>
+              </a:lnSpc>
+            </a:pPr>
+            <a:r>
+              <a:rPr b="0" lang="fr-FR" sz="1000" spc="-1" strike="noStrike">
+                <a:latin typeface="Arial"/>
+                <a:ea typeface="Noto Sans CJK SC"/>
+              </a:rPr>
+              <a:t>A data can be two screen with the same pictures, for example during a record of 60 seconds, if nothing happened to the screen, it will only record one image</a:t>
+            </a:r>
+            <a:endParaRPr b="0" lang="fr-FR" sz="1000" spc="-1" strike="noStrike">
+              <a:latin typeface="Arial"/>
+            </a:endParaRPr>
+          </a:p>
+          <a:p>
+            <a:pPr marL="216000" indent="-212760">
+              <a:lnSpc>
+                <a:spcPct val="100000"/>
+              </a:lnSpc>
+            </a:pPr>
+            <a:endParaRPr b="0" lang="fr-FR" sz="1000" spc="-1" strike="noStrike">
+              <a:latin typeface="Arial"/>
+            </a:endParaRPr>
+          </a:p>
+          <a:p>
+            <a:pPr marL="216000" indent="-212760">
+              <a:lnSpc>
+                <a:spcPct val="100000"/>
+              </a:lnSpc>
+            </a:pPr>
+            <a:endParaRPr b="0" lang="fr-FR" sz="1000" spc="-1" strike="noStrike">
+              <a:latin typeface="Arial"/>
+            </a:endParaRPr>
+          </a:p>
+          <a:p>
+            <a:pPr marL="216000" indent="-212760">
+              <a:lnSpc>
+                <a:spcPct val="100000"/>
+              </a:lnSpc>
+            </a:pPr>
+            <a:endParaRPr b="0" lang="fr-FR" sz="1000" spc="-1" strike="noStrike">
+              <a:latin typeface="Arial"/>
+            </a:endParaRPr>
+          </a:p>
+          <a:p>
+            <a:pPr marL="216000" indent="-212760">
+              <a:lnSpc>
+                <a:spcPct val="100000"/>
+              </a:lnSpc>
+            </a:pPr>
+            <a:endParaRPr b="0" lang="fr-FR" sz="1000" spc="-1" strike="noStrike">
+              <a:latin typeface="Arial"/>
+            </a:endParaRPr>
+          </a:p>
+          <a:p>
+            <a:pPr marL="216000" indent="-212760">
+              <a:lnSpc>
+                <a:spcPct val="100000"/>
+              </a:lnSpc>
+            </a:pPr>
+            <a:endParaRPr b="0" lang="fr-FR" sz="1000" spc="-1" strike="noStrike">
               <a:latin typeface="Arial"/>
             </a:endParaRPr>
           </a:p>
@@ -1634,7 +1671,7 @@
         <p:spPr>
           <a:xfrm>
             <a:off x="3884760" y="8685360"/>
-            <a:ext cx="2966400" cy="453240"/>
+            <a:ext cx="2966040" cy="452880"/>
           </a:xfrm>
           <a:prstGeom prst="rect">
             <a:avLst/>
@@ -1658,7 +1695,7 @@
                 <a:spcPct val="100000"/>
               </a:lnSpc>
             </a:pPr>
-            <a:fld id="{34260756-3C5E-480F-A4B2-1A6278188A71}" type="slidenum">
+            <a:fld id="{4B9C2989-0DA9-45D7-85CC-139C588A1BCA}" type="slidenum">
               <a:rPr b="0" lang="fr-FR" sz="1200" spc="-1" strike="noStrike">
                 <a:solidFill>
                   <a:srgbClr val="000000"/>
@@ -1708,7 +1745,7 @@
         <p:spPr>
           <a:xfrm>
             <a:off x="380880" y="694800"/>
-            <a:ext cx="6091560" cy="3424680"/>
+            <a:ext cx="6091200" cy="3424320"/>
           </a:xfrm>
           <a:prstGeom prst="rect">
             <a:avLst/>
@@ -1728,7 +1765,7 @@
         <p:spPr>
           <a:xfrm>
             <a:off x="685800" y="4343400"/>
-            <a:ext cx="5482080" cy="4110480"/>
+            <a:ext cx="5481720" cy="4110120"/>
           </a:xfrm>
           <a:prstGeom prst="rect">
             <a:avLst/>
@@ -1737,7 +1774,7 @@
         <p:txBody>
           <a:bodyPr lIns="0" rIns="0" tIns="0" bIns="0"/>
           <a:p>
-            <a:pPr marL="216000" indent="-212400">
+            <a:pPr marL="216000" indent="-212040">
               <a:lnSpc>
                 <a:spcPct val="100000"/>
               </a:lnSpc>
@@ -1753,7 +1790,7 @@
             </a:endParaRPr>
           </a:p>
           <a:p>
-            <a:pPr marL="216000" indent="-212400">
+            <a:pPr marL="216000" indent="-212040">
               <a:lnSpc>
                 <a:spcPct val="100000"/>
               </a:lnSpc>
@@ -1769,7 +1806,7 @@
             </a:endParaRPr>
           </a:p>
           <a:p>
-            <a:pPr marL="216000" indent="-212400">
+            <a:pPr marL="216000" indent="-212040">
               <a:lnSpc>
                 <a:spcPct val="100000"/>
               </a:lnSpc>
@@ -1785,7 +1822,7 @@
             </a:endParaRPr>
           </a:p>
           <a:p>
-            <a:pPr marL="216000" indent="-212400">
+            <a:pPr marL="216000" indent="-212040">
               <a:lnSpc>
                 <a:spcPct val="100000"/>
               </a:lnSpc>
@@ -5533,7 +5570,7 @@
         <p:spPr>
           <a:xfrm>
             <a:off x="0" y="0"/>
-            <a:ext cx="12186720" cy="6852600"/>
+            <a:ext cx="12186360" cy="6852240"/>
           </a:xfrm>
           <a:prstGeom prst="rect">
             <a:avLst/>
@@ -5566,7 +5603,7 @@
         <p:spPr>
           <a:xfrm flipV="1">
             <a:off x="0" y="-5760"/>
-            <a:ext cx="12183480" cy="6852600"/>
+            <a:ext cx="12183120" cy="6852240"/>
           </a:xfrm>
           <a:prstGeom prst="snip1Rect">
             <a:avLst>
@@ -5621,7 +5658,7 @@
         <p:spPr>
           <a:xfrm>
             <a:off x="684360" y="685800"/>
-            <a:ext cx="9673560" cy="3668040"/>
+            <a:ext cx="9673200" cy="3667680"/>
           </a:xfrm>
           <a:prstGeom prst="rect">
             <a:avLst/>
@@ -5672,7 +5709,7 @@
         <p:spPr>
           <a:xfrm>
             <a:off x="684360" y="4648320"/>
-            <a:ext cx="7000200" cy="1137600"/>
+            <a:ext cx="6999840" cy="1137240"/>
           </a:xfrm>
           <a:prstGeom prst="rect">
             <a:avLst/>
@@ -5810,7 +5847,7 @@
         <p:spPr>
           <a:xfrm>
             <a:off x="684360" y="4487400"/>
-            <a:ext cx="8529120" cy="1501560"/>
+            <a:ext cx="8528760" cy="1501200"/>
           </a:xfrm>
           <a:prstGeom prst="rect">
             <a:avLst/>
@@ -5859,7 +5896,7 @@
         <p:spPr>
           <a:xfrm>
             <a:off x="684360" y="685800"/>
-            <a:ext cx="8529120" cy="3609720"/>
+            <a:ext cx="8528760" cy="3609360"/>
           </a:xfrm>
           <a:prstGeom prst="rect">
             <a:avLst/>
@@ -5878,7 +5915,7 @@
         <p:txBody>
           <a:bodyPr lIns="90000" rIns="90000" tIns="45000" bIns="45000" anchor="ctr"/>
           <a:p>
-            <a:pPr marL="285840" indent="-280440">
+            <a:pPr marL="285840" indent="-280080">
               <a:lnSpc>
                 <a:spcPct val="100000"/>
               </a:lnSpc>
@@ -6010,7 +6047,7 @@
             </a:endParaRPr>
           </a:p>
           <a:p>
-            <a:pPr marL="285840" indent="-280440">
+            <a:pPr marL="285840" indent="-280080">
               <a:lnSpc>
                 <a:spcPct val="100000"/>
               </a:lnSpc>
@@ -6056,7 +6093,7 @@
         <p:spPr>
           <a:xfrm>
             <a:off x="4733640" y="3979440"/>
-            <a:ext cx="909000" cy="909000"/>
+            <a:ext cx="908640" cy="908640"/>
           </a:xfrm>
           <a:prstGeom prst="rect">
             <a:avLst/>
@@ -6079,7 +6116,7 @@
         <p:spPr>
           <a:xfrm>
             <a:off x="6825960" y="4030200"/>
-            <a:ext cx="909000" cy="909000"/>
+            <a:ext cx="908640" cy="908640"/>
           </a:xfrm>
           <a:prstGeom prst="rect">
             <a:avLst/>
@@ -6102,7 +6139,7 @@
         <p:spPr>
           <a:xfrm>
             <a:off x="5354640" y="2725920"/>
-            <a:ext cx="909000" cy="909000"/>
+            <a:ext cx="908640" cy="908640"/>
           </a:xfrm>
           <a:prstGeom prst="rect">
             <a:avLst/>
@@ -6125,7 +6162,7 @@
         <p:spPr>
           <a:xfrm>
             <a:off x="8550000" y="3433320"/>
-            <a:ext cx="909000" cy="909000"/>
+            <a:ext cx="908640" cy="908640"/>
           </a:xfrm>
           <a:prstGeom prst="rect">
             <a:avLst/>
@@ -6148,7 +6185,7 @@
         <p:spPr>
           <a:xfrm>
             <a:off x="5153040" y="5079960"/>
-            <a:ext cx="909000" cy="909000"/>
+            <a:ext cx="908640" cy="908640"/>
           </a:xfrm>
           <a:prstGeom prst="rect">
             <a:avLst/>
@@ -6167,7 +6204,7 @@
         <p:spPr>
           <a:xfrm rot="3732600">
             <a:off x="7995240" y="3762000"/>
-            <a:ext cx="198720" cy="664560"/>
+            <a:ext cx="198360" cy="664200"/>
           </a:xfrm>
           <a:prstGeom prst="downArrow">
             <a:avLst>
@@ -6205,8 +6242,8 @@
         </p:nvSpPr>
         <p:spPr>
           <a:xfrm rot="14618400">
-            <a:off x="6343560" y="4765320"/>
-            <a:ext cx="198720" cy="664560"/>
+            <a:off x="6343560" y="4765680"/>
+            <a:ext cx="198360" cy="664200"/>
           </a:xfrm>
           <a:prstGeom prst="downArrow">
             <a:avLst>
@@ -6244,8 +6281,8 @@
         </p:nvSpPr>
         <p:spPr>
           <a:xfrm rot="5400000">
-            <a:off x="6194160" y="4132800"/>
-            <a:ext cx="198720" cy="664560"/>
+            <a:off x="6194520" y="4132800"/>
+            <a:ext cx="198360" cy="664200"/>
           </a:xfrm>
           <a:prstGeom prst="downArrow">
             <a:avLst>
@@ -6283,8 +6320,8 @@
         </p:nvSpPr>
         <p:spPr>
           <a:xfrm rot="7014000">
-            <a:off x="6426360" y="3552120"/>
-            <a:ext cx="198720" cy="664560"/>
+            <a:off x="6426720" y="3551760"/>
+            <a:ext cx="198360" cy="664200"/>
           </a:xfrm>
           <a:prstGeom prst="downArrow">
             <a:avLst>
@@ -6322,8 +6359,8 @@
         </p:nvSpPr>
         <p:spPr>
           <a:xfrm rot="1747800">
-            <a:off x="5087880" y="3301200"/>
-            <a:ext cx="198720" cy="664560"/>
+            <a:off x="5087880" y="3300840"/>
+            <a:ext cx="198360" cy="664200"/>
           </a:xfrm>
           <a:prstGeom prst="downArrow">
             <a:avLst>
@@ -6411,7 +6448,7 @@
         <p:spPr>
           <a:xfrm>
             <a:off x="6868080" y="306720"/>
-            <a:ext cx="5038560" cy="2080440"/>
+            <a:ext cx="5038200" cy="2080080"/>
           </a:xfrm>
           <a:prstGeom prst="rect">
             <a:avLst/>
@@ -6454,7 +6491,7 @@
         <p:spPr>
           <a:xfrm>
             <a:off x="6271200" y="2669400"/>
-            <a:ext cx="5627520" cy="3003480"/>
+            <a:ext cx="5627160" cy="3003120"/>
           </a:xfrm>
           <a:prstGeom prst="rect">
             <a:avLst/>
@@ -6499,7 +6536,7 @@
         <p:spPr>
           <a:xfrm>
             <a:off x="129960" y="5709960"/>
-            <a:ext cx="11178000" cy="1084680"/>
+            <a:ext cx="11177640" cy="1084320"/>
           </a:xfrm>
           <a:prstGeom prst="rect">
             <a:avLst/>
@@ -6544,7 +6581,7 @@
         <p:spPr>
           <a:xfrm>
             <a:off x="207000" y="1787400"/>
-            <a:ext cx="5589360" cy="3222720"/>
+            <a:ext cx="5589000" cy="3222360"/>
           </a:xfrm>
           <a:prstGeom prst="rect">
             <a:avLst/>
@@ -6589,7 +6626,7 @@
         <p:spPr>
           <a:xfrm>
             <a:off x="684360" y="4487400"/>
-            <a:ext cx="8529120" cy="1501560"/>
+            <a:ext cx="8528760" cy="1501200"/>
           </a:xfrm>
           <a:prstGeom prst="rect">
             <a:avLst/>
@@ -6638,7 +6675,7 @@
         <p:spPr>
           <a:xfrm>
             <a:off x="684360" y="685800"/>
-            <a:ext cx="8529120" cy="3609720"/>
+            <a:ext cx="8528760" cy="3609360"/>
           </a:xfrm>
           <a:prstGeom prst="rect">
             <a:avLst/>
@@ -6657,7 +6694,7 @@
         <p:txBody>
           <a:bodyPr lIns="90000" rIns="90000" tIns="45000" bIns="45000" anchor="ctr"/>
           <a:p>
-            <a:pPr marL="285840" indent="-280440">
+            <a:pPr marL="285840" indent="-280080">
               <a:lnSpc>
                 <a:spcPct val="100000"/>
               </a:lnSpc>
@@ -6709,7 +6746,7 @@
             </a:endParaRPr>
           </a:p>
           <a:p>
-            <a:pPr marL="285840" indent="-280440">
+            <a:pPr marL="285840" indent="-280080">
               <a:lnSpc>
                 <a:spcPct val="100000"/>
               </a:lnSpc>
@@ -6751,7 +6788,7 @@
             </a:endParaRPr>
           </a:p>
           <a:p>
-            <a:pPr marL="285840" indent="-280440">
+            <a:pPr marL="285840" indent="-280080">
               <a:lnSpc>
                 <a:spcPct val="100000"/>
               </a:lnSpc>
@@ -6803,7 +6840,7 @@
             </a:endParaRPr>
           </a:p>
           <a:p>
-            <a:pPr marL="285840" indent="-280440">
+            <a:pPr marL="285840" indent="-280080">
               <a:lnSpc>
                 <a:spcPct val="100000"/>
               </a:lnSpc>
@@ -6971,7 +7008,7 @@
         <p:spPr>
           <a:xfrm>
             <a:off x="4629600" y="1832040"/>
-            <a:ext cx="849240" cy="849240"/>
+            <a:ext cx="848880" cy="848880"/>
           </a:xfrm>
           <a:prstGeom prst="rect">
             <a:avLst/>
@@ -6994,7 +7031,7 @@
         <p:spPr>
           <a:xfrm>
             <a:off x="4463640" y="4185360"/>
-            <a:ext cx="1175760" cy="468000"/>
+            <a:ext cx="1175400" cy="467640"/>
           </a:xfrm>
           <a:prstGeom prst="rect">
             <a:avLst/>
@@ -7017,7 +7054,7 @@
         <p:spPr>
           <a:xfrm>
             <a:off x="4586040" y="2785680"/>
-            <a:ext cx="892800" cy="1035000"/>
+            <a:ext cx="892440" cy="1034640"/>
           </a:xfrm>
           <a:prstGeom prst="rect">
             <a:avLst/>
@@ -7040,7 +7077,7 @@
         <p:spPr>
           <a:xfrm>
             <a:off x="250560" y="1953720"/>
-            <a:ext cx="909000" cy="909000"/>
+            <a:ext cx="908640" cy="908640"/>
           </a:xfrm>
           <a:prstGeom prst="rect">
             <a:avLst/>
@@ -7063,7 +7100,7 @@
         <p:spPr>
           <a:xfrm>
             <a:off x="271440" y="3259800"/>
-            <a:ext cx="909000" cy="909000"/>
+            <a:ext cx="908640" cy="908640"/>
           </a:xfrm>
           <a:prstGeom prst="rect">
             <a:avLst/>
@@ -7086,7 +7123,7 @@
         <p:spPr>
           <a:xfrm>
             <a:off x="2440800" y="2741040"/>
-            <a:ext cx="909000" cy="909000"/>
+            <a:ext cx="908640" cy="908640"/>
           </a:xfrm>
           <a:prstGeom prst="rect">
             <a:avLst/>
@@ -7104,8 +7141,8 @@
         </p:nvSpPr>
         <p:spPr>
           <a:xfrm rot="1192200">
-            <a:off x="1577880" y="2559240"/>
-            <a:ext cx="973080" cy="479160"/>
+            <a:off x="1577880" y="2558880"/>
+            <a:ext cx="972720" cy="478800"/>
           </a:xfrm>
           <a:prstGeom prst="rightArrow">
             <a:avLst>
@@ -7146,8 +7183,8 @@
         </p:nvSpPr>
         <p:spPr>
           <a:xfrm rot="20407800">
-            <a:off x="1556640" y="3347640"/>
-            <a:ext cx="973080" cy="479160"/>
+            <a:off x="1556280" y="3347640"/>
+            <a:ext cx="972720" cy="478800"/>
           </a:xfrm>
           <a:prstGeom prst="rightArrow">
             <a:avLst>
@@ -7188,8 +7225,8 @@
         </p:nvSpPr>
         <p:spPr>
           <a:xfrm rot="1192200">
-            <a:off x="3331440" y="3667680"/>
-            <a:ext cx="973080" cy="479160"/>
+            <a:off x="3331440" y="3667320"/>
+            <a:ext cx="972720" cy="478800"/>
           </a:xfrm>
           <a:prstGeom prst="rightArrow">
             <a:avLst>
@@ -7230,8 +7267,8 @@
         </p:nvSpPr>
         <p:spPr>
           <a:xfrm rot="20407800">
-            <a:off x="3404880" y="2343240"/>
-            <a:ext cx="973080" cy="479160"/>
+            <a:off x="3404520" y="2343240"/>
+            <a:ext cx="972720" cy="478800"/>
           </a:xfrm>
           <a:prstGeom prst="rightArrow">
             <a:avLst>
@@ -7273,7 +7310,7 @@
         <p:spPr>
           <a:xfrm>
             <a:off x="3483720" y="3004200"/>
-            <a:ext cx="973080" cy="479160"/>
+            <a:ext cx="972720" cy="478800"/>
           </a:xfrm>
           <a:prstGeom prst="rightArrow">
             <a:avLst>
@@ -7319,7 +7356,7 @@
         <p:spPr>
           <a:xfrm>
             <a:off x="5819760" y="5709960"/>
-            <a:ext cx="909000" cy="909000"/>
+            <a:ext cx="908640" cy="908640"/>
           </a:xfrm>
           <a:prstGeom prst="rect">
             <a:avLst/>
@@ -7342,7 +7379,7 @@
         <p:spPr>
           <a:xfrm>
             <a:off x="2060640" y="5759640"/>
-            <a:ext cx="909000" cy="909000"/>
+            <a:ext cx="908640" cy="908640"/>
           </a:xfrm>
           <a:prstGeom prst="rect">
             <a:avLst/>
@@ -7365,7 +7402,7 @@
         <p:spPr>
           <a:xfrm>
             <a:off x="9383040" y="5709960"/>
-            <a:ext cx="909000" cy="909000"/>
+            <a:ext cx="908640" cy="908640"/>
           </a:xfrm>
           <a:prstGeom prst="rect">
             <a:avLst/>
@@ -7388,7 +7425,7 @@
         <p:spPr>
           <a:xfrm>
             <a:off x="7495920" y="5709960"/>
-            <a:ext cx="909000" cy="909000"/>
+            <a:ext cx="908640" cy="908640"/>
           </a:xfrm>
           <a:prstGeom prst="rect">
             <a:avLst/>
@@ -7411,7 +7448,7 @@
         <p:spPr>
           <a:xfrm>
             <a:off x="4004640" y="5709960"/>
-            <a:ext cx="909000" cy="909000"/>
+            <a:ext cx="908640" cy="908640"/>
           </a:xfrm>
           <a:prstGeom prst="rect">
             <a:avLst/>
@@ -7434,7 +7471,7 @@
         <p:spPr>
           <a:xfrm>
             <a:off x="276120" y="5759640"/>
-            <a:ext cx="909000" cy="909000"/>
+            <a:ext cx="908640" cy="908640"/>
           </a:xfrm>
           <a:prstGeom prst="rect">
             <a:avLst/>
@@ -7453,7 +7490,7 @@
         <p:spPr>
           <a:xfrm>
             <a:off x="1230120" y="6098760"/>
-            <a:ext cx="677520" cy="256680"/>
+            <a:ext cx="677160" cy="256320"/>
           </a:xfrm>
           <a:prstGeom prst="rightArrow">
             <a:avLst>
@@ -7492,7 +7529,7 @@
         <p:spPr>
           <a:xfrm>
             <a:off x="3103920" y="6117480"/>
-            <a:ext cx="677520" cy="256680"/>
+            <a:ext cx="677160" cy="256320"/>
           </a:xfrm>
           <a:prstGeom prst="rightArrow">
             <a:avLst>
@@ -7531,7 +7568,7 @@
         <p:spPr>
           <a:xfrm>
             <a:off x="4958640" y="6109200"/>
-            <a:ext cx="677520" cy="256680"/>
+            <a:ext cx="677160" cy="256320"/>
           </a:xfrm>
           <a:prstGeom prst="rightArrow">
             <a:avLst>
@@ -7570,7 +7607,7 @@
         <p:spPr>
           <a:xfrm>
             <a:off x="6754320" y="6098760"/>
-            <a:ext cx="677520" cy="256680"/>
+            <a:ext cx="677160" cy="256320"/>
           </a:xfrm>
           <a:prstGeom prst="rightArrow">
             <a:avLst>
@@ -7609,7 +7646,7 @@
         <p:spPr>
           <a:xfrm>
             <a:off x="8468280" y="6085800"/>
-            <a:ext cx="677520" cy="256680"/>
+            <a:ext cx="677160" cy="256320"/>
           </a:xfrm>
           <a:prstGeom prst="rightArrow">
             <a:avLst>
@@ -7652,7 +7689,7 @@
         <p:spPr>
           <a:xfrm>
             <a:off x="6582600" y="3915000"/>
-            <a:ext cx="909000" cy="909000"/>
+            <a:ext cx="908640" cy="908640"/>
           </a:xfrm>
           <a:prstGeom prst="rect">
             <a:avLst/>
@@ -7675,7 +7712,7 @@
         <p:spPr>
           <a:xfrm>
             <a:off x="8674920" y="3965760"/>
-            <a:ext cx="909000" cy="909000"/>
+            <a:ext cx="908640" cy="908640"/>
           </a:xfrm>
           <a:prstGeom prst="rect">
             <a:avLst/>
@@ -7698,7 +7735,7 @@
         <p:spPr>
           <a:xfrm>
             <a:off x="7203600" y="2661480"/>
-            <a:ext cx="909000" cy="909000"/>
+            <a:ext cx="908640" cy="908640"/>
           </a:xfrm>
           <a:prstGeom prst="rect">
             <a:avLst/>
@@ -7721,7 +7758,7 @@
         <p:spPr>
           <a:xfrm>
             <a:off x="10398960" y="3368880"/>
-            <a:ext cx="909000" cy="909000"/>
+            <a:ext cx="908640" cy="908640"/>
           </a:xfrm>
           <a:prstGeom prst="rect">
             <a:avLst/>
@@ -7744,7 +7781,7 @@
         <p:spPr>
           <a:xfrm>
             <a:off x="7002000" y="5015520"/>
-            <a:ext cx="909000" cy="909000"/>
+            <a:ext cx="908640" cy="908640"/>
           </a:xfrm>
           <a:prstGeom prst="rect">
             <a:avLst/>
@@ -7763,7 +7800,7 @@
         <p:spPr>
           <a:xfrm rot="3732600">
             <a:off x="9844560" y="3697920"/>
-            <a:ext cx="198720" cy="664560"/>
+            <a:ext cx="198360" cy="664200"/>
           </a:xfrm>
           <a:prstGeom prst="downArrow">
             <a:avLst>
@@ -7801,8 +7838,8 @@
         </p:nvSpPr>
         <p:spPr>
           <a:xfrm rot="14618400">
-            <a:off x="8192520" y="4701240"/>
-            <a:ext cx="198720" cy="664560"/>
+            <a:off x="8192520" y="4701600"/>
+            <a:ext cx="198360" cy="664200"/>
           </a:xfrm>
           <a:prstGeom prst="downArrow">
             <a:avLst>
@@ -7840,8 +7877,8 @@
         </p:nvSpPr>
         <p:spPr>
           <a:xfrm rot="5400000">
-            <a:off x="8043120" y="4068360"/>
-            <a:ext cx="198720" cy="664560"/>
+            <a:off x="8043480" y="4068360"/>
+            <a:ext cx="198360" cy="664200"/>
           </a:xfrm>
           <a:prstGeom prst="downArrow">
             <a:avLst>
@@ -7879,8 +7916,8 @@
         </p:nvSpPr>
         <p:spPr>
           <a:xfrm rot="7014000">
-            <a:off x="8275680" y="3487680"/>
-            <a:ext cx="198720" cy="664560"/>
+            <a:off x="8276040" y="3487320"/>
+            <a:ext cx="198360" cy="664200"/>
           </a:xfrm>
           <a:prstGeom prst="downArrow">
             <a:avLst>
@@ -7918,8 +7955,8 @@
         </p:nvSpPr>
         <p:spPr>
           <a:xfrm rot="1747800">
-            <a:off x="7094880" y="3423240"/>
-            <a:ext cx="198720" cy="664560"/>
+            <a:off x="7094880" y="3422880"/>
+            <a:ext cx="198360" cy="664200"/>
           </a:xfrm>
           <a:prstGeom prst="downArrow">
             <a:avLst>
@@ -7962,7 +7999,7 @@
         <p:spPr>
           <a:xfrm>
             <a:off x="8641080" y="309600"/>
-            <a:ext cx="909000" cy="909000"/>
+            <a:ext cx="908640" cy="908640"/>
           </a:xfrm>
           <a:prstGeom prst="rect">
             <a:avLst/>
@@ -7985,7 +8022,7 @@
         <p:spPr>
           <a:xfrm>
             <a:off x="10568880" y="1497240"/>
-            <a:ext cx="909000" cy="909000"/>
+            <a:ext cx="908640" cy="908640"/>
           </a:xfrm>
           <a:prstGeom prst="rect">
             <a:avLst/>
@@ -8008,7 +8045,7 @@
         <p:spPr>
           <a:xfrm>
             <a:off x="6932880" y="1497240"/>
-            <a:ext cx="909000" cy="909000"/>
+            <a:ext cx="908640" cy="908640"/>
           </a:xfrm>
           <a:prstGeom prst="rect">
             <a:avLst/>
@@ -8027,7 +8064,7 @@
         <p:spPr>
           <a:xfrm>
             <a:off x="8173800" y="1774080"/>
-            <a:ext cx="2063160" cy="355320"/>
+            <a:ext cx="2062800" cy="354960"/>
           </a:xfrm>
           <a:prstGeom prst="rightArrow">
             <a:avLst>
@@ -8066,7 +8103,7 @@
         <p:spPr>
           <a:xfrm>
             <a:off x="8947440" y="1361160"/>
-            <a:ext cx="296280" cy="401760"/>
+            <a:ext cx="295920" cy="401400"/>
           </a:xfrm>
           <a:prstGeom prst="downArrow">
             <a:avLst>
@@ -8154,7 +8191,7 @@
         <p:spPr>
           <a:xfrm>
             <a:off x="0" y="0"/>
-            <a:ext cx="12186720" cy="6852600"/>
+            <a:ext cx="12186360" cy="6852240"/>
           </a:xfrm>
           <a:prstGeom prst="rect">
             <a:avLst/>
@@ -8207,7 +8244,7 @@
         <p:spPr>
           <a:xfrm>
             <a:off x="640440" y="685800"/>
-            <a:ext cx="4813200" cy="4598280"/>
+            <a:ext cx="4812840" cy="4597920"/>
           </a:xfrm>
           <a:prstGeom prst="rect">
             <a:avLst/>
@@ -8258,7 +8295,7 @@
         <p:spPr>
           <a:xfrm>
             <a:off x="6095880" y="0"/>
-            <a:ext cx="6090480" cy="6852600"/>
+            <a:ext cx="6090120" cy="6852240"/>
           </a:xfrm>
           <a:prstGeom prst="rect">
             <a:avLst/>
@@ -8296,7 +8333,7 @@
         <p:spPr>
           <a:xfrm>
             <a:off x="6625800" y="685800"/>
-            <a:ext cx="4873680" cy="4598280"/>
+            <a:ext cx="4873320" cy="4597920"/>
           </a:xfrm>
           <a:prstGeom prst="rect">
             <a:avLst/>
@@ -8317,7 +8354,7 @@
             <a:normAutofit/>
           </a:bodyPr>
           <a:p>
-            <a:pPr marL="285840" indent="-280440">
+            <a:pPr marL="285840" indent="-280080">
               <a:lnSpc>
                 <a:spcPct val="100000"/>
               </a:lnSpc>
@@ -8349,7 +8386,7 @@
             </a:endParaRPr>
           </a:p>
           <a:p>
-            <a:pPr marL="285840" indent="-280440">
+            <a:pPr marL="285840" indent="-280080">
               <a:lnSpc>
                 <a:spcPct val="100000"/>
               </a:lnSpc>
@@ -8381,7 +8418,7 @@
             </a:endParaRPr>
           </a:p>
           <a:p>
-            <a:pPr marL="285840" indent="-280440">
+            <a:pPr marL="285840" indent="-280080">
               <a:lnSpc>
                 <a:spcPct val="100000"/>
               </a:lnSpc>
@@ -8413,7 +8450,7 @@
             </a:endParaRPr>
           </a:p>
           <a:p>
-            <a:pPr marL="285840" indent="-280440">
+            <a:pPr marL="285840" indent="-280080">
               <a:lnSpc>
                 <a:spcPct val="100000"/>
               </a:lnSpc>
@@ -8445,7 +8482,7 @@
             </a:endParaRPr>
           </a:p>
           <a:p>
-            <a:pPr marL="285840" indent="-280440">
+            <a:pPr marL="285840" indent="-280080">
               <a:lnSpc>
                 <a:spcPct val="100000"/>
               </a:lnSpc>
@@ -8536,7 +8573,7 @@
         <p:spPr>
           <a:xfrm>
             <a:off x="684360" y="4487400"/>
-            <a:ext cx="8529120" cy="1501560"/>
+            <a:ext cx="8528760" cy="1501200"/>
           </a:xfrm>
           <a:prstGeom prst="rect">
             <a:avLst/>
@@ -8585,7 +8622,7 @@
         <p:spPr>
           <a:xfrm>
             <a:off x="684360" y="685800"/>
-            <a:ext cx="8529120" cy="3609720"/>
+            <a:ext cx="8528760" cy="3609360"/>
           </a:xfrm>
           <a:prstGeom prst="rect">
             <a:avLst/>
@@ -8604,7 +8641,7 @@
         <p:txBody>
           <a:bodyPr lIns="90000" rIns="90000" tIns="45000" bIns="45000" anchor="ctr"/>
           <a:p>
-            <a:pPr marL="285840" indent="-280440">
+            <a:pPr marL="285840" indent="-280080">
               <a:lnSpc>
                 <a:spcPct val="100000"/>
               </a:lnSpc>
@@ -8636,7 +8673,7 @@
             </a:endParaRPr>
           </a:p>
           <a:p>
-            <a:pPr marL="285840" indent="-280440">
+            <a:pPr marL="285840" indent="-280080">
               <a:lnSpc>
                 <a:spcPct val="100000"/>
               </a:lnSpc>
@@ -8746,7 +8783,7 @@
         <p:spPr>
           <a:xfrm>
             <a:off x="6995520" y="1949760"/>
-            <a:ext cx="849240" cy="849240"/>
+            <a:ext cx="848880" cy="848880"/>
           </a:xfrm>
           <a:prstGeom prst="rect">
             <a:avLst/>
@@ -8769,7 +8806,7 @@
         <p:spPr>
           <a:xfrm>
             <a:off x="6829560" y="4303080"/>
-            <a:ext cx="1175760" cy="468000"/>
+            <a:ext cx="1175400" cy="467640"/>
           </a:xfrm>
           <a:prstGeom prst="rect">
             <a:avLst/>
@@ -8792,7 +8829,7 @@
         <p:spPr>
           <a:xfrm>
             <a:off x="6951960" y="2903040"/>
-            <a:ext cx="892800" cy="1035000"/>
+            <a:ext cx="892440" cy="1034640"/>
           </a:xfrm>
           <a:prstGeom prst="rect">
             <a:avLst/>
@@ -8815,7 +8852,7 @@
         <p:spPr>
           <a:xfrm>
             <a:off x="2616120" y="2071080"/>
-            <a:ext cx="909000" cy="909000"/>
+            <a:ext cx="908640" cy="908640"/>
           </a:xfrm>
           <a:prstGeom prst="rect">
             <a:avLst/>
@@ -8838,7 +8875,7 @@
         <p:spPr>
           <a:xfrm>
             <a:off x="2637000" y="3377160"/>
-            <a:ext cx="909000" cy="909000"/>
+            <a:ext cx="908640" cy="908640"/>
           </a:xfrm>
           <a:prstGeom prst="rect">
             <a:avLst/>
@@ -8856,8 +8893,8 @@
         </p:nvSpPr>
         <p:spPr>
           <a:xfrm rot="1192200">
-            <a:off x="3943440" y="2676600"/>
-            <a:ext cx="973080" cy="479160"/>
+            <a:off x="3943440" y="2676240"/>
+            <a:ext cx="972720" cy="478800"/>
           </a:xfrm>
           <a:prstGeom prst="rightArrow">
             <a:avLst>
@@ -8898,8 +8935,8 @@
         </p:nvSpPr>
         <p:spPr>
           <a:xfrm rot="20407800">
-            <a:off x="3922200" y="3465000"/>
-            <a:ext cx="973080" cy="479160"/>
+            <a:off x="3921840" y="3465000"/>
+            <a:ext cx="972720" cy="478800"/>
           </a:xfrm>
           <a:prstGeom prst="rightArrow">
             <a:avLst>
@@ -8940,8 +8977,8 @@
         </p:nvSpPr>
         <p:spPr>
           <a:xfrm rot="1192200">
-            <a:off x="5697360" y="3785040"/>
-            <a:ext cx="973080" cy="479160"/>
+            <a:off x="5697360" y="3784680"/>
+            <a:ext cx="972720" cy="478800"/>
           </a:xfrm>
           <a:prstGeom prst="rightArrow">
             <a:avLst>
@@ -8982,8 +9019,8 @@
         </p:nvSpPr>
         <p:spPr>
           <a:xfrm rot="20407800">
-            <a:off x="5770440" y="2460600"/>
-            <a:ext cx="973080" cy="479160"/>
+            <a:off x="5770080" y="2460600"/>
+            <a:ext cx="972720" cy="478800"/>
           </a:xfrm>
           <a:prstGeom prst="rightArrow">
             <a:avLst>
@@ -9025,7 +9062,7 @@
         <p:spPr>
           <a:xfrm>
             <a:off x="5849640" y="3121560"/>
-            <a:ext cx="973080" cy="479160"/>
+            <a:ext cx="972720" cy="478800"/>
           </a:xfrm>
           <a:prstGeom prst="rightArrow">
             <a:avLst>
@@ -9071,7 +9108,7 @@
         <p:spPr>
           <a:xfrm>
             <a:off x="4950720" y="2998800"/>
-            <a:ext cx="751320" cy="751320"/>
+            <a:ext cx="750960" cy="750960"/>
           </a:xfrm>
           <a:prstGeom prst="rect">
             <a:avLst/>
@@ -9139,7 +9176,7 @@
         <p:spPr>
           <a:xfrm>
             <a:off x="684360" y="4487400"/>
-            <a:ext cx="8529120" cy="1501560"/>
+            <a:ext cx="8528760" cy="1501200"/>
           </a:xfrm>
           <a:prstGeom prst="rect">
             <a:avLst/>
@@ -9188,7 +9225,7 @@
         <p:spPr>
           <a:xfrm>
             <a:off x="684360" y="685800"/>
-            <a:ext cx="8529120" cy="3609720"/>
+            <a:ext cx="8528760" cy="3609360"/>
           </a:xfrm>
           <a:prstGeom prst="rect">
             <a:avLst/>
@@ -9207,7 +9244,7 @@
         <p:txBody>
           <a:bodyPr lIns="90000" rIns="90000" tIns="45000" bIns="45000" anchor="ctr"/>
           <a:p>
-            <a:pPr marL="285840" indent="-280440">
+            <a:pPr marL="285840" indent="-280080">
               <a:lnSpc>
                 <a:spcPct val="100000"/>
               </a:lnSpc>
@@ -9333,7 +9370,7 @@
             </a:endParaRPr>
           </a:p>
           <a:p>
-            <a:pPr marL="285840" indent="-280440">
+            <a:pPr marL="285840" indent="-280080">
               <a:lnSpc>
                 <a:spcPct val="100000"/>
               </a:lnSpc>
@@ -9425,7 +9462,7 @@
         <p:spPr>
           <a:xfrm>
             <a:off x="3562560" y="1395720"/>
-            <a:ext cx="909000" cy="909000"/>
+            <a:ext cx="908640" cy="908640"/>
           </a:xfrm>
           <a:prstGeom prst="rect">
             <a:avLst/>
@@ -9448,7 +9485,7 @@
         <p:spPr>
           <a:xfrm>
             <a:off x="6678360" y="1395720"/>
-            <a:ext cx="909000" cy="909000"/>
+            <a:ext cx="908640" cy="908640"/>
           </a:xfrm>
           <a:prstGeom prst="rect">
             <a:avLst/>
@@ -9471,7 +9508,7 @@
         <p:spPr>
           <a:xfrm>
             <a:off x="7042320" y="3904200"/>
-            <a:ext cx="909000" cy="909000"/>
+            <a:ext cx="908640" cy="908640"/>
           </a:xfrm>
           <a:prstGeom prst="rect">
             <a:avLst/>
@@ -9494,7 +9531,7 @@
         <p:spPr>
           <a:xfrm>
             <a:off x="3562560" y="3904200"/>
-            <a:ext cx="909000" cy="909000"/>
+            <a:ext cx="908640" cy="908640"/>
           </a:xfrm>
           <a:prstGeom prst="rect">
             <a:avLst/>
@@ -9517,7 +9554,7 @@
         <p:spPr>
           <a:xfrm>
             <a:off x="6678360" y="1395720"/>
-            <a:ext cx="909000" cy="909000"/>
+            <a:ext cx="908640" cy="908640"/>
           </a:xfrm>
           <a:prstGeom prst="rect">
             <a:avLst/>
@@ -9540,7 +9577,7 @@
         <p:spPr>
           <a:xfrm>
             <a:off x="4113000" y="2039400"/>
-            <a:ext cx="909000" cy="909000"/>
+            <a:ext cx="908640" cy="908640"/>
           </a:xfrm>
           <a:prstGeom prst="rect">
             <a:avLst/>
@@ -9563,7 +9600,7 @@
         <p:spPr>
           <a:xfrm>
             <a:off x="7296480" y="2133000"/>
-            <a:ext cx="909000" cy="909000"/>
+            <a:ext cx="908640" cy="908640"/>
           </a:xfrm>
           <a:prstGeom prst="rect">
             <a:avLst/>
@@ -9582,7 +9619,7 @@
         <p:spPr>
           <a:xfrm>
             <a:off x="5285160" y="1920960"/>
-            <a:ext cx="1177560" cy="540000"/>
+            <a:ext cx="1177200" cy="539640"/>
           </a:xfrm>
           <a:prstGeom prst="rightArrow">
             <a:avLst>
@@ -9624,7 +9661,7 @@
         <p:spPr>
           <a:xfrm>
             <a:off x="5149440" y="4088880"/>
-            <a:ext cx="1177560" cy="540000"/>
+            <a:ext cx="1177200" cy="539640"/>
           </a:xfrm>
           <a:prstGeom prst="rightArrow">
             <a:avLst>
@@ -9689,7 +9726,7 @@
         <p:spPr>
           <a:xfrm>
             <a:off x="4895280" y="2388600"/>
-            <a:ext cx="2702520" cy="359640"/>
+            <a:ext cx="2702160" cy="359280"/>
           </a:xfrm>
           <a:prstGeom prst="rect">
             <a:avLst/>
@@ -9738,7 +9775,7 @@
         <p:spPr>
           <a:xfrm>
             <a:off x="5027400" y="4575240"/>
-            <a:ext cx="2322360" cy="359640"/>
+            <a:ext cx="2322000" cy="359280"/>
           </a:xfrm>
           <a:prstGeom prst="rect">
             <a:avLst/>
@@ -9780,6 +9817,33 @@
       </p:sp>
     </p:spTree>
   </p:cSld>
+  <p:timing>
+    <p:tnLst>
+      <p:par>
+        <p:cTn id="27" dur="indefinite" restart="never" nodeType="tmRoot">
+          <p:childTnLst>
+            <p:seq>
+              <p:cTn id="28" dur="indefinite" nodeType="mainSeq"/>
+              <p:prevCondLst>
+                <p:cond delay="0" evt="onPrev">
+                  <p:tgtEl>
+                    <p:sldTgt/>
+                  </p:tgtEl>
+                </p:cond>
+              </p:prevCondLst>
+              <p:nextCondLst>
+                <p:cond delay="0" evt="onNext">
+                  <p:tgtEl>
+                    <p:sldTgt/>
+                  </p:tgtEl>
+                </p:cond>
+              </p:nextCondLst>
+            </p:seq>
+          </p:childTnLst>
+        </p:cTn>
+      </p:par>
+    </p:tnLst>
+  </p:timing>
 </p:sld>
 </file>
 
@@ -9809,7 +9873,7 @@
         <p:spPr>
           <a:xfrm>
             <a:off x="684360" y="4487400"/>
-            <a:ext cx="8529120" cy="1501560"/>
+            <a:ext cx="8528760" cy="1501200"/>
           </a:xfrm>
           <a:prstGeom prst="rect">
             <a:avLst/>
@@ -9858,7 +9922,7 @@
         <p:spPr>
           <a:xfrm>
             <a:off x="684360" y="685800"/>
-            <a:ext cx="8529120" cy="3609720"/>
+            <a:ext cx="8528760" cy="3609360"/>
           </a:xfrm>
           <a:prstGeom prst="rect">
             <a:avLst/>
@@ -9877,7 +9941,7 @@
         <p:txBody>
           <a:bodyPr lIns="90000" rIns="90000" tIns="45000" bIns="45000" anchor="ctr"/>
           <a:p>
-            <a:pPr marL="285840" indent="-280440">
+            <a:pPr marL="285840" indent="-280080">
               <a:lnSpc>
                 <a:spcPct val="100000"/>
               </a:lnSpc>
@@ -9999,7 +10063,7 @@
         <p:spPr>
           <a:xfrm>
             <a:off x="1863000" y="3157920"/>
-            <a:ext cx="909000" cy="909000"/>
+            <a:ext cx="908640" cy="908640"/>
           </a:xfrm>
           <a:prstGeom prst="rect">
             <a:avLst/>
@@ -10022,7 +10086,7 @@
         <p:spPr>
           <a:xfrm>
             <a:off x="2413440" y="3801600"/>
-            <a:ext cx="909000" cy="909000"/>
+            <a:ext cx="908640" cy="908640"/>
           </a:xfrm>
           <a:prstGeom prst="rect">
             <a:avLst/>
@@ -10045,7 +10109,7 @@
         <p:spPr>
           <a:xfrm>
             <a:off x="7197480" y="3439800"/>
-            <a:ext cx="909000" cy="909000"/>
+            <a:ext cx="908640" cy="908640"/>
           </a:xfrm>
           <a:prstGeom prst="rect">
             <a:avLst/>
@@ -10068,7 +10132,7 @@
         <p:spPr>
           <a:xfrm>
             <a:off x="4758840" y="3366360"/>
-            <a:ext cx="909000" cy="909000"/>
+            <a:ext cx="908640" cy="908640"/>
           </a:xfrm>
           <a:prstGeom prst="rect">
             <a:avLst/>
@@ -10087,7 +10151,7 @@
         <p:spPr>
           <a:xfrm>
             <a:off x="3568680" y="3429000"/>
-            <a:ext cx="932040" cy="909000"/>
+            <a:ext cx="931680" cy="908640"/>
           </a:xfrm>
           <a:prstGeom prst="mathPlus">
             <a:avLst>
@@ -10125,7 +10189,7 @@
         <p:spPr>
           <a:xfrm>
             <a:off x="6095880" y="3654360"/>
-            <a:ext cx="732960" cy="560880"/>
+            <a:ext cx="732600" cy="560520"/>
           </a:xfrm>
           <a:prstGeom prst="mathEqual">
             <a:avLst>
@@ -10186,7 +10250,7 @@
         <p:spPr>
           <a:xfrm>
             <a:off x="4750920" y="2898360"/>
-            <a:ext cx="2684520" cy="3714480"/>
+            <a:ext cx="2684160" cy="3714120"/>
           </a:xfrm>
           <a:prstGeom prst="rect">
             <a:avLst/>
@@ -10229,7 +10293,7 @@
         <p:spPr>
           <a:xfrm>
             <a:off x="684360" y="4487400"/>
-            <a:ext cx="8529120" cy="1501560"/>
+            <a:ext cx="8528760" cy="1501200"/>
           </a:xfrm>
           <a:prstGeom prst="rect">
             <a:avLst/>
@@ -10278,7 +10342,7 @@
         <p:spPr>
           <a:xfrm>
             <a:off x="684360" y="685800"/>
-            <a:ext cx="8529120" cy="3609720"/>
+            <a:ext cx="8528760" cy="3609360"/>
           </a:xfrm>
           <a:prstGeom prst="rect">
             <a:avLst/>
@@ -10297,7 +10361,7 @@
         <p:txBody>
           <a:bodyPr lIns="90000" rIns="90000" tIns="45000" bIns="45000" anchor="ctr"/>
           <a:p>
-            <a:pPr marL="285840" indent="-280440">
+            <a:pPr marL="285840" indent="-280080">
               <a:lnSpc>
                 <a:spcPct val="100000"/>
               </a:lnSpc>
@@ -10433,7 +10497,7 @@
         <p:spPr>
           <a:xfrm>
             <a:off x="4843440" y="2989800"/>
-            <a:ext cx="636480" cy="636480"/>
+            <a:ext cx="636120" cy="636120"/>
           </a:xfrm>
           <a:prstGeom prst="rect">
             <a:avLst/>
@@ -10456,7 +10520,7 @@
         <p:spPr>
           <a:xfrm>
             <a:off x="5028120" y="4248360"/>
-            <a:ext cx="909000" cy="909000"/>
+            <a:ext cx="908640" cy="908640"/>
           </a:xfrm>
           <a:prstGeom prst="rect">
             <a:avLst/>
@@ -10479,7 +10543,7 @@
         <p:spPr>
           <a:xfrm>
             <a:off x="5506200" y="5025240"/>
-            <a:ext cx="909000" cy="909000"/>
+            <a:ext cx="908640" cy="908640"/>
           </a:xfrm>
           <a:prstGeom prst="rect">
             <a:avLst/>
@@ -10502,7 +10566,7 @@
         <p:spPr>
           <a:xfrm>
             <a:off x="6042600" y="4248360"/>
-            <a:ext cx="909000" cy="909000"/>
+            <a:ext cx="908640" cy="908640"/>
           </a:xfrm>
           <a:prstGeom prst="rect">
             <a:avLst/>
@@ -10525,7 +10589,7 @@
         <p:spPr>
           <a:xfrm>
             <a:off x="7944480" y="2602440"/>
-            <a:ext cx="909000" cy="909000"/>
+            <a:ext cx="908640" cy="908640"/>
           </a:xfrm>
           <a:prstGeom prst="rect">
             <a:avLst/>
@@ -10548,7 +10612,7 @@
         <p:spPr>
           <a:xfrm>
             <a:off x="6671160" y="3059640"/>
-            <a:ext cx="566280" cy="566280"/>
+            <a:ext cx="565920" cy="565920"/>
           </a:xfrm>
           <a:prstGeom prst="rect">
             <a:avLst/>
@@ -10571,7 +10635,7 @@
         <p:spPr>
           <a:xfrm>
             <a:off x="2973240" y="3863520"/>
-            <a:ext cx="909000" cy="909000"/>
+            <a:ext cx="908640" cy="908640"/>
           </a:xfrm>
           <a:prstGeom prst="rect">
             <a:avLst/>
@@ -10590,7 +10654,7 @@
         <p:spPr>
           <a:xfrm>
             <a:off x="4012560" y="4487400"/>
-            <a:ext cx="1488240" cy="851760"/>
+            <a:ext cx="1487880" cy="851400"/>
           </a:xfrm>
           <a:custGeom>
             <a:avLst/>
@@ -10642,7 +10706,7 @@
         <p:spPr>
           <a:xfrm>
             <a:off x="4012560" y="4248360"/>
-            <a:ext cx="2024640" cy="233640"/>
+            <a:ext cx="2024280" cy="233280"/>
           </a:xfrm>
           <a:custGeom>
             <a:avLst/>
@@ -10694,7 +10758,7 @@
         <p:spPr>
           <a:xfrm>
             <a:off x="4012560" y="4367880"/>
-            <a:ext cx="933480" cy="234360"/>
+            <a:ext cx="933120" cy="234000"/>
           </a:xfrm>
           <a:custGeom>
             <a:avLst/>
@@ -10746,7 +10810,7 @@
         <p:spPr>
           <a:xfrm flipV="1">
             <a:off x="7242840" y="3216960"/>
-            <a:ext cx="624240" cy="117720"/>
+            <a:ext cx="623880" cy="117360"/>
           </a:xfrm>
           <a:custGeom>
             <a:avLst/>
@@ -10821,7 +10885,7 @@
         <p:spPr>
           <a:xfrm>
             <a:off x="684360" y="4487400"/>
-            <a:ext cx="8529120" cy="1501560"/>
+            <a:ext cx="8528760" cy="1501200"/>
           </a:xfrm>
           <a:prstGeom prst="rect">
             <a:avLst/>
@@ -10870,7 +10934,7 @@
         <p:spPr>
           <a:xfrm>
             <a:off x="684360" y="685800"/>
-            <a:ext cx="8529120" cy="3609720"/>
+            <a:ext cx="8528760" cy="3609360"/>
           </a:xfrm>
           <a:prstGeom prst="rect">
             <a:avLst/>
@@ -10889,7 +10953,7 @@
         <p:txBody>
           <a:bodyPr lIns="90000" rIns="90000" tIns="45000" bIns="45000" anchor="ctr"/>
           <a:p>
-            <a:pPr marL="285840" indent="-280440">
+            <a:pPr marL="285840" indent="-280080">
               <a:lnSpc>
                 <a:spcPct val="100000"/>
               </a:lnSpc>
@@ -11057,7 +11121,7 @@
         <p:spPr>
           <a:xfrm>
             <a:off x="5430600" y="2730600"/>
-            <a:ext cx="2684520" cy="3714480"/>
+            <a:ext cx="2684160" cy="3714120"/>
           </a:xfrm>
           <a:prstGeom prst="rect">
             <a:avLst/>
@@ -11104,7 +11168,7 @@
         <p:spPr>
           <a:xfrm>
             <a:off x="5523120" y="2822040"/>
-            <a:ext cx="636480" cy="636480"/>
+            <a:ext cx="636120" cy="636120"/>
           </a:xfrm>
           <a:prstGeom prst="rect">
             <a:avLst/>
@@ -11127,7 +11191,7 @@
         <p:spPr>
           <a:xfrm>
             <a:off x="5707800" y="4080600"/>
-            <a:ext cx="909000" cy="909000"/>
+            <a:ext cx="908640" cy="908640"/>
           </a:xfrm>
           <a:prstGeom prst="rect">
             <a:avLst/>
@@ -11150,7 +11214,7 @@
         <p:spPr>
           <a:xfrm>
             <a:off x="6185880" y="4857480"/>
-            <a:ext cx="909000" cy="909000"/>
+            <a:ext cx="908640" cy="908640"/>
           </a:xfrm>
           <a:prstGeom prst="rect">
             <a:avLst/>
@@ -11173,7 +11237,7 @@
         <p:spPr>
           <a:xfrm>
             <a:off x="6722280" y="4080600"/>
-            <a:ext cx="909000" cy="909000"/>
+            <a:ext cx="908640" cy="908640"/>
           </a:xfrm>
           <a:prstGeom prst="rect">
             <a:avLst/>
@@ -11196,7 +11260,7 @@
         <p:spPr>
           <a:xfrm>
             <a:off x="3652920" y="3695760"/>
-            <a:ext cx="909000" cy="909000"/>
+            <a:ext cx="908640" cy="908640"/>
           </a:xfrm>
           <a:prstGeom prst="rect">
             <a:avLst/>
@@ -11215,7 +11279,7 @@
         <p:spPr>
           <a:xfrm>
             <a:off x="4692240" y="4319640"/>
-            <a:ext cx="1488240" cy="851760"/>
+            <a:ext cx="1487880" cy="851400"/>
           </a:xfrm>
           <a:custGeom>
             <a:avLst/>
@@ -11267,7 +11331,7 @@
         <p:spPr>
           <a:xfrm>
             <a:off x="4692240" y="4080600"/>
-            <a:ext cx="2024640" cy="233640"/>
+            <a:ext cx="2024280" cy="233280"/>
           </a:xfrm>
           <a:custGeom>
             <a:avLst/>
@@ -11319,7 +11383,7 @@
         <p:spPr>
           <a:xfrm>
             <a:off x="4692240" y="4200120"/>
-            <a:ext cx="933480" cy="234360"/>
+            <a:ext cx="933120" cy="234000"/>
           </a:xfrm>
           <a:custGeom>
             <a:avLst/>
@@ -11375,7 +11439,7 @@
         <p:spPr>
           <a:xfrm>
             <a:off x="9653760" y="3605400"/>
-            <a:ext cx="909000" cy="909000"/>
+            <a:ext cx="908640" cy="908640"/>
           </a:xfrm>
           <a:prstGeom prst="rect">
             <a:avLst/>
@@ -11393,8 +11457,8 @@
         </p:nvSpPr>
         <p:spPr>
           <a:xfrm rot="10325400">
-            <a:off x="7858440" y="4107600"/>
-            <a:ext cx="1780560" cy="302400"/>
+            <a:off x="7858440" y="4107960"/>
+            <a:ext cx="1780200" cy="302040"/>
           </a:xfrm>
           <a:prstGeom prst="rightArrow">
             <a:avLst>
@@ -11458,7 +11522,7 @@
         <p:spPr>
           <a:xfrm>
             <a:off x="684360" y="4487400"/>
-            <a:ext cx="8529120" cy="1501560"/>
+            <a:ext cx="8528760" cy="1501200"/>
           </a:xfrm>
           <a:prstGeom prst="rect">
             <a:avLst/>
@@ -11507,7 +11571,7 @@
         <p:spPr>
           <a:xfrm>
             <a:off x="684360" y="685800"/>
-            <a:ext cx="8529120" cy="3609720"/>
+            <a:ext cx="8528760" cy="3609360"/>
           </a:xfrm>
           <a:prstGeom prst="rect">
             <a:avLst/>
@@ -11537,7 +11601,7 @@
         <p:spPr>
           <a:xfrm>
             <a:off x="4069440" y="82800"/>
-            <a:ext cx="4041000" cy="2841480"/>
+            <a:ext cx="4040640" cy="2841120"/>
           </a:xfrm>
           <a:prstGeom prst="rect">
             <a:avLst/>
@@ -11560,7 +11624,7 @@
         <p:spPr>
           <a:xfrm>
             <a:off x="83880" y="3103560"/>
-            <a:ext cx="3862080" cy="1639080"/>
+            <a:ext cx="3861720" cy="1638720"/>
           </a:xfrm>
           <a:prstGeom prst="rect">
             <a:avLst/>
@@ -11583,7 +11647,7 @@
         <p:spPr>
           <a:xfrm>
             <a:off x="4161600" y="3103560"/>
-            <a:ext cx="3862080" cy="1639080"/>
+            <a:ext cx="3861720" cy="1638720"/>
           </a:xfrm>
           <a:prstGeom prst="rect">
             <a:avLst/>
@@ -11606,7 +11670,7 @@
         <p:spPr>
           <a:xfrm>
             <a:off x="8230320" y="3103560"/>
-            <a:ext cx="3862080" cy="1639080"/>
+            <a:ext cx="3861720" cy="1638720"/>
           </a:xfrm>
           <a:prstGeom prst="rect">
             <a:avLst/>
@@ -11625,7 +11689,7 @@
         <p:spPr>
           <a:xfrm>
             <a:off x="3993840" y="3766680"/>
-            <a:ext cx="145800" cy="313920"/>
+            <a:ext cx="145440" cy="313560"/>
           </a:xfrm>
           <a:prstGeom prst="rightArrow">
             <a:avLst>
@@ -11664,7 +11728,7 @@
         <p:spPr>
           <a:xfrm>
             <a:off x="8073360" y="3793320"/>
-            <a:ext cx="126720" cy="313920"/>
+            <a:ext cx="126360" cy="313560"/>
           </a:xfrm>
           <a:prstGeom prst="rightArrow">
             <a:avLst>
@@ -11703,7 +11767,7 @@
         <p:spPr>
           <a:xfrm>
             <a:off x="2701080" y="5176080"/>
-            <a:ext cx="1831680" cy="917280"/>
+            <a:ext cx="1831320" cy="916920"/>
           </a:xfrm>
           <a:prstGeom prst="wedgeRectCallout">
             <a:avLst>
@@ -11768,7 +11832,7 @@
         <p:spPr>
           <a:xfrm>
             <a:off x="6722640" y="5196600"/>
-            <a:ext cx="1963080" cy="820440"/>
+            <a:ext cx="1962720" cy="820080"/>
           </a:xfrm>
           <a:prstGeom prst="wedgeRectCallout">
             <a:avLst>
@@ -11833,7 +11897,7 @@
         <p:spPr>
           <a:xfrm>
             <a:off x="9731160" y="5131440"/>
-            <a:ext cx="2100240" cy="651240"/>
+            <a:ext cx="2099880" cy="650880"/>
           </a:xfrm>
           <a:prstGeom prst="wedgeRectCallout">
             <a:avLst>
@@ -11898,7 +11962,7 @@
         <p:spPr>
           <a:xfrm>
             <a:off x="5033520" y="2516760"/>
-            <a:ext cx="2570040" cy="359640"/>
+            <a:ext cx="2569680" cy="359280"/>
           </a:xfrm>
           <a:prstGeom prst="rect">
             <a:avLst/>
@@ -11946,8 +12010,8 @@
         </p:nvSpPr>
         <p:spPr>
           <a:xfrm rot="16200000">
-            <a:off x="3177360" y="1270440"/>
-            <a:ext cx="1959120" cy="359640"/>
+            <a:off x="3177360" y="1270800"/>
+            <a:ext cx="1958760" cy="359280"/>
           </a:xfrm>
           <a:prstGeom prst="rect">
             <a:avLst/>
@@ -12018,7 +12082,7 @@
         <p:spPr>
           <a:xfrm>
             <a:off x="684360" y="4487400"/>
-            <a:ext cx="8529120" cy="1501560"/>
+            <a:ext cx="8528760" cy="1501200"/>
           </a:xfrm>
           <a:prstGeom prst="rect">
             <a:avLst/>
@@ -12069,9 +12133,9 @@
         <p:grpSpPr>
           <a:xfrm>
             <a:off x="948240" y="823320"/>
-            <a:ext cx="10287000" cy="3334320"/>
+            <a:ext cx="10286640" cy="3333960"/>
             <a:chOff x="948240" y="823320"/>
-            <a:chExt cx="10287000" cy="3334320"/>
+            <a:chExt cx="10286640" cy="3333960"/>
           </a:xfrm>
         </p:grpSpPr>
         <p:sp>
@@ -12083,7 +12147,7 @@
           <p:spPr>
             <a:xfrm>
               <a:off x="948240" y="823320"/>
-              <a:ext cx="1357200" cy="1357200"/>
+              <a:ext cx="1356840" cy="1356840"/>
             </a:xfrm>
             <a:prstGeom prst="ellipse">
               <a:avLst/>
@@ -12116,7 +12180,7 @@
           <p:spPr>
             <a:xfrm>
               <a:off x="1234440" y="1109520"/>
-              <a:ext cx="784800" cy="784800"/>
+              <a:ext cx="784440" cy="784440"/>
             </a:xfrm>
             <a:prstGeom prst="rect">
               <a:avLst/>
@@ -12147,7 +12211,7 @@
           <p:spPr>
             <a:xfrm>
               <a:off x="2602800" y="823320"/>
-              <a:ext cx="3206520" cy="1357200"/>
+              <a:ext cx="3206160" cy="1356840"/>
             </a:xfrm>
             <a:prstGeom prst="rect">
               <a:avLst/>
@@ -12199,7 +12263,7 @@
           <p:spPr>
             <a:xfrm>
               <a:off x="6374160" y="823320"/>
-              <a:ext cx="1357200" cy="1357200"/>
+              <a:ext cx="1356840" cy="1356840"/>
             </a:xfrm>
             <a:prstGeom prst="ellipse">
               <a:avLst/>
@@ -12232,7 +12296,7 @@
           <p:spPr>
             <a:xfrm>
               <a:off x="6660360" y="1109520"/>
-              <a:ext cx="784800" cy="784800"/>
+              <a:ext cx="784440" cy="784440"/>
             </a:xfrm>
             <a:prstGeom prst="rect">
               <a:avLst/>
@@ -12263,7 +12327,7 @@
           <p:spPr>
             <a:xfrm>
               <a:off x="8028720" y="823320"/>
-              <a:ext cx="3206520" cy="1357200"/>
+              <a:ext cx="3206160" cy="1356840"/>
             </a:xfrm>
             <a:prstGeom prst="rect">
               <a:avLst/>
@@ -12315,7 +12379,7 @@
           <p:spPr>
             <a:xfrm>
               <a:off x="948240" y="2800440"/>
-              <a:ext cx="1357200" cy="1357200"/>
+              <a:ext cx="1356840" cy="1356840"/>
             </a:xfrm>
             <a:prstGeom prst="ellipse">
               <a:avLst/>
@@ -12348,7 +12412,7 @@
           <p:spPr>
             <a:xfrm>
               <a:off x="1234440" y="3086640"/>
-              <a:ext cx="784800" cy="784800"/>
+              <a:ext cx="784440" cy="784440"/>
             </a:xfrm>
             <a:prstGeom prst="rect">
               <a:avLst/>
@@ -12379,7 +12443,7 @@
           <p:spPr>
             <a:xfrm>
               <a:off x="2602800" y="2800440"/>
-              <a:ext cx="3206520" cy="1357200"/>
+              <a:ext cx="3206160" cy="1356840"/>
             </a:xfrm>
             <a:prstGeom prst="rect">
               <a:avLst/>
@@ -12431,7 +12495,7 @@
           <p:spPr>
             <a:xfrm>
               <a:off x="6374160" y="2800440"/>
-              <a:ext cx="1357200" cy="1357200"/>
+              <a:ext cx="1356840" cy="1356840"/>
             </a:xfrm>
             <a:prstGeom prst="ellipse">
               <a:avLst/>
@@ -12464,7 +12528,7 @@
           <p:spPr>
             <a:xfrm>
               <a:off x="6660360" y="3086640"/>
-              <a:ext cx="784800" cy="784800"/>
+              <a:ext cx="784440" cy="784440"/>
             </a:xfrm>
             <a:prstGeom prst="rect">
               <a:avLst/>
@@ -12495,7 +12559,7 @@
           <p:spPr>
             <a:xfrm>
               <a:off x="8028720" y="2800440"/>
-              <a:ext cx="3206520" cy="1357200"/>
+              <a:ext cx="3206160" cy="1356840"/>
             </a:xfrm>
             <a:prstGeom prst="rect">
               <a:avLst/>
@@ -12585,7 +12649,7 @@
         <p:spPr>
           <a:xfrm>
             <a:off x="0" y="0"/>
-            <a:ext cx="12186720" cy="6852600"/>
+            <a:ext cx="12186360" cy="6852240"/>
           </a:xfrm>
           <a:prstGeom prst="rect">
             <a:avLst/>
@@ -12638,7 +12702,7 @@
         <p:spPr>
           <a:xfrm>
             <a:off x="0" y="0"/>
-            <a:ext cx="8124480" cy="6852600"/>
+            <a:ext cx="8124120" cy="6852240"/>
           </a:xfrm>
           <a:prstGeom prst="snip2DiagRect">
             <a:avLst>
@@ -12860,7 +12924,7 @@
         <p:spPr>
           <a:xfrm>
             <a:off x="8588520" y="941400"/>
-            <a:ext cx="3038400" cy="3243240"/>
+            <a:ext cx="3038040" cy="3242880"/>
           </a:xfrm>
           <a:prstGeom prst="rect">
             <a:avLst/>
@@ -12911,9 +12975,9 @@
         <p:grpSpPr>
           <a:xfrm>
             <a:off x="952560" y="2104200"/>
-            <a:ext cx="6161040" cy="2437920"/>
+            <a:ext cx="6160680" cy="2437560"/>
             <a:chOff x="952560" y="2104200"/>
-            <a:chExt cx="6161040" cy="2437920"/>
+            <a:chExt cx="6160680" cy="2437560"/>
           </a:xfrm>
         </p:grpSpPr>
         <p:sp>
@@ -12925,7 +12989,7 @@
           <p:spPr>
             <a:xfrm>
               <a:off x="952560" y="2104200"/>
-              <a:ext cx="811080" cy="811080"/>
+              <a:ext cx="810720" cy="810720"/>
             </a:xfrm>
             <a:prstGeom prst="ellipse">
               <a:avLst/>
@@ -12958,7 +13022,7 @@
           <p:spPr>
             <a:xfrm>
               <a:off x="1123920" y="2275560"/>
-              <a:ext cx="468000" cy="468000"/>
+              <a:ext cx="467640" cy="467640"/>
             </a:xfrm>
             <a:prstGeom prst="rect">
               <a:avLst/>
@@ -12989,7 +13053,7 @@
           <p:spPr>
             <a:xfrm>
               <a:off x="1944000" y="2104200"/>
-              <a:ext cx="1918800" cy="811080"/>
+              <a:ext cx="1918440" cy="810720"/>
             </a:xfrm>
             <a:prstGeom prst="rect">
               <a:avLst/>
@@ -13041,7 +13105,7 @@
           <p:spPr>
             <a:xfrm>
               <a:off x="4203360" y="2104200"/>
-              <a:ext cx="811080" cy="811080"/>
+              <a:ext cx="810720" cy="810720"/>
             </a:xfrm>
             <a:prstGeom prst="ellipse">
               <a:avLst/>
@@ -13074,7 +13138,7 @@
           <p:spPr>
             <a:xfrm>
               <a:off x="4375080" y="2275560"/>
-              <a:ext cx="468000" cy="468000"/>
+              <a:ext cx="467640" cy="467640"/>
             </a:xfrm>
             <a:prstGeom prst="rect">
               <a:avLst/>
@@ -13105,7 +13169,7 @@
           <p:spPr>
             <a:xfrm>
               <a:off x="5194800" y="2104200"/>
-              <a:ext cx="1918800" cy="811080"/>
+              <a:ext cx="1918440" cy="810720"/>
             </a:xfrm>
             <a:prstGeom prst="rect">
               <a:avLst/>
@@ -13157,7 +13221,7 @@
           <p:spPr>
             <a:xfrm>
               <a:off x="952560" y="3731040"/>
-              <a:ext cx="811080" cy="811080"/>
+              <a:ext cx="810720" cy="810720"/>
             </a:xfrm>
             <a:prstGeom prst="ellipse">
               <a:avLst/>
@@ -13190,7 +13254,7 @@
           <p:spPr>
             <a:xfrm>
               <a:off x="1123920" y="3902400"/>
-              <a:ext cx="468000" cy="468000"/>
+              <a:ext cx="467640" cy="467640"/>
             </a:xfrm>
             <a:prstGeom prst="rect">
               <a:avLst/>
@@ -13221,7 +13285,7 @@
           <p:spPr>
             <a:xfrm>
               <a:off x="1944000" y="3731040"/>
-              <a:ext cx="1918800" cy="811080"/>
+              <a:ext cx="1918440" cy="810720"/>
             </a:xfrm>
             <a:prstGeom prst="rect">
               <a:avLst/>
@@ -13273,7 +13337,7 @@
           <p:spPr>
             <a:xfrm>
               <a:off x="4203360" y="3731040"/>
-              <a:ext cx="811080" cy="811080"/>
+              <a:ext cx="810720" cy="810720"/>
             </a:xfrm>
             <a:prstGeom prst="ellipse">
               <a:avLst/>
@@ -13306,7 +13370,7 @@
           <p:spPr>
             <a:xfrm>
               <a:off x="4375080" y="3902400"/>
-              <a:ext cx="468000" cy="468000"/>
+              <a:ext cx="467640" cy="467640"/>
             </a:xfrm>
             <a:prstGeom prst="rect">
               <a:avLst/>
@@ -13337,7 +13401,7 @@
           <p:spPr>
             <a:xfrm>
               <a:off x="5194800" y="3731040"/>
-              <a:ext cx="1918800" cy="811080"/>
+              <a:ext cx="1918440" cy="810720"/>
             </a:xfrm>
             <a:prstGeom prst="rect">
               <a:avLst/>
@@ -13454,7 +13518,7 @@
         <p:spPr>
           <a:xfrm>
             <a:off x="684360" y="4487400"/>
-            <a:ext cx="8529120" cy="1501560"/>
+            <a:ext cx="8528760" cy="1501200"/>
           </a:xfrm>
           <a:prstGeom prst="rect">
             <a:avLst/>
@@ -13503,7 +13567,7 @@
         <p:spPr>
           <a:xfrm>
             <a:off x="684360" y="685800"/>
-            <a:ext cx="8529120" cy="3609720"/>
+            <a:ext cx="8528760" cy="3609360"/>
           </a:xfrm>
           <a:prstGeom prst="rect">
             <a:avLst/>
@@ -13522,7 +13586,7 @@
         <p:txBody>
           <a:bodyPr lIns="90000" rIns="90000" tIns="45000" bIns="45000" anchor="ctr"/>
           <a:p>
-            <a:pPr marL="285840" indent="-280440">
+            <a:pPr marL="285840" indent="-280080">
               <a:lnSpc>
                 <a:spcPct val="100000"/>
               </a:lnSpc>
@@ -13554,7 +13618,7 @@
             </a:endParaRPr>
           </a:p>
           <a:p>
-            <a:pPr marL="285840" indent="-280440">
+            <a:pPr marL="285840" indent="-280080">
               <a:lnSpc>
                 <a:spcPct val="100000"/>
               </a:lnSpc>
@@ -13586,7 +13650,7 @@
             </a:endParaRPr>
           </a:p>
           <a:p>
-            <a:pPr marL="285840" indent="-280440">
+            <a:pPr marL="285840" indent="-280080">
               <a:lnSpc>
                 <a:spcPct val="100000"/>
               </a:lnSpc>
@@ -13618,7 +13682,7 @@
             </a:endParaRPr>
           </a:p>
           <a:p>
-            <a:pPr marL="285840" indent="-280440">
+            <a:pPr marL="285840" indent="-280080">
               <a:lnSpc>
                 <a:spcPct val="100000"/>
               </a:lnSpc>
@@ -13682,7 +13746,7 @@
         <p:spPr>
           <a:xfrm>
             <a:off x="684360" y="4487400"/>
-            <a:ext cx="8529120" cy="1501560"/>
+            <a:ext cx="8528760" cy="1501200"/>
           </a:xfrm>
           <a:prstGeom prst="rect">
             <a:avLst/>
@@ -13735,7 +13799,7 @@
         <p:spPr>
           <a:xfrm>
             <a:off x="5221440" y="75600"/>
-            <a:ext cx="909000" cy="909000"/>
+            <a:ext cx="908640" cy="908640"/>
           </a:xfrm>
           <a:prstGeom prst="rect">
             <a:avLst/>
@@ -13758,7 +13822,7 @@
         <p:spPr>
           <a:xfrm>
             <a:off x="4695120" y="4444560"/>
-            <a:ext cx="909000" cy="909000"/>
+            <a:ext cx="908640" cy="908640"/>
           </a:xfrm>
           <a:prstGeom prst="rect">
             <a:avLst/>
@@ -13781,7 +13845,7 @@
         <p:spPr>
           <a:xfrm>
             <a:off x="2603880" y="2294640"/>
-            <a:ext cx="909000" cy="909000"/>
+            <a:ext cx="908640" cy="908640"/>
           </a:xfrm>
           <a:prstGeom prst="rect">
             <a:avLst/>
@@ -13804,7 +13868,7 @@
         <p:spPr>
           <a:xfrm>
             <a:off x="9767160" y="3294360"/>
-            <a:ext cx="909000" cy="909000"/>
+            <a:ext cx="908640" cy="908640"/>
           </a:xfrm>
           <a:prstGeom prst="rect">
             <a:avLst/>
@@ -13827,7 +13891,7 @@
         <p:spPr>
           <a:xfrm>
             <a:off x="1967760" y="3811680"/>
-            <a:ext cx="909000" cy="909000"/>
+            <a:ext cx="908640" cy="908640"/>
           </a:xfrm>
           <a:prstGeom prst="rect">
             <a:avLst/>
@@ -13850,7 +13914,7 @@
         <p:spPr>
           <a:xfrm>
             <a:off x="5221440" y="2907360"/>
-            <a:ext cx="909000" cy="909000"/>
+            <a:ext cx="908640" cy="908640"/>
           </a:xfrm>
           <a:prstGeom prst="rect">
             <a:avLst/>
@@ -13873,7 +13937,7 @@
         <p:spPr>
           <a:xfrm>
             <a:off x="1093680" y="3282480"/>
-            <a:ext cx="909000" cy="909000"/>
+            <a:ext cx="908640" cy="908640"/>
           </a:xfrm>
           <a:prstGeom prst="rect">
             <a:avLst/>
@@ -13896,7 +13960,7 @@
         <p:spPr>
           <a:xfrm>
             <a:off x="8595360" y="3808800"/>
-            <a:ext cx="909000" cy="909000"/>
+            <a:ext cx="908640" cy="908640"/>
           </a:xfrm>
           <a:prstGeom prst="rect">
             <a:avLst/>
@@ -13919,7 +13983,7 @@
         <p:spPr>
           <a:xfrm>
             <a:off x="7839000" y="2294640"/>
-            <a:ext cx="909000" cy="909000"/>
+            <a:ext cx="908640" cy="908640"/>
           </a:xfrm>
           <a:prstGeom prst="rect">
             <a:avLst/>
@@ -13938,7 +14002,7 @@
         <p:spPr>
           <a:xfrm>
             <a:off x="6312960" y="944640"/>
-            <a:ext cx="1521000" cy="1334880"/>
+            <a:ext cx="1520640" cy="1334520"/>
           </a:xfrm>
           <a:custGeom>
             <a:avLst/>
@@ -13991,7 +14055,7 @@
         <p:spPr>
           <a:xfrm>
             <a:off x="5678640" y="1145160"/>
-            <a:ext cx="360" cy="1601280"/>
+            <a:ext cx="360" cy="1600920"/>
           </a:xfrm>
           <a:custGeom>
             <a:avLst/>
@@ -14044,7 +14108,7 @@
         <p:spPr>
           <a:xfrm flipH="1">
             <a:off x="3421080" y="990000"/>
-            <a:ext cx="1612440" cy="1375200"/>
+            <a:ext cx="1612080" cy="1374840"/>
           </a:xfrm>
           <a:custGeom>
             <a:avLst/>
@@ -14097,7 +14161,7 @@
         <p:spPr>
           <a:xfrm>
             <a:off x="2082960" y="3279600"/>
-            <a:ext cx="912240" cy="359640"/>
+            <a:ext cx="911880" cy="359280"/>
           </a:xfrm>
           <a:prstGeom prst="rect">
             <a:avLst/>
@@ -14146,7 +14210,7 @@
         <p:spPr>
           <a:xfrm>
             <a:off x="5227200" y="4030200"/>
-            <a:ext cx="924480" cy="359640"/>
+            <a:ext cx="924120" cy="359280"/>
           </a:xfrm>
           <a:prstGeom prst="rect">
             <a:avLst/>
@@ -14195,7 +14259,7 @@
         <p:spPr>
           <a:xfrm>
             <a:off x="8246520" y="3279600"/>
-            <a:ext cx="1250640" cy="359640"/>
+            <a:ext cx="1250280" cy="359280"/>
           </a:xfrm>
           <a:prstGeom prst="rect">
             <a:avLst/>
@@ -14244,7 +14308,7 @@
         <p:spPr>
           <a:xfrm>
             <a:off x="481680" y="348120"/>
-            <a:ext cx="1806840" cy="359640"/>
+            <a:ext cx="1806480" cy="359280"/>
           </a:xfrm>
           <a:prstGeom prst="rect">
             <a:avLst/>
@@ -14297,7 +14361,7 @@
         <p:spPr>
           <a:xfrm>
             <a:off x="5855760" y="4444560"/>
-            <a:ext cx="909000" cy="909000"/>
+            <a:ext cx="908640" cy="908640"/>
           </a:xfrm>
           <a:prstGeom prst="rect">
             <a:avLst/>
@@ -14338,7 +14402,7 @@
         <p:spPr>
           <a:xfrm>
             <a:off x="684360" y="4487400"/>
-            <a:ext cx="8529120" cy="1501560"/>
+            <a:ext cx="8528760" cy="1501200"/>
           </a:xfrm>
           <a:prstGeom prst="rect">
             <a:avLst/>
@@ -14391,7 +14455,7 @@
         <p:spPr>
           <a:xfrm>
             <a:off x="7839000" y="2560320"/>
-            <a:ext cx="1308960" cy="594720"/>
+            <a:ext cx="1308600" cy="594360"/>
           </a:xfrm>
           <a:prstGeom prst="rect">
             <a:avLst/>
@@ -14410,7 +14474,7 @@
         <p:spPr>
           <a:xfrm>
             <a:off x="480240" y="348120"/>
-            <a:ext cx="1787040" cy="359640"/>
+            <a:ext cx="1786680" cy="359280"/>
           </a:xfrm>
           <a:prstGeom prst="rect">
             <a:avLst/>
@@ -14459,7 +14523,7 @@
         <p:spPr>
           <a:xfrm>
             <a:off x="6384240" y="990000"/>
-            <a:ext cx="1521000" cy="1334880"/>
+            <a:ext cx="1520640" cy="1334520"/>
           </a:xfrm>
           <a:custGeom>
             <a:avLst/>
@@ -14512,7 +14576,7 @@
         <p:spPr>
           <a:xfrm>
             <a:off x="5678640" y="1145160"/>
-            <a:ext cx="360" cy="1601280"/>
+            <a:ext cx="360" cy="1600920"/>
           </a:xfrm>
           <a:custGeom>
             <a:avLst/>
@@ -14565,7 +14629,7 @@
         <p:spPr>
           <a:xfrm flipH="1">
             <a:off x="3421080" y="990000"/>
-            <a:ext cx="1612440" cy="1375200"/>
+            <a:ext cx="1612080" cy="1374840"/>
           </a:xfrm>
           <a:custGeom>
             <a:avLst/>
@@ -14618,7 +14682,7 @@
         <p:spPr>
           <a:xfrm>
             <a:off x="2082960" y="3279600"/>
-            <a:ext cx="912240" cy="359640"/>
+            <a:ext cx="911880" cy="359280"/>
           </a:xfrm>
           <a:prstGeom prst="rect">
             <a:avLst/>
@@ -14667,7 +14731,7 @@
         <p:spPr>
           <a:xfrm>
             <a:off x="5227200" y="4030200"/>
-            <a:ext cx="924480" cy="359640"/>
+            <a:ext cx="924120" cy="359280"/>
           </a:xfrm>
           <a:prstGeom prst="rect">
             <a:avLst/>
@@ -14716,7 +14780,7 @@
         <p:spPr>
           <a:xfrm>
             <a:off x="8246520" y="3279600"/>
-            <a:ext cx="1250640" cy="359640"/>
+            <a:ext cx="1250280" cy="359280"/>
           </a:xfrm>
           <a:prstGeom prst="rect">
             <a:avLst/>
@@ -14769,7 +14833,7 @@
         <p:spPr>
           <a:xfrm>
             <a:off x="4979520" y="218880"/>
-            <a:ext cx="1328040" cy="613800"/>
+            <a:ext cx="1327680" cy="613440"/>
           </a:xfrm>
           <a:prstGeom prst="rect">
             <a:avLst/>
@@ -14792,7 +14856,7 @@
         <p:spPr>
           <a:xfrm>
             <a:off x="2102760" y="2514600"/>
-            <a:ext cx="1318680" cy="604080"/>
+            <a:ext cx="1318320" cy="603720"/>
           </a:xfrm>
           <a:prstGeom prst="rect">
             <a:avLst/>
@@ -14815,7 +14879,7 @@
         <p:spPr>
           <a:xfrm>
             <a:off x="4235760" y="3279600"/>
-            <a:ext cx="1308960" cy="594720"/>
+            <a:ext cx="1308600" cy="594360"/>
           </a:xfrm>
           <a:prstGeom prst="rect">
             <a:avLst/>
@@ -14838,7 +14902,7 @@
         <p:spPr>
           <a:xfrm>
             <a:off x="5833080" y="3279600"/>
-            <a:ext cx="1308960" cy="594720"/>
+            <a:ext cx="1308600" cy="594360"/>
           </a:xfrm>
           <a:prstGeom prst="rect">
             <a:avLst/>
@@ -14879,7 +14943,7 @@
         <p:spPr>
           <a:xfrm>
             <a:off x="684360" y="4487400"/>
-            <a:ext cx="8529120" cy="1501560"/>
+            <a:ext cx="8528760" cy="1501200"/>
           </a:xfrm>
           <a:prstGeom prst="rect">
             <a:avLst/>
@@ -14928,7 +14992,7 @@
         <p:spPr>
           <a:xfrm>
             <a:off x="684360" y="685800"/>
-            <a:ext cx="8529120" cy="3609720"/>
+            <a:ext cx="8528760" cy="3609360"/>
           </a:xfrm>
           <a:prstGeom prst="rect">
             <a:avLst/>
@@ -14947,7 +15011,7 @@
         <p:txBody>
           <a:bodyPr lIns="90000" rIns="90000" tIns="45000" bIns="45000" anchor="ctr"/>
           <a:p>
-            <a:pPr marL="285840" indent="-280440">
+            <a:pPr marL="285840" indent="-280080">
               <a:lnSpc>
                 <a:spcPct val="100000"/>
               </a:lnSpc>
@@ -15023,7 +15087,7 @@
         <p:spPr>
           <a:xfrm>
             <a:off x="666000" y="2574360"/>
-            <a:ext cx="4805280" cy="2968560"/>
+            <a:ext cx="4804920" cy="2968200"/>
           </a:xfrm>
           <a:prstGeom prst="roundRect">
             <a:avLst>
@@ -15173,7 +15237,7 @@
         <p:spPr>
           <a:xfrm>
             <a:off x="684360" y="5241960"/>
-            <a:ext cx="8529120" cy="1501560"/>
+            <a:ext cx="8528760" cy="1501200"/>
           </a:xfrm>
           <a:prstGeom prst="rect">
             <a:avLst/>
@@ -15222,7 +15286,7 @@
         <p:spPr>
           <a:xfrm>
             <a:off x="684360" y="685800"/>
-            <a:ext cx="10984680" cy="2282760"/>
+            <a:ext cx="10984320" cy="2282400"/>
           </a:xfrm>
           <a:prstGeom prst="rect">
             <a:avLst/>
@@ -15243,7 +15307,7 @@
             <a:normAutofit/>
           </a:bodyPr>
           <a:p>
-            <a:pPr marL="285840" indent="-280440">
+            <a:pPr marL="285840" indent="-280080">
               <a:lnSpc>
                 <a:spcPct val="100000"/>
               </a:lnSpc>
@@ -15325,7 +15389,7 @@
             </a:endParaRPr>
           </a:p>
           <a:p>
-            <a:pPr marL="285840" indent="-280440">
+            <a:pPr marL="285840" indent="-280080">
               <a:lnSpc>
                 <a:spcPct val="100000"/>
               </a:lnSpc>
@@ -15449,7 +15513,7 @@
         <p:spPr>
           <a:xfrm>
             <a:off x="2523960" y="3718800"/>
-            <a:ext cx="722880" cy="717840"/>
+            <a:ext cx="722520" cy="717480"/>
           </a:xfrm>
           <a:prstGeom prst="ellipse">
             <a:avLst/>
@@ -15517,7 +15581,7 @@
         <p:spPr>
           <a:xfrm>
             <a:off x="3363480" y="3303360"/>
-            <a:ext cx="1212120" cy="401760"/>
+            <a:ext cx="1211760" cy="401400"/>
           </a:xfrm>
           <a:prstGeom prst="ellipse">
             <a:avLst/>
@@ -15585,7 +15649,7 @@
         <p:spPr>
           <a:xfrm>
             <a:off x="744120" y="3208680"/>
-            <a:ext cx="1585440" cy="669960"/>
+            <a:ext cx="1585080" cy="669600"/>
           </a:xfrm>
           <a:prstGeom prst="ellipse">
             <a:avLst/>
@@ -15653,7 +15717,7 @@
         <p:spPr>
           <a:xfrm>
             <a:off x="2119680" y="4628880"/>
-            <a:ext cx="1524600" cy="669960"/>
+            <a:ext cx="1524240" cy="669600"/>
           </a:xfrm>
           <a:prstGeom prst="ellipse">
             <a:avLst/>
@@ -15721,7 +15785,7 @@
         <p:spPr>
           <a:xfrm>
             <a:off x="6819480" y="2574360"/>
-            <a:ext cx="4805280" cy="2968560"/>
+            <a:ext cx="4804920" cy="2968200"/>
           </a:xfrm>
           <a:prstGeom prst="roundRect">
             <a:avLst>
@@ -15871,7 +15935,7 @@
         <p:spPr>
           <a:xfrm>
             <a:off x="7103880" y="4147560"/>
-            <a:ext cx="4373640" cy="853920"/>
+            <a:ext cx="4373280" cy="853560"/>
           </a:xfrm>
           <a:prstGeom prst="ellipse">
             <a:avLst/>
@@ -15939,7 +16003,7 @@
         <p:spPr>
           <a:xfrm>
             <a:off x="9898200" y="3332520"/>
-            <a:ext cx="1212120" cy="401760"/>
+            <a:ext cx="1211760" cy="401400"/>
           </a:xfrm>
           <a:prstGeom prst="ellipse">
             <a:avLst/>
@@ -16007,7 +16071,7 @@
         <p:spPr>
           <a:xfrm>
             <a:off x="6965640" y="3288960"/>
-            <a:ext cx="1585440" cy="669960"/>
+            <a:ext cx="1585080" cy="669600"/>
           </a:xfrm>
           <a:prstGeom prst="ellipse">
             <a:avLst/>
@@ -16075,7 +16139,7 @@
         <p:spPr>
           <a:xfrm>
             <a:off x="8287920" y="2688120"/>
-            <a:ext cx="1868400" cy="669960"/>
+            <a:ext cx="1868040" cy="669600"/>
           </a:xfrm>
           <a:prstGeom prst="ellipse">
             <a:avLst/>
@@ -16192,7 +16256,7 @@
         <p:spPr>
           <a:xfrm>
             <a:off x="684360" y="4487400"/>
-            <a:ext cx="8529120" cy="1501560"/>
+            <a:ext cx="8528760" cy="1501200"/>
           </a:xfrm>
           <a:prstGeom prst="rect">
             <a:avLst/>
@@ -16241,7 +16305,7 @@
         <p:spPr>
           <a:xfrm>
             <a:off x="684360" y="685800"/>
-            <a:ext cx="11357280" cy="3609720"/>
+            <a:ext cx="11356920" cy="3609360"/>
           </a:xfrm>
           <a:prstGeom prst="rect">
             <a:avLst/>
@@ -16262,7 +16326,7 @@
             <a:normAutofit/>
           </a:bodyPr>
           <a:p>
-            <a:pPr marL="285840" indent="-280440">
+            <a:pPr marL="285840" indent="-280080">
               <a:lnSpc>
                 <a:spcPct val="100000"/>
               </a:lnSpc>
@@ -16304,7 +16368,7 @@
             </a:endParaRPr>
           </a:p>
           <a:p>
-            <a:pPr marL="285840" indent="-280440">
+            <a:pPr marL="285840" indent="-280080">
               <a:lnSpc>
                 <a:spcPct val="100000"/>
               </a:lnSpc>
@@ -16494,7 +16558,7 @@
             </a:endParaRPr>
           </a:p>
           <a:p>
-            <a:pPr marL="285840" indent="-280440">
+            <a:pPr marL="285840" indent="-280080">
               <a:lnSpc>
                 <a:spcPct val="100000"/>
               </a:lnSpc>
@@ -16526,7 +16590,7 @@
             </a:endParaRPr>
           </a:p>
           <a:p>
-            <a:pPr marL="285840" indent="-280440">
+            <a:pPr marL="285840" indent="-280080">
               <a:lnSpc>
                 <a:spcPct val="100000"/>
               </a:lnSpc>
@@ -16617,7 +16681,7 @@
         <p:spPr>
           <a:xfrm>
             <a:off x="684360" y="4487400"/>
-            <a:ext cx="8529120" cy="1501560"/>
+            <a:ext cx="8528760" cy="1501200"/>
           </a:xfrm>
           <a:prstGeom prst="rect">
             <a:avLst/>
@@ -16666,7 +16730,7 @@
         <p:spPr>
           <a:xfrm>
             <a:off x="684360" y="685800"/>
-            <a:ext cx="8529120" cy="3609720"/>
+            <a:ext cx="8528760" cy="3609360"/>
           </a:xfrm>
           <a:prstGeom prst="rect">
             <a:avLst/>
@@ -16685,7 +16749,7 @@
         <p:txBody>
           <a:bodyPr lIns="90000" rIns="90000" tIns="45000" bIns="45000" anchor="ctr"/>
           <a:p>
-            <a:pPr marL="285840" indent="-280440">
+            <a:pPr marL="285840" indent="-280080">
               <a:lnSpc>
                 <a:spcPct val="100000"/>
               </a:lnSpc>
@@ -16787,7 +16851,7 @@
             </a:endParaRPr>
           </a:p>
           <a:p>
-            <a:pPr marL="285840" indent="-280440">
+            <a:pPr marL="285840" indent="-280080">
               <a:lnSpc>
                 <a:spcPct val="100000"/>
               </a:lnSpc>
@@ -16889,7 +16953,7 @@
         <p:spPr>
           <a:xfrm>
             <a:off x="2521440" y="3979080"/>
-            <a:ext cx="1876680" cy="802440"/>
+            <a:ext cx="1876320" cy="802080"/>
           </a:xfrm>
           <a:prstGeom prst="rect">
             <a:avLst/>
@@ -16955,7 +17019,7 @@
         <p:spPr>
           <a:xfrm>
             <a:off x="5487840" y="3979080"/>
-            <a:ext cx="1876680" cy="802440"/>
+            <a:ext cx="1876320" cy="802080"/>
           </a:xfrm>
           <a:prstGeom prst="rect">
             <a:avLst/>
@@ -17021,7 +17085,7 @@
         <p:spPr>
           <a:xfrm>
             <a:off x="4004640" y="2771640"/>
-            <a:ext cx="1876680" cy="802440"/>
+            <a:ext cx="1876320" cy="802080"/>
           </a:xfrm>
           <a:prstGeom prst="rect">
             <a:avLst/>
@@ -17087,7 +17151,7 @@
         <p:spPr>
           <a:xfrm>
             <a:off x="4483080" y="4383000"/>
-            <a:ext cx="999360" cy="360"/>
+            <a:ext cx="999000" cy="360"/>
           </a:xfrm>
           <a:custGeom>
             <a:avLst/>
@@ -17139,7 +17203,7 @@
         <p:spPr>
           <a:xfrm>
             <a:off x="4985640" y="3657600"/>
-            <a:ext cx="360" cy="574200"/>
+            <a:ext cx="360" cy="573840"/>
           </a:xfrm>
           <a:custGeom>
             <a:avLst/>
@@ -17240,7 +17304,7 @@
         <p:spPr>
           <a:xfrm>
             <a:off x="0" y="0"/>
-            <a:ext cx="12186720" cy="6852600"/>
+            <a:ext cx="12186360" cy="6852240"/>
           </a:xfrm>
           <a:prstGeom prst="rect">
             <a:avLst/>
@@ -17293,7 +17357,7 @@
         <p:spPr>
           <a:xfrm>
             <a:off x="640440" y="685800"/>
-            <a:ext cx="4813200" cy="4598280"/>
+            <a:ext cx="4812840" cy="4597920"/>
           </a:xfrm>
           <a:prstGeom prst="rect">
             <a:avLst/>
@@ -17344,7 +17408,7 @@
         <p:spPr>
           <a:xfrm>
             <a:off x="6095880" y="0"/>
-            <a:ext cx="6090480" cy="6852600"/>
+            <a:ext cx="6090120" cy="6852240"/>
           </a:xfrm>
           <a:prstGeom prst="rect">
             <a:avLst/>
@@ -17382,7 +17446,7 @@
         <p:spPr>
           <a:xfrm>
             <a:off x="6625800" y="685800"/>
-            <a:ext cx="4873680" cy="4598280"/>
+            <a:ext cx="4873320" cy="4597920"/>
           </a:xfrm>
           <a:prstGeom prst="rect">
             <a:avLst/>
@@ -17403,7 +17467,7 @@
             <a:normAutofit/>
           </a:bodyPr>
           <a:p>
-            <a:pPr marL="285840" indent="-280440">
+            <a:pPr marL="285840" indent="-280080">
               <a:lnSpc>
                 <a:spcPct val="100000"/>
               </a:lnSpc>
@@ -17435,7 +17499,7 @@
             </a:endParaRPr>
           </a:p>
           <a:p>
-            <a:pPr marL="285840" indent="-280440">
+            <a:pPr marL="285840" indent="-280080">
               <a:lnSpc>
                 <a:spcPct val="100000"/>
               </a:lnSpc>
@@ -17467,7 +17531,7 @@
             </a:endParaRPr>
           </a:p>
           <a:p>
-            <a:pPr marL="285840" indent="-280440">
+            <a:pPr marL="285840" indent="-280080">
               <a:lnSpc>
                 <a:spcPct val="100000"/>
               </a:lnSpc>
@@ -17499,7 +17563,7 @@
             </a:endParaRPr>
           </a:p>
           <a:p>
-            <a:pPr marL="285840" indent="-280440">
+            <a:pPr marL="285840" indent="-280080">
               <a:lnSpc>
                 <a:spcPct val="100000"/>
               </a:lnSpc>
@@ -17590,7 +17654,7 @@
         <p:spPr>
           <a:xfrm>
             <a:off x="684360" y="4487400"/>
-            <a:ext cx="8529120" cy="1501560"/>
+            <a:ext cx="8528760" cy="1501200"/>
           </a:xfrm>
           <a:prstGeom prst="rect">
             <a:avLst/>
@@ -17639,7 +17703,7 @@
         <p:spPr>
           <a:xfrm>
             <a:off x="1044720" y="500040"/>
-            <a:ext cx="8258760" cy="3227400"/>
+            <a:ext cx="8258400" cy="3227040"/>
           </a:xfrm>
           <a:prstGeom prst="rect">
             <a:avLst/>
@@ -17658,7 +17722,7 @@
         <p:txBody>
           <a:bodyPr lIns="90000" rIns="90000" tIns="45000" bIns="45000" anchor="ctr"/>
           <a:p>
-            <a:pPr marL="285840" indent="-280440">
+            <a:pPr marL="285840" indent="-280080">
               <a:lnSpc>
                 <a:spcPct val="100000"/>
               </a:lnSpc>
@@ -17700,7 +17764,7 @@
             </a:endParaRPr>
           </a:p>
           <a:p>
-            <a:pPr marL="285840" indent="-280440">
+            <a:pPr marL="285840" indent="-280080">
               <a:lnSpc>
                 <a:spcPct val="100000"/>
               </a:lnSpc>
@@ -17752,7 +17816,7 @@
             </a:endParaRPr>
           </a:p>
           <a:p>
-            <a:pPr marL="285840" indent="-280440">
+            <a:pPr marL="285840" indent="-280080">
               <a:lnSpc>
                 <a:spcPct val="100000"/>
               </a:lnSpc>
@@ -17904,7 +17968,7 @@
         <p:spPr>
           <a:xfrm>
             <a:off x="7097760" y="1943280"/>
-            <a:ext cx="849240" cy="849240"/>
+            <a:ext cx="848880" cy="848880"/>
           </a:xfrm>
           <a:prstGeom prst="rect">
             <a:avLst/>
@@ -17927,7 +17991,7 @@
         <p:spPr>
           <a:xfrm>
             <a:off x="6931800" y="4296600"/>
-            <a:ext cx="1175760" cy="468000"/>
+            <a:ext cx="1175400" cy="467640"/>
           </a:xfrm>
           <a:prstGeom prst="rect">
             <a:avLst/>
@@ -17950,7 +18014,7 @@
         <p:spPr>
           <a:xfrm>
             <a:off x="7054200" y="2896920"/>
-            <a:ext cx="892800" cy="1035000"/>
+            <a:ext cx="892440" cy="1034640"/>
           </a:xfrm>
           <a:prstGeom prst="rect">
             <a:avLst/>
@@ -17973,7 +18037,7 @@
         <p:spPr>
           <a:xfrm>
             <a:off x="2718360" y="2064960"/>
-            <a:ext cx="909000" cy="909000"/>
+            <a:ext cx="908640" cy="908640"/>
           </a:xfrm>
           <a:prstGeom prst="rect">
             <a:avLst/>
@@ -17996,7 +18060,7 @@
         <p:spPr>
           <a:xfrm>
             <a:off x="2739240" y="3371040"/>
-            <a:ext cx="909000" cy="909000"/>
+            <a:ext cx="908640" cy="908640"/>
           </a:xfrm>
           <a:prstGeom prst="rect">
             <a:avLst/>
@@ -18019,7 +18083,7 @@
         <p:spPr>
           <a:xfrm>
             <a:off x="4908600" y="2852280"/>
-            <a:ext cx="909000" cy="909000"/>
+            <a:ext cx="908640" cy="908640"/>
           </a:xfrm>
           <a:prstGeom prst="rect">
             <a:avLst/>
@@ -18037,8 +18101,8 @@
         </p:nvSpPr>
         <p:spPr>
           <a:xfrm rot="1192200">
-            <a:off x="4046040" y="2670480"/>
-            <a:ext cx="973080" cy="479160"/>
+            <a:off x="4046040" y="2670120"/>
+            <a:ext cx="972720" cy="478800"/>
           </a:xfrm>
           <a:prstGeom prst="rightArrow">
             <a:avLst>
@@ -18079,8 +18143,8 @@
         </p:nvSpPr>
         <p:spPr>
           <a:xfrm rot="20407800">
-            <a:off x="4024440" y="3458880"/>
-            <a:ext cx="973080" cy="479160"/>
+            <a:off x="4024080" y="3458880"/>
+            <a:ext cx="972720" cy="478800"/>
           </a:xfrm>
           <a:prstGeom prst="rightArrow">
             <a:avLst>
@@ -18121,8 +18185,8 @@
         </p:nvSpPr>
         <p:spPr>
           <a:xfrm rot="1192200">
-            <a:off x="5799600" y="3778920"/>
-            <a:ext cx="973080" cy="479160"/>
+            <a:off x="5799600" y="3778560"/>
+            <a:ext cx="972720" cy="478800"/>
           </a:xfrm>
           <a:prstGeom prst="rightArrow">
             <a:avLst>
@@ -18163,8 +18227,8 @@
         </p:nvSpPr>
         <p:spPr>
           <a:xfrm rot="20407800">
-            <a:off x="5872680" y="2454480"/>
-            <a:ext cx="973080" cy="479160"/>
+            <a:off x="5872320" y="2454480"/>
+            <a:ext cx="972720" cy="478800"/>
           </a:xfrm>
           <a:prstGeom prst="rightArrow">
             <a:avLst>
@@ -18206,7 +18270,7 @@
         <p:spPr>
           <a:xfrm>
             <a:off x="5951880" y="3115440"/>
-            <a:ext cx="973080" cy="479160"/>
+            <a:ext cx="972720" cy="478800"/>
           </a:xfrm>
           <a:prstGeom prst="rightArrow">
             <a:avLst>
@@ -18297,7 +18361,7 @@
         <p:spPr>
           <a:xfrm>
             <a:off x="684360" y="4487400"/>
-            <a:ext cx="8529120" cy="1501560"/>
+            <a:ext cx="8528760" cy="1501200"/>
           </a:xfrm>
           <a:prstGeom prst="rect">
             <a:avLst/>
@@ -18346,7 +18410,7 @@
         <p:spPr>
           <a:xfrm>
             <a:off x="684360" y="685800"/>
-            <a:ext cx="8529120" cy="3609720"/>
+            <a:ext cx="8528760" cy="3609360"/>
           </a:xfrm>
           <a:prstGeom prst="rect">
             <a:avLst/>
@@ -18365,7 +18429,7 @@
         <p:txBody>
           <a:bodyPr lIns="90000" rIns="90000" tIns="45000" bIns="45000" anchor="ctr"/>
           <a:p>
-            <a:pPr marL="285840" indent="-280440">
+            <a:pPr marL="285840" indent="-280080">
               <a:lnSpc>
                 <a:spcPct val="100000"/>
               </a:lnSpc>
@@ -18457,7 +18521,7 @@
             </a:endParaRPr>
           </a:p>
           <a:p>
-            <a:pPr marL="285840" indent="-280440">
+            <a:pPr marL="285840" indent="-280080">
               <a:lnSpc>
                 <a:spcPct val="100000"/>
               </a:lnSpc>
@@ -18509,7 +18573,7 @@
             </a:endParaRPr>
           </a:p>
           <a:p>
-            <a:pPr marL="285840" indent="-280440">
+            <a:pPr marL="285840" indent="-280080">
               <a:lnSpc>
                 <a:spcPct val="100000"/>
               </a:lnSpc>
@@ -18595,7 +18659,7 @@
         <p:spPr>
           <a:xfrm>
             <a:off x="6227640" y="3794400"/>
-            <a:ext cx="909000" cy="909000"/>
+            <a:ext cx="908640" cy="908640"/>
           </a:xfrm>
           <a:prstGeom prst="rect">
             <a:avLst/>
@@ -18618,7 +18682,7 @@
         <p:spPr>
           <a:xfrm>
             <a:off x="2468520" y="3843720"/>
-            <a:ext cx="909000" cy="909000"/>
+            <a:ext cx="908640" cy="908640"/>
           </a:xfrm>
           <a:prstGeom prst="rect">
             <a:avLst/>
@@ -18641,7 +18705,7 @@
         <p:spPr>
           <a:xfrm>
             <a:off x="9790920" y="3794400"/>
-            <a:ext cx="909000" cy="909000"/>
+            <a:ext cx="908640" cy="908640"/>
           </a:xfrm>
           <a:prstGeom prst="rect">
             <a:avLst/>
@@ -18664,7 +18728,7 @@
         <p:spPr>
           <a:xfrm>
             <a:off x="7903800" y="3794400"/>
-            <a:ext cx="909000" cy="909000"/>
+            <a:ext cx="908640" cy="908640"/>
           </a:xfrm>
           <a:prstGeom prst="rect">
             <a:avLst/>
@@ -18687,7 +18751,7 @@
         <p:spPr>
           <a:xfrm>
             <a:off x="4412520" y="3794400"/>
-            <a:ext cx="909000" cy="909000"/>
+            <a:ext cx="908640" cy="908640"/>
           </a:xfrm>
           <a:prstGeom prst="rect">
             <a:avLst/>
@@ -18710,7 +18774,7 @@
         <p:spPr>
           <a:xfrm>
             <a:off x="684360" y="3843720"/>
-            <a:ext cx="909000" cy="909000"/>
+            <a:ext cx="908640" cy="908640"/>
           </a:xfrm>
           <a:prstGeom prst="rect">
             <a:avLst/>
@@ -18729,7 +18793,7 @@
         <p:spPr>
           <a:xfrm>
             <a:off x="1638000" y="4183200"/>
-            <a:ext cx="677520" cy="256680"/>
+            <a:ext cx="677160" cy="256320"/>
           </a:xfrm>
           <a:prstGeom prst="rightArrow">
             <a:avLst>
@@ -18768,7 +18832,7 @@
         <p:spPr>
           <a:xfrm>
             <a:off x="3511800" y="4201920"/>
-            <a:ext cx="677520" cy="256680"/>
+            <a:ext cx="677160" cy="256320"/>
           </a:xfrm>
           <a:prstGeom prst="rightArrow">
             <a:avLst>
@@ -18807,7 +18871,7 @@
         <p:spPr>
           <a:xfrm>
             <a:off x="5366520" y="4193640"/>
-            <a:ext cx="677520" cy="256680"/>
+            <a:ext cx="677160" cy="256320"/>
           </a:xfrm>
           <a:prstGeom prst="rightArrow">
             <a:avLst>
@@ -18846,7 +18910,7 @@
         <p:spPr>
           <a:xfrm>
             <a:off x="7162200" y="4183200"/>
-            <a:ext cx="677520" cy="256680"/>
+            <a:ext cx="677160" cy="256320"/>
           </a:xfrm>
           <a:prstGeom prst="rightArrow">
             <a:avLst>
@@ -18885,7 +18949,7 @@
         <p:spPr>
           <a:xfrm>
             <a:off x="8876160" y="4169880"/>
-            <a:ext cx="677520" cy="256680"/>
+            <a:ext cx="677160" cy="256320"/>
           </a:xfrm>
           <a:prstGeom prst="rightArrow">
             <a:avLst>
@@ -18973,7 +19037,7 @@
         <p:spPr>
           <a:xfrm>
             <a:off x="684360" y="4487400"/>
-            <a:ext cx="8529120" cy="1501560"/>
+            <a:ext cx="8528760" cy="1501200"/>
           </a:xfrm>
           <a:prstGeom prst="rect">
             <a:avLst/>
@@ -19022,7 +19086,7 @@
         <p:spPr>
           <a:xfrm>
             <a:off x="684360" y="685800"/>
-            <a:ext cx="8529120" cy="3609720"/>
+            <a:ext cx="8528760" cy="3609360"/>
           </a:xfrm>
           <a:prstGeom prst="rect">
             <a:avLst/>
@@ -19041,7 +19105,7 @@
         <p:txBody>
           <a:bodyPr lIns="90000" rIns="90000" tIns="45000" bIns="45000" anchor="ctr"/>
           <a:p>
-            <a:pPr marL="285840" indent="-280440">
+            <a:pPr marL="285840" indent="-280080">
               <a:lnSpc>
                 <a:spcPct val="100000"/>
               </a:lnSpc>
@@ -19123,7 +19187,7 @@
             </a:endParaRPr>
           </a:p>
           <a:p>
-            <a:pPr marL="285840" indent="-280440">
+            <a:pPr marL="285840" indent="-280080">
               <a:lnSpc>
                 <a:spcPct val="100000"/>
               </a:lnSpc>
@@ -19169,7 +19233,7 @@
         <p:spPr>
           <a:xfrm>
             <a:off x="4681800" y="2481480"/>
-            <a:ext cx="909000" cy="909000"/>
+            <a:ext cx="908640" cy="908640"/>
           </a:xfrm>
           <a:prstGeom prst="rect">
             <a:avLst/>
@@ -19192,7 +19256,7 @@
         <p:spPr>
           <a:xfrm>
             <a:off x="6609240" y="3669480"/>
-            <a:ext cx="909000" cy="909000"/>
+            <a:ext cx="908640" cy="908640"/>
           </a:xfrm>
           <a:prstGeom prst="rect">
             <a:avLst/>
@@ -19215,7 +19279,7 @@
         <p:spPr>
           <a:xfrm>
             <a:off x="2973240" y="3669480"/>
-            <a:ext cx="909000" cy="909000"/>
+            <a:ext cx="908640" cy="908640"/>
           </a:xfrm>
           <a:prstGeom prst="rect">
             <a:avLst/>
@@ -19234,7 +19298,7 @@
         <p:spPr>
           <a:xfrm>
             <a:off x="4214160" y="3946320"/>
-            <a:ext cx="2063160" cy="355320"/>
+            <a:ext cx="2062800" cy="354960"/>
           </a:xfrm>
           <a:prstGeom prst="rightArrow">
             <a:avLst>
@@ -19273,7 +19337,7 @@
         <p:spPr>
           <a:xfrm>
             <a:off x="4988160" y="3533400"/>
-            <a:ext cx="296280" cy="401760"/>
+            <a:ext cx="295920" cy="401400"/>
           </a:xfrm>
           <a:prstGeom prst="downArrow">
             <a:avLst>

</xml_diff>

<commit_message>
#12 Weak AI vs Strong AI explanation speech data transformation part 2 added on introduction slides
</commit_message>
<xml_diff>
--- a/SAI_presentation_libre_office.pptx
+++ b/SAI_presentation_libre_office.pptx
@@ -250,7 +250,7 @@
           <a:bodyPr lIns="0" rIns="0" tIns="0" bIns="0" anchor="b"/>
           <a:p>
             <a:pPr algn="r"/>
-            <a:fld id="{DA7DB626-504F-4B41-B30C-74ECD9C89993}" type="slidenum">
+            <a:fld id="{AAC14468-A696-47B0-8EF1-B12D32E755BE}" type="slidenum">
               <a:rPr b="0" lang="fr-FR" sz="1400" spc="-1" strike="noStrike">
                 <a:latin typeface="Times New Roman"/>
               </a:rPr>
@@ -298,7 +298,7 @@
         <p:spPr>
           <a:xfrm>
             <a:off x="685800" y="1143000"/>
-            <a:ext cx="5480640" cy="3080520"/>
+            <a:ext cx="5480280" cy="3080160"/>
           </a:xfrm>
           <a:prstGeom prst="rect">
             <a:avLst/>
@@ -318,7 +318,7 @@
         <p:spPr>
           <a:xfrm>
             <a:off x="685800" y="4400640"/>
-            <a:ext cx="5480640" cy="3594600"/>
+            <a:ext cx="5480280" cy="3594240"/>
           </a:xfrm>
           <a:prstGeom prst="rect">
             <a:avLst/>
@@ -327,7 +327,7 @@
         <p:txBody>
           <a:bodyPr lIns="0" rIns="0" tIns="0" bIns="0"/>
           <a:p>
-            <a:pPr marL="216000" indent="-210600">
+            <a:pPr marL="216000" indent="-210240">
               <a:lnSpc>
                 <a:spcPct val="100000"/>
               </a:lnSpc>
@@ -343,7 +343,7 @@
             </a:endParaRPr>
           </a:p>
           <a:p>
-            <a:pPr marL="216000" indent="-210600">
+            <a:pPr marL="216000" indent="-210240">
               <a:lnSpc>
                 <a:spcPct val="100000"/>
               </a:lnSpc>
@@ -360,7 +360,7 @@
             </a:endParaRPr>
           </a:p>
           <a:p>
-            <a:pPr marL="216000" indent="-210600">
+            <a:pPr marL="216000" indent="-210240">
               <a:lnSpc>
                 <a:spcPct val="100000"/>
               </a:lnSpc>
@@ -376,7 +376,7 @@
             </a:endParaRPr>
           </a:p>
           <a:p>
-            <a:pPr marL="216000" indent="-210600">
+            <a:pPr marL="216000" indent="-210240">
               <a:lnSpc>
                 <a:spcPct val="100000"/>
               </a:lnSpc>
@@ -392,7 +392,7 @@
             </a:endParaRPr>
           </a:p>
           <a:p>
-            <a:pPr marL="216000" indent="-210600">
+            <a:pPr marL="216000" indent="-210240">
               <a:lnSpc>
                 <a:spcPct val="100000"/>
               </a:lnSpc>
@@ -419,7 +419,7 @@
         <p:spPr>
           <a:xfrm>
             <a:off x="3884760" y="8685360"/>
-            <a:ext cx="2966040" cy="452880"/>
+            <a:ext cx="2965680" cy="452520"/>
           </a:xfrm>
           <a:prstGeom prst="rect">
             <a:avLst/>
@@ -443,7 +443,7 @@
                 <a:spcPct val="100000"/>
               </a:lnSpc>
             </a:pPr>
-            <a:fld id="{931FE728-8A25-4099-959F-557573CA671A}" type="slidenum">
+            <a:fld id="{CF46F077-C4B3-4708-A2A2-742B022CA86E}" type="slidenum">
               <a:rPr b="0" lang="fr-FR" sz="1200" spc="-1" strike="noStrike">
                 <a:solidFill>
                   <a:srgbClr val="000000"/>
@@ -493,7 +493,7 @@
         <p:spPr>
           <a:xfrm>
             <a:off x="685800" y="1143000"/>
-            <a:ext cx="5480640" cy="3080520"/>
+            <a:ext cx="5480280" cy="3080160"/>
           </a:xfrm>
           <a:prstGeom prst="rect">
             <a:avLst/>
@@ -513,7 +513,7 @@
         <p:spPr>
           <a:xfrm>
             <a:off x="685800" y="4400640"/>
-            <a:ext cx="5480640" cy="3594600"/>
+            <a:ext cx="5480280" cy="3594240"/>
           </a:xfrm>
           <a:prstGeom prst="rect">
             <a:avLst/>
@@ -522,7 +522,7 @@
         <p:txBody>
           <a:bodyPr lIns="0" rIns="0" tIns="0" bIns="0"/>
           <a:p>
-            <a:pPr marL="216000" indent="-210960">
+            <a:pPr marL="216000" indent="-210600">
               <a:lnSpc>
                 <a:spcPct val="100000"/>
               </a:lnSpc>
@@ -538,7 +538,7 @@
             </a:endParaRPr>
           </a:p>
           <a:p>
-            <a:pPr marL="216000" indent="-210960">
+            <a:pPr marL="216000" indent="-210600">
               <a:lnSpc>
                 <a:spcPct val="100000"/>
               </a:lnSpc>
@@ -548,7 +548,7 @@
             </a:endParaRPr>
           </a:p>
           <a:p>
-            <a:pPr marL="216000" indent="-210960">
+            <a:pPr marL="216000" indent="-210600">
               <a:lnSpc>
                 <a:spcPct val="100000"/>
               </a:lnSpc>
@@ -564,7 +564,7 @@
             </a:endParaRPr>
           </a:p>
           <a:p>
-            <a:pPr marL="216000" indent="-210960">
+            <a:pPr marL="216000" indent="-210600">
               <a:lnSpc>
                 <a:spcPct val="100000"/>
               </a:lnSpc>
@@ -574,7 +574,7 @@
             </a:endParaRPr>
           </a:p>
           <a:p>
-            <a:pPr marL="216000" indent="-210960">
+            <a:pPr marL="216000" indent="-210600">
               <a:lnSpc>
                 <a:spcPct val="100000"/>
               </a:lnSpc>
@@ -590,7 +590,7 @@
             </a:endParaRPr>
           </a:p>
           <a:p>
-            <a:pPr marL="216000" indent="-210960">
+            <a:pPr marL="216000" indent="-210600">
               <a:lnSpc>
                 <a:spcPct val="100000"/>
               </a:lnSpc>
@@ -600,7 +600,7 @@
             </a:endParaRPr>
           </a:p>
           <a:p>
-            <a:pPr marL="216000" indent="-210960">
+            <a:pPr marL="216000" indent="-210600">
               <a:lnSpc>
                 <a:spcPct val="100000"/>
               </a:lnSpc>
@@ -616,7 +616,7 @@
             </a:endParaRPr>
           </a:p>
           <a:p>
-            <a:pPr marL="216000" indent="-210960">
+            <a:pPr marL="216000" indent="-210600">
               <a:lnSpc>
                 <a:spcPct val="100000"/>
               </a:lnSpc>
@@ -626,7 +626,7 @@
             </a:endParaRPr>
           </a:p>
           <a:p>
-            <a:pPr marL="216000" indent="-210960">
+            <a:pPr marL="216000" indent="-210600">
               <a:lnSpc>
                 <a:spcPct val="100000"/>
               </a:lnSpc>
@@ -636,7 +636,7 @@
             </a:endParaRPr>
           </a:p>
           <a:p>
-            <a:pPr marL="216000" indent="-210960">
+            <a:pPr marL="216000" indent="-210600">
               <a:lnSpc>
                 <a:spcPct val="100000"/>
               </a:lnSpc>
@@ -652,7 +652,7 @@
             </a:endParaRPr>
           </a:p>
           <a:p>
-            <a:pPr marL="216000" indent="-210960">
+            <a:pPr marL="216000" indent="-210600">
               <a:lnSpc>
                 <a:spcPct val="100000"/>
               </a:lnSpc>
@@ -668,7 +668,7 @@
             </a:endParaRPr>
           </a:p>
           <a:p>
-            <a:pPr marL="216000" indent="-210960">
+            <a:pPr marL="216000" indent="-210600">
               <a:lnSpc>
                 <a:spcPct val="100000"/>
               </a:lnSpc>
@@ -684,7 +684,7 @@
             </a:endParaRPr>
           </a:p>
           <a:p>
-            <a:pPr marL="216000" indent="-210960">
+            <a:pPr marL="216000" indent="-210600">
               <a:lnSpc>
                 <a:spcPct val="100000"/>
               </a:lnSpc>
@@ -694,7 +694,7 @@
             </a:endParaRPr>
           </a:p>
           <a:p>
-            <a:pPr marL="216000" indent="-210960">
+            <a:pPr marL="216000" indent="-210600">
               <a:lnSpc>
                 <a:spcPct val="100000"/>
               </a:lnSpc>
@@ -710,7 +710,7 @@
             </a:endParaRPr>
           </a:p>
           <a:p>
-            <a:pPr marL="216000" indent="-210960">
+            <a:pPr marL="216000" indent="-210600">
               <a:lnSpc>
                 <a:spcPct val="100000"/>
               </a:lnSpc>
@@ -720,7 +720,7 @@
             </a:endParaRPr>
           </a:p>
           <a:p>
-            <a:pPr marL="216000" indent="-210960">
+            <a:pPr marL="216000" indent="-210600">
               <a:lnSpc>
                 <a:spcPct val="100000"/>
               </a:lnSpc>
@@ -736,7 +736,7 @@
             </a:endParaRPr>
           </a:p>
           <a:p>
-            <a:pPr marL="216000" indent="-210960">
+            <a:pPr marL="216000" indent="-210600">
               <a:lnSpc>
                 <a:spcPct val="100000"/>
               </a:lnSpc>
@@ -752,7 +752,7 @@
             </a:endParaRPr>
           </a:p>
           <a:p>
-            <a:pPr marL="216000" indent="-210960">
+            <a:pPr marL="216000" indent="-210600">
               <a:lnSpc>
                 <a:spcPct val="100000"/>
               </a:lnSpc>
@@ -768,7 +768,7 @@
             </a:endParaRPr>
           </a:p>
           <a:p>
-            <a:pPr marL="216000" indent="-210960">
+            <a:pPr marL="216000" indent="-210600">
               <a:lnSpc>
                 <a:spcPct val="100000"/>
               </a:lnSpc>
@@ -784,7 +784,7 @@
             </a:endParaRPr>
           </a:p>
           <a:p>
-            <a:pPr marL="216000" indent="-210960">
+            <a:pPr marL="216000" indent="-210600">
               <a:lnSpc>
                 <a:spcPct val="100000"/>
               </a:lnSpc>
@@ -794,7 +794,7 @@
             </a:endParaRPr>
           </a:p>
           <a:p>
-            <a:pPr marL="216000" indent="-210960">
+            <a:pPr marL="216000" indent="-210600">
               <a:lnSpc>
                 <a:spcPct val="100000"/>
               </a:lnSpc>
@@ -810,7 +810,7 @@
             </a:endParaRPr>
           </a:p>
           <a:p>
-            <a:pPr marL="216000" indent="-210960">
+            <a:pPr marL="216000" indent="-210600">
               <a:lnSpc>
                 <a:spcPct val="100000"/>
               </a:lnSpc>
@@ -826,7 +826,7 @@
             </a:endParaRPr>
           </a:p>
           <a:p>
-            <a:pPr marL="216000" indent="-210960">
+            <a:pPr marL="216000" indent="-210600">
               <a:lnSpc>
                 <a:spcPct val="100000"/>
               </a:lnSpc>
@@ -842,7 +842,7 @@
             </a:endParaRPr>
           </a:p>
           <a:p>
-            <a:pPr marL="216000" indent="-210960">
+            <a:pPr marL="216000" indent="-210600">
               <a:lnSpc>
                 <a:spcPct val="100000"/>
               </a:lnSpc>
@@ -858,7 +858,7 @@
             </a:endParaRPr>
           </a:p>
           <a:p>
-            <a:pPr marL="216000" indent="-210960">
+            <a:pPr marL="216000" indent="-210600">
               <a:lnSpc>
                 <a:spcPct val="100000"/>
               </a:lnSpc>
@@ -874,7 +874,7 @@
             </a:endParaRPr>
           </a:p>
           <a:p>
-            <a:pPr marL="216000" indent="-210960">
+            <a:pPr marL="216000" indent="-210600">
               <a:lnSpc>
                 <a:spcPct val="100000"/>
               </a:lnSpc>
@@ -884,7 +884,7 @@
             </a:endParaRPr>
           </a:p>
           <a:p>
-            <a:pPr marL="216000" indent="-210960">
+            <a:pPr marL="216000" indent="-210600">
               <a:lnSpc>
                 <a:spcPct val="100000"/>
               </a:lnSpc>
@@ -900,7 +900,7 @@
             </a:endParaRPr>
           </a:p>
           <a:p>
-            <a:pPr marL="216000" indent="-210960">
+            <a:pPr marL="216000" indent="-210600">
               <a:lnSpc>
                 <a:spcPct val="100000"/>
               </a:lnSpc>
@@ -916,7 +916,7 @@
             </a:endParaRPr>
           </a:p>
           <a:p>
-            <a:pPr marL="216000" indent="-210960">
+            <a:pPr marL="216000" indent="-210600">
               <a:lnSpc>
                 <a:spcPct val="100000"/>
               </a:lnSpc>
@@ -932,7 +932,7 @@
             </a:endParaRPr>
           </a:p>
           <a:p>
-            <a:pPr marL="216000" indent="-210960">
+            <a:pPr marL="216000" indent="-210600">
               <a:lnSpc>
                 <a:spcPct val="100000"/>
               </a:lnSpc>
@@ -942,7 +942,7 @@
             </a:endParaRPr>
           </a:p>
           <a:p>
-            <a:pPr marL="216000" indent="-210960">
+            <a:pPr marL="216000" indent="-210600">
               <a:lnSpc>
                 <a:spcPct val="100000"/>
               </a:lnSpc>
@@ -958,7 +958,7 @@
             </a:endParaRPr>
           </a:p>
           <a:p>
-            <a:pPr marL="216000" indent="-210960">
+            <a:pPr marL="216000" indent="-210600">
               <a:lnSpc>
                 <a:spcPct val="100000"/>
               </a:lnSpc>
@@ -974,7 +974,7 @@
             </a:endParaRPr>
           </a:p>
           <a:p>
-            <a:pPr marL="216000" indent="-210960">
+            <a:pPr marL="216000" indent="-210600">
               <a:lnSpc>
                 <a:spcPct val="100000"/>
               </a:lnSpc>
@@ -990,7 +990,7 @@
             </a:endParaRPr>
           </a:p>
           <a:p>
-            <a:pPr marL="216000" indent="-210960">
+            <a:pPr marL="216000" indent="-210600">
               <a:lnSpc>
                 <a:spcPct val="100000"/>
               </a:lnSpc>
@@ -1000,7 +1000,7 @@
             </a:endParaRPr>
           </a:p>
           <a:p>
-            <a:pPr marL="216000" indent="-210960">
+            <a:pPr marL="216000" indent="-210600">
               <a:lnSpc>
                 <a:spcPct val="100000"/>
               </a:lnSpc>
@@ -1016,7 +1016,7 @@
             </a:endParaRPr>
           </a:p>
           <a:p>
-            <a:pPr marL="216000" indent="-210960">
+            <a:pPr marL="216000" indent="-210600">
               <a:lnSpc>
                 <a:spcPct val="100000"/>
               </a:lnSpc>
@@ -1032,7 +1032,7 @@
             </a:endParaRPr>
           </a:p>
           <a:p>
-            <a:pPr marL="216000" indent="-210960">
+            <a:pPr marL="216000" indent="-210600">
               <a:lnSpc>
                 <a:spcPct val="100000"/>
               </a:lnSpc>
@@ -1048,7 +1048,7 @@
             </a:endParaRPr>
           </a:p>
           <a:p>
-            <a:pPr marL="216000" indent="-210960">
+            <a:pPr marL="216000" indent="-210600">
               <a:lnSpc>
                 <a:spcPct val="100000"/>
               </a:lnSpc>
@@ -1064,7 +1064,7 @@
             </a:endParaRPr>
           </a:p>
           <a:p>
-            <a:pPr marL="216000" indent="-210960">
+            <a:pPr marL="216000" indent="-210600">
               <a:lnSpc>
                 <a:spcPct val="100000"/>
               </a:lnSpc>
@@ -1074,7 +1074,7 @@
             </a:endParaRPr>
           </a:p>
           <a:p>
-            <a:pPr marL="216000" indent="-210960">
+            <a:pPr marL="216000" indent="-210600">
               <a:lnSpc>
                 <a:spcPct val="100000"/>
               </a:lnSpc>
@@ -1090,7 +1090,7 @@
             </a:endParaRPr>
           </a:p>
           <a:p>
-            <a:pPr marL="216000" indent="-210960">
+            <a:pPr marL="216000" indent="-210600">
               <a:lnSpc>
                 <a:spcPct val="100000"/>
               </a:lnSpc>
@@ -1107,7 +1107,7 @@
             </a:endParaRPr>
           </a:p>
           <a:p>
-            <a:pPr marL="216000" indent="-210960">
+            <a:pPr marL="216000" indent="-210600">
               <a:lnSpc>
                 <a:spcPct val="100000"/>
               </a:lnSpc>
@@ -1124,7 +1124,7 @@
             </a:endParaRPr>
           </a:p>
           <a:p>
-            <a:pPr marL="216000" indent="-210960">
+            <a:pPr marL="216000" indent="-210600">
               <a:lnSpc>
                 <a:spcPct val="100000"/>
               </a:lnSpc>
@@ -1141,7 +1141,7 @@
             </a:endParaRPr>
           </a:p>
           <a:p>
-            <a:pPr marL="216000" indent="-210960">
+            <a:pPr marL="216000" indent="-210600">
               <a:lnSpc>
                 <a:spcPct val="100000"/>
               </a:lnSpc>
@@ -1151,7 +1151,7 @@
             </a:endParaRPr>
           </a:p>
           <a:p>
-            <a:pPr marL="216000" indent="-210960">
+            <a:pPr marL="216000" indent="-210600">
               <a:lnSpc>
                 <a:spcPct val="100000"/>
               </a:lnSpc>
@@ -1168,7 +1168,7 @@
             </a:endParaRPr>
           </a:p>
           <a:p>
-            <a:pPr marL="216000" indent="-210960">
+            <a:pPr marL="216000" indent="-210600">
               <a:lnSpc>
                 <a:spcPct val="100000"/>
               </a:lnSpc>
@@ -1185,7 +1185,7 @@
             </a:endParaRPr>
           </a:p>
           <a:p>
-            <a:pPr marL="216000" indent="-210960">
+            <a:pPr marL="216000" indent="-210600">
               <a:lnSpc>
                 <a:spcPct val="100000"/>
               </a:lnSpc>
@@ -1195,7 +1195,7 @@
             </a:endParaRPr>
           </a:p>
           <a:p>
-            <a:pPr marL="216000" indent="-210960">
+            <a:pPr marL="216000" indent="-210600">
               <a:lnSpc>
                 <a:spcPct val="100000"/>
               </a:lnSpc>
@@ -1205,7 +1205,7 @@
             </a:endParaRPr>
           </a:p>
           <a:p>
-            <a:pPr marL="216000" indent="-210960">
+            <a:pPr marL="216000" indent="-210600">
               <a:lnSpc>
                 <a:spcPct val="100000"/>
               </a:lnSpc>
@@ -1215,7 +1215,7 @@
             </a:endParaRPr>
           </a:p>
           <a:p>
-            <a:pPr marL="216000" indent="-210960">
+            <a:pPr marL="216000" indent="-210600">
               <a:lnSpc>
                 <a:spcPct val="100000"/>
               </a:lnSpc>
@@ -1225,7 +1225,7 @@
             </a:endParaRPr>
           </a:p>
           <a:p>
-            <a:pPr marL="216000" indent="-210960">
+            <a:pPr marL="216000" indent="-210600">
               <a:lnSpc>
                 <a:spcPct val="100000"/>
               </a:lnSpc>
@@ -1245,7 +1245,7 @@
         <p:spPr>
           <a:xfrm>
             <a:off x="3884760" y="8685360"/>
-            <a:ext cx="2966040" cy="452880"/>
+            <a:ext cx="2965680" cy="452520"/>
           </a:xfrm>
           <a:prstGeom prst="rect">
             <a:avLst/>
@@ -1269,7 +1269,7 @@
                 <a:spcPct val="100000"/>
               </a:lnSpc>
             </a:pPr>
-            <a:fld id="{8FC3DA6A-BFC0-4E37-B5BC-2D12252A9B2C}" type="slidenum">
+            <a:fld id="{1F92893D-DFDE-4E20-8251-85F43F446A44}" type="slidenum">
               <a:rPr b="0" lang="fr-FR" sz="1200" spc="-1" strike="noStrike">
                 <a:solidFill>
                   <a:srgbClr val="000000"/>
@@ -1319,7 +1319,7 @@
         <p:spPr>
           <a:xfrm>
             <a:off x="685800" y="1143000"/>
-            <a:ext cx="5480640" cy="3080520"/>
+            <a:ext cx="5480280" cy="3080160"/>
           </a:xfrm>
           <a:prstGeom prst="rect">
             <a:avLst/>
@@ -1339,7 +1339,7 @@
         <p:spPr>
           <a:xfrm>
             <a:off x="685800" y="4400640"/>
-            <a:ext cx="5480640" cy="3594600"/>
+            <a:ext cx="5480280" cy="3594240"/>
           </a:xfrm>
           <a:prstGeom prst="rect">
             <a:avLst/>
@@ -1348,7 +1348,7 @@
         <p:txBody>
           <a:bodyPr lIns="0" rIns="0" tIns="0" bIns="0"/>
           <a:p>
-            <a:pPr marL="216000" indent="-212760">
+            <a:pPr marL="216000" indent="-212400">
               <a:lnSpc>
                 <a:spcPct val="100000"/>
               </a:lnSpc>
@@ -1364,7 +1364,7 @@
             </a:endParaRPr>
           </a:p>
           <a:p>
-            <a:pPr marL="216000" indent="-212760">
+            <a:pPr marL="216000" indent="-212400">
               <a:lnSpc>
                 <a:spcPct val="100000"/>
               </a:lnSpc>
@@ -1380,7 +1380,7 @@
             </a:endParaRPr>
           </a:p>
           <a:p>
-            <a:pPr marL="216000" indent="-212760">
+            <a:pPr marL="216000" indent="-212400">
               <a:lnSpc>
                 <a:spcPct val="100000"/>
               </a:lnSpc>
@@ -1396,7 +1396,7 @@
             </a:endParaRPr>
           </a:p>
           <a:p>
-            <a:pPr marL="216000" indent="-212760">
+            <a:pPr marL="216000" indent="-212400">
               <a:lnSpc>
                 <a:spcPct val="100000"/>
               </a:lnSpc>
@@ -1406,7 +1406,7 @@
             </a:endParaRPr>
           </a:p>
           <a:p>
-            <a:pPr marL="216000" indent="-212760">
+            <a:pPr marL="216000" indent="-212400">
               <a:lnSpc>
                 <a:spcPct val="100000"/>
               </a:lnSpc>
@@ -1422,7 +1422,7 @@
             </a:endParaRPr>
           </a:p>
           <a:p>
-            <a:pPr marL="216000" indent="-212760">
+            <a:pPr marL="216000" indent="-212400">
               <a:lnSpc>
                 <a:spcPct val="100000"/>
               </a:lnSpc>
@@ -1438,7 +1438,7 @@
             </a:endParaRPr>
           </a:p>
           <a:p>
-            <a:pPr marL="216000" indent="-212760">
+            <a:pPr marL="216000" indent="-212400">
               <a:lnSpc>
                 <a:spcPct val="100000"/>
               </a:lnSpc>
@@ -1448,7 +1448,7 @@
             </a:endParaRPr>
           </a:p>
           <a:p>
-            <a:pPr marL="216000" indent="-212760">
+            <a:pPr marL="216000" indent="-212400">
               <a:lnSpc>
                 <a:spcPct val="100000"/>
               </a:lnSpc>
@@ -1464,7 +1464,7 @@
             </a:endParaRPr>
           </a:p>
           <a:p>
-            <a:pPr marL="216000" indent="-212760">
+            <a:pPr marL="216000" indent="-212400">
               <a:lnSpc>
                 <a:spcPct val="100000"/>
               </a:lnSpc>
@@ -1474,7 +1474,7 @@
             </a:endParaRPr>
           </a:p>
           <a:p>
-            <a:pPr marL="216000" indent="-212760">
+            <a:pPr marL="216000" indent="-212400">
               <a:lnSpc>
                 <a:spcPct val="100000"/>
               </a:lnSpc>
@@ -1490,7 +1490,7 @@
             </a:endParaRPr>
           </a:p>
           <a:p>
-            <a:pPr marL="216000" indent="-212760">
+            <a:pPr marL="216000" indent="-212400">
               <a:lnSpc>
                 <a:spcPct val="100000"/>
               </a:lnSpc>
@@ -1506,7 +1506,7 @@
             </a:endParaRPr>
           </a:p>
           <a:p>
-            <a:pPr marL="216000" indent="-212760">
+            <a:pPr marL="216000" indent="-212400">
               <a:lnSpc>
                 <a:spcPct val="100000"/>
               </a:lnSpc>
@@ -1523,7 +1523,7 @@
             </a:endParaRPr>
           </a:p>
           <a:p>
-            <a:pPr marL="216000" indent="-212760">
+            <a:pPr marL="216000" indent="-212400">
               <a:lnSpc>
                 <a:spcPct val="100000"/>
               </a:lnSpc>
@@ -1533,7 +1533,7 @@
             </a:endParaRPr>
           </a:p>
           <a:p>
-            <a:pPr marL="216000" indent="-212760">
+            <a:pPr marL="216000" indent="-212400">
               <a:lnSpc>
                 <a:spcPct val="100000"/>
               </a:lnSpc>
@@ -1550,7 +1550,7 @@
             </a:endParaRPr>
           </a:p>
           <a:p>
-            <a:pPr marL="216000" indent="-212760">
+            <a:pPr marL="216000" indent="-212400">
               <a:lnSpc>
                 <a:spcPct val="100000"/>
               </a:lnSpc>
@@ -1567,7 +1567,7 @@
             </a:endParaRPr>
           </a:p>
           <a:p>
-            <a:pPr marL="216000" indent="-212760">
+            <a:pPr marL="216000" indent="-212400">
               <a:lnSpc>
                 <a:spcPct val="100000"/>
               </a:lnSpc>
@@ -1584,7 +1584,7 @@
             </a:endParaRPr>
           </a:p>
           <a:p>
-            <a:pPr marL="216000" indent="-212760">
+            <a:pPr marL="216000" indent="-212400">
               <a:lnSpc>
                 <a:spcPct val="100000"/>
               </a:lnSpc>
@@ -1594,7 +1594,7 @@
             </a:endParaRPr>
           </a:p>
           <a:p>
-            <a:pPr marL="216000" indent="-212760">
+            <a:pPr marL="216000" indent="-212400">
               <a:lnSpc>
                 <a:spcPct val="100000"/>
               </a:lnSpc>
@@ -1611,17 +1611,24 @@
             </a:endParaRPr>
           </a:p>
           <a:p>
-            <a:pPr marL="216000" indent="-212760">
-              <a:lnSpc>
-                <a:spcPct val="100000"/>
-              </a:lnSpc>
-            </a:pPr>
+            <a:pPr marL="216000" indent="-212400">
+              <a:lnSpc>
+                <a:spcPct val="100000"/>
+              </a:lnSpc>
+            </a:pPr>
+            <a:r>
+              <a:rPr b="0" lang="fr-FR" sz="1000" spc="-1" strike="noStrike">
+                <a:latin typeface="Arial"/>
+                <a:ea typeface="Noto Sans CJK SC"/>
+              </a:rPr>
+              <a:t>Moreover, if during 10 minutes nothing happened on the screen, it will save only one image with the ten different numbers (as little boxes) of the clock</a:t>
+            </a:r>
             <a:endParaRPr b="0" lang="fr-FR" sz="1000" spc="-1" strike="noStrike">
               <a:latin typeface="Arial"/>
             </a:endParaRPr>
           </a:p>
           <a:p>
-            <a:pPr marL="216000" indent="-212760">
+            <a:pPr marL="216000" indent="-212400">
               <a:lnSpc>
                 <a:spcPct val="100000"/>
               </a:lnSpc>
@@ -1631,7 +1638,7 @@
             </a:endParaRPr>
           </a:p>
           <a:p>
-            <a:pPr marL="216000" indent="-212760">
+            <a:pPr marL="216000" indent="-212400">
               <a:lnSpc>
                 <a:spcPct val="100000"/>
               </a:lnSpc>
@@ -1641,7 +1648,7 @@
             </a:endParaRPr>
           </a:p>
           <a:p>
-            <a:pPr marL="216000" indent="-212760">
+            <a:pPr marL="216000" indent="-212400">
               <a:lnSpc>
                 <a:spcPct val="100000"/>
               </a:lnSpc>
@@ -1651,7 +1658,17 @@
             </a:endParaRPr>
           </a:p>
           <a:p>
-            <a:pPr marL="216000" indent="-212760">
+            <a:pPr marL="216000" indent="-212400">
+              <a:lnSpc>
+                <a:spcPct val="100000"/>
+              </a:lnSpc>
+            </a:pPr>
+            <a:endParaRPr b="0" lang="fr-FR" sz="1000" spc="-1" strike="noStrike">
+              <a:latin typeface="Arial"/>
+            </a:endParaRPr>
+          </a:p>
+          <a:p>
+            <a:pPr marL="216000" indent="-212400">
               <a:lnSpc>
                 <a:spcPct val="100000"/>
               </a:lnSpc>
@@ -1671,7 +1688,7 @@
         <p:spPr>
           <a:xfrm>
             <a:off x="3884760" y="8685360"/>
-            <a:ext cx="2966040" cy="452880"/>
+            <a:ext cx="2965680" cy="452520"/>
           </a:xfrm>
           <a:prstGeom prst="rect">
             <a:avLst/>
@@ -1695,7 +1712,7 @@
                 <a:spcPct val="100000"/>
               </a:lnSpc>
             </a:pPr>
-            <a:fld id="{4B9C2989-0DA9-45D7-85CC-139C588A1BCA}" type="slidenum">
+            <a:fld id="{57D2863E-5630-4BFA-869E-57AF0C5FFF8E}" type="slidenum">
               <a:rPr b="0" lang="fr-FR" sz="1200" spc="-1" strike="noStrike">
                 <a:solidFill>
                   <a:srgbClr val="000000"/>
@@ -1745,7 +1762,7 @@
         <p:spPr>
           <a:xfrm>
             <a:off x="380880" y="694800"/>
-            <a:ext cx="6091200" cy="3424320"/>
+            <a:ext cx="6090840" cy="3423960"/>
           </a:xfrm>
           <a:prstGeom prst="rect">
             <a:avLst/>
@@ -1765,7 +1782,7 @@
         <p:spPr>
           <a:xfrm>
             <a:off x="685800" y="4343400"/>
-            <a:ext cx="5481720" cy="4110120"/>
+            <a:ext cx="5481360" cy="4109760"/>
           </a:xfrm>
           <a:prstGeom prst="rect">
             <a:avLst/>
@@ -1774,7 +1791,7 @@
         <p:txBody>
           <a:bodyPr lIns="0" rIns="0" tIns="0" bIns="0"/>
           <a:p>
-            <a:pPr marL="216000" indent="-212040">
+            <a:pPr marL="216000" indent="-211680">
               <a:lnSpc>
                 <a:spcPct val="100000"/>
               </a:lnSpc>
@@ -1790,7 +1807,7 @@
             </a:endParaRPr>
           </a:p>
           <a:p>
-            <a:pPr marL="216000" indent="-212040">
+            <a:pPr marL="216000" indent="-211680">
               <a:lnSpc>
                 <a:spcPct val="100000"/>
               </a:lnSpc>
@@ -1806,7 +1823,7 @@
             </a:endParaRPr>
           </a:p>
           <a:p>
-            <a:pPr marL="216000" indent="-212040">
+            <a:pPr marL="216000" indent="-211680">
               <a:lnSpc>
                 <a:spcPct val="100000"/>
               </a:lnSpc>
@@ -1822,7 +1839,7 @@
             </a:endParaRPr>
           </a:p>
           <a:p>
-            <a:pPr marL="216000" indent="-212040">
+            <a:pPr marL="216000" indent="-211680">
               <a:lnSpc>
                 <a:spcPct val="100000"/>
               </a:lnSpc>
@@ -5570,7 +5587,7 @@
         <p:spPr>
           <a:xfrm>
             <a:off x="0" y="0"/>
-            <a:ext cx="12186360" cy="6852240"/>
+            <a:ext cx="12186000" cy="6851880"/>
           </a:xfrm>
           <a:prstGeom prst="rect">
             <a:avLst/>
@@ -5602,8 +5619,8 @@
         </p:nvSpPr>
         <p:spPr>
           <a:xfrm flipV="1">
-            <a:off x="0" y="-5760"/>
-            <a:ext cx="12183120" cy="6852240"/>
+            <a:off x="0" y="-6480"/>
+            <a:ext cx="12182760" cy="6851880"/>
           </a:xfrm>
           <a:prstGeom prst="snip1Rect">
             <a:avLst>
@@ -5658,7 +5675,7 @@
         <p:spPr>
           <a:xfrm>
             <a:off x="684360" y="685800"/>
-            <a:ext cx="9673200" cy="3667680"/>
+            <a:ext cx="9672840" cy="3667320"/>
           </a:xfrm>
           <a:prstGeom prst="rect">
             <a:avLst/>
@@ -5709,7 +5726,7 @@
         <p:spPr>
           <a:xfrm>
             <a:off x="684360" y="4648320"/>
-            <a:ext cx="6999840" cy="1137240"/>
+            <a:ext cx="6999480" cy="1136880"/>
           </a:xfrm>
           <a:prstGeom prst="rect">
             <a:avLst/>
@@ -5847,7 +5864,7 @@
         <p:spPr>
           <a:xfrm>
             <a:off x="684360" y="4487400"/>
-            <a:ext cx="8528760" cy="1501200"/>
+            <a:ext cx="8528400" cy="1500840"/>
           </a:xfrm>
           <a:prstGeom prst="rect">
             <a:avLst/>
@@ -5896,7 +5913,7 @@
         <p:spPr>
           <a:xfrm>
             <a:off x="684360" y="685800"/>
-            <a:ext cx="8528760" cy="3609360"/>
+            <a:ext cx="8528400" cy="3609000"/>
           </a:xfrm>
           <a:prstGeom prst="rect">
             <a:avLst/>
@@ -5915,7 +5932,7 @@
         <p:txBody>
           <a:bodyPr lIns="90000" rIns="90000" tIns="45000" bIns="45000" anchor="ctr"/>
           <a:p>
-            <a:pPr marL="285840" indent="-280080">
+            <a:pPr marL="285840" indent="-279720">
               <a:lnSpc>
                 <a:spcPct val="100000"/>
               </a:lnSpc>
@@ -6047,7 +6064,7 @@
             </a:endParaRPr>
           </a:p>
           <a:p>
-            <a:pPr marL="285840" indent="-280080">
+            <a:pPr marL="285840" indent="-279720">
               <a:lnSpc>
                 <a:spcPct val="100000"/>
               </a:lnSpc>
@@ -6093,7 +6110,7 @@
         <p:spPr>
           <a:xfrm>
             <a:off x="4733640" y="3979440"/>
-            <a:ext cx="908640" cy="908640"/>
+            <a:ext cx="908280" cy="908280"/>
           </a:xfrm>
           <a:prstGeom prst="rect">
             <a:avLst/>
@@ -6116,7 +6133,7 @@
         <p:spPr>
           <a:xfrm>
             <a:off x="6825960" y="4030200"/>
-            <a:ext cx="908640" cy="908640"/>
+            <a:ext cx="908280" cy="908280"/>
           </a:xfrm>
           <a:prstGeom prst="rect">
             <a:avLst/>
@@ -6139,7 +6156,7 @@
         <p:spPr>
           <a:xfrm>
             <a:off x="5354640" y="2725920"/>
-            <a:ext cx="908640" cy="908640"/>
+            <a:ext cx="908280" cy="908280"/>
           </a:xfrm>
           <a:prstGeom prst="rect">
             <a:avLst/>
@@ -6162,7 +6179,7 @@
         <p:spPr>
           <a:xfrm>
             <a:off x="8550000" y="3433320"/>
-            <a:ext cx="908640" cy="908640"/>
+            <a:ext cx="908280" cy="908280"/>
           </a:xfrm>
           <a:prstGeom prst="rect">
             <a:avLst/>
@@ -6185,7 +6202,7 @@
         <p:spPr>
           <a:xfrm>
             <a:off x="5153040" y="5079960"/>
-            <a:ext cx="908640" cy="908640"/>
+            <a:ext cx="908280" cy="908280"/>
           </a:xfrm>
           <a:prstGeom prst="rect">
             <a:avLst/>
@@ -6204,7 +6221,7 @@
         <p:spPr>
           <a:xfrm rot="3732600">
             <a:off x="7995240" y="3762000"/>
-            <a:ext cx="198360" cy="664200"/>
+            <a:ext cx="198000" cy="663840"/>
           </a:xfrm>
           <a:prstGeom prst="downArrow">
             <a:avLst>
@@ -6242,8 +6259,8 @@
         </p:nvSpPr>
         <p:spPr>
           <a:xfrm rot="14618400">
-            <a:off x="6343560" y="4765680"/>
-            <a:ext cx="198360" cy="664200"/>
+            <a:off x="6343560" y="4766040"/>
+            <a:ext cx="198000" cy="663840"/>
           </a:xfrm>
           <a:prstGeom prst="downArrow">
             <a:avLst>
@@ -6281,8 +6298,8 @@
         </p:nvSpPr>
         <p:spPr>
           <a:xfrm rot="5400000">
-            <a:off x="6194520" y="4132800"/>
-            <a:ext cx="198360" cy="664200"/>
+            <a:off x="6194880" y="4132800"/>
+            <a:ext cx="198000" cy="663840"/>
           </a:xfrm>
           <a:prstGeom prst="downArrow">
             <a:avLst>
@@ -6320,8 +6337,8 @@
         </p:nvSpPr>
         <p:spPr>
           <a:xfrm rot="7014000">
-            <a:off x="6426720" y="3551760"/>
-            <a:ext cx="198360" cy="664200"/>
+            <a:off x="6427080" y="3551760"/>
+            <a:ext cx="198000" cy="663840"/>
           </a:xfrm>
           <a:prstGeom prst="downArrow">
             <a:avLst>
@@ -6360,7 +6377,7 @@
         <p:spPr>
           <a:xfrm rot="1747800">
             <a:off x="5087880" y="3300840"/>
-            <a:ext cx="198360" cy="664200"/>
+            <a:ext cx="198000" cy="663840"/>
           </a:xfrm>
           <a:prstGeom prst="downArrow">
             <a:avLst>
@@ -6448,7 +6465,7 @@
         <p:spPr>
           <a:xfrm>
             <a:off x="6868080" y="306720"/>
-            <a:ext cx="5038200" cy="2080080"/>
+            <a:ext cx="5037840" cy="2079720"/>
           </a:xfrm>
           <a:prstGeom prst="rect">
             <a:avLst/>
@@ -6491,7 +6508,7 @@
         <p:spPr>
           <a:xfrm>
             <a:off x="6271200" y="2669400"/>
-            <a:ext cx="5627160" cy="3003120"/>
+            <a:ext cx="5626800" cy="3002760"/>
           </a:xfrm>
           <a:prstGeom prst="rect">
             <a:avLst/>
@@ -6536,7 +6553,7 @@
         <p:spPr>
           <a:xfrm>
             <a:off x="129960" y="5709960"/>
-            <a:ext cx="11177640" cy="1084320"/>
+            <a:ext cx="11177280" cy="1083960"/>
           </a:xfrm>
           <a:prstGeom prst="rect">
             <a:avLst/>
@@ -6581,7 +6598,7 @@
         <p:spPr>
           <a:xfrm>
             <a:off x="207000" y="1787400"/>
-            <a:ext cx="5589000" cy="3222360"/>
+            <a:ext cx="5588640" cy="3222000"/>
           </a:xfrm>
           <a:prstGeom prst="rect">
             <a:avLst/>
@@ -6626,7 +6643,7 @@
         <p:spPr>
           <a:xfrm>
             <a:off x="684360" y="4487400"/>
-            <a:ext cx="8528760" cy="1501200"/>
+            <a:ext cx="8528400" cy="1500840"/>
           </a:xfrm>
           <a:prstGeom prst="rect">
             <a:avLst/>
@@ -6675,7 +6692,7 @@
         <p:spPr>
           <a:xfrm>
             <a:off x="684360" y="685800"/>
-            <a:ext cx="8528760" cy="3609360"/>
+            <a:ext cx="8528400" cy="3609000"/>
           </a:xfrm>
           <a:prstGeom prst="rect">
             <a:avLst/>
@@ -6694,7 +6711,7 @@
         <p:txBody>
           <a:bodyPr lIns="90000" rIns="90000" tIns="45000" bIns="45000" anchor="ctr"/>
           <a:p>
-            <a:pPr marL="285840" indent="-280080">
+            <a:pPr marL="285840" indent="-279720">
               <a:lnSpc>
                 <a:spcPct val="100000"/>
               </a:lnSpc>
@@ -6746,7 +6763,7 @@
             </a:endParaRPr>
           </a:p>
           <a:p>
-            <a:pPr marL="285840" indent="-280080">
+            <a:pPr marL="285840" indent="-279720">
               <a:lnSpc>
                 <a:spcPct val="100000"/>
               </a:lnSpc>
@@ -6788,7 +6805,7 @@
             </a:endParaRPr>
           </a:p>
           <a:p>
-            <a:pPr marL="285840" indent="-280080">
+            <a:pPr marL="285840" indent="-279720">
               <a:lnSpc>
                 <a:spcPct val="100000"/>
               </a:lnSpc>
@@ -6840,7 +6857,7 @@
             </a:endParaRPr>
           </a:p>
           <a:p>
-            <a:pPr marL="285840" indent="-280080">
+            <a:pPr marL="285840" indent="-279720">
               <a:lnSpc>
                 <a:spcPct val="100000"/>
               </a:lnSpc>
@@ -7008,7 +7025,7 @@
         <p:spPr>
           <a:xfrm>
             <a:off x="4629600" y="1832040"/>
-            <a:ext cx="848880" cy="848880"/>
+            <a:ext cx="848520" cy="848520"/>
           </a:xfrm>
           <a:prstGeom prst="rect">
             <a:avLst/>
@@ -7031,7 +7048,7 @@
         <p:spPr>
           <a:xfrm>
             <a:off x="4463640" y="4185360"/>
-            <a:ext cx="1175400" cy="467640"/>
+            <a:ext cx="1175040" cy="467280"/>
           </a:xfrm>
           <a:prstGeom prst="rect">
             <a:avLst/>
@@ -7054,7 +7071,7 @@
         <p:spPr>
           <a:xfrm>
             <a:off x="4586040" y="2785680"/>
-            <a:ext cx="892440" cy="1034640"/>
+            <a:ext cx="892080" cy="1034280"/>
           </a:xfrm>
           <a:prstGeom prst="rect">
             <a:avLst/>
@@ -7077,7 +7094,7 @@
         <p:spPr>
           <a:xfrm>
             <a:off x="250560" y="1953720"/>
-            <a:ext cx="908640" cy="908640"/>
+            <a:ext cx="908280" cy="908280"/>
           </a:xfrm>
           <a:prstGeom prst="rect">
             <a:avLst/>
@@ -7100,7 +7117,7 @@
         <p:spPr>
           <a:xfrm>
             <a:off x="271440" y="3259800"/>
-            <a:ext cx="908640" cy="908640"/>
+            <a:ext cx="908280" cy="908280"/>
           </a:xfrm>
           <a:prstGeom prst="rect">
             <a:avLst/>
@@ -7123,7 +7140,7 @@
         <p:spPr>
           <a:xfrm>
             <a:off x="2440800" y="2741040"/>
-            <a:ext cx="908640" cy="908640"/>
+            <a:ext cx="908280" cy="908280"/>
           </a:xfrm>
           <a:prstGeom prst="rect">
             <a:avLst/>
@@ -7141,8 +7158,8 @@
         </p:nvSpPr>
         <p:spPr>
           <a:xfrm rot="1192200">
-            <a:off x="1577880" y="2558880"/>
-            <a:ext cx="972720" cy="478800"/>
+            <a:off x="1577520" y="2558520"/>
+            <a:ext cx="972360" cy="478440"/>
           </a:xfrm>
           <a:prstGeom prst="rightArrow">
             <a:avLst>
@@ -7183,8 +7200,8 @@
         </p:nvSpPr>
         <p:spPr>
           <a:xfrm rot="20407800">
-            <a:off x="1556280" y="3347640"/>
-            <a:ext cx="972720" cy="478800"/>
+            <a:off x="1555920" y="3347640"/>
+            <a:ext cx="972360" cy="478440"/>
           </a:xfrm>
           <a:prstGeom prst="rightArrow">
             <a:avLst>
@@ -7225,8 +7242,8 @@
         </p:nvSpPr>
         <p:spPr>
           <a:xfrm rot="1192200">
-            <a:off x="3331440" y="3667320"/>
-            <a:ext cx="972720" cy="478800"/>
+            <a:off x="3331080" y="3666960"/>
+            <a:ext cx="972360" cy="478440"/>
           </a:xfrm>
           <a:prstGeom prst="rightArrow">
             <a:avLst>
@@ -7267,8 +7284,8 @@
         </p:nvSpPr>
         <p:spPr>
           <a:xfrm rot="20407800">
-            <a:off x="3404520" y="2343240"/>
-            <a:ext cx="972720" cy="478800"/>
+            <a:off x="3404160" y="2343240"/>
+            <a:ext cx="972360" cy="478440"/>
           </a:xfrm>
           <a:prstGeom prst="rightArrow">
             <a:avLst>
@@ -7310,7 +7327,7 @@
         <p:spPr>
           <a:xfrm>
             <a:off x="3483720" y="3004200"/>
-            <a:ext cx="972720" cy="478800"/>
+            <a:ext cx="972360" cy="478440"/>
           </a:xfrm>
           <a:prstGeom prst="rightArrow">
             <a:avLst>
@@ -7356,7 +7373,7 @@
         <p:spPr>
           <a:xfrm>
             <a:off x="5819760" y="5709960"/>
-            <a:ext cx="908640" cy="908640"/>
+            <a:ext cx="908280" cy="908280"/>
           </a:xfrm>
           <a:prstGeom prst="rect">
             <a:avLst/>
@@ -7379,7 +7396,7 @@
         <p:spPr>
           <a:xfrm>
             <a:off x="2060640" y="5759640"/>
-            <a:ext cx="908640" cy="908640"/>
+            <a:ext cx="908280" cy="908280"/>
           </a:xfrm>
           <a:prstGeom prst="rect">
             <a:avLst/>
@@ -7402,7 +7419,7 @@
         <p:spPr>
           <a:xfrm>
             <a:off x="9383040" y="5709960"/>
-            <a:ext cx="908640" cy="908640"/>
+            <a:ext cx="908280" cy="908280"/>
           </a:xfrm>
           <a:prstGeom prst="rect">
             <a:avLst/>
@@ -7425,7 +7442,7 @@
         <p:spPr>
           <a:xfrm>
             <a:off x="7495920" y="5709960"/>
-            <a:ext cx="908640" cy="908640"/>
+            <a:ext cx="908280" cy="908280"/>
           </a:xfrm>
           <a:prstGeom prst="rect">
             <a:avLst/>
@@ -7448,7 +7465,7 @@
         <p:spPr>
           <a:xfrm>
             <a:off x="4004640" y="5709960"/>
-            <a:ext cx="908640" cy="908640"/>
+            <a:ext cx="908280" cy="908280"/>
           </a:xfrm>
           <a:prstGeom prst="rect">
             <a:avLst/>
@@ -7471,7 +7488,7 @@
         <p:spPr>
           <a:xfrm>
             <a:off x="276120" y="5759640"/>
-            <a:ext cx="908640" cy="908640"/>
+            <a:ext cx="908280" cy="908280"/>
           </a:xfrm>
           <a:prstGeom prst="rect">
             <a:avLst/>
@@ -7490,7 +7507,7 @@
         <p:spPr>
           <a:xfrm>
             <a:off x="1230120" y="6098760"/>
-            <a:ext cx="677160" cy="256320"/>
+            <a:ext cx="676800" cy="255960"/>
           </a:xfrm>
           <a:prstGeom prst="rightArrow">
             <a:avLst>
@@ -7529,7 +7546,7 @@
         <p:spPr>
           <a:xfrm>
             <a:off x="3103920" y="6117480"/>
-            <a:ext cx="677160" cy="256320"/>
+            <a:ext cx="676800" cy="255960"/>
           </a:xfrm>
           <a:prstGeom prst="rightArrow">
             <a:avLst>
@@ -7568,7 +7585,7 @@
         <p:spPr>
           <a:xfrm>
             <a:off x="4958640" y="6109200"/>
-            <a:ext cx="677160" cy="256320"/>
+            <a:ext cx="676800" cy="255960"/>
           </a:xfrm>
           <a:prstGeom prst="rightArrow">
             <a:avLst>
@@ -7607,7 +7624,7 @@
         <p:spPr>
           <a:xfrm>
             <a:off x="6754320" y="6098760"/>
-            <a:ext cx="677160" cy="256320"/>
+            <a:ext cx="676800" cy="255960"/>
           </a:xfrm>
           <a:prstGeom prst="rightArrow">
             <a:avLst>
@@ -7646,7 +7663,7 @@
         <p:spPr>
           <a:xfrm>
             <a:off x="8468280" y="6085800"/>
-            <a:ext cx="677160" cy="256320"/>
+            <a:ext cx="676800" cy="255960"/>
           </a:xfrm>
           <a:prstGeom prst="rightArrow">
             <a:avLst>
@@ -7689,7 +7706,7 @@
         <p:spPr>
           <a:xfrm>
             <a:off x="6582600" y="3915000"/>
-            <a:ext cx="908640" cy="908640"/>
+            <a:ext cx="908280" cy="908280"/>
           </a:xfrm>
           <a:prstGeom prst="rect">
             <a:avLst/>
@@ -7712,7 +7729,7 @@
         <p:spPr>
           <a:xfrm>
             <a:off x="8674920" y="3965760"/>
-            <a:ext cx="908640" cy="908640"/>
+            <a:ext cx="908280" cy="908280"/>
           </a:xfrm>
           <a:prstGeom prst="rect">
             <a:avLst/>
@@ -7735,7 +7752,7 @@
         <p:spPr>
           <a:xfrm>
             <a:off x="7203600" y="2661480"/>
-            <a:ext cx="908640" cy="908640"/>
+            <a:ext cx="908280" cy="908280"/>
           </a:xfrm>
           <a:prstGeom prst="rect">
             <a:avLst/>
@@ -7758,7 +7775,7 @@
         <p:spPr>
           <a:xfrm>
             <a:off x="10398960" y="3368880"/>
-            <a:ext cx="908640" cy="908640"/>
+            <a:ext cx="908280" cy="908280"/>
           </a:xfrm>
           <a:prstGeom prst="rect">
             <a:avLst/>
@@ -7781,7 +7798,7 @@
         <p:spPr>
           <a:xfrm>
             <a:off x="7002000" y="5015520"/>
-            <a:ext cx="908640" cy="908640"/>
+            <a:ext cx="908280" cy="908280"/>
           </a:xfrm>
           <a:prstGeom prst="rect">
             <a:avLst/>
@@ -7800,7 +7817,7 @@
         <p:spPr>
           <a:xfrm rot="3732600">
             <a:off x="9844560" y="3697920"/>
-            <a:ext cx="198360" cy="664200"/>
+            <a:ext cx="198000" cy="663840"/>
           </a:xfrm>
           <a:prstGeom prst="downArrow">
             <a:avLst>
@@ -7838,8 +7855,8 @@
         </p:nvSpPr>
         <p:spPr>
           <a:xfrm rot="14618400">
-            <a:off x="8192520" y="4701600"/>
-            <a:ext cx="198360" cy="664200"/>
+            <a:off x="8192520" y="4701960"/>
+            <a:ext cx="198000" cy="663840"/>
           </a:xfrm>
           <a:prstGeom prst="downArrow">
             <a:avLst>
@@ -7877,8 +7894,8 @@
         </p:nvSpPr>
         <p:spPr>
           <a:xfrm rot="5400000">
-            <a:off x="8043480" y="4068360"/>
-            <a:ext cx="198360" cy="664200"/>
+            <a:off x="8043840" y="4068360"/>
+            <a:ext cx="198000" cy="663840"/>
           </a:xfrm>
           <a:prstGeom prst="downArrow">
             <a:avLst>
@@ -7916,8 +7933,8 @@
         </p:nvSpPr>
         <p:spPr>
           <a:xfrm rot="7014000">
-            <a:off x="8276040" y="3487320"/>
-            <a:ext cx="198360" cy="664200"/>
+            <a:off x="8276400" y="3487320"/>
+            <a:ext cx="198000" cy="663840"/>
           </a:xfrm>
           <a:prstGeom prst="downArrow">
             <a:avLst>
@@ -7956,7 +7973,7 @@
         <p:spPr>
           <a:xfrm rot="1747800">
             <a:off x="7094880" y="3422880"/>
-            <a:ext cx="198360" cy="664200"/>
+            <a:ext cx="198000" cy="663840"/>
           </a:xfrm>
           <a:prstGeom prst="downArrow">
             <a:avLst>
@@ -7999,7 +8016,7 @@
         <p:spPr>
           <a:xfrm>
             <a:off x="8641080" y="309600"/>
-            <a:ext cx="908640" cy="908640"/>
+            <a:ext cx="908280" cy="908280"/>
           </a:xfrm>
           <a:prstGeom prst="rect">
             <a:avLst/>
@@ -8022,7 +8039,7 @@
         <p:spPr>
           <a:xfrm>
             <a:off x="10568880" y="1497240"/>
-            <a:ext cx="908640" cy="908640"/>
+            <a:ext cx="908280" cy="908280"/>
           </a:xfrm>
           <a:prstGeom prst="rect">
             <a:avLst/>
@@ -8045,7 +8062,7 @@
         <p:spPr>
           <a:xfrm>
             <a:off x="6932880" y="1497240"/>
-            <a:ext cx="908640" cy="908640"/>
+            <a:ext cx="908280" cy="908280"/>
           </a:xfrm>
           <a:prstGeom prst="rect">
             <a:avLst/>
@@ -8064,7 +8081,7 @@
         <p:spPr>
           <a:xfrm>
             <a:off x="8173800" y="1774080"/>
-            <a:ext cx="2062800" cy="354960"/>
+            <a:ext cx="2062440" cy="354600"/>
           </a:xfrm>
           <a:prstGeom prst="rightArrow">
             <a:avLst>
@@ -8103,7 +8120,7 @@
         <p:spPr>
           <a:xfrm>
             <a:off x="8947440" y="1361160"/>
-            <a:ext cx="295920" cy="401400"/>
+            <a:ext cx="295560" cy="401040"/>
           </a:xfrm>
           <a:prstGeom prst="downArrow">
             <a:avLst>
@@ -8191,7 +8208,7 @@
         <p:spPr>
           <a:xfrm>
             <a:off x="0" y="0"/>
-            <a:ext cx="12186360" cy="6852240"/>
+            <a:ext cx="12186000" cy="6851880"/>
           </a:xfrm>
           <a:prstGeom prst="rect">
             <a:avLst/>
@@ -8244,7 +8261,7 @@
         <p:spPr>
           <a:xfrm>
             <a:off x="640440" y="685800"/>
-            <a:ext cx="4812840" cy="4597920"/>
+            <a:ext cx="4812480" cy="4597560"/>
           </a:xfrm>
           <a:prstGeom prst="rect">
             <a:avLst/>
@@ -8295,7 +8312,7 @@
         <p:spPr>
           <a:xfrm>
             <a:off x="6095880" y="0"/>
-            <a:ext cx="6090120" cy="6852240"/>
+            <a:ext cx="6089760" cy="6851880"/>
           </a:xfrm>
           <a:prstGeom prst="rect">
             <a:avLst/>
@@ -8333,7 +8350,7 @@
         <p:spPr>
           <a:xfrm>
             <a:off x="6625800" y="685800"/>
-            <a:ext cx="4873320" cy="4597920"/>
+            <a:ext cx="4872960" cy="4597560"/>
           </a:xfrm>
           <a:prstGeom prst="rect">
             <a:avLst/>
@@ -8354,7 +8371,7 @@
             <a:normAutofit/>
           </a:bodyPr>
           <a:p>
-            <a:pPr marL="285840" indent="-280080">
+            <a:pPr marL="285840" indent="-279720">
               <a:lnSpc>
                 <a:spcPct val="100000"/>
               </a:lnSpc>
@@ -8386,7 +8403,7 @@
             </a:endParaRPr>
           </a:p>
           <a:p>
-            <a:pPr marL="285840" indent="-280080">
+            <a:pPr marL="285840" indent="-279720">
               <a:lnSpc>
                 <a:spcPct val="100000"/>
               </a:lnSpc>
@@ -8418,7 +8435,7 @@
             </a:endParaRPr>
           </a:p>
           <a:p>
-            <a:pPr marL="285840" indent="-280080">
+            <a:pPr marL="285840" indent="-279720">
               <a:lnSpc>
                 <a:spcPct val="100000"/>
               </a:lnSpc>
@@ -8450,7 +8467,7 @@
             </a:endParaRPr>
           </a:p>
           <a:p>
-            <a:pPr marL="285840" indent="-280080">
+            <a:pPr marL="285840" indent="-279720">
               <a:lnSpc>
                 <a:spcPct val="100000"/>
               </a:lnSpc>
@@ -8482,7 +8499,7 @@
             </a:endParaRPr>
           </a:p>
           <a:p>
-            <a:pPr marL="285840" indent="-280080">
+            <a:pPr marL="285840" indent="-279720">
               <a:lnSpc>
                 <a:spcPct val="100000"/>
               </a:lnSpc>
@@ -8573,7 +8590,7 @@
         <p:spPr>
           <a:xfrm>
             <a:off x="684360" y="4487400"/>
-            <a:ext cx="8528760" cy="1501200"/>
+            <a:ext cx="8528400" cy="1500840"/>
           </a:xfrm>
           <a:prstGeom prst="rect">
             <a:avLst/>
@@ -8622,7 +8639,7 @@
         <p:spPr>
           <a:xfrm>
             <a:off x="684360" y="685800"/>
-            <a:ext cx="8528760" cy="3609360"/>
+            <a:ext cx="8528400" cy="3609000"/>
           </a:xfrm>
           <a:prstGeom prst="rect">
             <a:avLst/>
@@ -8641,7 +8658,7 @@
         <p:txBody>
           <a:bodyPr lIns="90000" rIns="90000" tIns="45000" bIns="45000" anchor="ctr"/>
           <a:p>
-            <a:pPr marL="285840" indent="-280080">
+            <a:pPr marL="285840" indent="-279720">
               <a:lnSpc>
                 <a:spcPct val="100000"/>
               </a:lnSpc>
@@ -8673,7 +8690,7 @@
             </a:endParaRPr>
           </a:p>
           <a:p>
-            <a:pPr marL="285840" indent="-280080">
+            <a:pPr marL="285840" indent="-279720">
               <a:lnSpc>
                 <a:spcPct val="100000"/>
               </a:lnSpc>
@@ -8783,7 +8800,7 @@
         <p:spPr>
           <a:xfrm>
             <a:off x="6995520" y="1949760"/>
-            <a:ext cx="848880" cy="848880"/>
+            <a:ext cx="848520" cy="848520"/>
           </a:xfrm>
           <a:prstGeom prst="rect">
             <a:avLst/>
@@ -8806,7 +8823,7 @@
         <p:spPr>
           <a:xfrm>
             <a:off x="6829560" y="4303080"/>
-            <a:ext cx="1175400" cy="467640"/>
+            <a:ext cx="1175040" cy="467280"/>
           </a:xfrm>
           <a:prstGeom prst="rect">
             <a:avLst/>
@@ -8829,7 +8846,7 @@
         <p:spPr>
           <a:xfrm>
             <a:off x="6951960" y="2903040"/>
-            <a:ext cx="892440" cy="1034640"/>
+            <a:ext cx="892080" cy="1034280"/>
           </a:xfrm>
           <a:prstGeom prst="rect">
             <a:avLst/>
@@ -8852,7 +8869,7 @@
         <p:spPr>
           <a:xfrm>
             <a:off x="2616120" y="2071080"/>
-            <a:ext cx="908640" cy="908640"/>
+            <a:ext cx="908280" cy="908280"/>
           </a:xfrm>
           <a:prstGeom prst="rect">
             <a:avLst/>
@@ -8875,7 +8892,7 @@
         <p:spPr>
           <a:xfrm>
             <a:off x="2637000" y="3377160"/>
-            <a:ext cx="908640" cy="908640"/>
+            <a:ext cx="908280" cy="908280"/>
           </a:xfrm>
           <a:prstGeom prst="rect">
             <a:avLst/>
@@ -8893,8 +8910,8 @@
         </p:nvSpPr>
         <p:spPr>
           <a:xfrm rot="1192200">
-            <a:off x="3943440" y="2676240"/>
-            <a:ext cx="972720" cy="478800"/>
+            <a:off x="3943080" y="2675880"/>
+            <a:ext cx="972360" cy="478440"/>
           </a:xfrm>
           <a:prstGeom prst="rightArrow">
             <a:avLst>
@@ -8935,8 +8952,8 @@
         </p:nvSpPr>
         <p:spPr>
           <a:xfrm rot="20407800">
-            <a:off x="3921840" y="3465000"/>
-            <a:ext cx="972720" cy="478800"/>
+            <a:off x="3921480" y="3465000"/>
+            <a:ext cx="972360" cy="478440"/>
           </a:xfrm>
           <a:prstGeom prst="rightArrow">
             <a:avLst>
@@ -8977,8 +8994,8 @@
         </p:nvSpPr>
         <p:spPr>
           <a:xfrm rot="1192200">
-            <a:off x="5697360" y="3784680"/>
-            <a:ext cx="972720" cy="478800"/>
+            <a:off x="5697000" y="3784320"/>
+            <a:ext cx="972360" cy="478440"/>
           </a:xfrm>
           <a:prstGeom prst="rightArrow">
             <a:avLst>
@@ -9019,8 +9036,8 @@
         </p:nvSpPr>
         <p:spPr>
           <a:xfrm rot="20407800">
-            <a:off x="5770080" y="2460600"/>
-            <a:ext cx="972720" cy="478800"/>
+            <a:off x="5769720" y="2460600"/>
+            <a:ext cx="972360" cy="478440"/>
           </a:xfrm>
           <a:prstGeom prst="rightArrow">
             <a:avLst>
@@ -9062,7 +9079,7 @@
         <p:spPr>
           <a:xfrm>
             <a:off x="5849640" y="3121560"/>
-            <a:ext cx="972720" cy="478800"/>
+            <a:ext cx="972360" cy="478440"/>
           </a:xfrm>
           <a:prstGeom prst="rightArrow">
             <a:avLst>
@@ -9108,7 +9125,7 @@
         <p:spPr>
           <a:xfrm>
             <a:off x="4950720" y="2998800"/>
-            <a:ext cx="750960" cy="750960"/>
+            <a:ext cx="750600" cy="750600"/>
           </a:xfrm>
           <a:prstGeom prst="rect">
             <a:avLst/>
@@ -9176,7 +9193,7 @@
         <p:spPr>
           <a:xfrm>
             <a:off x="684360" y="4487400"/>
-            <a:ext cx="8528760" cy="1501200"/>
+            <a:ext cx="8528400" cy="1500840"/>
           </a:xfrm>
           <a:prstGeom prst="rect">
             <a:avLst/>
@@ -9225,7 +9242,7 @@
         <p:spPr>
           <a:xfrm>
             <a:off x="684360" y="685800"/>
-            <a:ext cx="8528760" cy="3609360"/>
+            <a:ext cx="8528400" cy="3609000"/>
           </a:xfrm>
           <a:prstGeom prst="rect">
             <a:avLst/>
@@ -9244,7 +9261,7 @@
         <p:txBody>
           <a:bodyPr lIns="90000" rIns="90000" tIns="45000" bIns="45000" anchor="ctr"/>
           <a:p>
-            <a:pPr marL="285840" indent="-280080">
+            <a:pPr marL="285840" indent="-279720">
               <a:lnSpc>
                 <a:spcPct val="100000"/>
               </a:lnSpc>
@@ -9370,7 +9387,7 @@
             </a:endParaRPr>
           </a:p>
           <a:p>
-            <a:pPr marL="285840" indent="-280080">
+            <a:pPr marL="285840" indent="-279720">
               <a:lnSpc>
                 <a:spcPct val="100000"/>
               </a:lnSpc>
@@ -9462,7 +9479,7 @@
         <p:spPr>
           <a:xfrm>
             <a:off x="3562560" y="1395720"/>
-            <a:ext cx="908640" cy="908640"/>
+            <a:ext cx="908280" cy="908280"/>
           </a:xfrm>
           <a:prstGeom prst="rect">
             <a:avLst/>
@@ -9485,7 +9502,7 @@
         <p:spPr>
           <a:xfrm>
             <a:off x="6678360" y="1395720"/>
-            <a:ext cx="908640" cy="908640"/>
+            <a:ext cx="908280" cy="908280"/>
           </a:xfrm>
           <a:prstGeom prst="rect">
             <a:avLst/>
@@ -9508,7 +9525,7 @@
         <p:spPr>
           <a:xfrm>
             <a:off x="7042320" y="3904200"/>
-            <a:ext cx="908640" cy="908640"/>
+            <a:ext cx="908280" cy="908280"/>
           </a:xfrm>
           <a:prstGeom prst="rect">
             <a:avLst/>
@@ -9531,7 +9548,7 @@
         <p:spPr>
           <a:xfrm>
             <a:off x="3562560" y="3904200"/>
-            <a:ext cx="908640" cy="908640"/>
+            <a:ext cx="908280" cy="908280"/>
           </a:xfrm>
           <a:prstGeom prst="rect">
             <a:avLst/>
@@ -9554,7 +9571,7 @@
         <p:spPr>
           <a:xfrm>
             <a:off x="6678360" y="1395720"/>
-            <a:ext cx="908640" cy="908640"/>
+            <a:ext cx="908280" cy="908280"/>
           </a:xfrm>
           <a:prstGeom prst="rect">
             <a:avLst/>
@@ -9577,7 +9594,7 @@
         <p:spPr>
           <a:xfrm>
             <a:off x="4113000" y="2039400"/>
-            <a:ext cx="908640" cy="908640"/>
+            <a:ext cx="908280" cy="908280"/>
           </a:xfrm>
           <a:prstGeom prst="rect">
             <a:avLst/>
@@ -9600,7 +9617,7 @@
         <p:spPr>
           <a:xfrm>
             <a:off x="7296480" y="2133000"/>
-            <a:ext cx="908640" cy="908640"/>
+            <a:ext cx="908280" cy="908280"/>
           </a:xfrm>
           <a:prstGeom prst="rect">
             <a:avLst/>
@@ -9619,7 +9636,7 @@
         <p:spPr>
           <a:xfrm>
             <a:off x="5285160" y="1920960"/>
-            <a:ext cx="1177200" cy="539640"/>
+            <a:ext cx="1176840" cy="539280"/>
           </a:xfrm>
           <a:prstGeom prst="rightArrow">
             <a:avLst>
@@ -9661,7 +9678,7 @@
         <p:spPr>
           <a:xfrm>
             <a:off x="5149440" y="4088880"/>
-            <a:ext cx="1177200" cy="539640"/>
+            <a:ext cx="1176840" cy="539280"/>
           </a:xfrm>
           <a:prstGeom prst="rightArrow">
             <a:avLst>
@@ -9726,7 +9743,7 @@
         <p:spPr>
           <a:xfrm>
             <a:off x="4895280" y="2388600"/>
-            <a:ext cx="2702160" cy="359280"/>
+            <a:ext cx="2701800" cy="358920"/>
           </a:xfrm>
           <a:prstGeom prst="rect">
             <a:avLst/>
@@ -9775,7 +9792,7 @@
         <p:spPr>
           <a:xfrm>
             <a:off x="5027400" y="4575240"/>
-            <a:ext cx="2322000" cy="359280"/>
+            <a:ext cx="2321640" cy="358920"/>
           </a:xfrm>
           <a:prstGeom prst="rect">
             <a:avLst/>
@@ -9873,7 +9890,7 @@
         <p:spPr>
           <a:xfrm>
             <a:off x="684360" y="4487400"/>
-            <a:ext cx="8528760" cy="1501200"/>
+            <a:ext cx="8528400" cy="1500840"/>
           </a:xfrm>
           <a:prstGeom prst="rect">
             <a:avLst/>
@@ -9922,7 +9939,7 @@
         <p:spPr>
           <a:xfrm>
             <a:off x="684360" y="685800"/>
-            <a:ext cx="8528760" cy="3609360"/>
+            <a:ext cx="8528400" cy="3609000"/>
           </a:xfrm>
           <a:prstGeom prst="rect">
             <a:avLst/>
@@ -9941,7 +9958,7 @@
         <p:txBody>
           <a:bodyPr lIns="90000" rIns="90000" tIns="45000" bIns="45000" anchor="ctr"/>
           <a:p>
-            <a:pPr marL="285840" indent="-280080">
+            <a:pPr marL="285840" indent="-279720">
               <a:lnSpc>
                 <a:spcPct val="100000"/>
               </a:lnSpc>
@@ -10063,7 +10080,7 @@
         <p:spPr>
           <a:xfrm>
             <a:off x="1863000" y="3157920"/>
-            <a:ext cx="908640" cy="908640"/>
+            <a:ext cx="908280" cy="908280"/>
           </a:xfrm>
           <a:prstGeom prst="rect">
             <a:avLst/>
@@ -10086,7 +10103,7 @@
         <p:spPr>
           <a:xfrm>
             <a:off x="2413440" y="3801600"/>
-            <a:ext cx="908640" cy="908640"/>
+            <a:ext cx="908280" cy="908280"/>
           </a:xfrm>
           <a:prstGeom prst="rect">
             <a:avLst/>
@@ -10109,7 +10126,7 @@
         <p:spPr>
           <a:xfrm>
             <a:off x="7197480" y="3439800"/>
-            <a:ext cx="908640" cy="908640"/>
+            <a:ext cx="908280" cy="908280"/>
           </a:xfrm>
           <a:prstGeom prst="rect">
             <a:avLst/>
@@ -10132,7 +10149,7 @@
         <p:spPr>
           <a:xfrm>
             <a:off x="4758840" y="3366360"/>
-            <a:ext cx="908640" cy="908640"/>
+            <a:ext cx="908280" cy="908280"/>
           </a:xfrm>
           <a:prstGeom prst="rect">
             <a:avLst/>
@@ -10151,7 +10168,7 @@
         <p:spPr>
           <a:xfrm>
             <a:off x="3568680" y="3429000"/>
-            <a:ext cx="931680" cy="908640"/>
+            <a:ext cx="931320" cy="908280"/>
           </a:xfrm>
           <a:prstGeom prst="mathPlus">
             <a:avLst>
@@ -10189,7 +10206,7 @@
         <p:spPr>
           <a:xfrm>
             <a:off x="6095880" y="3654360"/>
-            <a:ext cx="732600" cy="560520"/>
+            <a:ext cx="732240" cy="560160"/>
           </a:xfrm>
           <a:prstGeom prst="mathEqual">
             <a:avLst>
@@ -10250,7 +10267,7 @@
         <p:spPr>
           <a:xfrm>
             <a:off x="4750920" y="2898360"/>
-            <a:ext cx="2684160" cy="3714120"/>
+            <a:ext cx="2683800" cy="3713760"/>
           </a:xfrm>
           <a:prstGeom prst="rect">
             <a:avLst/>
@@ -10293,7 +10310,7 @@
         <p:spPr>
           <a:xfrm>
             <a:off x="684360" y="4487400"/>
-            <a:ext cx="8528760" cy="1501200"/>
+            <a:ext cx="8528400" cy="1500840"/>
           </a:xfrm>
           <a:prstGeom prst="rect">
             <a:avLst/>
@@ -10342,7 +10359,7 @@
         <p:spPr>
           <a:xfrm>
             <a:off x="684360" y="685800"/>
-            <a:ext cx="8528760" cy="3609360"/>
+            <a:ext cx="8528400" cy="3609000"/>
           </a:xfrm>
           <a:prstGeom prst="rect">
             <a:avLst/>
@@ -10361,7 +10378,7 @@
         <p:txBody>
           <a:bodyPr lIns="90000" rIns="90000" tIns="45000" bIns="45000" anchor="ctr"/>
           <a:p>
-            <a:pPr marL="285840" indent="-280080">
+            <a:pPr marL="285840" indent="-279720">
               <a:lnSpc>
                 <a:spcPct val="100000"/>
               </a:lnSpc>
@@ -10497,7 +10514,7 @@
         <p:spPr>
           <a:xfrm>
             <a:off x="4843440" y="2989800"/>
-            <a:ext cx="636120" cy="636120"/>
+            <a:ext cx="635760" cy="635760"/>
           </a:xfrm>
           <a:prstGeom prst="rect">
             <a:avLst/>
@@ -10520,7 +10537,7 @@
         <p:spPr>
           <a:xfrm>
             <a:off x="5028120" y="4248360"/>
-            <a:ext cx="908640" cy="908640"/>
+            <a:ext cx="908280" cy="908280"/>
           </a:xfrm>
           <a:prstGeom prst="rect">
             <a:avLst/>
@@ -10543,7 +10560,7 @@
         <p:spPr>
           <a:xfrm>
             <a:off x="5506200" y="5025240"/>
-            <a:ext cx="908640" cy="908640"/>
+            <a:ext cx="908280" cy="908280"/>
           </a:xfrm>
           <a:prstGeom prst="rect">
             <a:avLst/>
@@ -10566,7 +10583,7 @@
         <p:spPr>
           <a:xfrm>
             <a:off x="6042600" y="4248360"/>
-            <a:ext cx="908640" cy="908640"/>
+            <a:ext cx="908280" cy="908280"/>
           </a:xfrm>
           <a:prstGeom prst="rect">
             <a:avLst/>
@@ -10589,7 +10606,7 @@
         <p:spPr>
           <a:xfrm>
             <a:off x="7944480" y="2602440"/>
-            <a:ext cx="908640" cy="908640"/>
+            <a:ext cx="908280" cy="908280"/>
           </a:xfrm>
           <a:prstGeom prst="rect">
             <a:avLst/>
@@ -10612,7 +10629,7 @@
         <p:spPr>
           <a:xfrm>
             <a:off x="6671160" y="3059640"/>
-            <a:ext cx="565920" cy="565920"/>
+            <a:ext cx="565560" cy="565560"/>
           </a:xfrm>
           <a:prstGeom prst="rect">
             <a:avLst/>
@@ -10635,7 +10652,7 @@
         <p:spPr>
           <a:xfrm>
             <a:off x="2973240" y="3863520"/>
-            <a:ext cx="908640" cy="908640"/>
+            <a:ext cx="908280" cy="908280"/>
           </a:xfrm>
           <a:prstGeom prst="rect">
             <a:avLst/>
@@ -10654,7 +10671,7 @@
         <p:spPr>
           <a:xfrm>
             <a:off x="4012560" y="4487400"/>
-            <a:ext cx="1487880" cy="851400"/>
+            <a:ext cx="1487520" cy="851040"/>
           </a:xfrm>
           <a:custGeom>
             <a:avLst/>
@@ -10706,7 +10723,7 @@
         <p:spPr>
           <a:xfrm>
             <a:off x="4012560" y="4248360"/>
-            <a:ext cx="2024280" cy="233280"/>
+            <a:ext cx="2023920" cy="232920"/>
           </a:xfrm>
           <a:custGeom>
             <a:avLst/>
@@ -10758,7 +10775,7 @@
         <p:spPr>
           <a:xfrm>
             <a:off x="4012560" y="4367880"/>
-            <a:ext cx="933120" cy="234000"/>
+            <a:ext cx="932760" cy="233640"/>
           </a:xfrm>
           <a:custGeom>
             <a:avLst/>
@@ -10809,8 +10826,8 @@
         </p:nvSpPr>
         <p:spPr>
           <a:xfrm flipV="1">
-            <a:off x="7242840" y="3216960"/>
-            <a:ext cx="623880" cy="117360"/>
+            <a:off x="7242840" y="3216240"/>
+            <a:ext cx="623520" cy="117000"/>
           </a:xfrm>
           <a:custGeom>
             <a:avLst/>
@@ -10885,7 +10902,7 @@
         <p:spPr>
           <a:xfrm>
             <a:off x="684360" y="4487400"/>
-            <a:ext cx="8528760" cy="1501200"/>
+            <a:ext cx="8528400" cy="1500840"/>
           </a:xfrm>
           <a:prstGeom prst="rect">
             <a:avLst/>
@@ -10934,7 +10951,7 @@
         <p:spPr>
           <a:xfrm>
             <a:off x="684360" y="685800"/>
-            <a:ext cx="8528760" cy="3609360"/>
+            <a:ext cx="8528400" cy="3609000"/>
           </a:xfrm>
           <a:prstGeom prst="rect">
             <a:avLst/>
@@ -10953,7 +10970,7 @@
         <p:txBody>
           <a:bodyPr lIns="90000" rIns="90000" tIns="45000" bIns="45000" anchor="ctr"/>
           <a:p>
-            <a:pPr marL="285840" indent="-280080">
+            <a:pPr marL="285840" indent="-279720">
               <a:lnSpc>
                 <a:spcPct val="100000"/>
               </a:lnSpc>
@@ -11121,7 +11138,7 @@
         <p:spPr>
           <a:xfrm>
             <a:off x="5430600" y="2730600"/>
-            <a:ext cx="2684160" cy="3714120"/>
+            <a:ext cx="2683800" cy="3713760"/>
           </a:xfrm>
           <a:prstGeom prst="rect">
             <a:avLst/>
@@ -11168,7 +11185,7 @@
         <p:spPr>
           <a:xfrm>
             <a:off x="5523120" y="2822040"/>
-            <a:ext cx="636120" cy="636120"/>
+            <a:ext cx="635760" cy="635760"/>
           </a:xfrm>
           <a:prstGeom prst="rect">
             <a:avLst/>
@@ -11191,7 +11208,7 @@
         <p:spPr>
           <a:xfrm>
             <a:off x="5707800" y="4080600"/>
-            <a:ext cx="908640" cy="908640"/>
+            <a:ext cx="908280" cy="908280"/>
           </a:xfrm>
           <a:prstGeom prst="rect">
             <a:avLst/>
@@ -11214,7 +11231,7 @@
         <p:spPr>
           <a:xfrm>
             <a:off x="6185880" y="4857480"/>
-            <a:ext cx="908640" cy="908640"/>
+            <a:ext cx="908280" cy="908280"/>
           </a:xfrm>
           <a:prstGeom prst="rect">
             <a:avLst/>
@@ -11237,7 +11254,7 @@
         <p:spPr>
           <a:xfrm>
             <a:off x="6722280" y="4080600"/>
-            <a:ext cx="908640" cy="908640"/>
+            <a:ext cx="908280" cy="908280"/>
           </a:xfrm>
           <a:prstGeom prst="rect">
             <a:avLst/>
@@ -11260,7 +11277,7 @@
         <p:spPr>
           <a:xfrm>
             <a:off x="3652920" y="3695760"/>
-            <a:ext cx="908640" cy="908640"/>
+            <a:ext cx="908280" cy="908280"/>
           </a:xfrm>
           <a:prstGeom prst="rect">
             <a:avLst/>
@@ -11279,7 +11296,7 @@
         <p:spPr>
           <a:xfrm>
             <a:off x="4692240" y="4319640"/>
-            <a:ext cx="1487880" cy="851400"/>
+            <a:ext cx="1487520" cy="851040"/>
           </a:xfrm>
           <a:custGeom>
             <a:avLst/>
@@ -11331,7 +11348,7 @@
         <p:spPr>
           <a:xfrm>
             <a:off x="4692240" y="4080600"/>
-            <a:ext cx="2024280" cy="233280"/>
+            <a:ext cx="2023920" cy="232920"/>
           </a:xfrm>
           <a:custGeom>
             <a:avLst/>
@@ -11383,7 +11400,7 @@
         <p:spPr>
           <a:xfrm>
             <a:off x="4692240" y="4200120"/>
-            <a:ext cx="933120" cy="234000"/>
+            <a:ext cx="932760" cy="233640"/>
           </a:xfrm>
           <a:custGeom>
             <a:avLst/>
@@ -11439,7 +11456,7 @@
         <p:spPr>
           <a:xfrm>
             <a:off x="9653760" y="3605400"/>
-            <a:ext cx="908640" cy="908640"/>
+            <a:ext cx="908280" cy="908280"/>
           </a:xfrm>
           <a:prstGeom prst="rect">
             <a:avLst/>
@@ -11457,8 +11474,8 @@
         </p:nvSpPr>
         <p:spPr>
           <a:xfrm rot="10325400">
-            <a:off x="7858440" y="4107960"/>
-            <a:ext cx="1780200" cy="302040"/>
+            <a:off x="7858440" y="4108320"/>
+            <a:ext cx="1779840" cy="301680"/>
           </a:xfrm>
           <a:prstGeom prst="rightArrow">
             <a:avLst>
@@ -11522,7 +11539,7 @@
         <p:spPr>
           <a:xfrm>
             <a:off x="684360" y="4487400"/>
-            <a:ext cx="8528760" cy="1501200"/>
+            <a:ext cx="8528400" cy="1500840"/>
           </a:xfrm>
           <a:prstGeom prst="rect">
             <a:avLst/>
@@ -11571,7 +11588,7 @@
         <p:spPr>
           <a:xfrm>
             <a:off x="684360" y="685800"/>
-            <a:ext cx="8528760" cy="3609360"/>
+            <a:ext cx="8528400" cy="3609000"/>
           </a:xfrm>
           <a:prstGeom prst="rect">
             <a:avLst/>
@@ -11601,7 +11618,7 @@
         <p:spPr>
           <a:xfrm>
             <a:off x="4069440" y="82800"/>
-            <a:ext cx="4040640" cy="2841120"/>
+            <a:ext cx="4040280" cy="2840760"/>
           </a:xfrm>
           <a:prstGeom prst="rect">
             <a:avLst/>
@@ -11624,7 +11641,7 @@
         <p:spPr>
           <a:xfrm>
             <a:off x="83880" y="3103560"/>
-            <a:ext cx="3861720" cy="1638720"/>
+            <a:ext cx="3861360" cy="1638360"/>
           </a:xfrm>
           <a:prstGeom prst="rect">
             <a:avLst/>
@@ -11647,7 +11664,7 @@
         <p:spPr>
           <a:xfrm>
             <a:off x="4161600" y="3103560"/>
-            <a:ext cx="3861720" cy="1638720"/>
+            <a:ext cx="3861360" cy="1638360"/>
           </a:xfrm>
           <a:prstGeom prst="rect">
             <a:avLst/>
@@ -11670,7 +11687,7 @@
         <p:spPr>
           <a:xfrm>
             <a:off x="8230320" y="3103560"/>
-            <a:ext cx="3861720" cy="1638720"/>
+            <a:ext cx="3861360" cy="1638360"/>
           </a:xfrm>
           <a:prstGeom prst="rect">
             <a:avLst/>
@@ -11689,7 +11706,7 @@
         <p:spPr>
           <a:xfrm>
             <a:off x="3993840" y="3766680"/>
-            <a:ext cx="145440" cy="313560"/>
+            <a:ext cx="145080" cy="313200"/>
           </a:xfrm>
           <a:prstGeom prst="rightArrow">
             <a:avLst>
@@ -11728,7 +11745,7 @@
         <p:spPr>
           <a:xfrm>
             <a:off x="8073360" y="3793320"/>
-            <a:ext cx="126360" cy="313560"/>
+            <a:ext cx="126000" cy="313200"/>
           </a:xfrm>
           <a:prstGeom prst="rightArrow">
             <a:avLst>
@@ -11767,7 +11784,7 @@
         <p:spPr>
           <a:xfrm>
             <a:off x="2701080" y="5176080"/>
-            <a:ext cx="1831320" cy="916920"/>
+            <a:ext cx="1830960" cy="916560"/>
           </a:xfrm>
           <a:prstGeom prst="wedgeRectCallout">
             <a:avLst>
@@ -11832,7 +11849,7 @@
         <p:spPr>
           <a:xfrm>
             <a:off x="6722640" y="5196600"/>
-            <a:ext cx="1962720" cy="820080"/>
+            <a:ext cx="1962360" cy="819720"/>
           </a:xfrm>
           <a:prstGeom prst="wedgeRectCallout">
             <a:avLst>
@@ -11897,7 +11914,7 @@
         <p:spPr>
           <a:xfrm>
             <a:off x="9731160" y="5131440"/>
-            <a:ext cx="2099880" cy="650880"/>
+            <a:ext cx="2099520" cy="650520"/>
           </a:xfrm>
           <a:prstGeom prst="wedgeRectCallout">
             <a:avLst>
@@ -11962,7 +11979,7 @@
         <p:spPr>
           <a:xfrm>
             <a:off x="5033520" y="2516760"/>
-            <a:ext cx="2569680" cy="359280"/>
+            <a:ext cx="2569320" cy="358920"/>
           </a:xfrm>
           <a:prstGeom prst="rect">
             <a:avLst/>
@@ -12010,8 +12027,8 @@
         </p:nvSpPr>
         <p:spPr>
           <a:xfrm rot="16200000">
-            <a:off x="3177360" y="1270800"/>
-            <a:ext cx="1958760" cy="359280"/>
+            <a:off x="3177360" y="1271160"/>
+            <a:ext cx="1958400" cy="358920"/>
           </a:xfrm>
           <a:prstGeom prst="rect">
             <a:avLst/>
@@ -12082,7 +12099,7 @@
         <p:spPr>
           <a:xfrm>
             <a:off x="684360" y="4487400"/>
-            <a:ext cx="8528760" cy="1501200"/>
+            <a:ext cx="8528400" cy="1500840"/>
           </a:xfrm>
           <a:prstGeom prst="rect">
             <a:avLst/>
@@ -12133,9 +12150,9 @@
         <p:grpSpPr>
           <a:xfrm>
             <a:off x="948240" y="823320"/>
-            <a:ext cx="10286640" cy="3333960"/>
+            <a:ext cx="10286280" cy="3333600"/>
             <a:chOff x="948240" y="823320"/>
-            <a:chExt cx="10286640" cy="3333960"/>
+            <a:chExt cx="10286280" cy="3333600"/>
           </a:xfrm>
         </p:grpSpPr>
         <p:sp>
@@ -12147,7 +12164,7 @@
           <p:spPr>
             <a:xfrm>
               <a:off x="948240" y="823320"/>
-              <a:ext cx="1356840" cy="1356840"/>
+              <a:ext cx="1356480" cy="1356480"/>
             </a:xfrm>
             <a:prstGeom prst="ellipse">
               <a:avLst/>
@@ -12180,7 +12197,7 @@
           <p:spPr>
             <a:xfrm>
               <a:off x="1234440" y="1109520"/>
-              <a:ext cx="784440" cy="784440"/>
+              <a:ext cx="784080" cy="784080"/>
             </a:xfrm>
             <a:prstGeom prst="rect">
               <a:avLst/>
@@ -12211,7 +12228,7 @@
           <p:spPr>
             <a:xfrm>
               <a:off x="2602800" y="823320"/>
-              <a:ext cx="3206160" cy="1356840"/>
+              <a:ext cx="3205800" cy="1356480"/>
             </a:xfrm>
             <a:prstGeom prst="rect">
               <a:avLst/>
@@ -12263,7 +12280,7 @@
           <p:spPr>
             <a:xfrm>
               <a:off x="6374160" y="823320"/>
-              <a:ext cx="1356840" cy="1356840"/>
+              <a:ext cx="1356480" cy="1356480"/>
             </a:xfrm>
             <a:prstGeom prst="ellipse">
               <a:avLst/>
@@ -12296,7 +12313,7 @@
           <p:spPr>
             <a:xfrm>
               <a:off x="6660360" y="1109520"/>
-              <a:ext cx="784440" cy="784440"/>
+              <a:ext cx="784080" cy="784080"/>
             </a:xfrm>
             <a:prstGeom prst="rect">
               <a:avLst/>
@@ -12327,7 +12344,7 @@
           <p:spPr>
             <a:xfrm>
               <a:off x="8028720" y="823320"/>
-              <a:ext cx="3206160" cy="1356840"/>
+              <a:ext cx="3205800" cy="1356480"/>
             </a:xfrm>
             <a:prstGeom prst="rect">
               <a:avLst/>
@@ -12379,7 +12396,7 @@
           <p:spPr>
             <a:xfrm>
               <a:off x="948240" y="2800440"/>
-              <a:ext cx="1356840" cy="1356840"/>
+              <a:ext cx="1356480" cy="1356480"/>
             </a:xfrm>
             <a:prstGeom prst="ellipse">
               <a:avLst/>
@@ -12412,7 +12429,7 @@
           <p:spPr>
             <a:xfrm>
               <a:off x="1234440" y="3086640"/>
-              <a:ext cx="784440" cy="784440"/>
+              <a:ext cx="784080" cy="784080"/>
             </a:xfrm>
             <a:prstGeom prst="rect">
               <a:avLst/>
@@ -12443,7 +12460,7 @@
           <p:spPr>
             <a:xfrm>
               <a:off x="2602800" y="2800440"/>
-              <a:ext cx="3206160" cy="1356840"/>
+              <a:ext cx="3205800" cy="1356480"/>
             </a:xfrm>
             <a:prstGeom prst="rect">
               <a:avLst/>
@@ -12495,7 +12512,7 @@
           <p:spPr>
             <a:xfrm>
               <a:off x="6374160" y="2800440"/>
-              <a:ext cx="1356840" cy="1356840"/>
+              <a:ext cx="1356480" cy="1356480"/>
             </a:xfrm>
             <a:prstGeom prst="ellipse">
               <a:avLst/>
@@ -12528,7 +12545,7 @@
           <p:spPr>
             <a:xfrm>
               <a:off x="6660360" y="3086640"/>
-              <a:ext cx="784440" cy="784440"/>
+              <a:ext cx="784080" cy="784080"/>
             </a:xfrm>
             <a:prstGeom prst="rect">
               <a:avLst/>
@@ -12559,7 +12576,7 @@
           <p:spPr>
             <a:xfrm>
               <a:off x="8028720" y="2800440"/>
-              <a:ext cx="3206160" cy="1356840"/>
+              <a:ext cx="3205800" cy="1356480"/>
             </a:xfrm>
             <a:prstGeom prst="rect">
               <a:avLst/>
@@ -12649,7 +12666,7 @@
         <p:spPr>
           <a:xfrm>
             <a:off x="0" y="0"/>
-            <a:ext cx="12186360" cy="6852240"/>
+            <a:ext cx="12186000" cy="6851880"/>
           </a:xfrm>
           <a:prstGeom prst="rect">
             <a:avLst/>
@@ -12702,7 +12719,7 @@
         <p:spPr>
           <a:xfrm>
             <a:off x="0" y="0"/>
-            <a:ext cx="8124120" cy="6852240"/>
+            <a:ext cx="8123760" cy="6851880"/>
           </a:xfrm>
           <a:prstGeom prst="snip2DiagRect">
             <a:avLst>
@@ -12924,7 +12941,7 @@
         <p:spPr>
           <a:xfrm>
             <a:off x="8588520" y="941400"/>
-            <a:ext cx="3038040" cy="3242880"/>
+            <a:ext cx="3037680" cy="3242520"/>
           </a:xfrm>
           <a:prstGeom prst="rect">
             <a:avLst/>
@@ -12975,9 +12992,9 @@
         <p:grpSpPr>
           <a:xfrm>
             <a:off x="952560" y="2104200"/>
-            <a:ext cx="6160680" cy="2437560"/>
+            <a:ext cx="6160320" cy="2437200"/>
             <a:chOff x="952560" y="2104200"/>
-            <a:chExt cx="6160680" cy="2437560"/>
+            <a:chExt cx="6160320" cy="2437200"/>
           </a:xfrm>
         </p:grpSpPr>
         <p:sp>
@@ -12989,7 +13006,7 @@
           <p:spPr>
             <a:xfrm>
               <a:off x="952560" y="2104200"/>
-              <a:ext cx="810720" cy="810720"/>
+              <a:ext cx="810360" cy="810360"/>
             </a:xfrm>
             <a:prstGeom prst="ellipse">
               <a:avLst/>
@@ -13022,7 +13039,7 @@
           <p:spPr>
             <a:xfrm>
               <a:off x="1123920" y="2275560"/>
-              <a:ext cx="467640" cy="467640"/>
+              <a:ext cx="467280" cy="467280"/>
             </a:xfrm>
             <a:prstGeom prst="rect">
               <a:avLst/>
@@ -13053,7 +13070,7 @@
           <p:spPr>
             <a:xfrm>
               <a:off x="1944000" y="2104200"/>
-              <a:ext cx="1918440" cy="810720"/>
+              <a:ext cx="1918080" cy="810360"/>
             </a:xfrm>
             <a:prstGeom prst="rect">
               <a:avLst/>
@@ -13105,7 +13122,7 @@
           <p:spPr>
             <a:xfrm>
               <a:off x="4203360" y="2104200"/>
-              <a:ext cx="810720" cy="810720"/>
+              <a:ext cx="810360" cy="810360"/>
             </a:xfrm>
             <a:prstGeom prst="ellipse">
               <a:avLst/>
@@ -13138,7 +13155,7 @@
           <p:spPr>
             <a:xfrm>
               <a:off x="4375080" y="2275560"/>
-              <a:ext cx="467640" cy="467640"/>
+              <a:ext cx="467280" cy="467280"/>
             </a:xfrm>
             <a:prstGeom prst="rect">
               <a:avLst/>
@@ -13169,7 +13186,7 @@
           <p:spPr>
             <a:xfrm>
               <a:off x="5194800" y="2104200"/>
-              <a:ext cx="1918440" cy="810720"/>
+              <a:ext cx="1918080" cy="810360"/>
             </a:xfrm>
             <a:prstGeom prst="rect">
               <a:avLst/>
@@ -13221,7 +13238,7 @@
           <p:spPr>
             <a:xfrm>
               <a:off x="952560" y="3731040"/>
-              <a:ext cx="810720" cy="810720"/>
+              <a:ext cx="810360" cy="810360"/>
             </a:xfrm>
             <a:prstGeom prst="ellipse">
               <a:avLst/>
@@ -13254,7 +13271,7 @@
           <p:spPr>
             <a:xfrm>
               <a:off x="1123920" y="3902400"/>
-              <a:ext cx="467640" cy="467640"/>
+              <a:ext cx="467280" cy="467280"/>
             </a:xfrm>
             <a:prstGeom prst="rect">
               <a:avLst/>
@@ -13285,7 +13302,7 @@
           <p:spPr>
             <a:xfrm>
               <a:off x="1944000" y="3731040"/>
-              <a:ext cx="1918440" cy="810720"/>
+              <a:ext cx="1918080" cy="810360"/>
             </a:xfrm>
             <a:prstGeom prst="rect">
               <a:avLst/>
@@ -13337,7 +13354,7 @@
           <p:spPr>
             <a:xfrm>
               <a:off x="4203360" y="3731040"/>
-              <a:ext cx="810720" cy="810720"/>
+              <a:ext cx="810360" cy="810360"/>
             </a:xfrm>
             <a:prstGeom prst="ellipse">
               <a:avLst/>
@@ -13370,7 +13387,7 @@
           <p:spPr>
             <a:xfrm>
               <a:off x="4375080" y="3902400"/>
-              <a:ext cx="467640" cy="467640"/>
+              <a:ext cx="467280" cy="467280"/>
             </a:xfrm>
             <a:prstGeom prst="rect">
               <a:avLst/>
@@ -13401,7 +13418,7 @@
           <p:spPr>
             <a:xfrm>
               <a:off x="5194800" y="3731040"/>
-              <a:ext cx="1918440" cy="810720"/>
+              <a:ext cx="1918080" cy="810360"/>
             </a:xfrm>
             <a:prstGeom prst="rect">
               <a:avLst/>
@@ -13518,7 +13535,7 @@
         <p:spPr>
           <a:xfrm>
             <a:off x="684360" y="4487400"/>
-            <a:ext cx="8528760" cy="1501200"/>
+            <a:ext cx="8528400" cy="1500840"/>
           </a:xfrm>
           <a:prstGeom prst="rect">
             <a:avLst/>
@@ -13567,7 +13584,7 @@
         <p:spPr>
           <a:xfrm>
             <a:off x="684360" y="685800"/>
-            <a:ext cx="8528760" cy="3609360"/>
+            <a:ext cx="8528400" cy="3609000"/>
           </a:xfrm>
           <a:prstGeom prst="rect">
             <a:avLst/>
@@ -13586,7 +13603,7 @@
         <p:txBody>
           <a:bodyPr lIns="90000" rIns="90000" tIns="45000" bIns="45000" anchor="ctr"/>
           <a:p>
-            <a:pPr marL="285840" indent="-280080">
+            <a:pPr marL="285840" indent="-279720">
               <a:lnSpc>
                 <a:spcPct val="100000"/>
               </a:lnSpc>
@@ -13618,7 +13635,7 @@
             </a:endParaRPr>
           </a:p>
           <a:p>
-            <a:pPr marL="285840" indent="-280080">
+            <a:pPr marL="285840" indent="-279720">
               <a:lnSpc>
                 <a:spcPct val="100000"/>
               </a:lnSpc>
@@ -13650,7 +13667,7 @@
             </a:endParaRPr>
           </a:p>
           <a:p>
-            <a:pPr marL="285840" indent="-280080">
+            <a:pPr marL="285840" indent="-279720">
               <a:lnSpc>
                 <a:spcPct val="100000"/>
               </a:lnSpc>
@@ -13682,7 +13699,7 @@
             </a:endParaRPr>
           </a:p>
           <a:p>
-            <a:pPr marL="285840" indent="-280080">
+            <a:pPr marL="285840" indent="-279720">
               <a:lnSpc>
                 <a:spcPct val="100000"/>
               </a:lnSpc>
@@ -13746,7 +13763,7 @@
         <p:spPr>
           <a:xfrm>
             <a:off x="684360" y="4487400"/>
-            <a:ext cx="8528760" cy="1501200"/>
+            <a:ext cx="8528400" cy="1500840"/>
           </a:xfrm>
           <a:prstGeom prst="rect">
             <a:avLst/>
@@ -13799,7 +13816,7 @@
         <p:spPr>
           <a:xfrm>
             <a:off x="5221440" y="75600"/>
-            <a:ext cx="908640" cy="908640"/>
+            <a:ext cx="908280" cy="908280"/>
           </a:xfrm>
           <a:prstGeom prst="rect">
             <a:avLst/>
@@ -13822,7 +13839,7 @@
         <p:spPr>
           <a:xfrm>
             <a:off x="4695120" y="4444560"/>
-            <a:ext cx="908640" cy="908640"/>
+            <a:ext cx="908280" cy="908280"/>
           </a:xfrm>
           <a:prstGeom prst="rect">
             <a:avLst/>
@@ -13845,7 +13862,7 @@
         <p:spPr>
           <a:xfrm>
             <a:off x="2603880" y="2294640"/>
-            <a:ext cx="908640" cy="908640"/>
+            <a:ext cx="908280" cy="908280"/>
           </a:xfrm>
           <a:prstGeom prst="rect">
             <a:avLst/>
@@ -13868,7 +13885,7 @@
         <p:spPr>
           <a:xfrm>
             <a:off x="9767160" y="3294360"/>
-            <a:ext cx="908640" cy="908640"/>
+            <a:ext cx="908280" cy="908280"/>
           </a:xfrm>
           <a:prstGeom prst="rect">
             <a:avLst/>
@@ -13891,7 +13908,7 @@
         <p:spPr>
           <a:xfrm>
             <a:off x="1967760" y="3811680"/>
-            <a:ext cx="908640" cy="908640"/>
+            <a:ext cx="908280" cy="908280"/>
           </a:xfrm>
           <a:prstGeom prst="rect">
             <a:avLst/>
@@ -13914,7 +13931,7 @@
         <p:spPr>
           <a:xfrm>
             <a:off x="5221440" y="2907360"/>
-            <a:ext cx="908640" cy="908640"/>
+            <a:ext cx="908280" cy="908280"/>
           </a:xfrm>
           <a:prstGeom prst="rect">
             <a:avLst/>
@@ -13937,7 +13954,7 @@
         <p:spPr>
           <a:xfrm>
             <a:off x="1093680" y="3282480"/>
-            <a:ext cx="908640" cy="908640"/>
+            <a:ext cx="908280" cy="908280"/>
           </a:xfrm>
           <a:prstGeom prst="rect">
             <a:avLst/>
@@ -13960,7 +13977,7 @@
         <p:spPr>
           <a:xfrm>
             <a:off x="8595360" y="3808800"/>
-            <a:ext cx="908640" cy="908640"/>
+            <a:ext cx="908280" cy="908280"/>
           </a:xfrm>
           <a:prstGeom prst="rect">
             <a:avLst/>
@@ -13983,7 +14000,7 @@
         <p:spPr>
           <a:xfrm>
             <a:off x="7839000" y="2294640"/>
-            <a:ext cx="908640" cy="908640"/>
+            <a:ext cx="908280" cy="908280"/>
           </a:xfrm>
           <a:prstGeom prst="rect">
             <a:avLst/>
@@ -14002,7 +14019,7 @@
         <p:spPr>
           <a:xfrm>
             <a:off x="6312960" y="944640"/>
-            <a:ext cx="1520640" cy="1334520"/>
+            <a:ext cx="1520280" cy="1334160"/>
           </a:xfrm>
           <a:custGeom>
             <a:avLst/>
@@ -14055,7 +14072,7 @@
         <p:spPr>
           <a:xfrm>
             <a:off x="5678640" y="1145160"/>
-            <a:ext cx="360" cy="1600920"/>
+            <a:ext cx="360" cy="1600560"/>
           </a:xfrm>
           <a:custGeom>
             <a:avLst/>
@@ -14107,8 +14124,8 @@
         </p:nvSpPr>
         <p:spPr>
           <a:xfrm flipH="1">
-            <a:off x="3421080" y="990000"/>
-            <a:ext cx="1612080" cy="1374840"/>
+            <a:off x="3420360" y="990000"/>
+            <a:ext cx="1611720" cy="1374480"/>
           </a:xfrm>
           <a:custGeom>
             <a:avLst/>
@@ -14161,7 +14178,7 @@
         <p:spPr>
           <a:xfrm>
             <a:off x="2082960" y="3279600"/>
-            <a:ext cx="911880" cy="359280"/>
+            <a:ext cx="911520" cy="358920"/>
           </a:xfrm>
           <a:prstGeom prst="rect">
             <a:avLst/>
@@ -14210,7 +14227,7 @@
         <p:spPr>
           <a:xfrm>
             <a:off x="5227200" y="4030200"/>
-            <a:ext cx="924120" cy="359280"/>
+            <a:ext cx="923760" cy="358920"/>
           </a:xfrm>
           <a:prstGeom prst="rect">
             <a:avLst/>
@@ -14259,7 +14276,7 @@
         <p:spPr>
           <a:xfrm>
             <a:off x="8246520" y="3279600"/>
-            <a:ext cx="1250280" cy="359280"/>
+            <a:ext cx="1249920" cy="358920"/>
           </a:xfrm>
           <a:prstGeom prst="rect">
             <a:avLst/>
@@ -14308,7 +14325,7 @@
         <p:spPr>
           <a:xfrm>
             <a:off x="481680" y="348120"/>
-            <a:ext cx="1806480" cy="359280"/>
+            <a:ext cx="1806120" cy="358920"/>
           </a:xfrm>
           <a:prstGeom prst="rect">
             <a:avLst/>
@@ -14361,7 +14378,7 @@
         <p:spPr>
           <a:xfrm>
             <a:off x="5855760" y="4444560"/>
-            <a:ext cx="908640" cy="908640"/>
+            <a:ext cx="908280" cy="908280"/>
           </a:xfrm>
           <a:prstGeom prst="rect">
             <a:avLst/>
@@ -14402,7 +14419,7 @@
         <p:spPr>
           <a:xfrm>
             <a:off x="684360" y="4487400"/>
-            <a:ext cx="8528760" cy="1501200"/>
+            <a:ext cx="8528400" cy="1500840"/>
           </a:xfrm>
           <a:prstGeom prst="rect">
             <a:avLst/>
@@ -14455,7 +14472,7 @@
         <p:spPr>
           <a:xfrm>
             <a:off x="7839000" y="2560320"/>
-            <a:ext cx="1308600" cy="594360"/>
+            <a:ext cx="1308240" cy="594000"/>
           </a:xfrm>
           <a:prstGeom prst="rect">
             <a:avLst/>
@@ -14474,7 +14491,7 @@
         <p:spPr>
           <a:xfrm>
             <a:off x="480240" y="348120"/>
-            <a:ext cx="1786680" cy="359280"/>
+            <a:ext cx="1786320" cy="358920"/>
           </a:xfrm>
           <a:prstGeom prst="rect">
             <a:avLst/>
@@ -14523,7 +14540,7 @@
         <p:spPr>
           <a:xfrm>
             <a:off x="6384240" y="990000"/>
-            <a:ext cx="1520640" cy="1334520"/>
+            <a:ext cx="1520280" cy="1334160"/>
           </a:xfrm>
           <a:custGeom>
             <a:avLst/>
@@ -14576,7 +14593,7 @@
         <p:spPr>
           <a:xfrm>
             <a:off x="5678640" y="1145160"/>
-            <a:ext cx="360" cy="1600920"/>
+            <a:ext cx="360" cy="1600560"/>
           </a:xfrm>
           <a:custGeom>
             <a:avLst/>
@@ -14628,8 +14645,8 @@
         </p:nvSpPr>
         <p:spPr>
           <a:xfrm flipH="1">
-            <a:off x="3421080" y="990000"/>
-            <a:ext cx="1612080" cy="1374840"/>
+            <a:off x="3420360" y="990000"/>
+            <a:ext cx="1611720" cy="1374480"/>
           </a:xfrm>
           <a:custGeom>
             <a:avLst/>
@@ -14682,7 +14699,7 @@
         <p:spPr>
           <a:xfrm>
             <a:off x="2082960" y="3279600"/>
-            <a:ext cx="911880" cy="359280"/>
+            <a:ext cx="911520" cy="358920"/>
           </a:xfrm>
           <a:prstGeom prst="rect">
             <a:avLst/>
@@ -14731,7 +14748,7 @@
         <p:spPr>
           <a:xfrm>
             <a:off x="5227200" y="4030200"/>
-            <a:ext cx="924120" cy="359280"/>
+            <a:ext cx="923760" cy="358920"/>
           </a:xfrm>
           <a:prstGeom prst="rect">
             <a:avLst/>
@@ -14780,7 +14797,7 @@
         <p:spPr>
           <a:xfrm>
             <a:off x="8246520" y="3279600"/>
-            <a:ext cx="1250280" cy="359280"/>
+            <a:ext cx="1249920" cy="358920"/>
           </a:xfrm>
           <a:prstGeom prst="rect">
             <a:avLst/>
@@ -14833,7 +14850,7 @@
         <p:spPr>
           <a:xfrm>
             <a:off x="4979520" y="218880"/>
-            <a:ext cx="1327680" cy="613440"/>
+            <a:ext cx="1327320" cy="613080"/>
           </a:xfrm>
           <a:prstGeom prst="rect">
             <a:avLst/>
@@ -14856,7 +14873,7 @@
         <p:spPr>
           <a:xfrm>
             <a:off x="2102760" y="2514600"/>
-            <a:ext cx="1318320" cy="603720"/>
+            <a:ext cx="1317960" cy="603360"/>
           </a:xfrm>
           <a:prstGeom prst="rect">
             <a:avLst/>
@@ -14879,7 +14896,7 @@
         <p:spPr>
           <a:xfrm>
             <a:off x="4235760" y="3279600"/>
-            <a:ext cx="1308600" cy="594360"/>
+            <a:ext cx="1308240" cy="594000"/>
           </a:xfrm>
           <a:prstGeom prst="rect">
             <a:avLst/>
@@ -14902,7 +14919,7 @@
         <p:spPr>
           <a:xfrm>
             <a:off x="5833080" y="3279600"/>
-            <a:ext cx="1308600" cy="594360"/>
+            <a:ext cx="1308240" cy="594000"/>
           </a:xfrm>
           <a:prstGeom prst="rect">
             <a:avLst/>
@@ -14943,7 +14960,7 @@
         <p:spPr>
           <a:xfrm>
             <a:off x="684360" y="4487400"/>
-            <a:ext cx="8528760" cy="1501200"/>
+            <a:ext cx="8528400" cy="1500840"/>
           </a:xfrm>
           <a:prstGeom prst="rect">
             <a:avLst/>
@@ -14992,7 +15009,7 @@
         <p:spPr>
           <a:xfrm>
             <a:off x="684360" y="685800"/>
-            <a:ext cx="8528760" cy="3609360"/>
+            <a:ext cx="8528400" cy="3609000"/>
           </a:xfrm>
           <a:prstGeom prst="rect">
             <a:avLst/>
@@ -15011,7 +15028,7 @@
         <p:txBody>
           <a:bodyPr lIns="90000" rIns="90000" tIns="45000" bIns="45000" anchor="ctr"/>
           <a:p>
-            <a:pPr marL="285840" indent="-280080">
+            <a:pPr marL="285840" indent="-279720">
               <a:lnSpc>
                 <a:spcPct val="100000"/>
               </a:lnSpc>
@@ -15087,7 +15104,7 @@
         <p:spPr>
           <a:xfrm>
             <a:off x="666000" y="2574360"/>
-            <a:ext cx="4804920" cy="2968200"/>
+            <a:ext cx="4804560" cy="2967840"/>
           </a:xfrm>
           <a:prstGeom prst="roundRect">
             <a:avLst>
@@ -15237,7 +15254,7 @@
         <p:spPr>
           <a:xfrm>
             <a:off x="684360" y="5241960"/>
-            <a:ext cx="8528760" cy="1501200"/>
+            <a:ext cx="8528400" cy="1500840"/>
           </a:xfrm>
           <a:prstGeom prst="rect">
             <a:avLst/>
@@ -15286,7 +15303,7 @@
         <p:spPr>
           <a:xfrm>
             <a:off x="684360" y="685800"/>
-            <a:ext cx="10984320" cy="2282400"/>
+            <a:ext cx="10983960" cy="2282040"/>
           </a:xfrm>
           <a:prstGeom prst="rect">
             <a:avLst/>
@@ -15307,7 +15324,7 @@
             <a:normAutofit/>
           </a:bodyPr>
           <a:p>
-            <a:pPr marL="285840" indent="-280080">
+            <a:pPr marL="285840" indent="-279720">
               <a:lnSpc>
                 <a:spcPct val="100000"/>
               </a:lnSpc>
@@ -15389,7 +15406,7 @@
             </a:endParaRPr>
           </a:p>
           <a:p>
-            <a:pPr marL="285840" indent="-280080">
+            <a:pPr marL="285840" indent="-279720">
               <a:lnSpc>
                 <a:spcPct val="100000"/>
               </a:lnSpc>
@@ -15513,7 +15530,7 @@
         <p:spPr>
           <a:xfrm>
             <a:off x="2523960" y="3718800"/>
-            <a:ext cx="722520" cy="717480"/>
+            <a:ext cx="722160" cy="717120"/>
           </a:xfrm>
           <a:prstGeom prst="ellipse">
             <a:avLst/>
@@ -15581,7 +15598,7 @@
         <p:spPr>
           <a:xfrm>
             <a:off x="3363480" y="3303360"/>
-            <a:ext cx="1211760" cy="401400"/>
+            <a:ext cx="1211400" cy="401040"/>
           </a:xfrm>
           <a:prstGeom prst="ellipse">
             <a:avLst/>
@@ -15649,7 +15666,7 @@
         <p:spPr>
           <a:xfrm>
             <a:off x="744120" y="3208680"/>
-            <a:ext cx="1585080" cy="669600"/>
+            <a:ext cx="1584720" cy="669240"/>
           </a:xfrm>
           <a:prstGeom prst="ellipse">
             <a:avLst/>
@@ -15717,7 +15734,7 @@
         <p:spPr>
           <a:xfrm>
             <a:off x="2119680" y="4628880"/>
-            <a:ext cx="1524240" cy="669600"/>
+            <a:ext cx="1523880" cy="669240"/>
           </a:xfrm>
           <a:prstGeom prst="ellipse">
             <a:avLst/>
@@ -15785,7 +15802,7 @@
         <p:spPr>
           <a:xfrm>
             <a:off x="6819480" y="2574360"/>
-            <a:ext cx="4804920" cy="2968200"/>
+            <a:ext cx="4804560" cy="2967840"/>
           </a:xfrm>
           <a:prstGeom prst="roundRect">
             <a:avLst>
@@ -15935,7 +15952,7 @@
         <p:spPr>
           <a:xfrm>
             <a:off x="7103880" y="4147560"/>
-            <a:ext cx="4373280" cy="853560"/>
+            <a:ext cx="4372920" cy="853200"/>
           </a:xfrm>
           <a:prstGeom prst="ellipse">
             <a:avLst/>
@@ -16003,7 +16020,7 @@
         <p:spPr>
           <a:xfrm>
             <a:off x="9898200" y="3332520"/>
-            <a:ext cx="1211760" cy="401400"/>
+            <a:ext cx="1211400" cy="401040"/>
           </a:xfrm>
           <a:prstGeom prst="ellipse">
             <a:avLst/>
@@ -16071,7 +16088,7 @@
         <p:spPr>
           <a:xfrm>
             <a:off x="6965640" y="3288960"/>
-            <a:ext cx="1585080" cy="669600"/>
+            <a:ext cx="1584720" cy="669240"/>
           </a:xfrm>
           <a:prstGeom prst="ellipse">
             <a:avLst/>
@@ -16139,7 +16156,7 @@
         <p:spPr>
           <a:xfrm>
             <a:off x="8287920" y="2688120"/>
-            <a:ext cx="1868040" cy="669600"/>
+            <a:ext cx="1867680" cy="669240"/>
           </a:xfrm>
           <a:prstGeom prst="ellipse">
             <a:avLst/>
@@ -16256,7 +16273,7 @@
         <p:spPr>
           <a:xfrm>
             <a:off x="684360" y="4487400"/>
-            <a:ext cx="8528760" cy="1501200"/>
+            <a:ext cx="8528400" cy="1500840"/>
           </a:xfrm>
           <a:prstGeom prst="rect">
             <a:avLst/>
@@ -16305,7 +16322,7 @@
         <p:spPr>
           <a:xfrm>
             <a:off x="684360" y="685800"/>
-            <a:ext cx="11356920" cy="3609360"/>
+            <a:ext cx="11356560" cy="3609000"/>
           </a:xfrm>
           <a:prstGeom prst="rect">
             <a:avLst/>
@@ -16326,7 +16343,7 @@
             <a:normAutofit/>
           </a:bodyPr>
           <a:p>
-            <a:pPr marL="285840" indent="-280080">
+            <a:pPr marL="285840" indent="-279720">
               <a:lnSpc>
                 <a:spcPct val="100000"/>
               </a:lnSpc>
@@ -16368,7 +16385,7 @@
             </a:endParaRPr>
           </a:p>
           <a:p>
-            <a:pPr marL="285840" indent="-280080">
+            <a:pPr marL="285840" indent="-279720">
               <a:lnSpc>
                 <a:spcPct val="100000"/>
               </a:lnSpc>
@@ -16558,7 +16575,7 @@
             </a:endParaRPr>
           </a:p>
           <a:p>
-            <a:pPr marL="285840" indent="-280080">
+            <a:pPr marL="285840" indent="-279720">
               <a:lnSpc>
                 <a:spcPct val="100000"/>
               </a:lnSpc>
@@ -16590,7 +16607,7 @@
             </a:endParaRPr>
           </a:p>
           <a:p>
-            <a:pPr marL="285840" indent="-280080">
+            <a:pPr marL="285840" indent="-279720">
               <a:lnSpc>
                 <a:spcPct val="100000"/>
               </a:lnSpc>
@@ -16681,7 +16698,7 @@
         <p:spPr>
           <a:xfrm>
             <a:off x="684360" y="4487400"/>
-            <a:ext cx="8528760" cy="1501200"/>
+            <a:ext cx="8528400" cy="1500840"/>
           </a:xfrm>
           <a:prstGeom prst="rect">
             <a:avLst/>
@@ -16730,7 +16747,7 @@
         <p:spPr>
           <a:xfrm>
             <a:off x="684360" y="685800"/>
-            <a:ext cx="8528760" cy="3609360"/>
+            <a:ext cx="8528400" cy="3609000"/>
           </a:xfrm>
           <a:prstGeom prst="rect">
             <a:avLst/>
@@ -16749,7 +16766,7 @@
         <p:txBody>
           <a:bodyPr lIns="90000" rIns="90000" tIns="45000" bIns="45000" anchor="ctr"/>
           <a:p>
-            <a:pPr marL="285840" indent="-280080">
+            <a:pPr marL="285840" indent="-279720">
               <a:lnSpc>
                 <a:spcPct val="100000"/>
               </a:lnSpc>
@@ -16851,7 +16868,7 @@
             </a:endParaRPr>
           </a:p>
           <a:p>
-            <a:pPr marL="285840" indent="-280080">
+            <a:pPr marL="285840" indent="-279720">
               <a:lnSpc>
                 <a:spcPct val="100000"/>
               </a:lnSpc>
@@ -16953,7 +16970,7 @@
         <p:spPr>
           <a:xfrm>
             <a:off x="2521440" y="3979080"/>
-            <a:ext cx="1876320" cy="802080"/>
+            <a:ext cx="1875960" cy="801720"/>
           </a:xfrm>
           <a:prstGeom prst="rect">
             <a:avLst/>
@@ -17019,7 +17036,7 @@
         <p:spPr>
           <a:xfrm>
             <a:off x="5487840" y="3979080"/>
-            <a:ext cx="1876320" cy="802080"/>
+            <a:ext cx="1875960" cy="801720"/>
           </a:xfrm>
           <a:prstGeom prst="rect">
             <a:avLst/>
@@ -17085,7 +17102,7 @@
         <p:spPr>
           <a:xfrm>
             <a:off x="4004640" y="2771640"/>
-            <a:ext cx="1876320" cy="802080"/>
+            <a:ext cx="1875960" cy="801720"/>
           </a:xfrm>
           <a:prstGeom prst="rect">
             <a:avLst/>
@@ -17151,7 +17168,7 @@
         <p:spPr>
           <a:xfrm>
             <a:off x="4483080" y="4383000"/>
-            <a:ext cx="999000" cy="360"/>
+            <a:ext cx="998640" cy="360"/>
           </a:xfrm>
           <a:custGeom>
             <a:avLst/>
@@ -17203,7 +17220,7 @@
         <p:spPr>
           <a:xfrm>
             <a:off x="4985640" y="3657600"/>
-            <a:ext cx="360" cy="573840"/>
+            <a:ext cx="360" cy="573480"/>
           </a:xfrm>
           <a:custGeom>
             <a:avLst/>
@@ -17304,7 +17321,7 @@
         <p:spPr>
           <a:xfrm>
             <a:off x="0" y="0"/>
-            <a:ext cx="12186360" cy="6852240"/>
+            <a:ext cx="12186000" cy="6851880"/>
           </a:xfrm>
           <a:prstGeom prst="rect">
             <a:avLst/>
@@ -17357,7 +17374,7 @@
         <p:spPr>
           <a:xfrm>
             <a:off x="640440" y="685800"/>
-            <a:ext cx="4812840" cy="4597920"/>
+            <a:ext cx="4812480" cy="4597560"/>
           </a:xfrm>
           <a:prstGeom prst="rect">
             <a:avLst/>
@@ -17408,7 +17425,7 @@
         <p:spPr>
           <a:xfrm>
             <a:off x="6095880" y="0"/>
-            <a:ext cx="6090120" cy="6852240"/>
+            <a:ext cx="6089760" cy="6851880"/>
           </a:xfrm>
           <a:prstGeom prst="rect">
             <a:avLst/>
@@ -17446,7 +17463,7 @@
         <p:spPr>
           <a:xfrm>
             <a:off x="6625800" y="685800"/>
-            <a:ext cx="4873320" cy="4597920"/>
+            <a:ext cx="4872960" cy="4597560"/>
           </a:xfrm>
           <a:prstGeom prst="rect">
             <a:avLst/>
@@ -17467,7 +17484,7 @@
             <a:normAutofit/>
           </a:bodyPr>
           <a:p>
-            <a:pPr marL="285840" indent="-280080">
+            <a:pPr marL="285840" indent="-279720">
               <a:lnSpc>
                 <a:spcPct val="100000"/>
               </a:lnSpc>
@@ -17499,7 +17516,7 @@
             </a:endParaRPr>
           </a:p>
           <a:p>
-            <a:pPr marL="285840" indent="-280080">
+            <a:pPr marL="285840" indent="-279720">
               <a:lnSpc>
                 <a:spcPct val="100000"/>
               </a:lnSpc>
@@ -17531,7 +17548,7 @@
             </a:endParaRPr>
           </a:p>
           <a:p>
-            <a:pPr marL="285840" indent="-280080">
+            <a:pPr marL="285840" indent="-279720">
               <a:lnSpc>
                 <a:spcPct val="100000"/>
               </a:lnSpc>
@@ -17563,7 +17580,7 @@
             </a:endParaRPr>
           </a:p>
           <a:p>
-            <a:pPr marL="285840" indent="-280080">
+            <a:pPr marL="285840" indent="-279720">
               <a:lnSpc>
                 <a:spcPct val="100000"/>
               </a:lnSpc>
@@ -17654,7 +17671,7 @@
         <p:spPr>
           <a:xfrm>
             <a:off x="684360" y="4487400"/>
-            <a:ext cx="8528760" cy="1501200"/>
+            <a:ext cx="8528400" cy="1500840"/>
           </a:xfrm>
           <a:prstGeom prst="rect">
             <a:avLst/>
@@ -17703,7 +17720,7 @@
         <p:spPr>
           <a:xfrm>
             <a:off x="1044720" y="500040"/>
-            <a:ext cx="8258400" cy="3227040"/>
+            <a:ext cx="8258040" cy="3226680"/>
           </a:xfrm>
           <a:prstGeom prst="rect">
             <a:avLst/>
@@ -17722,7 +17739,7 @@
         <p:txBody>
           <a:bodyPr lIns="90000" rIns="90000" tIns="45000" bIns="45000" anchor="ctr"/>
           <a:p>
-            <a:pPr marL="285840" indent="-280080">
+            <a:pPr marL="285840" indent="-279720">
               <a:lnSpc>
                 <a:spcPct val="100000"/>
               </a:lnSpc>
@@ -17764,7 +17781,7 @@
             </a:endParaRPr>
           </a:p>
           <a:p>
-            <a:pPr marL="285840" indent="-280080">
+            <a:pPr marL="285840" indent="-279720">
               <a:lnSpc>
                 <a:spcPct val="100000"/>
               </a:lnSpc>
@@ -17816,7 +17833,7 @@
             </a:endParaRPr>
           </a:p>
           <a:p>
-            <a:pPr marL="285840" indent="-280080">
+            <a:pPr marL="285840" indent="-279720">
               <a:lnSpc>
                 <a:spcPct val="100000"/>
               </a:lnSpc>
@@ -17968,7 +17985,7 @@
         <p:spPr>
           <a:xfrm>
             <a:off x="7097760" y="1943280"/>
-            <a:ext cx="848880" cy="848880"/>
+            <a:ext cx="848520" cy="848520"/>
           </a:xfrm>
           <a:prstGeom prst="rect">
             <a:avLst/>
@@ -17991,7 +18008,7 @@
         <p:spPr>
           <a:xfrm>
             <a:off x="6931800" y="4296600"/>
-            <a:ext cx="1175400" cy="467640"/>
+            <a:ext cx="1175040" cy="467280"/>
           </a:xfrm>
           <a:prstGeom prst="rect">
             <a:avLst/>
@@ -18014,7 +18031,7 @@
         <p:spPr>
           <a:xfrm>
             <a:off x="7054200" y="2896920"/>
-            <a:ext cx="892440" cy="1034640"/>
+            <a:ext cx="892080" cy="1034280"/>
           </a:xfrm>
           <a:prstGeom prst="rect">
             <a:avLst/>
@@ -18037,7 +18054,7 @@
         <p:spPr>
           <a:xfrm>
             <a:off x="2718360" y="2064960"/>
-            <a:ext cx="908640" cy="908640"/>
+            <a:ext cx="908280" cy="908280"/>
           </a:xfrm>
           <a:prstGeom prst="rect">
             <a:avLst/>
@@ -18060,7 +18077,7 @@
         <p:spPr>
           <a:xfrm>
             <a:off x="2739240" y="3371040"/>
-            <a:ext cx="908640" cy="908640"/>
+            <a:ext cx="908280" cy="908280"/>
           </a:xfrm>
           <a:prstGeom prst="rect">
             <a:avLst/>
@@ -18083,7 +18100,7 @@
         <p:spPr>
           <a:xfrm>
             <a:off x="4908600" y="2852280"/>
-            <a:ext cx="908640" cy="908640"/>
+            <a:ext cx="908280" cy="908280"/>
           </a:xfrm>
           <a:prstGeom prst="rect">
             <a:avLst/>
@@ -18101,8 +18118,8 @@
         </p:nvSpPr>
         <p:spPr>
           <a:xfrm rot="1192200">
-            <a:off x="4046040" y="2670120"/>
-            <a:ext cx="972720" cy="478800"/>
+            <a:off x="4045680" y="2669760"/>
+            <a:ext cx="972360" cy="478440"/>
           </a:xfrm>
           <a:prstGeom prst="rightArrow">
             <a:avLst>
@@ -18143,8 +18160,8 @@
         </p:nvSpPr>
         <p:spPr>
           <a:xfrm rot="20407800">
-            <a:off x="4024080" y="3458880"/>
-            <a:ext cx="972720" cy="478800"/>
+            <a:off x="4023720" y="3458880"/>
+            <a:ext cx="972360" cy="478440"/>
           </a:xfrm>
           <a:prstGeom prst="rightArrow">
             <a:avLst>
@@ -18185,8 +18202,8 @@
         </p:nvSpPr>
         <p:spPr>
           <a:xfrm rot="1192200">
-            <a:off x="5799600" y="3778560"/>
-            <a:ext cx="972720" cy="478800"/>
+            <a:off x="5799240" y="3778200"/>
+            <a:ext cx="972360" cy="478440"/>
           </a:xfrm>
           <a:prstGeom prst="rightArrow">
             <a:avLst>
@@ -18227,8 +18244,8 @@
         </p:nvSpPr>
         <p:spPr>
           <a:xfrm rot="20407800">
-            <a:off x="5872320" y="2454480"/>
-            <a:ext cx="972720" cy="478800"/>
+            <a:off x="5871960" y="2454480"/>
+            <a:ext cx="972360" cy="478440"/>
           </a:xfrm>
           <a:prstGeom prst="rightArrow">
             <a:avLst>
@@ -18270,7 +18287,7 @@
         <p:spPr>
           <a:xfrm>
             <a:off x="5951880" y="3115440"/>
-            <a:ext cx="972720" cy="478800"/>
+            <a:ext cx="972360" cy="478440"/>
           </a:xfrm>
           <a:prstGeom prst="rightArrow">
             <a:avLst>
@@ -18361,7 +18378,7 @@
         <p:spPr>
           <a:xfrm>
             <a:off x="684360" y="4487400"/>
-            <a:ext cx="8528760" cy="1501200"/>
+            <a:ext cx="8528400" cy="1500840"/>
           </a:xfrm>
           <a:prstGeom prst="rect">
             <a:avLst/>
@@ -18410,7 +18427,7 @@
         <p:spPr>
           <a:xfrm>
             <a:off x="684360" y="685800"/>
-            <a:ext cx="8528760" cy="3609360"/>
+            <a:ext cx="8528400" cy="3609000"/>
           </a:xfrm>
           <a:prstGeom prst="rect">
             <a:avLst/>
@@ -18429,7 +18446,7 @@
         <p:txBody>
           <a:bodyPr lIns="90000" rIns="90000" tIns="45000" bIns="45000" anchor="ctr"/>
           <a:p>
-            <a:pPr marL="285840" indent="-280080">
+            <a:pPr marL="285840" indent="-279720">
               <a:lnSpc>
                 <a:spcPct val="100000"/>
               </a:lnSpc>
@@ -18521,7 +18538,7 @@
             </a:endParaRPr>
           </a:p>
           <a:p>
-            <a:pPr marL="285840" indent="-280080">
+            <a:pPr marL="285840" indent="-279720">
               <a:lnSpc>
                 <a:spcPct val="100000"/>
               </a:lnSpc>
@@ -18573,7 +18590,7 @@
             </a:endParaRPr>
           </a:p>
           <a:p>
-            <a:pPr marL="285840" indent="-280080">
+            <a:pPr marL="285840" indent="-279720">
               <a:lnSpc>
                 <a:spcPct val="100000"/>
               </a:lnSpc>
@@ -18659,7 +18676,7 @@
         <p:spPr>
           <a:xfrm>
             <a:off x="6227640" y="3794400"/>
-            <a:ext cx="908640" cy="908640"/>
+            <a:ext cx="908280" cy="908280"/>
           </a:xfrm>
           <a:prstGeom prst="rect">
             <a:avLst/>
@@ -18682,7 +18699,7 @@
         <p:spPr>
           <a:xfrm>
             <a:off x="2468520" y="3843720"/>
-            <a:ext cx="908640" cy="908640"/>
+            <a:ext cx="908280" cy="908280"/>
           </a:xfrm>
           <a:prstGeom prst="rect">
             <a:avLst/>
@@ -18705,7 +18722,7 @@
         <p:spPr>
           <a:xfrm>
             <a:off x="9790920" y="3794400"/>
-            <a:ext cx="908640" cy="908640"/>
+            <a:ext cx="908280" cy="908280"/>
           </a:xfrm>
           <a:prstGeom prst="rect">
             <a:avLst/>
@@ -18728,7 +18745,7 @@
         <p:spPr>
           <a:xfrm>
             <a:off x="7903800" y="3794400"/>
-            <a:ext cx="908640" cy="908640"/>
+            <a:ext cx="908280" cy="908280"/>
           </a:xfrm>
           <a:prstGeom prst="rect">
             <a:avLst/>
@@ -18751,7 +18768,7 @@
         <p:spPr>
           <a:xfrm>
             <a:off x="4412520" y="3794400"/>
-            <a:ext cx="908640" cy="908640"/>
+            <a:ext cx="908280" cy="908280"/>
           </a:xfrm>
           <a:prstGeom prst="rect">
             <a:avLst/>
@@ -18774,7 +18791,7 @@
         <p:spPr>
           <a:xfrm>
             <a:off x="684360" y="3843720"/>
-            <a:ext cx="908640" cy="908640"/>
+            <a:ext cx="908280" cy="908280"/>
           </a:xfrm>
           <a:prstGeom prst="rect">
             <a:avLst/>
@@ -18793,7 +18810,7 @@
         <p:spPr>
           <a:xfrm>
             <a:off x="1638000" y="4183200"/>
-            <a:ext cx="677160" cy="256320"/>
+            <a:ext cx="676800" cy="255960"/>
           </a:xfrm>
           <a:prstGeom prst="rightArrow">
             <a:avLst>
@@ -18832,7 +18849,7 @@
         <p:spPr>
           <a:xfrm>
             <a:off x="3511800" y="4201920"/>
-            <a:ext cx="677160" cy="256320"/>
+            <a:ext cx="676800" cy="255960"/>
           </a:xfrm>
           <a:prstGeom prst="rightArrow">
             <a:avLst>
@@ -18871,7 +18888,7 @@
         <p:spPr>
           <a:xfrm>
             <a:off x="5366520" y="4193640"/>
-            <a:ext cx="677160" cy="256320"/>
+            <a:ext cx="676800" cy="255960"/>
           </a:xfrm>
           <a:prstGeom prst="rightArrow">
             <a:avLst>
@@ -18910,7 +18927,7 @@
         <p:spPr>
           <a:xfrm>
             <a:off x="7162200" y="4183200"/>
-            <a:ext cx="677160" cy="256320"/>
+            <a:ext cx="676800" cy="255960"/>
           </a:xfrm>
           <a:prstGeom prst="rightArrow">
             <a:avLst>
@@ -18949,7 +18966,7 @@
         <p:spPr>
           <a:xfrm>
             <a:off x="8876160" y="4169880"/>
-            <a:ext cx="677160" cy="256320"/>
+            <a:ext cx="676800" cy="255960"/>
           </a:xfrm>
           <a:prstGeom prst="rightArrow">
             <a:avLst>
@@ -19037,7 +19054,7 @@
         <p:spPr>
           <a:xfrm>
             <a:off x="684360" y="4487400"/>
-            <a:ext cx="8528760" cy="1501200"/>
+            <a:ext cx="8528400" cy="1500840"/>
           </a:xfrm>
           <a:prstGeom prst="rect">
             <a:avLst/>
@@ -19086,7 +19103,7 @@
         <p:spPr>
           <a:xfrm>
             <a:off x="684360" y="685800"/>
-            <a:ext cx="8528760" cy="3609360"/>
+            <a:ext cx="8528400" cy="3609000"/>
           </a:xfrm>
           <a:prstGeom prst="rect">
             <a:avLst/>
@@ -19105,7 +19122,7 @@
         <p:txBody>
           <a:bodyPr lIns="90000" rIns="90000" tIns="45000" bIns="45000" anchor="ctr"/>
           <a:p>
-            <a:pPr marL="285840" indent="-280080">
+            <a:pPr marL="285840" indent="-279720">
               <a:lnSpc>
                 <a:spcPct val="100000"/>
               </a:lnSpc>
@@ -19187,7 +19204,7 @@
             </a:endParaRPr>
           </a:p>
           <a:p>
-            <a:pPr marL="285840" indent="-280080">
+            <a:pPr marL="285840" indent="-279720">
               <a:lnSpc>
                 <a:spcPct val="100000"/>
               </a:lnSpc>
@@ -19233,7 +19250,7 @@
         <p:spPr>
           <a:xfrm>
             <a:off x="4681800" y="2481480"/>
-            <a:ext cx="908640" cy="908640"/>
+            <a:ext cx="908280" cy="908280"/>
           </a:xfrm>
           <a:prstGeom prst="rect">
             <a:avLst/>
@@ -19256,7 +19273,7 @@
         <p:spPr>
           <a:xfrm>
             <a:off x="6609240" y="3669480"/>
-            <a:ext cx="908640" cy="908640"/>
+            <a:ext cx="908280" cy="908280"/>
           </a:xfrm>
           <a:prstGeom prst="rect">
             <a:avLst/>
@@ -19279,7 +19296,7 @@
         <p:spPr>
           <a:xfrm>
             <a:off x="2973240" y="3669480"/>
-            <a:ext cx="908640" cy="908640"/>
+            <a:ext cx="908280" cy="908280"/>
           </a:xfrm>
           <a:prstGeom prst="rect">
             <a:avLst/>
@@ -19298,7 +19315,7 @@
         <p:spPr>
           <a:xfrm>
             <a:off x="4214160" y="3946320"/>
-            <a:ext cx="2062800" cy="354960"/>
+            <a:ext cx="2062440" cy="354600"/>
           </a:xfrm>
           <a:prstGeom prst="rightArrow">
             <a:avLst>
@@ -19337,7 +19354,7 @@
         <p:spPr>
           <a:xfrm>
             <a:off x="4988160" y="3533400"/>
-            <a:ext cx="295920" cy="401400"/>
+            <a:ext cx="295560" cy="401040"/>
           </a:xfrm>
           <a:prstGeom prst="downArrow">
             <a:avLst>

</xml_diff>

<commit_message>
#12 Weak AI vs Strong AI explanation speech data transformation part 3 added on introduction slides
</commit_message>
<xml_diff>
--- a/SAI_presentation_libre_office.pptx
+++ b/SAI_presentation_libre_office.pptx
@@ -150,7 +150,7 @@
               <a:rPr b="0" lang="fr-FR" sz="1400" spc="-1" strike="noStrike">
                 <a:latin typeface="Times New Roman"/>
               </a:rPr>
-              <a:t> </a:t>
+              <a:t>&lt;en-tête&gt;</a:t>
             </a:r>
             <a:endParaRPr b="0" lang="fr-FR" sz="1400" spc="-1" strike="noStrike">
               <a:latin typeface="Times New Roman"/>
@@ -185,7 +185,7 @@
               <a:rPr b="0" lang="fr-FR" sz="1400" spc="-1" strike="noStrike">
                 <a:latin typeface="Times New Roman"/>
               </a:rPr>
-              <a:t> </a:t>
+              <a:t>&lt;date/heure&gt;</a:t>
             </a:r>
             <a:endParaRPr b="0" lang="fr-FR" sz="1400" spc="-1" strike="noStrike">
               <a:latin typeface="Times New Roman"/>
@@ -219,7 +219,7 @@
               <a:rPr b="0" lang="fr-FR" sz="1400" spc="-1" strike="noStrike">
                 <a:latin typeface="Times New Roman"/>
               </a:rPr>
-              <a:t> </a:t>
+              <a:t>&lt;pied de page&gt;</a:t>
             </a:r>
             <a:endParaRPr b="0" lang="fr-FR" sz="1400" spc="-1" strike="noStrike">
               <a:latin typeface="Times New Roman"/>
@@ -250,11 +250,11 @@
           <a:bodyPr lIns="0" rIns="0" tIns="0" bIns="0" anchor="b"/>
           <a:p>
             <a:pPr algn="r"/>
-            <a:fld id="{AAC14468-A696-47B0-8EF1-B12D32E755BE}" type="slidenum">
+            <a:fld id="{6BA6FFDD-9075-481F-9C75-E4A2AC1A0C9B}" type="slidenum">
               <a:rPr b="0" lang="fr-FR" sz="1400" spc="-1" strike="noStrike">
                 <a:latin typeface="Times New Roman"/>
               </a:rPr>
-              <a:t>1</a:t>
+              <a:t>&lt;numéro&gt;</a:t>
             </a:fld>
             <a:endParaRPr b="0" lang="fr-FR" sz="1400" spc="-1" strike="noStrike">
               <a:latin typeface="Times New Roman"/>
@@ -298,7 +298,7 @@
         <p:spPr>
           <a:xfrm>
             <a:off x="685800" y="1143000"/>
-            <a:ext cx="5480280" cy="3080160"/>
+            <a:ext cx="5479920" cy="3079800"/>
           </a:xfrm>
           <a:prstGeom prst="rect">
             <a:avLst/>
@@ -318,7 +318,7 @@
         <p:spPr>
           <a:xfrm>
             <a:off x="685800" y="4400640"/>
-            <a:ext cx="5480280" cy="3594240"/>
+            <a:ext cx="5479920" cy="3593880"/>
           </a:xfrm>
           <a:prstGeom prst="rect">
             <a:avLst/>
@@ -327,7 +327,7 @@
         <p:txBody>
           <a:bodyPr lIns="0" rIns="0" tIns="0" bIns="0"/>
           <a:p>
-            <a:pPr marL="216000" indent="-210240">
+            <a:pPr marL="216000" indent="-209880">
               <a:lnSpc>
                 <a:spcPct val="100000"/>
               </a:lnSpc>
@@ -343,7 +343,7 @@
             </a:endParaRPr>
           </a:p>
           <a:p>
-            <a:pPr marL="216000" indent="-210240">
+            <a:pPr marL="216000" indent="-209880">
               <a:lnSpc>
                 <a:spcPct val="100000"/>
               </a:lnSpc>
@@ -360,7 +360,7 @@
             </a:endParaRPr>
           </a:p>
           <a:p>
-            <a:pPr marL="216000" indent="-210240">
+            <a:pPr marL="216000" indent="-209880">
               <a:lnSpc>
                 <a:spcPct val="100000"/>
               </a:lnSpc>
@@ -376,7 +376,7 @@
             </a:endParaRPr>
           </a:p>
           <a:p>
-            <a:pPr marL="216000" indent="-210240">
+            <a:pPr marL="216000" indent="-209880">
               <a:lnSpc>
                 <a:spcPct val="100000"/>
               </a:lnSpc>
@@ -392,7 +392,7 @@
             </a:endParaRPr>
           </a:p>
           <a:p>
-            <a:pPr marL="216000" indent="-210240">
+            <a:pPr marL="216000" indent="-209880">
               <a:lnSpc>
                 <a:spcPct val="100000"/>
               </a:lnSpc>
@@ -419,7 +419,7 @@
         <p:spPr>
           <a:xfrm>
             <a:off x="3884760" y="8685360"/>
-            <a:ext cx="2965680" cy="452520"/>
+            <a:ext cx="2965320" cy="452160"/>
           </a:xfrm>
           <a:prstGeom prst="rect">
             <a:avLst/>
@@ -443,14 +443,14 @@
                 <a:spcPct val="100000"/>
               </a:lnSpc>
             </a:pPr>
-            <a:fld id="{CF46F077-C4B3-4708-A2A2-742B022CA86E}" type="slidenum">
+            <a:fld id="{9B8D2DC9-D20B-424F-8628-1E8581119B2C}" type="slidenum">
               <a:rPr b="0" lang="fr-FR" sz="1200" spc="-1" strike="noStrike">
                 <a:solidFill>
                   <a:srgbClr val="000000"/>
                 </a:solidFill>
                 <a:latin typeface="Times New Roman"/>
               </a:rPr>
-              <a:t>1</a:t>
+              <a:t>&lt;numéro&gt;</a:t>
             </a:fld>
             <a:endParaRPr b="0" lang="fr-FR" sz="1200" spc="-1" strike="noStrike">
               <a:latin typeface="Arial"/>
@@ -493,7 +493,7 @@
         <p:spPr>
           <a:xfrm>
             <a:off x="685800" y="1143000"/>
-            <a:ext cx="5480280" cy="3080160"/>
+            <a:ext cx="5479920" cy="3079800"/>
           </a:xfrm>
           <a:prstGeom prst="rect">
             <a:avLst/>
@@ -513,7 +513,7 @@
         <p:spPr>
           <a:xfrm>
             <a:off x="685800" y="4400640"/>
-            <a:ext cx="5480280" cy="3594240"/>
+            <a:ext cx="5479920" cy="3593880"/>
           </a:xfrm>
           <a:prstGeom prst="rect">
             <a:avLst/>
@@ -522,7 +522,7 @@
         <p:txBody>
           <a:bodyPr lIns="0" rIns="0" tIns="0" bIns="0"/>
           <a:p>
-            <a:pPr marL="216000" indent="-210600">
+            <a:pPr marL="216000" indent="-210240">
               <a:lnSpc>
                 <a:spcPct val="100000"/>
               </a:lnSpc>
@@ -538,7 +538,7 @@
             </a:endParaRPr>
           </a:p>
           <a:p>
-            <a:pPr marL="216000" indent="-210600">
+            <a:pPr marL="216000" indent="-210240">
               <a:lnSpc>
                 <a:spcPct val="100000"/>
               </a:lnSpc>
@@ -548,7 +548,7 @@
             </a:endParaRPr>
           </a:p>
           <a:p>
-            <a:pPr marL="216000" indent="-210600">
+            <a:pPr marL="216000" indent="-210240">
               <a:lnSpc>
                 <a:spcPct val="100000"/>
               </a:lnSpc>
@@ -564,7 +564,7 @@
             </a:endParaRPr>
           </a:p>
           <a:p>
-            <a:pPr marL="216000" indent="-210600">
+            <a:pPr marL="216000" indent="-210240">
               <a:lnSpc>
                 <a:spcPct val="100000"/>
               </a:lnSpc>
@@ -574,7 +574,7 @@
             </a:endParaRPr>
           </a:p>
           <a:p>
-            <a:pPr marL="216000" indent="-210600">
+            <a:pPr marL="216000" indent="-210240">
               <a:lnSpc>
                 <a:spcPct val="100000"/>
               </a:lnSpc>
@@ -590,7 +590,7 @@
             </a:endParaRPr>
           </a:p>
           <a:p>
-            <a:pPr marL="216000" indent="-210600">
+            <a:pPr marL="216000" indent="-210240">
               <a:lnSpc>
                 <a:spcPct val="100000"/>
               </a:lnSpc>
@@ -600,7 +600,7 @@
             </a:endParaRPr>
           </a:p>
           <a:p>
-            <a:pPr marL="216000" indent="-210600">
+            <a:pPr marL="216000" indent="-210240">
               <a:lnSpc>
                 <a:spcPct val="100000"/>
               </a:lnSpc>
@@ -616,7 +616,7 @@
             </a:endParaRPr>
           </a:p>
           <a:p>
-            <a:pPr marL="216000" indent="-210600">
+            <a:pPr marL="216000" indent="-210240">
               <a:lnSpc>
                 <a:spcPct val="100000"/>
               </a:lnSpc>
@@ -626,7 +626,7 @@
             </a:endParaRPr>
           </a:p>
           <a:p>
-            <a:pPr marL="216000" indent="-210600">
+            <a:pPr marL="216000" indent="-210240">
               <a:lnSpc>
                 <a:spcPct val="100000"/>
               </a:lnSpc>
@@ -636,7 +636,7 @@
             </a:endParaRPr>
           </a:p>
           <a:p>
-            <a:pPr marL="216000" indent="-210600">
+            <a:pPr marL="216000" indent="-210240">
               <a:lnSpc>
                 <a:spcPct val="100000"/>
               </a:lnSpc>
@@ -652,7 +652,7 @@
             </a:endParaRPr>
           </a:p>
           <a:p>
-            <a:pPr marL="216000" indent="-210600">
+            <a:pPr marL="216000" indent="-210240">
               <a:lnSpc>
                 <a:spcPct val="100000"/>
               </a:lnSpc>
@@ -668,7 +668,7 @@
             </a:endParaRPr>
           </a:p>
           <a:p>
-            <a:pPr marL="216000" indent="-210600">
+            <a:pPr marL="216000" indent="-210240">
               <a:lnSpc>
                 <a:spcPct val="100000"/>
               </a:lnSpc>
@@ -684,7 +684,7 @@
             </a:endParaRPr>
           </a:p>
           <a:p>
-            <a:pPr marL="216000" indent="-210600">
+            <a:pPr marL="216000" indent="-210240">
               <a:lnSpc>
                 <a:spcPct val="100000"/>
               </a:lnSpc>
@@ -694,7 +694,7 @@
             </a:endParaRPr>
           </a:p>
           <a:p>
-            <a:pPr marL="216000" indent="-210600">
+            <a:pPr marL="216000" indent="-210240">
               <a:lnSpc>
                 <a:spcPct val="100000"/>
               </a:lnSpc>
@@ -710,7 +710,7 @@
             </a:endParaRPr>
           </a:p>
           <a:p>
-            <a:pPr marL="216000" indent="-210600">
+            <a:pPr marL="216000" indent="-210240">
               <a:lnSpc>
                 <a:spcPct val="100000"/>
               </a:lnSpc>
@@ -720,7 +720,7 @@
             </a:endParaRPr>
           </a:p>
           <a:p>
-            <a:pPr marL="216000" indent="-210600">
+            <a:pPr marL="216000" indent="-210240">
               <a:lnSpc>
                 <a:spcPct val="100000"/>
               </a:lnSpc>
@@ -736,7 +736,7 @@
             </a:endParaRPr>
           </a:p>
           <a:p>
-            <a:pPr marL="216000" indent="-210600">
+            <a:pPr marL="216000" indent="-210240">
               <a:lnSpc>
                 <a:spcPct val="100000"/>
               </a:lnSpc>
@@ -752,7 +752,7 @@
             </a:endParaRPr>
           </a:p>
           <a:p>
-            <a:pPr marL="216000" indent="-210600">
+            <a:pPr marL="216000" indent="-210240">
               <a:lnSpc>
                 <a:spcPct val="100000"/>
               </a:lnSpc>
@@ -768,7 +768,7 @@
             </a:endParaRPr>
           </a:p>
           <a:p>
-            <a:pPr marL="216000" indent="-210600">
+            <a:pPr marL="216000" indent="-210240">
               <a:lnSpc>
                 <a:spcPct val="100000"/>
               </a:lnSpc>
@@ -784,7 +784,7 @@
             </a:endParaRPr>
           </a:p>
           <a:p>
-            <a:pPr marL="216000" indent="-210600">
+            <a:pPr marL="216000" indent="-210240">
               <a:lnSpc>
                 <a:spcPct val="100000"/>
               </a:lnSpc>
@@ -794,7 +794,7 @@
             </a:endParaRPr>
           </a:p>
           <a:p>
-            <a:pPr marL="216000" indent="-210600">
+            <a:pPr marL="216000" indent="-210240">
               <a:lnSpc>
                 <a:spcPct val="100000"/>
               </a:lnSpc>
@@ -810,7 +810,7 @@
             </a:endParaRPr>
           </a:p>
           <a:p>
-            <a:pPr marL="216000" indent="-210600">
+            <a:pPr marL="216000" indent="-210240">
               <a:lnSpc>
                 <a:spcPct val="100000"/>
               </a:lnSpc>
@@ -826,7 +826,7 @@
             </a:endParaRPr>
           </a:p>
           <a:p>
-            <a:pPr marL="216000" indent="-210600">
+            <a:pPr marL="216000" indent="-210240">
               <a:lnSpc>
                 <a:spcPct val="100000"/>
               </a:lnSpc>
@@ -842,7 +842,7 @@
             </a:endParaRPr>
           </a:p>
           <a:p>
-            <a:pPr marL="216000" indent="-210600">
+            <a:pPr marL="216000" indent="-210240">
               <a:lnSpc>
                 <a:spcPct val="100000"/>
               </a:lnSpc>
@@ -858,7 +858,7 @@
             </a:endParaRPr>
           </a:p>
           <a:p>
-            <a:pPr marL="216000" indent="-210600">
+            <a:pPr marL="216000" indent="-210240">
               <a:lnSpc>
                 <a:spcPct val="100000"/>
               </a:lnSpc>
@@ -874,7 +874,7 @@
             </a:endParaRPr>
           </a:p>
           <a:p>
-            <a:pPr marL="216000" indent="-210600">
+            <a:pPr marL="216000" indent="-210240">
               <a:lnSpc>
                 <a:spcPct val="100000"/>
               </a:lnSpc>
@@ -884,7 +884,7 @@
             </a:endParaRPr>
           </a:p>
           <a:p>
-            <a:pPr marL="216000" indent="-210600">
+            <a:pPr marL="216000" indent="-210240">
               <a:lnSpc>
                 <a:spcPct val="100000"/>
               </a:lnSpc>
@@ -900,7 +900,7 @@
             </a:endParaRPr>
           </a:p>
           <a:p>
-            <a:pPr marL="216000" indent="-210600">
+            <a:pPr marL="216000" indent="-210240">
               <a:lnSpc>
                 <a:spcPct val="100000"/>
               </a:lnSpc>
@@ -916,7 +916,7 @@
             </a:endParaRPr>
           </a:p>
           <a:p>
-            <a:pPr marL="216000" indent="-210600">
+            <a:pPr marL="216000" indent="-210240">
               <a:lnSpc>
                 <a:spcPct val="100000"/>
               </a:lnSpc>
@@ -932,7 +932,7 @@
             </a:endParaRPr>
           </a:p>
           <a:p>
-            <a:pPr marL="216000" indent="-210600">
+            <a:pPr marL="216000" indent="-210240">
               <a:lnSpc>
                 <a:spcPct val="100000"/>
               </a:lnSpc>
@@ -942,7 +942,7 @@
             </a:endParaRPr>
           </a:p>
           <a:p>
-            <a:pPr marL="216000" indent="-210600">
+            <a:pPr marL="216000" indent="-210240">
               <a:lnSpc>
                 <a:spcPct val="100000"/>
               </a:lnSpc>
@@ -958,7 +958,7 @@
             </a:endParaRPr>
           </a:p>
           <a:p>
-            <a:pPr marL="216000" indent="-210600">
+            <a:pPr marL="216000" indent="-210240">
               <a:lnSpc>
                 <a:spcPct val="100000"/>
               </a:lnSpc>
@@ -974,7 +974,7 @@
             </a:endParaRPr>
           </a:p>
           <a:p>
-            <a:pPr marL="216000" indent="-210600">
+            <a:pPr marL="216000" indent="-210240">
               <a:lnSpc>
                 <a:spcPct val="100000"/>
               </a:lnSpc>
@@ -990,7 +990,7 @@
             </a:endParaRPr>
           </a:p>
           <a:p>
-            <a:pPr marL="216000" indent="-210600">
+            <a:pPr marL="216000" indent="-210240">
               <a:lnSpc>
                 <a:spcPct val="100000"/>
               </a:lnSpc>
@@ -1000,7 +1000,7 @@
             </a:endParaRPr>
           </a:p>
           <a:p>
-            <a:pPr marL="216000" indent="-210600">
+            <a:pPr marL="216000" indent="-210240">
               <a:lnSpc>
                 <a:spcPct val="100000"/>
               </a:lnSpc>
@@ -1016,7 +1016,7 @@
             </a:endParaRPr>
           </a:p>
           <a:p>
-            <a:pPr marL="216000" indent="-210600">
+            <a:pPr marL="216000" indent="-210240">
               <a:lnSpc>
                 <a:spcPct val="100000"/>
               </a:lnSpc>
@@ -1032,7 +1032,7 @@
             </a:endParaRPr>
           </a:p>
           <a:p>
-            <a:pPr marL="216000" indent="-210600">
+            <a:pPr marL="216000" indent="-210240">
               <a:lnSpc>
                 <a:spcPct val="100000"/>
               </a:lnSpc>
@@ -1048,7 +1048,7 @@
             </a:endParaRPr>
           </a:p>
           <a:p>
-            <a:pPr marL="216000" indent="-210600">
+            <a:pPr marL="216000" indent="-210240">
               <a:lnSpc>
                 <a:spcPct val="100000"/>
               </a:lnSpc>
@@ -1064,7 +1064,7 @@
             </a:endParaRPr>
           </a:p>
           <a:p>
-            <a:pPr marL="216000" indent="-210600">
+            <a:pPr marL="216000" indent="-210240">
               <a:lnSpc>
                 <a:spcPct val="100000"/>
               </a:lnSpc>
@@ -1074,7 +1074,7 @@
             </a:endParaRPr>
           </a:p>
           <a:p>
-            <a:pPr marL="216000" indent="-210600">
+            <a:pPr marL="216000" indent="-210240">
               <a:lnSpc>
                 <a:spcPct val="100000"/>
               </a:lnSpc>
@@ -1090,7 +1090,7 @@
             </a:endParaRPr>
           </a:p>
           <a:p>
-            <a:pPr marL="216000" indent="-210600">
+            <a:pPr marL="216000" indent="-210240">
               <a:lnSpc>
                 <a:spcPct val="100000"/>
               </a:lnSpc>
@@ -1107,7 +1107,7 @@
             </a:endParaRPr>
           </a:p>
           <a:p>
-            <a:pPr marL="216000" indent="-210600">
+            <a:pPr marL="216000" indent="-210240">
               <a:lnSpc>
                 <a:spcPct val="100000"/>
               </a:lnSpc>
@@ -1124,7 +1124,7 @@
             </a:endParaRPr>
           </a:p>
           <a:p>
-            <a:pPr marL="216000" indent="-210600">
+            <a:pPr marL="216000" indent="-210240">
               <a:lnSpc>
                 <a:spcPct val="100000"/>
               </a:lnSpc>
@@ -1141,7 +1141,7 @@
             </a:endParaRPr>
           </a:p>
           <a:p>
-            <a:pPr marL="216000" indent="-210600">
+            <a:pPr marL="216000" indent="-210240">
               <a:lnSpc>
                 <a:spcPct val="100000"/>
               </a:lnSpc>
@@ -1151,7 +1151,7 @@
             </a:endParaRPr>
           </a:p>
           <a:p>
-            <a:pPr marL="216000" indent="-210600">
+            <a:pPr marL="216000" indent="-210240">
               <a:lnSpc>
                 <a:spcPct val="100000"/>
               </a:lnSpc>
@@ -1168,7 +1168,7 @@
             </a:endParaRPr>
           </a:p>
           <a:p>
-            <a:pPr marL="216000" indent="-210600">
+            <a:pPr marL="216000" indent="-210240">
               <a:lnSpc>
                 <a:spcPct val="100000"/>
               </a:lnSpc>
@@ -1185,7 +1185,7 @@
             </a:endParaRPr>
           </a:p>
           <a:p>
-            <a:pPr marL="216000" indent="-210600">
+            <a:pPr marL="216000" indent="-210240">
               <a:lnSpc>
                 <a:spcPct val="100000"/>
               </a:lnSpc>
@@ -1195,7 +1195,7 @@
             </a:endParaRPr>
           </a:p>
           <a:p>
-            <a:pPr marL="216000" indent="-210600">
+            <a:pPr marL="216000" indent="-210240">
               <a:lnSpc>
                 <a:spcPct val="100000"/>
               </a:lnSpc>
@@ -1205,7 +1205,7 @@
             </a:endParaRPr>
           </a:p>
           <a:p>
-            <a:pPr marL="216000" indent="-210600">
+            <a:pPr marL="216000" indent="-210240">
               <a:lnSpc>
                 <a:spcPct val="100000"/>
               </a:lnSpc>
@@ -1215,7 +1215,7 @@
             </a:endParaRPr>
           </a:p>
           <a:p>
-            <a:pPr marL="216000" indent="-210600">
+            <a:pPr marL="216000" indent="-210240">
               <a:lnSpc>
                 <a:spcPct val="100000"/>
               </a:lnSpc>
@@ -1225,7 +1225,7 @@
             </a:endParaRPr>
           </a:p>
           <a:p>
-            <a:pPr marL="216000" indent="-210600">
+            <a:pPr marL="216000" indent="-210240">
               <a:lnSpc>
                 <a:spcPct val="100000"/>
               </a:lnSpc>
@@ -1245,7 +1245,7 @@
         <p:spPr>
           <a:xfrm>
             <a:off x="3884760" y="8685360"/>
-            <a:ext cx="2965680" cy="452520"/>
+            <a:ext cx="2965320" cy="452160"/>
           </a:xfrm>
           <a:prstGeom prst="rect">
             <a:avLst/>
@@ -1269,7 +1269,7 @@
                 <a:spcPct val="100000"/>
               </a:lnSpc>
             </a:pPr>
-            <a:fld id="{1F92893D-DFDE-4E20-8251-85F43F446A44}" type="slidenum">
+            <a:fld id="{92500F05-08D9-4AC6-95A2-CD8B28A2F3B3}" type="slidenum">
               <a:rPr b="0" lang="fr-FR" sz="1200" spc="-1" strike="noStrike">
                 <a:solidFill>
                   <a:srgbClr val="000000"/>
@@ -1319,7 +1319,7 @@
         <p:spPr>
           <a:xfrm>
             <a:off x="685800" y="1143000"/>
-            <a:ext cx="5480280" cy="3080160"/>
+            <a:ext cx="5479920" cy="3079800"/>
           </a:xfrm>
           <a:prstGeom prst="rect">
             <a:avLst/>
@@ -1339,7 +1339,7 @@
         <p:spPr>
           <a:xfrm>
             <a:off x="685800" y="4400640"/>
-            <a:ext cx="5480280" cy="3594240"/>
+            <a:ext cx="5479920" cy="3593880"/>
           </a:xfrm>
           <a:prstGeom prst="rect">
             <a:avLst/>
@@ -1348,7 +1348,7 @@
         <p:txBody>
           <a:bodyPr lIns="0" rIns="0" tIns="0" bIns="0"/>
           <a:p>
-            <a:pPr marL="216000" indent="-212400">
+            <a:pPr marL="216000" indent="-212040">
               <a:lnSpc>
                 <a:spcPct val="100000"/>
               </a:lnSpc>
@@ -1364,7 +1364,7 @@
             </a:endParaRPr>
           </a:p>
           <a:p>
-            <a:pPr marL="216000" indent="-212400">
+            <a:pPr marL="216000" indent="-212040">
               <a:lnSpc>
                 <a:spcPct val="100000"/>
               </a:lnSpc>
@@ -1380,7 +1380,7 @@
             </a:endParaRPr>
           </a:p>
           <a:p>
-            <a:pPr marL="216000" indent="-212400">
+            <a:pPr marL="216000" indent="-212040">
               <a:lnSpc>
                 <a:spcPct val="100000"/>
               </a:lnSpc>
@@ -1396,7 +1396,7 @@
             </a:endParaRPr>
           </a:p>
           <a:p>
-            <a:pPr marL="216000" indent="-212400">
+            <a:pPr marL="216000" indent="-212040">
               <a:lnSpc>
                 <a:spcPct val="100000"/>
               </a:lnSpc>
@@ -1406,7 +1406,7 @@
             </a:endParaRPr>
           </a:p>
           <a:p>
-            <a:pPr marL="216000" indent="-212400">
+            <a:pPr marL="216000" indent="-212040">
               <a:lnSpc>
                 <a:spcPct val="100000"/>
               </a:lnSpc>
@@ -1422,7 +1422,7 @@
             </a:endParaRPr>
           </a:p>
           <a:p>
-            <a:pPr marL="216000" indent="-212400">
+            <a:pPr marL="216000" indent="-212040">
               <a:lnSpc>
                 <a:spcPct val="100000"/>
               </a:lnSpc>
@@ -1438,7 +1438,7 @@
             </a:endParaRPr>
           </a:p>
           <a:p>
-            <a:pPr marL="216000" indent="-212400">
+            <a:pPr marL="216000" indent="-212040">
               <a:lnSpc>
                 <a:spcPct val="100000"/>
               </a:lnSpc>
@@ -1448,7 +1448,7 @@
             </a:endParaRPr>
           </a:p>
           <a:p>
-            <a:pPr marL="216000" indent="-212400">
+            <a:pPr marL="216000" indent="-212040">
               <a:lnSpc>
                 <a:spcPct val="100000"/>
               </a:lnSpc>
@@ -1464,7 +1464,7 @@
             </a:endParaRPr>
           </a:p>
           <a:p>
-            <a:pPr marL="216000" indent="-212400">
+            <a:pPr marL="216000" indent="-212040">
               <a:lnSpc>
                 <a:spcPct val="100000"/>
               </a:lnSpc>
@@ -1474,7 +1474,7 @@
             </a:endParaRPr>
           </a:p>
           <a:p>
-            <a:pPr marL="216000" indent="-212400">
+            <a:pPr marL="216000" indent="-212040">
               <a:lnSpc>
                 <a:spcPct val="100000"/>
               </a:lnSpc>
@@ -1490,7 +1490,7 @@
             </a:endParaRPr>
           </a:p>
           <a:p>
-            <a:pPr marL="216000" indent="-212400">
+            <a:pPr marL="216000" indent="-212040">
               <a:lnSpc>
                 <a:spcPct val="100000"/>
               </a:lnSpc>
@@ -1506,7 +1506,7 @@
             </a:endParaRPr>
           </a:p>
           <a:p>
-            <a:pPr marL="216000" indent="-212400">
+            <a:pPr marL="216000" indent="-212040">
               <a:lnSpc>
                 <a:spcPct val="100000"/>
               </a:lnSpc>
@@ -1523,7 +1523,7 @@
             </a:endParaRPr>
           </a:p>
           <a:p>
-            <a:pPr marL="216000" indent="-212400">
+            <a:pPr marL="216000" indent="-212040">
               <a:lnSpc>
                 <a:spcPct val="100000"/>
               </a:lnSpc>
@@ -1533,7 +1533,7 @@
             </a:endParaRPr>
           </a:p>
           <a:p>
-            <a:pPr marL="216000" indent="-212400">
+            <a:pPr marL="216000" indent="-212040">
               <a:lnSpc>
                 <a:spcPct val="100000"/>
               </a:lnSpc>
@@ -1550,7 +1550,7 @@
             </a:endParaRPr>
           </a:p>
           <a:p>
-            <a:pPr marL="216000" indent="-212400">
+            <a:pPr marL="216000" indent="-212040">
               <a:lnSpc>
                 <a:spcPct val="100000"/>
               </a:lnSpc>
@@ -1567,7 +1567,7 @@
             </a:endParaRPr>
           </a:p>
           <a:p>
-            <a:pPr marL="216000" indent="-212400">
+            <a:pPr marL="216000" indent="-212040">
               <a:lnSpc>
                 <a:spcPct val="100000"/>
               </a:lnSpc>
@@ -1584,7 +1584,7 @@
             </a:endParaRPr>
           </a:p>
           <a:p>
-            <a:pPr marL="216000" indent="-212400">
+            <a:pPr marL="216000" indent="-212040">
               <a:lnSpc>
                 <a:spcPct val="100000"/>
               </a:lnSpc>
@@ -1594,7 +1594,7 @@
             </a:endParaRPr>
           </a:p>
           <a:p>
-            <a:pPr marL="216000" indent="-212400">
+            <a:pPr marL="216000" indent="-212040">
               <a:lnSpc>
                 <a:spcPct val="100000"/>
               </a:lnSpc>
@@ -1611,7 +1611,7 @@
             </a:endParaRPr>
           </a:p>
           <a:p>
-            <a:pPr marL="216000" indent="-212400">
+            <a:pPr marL="216000" indent="-212040">
               <a:lnSpc>
                 <a:spcPct val="100000"/>
               </a:lnSpc>
@@ -1628,17 +1628,24 @@
             </a:endParaRPr>
           </a:p>
           <a:p>
-            <a:pPr marL="216000" indent="-212400">
-              <a:lnSpc>
-                <a:spcPct val="100000"/>
-              </a:lnSpc>
-            </a:pPr>
+            <a:pPr marL="216000" indent="-212040">
+              <a:lnSpc>
+                <a:spcPct val="100000"/>
+              </a:lnSpc>
+            </a:pPr>
+            <a:r>
+              <a:rPr b="0" lang="fr-FR" sz="1000" spc="-1" strike="noStrike">
+                <a:latin typeface="Arial"/>
+                <a:ea typeface="Noto Sans CJK SC"/>
+              </a:rPr>
+              <a:t>Thoses numbers (1 ,, 10) can be stock as ten pictures or as an explicit understanding, for example [1] → one blueberry → one banana → one abricot</a:t>
+            </a:r>
             <a:endParaRPr b="0" lang="fr-FR" sz="1000" spc="-1" strike="noStrike">
               <a:latin typeface="Arial"/>
             </a:endParaRPr>
           </a:p>
           <a:p>
-            <a:pPr marL="216000" indent="-212400">
+            <a:pPr marL="216000" indent="-212040">
               <a:lnSpc>
                 <a:spcPct val="100000"/>
               </a:lnSpc>
@@ -1648,7 +1655,7 @@
             </a:endParaRPr>
           </a:p>
           <a:p>
-            <a:pPr marL="216000" indent="-212400">
+            <a:pPr marL="216000" indent="-212040">
               <a:lnSpc>
                 <a:spcPct val="100000"/>
               </a:lnSpc>
@@ -1658,7 +1665,7 @@
             </a:endParaRPr>
           </a:p>
           <a:p>
-            <a:pPr marL="216000" indent="-212400">
+            <a:pPr marL="216000" indent="-212040">
               <a:lnSpc>
                 <a:spcPct val="100000"/>
               </a:lnSpc>
@@ -1668,7 +1675,17 @@
             </a:endParaRPr>
           </a:p>
           <a:p>
-            <a:pPr marL="216000" indent="-212400">
+            <a:pPr marL="216000" indent="-212040">
+              <a:lnSpc>
+                <a:spcPct val="100000"/>
+              </a:lnSpc>
+            </a:pPr>
+            <a:endParaRPr b="0" lang="fr-FR" sz="1000" spc="-1" strike="noStrike">
+              <a:latin typeface="Arial"/>
+            </a:endParaRPr>
+          </a:p>
+          <a:p>
+            <a:pPr marL="216000" indent="-212040">
               <a:lnSpc>
                 <a:spcPct val="100000"/>
               </a:lnSpc>
@@ -1688,7 +1705,7 @@
         <p:spPr>
           <a:xfrm>
             <a:off x="3884760" y="8685360"/>
-            <a:ext cx="2965680" cy="452520"/>
+            <a:ext cx="2965320" cy="452160"/>
           </a:xfrm>
           <a:prstGeom prst="rect">
             <a:avLst/>
@@ -1712,7 +1729,7 @@
                 <a:spcPct val="100000"/>
               </a:lnSpc>
             </a:pPr>
-            <a:fld id="{57D2863E-5630-4BFA-869E-57AF0C5FFF8E}" type="slidenum">
+            <a:fld id="{D4F3244B-AC12-4575-A499-3C9A74A7F726}" type="slidenum">
               <a:rPr b="0" lang="fr-FR" sz="1200" spc="-1" strike="noStrike">
                 <a:solidFill>
                   <a:srgbClr val="000000"/>
@@ -1762,7 +1779,7 @@
         <p:spPr>
           <a:xfrm>
             <a:off x="380880" y="694800"/>
-            <a:ext cx="6090840" cy="3423960"/>
+            <a:ext cx="6090480" cy="3423600"/>
           </a:xfrm>
           <a:prstGeom prst="rect">
             <a:avLst/>
@@ -1782,7 +1799,7 @@
         <p:spPr>
           <a:xfrm>
             <a:off x="685800" y="4343400"/>
-            <a:ext cx="5481360" cy="4109760"/>
+            <a:ext cx="5481000" cy="4109400"/>
           </a:xfrm>
           <a:prstGeom prst="rect">
             <a:avLst/>
@@ -1791,7 +1808,7 @@
         <p:txBody>
           <a:bodyPr lIns="0" rIns="0" tIns="0" bIns="0"/>
           <a:p>
-            <a:pPr marL="216000" indent="-211680">
+            <a:pPr marL="216000" indent="-211320">
               <a:lnSpc>
                 <a:spcPct val="100000"/>
               </a:lnSpc>
@@ -1807,7 +1824,7 @@
             </a:endParaRPr>
           </a:p>
           <a:p>
-            <a:pPr marL="216000" indent="-211680">
+            <a:pPr marL="216000" indent="-211320">
               <a:lnSpc>
                 <a:spcPct val="100000"/>
               </a:lnSpc>
@@ -1823,7 +1840,7 @@
             </a:endParaRPr>
           </a:p>
           <a:p>
-            <a:pPr marL="216000" indent="-211680">
+            <a:pPr marL="216000" indent="-211320">
               <a:lnSpc>
                 <a:spcPct val="100000"/>
               </a:lnSpc>
@@ -1839,7 +1856,7 @@
             </a:endParaRPr>
           </a:p>
           <a:p>
-            <a:pPr marL="216000" indent="-211680">
+            <a:pPr marL="216000" indent="-211320">
               <a:lnSpc>
                 <a:spcPct val="100000"/>
               </a:lnSpc>
@@ -5587,7 +5604,7 @@
         <p:spPr>
           <a:xfrm>
             <a:off x="0" y="0"/>
-            <a:ext cx="12186000" cy="6851880"/>
+            <a:ext cx="12185640" cy="6851520"/>
           </a:xfrm>
           <a:prstGeom prst="rect">
             <a:avLst/>
@@ -5620,7 +5637,7 @@
         <p:spPr>
           <a:xfrm flipV="1">
             <a:off x="0" y="-6480"/>
-            <a:ext cx="12182760" cy="6851880"/>
+            <a:ext cx="12182400" cy="6851520"/>
           </a:xfrm>
           <a:prstGeom prst="snip1Rect">
             <a:avLst>
@@ -5675,7 +5692,7 @@
         <p:spPr>
           <a:xfrm>
             <a:off x="684360" y="685800"/>
-            <a:ext cx="9672840" cy="3667320"/>
+            <a:ext cx="9672480" cy="3666960"/>
           </a:xfrm>
           <a:prstGeom prst="rect">
             <a:avLst/>
@@ -5726,7 +5743,7 @@
         <p:spPr>
           <a:xfrm>
             <a:off x="684360" y="4648320"/>
-            <a:ext cx="6999480" cy="1136880"/>
+            <a:ext cx="6999120" cy="1136520"/>
           </a:xfrm>
           <a:prstGeom prst="rect">
             <a:avLst/>
@@ -5864,7 +5881,7 @@
         <p:spPr>
           <a:xfrm>
             <a:off x="684360" y="4487400"/>
-            <a:ext cx="8528400" cy="1500840"/>
+            <a:ext cx="8528040" cy="1500480"/>
           </a:xfrm>
           <a:prstGeom prst="rect">
             <a:avLst/>
@@ -5913,7 +5930,7 @@
         <p:spPr>
           <a:xfrm>
             <a:off x="684360" y="685800"/>
-            <a:ext cx="8528400" cy="3609000"/>
+            <a:ext cx="8528040" cy="3608640"/>
           </a:xfrm>
           <a:prstGeom prst="rect">
             <a:avLst/>
@@ -5932,7 +5949,7 @@
         <p:txBody>
           <a:bodyPr lIns="90000" rIns="90000" tIns="45000" bIns="45000" anchor="ctr"/>
           <a:p>
-            <a:pPr marL="285840" indent="-279720">
+            <a:pPr marL="285840" indent="-279360">
               <a:lnSpc>
                 <a:spcPct val="100000"/>
               </a:lnSpc>
@@ -6064,7 +6081,7 @@
             </a:endParaRPr>
           </a:p>
           <a:p>
-            <a:pPr marL="285840" indent="-279720">
+            <a:pPr marL="285840" indent="-279360">
               <a:lnSpc>
                 <a:spcPct val="100000"/>
               </a:lnSpc>
@@ -6110,7 +6127,7 @@
         <p:spPr>
           <a:xfrm>
             <a:off x="4733640" y="3979440"/>
-            <a:ext cx="908280" cy="908280"/>
+            <a:ext cx="907920" cy="907920"/>
           </a:xfrm>
           <a:prstGeom prst="rect">
             <a:avLst/>
@@ -6133,7 +6150,7 @@
         <p:spPr>
           <a:xfrm>
             <a:off x="6825960" y="4030200"/>
-            <a:ext cx="908280" cy="908280"/>
+            <a:ext cx="907920" cy="907920"/>
           </a:xfrm>
           <a:prstGeom prst="rect">
             <a:avLst/>
@@ -6156,7 +6173,7 @@
         <p:spPr>
           <a:xfrm>
             <a:off x="5354640" y="2725920"/>
-            <a:ext cx="908280" cy="908280"/>
+            <a:ext cx="907920" cy="907920"/>
           </a:xfrm>
           <a:prstGeom prst="rect">
             <a:avLst/>
@@ -6179,7 +6196,7 @@
         <p:spPr>
           <a:xfrm>
             <a:off x="8550000" y="3433320"/>
-            <a:ext cx="908280" cy="908280"/>
+            <a:ext cx="907920" cy="907920"/>
           </a:xfrm>
           <a:prstGeom prst="rect">
             <a:avLst/>
@@ -6202,7 +6219,7 @@
         <p:spPr>
           <a:xfrm>
             <a:off x="5153040" y="5079960"/>
-            <a:ext cx="908280" cy="908280"/>
+            <a:ext cx="907920" cy="907920"/>
           </a:xfrm>
           <a:prstGeom prst="rect">
             <a:avLst/>
@@ -6220,8 +6237,8 @@
         </p:nvSpPr>
         <p:spPr>
           <a:xfrm rot="3732600">
-            <a:off x="7995240" y="3762000"/>
-            <a:ext cx="198000" cy="663840"/>
+            <a:off x="7995240" y="3761640"/>
+            <a:ext cx="197640" cy="663480"/>
           </a:xfrm>
           <a:prstGeom prst="downArrow">
             <a:avLst>
@@ -6259,8 +6276,8 @@
         </p:nvSpPr>
         <p:spPr>
           <a:xfrm rot="14618400">
-            <a:off x="6343560" y="4766040"/>
-            <a:ext cx="198000" cy="663840"/>
+            <a:off x="6343560" y="4766400"/>
+            <a:ext cx="197640" cy="663480"/>
           </a:xfrm>
           <a:prstGeom prst="downArrow">
             <a:avLst>
@@ -6298,8 +6315,8 @@
         </p:nvSpPr>
         <p:spPr>
           <a:xfrm rot="5400000">
-            <a:off x="6194880" y="4132800"/>
-            <a:ext cx="198000" cy="663840"/>
+            <a:off x="6195240" y="4132800"/>
+            <a:ext cx="197640" cy="663480"/>
           </a:xfrm>
           <a:prstGeom prst="downArrow">
             <a:avLst>
@@ -6337,8 +6354,8 @@
         </p:nvSpPr>
         <p:spPr>
           <a:xfrm rot="7014000">
-            <a:off x="6427080" y="3551760"/>
-            <a:ext cx="198000" cy="663840"/>
+            <a:off x="6427440" y="3551760"/>
+            <a:ext cx="197640" cy="663480"/>
           </a:xfrm>
           <a:prstGeom prst="downArrow">
             <a:avLst>
@@ -6377,7 +6394,7 @@
         <p:spPr>
           <a:xfrm rot="1747800">
             <a:off x="5087880" y="3300840"/>
-            <a:ext cx="198000" cy="663840"/>
+            <a:ext cx="197640" cy="663480"/>
           </a:xfrm>
           <a:prstGeom prst="downArrow">
             <a:avLst>
@@ -6465,7 +6482,7 @@
         <p:spPr>
           <a:xfrm>
             <a:off x="6868080" y="306720"/>
-            <a:ext cx="5037840" cy="2079720"/>
+            <a:ext cx="5037480" cy="2079360"/>
           </a:xfrm>
           <a:prstGeom prst="rect">
             <a:avLst/>
@@ -6508,7 +6525,7 @@
         <p:spPr>
           <a:xfrm>
             <a:off x="6271200" y="2669400"/>
-            <a:ext cx="5626800" cy="3002760"/>
+            <a:ext cx="5626440" cy="3002400"/>
           </a:xfrm>
           <a:prstGeom prst="rect">
             <a:avLst/>
@@ -6553,7 +6570,7 @@
         <p:spPr>
           <a:xfrm>
             <a:off x="129960" y="5709960"/>
-            <a:ext cx="11177280" cy="1083960"/>
+            <a:ext cx="11176920" cy="1083600"/>
           </a:xfrm>
           <a:prstGeom prst="rect">
             <a:avLst/>
@@ -6598,7 +6615,7 @@
         <p:spPr>
           <a:xfrm>
             <a:off x="207000" y="1787400"/>
-            <a:ext cx="5588640" cy="3222000"/>
+            <a:ext cx="5588280" cy="3221640"/>
           </a:xfrm>
           <a:prstGeom prst="rect">
             <a:avLst/>
@@ -6643,7 +6660,7 @@
         <p:spPr>
           <a:xfrm>
             <a:off x="684360" y="4487400"/>
-            <a:ext cx="8528400" cy="1500840"/>
+            <a:ext cx="8528040" cy="1500480"/>
           </a:xfrm>
           <a:prstGeom prst="rect">
             <a:avLst/>
@@ -6692,7 +6709,7 @@
         <p:spPr>
           <a:xfrm>
             <a:off x="684360" y="685800"/>
-            <a:ext cx="8528400" cy="3609000"/>
+            <a:ext cx="8528040" cy="3608640"/>
           </a:xfrm>
           <a:prstGeom prst="rect">
             <a:avLst/>
@@ -6711,7 +6728,7 @@
         <p:txBody>
           <a:bodyPr lIns="90000" rIns="90000" tIns="45000" bIns="45000" anchor="ctr"/>
           <a:p>
-            <a:pPr marL="285840" indent="-279720">
+            <a:pPr marL="285840" indent="-279360">
               <a:lnSpc>
                 <a:spcPct val="100000"/>
               </a:lnSpc>
@@ -6763,7 +6780,7 @@
             </a:endParaRPr>
           </a:p>
           <a:p>
-            <a:pPr marL="285840" indent="-279720">
+            <a:pPr marL="285840" indent="-279360">
               <a:lnSpc>
                 <a:spcPct val="100000"/>
               </a:lnSpc>
@@ -6805,7 +6822,7 @@
             </a:endParaRPr>
           </a:p>
           <a:p>
-            <a:pPr marL="285840" indent="-279720">
+            <a:pPr marL="285840" indent="-279360">
               <a:lnSpc>
                 <a:spcPct val="100000"/>
               </a:lnSpc>
@@ -6857,7 +6874,7 @@
             </a:endParaRPr>
           </a:p>
           <a:p>
-            <a:pPr marL="285840" indent="-279720">
+            <a:pPr marL="285840" indent="-279360">
               <a:lnSpc>
                 <a:spcPct val="100000"/>
               </a:lnSpc>
@@ -7025,7 +7042,7 @@
         <p:spPr>
           <a:xfrm>
             <a:off x="4629600" y="1832040"/>
-            <a:ext cx="848520" cy="848520"/>
+            <a:ext cx="848160" cy="848160"/>
           </a:xfrm>
           <a:prstGeom prst="rect">
             <a:avLst/>
@@ -7048,7 +7065,7 @@
         <p:spPr>
           <a:xfrm>
             <a:off x="4463640" y="4185360"/>
-            <a:ext cx="1175040" cy="467280"/>
+            <a:ext cx="1174680" cy="466920"/>
           </a:xfrm>
           <a:prstGeom prst="rect">
             <a:avLst/>
@@ -7071,7 +7088,7 @@
         <p:spPr>
           <a:xfrm>
             <a:off x="4586040" y="2785680"/>
-            <a:ext cx="892080" cy="1034280"/>
+            <a:ext cx="891720" cy="1033920"/>
           </a:xfrm>
           <a:prstGeom prst="rect">
             <a:avLst/>
@@ -7094,7 +7111,7 @@
         <p:spPr>
           <a:xfrm>
             <a:off x="250560" y="1953720"/>
-            <a:ext cx="908280" cy="908280"/>
+            <a:ext cx="907920" cy="907920"/>
           </a:xfrm>
           <a:prstGeom prst="rect">
             <a:avLst/>
@@ -7117,7 +7134,7 @@
         <p:spPr>
           <a:xfrm>
             <a:off x="271440" y="3259800"/>
-            <a:ext cx="908280" cy="908280"/>
+            <a:ext cx="907920" cy="907920"/>
           </a:xfrm>
           <a:prstGeom prst="rect">
             <a:avLst/>
@@ -7140,7 +7157,7 @@
         <p:spPr>
           <a:xfrm>
             <a:off x="2440800" y="2741040"/>
-            <a:ext cx="908280" cy="908280"/>
+            <a:ext cx="907920" cy="907920"/>
           </a:xfrm>
           <a:prstGeom prst="rect">
             <a:avLst/>
@@ -7158,8 +7175,8 @@
         </p:nvSpPr>
         <p:spPr>
           <a:xfrm rot="1192200">
-            <a:off x="1577520" y="2558520"/>
-            <a:ext cx="972360" cy="478440"/>
+            <a:off x="1577160" y="2558520"/>
+            <a:ext cx="972000" cy="478080"/>
           </a:xfrm>
           <a:prstGeom prst="rightArrow">
             <a:avLst>
@@ -7201,7 +7218,7 @@
         <p:spPr>
           <a:xfrm rot="20407800">
             <a:off x="1555920" y="3347640"/>
-            <a:ext cx="972360" cy="478440"/>
+            <a:ext cx="972000" cy="478080"/>
           </a:xfrm>
           <a:prstGeom prst="rightArrow">
             <a:avLst>
@@ -7242,8 +7259,8 @@
         </p:nvSpPr>
         <p:spPr>
           <a:xfrm rot="1192200">
-            <a:off x="3331080" y="3666960"/>
-            <a:ext cx="972360" cy="478440"/>
+            <a:off x="3330720" y="3666960"/>
+            <a:ext cx="972000" cy="478080"/>
           </a:xfrm>
           <a:prstGeom prst="rightArrow">
             <a:avLst>
@@ -7285,7 +7302,7 @@
         <p:spPr>
           <a:xfrm rot="20407800">
             <a:off x="3404160" y="2343240"/>
-            <a:ext cx="972360" cy="478440"/>
+            <a:ext cx="972000" cy="478080"/>
           </a:xfrm>
           <a:prstGeom prst="rightArrow">
             <a:avLst>
@@ -7327,7 +7344,7 @@
         <p:spPr>
           <a:xfrm>
             <a:off x="3483720" y="3004200"/>
-            <a:ext cx="972360" cy="478440"/>
+            <a:ext cx="972000" cy="478080"/>
           </a:xfrm>
           <a:prstGeom prst="rightArrow">
             <a:avLst>
@@ -7373,7 +7390,7 @@
         <p:spPr>
           <a:xfrm>
             <a:off x="5819760" y="5709960"/>
-            <a:ext cx="908280" cy="908280"/>
+            <a:ext cx="907920" cy="907920"/>
           </a:xfrm>
           <a:prstGeom prst="rect">
             <a:avLst/>
@@ -7396,7 +7413,7 @@
         <p:spPr>
           <a:xfrm>
             <a:off x="2060640" y="5759640"/>
-            <a:ext cx="908280" cy="908280"/>
+            <a:ext cx="907920" cy="907920"/>
           </a:xfrm>
           <a:prstGeom prst="rect">
             <a:avLst/>
@@ -7419,7 +7436,7 @@
         <p:spPr>
           <a:xfrm>
             <a:off x="9383040" y="5709960"/>
-            <a:ext cx="908280" cy="908280"/>
+            <a:ext cx="907920" cy="907920"/>
           </a:xfrm>
           <a:prstGeom prst="rect">
             <a:avLst/>
@@ -7442,7 +7459,7 @@
         <p:spPr>
           <a:xfrm>
             <a:off x="7495920" y="5709960"/>
-            <a:ext cx="908280" cy="908280"/>
+            <a:ext cx="907920" cy="907920"/>
           </a:xfrm>
           <a:prstGeom prst="rect">
             <a:avLst/>
@@ -7465,7 +7482,7 @@
         <p:spPr>
           <a:xfrm>
             <a:off x="4004640" y="5709960"/>
-            <a:ext cx="908280" cy="908280"/>
+            <a:ext cx="907920" cy="907920"/>
           </a:xfrm>
           <a:prstGeom prst="rect">
             <a:avLst/>
@@ -7488,7 +7505,7 @@
         <p:spPr>
           <a:xfrm>
             <a:off x="276120" y="5759640"/>
-            <a:ext cx="908280" cy="908280"/>
+            <a:ext cx="907920" cy="907920"/>
           </a:xfrm>
           <a:prstGeom prst="rect">
             <a:avLst/>
@@ -7507,7 +7524,7 @@
         <p:spPr>
           <a:xfrm>
             <a:off x="1230120" y="6098760"/>
-            <a:ext cx="676800" cy="255960"/>
+            <a:ext cx="676440" cy="255600"/>
           </a:xfrm>
           <a:prstGeom prst="rightArrow">
             <a:avLst>
@@ -7546,7 +7563,7 @@
         <p:spPr>
           <a:xfrm>
             <a:off x="3103920" y="6117480"/>
-            <a:ext cx="676800" cy="255960"/>
+            <a:ext cx="676440" cy="255600"/>
           </a:xfrm>
           <a:prstGeom prst="rightArrow">
             <a:avLst>
@@ -7585,7 +7602,7 @@
         <p:spPr>
           <a:xfrm>
             <a:off x="4958640" y="6109200"/>
-            <a:ext cx="676800" cy="255960"/>
+            <a:ext cx="676440" cy="255600"/>
           </a:xfrm>
           <a:prstGeom prst="rightArrow">
             <a:avLst>
@@ -7624,7 +7641,7 @@
         <p:spPr>
           <a:xfrm>
             <a:off x="6754320" y="6098760"/>
-            <a:ext cx="676800" cy="255960"/>
+            <a:ext cx="676440" cy="255600"/>
           </a:xfrm>
           <a:prstGeom prst="rightArrow">
             <a:avLst>
@@ -7663,7 +7680,7 @@
         <p:spPr>
           <a:xfrm>
             <a:off x="8468280" y="6085800"/>
-            <a:ext cx="676800" cy="255960"/>
+            <a:ext cx="676440" cy="255600"/>
           </a:xfrm>
           <a:prstGeom prst="rightArrow">
             <a:avLst>
@@ -7706,7 +7723,7 @@
         <p:spPr>
           <a:xfrm>
             <a:off x="6582600" y="3915000"/>
-            <a:ext cx="908280" cy="908280"/>
+            <a:ext cx="907920" cy="907920"/>
           </a:xfrm>
           <a:prstGeom prst="rect">
             <a:avLst/>
@@ -7729,7 +7746,7 @@
         <p:spPr>
           <a:xfrm>
             <a:off x="8674920" y="3965760"/>
-            <a:ext cx="908280" cy="908280"/>
+            <a:ext cx="907920" cy="907920"/>
           </a:xfrm>
           <a:prstGeom prst="rect">
             <a:avLst/>
@@ -7752,7 +7769,7 @@
         <p:spPr>
           <a:xfrm>
             <a:off x="7203600" y="2661480"/>
-            <a:ext cx="908280" cy="908280"/>
+            <a:ext cx="907920" cy="907920"/>
           </a:xfrm>
           <a:prstGeom prst="rect">
             <a:avLst/>
@@ -7775,7 +7792,7 @@
         <p:spPr>
           <a:xfrm>
             <a:off x="10398960" y="3368880"/>
-            <a:ext cx="908280" cy="908280"/>
+            <a:ext cx="907920" cy="907920"/>
           </a:xfrm>
           <a:prstGeom prst="rect">
             <a:avLst/>
@@ -7798,7 +7815,7 @@
         <p:spPr>
           <a:xfrm>
             <a:off x="7002000" y="5015520"/>
-            <a:ext cx="908280" cy="908280"/>
+            <a:ext cx="907920" cy="907920"/>
           </a:xfrm>
           <a:prstGeom prst="rect">
             <a:avLst/>
@@ -7816,8 +7833,8 @@
         </p:nvSpPr>
         <p:spPr>
           <a:xfrm rot="3732600">
-            <a:off x="9844560" y="3697920"/>
-            <a:ext cx="198000" cy="663840"/>
+            <a:off x="9844560" y="3697560"/>
+            <a:ext cx="197640" cy="663480"/>
           </a:xfrm>
           <a:prstGeom prst="downArrow">
             <a:avLst>
@@ -7855,8 +7872,8 @@
         </p:nvSpPr>
         <p:spPr>
           <a:xfrm rot="14618400">
-            <a:off x="8192520" y="4701960"/>
-            <a:ext cx="198000" cy="663840"/>
+            <a:off x="8192520" y="4702320"/>
+            <a:ext cx="197640" cy="663480"/>
           </a:xfrm>
           <a:prstGeom prst="downArrow">
             <a:avLst>
@@ -7894,8 +7911,8 @@
         </p:nvSpPr>
         <p:spPr>
           <a:xfrm rot="5400000">
-            <a:off x="8043840" y="4068360"/>
-            <a:ext cx="198000" cy="663840"/>
+            <a:off x="8044200" y="4068360"/>
+            <a:ext cx="197640" cy="663480"/>
           </a:xfrm>
           <a:prstGeom prst="downArrow">
             <a:avLst>
@@ -7933,8 +7950,8 @@
         </p:nvSpPr>
         <p:spPr>
           <a:xfrm rot="7014000">
-            <a:off x="8276400" y="3487320"/>
-            <a:ext cx="198000" cy="663840"/>
+            <a:off x="8276760" y="3487320"/>
+            <a:ext cx="197640" cy="663480"/>
           </a:xfrm>
           <a:prstGeom prst="downArrow">
             <a:avLst>
@@ -7973,7 +7990,7 @@
         <p:spPr>
           <a:xfrm rot="1747800">
             <a:off x="7094880" y="3422880"/>
-            <a:ext cx="198000" cy="663840"/>
+            <a:ext cx="197640" cy="663480"/>
           </a:xfrm>
           <a:prstGeom prst="downArrow">
             <a:avLst>
@@ -8016,7 +8033,7 @@
         <p:spPr>
           <a:xfrm>
             <a:off x="8641080" y="309600"/>
-            <a:ext cx="908280" cy="908280"/>
+            <a:ext cx="907920" cy="907920"/>
           </a:xfrm>
           <a:prstGeom prst="rect">
             <a:avLst/>
@@ -8039,7 +8056,7 @@
         <p:spPr>
           <a:xfrm>
             <a:off x="10568880" y="1497240"/>
-            <a:ext cx="908280" cy="908280"/>
+            <a:ext cx="907920" cy="907920"/>
           </a:xfrm>
           <a:prstGeom prst="rect">
             <a:avLst/>
@@ -8062,7 +8079,7 @@
         <p:spPr>
           <a:xfrm>
             <a:off x="6932880" y="1497240"/>
-            <a:ext cx="908280" cy="908280"/>
+            <a:ext cx="907920" cy="907920"/>
           </a:xfrm>
           <a:prstGeom prst="rect">
             <a:avLst/>
@@ -8081,7 +8098,7 @@
         <p:spPr>
           <a:xfrm>
             <a:off x="8173800" y="1774080"/>
-            <a:ext cx="2062440" cy="354600"/>
+            <a:ext cx="2062080" cy="354240"/>
           </a:xfrm>
           <a:prstGeom prst="rightArrow">
             <a:avLst>
@@ -8120,7 +8137,7 @@
         <p:spPr>
           <a:xfrm>
             <a:off x="8947440" y="1361160"/>
-            <a:ext cx="295560" cy="401040"/>
+            <a:ext cx="295200" cy="400680"/>
           </a:xfrm>
           <a:prstGeom prst="downArrow">
             <a:avLst>
@@ -8208,7 +8225,7 @@
         <p:spPr>
           <a:xfrm>
             <a:off x="0" y="0"/>
-            <a:ext cx="12186000" cy="6851880"/>
+            <a:ext cx="12185640" cy="6851520"/>
           </a:xfrm>
           <a:prstGeom prst="rect">
             <a:avLst/>
@@ -8261,7 +8278,7 @@
         <p:spPr>
           <a:xfrm>
             <a:off x="640440" y="685800"/>
-            <a:ext cx="4812480" cy="4597560"/>
+            <a:ext cx="4812120" cy="4597200"/>
           </a:xfrm>
           <a:prstGeom prst="rect">
             <a:avLst/>
@@ -8312,7 +8329,7 @@
         <p:spPr>
           <a:xfrm>
             <a:off x="6095880" y="0"/>
-            <a:ext cx="6089760" cy="6851880"/>
+            <a:ext cx="6089400" cy="6851520"/>
           </a:xfrm>
           <a:prstGeom prst="rect">
             <a:avLst/>
@@ -8350,7 +8367,7 @@
         <p:spPr>
           <a:xfrm>
             <a:off x="6625800" y="685800"/>
-            <a:ext cx="4872960" cy="4597560"/>
+            <a:ext cx="4872600" cy="4597200"/>
           </a:xfrm>
           <a:prstGeom prst="rect">
             <a:avLst/>
@@ -8371,7 +8388,7 @@
             <a:normAutofit/>
           </a:bodyPr>
           <a:p>
-            <a:pPr marL="285840" indent="-279720">
+            <a:pPr marL="285840" indent="-279360">
               <a:lnSpc>
                 <a:spcPct val="100000"/>
               </a:lnSpc>
@@ -8403,7 +8420,7 @@
             </a:endParaRPr>
           </a:p>
           <a:p>
-            <a:pPr marL="285840" indent="-279720">
+            <a:pPr marL="285840" indent="-279360">
               <a:lnSpc>
                 <a:spcPct val="100000"/>
               </a:lnSpc>
@@ -8435,7 +8452,7 @@
             </a:endParaRPr>
           </a:p>
           <a:p>
-            <a:pPr marL="285840" indent="-279720">
+            <a:pPr marL="285840" indent="-279360">
               <a:lnSpc>
                 <a:spcPct val="100000"/>
               </a:lnSpc>
@@ -8467,7 +8484,7 @@
             </a:endParaRPr>
           </a:p>
           <a:p>
-            <a:pPr marL="285840" indent="-279720">
+            <a:pPr marL="285840" indent="-279360">
               <a:lnSpc>
                 <a:spcPct val="100000"/>
               </a:lnSpc>
@@ -8499,7 +8516,7 @@
             </a:endParaRPr>
           </a:p>
           <a:p>
-            <a:pPr marL="285840" indent="-279720">
+            <a:pPr marL="285840" indent="-279360">
               <a:lnSpc>
                 <a:spcPct val="100000"/>
               </a:lnSpc>
@@ -8590,7 +8607,7 @@
         <p:spPr>
           <a:xfrm>
             <a:off x="684360" y="4487400"/>
-            <a:ext cx="8528400" cy="1500840"/>
+            <a:ext cx="8528040" cy="1500480"/>
           </a:xfrm>
           <a:prstGeom prst="rect">
             <a:avLst/>
@@ -8639,7 +8656,7 @@
         <p:spPr>
           <a:xfrm>
             <a:off x="684360" y="685800"/>
-            <a:ext cx="8528400" cy="3609000"/>
+            <a:ext cx="8528040" cy="3608640"/>
           </a:xfrm>
           <a:prstGeom prst="rect">
             <a:avLst/>
@@ -8658,7 +8675,7 @@
         <p:txBody>
           <a:bodyPr lIns="90000" rIns="90000" tIns="45000" bIns="45000" anchor="ctr"/>
           <a:p>
-            <a:pPr marL="285840" indent="-279720">
+            <a:pPr marL="285840" indent="-279360">
               <a:lnSpc>
                 <a:spcPct val="100000"/>
               </a:lnSpc>
@@ -8690,7 +8707,7 @@
             </a:endParaRPr>
           </a:p>
           <a:p>
-            <a:pPr marL="285840" indent="-279720">
+            <a:pPr marL="285840" indent="-279360">
               <a:lnSpc>
                 <a:spcPct val="100000"/>
               </a:lnSpc>
@@ -8800,7 +8817,7 @@
         <p:spPr>
           <a:xfrm>
             <a:off x="6995520" y="1949760"/>
-            <a:ext cx="848520" cy="848520"/>
+            <a:ext cx="848160" cy="848160"/>
           </a:xfrm>
           <a:prstGeom prst="rect">
             <a:avLst/>
@@ -8823,7 +8840,7 @@
         <p:spPr>
           <a:xfrm>
             <a:off x="6829560" y="4303080"/>
-            <a:ext cx="1175040" cy="467280"/>
+            <a:ext cx="1174680" cy="466920"/>
           </a:xfrm>
           <a:prstGeom prst="rect">
             <a:avLst/>
@@ -8846,7 +8863,7 @@
         <p:spPr>
           <a:xfrm>
             <a:off x="6951960" y="2903040"/>
-            <a:ext cx="892080" cy="1034280"/>
+            <a:ext cx="891720" cy="1033920"/>
           </a:xfrm>
           <a:prstGeom prst="rect">
             <a:avLst/>
@@ -8869,7 +8886,7 @@
         <p:spPr>
           <a:xfrm>
             <a:off x="2616120" y="2071080"/>
-            <a:ext cx="908280" cy="908280"/>
+            <a:ext cx="907920" cy="907920"/>
           </a:xfrm>
           <a:prstGeom prst="rect">
             <a:avLst/>
@@ -8892,7 +8909,7 @@
         <p:spPr>
           <a:xfrm>
             <a:off x="2637000" y="3377160"/>
-            <a:ext cx="908280" cy="908280"/>
+            <a:ext cx="907920" cy="907920"/>
           </a:xfrm>
           <a:prstGeom prst="rect">
             <a:avLst/>
@@ -8910,8 +8927,8 @@
         </p:nvSpPr>
         <p:spPr>
           <a:xfrm rot="1192200">
-            <a:off x="3943080" y="2675880"/>
-            <a:ext cx="972360" cy="478440"/>
+            <a:off x="3942720" y="2675880"/>
+            <a:ext cx="972000" cy="478080"/>
           </a:xfrm>
           <a:prstGeom prst="rightArrow">
             <a:avLst>
@@ -8953,7 +8970,7 @@
         <p:spPr>
           <a:xfrm rot="20407800">
             <a:off x="3921480" y="3465000"/>
-            <a:ext cx="972360" cy="478440"/>
+            <a:ext cx="972000" cy="478080"/>
           </a:xfrm>
           <a:prstGeom prst="rightArrow">
             <a:avLst>
@@ -8994,8 +9011,8 @@
         </p:nvSpPr>
         <p:spPr>
           <a:xfrm rot="1192200">
-            <a:off x="5697000" y="3784320"/>
-            <a:ext cx="972360" cy="478440"/>
+            <a:off x="5696640" y="3784320"/>
+            <a:ext cx="972000" cy="478080"/>
           </a:xfrm>
           <a:prstGeom prst="rightArrow">
             <a:avLst>
@@ -9037,7 +9054,7 @@
         <p:spPr>
           <a:xfrm rot="20407800">
             <a:off x="5769720" y="2460600"/>
-            <a:ext cx="972360" cy="478440"/>
+            <a:ext cx="972000" cy="478080"/>
           </a:xfrm>
           <a:prstGeom prst="rightArrow">
             <a:avLst>
@@ -9079,7 +9096,7 @@
         <p:spPr>
           <a:xfrm>
             <a:off x="5849640" y="3121560"/>
-            <a:ext cx="972360" cy="478440"/>
+            <a:ext cx="972000" cy="478080"/>
           </a:xfrm>
           <a:prstGeom prst="rightArrow">
             <a:avLst>
@@ -9125,7 +9142,7 @@
         <p:spPr>
           <a:xfrm>
             <a:off x="4950720" y="2998800"/>
-            <a:ext cx="750600" cy="750600"/>
+            <a:ext cx="750240" cy="750240"/>
           </a:xfrm>
           <a:prstGeom prst="rect">
             <a:avLst/>
@@ -9193,7 +9210,7 @@
         <p:spPr>
           <a:xfrm>
             <a:off x="684360" y="4487400"/>
-            <a:ext cx="8528400" cy="1500840"/>
+            <a:ext cx="8528040" cy="1500480"/>
           </a:xfrm>
           <a:prstGeom prst="rect">
             <a:avLst/>
@@ -9242,7 +9259,7 @@
         <p:spPr>
           <a:xfrm>
             <a:off x="684360" y="685800"/>
-            <a:ext cx="8528400" cy="3609000"/>
+            <a:ext cx="8528040" cy="3608640"/>
           </a:xfrm>
           <a:prstGeom prst="rect">
             <a:avLst/>
@@ -9261,7 +9278,7 @@
         <p:txBody>
           <a:bodyPr lIns="90000" rIns="90000" tIns="45000" bIns="45000" anchor="ctr"/>
           <a:p>
-            <a:pPr marL="285840" indent="-279720">
+            <a:pPr marL="285840" indent="-279360">
               <a:lnSpc>
                 <a:spcPct val="100000"/>
               </a:lnSpc>
@@ -9387,7 +9404,7 @@
             </a:endParaRPr>
           </a:p>
           <a:p>
-            <a:pPr marL="285840" indent="-279720">
+            <a:pPr marL="285840" indent="-279360">
               <a:lnSpc>
                 <a:spcPct val="100000"/>
               </a:lnSpc>
@@ -9479,7 +9496,7 @@
         <p:spPr>
           <a:xfrm>
             <a:off x="3562560" y="1395720"/>
-            <a:ext cx="908280" cy="908280"/>
+            <a:ext cx="907920" cy="907920"/>
           </a:xfrm>
           <a:prstGeom prst="rect">
             <a:avLst/>
@@ -9502,7 +9519,7 @@
         <p:spPr>
           <a:xfrm>
             <a:off x="6678360" y="1395720"/>
-            <a:ext cx="908280" cy="908280"/>
+            <a:ext cx="907920" cy="907920"/>
           </a:xfrm>
           <a:prstGeom prst="rect">
             <a:avLst/>
@@ -9525,7 +9542,7 @@
         <p:spPr>
           <a:xfrm>
             <a:off x="7042320" y="3904200"/>
-            <a:ext cx="908280" cy="908280"/>
+            <a:ext cx="907920" cy="907920"/>
           </a:xfrm>
           <a:prstGeom prst="rect">
             <a:avLst/>
@@ -9548,7 +9565,7 @@
         <p:spPr>
           <a:xfrm>
             <a:off x="3562560" y="3904200"/>
-            <a:ext cx="908280" cy="908280"/>
+            <a:ext cx="907920" cy="907920"/>
           </a:xfrm>
           <a:prstGeom prst="rect">
             <a:avLst/>
@@ -9571,7 +9588,7 @@
         <p:spPr>
           <a:xfrm>
             <a:off x="6678360" y="1395720"/>
-            <a:ext cx="908280" cy="908280"/>
+            <a:ext cx="907920" cy="907920"/>
           </a:xfrm>
           <a:prstGeom prst="rect">
             <a:avLst/>
@@ -9594,7 +9611,7 @@
         <p:spPr>
           <a:xfrm>
             <a:off x="4113000" y="2039400"/>
-            <a:ext cx="908280" cy="908280"/>
+            <a:ext cx="907920" cy="907920"/>
           </a:xfrm>
           <a:prstGeom prst="rect">
             <a:avLst/>
@@ -9617,7 +9634,7 @@
         <p:spPr>
           <a:xfrm>
             <a:off x="7296480" y="2133000"/>
-            <a:ext cx="908280" cy="908280"/>
+            <a:ext cx="907920" cy="907920"/>
           </a:xfrm>
           <a:prstGeom prst="rect">
             <a:avLst/>
@@ -9636,7 +9653,7 @@
         <p:spPr>
           <a:xfrm>
             <a:off x="5285160" y="1920960"/>
-            <a:ext cx="1176840" cy="539280"/>
+            <a:ext cx="1176480" cy="538920"/>
           </a:xfrm>
           <a:prstGeom prst="rightArrow">
             <a:avLst>
@@ -9678,7 +9695,7 @@
         <p:spPr>
           <a:xfrm>
             <a:off x="5149440" y="4088880"/>
-            <a:ext cx="1176840" cy="539280"/>
+            <a:ext cx="1176480" cy="538920"/>
           </a:xfrm>
           <a:prstGeom prst="rightArrow">
             <a:avLst>
@@ -9743,7 +9760,7 @@
         <p:spPr>
           <a:xfrm>
             <a:off x="4895280" y="2388600"/>
-            <a:ext cx="2701800" cy="358920"/>
+            <a:ext cx="2701440" cy="358560"/>
           </a:xfrm>
           <a:prstGeom prst="rect">
             <a:avLst/>
@@ -9792,7 +9809,7 @@
         <p:spPr>
           <a:xfrm>
             <a:off x="5027400" y="4575240"/>
-            <a:ext cx="2321640" cy="358920"/>
+            <a:ext cx="2321280" cy="358560"/>
           </a:xfrm>
           <a:prstGeom prst="rect">
             <a:avLst/>
@@ -9890,7 +9907,7 @@
         <p:spPr>
           <a:xfrm>
             <a:off x="684360" y="4487400"/>
-            <a:ext cx="8528400" cy="1500840"/>
+            <a:ext cx="8528040" cy="1500480"/>
           </a:xfrm>
           <a:prstGeom prst="rect">
             <a:avLst/>
@@ -9939,7 +9956,7 @@
         <p:spPr>
           <a:xfrm>
             <a:off x="684360" y="685800"/>
-            <a:ext cx="8528400" cy="3609000"/>
+            <a:ext cx="8528040" cy="3608640"/>
           </a:xfrm>
           <a:prstGeom prst="rect">
             <a:avLst/>
@@ -9958,7 +9975,7 @@
         <p:txBody>
           <a:bodyPr lIns="90000" rIns="90000" tIns="45000" bIns="45000" anchor="ctr"/>
           <a:p>
-            <a:pPr marL="285840" indent="-279720">
+            <a:pPr marL="285840" indent="-279360">
               <a:lnSpc>
                 <a:spcPct val="100000"/>
               </a:lnSpc>
@@ -10080,7 +10097,7 @@
         <p:spPr>
           <a:xfrm>
             <a:off x="1863000" y="3157920"/>
-            <a:ext cx="908280" cy="908280"/>
+            <a:ext cx="907920" cy="907920"/>
           </a:xfrm>
           <a:prstGeom prst="rect">
             <a:avLst/>
@@ -10103,7 +10120,7 @@
         <p:spPr>
           <a:xfrm>
             <a:off x="2413440" y="3801600"/>
-            <a:ext cx="908280" cy="908280"/>
+            <a:ext cx="907920" cy="907920"/>
           </a:xfrm>
           <a:prstGeom prst="rect">
             <a:avLst/>
@@ -10126,7 +10143,7 @@
         <p:spPr>
           <a:xfrm>
             <a:off x="7197480" y="3439800"/>
-            <a:ext cx="908280" cy="908280"/>
+            <a:ext cx="907920" cy="907920"/>
           </a:xfrm>
           <a:prstGeom prst="rect">
             <a:avLst/>
@@ -10149,7 +10166,7 @@
         <p:spPr>
           <a:xfrm>
             <a:off x="4758840" y="3366360"/>
-            <a:ext cx="908280" cy="908280"/>
+            <a:ext cx="907920" cy="907920"/>
           </a:xfrm>
           <a:prstGeom prst="rect">
             <a:avLst/>
@@ -10168,7 +10185,7 @@
         <p:spPr>
           <a:xfrm>
             <a:off x="3568680" y="3429000"/>
-            <a:ext cx="931320" cy="908280"/>
+            <a:ext cx="930960" cy="907920"/>
           </a:xfrm>
           <a:prstGeom prst="mathPlus">
             <a:avLst>
@@ -10206,7 +10223,7 @@
         <p:spPr>
           <a:xfrm>
             <a:off x="6095880" y="3654360"/>
-            <a:ext cx="732240" cy="560160"/>
+            <a:ext cx="731880" cy="559800"/>
           </a:xfrm>
           <a:prstGeom prst="mathEqual">
             <a:avLst>
@@ -10267,7 +10284,7 @@
         <p:spPr>
           <a:xfrm>
             <a:off x="4750920" y="2898360"/>
-            <a:ext cx="2683800" cy="3713760"/>
+            <a:ext cx="2683440" cy="3713400"/>
           </a:xfrm>
           <a:prstGeom prst="rect">
             <a:avLst/>
@@ -10310,7 +10327,7 @@
         <p:spPr>
           <a:xfrm>
             <a:off x="684360" y="4487400"/>
-            <a:ext cx="8528400" cy="1500840"/>
+            <a:ext cx="8528040" cy="1500480"/>
           </a:xfrm>
           <a:prstGeom prst="rect">
             <a:avLst/>
@@ -10359,7 +10376,7 @@
         <p:spPr>
           <a:xfrm>
             <a:off x="684360" y="685800"/>
-            <a:ext cx="8528400" cy="3609000"/>
+            <a:ext cx="8528040" cy="3608640"/>
           </a:xfrm>
           <a:prstGeom prst="rect">
             <a:avLst/>
@@ -10378,7 +10395,7 @@
         <p:txBody>
           <a:bodyPr lIns="90000" rIns="90000" tIns="45000" bIns="45000" anchor="ctr"/>
           <a:p>
-            <a:pPr marL="285840" indent="-279720">
+            <a:pPr marL="285840" indent="-279360">
               <a:lnSpc>
                 <a:spcPct val="100000"/>
               </a:lnSpc>
@@ -10514,7 +10531,7 @@
         <p:spPr>
           <a:xfrm>
             <a:off x="4843440" y="2989800"/>
-            <a:ext cx="635760" cy="635760"/>
+            <a:ext cx="635400" cy="635400"/>
           </a:xfrm>
           <a:prstGeom prst="rect">
             <a:avLst/>
@@ -10537,7 +10554,7 @@
         <p:spPr>
           <a:xfrm>
             <a:off x="5028120" y="4248360"/>
-            <a:ext cx="908280" cy="908280"/>
+            <a:ext cx="907920" cy="907920"/>
           </a:xfrm>
           <a:prstGeom prst="rect">
             <a:avLst/>
@@ -10560,7 +10577,7 @@
         <p:spPr>
           <a:xfrm>
             <a:off x="5506200" y="5025240"/>
-            <a:ext cx="908280" cy="908280"/>
+            <a:ext cx="907920" cy="907920"/>
           </a:xfrm>
           <a:prstGeom prst="rect">
             <a:avLst/>
@@ -10583,7 +10600,7 @@
         <p:spPr>
           <a:xfrm>
             <a:off x="6042600" y="4248360"/>
-            <a:ext cx="908280" cy="908280"/>
+            <a:ext cx="907920" cy="907920"/>
           </a:xfrm>
           <a:prstGeom prst="rect">
             <a:avLst/>
@@ -10606,7 +10623,7 @@
         <p:spPr>
           <a:xfrm>
             <a:off x="7944480" y="2602440"/>
-            <a:ext cx="908280" cy="908280"/>
+            <a:ext cx="907920" cy="907920"/>
           </a:xfrm>
           <a:prstGeom prst="rect">
             <a:avLst/>
@@ -10629,7 +10646,7 @@
         <p:spPr>
           <a:xfrm>
             <a:off x="6671160" y="3059640"/>
-            <a:ext cx="565560" cy="565560"/>
+            <a:ext cx="565200" cy="565200"/>
           </a:xfrm>
           <a:prstGeom prst="rect">
             <a:avLst/>
@@ -10652,7 +10669,7 @@
         <p:spPr>
           <a:xfrm>
             <a:off x="2973240" y="3863520"/>
-            <a:ext cx="908280" cy="908280"/>
+            <a:ext cx="907920" cy="907920"/>
           </a:xfrm>
           <a:prstGeom prst="rect">
             <a:avLst/>
@@ -10671,7 +10688,7 @@
         <p:spPr>
           <a:xfrm>
             <a:off x="4012560" y="4487400"/>
-            <a:ext cx="1487520" cy="851040"/>
+            <a:ext cx="1487160" cy="850680"/>
           </a:xfrm>
           <a:custGeom>
             <a:avLst/>
@@ -10723,7 +10740,7 @@
         <p:spPr>
           <a:xfrm>
             <a:off x="4012560" y="4248360"/>
-            <a:ext cx="2023920" cy="232920"/>
+            <a:ext cx="2023560" cy="232560"/>
           </a:xfrm>
           <a:custGeom>
             <a:avLst/>
@@ -10775,7 +10792,7 @@
         <p:spPr>
           <a:xfrm>
             <a:off x="4012560" y="4367880"/>
-            <a:ext cx="932760" cy="233640"/>
+            <a:ext cx="932400" cy="233280"/>
           </a:xfrm>
           <a:custGeom>
             <a:avLst/>
@@ -10827,7 +10844,7 @@
         <p:spPr>
           <a:xfrm flipV="1">
             <a:off x="7242840" y="3216240"/>
-            <a:ext cx="623520" cy="117000"/>
+            <a:ext cx="623160" cy="116640"/>
           </a:xfrm>
           <a:custGeom>
             <a:avLst/>
@@ -10902,7 +10919,7 @@
         <p:spPr>
           <a:xfrm>
             <a:off x="684360" y="4487400"/>
-            <a:ext cx="8528400" cy="1500840"/>
+            <a:ext cx="8528040" cy="1500480"/>
           </a:xfrm>
           <a:prstGeom prst="rect">
             <a:avLst/>
@@ -10951,7 +10968,7 @@
         <p:spPr>
           <a:xfrm>
             <a:off x="684360" y="685800"/>
-            <a:ext cx="8528400" cy="3609000"/>
+            <a:ext cx="8528040" cy="3608640"/>
           </a:xfrm>
           <a:prstGeom prst="rect">
             <a:avLst/>
@@ -10970,7 +10987,7 @@
         <p:txBody>
           <a:bodyPr lIns="90000" rIns="90000" tIns="45000" bIns="45000" anchor="ctr"/>
           <a:p>
-            <a:pPr marL="285840" indent="-279720">
+            <a:pPr marL="285840" indent="-279360">
               <a:lnSpc>
                 <a:spcPct val="100000"/>
               </a:lnSpc>
@@ -11138,7 +11155,7 @@
         <p:spPr>
           <a:xfrm>
             <a:off x="5430600" y="2730600"/>
-            <a:ext cx="2683800" cy="3713760"/>
+            <a:ext cx="2683440" cy="3713400"/>
           </a:xfrm>
           <a:prstGeom prst="rect">
             <a:avLst/>
@@ -11185,7 +11202,7 @@
         <p:spPr>
           <a:xfrm>
             <a:off x="5523120" y="2822040"/>
-            <a:ext cx="635760" cy="635760"/>
+            <a:ext cx="635400" cy="635400"/>
           </a:xfrm>
           <a:prstGeom prst="rect">
             <a:avLst/>
@@ -11208,7 +11225,7 @@
         <p:spPr>
           <a:xfrm>
             <a:off x="5707800" y="4080600"/>
-            <a:ext cx="908280" cy="908280"/>
+            <a:ext cx="907920" cy="907920"/>
           </a:xfrm>
           <a:prstGeom prst="rect">
             <a:avLst/>
@@ -11231,7 +11248,7 @@
         <p:spPr>
           <a:xfrm>
             <a:off x="6185880" y="4857480"/>
-            <a:ext cx="908280" cy="908280"/>
+            <a:ext cx="907920" cy="907920"/>
           </a:xfrm>
           <a:prstGeom prst="rect">
             <a:avLst/>
@@ -11254,7 +11271,7 @@
         <p:spPr>
           <a:xfrm>
             <a:off x="6722280" y="4080600"/>
-            <a:ext cx="908280" cy="908280"/>
+            <a:ext cx="907920" cy="907920"/>
           </a:xfrm>
           <a:prstGeom prst="rect">
             <a:avLst/>
@@ -11277,7 +11294,7 @@
         <p:spPr>
           <a:xfrm>
             <a:off x="3652920" y="3695760"/>
-            <a:ext cx="908280" cy="908280"/>
+            <a:ext cx="907920" cy="907920"/>
           </a:xfrm>
           <a:prstGeom prst="rect">
             <a:avLst/>
@@ -11296,7 +11313,7 @@
         <p:spPr>
           <a:xfrm>
             <a:off x="4692240" y="4319640"/>
-            <a:ext cx="1487520" cy="851040"/>
+            <a:ext cx="1487160" cy="850680"/>
           </a:xfrm>
           <a:custGeom>
             <a:avLst/>
@@ -11348,7 +11365,7 @@
         <p:spPr>
           <a:xfrm>
             <a:off x="4692240" y="4080600"/>
-            <a:ext cx="2023920" cy="232920"/>
+            <a:ext cx="2023560" cy="232560"/>
           </a:xfrm>
           <a:custGeom>
             <a:avLst/>
@@ -11400,7 +11417,7 @@
         <p:spPr>
           <a:xfrm>
             <a:off x="4692240" y="4200120"/>
-            <a:ext cx="932760" cy="233640"/>
+            <a:ext cx="932400" cy="233280"/>
           </a:xfrm>
           <a:custGeom>
             <a:avLst/>
@@ -11456,7 +11473,7 @@
         <p:spPr>
           <a:xfrm>
             <a:off x="9653760" y="3605400"/>
-            <a:ext cx="908280" cy="908280"/>
+            <a:ext cx="907920" cy="907920"/>
           </a:xfrm>
           <a:prstGeom prst="rect">
             <a:avLst/>
@@ -11474,8 +11491,8 @@
         </p:nvSpPr>
         <p:spPr>
           <a:xfrm rot="10325400">
-            <a:off x="7858440" y="4108320"/>
-            <a:ext cx="1779840" cy="301680"/>
+            <a:off x="7858440" y="4108680"/>
+            <a:ext cx="1779480" cy="301320"/>
           </a:xfrm>
           <a:prstGeom prst="rightArrow">
             <a:avLst>
@@ -11539,7 +11556,7 @@
         <p:spPr>
           <a:xfrm>
             <a:off x="684360" y="4487400"/>
-            <a:ext cx="8528400" cy="1500840"/>
+            <a:ext cx="8528040" cy="1500480"/>
           </a:xfrm>
           <a:prstGeom prst="rect">
             <a:avLst/>
@@ -11588,7 +11605,7 @@
         <p:spPr>
           <a:xfrm>
             <a:off x="684360" y="685800"/>
-            <a:ext cx="8528400" cy="3609000"/>
+            <a:ext cx="8528040" cy="3608640"/>
           </a:xfrm>
           <a:prstGeom prst="rect">
             <a:avLst/>
@@ -11618,7 +11635,7 @@
         <p:spPr>
           <a:xfrm>
             <a:off x="4069440" y="82800"/>
-            <a:ext cx="4040280" cy="2840760"/>
+            <a:ext cx="4039920" cy="2840400"/>
           </a:xfrm>
           <a:prstGeom prst="rect">
             <a:avLst/>
@@ -11641,7 +11658,7 @@
         <p:spPr>
           <a:xfrm>
             <a:off x="83880" y="3103560"/>
-            <a:ext cx="3861360" cy="1638360"/>
+            <a:ext cx="3861000" cy="1638000"/>
           </a:xfrm>
           <a:prstGeom prst="rect">
             <a:avLst/>
@@ -11664,7 +11681,7 @@
         <p:spPr>
           <a:xfrm>
             <a:off x="4161600" y="3103560"/>
-            <a:ext cx="3861360" cy="1638360"/>
+            <a:ext cx="3861000" cy="1638000"/>
           </a:xfrm>
           <a:prstGeom prst="rect">
             <a:avLst/>
@@ -11687,7 +11704,7 @@
         <p:spPr>
           <a:xfrm>
             <a:off x="8230320" y="3103560"/>
-            <a:ext cx="3861360" cy="1638360"/>
+            <a:ext cx="3861000" cy="1638000"/>
           </a:xfrm>
           <a:prstGeom prst="rect">
             <a:avLst/>
@@ -11706,7 +11723,7 @@
         <p:spPr>
           <a:xfrm>
             <a:off x="3993840" y="3766680"/>
-            <a:ext cx="145080" cy="313200"/>
+            <a:ext cx="144720" cy="312840"/>
           </a:xfrm>
           <a:prstGeom prst="rightArrow">
             <a:avLst>
@@ -11745,7 +11762,7 @@
         <p:spPr>
           <a:xfrm>
             <a:off x="8073360" y="3793320"/>
-            <a:ext cx="126000" cy="313200"/>
+            <a:ext cx="125640" cy="312840"/>
           </a:xfrm>
           <a:prstGeom prst="rightArrow">
             <a:avLst>
@@ -11784,7 +11801,7 @@
         <p:spPr>
           <a:xfrm>
             <a:off x="2701080" y="5176080"/>
-            <a:ext cx="1830960" cy="916560"/>
+            <a:ext cx="1830600" cy="916200"/>
           </a:xfrm>
           <a:prstGeom prst="wedgeRectCallout">
             <a:avLst>
@@ -11849,7 +11866,7 @@
         <p:spPr>
           <a:xfrm>
             <a:off x="6722640" y="5196600"/>
-            <a:ext cx="1962360" cy="819720"/>
+            <a:ext cx="1962000" cy="819360"/>
           </a:xfrm>
           <a:prstGeom prst="wedgeRectCallout">
             <a:avLst>
@@ -11914,7 +11931,7 @@
         <p:spPr>
           <a:xfrm>
             <a:off x="9731160" y="5131440"/>
-            <a:ext cx="2099520" cy="650520"/>
+            <a:ext cx="2099160" cy="650160"/>
           </a:xfrm>
           <a:prstGeom prst="wedgeRectCallout">
             <a:avLst>
@@ -11979,7 +11996,7 @@
         <p:spPr>
           <a:xfrm>
             <a:off x="5033520" y="2516760"/>
-            <a:ext cx="2569320" cy="358920"/>
+            <a:ext cx="2568960" cy="358560"/>
           </a:xfrm>
           <a:prstGeom prst="rect">
             <a:avLst/>
@@ -12027,8 +12044,8 @@
         </p:nvSpPr>
         <p:spPr>
           <a:xfrm rot="16200000">
-            <a:off x="3177360" y="1271160"/>
-            <a:ext cx="1958400" cy="358920"/>
+            <a:off x="3177360" y="1271520"/>
+            <a:ext cx="1958040" cy="358560"/>
           </a:xfrm>
           <a:prstGeom prst="rect">
             <a:avLst/>
@@ -12099,7 +12116,7 @@
         <p:spPr>
           <a:xfrm>
             <a:off x="684360" y="4487400"/>
-            <a:ext cx="8528400" cy="1500840"/>
+            <a:ext cx="8528040" cy="1500480"/>
           </a:xfrm>
           <a:prstGeom prst="rect">
             <a:avLst/>
@@ -12150,9 +12167,9 @@
         <p:grpSpPr>
           <a:xfrm>
             <a:off x="948240" y="823320"/>
-            <a:ext cx="10286280" cy="3333600"/>
+            <a:ext cx="10285920" cy="3333240"/>
             <a:chOff x="948240" y="823320"/>
-            <a:chExt cx="10286280" cy="3333600"/>
+            <a:chExt cx="10285920" cy="3333240"/>
           </a:xfrm>
         </p:grpSpPr>
         <p:sp>
@@ -12164,7 +12181,7 @@
           <p:spPr>
             <a:xfrm>
               <a:off x="948240" y="823320"/>
-              <a:ext cx="1356480" cy="1356480"/>
+              <a:ext cx="1356120" cy="1356120"/>
             </a:xfrm>
             <a:prstGeom prst="ellipse">
               <a:avLst/>
@@ -12197,7 +12214,7 @@
           <p:spPr>
             <a:xfrm>
               <a:off x="1234440" y="1109520"/>
-              <a:ext cx="784080" cy="784080"/>
+              <a:ext cx="783720" cy="783720"/>
             </a:xfrm>
             <a:prstGeom prst="rect">
               <a:avLst/>
@@ -12228,7 +12245,7 @@
           <p:spPr>
             <a:xfrm>
               <a:off x="2602800" y="823320"/>
-              <a:ext cx="3205800" cy="1356480"/>
+              <a:ext cx="3205440" cy="1356120"/>
             </a:xfrm>
             <a:prstGeom prst="rect">
               <a:avLst/>
@@ -12280,7 +12297,7 @@
           <p:spPr>
             <a:xfrm>
               <a:off x="6374160" y="823320"/>
-              <a:ext cx="1356480" cy="1356480"/>
+              <a:ext cx="1356120" cy="1356120"/>
             </a:xfrm>
             <a:prstGeom prst="ellipse">
               <a:avLst/>
@@ -12313,7 +12330,7 @@
           <p:spPr>
             <a:xfrm>
               <a:off x="6660360" y="1109520"/>
-              <a:ext cx="784080" cy="784080"/>
+              <a:ext cx="783720" cy="783720"/>
             </a:xfrm>
             <a:prstGeom prst="rect">
               <a:avLst/>
@@ -12344,7 +12361,7 @@
           <p:spPr>
             <a:xfrm>
               <a:off x="8028720" y="823320"/>
-              <a:ext cx="3205800" cy="1356480"/>
+              <a:ext cx="3205440" cy="1356120"/>
             </a:xfrm>
             <a:prstGeom prst="rect">
               <a:avLst/>
@@ -12396,7 +12413,7 @@
           <p:spPr>
             <a:xfrm>
               <a:off x="948240" y="2800440"/>
-              <a:ext cx="1356480" cy="1356480"/>
+              <a:ext cx="1356120" cy="1356120"/>
             </a:xfrm>
             <a:prstGeom prst="ellipse">
               <a:avLst/>
@@ -12429,7 +12446,7 @@
           <p:spPr>
             <a:xfrm>
               <a:off x="1234440" y="3086640"/>
-              <a:ext cx="784080" cy="784080"/>
+              <a:ext cx="783720" cy="783720"/>
             </a:xfrm>
             <a:prstGeom prst="rect">
               <a:avLst/>
@@ -12460,7 +12477,7 @@
           <p:spPr>
             <a:xfrm>
               <a:off x="2602800" y="2800440"/>
-              <a:ext cx="3205800" cy="1356480"/>
+              <a:ext cx="3205440" cy="1356120"/>
             </a:xfrm>
             <a:prstGeom prst="rect">
               <a:avLst/>
@@ -12512,7 +12529,7 @@
           <p:spPr>
             <a:xfrm>
               <a:off x="6374160" y="2800440"/>
-              <a:ext cx="1356480" cy="1356480"/>
+              <a:ext cx="1356120" cy="1356120"/>
             </a:xfrm>
             <a:prstGeom prst="ellipse">
               <a:avLst/>
@@ -12545,7 +12562,7 @@
           <p:spPr>
             <a:xfrm>
               <a:off x="6660360" y="3086640"/>
-              <a:ext cx="784080" cy="784080"/>
+              <a:ext cx="783720" cy="783720"/>
             </a:xfrm>
             <a:prstGeom prst="rect">
               <a:avLst/>
@@ -12576,7 +12593,7 @@
           <p:spPr>
             <a:xfrm>
               <a:off x="8028720" y="2800440"/>
-              <a:ext cx="3205800" cy="1356480"/>
+              <a:ext cx="3205440" cy="1356120"/>
             </a:xfrm>
             <a:prstGeom prst="rect">
               <a:avLst/>
@@ -12666,7 +12683,7 @@
         <p:spPr>
           <a:xfrm>
             <a:off x="0" y="0"/>
-            <a:ext cx="12186000" cy="6851880"/>
+            <a:ext cx="12185640" cy="6851520"/>
           </a:xfrm>
           <a:prstGeom prst="rect">
             <a:avLst/>
@@ -12719,7 +12736,7 @@
         <p:spPr>
           <a:xfrm>
             <a:off x="0" y="0"/>
-            <a:ext cx="8123760" cy="6851880"/>
+            <a:ext cx="8123400" cy="6851520"/>
           </a:xfrm>
           <a:prstGeom prst="snip2DiagRect">
             <a:avLst>
@@ -12941,7 +12958,7 @@
         <p:spPr>
           <a:xfrm>
             <a:off x="8588520" y="941400"/>
-            <a:ext cx="3037680" cy="3242520"/>
+            <a:ext cx="3037320" cy="3242160"/>
           </a:xfrm>
           <a:prstGeom prst="rect">
             <a:avLst/>
@@ -12992,9 +13009,9 @@
         <p:grpSpPr>
           <a:xfrm>
             <a:off x="952560" y="2104200"/>
-            <a:ext cx="6160320" cy="2437200"/>
+            <a:ext cx="6159960" cy="2436840"/>
             <a:chOff x="952560" y="2104200"/>
-            <a:chExt cx="6160320" cy="2437200"/>
+            <a:chExt cx="6159960" cy="2436840"/>
           </a:xfrm>
         </p:grpSpPr>
         <p:sp>
@@ -13006,7 +13023,7 @@
           <p:spPr>
             <a:xfrm>
               <a:off x="952560" y="2104200"/>
-              <a:ext cx="810360" cy="810360"/>
+              <a:ext cx="810000" cy="810000"/>
             </a:xfrm>
             <a:prstGeom prst="ellipse">
               <a:avLst/>
@@ -13039,7 +13056,7 @@
           <p:spPr>
             <a:xfrm>
               <a:off x="1123920" y="2275560"/>
-              <a:ext cx="467280" cy="467280"/>
+              <a:ext cx="466920" cy="466920"/>
             </a:xfrm>
             <a:prstGeom prst="rect">
               <a:avLst/>
@@ -13070,7 +13087,7 @@
           <p:spPr>
             <a:xfrm>
               <a:off x="1944000" y="2104200"/>
-              <a:ext cx="1918080" cy="810360"/>
+              <a:ext cx="1917720" cy="810000"/>
             </a:xfrm>
             <a:prstGeom prst="rect">
               <a:avLst/>
@@ -13122,7 +13139,7 @@
           <p:spPr>
             <a:xfrm>
               <a:off x="4203360" y="2104200"/>
-              <a:ext cx="810360" cy="810360"/>
+              <a:ext cx="810000" cy="810000"/>
             </a:xfrm>
             <a:prstGeom prst="ellipse">
               <a:avLst/>
@@ -13155,7 +13172,7 @@
           <p:spPr>
             <a:xfrm>
               <a:off x="4375080" y="2275560"/>
-              <a:ext cx="467280" cy="467280"/>
+              <a:ext cx="466920" cy="466920"/>
             </a:xfrm>
             <a:prstGeom prst="rect">
               <a:avLst/>
@@ -13186,7 +13203,7 @@
           <p:spPr>
             <a:xfrm>
               <a:off x="5194800" y="2104200"/>
-              <a:ext cx="1918080" cy="810360"/>
+              <a:ext cx="1917720" cy="810000"/>
             </a:xfrm>
             <a:prstGeom prst="rect">
               <a:avLst/>
@@ -13238,7 +13255,7 @@
           <p:spPr>
             <a:xfrm>
               <a:off x="952560" y="3731040"/>
-              <a:ext cx="810360" cy="810360"/>
+              <a:ext cx="810000" cy="810000"/>
             </a:xfrm>
             <a:prstGeom prst="ellipse">
               <a:avLst/>
@@ -13271,7 +13288,7 @@
           <p:spPr>
             <a:xfrm>
               <a:off x="1123920" y="3902400"/>
-              <a:ext cx="467280" cy="467280"/>
+              <a:ext cx="466920" cy="466920"/>
             </a:xfrm>
             <a:prstGeom prst="rect">
               <a:avLst/>
@@ -13302,7 +13319,7 @@
           <p:spPr>
             <a:xfrm>
               <a:off x="1944000" y="3731040"/>
-              <a:ext cx="1918080" cy="810360"/>
+              <a:ext cx="1917720" cy="810000"/>
             </a:xfrm>
             <a:prstGeom prst="rect">
               <a:avLst/>
@@ -13354,7 +13371,7 @@
           <p:spPr>
             <a:xfrm>
               <a:off x="4203360" y="3731040"/>
-              <a:ext cx="810360" cy="810360"/>
+              <a:ext cx="810000" cy="810000"/>
             </a:xfrm>
             <a:prstGeom prst="ellipse">
               <a:avLst/>
@@ -13387,7 +13404,7 @@
           <p:spPr>
             <a:xfrm>
               <a:off x="4375080" y="3902400"/>
-              <a:ext cx="467280" cy="467280"/>
+              <a:ext cx="466920" cy="466920"/>
             </a:xfrm>
             <a:prstGeom prst="rect">
               <a:avLst/>
@@ -13418,7 +13435,7 @@
           <p:spPr>
             <a:xfrm>
               <a:off x="5194800" y="3731040"/>
-              <a:ext cx="1918080" cy="810360"/>
+              <a:ext cx="1917720" cy="810000"/>
             </a:xfrm>
             <a:prstGeom prst="rect">
               <a:avLst/>
@@ -13535,7 +13552,7 @@
         <p:spPr>
           <a:xfrm>
             <a:off x="684360" y="4487400"/>
-            <a:ext cx="8528400" cy="1500840"/>
+            <a:ext cx="8528040" cy="1500480"/>
           </a:xfrm>
           <a:prstGeom prst="rect">
             <a:avLst/>
@@ -13584,7 +13601,7 @@
         <p:spPr>
           <a:xfrm>
             <a:off x="684360" y="685800"/>
-            <a:ext cx="8528400" cy="3609000"/>
+            <a:ext cx="8528040" cy="3608640"/>
           </a:xfrm>
           <a:prstGeom prst="rect">
             <a:avLst/>
@@ -13603,7 +13620,7 @@
         <p:txBody>
           <a:bodyPr lIns="90000" rIns="90000" tIns="45000" bIns="45000" anchor="ctr"/>
           <a:p>
-            <a:pPr marL="285840" indent="-279720">
+            <a:pPr marL="285840" indent="-279360">
               <a:lnSpc>
                 <a:spcPct val="100000"/>
               </a:lnSpc>
@@ -13635,7 +13652,7 @@
             </a:endParaRPr>
           </a:p>
           <a:p>
-            <a:pPr marL="285840" indent="-279720">
+            <a:pPr marL="285840" indent="-279360">
               <a:lnSpc>
                 <a:spcPct val="100000"/>
               </a:lnSpc>
@@ -13667,7 +13684,7 @@
             </a:endParaRPr>
           </a:p>
           <a:p>
-            <a:pPr marL="285840" indent="-279720">
+            <a:pPr marL="285840" indent="-279360">
               <a:lnSpc>
                 <a:spcPct val="100000"/>
               </a:lnSpc>
@@ -13699,7 +13716,7 @@
             </a:endParaRPr>
           </a:p>
           <a:p>
-            <a:pPr marL="285840" indent="-279720">
+            <a:pPr marL="285840" indent="-279360">
               <a:lnSpc>
                 <a:spcPct val="100000"/>
               </a:lnSpc>
@@ -13763,7 +13780,7 @@
         <p:spPr>
           <a:xfrm>
             <a:off x="684360" y="4487400"/>
-            <a:ext cx="8528400" cy="1500840"/>
+            <a:ext cx="8528040" cy="1500480"/>
           </a:xfrm>
           <a:prstGeom prst="rect">
             <a:avLst/>
@@ -13816,7 +13833,7 @@
         <p:spPr>
           <a:xfrm>
             <a:off x="5221440" y="75600"/>
-            <a:ext cx="908280" cy="908280"/>
+            <a:ext cx="907920" cy="907920"/>
           </a:xfrm>
           <a:prstGeom prst="rect">
             <a:avLst/>
@@ -13839,7 +13856,7 @@
         <p:spPr>
           <a:xfrm>
             <a:off x="4695120" y="4444560"/>
-            <a:ext cx="908280" cy="908280"/>
+            <a:ext cx="907920" cy="907920"/>
           </a:xfrm>
           <a:prstGeom prst="rect">
             <a:avLst/>
@@ -13862,7 +13879,7 @@
         <p:spPr>
           <a:xfrm>
             <a:off x="2603880" y="2294640"/>
-            <a:ext cx="908280" cy="908280"/>
+            <a:ext cx="907920" cy="907920"/>
           </a:xfrm>
           <a:prstGeom prst="rect">
             <a:avLst/>
@@ -13885,7 +13902,7 @@
         <p:spPr>
           <a:xfrm>
             <a:off x="9767160" y="3294360"/>
-            <a:ext cx="908280" cy="908280"/>
+            <a:ext cx="907920" cy="907920"/>
           </a:xfrm>
           <a:prstGeom prst="rect">
             <a:avLst/>
@@ -13908,7 +13925,7 @@
         <p:spPr>
           <a:xfrm>
             <a:off x="1967760" y="3811680"/>
-            <a:ext cx="908280" cy="908280"/>
+            <a:ext cx="907920" cy="907920"/>
           </a:xfrm>
           <a:prstGeom prst="rect">
             <a:avLst/>
@@ -13931,7 +13948,7 @@
         <p:spPr>
           <a:xfrm>
             <a:off x="5221440" y="2907360"/>
-            <a:ext cx="908280" cy="908280"/>
+            <a:ext cx="907920" cy="907920"/>
           </a:xfrm>
           <a:prstGeom prst="rect">
             <a:avLst/>
@@ -13954,7 +13971,7 @@
         <p:spPr>
           <a:xfrm>
             <a:off x="1093680" y="3282480"/>
-            <a:ext cx="908280" cy="908280"/>
+            <a:ext cx="907920" cy="907920"/>
           </a:xfrm>
           <a:prstGeom prst="rect">
             <a:avLst/>
@@ -13977,7 +13994,7 @@
         <p:spPr>
           <a:xfrm>
             <a:off x="8595360" y="3808800"/>
-            <a:ext cx="908280" cy="908280"/>
+            <a:ext cx="907920" cy="907920"/>
           </a:xfrm>
           <a:prstGeom prst="rect">
             <a:avLst/>
@@ -14000,7 +14017,7 @@
         <p:spPr>
           <a:xfrm>
             <a:off x="7839000" y="2294640"/>
-            <a:ext cx="908280" cy="908280"/>
+            <a:ext cx="907920" cy="907920"/>
           </a:xfrm>
           <a:prstGeom prst="rect">
             <a:avLst/>
@@ -14019,7 +14036,7 @@
         <p:spPr>
           <a:xfrm>
             <a:off x="6312960" y="944640"/>
-            <a:ext cx="1520280" cy="1334160"/>
+            <a:ext cx="1519920" cy="1333800"/>
           </a:xfrm>
           <a:custGeom>
             <a:avLst/>
@@ -14072,7 +14089,7 @@
         <p:spPr>
           <a:xfrm>
             <a:off x="5678640" y="1145160"/>
-            <a:ext cx="360" cy="1600560"/>
+            <a:ext cx="360" cy="1600200"/>
           </a:xfrm>
           <a:custGeom>
             <a:avLst/>
@@ -14125,7 +14142,7 @@
         <p:spPr>
           <a:xfrm flipH="1">
             <a:off x="3420360" y="990000"/>
-            <a:ext cx="1611720" cy="1374480"/>
+            <a:ext cx="1611360" cy="1374120"/>
           </a:xfrm>
           <a:custGeom>
             <a:avLst/>
@@ -14178,7 +14195,7 @@
         <p:spPr>
           <a:xfrm>
             <a:off x="2082960" y="3279600"/>
-            <a:ext cx="911520" cy="358920"/>
+            <a:ext cx="911160" cy="358560"/>
           </a:xfrm>
           <a:prstGeom prst="rect">
             <a:avLst/>
@@ -14227,7 +14244,7 @@
         <p:spPr>
           <a:xfrm>
             <a:off x="5227200" y="4030200"/>
-            <a:ext cx="923760" cy="358920"/>
+            <a:ext cx="923400" cy="358560"/>
           </a:xfrm>
           <a:prstGeom prst="rect">
             <a:avLst/>
@@ -14276,7 +14293,7 @@
         <p:spPr>
           <a:xfrm>
             <a:off x="8246520" y="3279600"/>
-            <a:ext cx="1249920" cy="358920"/>
+            <a:ext cx="1249560" cy="358560"/>
           </a:xfrm>
           <a:prstGeom prst="rect">
             <a:avLst/>
@@ -14325,7 +14342,7 @@
         <p:spPr>
           <a:xfrm>
             <a:off x="481680" y="348120"/>
-            <a:ext cx="1806120" cy="358920"/>
+            <a:ext cx="1805760" cy="358560"/>
           </a:xfrm>
           <a:prstGeom prst="rect">
             <a:avLst/>
@@ -14378,7 +14395,7 @@
         <p:spPr>
           <a:xfrm>
             <a:off x="5855760" y="4444560"/>
-            <a:ext cx="908280" cy="908280"/>
+            <a:ext cx="907920" cy="907920"/>
           </a:xfrm>
           <a:prstGeom prst="rect">
             <a:avLst/>
@@ -14419,7 +14436,7 @@
         <p:spPr>
           <a:xfrm>
             <a:off x="684360" y="4487400"/>
-            <a:ext cx="8528400" cy="1500840"/>
+            <a:ext cx="8528040" cy="1500480"/>
           </a:xfrm>
           <a:prstGeom prst="rect">
             <a:avLst/>
@@ -14472,7 +14489,7 @@
         <p:spPr>
           <a:xfrm>
             <a:off x="7839000" y="2560320"/>
-            <a:ext cx="1308240" cy="594000"/>
+            <a:ext cx="1307880" cy="593640"/>
           </a:xfrm>
           <a:prstGeom prst="rect">
             <a:avLst/>
@@ -14491,7 +14508,7 @@
         <p:spPr>
           <a:xfrm>
             <a:off x="480240" y="348120"/>
-            <a:ext cx="1786320" cy="358920"/>
+            <a:ext cx="1785960" cy="358560"/>
           </a:xfrm>
           <a:prstGeom prst="rect">
             <a:avLst/>
@@ -14540,7 +14557,7 @@
         <p:spPr>
           <a:xfrm>
             <a:off x="6384240" y="990000"/>
-            <a:ext cx="1520280" cy="1334160"/>
+            <a:ext cx="1519920" cy="1333800"/>
           </a:xfrm>
           <a:custGeom>
             <a:avLst/>
@@ -14593,7 +14610,7 @@
         <p:spPr>
           <a:xfrm>
             <a:off x="5678640" y="1145160"/>
-            <a:ext cx="360" cy="1600560"/>
+            <a:ext cx="360" cy="1600200"/>
           </a:xfrm>
           <a:custGeom>
             <a:avLst/>
@@ -14646,7 +14663,7 @@
         <p:spPr>
           <a:xfrm flipH="1">
             <a:off x="3420360" y="990000"/>
-            <a:ext cx="1611720" cy="1374480"/>
+            <a:ext cx="1611360" cy="1374120"/>
           </a:xfrm>
           <a:custGeom>
             <a:avLst/>
@@ -14699,7 +14716,7 @@
         <p:spPr>
           <a:xfrm>
             <a:off x="2082960" y="3279600"/>
-            <a:ext cx="911520" cy="358920"/>
+            <a:ext cx="911160" cy="358560"/>
           </a:xfrm>
           <a:prstGeom prst="rect">
             <a:avLst/>
@@ -14748,7 +14765,7 @@
         <p:spPr>
           <a:xfrm>
             <a:off x="5227200" y="4030200"/>
-            <a:ext cx="923760" cy="358920"/>
+            <a:ext cx="923400" cy="358560"/>
           </a:xfrm>
           <a:prstGeom prst="rect">
             <a:avLst/>
@@ -14797,7 +14814,7 @@
         <p:spPr>
           <a:xfrm>
             <a:off x="8246520" y="3279600"/>
-            <a:ext cx="1249920" cy="358920"/>
+            <a:ext cx="1249560" cy="358560"/>
           </a:xfrm>
           <a:prstGeom prst="rect">
             <a:avLst/>
@@ -14850,7 +14867,7 @@
         <p:spPr>
           <a:xfrm>
             <a:off x="4979520" y="218880"/>
-            <a:ext cx="1327320" cy="613080"/>
+            <a:ext cx="1326960" cy="612720"/>
           </a:xfrm>
           <a:prstGeom prst="rect">
             <a:avLst/>
@@ -14873,7 +14890,7 @@
         <p:spPr>
           <a:xfrm>
             <a:off x="2102760" y="2514600"/>
-            <a:ext cx="1317960" cy="603360"/>
+            <a:ext cx="1317600" cy="603000"/>
           </a:xfrm>
           <a:prstGeom prst="rect">
             <a:avLst/>
@@ -14896,7 +14913,7 @@
         <p:spPr>
           <a:xfrm>
             <a:off x="4235760" y="3279600"/>
-            <a:ext cx="1308240" cy="594000"/>
+            <a:ext cx="1307880" cy="593640"/>
           </a:xfrm>
           <a:prstGeom prst="rect">
             <a:avLst/>
@@ -14919,7 +14936,7 @@
         <p:spPr>
           <a:xfrm>
             <a:off x="5833080" y="3279600"/>
-            <a:ext cx="1308240" cy="594000"/>
+            <a:ext cx="1307880" cy="593640"/>
           </a:xfrm>
           <a:prstGeom prst="rect">
             <a:avLst/>
@@ -14960,7 +14977,7 @@
         <p:spPr>
           <a:xfrm>
             <a:off x="684360" y="4487400"/>
-            <a:ext cx="8528400" cy="1500840"/>
+            <a:ext cx="8528040" cy="1500480"/>
           </a:xfrm>
           <a:prstGeom prst="rect">
             <a:avLst/>
@@ -15009,7 +15026,7 @@
         <p:spPr>
           <a:xfrm>
             <a:off x="684360" y="685800"/>
-            <a:ext cx="8528400" cy="3609000"/>
+            <a:ext cx="8528040" cy="3608640"/>
           </a:xfrm>
           <a:prstGeom prst="rect">
             <a:avLst/>
@@ -15028,7 +15045,7 @@
         <p:txBody>
           <a:bodyPr lIns="90000" rIns="90000" tIns="45000" bIns="45000" anchor="ctr"/>
           <a:p>
-            <a:pPr marL="285840" indent="-279720">
+            <a:pPr marL="285840" indent="-279360">
               <a:lnSpc>
                 <a:spcPct val="100000"/>
               </a:lnSpc>
@@ -15104,7 +15121,7 @@
         <p:spPr>
           <a:xfrm>
             <a:off x="666000" y="2574360"/>
-            <a:ext cx="4804560" cy="2967840"/>
+            <a:ext cx="4804200" cy="2967480"/>
           </a:xfrm>
           <a:prstGeom prst="roundRect">
             <a:avLst>
@@ -15254,7 +15271,7 @@
         <p:spPr>
           <a:xfrm>
             <a:off x="684360" y="5241960"/>
-            <a:ext cx="8528400" cy="1500840"/>
+            <a:ext cx="8528040" cy="1500480"/>
           </a:xfrm>
           <a:prstGeom prst="rect">
             <a:avLst/>
@@ -15303,7 +15320,7 @@
         <p:spPr>
           <a:xfrm>
             <a:off x="684360" y="685800"/>
-            <a:ext cx="10983960" cy="2282040"/>
+            <a:ext cx="10983600" cy="2281680"/>
           </a:xfrm>
           <a:prstGeom prst="rect">
             <a:avLst/>
@@ -15324,7 +15341,7 @@
             <a:normAutofit/>
           </a:bodyPr>
           <a:p>
-            <a:pPr marL="285840" indent="-279720">
+            <a:pPr marL="285840" indent="-279360">
               <a:lnSpc>
                 <a:spcPct val="100000"/>
               </a:lnSpc>
@@ -15406,7 +15423,7 @@
             </a:endParaRPr>
           </a:p>
           <a:p>
-            <a:pPr marL="285840" indent="-279720">
+            <a:pPr marL="285840" indent="-279360">
               <a:lnSpc>
                 <a:spcPct val="100000"/>
               </a:lnSpc>
@@ -15530,7 +15547,7 @@
         <p:spPr>
           <a:xfrm>
             <a:off x="2523960" y="3718800"/>
-            <a:ext cx="722160" cy="717120"/>
+            <a:ext cx="721800" cy="716760"/>
           </a:xfrm>
           <a:prstGeom prst="ellipse">
             <a:avLst/>
@@ -15598,7 +15615,7 @@
         <p:spPr>
           <a:xfrm>
             <a:off x="3363480" y="3303360"/>
-            <a:ext cx="1211400" cy="401040"/>
+            <a:ext cx="1211040" cy="400680"/>
           </a:xfrm>
           <a:prstGeom prst="ellipse">
             <a:avLst/>
@@ -15666,7 +15683,7 @@
         <p:spPr>
           <a:xfrm>
             <a:off x="744120" y="3208680"/>
-            <a:ext cx="1584720" cy="669240"/>
+            <a:ext cx="1584360" cy="668880"/>
           </a:xfrm>
           <a:prstGeom prst="ellipse">
             <a:avLst/>
@@ -15734,7 +15751,7 @@
         <p:spPr>
           <a:xfrm>
             <a:off x="2119680" y="4628880"/>
-            <a:ext cx="1523880" cy="669240"/>
+            <a:ext cx="1523520" cy="668880"/>
           </a:xfrm>
           <a:prstGeom prst="ellipse">
             <a:avLst/>
@@ -15802,7 +15819,7 @@
         <p:spPr>
           <a:xfrm>
             <a:off x="6819480" y="2574360"/>
-            <a:ext cx="4804560" cy="2967840"/>
+            <a:ext cx="4804200" cy="2967480"/>
           </a:xfrm>
           <a:prstGeom prst="roundRect">
             <a:avLst>
@@ -15952,7 +15969,7 @@
         <p:spPr>
           <a:xfrm>
             <a:off x="7103880" y="4147560"/>
-            <a:ext cx="4372920" cy="853200"/>
+            <a:ext cx="4372560" cy="852840"/>
           </a:xfrm>
           <a:prstGeom prst="ellipse">
             <a:avLst/>
@@ -16020,7 +16037,7 @@
         <p:spPr>
           <a:xfrm>
             <a:off x="9898200" y="3332520"/>
-            <a:ext cx="1211400" cy="401040"/>
+            <a:ext cx="1211040" cy="400680"/>
           </a:xfrm>
           <a:prstGeom prst="ellipse">
             <a:avLst/>
@@ -16088,7 +16105,7 @@
         <p:spPr>
           <a:xfrm>
             <a:off x="6965640" y="3288960"/>
-            <a:ext cx="1584720" cy="669240"/>
+            <a:ext cx="1584360" cy="668880"/>
           </a:xfrm>
           <a:prstGeom prst="ellipse">
             <a:avLst/>
@@ -16156,7 +16173,7 @@
         <p:spPr>
           <a:xfrm>
             <a:off x="8287920" y="2688120"/>
-            <a:ext cx="1867680" cy="669240"/>
+            <a:ext cx="1867320" cy="668880"/>
           </a:xfrm>
           <a:prstGeom prst="ellipse">
             <a:avLst/>
@@ -16273,7 +16290,7 @@
         <p:spPr>
           <a:xfrm>
             <a:off x="684360" y="4487400"/>
-            <a:ext cx="8528400" cy="1500840"/>
+            <a:ext cx="8528040" cy="1500480"/>
           </a:xfrm>
           <a:prstGeom prst="rect">
             <a:avLst/>
@@ -16322,7 +16339,7 @@
         <p:spPr>
           <a:xfrm>
             <a:off x="684360" y="685800"/>
-            <a:ext cx="11356560" cy="3609000"/>
+            <a:ext cx="11356200" cy="3608640"/>
           </a:xfrm>
           <a:prstGeom prst="rect">
             <a:avLst/>
@@ -16343,7 +16360,7 @@
             <a:normAutofit/>
           </a:bodyPr>
           <a:p>
-            <a:pPr marL="285840" indent="-279720">
+            <a:pPr marL="285840" indent="-279360">
               <a:lnSpc>
                 <a:spcPct val="100000"/>
               </a:lnSpc>
@@ -16385,7 +16402,7 @@
             </a:endParaRPr>
           </a:p>
           <a:p>
-            <a:pPr marL="285840" indent="-279720">
+            <a:pPr marL="285840" indent="-279360">
               <a:lnSpc>
                 <a:spcPct val="100000"/>
               </a:lnSpc>
@@ -16575,7 +16592,7 @@
             </a:endParaRPr>
           </a:p>
           <a:p>
-            <a:pPr marL="285840" indent="-279720">
+            <a:pPr marL="285840" indent="-279360">
               <a:lnSpc>
                 <a:spcPct val="100000"/>
               </a:lnSpc>
@@ -16607,7 +16624,7 @@
             </a:endParaRPr>
           </a:p>
           <a:p>
-            <a:pPr marL="285840" indent="-279720">
+            <a:pPr marL="285840" indent="-279360">
               <a:lnSpc>
                 <a:spcPct val="100000"/>
               </a:lnSpc>
@@ -16698,7 +16715,7 @@
         <p:spPr>
           <a:xfrm>
             <a:off x="684360" y="4487400"/>
-            <a:ext cx="8528400" cy="1500840"/>
+            <a:ext cx="8528040" cy="1500480"/>
           </a:xfrm>
           <a:prstGeom prst="rect">
             <a:avLst/>
@@ -16747,7 +16764,7 @@
         <p:spPr>
           <a:xfrm>
             <a:off x="684360" y="685800"/>
-            <a:ext cx="8528400" cy="3609000"/>
+            <a:ext cx="8528040" cy="3608640"/>
           </a:xfrm>
           <a:prstGeom prst="rect">
             <a:avLst/>
@@ -16766,7 +16783,7 @@
         <p:txBody>
           <a:bodyPr lIns="90000" rIns="90000" tIns="45000" bIns="45000" anchor="ctr"/>
           <a:p>
-            <a:pPr marL="285840" indent="-279720">
+            <a:pPr marL="285840" indent="-279360">
               <a:lnSpc>
                 <a:spcPct val="100000"/>
               </a:lnSpc>
@@ -16868,7 +16885,7 @@
             </a:endParaRPr>
           </a:p>
           <a:p>
-            <a:pPr marL="285840" indent="-279720">
+            <a:pPr marL="285840" indent="-279360">
               <a:lnSpc>
                 <a:spcPct val="100000"/>
               </a:lnSpc>
@@ -16970,7 +16987,7 @@
         <p:spPr>
           <a:xfrm>
             <a:off x="2521440" y="3979080"/>
-            <a:ext cx="1875960" cy="801720"/>
+            <a:ext cx="1875600" cy="801360"/>
           </a:xfrm>
           <a:prstGeom prst="rect">
             <a:avLst/>
@@ -17036,7 +17053,7 @@
         <p:spPr>
           <a:xfrm>
             <a:off x="5487840" y="3979080"/>
-            <a:ext cx="1875960" cy="801720"/>
+            <a:ext cx="1875600" cy="801360"/>
           </a:xfrm>
           <a:prstGeom prst="rect">
             <a:avLst/>
@@ -17102,7 +17119,7 @@
         <p:spPr>
           <a:xfrm>
             <a:off x="4004640" y="2771640"/>
-            <a:ext cx="1875960" cy="801720"/>
+            <a:ext cx="1875600" cy="801360"/>
           </a:xfrm>
           <a:prstGeom prst="rect">
             <a:avLst/>
@@ -17168,7 +17185,7 @@
         <p:spPr>
           <a:xfrm>
             <a:off x="4483080" y="4383000"/>
-            <a:ext cx="998640" cy="360"/>
+            <a:ext cx="998280" cy="360"/>
           </a:xfrm>
           <a:custGeom>
             <a:avLst/>
@@ -17220,7 +17237,7 @@
         <p:spPr>
           <a:xfrm>
             <a:off x="4985640" y="3657600"/>
-            <a:ext cx="360" cy="573480"/>
+            <a:ext cx="360" cy="573120"/>
           </a:xfrm>
           <a:custGeom>
             <a:avLst/>
@@ -17321,7 +17338,7 @@
         <p:spPr>
           <a:xfrm>
             <a:off x="0" y="0"/>
-            <a:ext cx="12186000" cy="6851880"/>
+            <a:ext cx="12185640" cy="6851520"/>
           </a:xfrm>
           <a:prstGeom prst="rect">
             <a:avLst/>
@@ -17374,7 +17391,7 @@
         <p:spPr>
           <a:xfrm>
             <a:off x="640440" y="685800"/>
-            <a:ext cx="4812480" cy="4597560"/>
+            <a:ext cx="4812120" cy="4597200"/>
           </a:xfrm>
           <a:prstGeom prst="rect">
             <a:avLst/>
@@ -17425,7 +17442,7 @@
         <p:spPr>
           <a:xfrm>
             <a:off x="6095880" y="0"/>
-            <a:ext cx="6089760" cy="6851880"/>
+            <a:ext cx="6089400" cy="6851520"/>
           </a:xfrm>
           <a:prstGeom prst="rect">
             <a:avLst/>
@@ -17463,7 +17480,7 @@
         <p:spPr>
           <a:xfrm>
             <a:off x="6625800" y="685800"/>
-            <a:ext cx="4872960" cy="4597560"/>
+            <a:ext cx="4872600" cy="4597200"/>
           </a:xfrm>
           <a:prstGeom prst="rect">
             <a:avLst/>
@@ -17484,7 +17501,7 @@
             <a:normAutofit/>
           </a:bodyPr>
           <a:p>
-            <a:pPr marL="285840" indent="-279720">
+            <a:pPr marL="285840" indent="-279360">
               <a:lnSpc>
                 <a:spcPct val="100000"/>
               </a:lnSpc>
@@ -17516,7 +17533,7 @@
             </a:endParaRPr>
           </a:p>
           <a:p>
-            <a:pPr marL="285840" indent="-279720">
+            <a:pPr marL="285840" indent="-279360">
               <a:lnSpc>
                 <a:spcPct val="100000"/>
               </a:lnSpc>
@@ -17548,7 +17565,7 @@
             </a:endParaRPr>
           </a:p>
           <a:p>
-            <a:pPr marL="285840" indent="-279720">
+            <a:pPr marL="285840" indent="-279360">
               <a:lnSpc>
                 <a:spcPct val="100000"/>
               </a:lnSpc>
@@ -17580,7 +17597,7 @@
             </a:endParaRPr>
           </a:p>
           <a:p>
-            <a:pPr marL="285840" indent="-279720">
+            <a:pPr marL="285840" indent="-279360">
               <a:lnSpc>
                 <a:spcPct val="100000"/>
               </a:lnSpc>
@@ -17671,7 +17688,7 @@
         <p:spPr>
           <a:xfrm>
             <a:off x="684360" y="4487400"/>
-            <a:ext cx="8528400" cy="1500840"/>
+            <a:ext cx="8528040" cy="1500480"/>
           </a:xfrm>
           <a:prstGeom prst="rect">
             <a:avLst/>
@@ -17720,7 +17737,7 @@
         <p:spPr>
           <a:xfrm>
             <a:off x="1044720" y="500040"/>
-            <a:ext cx="8258040" cy="3226680"/>
+            <a:ext cx="8257680" cy="3226320"/>
           </a:xfrm>
           <a:prstGeom prst="rect">
             <a:avLst/>
@@ -17739,7 +17756,7 @@
         <p:txBody>
           <a:bodyPr lIns="90000" rIns="90000" tIns="45000" bIns="45000" anchor="ctr"/>
           <a:p>
-            <a:pPr marL="285840" indent="-279720">
+            <a:pPr marL="285840" indent="-279360">
               <a:lnSpc>
                 <a:spcPct val="100000"/>
               </a:lnSpc>
@@ -17781,7 +17798,7 @@
             </a:endParaRPr>
           </a:p>
           <a:p>
-            <a:pPr marL="285840" indent="-279720">
+            <a:pPr marL="285840" indent="-279360">
               <a:lnSpc>
                 <a:spcPct val="100000"/>
               </a:lnSpc>
@@ -17833,7 +17850,7 @@
             </a:endParaRPr>
           </a:p>
           <a:p>
-            <a:pPr marL="285840" indent="-279720">
+            <a:pPr marL="285840" indent="-279360">
               <a:lnSpc>
                 <a:spcPct val="100000"/>
               </a:lnSpc>
@@ -17985,7 +18002,7 @@
         <p:spPr>
           <a:xfrm>
             <a:off x="7097760" y="1943280"/>
-            <a:ext cx="848520" cy="848520"/>
+            <a:ext cx="848160" cy="848160"/>
           </a:xfrm>
           <a:prstGeom prst="rect">
             <a:avLst/>
@@ -18008,7 +18025,7 @@
         <p:spPr>
           <a:xfrm>
             <a:off x="6931800" y="4296600"/>
-            <a:ext cx="1175040" cy="467280"/>
+            <a:ext cx="1174680" cy="466920"/>
           </a:xfrm>
           <a:prstGeom prst="rect">
             <a:avLst/>
@@ -18031,7 +18048,7 @@
         <p:spPr>
           <a:xfrm>
             <a:off x="7054200" y="2896920"/>
-            <a:ext cx="892080" cy="1034280"/>
+            <a:ext cx="891720" cy="1033920"/>
           </a:xfrm>
           <a:prstGeom prst="rect">
             <a:avLst/>
@@ -18054,7 +18071,7 @@
         <p:spPr>
           <a:xfrm>
             <a:off x="2718360" y="2064960"/>
-            <a:ext cx="908280" cy="908280"/>
+            <a:ext cx="907920" cy="907920"/>
           </a:xfrm>
           <a:prstGeom prst="rect">
             <a:avLst/>
@@ -18077,7 +18094,7 @@
         <p:spPr>
           <a:xfrm>
             <a:off x="2739240" y="3371040"/>
-            <a:ext cx="908280" cy="908280"/>
+            <a:ext cx="907920" cy="907920"/>
           </a:xfrm>
           <a:prstGeom prst="rect">
             <a:avLst/>
@@ -18100,7 +18117,7 @@
         <p:spPr>
           <a:xfrm>
             <a:off x="4908600" y="2852280"/>
-            <a:ext cx="908280" cy="908280"/>
+            <a:ext cx="907920" cy="907920"/>
           </a:xfrm>
           <a:prstGeom prst="rect">
             <a:avLst/>
@@ -18118,8 +18135,8 @@
         </p:nvSpPr>
         <p:spPr>
           <a:xfrm rot="1192200">
-            <a:off x="4045680" y="2669760"/>
-            <a:ext cx="972360" cy="478440"/>
+            <a:off x="4045320" y="2669760"/>
+            <a:ext cx="972000" cy="478080"/>
           </a:xfrm>
           <a:prstGeom prst="rightArrow">
             <a:avLst>
@@ -18161,7 +18178,7 @@
         <p:spPr>
           <a:xfrm rot="20407800">
             <a:off x="4023720" y="3458880"/>
-            <a:ext cx="972360" cy="478440"/>
+            <a:ext cx="972000" cy="478080"/>
           </a:xfrm>
           <a:prstGeom prst="rightArrow">
             <a:avLst>
@@ -18202,8 +18219,8 @@
         </p:nvSpPr>
         <p:spPr>
           <a:xfrm rot="1192200">
-            <a:off x="5799240" y="3778200"/>
-            <a:ext cx="972360" cy="478440"/>
+            <a:off x="5798880" y="3778200"/>
+            <a:ext cx="972000" cy="478080"/>
           </a:xfrm>
           <a:prstGeom prst="rightArrow">
             <a:avLst>
@@ -18245,7 +18262,7 @@
         <p:spPr>
           <a:xfrm rot="20407800">
             <a:off x="5871960" y="2454480"/>
-            <a:ext cx="972360" cy="478440"/>
+            <a:ext cx="972000" cy="478080"/>
           </a:xfrm>
           <a:prstGeom prst="rightArrow">
             <a:avLst>
@@ -18287,7 +18304,7 @@
         <p:spPr>
           <a:xfrm>
             <a:off x="5951880" y="3115440"/>
-            <a:ext cx="972360" cy="478440"/>
+            <a:ext cx="972000" cy="478080"/>
           </a:xfrm>
           <a:prstGeom prst="rightArrow">
             <a:avLst>
@@ -18378,7 +18395,7 @@
         <p:spPr>
           <a:xfrm>
             <a:off x="684360" y="4487400"/>
-            <a:ext cx="8528400" cy="1500840"/>
+            <a:ext cx="8528040" cy="1500480"/>
           </a:xfrm>
           <a:prstGeom prst="rect">
             <a:avLst/>
@@ -18427,7 +18444,7 @@
         <p:spPr>
           <a:xfrm>
             <a:off x="684360" y="685800"/>
-            <a:ext cx="8528400" cy="3609000"/>
+            <a:ext cx="8528040" cy="3608640"/>
           </a:xfrm>
           <a:prstGeom prst="rect">
             <a:avLst/>
@@ -18446,7 +18463,7 @@
         <p:txBody>
           <a:bodyPr lIns="90000" rIns="90000" tIns="45000" bIns="45000" anchor="ctr"/>
           <a:p>
-            <a:pPr marL="285840" indent="-279720">
+            <a:pPr marL="285840" indent="-279360">
               <a:lnSpc>
                 <a:spcPct val="100000"/>
               </a:lnSpc>
@@ -18538,7 +18555,7 @@
             </a:endParaRPr>
           </a:p>
           <a:p>
-            <a:pPr marL="285840" indent="-279720">
+            <a:pPr marL="285840" indent="-279360">
               <a:lnSpc>
                 <a:spcPct val="100000"/>
               </a:lnSpc>
@@ -18590,7 +18607,7 @@
             </a:endParaRPr>
           </a:p>
           <a:p>
-            <a:pPr marL="285840" indent="-279720">
+            <a:pPr marL="285840" indent="-279360">
               <a:lnSpc>
                 <a:spcPct val="100000"/>
               </a:lnSpc>
@@ -18676,7 +18693,7 @@
         <p:spPr>
           <a:xfrm>
             <a:off x="6227640" y="3794400"/>
-            <a:ext cx="908280" cy="908280"/>
+            <a:ext cx="907920" cy="907920"/>
           </a:xfrm>
           <a:prstGeom prst="rect">
             <a:avLst/>
@@ -18699,7 +18716,7 @@
         <p:spPr>
           <a:xfrm>
             <a:off x="2468520" y="3843720"/>
-            <a:ext cx="908280" cy="908280"/>
+            <a:ext cx="907920" cy="907920"/>
           </a:xfrm>
           <a:prstGeom prst="rect">
             <a:avLst/>
@@ -18722,7 +18739,7 @@
         <p:spPr>
           <a:xfrm>
             <a:off x="9790920" y="3794400"/>
-            <a:ext cx="908280" cy="908280"/>
+            <a:ext cx="907920" cy="907920"/>
           </a:xfrm>
           <a:prstGeom prst="rect">
             <a:avLst/>
@@ -18745,7 +18762,7 @@
         <p:spPr>
           <a:xfrm>
             <a:off x="7903800" y="3794400"/>
-            <a:ext cx="908280" cy="908280"/>
+            <a:ext cx="907920" cy="907920"/>
           </a:xfrm>
           <a:prstGeom prst="rect">
             <a:avLst/>
@@ -18768,7 +18785,7 @@
         <p:spPr>
           <a:xfrm>
             <a:off x="4412520" y="3794400"/>
-            <a:ext cx="908280" cy="908280"/>
+            <a:ext cx="907920" cy="907920"/>
           </a:xfrm>
           <a:prstGeom prst="rect">
             <a:avLst/>
@@ -18791,7 +18808,7 @@
         <p:spPr>
           <a:xfrm>
             <a:off x="684360" y="3843720"/>
-            <a:ext cx="908280" cy="908280"/>
+            <a:ext cx="907920" cy="907920"/>
           </a:xfrm>
           <a:prstGeom prst="rect">
             <a:avLst/>
@@ -18810,7 +18827,7 @@
         <p:spPr>
           <a:xfrm>
             <a:off x="1638000" y="4183200"/>
-            <a:ext cx="676800" cy="255960"/>
+            <a:ext cx="676440" cy="255600"/>
           </a:xfrm>
           <a:prstGeom prst="rightArrow">
             <a:avLst>
@@ -18849,7 +18866,7 @@
         <p:spPr>
           <a:xfrm>
             <a:off x="3511800" y="4201920"/>
-            <a:ext cx="676800" cy="255960"/>
+            <a:ext cx="676440" cy="255600"/>
           </a:xfrm>
           <a:prstGeom prst="rightArrow">
             <a:avLst>
@@ -18888,7 +18905,7 @@
         <p:spPr>
           <a:xfrm>
             <a:off x="5366520" y="4193640"/>
-            <a:ext cx="676800" cy="255960"/>
+            <a:ext cx="676440" cy="255600"/>
           </a:xfrm>
           <a:prstGeom prst="rightArrow">
             <a:avLst>
@@ -18927,7 +18944,7 @@
         <p:spPr>
           <a:xfrm>
             <a:off x="7162200" y="4183200"/>
-            <a:ext cx="676800" cy="255960"/>
+            <a:ext cx="676440" cy="255600"/>
           </a:xfrm>
           <a:prstGeom prst="rightArrow">
             <a:avLst>
@@ -18966,7 +18983,7 @@
         <p:spPr>
           <a:xfrm>
             <a:off x="8876160" y="4169880"/>
-            <a:ext cx="676800" cy="255960"/>
+            <a:ext cx="676440" cy="255600"/>
           </a:xfrm>
           <a:prstGeom prst="rightArrow">
             <a:avLst>
@@ -19054,7 +19071,7 @@
         <p:spPr>
           <a:xfrm>
             <a:off x="684360" y="4487400"/>
-            <a:ext cx="8528400" cy="1500840"/>
+            <a:ext cx="8528040" cy="1500480"/>
           </a:xfrm>
           <a:prstGeom prst="rect">
             <a:avLst/>
@@ -19103,7 +19120,7 @@
         <p:spPr>
           <a:xfrm>
             <a:off x="684360" y="685800"/>
-            <a:ext cx="8528400" cy="3609000"/>
+            <a:ext cx="8528040" cy="3608640"/>
           </a:xfrm>
           <a:prstGeom prst="rect">
             <a:avLst/>
@@ -19122,7 +19139,7 @@
         <p:txBody>
           <a:bodyPr lIns="90000" rIns="90000" tIns="45000" bIns="45000" anchor="ctr"/>
           <a:p>
-            <a:pPr marL="285840" indent="-279720">
+            <a:pPr marL="285840" indent="-279360">
               <a:lnSpc>
                 <a:spcPct val="100000"/>
               </a:lnSpc>
@@ -19204,7 +19221,7 @@
             </a:endParaRPr>
           </a:p>
           <a:p>
-            <a:pPr marL="285840" indent="-279720">
+            <a:pPr marL="285840" indent="-279360">
               <a:lnSpc>
                 <a:spcPct val="100000"/>
               </a:lnSpc>
@@ -19250,7 +19267,7 @@
         <p:spPr>
           <a:xfrm>
             <a:off x="4681800" y="2481480"/>
-            <a:ext cx="908280" cy="908280"/>
+            <a:ext cx="907920" cy="907920"/>
           </a:xfrm>
           <a:prstGeom prst="rect">
             <a:avLst/>
@@ -19273,7 +19290,7 @@
         <p:spPr>
           <a:xfrm>
             <a:off x="6609240" y="3669480"/>
-            <a:ext cx="908280" cy="908280"/>
+            <a:ext cx="907920" cy="907920"/>
           </a:xfrm>
           <a:prstGeom prst="rect">
             <a:avLst/>
@@ -19296,7 +19313,7 @@
         <p:spPr>
           <a:xfrm>
             <a:off x="2973240" y="3669480"/>
-            <a:ext cx="908280" cy="908280"/>
+            <a:ext cx="907920" cy="907920"/>
           </a:xfrm>
           <a:prstGeom prst="rect">
             <a:avLst/>
@@ -19315,7 +19332,7 @@
         <p:spPr>
           <a:xfrm>
             <a:off x="4214160" y="3946320"/>
-            <a:ext cx="2062440" cy="354600"/>
+            <a:ext cx="2062080" cy="354240"/>
           </a:xfrm>
           <a:prstGeom prst="rightArrow">
             <a:avLst>
@@ -19354,7 +19371,7 @@
         <p:spPr>
           <a:xfrm>
             <a:off x="4988160" y="3533400"/>
-            <a:ext cx="295560" cy="401040"/>
+            <a:ext cx="295200" cy="400680"/>
           </a:xfrm>
           <a:prstGeom prst="downArrow">
             <a:avLst>

</xml_diff>

<commit_message>
#12 Weak AI vs Strong AI explanation concept number one part 1 added on introduction slides
</commit_message>
<xml_diff>
--- a/SAI_presentation_libre_office.pptx
+++ b/SAI_presentation_libre_office.pptx
@@ -150,7 +150,7 @@
               <a:rPr b="0" lang="fr-FR" sz="1400" spc="-1" strike="noStrike">
                 <a:latin typeface="Times New Roman"/>
               </a:rPr>
-              <a:t>&lt;en-tête&gt;</a:t>
+              <a:t> </a:t>
             </a:r>
             <a:endParaRPr b="0" lang="fr-FR" sz="1400" spc="-1" strike="noStrike">
               <a:latin typeface="Times New Roman"/>
@@ -185,7 +185,7 @@
               <a:rPr b="0" lang="fr-FR" sz="1400" spc="-1" strike="noStrike">
                 <a:latin typeface="Times New Roman"/>
               </a:rPr>
-              <a:t>&lt;date/heure&gt;</a:t>
+              <a:t> </a:t>
             </a:r>
             <a:endParaRPr b="0" lang="fr-FR" sz="1400" spc="-1" strike="noStrike">
               <a:latin typeface="Times New Roman"/>
@@ -219,7 +219,7 @@
               <a:rPr b="0" lang="fr-FR" sz="1400" spc="-1" strike="noStrike">
                 <a:latin typeface="Times New Roman"/>
               </a:rPr>
-              <a:t>&lt;pied de page&gt;</a:t>
+              <a:t> </a:t>
             </a:r>
             <a:endParaRPr b="0" lang="fr-FR" sz="1400" spc="-1" strike="noStrike">
               <a:latin typeface="Times New Roman"/>
@@ -250,11 +250,11 @@
           <a:bodyPr lIns="0" rIns="0" tIns="0" bIns="0" anchor="b"/>
           <a:p>
             <a:pPr algn="r"/>
-            <a:fld id="{6BA6FFDD-9075-481F-9C75-E4A2AC1A0C9B}" type="slidenum">
+            <a:fld id="{FD590AF4-F0F9-4E86-A372-9D527F6BF160}" type="slidenum">
               <a:rPr b="0" lang="fr-FR" sz="1400" spc="-1" strike="noStrike">
                 <a:latin typeface="Times New Roman"/>
               </a:rPr>
-              <a:t>&lt;numéro&gt;</a:t>
+              <a:t>1</a:t>
             </a:fld>
             <a:endParaRPr b="0" lang="fr-FR" sz="1400" spc="-1" strike="noStrike">
               <a:latin typeface="Times New Roman"/>
@@ -298,7 +298,7 @@
         <p:spPr>
           <a:xfrm>
             <a:off x="685800" y="1143000"/>
-            <a:ext cx="5479920" cy="3079800"/>
+            <a:ext cx="5479560" cy="3079440"/>
           </a:xfrm>
           <a:prstGeom prst="rect">
             <a:avLst/>
@@ -318,7 +318,7 @@
         <p:spPr>
           <a:xfrm>
             <a:off x="685800" y="4400640"/>
-            <a:ext cx="5479920" cy="3593880"/>
+            <a:ext cx="5479560" cy="3593520"/>
           </a:xfrm>
           <a:prstGeom prst="rect">
             <a:avLst/>
@@ -327,7 +327,7 @@
         <p:txBody>
           <a:bodyPr lIns="0" rIns="0" tIns="0" bIns="0"/>
           <a:p>
-            <a:pPr marL="216000" indent="-209880">
+            <a:pPr marL="216000" indent="-209520">
               <a:lnSpc>
                 <a:spcPct val="100000"/>
               </a:lnSpc>
@@ -343,7 +343,7 @@
             </a:endParaRPr>
           </a:p>
           <a:p>
-            <a:pPr marL="216000" indent="-209880">
+            <a:pPr marL="216000" indent="-209520">
               <a:lnSpc>
                 <a:spcPct val="100000"/>
               </a:lnSpc>
@@ -360,7 +360,7 @@
             </a:endParaRPr>
           </a:p>
           <a:p>
-            <a:pPr marL="216000" indent="-209880">
+            <a:pPr marL="216000" indent="-209520">
               <a:lnSpc>
                 <a:spcPct val="100000"/>
               </a:lnSpc>
@@ -376,7 +376,7 @@
             </a:endParaRPr>
           </a:p>
           <a:p>
-            <a:pPr marL="216000" indent="-209880">
+            <a:pPr marL="216000" indent="-209520">
               <a:lnSpc>
                 <a:spcPct val="100000"/>
               </a:lnSpc>
@@ -392,7 +392,7 @@
             </a:endParaRPr>
           </a:p>
           <a:p>
-            <a:pPr marL="216000" indent="-209880">
+            <a:pPr marL="216000" indent="-209520">
               <a:lnSpc>
                 <a:spcPct val="100000"/>
               </a:lnSpc>
@@ -419,7 +419,7 @@
         <p:spPr>
           <a:xfrm>
             <a:off x="3884760" y="8685360"/>
-            <a:ext cx="2965320" cy="452160"/>
+            <a:ext cx="2964960" cy="451800"/>
           </a:xfrm>
           <a:prstGeom prst="rect">
             <a:avLst/>
@@ -443,14 +443,14 @@
                 <a:spcPct val="100000"/>
               </a:lnSpc>
             </a:pPr>
-            <a:fld id="{9B8D2DC9-D20B-424F-8628-1E8581119B2C}" type="slidenum">
+            <a:fld id="{C9007952-4DCD-4F9E-B973-0115B1EB7528}" type="slidenum">
               <a:rPr b="0" lang="fr-FR" sz="1200" spc="-1" strike="noStrike">
                 <a:solidFill>
                   <a:srgbClr val="000000"/>
                 </a:solidFill>
                 <a:latin typeface="Times New Roman"/>
               </a:rPr>
-              <a:t>&lt;numéro&gt;</a:t>
+              <a:t>1</a:t>
             </a:fld>
             <a:endParaRPr b="0" lang="fr-FR" sz="1200" spc="-1" strike="noStrike">
               <a:latin typeface="Arial"/>
@@ -493,7 +493,7 @@
         <p:spPr>
           <a:xfrm>
             <a:off x="685800" y="1143000"/>
-            <a:ext cx="5479920" cy="3079800"/>
+            <a:ext cx="5479560" cy="3079440"/>
           </a:xfrm>
           <a:prstGeom prst="rect">
             <a:avLst/>
@@ -513,7 +513,7 @@
         <p:spPr>
           <a:xfrm>
             <a:off x="685800" y="4400640"/>
-            <a:ext cx="5479920" cy="3593880"/>
+            <a:ext cx="5479560" cy="3593520"/>
           </a:xfrm>
           <a:prstGeom prst="rect">
             <a:avLst/>
@@ -522,7 +522,7 @@
         <p:txBody>
           <a:bodyPr lIns="0" rIns="0" tIns="0" bIns="0"/>
           <a:p>
-            <a:pPr marL="216000" indent="-210240">
+            <a:pPr marL="216000" indent="-209880">
               <a:lnSpc>
                 <a:spcPct val="100000"/>
               </a:lnSpc>
@@ -538,7 +538,7 @@
             </a:endParaRPr>
           </a:p>
           <a:p>
-            <a:pPr marL="216000" indent="-210240">
+            <a:pPr marL="216000" indent="-209880">
               <a:lnSpc>
                 <a:spcPct val="100000"/>
               </a:lnSpc>
@@ -548,7 +548,7 @@
             </a:endParaRPr>
           </a:p>
           <a:p>
-            <a:pPr marL="216000" indent="-210240">
+            <a:pPr marL="216000" indent="-209880">
               <a:lnSpc>
                 <a:spcPct val="100000"/>
               </a:lnSpc>
@@ -564,7 +564,7 @@
             </a:endParaRPr>
           </a:p>
           <a:p>
-            <a:pPr marL="216000" indent="-210240">
+            <a:pPr marL="216000" indent="-209880">
               <a:lnSpc>
                 <a:spcPct val="100000"/>
               </a:lnSpc>
@@ -574,7 +574,7 @@
             </a:endParaRPr>
           </a:p>
           <a:p>
-            <a:pPr marL="216000" indent="-210240">
+            <a:pPr marL="216000" indent="-209880">
               <a:lnSpc>
                 <a:spcPct val="100000"/>
               </a:lnSpc>
@@ -590,7 +590,7 @@
             </a:endParaRPr>
           </a:p>
           <a:p>
-            <a:pPr marL="216000" indent="-210240">
+            <a:pPr marL="216000" indent="-209880">
               <a:lnSpc>
                 <a:spcPct val="100000"/>
               </a:lnSpc>
@@ -600,7 +600,7 @@
             </a:endParaRPr>
           </a:p>
           <a:p>
-            <a:pPr marL="216000" indent="-210240">
+            <a:pPr marL="216000" indent="-209880">
               <a:lnSpc>
                 <a:spcPct val="100000"/>
               </a:lnSpc>
@@ -616,7 +616,7 @@
             </a:endParaRPr>
           </a:p>
           <a:p>
-            <a:pPr marL="216000" indent="-210240">
+            <a:pPr marL="216000" indent="-209880">
               <a:lnSpc>
                 <a:spcPct val="100000"/>
               </a:lnSpc>
@@ -626,7 +626,7 @@
             </a:endParaRPr>
           </a:p>
           <a:p>
-            <a:pPr marL="216000" indent="-210240">
+            <a:pPr marL="216000" indent="-209880">
               <a:lnSpc>
                 <a:spcPct val="100000"/>
               </a:lnSpc>
@@ -636,7 +636,7 @@
             </a:endParaRPr>
           </a:p>
           <a:p>
-            <a:pPr marL="216000" indent="-210240">
+            <a:pPr marL="216000" indent="-209880">
               <a:lnSpc>
                 <a:spcPct val="100000"/>
               </a:lnSpc>
@@ -652,7 +652,7 @@
             </a:endParaRPr>
           </a:p>
           <a:p>
-            <a:pPr marL="216000" indent="-210240">
+            <a:pPr marL="216000" indent="-209880">
               <a:lnSpc>
                 <a:spcPct val="100000"/>
               </a:lnSpc>
@@ -668,7 +668,7 @@
             </a:endParaRPr>
           </a:p>
           <a:p>
-            <a:pPr marL="216000" indent="-210240">
+            <a:pPr marL="216000" indent="-209880">
               <a:lnSpc>
                 <a:spcPct val="100000"/>
               </a:lnSpc>
@@ -684,7 +684,7 @@
             </a:endParaRPr>
           </a:p>
           <a:p>
-            <a:pPr marL="216000" indent="-210240">
+            <a:pPr marL="216000" indent="-209880">
               <a:lnSpc>
                 <a:spcPct val="100000"/>
               </a:lnSpc>
@@ -694,7 +694,7 @@
             </a:endParaRPr>
           </a:p>
           <a:p>
-            <a:pPr marL="216000" indent="-210240">
+            <a:pPr marL="216000" indent="-209880">
               <a:lnSpc>
                 <a:spcPct val="100000"/>
               </a:lnSpc>
@@ -710,7 +710,7 @@
             </a:endParaRPr>
           </a:p>
           <a:p>
-            <a:pPr marL="216000" indent="-210240">
+            <a:pPr marL="216000" indent="-209880">
               <a:lnSpc>
                 <a:spcPct val="100000"/>
               </a:lnSpc>
@@ -720,7 +720,7 @@
             </a:endParaRPr>
           </a:p>
           <a:p>
-            <a:pPr marL="216000" indent="-210240">
+            <a:pPr marL="216000" indent="-209880">
               <a:lnSpc>
                 <a:spcPct val="100000"/>
               </a:lnSpc>
@@ -736,7 +736,7 @@
             </a:endParaRPr>
           </a:p>
           <a:p>
-            <a:pPr marL="216000" indent="-210240">
+            <a:pPr marL="216000" indent="-209880">
               <a:lnSpc>
                 <a:spcPct val="100000"/>
               </a:lnSpc>
@@ -752,7 +752,7 @@
             </a:endParaRPr>
           </a:p>
           <a:p>
-            <a:pPr marL="216000" indent="-210240">
+            <a:pPr marL="216000" indent="-209880">
               <a:lnSpc>
                 <a:spcPct val="100000"/>
               </a:lnSpc>
@@ -768,7 +768,7 @@
             </a:endParaRPr>
           </a:p>
           <a:p>
-            <a:pPr marL="216000" indent="-210240">
+            <a:pPr marL="216000" indent="-209880">
               <a:lnSpc>
                 <a:spcPct val="100000"/>
               </a:lnSpc>
@@ -784,7 +784,7 @@
             </a:endParaRPr>
           </a:p>
           <a:p>
-            <a:pPr marL="216000" indent="-210240">
+            <a:pPr marL="216000" indent="-209880">
               <a:lnSpc>
                 <a:spcPct val="100000"/>
               </a:lnSpc>
@@ -794,7 +794,7 @@
             </a:endParaRPr>
           </a:p>
           <a:p>
-            <a:pPr marL="216000" indent="-210240">
+            <a:pPr marL="216000" indent="-209880">
               <a:lnSpc>
                 <a:spcPct val="100000"/>
               </a:lnSpc>
@@ -810,7 +810,7 @@
             </a:endParaRPr>
           </a:p>
           <a:p>
-            <a:pPr marL="216000" indent="-210240">
+            <a:pPr marL="216000" indent="-209880">
               <a:lnSpc>
                 <a:spcPct val="100000"/>
               </a:lnSpc>
@@ -826,7 +826,7 @@
             </a:endParaRPr>
           </a:p>
           <a:p>
-            <a:pPr marL="216000" indent="-210240">
+            <a:pPr marL="216000" indent="-209880">
               <a:lnSpc>
                 <a:spcPct val="100000"/>
               </a:lnSpc>
@@ -842,7 +842,7 @@
             </a:endParaRPr>
           </a:p>
           <a:p>
-            <a:pPr marL="216000" indent="-210240">
+            <a:pPr marL="216000" indent="-209880">
               <a:lnSpc>
                 <a:spcPct val="100000"/>
               </a:lnSpc>
@@ -858,7 +858,7 @@
             </a:endParaRPr>
           </a:p>
           <a:p>
-            <a:pPr marL="216000" indent="-210240">
+            <a:pPr marL="216000" indent="-209880">
               <a:lnSpc>
                 <a:spcPct val="100000"/>
               </a:lnSpc>
@@ -874,7 +874,7 @@
             </a:endParaRPr>
           </a:p>
           <a:p>
-            <a:pPr marL="216000" indent="-210240">
+            <a:pPr marL="216000" indent="-209880">
               <a:lnSpc>
                 <a:spcPct val="100000"/>
               </a:lnSpc>
@@ -884,7 +884,7 @@
             </a:endParaRPr>
           </a:p>
           <a:p>
-            <a:pPr marL="216000" indent="-210240">
+            <a:pPr marL="216000" indent="-209880">
               <a:lnSpc>
                 <a:spcPct val="100000"/>
               </a:lnSpc>
@@ -900,7 +900,7 @@
             </a:endParaRPr>
           </a:p>
           <a:p>
-            <a:pPr marL="216000" indent="-210240">
+            <a:pPr marL="216000" indent="-209880">
               <a:lnSpc>
                 <a:spcPct val="100000"/>
               </a:lnSpc>
@@ -916,7 +916,7 @@
             </a:endParaRPr>
           </a:p>
           <a:p>
-            <a:pPr marL="216000" indent="-210240">
+            <a:pPr marL="216000" indent="-209880">
               <a:lnSpc>
                 <a:spcPct val="100000"/>
               </a:lnSpc>
@@ -932,7 +932,7 @@
             </a:endParaRPr>
           </a:p>
           <a:p>
-            <a:pPr marL="216000" indent="-210240">
+            <a:pPr marL="216000" indent="-209880">
               <a:lnSpc>
                 <a:spcPct val="100000"/>
               </a:lnSpc>
@@ -942,7 +942,7 @@
             </a:endParaRPr>
           </a:p>
           <a:p>
-            <a:pPr marL="216000" indent="-210240">
+            <a:pPr marL="216000" indent="-209880">
               <a:lnSpc>
                 <a:spcPct val="100000"/>
               </a:lnSpc>
@@ -958,7 +958,7 @@
             </a:endParaRPr>
           </a:p>
           <a:p>
-            <a:pPr marL="216000" indent="-210240">
+            <a:pPr marL="216000" indent="-209880">
               <a:lnSpc>
                 <a:spcPct val="100000"/>
               </a:lnSpc>
@@ -974,7 +974,7 @@
             </a:endParaRPr>
           </a:p>
           <a:p>
-            <a:pPr marL="216000" indent="-210240">
+            <a:pPr marL="216000" indent="-209880">
               <a:lnSpc>
                 <a:spcPct val="100000"/>
               </a:lnSpc>
@@ -990,7 +990,7 @@
             </a:endParaRPr>
           </a:p>
           <a:p>
-            <a:pPr marL="216000" indent="-210240">
+            <a:pPr marL="216000" indent="-209880">
               <a:lnSpc>
                 <a:spcPct val="100000"/>
               </a:lnSpc>
@@ -1000,7 +1000,7 @@
             </a:endParaRPr>
           </a:p>
           <a:p>
-            <a:pPr marL="216000" indent="-210240">
+            <a:pPr marL="216000" indent="-209880">
               <a:lnSpc>
                 <a:spcPct val="100000"/>
               </a:lnSpc>
@@ -1016,7 +1016,7 @@
             </a:endParaRPr>
           </a:p>
           <a:p>
-            <a:pPr marL="216000" indent="-210240">
+            <a:pPr marL="216000" indent="-209880">
               <a:lnSpc>
                 <a:spcPct val="100000"/>
               </a:lnSpc>
@@ -1032,7 +1032,7 @@
             </a:endParaRPr>
           </a:p>
           <a:p>
-            <a:pPr marL="216000" indent="-210240">
+            <a:pPr marL="216000" indent="-209880">
               <a:lnSpc>
                 <a:spcPct val="100000"/>
               </a:lnSpc>
@@ -1048,7 +1048,7 @@
             </a:endParaRPr>
           </a:p>
           <a:p>
-            <a:pPr marL="216000" indent="-210240">
+            <a:pPr marL="216000" indent="-209880">
               <a:lnSpc>
                 <a:spcPct val="100000"/>
               </a:lnSpc>
@@ -1064,7 +1064,7 @@
             </a:endParaRPr>
           </a:p>
           <a:p>
-            <a:pPr marL="216000" indent="-210240">
+            <a:pPr marL="216000" indent="-209880">
               <a:lnSpc>
                 <a:spcPct val="100000"/>
               </a:lnSpc>
@@ -1074,7 +1074,7 @@
             </a:endParaRPr>
           </a:p>
           <a:p>
-            <a:pPr marL="216000" indent="-210240">
+            <a:pPr marL="216000" indent="-209880">
               <a:lnSpc>
                 <a:spcPct val="100000"/>
               </a:lnSpc>
@@ -1090,7 +1090,7 @@
             </a:endParaRPr>
           </a:p>
           <a:p>
-            <a:pPr marL="216000" indent="-210240">
+            <a:pPr marL="216000" indent="-209880">
               <a:lnSpc>
                 <a:spcPct val="100000"/>
               </a:lnSpc>
@@ -1107,7 +1107,7 @@
             </a:endParaRPr>
           </a:p>
           <a:p>
-            <a:pPr marL="216000" indent="-210240">
+            <a:pPr marL="216000" indent="-209880">
               <a:lnSpc>
                 <a:spcPct val="100000"/>
               </a:lnSpc>
@@ -1124,7 +1124,7 @@
             </a:endParaRPr>
           </a:p>
           <a:p>
-            <a:pPr marL="216000" indent="-210240">
+            <a:pPr marL="216000" indent="-209880">
               <a:lnSpc>
                 <a:spcPct val="100000"/>
               </a:lnSpc>
@@ -1141,7 +1141,7 @@
             </a:endParaRPr>
           </a:p>
           <a:p>
-            <a:pPr marL="216000" indent="-210240">
+            <a:pPr marL="216000" indent="-209880">
               <a:lnSpc>
                 <a:spcPct val="100000"/>
               </a:lnSpc>
@@ -1151,7 +1151,7 @@
             </a:endParaRPr>
           </a:p>
           <a:p>
-            <a:pPr marL="216000" indent="-210240">
+            <a:pPr marL="216000" indent="-209880">
               <a:lnSpc>
                 <a:spcPct val="100000"/>
               </a:lnSpc>
@@ -1168,7 +1168,7 @@
             </a:endParaRPr>
           </a:p>
           <a:p>
-            <a:pPr marL="216000" indent="-210240">
+            <a:pPr marL="216000" indent="-209880">
               <a:lnSpc>
                 <a:spcPct val="100000"/>
               </a:lnSpc>
@@ -1185,7 +1185,7 @@
             </a:endParaRPr>
           </a:p>
           <a:p>
-            <a:pPr marL="216000" indent="-210240">
+            <a:pPr marL="216000" indent="-209880">
               <a:lnSpc>
                 <a:spcPct val="100000"/>
               </a:lnSpc>
@@ -1195,7 +1195,7 @@
             </a:endParaRPr>
           </a:p>
           <a:p>
-            <a:pPr marL="216000" indent="-210240">
+            <a:pPr marL="216000" indent="-209880">
               <a:lnSpc>
                 <a:spcPct val="100000"/>
               </a:lnSpc>
@@ -1205,7 +1205,7 @@
             </a:endParaRPr>
           </a:p>
           <a:p>
-            <a:pPr marL="216000" indent="-210240">
+            <a:pPr marL="216000" indent="-209880">
               <a:lnSpc>
                 <a:spcPct val="100000"/>
               </a:lnSpc>
@@ -1215,7 +1215,7 @@
             </a:endParaRPr>
           </a:p>
           <a:p>
-            <a:pPr marL="216000" indent="-210240">
+            <a:pPr marL="216000" indent="-209880">
               <a:lnSpc>
                 <a:spcPct val="100000"/>
               </a:lnSpc>
@@ -1225,7 +1225,7 @@
             </a:endParaRPr>
           </a:p>
           <a:p>
-            <a:pPr marL="216000" indent="-210240">
+            <a:pPr marL="216000" indent="-209880">
               <a:lnSpc>
                 <a:spcPct val="100000"/>
               </a:lnSpc>
@@ -1245,7 +1245,7 @@
         <p:spPr>
           <a:xfrm>
             <a:off x="3884760" y="8685360"/>
-            <a:ext cx="2965320" cy="452160"/>
+            <a:ext cx="2964960" cy="451800"/>
           </a:xfrm>
           <a:prstGeom prst="rect">
             <a:avLst/>
@@ -1269,7 +1269,7 @@
                 <a:spcPct val="100000"/>
               </a:lnSpc>
             </a:pPr>
-            <a:fld id="{92500F05-08D9-4AC6-95A2-CD8B28A2F3B3}" type="slidenum">
+            <a:fld id="{0C799522-61F4-4BA2-8947-1F3F7B323503}" type="slidenum">
               <a:rPr b="0" lang="fr-FR" sz="1200" spc="-1" strike="noStrike">
                 <a:solidFill>
                   <a:srgbClr val="000000"/>
@@ -1319,7 +1319,7 @@
         <p:spPr>
           <a:xfrm>
             <a:off x="685800" y="1143000"/>
-            <a:ext cx="5479920" cy="3079800"/>
+            <a:ext cx="5479560" cy="3079440"/>
           </a:xfrm>
           <a:prstGeom prst="rect">
             <a:avLst/>
@@ -1339,7 +1339,7 @@
         <p:spPr>
           <a:xfrm>
             <a:off x="685800" y="4400640"/>
-            <a:ext cx="5479920" cy="3593880"/>
+            <a:ext cx="5479560" cy="3593520"/>
           </a:xfrm>
           <a:prstGeom prst="rect">
             <a:avLst/>
@@ -1348,7 +1348,7 @@
         <p:txBody>
           <a:bodyPr lIns="0" rIns="0" tIns="0" bIns="0"/>
           <a:p>
-            <a:pPr marL="216000" indent="-212040">
+            <a:pPr marL="216000" indent="-211680">
               <a:lnSpc>
                 <a:spcPct val="100000"/>
               </a:lnSpc>
@@ -1364,7 +1364,7 @@
             </a:endParaRPr>
           </a:p>
           <a:p>
-            <a:pPr marL="216000" indent="-212040">
+            <a:pPr marL="216000" indent="-211680">
               <a:lnSpc>
                 <a:spcPct val="100000"/>
               </a:lnSpc>
@@ -1380,7 +1380,7 @@
             </a:endParaRPr>
           </a:p>
           <a:p>
-            <a:pPr marL="216000" indent="-212040">
+            <a:pPr marL="216000" indent="-211680">
               <a:lnSpc>
                 <a:spcPct val="100000"/>
               </a:lnSpc>
@@ -1396,7 +1396,7 @@
             </a:endParaRPr>
           </a:p>
           <a:p>
-            <a:pPr marL="216000" indent="-212040">
+            <a:pPr marL="216000" indent="-211680">
               <a:lnSpc>
                 <a:spcPct val="100000"/>
               </a:lnSpc>
@@ -1406,7 +1406,7 @@
             </a:endParaRPr>
           </a:p>
           <a:p>
-            <a:pPr marL="216000" indent="-212040">
+            <a:pPr marL="216000" indent="-211680">
               <a:lnSpc>
                 <a:spcPct val="100000"/>
               </a:lnSpc>
@@ -1422,7 +1422,7 @@
             </a:endParaRPr>
           </a:p>
           <a:p>
-            <a:pPr marL="216000" indent="-212040">
+            <a:pPr marL="216000" indent="-211680">
               <a:lnSpc>
                 <a:spcPct val="100000"/>
               </a:lnSpc>
@@ -1438,7 +1438,7 @@
             </a:endParaRPr>
           </a:p>
           <a:p>
-            <a:pPr marL="216000" indent="-212040">
+            <a:pPr marL="216000" indent="-211680">
               <a:lnSpc>
                 <a:spcPct val="100000"/>
               </a:lnSpc>
@@ -1448,7 +1448,7 @@
             </a:endParaRPr>
           </a:p>
           <a:p>
-            <a:pPr marL="216000" indent="-212040">
+            <a:pPr marL="216000" indent="-211680">
               <a:lnSpc>
                 <a:spcPct val="100000"/>
               </a:lnSpc>
@@ -1464,7 +1464,7 @@
             </a:endParaRPr>
           </a:p>
           <a:p>
-            <a:pPr marL="216000" indent="-212040">
+            <a:pPr marL="216000" indent="-211680">
               <a:lnSpc>
                 <a:spcPct val="100000"/>
               </a:lnSpc>
@@ -1474,7 +1474,7 @@
             </a:endParaRPr>
           </a:p>
           <a:p>
-            <a:pPr marL="216000" indent="-212040">
+            <a:pPr marL="216000" indent="-211680">
               <a:lnSpc>
                 <a:spcPct val="100000"/>
               </a:lnSpc>
@@ -1490,7 +1490,7 @@
             </a:endParaRPr>
           </a:p>
           <a:p>
-            <a:pPr marL="216000" indent="-212040">
+            <a:pPr marL="216000" indent="-211680">
               <a:lnSpc>
                 <a:spcPct val="100000"/>
               </a:lnSpc>
@@ -1506,7 +1506,7 @@
             </a:endParaRPr>
           </a:p>
           <a:p>
-            <a:pPr marL="216000" indent="-212040">
+            <a:pPr marL="216000" indent="-211680">
               <a:lnSpc>
                 <a:spcPct val="100000"/>
               </a:lnSpc>
@@ -1523,7 +1523,7 @@
             </a:endParaRPr>
           </a:p>
           <a:p>
-            <a:pPr marL="216000" indent="-212040">
+            <a:pPr marL="216000" indent="-211680">
               <a:lnSpc>
                 <a:spcPct val="100000"/>
               </a:lnSpc>
@@ -1533,7 +1533,7 @@
             </a:endParaRPr>
           </a:p>
           <a:p>
-            <a:pPr marL="216000" indent="-212040">
+            <a:pPr marL="216000" indent="-211680">
               <a:lnSpc>
                 <a:spcPct val="100000"/>
               </a:lnSpc>
@@ -1550,7 +1550,7 @@
             </a:endParaRPr>
           </a:p>
           <a:p>
-            <a:pPr marL="216000" indent="-212040">
+            <a:pPr marL="216000" indent="-211680">
               <a:lnSpc>
                 <a:spcPct val="100000"/>
               </a:lnSpc>
@@ -1567,7 +1567,7 @@
             </a:endParaRPr>
           </a:p>
           <a:p>
-            <a:pPr marL="216000" indent="-212040">
+            <a:pPr marL="216000" indent="-211680">
               <a:lnSpc>
                 <a:spcPct val="100000"/>
               </a:lnSpc>
@@ -1584,7 +1584,7 @@
             </a:endParaRPr>
           </a:p>
           <a:p>
-            <a:pPr marL="216000" indent="-212040">
+            <a:pPr marL="216000" indent="-211680">
               <a:lnSpc>
                 <a:spcPct val="100000"/>
               </a:lnSpc>
@@ -1594,7 +1594,7 @@
             </a:endParaRPr>
           </a:p>
           <a:p>
-            <a:pPr marL="216000" indent="-212040">
+            <a:pPr marL="216000" indent="-211680">
               <a:lnSpc>
                 <a:spcPct val="100000"/>
               </a:lnSpc>
@@ -1611,7 +1611,7 @@
             </a:endParaRPr>
           </a:p>
           <a:p>
-            <a:pPr marL="216000" indent="-212040">
+            <a:pPr marL="216000" indent="-211680">
               <a:lnSpc>
                 <a:spcPct val="100000"/>
               </a:lnSpc>
@@ -1628,7 +1628,7 @@
             </a:endParaRPr>
           </a:p>
           <a:p>
-            <a:pPr marL="216000" indent="-212040">
+            <a:pPr marL="216000" indent="-211680">
               <a:lnSpc>
                 <a:spcPct val="100000"/>
               </a:lnSpc>
@@ -1645,7 +1645,7 @@
             </a:endParaRPr>
           </a:p>
           <a:p>
-            <a:pPr marL="216000" indent="-212040">
+            <a:pPr marL="216000" indent="-211680">
               <a:lnSpc>
                 <a:spcPct val="100000"/>
               </a:lnSpc>
@@ -1655,17 +1655,24 @@
             </a:endParaRPr>
           </a:p>
           <a:p>
-            <a:pPr marL="216000" indent="-212040">
-              <a:lnSpc>
-                <a:spcPct val="100000"/>
-              </a:lnSpc>
-            </a:pPr>
+            <a:pPr marL="216000" indent="-211680">
+              <a:lnSpc>
+                <a:spcPct val="100000"/>
+              </a:lnSpc>
+            </a:pPr>
+            <a:r>
+              <a:rPr b="0" lang="fr-FR" sz="1000" spc="-1" strike="noStrike">
+                <a:latin typeface="Arial"/>
+                <a:ea typeface="Noto Sans CJK SC"/>
+              </a:rPr>
+              <a:t>This means that SAI will understand the concept of the number one and can apply new things on a previous memory</a:t>
+            </a:r>
             <a:endParaRPr b="0" lang="fr-FR" sz="1000" spc="-1" strike="noStrike">
               <a:latin typeface="Arial"/>
             </a:endParaRPr>
           </a:p>
           <a:p>
-            <a:pPr marL="216000" indent="-212040">
+            <a:pPr marL="216000" indent="-211680">
               <a:lnSpc>
                 <a:spcPct val="100000"/>
               </a:lnSpc>
@@ -1675,7 +1682,7 @@
             </a:endParaRPr>
           </a:p>
           <a:p>
-            <a:pPr marL="216000" indent="-212040">
+            <a:pPr marL="216000" indent="-211680">
               <a:lnSpc>
                 <a:spcPct val="100000"/>
               </a:lnSpc>
@@ -1685,7 +1692,27 @@
             </a:endParaRPr>
           </a:p>
           <a:p>
-            <a:pPr marL="216000" indent="-212040">
+            <a:pPr marL="216000" indent="-211680">
+              <a:lnSpc>
+                <a:spcPct val="100000"/>
+              </a:lnSpc>
+            </a:pPr>
+            <a:endParaRPr b="0" lang="fr-FR" sz="1000" spc="-1" strike="noStrike">
+              <a:latin typeface="Arial"/>
+            </a:endParaRPr>
+          </a:p>
+          <a:p>
+            <a:pPr marL="216000" indent="-211680">
+              <a:lnSpc>
+                <a:spcPct val="100000"/>
+              </a:lnSpc>
+            </a:pPr>
+            <a:endParaRPr b="0" lang="fr-FR" sz="1000" spc="-1" strike="noStrike">
+              <a:latin typeface="Arial"/>
+            </a:endParaRPr>
+          </a:p>
+          <a:p>
+            <a:pPr marL="216000" indent="-211680">
               <a:lnSpc>
                 <a:spcPct val="100000"/>
               </a:lnSpc>
@@ -1705,7 +1732,7 @@
         <p:spPr>
           <a:xfrm>
             <a:off x="3884760" y="8685360"/>
-            <a:ext cx="2965320" cy="452160"/>
+            <a:ext cx="2964960" cy="451800"/>
           </a:xfrm>
           <a:prstGeom prst="rect">
             <a:avLst/>
@@ -1729,7 +1756,7 @@
                 <a:spcPct val="100000"/>
               </a:lnSpc>
             </a:pPr>
-            <a:fld id="{D4F3244B-AC12-4575-A499-3C9A74A7F726}" type="slidenum">
+            <a:fld id="{C028FED4-D7D6-4E1D-BC5D-4CBDEFB496A6}" type="slidenum">
               <a:rPr b="0" lang="fr-FR" sz="1200" spc="-1" strike="noStrike">
                 <a:solidFill>
                   <a:srgbClr val="000000"/>
@@ -1779,7 +1806,7 @@
         <p:spPr>
           <a:xfrm>
             <a:off x="380880" y="694800"/>
-            <a:ext cx="6090480" cy="3423600"/>
+            <a:ext cx="6090120" cy="3423240"/>
           </a:xfrm>
           <a:prstGeom prst="rect">
             <a:avLst/>
@@ -1799,7 +1826,7 @@
         <p:spPr>
           <a:xfrm>
             <a:off x="685800" y="4343400"/>
-            <a:ext cx="5481000" cy="4109400"/>
+            <a:ext cx="5480640" cy="4109040"/>
           </a:xfrm>
           <a:prstGeom prst="rect">
             <a:avLst/>
@@ -1808,7 +1835,7 @@
         <p:txBody>
           <a:bodyPr lIns="0" rIns="0" tIns="0" bIns="0"/>
           <a:p>
-            <a:pPr marL="216000" indent="-211320">
+            <a:pPr marL="216000" indent="-210960">
               <a:lnSpc>
                 <a:spcPct val="100000"/>
               </a:lnSpc>
@@ -1824,7 +1851,7 @@
             </a:endParaRPr>
           </a:p>
           <a:p>
-            <a:pPr marL="216000" indent="-211320">
+            <a:pPr marL="216000" indent="-210960">
               <a:lnSpc>
                 <a:spcPct val="100000"/>
               </a:lnSpc>
@@ -1840,7 +1867,7 @@
             </a:endParaRPr>
           </a:p>
           <a:p>
-            <a:pPr marL="216000" indent="-211320">
+            <a:pPr marL="216000" indent="-210960">
               <a:lnSpc>
                 <a:spcPct val="100000"/>
               </a:lnSpc>
@@ -1856,7 +1883,7 @@
             </a:endParaRPr>
           </a:p>
           <a:p>
-            <a:pPr marL="216000" indent="-211320">
+            <a:pPr marL="216000" indent="-210960">
               <a:lnSpc>
                 <a:spcPct val="100000"/>
               </a:lnSpc>
@@ -5604,7 +5631,7 @@
         <p:spPr>
           <a:xfrm>
             <a:off x="0" y="0"/>
-            <a:ext cx="12185640" cy="6851520"/>
+            <a:ext cx="12185280" cy="6851160"/>
           </a:xfrm>
           <a:prstGeom prst="rect">
             <a:avLst/>
@@ -5636,8 +5663,8 @@
         </p:nvSpPr>
         <p:spPr>
           <a:xfrm flipV="1">
-            <a:off x="0" y="-6480"/>
-            <a:ext cx="12182400" cy="6851520"/>
+            <a:off x="0" y="-7200"/>
+            <a:ext cx="12182040" cy="6851160"/>
           </a:xfrm>
           <a:prstGeom prst="snip1Rect">
             <a:avLst>
@@ -5692,7 +5719,7 @@
         <p:spPr>
           <a:xfrm>
             <a:off x="684360" y="685800"/>
-            <a:ext cx="9672480" cy="3666960"/>
+            <a:ext cx="9672120" cy="3666600"/>
           </a:xfrm>
           <a:prstGeom prst="rect">
             <a:avLst/>
@@ -5743,7 +5770,7 @@
         <p:spPr>
           <a:xfrm>
             <a:off x="684360" y="4648320"/>
-            <a:ext cx="6999120" cy="1136520"/>
+            <a:ext cx="6998760" cy="1136160"/>
           </a:xfrm>
           <a:prstGeom prst="rect">
             <a:avLst/>
@@ -5881,7 +5908,7 @@
         <p:spPr>
           <a:xfrm>
             <a:off x="684360" y="4487400"/>
-            <a:ext cx="8528040" cy="1500480"/>
+            <a:ext cx="8527680" cy="1500120"/>
           </a:xfrm>
           <a:prstGeom prst="rect">
             <a:avLst/>
@@ -5930,7 +5957,7 @@
         <p:spPr>
           <a:xfrm>
             <a:off x="684360" y="685800"/>
-            <a:ext cx="8528040" cy="3608640"/>
+            <a:ext cx="8527680" cy="3608280"/>
           </a:xfrm>
           <a:prstGeom prst="rect">
             <a:avLst/>
@@ -5949,7 +5976,7 @@
         <p:txBody>
           <a:bodyPr lIns="90000" rIns="90000" tIns="45000" bIns="45000" anchor="ctr"/>
           <a:p>
-            <a:pPr marL="285840" indent="-279360">
+            <a:pPr marL="285840" indent="-279000">
               <a:lnSpc>
                 <a:spcPct val="100000"/>
               </a:lnSpc>
@@ -6081,7 +6108,7 @@
             </a:endParaRPr>
           </a:p>
           <a:p>
-            <a:pPr marL="285840" indent="-279360">
+            <a:pPr marL="285840" indent="-279000">
               <a:lnSpc>
                 <a:spcPct val="100000"/>
               </a:lnSpc>
@@ -6127,7 +6154,7 @@
         <p:spPr>
           <a:xfrm>
             <a:off x="4733640" y="3979440"/>
-            <a:ext cx="907920" cy="907920"/>
+            <a:ext cx="907560" cy="907560"/>
           </a:xfrm>
           <a:prstGeom prst="rect">
             <a:avLst/>
@@ -6150,7 +6177,7 @@
         <p:spPr>
           <a:xfrm>
             <a:off x="6825960" y="4030200"/>
-            <a:ext cx="907920" cy="907920"/>
+            <a:ext cx="907560" cy="907560"/>
           </a:xfrm>
           <a:prstGeom prst="rect">
             <a:avLst/>
@@ -6173,7 +6200,7 @@
         <p:spPr>
           <a:xfrm>
             <a:off x="5354640" y="2725920"/>
-            <a:ext cx="907920" cy="907920"/>
+            <a:ext cx="907560" cy="907560"/>
           </a:xfrm>
           <a:prstGeom prst="rect">
             <a:avLst/>
@@ -6196,7 +6223,7 @@
         <p:spPr>
           <a:xfrm>
             <a:off x="8550000" y="3433320"/>
-            <a:ext cx="907920" cy="907920"/>
+            <a:ext cx="907560" cy="907560"/>
           </a:xfrm>
           <a:prstGeom prst="rect">
             <a:avLst/>
@@ -6219,7 +6246,7 @@
         <p:spPr>
           <a:xfrm>
             <a:off x="5153040" y="5079960"/>
-            <a:ext cx="907920" cy="907920"/>
+            <a:ext cx="907560" cy="907560"/>
           </a:xfrm>
           <a:prstGeom prst="rect">
             <a:avLst/>
@@ -6237,8 +6264,8 @@
         </p:nvSpPr>
         <p:spPr>
           <a:xfrm rot="3732600">
-            <a:off x="7995240" y="3761640"/>
-            <a:ext cx="197640" cy="663480"/>
+            <a:off x="7995240" y="3761280"/>
+            <a:ext cx="197280" cy="663120"/>
           </a:xfrm>
           <a:prstGeom prst="downArrow">
             <a:avLst>
@@ -6276,8 +6303,8 @@
         </p:nvSpPr>
         <p:spPr>
           <a:xfrm rot="14618400">
-            <a:off x="6343560" y="4766400"/>
-            <a:ext cx="197640" cy="663480"/>
+            <a:off x="6343560" y="4766760"/>
+            <a:ext cx="197280" cy="663120"/>
           </a:xfrm>
           <a:prstGeom prst="downArrow">
             <a:avLst>
@@ -6315,8 +6342,8 @@
         </p:nvSpPr>
         <p:spPr>
           <a:xfrm rot="5400000">
-            <a:off x="6195240" y="4132800"/>
-            <a:ext cx="197640" cy="663480"/>
+            <a:off x="6195600" y="4132800"/>
+            <a:ext cx="197280" cy="663120"/>
           </a:xfrm>
           <a:prstGeom prst="downArrow">
             <a:avLst>
@@ -6355,7 +6382,7 @@
         <p:spPr>
           <a:xfrm rot="7014000">
             <a:off x="6427440" y="3551760"/>
-            <a:ext cx="197640" cy="663480"/>
+            <a:ext cx="197280" cy="663120"/>
           </a:xfrm>
           <a:prstGeom prst="downArrow">
             <a:avLst>
@@ -6393,8 +6420,8 @@
         </p:nvSpPr>
         <p:spPr>
           <a:xfrm rot="1747800">
-            <a:off x="5087880" y="3300840"/>
-            <a:ext cx="197640" cy="663480"/>
+            <a:off x="5087880" y="3300480"/>
+            <a:ext cx="197280" cy="663120"/>
           </a:xfrm>
           <a:prstGeom prst="downArrow">
             <a:avLst>
@@ -6482,7 +6509,7 @@
         <p:spPr>
           <a:xfrm>
             <a:off x="6868080" y="306720"/>
-            <a:ext cx="5037480" cy="2079360"/>
+            <a:ext cx="5037120" cy="2079000"/>
           </a:xfrm>
           <a:prstGeom prst="rect">
             <a:avLst/>
@@ -6525,7 +6552,7 @@
         <p:spPr>
           <a:xfrm>
             <a:off x="6271200" y="2669400"/>
-            <a:ext cx="5626440" cy="3002400"/>
+            <a:ext cx="5626080" cy="3002040"/>
           </a:xfrm>
           <a:prstGeom prst="rect">
             <a:avLst/>
@@ -6570,7 +6597,7 @@
         <p:spPr>
           <a:xfrm>
             <a:off x="129960" y="5709960"/>
-            <a:ext cx="11176920" cy="1083600"/>
+            <a:ext cx="11176560" cy="1083240"/>
           </a:xfrm>
           <a:prstGeom prst="rect">
             <a:avLst/>
@@ -6615,7 +6642,7 @@
         <p:spPr>
           <a:xfrm>
             <a:off x="207000" y="1787400"/>
-            <a:ext cx="5588280" cy="3221640"/>
+            <a:ext cx="5587920" cy="3221280"/>
           </a:xfrm>
           <a:prstGeom prst="rect">
             <a:avLst/>
@@ -6660,7 +6687,7 @@
         <p:spPr>
           <a:xfrm>
             <a:off x="684360" y="4487400"/>
-            <a:ext cx="8528040" cy="1500480"/>
+            <a:ext cx="8527680" cy="1500120"/>
           </a:xfrm>
           <a:prstGeom prst="rect">
             <a:avLst/>
@@ -6709,7 +6736,7 @@
         <p:spPr>
           <a:xfrm>
             <a:off x="684360" y="685800"/>
-            <a:ext cx="8528040" cy="3608640"/>
+            <a:ext cx="8527680" cy="3608280"/>
           </a:xfrm>
           <a:prstGeom prst="rect">
             <a:avLst/>
@@ -6728,7 +6755,7 @@
         <p:txBody>
           <a:bodyPr lIns="90000" rIns="90000" tIns="45000" bIns="45000" anchor="ctr"/>
           <a:p>
-            <a:pPr marL="285840" indent="-279360">
+            <a:pPr marL="285840" indent="-279000">
               <a:lnSpc>
                 <a:spcPct val="100000"/>
               </a:lnSpc>
@@ -6780,7 +6807,7 @@
             </a:endParaRPr>
           </a:p>
           <a:p>
-            <a:pPr marL="285840" indent="-279360">
+            <a:pPr marL="285840" indent="-279000">
               <a:lnSpc>
                 <a:spcPct val="100000"/>
               </a:lnSpc>
@@ -6822,7 +6849,7 @@
             </a:endParaRPr>
           </a:p>
           <a:p>
-            <a:pPr marL="285840" indent="-279360">
+            <a:pPr marL="285840" indent="-279000">
               <a:lnSpc>
                 <a:spcPct val="100000"/>
               </a:lnSpc>
@@ -6874,7 +6901,7 @@
             </a:endParaRPr>
           </a:p>
           <a:p>
-            <a:pPr marL="285840" indent="-279360">
+            <a:pPr marL="285840" indent="-279000">
               <a:lnSpc>
                 <a:spcPct val="100000"/>
               </a:lnSpc>
@@ -7042,7 +7069,7 @@
         <p:spPr>
           <a:xfrm>
             <a:off x="4629600" y="1832040"/>
-            <a:ext cx="848160" cy="848160"/>
+            <a:ext cx="847800" cy="847800"/>
           </a:xfrm>
           <a:prstGeom prst="rect">
             <a:avLst/>
@@ -7065,7 +7092,7 @@
         <p:spPr>
           <a:xfrm>
             <a:off x="4463640" y="4185360"/>
-            <a:ext cx="1174680" cy="466920"/>
+            <a:ext cx="1174320" cy="466560"/>
           </a:xfrm>
           <a:prstGeom prst="rect">
             <a:avLst/>
@@ -7088,7 +7115,7 @@
         <p:spPr>
           <a:xfrm>
             <a:off x="4586040" y="2785680"/>
-            <a:ext cx="891720" cy="1033920"/>
+            <a:ext cx="891360" cy="1033560"/>
           </a:xfrm>
           <a:prstGeom prst="rect">
             <a:avLst/>
@@ -7111,7 +7138,7 @@
         <p:spPr>
           <a:xfrm>
             <a:off x="250560" y="1953720"/>
-            <a:ext cx="907920" cy="907920"/>
+            <a:ext cx="907560" cy="907560"/>
           </a:xfrm>
           <a:prstGeom prst="rect">
             <a:avLst/>
@@ -7134,7 +7161,7 @@
         <p:spPr>
           <a:xfrm>
             <a:off x="271440" y="3259800"/>
-            <a:ext cx="907920" cy="907920"/>
+            <a:ext cx="907560" cy="907560"/>
           </a:xfrm>
           <a:prstGeom prst="rect">
             <a:avLst/>
@@ -7157,7 +7184,7 @@
         <p:spPr>
           <a:xfrm>
             <a:off x="2440800" y="2741040"/>
-            <a:ext cx="907920" cy="907920"/>
+            <a:ext cx="907560" cy="907560"/>
           </a:xfrm>
           <a:prstGeom prst="rect">
             <a:avLst/>
@@ -7176,7 +7203,7 @@
         <p:spPr>
           <a:xfrm rot="1192200">
             <a:off x="1577160" y="2558520"/>
-            <a:ext cx="972000" cy="478080"/>
+            <a:ext cx="971640" cy="477720"/>
           </a:xfrm>
           <a:prstGeom prst="rightArrow">
             <a:avLst>
@@ -7217,8 +7244,8 @@
         </p:nvSpPr>
         <p:spPr>
           <a:xfrm rot="20407800">
-            <a:off x="1555920" y="3347640"/>
-            <a:ext cx="972000" cy="478080"/>
+            <a:off x="1555920" y="3347280"/>
+            <a:ext cx="971640" cy="477720"/>
           </a:xfrm>
           <a:prstGeom prst="rightArrow">
             <a:avLst>
@@ -7260,7 +7287,7 @@
         <p:spPr>
           <a:xfrm rot="1192200">
             <a:off x="3330720" y="3666960"/>
-            <a:ext cx="972000" cy="478080"/>
+            <a:ext cx="971640" cy="477720"/>
           </a:xfrm>
           <a:prstGeom prst="rightArrow">
             <a:avLst>
@@ -7301,8 +7328,8 @@
         </p:nvSpPr>
         <p:spPr>
           <a:xfrm rot="20407800">
-            <a:off x="3404160" y="2343240"/>
-            <a:ext cx="972000" cy="478080"/>
+            <a:off x="3404160" y="2342880"/>
+            <a:ext cx="971640" cy="477720"/>
           </a:xfrm>
           <a:prstGeom prst="rightArrow">
             <a:avLst>
@@ -7344,7 +7371,7 @@
         <p:spPr>
           <a:xfrm>
             <a:off x="3483720" y="3004200"/>
-            <a:ext cx="972000" cy="478080"/>
+            <a:ext cx="971640" cy="477720"/>
           </a:xfrm>
           <a:prstGeom prst="rightArrow">
             <a:avLst>
@@ -7390,7 +7417,7 @@
         <p:spPr>
           <a:xfrm>
             <a:off x="5819760" y="5709960"/>
-            <a:ext cx="907920" cy="907920"/>
+            <a:ext cx="907560" cy="907560"/>
           </a:xfrm>
           <a:prstGeom prst="rect">
             <a:avLst/>
@@ -7413,7 +7440,7 @@
         <p:spPr>
           <a:xfrm>
             <a:off x="2060640" y="5759640"/>
-            <a:ext cx="907920" cy="907920"/>
+            <a:ext cx="907560" cy="907560"/>
           </a:xfrm>
           <a:prstGeom prst="rect">
             <a:avLst/>
@@ -7436,7 +7463,7 @@
         <p:spPr>
           <a:xfrm>
             <a:off x="9383040" y="5709960"/>
-            <a:ext cx="907920" cy="907920"/>
+            <a:ext cx="907560" cy="907560"/>
           </a:xfrm>
           <a:prstGeom prst="rect">
             <a:avLst/>
@@ -7459,7 +7486,7 @@
         <p:spPr>
           <a:xfrm>
             <a:off x="7495920" y="5709960"/>
-            <a:ext cx="907920" cy="907920"/>
+            <a:ext cx="907560" cy="907560"/>
           </a:xfrm>
           <a:prstGeom prst="rect">
             <a:avLst/>
@@ -7482,7 +7509,7 @@
         <p:spPr>
           <a:xfrm>
             <a:off x="4004640" y="5709960"/>
-            <a:ext cx="907920" cy="907920"/>
+            <a:ext cx="907560" cy="907560"/>
           </a:xfrm>
           <a:prstGeom prst="rect">
             <a:avLst/>
@@ -7505,7 +7532,7 @@
         <p:spPr>
           <a:xfrm>
             <a:off x="276120" y="5759640"/>
-            <a:ext cx="907920" cy="907920"/>
+            <a:ext cx="907560" cy="907560"/>
           </a:xfrm>
           <a:prstGeom prst="rect">
             <a:avLst/>
@@ -7524,7 +7551,7 @@
         <p:spPr>
           <a:xfrm>
             <a:off x="1230120" y="6098760"/>
-            <a:ext cx="676440" cy="255600"/>
+            <a:ext cx="676080" cy="255240"/>
           </a:xfrm>
           <a:prstGeom prst="rightArrow">
             <a:avLst>
@@ -7563,7 +7590,7 @@
         <p:spPr>
           <a:xfrm>
             <a:off x="3103920" y="6117480"/>
-            <a:ext cx="676440" cy="255600"/>
+            <a:ext cx="676080" cy="255240"/>
           </a:xfrm>
           <a:prstGeom prst="rightArrow">
             <a:avLst>
@@ -7602,7 +7629,7 @@
         <p:spPr>
           <a:xfrm>
             <a:off x="4958640" y="6109200"/>
-            <a:ext cx="676440" cy="255600"/>
+            <a:ext cx="676080" cy="255240"/>
           </a:xfrm>
           <a:prstGeom prst="rightArrow">
             <a:avLst>
@@ -7641,7 +7668,7 @@
         <p:spPr>
           <a:xfrm>
             <a:off x="6754320" y="6098760"/>
-            <a:ext cx="676440" cy="255600"/>
+            <a:ext cx="676080" cy="255240"/>
           </a:xfrm>
           <a:prstGeom prst="rightArrow">
             <a:avLst>
@@ -7680,7 +7707,7 @@
         <p:spPr>
           <a:xfrm>
             <a:off x="8468280" y="6085800"/>
-            <a:ext cx="676440" cy="255600"/>
+            <a:ext cx="676080" cy="255240"/>
           </a:xfrm>
           <a:prstGeom prst="rightArrow">
             <a:avLst>
@@ -7723,7 +7750,7 @@
         <p:spPr>
           <a:xfrm>
             <a:off x="6582600" y="3915000"/>
-            <a:ext cx="907920" cy="907920"/>
+            <a:ext cx="907560" cy="907560"/>
           </a:xfrm>
           <a:prstGeom prst="rect">
             <a:avLst/>
@@ -7746,7 +7773,7 @@
         <p:spPr>
           <a:xfrm>
             <a:off x="8674920" y="3965760"/>
-            <a:ext cx="907920" cy="907920"/>
+            <a:ext cx="907560" cy="907560"/>
           </a:xfrm>
           <a:prstGeom prst="rect">
             <a:avLst/>
@@ -7769,7 +7796,7 @@
         <p:spPr>
           <a:xfrm>
             <a:off x="7203600" y="2661480"/>
-            <a:ext cx="907920" cy="907920"/>
+            <a:ext cx="907560" cy="907560"/>
           </a:xfrm>
           <a:prstGeom prst="rect">
             <a:avLst/>
@@ -7792,7 +7819,7 @@
         <p:spPr>
           <a:xfrm>
             <a:off x="10398960" y="3368880"/>
-            <a:ext cx="907920" cy="907920"/>
+            <a:ext cx="907560" cy="907560"/>
           </a:xfrm>
           <a:prstGeom prst="rect">
             <a:avLst/>
@@ -7815,7 +7842,7 @@
         <p:spPr>
           <a:xfrm>
             <a:off x="7002000" y="5015520"/>
-            <a:ext cx="907920" cy="907920"/>
+            <a:ext cx="907560" cy="907560"/>
           </a:xfrm>
           <a:prstGeom prst="rect">
             <a:avLst/>
@@ -7833,8 +7860,8 @@
         </p:nvSpPr>
         <p:spPr>
           <a:xfrm rot="3732600">
-            <a:off x="9844560" y="3697560"/>
-            <a:ext cx="197640" cy="663480"/>
+            <a:off x="9844560" y="3697200"/>
+            <a:ext cx="197280" cy="663120"/>
           </a:xfrm>
           <a:prstGeom prst="downArrow">
             <a:avLst>
@@ -7872,8 +7899,8 @@
         </p:nvSpPr>
         <p:spPr>
           <a:xfrm rot="14618400">
-            <a:off x="8192520" y="4702320"/>
-            <a:ext cx="197640" cy="663480"/>
+            <a:off x="8192520" y="4702680"/>
+            <a:ext cx="197280" cy="663120"/>
           </a:xfrm>
           <a:prstGeom prst="downArrow">
             <a:avLst>
@@ -7911,8 +7938,8 @@
         </p:nvSpPr>
         <p:spPr>
           <a:xfrm rot="5400000">
-            <a:off x="8044200" y="4068360"/>
-            <a:ext cx="197640" cy="663480"/>
+            <a:off x="8044560" y="4068360"/>
+            <a:ext cx="197280" cy="663120"/>
           </a:xfrm>
           <a:prstGeom prst="downArrow">
             <a:avLst>
@@ -7951,7 +7978,7 @@
         <p:spPr>
           <a:xfrm rot="7014000">
             <a:off x="8276760" y="3487320"/>
-            <a:ext cx="197640" cy="663480"/>
+            <a:ext cx="197280" cy="663120"/>
           </a:xfrm>
           <a:prstGeom prst="downArrow">
             <a:avLst>
@@ -7989,8 +8016,8 @@
         </p:nvSpPr>
         <p:spPr>
           <a:xfrm rot="1747800">
-            <a:off x="7094880" y="3422880"/>
-            <a:ext cx="197640" cy="663480"/>
+            <a:off x="7094880" y="3422520"/>
+            <a:ext cx="197280" cy="663120"/>
           </a:xfrm>
           <a:prstGeom prst="downArrow">
             <a:avLst>
@@ -8033,7 +8060,7 @@
         <p:spPr>
           <a:xfrm>
             <a:off x="8641080" y="309600"/>
-            <a:ext cx="907920" cy="907920"/>
+            <a:ext cx="907560" cy="907560"/>
           </a:xfrm>
           <a:prstGeom prst="rect">
             <a:avLst/>
@@ -8056,7 +8083,7 @@
         <p:spPr>
           <a:xfrm>
             <a:off x="10568880" y="1497240"/>
-            <a:ext cx="907920" cy="907920"/>
+            <a:ext cx="907560" cy="907560"/>
           </a:xfrm>
           <a:prstGeom prst="rect">
             <a:avLst/>
@@ -8079,7 +8106,7 @@
         <p:spPr>
           <a:xfrm>
             <a:off x="6932880" y="1497240"/>
-            <a:ext cx="907920" cy="907920"/>
+            <a:ext cx="907560" cy="907560"/>
           </a:xfrm>
           <a:prstGeom prst="rect">
             <a:avLst/>
@@ -8098,7 +8125,7 @@
         <p:spPr>
           <a:xfrm>
             <a:off x="8173800" y="1774080"/>
-            <a:ext cx="2062080" cy="354240"/>
+            <a:ext cx="2061720" cy="353880"/>
           </a:xfrm>
           <a:prstGeom prst="rightArrow">
             <a:avLst>
@@ -8137,7 +8164,7 @@
         <p:spPr>
           <a:xfrm>
             <a:off x="8947440" y="1361160"/>
-            <a:ext cx="295200" cy="400680"/>
+            <a:ext cx="294840" cy="400320"/>
           </a:xfrm>
           <a:prstGeom prst="downArrow">
             <a:avLst>
@@ -8225,7 +8252,7 @@
         <p:spPr>
           <a:xfrm>
             <a:off x="0" y="0"/>
-            <a:ext cx="12185640" cy="6851520"/>
+            <a:ext cx="12185280" cy="6851160"/>
           </a:xfrm>
           <a:prstGeom prst="rect">
             <a:avLst/>
@@ -8278,7 +8305,7 @@
         <p:spPr>
           <a:xfrm>
             <a:off x="640440" y="685800"/>
-            <a:ext cx="4812120" cy="4597200"/>
+            <a:ext cx="4811760" cy="4596840"/>
           </a:xfrm>
           <a:prstGeom prst="rect">
             <a:avLst/>
@@ -8329,7 +8356,7 @@
         <p:spPr>
           <a:xfrm>
             <a:off x="6095880" y="0"/>
-            <a:ext cx="6089400" cy="6851520"/>
+            <a:ext cx="6089040" cy="6851160"/>
           </a:xfrm>
           <a:prstGeom prst="rect">
             <a:avLst/>
@@ -8367,7 +8394,7 @@
         <p:spPr>
           <a:xfrm>
             <a:off x="6625800" y="685800"/>
-            <a:ext cx="4872600" cy="4597200"/>
+            <a:ext cx="4872240" cy="4596840"/>
           </a:xfrm>
           <a:prstGeom prst="rect">
             <a:avLst/>
@@ -8388,7 +8415,7 @@
             <a:normAutofit/>
           </a:bodyPr>
           <a:p>
-            <a:pPr marL="285840" indent="-279360">
+            <a:pPr marL="285840" indent="-279000">
               <a:lnSpc>
                 <a:spcPct val="100000"/>
               </a:lnSpc>
@@ -8420,7 +8447,7 @@
             </a:endParaRPr>
           </a:p>
           <a:p>
-            <a:pPr marL="285840" indent="-279360">
+            <a:pPr marL="285840" indent="-279000">
               <a:lnSpc>
                 <a:spcPct val="100000"/>
               </a:lnSpc>
@@ -8452,7 +8479,7 @@
             </a:endParaRPr>
           </a:p>
           <a:p>
-            <a:pPr marL="285840" indent="-279360">
+            <a:pPr marL="285840" indent="-279000">
               <a:lnSpc>
                 <a:spcPct val="100000"/>
               </a:lnSpc>
@@ -8484,7 +8511,7 @@
             </a:endParaRPr>
           </a:p>
           <a:p>
-            <a:pPr marL="285840" indent="-279360">
+            <a:pPr marL="285840" indent="-279000">
               <a:lnSpc>
                 <a:spcPct val="100000"/>
               </a:lnSpc>
@@ -8516,7 +8543,7 @@
             </a:endParaRPr>
           </a:p>
           <a:p>
-            <a:pPr marL="285840" indent="-279360">
+            <a:pPr marL="285840" indent="-279000">
               <a:lnSpc>
                 <a:spcPct val="100000"/>
               </a:lnSpc>
@@ -8607,7 +8634,7 @@
         <p:spPr>
           <a:xfrm>
             <a:off x="684360" y="4487400"/>
-            <a:ext cx="8528040" cy="1500480"/>
+            <a:ext cx="8527680" cy="1500120"/>
           </a:xfrm>
           <a:prstGeom prst="rect">
             <a:avLst/>
@@ -8656,7 +8683,7 @@
         <p:spPr>
           <a:xfrm>
             <a:off x="684360" y="685800"/>
-            <a:ext cx="8528040" cy="3608640"/>
+            <a:ext cx="8527680" cy="3608280"/>
           </a:xfrm>
           <a:prstGeom prst="rect">
             <a:avLst/>
@@ -8675,7 +8702,7 @@
         <p:txBody>
           <a:bodyPr lIns="90000" rIns="90000" tIns="45000" bIns="45000" anchor="ctr"/>
           <a:p>
-            <a:pPr marL="285840" indent="-279360">
+            <a:pPr marL="285840" indent="-279000">
               <a:lnSpc>
                 <a:spcPct val="100000"/>
               </a:lnSpc>
@@ -8707,7 +8734,7 @@
             </a:endParaRPr>
           </a:p>
           <a:p>
-            <a:pPr marL="285840" indent="-279360">
+            <a:pPr marL="285840" indent="-279000">
               <a:lnSpc>
                 <a:spcPct val="100000"/>
               </a:lnSpc>
@@ -8817,7 +8844,7 @@
         <p:spPr>
           <a:xfrm>
             <a:off x="6995520" y="1949760"/>
-            <a:ext cx="848160" cy="848160"/>
+            <a:ext cx="847800" cy="847800"/>
           </a:xfrm>
           <a:prstGeom prst="rect">
             <a:avLst/>
@@ -8840,7 +8867,7 @@
         <p:spPr>
           <a:xfrm>
             <a:off x="6829560" y="4303080"/>
-            <a:ext cx="1174680" cy="466920"/>
+            <a:ext cx="1174320" cy="466560"/>
           </a:xfrm>
           <a:prstGeom prst="rect">
             <a:avLst/>
@@ -8863,7 +8890,7 @@
         <p:spPr>
           <a:xfrm>
             <a:off x="6951960" y="2903040"/>
-            <a:ext cx="891720" cy="1033920"/>
+            <a:ext cx="891360" cy="1033560"/>
           </a:xfrm>
           <a:prstGeom prst="rect">
             <a:avLst/>
@@ -8886,7 +8913,7 @@
         <p:spPr>
           <a:xfrm>
             <a:off x="2616120" y="2071080"/>
-            <a:ext cx="907920" cy="907920"/>
+            <a:ext cx="907560" cy="907560"/>
           </a:xfrm>
           <a:prstGeom prst="rect">
             <a:avLst/>
@@ -8909,7 +8936,7 @@
         <p:spPr>
           <a:xfrm>
             <a:off x="2637000" y="3377160"/>
-            <a:ext cx="907920" cy="907920"/>
+            <a:ext cx="907560" cy="907560"/>
           </a:xfrm>
           <a:prstGeom prst="rect">
             <a:avLst/>
@@ -8928,7 +8955,7 @@
         <p:spPr>
           <a:xfrm rot="1192200">
             <a:off x="3942720" y="2675880"/>
-            <a:ext cx="972000" cy="478080"/>
+            <a:ext cx="971640" cy="477720"/>
           </a:xfrm>
           <a:prstGeom prst="rightArrow">
             <a:avLst>
@@ -8969,8 +8996,8 @@
         </p:nvSpPr>
         <p:spPr>
           <a:xfrm rot="20407800">
-            <a:off x="3921480" y="3465000"/>
-            <a:ext cx="972000" cy="478080"/>
+            <a:off x="3921480" y="3464640"/>
+            <a:ext cx="971640" cy="477720"/>
           </a:xfrm>
           <a:prstGeom prst="rightArrow">
             <a:avLst>
@@ -9012,7 +9039,7 @@
         <p:spPr>
           <a:xfrm rot="1192200">
             <a:off x="5696640" y="3784320"/>
-            <a:ext cx="972000" cy="478080"/>
+            <a:ext cx="971640" cy="477720"/>
           </a:xfrm>
           <a:prstGeom prst="rightArrow">
             <a:avLst>
@@ -9053,8 +9080,8 @@
         </p:nvSpPr>
         <p:spPr>
           <a:xfrm rot="20407800">
-            <a:off x="5769720" y="2460600"/>
-            <a:ext cx="972000" cy="478080"/>
+            <a:off x="5769720" y="2460240"/>
+            <a:ext cx="971640" cy="477720"/>
           </a:xfrm>
           <a:prstGeom prst="rightArrow">
             <a:avLst>
@@ -9096,7 +9123,7 @@
         <p:spPr>
           <a:xfrm>
             <a:off x="5849640" y="3121560"/>
-            <a:ext cx="972000" cy="478080"/>
+            <a:ext cx="971640" cy="477720"/>
           </a:xfrm>
           <a:prstGeom prst="rightArrow">
             <a:avLst>
@@ -9142,7 +9169,7 @@
         <p:spPr>
           <a:xfrm>
             <a:off x="4950720" y="2998800"/>
-            <a:ext cx="750240" cy="750240"/>
+            <a:ext cx="749880" cy="749880"/>
           </a:xfrm>
           <a:prstGeom prst="rect">
             <a:avLst/>
@@ -9210,7 +9237,7 @@
         <p:spPr>
           <a:xfrm>
             <a:off x="684360" y="4487400"/>
-            <a:ext cx="8528040" cy="1500480"/>
+            <a:ext cx="8527680" cy="1500120"/>
           </a:xfrm>
           <a:prstGeom prst="rect">
             <a:avLst/>
@@ -9259,7 +9286,7 @@
         <p:spPr>
           <a:xfrm>
             <a:off x="684360" y="685800"/>
-            <a:ext cx="8528040" cy="3608640"/>
+            <a:ext cx="8527680" cy="3608280"/>
           </a:xfrm>
           <a:prstGeom prst="rect">
             <a:avLst/>
@@ -9278,7 +9305,7 @@
         <p:txBody>
           <a:bodyPr lIns="90000" rIns="90000" tIns="45000" bIns="45000" anchor="ctr"/>
           <a:p>
-            <a:pPr marL="285840" indent="-279360">
+            <a:pPr marL="285840" indent="-279000">
               <a:lnSpc>
                 <a:spcPct val="100000"/>
               </a:lnSpc>
@@ -9404,7 +9431,7 @@
             </a:endParaRPr>
           </a:p>
           <a:p>
-            <a:pPr marL="285840" indent="-279360">
+            <a:pPr marL="285840" indent="-279000">
               <a:lnSpc>
                 <a:spcPct val="100000"/>
               </a:lnSpc>
@@ -9496,7 +9523,7 @@
         <p:spPr>
           <a:xfrm>
             <a:off x="3562560" y="1395720"/>
-            <a:ext cx="907920" cy="907920"/>
+            <a:ext cx="907560" cy="907560"/>
           </a:xfrm>
           <a:prstGeom prst="rect">
             <a:avLst/>
@@ -9519,7 +9546,7 @@
         <p:spPr>
           <a:xfrm>
             <a:off x="6678360" y="1395720"/>
-            <a:ext cx="907920" cy="907920"/>
+            <a:ext cx="907560" cy="907560"/>
           </a:xfrm>
           <a:prstGeom prst="rect">
             <a:avLst/>
@@ -9542,7 +9569,7 @@
         <p:spPr>
           <a:xfrm>
             <a:off x="7042320" y="3904200"/>
-            <a:ext cx="907920" cy="907920"/>
+            <a:ext cx="907560" cy="907560"/>
           </a:xfrm>
           <a:prstGeom prst="rect">
             <a:avLst/>
@@ -9565,7 +9592,7 @@
         <p:spPr>
           <a:xfrm>
             <a:off x="3562560" y="3904200"/>
-            <a:ext cx="907920" cy="907920"/>
+            <a:ext cx="907560" cy="907560"/>
           </a:xfrm>
           <a:prstGeom prst="rect">
             <a:avLst/>
@@ -9588,7 +9615,7 @@
         <p:spPr>
           <a:xfrm>
             <a:off x="6678360" y="1395720"/>
-            <a:ext cx="907920" cy="907920"/>
+            <a:ext cx="907560" cy="907560"/>
           </a:xfrm>
           <a:prstGeom prst="rect">
             <a:avLst/>
@@ -9611,7 +9638,7 @@
         <p:spPr>
           <a:xfrm>
             <a:off x="4113000" y="2039400"/>
-            <a:ext cx="907920" cy="907920"/>
+            <a:ext cx="907560" cy="907560"/>
           </a:xfrm>
           <a:prstGeom prst="rect">
             <a:avLst/>
@@ -9634,7 +9661,7 @@
         <p:spPr>
           <a:xfrm>
             <a:off x="7296480" y="2133000"/>
-            <a:ext cx="907920" cy="907920"/>
+            <a:ext cx="907560" cy="907560"/>
           </a:xfrm>
           <a:prstGeom prst="rect">
             <a:avLst/>
@@ -9653,7 +9680,7 @@
         <p:spPr>
           <a:xfrm>
             <a:off x="5285160" y="1920960"/>
-            <a:ext cx="1176480" cy="538920"/>
+            <a:ext cx="1176120" cy="538560"/>
           </a:xfrm>
           <a:prstGeom prst="rightArrow">
             <a:avLst>
@@ -9695,7 +9722,7 @@
         <p:spPr>
           <a:xfrm>
             <a:off x="5149440" y="4088880"/>
-            <a:ext cx="1176480" cy="538920"/>
+            <a:ext cx="1176120" cy="538560"/>
           </a:xfrm>
           <a:prstGeom prst="rightArrow">
             <a:avLst>
@@ -9760,7 +9787,7 @@
         <p:spPr>
           <a:xfrm>
             <a:off x="4895280" y="2388600"/>
-            <a:ext cx="2701440" cy="358560"/>
+            <a:ext cx="2701080" cy="358200"/>
           </a:xfrm>
           <a:prstGeom prst="rect">
             <a:avLst/>
@@ -9809,7 +9836,7 @@
         <p:spPr>
           <a:xfrm>
             <a:off x="5027400" y="4575240"/>
-            <a:ext cx="2321280" cy="358560"/>
+            <a:ext cx="2320920" cy="358200"/>
           </a:xfrm>
           <a:prstGeom prst="rect">
             <a:avLst/>
@@ -9907,7 +9934,7 @@
         <p:spPr>
           <a:xfrm>
             <a:off x="684360" y="4487400"/>
-            <a:ext cx="8528040" cy="1500480"/>
+            <a:ext cx="8527680" cy="1500120"/>
           </a:xfrm>
           <a:prstGeom prst="rect">
             <a:avLst/>
@@ -9956,7 +9983,7 @@
         <p:spPr>
           <a:xfrm>
             <a:off x="684360" y="685800"/>
-            <a:ext cx="8528040" cy="3608640"/>
+            <a:ext cx="8527680" cy="3608280"/>
           </a:xfrm>
           <a:prstGeom prst="rect">
             <a:avLst/>
@@ -9975,7 +10002,7 @@
         <p:txBody>
           <a:bodyPr lIns="90000" rIns="90000" tIns="45000" bIns="45000" anchor="ctr"/>
           <a:p>
-            <a:pPr marL="285840" indent="-279360">
+            <a:pPr marL="285840" indent="-279000">
               <a:lnSpc>
                 <a:spcPct val="100000"/>
               </a:lnSpc>
@@ -10097,7 +10124,7 @@
         <p:spPr>
           <a:xfrm>
             <a:off x="1863000" y="3157920"/>
-            <a:ext cx="907920" cy="907920"/>
+            <a:ext cx="907560" cy="907560"/>
           </a:xfrm>
           <a:prstGeom prst="rect">
             <a:avLst/>
@@ -10120,7 +10147,7 @@
         <p:spPr>
           <a:xfrm>
             <a:off x="2413440" y="3801600"/>
-            <a:ext cx="907920" cy="907920"/>
+            <a:ext cx="907560" cy="907560"/>
           </a:xfrm>
           <a:prstGeom prst="rect">
             <a:avLst/>
@@ -10143,7 +10170,7 @@
         <p:spPr>
           <a:xfrm>
             <a:off x="7197480" y="3439800"/>
-            <a:ext cx="907920" cy="907920"/>
+            <a:ext cx="907560" cy="907560"/>
           </a:xfrm>
           <a:prstGeom prst="rect">
             <a:avLst/>
@@ -10166,7 +10193,7 @@
         <p:spPr>
           <a:xfrm>
             <a:off x="4758840" y="3366360"/>
-            <a:ext cx="907920" cy="907920"/>
+            <a:ext cx="907560" cy="907560"/>
           </a:xfrm>
           <a:prstGeom prst="rect">
             <a:avLst/>
@@ -10185,7 +10212,7 @@
         <p:spPr>
           <a:xfrm>
             <a:off x="3568680" y="3429000"/>
-            <a:ext cx="930960" cy="907920"/>
+            <a:ext cx="930600" cy="907560"/>
           </a:xfrm>
           <a:prstGeom prst="mathPlus">
             <a:avLst>
@@ -10223,7 +10250,7 @@
         <p:spPr>
           <a:xfrm>
             <a:off x="6095880" y="3654360"/>
-            <a:ext cx="731880" cy="559800"/>
+            <a:ext cx="731520" cy="559440"/>
           </a:xfrm>
           <a:prstGeom prst="mathEqual">
             <a:avLst>
@@ -10284,7 +10311,7 @@
         <p:spPr>
           <a:xfrm>
             <a:off x="4750920" y="2898360"/>
-            <a:ext cx="2683440" cy="3713400"/>
+            <a:ext cx="2683080" cy="3713040"/>
           </a:xfrm>
           <a:prstGeom prst="rect">
             <a:avLst/>
@@ -10327,7 +10354,7 @@
         <p:spPr>
           <a:xfrm>
             <a:off x="684360" y="4487400"/>
-            <a:ext cx="8528040" cy="1500480"/>
+            <a:ext cx="8527680" cy="1500120"/>
           </a:xfrm>
           <a:prstGeom prst="rect">
             <a:avLst/>
@@ -10376,7 +10403,7 @@
         <p:spPr>
           <a:xfrm>
             <a:off x="684360" y="685800"/>
-            <a:ext cx="8528040" cy="3608640"/>
+            <a:ext cx="8527680" cy="3608280"/>
           </a:xfrm>
           <a:prstGeom prst="rect">
             <a:avLst/>
@@ -10395,7 +10422,7 @@
         <p:txBody>
           <a:bodyPr lIns="90000" rIns="90000" tIns="45000" bIns="45000" anchor="ctr"/>
           <a:p>
-            <a:pPr marL="285840" indent="-279360">
+            <a:pPr marL="285840" indent="-279000">
               <a:lnSpc>
                 <a:spcPct val="100000"/>
               </a:lnSpc>
@@ -10531,7 +10558,7 @@
         <p:spPr>
           <a:xfrm>
             <a:off x="4843440" y="2989800"/>
-            <a:ext cx="635400" cy="635400"/>
+            <a:ext cx="635040" cy="635040"/>
           </a:xfrm>
           <a:prstGeom prst="rect">
             <a:avLst/>
@@ -10554,7 +10581,7 @@
         <p:spPr>
           <a:xfrm>
             <a:off x="5028120" y="4248360"/>
-            <a:ext cx="907920" cy="907920"/>
+            <a:ext cx="907560" cy="907560"/>
           </a:xfrm>
           <a:prstGeom prst="rect">
             <a:avLst/>
@@ -10577,7 +10604,7 @@
         <p:spPr>
           <a:xfrm>
             <a:off x="5506200" y="5025240"/>
-            <a:ext cx="907920" cy="907920"/>
+            <a:ext cx="907560" cy="907560"/>
           </a:xfrm>
           <a:prstGeom prst="rect">
             <a:avLst/>
@@ -10600,7 +10627,7 @@
         <p:spPr>
           <a:xfrm>
             <a:off x="6042600" y="4248360"/>
-            <a:ext cx="907920" cy="907920"/>
+            <a:ext cx="907560" cy="907560"/>
           </a:xfrm>
           <a:prstGeom prst="rect">
             <a:avLst/>
@@ -10623,7 +10650,7 @@
         <p:spPr>
           <a:xfrm>
             <a:off x="7944480" y="2602440"/>
-            <a:ext cx="907920" cy="907920"/>
+            <a:ext cx="907560" cy="907560"/>
           </a:xfrm>
           <a:prstGeom prst="rect">
             <a:avLst/>
@@ -10646,7 +10673,7 @@
         <p:spPr>
           <a:xfrm>
             <a:off x="6671160" y="3059640"/>
-            <a:ext cx="565200" cy="565200"/>
+            <a:ext cx="564840" cy="564840"/>
           </a:xfrm>
           <a:prstGeom prst="rect">
             <a:avLst/>
@@ -10669,7 +10696,7 @@
         <p:spPr>
           <a:xfrm>
             <a:off x="2973240" y="3863520"/>
-            <a:ext cx="907920" cy="907920"/>
+            <a:ext cx="907560" cy="907560"/>
           </a:xfrm>
           <a:prstGeom prst="rect">
             <a:avLst/>
@@ -10688,7 +10715,7 @@
         <p:spPr>
           <a:xfrm>
             <a:off x="4012560" y="4487400"/>
-            <a:ext cx="1487160" cy="850680"/>
+            <a:ext cx="1486800" cy="850320"/>
           </a:xfrm>
           <a:custGeom>
             <a:avLst/>
@@ -10740,7 +10767,7 @@
         <p:spPr>
           <a:xfrm>
             <a:off x="4012560" y="4248360"/>
-            <a:ext cx="2023560" cy="232560"/>
+            <a:ext cx="2023200" cy="232200"/>
           </a:xfrm>
           <a:custGeom>
             <a:avLst/>
@@ -10792,7 +10819,7 @@
         <p:spPr>
           <a:xfrm>
             <a:off x="4012560" y="4367880"/>
-            <a:ext cx="932400" cy="233280"/>
+            <a:ext cx="932040" cy="232920"/>
           </a:xfrm>
           <a:custGeom>
             <a:avLst/>
@@ -10843,8 +10870,8 @@
         </p:nvSpPr>
         <p:spPr>
           <a:xfrm flipV="1">
-            <a:off x="7242840" y="3216240"/>
-            <a:ext cx="623160" cy="116640"/>
+            <a:off x="7242840" y="3215520"/>
+            <a:ext cx="622800" cy="116280"/>
           </a:xfrm>
           <a:custGeom>
             <a:avLst/>
@@ -10919,7 +10946,7 @@
         <p:spPr>
           <a:xfrm>
             <a:off x="684360" y="4487400"/>
-            <a:ext cx="8528040" cy="1500480"/>
+            <a:ext cx="8527680" cy="1500120"/>
           </a:xfrm>
           <a:prstGeom prst="rect">
             <a:avLst/>
@@ -10968,7 +10995,7 @@
         <p:spPr>
           <a:xfrm>
             <a:off x="684360" y="685800"/>
-            <a:ext cx="8528040" cy="3608640"/>
+            <a:ext cx="8527680" cy="3608280"/>
           </a:xfrm>
           <a:prstGeom prst="rect">
             <a:avLst/>
@@ -10987,7 +11014,7 @@
         <p:txBody>
           <a:bodyPr lIns="90000" rIns="90000" tIns="45000" bIns="45000" anchor="ctr"/>
           <a:p>
-            <a:pPr marL="285840" indent="-279360">
+            <a:pPr marL="285840" indent="-279000">
               <a:lnSpc>
                 <a:spcPct val="100000"/>
               </a:lnSpc>
@@ -11155,7 +11182,7 @@
         <p:spPr>
           <a:xfrm>
             <a:off x="5430600" y="2730600"/>
-            <a:ext cx="2683440" cy="3713400"/>
+            <a:ext cx="2683080" cy="3713040"/>
           </a:xfrm>
           <a:prstGeom prst="rect">
             <a:avLst/>
@@ -11202,7 +11229,7 @@
         <p:spPr>
           <a:xfrm>
             <a:off x="5523120" y="2822040"/>
-            <a:ext cx="635400" cy="635400"/>
+            <a:ext cx="635040" cy="635040"/>
           </a:xfrm>
           <a:prstGeom prst="rect">
             <a:avLst/>
@@ -11225,7 +11252,7 @@
         <p:spPr>
           <a:xfrm>
             <a:off x="5707800" y="4080600"/>
-            <a:ext cx="907920" cy="907920"/>
+            <a:ext cx="907560" cy="907560"/>
           </a:xfrm>
           <a:prstGeom prst="rect">
             <a:avLst/>
@@ -11248,7 +11275,7 @@
         <p:spPr>
           <a:xfrm>
             <a:off x="6185880" y="4857480"/>
-            <a:ext cx="907920" cy="907920"/>
+            <a:ext cx="907560" cy="907560"/>
           </a:xfrm>
           <a:prstGeom prst="rect">
             <a:avLst/>
@@ -11271,7 +11298,7 @@
         <p:spPr>
           <a:xfrm>
             <a:off x="6722280" y="4080600"/>
-            <a:ext cx="907920" cy="907920"/>
+            <a:ext cx="907560" cy="907560"/>
           </a:xfrm>
           <a:prstGeom prst="rect">
             <a:avLst/>
@@ -11294,7 +11321,7 @@
         <p:spPr>
           <a:xfrm>
             <a:off x="3652920" y="3695760"/>
-            <a:ext cx="907920" cy="907920"/>
+            <a:ext cx="907560" cy="907560"/>
           </a:xfrm>
           <a:prstGeom prst="rect">
             <a:avLst/>
@@ -11313,7 +11340,7 @@
         <p:spPr>
           <a:xfrm>
             <a:off x="4692240" y="4319640"/>
-            <a:ext cx="1487160" cy="850680"/>
+            <a:ext cx="1486800" cy="850320"/>
           </a:xfrm>
           <a:custGeom>
             <a:avLst/>
@@ -11365,7 +11392,7 @@
         <p:spPr>
           <a:xfrm>
             <a:off x="4692240" y="4080600"/>
-            <a:ext cx="2023560" cy="232560"/>
+            <a:ext cx="2023200" cy="232200"/>
           </a:xfrm>
           <a:custGeom>
             <a:avLst/>
@@ -11417,7 +11444,7 @@
         <p:spPr>
           <a:xfrm>
             <a:off x="4692240" y="4200120"/>
-            <a:ext cx="932400" cy="233280"/>
+            <a:ext cx="932040" cy="232920"/>
           </a:xfrm>
           <a:custGeom>
             <a:avLst/>
@@ -11473,7 +11500,7 @@
         <p:spPr>
           <a:xfrm>
             <a:off x="9653760" y="3605400"/>
-            <a:ext cx="907920" cy="907920"/>
+            <a:ext cx="907560" cy="907560"/>
           </a:xfrm>
           <a:prstGeom prst="rect">
             <a:avLst/>
@@ -11491,8 +11518,8 @@
         </p:nvSpPr>
         <p:spPr>
           <a:xfrm rot="10325400">
-            <a:off x="7858440" y="4108680"/>
-            <a:ext cx="1779480" cy="301320"/>
+            <a:off x="7858440" y="4109040"/>
+            <a:ext cx="1779120" cy="300960"/>
           </a:xfrm>
           <a:prstGeom prst="rightArrow">
             <a:avLst>
@@ -11556,7 +11583,7 @@
         <p:spPr>
           <a:xfrm>
             <a:off x="684360" y="4487400"/>
-            <a:ext cx="8528040" cy="1500480"/>
+            <a:ext cx="8527680" cy="1500120"/>
           </a:xfrm>
           <a:prstGeom prst="rect">
             <a:avLst/>
@@ -11605,7 +11632,7 @@
         <p:spPr>
           <a:xfrm>
             <a:off x="684360" y="685800"/>
-            <a:ext cx="8528040" cy="3608640"/>
+            <a:ext cx="8527680" cy="3608280"/>
           </a:xfrm>
           <a:prstGeom prst="rect">
             <a:avLst/>
@@ -11635,7 +11662,7 @@
         <p:spPr>
           <a:xfrm>
             <a:off x="4069440" y="82800"/>
-            <a:ext cx="4039920" cy="2840400"/>
+            <a:ext cx="4039560" cy="2840040"/>
           </a:xfrm>
           <a:prstGeom prst="rect">
             <a:avLst/>
@@ -11658,7 +11685,7 @@
         <p:spPr>
           <a:xfrm>
             <a:off x="83880" y="3103560"/>
-            <a:ext cx="3861000" cy="1638000"/>
+            <a:ext cx="3860640" cy="1637640"/>
           </a:xfrm>
           <a:prstGeom prst="rect">
             <a:avLst/>
@@ -11681,7 +11708,7 @@
         <p:spPr>
           <a:xfrm>
             <a:off x="4161600" y="3103560"/>
-            <a:ext cx="3861000" cy="1638000"/>
+            <a:ext cx="3860640" cy="1637640"/>
           </a:xfrm>
           <a:prstGeom prst="rect">
             <a:avLst/>
@@ -11704,7 +11731,7 @@
         <p:spPr>
           <a:xfrm>
             <a:off x="8230320" y="3103560"/>
-            <a:ext cx="3861000" cy="1638000"/>
+            <a:ext cx="3860640" cy="1637640"/>
           </a:xfrm>
           <a:prstGeom prst="rect">
             <a:avLst/>
@@ -11723,7 +11750,7 @@
         <p:spPr>
           <a:xfrm>
             <a:off x="3993840" y="3766680"/>
-            <a:ext cx="144720" cy="312840"/>
+            <a:ext cx="144360" cy="312480"/>
           </a:xfrm>
           <a:prstGeom prst="rightArrow">
             <a:avLst>
@@ -11762,7 +11789,7 @@
         <p:spPr>
           <a:xfrm>
             <a:off x="8073360" y="3793320"/>
-            <a:ext cx="125640" cy="312840"/>
+            <a:ext cx="125280" cy="312480"/>
           </a:xfrm>
           <a:prstGeom prst="rightArrow">
             <a:avLst>
@@ -11801,7 +11828,7 @@
         <p:spPr>
           <a:xfrm>
             <a:off x="2701080" y="5176080"/>
-            <a:ext cx="1830600" cy="916200"/>
+            <a:ext cx="1830240" cy="915840"/>
           </a:xfrm>
           <a:prstGeom prst="wedgeRectCallout">
             <a:avLst>
@@ -11866,7 +11893,7 @@
         <p:spPr>
           <a:xfrm>
             <a:off x="6722640" y="5196600"/>
-            <a:ext cx="1962000" cy="819360"/>
+            <a:ext cx="1961640" cy="819000"/>
           </a:xfrm>
           <a:prstGeom prst="